<commit_message>
Place Holders in PowerPoint
</commit_message>
<xml_diff>
--- a/Attrition_Case_Study_2_pptx_TAJAR_IP.pptx
+++ b/Attrition_Case_Study_2_pptx_TAJAR_IP.pptx
@@ -5,7 +5,7 @@
     <p:sldMasterId id="2147483648" r:id="rId1"/>
   </p:sldMasterIdLst>
   <p:notesMasterIdLst>
-    <p:notesMasterId r:id="rId14"/>
+    <p:notesMasterId r:id="rId15"/>
   </p:notesMasterIdLst>
   <p:sldIdLst>
     <p:sldId id="256" r:id="rId2"/>
@@ -17,9 +17,10 @@
     <p:sldId id="261" r:id="rId8"/>
     <p:sldId id="262" r:id="rId9"/>
     <p:sldId id="264" r:id="rId10"/>
-    <p:sldId id="263" r:id="rId11"/>
+    <p:sldId id="269" r:id="rId11"/>
     <p:sldId id="268" r:id="rId12"/>
-    <p:sldId id="267" r:id="rId13"/>
+    <p:sldId id="263" r:id="rId13"/>
+    <p:sldId id="267" r:id="rId14"/>
   </p:sldIdLst>
   <p:sldSz cx="12192000" cy="6858000"/>
   <p:notesSz cx="6858000" cy="9144000"/>
@@ -5759,6 +5760,31 @@
 <file path=ppt/slides/slide10.xml><?xml version="1.0" encoding="utf-8"?>
 <p:sld xmlns:a="http://schemas.openxmlformats.org/drawingml/2006/main" xmlns:r="http://schemas.openxmlformats.org/officeDocument/2006/relationships" xmlns:p="http://schemas.openxmlformats.org/presentationml/2006/main">
   <p:cSld>
+    <p:bg>
+      <p:bgPr>
+        <a:gradFill rotWithShape="1">
+          <a:gsLst>
+            <a:gs pos="10000">
+              <a:schemeClr val="bg2">
+                <a:tint val="97000"/>
+                <a:hueMod val="92000"/>
+                <a:satMod val="169000"/>
+                <a:lumMod val="164000"/>
+              </a:schemeClr>
+            </a:gs>
+            <a:gs pos="100000">
+              <a:schemeClr val="bg2">
+                <a:shade val="96000"/>
+                <a:satMod val="120000"/>
+                <a:lumMod val="90000"/>
+              </a:schemeClr>
+            </a:gs>
+          </a:gsLst>
+          <a:lin ang="6120000" scaled="1"/>
+        </a:gradFill>
+        <a:effectLst/>
+      </p:bgPr>
+    </p:bg>
     <p:spTree>
       <p:nvGrpSpPr>
         <p:cNvPr id="1" name=""/>
@@ -5785,25 +5811,32 @@
         </p:nvSpPr>
         <p:spPr>
           <a:xfrm>
-            <a:off x="557211" y="342900"/>
-            <a:ext cx="8534401" cy="685800"/>
+            <a:off x="4546886" y="685799"/>
+            <a:ext cx="7077667" cy="4892676"/>
           </a:xfrm>
         </p:spPr>
         <p:txBody>
-          <a:bodyPr/>
-          <a:lstStyle/>
-          <a:p>
-            <a:r>
-              <a:rPr lang="en-US"/>
-              <a:t>How to mitigate attrition</a:t>
-            </a:r>
-            <a:endParaRPr lang="en-US" dirty="0"/>
-          </a:p>
-        </p:txBody>
-      </p:sp>
-      <p:sp>
-        <p:nvSpPr>
-          <p:cNvPr id="3" name="Text Placeholder 2"/>
+          <a:bodyPr vert="horz" lIns="91440" tIns="45720" rIns="91440" bIns="45720" rtlCol="0" anchor="ctr">
+            <a:normAutofit/>
+          </a:bodyPr>
+          <a:lstStyle/>
+          <a:p>
+            <a:r>
+              <a:rPr lang="en-US" sz="4800"/>
+              <a:t>Life Satisfaction</a:t>
+            </a:r>
+          </a:p>
+        </p:txBody>
+      </p:sp>
+      <p:sp>
+        <p:nvSpPr>
+          <p:cNvPr id="7" name="Text Placeholder 6">
+            <a:extLst>
+              <a:ext uri="{FF2B5EF4-FFF2-40B4-BE49-F238E27FC236}">
+                <a16:creationId xmlns:a16="http://schemas.microsoft.com/office/drawing/2014/main" id="{68BE2056-ED35-43E3-8265-E8D944FA51C9}"/>
+              </a:ext>
+            </a:extLst>
+          </p:cNvPr>
           <p:cNvSpPr>
             <a:spLocks noGrp="1"/>
           </p:cNvSpPr>
@@ -5813,19 +5846,39 @@
         </p:nvSpPr>
         <p:spPr>
           <a:xfrm>
-            <a:off x="684213" y="1193800"/>
-            <a:ext cx="8534400" cy="4800600"/>
+            <a:off x="684212" y="685800"/>
+            <a:ext cx="2888773" cy="4892675"/>
           </a:xfrm>
         </p:spPr>
         <p:txBody>
-          <a:bodyPr/>
-          <a:lstStyle/>
-          <a:p>
-            <a:r>
-              <a:rPr lang="en-US"/>
-              <a:t>Whole Team Provides content</a:t>
-            </a:r>
-            <a:endParaRPr lang="en-US" dirty="0"/>
+          <a:bodyPr vert="horz" lIns="91440" tIns="45720" rIns="91440" bIns="45720" rtlCol="0" anchor="ctr">
+            <a:normAutofit/>
+          </a:bodyPr>
+          <a:lstStyle/>
+          <a:p>
+            <a:pPr algn="r"/>
+            <a:r>
+              <a:rPr lang="en-US" sz="2100" b="1" dirty="0">
+                <a:solidFill>
+                  <a:schemeClr val="accent6"/>
+                </a:solidFill>
+              </a:rPr>
+              <a:t>**Jodi Will enter visual here by noon Monday (promise!).   I will be looking at Those that worked overtime against Work Life balance self reporting. </a:t>
+            </a:r>
+            <a:r>
+              <a:rPr lang="en-US" sz="2100" b="1" dirty="0">
+                <a:solidFill>
+                  <a:schemeClr val="accent6"/>
+                </a:solidFill>
+                <a:sym typeface="Wingdings" panose="05000000000000000000" pitchFamily="2" charset="2"/>
+              </a:rPr>
+              <a:t> </a:t>
+            </a:r>
+            <a:endParaRPr lang="en-US" sz="2100" b="1" dirty="0">
+              <a:solidFill>
+                <a:schemeClr val="accent6"/>
+              </a:solidFill>
+            </a:endParaRPr>
           </a:p>
         </p:txBody>
       </p:sp>
@@ -5874,10 +5927,100 @@
           </a:p>
         </p:txBody>
       </p:sp>
+      <p:sp>
+        <p:nvSpPr>
+          <p:cNvPr id="5" name="AutoShape 2" descr="data:image/png;base64,iVBORw0KGgoAAAANSUhEUgAABUAAAAPACAMAAADDuCPrAAABYlBMVEUAAAAAADoAAGYAOjoAOmYAOpAAZrYzMzM6AAA6OgA6Ojo6OmY6ZmY6ZpA6ZrY6kLY6kNtNTU1NTW5NTY5Nbm5Nbo5NbqtNjshmAABmADpmOgBmOjpmZjpmZmZmZpBmkGZmkLZmkNtmtttmtv9uTU1ubk1ubm5ubo5ujqtujshuq8huq+SOTU2Obk2Obm6Oq8iOyOSOyP+QOgCQOjqQZjqQZmaQZpCQkGaQkLaQtraQttuQ2/+rbk2rjk2rjm6rq8iryOSr5Mir5P+2ZgC2Zjq2kDq2kGa2kJC2tpC2tra2ttu229u22/+2///Ijk3Ijm7Iq27Iq6vIyKvI5KvI5OTI5P/I///bkDrbkGbbtmbbtpDbtrbb27bb29vb2//b/7bb///kq27kyI7kyKvk5P/k///r6+v8jVn/tmb/yI7/25D/27b/29v/5Kv/5Mj/5OT//7b//7///8j//9v//+T///+zjZs9AAAACXBIWXMAAB2HAAAdhwGP5fFlAAAgAElEQVR4nO3d/59b5ZnecU0wMDGEILMYh0CWwmwDxaSLN3S7xHW3mGQXkni3aY0TEijO1q2/YMe1rP+/0iNpRnPbM+fMM9e5n3PffN4/xB472Eiv6/mgGUlnJnMAQJVJ638BAIiKgAJAJQIKAJUIKABUIqAAUImAAkAlAgoAlQgoAFQioABQiYACQCUCCgCVCCgAVCKgAFCJgAJAJQIKAJVGENDZl298fzKZ7Lzw8Ten/rNuT570zvzhhcnOLwT/pgCwrXlAZ7/aPWjdS6dNKAEF4Kd1QO+9fih2p+0cAQXgp3FA7y4ffu689dXip9/+6vuCgh78ud/7reRPAoCjtA3o4qHh1ufts1/KCkpAAQyvbUCvLor59tbHy8/An1P8wQQUwPCaBnT5CfzLh37lRvmapeRPJqAABtY0oItcmswtP6d/rvzGwQPRq5vK3vv5Irg7P/jNwT/9zuzT3cnOC09+1n84oJsnka4ufyh/ygsfL3/9yx8vev3Cr/f/f+YvAIBjtQzo7NKTn7Cvmroo3n7/NvWbfWpe7LQM6NUjnro/OqA31n/Iywd/4PpB8BN/AQAcq2VAlw837efrt1c9vHrwO4tfefabVW03VtVdpPBs+fDZJ3t3ZED/fv8Pefvq4ddOPfkXAMCxWgZ0UbknHjyuo3r7IGLrli4fOb709Xz+7aebx4zlseQPv5l/+/VT/+inBnRh+Rn6l4tP1Z+Z7Lz9zeqZ/+fmT/0LAOBYLQN6+ymffS8D+vJ866Xv68/mtx6t3l5/5fTGMaE7OqAvb/6MzV9wdfUQ9il/AQAca6QBXdZxlbr180nbTysdPCY98kWjRwZ0/aubv2a+/yWCp/wFAHCssQZ0UcDypc3lVyaXMdtu2u39xj7lq58rRwb0uYO/5p1D/9en/AUAcKyRfg10Gc7ye+uQbj/Ds3mW58YxT/YcGdCXD//K/v/1aX8BABxrbM/C70f19qFP5W3f7Cfd1qkDeuRjWwDYGOfrQOclcYuIbR6IElAA4zPOdyItlbcNbV7OtPlSqPmntQHliSMAJ9I0oFu5XNt6L3z5HH7/qZ2rTz6vIw3o0/4CADhW26sx2Zdy3t765HnxmPDZ/7X/ls7tp9xv7H95VBjQp/wFAHCstgEtX3k8eOf5jcn2C5tulDderku2deGmzfNM2oA+5S8AgGM1viL9veUVlQ9dkf7gC5Grq9VvSrZ8F9GZX6+/h9LmvZfCgD7lLwCAY435eyJd3X42fPtp8lUbxQF98i8AgGO1Duih78q5c/g6crcn28+Mz36++b+dWV2wUxzQJ/8CADhW84AufPnz5Sfvz7xovy/89lVBl/60vN7x+lrIc31An/gLAOBYYwgoAIREQAGgEgEFgEoEFAAqEVAAqERAAaASAQWASgQUACoRUACoREABoBIBBYBKBBQAKhFQAKhEQAGgEgEFgEoEFAAqEVAAqNQwoP8HEtyT6MRIVEzFCGh43JPoxEhUTMUIaHjck+jESFRMxQhoeNyT6MRIVEzFCGh43JPoxEhUTMUIaHjck+jESFRMxQhoeNyT6MRIVEzFCGh43JPoxEhUTMUIaHjck+jESFRMxQhoeNyT6MRIVEzFCGh43JPoxEhUTMUIaHjck+jESFRMxQhoeNyT6MRIVEzFCGh43JPoxEhUTMUIaHjck+jESFRMxQhoeNyT6MRIVEzFCGh43JPoxEhUTMUIaHjck+jESFRMxQhoeNyT6MRIVEzFCGh43JPoxEhUTMUIaHjck+jESFRMxQhoeNyT6MRIVEzFCGh43JPoxEhUTMUIaHjck+jESFRMxQhoeNyT6MRIVEzFCGh43JPoxEhUTMUIaHjck+jESFRMxQhoeNyT6MRIVEzFCGh43JPoxEhUTMUIaHjck+jESFRMxQhoeNyT6MRIVEzFCGh43JPoxEhUTMUIaHjck+jESFRMxQhoeNyT6MRIVEzFCGh43JPoxEhUTMUIaHjck+jESFRMxQhoeNyT6MRIVEzFUgX0/+I7RL+fxAioiqkYAUVQ+v0kRkBVTMUIKILS7ycxAqpiKkZAEZR+P4kRUBVTMQKKoPT7SYyAqpiKEVAEpd9PYgRUxVSMgCIo/X4SI6AqpmIEFEHp95MYAVUxFSOgCEq/n8QIqIqpGAFFUPr9JEZAVUzFCCiC0u8nMQKqYipGQBGUfj+JEVAVUzECiqD0+0mMgKqYihFQBKXfT2IEVMVUjIAiKP1+EiOgKqZiBBRB6feTGAFVMRUjoAhKv5/ECKiKqRgBRVD6/SRGQFVMxQgogtLvJzECqmIqRkARlH4/iRFQFVMxAoqg9PtJjICqmIoRUASl309iBFTFVIyAIij9fhIjoCqmYgQUQen3kxgBVTEVI6AISr+fxAioiqkYAUVQ+v0kRkBVTMUIKILS7ycxAqpiKkZAEZR+P4kRUBVTMQKKoPT7SYyAqpiKEVAEpd9PYgRUxVSMgCIo/X4SI6AqpmKnDeiji6+tf/b4yt50+u71rg8IKDT0+0mMgKqIA3pt+tqmpNOlV744/gMCChH9fhIjoCrSgD6+Nt0E9Nr0/PX5g8vT87eO/YCAQkS/n8QIqIoyoP/2wXQT0Pt75RHmo4vnPjnuAwIKFf1+EiOgKsKA3pxO3/vzOqA39398/7gPCChU9PtJjICqKAP66j/O76zzeG36YfmxfHz0BwQUKvr9JEZAVYQB3cri48vrT9Dv752/dfQHq3/m+ZVT/s1P0fpIw5N+P8BJEVAEpd8PcFL6gL7yxdEfHPpH9Y+uWx9peNLvJzE+hVcZPKDdj0AJKAT0+0mMgKoQUOSg309iBFRlmIDyLDy86feTGAFVGSigm1d5rl/6edQHBBQq+v0kRkBVBgoo70SCM/1+EiOgKgMF9PHl6av773g/+gMCChX9fhIjoCoDBXT+YPuaS0d/QEAhot9PYgRUZaiAzh9cWVTy3VtdHxBQaOj3kxgBVREH9BT0t631kYYn/X4SI6AqpmIEFEHp95MYAVUxFSOgCEq/n8QIqIqpGAFFUPr9JEZAVUzFCCiC0u8nMQKqYipGQBGUfj+JEVAVUzECiqD0+0mMgKqYihFQBKXfT2IEVMVUjIAiKP1+EiOgKqZiBBRB6feTGAFVMRUjoAhKv5/ECKiKqRgBRVD6/SRGQFVMxQgogtLvJzECqmIqRkARlH4/iRFQFVMxAoqg9PtJjICqmIoRUASl309iBFTFVIyAIij9fhIjoCqmYgQUQen3kxgBVTEVI6AISr+fxAioiqkYAUVQ+v0kRkBVTMUIKILS7ycxAqpiKkZAEZR+P4kRUBVTMQKKoPT7SYyAqpiKEVAEpd9PYgRUxVSMgCIo/X4SI6AqpmIEFEHp95MYAVUxFSOgCEq/n8QIqIqpGAFFUPr9JEZAVUzFCCiC0u8nMQKqYipGQBGUfj+JEVAVUzECiqD0+0mMgKqYihFQBKXfT2IEVMVUjIAiKP1+EiOgKqZiBBRB6feTGAFVMRUjoAhKv5/ECKiKqRgBRVD6/SRGQFVMxQgogtLvJzECqmIqRkARlH4/iRFQFVMxAoqg9PtJjICqmIoRUASl309iBFTFVIyAIij9fhIjoCqmYgQUQen3kxgBVTEVI6AISr+fxAioiqkYAUVQ+v0kRkBVTMUIKILS7ycxAqpiKkZAEZR+P4kRUBVTMQKKoPT7SYyAqpiKEVAEpd9PYgRUxVSMgCIo/X4SI6AqpmIEFEHp95MYAVUxFSOgCEq/n8QIqIqpGAFFUPr9JEZAVUzFCCiC0u8nMQKqYipGQBGUfj+JEVAVUzECiqD0+0mMgKqYihFQBKXfT2IEVMVUjIAiKP1+EiOgKqZiBBRB6feTGAFVMRUjoAhKv5/ECKiKqRgBRVD6/SRGQFVMxQgogtLvJzECqmIqRkARlH4/iRFQFVMxAoqg9PtJjICqmIoRUASl309iBFTFVIyAIij9fhIjoCqmYgQUQen3kxgBVTEVI6AISr+fxAioiqkYAUVQ+v0kRkBVTMUIKILS7ycxAqpiKkZAEZR+P4kRUBVTMQKKoPT7SYyAqpiKEVAEpd9PYgRUxVSMgCIo/X4SI6AqpmIEFEHp95MYAVUxFSOgCEq/n8QIqIqpGAFFUPr9JEZAVUzFCCiC0u8nMQKqYipGQBGUfj+JEVAVU7GGAdVrfaThqfXaAB6BIiz9fhLjEaiKqRgBRVD6/SRGQFVMxQgogtLvJzECqmIqRkARlH4/iRFQFVMxAoqg9PtJjICqmIoRUASl309iBFTFVIyAIij9fhIjoCqmYgQUQen3kxgBVTEVI6AISr+fxAioiqkYAUVQ+v0kRkBVTMUIKILS7ycxAqpiKkZAEZR+P4kRUBVTMQKKoPT7SYyAqpiKEVAEpd9PYgRUxVSMgCIo/X4SI6AqpmIEFEHp95MYAVUxFSOgCEq/n8QIqIqpGAFFUPr9JEZAVUzFCCiC0u8nMQKqYipGQBGUfj+JEVAVUzECiqD0+0mMgKqYihFQBKXfT2IEVMVUjIAiKP1+EiOgKqZiBBRB6feTGAFVMRUjoAhKv5/ECKiKqRgBRVD6/SRGQFVMxQgogtLvJzECqmIqRkARlH4/iRFQFVMxAoqg9PtJjICqmIoRUASl309iBFTFVIyAIij9fhIjoCqmYgQUQen3kxgBVTEVI6AISr+fxAioiqkYAUVQ+v0kRkBVTMUIKILS7ycxAqpiKkZAEZR+P4kRUBVTMQKKoPT7SYyAqpiKEVAEpd9PYgRUxVSMgCIo/X4SI6AqpmIEFEHp95MYAVUxFSOgCEq/n8QIqIqpGAFFUPr9JEZAVUzFCCiC0u8nMQKqYipGQBGUfj+JEVAVUzECiqD0+0mMgKqYihFQBKXfT2IEVMVUjIAiKP1+EiOgKqZiBBRB6feTGAFVMRUjoAhKv5/ECKiKqRgBRVD6/SRGQFVMxQgogtLvJzECqmIqRkARlH4/iRFQFVMxAoqg9PtJjICqmIoRUASl309iBFTFVIyAIij9fhIjoCqmYgQUQen3kxgBVTEVI6AISr+fxAioiqkYAUVQ+v0kRkBVTMUIKILS7ycxAqpiKkZAEZR+P4kRUBVTMQKKoPT7SYyAqpiKEVAEpd9PYgRUxVSMgCIo/X4SI6AqpmIEFEHp95MYAVUxFSOgCEq/n8QIqIqpGAFFUPr9JEZAVUzFCCiC0u8nMQKqYipGQBGUfj+JEVAVUzECiqD0+0mMgKqYihFQBKXfT2IEVMVUjIAiKP1+EiOgKqZiBBRB6feTGAFVMRUjoAhKv5/ECKiKqRgBRVD6/SRGQFVMxQgogtLvJzECqmIqRkARlH4/iRFQFVMxAoqg9PtJjICqmIoRUASl309iBFTFVIyAIij9fhIjoCqmYgQUQen3kxgBVTEVI6AISr+fxAioiqmYKKCPL083XvliPn908eDni9+8sjedvnudgEJJv5/ECKiKS0Dv720FdF3TVUwJKET0+0mMgKoME9CN+3vnPln8cGf62sGvXZuevz5/cHl6/hYBhY5+P4kRUJVBA7p4IPr+qpnvbzV1/Ti0pJWAQkS/n8QIqMqgAb25epj5+PJWLG+uH43e3IoqAcWp6feTGAFVGTKgjy5OP1z9eP53H0ynP72+/ODa6tcOf1pPQHFa+v0kRkBVhgzo5sHm5jmkZTr3H43e39t8EfT5FeXfvNL6SMOTfj/ASSkDuv9lzjvT6Xu35n+5Ml18TEAxDP1+gJNSBvTO5on2zSPR5XNJWwE1L2TSP7pufaThSb+fxPgUXmW4gD6+vP5q56GiPuURKAGFgH4/iRFQleEC+sRDzPIrBBTD0O8nMQKqMlxAn3iafdVMnoXHIPT7SYyAqgwX0P1Xz+9/Ll+auXn9J68DhZR+P4kRUJXBArr16vlrqwebq5DyTiQMQr+fxAioymABfXRx/0ug9/eWL2N68EF5Vn6R0Vd5Lzzk9PtJjICqDBbQ7SeJbq4vxnR9+cEDrsaEAej3kxgBVRksoHe2H2I++Nl0eu699ccPriz6+e4t+w/ob1vrIw1P+v0kRkBVBgvoielvW+sjDU/6/SRGQFVMxQgogtLvJzECqmIqRkARlH4/iRFQFVMxAoqg9PtJjICqmIoRUASl309iBFTFVKwjoLM/fvY5AcUY6feTGAFV6RvQe//pm/n84euTyeTMLwgoxke/n8QIqErPgN6YfO+38/nVydLyZwQUI6PfT2IEVKVfQG+XbN7dnTz7zb0Lk5cJKEZHv5/ECKhKv4BeXZRzmdGdXyz/d/lzAopx0e8nMQKq0iugs0vLcq4z+vDCMJ/D629b6yMNT/r9JEZAVXoFdNXMhxcmz80JKMZJv5/ECKjKCQJ6d3fyDgHFSOn3kxgBVekV0NWn8DfKl0D5GihGSb+fxAioSq+Azq9Onls+/b4sJ8/CY5T0+0mMgKr0C+jt8gLQxWfws59PVo9DCSjGRb+fxAioSr+ALj59X3iuPJG0884g/SSgOBX9fhIjoCo9Azq/99FPPl788PBHP/jNMP0koDgV/X4SI6AqfQM6PP1ta32k4Um/n8QIqIqp2LEBnX09YD8JKE5Fv5/ECKiKqdjRAf3yx8v3wz/80VuDvIaJgOKU9PtJjICq9Azo7NPVdZgeXpicGeZiTAQUp6LfT2IEVKVnQK9OJmf+evd7v5393WSg19ETUJyKfj+JEVCVfgG9PZm8vX4P5x9Wb+gkoBgX/X4SI6Aq/QJ6dfnuo/Wb4G+US4oQUIyLfj+JEVCVXgFdvRd+HdC7u1xMBOOj309iBFSlV0A3l7Mr5eRqTBgj/X4SI6AqBBQ56PeTGAFV6RXQ2aXlE0frcnI5O4yRfj+JEVCVXgFdPXG0CugipjyJhPHR7ycxAqrSL6B3dycvfVMCeu91LmeHMdLvJzECqtIvoOVydmd3d178/uLHYa6nTEBxKvr9JEZAVXoGdP773cnaQP0koDgV/X4SI6AqfQM6//ZXZxf1fGawy4ESUJyKfj+JEVCV3gEdnP62tT7S8KTfT2IEVMVUjOuBIij9fhIjoCqmYlwPFEHp95MYAVXpGVCuB4qR0+8nMQKq0jOgXA8UI6ffT2IEVKVfQLkeKMZOv5/ECKhKv4ByPVCMnX4/iRFQlV4B5XqgGD39fhIjoCq9Asrl7DB6+v0kRkBVCChy0O8nMQKq0iugXA8Uo6ffT2IEVKVXQLkeKEZPv5/ECKhKv4ByPVCMnX4/iRFQlX4B5XqgGDv9fhIjoCo9A8r1QDFy+v0kRkBV+gaU64Fi3PT7SYyAqvQO6OD0t631kYYn/X4SI6AqpmIEFEHp95MYAVUxFTvihfQ/emnQaykTUJyafj+JEVCVfgG9MJk8M9iVlAkoBPT7SYyAqvQK6OpyypMzHw/ZUP1ta32k4Um/n8QIqEqvgC786celoS98TEAxSvr9JEZAVfoGdL76rkgLQ72QSX/bWh9peNLvJzECqnKCgC4+lf/y9WVCd94a4ikl/W1rfaThSb+fxAioyokCuvDtz8tbkl7QPwzV37bWRxqe9PtJjICqnCigs199f/OGzslLBBRjot9PYgRUpX9AN/VcPhf/7af698Trb1vrIw1P+v0kRkBVegZ0/dXPg1eD6i+rrL9trY80POn3kxgBVekV0NmliX3ySP+NPfS3rfWRhif9fhIjoCq9Arp8J9LO4ZcvPbzAI1CMiX4/iRFQlZ4B/cGvzS/NPle/lEl/21ofaXjS7ycxAqrSK6Au9Let9ZGGJ/1+EiOgKqZiBBRB6feTGAFVMRXruCL9ztlB3oREQHFq+v0kRkBV+gb0xv4r6PmeSBgj/X4SI6AqPQO67OczL775Bt+VEyOl309iBFSlX0Dv7k6eXb2K6d4lvi88xki/n8QIqEq/gF49eN/R7NLkOQKK0dHvJzECqtIroLNLW4867+6qX0JPQHF6+v0kRkBVegX00Ps29W/iJKA4Pf1+EiOgKgQUOej3kxgBVekV0NmlyTv7H+ivw0RAcXr6/SRGQFV6BZQnkTB6+v0kRkBV+gX07u7kzOpyIn96nZcxYYz0+0mMgKr0C+jqjUhnz54d8q1Icq2PNDy1XhtwzFs5/7C7fifnztsD/dX6/zi0PtLwpN9PYjwCVekb0PnsyzcWj0Bf/HiQJ5AIKE5Lv5/ECKhK74AOTn/bWh9peNLvJzECqmIqRkARlH4/iRFQFVMxG9DZR28+6Se8DhSjo99PYgRUpSOgy28n9wTeiYTx0e8nMQKqQkCRg34/iRFQlY6AOtLfttZHGp70+0mMgKqYihFQBKXfT2IEVMVU7PiAfjVcPgkoTke/n8QIqIqp2NEB/fLH5X1IP/gNAcUY6feTGAFV6RnQ2aX9p5BeGui9SPrb1vpIw5N+P4kRUJV+AV32c+fFf/jsn97YnQx0NTsCilPR7ycxAqrSL6A3JpMfrh54zn452bq4MgHFWOj3kxgBVekV0MUD0INr2F3lgsoYIf1+EiOgKr0C+vDCoe/KyQvpMT76/SRGQFV6BpRvKoeR0+8nMQKq0iugfF94jJ5+P4kRUJVeAZ3f2Pq65w2+BooR0u8nMQKq0i+gs0v7L/+8MdC1RAgoTkW/n8QIqEqvgM4+Wr7+88W3Pvvn5Y8vDHNVUP1ta32k4Um/n8QIqEqvgLpc1E5/21ofaXjS7ycxAqpCQJGDfj+JEVCVXgF1ob9trY80POn3kxgBVTEVI6AISr+fxAioiqkYAUVQ+v0kRkBVTMWODugfP9v3OS+kx+jo95MYAVXpGdDf7/JN5TBq+v0kRkBV+gX0Nt+VEyOn309iBFSlV0BnlyY7H3+17+sh+klAcSr6/SRGQFV6BfThhYEuokxAoaLfT2IEVKVnQAd6/zsBhYp+P4kRUJVeAZ1dIqAYOf1+EiOgKr0COr/Bp/AYOf1+EiOgKv0Ceuh7ehBQjJB+P4kRUJV+AZ3fuzA58+aG+kJ2BBSnp99PYgRUpWdAP+V1oBg3/X4SI6Aq/QJ6gxfSY+T0+0mMgKr0Cmh5If0gn7cTUIjo95MYAVXpFVCP55AIKE5Fv5/ECKhKz4DyOlCMnH4/iRFQlV4B5YX0GD39fhIjoCq9Ajq/MXmZgGLU9PtJjICq9Avo7NLO2wQUY6bfT2IEVKVXQGcfvTGZ7LzIC+kxXvr9JEZAVXoF1HxbY14HivHR7ycxAqpCQJGDfj+JEVCVXgF1ob9trY80POn3kxgBVTEVI6AISr+fxAioiqkYAUVQ+v0kRkBVTMVsQGd/tN8F/uGPz77A10AxOvr9JEZAVToC+vDC6imj2UebFy9tfoWAYlT0+0mMgKr0DOhBNgkoRkm/n8QIqAoBRQ76/SRGQFUIKHLQ7ycxAqpCQJGDfj+JEVAVAooc9PtJjICqEFDkoN9PYgRUhYAiB/1+EiOgKgQUOej3kxgBVSGgyEG/n8QIqAoBRQ76/SRGQFUIKHLQ7ycxAqrSHdAnEVCMj34/iRFQFQKKHPT7SYyAqnQEdPbRm0/im8phfPT7SYyAqnQE1JH+trU+0vCk309iBFTFVIyAIij9fhIjoCqmYgQUQen3kxgBVTEVI6AISr+fxAioiqkYAUVQ+v0kRkBVTMUIKILS7ycxAqpiKkZAEZR+P4kRUBVTMQKKoPT7SYyAqpiKEVAEpd9PYgRUxVTsiXciXdr5xeKHb78moBg3/X4SI6AqHQF9eGH5xvfV/xJQjJh+P4kRUJXOgC4fgRJQjJ5+P4kRUJWOgM4uTZ79/Ks/Xfjer786MMzn8/rb1vpIw5N+P4kRUJWOgM5vcDk7hKDfT2IEVKUroLNP6wL66OK0eOWL5UePr+xNp+9eX/3WoQ8IKDT0+0mMgKp0BXSR0K8+++fdnX/47MDnPa4Hen9vK6Drmq5ieugDAgoR/X4SI6Aq3QGdVz2JdGf62sEH16bnr88fXJ6ev2U/IKAQ0e8nMQKq0iugs49OfBH6a9P3939+f2/9OPTcJ+YDAgoV/X4SI6AqvQJ6co8vb/Xx5vrR6M1lVA99QEChot9PYgRUpXdAv/3V2clk5+xb/V7D9Oji+d99MJ3+9Pryg2vTD8svlk/rD31AQKGi309iBFSlb0APXs70cp+Abp5DWtZy/9Ho/b3ztw59sPr/Pr/S5489mdZHGp70+wFO6qiALvv5zItvvvH9ngW9M52+d2v+lyvTRS4JKBzo9wOc1BEBvbs7efY35Wf3Lk3K5UU6bL7SuXwuaauZr3xx6IND/4j+0XXrIw1P+v0kxqfwKv0CenXy7OZp+NmlyXPdAd24MzUPOp/yCJSAQkC/n8QIqEqvgK4vardyd/fZ/q9pMg86CSiGot9PYgRUpVdAD72Q/kSvqi+Z5Fl4DE+/n8QIqMowAX18eTuTm5d8rl8HuvUBAYWKfj+JEVCVXgGdXZq8s//B7UmPT+GvrR5frkLKO5EwPP1+EiOgKr0CevInke7vLV/G9OCD8o73RUZf3X/7+6EPCChU9PtJjICq9Avo3d3JmV+Xn/3p9V4vY1p8hr665tL15QcPti/A9ICrMWEA+v0kRkBV+gV09Uaks2fP9n4r0vzBz6bTc++tH2U+uLJI5rtP+4CAQkO/n8QIqErPgM7/sLt+J+fO2736eXL629b6SMOTfj+JEVCVvgGdz758Y/EI9MWPT3pdOwIKF/r9JEZAVXoHdHD629b6SMOTfj+JEVAVUzECiqD0+0mMgKqYihFQBKXfT2IEVMVUjIAiKP1+EiOgKqZiBBRB6feTGAFVMRUjoAhKv5/ECKiKqRgBRVD6/SRGQFVMxQgogtLvJzECqmIqRkARlH4/iRFQFVOxo67G9IPfEFCMmn4/iRFQlV4BfXhh63qgBBRjpN9PYgRUpWdAT/BdPAgoWtDvJzECqtIroIe+qRwBxRjp95MYAVXpFdD5jc23hSegGCn9fhIjoCr9AvrtLyeTZ158c+0ng1zSTn/bWh9peJuln3QAABwGSURBVNLvJzECqtIroA8vTLYN8wVR/W1rfaThSb+fxAioCgFFDvr9JEZAVXoF1IX+trU+0vCk309iBFTFVIyAIij9fhIjoCqmYscGdPb1gP0koDgV/X4SI6AqpmJHB/TLHy+/+PnwR28N9V3l9Let9ZGGJ/1+EiOgKj0DOvt09ezRwwuTMwO9KUl/21ofaXjS7ycxAqrSM6BXJ5Mzf737vd/O/m4yeXaYx6D629b6SMOTfj+JEVCVfgG9PZm8vX5H/B92B7qwiP62tT7S8KTfT2IEVKVfQK9OXt6/pMiNyXMEFKOj309iBFSlV0BXFxNZB/TuLi+kx/jo95MYAVXpFdBVOtcBHeradvrb1vpIw5N+P4kRUBUCihz0+0mMgKr0Cujs0vKJo3U5bw/0NLz+trU+0vCk309iBFSlV0BXTxytArqIKU8iYXz0+0mMgKr0C+jd3clL35SA3nt9MtDV6fW3rfWRhif9fhIjoCr9Arp4CDqZnN3defH7ix9fHqSfBBSnot9PYgRUpWdA57/f3VwNdKB+ElCcin4/iRFQlb4BnX/7q7OLej4z3DeI19+21kcanvT7SYyAqvQO6OD0t631kYYn/X4SI6AqpmLHXw/0qwH7SUBxKvr9JEZAVUzFjr8e6AKfwmOc9PtJjICq9Azo7NL+t5R7aaArKutvW+sjDU/6/SRGQFX6BXTZz50X//Nn//TGoqDDvI6egOJU9PtJjICq9Avo7f1XL81+OeF6oBgh/X4SI6AqvQK6eAB68OrPq7yVEyOk309iBFSlV0AfXth6+ybXA8UY6feTGAFV6RnQrWZyOTuMkX4/iRFQlV4BXV2Rfu3uLpezw/jo95MYAVXpFdBD3wfpxkDvhtffttZHGp70+0mMgKr0C+jDC5MffrPp5zCfwRNQnIp+P4kRUJWOgM4+erN4Y/U60H9+c3cyefEnfAqP0dHvJzECqtIR0MVDzyfxJBLGR7+fxAioCgFFDpUj+X/4DpH2pegIqCP9bWt9pOGpciStjzQ8SftSmIoRUARVOZLWRxqepH0pTMUIKIKqHEnrIw1P0r4UpmJHB/SPn+37nGfhMTqVI2l9pOFJ2peiZ0APvqccTyJhlCpH0vpIw5O0L0W/gN7mWXiMXOVIWh9peJL2pegV0Nmlyc7HX+37eoh+ElCcSuVIWh9peJL2pegV0IcXBrqIMgGFSuVIWh9peJL2pegZ0IHe/05AoVI5ktZHGp6kfSl6BXR2iYBi5CpH0vpIw5O0L0WvgM5v8Ck8Rq5yJK2PNDxJ+1L0C+ih7+lBQDFClSNpfaThSdqXol9A5/cuTM68ucHl7DA+lSNpfaThSdqXomdAP+V1oBi3ypG0PtLwJO1L0S+gN3ghPUauciStjzQ8SftS9ApoeSH9IJ+3E1CIVI6k9ZGGJ2lfil4B9XgOiYDiVCpH0vpIw5O0L0XPgPI6UIxc5UhaH2l4kval6BVQXkiP0ascSesjDU/SvhS9AjrY94InoFCpHEnrIw1P0r4U/QI6u7TzNgHFmFWOpPWRhidpX4peAZ19VL4vPC+kx3hVjqT1kYYnaV+KXgE139yY14FifCpH0vpIw5O0LwUBRQ6VI2l9pOFJ2peiV0Bd6G9b6yMNT5UjaX2k4Unal8JUjIAiqMqRtD7S8CTtS2EqRkARVOVIWh9peJL2pTAVOyKg3361jW8qh/GpHEnrIw1P0r4UvQLq8iSSXusjDU+VI2l9pOFJ2pen4Vl4BFU5ktZHGp6kfSl6BXT2x8/W/v71yc4/fM4L6TE6lSNpfaThSdqXoldAt93dfXaYK4Pqb1vrIw1PlSNpfaThSdqX4sQBHezCIvrb1vpIw1PlSFofaXiS9qU4eUCHegiqv22tjzQ8VY6k9ZGGJ2lfipMHdKirK+tvW+sjDU+VI2l9pOFJ2pfi5AG9u0tAMT6VI2l9pOFJ2pfixAGdXZ3wKTzGp3IkrY80PEn7UvQK6OyjzaVA33xjd8KTSBihypG0PtLwJO1L0Sugh19Iz8uYMEKVI2l9pOFJ2pfixAF95q2BvkG8/ra1PtLwVDmS1kcanqR9KXoF1IX+trU+0vBUOZLWRxqepH0pTMUIKIKqHEnrIw1P0r4UpmIEFEFVjqT1kYYnaV8KUzECiqAqR9L6SMOTtC+FqZgN6NYLmA7wbY0xPpUjaX2k4Unal6IjoOZKoFwPFGNVOZLWRxqepH0pCChyqBxJ6yMNT9K+FB0Btb7cnfBOJIxR5UhaH2l4kvalOFFAZz9f5PPMbwbpJwHFqVSOpPWRhidpX4qTBPQPi4efO0O9EYmA4lQqR9L6SMOTtC9F/4AO+vCTgOKUKkfS+kjDk7QvRe+Aloef/26wfBJQnE7lSFofaXiS9qXoGdB7Az/8JKA4pcqRtD7S8CTtS9EvoIM//CSgOKXKkbQ+0vAk7UvRJ6D3Li2vAjrow08CilOqHEnrIw1P0r4UPQJaHn6+PXA+CShOp3IkrY80PEn7UnQG1OfhJwHFKVWOpPWRhidpX4qugP7e5+EnAcUpVY6k9ZGGJ2lfio6A8l54BFE5ktZHGp6kfSkIKHKoHEnrIw1P0r4UHQHleqAIonIkrY80PEn7UnQE1JH+trU+0vBUOZLWRxqepH0pTMUIKIKqHEnrIw1P0r4UpmIEFEFVjqT1kYYnaV8KUzECiqAqR9L6SMOTtC+FqRgBRVCVI2l9pOFJ2pfCVIyAIqjKkbQ+0vAk7UthKkZAEVTlSFofaXiS9qUwFSOgCKpyJK2PNDxJ+1KYihFQBFU5ktZHGp6kfSlMxQgogqocSesjDU/SvhSmYgQUQVWOpPWRhidpXwpTMQKKoCpH0vpIw5O0L4WpGAFFUJUjaX2k4Unal8JUjIAiqMqRtD7S8CTtS2EqRkARVOVIWh9peJL2pTAVI6AIqnIkrY80PEn7UpiKEVAEVTmS1kcanqR9KUzFCCiCqhxJ6yMNT9K+FKZiBBRBVY6k9ZGGJ2lfClMxAoqgKkfS+kjDk7QvhakYAUVQlSNpfaThSdqXwlSMgCKoypG0PtLwJO1LYSpGQBFU5UhaH2l4kvalMBUjoAiqciStjzQ8SftSmIoRUARVOZLWRxqepH0pTMUIKIKqHEnrIw1P0r4UpmIEFEFVjqT1kYYnaV8KUzECiqAqR9L6SMOTtC+FqRgBRVCVI2l9pOFJ2pfCVIyAIqjKkbQ+0vAk7UthKkZAEVTlSFofaXiS9qUwFSOgCKpyJK2PNDxJ+1KYihFQBFU5ktZHGp6kfSlMxQgogqocSesjDU/SvhSmYgQUQVWOpPWRhidpXwpTMQKKoCpH0vpIw5O0L4WpGAFFUJUjaX2k4Unal8JUjIAiqMqRtD7S8CTtS2EqRkARVOVIWh9peJL2pTAVI6AIqnIkrY80PEn7UpiKEVAEVTmS1kcanqR9KUzFCCiCqhxJ6yMNT9K+FKZiBBRBVY6k9ZGGJ2lfClMxAoqgKkfS+kjDk7QvhakYAUVQlSNpfaThSdqXwlSMgCKoypG0PtLwJO1LYSpGQBFU5UhaH2l4kvalMBUjoAiqciStjzQ8SftSmIrpAvpvP5tOz717vfz80cVp8coXy48eX9mbTte/Q0AhUjmS1kcanqR9KYYK6L+sknnuk+UH9/e2Arqu6SqmBBQilSNpfaThSdqXYqCA3pme+9v5/MHlVSfvTF87+K1r0/PXl79z/hYBhU7lSFofaXiS9qUYJqCPL08/XP64eLT5YWnm+/u/dX9v/Th09eCUgEKjciStjzQ8SftSDBPQRxfXn6GXdD6+vBXLm+tHoze3okpAcWqVI2l9pOFJ2pdimIDuKwF9dPH87z6YTn96ffUr5bHp4U/rCShOq3IkrY80PEn7Ugwb0NUn6pvnkJbp3H80en9v80XQ51e0f/NS6yMNT5UjaX2k4Unal6cRB3T1+fqd6fS9W/O/XFk+J09AMYzKkbQ+0vAk7cvTaAN6Z/Uyps2XPZefz28F1LyQSf/ouvWRhqfKkbQ+0vAk7UsxZEDv7J378HBPz996yiNQAgqBypG0PtLwJO1LMWBAb07NK5WWDzoJKIZROZLWRxqepH0phgvov9h+rprJs/AYROVIWh9peJL2pRgqoI+vTV9df41z86r6VTM3r//kdaCQqhxJ6yMNT9K+FEMF9NrWWzWvrR5srkLKO5EwiMqRtD7S8CTtSzFQQG9uv9X9/t7yZUwPPii/tsjoq7wXHnKVI2l9pOFJ2pdimIBurl+38FrJ6eoCTNeXv/eAqzFhAJUjaX2k4Unal2KYgN6ZHgro/MHy4qDvrR9yPriy+OV3b9l/Rn/bWh9peKocSesjDU/SvhTDBLSG/ra1PtLwVDmS1kcanqR9KUzFCCiCqhxJ6yMNT9K+FKZiBBRBVY6k9ZGGJ2lfClMxAoqgKkfS+kjDk7QvhakYAUVQlSNpfaThSdqXwlSMgCKoypG0PtLwJO1LYSpGQBFU5UhaH2l4kvalMBUjoAiqciStjzQ8SftSmIoRUARVOZLWRxqepH0pTMUIKIKqHEnrIw1P0r4UpmIEFEFVjqT1kYYnaV8KUzECiqAqR9L6SMOTtC+FqRgBRVCVI2l9pOFJ2pfCVIyAIqjKkbQ+0vAk7UthKkZAEVTlSFofaXiS9qUwFSOgCKpyJK2PNDxJ+1KYihFQBFU5ktZHGp6kfSlMxQgogqocSesjDU/SvhSmYgQUQVWOpPWRhidpXwpTMQKKoCpH0vpIw5O0L4WpGAFFUJUjaX2k4Unal8JUjIAiqMqRtD7S8CTtS2EqRkARVOVIWh9peJL2pTAVI6AIqnIkrY80PEn7UpiKEVAEVTmS1kcanqR9KUzFCCiCqhxJ6yMNT9K+FKZiBBRBVY6k9ZGGJ2lfClMxAoqgKkfS+kjDk7QvhakYAUVQlSNpfaThSdqXwlSMgCKoypG0PtLwJO1LYSpGQBFU5UhaH2l4kvalMBUjoAiqciStjzQ8SftSmIoRUARVOZLWRxqepH0pTMUIKIKqHEnrIw1P0r4UpmIEFEFVjqT1kYYnaV8KUzECiqAqR9L6SMOTtC+FqRgBRVCVI2l9pOFJ2pfCVIyAIqjKkbQ+0vAk7UthKkZAEVTlSFofaXiS9qUwFSOgCKpyJK2PNDxJ+1KYihFQBFU5ktZHGp6kfSlMxQgogqocSesjDU/SvhSmYgQUQVWOpPWRhidpXwpTMQKKoCpH0vpIw5O0L4WpGAFFUJUjaX2k4Unal8JUjIAiqMqRtD7S8CTtS2EqRkARVOVIWh9peJL2pTAVI6AIqnIkrY80PEn7UpiKEVAEVTmS1kcanqR9KUzFCCiCqhxJ6yMNT9K+FKZiBBRBVY6k9ZGGJ2lfClMxAoqgKkfS+kjDk7QvhakYAUVQlSNpfaThSdqXwlSMgCKoypG0PtLwJO1LYSpGQBFU5UhaH2l4kvalMBUjoAiqciStjzQ8SftSmIoRUARVOZLWRxqepH0pTMUIKIKqHEnrIw1P0r4UpmIEFEFVjqT1kYYnaV8KUzECiqAqR9L6SMOTtC+FqRgBRVCVI2l9pOFJ2pfCVIyAIqjKkbQ+0vAk7UthKkZAEVTlSFofaXiS9qUwFSOgCKpyJK2PNDxJ+1KYihFQBFU5ktZHGp6kfSlMxQgogqocSesjDU/SvhSmYgQUQVWOpPWRhidpXwpTMQKKoCpH0vpIw5O0L4WpGAFFUJUjaX2k4Unal8JUjIAiqMqRtD7S8CTtS2EqRkARVOVIWh9peJL2pTAVI6AIqnIkrY80PEn7UpiKEVAEVTmS1kcanqR9KUzFCCiCqhxJ6yMNT9K+FKZiBBRBVY6k9ZGGJ2lfClMxAoqgKkfS+kjDk7QvhakYAUVQlSNpfaThSdqXwlSMgCKoypG0PtLwJO1LYSpGQBFU5UhaH2l4kvalMBVrGFC91kcanipH0vpIw5O0L0/DI1AEVTmS1kcanqR9KUzFCCiCqhxJ6yMNT9K+FKZiBBRBVY6k9ZGGJ2lfClMxAoqgKkfS+kjDk7QvhakYAUVQlSNpfaThSdqXwlSMgCKoypG0PtLwJO1LYSpGQBFU5UhaH2l4kvalMBUjoAiqciStjzQ8SftSmIoRUARVOZLWRxqepH0pTMUIKIKqHEnrIw1P0r4UpmIEFEFVjqT1kYYnaV8KUzECiqAqR9L6SMOTtC+FqRgBRVCVI2l9pOFJ2pfCVIyAIqjKkbQ+0vAk7UthKkZAEVTlSFofaXiS9qUwFSOgCKpyJK2PNDxJ+1KYihFQBFU5ktZHGp6kfSlMxQgogqocSesjDU/SvhSmYgQUQVWOpPWRhidpXwpTMQKKoCpH0vpIw5O0L4WpGAFFUJUjaX2k4Unal8JUjIAiqMqRtD7S8CTtS2EqRkARVOVIWh9peJL2pTAVI6AIqnIkrY80PEn7UpiKEVAEVTmS1kcanqR9KUzFCCiCqhxJ6yMNT9K+FKZiBBRBVY6k9ZGGJ2lfClMxAoqgKkfS+kjDk7QvhakYAUVQlSNpfaThSdqXwlSMgCKoypG0PtLwJO1LYSpGQBFU5UhaH2l4kvalMBUjoAiqciStjzQ8SftSmIoRUARVOZLWRxqepH0pTMUIKIKqHEnrIw1P0r4UpmIEFEFVjqT1kYYnaV8KUzECiqAqR9L6SMOTtC+FqRgBRVCVI2l9pOFJ2pfCVIyAIqjKkbQ+0vAk7UthKkZAEVTlSFofaXiS9qUwFSOgCKpyJK2PNDxJ+1KYihFQBFU5ktZHGp6kfSlMxQgogqocSesjDU/SvhSmYgQUQVWOpPWRhidpXwpTMQKKoCpH0vpIw5O0L4WpGAFFUJUjaX2k4Unal8JUjIAiqMqRtD7S8CTtS2EqRkARVOVIWh9peJL2pTAVI6AIqnIkrY80PEn7UpiKEVAEVTmS1kcanqR9KUzFCCiCqhxJ6yMNT9K+FKZiBBRBVY6k9ZGGJ2lfClMxAoqgKkfS+kjDk7QvhakYAUVQlSNpfaThSdqXwlSMgCKoypG0PtLwJO1LYSpGQBFU5UhaH2l4kvalMBUjoAiqciStjzQ8SftSmIoRUARVOZLWRxqepH0pTMUIKIKqHEnrIw1P0r4UpmIEFEFVjqT1kYYnaV8KUzECiqAqR9L6SMOTtC+FqRgBRVCVI2l9pOFJ2pfCVIyAIqjKkbQ+0vAk7UthKkZAEVTlSFofaXiS9qUwFSOgCKpyJK2PNDxJ+1KYihFQBFU5ktZHGp6kfSlMxQgogqocSesjDU/SvhSmYgQUQVWOpPWRhidpXwpTMQKKoCpH0vpIw5O0L4WpGAFFUJUjaX2k4Unal8JUjIAiqMqRtD7S8CTtS2EqRkARVOVIWh9peJL2pTAVI6AIqnIkrY80PEn7UpiKEVAEVTmS1kcanqR9KUzFCCiCqhxJ6yMNT9K+FKZiBBRBVY6k9ZGGJ2lfClMxAoqgKkfS+kjDk7QvhakYAUVQlSNpfaThSdqXwlSMgCKoypG0PtLwJO1LYSpGQBFU5UhaH2l4kvalMBUjoAiqciStjzQ8SftSmIp5BPTxlb3p9N3rBBRKlSNpfaThSdqXwj+gjy5Ol175goBCqHIkrY80PEn7UvgH9Nr0/PX5g8vT87cIKHQqR9L6SMOTtC+Fe0Dv75XHno8unvuEgEKnciStjzQ8SftSuAf05vS19Y/vE1DoVI6k9ZGGJ2lfCveAXpt+WH68sw4pAYVE5UhaH2l4kval8A7o48vrT93v722+CPr8iv7van2k4alyJK2PNDxJ+/I0qQIKAJ48A2peyKR/dP3dxD2JToxEpWFAzeuYWt8TWXBPohMjUSGg2XBPohMjUfEOqOez8N9N3JPoxEhU3AO6ef2nw+tAv5u4J9GJkai4B9TxnUjfTdyT6MRIVNwD+vjy9FWn98J/N3FPohMjUXEP6PyB29WYvpu4J9GJkaj4B3T+4Mqin+/esr/c+p7IgnsSnRiJSoOAHqH1PZEF9yQ6MRIVUzECGh73JDoxEhVTMQIaHvckOjESFVMxAhoe9yQ6MRIVUzECGh73JDoxEhVTMQIaHvckOjESFVMxAhoe9yQ6MRIVUzECGh73JDoxEhVTMQIaHvckOjESFVMxAhoe9yQ6MRIVUzECGh73JDoxEhVTMQIaHvckOjESFVMxAhoe9yQ6MRIVUzECGh73JDoxEhVTMQIaHvckOjESFVMxAhoe9yQ6MRIVUzECGh73JDoxEhVTMQIaHvckOjESFVMxAhoe9yQ6MRIVUzECGh73JDoxEhVTMQIaHvckOjESFVMxAhoe9yQ6MRIVUzECGh73JDoxEhVTMQIaHvckOjESFVMxAhoe9yQ6MRIVUzECGh73JDoxEhVTMQIaHvckOjESFVOxhgGFxvPPt/43wOgxkoEQ0PA4G+jESAZCQMPjbKATIxkIAQ2Ps4FOjGQgBDQ8zgY6MZKBENDwOBvoxEgGQkDD42ygEyMZCAEFgEoEFAAqEVAAqERAAaASAQWASgQUACoRUACoREABoBIBDeHRxen7+z995Yum/y4Yk8eXp+dv7f/0w7b/Mt9BBDSERUDPfbL5KQHFgft7m/+23tlPKdwQ0BAWAZ2+tvkpAcWWm9PVIB5d3Pw3Fn4IaAiLw/E368/PCCgO2Xx55+bmP7FwREBDWFTzf+xtHmisfnxwZTqdvnu96b8WxuBO+fLO/fU+FsPYm05/en31858tRvLv/7bhv1x2BDSEZTXXjzDWAb2zOCUL53ja4Dvv8eXlMq6tP0O5vzWM9c95aDocAhrCsprrJ1lXAV0cjXf/9/zxv0z5uhfu75375P7e6hmkxSf0792aP/7X5RdGF4v5D4tf/Lc9RjIYAhpCqebqk7RVQDdf8LrGowssVnD+v6wjuRnGzen7PK3kgICGsKpmqWX56f5L/njpCrZfpPH48rqZy0eki5W8+j9b/nt9BxDQEFYBLY8oyk/3H1vwnDzmy/+OrmewaObG4lduLn989b/yn9jhENAQNs8cLR5vrgO6PjAEFPPV483yk+Vj0YOAzv/8N+Wn75HQoRDQEDadvDZ9n0egeMJWQM2XPR//9+Urmd5/2j8EAQIawqaTi/Px3/gaKKz9gD7t/fCP/5WRDIaAhrD/QPPO9K/2eBYexn5AF8NY/Wz5X9bNa+sPfhdqBDSEg8/Ur62+uLV6HehfrvA6UMy3E/no4vT89fn8z3uLR6LLKzUtfv7gMv+VHQwBDeEgoIty8k4kGFuPMdfDmL43P3gn0qt8nXwoBDSEreeKNhff4b3w2Lf9SfrqvfD/ePDzv/qPfAI/GAIKAJUIKABUIqAAUImAAkAlAgoAlQgoAFQioABQiYACQCUCCgCVCCgAVCKgAFCJgAJAJQIKAJUIKABUIqAAUImAAkAlAgoAlQgoAFQioABQiYACQCUCCgCVCCgAVCKgAFCJgAJAJQIKAJUIKABUIqAAUImAAkAlAgoAlQgoAFQioABQiYACQCUCCgCVCCgAVCKgAFCJgAJAJQIKAJUIKABUIqAAUImAAkAlAgoAlQgoAFQioABQiYACQCUCCgCVCCgAVCKgAFCJgAJAJQIKAJUIKABUIqAAUOn/A71FEGOQyBlxAAAAAElFTkSuQmCC">
+            <a:extLst>
+              <a:ext uri="{FF2B5EF4-FFF2-40B4-BE49-F238E27FC236}">
+                <a16:creationId xmlns:a16="http://schemas.microsoft.com/office/drawing/2014/main" id="{27CC6064-973B-4FF1-9446-C7722D5F572B}"/>
+              </a:ext>
+            </a:extLst>
+          </p:cNvPr>
+          <p:cNvSpPr>
+            <a:spLocks noChangeAspect="1" noChangeArrowheads="1"/>
+          </p:cNvSpPr>
+          <p:nvPr/>
+        </p:nvSpPr>
+        <p:spPr bwMode="auto">
+          <a:xfrm>
+            <a:off x="2895600" y="228600"/>
+            <a:ext cx="6400800" cy="6400800"/>
+          </a:xfrm>
+          <a:prstGeom prst="rect">
+            <a:avLst/>
+          </a:prstGeom>
+          <a:noFill/>
+          <a:extLst>
+            <a:ext uri="{909E8E84-426E-40DD-AFC4-6F175D3DCCD1}">
+              <a14:hiddenFill xmlns:a14="http://schemas.microsoft.com/office/drawing/2010/main">
+                <a:solidFill>
+                  <a:srgbClr val="FFFFFF"/>
+                </a:solidFill>
+              </a14:hiddenFill>
+            </a:ext>
+          </a:extLst>
+        </p:spPr>
+        <p:txBody>
+          <a:bodyPr vert="horz" wrap="square" lIns="91440" tIns="45720" rIns="91440" bIns="45720" numCol="1" anchor="t" anchorCtr="0" compatLnSpc="1">
+            <a:prstTxWarp prst="textNoShape">
+              <a:avLst/>
+            </a:prstTxWarp>
+          </a:bodyPr>
+          <a:lstStyle/>
+          <a:p>
+            <a:endParaRPr lang="en-US"/>
+          </a:p>
+        </p:txBody>
+      </p:sp>
+      <p:sp>
+        <p:nvSpPr>
+          <p:cNvPr id="6" name="AutoShape 4" descr="data:image/png;base64,iVBORw0KGgoAAAANSUhEUgAABUAAAAPACAMAAADDuCPrAAABYlBMVEUAAAAAADoAAGYAOjoAOmYAOpAAZrYzMzM6AAA6OgA6Ojo6OmY6ZmY6ZpA6ZrY6kLY6kNtNTU1NTW5NTY5Nbm5Nbo5NbqtNjshmAABmADpmOgBmOjpmZjpmZmZmZpBmkGZmkLZmkNtmtttmtv9uTU1ubk1ubm5ubo5ujqtujshuq8huq+SOTU2Obk2Obm6Oq8iOyOSOyP+QOgCQOjqQZjqQZmaQZpCQkGaQkLaQtraQttuQ2/+rbk2rjk2rjm6rq8iryOSr5Mir5P+2ZgC2Zjq2kDq2kGa2kJC2tpC2tra2ttu229u22/+2///Ijk3Ijm7Iq27Iq6vIyKvI5KvI5OTI5P/I///bkDrbkGbbtmbbtpDbtrbb27bb29vb2//b/7bb///kq27kyI7kyKvk5P/k///r6+v8jVn/tmb/yI7/25D/27b/29v/5Kv/5Mj/5OT//7b//7///8j//9v//+T///+zjZs9AAAACXBIWXMAAB2HAAAdhwGP5fFlAAAgAElEQVR4nO3d/59b5ZnecU0wMDGEILMYh0CWwmwDxaSLN3S7xHW3mGQXkni3aY0TEijO1q2/YMe1rP+/0iNpRnPbM+fMM9e5n3PffN4/xB472Eiv6/mgGUlnJnMAQJVJ638BAIiKgAJAJQIKAJUIKABUIqAAUImAAkAlAgoAlQgoAFQioABQiYACQCUCCgCVCCgAVCKgAFCJgAJAJQIKAJVGENDZl298fzKZ7Lzw8Ten/rNuT570zvzhhcnOLwT/pgCwrXlAZ7/aPWjdS6dNKAEF4Kd1QO+9fih2p+0cAQXgp3FA7y4ffu689dXip9/+6vuCgh78ud/7reRPAoCjtA3o4qHh1ufts1/KCkpAAQyvbUCvLor59tbHy8/An1P8wQQUwPCaBnT5CfzLh37lRvmapeRPJqAABtY0oItcmswtP6d/rvzGwQPRq5vK3vv5Irg7P/jNwT/9zuzT3cnOC09+1n84oJsnka4ufyh/ygsfL3/9yx8vev3Cr/f/f+YvAIBjtQzo7NKTn7Cvmroo3n7/NvWbfWpe7LQM6NUjnro/OqA31n/Iywd/4PpB8BN/AQAcq2VAlw837efrt1c9vHrwO4tfefabVW03VtVdpPBs+fDZJ3t3ZED/fv8Pefvq4ddOPfkXAMCxWgZ0UbknHjyuo3r7IGLrli4fOb709Xz+7aebx4zlseQPv5l/+/VT/+inBnRh+Rn6l4tP1Z+Z7Lz9zeqZ/+fmT/0LAOBYLQN6+ymffS8D+vJ866Xv68/mtx6t3l5/5fTGMaE7OqAvb/6MzV9wdfUQ9il/AQAca6QBXdZxlbr180nbTysdPCY98kWjRwZ0/aubv2a+/yWCp/wFAHCssQZ0UcDypc3lVyaXMdtu2u39xj7lq58rRwb0uYO/5p1D/9en/AUAcKyRfg10Gc7ye+uQbj/Ds3mW58YxT/YcGdCXD//K/v/1aX8BABxrbM/C70f19qFP5W3f7Cfd1qkDeuRjWwDYGOfrQOclcYuIbR6IElAA4zPOdyItlbcNbV7OtPlSqPmntQHliSMAJ9I0oFu5XNt6L3z5HH7/qZ2rTz6vIw3o0/4CADhW26sx2Zdy3t765HnxmPDZ/7X/ls7tp9xv7H95VBjQp/wFAHCstgEtX3k8eOf5jcn2C5tulDderku2deGmzfNM2oA+5S8AgGM1viL9veUVlQ9dkf7gC5Grq9VvSrZ8F9GZX6+/h9LmvZfCgD7lLwCAY435eyJd3X42fPtp8lUbxQF98i8AgGO1Duih78q5c/g6crcn28+Mz36++b+dWV2wUxzQJ/8CADhW84AufPnz5Sfvz7xovy/89lVBl/60vN7x+lrIc31An/gLAOBYYwgoAIREQAGgEgEFgEoEFAAqEVAAqERAAaASAQWASgQUACoRUACoREABoBIBBYBKBBQAKhFQAKhEQAGgEgEFgEoEFAAqEVAAqNQwoP8HEtyT6MRIVEzFCGh43JPoxEhUTMUIaHjck+jESFRMxQhoeNyT6MRIVEzFCGh43JPoxEhUTMUIaHjck+jESFRMxQhoeNyT6MRIVEzFCGh43JPoxEhUTMUIaHjck+jESFRMxQhoeNyT6MRIVEzFCGh43JPoxEhUTMUIaHjck+jESFRMxQhoeNyT6MRIVEzFCGh43JPoxEhUTMUIaHjck+jESFRMxQhoeNyT6MRIVEzFCGh43JPoxEhUTMUIaHjck+jESFRMxQhoeNyT6MRIVEzFCGh43JPoxEhUTMUIaHjck+jESFRMxQhoeNyT6MRIVEzFCGh43JPoxEhUTMUIaHjck+jESFRMxQhoeNyT6MRIVEzFCGh43JPoxEhUTMUIaHjck+jESFRMxQhoeNyT6MRIVEzFCGh43JPoxEhUTMUIaHjck+jESFRMxQhoeNyT6MRIVEzFCGh43JPoxEhUTMUIaHjck+jESFRMxQhoeNyT6MRIVEzFCGh43JPoxEhUTMUIaHjck+jESFRMxQhoeNyT6MRIVEzFUgX0/+I7RL+fxAioiqkYAUVQ+v0kRkBVTMUIKILS7ycxAqpiKkZAEZR+P4kRUBVTMQKKoPT7SYyAqpiKEVAEpd9PYgRUxVSMgCIo/X4SI6AqpmIEFEHp95MYAVUxFSOgCEq/n8QIqIqpGAFFUPr9JEZAVUzFCCiC0u8nMQKqYipGQBGUfj+JEVAVUzECiqD0+0mMgKqYihFQBKXfT2IEVMVUjIAiKP1+EiOgKqZiBBRB6feTGAFVMRUjoAhKv5/ECKiKqRgBRVD6/SRGQFVMxQgogtLvJzECqmIqRkARlH4/iRFQFVMxAoqg9PtJjICqmIoRUASl309iBFTFVIyAIij9fhIjoCqmYgQUQen3kxgBVTEVI6AISr+fxAioiqkYAUVQ+v0kRkBVTMUIKILS7ycxAqpiKkZAEZR+P4kRUBVTMQKKoPT7SYyAqpiKEVAEpd9PYgRUxVSMgCIo/X4SI6AqpmKnDeiji6+tf/b4yt50+u71rg8IKDT0+0mMgKqIA3pt+tqmpNOlV744/gMCChH9fhIjoCrSgD6+Nt0E9Nr0/PX5g8vT87eO/YCAQkS/n8QIqIoyoP/2wXQT0Pt75RHmo4vnPjnuAwIKFf1+EiOgKsKA3pxO3/vzOqA39398/7gPCChU9PtJjICqKAP66j/O76zzeG36YfmxfHz0BwQUKvr9JEZAVYQB3cri48vrT9Dv752/dfQHq3/m+ZVT/s1P0fpIw5N+P8BJEVAEpd8PcFL6gL7yxdEfHPpH9Y+uWx9peNLvJzE+hVcZPKDdj0AJKAT0+0mMgKoQUOSg309iBFRlmIDyLDy86feTGAFVGSigm1d5rl/6edQHBBQq+v0kRkBVBgoo70SCM/1+EiOgKgMF9PHl6av773g/+gMCChX9fhIjoCoDBXT+YPuaS0d/QEAhot9PYgRUZaiAzh9cWVTy3VtdHxBQaOj3kxgBVREH9BT0t631kYYn/X4SI6AqpmIEFEHp95MYAVUxFSOgCEq/n8QIqIqpGAFFUPr9JEZAVUzFCCiC0u8nMQKqYipGQBGUfj+JEVAVUzECiqD0+0mMgKqYihFQBKXfT2IEVMVUjIAiKP1+EiOgKqZiBBRB6feTGAFVMRUjoAhKv5/ECKiKqRgBRVD6/SRGQFVMxQgogtLvJzECqmIqRkARlH4/iRFQFVMxAoqg9PtJjICqmIoRUASl309iBFTFVIyAIij9fhIjoCqmYgQUQen3kxgBVTEVI6AISr+fxAioiqkYAUVQ+v0kRkBVTMUIKILS7ycxAqpiKkZAEZR+P4kRUBVTMQKKoPT7SYyAqpiKEVAEpd9PYgRUxVSMgCIo/X4SI6AqpmIEFEHp95MYAVUxFSOgCEq/n8QIqIqpGAFFUPr9JEZAVUzFCCiC0u8nMQKqYipGQBGUfj+JEVAVUzECiqD0+0mMgKqYihFQBKXfT2IEVMVUjIAiKP1+EiOgKqZiBBRB6feTGAFVMRUjoAhKv5/ECKiKqRgBRVD6/SRGQFVMxQgogtLvJzECqmIqRkARlH4/iRFQFVMxAoqg9PtJjICqmIoRUASl309iBFTFVIyAIij9fhIjoCqmYgQUQen3kxgBVTEVI6AISr+fxAioiqkYAUVQ+v0kRkBVTMUIKILS7ycxAqpiKkZAEZR+P4kRUBVTMQKKoPT7SYyAqpiKEVAEpd9PYgRUxVSMgCIo/X4SI6AqpmIEFEHp95MYAVUxFSOgCEq/n8QIqIqpGAFFUPr9JEZAVUzFCCiC0u8nMQKqYipGQBGUfj+JEVAVUzECiqD0+0mMgKqYihFQBKXfT2IEVMVUjIAiKP1+EiOgKqZiBBRB6feTGAFVMRUjoAhKv5/ECKiKqRgBRVD6/SRGQFVMxQgogtLvJzECqmIqRkARlH4/iRFQFVMxAoqg9PtJjICqmIoRUASl309iBFTFVIyAIij9fhIjoCqmYgQUQen3kxgBVTEVI6AISr+fxAioiqkYAUVQ+v0kRkBVTMUIKILS7ycxAqpiKkZAEZR+P4kRUBVTMQKKoPT7SYyAqpiKEVAEpd9PYgRUxVSMgCIo/X4SI6AqpmIEFEHp95MYAVUxFSOgCEq/n8QIqIqpGAFFUPr9JEZAVUzFCCiC0u8nMQKqYipGQBGUfj+JEVAVU7GGAdVrfaThqfXaAB6BIiz9fhLjEaiKqRgBRVD6/SRGQFVMxQgogtLvJzECqmIqRkARlH4/iRFQFVMxAoqg9PtJjICqmIoRUASl309iBFTFVIyAIij9fhIjoCqmYgQUQen3kxgBVTEVI6AISr+fxAioiqkYAUVQ+v0kRkBVTMUIKILS7ycxAqpiKkZAEZR+P4kRUBVTMQKKoPT7SYyAqpiKEVAEpd9PYgRUxVSMgCIo/X4SI6AqpmIEFEHp95MYAVUxFSOgCEq/n8QIqIqpGAFFUPr9JEZAVUzFCCiC0u8nMQKqYipGQBGUfj+JEVAVUzECiqD0+0mMgKqYihFQBKXfT2IEVMVUjIAiKP1+EiOgKqZiBBRB6feTGAFVMRUjoAhKv5/ECKiKqRgBRVD6/SRGQFVMxQgogtLvJzECqmIqRkARlH4/iRFQFVMxAoqg9PtJjICqmIoRUASl309iBFTFVIyAIij9fhIjoCqmYgQUQen3kxgBVTEVI6AISr+fxAioiqkYAUVQ+v0kRkBVTMUIKILS7ycxAqpiKkZAEZR+P4kRUBVTMQKKoPT7SYyAqpiKEVAEpd9PYgRUxVSMgCIo/X4SI6AqpmIEFEHp95MYAVUxFSOgCEq/n8QIqIqpGAFFUPr9JEZAVUzFCCiC0u8nMQKqYipGQBGUfj+JEVAVUzECiqD0+0mMgKqYihFQBKXfT2IEVMVUjIAiKP1+EiOgKqZiBBRB6feTGAFVMRUjoAhKv5/ECKiKqRgBRVD6/SRGQFVMxQgogtLvJzECqmIqRkARlH4/iRFQFVMxAoqg9PtJjICqmIoRUASl309iBFTFVIyAIij9fhIjoCqmYgQUQen3kxgBVTEVI6AISr+fxAioiqkYAUVQ+v0kRkBVTMUIKILS7ycxAqpiKkZAEZR+P4kRUBVTMQKKoPT7SYyAqpiKEVAEpd9PYgRUxVSMgCIo/X4SI6AqpmIEFEHp95MYAVUxFSOgCEq/n8QIqIqpGAFFUPr9JEZAVUzFCCiC0u8nMQKqYipGQBGUfj+JEVAVUzECiqD0+0mMgKqYihFQBKXfT2IEVMVUjIAiKP1+EiOgKqZiBBRB6feTGAFVMRUjoAhKv5/ECKiKqRgBRVD6/SRGQFVMxQgogtLvJzECqmIqRkARlH4/iRFQFVMxAoqg9PtJjICqmIoRUASl309iBFTFVIyAIij9fhIjoCqmYgQUQen3kxgBVTEVI6AISr+fxAioiqmYKKCPL083XvliPn908eDni9+8sjedvnudgEJJv5/ECKiKS0Dv720FdF3TVUwJKET0+0mMgKoME9CN+3vnPln8cGf62sGvXZuevz5/cHl6/hYBhY5+P4kRUJVBA7p4IPr+qpnvbzV1/Ti0pJWAQkS/n8QIqMqgAb25epj5+PJWLG+uH43e3IoqAcWp6feTGAFVGTKgjy5OP1z9eP53H0ynP72+/ODa6tcOf1pPQHFa+v0kRkBVhgzo5sHm5jmkZTr3H43e39t8EfT5FeXfvNL6SMOTfj/ASSkDuv9lzjvT6Xu35n+5Ml18TEAxDP1+gJNSBvTO5on2zSPR5XNJWwE1L2TSP7pufaThSb+fxPgUXmW4gD6+vP5q56GiPuURKAGFgH4/iRFQleEC+sRDzPIrBBTD0O8nMQKqMlxAn3iafdVMnoXHIPT7SYyAqgwX0P1Xz+9/Ll+auXn9J68DhZR+P4kRUJXBArr16vlrqwebq5DyTiQMQr+fxAioymABfXRx/0ug9/eWL2N68EF5Vn6R0Vd5Lzzk9PtJjICqDBbQ7SeJbq4vxnR9+cEDrsaEAej3kxgBVRksoHe2H2I++Nl0eu699ccPriz6+e4t+w/ob1vrIw1P+v0kRkBVBgvoielvW+sjDU/6/SRGQFVMxQgogtLvJzECqmIqRkARlH4/iRFQFVMxAoqg9PtJjICqmIoRUASl309iBFTFVKwjoLM/fvY5AcUY6feTGAFV6RvQe//pm/n84euTyeTMLwgoxke/n8QIqErPgN6YfO+38/nVydLyZwQUI6PfT2IEVKVfQG+XbN7dnTz7zb0Lk5cJKEZHv5/ECKhKv4BeXZRzmdGdXyz/d/lzAopx0e8nMQKq0iugs0vLcq4z+vDCMJ/D629b6yMNT/r9JEZAVXoFdNXMhxcmz80JKMZJv5/ECKjKCQJ6d3fyDgHFSOn3kxgBVekV0NWn8DfKl0D5GihGSb+fxAioSq+Azq9Onls+/b4sJ8/CY5T0+0mMgKr0C+jt8gLQxWfws59PVo9DCSjGRb+fxAioSr+ALj59X3iuPJG0884g/SSgOBX9fhIjoCo9Azq/99FPPl788PBHP/jNMP0koDgV/X4SI6AqfQM6PP1ta32k4Um/n8QIqIqp2LEBnX09YD8JKE5Fv5/ECKiKqdjRAf3yx8v3wz/80VuDvIaJgOKU9PtJjICq9Azo7NPVdZgeXpicGeZiTAQUp6LfT2IEVKVnQK9OJmf+evd7v5393WSg19ETUJyKfj+JEVCVfgG9PZm8vX4P5x9Wb+gkoBgX/X4SI6Aq/QJ6dfnuo/Wb4G+US4oQUIyLfj+JEVCVXgFdvRd+HdC7u1xMBOOj309iBFSlV0A3l7Mr5eRqTBgj/X4SI6AqBBQ56PeTGAFV6RXQ2aXlE0frcnI5O4yRfj+JEVCVXgFdPXG0CugipjyJhPHR7ycxAqrSL6B3dycvfVMCeu91LmeHMdLvJzECqtIvoOVydmd3d178/uLHYa6nTEBxKvr9JEZAVXoGdP773cnaQP0koDgV/X4SI6AqfQM6//ZXZxf1fGawy4ESUJyKfj+JEVCV3gEdnP62tT7S8KTfT2IEVMVUjOuBIij9fhIjoCqmYlwPFEHp95MYAVXpGVCuB4qR0+8nMQKq0jOgXA8UI6ffT2IEVKVfQLkeKMZOv5/ECKhKv4ByPVCMnX4/iRFQlV4B5XqgGD39fhIjoCq9Asrl7DB6+v0kRkBVCChy0O8nMQKq0iugXA8Uo6ffT2IEVKVXQLkeKEZPv5/ECKhKv4ByPVCMnX4/iRFQlX4B5XqgGDv9fhIjoCo9A8r1QDFy+v0kRkBV+gaU64Fi3PT7SYyAqvQO6OD0t631kYYn/X4SI6AqpmIEFEHp95MYAVUxFTvihfQ/emnQaykTUJyafj+JEVCVfgG9MJk8M9iVlAkoBPT7SYyAqvQK6OpyypMzHw/ZUP1ta32k4Um/n8QIqEqvgC786celoS98TEAxSvr9JEZAVfoGdL76rkgLQ72QSX/bWh9peNLvJzECqnKCgC4+lf/y9WVCd94a4ikl/W1rfaThSb+fxAioyokCuvDtz8tbkl7QPwzV37bWRxqe9PtJjICqnCigs199f/OGzslLBBRjot9PYgRUpX9AN/VcPhf/7af698Trb1vrIw1P+v0kRkBVegZ0/dXPg1eD6i+rrL9trY80POn3kxgBVekV0NmliX3ySP+NPfS3rfWRhif9fhIjoCq9Arp8J9LO4ZcvPbzAI1CMiX4/iRFQlZ4B/cGvzS/NPle/lEl/21ofaXjS7ycxAqrSK6Au9Let9ZGGJ/1+EiOgKqZiBBRB6feTGAFVMRXruCL9ztlB3oREQHFq+v0kRkBV+gb0xv4r6PmeSBgj/X4SI6AqPQO67OczL775Bt+VEyOl309iBFSlX0Dv7k6eXb2K6d4lvi88xki/n8QIqEq/gF49eN/R7NLkOQKK0dHvJzECqtIroLNLW4867+6qX0JPQHF6+v0kRkBVegX00Ps29W/iJKA4Pf1+EiOgKgQUOej3kxgBVekV0NmlyTv7H+ivw0RAcXr6/SRGQFV6BZQnkTB6+v0kRkBV+gX07u7kzOpyIn96nZcxYYz0+0mMgKr0C+jqjUhnz54d8q1Icq2PNDy1XhtwzFs5/7C7fifnztsD/dX6/zi0PtLwpN9PYjwCVekb0PnsyzcWj0Bf/HiQJ5AIKE5Lv5/ECKhK74AOTn/bWh9peNLvJzECqmIqRkARlH4/iRFQFVMxG9DZR28+6Se8DhSjo99PYgRUpSOgy28n9wTeiYTx0e8nMQKqQkCRg34/iRFQlY6AOtLfttZHGp70+0mMgKqYihFQBKXfT2IEVMVU7PiAfjVcPgkoTke/n8QIqIqp2NEB/fLH5X1IP/gNAcUY6feTGAFV6RnQ2aX9p5BeGui9SPrb1vpIw5N+P4kRUJV+AV32c+fFf/jsn97YnQx0NTsCilPR7ycxAqrSL6A3JpMfrh54zn452bq4MgHFWOj3kxgBVekV0MUD0INr2F3lgsoYIf1+EiOgKr0C+vDCoe/KyQvpMT76/SRGQFV6BpRvKoeR0+8nMQKq0iugfF94jJ5+P4kRUJVeAZ3f2Pq65w2+BooR0u8nMQKq0i+gs0v7L/+8MdC1RAgoTkW/n8QIqEqvgM4+Wr7+88W3Pvvn5Y8vDHNVUP1ta32k4Um/n8QIqEqvgLpc1E5/21ofaXjS7ycxAqpCQJGDfj+JEVCVXgF1ob9trY80POn3kxgBVTEVI6AISr+fxAioiqkYAUVQ+v0kRkBVTMWODugfP9v3OS+kx+jo95MYAVXpGdDf7/JN5TBq+v0kRkBV+gX0Nt+VEyOn309iBFSlV0BnlyY7H3+17+sh+klAcSr6/SRGQFV6BfThhYEuokxAoaLfT2IEVKVnQAd6/zsBhYp+P4kRUJVeAZ1dIqAYOf1+EiOgKr0COr/Bp/AYOf1+EiOgKv0Ceuh7ehBQjJB+P4kRUJV+AZ3fuzA58+aG+kJ2BBSnp99PYgRUpWdAP+V1oBg3/X4SI6Aq/QJ6gxfSY+T0+0mMgKr0Cmh5If0gn7cTUIjo95MYAVXpFVCP55AIKE5Fv5/ECKhKz4DyOlCMnH4/iRFQlV4B5YX0GD39fhIjoCq9Ajq/MXmZgGLU9PtJjICq9Avo7NLO2wQUY6bfT2IEVKVXQGcfvTGZ7LzIC+kxXvr9JEZAVXoF1HxbY14HivHR7ycxAqpCQJGDfj+JEVCVXgF1ob9trY80POn3kxgBVTEVI6AISr+fxAioiqkYAUVQ+v0kRkBVTMVsQGd/tN8F/uGPz77A10AxOvr9JEZAVToC+vDC6imj2UebFy9tfoWAYlT0+0mMgKr0DOhBNgkoRkm/n8QIqAoBRQ76/SRGQFUIKHLQ7ycxAqpCQJGDfj+JEVAVAooc9PtJjICqEFDkoN9PYgRUhYAiB/1+EiOgKgQUOej3kxgBVSGgyEG/n8QIqAoBRQ76/SRGQFUIKHLQ7ycxAqrSHdAnEVCMj34/iRFQFQKKHPT7SYyAqnQEdPbRm0/im8phfPT7SYyAqnQE1JH+trU+0vCk309iBFTFVIyAIij9fhIjoCqmYgQUQen3kxgBVTEVI6AISr+fxAioiqkYAUVQ+v0kRkBVTMUIKILS7ycxAqpiKkZAEZR+P4kRUBVTMQKKoPT7SYyAqpiKEVAEpd9PYgRUxVTsiXciXdr5xeKHb78moBg3/X4SI6AqHQF9eGH5xvfV/xJQjJh+P4kRUJXOgC4fgRJQjJ5+P4kRUJWOgM4uTZ79/Ks/Xfjer786MMzn8/rb1vpIw5N+P4kRUJWOgM5vcDk7hKDfT2IEVKUroLNP6wL66OK0eOWL5UePr+xNp+9eX/3WoQ8IKDT0+0mMgKp0BXSR0K8+++fdnX/47MDnPa4Hen9vK6Drmq5ieugDAgoR/X4SI6Aq3QGdVz2JdGf62sEH16bnr88fXJ6ev2U/IKAQ0e8nMQKq0iugs49OfBH6a9P3939+f2/9OPTcJ+YDAgoV/X4SI6AqvQJ6co8vb/Xx5vrR6M1lVA99QEChot9PYgRUpXdAv/3V2clk5+xb/V7D9Oji+d99MJ3+9Pryg2vTD8svlk/rD31AQKGi309iBFSlb0APXs70cp+Abp5DWtZy/9Ho/b3ztw59sPr/Pr/S5489mdZHGp70+wFO6qiALvv5zItvvvH9ngW9M52+d2v+lyvTRS4JKBzo9wOc1BEBvbs7efY35Wf3Lk3K5UU6bL7SuXwuaauZr3xx6IND/4j+0XXrIw1P+v0kxqfwKv0CenXy7OZp+NmlyXPdAd24MzUPOp/yCJSAQkC/n8QIqEqvgK4vardyd/fZ/q9pMg86CSiGot9PYgRUpVdAD72Q/kSvqi+Z5Fl4DE+/n8QIqMowAX18eTuTm5d8rl8HuvUBAYWKfj+JEVCVXgGdXZq8s//B7UmPT+GvrR5frkLKO5EwPP1+EiOgKr0CevInke7vLV/G9OCD8o73RUZf3X/7+6EPCChU9PtJjICq9Avo3d3JmV+Xn/3p9V4vY1p8hr665tL15QcPti/A9ICrMWEA+v0kRkBV+gV09Uaks2fP9n4r0vzBz6bTc++tH2U+uLJI5rtP+4CAQkO/n8QIqErPgM7/sLt+J+fO2736eXL629b6SMOTfj+JEVCVvgGdz758Y/EI9MWPT3pdOwIKF/r9JEZAVXoHdHD629b6SMOTfj+JEVAVUzECiqD0+0mMgKqYihFQBKXfT2IEVMVUjIAiKP1+EiOgKqZiBBRB6feTGAFVMRUjoAhKv5/ECKiKqRgBRVD6/SRGQFVMxQgogtLvJzECqmIqRkARlH4/iRFQFVOxo67G9IPfEFCMmn4/iRFQlV4BfXhh63qgBBRjpN9PYgRUpWdAT/BdPAgoWtDvJzECqtIroIe+qRwBxRjp95MYAVXpFdD5jc23hSegGCn9fhIjoCr9AvrtLyeTZ158c+0ng1zSTn/bWh9peJuln3QAABwGSURBVNLvJzECqtIroA8vTLYN8wVR/W1rfaThSb+fxAioCgFFDvr9JEZAVXoF1IX+trU+0vCk309iBFTFVIyAIij9fhIjoCqmYscGdPb1gP0koDgV/X4SI6AqpmJHB/TLHy+/+PnwR28N9V3l9Let9ZGGJ/1+EiOgKj0DOvt09ezRwwuTMwO9KUl/21ofaXjS7ycxAqrSM6BXJ5Mzf737vd/O/m4yeXaYx6D629b6SMOTfj+JEVCVfgG9PZm8vX5H/B92B7qwiP62tT7S8KTfT2IEVKVfQK9OXt6/pMiNyXMEFKOj309iBFSlV0BXFxNZB/TuLi+kx/jo95MYAVXpFdBVOtcBHeradvrb1vpIw5N+P4kRUBUCihz0+0mMgKr0Cujs0vKJo3U5bw/0NLz+trU+0vCk309iBFSlV0BXTxytArqIKU8iYXz0+0mMgKr0C+jd3clL35SA3nt9MtDV6fW3rfWRhif9fhIjoCr9Arp4CDqZnN3defH7ix9fHqSfBBSnot9PYgRUpWdA57/f3VwNdKB+ElCcin4/iRFQlb4BnX/7q7OLej4z3DeI19+21kcanvT7SYyAqvQO6OD0t631kYYn/X4SI6AqpmLHXw/0qwH7SUBxKvr9JEZAVUzFjr8e6AKfwmOc9PtJjICq9Azo7NL+t5R7aaArKutvW+sjDU/6/SRGQFX6BXTZz50X//Nn//TGoqDDvI6egOJU9PtJjICq9Avo7f1XL81+OeF6oBgh/X4SI6AqvQK6eAB68OrPq7yVEyOk309iBFSlV0AfXth6+ybXA8UY6feTGAFV6RnQrWZyOTuMkX4/iRFQlV4BXV2Rfu3uLpezw/jo95MYAVXpFdBD3wfpxkDvhtffttZHGp70+0mMgKr0C+jDC5MffrPp5zCfwRNQnIp+P4kRUJWOgM4+erN4Y/U60H9+c3cyefEnfAqP0dHvJzECqtIR0MVDzyfxJBLGR7+fxAioCgFFDpUj+X/4DpH2pegIqCP9bWt9pOGpciStjzQ8SftSmIoRUARVOZLWRxqepH0pTMUIKIKqHEnrIw1P0r4UpmJHB/SPn+37nGfhMTqVI2l9pOFJ2peiZ0APvqccTyJhlCpH0vpIw5O0L0W/gN7mWXiMXOVIWh9peJL2pegV0Nmlyc7HX+37eoh+ElCcSuVIWh9peJL2pegV0IcXBrqIMgGFSuVIWh9peJL2pegZ0IHe/05AoVI5ktZHGp6kfSl6BXR2iYBi5CpH0vpIw5O0L0WvgM5v8Ck8Rq5yJK2PNDxJ+1L0C+ih7+lBQDFClSNpfaThSdqXol9A5/cuTM68ucHl7DA+lSNpfaThSdqXomdAP+V1oBi3ypG0PtLwJO1L0S+gN3ghPUauciStjzQ8SftS9ApoeSH9IJ+3E1CIVI6k9ZGGJ2lfil4B9XgOiYDiVCpH0vpIw5O0L0XPgPI6UIxc5UhaH2l4kval6BVQXkiP0ascSesjDU/SvhS9AjrY94InoFCpHEnrIw1P0r4U/QI6u7TzNgHFmFWOpPWRhidpX4peAZ19VL4vPC+kx3hVjqT1kYYnaV+KXgE139yY14FifCpH0vpIw5O0LwUBRQ6VI2l9pOFJ2peiV0Bd6G9b6yMNT5UjaX2k4Unal8JUjIAiqMqRtD7S8CTtS2EqRkARVOVIWh9peJL2pTAVOyKg3361jW8qh/GpHEnrIw1P0r4UvQLq8iSSXusjDU+VI2l9pOFJ2pen4Vl4BFU5ktZHGp6kfSl6BXT2x8/W/v71yc4/fM4L6TE6lSNpfaThSdqXoldAt93dfXaYK4Pqb1vrIw1PlSNpfaThSdqX4sQBHezCIvrb1vpIw1PlSFofaXiS9qU4eUCHegiqv22tjzQ8VY6k9ZGGJ2lfipMHdKirK+tvW+sjDU+VI2l9pOFJ2pfi5AG9u0tAMT6VI2l9pOFJ2pfixAGdXZ3wKTzGp3IkrY80PEn7UvQK6OyjzaVA33xjd8KTSBihypG0PtLwJO1L0Sugh19Iz8uYMEKVI2l9pOFJ2pfixAF95q2BvkG8/ra1PtLwVDmS1kcanqR9KXoF1IX+trU+0vBUOZLWRxqepH0pTMUIKIKqHEnrIw1P0r4UpmIEFEFVjqT1kYYnaV8KUzECiqAqR9L6SMOTtC+FqZgN6NYLmA7wbY0xPpUjaX2k4Unal6IjoOZKoFwPFGNVOZLWRxqepH0pCChyqBxJ6yMNT9K+FB0Btb7cnfBOJIxR5UhaH2l4kvalOFFAZz9f5PPMbwbpJwHFqVSOpPWRhidpX4qTBPQPi4efO0O9EYmA4lQqR9L6SMOTtC9F/4AO+vCTgOKUKkfS+kjDk7QvRe+Aloef/26wfBJQnE7lSFofaXiS9qXoGdB7Az/8JKA4pcqRtD7S8CTtS9EvoIM//CSgOKXKkbQ+0vAk7UvRJ6D3Li2vAjrow08CilOqHEnrIw1P0r4UPQJaHn6+PXA+CShOp3IkrY80PEn7UnQG1OfhJwHFKVWOpPWRhidpX4qugP7e5+EnAcUpVY6k9ZGGJ2lfio6A8l54BFE5ktZHGp6kfSkIKHKoHEnrIw1P0r4UHQHleqAIonIkrY80PEn7UnQE1JH+trU+0vBUOZLWRxqepH0pTMUIKIKqHEnrIw1P0r4UpmIEFEFVjqT1kYYnaV8KUzECiqAqR9L6SMOTtC+FqRgBRVCVI2l9pOFJ2pfCVIyAIqjKkbQ+0vAk7UthKkZAEVTlSFofaXiS9qUwFSOgCKpyJK2PNDxJ+1KYihFQBFU5ktZHGp6kfSlMxQgogqocSesjDU/SvhSmYgQUQVWOpPWRhidpXwpTMQKKoCpH0vpIw5O0L4WpGAFFUJUjaX2k4Unal8JUjIAiqMqRtD7S8CTtS2EqRkARVOVIWh9peJL2pTAVI6AIqnIkrY80PEn7UpiKEVAEVTmS1kcanqR9KUzFCCiCqhxJ6yMNT9K+FKZiBBRBVY6k9ZGGJ2lfClMxAoqgKkfS+kjDk7QvhakYAUVQlSNpfaThSdqXwlSMgCKoypG0PtLwJO1LYSpGQBFU5UhaH2l4kvalMBUjoAiqciStjzQ8SftSmIoRUARVOZLWRxqepH0pTMUIKIKqHEnrIw1P0r4UpmIEFEFVjqT1kYYnaV8KUzECiqAqR9L6SMOTtC+FqRgBRVCVI2l9pOFJ2pfCVIyAIqjKkbQ+0vAk7UthKkZAEVTlSFofaXiS9qUwFSOgCKpyJK2PNDxJ+1KYihFQBFU5ktZHGp6kfSlMxQgogqocSesjDU/SvhSmYgQUQVWOpPWRhidpXwpTMQKKoCpH0vpIw5O0L4WpGAFFUJUjaX2k4Unal8JUjIAiqMqRtD7S8CTtS2EqRkARVOVIWh9peJL2pTAVI6AIqnIkrY80PEn7UpiKEVAEVTmS1kcanqR9KUzFCCiCqhxJ6yMNT9K+FKZiBBRBVY6k9ZGGJ2lfClMxAoqgKkfS+kjDk7QvhakYAUVQlSNpfaThSdqXwlSMgCKoypG0PtLwJO1LYSpGQBFU5UhaH2l4kvalMBUjoAiqciStjzQ8SftSmIrpAvpvP5tOz717vfz80cVp8coXy48eX9mbTte/Q0AhUjmS1kcanqR9KYYK6L+sknnuk+UH9/e2Arqu6SqmBBQilSNpfaThSdqXYqCA3pme+9v5/MHlVSfvTF87+K1r0/PXl79z/hYBhU7lSFofaXiS9qUYJqCPL08/XP64eLT5YWnm+/u/dX9v/Th09eCUgEKjciStjzQ8SftSDBPQRxfXn6GXdD6+vBXLm+tHoze3okpAcWqVI2l9pOFJ2pdimIDuKwF9dPH87z6YTn96ffUr5bHp4U/rCShOq3IkrY80PEn7Ugwb0NUn6pvnkJbp3H80en9v80XQ51e0f/NS6yMNT5UjaX2k4Unal6cRB3T1+fqd6fS9W/O/XFk+J09AMYzKkbQ+0vAk7cvTaAN6Z/Uyps2XPZefz28F1LyQSf/ouvWRhqfKkbQ+0vAk7UsxZEDv7J378HBPz996yiNQAgqBypG0PtLwJO1LMWBAb07NK5WWDzoJKIZROZLWRxqepH0phgvov9h+rprJs/AYROVIWh9peJL2pRgqoI+vTV9df41z86r6VTM3r//kdaCQqhxJ6yMNT9K+FEMF9NrWWzWvrR5srkLKO5EwiMqRtD7S8CTtSzFQQG9uv9X9/t7yZUwPPii/tsjoq7wXHnKVI2l9pOFJ2pdimIBurl+38FrJ6eoCTNeXv/eAqzFhAJUjaX2k4Unal2KYgN6ZHgro/MHy4qDvrR9yPriy+OV3b9l/Rn/bWh9peKocSesjDU/SvhTDBLSG/ra1PtLwVDmS1kcanqR9KUzFCCiCqhxJ6yMNT9K+FKZiBBRBVY6k9ZGGJ2lfClMxAoqgKkfS+kjDk7QvhakYAUVQlSNpfaThSdqXwlSMgCKoypG0PtLwJO1LYSpGQBFU5UhaH2l4kvalMBUjoAiqciStjzQ8SftSmIoRUARVOZLWRxqepH0pTMUIKIKqHEnrIw1P0r4UpmIEFEFVjqT1kYYnaV8KUzECiqAqR9L6SMOTtC+FqRgBRVCVI2l9pOFJ2pfCVIyAIqjKkbQ+0vAk7UthKkZAEVTlSFofaXiS9qUwFSOgCKpyJK2PNDxJ+1KYihFQBFU5ktZHGp6kfSlMxQgogqocSesjDU/SvhSmYgQUQVWOpPWRhidpXwpTMQKKoCpH0vpIw5O0L4WpGAFFUJUjaX2k4Unal8JUjIAiqMqRtD7S8CTtS2EqRkARVOVIWh9peJL2pTAVI6AIqnIkrY80PEn7UpiKEVAEVTmS1kcanqR9KUzFCCiCqhxJ6yMNT9K+FKZiBBRBVY6k9ZGGJ2lfClMxAoqgKkfS+kjDk7QvhakYAUVQlSNpfaThSdqXwlSMgCKoypG0PtLwJO1LYSpGQBFU5UhaH2l4kvalMBUjoAiqciStjzQ8SftSmIoRUARVOZLWRxqepH0pTMUIKIKqHEnrIw1P0r4UpmIEFEFVjqT1kYYnaV8KUzECiqAqR9L6SMOTtC+FqRgBRVCVI2l9pOFJ2pfCVIyAIqjKkbQ+0vAk7UthKkZAEVTlSFofaXiS9qUwFSOgCKpyJK2PNDxJ+1KYihFQBFU5ktZHGp6kfSlMxQgogqocSesjDU/SvhSmYgQUQVWOpPWRhidpXwpTMQKKoCpH0vpIw5O0L4WpGAFFUJUjaX2k4Unal8JUjIAiqMqRtD7S8CTtS2EqRkARVOVIWh9peJL2pTAVI6AIqnIkrY80PEn7UpiKEVAEVTmS1kcanqR9KUzFCCiCqhxJ6yMNT9K+FKZiBBRBVY6k9ZGGJ2lfClMxAoqgKkfS+kjDk7QvhakYAUVQlSNpfaThSdqXwlSMgCKoypG0PtLwJO1LYSpGQBFU5UhaH2l4kvalMBUjoAiqciStjzQ8SftSmIoRUARVOZLWRxqepH0pTMUIKIKqHEnrIw1P0r4UpmIEFEFVjqT1kYYnaV8KUzECiqAqR9L6SMOTtC+FqRgBRVCVI2l9pOFJ2pfCVIyAIqjKkbQ+0vAk7UthKkZAEVTlSFofaXiS9qUwFSOgCKpyJK2PNDxJ+1KYihFQBFU5ktZHGp6kfSlMxQgogqocSesjDU/SvhSmYgQUQVWOpPWRhidpXwpTMQKKoCpH0vpIw5O0L4WpGAFFUJUjaX2k4Unal8JUjIAiqMqRtD7S8CTtS2EqRkARVOVIWh9peJL2pTAVI6AIqnIkrY80PEn7UpiKEVAEVTmS1kcanqR9KUzFCCiCqhxJ6yMNT9K+FKZiBBRBVY6k9ZGGJ2lfClMxAoqgKkfS+kjDk7QvhakYAUVQlSNpfaThSdqXwlSMgCKoypG0PtLwJO1LYSpGQBFU5UhaH2l4kvalMBVrGFC91kcanipH0vpIw5O0L0/DI1AEVTmS1kcanqR9KUzFCCiCqhxJ6yMNT9K+FKZiBBRBVY6k9ZGGJ2lfClMxAoqgKkfS+kjDk7QvhakYAUVQlSNpfaThSdqXwlSMgCKoypG0PtLwJO1LYSpGQBFU5UhaH2l4kvalMBUjoAiqciStjzQ8SftSmIoRUARVOZLWRxqepH0pTMUIKIKqHEnrIw1P0r4UpmIEFEFVjqT1kYYnaV8KUzECiqAqR9L6SMOTtC+FqRgBRVCVI2l9pOFJ2pfCVIyAIqjKkbQ+0vAk7UthKkZAEVTlSFofaXiS9qUwFSOgCKpyJK2PNDxJ+1KYihFQBFU5ktZHGp6kfSlMxQgogqocSesjDU/SvhSmYgQUQVWOpPWRhidpXwpTMQKKoCpH0vpIw5O0L4WpGAFFUJUjaX2k4Unal8JUjIAiqMqRtD7S8CTtS2EqRkARVOVIWh9peJL2pTAVI6AIqnIkrY80PEn7UpiKEVAEVTmS1kcanqR9KUzFCCiCqhxJ6yMNT9K+FKZiBBRBVY6k9ZGGJ2lfClMxAoqgKkfS+kjDk7QvhakYAUVQlSNpfaThSdqXwlSMgCKoypG0PtLwJO1LYSpGQBFU5UhaH2l4kvalMBUjoAiqciStjzQ8SftSmIoRUARVOZLWRxqepH0pTMUIKIKqHEnrIw1P0r4UpmIEFEFVjqT1kYYnaV8KUzECiqAqR9L6SMOTtC+FqRgBRVCVI2l9pOFJ2pfCVIyAIqjKkbQ+0vAk7UthKkZAEVTlSFofaXiS9qUwFSOgCKpyJK2PNDxJ+1KYihFQBFU5ktZHGp6kfSlMxQgogqocSesjDU/SvhSmYgQUQVWOpPWRhidpXwpTMQKKoCpH0vpIw5O0L4WpGAFFUJUjaX2k4Unal8JUjIAiqMqRtD7S8CTtS2EqRkARVOVIWh9peJL2pTAVI6AIqnIkrY80PEn7UpiKEVAEVTmS1kcanqR9KUzFCCiCqhxJ6yMNT9K+FKZiBBRBVY6k9ZGGJ2lfClMxAoqgKkfS+kjDk7QvhakYAUVQlSNpfaThSdqXwlSMgCKoypG0PtLwJO1LYSpGQBFU5UhaH2l4kvalMBUjoAiqciStjzQ8SftSmIoRUARVOZLWRxqepH0pTMUIKIKqHEnrIw1P0r4UpmIEFEFVjqT1kYYnaV8KUzECiqAqR9L6SMOTtC+FqRgBRVCVI2l9pOFJ2pfCVIyAIqjKkbQ+0vAk7UthKkZAEVTlSFofaXiS9qUwFSOgCKpyJK2PNDxJ+1KYihFQBFU5ktZHGp6kfSlMxQgogqocSesjDU/SvhSmYgQUQVWOpPWRhidpXwpTMQKKoCpH0vpIw5O0L4WpGAFFUJUjaX2k4Unal8JUjIAiqMqRtD7S8CTtS2EqRkARVOVIWh9peJL2pTAVI6AIqnIkrY80PEn7UpiKEVAEVTmS1kcanqR9KUzFCCiCqhxJ6yMNT9K+FKZiBBRBVY6k9ZGGJ2lfClMxAoqgKkfS+kjDk7QvhakYAUVQlSNpfaThSdqXwlSMgCKoypG0PtLwJO1LYSpGQBFU5UhaH2l4kvalMBUjoAiqciStjzQ8SftSmIp5BPTxlb3p9N3rBBRKlSNpfaThSdqXwj+gjy5Ol175goBCqHIkrY80PEn7UvgH9Nr0/PX5g8vT87cIKHQqR9L6SMOTtC+Fe0Dv75XHno8unvuEgEKnciStjzQ8SftSuAf05vS19Y/vE1DoVI6k9ZGGJ2lfCveAXpt+WH68sw4pAYVE5UhaH2l4kval8A7o48vrT93v722+CPr8iv7van2k4alyJK2PNDxJ+/I0qQIKAJ48A2peyKR/dP3dxD2JToxEpWFAzeuYWt8TWXBPohMjUSGg2XBPohMjUfEOqOez8N9N3JPoxEhU3AO6ef2nw+tAv5u4J9GJkai4B9TxnUjfTdyT6MRIVNwD+vjy9FWn98J/N3FPohMjUXEP6PyB29WYvpu4J9GJkaj4B3T+4Mqin+/esr/c+p7IgnsSnRiJSoOAHqH1PZEF9yQ6MRIVUzECGh73JDoxEhVTMQIaHvckOjESFVMxAhoe9yQ6MRIVUzECGh73JDoxEhVTMQIaHvckOjESFVMxAhoe9yQ6MRIVUzECGh73JDoxEhVTMQIaHvckOjESFVMxAhoe9yQ6MRIVUzECGh73JDoxEhVTMQIaHvckOjESFVMxAhoe9yQ6MRIVUzECGh73JDoxEhVTMQIaHvckOjESFVMxAhoe9yQ6MRIVUzECGh73JDoxEhVTMQIaHvckOjESFVMxAhoe9yQ6MRIVUzECGh73JDoxEhVTMQIaHvckOjESFVMxAhoe9yQ6MRIVUzECGh73JDoxEhVTMQIaHvckOjESFVMxAhoe9yQ6MRIVUzECGh73JDoxEhVTMQIaHvckOjESFVOxhgGFxvPPt/43wOgxkoEQ0PA4G+jESAZCQMPjbKATIxkIAQ2Ps4FOjGQgBDQ8zgY6MZKBENDwOBvoxEgGQkDD42ygEyMZCAEFgEoEFAAqEVAAqERAAaASAQWASgQUACoRUACoREABoBIBDeHRxen7+z995Yum/y4Yk8eXp+dv7f/0w7b/Mt9BBDSERUDPfbL5KQHFgft7m/+23tlPKdwQ0BAWAZ2+tvkpAcWWm9PVIB5d3Pw3Fn4IaAiLw/E368/PCCgO2Xx55+bmP7FwREBDWFTzf+xtHmisfnxwZTqdvnu96b8WxuBO+fLO/fU+FsPYm05/en31858tRvLv/7bhv1x2BDSEZTXXjzDWAb2zOCUL53ja4Dvv8eXlMq6tP0O5vzWM9c95aDocAhrCsprrJ1lXAV0cjXf/9/zxv0z5uhfu75375P7e6hmkxSf0792aP/7X5RdGF4v5D4tf/Lc9RjIYAhpCqebqk7RVQDdf8LrGowssVnD+v6wjuRnGzen7PK3kgICGsKpmqWX56f5L/njpCrZfpPH48rqZy0eki5W8+j9b/nt9BxDQEFYBLY8oyk/3H1vwnDzmy/+OrmewaObG4lduLn989b/yn9jhENAQNs8cLR5vrgO6PjAEFPPV483yk+Vj0YOAzv/8N+Wn75HQoRDQEDadvDZ9n0egeMJWQM2XPR//9+Urmd5/2j8EAQIawqaTi/Px3/gaKKz9gD7t/fCP/5WRDIaAhrD/QPPO9K/2eBYexn5AF8NY/Wz5X9bNa+sPfhdqBDSEg8/Ur62+uLV6HehfrvA6UMy3E/no4vT89fn8z3uLR6LLKzUtfv7gMv+VHQwBDeEgoIty8k4kGFuPMdfDmL43P3gn0qt8nXwoBDSEreeKNhff4b3w2Lf9SfrqvfD/ePDzv/qPfAI/GAIKAJUIKABUIqAAUImAAkAlAgoAlQgoAFQioABQiYACQCUCCgCVCCgAVCKgAFCJgAJAJQIKAJUIKABUIqAAUImAAkAlAgoAlQgoAFQioABQiYACQCUCCgCVCCgAVCKgAFCJgAJAJQIKAJUIKABUIqAAUImAAkAlAgoAlQgoAFQioABQiYACQCUCCgCVCCgAVCKgAFCJgAJAJQIKAJUIKABUIqAAUImAAkAlAgoAlQgoAFQioABQiYACQCUCCgCVCCgAVCKgAFCJgAJAJQIKAJUIKABUIqAAUOn/A71FEGOQyBlxAAAAAElFTkSuQmCC">
+            <a:extLst>
+              <a:ext uri="{FF2B5EF4-FFF2-40B4-BE49-F238E27FC236}">
+                <a16:creationId xmlns:a16="http://schemas.microsoft.com/office/drawing/2014/main" id="{303DEEFB-7094-4F9F-A65F-D2AFDD19F5FE}"/>
+              </a:ext>
+            </a:extLst>
+          </p:cNvPr>
+          <p:cNvSpPr>
+            <a:spLocks noChangeAspect="1" noChangeArrowheads="1"/>
+          </p:cNvSpPr>
+          <p:nvPr/>
+        </p:nvSpPr>
+        <p:spPr bwMode="auto">
+          <a:xfrm>
+            <a:off x="5943600" y="3276600"/>
+            <a:ext cx="304800" cy="304800"/>
+          </a:xfrm>
+          <a:prstGeom prst="rect">
+            <a:avLst/>
+          </a:prstGeom>
+          <a:noFill/>
+          <a:extLst>
+            <a:ext uri="{909E8E84-426E-40DD-AFC4-6F175D3DCCD1}">
+              <a14:hiddenFill xmlns:a14="http://schemas.microsoft.com/office/drawing/2010/main">
+                <a:solidFill>
+                  <a:srgbClr val="FFFFFF"/>
+                </a:solidFill>
+              </a14:hiddenFill>
+            </a:ext>
+          </a:extLst>
+        </p:spPr>
+        <p:txBody>
+          <a:bodyPr vert="horz" wrap="square" lIns="91440" tIns="45720" rIns="91440" bIns="45720" numCol="1" anchor="t" anchorCtr="0" compatLnSpc="1">
+            <a:prstTxWarp prst="textNoShape">
+              <a:avLst/>
+            </a:prstTxWarp>
+          </a:bodyPr>
+          <a:lstStyle/>
+          <a:p>
+            <a:endParaRPr lang="en-US"/>
+          </a:p>
+        </p:txBody>
+      </p:sp>
     </p:spTree>
     <p:extLst>
       <p:ext uri="{BB962C8B-B14F-4D97-AF65-F5344CB8AC3E}">
-        <p14:creationId xmlns:p14="http://schemas.microsoft.com/office/powerpoint/2010/main" val="288936918"/>
+        <p14:creationId xmlns:p14="http://schemas.microsoft.com/office/powerpoint/2010/main" val="2186280307"/>
       </p:ext>
     </p:extLst>
   </p:cSld>
@@ -5977,6 +6120,193 @@
 </file>
 
 <file path=ppt/slides/slide12.xml><?xml version="1.0" encoding="utf-8"?>
+<p:sld xmlns:a="http://schemas.openxmlformats.org/drawingml/2006/main" xmlns:r="http://schemas.openxmlformats.org/officeDocument/2006/relationships" xmlns:p="http://schemas.openxmlformats.org/presentationml/2006/main">
+  <p:cSld>
+    <p:spTree>
+      <p:nvGrpSpPr>
+        <p:cNvPr id="1" name=""/>
+        <p:cNvGrpSpPr/>
+        <p:nvPr/>
+      </p:nvGrpSpPr>
+      <p:grpSpPr>
+        <a:xfrm>
+          <a:off x="0" y="0"/>
+          <a:ext cx="0" cy="0"/>
+          <a:chOff x="0" y="0"/>
+          <a:chExt cx="0" cy="0"/>
+        </a:xfrm>
+      </p:grpSpPr>
+      <p:sp>
+        <p:nvSpPr>
+          <p:cNvPr id="2" name="Title 1"/>
+          <p:cNvSpPr>
+            <a:spLocks noGrp="1"/>
+          </p:cNvSpPr>
+          <p:nvPr>
+            <p:ph type="title"/>
+          </p:nvPr>
+        </p:nvSpPr>
+        <p:spPr>
+          <a:xfrm>
+            <a:off x="557211" y="342900"/>
+            <a:ext cx="8534401" cy="685800"/>
+          </a:xfrm>
+        </p:spPr>
+        <p:txBody>
+          <a:bodyPr/>
+          <a:lstStyle/>
+          <a:p>
+            <a:r>
+              <a:rPr lang="en-US"/>
+              <a:t>How to mitigate attrition</a:t>
+            </a:r>
+            <a:endParaRPr lang="en-US" dirty="0"/>
+          </a:p>
+        </p:txBody>
+      </p:sp>
+      <p:sp>
+        <p:nvSpPr>
+          <p:cNvPr id="3" name="Text Placeholder 2"/>
+          <p:cNvSpPr>
+            <a:spLocks noGrp="1"/>
+          </p:cNvSpPr>
+          <p:nvPr>
+            <p:ph type="body" idx="1"/>
+          </p:nvPr>
+        </p:nvSpPr>
+        <p:spPr>
+          <a:xfrm>
+            <a:off x="684213" y="1193800"/>
+            <a:ext cx="8534400" cy="4800600"/>
+          </a:xfrm>
+        </p:spPr>
+        <p:txBody>
+          <a:bodyPr/>
+          <a:lstStyle/>
+          <a:p>
+            <a:r>
+              <a:rPr lang="en-US" b="1" dirty="0">
+                <a:solidFill>
+                  <a:srgbClr val="FF0000"/>
+                </a:solidFill>
+              </a:rPr>
+              <a:t>**Content in Progress (by Jodi) – feel free to add.  I will finalize Monday morning!</a:t>
+            </a:r>
+          </a:p>
+          <a:p>
+            <a:endParaRPr lang="en-US" dirty="0"/>
+          </a:p>
+          <a:p>
+            <a:pPr marL="285750" indent="-285750">
+              <a:buFont typeface="Arial" panose="020B0604020202020204" pitchFamily="34" charset="0"/>
+              <a:buChar char="•"/>
+            </a:pPr>
+            <a:r>
+              <a:rPr lang="en-US" dirty="0">
+                <a:solidFill>
+                  <a:schemeClr val="tx1"/>
+                </a:solidFill>
+              </a:rPr>
+              <a:t>We recommend that the HR team further review…….</a:t>
+            </a:r>
+          </a:p>
+          <a:p>
+            <a:pPr marL="742950" lvl="1" indent="-285750">
+              <a:buFont typeface="Arial" panose="020B0604020202020204" pitchFamily="34" charset="0"/>
+              <a:buChar char="•"/>
+            </a:pPr>
+            <a:r>
+              <a:rPr lang="en-US" dirty="0"/>
+              <a:t>Stock Options…</a:t>
+            </a:r>
+          </a:p>
+          <a:p>
+            <a:pPr marL="742950" lvl="1" indent="-285750">
+              <a:buFont typeface="Arial" panose="020B0604020202020204" pitchFamily="34" charset="0"/>
+              <a:buChar char="•"/>
+            </a:pPr>
+            <a:r>
+              <a:rPr lang="en-US" dirty="0"/>
+              <a:t>Job Role…</a:t>
+            </a:r>
+          </a:p>
+          <a:p>
+            <a:pPr marL="742950" lvl="1" indent="-285750">
+              <a:buFont typeface="Arial" panose="020B0604020202020204" pitchFamily="34" charset="0"/>
+              <a:buChar char="•"/>
+            </a:pPr>
+            <a:r>
+              <a:rPr lang="en-US" dirty="0"/>
+              <a:t>Overtime…</a:t>
+            </a:r>
+          </a:p>
+          <a:p>
+            <a:endParaRPr lang="en-US" dirty="0"/>
+          </a:p>
+          <a:p>
+            <a:endParaRPr lang="en-US" dirty="0"/>
+          </a:p>
+        </p:txBody>
+      </p:sp>
+      <p:sp>
+        <p:nvSpPr>
+          <p:cNvPr id="4" name="AutoShape 2" descr="data:image/png;base64,iVBORw0KGgoAAAANSUhEUgAABUAAAAPACAMAAADDuCPrAAABYlBMVEUAAAAAADoAAGYAOjoAOmYAOpAAZrYzMzM6AAA6OgA6Ojo6OmY6ZmY6ZpA6ZrY6kLY6kNtNTU1NTW5NTY5Nbm5Nbo5NbqtNjshmAABmADpmOgBmOjpmZjpmZmZmZpBmkGZmkLZmkNtmtttmtv9uTU1ubk1ubm5ubo5ujqtujshuq8huq+SOTU2Obk2Obm6Oq8iOyOSOyP+QOgCQOjqQZjqQZmaQZpCQkGaQkLaQtraQttuQ2/+rbk2rjk2rjm6rq8iryOSr5Mir5P+2ZgC2Zjq2kDq2kGa2kJC2tpC2tra2ttu229u22/+2///Ijk3Ijm7Iq27Iq6vIyKvI5KvI5OTI5P/I///bkDrbkGbbtmbbtpDbtrbb27bb29vb2//b/7bb///kq27kyI7kyKvk5P/k///r6+v8jVn/tmb/yI7/25D/27b/29v/5Kv/5Mj/5OT//7b//7///8j//9v//+T///+zjZs9AAAACXBIWXMAAB2HAAAdhwGP5fFlAAAgAElEQVR4nO3d/59b5ZnecU0wMDGEILMYh0CWwmwDxaSLN3S7xHW3mGQXkni3aY0TEijO1q2/YMe1rP+/0iNpRnPbM+fMM9e5n3PffN4/xB472Eiv6/mgGUlnJnMAQJVJ638BAIiKgAJAJQIKAJUIKABUIqAAUImAAkAlAgoAlQgoAFQioABQiYACQCUCCgCVCCgAVCKgAFCJgAJAJQIKAJVGENDZl298fzKZ7Lzw8Ten/rNuT570zvzhhcnOLwT/pgCwrXlAZ7/aPWjdS6dNKAEF4Kd1QO+9fih2p+0cAQXgp3FA7y4ffu689dXip9/+6vuCgh78ud/7reRPAoCjtA3o4qHh1ufts1/KCkpAAQyvbUCvLor59tbHy8/An1P8wQQUwPCaBnT5CfzLh37lRvmapeRPJqAABtY0oItcmswtP6d/rvzGwQPRq5vK3vv5Irg7P/jNwT/9zuzT3cnOC09+1n84oJsnka4ufyh/ygsfL3/9yx8vev3Cr/f/f+YvAIBjtQzo7NKTn7Cvmroo3n7/NvWbfWpe7LQM6NUjnro/OqA31n/Iywd/4PpB8BN/AQAcq2VAlw837efrt1c9vHrwO4tfefabVW03VtVdpPBs+fDZJ3t3ZED/fv8Pefvq4ddOPfkXAMCxWgZ0UbknHjyuo3r7IGLrli4fOb709Xz+7aebx4zlseQPv5l/+/VT/+inBnRh+Rn6l4tP1Z+Z7Lz9zeqZ/+fmT/0LAOBYLQN6+ymffS8D+vJ866Xv68/mtx6t3l5/5fTGMaE7OqAvb/6MzV9wdfUQ9il/AQAca6QBXdZxlbr180nbTysdPCY98kWjRwZ0/aubv2a+/yWCp/wFAHCssQZ0UcDypc3lVyaXMdtu2u39xj7lq58rRwb0uYO/5p1D/9en/AUAcKyRfg10Gc7ye+uQbj/Ds3mW58YxT/YcGdCXD//K/v/1aX8BABxrbM/C70f19qFP5W3f7Cfd1qkDeuRjWwDYGOfrQOclcYuIbR6IElAA4zPOdyItlbcNbV7OtPlSqPmntQHliSMAJ9I0oFu5XNt6L3z5HH7/qZ2rTz6vIw3o0/4CADhW26sx2Zdy3t765HnxmPDZ/7X/ls7tp9xv7H95VBjQp/wFAHCstgEtX3k8eOf5jcn2C5tulDderku2deGmzfNM2oA+5S8AgGM1viL9veUVlQ9dkf7gC5Grq9VvSrZ8F9GZX6+/h9LmvZfCgD7lLwCAY435eyJd3X42fPtp8lUbxQF98i8AgGO1Duih78q5c/g6crcn28+Mz36++b+dWV2wUxzQJ/8CADhW84AufPnz5Sfvz7xovy/89lVBl/60vN7x+lrIc31An/gLAOBYYwgoAIREQAGgEgEFgEoEFAAqEVAAqERAAaASAQWASgQUACoRUACoREABoBIBBYBKBBQAKhFQAKhEQAGgEgEFgEoEFAAqEVAAqNQwoP8HEtyT6MRIVEzFCGh43JPoxEhUTMUIaHjck+jESFRMxQhoeNyT6MRIVEzFCGh43JPoxEhUTMUIaHjck+jESFRMxQhoeNyT6MRIVEzFCGh43JPoxEhUTMUIaHjck+jESFRMxQhoeNyT6MRIVEzFCGh43JPoxEhUTMUIaHjck+jESFRMxQhoeNyT6MRIVEzFCGh43JPoxEhUTMUIaHjck+jESFRMxQhoeNyT6MRIVEzFCGh43JPoxEhUTMUIaHjck+jESFRMxQhoeNyT6MRIVEzFCGh43JPoxEhUTMUIaHjck+jESFRMxQhoeNyT6MRIVEzFCGh43JPoxEhUTMUIaHjck+jESFRMxQhoeNyT6MRIVEzFCGh43JPoxEhUTMUIaHjck+jESFRMxQhoeNyT6MRIVEzFCGh43JPoxEhUTMUIaHjck+jESFRMxQhoeNyT6MRIVEzFCGh43JPoxEhUTMUIaHjck+jESFRMxQhoeNyT6MRIVEzFCGh43JPoxEhUTMUIaHjck+jESFRMxQhoeNyT6MRIVEzFUgX0/+I7RL+fxAioiqkYAUVQ+v0kRkBVTMUIKILS7ycxAqpiKkZAEZR+P4kRUBVTMQKKoPT7SYyAqpiKEVAEpd9PYgRUxVSMgCIo/X4SI6AqpmIEFEHp95MYAVUxFSOgCEq/n8QIqIqpGAFFUPr9JEZAVUzFCCiC0u8nMQKqYipGQBGUfj+JEVAVUzECiqD0+0mMgKqYihFQBKXfT2IEVMVUjIAiKP1+EiOgKqZiBBRB6feTGAFVMRUjoAhKv5/ECKiKqRgBRVD6/SRGQFVMxQgogtLvJzECqmIqRkARlH4/iRFQFVMxAoqg9PtJjICqmIoRUASl309iBFTFVIyAIij9fhIjoCqmYgQUQen3kxgBVTEVI6AISr+fxAioiqkYAUVQ+v0kRkBVTMUIKILS7ycxAqpiKkZAEZR+P4kRUBVTMQKKoPT7SYyAqpiKEVAEpd9PYgRUxVSMgCIo/X4SI6AqpmKnDeiji6+tf/b4yt50+u71rg8IKDT0+0mMgKqIA3pt+tqmpNOlV744/gMCChH9fhIjoCrSgD6+Nt0E9Nr0/PX5g8vT87eO/YCAQkS/n8QIqIoyoP/2wXQT0Pt75RHmo4vnPjnuAwIKFf1+EiOgKsKA3pxO3/vzOqA39398/7gPCChU9PtJjICqKAP66j/O76zzeG36YfmxfHz0BwQUKvr9JEZAVYQB3cri48vrT9Dv752/dfQHq3/m+ZVT/s1P0fpIw5N+P8BJEVAEpd8PcFL6gL7yxdEfHPpH9Y+uWx9peNLvJzE+hVcZPKDdj0AJKAT0+0mMgKoQUOSg309iBFRlmIDyLDy86feTGAFVGSigm1d5rl/6edQHBBQq+v0kRkBVBgoo70SCM/1+EiOgKgMF9PHl6av773g/+gMCChX9fhIjoCoDBXT+YPuaS0d/QEAhot9PYgRUZaiAzh9cWVTy3VtdHxBQaOj3kxgBVREH9BT0t631kYYn/X4SI6AqpmIEFEHp95MYAVUxFSOgCEq/n8QIqIqpGAFFUPr9JEZAVUzFCCiC0u8nMQKqYipGQBGUfj+JEVAVUzECiqD0+0mMgKqYihFQBKXfT2IEVMVUjIAiKP1+EiOgKqZiBBRB6feTGAFVMRUjoAhKv5/ECKiKqRgBRVD6/SRGQFVMxQgogtLvJzECqmIqRkARlH4/iRFQFVMxAoqg9PtJjICqmIoRUASl309iBFTFVIyAIij9fhIjoCqmYgQUQen3kxgBVTEVI6AISr+fxAioiqkYAUVQ+v0kRkBVTMUIKILS7ycxAqpiKkZAEZR+P4kRUBVTMQKKoPT7SYyAqpiKEVAEpd9PYgRUxVSMgCIo/X4SI6AqpmIEFEHp95MYAVUxFSOgCEq/n8QIqIqpGAFFUPr9JEZAVUzFCCiC0u8nMQKqYipGQBGUfj+JEVAVUzECiqD0+0mMgKqYihFQBKXfT2IEVMVUjIAiKP1+EiOgKqZiBBRB6feTGAFVMRUjoAhKv5/ECKiKqRgBRVD6/SRGQFVMxQgogtLvJzECqmIqRkARlH4/iRFQFVMxAoqg9PtJjICqmIoRUASl309iBFTFVIyAIij9fhIjoCqmYgQUQen3kxgBVTEVI6AISr+fxAioiqkYAUVQ+v0kRkBVTMUIKILS7ycxAqpiKkZAEZR+P4kRUBVTMQKKoPT7SYyAqpiKEVAEpd9PYgRUxVSMgCIo/X4SI6AqpmIEFEHp95MYAVUxFSOgCEq/n8QIqIqpGAFFUPr9JEZAVUzFCCiC0u8nMQKqYipGQBGUfj+JEVAVUzECiqD0+0mMgKqYihFQBKXfT2IEVMVUjIAiKP1+EiOgKqZiBBRB6feTGAFVMRUjoAhKv5/ECKiKqRgBRVD6/SRGQFVMxQgogtLvJzECqmIqRkARlH4/iRFQFVMxAoqg9PtJjICqmIoRUASl309iBFTFVIyAIij9fhIjoCqmYgQUQen3kxgBVTEVI6AISr+fxAioiqkYAUVQ+v0kRkBVTMUIKILS7ycxAqpiKkZAEZR+P4kRUBVTMQKKoPT7SYyAqpiKEVAEpd9PYgRUxVSMgCIo/X4SI6AqpmIEFEHp95MYAVUxFSOgCEq/n8QIqIqpGAFFUPr9JEZAVUzFCCiC0u8nMQKqYipGQBGUfj+JEVAVU7GGAdVrfaThqfXaAB6BIiz9fhLjEaiKqRgBRVD6/SRGQFVMxQgogtLvJzECqmIqRkARlH4/iRFQFVMxAoqg9PtJjICqmIoRUASl309iBFTFVIyAIij9fhIjoCqmYgQUQen3kxgBVTEVI6AISr+fxAioiqkYAUVQ+v0kRkBVTMUIKILS7ycxAqpiKkZAEZR+P4kRUBVTMQKKoPT7SYyAqpiKEVAEpd9PYgRUxVSMgCIo/X4SI6AqpmIEFEHp95MYAVUxFSOgCEq/n8QIqIqpGAFFUPr9JEZAVUzFCCiC0u8nMQKqYipGQBGUfj+JEVAVUzECiqD0+0mMgKqYihFQBKXfT2IEVMVUjIAiKP1+EiOgKqZiBBRB6feTGAFVMRUjoAhKv5/ECKiKqRgBRVD6/SRGQFVMxQgogtLvJzECqmIqRkARlH4/iRFQFVMxAoqg9PtJjICqmIoRUASl309iBFTFVIyAIij9fhIjoCqmYgQUQen3kxgBVTEVI6AISr+fxAioiqkYAUVQ+v0kRkBVTMUIKILS7ycxAqpiKkZAEZR+P4kRUBVTMQKKoPT7SYyAqpiKEVAEpd9PYgRUxVSMgCIo/X4SI6AqpmIEFEHp95MYAVUxFSOgCEq/n8QIqIqpGAFFUPr9JEZAVUzFCCiC0u8nMQKqYipGQBGUfj+JEVAVUzECiqD0+0mMgKqYihFQBKXfT2IEVMVUjIAiKP1+EiOgKqZiBBRB6feTGAFVMRUjoAhKv5/ECKiKqRgBRVD6/SRGQFVMxQgogtLvJzECqmIqRkARlH4/iRFQFVMxAoqg9PtJjICqmIoRUASl309iBFTFVIyAIij9fhIjoCqmYgQUQen3kxgBVTEVI6AISr+fxAioiqkYAUVQ+v0kRkBVTMUIKILS7ycxAqpiKkZAEZR+P4kRUBVTMQKKoPT7SYyAqpiKEVAEpd9PYgRUxVSMgCIo/X4SI6AqpmIEFEHp95MYAVUxFSOgCEq/n8QIqIqpGAFFUPr9JEZAVUzFCCiC0u8nMQKqYipGQBGUfj+JEVAVUzECiqD0+0mMgKqYihFQBKXfT2IEVMVUjIAiKP1+EiOgKqZiBBRB6feTGAFVMRUjoAhKv5/ECKiKqRgBRVD6/SRGQFVMxQgogtLvJzECqmIqRkARlH4/iRFQFVMxAoqg9PtJjICqmIoRUASl309iBFTFVIyAIij9fhIjoCqmYgQUQen3kxgBVTEVI6AISr+fxAioiqmYKKCPL083XvliPn908eDni9+8sjedvnudgEJJv5/ECKiKS0Dv720FdF3TVUwJKET0+0mMgKoME9CN+3vnPln8cGf62sGvXZuevz5/cHl6/hYBhY5+P4kRUJVBA7p4IPr+qpnvbzV1/Ti0pJWAQkS/n8QIqMqgAb25epj5+PJWLG+uH43e3IoqAcWp6feTGAFVGTKgjy5OP1z9eP53H0ynP72+/ODa6tcOf1pPQHFa+v0kRkBVhgzo5sHm5jmkZTr3H43e39t8EfT5FeXfvNL6SMOTfj/ASSkDuv9lzjvT6Xu35n+5Ml18TEAxDP1+gJNSBvTO5on2zSPR5XNJWwE1L2TSP7pufaThSb+fxPgUXmW4gD6+vP5q56GiPuURKAGFgH4/iRFQleEC+sRDzPIrBBTD0O8nMQKqMlxAn3iafdVMnoXHIPT7SYyAqgwX0P1Xz+9/Ll+auXn9J68DhZR+P4kRUJXBArr16vlrqwebq5DyTiQMQr+fxAioymABfXRx/0ug9/eWL2N68EF5Vn6R0Vd5Lzzk9PtJjICqDBbQ7SeJbq4vxnR9+cEDrsaEAej3kxgBVRksoHe2H2I++Nl0eu699ccPriz6+e4t+w/ob1vrIw1P+v0kRkBVBgvoielvW+sjDU/6/SRGQFVMxQgogtLvJzECqmIqRkARlH4/iRFQFVMxAoqg9PtJjICqmIoRUASl309iBFTFVKwjoLM/fvY5AcUY6feTGAFV6RvQe//pm/n84euTyeTMLwgoxke/n8QIqErPgN6YfO+38/nVydLyZwQUI6PfT2IEVKVfQG+XbN7dnTz7zb0Lk5cJKEZHv5/ECKhKv4BeXZRzmdGdXyz/d/lzAopx0e8nMQKq0iugs0vLcq4z+vDCMJ/D629b6yMNT/r9JEZAVXoFdNXMhxcmz80JKMZJv5/ECKjKCQJ6d3fyDgHFSOn3kxgBVekV0NWn8DfKl0D5GihGSb+fxAioSq+Azq9Onls+/b4sJ8/CY5T0+0mMgKr0C+jt8gLQxWfws59PVo9DCSjGRb+fxAioSr+ALj59X3iuPJG0884g/SSgOBX9fhIjoCo9Azq/99FPPl788PBHP/jNMP0koDgV/X4SI6AqfQM6PP1ta32k4Um/n8QIqIqp2LEBnX09YD8JKE5Fv5/ECKiKqdjRAf3yx8v3wz/80VuDvIaJgOKU9PtJjICq9Azo7NPVdZgeXpicGeZiTAQUp6LfT2IEVKVnQK9OJmf+evd7v5393WSg19ETUJyKfj+JEVCVfgG9PZm8vX4P5x9Wb+gkoBgX/X4SI6Aq/QJ6dfnuo/Wb4G+US4oQUIyLfj+JEVCVXgFdvRd+HdC7u1xMBOOj309iBFSlV0A3l7Mr5eRqTBgj/X4SI6AqBBQ56PeTGAFV6RXQ2aXlE0frcnI5O4yRfj+JEVCVXgFdPXG0CugipjyJhPHR7ycxAqrSL6B3dycvfVMCeu91LmeHMdLvJzECqtIvoOVydmd3d178/uLHYa6nTEBxKvr9JEZAVXoGdP773cnaQP0koDgV/X4SI6AqfQM6//ZXZxf1fGawy4ESUJyKfj+JEVCV3gEdnP62tT7S8KTfT2IEVMVUjOuBIij9fhIjoCqmYlwPFEHp95MYAVXpGVCuB4qR0+8nMQKq0jOgXA8UI6ffT2IEVKVfQLkeKMZOv5/ECKhKv4ByPVCMnX4/iRFQlV4B5XqgGD39fhIjoCq9Asrl7DB6+v0kRkBVCChy0O8nMQKq0iugXA8Uo6ffT2IEVKVXQLkeKEZPv5/ECKhKv4ByPVCMnX4/iRFQlX4B5XqgGDv9fhIjoCo9A8r1QDFy+v0kRkBV+gaU64Fi3PT7SYyAqvQO6OD0t631kYYn/X4SI6AqpmIEFEHp95MYAVUxFTvihfQ/emnQaykTUJyafj+JEVCVfgG9MJk8M9iVlAkoBPT7SYyAqvQK6OpyypMzHw/ZUP1ta32k4Um/n8QIqEqvgC786celoS98TEAxSvr9JEZAVfoGdL76rkgLQ72QSX/bWh9peNLvJzECqnKCgC4+lf/y9WVCd94a4ikl/W1rfaThSb+fxAioyokCuvDtz8tbkl7QPwzV37bWRxqe9PtJjICqnCigs199f/OGzslLBBRjot9PYgRUpX9AN/VcPhf/7af698Trb1vrIw1P+v0kRkBVegZ0/dXPg1eD6i+rrL9trY80POn3kxgBVekV0NmliX3ySP+NPfS3rfWRhif9fhIjoCq9Arp8J9LO4ZcvPbzAI1CMiX4/iRFQlZ4B/cGvzS/NPle/lEl/21ofaXjS7ycxAqrSK6Au9Let9ZGGJ/1+EiOgKqZiBBRB6feTGAFVMRXruCL9ztlB3oREQHFq+v0kRkBV+gb0xv4r6PmeSBgj/X4SI6AqPQO67OczL775Bt+VEyOl309iBFSlX0Dv7k6eXb2K6d4lvi88xki/n8QIqEq/gF49eN/R7NLkOQKK0dHvJzECqtIroLNLW4867+6qX0JPQHF6+v0kRkBVegX00Ps29W/iJKA4Pf1+EiOgKgQUOej3kxgBVekV0NmlyTv7H+ivw0RAcXr6/SRGQFV6BZQnkTB6+v0kRkBV+gX07u7kzOpyIn96nZcxYYz0+0mMgKr0C+jqjUhnz54d8q1Icq2PNDy1XhtwzFs5/7C7fifnztsD/dX6/zi0PtLwpN9PYjwCVekb0PnsyzcWj0Bf/HiQJ5AIKE5Lv5/ECKhK74AOTn/bWh9peNLvJzECqmIqRkARlH4/iRFQFVMxG9DZR28+6Se8DhSjo99PYgRUpSOgy28n9wTeiYTx0e8nMQKqQkCRg34/iRFQlY6AOtLfttZHGp70+0mMgKqYihFQBKXfT2IEVMVU7PiAfjVcPgkoTke/n8QIqIqp2NEB/fLH5X1IP/gNAcUY6feTGAFV6RnQ2aX9p5BeGui9SPrb1vpIw5N+P4kRUJV+AV32c+fFf/jsn97YnQx0NTsCilPR7ycxAqrSL6A3JpMfrh54zn452bq4MgHFWOj3kxgBVekV0MUD0INr2F3lgsoYIf1+EiOgKr0C+vDCoe/KyQvpMT76/SRGQFV6BpRvKoeR0+8nMQKq0iugfF94jJ5+P4kRUJVeAZ3f2Pq65w2+BooR0u8nMQKq0i+gs0v7L/+8MdC1RAgoTkW/n8QIqEqvgM4+Wr7+88W3Pvvn5Y8vDHNVUP1ta32k4Um/n8QIqEqvgLpc1E5/21ofaXjS7ycxAqpCQJGDfj+JEVCVXgF1ob9trY80POn3kxgBVTEVI6AISr+fxAioiqkYAUVQ+v0kRkBVTMWODugfP9v3OS+kx+jo95MYAVXpGdDf7/JN5TBq+v0kRkBV+gX0Nt+VEyOn309iBFSlV0BnlyY7H3+17+sh+klAcSr6/SRGQFV6BfThhYEuokxAoaLfT2IEVKVnQAd6/zsBhYp+P4kRUJVeAZ1dIqAYOf1+EiOgKr0COr/Bp/AYOf1+EiOgKv0Ceuh7ehBQjJB+P4kRUJV+AZ3fuzA58+aG+kJ2BBSnp99PYgRUpWdAP+V1oBg3/X4SI6Aq/QJ6gxfSY+T0+0mMgKr0Cmh5If0gn7cTUIjo95MYAVXpFVCP55AIKE5Fv5/ECKhKz4DyOlCMnH4/iRFQlV4B5YX0GD39fhIjoCq9Ajq/MXmZgGLU9PtJjICq9Avo7NLO2wQUY6bfT2IEVKVXQGcfvTGZ7LzIC+kxXvr9JEZAVXoF1HxbY14HivHR7ycxAqpCQJGDfj+JEVCVXgF1ob9trY80POn3kxgBVTEVI6AISr+fxAioiqkYAUVQ+v0kRkBVTMVsQGd/tN8F/uGPz77A10AxOvr9JEZAVToC+vDC6imj2UebFy9tfoWAYlT0+0mMgKr0DOhBNgkoRkm/n8QIqAoBRQ76/SRGQFUIKHLQ7ycxAqpCQJGDfj+JEVAVAooc9PtJjICqEFDkoN9PYgRUhYAiB/1+EiOgKgQUOej3kxgBVSGgyEG/n8QIqAoBRQ76/SRGQFUIKHLQ7ycxAqrSHdAnEVCMj34/iRFQFQKKHPT7SYyAqnQEdPbRm0/im8phfPT7SYyAqnQE1JH+trU+0vCk309iBFTFVIyAIij9fhIjoCqmYgQUQen3kxgBVTEVI6AISr+fxAioiqkYAUVQ+v0kRkBVTMUIKILS7ycxAqpiKkZAEZR+P4kRUBVTMQKKoPT7SYyAqpiKEVAEpd9PYgRUxVTsiXciXdr5xeKHb78moBg3/X4SI6AqHQF9eGH5xvfV/xJQjJh+P4kRUJXOgC4fgRJQjJ5+P4kRUJWOgM4uTZ79/Ks/Xfjer786MMzn8/rb1vpIw5N+P4kRUJWOgM5vcDk7hKDfT2IEVKUroLNP6wL66OK0eOWL5UePr+xNp+9eX/3WoQ8IKDT0+0mMgKp0BXSR0K8+++fdnX/47MDnPa4Hen9vK6Drmq5ieugDAgoR/X4SI6Aq3QGdVz2JdGf62sEH16bnr88fXJ6ev2U/IKAQ0e8nMQKq0iugs49OfBH6a9P3939+f2/9OPTcJ+YDAgoV/X4SI6AqvQJ6co8vb/Xx5vrR6M1lVA99QEChot9PYgRUpXdAv/3V2clk5+xb/V7D9Oji+d99MJ3+9Pryg2vTD8svlk/rD31AQKGi309iBFSlb0APXs70cp+Abp5DWtZy/9Ho/b3ztw59sPr/Pr/S5489mdZHGp70+wFO6qiALvv5zItvvvH9ngW9M52+d2v+lyvTRS4JKBzo9wOc1BEBvbs7efY35Wf3Lk3K5UU6bL7SuXwuaauZr3xx6IND/4j+0XXrIw1P+v0kxqfwKv0CenXy7OZp+NmlyXPdAd24MzUPOp/yCJSAQkC/n8QIqEqvgK4vardyd/fZ/q9pMg86CSiGot9PYgRUpVdAD72Q/kSvqi+Z5Fl4DE+/n8QIqMowAX18eTuTm5d8rl8HuvUBAYWKfj+JEVCVXgGdXZq8s//B7UmPT+GvrR5frkLKO5EwPP1+EiOgKr0CevInke7vLV/G9OCD8o73RUZf3X/7+6EPCChU9PtJjICq9Avo3d3JmV+Xn/3p9V4vY1p8hr665tL15QcPti/A9ICrMWEA+v0kRkBV+gV09Uaks2fP9n4r0vzBz6bTc++tH2U+uLJI5rtP+4CAQkO/n8QIqErPgM7/sLt+J+fO2736eXL629b6SMOTfj+JEVCVvgGdz758Y/EI9MWPT3pdOwIKF/r9JEZAVXoHdHD629b6SMOTfj+JEVAVUzECiqD0+0mMgKqYihFQBKXfT2IEVMVUjIAiKP1+EiOgKqZiBBRB6feTGAFVMRUjoAhKv5/ECKiKqRgBRVD6/SRGQFVMxQgogtLvJzECqmIqRkARlH4/iRFQFVOxo67G9IPfEFCMmn4/iRFQlV4BfXhh63qgBBRjpN9PYgRUpWdAT/BdPAgoWtDvJzECqtIroIe+qRwBxRjp95MYAVXpFdD5jc23hSegGCn9fhIjoCr9AvrtLyeTZ158c+0ng1zSTn/bWh9peJuln3QAABwGSURBVNLvJzECqtIroA8vTLYN8wVR/W1rfaThSb+fxAioCgFFDvr9JEZAVXoF1IX+trU+0vCk309iBFTFVIyAIij9fhIjoCqmYscGdPb1gP0koDgV/X4SI6AqpmJHB/TLHy+/+PnwR28N9V3l9Let9ZGGJ/1+EiOgKj0DOvt09ezRwwuTMwO9KUl/21ofaXjS7ycxAqrSM6BXJ5Mzf737vd/O/m4yeXaYx6D629b6SMOTfj+JEVCVfgG9PZm8vX5H/B92B7qwiP62tT7S8KTfT2IEVKVfQK9OXt6/pMiNyXMEFKOj309iBFSlV0BXFxNZB/TuLi+kx/jo95MYAVXpFdBVOtcBHeradvrb1vpIw5N+P4kRUBUCihz0+0mMgKr0Cujs0vKJo3U5bw/0NLz+trU+0vCk309iBFSlV0BXTxytArqIKU8iYXz0+0mMgKr0C+jd3clL35SA3nt9MtDV6fW3rfWRhif9fhIjoCr9Arp4CDqZnN3defH7ix9fHqSfBBSnot9PYgRUpWdA57/f3VwNdKB+ElCcin4/iRFQlb4BnX/7q7OLej4z3DeI19+21kcanvT7SYyAqvQO6OD0t631kYYn/X4SI6AqpmLHXw/0qwH7SUBxKvr9JEZAVUzFjr8e6AKfwmOc9PtJjICq9Azo7NL+t5R7aaArKutvW+sjDU/6/SRGQFX6BXTZz50X//Nn//TGoqDDvI6egOJU9PtJjICq9Avo7f1XL81+OeF6oBgh/X4SI6AqvQK6eAB68OrPq7yVEyOk309iBFSlV0AfXth6+ybXA8UY6feTGAFV6RnQrWZyOTuMkX4/iRFQlV4BXV2Rfu3uLpezw/jo95MYAVXpFdBD3wfpxkDvhtffttZHGp70+0mMgKr0C+jDC5MffrPp5zCfwRNQnIp+P4kRUJWOgM4+erN4Y/U60H9+c3cyefEnfAqP0dHvJzECqtIR0MVDzyfxJBLGR7+fxAioCgFFDpUj+X/4DpH2pegIqCP9bWt9pOGpciStjzQ8SftSmIoRUARVOZLWRxqepH0pTMUIKIKqHEnrIw1P0r4UpmJHB/SPn+37nGfhMTqVI2l9pOFJ2peiZ0APvqccTyJhlCpH0vpIw5O0L0W/gN7mWXiMXOVIWh9peJL2pegV0Nmlyc7HX+37eoh+ElCcSuVIWh9peJL2pegV0IcXBrqIMgGFSuVIWh9peJL2pegZ0IHe/05AoVI5ktZHGp6kfSl6BXR2iYBi5CpH0vpIw5O0L0WvgM5v8Ck8Rq5yJK2PNDxJ+1L0C+ih7+lBQDFClSNpfaThSdqXol9A5/cuTM68ucHl7DA+lSNpfaThSdqXomdAP+V1oBi3ypG0PtLwJO1L0S+gN3ghPUauciStjzQ8SftS9ApoeSH9IJ+3E1CIVI6k9ZGGJ2lfil4B9XgOiYDiVCpH0vpIw5O0L0XPgPI6UIxc5UhaH2l4kval6BVQXkiP0ascSesjDU/SvhS9AjrY94InoFCpHEnrIw1P0r4U/QI6u7TzNgHFmFWOpPWRhidpX4peAZ19VL4vPC+kx3hVjqT1kYYnaV+KXgE139yY14FifCpH0vpIw5O0LwUBRQ6VI2l9pOFJ2peiV0Bd6G9b6yMNT5UjaX2k4Unal8JUjIAiqMqRtD7S8CTtS2EqRkARVOVIWh9peJL2pTAVOyKg3361jW8qh/GpHEnrIw1P0r4UvQLq8iSSXusjDU+VI2l9pOFJ2pen4Vl4BFU5ktZHGp6kfSl6BXT2x8/W/v71yc4/fM4L6TE6lSNpfaThSdqXoldAt93dfXaYK4Pqb1vrIw1PlSNpfaThSdqX4sQBHezCIvrb1vpIw1PlSFofaXiS9qU4eUCHegiqv22tjzQ8VY6k9ZGGJ2lfipMHdKirK+tvW+sjDU+VI2l9pOFJ2pfi5AG9u0tAMT6VI2l9pOFJ2pfixAGdXZ3wKTzGp3IkrY80PEn7UvQK6OyjzaVA33xjd8KTSBihypG0PtLwJO1L0Sugh19Iz8uYMEKVI2l9pOFJ2pfixAF95q2BvkG8/ra1PtLwVDmS1kcanqR9KXoF1IX+trU+0vBUOZLWRxqepH0pTMUIKIKqHEnrIw1P0r4UpmIEFEFVjqT1kYYnaV8KUzECiqAqR9L6SMOTtC+FqZgN6NYLmA7wbY0xPpUjaX2k4Unal6IjoOZKoFwPFGNVOZLWRxqepH0pCChyqBxJ6yMNT9K+FB0Btb7cnfBOJIxR5UhaH2l4kvalOFFAZz9f5PPMbwbpJwHFqVSOpPWRhidpX4qTBPQPi4efO0O9EYmA4lQqR9L6SMOTtC9F/4AO+vCTgOKUKkfS+kjDk7QvRe+Aloef/26wfBJQnE7lSFofaXiS9qXoGdB7Az/8JKA4pcqRtD7S8CTtS9EvoIM//CSgOKXKkbQ+0vAk7UvRJ6D3Li2vAjrow08CilOqHEnrIw1P0r4UPQJaHn6+PXA+CShOp3IkrY80PEn7UnQG1OfhJwHFKVWOpPWRhidpX4qugP7e5+EnAcUpVY6k9ZGGJ2lfio6A8l54BFE5ktZHGp6kfSkIKHKoHEnrIw1P0r4UHQHleqAIonIkrY80PEn7UnQE1JH+trU+0vBUOZLWRxqepH0pTMUIKIKqHEnrIw1P0r4UpmIEFEFVjqT1kYYnaV8KUzECiqAqR9L6SMOTtC+FqRgBRVCVI2l9pOFJ2pfCVIyAIqjKkbQ+0vAk7UthKkZAEVTlSFofaXiS9qUwFSOgCKpyJK2PNDxJ+1KYihFQBFU5ktZHGp6kfSlMxQgogqocSesjDU/SvhSmYgQUQVWOpPWRhidpXwpTMQKKoCpH0vpIw5O0L4WpGAFFUJUjaX2k4Unal8JUjIAiqMqRtD7S8CTtS2EqRkARVOVIWh9peJL2pTAVI6AIqnIkrY80PEn7UpiKEVAEVTmS1kcanqR9KUzFCCiCqhxJ6yMNT9K+FKZiBBRBVY6k9ZGGJ2lfClMxAoqgKkfS+kjDk7QvhakYAUVQlSNpfaThSdqXwlSMgCKoypG0PtLwJO1LYSpGQBFU5UhaH2l4kvalMBUjoAiqciStjzQ8SftSmIoRUARVOZLWRxqepH0pTMUIKIKqHEnrIw1P0r4UpmIEFEFVjqT1kYYnaV8KUzECiqAqR9L6SMOTtC+FqRgBRVCVI2l9pOFJ2pfCVIyAIqjKkbQ+0vAk7UthKkZAEVTlSFofaXiS9qUwFSOgCKpyJK2PNDxJ+1KYihFQBFU5ktZHGp6kfSlMxQgogqocSesjDU/SvhSmYgQUQVWOpPWRhidpXwpTMQKKoCpH0vpIw5O0L4WpGAFFUJUjaX2k4Unal8JUjIAiqMqRtD7S8CTtS2EqRkARVOVIWh9peJL2pTAVI6AIqnIkrY80PEn7UpiKEVAEVTmS1kcanqR9KUzFCCiCqhxJ6yMNT9K+FKZiBBRBVY6k9ZGGJ2lfClMxAoqgKkfS+kjDk7QvhakYAUVQlSNpfaThSdqXwlSMgCKoypG0PtLwJO1LYSpGQBFU5UhaH2l4kvalMBUjoAiqciStjzQ8SftSmIrpAvpvP5tOz717vfz80cVp8coXy48eX9mbTte/Q0AhUjmS1kcanqR9KYYK6L+sknnuk+UH9/e2Arqu6SqmBBQilSNpfaThSdqXYqCA3pme+9v5/MHlVSfvTF87+K1r0/PXl79z/hYBhU7lSFofaXiS9qUYJqCPL08/XP64eLT5YWnm+/u/dX9v/Th09eCUgEKjciStjzQ8SftSDBPQRxfXn6GXdD6+vBXLm+tHoze3okpAcWqVI2l9pOFJ2pdimIDuKwF9dPH87z6YTn96ffUr5bHp4U/rCShOq3IkrY80PEn7Ugwb0NUn6pvnkJbp3H80en9v80XQ51e0f/NS6yMNT5UjaX2k4Unal6cRB3T1+fqd6fS9W/O/XFk+J09AMYzKkbQ+0vAk7cvTaAN6Z/Uyps2XPZefz28F1LyQSf/ouvWRhqfKkbQ+0vAk7UsxZEDv7J378HBPz996yiNQAgqBypG0PtLwJO1LMWBAb07NK5WWDzoJKIZROZLWRxqepH0phgvov9h+rprJs/AYROVIWh9peJL2pRgqoI+vTV9df41z86r6VTM3r//kdaCQqhxJ6yMNT9K+FEMF9NrWWzWvrR5srkLKO5EwiMqRtD7S8CTtSzFQQG9uv9X9/t7yZUwPPii/tsjoq7wXHnKVI2l9pOFJ2pdimIBurl+38FrJ6eoCTNeXv/eAqzFhAJUjaX2k4Unal2KYgN6ZHgro/MHy4qDvrR9yPriy+OV3b9l/Rn/bWh9peKocSesjDU/SvhTDBLSG/ra1PtLwVDmS1kcanqR9KUzFCCiCqhxJ6yMNT9K+FKZiBBRBVY6k9ZGGJ2lfClMxAoqgKkfS+kjDk7QvhakYAUVQlSNpfaThSdqXwlSMgCKoypG0PtLwJO1LYSpGQBFU5UhaH2l4kvalMBUjoAiqciStjzQ8SftSmIoRUARVOZLWRxqepH0pTMUIKIKqHEnrIw1P0r4UpmIEFEFVjqT1kYYnaV8KUzECiqAqR9L6SMOTtC+FqRgBRVCVI2l9pOFJ2pfCVIyAIqjKkbQ+0vAk7UthKkZAEVTlSFofaXiS9qUwFSOgCKpyJK2PNDxJ+1KYihFQBFU5ktZHGp6kfSlMxQgogqocSesjDU/SvhSmYgQUQVWOpPWRhidpXwpTMQKKoCpH0vpIw5O0L4WpGAFFUJUjaX2k4Unal8JUjIAiqMqRtD7S8CTtS2EqRkARVOVIWh9peJL2pTAVI6AIqnIkrY80PEn7UpiKEVAEVTmS1kcanqR9KUzFCCiCqhxJ6yMNT9K+FKZiBBRBVY6k9ZGGJ2lfClMxAoqgKkfS+kjDk7QvhakYAUVQlSNpfaThSdqXwlSMgCKoypG0PtLwJO1LYSpGQBFU5UhaH2l4kvalMBUjoAiqciStjzQ8SftSmIoRUARVOZLWRxqepH0pTMUIKIKqHEnrIw1P0r4UpmIEFEFVjqT1kYYnaV8KUzECiqAqR9L6SMOTtC+FqRgBRVCVI2l9pOFJ2pfCVIyAIqjKkbQ+0vAk7UthKkZAEVTlSFofaXiS9qUwFSOgCKpyJK2PNDxJ+1KYihFQBFU5ktZHGp6kfSlMxQgogqocSesjDU/SvhSmYgQUQVWOpPWRhidpXwpTMQKKoCpH0vpIw5O0L4WpGAFFUJUjaX2k4Unal8JUjIAiqMqRtD7S8CTtS2EqRkARVOVIWh9peJL2pTAVI6AIqnIkrY80PEn7UpiKEVAEVTmS1kcanqR9KUzFCCiCqhxJ6yMNT9K+FKZiBBRBVY6k9ZGGJ2lfClMxAoqgKkfS+kjDk7QvhakYAUVQlSNpfaThSdqXwlSMgCKoypG0PtLwJO1LYSpGQBFU5UhaH2l4kvalMBUjoAiqciStjzQ8SftSmIoRUARVOZLWRxqepH0pTMUIKIKqHEnrIw1P0r4UpmIEFEFVjqT1kYYnaV8KUzECiqAqR9L6SMOTtC+FqRgBRVCVI2l9pOFJ2pfCVIyAIqjKkbQ+0vAk7UthKkZAEVTlSFofaXiS9qUwFSOgCKpyJK2PNDxJ+1KYihFQBFU5ktZHGp6kfSlMxQgogqocSesjDU/SvhSmYgQUQVWOpPWRhidpXwpTMQKKoCpH0vpIw5O0L4WpGAFFUJUjaX2k4Unal8JUjIAiqMqRtD7S8CTtS2EqRkARVOVIWh9peJL2pTAVI6AIqnIkrY80PEn7UpiKEVAEVTmS1kcanqR9KUzFCCiCqhxJ6yMNT9K+FKZiBBRBVY6k9ZGGJ2lfClMxAoqgKkfS+kjDk7QvhakYAUVQlSNpfaThSdqXwlSMgCKoypG0PtLwJO1LYSpGQBFU5UhaH2l4kvalMBVrGFC91kcanipH0vpIw5O0L0/DI1AEVTmS1kcanqR9KUzFCCiCqhxJ6yMNT9K+FKZiBBRBVY6k9ZGGJ2lfClMxAoqgKkfS+kjDk7QvhakYAUVQlSNpfaThSdqXwlSMgCKoypG0PtLwJO1LYSpGQBFU5UhaH2l4kvalMBUjoAiqciStjzQ8SftSmIoRUARVOZLWRxqepH0pTMUIKIKqHEnrIw1P0r4UpmIEFEFVjqT1kYYnaV8KUzECiqAqR9L6SMOTtC+FqRgBRVCVI2l9pOFJ2pfCVIyAIqjKkbQ+0vAk7UthKkZAEVTlSFofaXiS9qUwFSOgCKpyJK2PNDxJ+1KYihFQBFU5ktZHGp6kfSlMxQgogqocSesjDU/SvhSmYgQUQVWOpPWRhidpXwpTMQKKoCpH0vpIw5O0L4WpGAFFUJUjaX2k4Unal8JUjIAiqMqRtD7S8CTtS2EqRkARVOVIWh9peJL2pTAVI6AIqnIkrY80PEn7UpiKEVAEVTmS1kcanqR9KUzFCCiCqhxJ6yMNT9K+FKZiBBRBVY6k9ZGGJ2lfClMxAoqgKkfS+kjDk7QvhakYAUVQlSNpfaThSdqXwlSMgCKoypG0PtLwJO1LYSpGQBFU5UhaH2l4kvalMBUjoAiqciStjzQ8SftSmIoRUARVOZLWRxqepH0pTMUIKIKqHEnrIw1P0r4UpmIEFEFVjqT1kYYnaV8KUzECiqAqR9L6SMOTtC+FqRgBRVCVI2l9pOFJ2pfCVIyAIqjKkbQ+0vAk7UthKkZAEVTlSFofaXiS9qUwFSOgCKpyJK2PNDxJ+1KYihFQBFU5ktZHGp6kfSlMxQgogqocSesjDU/SvhSmYgQUQVWOpPWRhidpXwpTMQKKoCpH0vpIw5O0L4WpGAFFUJUjaX2k4Unal8JUjIAiqMqRtD7S8CTtS2EqRkARVOVIWh9peJL2pTAVI6AIqnIkrY80PEn7UpiKEVAEVTmS1kcanqR9KUzFCCiCqhxJ6yMNT9K+FKZiBBRBVY6k9ZGGJ2lfClMxAoqgKkfS+kjDk7QvhakYAUVQlSNpfaThSdqXwlSMgCKoypG0PtLwJO1LYSpGQBFU5UhaH2l4kvalMBUjoAiqciStjzQ8SftSmIoRUARVOZLWRxqepH0pTMUIKIKqHEnrIw1P0r4UpmIEFEFVjqT1kYYnaV8KUzECiqAqR9L6SMOTtC+FqRgBRVCVI2l9pOFJ2pfCVIyAIqjKkbQ+0vAk7UthKkZAEVTlSFofaXiS9qUwFSOgCKpyJK2PNDxJ+1KYihFQBFU5ktZHGp6kfSlMxQgogqocSesjDU/SvhSmYgQUQVWOpPWRhidpXwpTMQKKoCpH0vpIw5O0L4WpGAFFUJUjaX2k4Unal8JUjIAiqMqRtD7S8CTtS2EqRkARVOVIWh9peJL2pTAVI6AIqnIkrY80PEn7UpiKEVAEVTmS1kcanqR9KUzFCCiCqhxJ6yMNT9K+FKZiBBRBVY6k9ZGGJ2lfClMxAoqgKkfS+kjDk7QvhakYAUVQlSNpfaThSdqXwlSMgCKoypG0PtLwJO1LYSpGQBFU5UhaH2l4kvalMBUjoAiqciStjzQ8SftSmIp5BPTxlb3p9N3rBBRKlSNpfaThSdqXwj+gjy5Ol175goBCqHIkrY80PEn7UvgH9Nr0/PX5g8vT87cIKHQqR9L6SMOTtC+Fe0Dv75XHno8unvuEgEKnciStjzQ8SftSuAf05vS19Y/vE1DoVI6k9ZGGJ2lfCveAXpt+WH68sw4pAYVE5UhaH2l4kval8A7o48vrT93v722+CPr8iv7van2k4alyJK2PNDxJ+/I0qQIKAJ48A2peyKR/dP3dxD2JToxEpWFAzeuYWt8TWXBPohMjUSGg2XBPohMjUfEOqOez8N9N3JPoxEhU3AO6ef2nw+tAv5u4J9GJkai4B9TxnUjfTdyT6MRIVNwD+vjy9FWn98J/N3FPohMjUXEP6PyB29WYvpu4J9GJkaj4B3T+4Mqin+/esr/c+p7IgnsSnRiJSoOAHqH1PZEF9yQ6MRIVUzECGh73JDoxEhVTMQIaHvckOjESFVMxAhoe9yQ6MRIVUzECGh73JDoxEhVTMQIaHvckOjESFVMxAhoe9yQ6MRIVUzECGh73JDoxEhVTMQIaHvckOjESFVMxAhoe9yQ6MRIVUzECGh73JDoxEhVTMQIaHvckOjESFVMxAhoe9yQ6MRIVUzECGh73JDoxEhVTMQIaHvckOjESFVMxAhoe9yQ6MRIVUzECGh73JDoxEhVTMQIaHvckOjESFVMxAhoe9yQ6MRIVUzECGh73JDoxEhVTMQIaHvckOjESFVMxAhoe9yQ6MRIVUzECGh73JDoxEhVTMQIaHvckOjESFVMxAhoe9yQ6MRIVUzECGh73JDoxEhVTMQIaHvckOjESFVOxhgGFxvPPt/43wOgxkoEQ0PA4G+jESAZCQMPjbKATIxkIAQ2Ps4FOjGQgBDQ8zgY6MZKBENDwOBvoxEgGQkDD42ygEyMZCAEFgEoEFAAqEVAAqERAAaASAQWASgQUACoRUACoREABoBIBDeHRxen7+z995Yum/y4Yk8eXp+dv7f/0w7b/Mt9BBDSERUDPfbL5KQHFgft7m/+23tlPKdwQ0BAWAZ2+tvkpAcWWm9PVIB5d3Pw3Fn4IaAiLw/E368/PCCgO2Xx55+bmP7FwREBDWFTzf+xtHmisfnxwZTqdvnu96b8WxuBO+fLO/fU+FsPYm05/en31858tRvLv/7bhv1x2BDSEZTXXjzDWAb2zOCUL53ja4Dvv8eXlMq6tP0O5vzWM9c95aDocAhrCsprrJ1lXAV0cjXf/9/zxv0z5uhfu75375P7e6hmkxSf0792aP/7X5RdGF4v5D4tf/Lc9RjIYAhpCqebqk7RVQDdf8LrGowssVnD+v6wjuRnGzen7PK3kgICGsKpmqWX56f5L/njpCrZfpPH48rqZy0eki5W8+j9b/nt9BxDQEFYBLY8oyk/3H1vwnDzmy/+OrmewaObG4lduLn989b/yn9jhENAQNs8cLR5vrgO6PjAEFPPV483yk+Vj0YOAzv/8N+Wn75HQoRDQEDadvDZ9n0egeMJWQM2XPR//9+Urmd5/2j8EAQIawqaTi/Px3/gaKKz9gD7t/fCP/5WRDIaAhrD/QPPO9K/2eBYexn5AF8NY/Wz5X9bNa+sPfhdqBDSEg8/Ur62+uLV6HehfrvA6UMy3E/no4vT89fn8z3uLR6LLKzUtfv7gMv+VHQwBDeEgoIty8k4kGFuPMdfDmL43P3gn0qt8nXwoBDSEreeKNhff4b3w2Lf9SfrqvfD/ePDzv/qPfAI/GAIKAJUIKABUIqAAUImAAkAlAgoAlQgoAFQioABQiYACQCUCCgCVCCgAVCKgAFCJgAJAJQIKAJUIKABUIqAAUImAAkAlAgoAlQgoAFQioABQiYACQCUCCgCVCCgAVCKgAFCJgAJAJQIKAJUIKABUIqAAUImAAkAlAgoAlQgoAFQioABQiYACQCUCCgCVCCgAVCKgAFCJgAJAJQIKAJUIKABUIqAAUImAAkAlAgoAlQgoAFQioABQiYACQCUCCgCVCCgAVCKgAFCJgAJAJQIKAJUIKABUIqAAUOn/A71FEGOQyBlxAAAAAElFTkSuQmCC">
+            <a:extLst>
+              <a:ext uri="{FF2B5EF4-FFF2-40B4-BE49-F238E27FC236}">
+                <a16:creationId xmlns:a16="http://schemas.microsoft.com/office/drawing/2014/main" id="{8CC047BC-7FEC-4EB1-BCEA-02FB6A9AD576}"/>
+              </a:ext>
+            </a:extLst>
+          </p:cNvPr>
+          <p:cNvSpPr>
+            <a:spLocks noChangeAspect="1" noChangeArrowheads="1"/>
+          </p:cNvSpPr>
+          <p:nvPr/>
+        </p:nvSpPr>
+        <p:spPr bwMode="auto">
+          <a:xfrm>
+            <a:off x="5963478" y="3296478"/>
+            <a:ext cx="284922" cy="284922"/>
+          </a:xfrm>
+          <a:prstGeom prst="rect">
+            <a:avLst/>
+          </a:prstGeom>
+          <a:noFill/>
+          <a:extLst>
+            <a:ext uri="{909E8E84-426E-40DD-AFC4-6F175D3DCCD1}">
+              <a14:hiddenFill xmlns:a14="http://schemas.microsoft.com/office/drawing/2010/main">
+                <a:solidFill>
+                  <a:srgbClr val="FFFFFF"/>
+                </a:solidFill>
+              </a14:hiddenFill>
+            </a:ext>
+          </a:extLst>
+        </p:spPr>
+        <p:txBody>
+          <a:bodyPr vert="horz" wrap="square" lIns="91440" tIns="45720" rIns="91440" bIns="45720" numCol="1" anchor="t" anchorCtr="0" compatLnSpc="1">
+            <a:prstTxWarp prst="textNoShape">
+              <a:avLst/>
+            </a:prstTxWarp>
+          </a:bodyPr>
+          <a:lstStyle/>
+          <a:p>
+            <a:endParaRPr lang="en-US"/>
+          </a:p>
+        </p:txBody>
+      </p:sp>
+    </p:spTree>
+    <p:extLst>
+      <p:ext uri="{BB962C8B-B14F-4D97-AF65-F5344CB8AC3E}">
+        <p14:creationId xmlns:p14="http://schemas.microsoft.com/office/powerpoint/2010/main" val="288936918"/>
+      </p:ext>
+    </p:extLst>
+  </p:cSld>
+  <p:clrMapOvr>
+    <a:masterClrMapping/>
+  </p:clrMapOvr>
+</p:sld>
+</file>
+
+<file path=ppt/slides/slide13.xml><?xml version="1.0" encoding="utf-8"?>
 <p:sld xmlns:a="http://schemas.openxmlformats.org/drawingml/2006/main" xmlns:r="http://schemas.openxmlformats.org/officeDocument/2006/relationships" xmlns:p="http://schemas.openxmlformats.org/presentationml/2006/main">
   <p:cSld>
     <p:spTree>
@@ -8089,6 +8419,103 @@
           </a:p>
         </p:txBody>
       </p:sp>
+      <p:sp>
+        <p:nvSpPr>
+          <p:cNvPr id="3" name="Text Placeholder 2"/>
+          <p:cNvSpPr>
+            <a:spLocks noGrp="1"/>
+          </p:cNvSpPr>
+          <p:nvPr>
+            <p:ph type="body" idx="1"/>
+          </p:nvPr>
+        </p:nvSpPr>
+        <p:spPr>
+          <a:xfrm>
+            <a:off x="684213" y="5167867"/>
+            <a:ext cx="6797468" cy="1347233"/>
+          </a:xfrm>
+        </p:spPr>
+        <p:txBody>
+          <a:bodyPr>
+            <a:noAutofit/>
+          </a:bodyPr>
+          <a:lstStyle/>
+          <a:p>
+            <a:pPr marL="342900" indent="-342900">
+              <a:buFont typeface="Arial" panose="020B0604020202020204" pitchFamily="34" charset="0"/>
+              <a:buChar char="•"/>
+            </a:pPr>
+            <a:r>
+              <a:rPr lang="en-US" sz="1400" b="1" dirty="0">
+                <a:solidFill>
+                  <a:schemeClr val="tx1"/>
+                </a:solidFill>
+              </a:rPr>
+              <a:t>Employees’ income is very left skewed.</a:t>
+            </a:r>
+          </a:p>
+          <a:p>
+            <a:pPr marL="342900" indent="-342900">
+              <a:buFont typeface="Arial" panose="020B0604020202020204" pitchFamily="34" charset="0"/>
+              <a:buChar char="•"/>
+            </a:pPr>
+            <a:r>
+              <a:rPr lang="en-US" sz="1400" b="1" dirty="0">
+                <a:solidFill>
+                  <a:schemeClr val="tx1"/>
+                </a:solidFill>
+              </a:rPr>
+              <a:t>Employees’ age is normally distributed.</a:t>
+            </a:r>
+          </a:p>
+          <a:p>
+            <a:pPr marL="342900" indent="-342900">
+              <a:buFont typeface="Arial" panose="020B0604020202020204" pitchFamily="34" charset="0"/>
+              <a:buChar char="•"/>
+            </a:pPr>
+            <a:r>
+              <a:rPr lang="en-US" sz="1400" b="1" dirty="0">
+                <a:solidFill>
+                  <a:schemeClr val="tx1"/>
+                </a:solidFill>
+              </a:rPr>
+              <a:t>For every 1 year increase in age for males there is a $256.70  increase in the average monthly income( R</a:t>
+            </a:r>
+            <a:r>
+              <a:rPr lang="en-US" sz="1400" b="1" baseline="30000" dirty="0">
+                <a:solidFill>
+                  <a:schemeClr val="tx1"/>
+                </a:solidFill>
+              </a:rPr>
+              <a:t>2</a:t>
+            </a:r>
+            <a:r>
+              <a:rPr lang="en-US" sz="1400" b="1" dirty="0">
+                <a:solidFill>
+                  <a:schemeClr val="tx1"/>
+                </a:solidFill>
+              </a:rPr>
+              <a:t> of 0.2424) and for every 1 year increase in age for females there is a $255.74 increase in the average monthly income (R</a:t>
+            </a:r>
+            <a:r>
+              <a:rPr lang="en-US" sz="1400" b="1" baseline="30000" dirty="0">
+                <a:solidFill>
+                  <a:schemeClr val="tx1"/>
+                </a:solidFill>
+              </a:rPr>
+              <a:t>2</a:t>
+            </a:r>
+            <a:r>
+              <a:rPr lang="en-US" sz="1400" b="1" dirty="0">
+                <a:solidFill>
+                  <a:schemeClr val="tx1"/>
+                </a:solidFill>
+              </a:rPr>
+              <a:t> of 0.2547).</a:t>
+            </a:r>
+          </a:p>
+        </p:txBody>
+      </p:sp>
       <p:pic>
         <p:nvPicPr>
           <p:cNvPr id="4" name="Picture 3">
@@ -8119,103 +8546,6 @@
           </a:prstGeom>
         </p:spPr>
       </p:pic>
-      <p:sp>
-        <p:nvSpPr>
-          <p:cNvPr id="3" name="Text Placeholder 2"/>
-          <p:cNvSpPr>
-            <a:spLocks noGrp="1"/>
-          </p:cNvSpPr>
-          <p:nvPr>
-            <p:ph type="body" idx="1"/>
-          </p:nvPr>
-        </p:nvSpPr>
-        <p:spPr>
-          <a:xfrm>
-            <a:off x="684213" y="5167867"/>
-            <a:ext cx="6797468" cy="1347233"/>
-          </a:xfrm>
-        </p:spPr>
-        <p:txBody>
-          <a:bodyPr>
-            <a:noAutofit/>
-          </a:bodyPr>
-          <a:lstStyle/>
-          <a:p>
-            <a:pPr marL="342900" indent="-342900">
-              <a:buFont typeface="Arial" panose="020B0604020202020204" pitchFamily="34" charset="0"/>
-              <a:buChar char="•"/>
-            </a:pPr>
-            <a:r>
-              <a:rPr lang="en-US" sz="1400" b="1" dirty="0">
-                <a:solidFill>
-                  <a:schemeClr val="tx1"/>
-                </a:solidFill>
-              </a:rPr>
-              <a:t>Employees’ income is very left skewed.</a:t>
-            </a:r>
-          </a:p>
-          <a:p>
-            <a:pPr marL="342900" indent="-342900">
-              <a:buFont typeface="Arial" panose="020B0604020202020204" pitchFamily="34" charset="0"/>
-              <a:buChar char="•"/>
-            </a:pPr>
-            <a:r>
-              <a:rPr lang="en-US" sz="1400" b="1" dirty="0">
-                <a:solidFill>
-                  <a:schemeClr val="tx1"/>
-                </a:solidFill>
-              </a:rPr>
-              <a:t>Employees’ age is normally distributed.</a:t>
-            </a:r>
-          </a:p>
-          <a:p>
-            <a:pPr marL="342900" indent="-342900">
-              <a:buFont typeface="Arial" panose="020B0604020202020204" pitchFamily="34" charset="0"/>
-              <a:buChar char="•"/>
-            </a:pPr>
-            <a:r>
-              <a:rPr lang="en-US" sz="1400" b="1" dirty="0">
-                <a:solidFill>
-                  <a:schemeClr val="tx1"/>
-                </a:solidFill>
-              </a:rPr>
-              <a:t>For every 1 year increase in age for males there is a $256.70  increase in the average monthly income( R</a:t>
-            </a:r>
-            <a:r>
-              <a:rPr lang="en-US" sz="1400" b="1" baseline="30000" dirty="0">
-                <a:solidFill>
-                  <a:schemeClr val="tx1"/>
-                </a:solidFill>
-              </a:rPr>
-              <a:t>2</a:t>
-            </a:r>
-            <a:r>
-              <a:rPr lang="en-US" sz="1400" b="1" dirty="0">
-                <a:solidFill>
-                  <a:schemeClr val="tx1"/>
-                </a:solidFill>
-              </a:rPr>
-              <a:t> of 0.2424) and for every 1 year increase in age for females there is a $255.74 increase in the average monthly income (R</a:t>
-            </a:r>
-            <a:r>
-              <a:rPr lang="en-US" sz="1400" b="1" baseline="30000" dirty="0">
-                <a:solidFill>
-                  <a:schemeClr val="tx1"/>
-                </a:solidFill>
-              </a:rPr>
-              <a:t>2</a:t>
-            </a:r>
-            <a:r>
-              <a:rPr lang="en-US" sz="1400" b="1" dirty="0">
-                <a:solidFill>
-                  <a:schemeClr val="tx1"/>
-                </a:solidFill>
-              </a:rPr>
-              <a:t> of 0.2547).</a:t>
-            </a:r>
-          </a:p>
-        </p:txBody>
-      </p:sp>
       <p:pic>
         <p:nvPicPr>
           <p:cNvPr id="5" name="Picture 4">
@@ -8331,326 +8661,6 @@
           <a:chExt cx="0" cy="0"/>
         </a:xfrm>
       </p:grpSpPr>
-      <p:cxnSp>
-        <p:nvCxnSpPr>
-          <p:cNvPr id="65" name="Straight Connector 64">
-            <a:extLst>
-              <a:ext uri="{FF2B5EF4-FFF2-40B4-BE49-F238E27FC236}">
-                <a16:creationId xmlns:a16="http://schemas.microsoft.com/office/drawing/2014/main" id="{DD6CFB6C-6ECB-4250-B68E-01966297A513}"/>
-              </a:ext>
-              <a:ext uri="{C183D7F6-B498-43B3-948B-1728B52AA6E4}">
-                <adec:decorative xmlns:adec="http://schemas.microsoft.com/office/drawing/2017/decorative" val="1"/>
-              </a:ext>
-            </a:extLst>
-          </p:cNvPr>
-          <p:cNvCxnSpPr>
-            <a:cxnSpLocks noGrp="1" noRot="1" noChangeAspect="1" noMove="1" noResize="1" noEditPoints="1" noAdjustHandles="1" noChangeArrowheads="1" noChangeShapeType="1"/>
-          </p:cNvCxnSpPr>
-          <p:nvPr>
-            <p:extLst>
-              <p:ext uri="{386F3935-93C4-4BCD-93E2-E3B085C9AB24}">
-                <p16:designElem xmlns:p16="http://schemas.microsoft.com/office/powerpoint/2015/main" val="1"/>
-              </p:ext>
-            </p:extLst>
-          </p:nvPr>
-        </p:nvCxnSpPr>
-        <p:spPr>
-          <a:xfrm flipH="1">
-            <a:off x="8228012" y="8467"/>
-            <a:ext cx="3810000" cy="3810000"/>
-          </a:xfrm>
-          <a:prstGeom prst="line">
-            <a:avLst/>
-          </a:prstGeom>
-          <a:ln w="12700">
-            <a:solidFill>
-              <a:schemeClr val="tx1"/>
-            </a:solidFill>
-          </a:ln>
-        </p:spPr>
-        <p:style>
-          <a:lnRef idx="2">
-            <a:schemeClr val="accent1"/>
-          </a:lnRef>
-          <a:fillRef idx="0">
-            <a:schemeClr val="accent1"/>
-          </a:fillRef>
-          <a:effectRef idx="1">
-            <a:schemeClr val="accent1"/>
-          </a:effectRef>
-          <a:fontRef idx="minor">
-            <a:schemeClr val="tx1"/>
-          </a:fontRef>
-        </p:style>
-      </p:cxnSp>
-      <p:cxnSp>
-        <p:nvCxnSpPr>
-          <p:cNvPr id="67" name="Straight Connector 66">
-            <a:extLst>
-              <a:ext uri="{FF2B5EF4-FFF2-40B4-BE49-F238E27FC236}">
-                <a16:creationId xmlns:a16="http://schemas.microsoft.com/office/drawing/2014/main" id="{B8359141-C085-46E4-B4EC-42F9599BA7D2}"/>
-              </a:ext>
-              <a:ext uri="{C183D7F6-B498-43B3-948B-1728B52AA6E4}">
-                <adec:decorative xmlns:adec="http://schemas.microsoft.com/office/drawing/2017/decorative" val="1"/>
-              </a:ext>
-            </a:extLst>
-          </p:cNvPr>
-          <p:cNvCxnSpPr>
-            <a:cxnSpLocks noGrp="1" noRot="1" noChangeAspect="1" noMove="1" noResize="1" noEditPoints="1" noAdjustHandles="1" noChangeArrowheads="1" noChangeShapeType="1"/>
-          </p:cNvCxnSpPr>
-          <p:nvPr>
-            <p:extLst>
-              <p:ext uri="{386F3935-93C4-4BCD-93E2-E3B085C9AB24}">
-                <p16:designElem xmlns:p16="http://schemas.microsoft.com/office/powerpoint/2015/main" val="1"/>
-              </p:ext>
-            </p:extLst>
-          </p:nvPr>
-        </p:nvCxnSpPr>
-        <p:spPr>
-          <a:xfrm flipH="1">
-            <a:off x="6108170" y="91545"/>
-            <a:ext cx="6080655" cy="6080655"/>
-          </a:xfrm>
-          <a:prstGeom prst="line">
-            <a:avLst/>
-          </a:prstGeom>
-          <a:ln w="12700">
-            <a:solidFill>
-              <a:schemeClr val="tx1"/>
-            </a:solidFill>
-          </a:ln>
-        </p:spPr>
-        <p:style>
-          <a:lnRef idx="2">
-            <a:schemeClr val="accent1"/>
-          </a:lnRef>
-          <a:fillRef idx="0">
-            <a:schemeClr val="accent1"/>
-          </a:fillRef>
-          <a:effectRef idx="1">
-            <a:schemeClr val="accent1"/>
-          </a:effectRef>
-          <a:fontRef idx="minor">
-            <a:schemeClr val="tx1"/>
-          </a:fontRef>
-        </p:style>
-      </p:cxnSp>
-      <p:cxnSp>
-        <p:nvCxnSpPr>
-          <p:cNvPr id="69" name="Straight Connector 68">
-            <a:extLst>
-              <a:ext uri="{FF2B5EF4-FFF2-40B4-BE49-F238E27FC236}">
-                <a16:creationId xmlns:a16="http://schemas.microsoft.com/office/drawing/2014/main" id="{FA903156-0F0C-44A5-9019-0CAF51EB494A}"/>
-              </a:ext>
-              <a:ext uri="{C183D7F6-B498-43B3-948B-1728B52AA6E4}">
-                <adec:decorative xmlns:adec="http://schemas.microsoft.com/office/drawing/2017/decorative" val="1"/>
-              </a:ext>
-            </a:extLst>
-          </p:cNvPr>
-          <p:cNvCxnSpPr>
-            <a:cxnSpLocks noGrp="1" noRot="1" noChangeAspect="1" noMove="1" noResize="1" noEditPoints="1" noAdjustHandles="1" noChangeArrowheads="1" noChangeShapeType="1"/>
-          </p:cNvCxnSpPr>
-          <p:nvPr>
-            <p:extLst>
-              <p:ext uri="{386F3935-93C4-4BCD-93E2-E3B085C9AB24}">
-                <p16:designElem xmlns:p16="http://schemas.microsoft.com/office/powerpoint/2015/main" val="1"/>
-              </p:ext>
-            </p:extLst>
-          </p:nvPr>
-        </p:nvCxnSpPr>
-        <p:spPr>
-          <a:xfrm flipH="1">
-            <a:off x="7235825" y="228600"/>
-            <a:ext cx="4953000" cy="4953000"/>
-          </a:xfrm>
-          <a:prstGeom prst="line">
-            <a:avLst/>
-          </a:prstGeom>
-          <a:ln w="12700">
-            <a:solidFill>
-              <a:schemeClr val="tx1"/>
-            </a:solidFill>
-          </a:ln>
-        </p:spPr>
-        <p:style>
-          <a:lnRef idx="2">
-            <a:schemeClr val="accent1"/>
-          </a:lnRef>
-          <a:fillRef idx="0">
-            <a:schemeClr val="accent1"/>
-          </a:fillRef>
-          <a:effectRef idx="1">
-            <a:schemeClr val="accent1"/>
-          </a:effectRef>
-          <a:fontRef idx="minor">
-            <a:schemeClr val="tx1"/>
-          </a:fontRef>
-        </p:style>
-      </p:cxnSp>
-      <p:cxnSp>
-        <p:nvCxnSpPr>
-          <p:cNvPr id="71" name="Straight Connector 70">
-            <a:extLst>
-              <a:ext uri="{FF2B5EF4-FFF2-40B4-BE49-F238E27FC236}">
-                <a16:creationId xmlns:a16="http://schemas.microsoft.com/office/drawing/2014/main" id="{66E5E851-3725-463F-9451-2FFEF5D3E089}"/>
-              </a:ext>
-              <a:ext uri="{C183D7F6-B498-43B3-948B-1728B52AA6E4}">
-                <adec:decorative xmlns:adec="http://schemas.microsoft.com/office/drawing/2017/decorative" val="1"/>
-              </a:ext>
-            </a:extLst>
-          </p:cNvPr>
-          <p:cNvCxnSpPr>
-            <a:cxnSpLocks noGrp="1" noRot="1" noChangeAspect="1" noMove="1" noResize="1" noEditPoints="1" noAdjustHandles="1" noChangeArrowheads="1" noChangeShapeType="1"/>
-          </p:cNvCxnSpPr>
-          <p:nvPr>
-            <p:extLst>
-              <p:ext uri="{386F3935-93C4-4BCD-93E2-E3B085C9AB24}">
-                <p16:designElem xmlns:p16="http://schemas.microsoft.com/office/powerpoint/2015/main" val="1"/>
-              </p:ext>
-            </p:extLst>
-          </p:nvPr>
-        </p:nvCxnSpPr>
-        <p:spPr>
-          <a:xfrm flipH="1">
-            <a:off x="7335837" y="32278"/>
-            <a:ext cx="4852989" cy="4852989"/>
-          </a:xfrm>
-          <a:prstGeom prst="line">
-            <a:avLst/>
-          </a:prstGeom>
-          <a:ln w="31750">
-            <a:solidFill>
-              <a:schemeClr val="tx1"/>
-            </a:solidFill>
-          </a:ln>
-        </p:spPr>
-        <p:style>
-          <a:lnRef idx="2">
-            <a:schemeClr val="accent1"/>
-          </a:lnRef>
-          <a:fillRef idx="0">
-            <a:schemeClr val="accent1"/>
-          </a:fillRef>
-          <a:effectRef idx="1">
-            <a:schemeClr val="accent1"/>
-          </a:effectRef>
-          <a:fontRef idx="minor">
-            <a:schemeClr val="tx1"/>
-          </a:fontRef>
-        </p:style>
-      </p:cxnSp>
-      <p:cxnSp>
-        <p:nvCxnSpPr>
-          <p:cNvPr id="73" name="Straight Connector 72">
-            <a:extLst>
-              <a:ext uri="{FF2B5EF4-FFF2-40B4-BE49-F238E27FC236}">
-                <a16:creationId xmlns:a16="http://schemas.microsoft.com/office/drawing/2014/main" id="{94209D59-6810-40C2-B8D6-6DACF8A06143}"/>
-              </a:ext>
-              <a:ext uri="{C183D7F6-B498-43B3-948B-1728B52AA6E4}">
-                <adec:decorative xmlns:adec="http://schemas.microsoft.com/office/drawing/2017/decorative" val="1"/>
-              </a:ext>
-            </a:extLst>
-          </p:cNvPr>
-          <p:cNvCxnSpPr>
-            <a:cxnSpLocks noGrp="1" noRot="1" noChangeAspect="1" noMove="1" noResize="1" noEditPoints="1" noAdjustHandles="1" noChangeArrowheads="1" noChangeShapeType="1"/>
-          </p:cNvCxnSpPr>
-          <p:nvPr>
-            <p:extLst>
-              <p:ext uri="{386F3935-93C4-4BCD-93E2-E3B085C9AB24}">
-                <p16:designElem xmlns:p16="http://schemas.microsoft.com/office/powerpoint/2015/main" val="1"/>
-              </p:ext>
-            </p:extLst>
-          </p:nvPr>
-        </p:nvCxnSpPr>
-        <p:spPr>
-          <a:xfrm flipH="1">
-            <a:off x="7845426" y="609601"/>
-            <a:ext cx="4343399" cy="4343399"/>
-          </a:xfrm>
-          <a:prstGeom prst="line">
-            <a:avLst/>
-          </a:prstGeom>
-          <a:ln w="31750">
-            <a:solidFill>
-              <a:schemeClr val="tx1"/>
-            </a:solidFill>
-          </a:ln>
-        </p:spPr>
-        <p:style>
-          <a:lnRef idx="2">
-            <a:schemeClr val="accent1"/>
-          </a:lnRef>
-          <a:fillRef idx="0">
-            <a:schemeClr val="accent1"/>
-          </a:fillRef>
-          <a:effectRef idx="1">
-            <a:schemeClr val="accent1"/>
-          </a:effectRef>
-          <a:fontRef idx="minor">
-            <a:schemeClr val="tx1"/>
-          </a:fontRef>
-        </p:style>
-      </p:cxnSp>
-      <p:sp useBgFill="1">
-        <p:nvSpPr>
-          <p:cNvPr id="75" name="Rectangle 74">
-            <a:extLst>
-              <a:ext uri="{FF2B5EF4-FFF2-40B4-BE49-F238E27FC236}">
-                <a16:creationId xmlns:a16="http://schemas.microsoft.com/office/drawing/2014/main" id="{0BE1027C-ABCB-4C82-91A2-F67B9A5A65A6}"/>
-              </a:ext>
-              <a:ext uri="{C183D7F6-B498-43B3-948B-1728B52AA6E4}">
-                <adec:decorative xmlns:adec="http://schemas.microsoft.com/office/drawing/2017/decorative" val="1"/>
-              </a:ext>
-            </a:extLst>
-          </p:cNvPr>
-          <p:cNvSpPr>
-            <a:spLocks noGrp="1" noRot="1" noChangeAspect="1" noMove="1" noResize="1" noEditPoints="1" noAdjustHandles="1" noChangeArrowheads="1" noChangeShapeType="1" noTextEdit="1"/>
-          </p:cNvSpPr>
-          <p:nvPr>
-            <p:extLst>
-              <p:ext uri="{386F3935-93C4-4BCD-93E2-E3B085C9AB24}">
-                <p16:designElem xmlns:p16="http://schemas.microsoft.com/office/powerpoint/2015/main" val="1"/>
-              </p:ext>
-            </p:extLst>
-          </p:nvPr>
-        </p:nvSpPr>
-        <p:spPr>
-          <a:xfrm>
-            <a:off x="0" y="0"/>
-            <a:ext cx="12192000" cy="6858000"/>
-          </a:xfrm>
-          <a:prstGeom prst="rect">
-            <a:avLst/>
-          </a:prstGeom>
-          <a:ln>
-            <a:noFill/>
-          </a:ln>
-        </p:spPr>
-        <p:style>
-          <a:lnRef idx="2">
-            <a:schemeClr val="accent1">
-              <a:shade val="50000"/>
-            </a:schemeClr>
-          </a:lnRef>
-          <a:fillRef idx="1">
-            <a:schemeClr val="accent1"/>
-          </a:fillRef>
-          <a:effectRef idx="0">
-            <a:schemeClr val="accent1"/>
-          </a:effectRef>
-          <a:fontRef idx="minor">
-            <a:schemeClr val="lt1"/>
-          </a:fontRef>
-        </p:style>
-        <p:txBody>
-          <a:bodyPr rtlCol="0" anchor="ctr"/>
-          <a:lstStyle/>
-          <a:p>
-            <a:pPr algn="ctr"/>
-            <a:endParaRPr lang="en-US"/>
-          </a:p>
-        </p:txBody>
-      </p:sp>
       <p:sp>
         <p:nvSpPr>
           <p:cNvPr id="2" name="Title 1"/>
@@ -8708,365 +8718,6 @@
           <a:lstStyle/>
           <a:p>
             <a:endParaRPr lang="en-US" sz="2100" dirty="0"/>
-          </a:p>
-        </p:txBody>
-      </p:sp>
-      <p:grpSp>
-        <p:nvGrpSpPr>
-          <p:cNvPr id="77" name="Group 76">
-            <a:extLst>
-              <a:ext uri="{FF2B5EF4-FFF2-40B4-BE49-F238E27FC236}">
-                <a16:creationId xmlns:a16="http://schemas.microsoft.com/office/drawing/2014/main" id="{0CC57C46-4659-4AF2-9180-2DEED214CDD7}"/>
-              </a:ext>
-              <a:ext uri="{C183D7F6-B498-43B3-948B-1728B52AA6E4}">
-                <adec:decorative xmlns:adec="http://schemas.microsoft.com/office/drawing/2017/decorative" val="1"/>
-              </a:ext>
-            </a:extLst>
-          </p:cNvPr>
-          <p:cNvGrpSpPr>
-            <a:grpSpLocks noGrp="1" noUngrp="1" noRot="1" noChangeAspect="1" noMove="1" noResize="1"/>
-          </p:cNvGrpSpPr>
-          <p:nvPr>
-            <p:extLst>
-              <p:ext uri="{386F3935-93C4-4BCD-93E2-E3B085C9AB24}">
-                <p16:designElem xmlns:p16="http://schemas.microsoft.com/office/powerpoint/2015/main" val="1"/>
-              </p:ext>
-            </p:extLst>
-          </p:nvPr>
-        </p:nvGrpSpPr>
-        <p:grpSpPr>
-          <a:xfrm>
-            <a:off x="9206969" y="2963333"/>
-            <a:ext cx="2981858" cy="3208867"/>
-            <a:chOff x="9206969" y="2963333"/>
-            <a:chExt cx="2981858" cy="3208867"/>
-          </a:xfrm>
-        </p:grpSpPr>
-        <p:cxnSp>
-          <p:nvCxnSpPr>
-            <p:cNvPr id="78" name="Straight Connector 77">
-              <a:extLst>
-                <a:ext uri="{FF2B5EF4-FFF2-40B4-BE49-F238E27FC236}">
-                  <a16:creationId xmlns:a16="http://schemas.microsoft.com/office/drawing/2014/main" id="{CFB52317-0F00-40C0-B1F2-33ED6D30D97A}"/>
-                </a:ext>
-                <a:ext uri="{C183D7F6-B498-43B3-948B-1728B52AA6E4}">
-                  <adec:decorative xmlns:adec="http://schemas.microsoft.com/office/drawing/2017/decorative" val="1"/>
-                </a:ext>
-              </a:extLst>
-            </p:cNvPr>
-            <p:cNvCxnSpPr/>
-            <p:nvPr>
-              <p:extLst>
-                <p:ext uri="{386F3935-93C4-4BCD-93E2-E3B085C9AB24}">
-                  <p16:designElem xmlns:p16="http://schemas.microsoft.com/office/powerpoint/2015/main" val="1"/>
-                </p:ext>
-              </p:extLst>
-            </p:nvPr>
-          </p:nvCxnSpPr>
-          <p:spPr>
-            <a:xfrm flipH="1">
-              <a:off x="11276012" y="2963333"/>
-              <a:ext cx="912814" cy="912812"/>
-            </a:xfrm>
-            <a:prstGeom prst="line">
-              <a:avLst/>
-            </a:prstGeom>
-            <a:ln w="9525">
-              <a:solidFill>
-                <a:schemeClr val="tx1"/>
-              </a:solidFill>
-            </a:ln>
-          </p:spPr>
-          <p:style>
-            <a:lnRef idx="2">
-              <a:schemeClr val="accent1"/>
-            </a:lnRef>
-            <a:fillRef idx="0">
-              <a:schemeClr val="accent1"/>
-            </a:fillRef>
-            <a:effectRef idx="1">
-              <a:schemeClr val="accent1"/>
-            </a:effectRef>
-            <a:fontRef idx="minor">
-              <a:schemeClr val="tx1"/>
-            </a:fontRef>
-          </p:style>
-        </p:cxnSp>
-        <p:cxnSp>
-          <p:nvCxnSpPr>
-            <p:cNvPr id="79" name="Straight Connector 78">
-              <a:extLst>
-                <a:ext uri="{FF2B5EF4-FFF2-40B4-BE49-F238E27FC236}">
-                  <a16:creationId xmlns:a16="http://schemas.microsoft.com/office/drawing/2014/main" id="{2468ACF9-4EF2-4251-9FAD-3F225BF7417D}"/>
-                </a:ext>
-                <a:ext uri="{C183D7F6-B498-43B3-948B-1728B52AA6E4}">
-                  <adec:decorative xmlns:adec="http://schemas.microsoft.com/office/drawing/2017/decorative" val="1"/>
-                </a:ext>
-              </a:extLst>
-            </p:cNvPr>
-            <p:cNvCxnSpPr/>
-            <p:nvPr>
-              <p:extLst>
-                <p:ext uri="{386F3935-93C4-4BCD-93E2-E3B085C9AB24}">
-                  <p16:designElem xmlns:p16="http://schemas.microsoft.com/office/powerpoint/2015/main" val="1"/>
-                </p:ext>
-              </p:extLst>
-            </p:nvPr>
-          </p:nvCxnSpPr>
-          <p:spPr>
-            <a:xfrm flipH="1">
-              <a:off x="9206969" y="3190344"/>
-              <a:ext cx="2981857" cy="2981856"/>
-            </a:xfrm>
-            <a:prstGeom prst="line">
-              <a:avLst/>
-            </a:prstGeom>
-            <a:ln w="9525">
-              <a:solidFill>
-                <a:schemeClr val="tx1"/>
-              </a:solidFill>
-            </a:ln>
-          </p:spPr>
-          <p:style>
-            <a:lnRef idx="2">
-              <a:schemeClr val="accent1"/>
-            </a:lnRef>
-            <a:fillRef idx="0">
-              <a:schemeClr val="accent1"/>
-            </a:fillRef>
-            <a:effectRef idx="1">
-              <a:schemeClr val="accent1"/>
-            </a:effectRef>
-            <a:fontRef idx="minor">
-              <a:schemeClr val="tx1"/>
-            </a:fontRef>
-          </p:style>
-        </p:cxnSp>
-        <p:cxnSp>
-          <p:nvCxnSpPr>
-            <p:cNvPr id="80" name="Straight Connector 79">
-              <a:extLst>
-                <a:ext uri="{FF2B5EF4-FFF2-40B4-BE49-F238E27FC236}">
-                  <a16:creationId xmlns:a16="http://schemas.microsoft.com/office/drawing/2014/main" id="{CE4A3ECD-6924-4912-B117-3C617B584BCF}"/>
-                </a:ext>
-                <a:ext uri="{C183D7F6-B498-43B3-948B-1728B52AA6E4}">
-                  <adec:decorative xmlns:adec="http://schemas.microsoft.com/office/drawing/2017/decorative" val="1"/>
-                </a:ext>
-              </a:extLst>
-            </p:cNvPr>
-            <p:cNvCxnSpPr/>
-            <p:nvPr>
-              <p:extLst>
-                <p:ext uri="{386F3935-93C4-4BCD-93E2-E3B085C9AB24}">
-                  <p16:designElem xmlns:p16="http://schemas.microsoft.com/office/powerpoint/2015/main" val="1"/>
-                </p:ext>
-              </p:extLst>
-            </p:nvPr>
-          </p:nvCxnSpPr>
-          <p:spPr>
-            <a:xfrm flipH="1">
-              <a:off x="10292292" y="3285067"/>
-              <a:ext cx="1896534" cy="1896533"/>
-            </a:xfrm>
-            <a:prstGeom prst="line">
-              <a:avLst/>
-            </a:prstGeom>
-            <a:ln w="9525">
-              <a:solidFill>
-                <a:schemeClr val="tx1"/>
-              </a:solidFill>
-            </a:ln>
-          </p:spPr>
-          <p:style>
-            <a:lnRef idx="2">
-              <a:schemeClr val="accent1"/>
-            </a:lnRef>
-            <a:fillRef idx="0">
-              <a:schemeClr val="accent1"/>
-            </a:fillRef>
-            <a:effectRef idx="1">
-              <a:schemeClr val="accent1"/>
-            </a:effectRef>
-            <a:fontRef idx="minor">
-              <a:schemeClr val="tx1"/>
-            </a:fontRef>
-          </p:style>
-        </p:cxnSp>
-        <p:cxnSp>
-          <p:nvCxnSpPr>
-            <p:cNvPr id="81" name="Straight Connector 80">
-              <a:extLst>
-                <a:ext uri="{FF2B5EF4-FFF2-40B4-BE49-F238E27FC236}">
-                  <a16:creationId xmlns:a16="http://schemas.microsoft.com/office/drawing/2014/main" id="{D1DFE1F5-FA7A-403F-B9D9-0434E2BE2F5B}"/>
-                </a:ext>
-                <a:ext uri="{C183D7F6-B498-43B3-948B-1728B52AA6E4}">
-                  <adec:decorative xmlns:adec="http://schemas.microsoft.com/office/drawing/2017/decorative" val="1"/>
-                </a:ext>
-              </a:extLst>
-            </p:cNvPr>
-            <p:cNvCxnSpPr/>
-            <p:nvPr>
-              <p:extLst>
-                <p:ext uri="{386F3935-93C4-4BCD-93E2-E3B085C9AB24}">
-                  <p16:designElem xmlns:p16="http://schemas.microsoft.com/office/powerpoint/2015/main" val="1"/>
-                </p:ext>
-              </p:extLst>
-            </p:nvPr>
-          </p:nvCxnSpPr>
-          <p:spPr>
-            <a:xfrm flipH="1">
-              <a:off x="10443103" y="3131080"/>
-              <a:ext cx="1745722" cy="1745720"/>
-            </a:xfrm>
-            <a:prstGeom prst="line">
-              <a:avLst/>
-            </a:prstGeom>
-            <a:ln w="28575">
-              <a:solidFill>
-                <a:schemeClr val="tx1"/>
-              </a:solidFill>
-            </a:ln>
-          </p:spPr>
-          <p:style>
-            <a:lnRef idx="2">
-              <a:schemeClr val="accent1"/>
-            </a:lnRef>
-            <a:fillRef idx="0">
-              <a:schemeClr val="accent1"/>
-            </a:fillRef>
-            <a:effectRef idx="1">
-              <a:schemeClr val="accent1"/>
-            </a:effectRef>
-            <a:fontRef idx="minor">
-              <a:schemeClr val="tx1"/>
-            </a:fontRef>
-          </p:style>
-        </p:cxnSp>
-        <p:cxnSp>
-          <p:nvCxnSpPr>
-            <p:cNvPr id="82" name="Straight Connector 81">
-              <a:extLst>
-                <a:ext uri="{FF2B5EF4-FFF2-40B4-BE49-F238E27FC236}">
-                  <a16:creationId xmlns:a16="http://schemas.microsoft.com/office/drawing/2014/main" id="{92CF27E4-09D0-444E-B18D-F90487103863}"/>
-                </a:ext>
-                <a:ext uri="{C183D7F6-B498-43B3-948B-1728B52AA6E4}">
-                  <adec:decorative xmlns:adec="http://schemas.microsoft.com/office/drawing/2017/decorative" val="1"/>
-                </a:ext>
-              </a:extLst>
-            </p:cNvPr>
-            <p:cNvCxnSpPr/>
-            <p:nvPr>
-              <p:extLst>
-                <p:ext uri="{386F3935-93C4-4BCD-93E2-E3B085C9AB24}">
-                  <p16:designElem xmlns:p16="http://schemas.microsoft.com/office/powerpoint/2015/main" val="1"/>
-                </p:ext>
-              </p:extLst>
-            </p:nvPr>
-          </p:nvCxnSpPr>
-          <p:spPr>
-            <a:xfrm flipH="1">
-              <a:off x="10918826" y="3683001"/>
-              <a:ext cx="1270001" cy="1269999"/>
-            </a:xfrm>
-            <a:prstGeom prst="line">
-              <a:avLst/>
-            </a:prstGeom>
-            <a:ln w="28575">
-              <a:solidFill>
-                <a:schemeClr val="tx1"/>
-              </a:solidFill>
-            </a:ln>
-          </p:spPr>
-          <p:style>
-            <a:lnRef idx="2">
-              <a:schemeClr val="accent1"/>
-            </a:lnRef>
-            <a:fillRef idx="0">
-              <a:schemeClr val="accent1"/>
-            </a:fillRef>
-            <a:effectRef idx="1">
-              <a:schemeClr val="accent1"/>
-            </a:effectRef>
-            <a:fontRef idx="minor">
-              <a:schemeClr val="tx1"/>
-            </a:fontRef>
-          </p:style>
-        </p:cxnSp>
-      </p:grpSp>
-      <p:sp>
-        <p:nvSpPr>
-          <p:cNvPr id="84" name="Snip Diagonal Corner Rectangle 12">
-            <a:extLst>
-              <a:ext uri="{FF2B5EF4-FFF2-40B4-BE49-F238E27FC236}">
-                <a16:creationId xmlns:a16="http://schemas.microsoft.com/office/drawing/2014/main" id="{FDAF26D5-7469-49F5-902D-571FA58A7EEE}"/>
-              </a:ext>
-              <a:ext uri="{C183D7F6-B498-43B3-948B-1728B52AA6E4}">
-                <adec:decorative xmlns:adec="http://schemas.microsoft.com/office/drawing/2017/decorative" val="1"/>
-              </a:ext>
-            </a:extLst>
-          </p:cNvPr>
-          <p:cNvSpPr>
-            <a:spLocks noGrp="1" noRot="1" noChangeAspect="1" noMove="1" noResize="1" noEditPoints="1" noAdjustHandles="1" noChangeArrowheads="1" noChangeShapeType="1" noTextEdit="1"/>
-          </p:cNvSpPr>
-          <p:nvPr>
-            <p:extLst>
-              <p:ext uri="{386F3935-93C4-4BCD-93E2-E3B085C9AB24}">
-                <p16:designElem xmlns:p16="http://schemas.microsoft.com/office/powerpoint/2015/main" val="1"/>
-              </p:ext>
-            </p:extLst>
-          </p:nvPr>
-        </p:nvSpPr>
-        <p:spPr>
-          <a:xfrm>
-            <a:off x="672251" y="690851"/>
-            <a:ext cx="9615670" cy="3584587"/>
-          </a:xfrm>
-          <a:prstGeom prst="snip2DiagRect">
-            <a:avLst>
-              <a:gd name="adj1" fmla="val 12305"/>
-              <a:gd name="adj2" fmla="val 0"/>
-            </a:avLst>
-          </a:prstGeom>
-          <a:solidFill>
-            <a:schemeClr val="tx1"/>
-          </a:solidFill>
-          <a:ln>
-            <a:solidFill>
-              <a:srgbClr val="FFFFFF">
-                <a:alpha val="40000"/>
-              </a:srgbClr>
-            </a:solidFill>
-          </a:ln>
-          <a:effectLst>
-            <a:innerShdw blurRad="57150" dist="38100" dir="14460000">
-              <a:prstClr val="black">
-                <a:alpha val="70000"/>
-              </a:prstClr>
-            </a:innerShdw>
-          </a:effectLst>
-        </p:spPr>
-        <p:style>
-          <a:lnRef idx="2">
-            <a:schemeClr val="accent1">
-              <a:shade val="50000"/>
-            </a:schemeClr>
-          </a:lnRef>
-          <a:fillRef idx="1">
-            <a:schemeClr val="accent1"/>
-          </a:fillRef>
-          <a:effectRef idx="0">
-            <a:schemeClr val="accent1"/>
-          </a:effectRef>
-          <a:fontRef idx="minor">
-            <a:schemeClr val="lt1"/>
-          </a:fontRef>
-        </p:style>
-        <p:txBody>
-          <a:bodyPr rtlCol="0" anchor="ctr"/>
-          <a:lstStyle/>
-          <a:p>
-            <a:pPr algn="ctr"/>
-            <a:endParaRPr lang="en-US"/>
           </a:p>
         </p:txBody>
       </p:sp>

</xml_diff>

<commit_message>
Tori report updates and ppt edits
</commit_message>
<xml_diff>
--- a/Attrition_Case_Study_2_pptx_TAJAR_IP.pptx
+++ b/Attrition_Case_Study_2_pptx_TAJAR_IP.pptx
@@ -5,14 +5,14 @@
     <p:sldMasterId id="2147483648" r:id="rId1"/>
   </p:sldMasterIdLst>
   <p:notesMasterIdLst>
-    <p:notesMasterId r:id="rId15"/>
+    <p:notesMasterId r:id="rId16"/>
   </p:notesMasterIdLst>
   <p:sldIdLst>
     <p:sldId id="256" r:id="rId2"/>
     <p:sldId id="265" r:id="rId3"/>
-    <p:sldId id="266" r:id="rId4"/>
-    <p:sldId id="258" r:id="rId5"/>
-    <p:sldId id="259" r:id="rId6"/>
+    <p:sldId id="258" r:id="rId4"/>
+    <p:sldId id="259" r:id="rId5"/>
+    <p:sldId id="270" r:id="rId6"/>
     <p:sldId id="260" r:id="rId7"/>
     <p:sldId id="261" r:id="rId8"/>
     <p:sldId id="262" r:id="rId9"/>
@@ -20,7 +20,8 @@
     <p:sldId id="269" r:id="rId11"/>
     <p:sldId id="268" r:id="rId12"/>
     <p:sldId id="263" r:id="rId13"/>
-    <p:sldId id="267" r:id="rId14"/>
+    <p:sldId id="271" r:id="rId14"/>
+    <p:sldId id="267" r:id="rId15"/>
   </p:sldIdLst>
   <p:sldSz cx="12192000" cy="6858000"/>
   <p:notesSz cx="6858000" cy="9144000"/>
@@ -209,7 +210,7 @@
           <a:p>
             <a:fld id="{380F82E0-DA90-F642-BDF9-D28F7CF5A168}" type="datetimeFigureOut">
               <a:rPr lang="en-US" smtClean="0"/>
-              <a:t>8/5/2018</a:t>
+              <a:t>8/5/18</a:t>
             </a:fld>
             <a:endParaRPr lang="en-US"/>
           </a:p>
@@ -668,7 +669,7 @@
             <a:fld id="{B61BEF0D-F0BB-DE4B-95CE-6DB70DBA9567}" type="datetimeFigureOut">
               <a:rPr lang="en-US" dirty="0"/>
               <a:pPr/>
-              <a:t>8/5/2018</a:t>
+              <a:t>8/5/18</a:t>
             </a:fld>
             <a:endParaRPr lang="en-US" dirty="0"/>
           </a:p>
@@ -1101,7 +1102,7 @@
             <a:fld id="{B61BEF0D-F0BB-DE4B-95CE-6DB70DBA9567}" type="datetimeFigureOut">
               <a:rPr lang="en-US" dirty="0"/>
               <a:pPr/>
-              <a:t>8/5/2018</a:t>
+              <a:t>8/5/18</a:t>
             </a:fld>
             <a:endParaRPr lang="en-US" dirty="0"/>
           </a:p>
@@ -1348,7 +1349,7 @@
             <a:fld id="{B61BEF0D-F0BB-DE4B-95CE-6DB70DBA9567}" type="datetimeFigureOut">
               <a:rPr lang="en-US" dirty="0"/>
               <a:pPr/>
-              <a:t>8/5/2018</a:t>
+              <a:t>8/5/18</a:t>
             </a:fld>
             <a:endParaRPr lang="en-US" dirty="0"/>
           </a:p>
@@ -1653,7 +1654,7 @@
             <a:fld id="{B61BEF0D-F0BB-DE4B-95CE-6DB70DBA9567}" type="datetimeFigureOut">
               <a:rPr lang="en-US" dirty="0"/>
               <a:pPr/>
-              <a:t>8/5/2018</a:t>
+              <a:t>8/5/18</a:t>
             </a:fld>
             <a:endParaRPr lang="en-US" dirty="0"/>
           </a:p>
@@ -1968,7 +1969,7 @@
             <a:fld id="{B61BEF0D-F0BB-DE4B-95CE-6DB70DBA9567}" type="datetimeFigureOut">
               <a:rPr lang="en-US" dirty="0"/>
               <a:pPr/>
-              <a:t>8/5/2018</a:t>
+              <a:t>8/5/18</a:t>
             </a:fld>
             <a:endParaRPr lang="en-US" dirty="0"/>
           </a:p>
@@ -2267,7 +2268,7 @@
             <a:fld id="{B61BEF0D-F0BB-DE4B-95CE-6DB70DBA9567}" type="datetimeFigureOut">
               <a:rPr lang="en-US" dirty="0"/>
               <a:pPr/>
-              <a:t>8/5/2018</a:t>
+              <a:t>8/5/18</a:t>
             </a:fld>
             <a:endParaRPr lang="en-US" dirty="0"/>
           </a:p>
@@ -2631,7 +2632,7 @@
             <a:fld id="{B61BEF0D-F0BB-DE4B-95CE-6DB70DBA9567}" type="datetimeFigureOut">
               <a:rPr lang="en-US" dirty="0"/>
               <a:pPr/>
-              <a:t>8/5/2018</a:t>
+              <a:t>8/5/18</a:t>
             </a:fld>
             <a:endParaRPr lang="en-US" dirty="0"/>
           </a:p>
@@ -2802,7 +2803,7 @@
             <a:fld id="{B61BEF0D-F0BB-DE4B-95CE-6DB70DBA9567}" type="datetimeFigureOut">
               <a:rPr lang="en-US" dirty="0"/>
               <a:pPr/>
-              <a:t>8/5/2018</a:t>
+              <a:t>8/5/18</a:t>
             </a:fld>
             <a:endParaRPr lang="en-US" dirty="0"/>
           </a:p>
@@ -2979,7 +2980,7 @@
             <a:fld id="{B61BEF0D-F0BB-DE4B-95CE-6DB70DBA9567}" type="datetimeFigureOut">
               <a:rPr lang="en-US" dirty="0"/>
               <a:pPr/>
-              <a:t>8/5/2018</a:t>
+              <a:t>8/5/18</a:t>
             </a:fld>
             <a:endParaRPr lang="en-US" dirty="0"/>
           </a:p>
@@ -3146,7 +3147,7 @@
             <a:fld id="{B61BEF0D-F0BB-DE4B-95CE-6DB70DBA9567}" type="datetimeFigureOut">
               <a:rPr lang="en-US" dirty="0"/>
               <a:pPr/>
-              <a:t>8/5/2018</a:t>
+              <a:t>8/5/18</a:t>
             </a:fld>
             <a:endParaRPr lang="en-US" dirty="0"/>
           </a:p>
@@ -3393,7 +3394,7 @@
             <a:fld id="{B61BEF0D-F0BB-DE4B-95CE-6DB70DBA9567}" type="datetimeFigureOut">
               <a:rPr lang="en-US" dirty="0"/>
               <a:pPr/>
-              <a:t>8/5/2018</a:t>
+              <a:t>8/5/18</a:t>
             </a:fld>
             <a:endParaRPr lang="en-US" dirty="0"/>
           </a:p>
@@ -3626,7 +3627,7 @@
             <a:fld id="{B61BEF0D-F0BB-DE4B-95CE-6DB70DBA9567}" type="datetimeFigureOut">
               <a:rPr lang="en-US" dirty="0"/>
               <a:pPr/>
-              <a:t>8/5/2018</a:t>
+              <a:t>8/5/18</a:t>
             </a:fld>
             <a:endParaRPr lang="en-US" dirty="0"/>
           </a:p>
@@ -4005,7 +4006,7 @@
             <a:fld id="{B61BEF0D-F0BB-DE4B-95CE-6DB70DBA9567}" type="datetimeFigureOut">
               <a:rPr lang="en-US" dirty="0"/>
               <a:pPr/>
-              <a:t>8/5/2018</a:t>
+              <a:t>8/5/18</a:t>
             </a:fld>
             <a:endParaRPr lang="en-US" dirty="0"/>
           </a:p>
@@ -4120,7 +4121,7 @@
             <a:fld id="{B61BEF0D-F0BB-DE4B-95CE-6DB70DBA9567}" type="datetimeFigureOut">
               <a:rPr lang="en-US" dirty="0"/>
               <a:pPr/>
-              <a:t>8/5/2018</a:t>
+              <a:t>8/5/18</a:t>
             </a:fld>
             <a:endParaRPr lang="en-US" dirty="0"/>
           </a:p>
@@ -4212,7 +4213,7 @@
             <a:fld id="{B61BEF0D-F0BB-DE4B-95CE-6DB70DBA9567}" type="datetimeFigureOut">
               <a:rPr lang="en-US" dirty="0"/>
               <a:pPr/>
-              <a:t>8/5/2018</a:t>
+              <a:t>8/5/18</a:t>
             </a:fld>
             <a:endParaRPr lang="en-US" dirty="0"/>
           </a:p>
@@ -4464,7 +4465,7 @@
             <a:fld id="{B61BEF0D-F0BB-DE4B-95CE-6DB70DBA9567}" type="datetimeFigureOut">
               <a:rPr lang="en-US" dirty="0"/>
               <a:pPr/>
-              <a:t>8/5/2018</a:t>
+              <a:t>8/5/18</a:t>
             </a:fld>
             <a:endParaRPr lang="en-US" dirty="0"/>
           </a:p>
@@ -4744,7 +4745,7 @@
             <a:fld id="{B61BEF0D-F0BB-DE4B-95CE-6DB70DBA9567}" type="datetimeFigureOut">
               <a:rPr lang="en-US" dirty="0"/>
               <a:pPr/>
-              <a:t>8/5/2018</a:t>
+              <a:t>8/5/18</a:t>
             </a:fld>
             <a:endParaRPr lang="en-US" dirty="0"/>
           </a:p>
@@ -5147,7 +5148,7 @@
             <a:fld id="{B61BEF0D-F0BB-DE4B-95CE-6DB70DBA9567}" type="datetimeFigureOut">
               <a:rPr lang="en-US" dirty="0"/>
               <a:pPr/>
-              <a:t>8/5/2018</a:t>
+              <a:t>8/5/18</a:t>
             </a:fld>
             <a:endParaRPr lang="en-US" dirty="0"/>
           </a:p>
@@ -6097,12 +6098,12 @@
           <a:lstStyle/>
           <a:p>
             <a:r>
-              <a:rPr lang="en-US"/>
-              <a:t>Tell me about any job role specific trends that may exist in the data set</a:t>
-            </a:r>
-          </a:p>
-          <a:p>
-            <a:endParaRPr lang="en-US"/>
+              <a:rPr lang="en-US" dirty="0"/>
+              <a:t>“Tell me about any job role specific trends that may exist in the data set”</a:t>
+            </a:r>
+          </a:p>
+          <a:p>
+            <a:endParaRPr lang="en-US" dirty="0"/>
           </a:p>
         </p:txBody>
       </p:sp>
@@ -6241,7 +6242,18 @@
             </a:r>
           </a:p>
           <a:p>
-            <a:endParaRPr lang="en-US" dirty="0"/>
+            <a:r>
+              <a:rPr lang="en-US" dirty="0"/>
+              <a:t>Make sure this conclusion and the conclusion in the </a:t>
+            </a:r>
+            <a:r>
+              <a:rPr lang="en-US" dirty="0" err="1"/>
+              <a:t>rmd</a:t>
+            </a:r>
+            <a:r>
+              <a:rPr lang="en-US" dirty="0"/>
+              <a:t> match.</a:t>
+            </a:r>
           </a:p>
           <a:p>
             <a:endParaRPr lang="en-US" dirty="0"/>
@@ -6325,6 +6337,158 @@
       </p:grpSpPr>
       <p:sp>
         <p:nvSpPr>
+          <p:cNvPr id="2" name="Title 1"/>
+          <p:cNvSpPr>
+            <a:spLocks noGrp="1"/>
+          </p:cNvSpPr>
+          <p:nvPr>
+            <p:ph type="title"/>
+          </p:nvPr>
+        </p:nvSpPr>
+        <p:spPr>
+          <a:xfrm>
+            <a:off x="557211" y="342900"/>
+            <a:ext cx="8534401" cy="685800"/>
+          </a:xfrm>
+        </p:spPr>
+        <p:txBody>
+          <a:bodyPr/>
+          <a:lstStyle/>
+          <a:p>
+            <a:r>
+              <a:rPr lang="en-US" dirty="0"/>
+              <a:t>CURIOUS? WANT TO LEARN MORE?</a:t>
+            </a:r>
+          </a:p>
+        </p:txBody>
+      </p:sp>
+      <p:sp>
+        <p:nvSpPr>
+          <p:cNvPr id="4" name="TextBox 3"/>
+          <p:cNvSpPr txBox="1"/>
+          <p:nvPr/>
+        </p:nvSpPr>
+        <p:spPr>
+          <a:xfrm>
+            <a:off x="557211" y="1152395"/>
+            <a:ext cx="9725438" cy="1323439"/>
+          </a:xfrm>
+          <a:prstGeom prst="rect">
+            <a:avLst/>
+          </a:prstGeom>
+          <a:noFill/>
+        </p:spPr>
+        <p:txBody>
+          <a:bodyPr wrap="square" rtlCol="0">
+            <a:spAutoFit/>
+          </a:bodyPr>
+          <a:lstStyle/>
+          <a:p>
+            <a:r>
+              <a:rPr lang="en-US" sz="2000" dirty="0">
+                <a:solidFill>
+                  <a:srgbClr val="002060"/>
+                </a:solidFill>
+              </a:rPr>
+              <a:t>The data, and information on our code, our full report, and our methods can be </a:t>
+            </a:r>
+            <a:r>
+              <a:rPr lang="en-US" sz="2000">
+                <a:solidFill>
+                  <a:srgbClr val="002060"/>
+                </a:solidFill>
+              </a:rPr>
+              <a:t>found online at:</a:t>
+            </a:r>
+            <a:endParaRPr lang="en-US" sz="2000" dirty="0">
+              <a:solidFill>
+                <a:srgbClr val="002060"/>
+              </a:solidFill>
+            </a:endParaRPr>
+          </a:p>
+          <a:p>
+            <a:endParaRPr lang="en-US" sz="2000" dirty="0">
+              <a:solidFill>
+                <a:srgbClr val="002060"/>
+              </a:solidFill>
+            </a:endParaRPr>
+          </a:p>
+          <a:p>
+            <a:r>
+              <a:rPr lang="en-US" sz="2000" dirty="0">
+                <a:solidFill>
+                  <a:srgbClr val="002060"/>
+                </a:solidFill>
+              </a:rPr>
+              <a:t> https://</a:t>
+            </a:r>
+            <a:r>
+              <a:rPr lang="en-US" sz="2000" dirty="0" err="1">
+                <a:solidFill>
+                  <a:srgbClr val="002060"/>
+                </a:solidFill>
+              </a:rPr>
+              <a:t>github.com</a:t>
+            </a:r>
+            <a:r>
+              <a:rPr lang="en-US" sz="2000" dirty="0">
+                <a:solidFill>
+                  <a:srgbClr val="002060"/>
+                </a:solidFill>
+              </a:rPr>
+              <a:t>/R-</a:t>
+            </a:r>
+            <a:r>
+              <a:rPr lang="en-US" sz="2000" dirty="0" err="1">
+                <a:solidFill>
+                  <a:srgbClr val="002060"/>
+                </a:solidFill>
+              </a:rPr>
+              <a:t>Chandna</a:t>
+            </a:r>
+            <a:r>
+              <a:rPr lang="en-US" sz="2000" dirty="0">
+                <a:solidFill>
+                  <a:srgbClr val="002060"/>
+                </a:solidFill>
+              </a:rPr>
+              <a:t>/MSDS6306_CaseStudy_2.git</a:t>
+            </a:r>
+          </a:p>
+        </p:txBody>
+      </p:sp>
+    </p:spTree>
+    <p:extLst>
+      <p:ext uri="{BB962C8B-B14F-4D97-AF65-F5344CB8AC3E}">
+        <p14:creationId xmlns:p14="http://schemas.microsoft.com/office/powerpoint/2010/main" val="1926449743"/>
+      </p:ext>
+    </p:extLst>
+  </p:cSld>
+  <p:clrMapOvr>
+    <a:masterClrMapping/>
+  </p:clrMapOvr>
+</p:sld>
+</file>
+
+<file path=ppt/slides/slide14.xml><?xml version="1.0" encoding="utf-8"?>
+<p:sld xmlns:a="http://schemas.openxmlformats.org/drawingml/2006/main" xmlns:r="http://schemas.openxmlformats.org/officeDocument/2006/relationships" xmlns:p="http://schemas.openxmlformats.org/presentationml/2006/main">
+  <p:cSld>
+    <p:spTree>
+      <p:nvGrpSpPr>
+        <p:cNvPr id="1" name=""/>
+        <p:cNvGrpSpPr/>
+        <p:nvPr/>
+      </p:nvGrpSpPr>
+      <p:grpSpPr>
+        <a:xfrm>
+          <a:off x="0" y="0"/>
+          <a:ext cx="0" cy="0"/>
+          <a:chOff x="0" y="0"/>
+          <a:chExt cx="0" cy="0"/>
+        </a:xfrm>
+      </p:grpSpPr>
+      <p:sp>
+        <p:nvSpPr>
           <p:cNvPr id="2" name="Title 1">
             <a:extLst>
               <a:ext uri="{FF2B5EF4-FFF2-40B4-BE49-F238E27FC236}">
@@ -6461,14 +6625,14 @@
             <a:pPr lvl="1"/>
             <a:r>
               <a:rPr lang="en-US" dirty="0"/>
-              <a:t>Business Objectives</a:t>
+              <a:t>Introduction/Business Objectives</a:t>
             </a:r>
           </a:p>
           <a:p>
             <a:pPr lvl="1"/>
             <a:r>
               <a:rPr lang="en-US" dirty="0"/>
-              <a:t>Data Sourced</a:t>
+              <a:t>Data Source/Demographics</a:t>
             </a:r>
           </a:p>
           <a:p>
@@ -6529,13 +6693,7 @@
       </p:grpSpPr>
       <p:sp>
         <p:nvSpPr>
-          <p:cNvPr id="2" name="Title 1">
-            <a:extLst>
-              <a:ext uri="{FF2B5EF4-FFF2-40B4-BE49-F238E27FC236}">
-                <a16:creationId xmlns:a16="http://schemas.microsoft.com/office/drawing/2014/main" id="{982A457D-742A-E247-8915-287DC6F3CDA9}"/>
-              </a:ext>
-            </a:extLst>
-          </p:cNvPr>
+          <p:cNvPr id="2" name="Title 1"/>
           <p:cNvSpPr>
             <a:spLocks noGrp="1"/>
           </p:cNvSpPr>
@@ -6543,47 +6701,178 @@
             <p:ph type="title"/>
           </p:nvPr>
         </p:nvSpPr>
-        <p:spPr/>
+        <p:spPr>
+          <a:xfrm>
+            <a:off x="557211" y="342900"/>
+            <a:ext cx="8534401" cy="685800"/>
+          </a:xfrm>
+        </p:spPr>
         <p:txBody>
           <a:bodyPr/>
           <a:lstStyle/>
           <a:p>
             <a:r>
               <a:rPr lang="en-US" dirty="0"/>
-              <a:t>Business Objectives</a:t>
-            </a:r>
-          </a:p>
-        </p:txBody>
-      </p:sp>
-      <p:sp>
-        <p:nvSpPr>
-          <p:cNvPr id="3" name="Content Placeholder 2">
-            <a:extLst>
-              <a:ext uri="{FF2B5EF4-FFF2-40B4-BE49-F238E27FC236}">
-                <a16:creationId xmlns:a16="http://schemas.microsoft.com/office/drawing/2014/main" id="{A15B24DE-26E8-9345-8B43-FB639EAE0686}"/>
-              </a:ext>
-            </a:extLst>
-          </p:cNvPr>
-          <p:cNvSpPr>
-            <a:spLocks noGrp="1"/>
-          </p:cNvSpPr>
-          <p:nvPr>
-            <p:ph idx="1"/>
-          </p:nvPr>
-        </p:nvSpPr>
-        <p:spPr/>
-        <p:txBody>
-          <a:bodyPr/>
-          <a:lstStyle/>
-          <a:p>
-            <a:endParaRPr lang="en-US"/>
+              <a:t>Introduction/OBJECTIVES</a:t>
+            </a:r>
+          </a:p>
+        </p:txBody>
+      </p:sp>
+      <p:sp>
+        <p:nvSpPr>
+          <p:cNvPr id="4" name="TextBox 3"/>
+          <p:cNvSpPr txBox="1"/>
+          <p:nvPr/>
+        </p:nvSpPr>
+        <p:spPr>
+          <a:xfrm>
+            <a:off x="557211" y="1152395"/>
+            <a:ext cx="9725438" cy="1323439"/>
+          </a:xfrm>
+          <a:prstGeom prst="rect">
+            <a:avLst/>
+          </a:prstGeom>
+          <a:noFill/>
+        </p:spPr>
+        <p:txBody>
+          <a:bodyPr wrap="square" rtlCol="0">
+            <a:spAutoFit/>
+          </a:bodyPr>
+          <a:lstStyle/>
+          <a:p>
+            <a:r>
+              <a:rPr lang="en-US" sz="2000" dirty="0">
+                <a:solidFill>
+                  <a:srgbClr val="002060"/>
+                </a:solidFill>
+              </a:rPr>
+              <a:t>Attrition comes as a high cost to companies.  The cost of interviewing, training, productivity, and negative impacts on morale are just a few.  </a:t>
+            </a:r>
+          </a:p>
+          <a:p>
+            <a:endParaRPr lang="en-US" sz="2000" dirty="0">
+              <a:solidFill>
+                <a:srgbClr val="002060"/>
+              </a:solidFill>
+            </a:endParaRPr>
+          </a:p>
+          <a:p>
+            <a:r>
+              <a:rPr lang="en-US" sz="2000" dirty="0">
+                <a:solidFill>
+                  <a:srgbClr val="002060"/>
+                </a:solidFill>
+              </a:rPr>
+              <a:t>This report will focus on the following based on our analysis:  </a:t>
+            </a:r>
+          </a:p>
+        </p:txBody>
+      </p:sp>
+      <p:sp>
+        <p:nvSpPr>
+          <p:cNvPr id="7" name="TextBox 6"/>
+          <p:cNvSpPr txBox="1"/>
+          <p:nvPr/>
+        </p:nvSpPr>
+        <p:spPr>
+          <a:xfrm>
+            <a:off x="1625600" y="2912533"/>
+            <a:ext cx="6908800" cy="2677656"/>
+          </a:xfrm>
+          <a:prstGeom prst="rect">
+            <a:avLst/>
+          </a:prstGeom>
+          <a:noFill/>
+        </p:spPr>
+        <p:txBody>
+          <a:bodyPr wrap="square" rtlCol="0">
+            <a:spAutoFit/>
+          </a:bodyPr>
+          <a:lstStyle/>
+          <a:p>
+            <a:pPr marL="285750" indent="-285750">
+              <a:buFont typeface="Arial" charset="0"/>
+              <a:buChar char="•"/>
+            </a:pPr>
+            <a:r>
+              <a:rPr lang="en-US" sz="2400" dirty="0">
+                <a:solidFill>
+                  <a:srgbClr val="002060"/>
+                </a:solidFill>
+              </a:rPr>
+              <a:t>The top 3 factors that contribute to attrition</a:t>
+            </a:r>
+          </a:p>
+          <a:p>
+            <a:pPr marL="285750" indent="-285750">
+              <a:buFont typeface="Arial" charset="0"/>
+              <a:buChar char="•"/>
+            </a:pPr>
+            <a:endParaRPr lang="en-US" sz="2400" dirty="0">
+              <a:solidFill>
+                <a:srgbClr val="002060"/>
+              </a:solidFill>
+            </a:endParaRPr>
+          </a:p>
+          <a:p>
+            <a:pPr marL="285750" indent="-285750">
+              <a:buFont typeface="Arial" charset="0"/>
+              <a:buChar char="•"/>
+            </a:pPr>
+            <a:r>
+              <a:rPr lang="en-US" sz="2400" dirty="0">
+                <a:solidFill>
+                  <a:srgbClr val="002060"/>
+                </a:solidFill>
+              </a:rPr>
+              <a:t>Job role-specific and general trends</a:t>
+            </a:r>
+          </a:p>
+          <a:p>
+            <a:pPr marL="285750" indent="-285750">
+              <a:buFont typeface="Arial" charset="0"/>
+              <a:buChar char="•"/>
+            </a:pPr>
+            <a:endParaRPr lang="en-US" sz="2400" dirty="0">
+              <a:solidFill>
+                <a:srgbClr val="002060"/>
+              </a:solidFill>
+            </a:endParaRPr>
+          </a:p>
+          <a:p>
+            <a:pPr marL="285750" indent="-285750">
+              <a:buFont typeface="Arial" charset="0"/>
+              <a:buChar char="•"/>
+            </a:pPr>
+            <a:r>
+              <a:rPr lang="en-US" sz="2400" dirty="0">
+                <a:solidFill>
+                  <a:srgbClr val="002060"/>
+                </a:solidFill>
+              </a:rPr>
+              <a:t>Recommendations to mitigate attrition</a:t>
+            </a:r>
+          </a:p>
+          <a:p>
+            <a:pPr marL="285750" indent="-285750">
+              <a:buFont typeface="Arial" charset="0"/>
+              <a:buChar char="•"/>
+            </a:pPr>
+            <a:endParaRPr lang="en-US" sz="2400" dirty="0"/>
+          </a:p>
+          <a:p>
+            <a:pPr marL="285750" indent="-285750">
+              <a:buFont typeface="Arial" charset="0"/>
+              <a:buChar char="•"/>
+            </a:pPr>
+            <a:endParaRPr lang="en-US" sz="2400" dirty="0"/>
           </a:p>
         </p:txBody>
       </p:sp>
     </p:spTree>
     <p:extLst>
       <p:ext uri="{BB962C8B-B14F-4D97-AF65-F5344CB8AC3E}">
-        <p14:creationId xmlns:p14="http://schemas.microsoft.com/office/powerpoint/2010/main" val="1594953444"/>
+        <p14:creationId xmlns:p14="http://schemas.microsoft.com/office/powerpoint/2010/main" val="394083745"/>
       </p:ext>
     </p:extLst>
   </p:cSld>
@@ -6632,21 +6921,51 @@
           <a:p>
             <a:r>
               <a:rPr lang="en-US" dirty="0"/>
-              <a:t>Introduction</a:t>
-            </a:r>
-          </a:p>
-        </p:txBody>
-      </p:sp>
-      <p:sp>
-        <p:nvSpPr>
-          <p:cNvPr id="4" name="TextBox 3"/>
+              <a:t>Data Source/DEMOGRAPHICS</a:t>
+            </a:r>
+          </a:p>
+        </p:txBody>
+      </p:sp>
+      <p:pic>
+        <p:nvPicPr>
+          <p:cNvPr id="9" name="Picture 8"/>
+          <p:cNvPicPr>
+            <a:picLocks noChangeAspect="1"/>
+          </p:cNvPicPr>
+          <p:nvPr/>
+        </p:nvPicPr>
+        <p:blipFill>
+          <a:blip r:embed="rId2">
+            <a:extLst>
+              <a:ext uri="{28A0092B-C50C-407E-A947-70E740481C1C}">
+                <a14:useLocalDpi xmlns:a14="http://schemas.microsoft.com/office/drawing/2010/main" val="0"/>
+              </a:ext>
+            </a:extLst>
+          </a:blip>
+          <a:stretch>
+            <a:fillRect/>
+          </a:stretch>
+        </p:blipFill>
+        <p:spPr>
+          <a:xfrm>
+            <a:off x="7500135" y="1533816"/>
+            <a:ext cx="4490692" cy="4762125"/>
+          </a:xfrm>
+          <a:prstGeom prst="rect">
+            <a:avLst/>
+          </a:prstGeom>
+        </p:spPr>
+      </p:pic>
+      <p:sp>
+        <p:nvSpPr>
+          <p:cNvPr id="10" name="TextBox 9"/>
           <p:cNvSpPr txBox="1"/>
           <p:nvPr/>
         </p:nvSpPr>
         <p:spPr>
           <a:xfrm>
-            <a:off x="557211" y="1152395"/>
-            <a:ext cx="9725438" cy="1323439"/>
+            <a:off x="9091612" y="4155541"/>
+            <a:ext cx="789140" cy="369332"/>
           </a:xfrm>
           <a:prstGeom prst="rect">
             <a:avLst/>
@@ -6660,43 +6979,22 @@
           <a:lstStyle/>
           <a:p>
             <a:r>
-              <a:rPr lang="en-US" sz="2000" dirty="0">
-                <a:solidFill>
-                  <a:srgbClr val="002060"/>
-                </a:solidFill>
-              </a:rPr>
-              <a:t>Attrition comes as a high cost to companies.  The cost of interviewing, training, productivity, and negative impacts on morale are just a few.  </a:t>
-            </a:r>
-          </a:p>
-          <a:p>
-            <a:endParaRPr lang="en-US" sz="2000" dirty="0">
-              <a:solidFill>
-                <a:srgbClr val="002060"/>
-              </a:solidFill>
-            </a:endParaRPr>
-          </a:p>
-          <a:p>
-            <a:r>
-              <a:rPr lang="en-US" sz="2000" dirty="0">
-                <a:solidFill>
-                  <a:srgbClr val="002060"/>
-                </a:solidFill>
-              </a:rPr>
-              <a:t>This report will focus on the following based on our analysis:  </a:t>
-            </a:r>
-          </a:p>
-        </p:txBody>
-      </p:sp>
-      <p:sp>
-        <p:nvSpPr>
-          <p:cNvPr id="7" name="TextBox 6"/>
+              <a:rPr lang="en-US" dirty="0"/>
+              <a:t>1233</a:t>
+            </a:r>
+          </a:p>
+        </p:txBody>
+      </p:sp>
+      <p:sp>
+        <p:nvSpPr>
+          <p:cNvPr id="11" name="TextBox 10"/>
           <p:cNvSpPr txBox="1"/>
           <p:nvPr/>
         </p:nvSpPr>
         <p:spPr>
           <a:xfrm>
-            <a:off x="1625600" y="2912533"/>
-            <a:ext cx="6908800" cy="2677656"/>
+            <a:off x="10412533" y="4906218"/>
+            <a:ext cx="569387" cy="369332"/>
           </a:xfrm>
           <a:prstGeom prst="rect">
             <a:avLst/>
@@ -6704,94 +7002,148 @@
           <a:noFill/>
         </p:spPr>
         <p:txBody>
+          <a:bodyPr wrap="none" rtlCol="0">
+            <a:spAutoFit/>
+          </a:bodyPr>
+          <a:lstStyle/>
+          <a:p>
+            <a:r>
+              <a:rPr lang="en-US"/>
+              <a:t>237</a:t>
+            </a:r>
+          </a:p>
+        </p:txBody>
+      </p:sp>
+      <p:sp>
+        <p:nvSpPr>
+          <p:cNvPr id="6" name="TextBox 5"/>
+          <p:cNvSpPr txBox="1"/>
+          <p:nvPr/>
+        </p:nvSpPr>
+        <p:spPr>
+          <a:xfrm>
+            <a:off x="557211" y="1198756"/>
+            <a:ext cx="6942924" cy="2031325"/>
+          </a:xfrm>
+          <a:prstGeom prst="rect">
+            <a:avLst/>
+          </a:prstGeom>
+          <a:noFill/>
+        </p:spPr>
+        <p:txBody>
           <a:bodyPr wrap="square" rtlCol="0">
             <a:spAutoFit/>
           </a:bodyPr>
           <a:lstStyle/>
           <a:p>
+            <a:r>
+              <a:rPr lang="en-US" b="1" dirty="0">
+                <a:solidFill>
+                  <a:srgbClr val="002060"/>
+                </a:solidFill>
+              </a:rPr>
+              <a:t>Summary: </a:t>
+            </a:r>
+          </a:p>
+          <a:p>
             <a:pPr marL="285750" indent="-285750">
-              <a:buFont typeface="Arial" charset="0"/>
+              <a:buFont typeface="Arial" panose="020B0604020202020204" pitchFamily="34" charset="0"/>
               <a:buChar char="•"/>
             </a:pPr>
             <a:r>
-              <a:rPr lang="en-US" sz="2400" dirty="0">
+              <a:rPr lang="en-US" dirty="0">
                 <a:solidFill>
                   <a:srgbClr val="002060"/>
                 </a:solidFill>
               </a:rPr>
-              <a:t>The top 3 factors that contribute to attrition</a:t>
+              <a:t>Self-report data from 1,470 employees from corporate office</a:t>
             </a:r>
           </a:p>
           <a:p>
             <a:pPr marL="285750" indent="-285750">
-              <a:buFont typeface="Arial" charset="0"/>
+              <a:buFont typeface="Arial" panose="020B0604020202020204" pitchFamily="34" charset="0"/>
               <a:buChar char="•"/>
             </a:pPr>
-            <a:endParaRPr lang="en-US" sz="2400" dirty="0">
+            <a:r>
+              <a:rPr lang="en-US" dirty="0">
+                <a:solidFill>
+                  <a:srgbClr val="002060"/>
+                </a:solidFill>
+              </a:rPr>
+              <a:t>Demographics, personal, and professional data</a:t>
+            </a:r>
+          </a:p>
+          <a:p>
+            <a:pPr marL="742950" lvl="1" indent="-285750">
+              <a:buFont typeface="Arial" panose="020B0604020202020204" pitchFamily="34" charset="0"/>
+              <a:buChar char="•"/>
+            </a:pPr>
+            <a:r>
+              <a:rPr lang="en-US" dirty="0">
+                <a:solidFill>
+                  <a:srgbClr val="002060"/>
+                </a:solidFill>
+              </a:rPr>
+              <a:t>35 variables, including age, gender, job role, work-life balance, etc.</a:t>
+            </a:r>
+          </a:p>
+          <a:p>
+            <a:pPr marL="285750" indent="-285750">
+              <a:buFont typeface="Arial" panose="020B0604020202020204" pitchFamily="34" charset="0"/>
+              <a:buChar char="•"/>
+            </a:pPr>
+            <a:endParaRPr lang="en-US" dirty="0">
               <a:solidFill>
                 <a:srgbClr val="002060"/>
               </a:solidFill>
             </a:endParaRPr>
           </a:p>
-          <a:p>
-            <a:pPr marL="285750" indent="-285750">
-              <a:buFont typeface="Arial" charset="0"/>
-              <a:buChar char="•"/>
-            </a:pPr>
-            <a:r>
-              <a:rPr lang="en-US" sz="2400" dirty="0">
-                <a:solidFill>
-                  <a:srgbClr val="002060"/>
-                </a:solidFill>
-              </a:rPr>
-              <a:t>Job role specific trends</a:t>
-            </a:r>
-          </a:p>
-          <a:p>
-            <a:pPr marL="285750" indent="-285750">
-              <a:buFont typeface="Arial" charset="0"/>
-              <a:buChar char="•"/>
-            </a:pPr>
-            <a:endParaRPr lang="en-US" sz="2400" dirty="0">
-              <a:solidFill>
-                <a:srgbClr val="002060"/>
-              </a:solidFill>
-            </a:endParaRPr>
-          </a:p>
-          <a:p>
-            <a:pPr marL="285750" indent="-285750">
-              <a:buFont typeface="Arial" charset="0"/>
-              <a:buChar char="•"/>
-            </a:pPr>
-            <a:r>
-              <a:rPr lang="en-US" sz="2400" dirty="0">
-                <a:solidFill>
-                  <a:srgbClr val="002060"/>
-                </a:solidFill>
-              </a:rPr>
-              <a:t>Recommendations to mitigate attrition</a:t>
-            </a:r>
-          </a:p>
-          <a:p>
-            <a:pPr marL="285750" indent="-285750">
-              <a:buFont typeface="Arial" charset="0"/>
-              <a:buChar char="•"/>
-            </a:pPr>
-            <a:endParaRPr lang="en-US" sz="2400" dirty="0"/>
-          </a:p>
-          <a:p>
-            <a:pPr marL="285750" indent="-285750">
-              <a:buFont typeface="Arial" charset="0"/>
-              <a:buChar char="•"/>
-            </a:pPr>
-            <a:endParaRPr lang="en-US" sz="2400" dirty="0"/>
+        </p:txBody>
+      </p:sp>
+      <p:sp>
+        <p:nvSpPr>
+          <p:cNvPr id="15" name="TextBox 14">
+            <a:extLst>
+              <a:ext uri="{FF2B5EF4-FFF2-40B4-BE49-F238E27FC236}">
+                <a16:creationId xmlns:a16="http://schemas.microsoft.com/office/drawing/2014/main" id="{81BFBD42-B2FD-9146-AFA4-30B7C60592A0}"/>
+              </a:ext>
+            </a:extLst>
+          </p:cNvPr>
+          <p:cNvSpPr txBox="1"/>
+          <p:nvPr/>
+        </p:nvSpPr>
+        <p:spPr>
+          <a:xfrm>
+            <a:off x="1068512" y="4407613"/>
+            <a:ext cx="4068567" cy="1200329"/>
+          </a:xfrm>
+          <a:prstGeom prst="rect">
+            <a:avLst/>
+          </a:prstGeom>
+          <a:noFill/>
+        </p:spPr>
+        <p:txBody>
+          <a:bodyPr wrap="square" rtlCol="0">
+            <a:spAutoFit/>
+          </a:bodyPr>
+          <a:lstStyle/>
+          <a:p>
+            <a:r>
+              <a:rPr lang="en-US" dirty="0"/>
+              <a:t>Include a few more pictures and graphs of our EDA and descriptive statistics on this slide and the next- match the </a:t>
+            </a:r>
+            <a:r>
+              <a:rPr lang="en-US" dirty="0" err="1"/>
+              <a:t>rmd</a:t>
+            </a:r>
+            <a:endParaRPr lang="en-US" dirty="0"/>
           </a:p>
         </p:txBody>
       </p:sp>
     </p:spTree>
     <p:extLst>
       <p:ext uri="{BB962C8B-B14F-4D97-AF65-F5344CB8AC3E}">
-        <p14:creationId xmlns:p14="http://schemas.microsoft.com/office/powerpoint/2010/main" val="394083745"/>
+        <p14:creationId xmlns:p14="http://schemas.microsoft.com/office/powerpoint/2010/main" val="255234722"/>
       </p:ext>
     </p:extLst>
   </p:cSld>
@@ -6820,434 +7172,159 @@
       </p:grpSpPr>
       <p:sp>
         <p:nvSpPr>
-          <p:cNvPr id="2" name="Title 1"/>
-          <p:cNvSpPr>
-            <a:spLocks noGrp="1"/>
-          </p:cNvSpPr>
-          <p:nvPr>
-            <p:ph type="title"/>
-          </p:nvPr>
+          <p:cNvPr id="4" name="Title 1">
+            <a:extLst>
+              <a:ext uri="{FF2B5EF4-FFF2-40B4-BE49-F238E27FC236}">
+                <a16:creationId xmlns:a16="http://schemas.microsoft.com/office/drawing/2014/main" id="{10025774-F3AC-0B46-BFAD-62F83C5E6558}"/>
+              </a:ext>
+            </a:extLst>
+          </p:cNvPr>
+          <p:cNvSpPr txBox="1">
+            <a:spLocks/>
+          </p:cNvSpPr>
+          <p:nvPr/>
         </p:nvSpPr>
         <p:spPr>
           <a:xfrm>
             <a:off x="557211" y="342900"/>
             <a:ext cx="8534401" cy="685800"/>
           </a:xfrm>
-        </p:spPr>
-        <p:txBody>
-          <a:bodyPr/>
-          <a:lstStyle/>
-          <a:p>
-            <a:r>
-              <a:rPr lang="en-US" dirty="0"/>
-              <a:t>Data Source</a:t>
-            </a:r>
-          </a:p>
-        </p:txBody>
-      </p:sp>
-      <p:sp>
-        <p:nvSpPr>
-          <p:cNvPr id="3" name="Text Placeholder 2"/>
-          <p:cNvSpPr>
-            <a:spLocks noGrp="1"/>
-          </p:cNvSpPr>
-          <p:nvPr>
-            <p:ph type="body" idx="1"/>
-          </p:nvPr>
-        </p:nvSpPr>
-        <p:spPr>
-          <a:xfrm>
-            <a:off x="557211" y="1970171"/>
-            <a:ext cx="3275753" cy="1042441"/>
-          </a:xfrm>
-        </p:spPr>
-        <p:txBody>
-          <a:bodyPr>
-            <a:normAutofit fontScale="92500" lnSpcReduction="20000"/>
-          </a:bodyPr>
-          <a:lstStyle/>
-          <a:p>
-            <a:r>
-              <a:rPr lang="en-US" b="1" u="sng" dirty="0">
-                <a:solidFill>
-                  <a:srgbClr val="002060"/>
-                </a:solidFill>
-              </a:rPr>
-              <a:t>Data Dimension</a:t>
-            </a:r>
-          </a:p>
-          <a:p>
-            <a:r>
-              <a:rPr lang="en-US" dirty="0">
-                <a:solidFill>
-                  <a:srgbClr val="002060"/>
-                </a:solidFill>
-              </a:rPr>
-              <a:t>Total Observations: 1470</a:t>
-            </a:r>
-          </a:p>
-          <a:p>
-            <a:r>
-              <a:rPr lang="en-US" dirty="0">
-                <a:solidFill>
-                  <a:srgbClr val="002060"/>
-                </a:solidFill>
-              </a:rPr>
-              <a:t>Total Variables	 :  35</a:t>
-            </a:r>
-          </a:p>
-        </p:txBody>
-      </p:sp>
-      <p:pic>
-        <p:nvPicPr>
-          <p:cNvPr id="9" name="Picture 8"/>
-          <p:cNvPicPr>
-            <a:picLocks noChangeAspect="1"/>
-          </p:cNvPicPr>
-          <p:nvPr/>
-        </p:nvPicPr>
-        <p:blipFill>
-          <a:blip r:embed="rId2">
-            <a:extLst>
-              <a:ext uri="{28A0092B-C50C-407E-A947-70E740481C1C}">
-                <a14:useLocalDpi xmlns:a14="http://schemas.microsoft.com/office/drawing/2010/main" val="0"/>
-              </a:ext>
-            </a:extLst>
-          </a:blip>
-          <a:stretch>
-            <a:fillRect/>
-          </a:stretch>
-        </p:blipFill>
-        <p:spPr>
-          <a:xfrm>
-            <a:off x="7954027" y="2015143"/>
-            <a:ext cx="4036800" cy="4280798"/>
-          </a:xfrm>
           <a:prstGeom prst="rect">
             <a:avLst/>
           </a:prstGeom>
+          <a:effectLst/>
         </p:spPr>
-      </p:pic>
-      <p:sp>
-        <p:nvSpPr>
-          <p:cNvPr id="10" name="TextBox 9"/>
-          <p:cNvSpPr txBox="1"/>
-          <p:nvPr/>
+        <p:txBody>
+          <a:bodyPr vert="horz" lIns="91440" tIns="45720" rIns="91440" bIns="45720" rtlCol="0" anchor="b">
+            <a:normAutofit/>
+          </a:bodyPr>
+          <a:lstStyle>
+            <a:lvl1pPr algn="l" defTabSz="457200" rtl="0" eaLnBrk="1" latinLnBrk="0" hangingPunct="1">
+              <a:spcBef>
+                <a:spcPct val="0"/>
+              </a:spcBef>
+              <a:buNone/>
+              <a:defRPr sz="3600" b="0" kern="1200" cap="all">
+                <a:ln w="3175" cmpd="sng">
+                  <a:noFill/>
+                </a:ln>
+                <a:solidFill>
+                  <a:schemeClr val="tx1"/>
+                </a:solidFill>
+                <a:effectLst/>
+                <a:latin typeface="+mj-lt"/>
+                <a:ea typeface="+mj-ea"/>
+                <a:cs typeface="+mj-cs"/>
+              </a:defRPr>
+            </a:lvl1pPr>
+            <a:lvl2pPr eaLnBrk="1" hangingPunct="1">
+              <a:defRPr>
+                <a:solidFill>
+                  <a:schemeClr val="tx2"/>
+                </a:solidFill>
+              </a:defRPr>
+            </a:lvl2pPr>
+            <a:lvl3pPr eaLnBrk="1" hangingPunct="1">
+              <a:defRPr>
+                <a:solidFill>
+                  <a:schemeClr val="tx2"/>
+                </a:solidFill>
+              </a:defRPr>
+            </a:lvl3pPr>
+            <a:lvl4pPr eaLnBrk="1" hangingPunct="1">
+              <a:defRPr>
+                <a:solidFill>
+                  <a:schemeClr val="tx2"/>
+                </a:solidFill>
+              </a:defRPr>
+            </a:lvl4pPr>
+            <a:lvl5pPr eaLnBrk="1" hangingPunct="1">
+              <a:defRPr>
+                <a:solidFill>
+                  <a:schemeClr val="tx2"/>
+                </a:solidFill>
+              </a:defRPr>
+            </a:lvl5pPr>
+            <a:lvl6pPr eaLnBrk="1" hangingPunct="1">
+              <a:defRPr>
+                <a:solidFill>
+                  <a:schemeClr val="tx2"/>
+                </a:solidFill>
+              </a:defRPr>
+            </a:lvl6pPr>
+            <a:lvl7pPr eaLnBrk="1" hangingPunct="1">
+              <a:defRPr>
+                <a:solidFill>
+                  <a:schemeClr val="tx2"/>
+                </a:solidFill>
+              </a:defRPr>
+            </a:lvl7pPr>
+            <a:lvl8pPr eaLnBrk="1" hangingPunct="1">
+              <a:defRPr>
+                <a:solidFill>
+                  <a:schemeClr val="tx2"/>
+                </a:solidFill>
+              </a:defRPr>
+            </a:lvl8pPr>
+            <a:lvl9pPr eaLnBrk="1" hangingPunct="1">
+              <a:defRPr>
+                <a:solidFill>
+                  <a:schemeClr val="tx2"/>
+                </a:solidFill>
+              </a:defRPr>
+            </a:lvl9pPr>
+          </a:lstStyle>
+          <a:p>
+            <a:r>
+              <a:rPr lang="en-US"/>
+              <a:t>Data Source/DEMOGRAPHICS</a:t>
+            </a:r>
+            <a:endParaRPr lang="en-US" dirty="0"/>
+          </a:p>
+        </p:txBody>
+      </p:sp>
+      <p:sp>
+        <p:nvSpPr>
+          <p:cNvPr id="5" name="Text Placeholder 2">
+            <a:extLst>
+              <a:ext uri="{FF2B5EF4-FFF2-40B4-BE49-F238E27FC236}">
+                <a16:creationId xmlns:a16="http://schemas.microsoft.com/office/drawing/2014/main" id="{9958FC6C-D112-8144-B815-67A37B638E30}"/>
+              </a:ext>
+            </a:extLst>
+          </p:cNvPr>
+          <p:cNvSpPr>
+            <a:spLocks noGrp="1"/>
+          </p:cNvSpPr>
+          <p:nvPr>
+            <p:ph type="body" idx="1"/>
+          </p:nvPr>
         </p:nvSpPr>
         <p:spPr>
           <a:xfrm>
-            <a:off x="9091612" y="4155541"/>
-            <a:ext cx="789140" cy="369332"/>
+            <a:off x="684213" y="1193800"/>
+            <a:ext cx="8534400" cy="4800600"/>
           </a:xfrm>
-          <a:prstGeom prst="rect">
-            <a:avLst/>
-          </a:prstGeom>
-          <a:noFill/>
         </p:spPr>
         <p:txBody>
-          <a:bodyPr wrap="square" rtlCol="0">
-            <a:spAutoFit/>
-          </a:bodyPr>
+          <a:bodyPr/>
           <a:lstStyle/>
           <a:p>
             <a:r>
               <a:rPr lang="en-US" dirty="0"/>
-              <a:t>1233</a:t>
-            </a:r>
-          </a:p>
-        </p:txBody>
-      </p:sp>
-      <p:sp>
-        <p:nvSpPr>
-          <p:cNvPr id="11" name="TextBox 10"/>
-          <p:cNvSpPr txBox="1"/>
-          <p:nvPr/>
-        </p:nvSpPr>
-        <p:spPr>
-          <a:xfrm>
-            <a:off x="10412533" y="4906218"/>
-            <a:ext cx="569387" cy="369332"/>
-          </a:xfrm>
-          <a:prstGeom prst="rect">
-            <a:avLst/>
-          </a:prstGeom>
-          <a:noFill/>
-        </p:spPr>
-        <p:txBody>
-          <a:bodyPr wrap="none" rtlCol="0">
-            <a:spAutoFit/>
-          </a:bodyPr>
-          <a:lstStyle/>
-          <a:p>
+              <a:t>Include a few more pictures and graphs of our EDA and descriptive statistics on this slide- match the </a:t>
+            </a:r>
             <a:r>
               <a:rPr lang="en-US"/>
-              <a:t>237</a:t>
-            </a:r>
-          </a:p>
-        </p:txBody>
-      </p:sp>
-      <p:sp>
-        <p:nvSpPr>
-          <p:cNvPr id="5" name="TextBox 4"/>
-          <p:cNvSpPr txBox="1"/>
-          <p:nvPr/>
-        </p:nvSpPr>
-        <p:spPr>
-          <a:xfrm>
-            <a:off x="557211" y="5372611"/>
-            <a:ext cx="3689112" cy="923330"/>
-          </a:xfrm>
-          <a:prstGeom prst="rect">
-            <a:avLst/>
-          </a:prstGeom>
-          <a:noFill/>
-        </p:spPr>
-        <p:txBody>
-          <a:bodyPr wrap="square" rtlCol="0">
-            <a:spAutoFit/>
-          </a:bodyPr>
-          <a:lstStyle/>
-          <a:p>
-            <a:r>
-              <a:rPr lang="en-US" b="1" u="sng" dirty="0">
-                <a:solidFill>
-                  <a:srgbClr val="002060"/>
-                </a:solidFill>
-              </a:rPr>
-              <a:t>Excluded Variables: </a:t>
-            </a:r>
-          </a:p>
-          <a:p>
-            <a:r>
-              <a:rPr lang="en-US" dirty="0" err="1">
-                <a:solidFill>
-                  <a:srgbClr val="002060"/>
-                </a:solidFill>
-              </a:rPr>
-              <a:t>HeadCount</a:t>
-            </a:r>
-            <a:r>
-              <a:rPr lang="en-US" dirty="0">
-                <a:solidFill>
-                  <a:srgbClr val="002060"/>
-                </a:solidFill>
-              </a:rPr>
-              <a:t>, </a:t>
-            </a:r>
-            <a:r>
-              <a:rPr lang="en-US" dirty="0" err="1">
-                <a:solidFill>
-                  <a:srgbClr val="002060"/>
-                </a:solidFill>
-              </a:rPr>
-              <a:t>EmployeeID</a:t>
-            </a:r>
-            <a:r>
-              <a:rPr lang="en-US" dirty="0">
-                <a:solidFill>
-                  <a:srgbClr val="002060"/>
-                </a:solidFill>
-              </a:rPr>
-              <a:t>, Over18, </a:t>
-            </a:r>
-            <a:r>
-              <a:rPr lang="en-US" dirty="0" err="1">
-                <a:solidFill>
-                  <a:srgbClr val="002060"/>
-                </a:solidFill>
-              </a:rPr>
-              <a:t>StdHours</a:t>
-            </a:r>
-            <a:endParaRPr lang="en-US" dirty="0">
-              <a:solidFill>
-                <a:srgbClr val="002060"/>
-              </a:solidFill>
-            </a:endParaRPr>
-          </a:p>
-        </p:txBody>
-      </p:sp>
-      <p:sp>
-        <p:nvSpPr>
-          <p:cNvPr id="6" name="TextBox 5"/>
-          <p:cNvSpPr txBox="1"/>
-          <p:nvPr/>
-        </p:nvSpPr>
-        <p:spPr>
-          <a:xfrm>
-            <a:off x="557211" y="1130103"/>
-            <a:ext cx="11001730" cy="646331"/>
-          </a:xfrm>
-          <a:prstGeom prst="rect">
-            <a:avLst/>
-          </a:prstGeom>
-          <a:noFill/>
-        </p:spPr>
-        <p:txBody>
-          <a:bodyPr wrap="none" rtlCol="0">
-            <a:spAutoFit/>
-          </a:bodyPr>
-          <a:lstStyle/>
-          <a:p>
-            <a:r>
-              <a:rPr lang="en-US" b="1" dirty="0">
-                <a:solidFill>
-                  <a:srgbClr val="002060"/>
-                </a:solidFill>
-              </a:rPr>
-              <a:t>Summary: </a:t>
-            </a:r>
-            <a:r>
-              <a:rPr lang="en-US" dirty="0">
-                <a:solidFill>
-                  <a:srgbClr val="002060"/>
-                </a:solidFill>
-              </a:rPr>
-              <a:t>The dataset provided required minimal tidying.  There was no missing data (i.e. NA).  It </a:t>
-            </a:r>
-          </a:p>
-          <a:p>
-            <a:r>
-              <a:rPr lang="en-US" dirty="0">
-                <a:solidFill>
-                  <a:srgbClr val="002060"/>
-                </a:solidFill>
-              </a:rPr>
-              <a:t>included both personal and professional data on employee from various departments.</a:t>
-            </a:r>
-          </a:p>
-        </p:txBody>
-      </p:sp>
-      <p:sp>
-        <p:nvSpPr>
-          <p:cNvPr id="7" name="TextBox 6"/>
-          <p:cNvSpPr txBox="1"/>
-          <p:nvPr/>
-        </p:nvSpPr>
-        <p:spPr>
-          <a:xfrm>
-            <a:off x="557211" y="3323270"/>
-            <a:ext cx="2353770" cy="923330"/>
-          </a:xfrm>
-          <a:prstGeom prst="rect">
-            <a:avLst/>
-          </a:prstGeom>
-          <a:noFill/>
-        </p:spPr>
-        <p:txBody>
-          <a:bodyPr wrap="square" rtlCol="0">
-            <a:spAutoFit/>
-          </a:bodyPr>
-          <a:lstStyle/>
-          <a:p>
-            <a:r>
-              <a:rPr lang="en-US" b="1" u="sng" dirty="0">
-                <a:solidFill>
-                  <a:srgbClr val="002060"/>
-                </a:solidFill>
-              </a:rPr>
-              <a:t>Data Class Type</a:t>
-            </a:r>
-          </a:p>
-          <a:p>
-            <a:r>
-              <a:rPr lang="en-US" dirty="0">
-                <a:solidFill>
-                  <a:srgbClr val="002060"/>
-                </a:solidFill>
-              </a:rPr>
-              <a:t>Numeric 	: 25</a:t>
-            </a:r>
-          </a:p>
-          <a:p>
-            <a:r>
-              <a:rPr lang="en-US" dirty="0">
-                <a:solidFill>
-                  <a:srgbClr val="002060"/>
-                </a:solidFill>
-              </a:rPr>
-              <a:t>Character	: 10</a:t>
-            </a:r>
-          </a:p>
-        </p:txBody>
-      </p:sp>
-      <p:sp>
-        <p:nvSpPr>
-          <p:cNvPr id="8" name="TextBox 7"/>
-          <p:cNvSpPr txBox="1"/>
-          <p:nvPr/>
-        </p:nvSpPr>
-        <p:spPr>
-          <a:xfrm>
-            <a:off x="557211" y="4608818"/>
-            <a:ext cx="3093928" cy="677108"/>
-          </a:xfrm>
-          <a:prstGeom prst="rect">
-            <a:avLst/>
-          </a:prstGeom>
-          <a:noFill/>
-        </p:spPr>
-        <p:txBody>
-          <a:bodyPr wrap="square" rtlCol="0">
-            <a:spAutoFit/>
-          </a:bodyPr>
-          <a:lstStyle/>
-          <a:p>
-            <a:r>
-              <a:rPr lang="en-US" b="1" u="sng" dirty="0">
-                <a:solidFill>
-                  <a:srgbClr val="002060"/>
-                </a:solidFill>
-              </a:rPr>
-              <a:t>Length &gt; 12 Variables</a:t>
-            </a:r>
-          </a:p>
-          <a:p>
-            <a:pPr lvl="1"/>
-            <a:r>
-              <a:rPr lang="en-US" sz="2000" dirty="0">
-                <a:solidFill>
-                  <a:srgbClr val="002060"/>
-                </a:solidFill>
-              </a:rPr>
-              <a:t>	23</a:t>
-            </a:r>
-          </a:p>
-        </p:txBody>
-      </p:sp>
-      <p:pic>
-        <p:nvPicPr>
-          <p:cNvPr id="12" name="Picture 11"/>
-          <p:cNvPicPr>
-            <a:picLocks noChangeAspect="1"/>
-          </p:cNvPicPr>
-          <p:nvPr/>
-        </p:nvPicPr>
-        <p:blipFill>
-          <a:blip r:embed="rId3">
-            <a:extLst>
-              <a:ext uri="{28A0092B-C50C-407E-A947-70E740481C1C}">
-                <a14:useLocalDpi xmlns:a14="http://schemas.microsoft.com/office/drawing/2010/main" val="0"/>
-              </a:ext>
-            </a:extLst>
-          </a:blip>
-          <a:stretch>
-            <a:fillRect/>
-          </a:stretch>
-        </p:blipFill>
-        <p:spPr>
-          <a:xfrm>
-            <a:off x="3635986" y="2015142"/>
-            <a:ext cx="3811383" cy="4280799"/>
-          </a:xfrm>
-          <a:prstGeom prst="rect">
-            <a:avLst/>
-          </a:prstGeom>
-        </p:spPr>
-      </p:pic>
+              <a:t>rmd</a:t>
+            </a:r>
+            <a:endParaRPr lang="en-US" dirty="0"/>
+          </a:p>
+        </p:txBody>
+      </p:sp>
     </p:spTree>
     <p:extLst>
       <p:ext uri="{BB962C8B-B14F-4D97-AF65-F5344CB8AC3E}">
-        <p14:creationId xmlns:p14="http://schemas.microsoft.com/office/powerpoint/2010/main" val="255234722"/>
+        <p14:creationId xmlns:p14="http://schemas.microsoft.com/office/powerpoint/2010/main" val="36753451"/>
       </p:ext>
     </p:extLst>
   </p:cSld>
@@ -7323,7 +7400,15 @@
           <a:p>
             <a:r>
               <a:rPr lang="en-US" dirty="0"/>
-              <a:t>RAJAT to provide content</a:t>
+              <a:t>RAJAT to provide content- explain in plain language only, an “elevator pitch” of what random forest is and what it told us. Include the actual explanation in the </a:t>
+            </a:r>
+            <a:r>
+              <a:rPr lang="en-US" dirty="0" err="1"/>
+              <a:t>rmd</a:t>
+            </a:r>
+            <a:r>
+              <a:rPr lang="en-US" dirty="0"/>
+              <a:t> file.</a:t>
             </a:r>
           </a:p>
         </p:txBody>
@@ -7380,7 +7465,7 @@
           <a:p>
             <a:r>
               <a:rPr lang="en-US" dirty="0"/>
-              <a:t>Top 7 Factors of Attrition</a:t>
+              <a:t>Top 7 Factors FOR Attrition</a:t>
             </a:r>
           </a:p>
         </p:txBody>
@@ -7405,7 +7490,10 @@
           <a:bodyPr/>
           <a:lstStyle/>
           <a:p>
-            <a:endParaRPr lang="en-US" dirty="0"/>
+            <a:r>
+              <a:rPr lang="en-US" dirty="0"/>
+              <a:t>Does this need updating?</a:t>
+            </a:r>
           </a:p>
         </p:txBody>
       </p:sp>
@@ -8717,7 +8805,10 @@
           </a:bodyPr>
           <a:lstStyle/>
           <a:p>
-            <a:endParaRPr lang="en-US" sz="2100" dirty="0"/>
+            <a:r>
+              <a:rPr lang="en-US" sz="2100" dirty="0"/>
+              <a:t>Does this need updating?</a:t>
+            </a:r>
           </a:p>
         </p:txBody>
       </p:sp>

</xml_diff>

<commit_message>
Removed Tori's update for slide 2 and 3.  Added Methodology slides for Rajat to populate content
</commit_message>
<xml_diff>
--- a/Attrition_Case_Study_2_pptx_TAJAR_IP.pptx
+++ b/Attrition_Case_Study_2_pptx_TAJAR_IP.pptx
@@ -5,23 +5,24 @@
     <p:sldMasterId id="2147483648" r:id="rId1"/>
   </p:sldMasterIdLst>
   <p:notesMasterIdLst>
-    <p:notesMasterId r:id="rId16"/>
+    <p:notesMasterId r:id="rId17"/>
   </p:notesMasterIdLst>
   <p:sldIdLst>
     <p:sldId id="256" r:id="rId2"/>
     <p:sldId id="265" r:id="rId3"/>
     <p:sldId id="258" r:id="rId4"/>
-    <p:sldId id="259" r:id="rId5"/>
+    <p:sldId id="273" r:id="rId5"/>
     <p:sldId id="270" r:id="rId6"/>
     <p:sldId id="260" r:id="rId7"/>
-    <p:sldId id="261" r:id="rId8"/>
-    <p:sldId id="262" r:id="rId9"/>
-    <p:sldId id="264" r:id="rId10"/>
-    <p:sldId id="269" r:id="rId11"/>
-    <p:sldId id="268" r:id="rId12"/>
-    <p:sldId id="263" r:id="rId13"/>
-    <p:sldId id="271" r:id="rId14"/>
-    <p:sldId id="267" r:id="rId15"/>
+    <p:sldId id="275" r:id="rId8"/>
+    <p:sldId id="261" r:id="rId9"/>
+    <p:sldId id="262" r:id="rId10"/>
+    <p:sldId id="264" r:id="rId11"/>
+    <p:sldId id="269" r:id="rId12"/>
+    <p:sldId id="268" r:id="rId13"/>
+    <p:sldId id="263" r:id="rId14"/>
+    <p:sldId id="271" r:id="rId15"/>
+    <p:sldId id="267" r:id="rId16"/>
   </p:sldIdLst>
   <p:sldSz cx="12192000" cy="6858000"/>
   <p:notesSz cx="6858000" cy="9144000"/>
@@ -5694,6 +5695,10 @@
           <a:bodyPr/>
           <a:lstStyle/>
           <a:p>
+            <a:r>
+              <a:rPr lang="en-US" dirty="0"/>
+              <a:t/>
+            </a:r>
             <a:br>
               <a:rPr lang="en-US" dirty="0"/>
             </a:br>
@@ -5812,83 +5817,123 @@
         </p:nvSpPr>
         <p:spPr>
           <a:xfrm>
-            <a:off x="4546886" y="685799"/>
-            <a:ext cx="7077667" cy="4892676"/>
+            <a:off x="665641" y="4473679"/>
+            <a:ext cx="9552558" cy="1233251"/>
           </a:xfrm>
         </p:spPr>
         <p:txBody>
-          <a:bodyPr vert="horz" lIns="91440" tIns="45720" rIns="91440" bIns="45720" rtlCol="0" anchor="ctr">
+          <a:bodyPr vert="horz" lIns="91440" tIns="45720" rIns="91440" bIns="45720" rtlCol="0" anchor="b">
             <a:normAutofit/>
           </a:bodyPr>
           <a:lstStyle/>
           <a:p>
-            <a:r>
-              <a:rPr lang="en-US" sz="4800"/>
-              <a:t>Life Satisfaction</a:t>
-            </a:r>
-          </a:p>
-        </p:txBody>
-      </p:sp>
-      <p:sp>
-        <p:nvSpPr>
-          <p:cNvPr id="7" name="Text Placeholder 6">
+            <a:pPr>
+              <a:lnSpc>
+                <a:spcPct val="90000"/>
+              </a:lnSpc>
+            </a:pPr>
+            <a:r>
+              <a:rPr lang="en-US" sz="4100"/>
+              <a:t>Top Two Factors Attributed to Company’s Attrition</a:t>
+            </a:r>
+          </a:p>
+        </p:txBody>
+      </p:sp>
+      <p:sp>
+        <p:nvSpPr>
+          <p:cNvPr id="3" name="Text Placeholder 2"/>
+          <p:cNvSpPr>
+            <a:spLocks noGrp="1"/>
+          </p:cNvSpPr>
+          <p:nvPr>
+            <p:ph type="body" idx="1"/>
+          </p:nvPr>
+        </p:nvSpPr>
+        <p:spPr>
+          <a:xfrm>
+            <a:off x="668815" y="5686129"/>
+            <a:ext cx="9623477" cy="462967"/>
+          </a:xfrm>
+        </p:spPr>
+        <p:txBody>
+          <a:bodyPr vert="horz" lIns="91440" tIns="45720" rIns="91440" bIns="45720" rtlCol="0" anchor="t">
+            <a:normAutofit/>
+          </a:bodyPr>
+          <a:lstStyle/>
+          <a:p>
+            <a:r>
+              <a:rPr lang="en-US" sz="2100" dirty="0"/>
+              <a:t>Does this need updating?</a:t>
+            </a:r>
+          </a:p>
+        </p:txBody>
+      </p:sp>
+      <p:pic>
+        <p:nvPicPr>
+          <p:cNvPr id="12" name="Picture 11">
             <a:extLst>
               <a:ext uri="{FF2B5EF4-FFF2-40B4-BE49-F238E27FC236}">
-                <a16:creationId xmlns:a16="http://schemas.microsoft.com/office/drawing/2014/main" id="{68BE2056-ED35-43E3-8265-E8D944FA51C9}"/>
+                <a16:creationId xmlns="" xmlns:a16="http://schemas.microsoft.com/office/drawing/2014/main" id="{E2B66158-1DF2-447F-A805-9EFB84231251}"/>
               </a:ext>
             </a:extLst>
           </p:cNvPr>
-          <p:cNvSpPr>
-            <a:spLocks noGrp="1"/>
-          </p:cNvSpPr>
-          <p:nvPr>
-            <p:ph type="body" idx="1"/>
-          </p:nvPr>
-        </p:nvSpPr>
+          <p:cNvPicPr>
+            <a:picLocks noChangeAspect="1"/>
+          </p:cNvPicPr>
+          <p:nvPr/>
+        </p:nvPicPr>
+        <p:blipFill>
+          <a:blip r:embed="rId2"/>
+          <a:stretch>
+            <a:fillRect/>
+          </a:stretch>
+        </p:blipFill>
         <p:spPr>
           <a:xfrm>
-            <a:off x="684212" y="685800"/>
-            <a:ext cx="2888773" cy="4892675"/>
+            <a:off x="5744777" y="1151070"/>
+            <a:ext cx="4201297" cy="3000926"/>
           </a:xfrm>
+          <a:prstGeom prst="rect">
+            <a:avLst/>
+          </a:prstGeom>
         </p:spPr>
-        <p:txBody>
-          <a:bodyPr vert="horz" lIns="91440" tIns="45720" rIns="91440" bIns="45720" rtlCol="0" anchor="ctr">
-            <a:normAutofit/>
-          </a:bodyPr>
-          <a:lstStyle/>
-          <a:p>
-            <a:pPr algn="r"/>
-            <a:r>
-              <a:rPr lang="en-US" sz="2100" b="1" dirty="0">
-                <a:solidFill>
-                  <a:schemeClr val="accent6"/>
-                </a:solidFill>
-              </a:rPr>
-              <a:t>**Jodi Will enter visual here by noon Monday (promise!).   I will be looking at Those that worked overtime against Work Life balance self reporting. </a:t>
-            </a:r>
-            <a:r>
-              <a:rPr lang="en-US" sz="2100" b="1" dirty="0">
-                <a:solidFill>
-                  <a:schemeClr val="accent6"/>
-                </a:solidFill>
-                <a:sym typeface="Wingdings" panose="05000000000000000000" pitchFamily="2" charset="2"/>
-              </a:rPr>
-              <a:t> </a:t>
-            </a:r>
-            <a:endParaRPr lang="en-US" sz="2100" b="1" dirty="0">
-              <a:solidFill>
-                <a:schemeClr val="accent6"/>
-              </a:solidFill>
-            </a:endParaRPr>
-          </a:p>
-        </p:txBody>
-      </p:sp>
+      </p:pic>
+      <p:pic>
+        <p:nvPicPr>
+          <p:cNvPr id="8" name="Picture 7">
+            <a:extLst>
+              <a:ext uri="{FF2B5EF4-FFF2-40B4-BE49-F238E27FC236}">
+                <a16:creationId xmlns="" xmlns:a16="http://schemas.microsoft.com/office/drawing/2014/main" id="{808FDCEC-C955-44EE-B530-C6DE790D3AB2}"/>
+              </a:ext>
+            </a:extLst>
+          </p:cNvPr>
+          <p:cNvPicPr>
+            <a:picLocks noChangeAspect="1"/>
+          </p:cNvPicPr>
+          <p:nvPr/>
+        </p:nvPicPr>
+        <p:blipFill>
+          <a:blip r:embed="rId3"/>
+          <a:stretch>
+            <a:fillRect/>
+          </a:stretch>
+        </p:blipFill>
+        <p:spPr>
+          <a:xfrm>
+            <a:off x="1049892" y="1165301"/>
+            <a:ext cx="4157293" cy="2972463"/>
+          </a:xfrm>
+          <a:prstGeom prst="rect">
+            <a:avLst/>
+          </a:prstGeom>
+        </p:spPr>
+      </p:pic>
       <p:sp>
         <p:nvSpPr>
           <p:cNvPr id="4" name="AutoShape 2" descr="data:image/png;base64,iVBORw0KGgoAAAANSUhEUgAABUAAAAPACAMAAADDuCPrAAABYlBMVEUAAAAAADoAAGYAOjoAOmYAOpAAZrYzMzM6AAA6OgA6Ojo6OmY6ZmY6ZpA6ZrY6kLY6kNtNTU1NTW5NTY5Nbm5Nbo5NbqtNjshmAABmADpmOgBmOjpmZjpmZmZmZpBmkGZmkLZmkNtmtttmtv9uTU1ubk1ubm5ubo5ujqtujshuq8huq+SOTU2Obk2Obm6Oq8iOyOSOyP+QOgCQOjqQZjqQZmaQZpCQkGaQkLaQtraQttuQ2/+rbk2rjk2rjm6rq8iryOSr5Mir5P+2ZgC2Zjq2kDq2kGa2kJC2tpC2tra2ttu229u22/+2///Ijk3Ijm7Iq27Iq6vIyKvI5KvI5OTI5P/I///bkDrbkGbbtmbbtpDbtrbb27bb29vb2//b/7bb///kq27kyI7kyKvk5P/k///r6+v8jVn/tmb/yI7/25D/27b/29v/5Kv/5Mj/5OT//7b//7///8j//9v//+T///+zjZs9AAAACXBIWXMAAB2HAAAdhwGP5fFlAAAgAElEQVR4nO3d/59b5ZnecU0wMDGEILMYh0CWwmwDxaSLN3S7xHW3mGQXkni3aY0TEijO1q2/YMe1rP+/0iNpRnPbM+fMM9e5n3PffN4/xB472Eiv6/mgGUlnJnMAQJVJ638BAIiKgAJAJQIKAJUIKABUIqAAUImAAkAlAgoAlQgoAFQioABQiYACQCUCCgCVCCgAVCKgAFCJgAJAJQIKAJVGENDZl298fzKZ7Lzw8Ten/rNuT570zvzhhcnOLwT/pgCwrXlAZ7/aPWjdS6dNKAEF4Kd1QO+9fih2p+0cAQXgp3FA7y4ffu689dXip9/+6vuCgh78ud/7reRPAoCjtA3o4qHh1ufts1/KCkpAAQyvbUCvLor59tbHy8/An1P8wQQUwPCaBnT5CfzLh37lRvmapeRPJqAABtY0oItcmswtP6d/rvzGwQPRq5vK3vv5Irg7P/jNwT/9zuzT3cnOC09+1n84oJsnka4ufyh/ygsfL3/9yx8vev3Cr/f/f+YvAIBjtQzo7NKTn7Cvmroo3n7/NvWbfWpe7LQM6NUjnro/OqA31n/Iywd/4PpB8BN/AQAcq2VAlw837efrt1c9vHrwO4tfefabVW03VtVdpPBs+fDZJ3t3ZED/fv8Pefvq4ddOPfkXAMCxWgZ0UbknHjyuo3r7IGLrli4fOb709Xz+7aebx4zlseQPv5l/+/VT/+inBnRh+Rn6l4tP1Z+Z7Lz9zeqZ/+fmT/0LAOBYLQN6+ymffS8D+vJ866Xv68/mtx6t3l5/5fTGMaE7OqAvb/6MzV9wdfUQ9il/AQAca6QBXdZxlbr180nbTysdPCY98kWjRwZ0/aubv2a+/yWCp/wFAHCssQZ0UcDypc3lVyaXMdtu2u39xj7lq58rRwb0uYO/5p1D/9en/AUAcKyRfg10Gc7ye+uQbj/Ds3mW58YxT/YcGdCXD//K/v/1aX8BABxrbM/C70f19qFP5W3f7Cfd1qkDeuRjWwDYGOfrQOclcYuIbR6IElAA4zPOdyItlbcNbV7OtPlSqPmntQHliSMAJ9I0oFu5XNt6L3z5HH7/qZ2rTz6vIw3o0/4CADhW26sx2Zdy3t765HnxmPDZ/7X/ls7tp9xv7H95VBjQp/wFAHCstgEtX3k8eOf5jcn2C5tulDderku2deGmzfNM2oA+5S8AgGM1viL9veUVlQ9dkf7gC5Grq9VvSrZ8F9GZX6+/h9LmvZfCgD7lLwCAY435eyJd3X42fPtp8lUbxQF98i8AgGO1Duih78q5c/g6crcn28+Mz36++b+dWV2wUxzQJ/8CADhW84AufPnz5Sfvz7xovy/89lVBl/60vN7x+lrIc31An/gLAOBYYwgoAIREQAGgEgEFgEoEFAAqEVAAqERAAaASAQWASgQUACoRUACoREABoBIBBYBKBBQAKhFQAKhEQAGgEgEFgEoEFAAqEVAAqNQwoP8HEtyT6MRIVEzFCGh43JPoxEhUTMUIaHjck+jESFRMxQhoeNyT6MRIVEzFCGh43JPoxEhUTMUIaHjck+jESFRMxQhoeNyT6MRIVEzFCGh43JPoxEhUTMUIaHjck+jESFRMxQhoeNyT6MRIVEzFCGh43JPoxEhUTMUIaHjck+jESFRMxQhoeNyT6MRIVEzFCGh43JPoxEhUTMUIaHjck+jESFRMxQhoeNyT6MRIVEzFCGh43JPoxEhUTMUIaHjck+jESFRMxQhoeNyT6MRIVEzFCGh43JPoxEhUTMUIaHjck+jESFRMxQhoeNyT6MRIVEzFCGh43JPoxEhUTMUIaHjck+jESFRMxQhoeNyT6MRIVEzFCGh43JPoxEhUTMUIaHjck+jESFRMxQhoeNyT6MRIVEzFCGh43JPoxEhUTMUIaHjck+jESFRMxQhoeNyT6MRIVEzFCGh43JPoxEhUTMUIaHjck+jESFRMxQhoeNyT6MRIVEzFCGh43JPoxEhUTMUIaHjck+jESFRMxQhoeNyT6MRIVEzFUgX0/+I7RL+fxAioiqkYAUVQ+v0kRkBVTMUIKILS7ycxAqpiKkZAEZR+P4kRUBVTMQKKoPT7SYyAqpiKEVAEpd9PYgRUxVSMgCIo/X4SI6AqpmIEFEHp95MYAVUxFSOgCEq/n8QIqIqpGAFFUPr9JEZAVUzFCCiC0u8nMQKqYipGQBGUfj+JEVAVUzECiqD0+0mMgKqYihFQBKXfT2IEVMVUjIAiKP1+EiOgKqZiBBRB6feTGAFVMRUjoAhKv5/ECKiKqRgBRVD6/SRGQFVMxQgogtLvJzECqmIqRkARlH4/iRFQFVMxAoqg9PtJjICqmIoRUASl309iBFTFVIyAIij9fhIjoCqmYgQUQen3kxgBVTEVI6AISr+fxAioiqkYAUVQ+v0kRkBVTMUIKILS7ycxAqpiKkZAEZR+P4kRUBVTMQKKoPT7SYyAqpiKEVAEpd9PYgRUxVSMgCIo/X4SI6AqpmKnDeiji6+tf/b4yt50+u71rg8IKDT0+0mMgKqIA3pt+tqmpNOlV744/gMCChH9fhIjoCrSgD6+Nt0E9Nr0/PX5g8vT87eO/YCAQkS/n8QIqIoyoP/2wXQT0Pt75RHmo4vnPjnuAwIKFf1+EiOgKsKA3pxO3/vzOqA39398/7gPCChU9PtJjICqKAP66j/O76zzeG36YfmxfHz0BwQUKvr9JEZAVYQB3cri48vrT9Dv752/dfQHq3/m+ZVT/s1P0fpIw5N+P8BJEVAEpd8PcFL6gL7yxdEfHPpH9Y+uWx9peNLvJzE+hVcZPKDdj0AJKAT0+0mMgKoQUOSg309iBFRlmIDyLDy86feTGAFVGSigm1d5rl/6edQHBBQq+v0kRkBVBgoo70SCM/1+EiOgKgMF9PHl6av773g/+gMCChX9fhIjoCoDBXT+YPuaS0d/QEAhot9PYgRUZaiAzh9cWVTy3VtdHxBQaOj3kxgBVREH9BT0t631kYYn/X4SI6AqpmIEFEHp95MYAVUxFSOgCEq/n8QIqIqpGAFFUPr9JEZAVUzFCCiC0u8nMQKqYipGQBGUfj+JEVAVUzECiqD0+0mMgKqYihFQBKXfT2IEVMVUjIAiKP1+EiOgKqZiBBRB6feTGAFVMRUjoAhKv5/ECKiKqRgBRVD6/SRGQFVMxQgogtLvJzECqmIqRkARlH4/iRFQFVMxAoqg9PtJjICqmIoRUASl309iBFTFVIyAIij9fhIjoCqmYgQUQen3kxgBVTEVI6AISr+fxAioiqkYAUVQ+v0kRkBVTMUIKILS7ycxAqpiKkZAEZR+P4kRUBVTMQKKoPT7SYyAqpiKEVAEpd9PYgRUxVSMgCIo/X4SI6AqpmIEFEHp95MYAVUxFSOgCEq/n8QIqIqpGAFFUPr9JEZAVUzFCCiC0u8nMQKqYipGQBGUfj+JEVAVUzECiqD0+0mMgKqYihFQBKXfT2IEVMVUjIAiKP1+EiOgKqZiBBRB6feTGAFVMRUjoAhKv5/ECKiKqRgBRVD6/SRGQFVMxQgogtLvJzECqmIqRkARlH4/iRFQFVMxAoqg9PtJjICqmIoRUASl309iBFTFVIyAIij9fhIjoCqmYgQUQen3kxgBVTEVI6AISr+fxAioiqkYAUVQ+v0kRkBVTMUIKILS7ycxAqpiKkZAEZR+P4kRUBVTMQKKoPT7SYyAqpiKEVAEpd9PYgRUxVSMgCIo/X4SI6AqpmIEFEHp95MYAVUxFSOgCEq/n8QIqIqpGAFFUPr9JEZAVUzFCCiC0u8nMQKqYipGQBGUfj+JEVAVUzECiqD0+0mMgKqYihFQBKXfT2IEVMVUjIAiKP1+EiOgKqZiBBRB6feTGAFVMRUjoAhKv5/ECKiKqRgBRVD6/SRGQFVMxQgogtLvJzECqmIqRkARlH4/iRFQFVMxAoqg9PtJjICqmIoRUASl309iBFTFVIyAIij9fhIjoCqmYgQUQen3kxgBVTEVI6AISr+fxAioiqkYAUVQ+v0kRkBVTMUIKILS7ycxAqpiKkZAEZR+P4kRUBVTMQKKoPT7SYyAqpiKEVAEpd9PYgRUxVSMgCIo/X4SI6AqpmIEFEHp95MYAVUxFSOgCEq/n8QIqIqpGAFFUPr9JEZAVUzFCCiC0u8nMQKqYipGQBGUfj+JEVAVU7GGAdVrfaThqfXaAB6BIiz9fhLjEaiKqRgBRVD6/SRGQFVMxQgogtLvJzECqmIqRkARlH4/iRFQFVMxAoqg9PtJjICqmIoRUASl309iBFTFVIyAIij9fhIjoCqmYgQUQen3kxgBVTEVI6AISr+fxAioiqkYAUVQ+v0kRkBVTMUIKILS7ycxAqpiKkZAEZR+P4kRUBVTMQKKoPT7SYyAqpiKEVAEpd9PYgRUxVSMgCIo/X4SI6AqpmIEFEHp95MYAVUxFSOgCEq/n8QIqIqpGAFFUPr9JEZAVUzFCCiC0u8nMQKqYipGQBGUfj+JEVAVUzECiqD0+0mMgKqYihFQBKXfT2IEVMVUjIAiKP1+EiOgKqZiBBRB6feTGAFVMRUjoAhKv5/ECKiKqRgBRVD6/SRGQFVMxQgogtLvJzECqmIqRkARlH4/iRFQFVMxAoqg9PtJjICqmIoRUASl309iBFTFVIyAIij9fhIjoCqmYgQUQen3kxgBVTEVI6AISr+fxAioiqkYAUVQ+v0kRkBVTMUIKILS7ycxAqpiKkZAEZR+P4kRUBVTMQKKoPT7SYyAqpiKEVAEpd9PYgRUxVSMgCIo/X4SI6AqpmIEFEHp95MYAVUxFSOgCEq/n8QIqIqpGAFFUPr9JEZAVUzFCCiC0u8nMQKqYipGQBGUfj+JEVAVUzECiqD0+0mMgKqYihFQBKXfT2IEVMVUjIAiKP1+EiOgKqZiBBRB6feTGAFVMRUjoAhKv5/ECKiKqRgBRVD6/SRGQFVMxQgogtLvJzECqmIqRkARlH4/iRFQFVMxAoqg9PtJjICqmIoRUASl309iBFTFVIyAIij9fhIjoCqmYgQUQen3kxgBVTEVI6AISr+fxAioiqkYAUVQ+v0kRkBVTMUIKILS7ycxAqpiKkZAEZR+P4kRUBVTMQKKoPT7SYyAqpiKEVAEpd9PYgRUxVSMgCIo/X4SI6AqpmIEFEHp95MYAVUxFSOgCEq/n8QIqIqpGAFFUPr9JEZAVUzFCCiC0u8nMQKqYipGQBGUfj+JEVAVUzECiqD0+0mMgKqYihFQBKXfT2IEVMVUjIAiKP1+EiOgKqZiBBRB6feTGAFVMRUjoAhKv5/ECKiKqRgBRVD6/SRGQFVMxQgogtLvJzECqmIqRkARlH4/iRFQFVMxAoqg9PtJjICqmIoRUASl309iBFTFVIyAIij9fhIjoCqmYgQUQen3kxgBVTEVI6AISr+fxAioiqmYKKCPL083XvliPn908eDni9+8sjedvnudgEJJv5/ECKiKS0Dv720FdF3TVUwJKET0+0mMgKoME9CN+3vnPln8cGf62sGvXZuevz5/cHl6/hYBhY5+P4kRUJVBA7p4IPr+qpnvbzV1/Ti0pJWAQkS/n8QIqMqgAb25epj5+PJWLG+uH43e3IoqAcWp6feTGAFVGTKgjy5OP1z9eP53H0ynP72+/ODa6tcOf1pPQHFa+v0kRkBVhgzo5sHm5jmkZTr3H43e39t8EfT5FeXfvNL6SMOTfj/ASSkDuv9lzjvT6Xu35n+5Ml18TEAxDP1+gJNSBvTO5on2zSPR5XNJWwE1L2TSP7pufaThSb+fxPgUXmW4gD6+vP5q56GiPuURKAGFgH4/iRFQleEC+sRDzPIrBBTD0O8nMQKqMlxAn3iafdVMnoXHIPT7SYyAqgwX0P1Xz+9/Ll+auXn9J68DhZR+P4kRUJXBArr16vlrqwebq5DyTiQMQr+fxAioymABfXRx/0ug9/eWL2N68EF5Vn6R0Vd5Lzzk9PtJjICqDBbQ7SeJbq4vxnR9+cEDrsaEAej3kxgBVRksoHe2H2I++Nl0eu699ccPriz6+e4t+w/ob1vrIw1P+v0kRkBVBgvoielvW+sjDU/6/SRGQFVMxQgogtLvJzECqmIqRkARlH4/iRFQFVMxAoqg9PtJjICqmIoRUASl309iBFTFVKwjoLM/fvY5AcUY6feTGAFV6RvQe//pm/n84euTyeTMLwgoxke/n8QIqErPgN6YfO+38/nVydLyZwQUI6PfT2IEVKVfQG+XbN7dnTz7zb0Lk5cJKEZHv5/ECKhKv4BeXZRzmdGdXyz/d/lzAopx0e8nMQKq0iugs0vLcq4z+vDCMJ/D629b6yMNT/r9JEZAVXoFdNXMhxcmz80JKMZJv5/ECKjKCQJ6d3fyDgHFSOn3kxgBVekV0NWn8DfKl0D5GihGSb+fxAioSq+Azq9Onls+/b4sJ8/CY5T0+0mMgKr0C+jt8gLQxWfws59PVo9DCSjGRb+fxAioSr+ALj59X3iuPJG0884g/SSgOBX9fhIjoCo9Azq/99FPPl788PBHP/jNMP0koDgV/X4SI6AqfQM6PP1ta32k4Um/n8QIqIqp2LEBnX09YD8JKE5Fv5/ECKiKqdjRAf3yx8v3wz/80VuDvIaJgOKU9PtJjICq9Azo7NPVdZgeXpicGeZiTAQUp6LfT2IEVKVnQK9OJmf+evd7v5393WSg19ETUJyKfj+JEVCVfgG9PZm8vX4P5x9Wb+gkoBgX/X4SI6Aq/QJ6dfnuo/Wb4G+US4oQUIyLfj+JEVCVXgFdvRd+HdC7u1xMBOOj309iBFSlV0A3l7Mr5eRqTBgj/X4SI6AqBBQ56PeTGAFV6RXQ2aXlE0frcnI5O4yRfj+JEVCVXgFdPXG0CugipjyJhPHR7ycxAqrSL6B3dycvfVMCeu91LmeHMdLvJzECqtIvoOVydmd3d178/uLHYa6nTEBxKvr9JEZAVXoGdP773cnaQP0koDgV/X4SI6AqfQM6//ZXZxf1fGawy4ESUJyKfj+JEVCV3gEdnP62tT7S8KTfT2IEVMVUjOuBIij9fhIjoCqmYlwPFEHp95MYAVXpGVCuB4qR0+8nMQKq0jOgXA8UI6ffT2IEVKVfQLkeKMZOv5/ECKhKv4ByPVCMnX4/iRFQlV4B5XqgGD39fhIjoCq9Asrl7DB6+v0kRkBVCChy0O8nMQKq0iugXA8Uo6ffT2IEVKVXQLkeKEZPv5/ECKhKv4ByPVCMnX4/iRFQlX4B5XqgGDv9fhIjoCo9A8r1QDFy+v0kRkBV+gaU64Fi3PT7SYyAqvQO6OD0t631kYYn/X4SI6AqpmIEFEHp95MYAVUxFTvihfQ/emnQaykTUJyafj+JEVCVfgG9MJk8M9iVlAkoBPT7SYyAqvQK6OpyypMzHw/ZUP1ta32k4Um/n8QIqEqvgC786celoS98TEAxSvr9JEZAVfoGdL76rkgLQ72QSX/bWh9peNLvJzECqnKCgC4+lf/y9WVCd94a4ikl/W1rfaThSb+fxAioyokCuvDtz8tbkl7QPwzV37bWRxqe9PtJjICqnCigs199f/OGzslLBBRjot9PYgRUpX9AN/VcPhf/7af698Trb1vrIw1P+v0kRkBVegZ0/dXPg1eD6i+rrL9trY80POn3kxgBVekV0NmliX3ySP+NPfS3rfWRhif9fhIjoCq9Arp8J9LO4ZcvPbzAI1CMiX4/iRFQlZ4B/cGvzS/NPle/lEl/21ofaXjS7ycxAqrSK6Au9Let9ZGGJ/1+EiOgKqZiBBRB6feTGAFVMRXruCL9ztlB3oREQHFq+v0kRkBV+gb0xv4r6PmeSBgj/X4SI6AqPQO67OczL775Bt+VEyOl309iBFSlX0Dv7k6eXb2K6d4lvi88xki/n8QIqEq/gF49eN/R7NLkOQKK0dHvJzECqtIroLNLW4867+6qX0JPQHF6+v0kRkBVegX00Ps29W/iJKA4Pf1+EiOgKgQUOej3kxgBVekV0NmlyTv7H+ivw0RAcXr6/SRGQFV6BZQnkTB6+v0kRkBV+gX07u7kzOpyIn96nZcxYYz0+0mMgKr0C+jqjUhnz54d8q1Icq2PNDy1XhtwzFs5/7C7fifnztsD/dX6/zi0PtLwpN9PYjwCVekb0PnsyzcWj0Bf/HiQJ5AIKE5Lv5/ECKhK74AOTn/bWh9peNLvJzECqmIqRkARlH4/iRFQFVMxG9DZR28+6Se8DhSjo99PYgRUpSOgy28n9wTeiYTx0e8nMQKqQkCRg34/iRFQlY6AOtLfttZHGp70+0mMgKqYihFQBKXfT2IEVMVU7PiAfjVcPgkoTke/n8QIqIqp2NEB/fLH5X1IP/gNAcUY6feTGAFV6RnQ2aX9p5BeGui9SPrb1vpIw5N+P4kRUJV+AV32c+fFf/jsn97YnQx0NTsCilPR7ycxAqrSL6A3JpMfrh54zn452bq4MgHFWOj3kxgBVekV0MUD0INr2F3lgsoYIf1+EiOgKr0C+vDCoe/KyQvpMT76/SRGQFV6BpRvKoeR0+8nMQKq0iugfF94jJ5+P4kRUJVeAZ3f2Pq65w2+BooR0u8nMQKq0i+gs0v7L/+8MdC1RAgoTkW/n8QIqEqvgM4+Wr7+88W3Pvvn5Y8vDHNVUP1ta32k4Um/n8QIqEqvgLpc1E5/21ofaXjS7ycxAqpCQJGDfj+JEVCVXgF1ob9trY80POn3kxgBVTEVI6AISr+fxAioiqkYAUVQ+v0kRkBVTMWODugfP9v3OS+kx+jo95MYAVXpGdDf7/JN5TBq+v0kRkBV+gX0Nt+VEyOn309iBFSlV0BnlyY7H3+17+sh+klAcSr6/SRGQFV6BfThhYEuokxAoaLfT2IEVKVnQAd6/zsBhYp+P4kRUJVeAZ1dIqAYOf1+EiOgKr0COr/Bp/AYOf1+EiOgKv0Ceuh7ehBQjJB+P4kRUJV+AZ3fuzA58+aG+kJ2BBSnp99PYgRUpWdAP+V1oBg3/X4SI6Aq/QJ6gxfSY+T0+0mMgKr0Cmh5If0gn7cTUIjo95MYAVXpFVCP55AIKE5Fv5/ECKhKz4DyOlCMnH4/iRFQlV4B5YX0GD39fhIjoCq9Ajq/MXmZgGLU9PtJjICq9Avo7NLO2wQUY6bfT2IEVKVXQGcfvTGZ7LzIC+kxXvr9JEZAVXoF1HxbY14HivHR7ycxAqpCQJGDfj+JEVCVXgF1ob9trY80POn3kxgBVTEVI6AISr+fxAioiqkYAUVQ+v0kRkBVTMVsQGd/tN8F/uGPz77A10AxOvr9JEZAVToC+vDC6imj2UebFy9tfoWAYlT0+0mMgKr0DOhBNgkoRkm/n8QIqAoBRQ76/SRGQFUIKHLQ7ycxAqpCQJGDfj+JEVAVAooc9PtJjICqEFDkoN9PYgRUhYAiB/1+EiOgKgQUOej3kxgBVSGgyEG/n8QIqAoBRQ76/SRGQFUIKHLQ7ycxAqrSHdAnEVCMj34/iRFQFQKKHPT7SYyAqnQEdPbRm0/im8phfPT7SYyAqnQE1JH+trU+0vCk309iBFTFVIyAIij9fhIjoCqmYgQUQen3kxgBVTEVI6AISr+fxAioiqkYAUVQ+v0kRkBVTMUIKILS7ycxAqpiKkZAEZR+P4kRUBVTMQKKoPT7SYyAqpiKEVAEpd9PYgRUxVTsiXciXdr5xeKHb78moBg3/X4SI6AqHQF9eGH5xvfV/xJQjJh+P4kRUJXOgC4fgRJQjJ5+P4kRUJWOgM4uTZ79/Ks/Xfjer786MMzn8/rb1vpIw5N+P4kRUJWOgM5vcDk7hKDfT2IEVKUroLNP6wL66OK0eOWL5UePr+xNp+9eX/3WoQ8IKDT0+0mMgKp0BXSR0K8+++fdnX/47MDnPa4Hen9vK6Drmq5ieugDAgoR/X4SI6Aq3QGdVz2JdGf62sEH16bnr88fXJ6ev2U/IKAQ0e8nMQKq0iugs49OfBH6a9P3939+f2/9OPTcJ+YDAgoV/X4SI6AqvQJ6co8vb/Xx5vrR6M1lVA99QEChot9PYgRUpXdAv/3V2clk5+xb/V7D9Oji+d99MJ3+9Pryg2vTD8svlk/rD31AQKGi309iBFSlb0APXs70cp+Abp5DWtZy/9Ho/b3ztw59sPr/Pr/S5489mdZHGp70+wFO6qiALvv5zItvvvH9ngW9M52+d2v+lyvTRS4JKBzo9wOc1BEBvbs7efY35Wf3Lk3K5UU6bL7SuXwuaauZr3xx6IND/4j+0XXrIw1P+v0kxqfwKv0CenXy7OZp+NmlyXPdAd24MzUPOp/yCJSAQkC/n8QIqEqvgK4vardyd/fZ/q9pMg86CSiGot9PYgRUpVdAD72Q/kSvqi+Z5Fl4DE+/n8QIqMowAX18eTuTm5d8rl8HuvUBAYWKfj+JEVCVXgGdXZq8s//B7UmPT+GvrR5frkLKO5EwPP1+EiOgKr0CevInke7vLV/G9OCD8o73RUZf3X/7+6EPCChU9PtJjICq9Avo3d3JmV+Xn/3p9V4vY1p8hr665tL15QcPti/A9ICrMWEA+v0kRkBV+gV09Uaks2fP9n4r0vzBz6bTc++tH2U+uLJI5rtP+4CAQkO/n8QIqErPgM7/sLt+J+fO2736eXL629b6SMOTfj+JEVCVvgGdz758Y/EI9MWPT3pdOwIKF/r9JEZAVXoHdHD629b6SMOTfj+JEVAVUzECiqD0+0mMgKqYihFQBKXfT2IEVMVUjIAiKP1+EiOgKqZiBBRB6feTGAFVMRUjoAhKv5/ECKiKqRgBRVD6/SRGQFVMxQgogtLvJzECqmIqRkARlH4/iRFQFVOxo67G9IPfEFCMmn4/iRFQlV4BfXhh63qgBBRjpN9PYgRUpWdAT/BdPAgoWtDvJzECqtIroIe+qRwBxRjp95MYAVXpFdD5jc23hSegGCn9fhIjoCr9AvrtLyeTZ158c+0ng1zSTn/bWh9peJuln3QAABwGSURBVNLvJzECqtIroA8vTLYN8wVR/W1rfaThSb+fxAioCgFFDvr9JEZAVXoF1IX+trU+0vCk309iBFTFVIyAIij9fhIjoCqmYscGdPb1gP0koDgV/X4SI6AqpmJHB/TLHy+/+PnwR28N9V3l9Let9ZGGJ/1+EiOgKj0DOvt09ezRwwuTMwO9KUl/21ofaXjS7ycxAqrSM6BXJ5Mzf737vd/O/m4yeXaYx6D629b6SMOTfj+JEVCVfgG9PZm8vX5H/B92B7qwiP62tT7S8KTfT2IEVKVfQK9OXt6/pMiNyXMEFKOj309iBFSlV0BXFxNZB/TuLi+kx/jo95MYAVXpFdBVOtcBHeradvrb1vpIw5N+P4kRUBUCihz0+0mMgKr0Cujs0vKJo3U5bw/0NLz+trU+0vCk309iBFSlV0BXTxytArqIKU8iYXz0+0mMgKr0C+jd3clL35SA3nt9MtDV6fW3rfWRhif9fhIjoCr9Arp4CDqZnN3defH7ix9fHqSfBBSnot9PYgRUpWdA57/f3VwNdKB+ElCcin4/iRFQlb4BnX/7q7OLej4z3DeI19+21kcanvT7SYyAqvQO6OD0t631kYYn/X4SI6AqpmLHXw/0qwH7SUBxKvr9JEZAVUzFjr8e6AKfwmOc9PtJjICq9Azo7NL+t5R7aaArKutvW+sjDU/6/SRGQFX6BXTZz50X//Nn//TGoqDDvI6egOJU9PtJjICq9Avo7f1XL81+OeF6oBgh/X4SI6AqvQK6eAB68OrPq7yVEyOk309iBFSlV0AfXth6+ybXA8UY6feTGAFV6RnQrWZyOTuMkX4/iRFQlV4BXV2Rfu3uLpezw/jo95MYAVXpFdBD3wfpxkDvhtffttZHGp70+0mMgKr0C+jDC5MffrPp5zCfwRNQnIp+P4kRUJWOgM4+erN4Y/U60H9+c3cyefEnfAqP0dHvJzECqtIR0MVDzyfxJBLGR7+fxAioCgFFDpUj+X/4DpH2pegIqCP9bWt9pOGpciStjzQ8SftSmIoRUARVOZLWRxqepH0pTMUIKIKqHEnrIw1P0r4UpmJHB/SPn+37nGfhMTqVI2l9pOFJ2peiZ0APvqccTyJhlCpH0vpIw5O0L0W/gN7mWXiMXOVIWh9peJL2pegV0Nmlyc7HX+37eoh+ElCcSuVIWh9peJL2pegV0IcXBrqIMgGFSuVIWh9peJL2pegZ0IHe/05AoVI5ktZHGp6kfSl6BXR2iYBi5CpH0vpIw5O0L0WvgM5v8Ck8Rq5yJK2PNDxJ+1L0C+ih7+lBQDFClSNpfaThSdqXol9A5/cuTM68ucHl7DA+lSNpfaThSdqXomdAP+V1oBi3ypG0PtLwJO1L0S+gN3ghPUauciStjzQ8SftS9ApoeSH9IJ+3E1CIVI6k9ZGGJ2lfil4B9XgOiYDiVCpH0vpIw5O0L0XPgPI6UIxc5UhaH2l4kval6BVQXkiP0ascSesjDU/SvhS9AjrY94InoFCpHEnrIw1P0r4U/QI6u7TzNgHFmFWOpPWRhidpX4peAZ19VL4vPC+kx3hVjqT1kYYnaV+KXgE139yY14FifCpH0vpIw5O0LwUBRQ6VI2l9pOFJ2peiV0Bd6G9b6yMNT5UjaX2k4Unal8JUjIAiqMqRtD7S8CTtS2EqRkARVOVIWh9peJL2pTAVOyKg3361jW8qh/GpHEnrIw1P0r4UvQLq8iSSXusjDU+VI2l9pOFJ2pen4Vl4BFU5ktZHGp6kfSl6BXT2x8/W/v71yc4/fM4L6TE6lSNpfaThSdqXoldAt93dfXaYK4Pqb1vrIw1PlSNpfaThSdqX4sQBHezCIvrb1vpIw1PlSFofaXiS9qU4eUCHegiqv22tjzQ8VY6k9ZGGJ2lfipMHdKirK+tvW+sjDU+VI2l9pOFJ2pfi5AG9u0tAMT6VI2l9pOFJ2pfixAGdXZ3wKTzGp3IkrY80PEn7UvQK6OyjzaVA33xjd8KTSBihypG0PtLwJO1L0Sugh19Iz8uYMEKVI2l9pOFJ2pfixAF95q2BvkG8/ra1PtLwVDmS1kcanqR9KXoF1IX+trU+0vBUOZLWRxqepH0pTMUIKIKqHEnrIw1P0r4UpmIEFEFVjqT1kYYnaV8KUzECiqAqR9L6SMOTtC+FqZgN6NYLmA7wbY0xPpUjaX2k4Unal6IjoOZKoFwPFGNVOZLWRxqepH0pCChyqBxJ6yMNT9K+FB0Btb7cnfBOJIxR5UhaH2l4kvalOFFAZz9f5PPMbwbpJwHFqVSOpPWRhidpX4qTBPQPi4efO0O9EYmA4lQqR9L6SMOTtC9F/4AO+vCTgOKUKkfS+kjDk7QvRe+Aloef/26wfBJQnE7lSFofaXiS9qXoGdB7Az/8JKA4pcqRtD7S8CTtS9EvoIM//CSgOKXKkbQ+0vAk7UvRJ6D3Li2vAjrow08CilOqHEnrIw1P0r4UPQJaHn6+PXA+CShOp3IkrY80PEn7UnQG1OfhJwHFKVWOpPWRhidpX4qugP7e5+EnAcUpVY6k9ZGGJ2lfio6A8l54BFE5ktZHGp6kfSkIKHKoHEnrIw1P0r4UHQHleqAIonIkrY80PEn7UnQE1JH+trU+0vBUOZLWRxqepH0pTMUIKIKqHEnrIw1P0r4UpmIEFEFVjqT1kYYnaV8KUzECiqAqR9L6SMOTtC+FqRgBRVCVI2l9pOFJ2pfCVIyAIqjKkbQ+0vAk7UthKkZAEVTlSFofaXiS9qUwFSOgCKpyJK2PNDxJ+1KYihFQBFU5ktZHGp6kfSlMxQgogqocSesjDU/SvhSmYgQUQVWOpPWRhidpXwpTMQKKoCpH0vpIw5O0L4WpGAFFUJUjaX2k4Unal8JUjIAiqMqRtD7S8CTtS2EqRkARVOVIWh9peJL2pTAVI6AIqnIkrY80PEn7UpiKEVAEVTmS1kcanqR9KUzFCCiCqhxJ6yMNT9K+FKZiBBRBVY6k9ZGGJ2lfClMxAoqgKkfS+kjDk7QvhakYAUVQlSNpfaThSdqXwlSMgCKoypG0PtLwJO1LYSpGQBFU5UhaH2l4kvalMBUjoAiqciStjzQ8SftSmIoRUARVOZLWRxqepH0pTMUIKIKqHEnrIw1P0r4UpmIEFEFVjqT1kYYnaV8KUzECiqAqR9L6SMOTtC+FqRgBRVCVI2l9pOFJ2pfCVIyAIqjKkbQ+0vAk7UthKkZAEVTlSFofaXiS9qUwFSOgCKpyJK2PNDxJ+1KYihFQBFU5ktZHGp6kfSlMxQgogqocSesjDU/SvhSmYgQUQVWOpPWRhidpXwpTMQKKoCpH0vpIw5O0L4WpGAFFUJUjaX2k4Unal8JUjIAiqMqRtD7S8CTtS2EqRkARVOVIWh9peJL2pTAVI6AIqnIkrY80PEn7UpiKEVAEVTmS1kcanqR9KUzFCCiCqhxJ6yMNT9K+FKZiBBRBVY6k9ZGGJ2lfClMxAoqgKkfS+kjDk7QvhakYAUVQlSNpfaThSdqXwlSMgCKoypG0PtLwJO1LYSpGQBFU5UhaH2l4kvalMBUjoAiqciStjzQ8SftSmIrpAvpvP5tOz717vfz80cVp8coXy48eX9mbTte/Q0AhUjmS1kcanqR9KYYK6L+sknnuk+UH9/e2Arqu6SqmBBQilSNpfaThSdqXYqCA3pme+9v5/MHlVSfvTF87+K1r0/PXl79z/hYBhU7lSFofaXiS9qUYJqCPL08/XP64eLT5YWnm+/u/dX9v/Th09eCUgEKjciStjzQ8SftSDBPQRxfXn6GXdD6+vBXLm+tHoze3okpAcWqVI2l9pOFJ2pdimIDuKwF9dPH87z6YTn96ffUr5bHp4U/rCShOq3IkrY80PEn7Ugwb0NUn6pvnkJbp3H80en9v80XQ51e0f/NS6yMNT5UjaX2k4Unal6cRB3T1+fqd6fS9W/O/XFk+J09AMYzKkbQ+0vAk7cvTaAN6Z/Uyps2XPZefz28F1LyQSf/ouvWRhqfKkbQ+0vAk7UsxZEDv7J378HBPz996yiNQAgqBypG0PtLwJO1LMWBAb07NK5WWDzoJKIZROZLWRxqepH0phgvov9h+rprJs/AYROVIWh9peJL2pRgqoI+vTV9df41z86r6VTM3r//kdaCQqhxJ6yMNT9K+FEMF9NrWWzWvrR5srkLKO5EwiMqRtD7S8CTtSzFQQG9uv9X9/t7yZUwPPii/tsjoq7wXHnKVI2l9pOFJ2pdimIBurl+38FrJ6eoCTNeXv/eAqzFhAJUjaX2k4Unal2KYgN6ZHgro/MHy4qDvrR9yPriy+OV3b9l/Rn/bWh9peKocSesjDU/SvhTDBLSG/ra1PtLwVDmS1kcanqR9KUzFCCiCqhxJ6yMNT9K+FKZiBBRBVY6k9ZGGJ2lfClMxAoqgKkfS+kjDk7QvhakYAUVQlSNpfaThSdqXwlSMgCKoypG0PtLwJO1LYSpGQBFU5UhaH2l4kvalMBUjoAiqciStjzQ8SftSmIoRUARVOZLWRxqepH0pTMUIKIKqHEnrIw1P0r4UpmIEFEFVjqT1kYYnaV8KUzECiqAqR9L6SMOTtC+FqRgBRVCVI2l9pOFJ2pfCVIyAIqjKkbQ+0vAk7UthKkZAEVTlSFofaXiS9qUwFSOgCKpyJK2PNDxJ+1KYihFQBFU5ktZHGp6kfSlMxQgogqocSesjDU/SvhSmYgQUQVWOpPWRhidpXwpTMQKKoCpH0vpIw5O0L4WpGAFFUJUjaX2k4Unal8JUjIAiqMqRtD7S8CTtS2EqRkARVOVIWh9peJL2pTAVI6AIqnIkrY80PEn7UpiKEVAEVTmS1kcanqR9KUzFCCiCqhxJ6yMNT9K+FKZiBBRBVY6k9ZGGJ2lfClMxAoqgKkfS+kjDk7QvhakYAUVQlSNpfaThSdqXwlSMgCKoypG0PtLwJO1LYSpGQBFU5UhaH2l4kvalMBUjoAiqciStjzQ8SftSmIoRUARVOZLWRxqepH0pTMUIKIKqHEnrIw1P0r4UpmIEFEFVjqT1kYYnaV8KUzECiqAqR9L6SMOTtC+FqRgBRVCVI2l9pOFJ2pfCVIyAIqjKkbQ+0vAk7UthKkZAEVTlSFofaXiS9qUwFSOgCKpyJK2PNDxJ+1KYihFQBFU5ktZHGp6kfSlMxQgogqocSesjDU/SvhSmYgQUQVWOpPWRhidpXwpTMQKKoCpH0vpIw5O0L4WpGAFFUJUjaX2k4Unal8JUjIAiqMqRtD7S8CTtS2EqRkARVOVIWh9peJL2pTAVI6AIqnIkrY80PEn7UpiKEVAEVTmS1kcanqR9KUzFCCiCqhxJ6yMNT9K+FKZiBBRBVY6k9ZGGJ2lfClMxAoqgKkfS+kjDk7QvhakYAUVQlSNpfaThSdqXwlSMgCKoypG0PtLwJO1LYSpGQBFU5UhaH2l4kvalMBUjoAiqciStjzQ8SftSmIoRUARVOZLWRxqepH0pTMUIKIKqHEnrIw1P0r4UpmIEFEFVjqT1kYYnaV8KUzECiqAqR9L6SMOTtC+FqRgBRVCVI2l9pOFJ2pfCVIyAIqjKkbQ+0vAk7UthKkZAEVTlSFofaXiS9qUwFSOgCKpyJK2PNDxJ+1KYihFQBFU5ktZHGp6kfSlMxQgogqocSesjDU/SvhSmYgQUQVWOpPWRhidpXwpTMQKKoCpH0vpIw5O0L4WpGAFFUJUjaX2k4Unal8JUjIAiqMqRtD7S8CTtS2EqRkARVOVIWh9peJL2pTAVI6AIqnIkrY80PEn7UpiKEVAEVTmS1kcanqR9KUzFCCiCqhxJ6yMNT9K+FKZiBBRBVY6k9ZGGJ2lfClMxAoqgKkfS+kjDk7QvhakYAUVQlSNpfaThSdqXwlSMgCKoypG0PtLwJO1LYSpGQBFU5UhaH2l4kvalMBVrGFC91kcanipH0vpIw5O0L0/DI1AEVTmS1kcanqR9KUzFCCiCqhxJ6yMNT9K+FKZiBBRBVY6k9ZGGJ2lfClMxAoqgKkfS+kjDk7QvhakYAUVQlSNpfaThSdqXwlSMgCKoypG0PtLwJO1LYSpGQBFU5UhaH2l4kvalMBUjoAiqciStjzQ8SftSmIoRUARVOZLWRxqepH0pTMUIKIKqHEnrIw1P0r4UpmIEFEFVjqT1kYYnaV8KUzECiqAqR9L6SMOTtC+FqRgBRVCVI2l9pOFJ2pfCVIyAIqjKkbQ+0vAk7UthKkZAEVTlSFofaXiS9qUwFSOgCKpyJK2PNDxJ+1KYihFQBFU5ktZHGp6kfSlMxQgogqocSesjDU/SvhSmYgQUQVWOpPWRhidpXwpTMQKKoCpH0vpIw5O0L4WpGAFFUJUjaX2k4Unal8JUjIAiqMqRtD7S8CTtS2EqRkARVOVIWh9peJL2pTAVI6AIqnIkrY80PEn7UpiKEVAEVTmS1kcanqR9KUzFCCiCqhxJ6yMNT9K+FKZiBBRBVY6k9ZGGJ2lfClMxAoqgKkfS+kjDk7QvhakYAUVQlSNpfaThSdqXwlSMgCKoypG0PtLwJO1LYSpGQBFU5UhaH2l4kvalMBUjoAiqciStjzQ8SftSmIoRUARVOZLWRxqepH0pTMUIKIKqHEnrIw1P0r4UpmIEFEFVjqT1kYYnaV8KUzECiqAqR9L6SMOTtC+FqRgBRVCVI2l9pOFJ2pfCVIyAIqjKkbQ+0vAk7UthKkZAEVTlSFofaXiS9qUwFSOgCKpyJK2PNDxJ+1KYihFQBFU5ktZHGp6kfSlMxQgogqocSesjDU/SvhSmYgQUQVWOpPWRhidpXwpTMQKKoCpH0vpIw5O0L4WpGAFFUJUjaX2k4Unal8JUjIAiqMqRtD7S8CTtS2EqRkARVOVIWh9peJL2pTAVI6AIqnIkrY80PEn7UpiKEVAEVTmS1kcanqR9KUzFCCiCqhxJ6yMNT9K+FKZiBBRBVY6k9ZGGJ2lfClMxAoqgKkfS+kjDk7QvhakYAUVQlSNpfaThSdqXwlSMgCKoypG0PtLwJO1LYSpGQBFU5UhaH2l4kvalMBUjoAiqciStjzQ8SftSmIoRUARVOZLWRxqepH0pTMUIKIKqHEnrIw1P0r4UpmIEFEFVjqT1kYYnaV8KUzECiqAqR9L6SMOTtC+FqRgBRVCVI2l9pOFJ2pfCVIyAIqjKkbQ+0vAk7UthKkZAEVTlSFofaXiS9qUwFSOgCKpyJK2PNDxJ+1KYihFQBFU5ktZHGp6kfSlMxQgogqocSesjDU/SvhSmYgQUQVWOpPWRhidpXwpTMQKKoCpH0vpIw5O0L4WpGAFFUJUjaX2k4Unal8JUjIAiqMqRtD7S8CTtS2EqRkARVOVIWh9peJL2pTAVI6AIqnIkrY80PEn7UpiKEVAEVTmS1kcanqR9KUzFCCiCqhxJ6yMNT9K+FKZiBBRBVY6k9ZGGJ2lfClMxAoqgKkfS+kjDk7QvhakYAUVQlSNpfaThSdqXwlSMgCKoypG0PtLwJO1LYSpGQBFU5UhaH2l4kvalMBUjoAiqciStjzQ8SftSmIp5BPTxlb3p9N3rBBRKlSNpfaThSdqXwj+gjy5Ol175goBCqHIkrY80PEn7UvgH9Nr0/PX5g8vT87cIKHQqR9L6SMOTtC+Fe0Dv75XHno8unvuEgEKnciStjzQ8SftSuAf05vS19Y/vE1DoVI6k9ZGGJ2lfCveAXpt+WH68sw4pAYVE5UhaH2l4kval8A7o48vrT93v722+CPr8iv7van2k4alyJK2PNDxJ+/I0qQIKAJ48A2peyKR/dP3dxD2JToxEpWFAzeuYWt8TWXBPohMjUSGg2XBPohMjUfEOqOez8N9N3JPoxEhU3AO6ef2nw+tAv5u4J9GJkai4B9TxnUjfTdyT6MRIVNwD+vjy9FWn98J/N3FPohMjUXEP6PyB29WYvpu4J9GJkaj4B3T+4Mqin+/esr/c+p7IgnsSnRiJSoOAHqH1PZEF9yQ6MRIVUzECGh73JDoxEhVTMQIaHvckOjESFVMxAhoe9yQ6MRIVUzECGh73JDoxEhVTMQIaHvckOjESFVMxAhoe9yQ6MRIVUzECGh73JDoxEhVTMQIaHvckOjESFVMxAhoe9yQ6MRIVUzECGh73JDoxEhVTMQIaHvckOjESFVMxAhoe9yQ6MRIVUzECGh73JDoxEhVTMQIaHvckOjESFVMxAhoe9yQ6MRIVUzECGh73JDoxEhVTMQIaHvckOjESFVMxAhoe9yQ6MRIVUzECGh73JDoxEhVTMQIaHvckOjESFVMxAhoe9yQ6MRIVUzECGh73JDoxEhVTMQIaHvckOjESFVMxAhoe9yQ6MRIVUzECGh73JDoxEhVTMQIaHvckOjESFVOxhgGFxvPPt/43wOgxkoEQ0PA4G+jESAZCQMPjbKATIxkIAQ2Ps4FOjGQgBDQ8zgY6MZKBENDwOBvoxEgGQkDD42ygEyMZCAEFgEoEFAAqEVAAqERAAaASAQWASgQUACoRUACoREABoBIBDeHRxen7+z995Yum/y4Yk8eXp+dv7f/0w7b/Mt9BBDSERUDPfbL5KQHFgft7m/+23tlPKdwQ0BAWAZ2+tvkpAcWWm9PVIB5d3Pw3Fn4IaAiLw/E368/PCCgO2Xx55+bmP7FwREBDWFTzf+xtHmisfnxwZTqdvnu96b8WxuBO+fLO/fU+FsPYm05/en31858tRvLv/7bhv1x2BDSEZTXXjzDWAb2zOCUL53ja4Dvv8eXlMq6tP0O5vzWM9c95aDocAhrCsprrJ1lXAV0cjXf/9/zxv0z5uhfu75375P7e6hmkxSf0792aP/7X5RdGF4v5D4tf/Lc9RjIYAhpCqebqk7RVQDdf8LrGowssVnD+v6wjuRnGzen7PK3kgICGsKpmqWX56f5L/njpCrZfpPH48rqZy0eki5W8+j9b/nt9BxDQEFYBLY8oyk/3H1vwnDzmy/+OrmewaObG4lduLn989b/yn9jhENAQNs8cLR5vrgO6PjAEFPPV483yk+Vj0YOAzv/8N+Wn75HQoRDQEDadvDZ9n0egeMJWQM2XPR//9+Urmd5/2j8EAQIawqaTi/Px3/gaKKz9gD7t/fCP/5WRDIaAhrD/QPPO9K/2eBYexn5AF8NY/Wz5X9bNa+sPfhdqBDSEg8/Ur62+uLV6HehfrvA6UMy3E/no4vT89fn8z3uLR6LLKzUtfv7gMv+VHQwBDeEgoIty8k4kGFuPMdfDmL43P3gn0qt8nXwoBDSEreeKNhff4b3w2Lf9SfrqvfD/ePDzv/qPfAI/GAIKAJUIKABUIqAAUImAAkAlAgoAlQgoAFQioABQiYACQCUCCgCVCCgAVCKgAFCJgAJAJQIKAJUIKABUIqAAUImAAkAlAgoAlQgoAFQioABQiYACQCUCCgCVCCgAVCKgAFCJgAJAJQIKAJUIKABUIqAAUImAAkAlAgoAlQgoAFQioABQiYACQCUCCgCVCCgAVCKgAFCJgAJAJQIKAJUIKABUIqAAUImAAkAlAgoAlQgoAFQioABQiYACQCUCCgCVCCgAVCKgAFCJgAJAJQIKAJUIKABUIqAAUOn/A71FEGOQyBlxAAAAAElFTkSuQmCC">
             <a:extLst>
               <a:ext uri="{FF2B5EF4-FFF2-40B4-BE49-F238E27FC236}">
-                <a16:creationId xmlns:a16="http://schemas.microsoft.com/office/drawing/2014/main" id="{8CC047BC-7FEC-4EB1-BCEA-02FB6A9AD576}"/>
+                <a16:creationId xmlns="" xmlns:a16="http://schemas.microsoft.com/office/drawing/2014/main" id="{8CC047BC-7FEC-4EB1-BCEA-02FB6A9AD576}"/>
               </a:ext>
             </a:extLst>
           </p:cNvPr>
@@ -5933,7 +5978,7 @@
           <p:cNvPr id="5" name="AutoShape 2" descr="data:image/png;base64,iVBORw0KGgoAAAANSUhEUgAABUAAAAPACAMAAADDuCPrAAABYlBMVEUAAAAAADoAAGYAOjoAOmYAOpAAZrYzMzM6AAA6OgA6Ojo6OmY6ZmY6ZpA6ZrY6kLY6kNtNTU1NTW5NTY5Nbm5Nbo5NbqtNjshmAABmADpmOgBmOjpmZjpmZmZmZpBmkGZmkLZmkNtmtttmtv9uTU1ubk1ubm5ubo5ujqtujshuq8huq+SOTU2Obk2Obm6Oq8iOyOSOyP+QOgCQOjqQZjqQZmaQZpCQkGaQkLaQtraQttuQ2/+rbk2rjk2rjm6rq8iryOSr5Mir5P+2ZgC2Zjq2kDq2kGa2kJC2tpC2tra2ttu229u22/+2///Ijk3Ijm7Iq27Iq6vIyKvI5KvI5OTI5P/I///bkDrbkGbbtmbbtpDbtrbb27bb29vb2//b/7bb///kq27kyI7kyKvk5P/k///r6+v8jVn/tmb/yI7/25D/27b/29v/5Kv/5Mj/5OT//7b//7///8j//9v//+T///+zjZs9AAAACXBIWXMAAB2HAAAdhwGP5fFlAAAgAElEQVR4nO3d/59b5ZnecU0wMDGEILMYh0CWwmwDxaSLN3S7xHW3mGQXkni3aY0TEijO1q2/YMe1rP+/0iNpRnPbM+fMM9e5n3PffN4/xB472Eiv6/mgGUlnJnMAQJVJ638BAIiKgAJAJQIKAJUIKABUIqAAUImAAkAlAgoAlQgoAFQioABQiYACQCUCCgCVCCgAVCKgAFCJgAJAJQIKAJVGENDZl298fzKZ7Lzw8Ten/rNuT570zvzhhcnOLwT/pgCwrXlAZ7/aPWjdS6dNKAEF4Kd1QO+9fih2p+0cAQXgp3FA7y4ffu689dXip9/+6vuCgh78ud/7reRPAoCjtA3o4qHh1ufts1/KCkpAAQyvbUCvLor59tbHy8/An1P8wQQUwPCaBnT5CfzLh37lRvmapeRPJqAABtY0oItcmswtP6d/rvzGwQPRq5vK3vv5Irg7P/jNwT/9zuzT3cnOC09+1n84oJsnka4ufyh/ygsfL3/9yx8vev3Cr/f/f+YvAIBjtQzo7NKTn7Cvmroo3n7/NvWbfWpe7LQM6NUjnro/OqA31n/Iywd/4PpB8BN/AQAcq2VAlw837efrt1c9vHrwO4tfefabVW03VtVdpPBs+fDZJ3t3ZED/fv8Pefvq4ddOPfkXAMCxWgZ0UbknHjyuo3r7IGLrli4fOb709Xz+7aebx4zlseQPv5l/+/VT/+inBnRh+Rn6l4tP1Z+Z7Lz9zeqZ/+fmT/0LAOBYLQN6+ymffS8D+vJ866Xv68/mtx6t3l5/5fTGMaE7OqAvb/6MzV9wdfUQ9il/AQAca6QBXdZxlbr180nbTysdPCY98kWjRwZ0/aubv2a+/yWCp/wFAHCssQZ0UcDypc3lVyaXMdtu2u39xj7lq58rRwb0uYO/5p1D/9en/AUAcKyRfg10Gc7ye+uQbj/Ds3mW58YxT/YcGdCXD//K/v/1aX8BABxrbM/C70f19qFP5W3f7Cfd1qkDeuRjWwDYGOfrQOclcYuIbR6IElAA4zPOdyItlbcNbV7OtPlSqPmntQHliSMAJ9I0oFu5XNt6L3z5HH7/qZ2rTz6vIw3o0/4CADhW26sx2Zdy3t765HnxmPDZ/7X/ls7tp9xv7H95VBjQp/wFAHCstgEtX3k8eOf5jcn2C5tulDderku2deGmzfNM2oA+5S8AgGM1viL9veUVlQ9dkf7gC5Grq9VvSrZ8F9GZX6+/h9LmvZfCgD7lLwCAY435eyJd3X42fPtp8lUbxQF98i8AgGO1Duih78q5c/g6crcn28+Mz36++b+dWV2wUxzQJ/8CADhW84AufPnz5Sfvz7xovy/89lVBl/60vN7x+lrIc31An/gLAOBYYwgoAIREQAGgEgEFgEoEFAAqEVAAqERAAaASAQWASgQUACoRUACoREABoBIBBYBKBBQAKhFQAKhEQAGgEgEFgEoEFAAqEVAAqNQwoP8HEtyT6MRIVEzFCGh43JPoxEhUTMUIaHjck+jESFRMxQhoeNyT6MRIVEzFCGh43JPoxEhUTMUIaHjck+jESFRMxQhoeNyT6MRIVEzFCGh43JPoxEhUTMUIaHjck+jESFRMxQhoeNyT6MRIVEzFCGh43JPoxEhUTMUIaHjck+jESFRMxQhoeNyT6MRIVEzFCGh43JPoxEhUTMUIaHjck+jESFRMxQhoeNyT6MRIVEzFCGh43JPoxEhUTMUIaHjck+jESFRMxQhoeNyT6MRIVEzFCGh43JPoxEhUTMUIaHjck+jESFRMxQhoeNyT6MRIVEzFCGh43JPoxEhUTMUIaHjck+jESFRMxQhoeNyT6MRIVEzFCGh43JPoxEhUTMUIaHjck+jESFRMxQhoeNyT6MRIVEzFCGh43JPoxEhUTMUIaHjck+jESFRMxQhoeNyT6MRIVEzFCGh43JPoxEhUTMUIaHjck+jESFRMxQhoeNyT6MRIVEzFCGh43JPoxEhUTMUIaHjck+jESFRMxQhoeNyT6MRIVEzFUgX0/+I7RL+fxAioiqkYAUVQ+v0kRkBVTMUIKILS7ycxAqpiKkZAEZR+P4kRUBVTMQKKoPT7SYyAqpiKEVAEpd9PYgRUxVSMgCIo/X4SI6AqpmIEFEHp95MYAVUxFSOgCEq/n8QIqIqpGAFFUPr9JEZAVUzFCCiC0u8nMQKqYipGQBGUfj+JEVAVUzECiqD0+0mMgKqYihFQBKXfT2IEVMVUjIAiKP1+EiOgKqZiBBRB6feTGAFVMRUjoAhKv5/ECKiKqRgBRVD6/SRGQFVMxQgogtLvJzECqmIqRkARlH4/iRFQFVMxAoqg9PtJjICqmIoRUASl309iBFTFVIyAIij9fhIjoCqmYgQUQen3kxgBVTEVI6AISr+fxAioiqkYAUVQ+v0kRkBVTMUIKILS7ycxAqpiKkZAEZR+P4kRUBVTMQKKoPT7SYyAqpiKEVAEpd9PYgRUxVSMgCIo/X4SI6AqpmKnDeiji6+tf/b4yt50+u71rg8IKDT0+0mMgKqIA3pt+tqmpNOlV744/gMCChH9fhIjoCrSgD6+Nt0E9Nr0/PX5g8vT87eO/YCAQkS/n8QIqIoyoP/2wXQT0Pt75RHmo4vnPjnuAwIKFf1+EiOgKsKA3pxO3/vzOqA39398/7gPCChU9PtJjICqKAP66j/O76zzeG36YfmxfHz0BwQUKvr9JEZAVYQB3cri48vrT9Dv752/dfQHq3/m+ZVT/s1P0fpIw5N+P8BJEVAEpd8PcFL6gL7yxdEfHPpH9Y+uWx9peNLvJzE+hVcZPKDdj0AJKAT0+0mMgKoQUOSg309iBFRlmIDyLDy86feTGAFVGSigm1d5rl/6edQHBBQq+v0kRkBVBgoo70SCM/1+EiOgKgMF9PHl6av773g/+gMCChX9fhIjoCoDBXT+YPuaS0d/QEAhot9PYgRUZaiAzh9cWVTy3VtdHxBQaOj3kxgBVREH9BT0t631kYYn/X4SI6AqpmIEFEHp95MYAVUxFSOgCEq/n8QIqIqpGAFFUPr9JEZAVUzFCCiC0u8nMQKqYipGQBGUfj+JEVAVUzECiqD0+0mMgKqYihFQBKXfT2IEVMVUjIAiKP1+EiOgKqZiBBRB6feTGAFVMRUjoAhKv5/ECKiKqRgBRVD6/SRGQFVMxQgogtLvJzECqmIqRkARlH4/iRFQFVMxAoqg9PtJjICqmIoRUASl309iBFTFVIyAIij9fhIjoCqmYgQUQen3kxgBVTEVI6AISr+fxAioiqkYAUVQ+v0kRkBVTMUIKILS7ycxAqpiKkZAEZR+P4kRUBVTMQKKoPT7SYyAqpiKEVAEpd9PYgRUxVSMgCIo/X4SI6AqpmIEFEHp95MYAVUxFSOgCEq/n8QIqIqpGAFFUPr9JEZAVUzFCCiC0u8nMQKqYipGQBGUfj+JEVAVUzECiqD0+0mMgKqYihFQBKXfT2IEVMVUjIAiKP1+EiOgKqZiBBRB6feTGAFVMRUjoAhKv5/ECKiKqRgBRVD6/SRGQFVMxQgogtLvJzECqmIqRkARlH4/iRFQFVMxAoqg9PtJjICqmIoRUASl309iBFTFVIyAIij9fhIjoCqmYgQUQen3kxgBVTEVI6AISr+fxAioiqkYAUVQ+v0kRkBVTMUIKILS7ycxAqpiKkZAEZR+P4kRUBVTMQKKoPT7SYyAqpiKEVAEpd9PYgRUxVSMgCIo/X4SI6AqpmIEFEHp95MYAVUxFSOgCEq/n8QIqIqpGAFFUPr9JEZAVUzFCCiC0u8nMQKqYipGQBGUfj+JEVAVUzECiqD0+0mMgKqYihFQBKXfT2IEVMVUjIAiKP1+EiOgKqZiBBRB6feTGAFVMRUjoAhKv5/ECKiKqRgBRVD6/SRGQFVMxQgogtLvJzECqmIqRkARlH4/iRFQFVMxAoqg9PtJjICqmIoRUASl309iBFTFVIyAIij9fhIjoCqmYgQUQen3kxgBVTEVI6AISr+fxAioiqkYAUVQ+v0kRkBVTMUIKILS7ycxAqpiKkZAEZR+P4kRUBVTMQKKoPT7SYyAqpiKEVAEpd9PYgRUxVSMgCIo/X4SI6AqpmIEFEHp95MYAVUxFSOgCEq/n8QIqIqpGAFFUPr9JEZAVUzFCCiC0u8nMQKqYipGQBGUfj+JEVAVU7GGAdVrfaThqfXaAB6BIiz9fhLjEaiKqRgBRVD6/SRGQFVMxQgogtLvJzECqmIqRkARlH4/iRFQFVMxAoqg9PtJjICqmIoRUASl309iBFTFVIyAIij9fhIjoCqmYgQUQen3kxgBVTEVI6AISr+fxAioiqkYAUVQ+v0kRkBVTMUIKILS7ycxAqpiKkZAEZR+P4kRUBVTMQKKoPT7SYyAqpiKEVAEpd9PYgRUxVSMgCIo/X4SI6AqpmIEFEHp95MYAVUxFSOgCEq/n8QIqIqpGAFFUPr9JEZAVUzFCCiC0u8nMQKqYipGQBGUfj+JEVAVUzECiqD0+0mMgKqYihFQBKXfT2IEVMVUjIAiKP1+EiOgKqZiBBRB6feTGAFVMRUjoAhKv5/ECKiKqRgBRVD6/SRGQFVMxQgogtLvJzECqmIqRkARlH4/iRFQFVMxAoqg9PtJjICqmIoRUASl309iBFTFVIyAIij9fhIjoCqmYgQUQen3kxgBVTEVI6AISr+fxAioiqkYAUVQ+v0kRkBVTMUIKILS7ycxAqpiKkZAEZR+P4kRUBVTMQKKoPT7SYyAqpiKEVAEpd9PYgRUxVSMgCIo/X4SI6AqpmIEFEHp95MYAVUxFSOgCEq/n8QIqIqpGAFFUPr9JEZAVUzFCCiC0u8nMQKqYipGQBGUfj+JEVAVUzECiqD0+0mMgKqYihFQBKXfT2IEVMVUjIAiKP1+EiOgKqZiBBRB6feTGAFVMRUjoAhKv5/ECKiKqRgBRVD6/SRGQFVMxQgogtLvJzECqmIqRkARlH4/iRFQFVMxAoqg9PtJjICqmIoRUASl309iBFTFVIyAIij9fhIjoCqmYgQUQen3kxgBVTEVI6AISr+fxAioiqkYAUVQ+v0kRkBVTMUIKILS7ycxAqpiKkZAEZR+P4kRUBVTMQKKoPT7SYyAqpiKEVAEpd9PYgRUxVSMgCIo/X4SI6AqpmIEFEHp95MYAVUxFSOgCEq/n8QIqIqpGAFFUPr9JEZAVUzFCCiC0u8nMQKqYipGQBGUfj+JEVAVUzECiqD0+0mMgKqYihFQBKXfT2IEVMVUjIAiKP1+EiOgKqZiBBRB6feTGAFVMRUjoAhKv5/ECKiKqRgBRVD6/SRGQFVMxQgogtLvJzECqmIqRkARlH4/iRFQFVMxAoqg9PtJjICqmIoRUASl309iBFTFVIyAIij9fhIjoCqmYgQUQen3kxgBVTEVI6AISr+fxAioiqmYKKCPL083XvliPn908eDni9+8sjedvnudgEJJv5/ECKiKS0Dv720FdF3TVUwJKET0+0mMgKoME9CN+3vnPln8cGf62sGvXZuevz5/cHl6/hYBhY5+P4kRUJVBA7p4IPr+qpnvbzV1/Ti0pJWAQkS/n8QIqMqgAb25epj5+PJWLG+uH43e3IoqAcWp6feTGAFVGTKgjy5OP1z9eP53H0ynP72+/ODa6tcOf1pPQHFa+v0kRkBVhgzo5sHm5jmkZTr3H43e39t8EfT5FeXfvNL6SMOTfj/ASSkDuv9lzjvT6Xu35n+5Ml18TEAxDP1+gJNSBvTO5on2zSPR5XNJWwE1L2TSP7pufaThSb+fxPgUXmW4gD6+vP5q56GiPuURKAGFgH4/iRFQleEC+sRDzPIrBBTD0O8nMQKqMlxAn3iafdVMnoXHIPT7SYyAqgwX0P1Xz+9/Ll+auXn9J68DhZR+P4kRUJXBArr16vlrqwebq5DyTiQMQr+fxAioymABfXRx/0ug9/eWL2N68EF5Vn6R0Vd5Lzzk9PtJjICqDBbQ7SeJbq4vxnR9+cEDrsaEAej3kxgBVRksoHe2H2I++Nl0eu699ccPriz6+e4t+w/ob1vrIw1P+v0kRkBVBgvoielvW+sjDU/6/SRGQFVMxQgogtLvJzECqmIqRkARlH4/iRFQFVMxAoqg9PtJjICqmIoRUASl309iBFTFVKwjoLM/fvY5AcUY6feTGAFV6RvQe//pm/n84euTyeTMLwgoxke/n8QIqErPgN6YfO+38/nVydLyZwQUI6PfT2IEVKVfQG+XbN7dnTz7zb0Lk5cJKEZHv5/ECKhKv4BeXZRzmdGdXyz/d/lzAopx0e8nMQKq0iugs0vLcq4z+vDCMJ/D629b6yMNT/r9JEZAVXoFdNXMhxcmz80JKMZJv5/ECKjKCQJ6d3fyDgHFSOn3kxgBVekV0NWn8DfKl0D5GihGSb+fxAioSq+Azq9Onls+/b4sJ8/CY5T0+0mMgKr0C+jt8gLQxWfws59PVo9DCSjGRb+fxAioSr+ALj59X3iuPJG0884g/SSgOBX9fhIjoCo9Azq/99FPPl788PBHP/jNMP0koDgV/X4SI6AqfQM6PP1ta32k4Um/n8QIqIqp2LEBnX09YD8JKE5Fv5/ECKiKqdjRAf3yx8v3wz/80VuDvIaJgOKU9PtJjICq9Azo7NPVdZgeXpicGeZiTAQUp6LfT2IEVKVnQK9OJmf+evd7v5393WSg19ETUJyKfj+JEVCVfgG9PZm8vX4P5x9Wb+gkoBgX/X4SI6Aq/QJ6dfnuo/Wb4G+US4oQUIyLfj+JEVCVXgFdvRd+HdC7u1xMBOOj309iBFSlV0A3l7Mr5eRqTBgj/X4SI6AqBBQ56PeTGAFV6RXQ2aXlE0frcnI5O4yRfj+JEVCVXgFdPXG0CugipjyJhPHR7ycxAqrSL6B3dycvfVMCeu91LmeHMdLvJzECqtIvoOVydmd3d178/uLHYa6nTEBxKvr9JEZAVXoGdP773cnaQP0koDgV/X4SI6AqfQM6//ZXZxf1fGawy4ESUJyKfj+JEVCV3gEdnP62tT7S8KTfT2IEVMVUjOuBIij9fhIjoCqmYlwPFEHp95MYAVXpGVCuB4qR0+8nMQKq0jOgXA8UI6ffT2IEVKVfQLkeKMZOv5/ECKhKv4ByPVCMnX4/iRFQlV4B5XqgGD39fhIjoCq9Asrl7DB6+v0kRkBVCChy0O8nMQKq0iugXA8Uo6ffT2IEVKVXQLkeKEZPv5/ECKhKv4ByPVCMnX4/iRFQlX4B5XqgGDv9fhIjoCo9A8r1QDFy+v0kRkBV+gaU64Fi3PT7SYyAqvQO6OD0t631kYYn/X4SI6AqpmIEFEHp95MYAVUxFTvihfQ/emnQaykTUJyafj+JEVCVfgG9MJk8M9iVlAkoBPT7SYyAqvQK6OpyypMzHw/ZUP1ta32k4Um/n8QIqEqvgC786celoS98TEAxSvr9JEZAVfoGdL76rkgLQ72QSX/bWh9peNLvJzECqnKCgC4+lf/y9WVCd94a4ikl/W1rfaThSb+fxAioyokCuvDtz8tbkl7QPwzV37bWRxqe9PtJjICqnCigs199f/OGzslLBBRjot9PYgRUpX9AN/VcPhf/7af698Trb1vrIw1P+v0kRkBVegZ0/dXPg1eD6i+rrL9trY80POn3kxgBVekV0NmliX3ySP+NPfS3rfWRhif9fhIjoCq9Arp8J9LO4ZcvPbzAI1CMiX4/iRFQlZ4B/cGvzS/NPle/lEl/21ofaXjS7ycxAqrSK6Au9Let9ZGGJ/1+EiOgKqZiBBRB6feTGAFVMRXruCL9ztlB3oREQHFq+v0kRkBV+gb0xv4r6PmeSBgj/X4SI6AqPQO67OczL775Bt+VEyOl309iBFSlX0Dv7k6eXb2K6d4lvi88xki/n8QIqEq/gF49eN/R7NLkOQKK0dHvJzECqtIroLNLW4867+6qX0JPQHF6+v0kRkBVegX00Ps29W/iJKA4Pf1+EiOgKgQUOej3kxgBVekV0NmlyTv7H+ivw0RAcXr6/SRGQFV6BZQnkTB6+v0kRkBV+gX07u7kzOpyIn96nZcxYYz0+0mMgKr0C+jqjUhnz54d8q1Icq2PNDy1XhtwzFs5/7C7fifnztsD/dX6/zi0PtLwpN9PYjwCVekb0PnsyzcWj0Bf/HiQJ5AIKE5Lv5/ECKhK74AOTn/bWh9peNLvJzECqmIqRkARlH4/iRFQFVMxG9DZR28+6Se8DhSjo99PYgRUpSOgy28n9wTeiYTx0e8nMQKqQkCRg34/iRFQlY6AOtLfttZHGp70+0mMgKqYihFQBKXfT2IEVMVU7PiAfjVcPgkoTke/n8QIqIqp2NEB/fLH5X1IP/gNAcUY6feTGAFV6RnQ2aX9p5BeGui9SPrb1vpIw5N+P4kRUJV+AV32c+fFf/jsn97YnQx0NTsCilPR7ycxAqrSL6A3JpMfrh54zn452bq4MgHFWOj3kxgBVekV0MUD0INr2F3lgsoYIf1+EiOgKr0C+vDCoe/KyQvpMT76/SRGQFV6BpRvKoeR0+8nMQKq0iugfF94jJ5+P4kRUJVeAZ3f2Pq65w2+BooR0u8nMQKq0i+gs0v7L/+8MdC1RAgoTkW/n8QIqEqvgM4+Wr7+88W3Pvvn5Y8vDHNVUP1ta32k4Um/n8QIqEqvgLpc1E5/21ofaXjS7ycxAqpCQJGDfj+JEVCVXgF1ob9trY80POn3kxgBVTEVI6AISr+fxAioiqkYAUVQ+v0kRkBVTMWODugfP9v3OS+kx+jo95MYAVXpGdDf7/JN5TBq+v0kRkBV+gX0Nt+VEyOn309iBFSlV0BnlyY7H3+17+sh+klAcSr6/SRGQFV6BfThhYEuokxAoaLfT2IEVKVnQAd6/zsBhYp+P4kRUJVeAZ1dIqAYOf1+EiOgKr0COr/Bp/AYOf1+EiOgKv0Ceuh7ehBQjJB+P4kRUJV+AZ3fuzA58+aG+kJ2BBSnp99PYgRUpWdAP+V1oBg3/X4SI6Aq/QJ6gxfSY+T0+0mMgKr0Cmh5If0gn7cTUIjo95MYAVXpFVCP55AIKE5Fv5/ECKhKz4DyOlCMnH4/iRFQlV4B5YX0GD39fhIjoCq9Ajq/MXmZgGLU9PtJjICq9Avo7NLO2wQUY6bfT2IEVKVXQGcfvTGZ7LzIC+kxXvr9JEZAVXoF1HxbY14HivHR7ycxAqpCQJGDfj+JEVCVXgF1ob9trY80POn3kxgBVTEVI6AISr+fxAioiqkYAUVQ+v0kRkBVTMVsQGd/tN8F/uGPz77A10AxOvr9JEZAVToC+vDC6imj2UebFy9tfoWAYlT0+0mMgKr0DOhBNgkoRkm/n8QIqAoBRQ76/SRGQFUIKHLQ7ycxAqpCQJGDfj+JEVAVAooc9PtJjICqEFDkoN9PYgRUhYAiB/1+EiOgKgQUOej3kxgBVSGgyEG/n8QIqAoBRQ76/SRGQFUIKHLQ7ycxAqrSHdAnEVCMj34/iRFQFQKKHPT7SYyAqnQEdPbRm0/im8phfPT7SYyAqnQE1JH+trU+0vCk309iBFTFVIyAIij9fhIjoCqmYgQUQen3kxgBVTEVI6AISr+fxAioiqkYAUVQ+v0kRkBVTMUIKILS7ycxAqpiKkZAEZR+P4kRUBVTMQKKoPT7SYyAqpiKEVAEpd9PYgRUxVTsiXciXdr5xeKHb78moBg3/X4SI6AqHQF9eGH5xvfV/xJQjJh+P4kRUJXOgC4fgRJQjJ5+P4kRUJWOgM4uTZ79/Ks/Xfjer786MMzn8/rb1vpIw5N+P4kRUJWOgM5vcDk7hKDfT2IEVKUroLNP6wL66OK0eOWL5UePr+xNp+9eX/3WoQ8IKDT0+0mMgKp0BXSR0K8+++fdnX/47MDnPa4Hen9vK6Drmq5ieugDAgoR/X4SI6Aq3QGdVz2JdGf62sEH16bnr88fXJ6ev2U/IKAQ0e8nMQKq0iugs49OfBH6a9P3939+f2/9OPTcJ+YDAgoV/X4SI6AqvQJ6co8vb/Xx5vrR6M1lVA99QEChot9PYgRUpXdAv/3V2clk5+xb/V7D9Oji+d99MJ3+9Pryg2vTD8svlk/rD31AQKGi309iBFSlb0APXs70cp+Abp5DWtZy/9Ho/b3ztw59sPr/Pr/S5489mdZHGp70+wFO6qiALvv5zItvvvH9ngW9M52+d2v+lyvTRS4JKBzo9wOc1BEBvbs7efY35Wf3Lk3K5UU6bL7SuXwuaauZr3xx6IND/4j+0XXrIw1P+v0kxqfwKv0CenXy7OZp+NmlyXPdAd24MzUPOp/yCJSAQkC/n8QIqEqvgK4vardyd/fZ/q9pMg86CSiGot9PYgRUpVdAD72Q/kSvqi+Z5Fl4DE+/n8QIqMowAX18eTuTm5d8rl8HuvUBAYWKfj+JEVCVXgGdXZq8s//B7UmPT+GvrR5frkLKO5EwPP1+EiOgKr0CevInke7vLV/G9OCD8o73RUZf3X/7+6EPCChU9PtJjICq9Avo3d3JmV+Xn/3p9V4vY1p8hr665tL15QcPti/A9ICrMWEA+v0kRkBV+gV09Uaks2fP9n4r0vzBz6bTc++tH2U+uLJI5rtP+4CAQkO/n8QIqErPgM7/sLt+J+fO2736eXL629b6SMOTfj+JEVCVvgGdz758Y/EI9MWPT3pdOwIKF/r9JEZAVXoHdHD629b6SMOTfj+JEVAVUzECiqD0+0mMgKqYihFQBKXfT2IEVMVUjIAiKP1+EiOgKqZiBBRB6feTGAFVMRUjoAhKv5/ECKiKqRgBRVD6/SRGQFVMxQgogtLvJzECqmIqRkARlH4/iRFQFVOxo67G9IPfEFCMmn4/iRFQlV4BfXhh63qgBBRjpN9PYgRUpWdAT/BdPAgoWtDvJzECqtIroIe+qRwBxRjp95MYAVXpFdD5jc23hSegGCn9fhIjoCr9AvrtLyeTZ158c+0ng1zSTn/bWh9peJuln3QAABwGSURBVNLvJzECqtIroA8vTLYN8wVR/W1rfaThSb+fxAioCgFFDvr9JEZAVXoF1IX+trU+0vCk309iBFTFVIyAIij9fhIjoCqmYscGdPb1gP0koDgV/X4SI6AqpmJHB/TLHy+/+PnwR28N9V3l9Let9ZGGJ/1+EiOgKj0DOvt09ezRwwuTMwO9KUl/21ofaXjS7ycxAqrSM6BXJ5Mzf737vd/O/m4yeXaYx6D629b6SMOTfj+JEVCVfgG9PZm8vX5H/B92B7qwiP62tT7S8KTfT2IEVKVfQK9OXt6/pMiNyXMEFKOj309iBFSlV0BXFxNZB/TuLi+kx/jo95MYAVXpFdBVOtcBHeradvrb1vpIw5N+P4kRUBUCihz0+0mMgKr0Cujs0vKJo3U5bw/0NLz+trU+0vCk309iBFSlV0BXTxytArqIKU8iYXz0+0mMgKr0C+jd3clL35SA3nt9MtDV6fW3rfWRhif9fhIjoCr9Arp4CDqZnN3defH7ix9fHqSfBBSnot9PYgRUpWdA57/f3VwNdKB+ElCcin4/iRFQlb4BnX/7q7OLej4z3DeI19+21kcanvT7SYyAqvQO6OD0t631kYYn/X4SI6AqpmLHXw/0qwH7SUBxKvr9JEZAVUzFjr8e6AKfwmOc9PtJjICq9Azo7NL+t5R7aaArKutvW+sjDU/6/SRGQFX6BXTZz50X//Nn//TGoqDDvI6egOJU9PtJjICq9Avo7f1XL81+OeF6oBgh/X4SI6AqvQK6eAB68OrPq7yVEyOk309iBFSlV0AfXth6+ybXA8UY6feTGAFV6RnQrWZyOTuMkX4/iRFQlV4BXV2Rfu3uLpezw/jo95MYAVXpFdBD3wfpxkDvhtffttZHGp70+0mMgKr0C+jDC5MffrPp5zCfwRNQnIp+P4kRUJWOgM4+erN4Y/U60H9+c3cyefEnfAqP0dHvJzECqtIR0MVDzyfxJBLGR7+fxAioCgFFDpUj+X/4DpH2pegIqCP9bWt9pOGpciStjzQ8SftSmIoRUARVOZLWRxqepH0pTMUIKIKqHEnrIw1P0r4UpmJHB/SPn+37nGfhMTqVI2l9pOFJ2peiZ0APvqccTyJhlCpH0vpIw5O0L0W/gN7mWXiMXOVIWh9peJL2pegV0Nmlyc7HX+37eoh+ElCcSuVIWh9peJL2pegV0IcXBrqIMgGFSuVIWh9peJL2pegZ0IHe/05AoVI5ktZHGp6kfSl6BXR2iYBi5CpH0vpIw5O0L0WvgM5v8Ck8Rq5yJK2PNDxJ+1L0C+ih7+lBQDFClSNpfaThSdqXol9A5/cuTM68ucHl7DA+lSNpfaThSdqXomdAP+V1oBi3ypG0PtLwJO1L0S+gN3ghPUauciStjzQ8SftS9ApoeSH9IJ+3E1CIVI6k9ZGGJ2lfil4B9XgOiYDiVCpH0vpIw5O0L0XPgPI6UIxc5UhaH2l4kval6BVQXkiP0ascSesjDU/SvhS9AjrY94InoFCpHEnrIw1P0r4U/QI6u7TzNgHFmFWOpPWRhidpX4peAZ19VL4vPC+kx3hVjqT1kYYnaV+KXgE139yY14FifCpH0vpIw5O0LwUBRQ6VI2l9pOFJ2peiV0Bd6G9b6yMNT5UjaX2k4Unal8JUjIAiqMqRtD7S8CTtS2EqRkARVOVIWh9peJL2pTAVOyKg3361jW8qh/GpHEnrIw1P0r4UvQLq8iSSXusjDU+VI2l9pOFJ2pen4Vl4BFU5ktZHGp6kfSl6BXT2x8/W/v71yc4/fM4L6TE6lSNpfaThSdqXoldAt93dfXaYK4Pqb1vrIw1PlSNpfaThSdqX4sQBHezCIvrb1vpIw1PlSFofaXiS9qU4eUCHegiqv22tjzQ8VY6k9ZGGJ2lfipMHdKirK+tvW+sjDU+VI2l9pOFJ2pfi5AG9u0tAMT6VI2l9pOFJ2pfixAGdXZ3wKTzGp3IkrY80PEn7UvQK6OyjzaVA33xjd8KTSBihypG0PtLwJO1L0Sugh19Iz8uYMEKVI2l9pOFJ2pfixAF95q2BvkG8/ra1PtLwVDmS1kcanqR9KXoF1IX+trU+0vBUOZLWRxqepH0pTMUIKIKqHEnrIw1P0r4UpmIEFEFVjqT1kYYnaV8KUzECiqAqR9L6SMOTtC+FqZgN6NYLmA7wbY0xPpUjaX2k4Unal6IjoOZKoFwPFGNVOZLWRxqepH0pCChyqBxJ6yMNT9K+FB0Btb7cnfBOJIxR5UhaH2l4kvalOFFAZz9f5PPMbwbpJwHFqVSOpPWRhidpX4qTBPQPi4efO0O9EYmA4lQqR9L6SMOTtC9F/4AO+vCTgOKUKkfS+kjDk7QvRe+Aloef/26wfBJQnE7lSFofaXiS9qXoGdB7Az/8JKA4pcqRtD7S8CTtS9EvoIM//CSgOKXKkbQ+0vAk7UvRJ6D3Li2vAjrow08CilOqHEnrIw1P0r4UPQJaHn6+PXA+CShOp3IkrY80PEn7UnQG1OfhJwHFKVWOpPWRhidpX4qugP7e5+EnAcUpVY6k9ZGGJ2lfio6A8l54BFE5ktZHGp6kfSkIKHKoHEnrIw1P0r4UHQHleqAIonIkrY80PEn7UnQE1JH+trU+0vBUOZLWRxqepH0pTMUIKIKqHEnrIw1P0r4UpmIEFEFVjqT1kYYnaV8KUzECiqAqR9L6SMOTtC+FqRgBRVCVI2l9pOFJ2pfCVIyAIqjKkbQ+0vAk7UthKkZAEVTlSFofaXiS9qUwFSOgCKpyJK2PNDxJ+1KYihFQBFU5ktZHGp6kfSlMxQgogqocSesjDU/SvhSmYgQUQVWOpPWRhidpXwpTMQKKoCpH0vpIw5O0L4WpGAFFUJUjaX2k4Unal8JUjIAiqMqRtD7S8CTtS2EqRkARVOVIWh9peJL2pTAVI6AIqnIkrY80PEn7UpiKEVAEVTmS1kcanqR9KUzFCCiCqhxJ6yMNT9K+FKZiBBRBVY6k9ZGGJ2lfClMxAoqgKkfS+kjDk7QvhakYAUVQlSNpfaThSdqXwlSMgCKoypG0PtLwJO1LYSpGQBFU5UhaH2l4kvalMBUjoAiqciStjzQ8SftSmIoRUARVOZLWRxqepH0pTMUIKIKqHEnrIw1P0r4UpmIEFEFVjqT1kYYnaV8KUzECiqAqR9L6SMOTtC+FqRgBRVCVI2l9pOFJ2pfCVIyAIqjKkbQ+0vAk7UthKkZAEVTlSFofaXiS9qUwFSOgCKpyJK2PNDxJ+1KYihFQBFU5ktZHGp6kfSlMxQgogqocSesjDU/SvhSmYgQUQVWOpPWRhidpXwpTMQKKoCpH0vpIw5O0L4WpGAFFUJUjaX2k4Unal8JUjIAiqMqRtD7S8CTtS2EqRkARVOVIWh9peJL2pTAVI6AIqnIkrY80PEn7UpiKEVAEVTmS1kcanqR9KUzFCCiCqhxJ6yMNT9K+FKZiBBRBVY6k9ZGGJ2lfClMxAoqgKkfS+kjDk7QvhakYAUVQlSNpfaThSdqXwlSMgCKoypG0PtLwJO1LYSpGQBFU5UhaH2l4kvalMBUjoAiqciStjzQ8SftSmIrpAvpvP5tOz717vfz80cVp8coXy48eX9mbTte/Q0AhUjmS1kcanqR9KYYK6L+sknnuk+UH9/e2Arqu6SqmBBQilSNpfaThSdqXYqCA3pme+9v5/MHlVSfvTF87+K1r0/PXl79z/hYBhU7lSFofaXiS9qUYJqCPL08/XP64eLT5YWnm+/u/dX9v/Th09eCUgEKjciStjzQ8SftSDBPQRxfXn6GXdD6+vBXLm+tHoze3okpAcWqVI2l9pOFJ2pdimIDuKwF9dPH87z6YTn96ffUr5bHp4U/rCShOq3IkrY80PEn7Ugwb0NUn6pvnkJbp3H80en9v80XQ51e0f/NS6yMNT5UjaX2k4Unal6cRB3T1+fqd6fS9W/O/XFk+J09AMYzKkbQ+0vAk7cvTaAN6Z/Uyps2XPZefz28F1LyQSf/ouvWRhqfKkbQ+0vAk7UsxZEDv7J378HBPz996yiNQAgqBypG0PtLwJO1LMWBAb07NK5WWDzoJKIZROZLWRxqepH0phgvov9h+rprJs/AYROVIWh9peJL2pRgqoI+vTV9df41z86r6VTM3r//kdaCQqhxJ6yMNT9K+FEMF9NrWWzWvrR5srkLKO5EwiMqRtD7S8CTtSzFQQG9uv9X9/t7yZUwPPii/tsjoq7wXHnKVI2l9pOFJ2pdimIBurl+38FrJ6eoCTNeXv/eAqzFhAJUjaX2k4Unal2KYgN6ZHgro/MHy4qDvrR9yPriy+OV3b9l/Rn/bWh9peKocSesjDU/SvhTDBLSG/ra1PtLwVDmS1kcanqR9KUzFCCiCqhxJ6yMNT9K+FKZiBBRBVY6k9ZGGJ2lfClMxAoqgKkfS+kjDk7QvhakYAUVQlSNpfaThSdqXwlSMgCKoypG0PtLwJO1LYSpGQBFU5UhaH2l4kvalMBUjoAiqciStjzQ8SftSmIoRUARVOZLWRxqepH0pTMUIKIKqHEnrIw1P0r4UpmIEFEFVjqT1kYYnaV8KUzECiqAqR9L6SMOTtC+FqRgBRVCVI2l9pOFJ2pfCVIyAIqjKkbQ+0vAk7UthKkZAEVTlSFofaXiS9qUwFSOgCKpyJK2PNDxJ+1KYihFQBFU5ktZHGp6kfSlMxQgogqocSesjDU/SvhSmYgQUQVWOpPWRhidpXwpTMQKKoCpH0vpIw5O0L4WpGAFFUJUjaX2k4Unal8JUjIAiqMqRtD7S8CTtS2EqRkARVOVIWh9peJL2pTAVI6AIqnIkrY80PEn7UpiKEVAEVTmS1kcanqR9KUzFCCiCqhxJ6yMNT9K+FKZiBBRBVY6k9ZGGJ2lfClMxAoqgKkfS+kjDk7QvhakYAUVQlSNpfaThSdqXwlSMgCKoypG0PtLwJO1LYSpGQBFU5UhaH2l4kvalMBUjoAiqciStjzQ8SftSmIoRUARVOZLWRxqepH0pTMUIKIKqHEnrIw1P0r4UpmIEFEFVjqT1kYYnaV8KUzECiqAqR9L6SMOTtC+FqRgBRVCVI2l9pOFJ2pfCVIyAIqjKkbQ+0vAk7UthKkZAEVTlSFofaXiS9qUwFSOgCKpyJK2PNDxJ+1KYihFQBFU5ktZHGp6kfSlMxQgogqocSesjDU/SvhSmYgQUQVWOpPWRhidpXwpTMQKKoCpH0vpIw5O0L4WpGAFFUJUjaX2k4Unal8JUjIAiqMqRtD7S8CTtS2EqRkARVOVIWh9peJL2pTAVI6AIqnIkrY80PEn7UpiKEVAEVTmS1kcanqR9KUzFCCiCqhxJ6yMNT9K+FKZiBBRBVY6k9ZGGJ2lfClMxAoqgKkfS+kjDk7QvhakYAUVQlSNpfaThSdqXwlSMgCKoypG0PtLwJO1LYSpGQBFU5UhaH2l4kvalMBUjoAiqciStjzQ8SftSmIoRUARVOZLWRxqepH0pTMUIKIKqHEnrIw1P0r4UpmIEFEFVjqT1kYYnaV8KUzECiqAqR9L6SMOTtC+FqRgBRVCVI2l9pOFJ2pfCVIyAIqjKkbQ+0vAk7UthKkZAEVTlSFofaXiS9qUwFSOgCKpyJK2PNDxJ+1KYihFQBFU5ktZHGp6kfSlMxQgogqocSesjDU/SvhSmYgQUQVWOpPWRhidpXwpTMQKKoCpH0vpIw5O0L4WpGAFFUJUjaX2k4Unal8JUjIAiqMqRtD7S8CTtS2EqRkARVOVIWh9peJL2pTAVI6AIqnIkrY80PEn7UpiKEVAEVTmS1kcanqR9KUzFCCiCqhxJ6yMNT9K+FKZiBBRBVY6k9ZGGJ2lfClMxAoqgKkfS+kjDk7QvhakYAUVQlSNpfaThSdqXwlSMgCKoypG0PtLwJO1LYSpGQBFU5UhaH2l4kvalMBVrGFC91kcanipH0vpIw5O0L0/DI1AEVTmS1kcanqR9KUzFCCiCqhxJ6yMNT9K+FKZiBBRBVY6k9ZGGJ2lfClMxAoqgKkfS+kjDk7QvhakYAUVQlSNpfaThSdqXwlSMgCKoypG0PtLwJO1LYSpGQBFU5UhaH2l4kvalMBUjoAiqciStjzQ8SftSmIoRUARVOZLWRxqepH0pTMUIKIKqHEnrIw1P0r4UpmIEFEFVjqT1kYYnaV8KUzECiqAqR9L6SMOTtC+FqRgBRVCVI2l9pOFJ2pfCVIyAIqjKkbQ+0vAk7UthKkZAEVTlSFofaXiS9qUwFSOgCKpyJK2PNDxJ+1KYihFQBFU5ktZHGp6kfSlMxQgogqocSesjDU/SvhSmYgQUQVWOpPWRhidpXwpTMQKKoCpH0vpIw5O0L4WpGAFFUJUjaX2k4Unal8JUjIAiqMqRtD7S8CTtS2EqRkARVOVIWh9peJL2pTAVI6AIqnIkrY80PEn7UpiKEVAEVTmS1kcanqR9KUzFCCiCqhxJ6yMNT9K+FKZiBBRBVY6k9ZGGJ2lfClMxAoqgKkfS+kjDk7QvhakYAUVQlSNpfaThSdqXwlSMgCKoypG0PtLwJO1LYSpGQBFU5UhaH2l4kvalMBUjoAiqciStjzQ8SftSmIoRUARVOZLWRxqepH0pTMUIKIKqHEnrIw1P0r4UpmIEFEFVjqT1kYYnaV8KUzECiqAqR9L6SMOTtC+FqRgBRVCVI2l9pOFJ2pfCVIyAIqjKkbQ+0vAk7UthKkZAEVTlSFofaXiS9qUwFSOgCKpyJK2PNDxJ+1KYihFQBFU5ktZHGp6kfSlMxQgogqocSesjDU/SvhSmYgQUQVWOpPWRhidpXwpTMQKKoCpH0vpIw5O0L4WpGAFFUJUjaX2k4Unal8JUjIAiqMqRtD7S8CTtS2EqRkARVOVIWh9peJL2pTAVI6AIqnIkrY80PEn7UpiKEVAEVTmS1kcanqR9KUzFCCiCqhxJ6yMNT9K+FKZiBBRBVY6k9ZGGJ2lfClMxAoqgKkfS+kjDk7QvhakYAUVQlSNpfaThSdqXwlSMgCKoypG0PtLwJO1LYSpGQBFU5UhaH2l4kvalMBUjoAiqciStjzQ8SftSmIoRUARVOZLWRxqepH0pTMUIKIKqHEnrIw1P0r4UpmIEFEFVjqT1kYYnaV8KUzECiqAqR9L6SMOTtC+FqRgBRVCVI2l9pOFJ2pfCVIyAIqjKkbQ+0vAk7UthKkZAEVTlSFofaXiS9qUwFSOgCKpyJK2PNDxJ+1KYihFQBFU5ktZHGp6kfSlMxQgogqocSesjDU/SvhSmYgQUQVWOpPWRhidpXwpTMQKKoCpH0vpIw5O0L4WpGAFFUJUjaX2k4Unal8JUjIAiqMqRtD7S8CTtS2EqRkARVOVIWh9peJL2pTAVI6AIqnIkrY80PEn7UpiKEVAEVTmS1kcanqR9KUzFCCiCqhxJ6yMNT9K+FKZiBBRBVY6k9ZGGJ2lfClMxAoqgKkfS+kjDk7QvhakYAUVQlSNpfaThSdqXwlSMgCKoypG0PtLwJO1LYSpGQBFU5UhaH2l4kvalMBUjoAiqciStjzQ8SftSmIp5BPTxlb3p9N3rBBRKlSNpfaThSdqXwj+gjy5Ol175goBCqHIkrY80PEn7UvgH9Nr0/PX5g8vT87cIKHQqR9L6SMOTtC+Fe0Dv75XHno8unvuEgEKnciStjzQ8SftSuAf05vS19Y/vE1DoVI6k9ZGGJ2lfCveAXpt+WH68sw4pAYVE5UhaH2l4kval8A7o48vrT93v722+CPr8iv7van2k4alyJK2PNDxJ+/I0qQIKAJ48A2peyKR/dP3dxD2JToxEpWFAzeuYWt8TWXBPohMjUSGg2XBPohMjUfEOqOez8N9N3JPoxEhU3AO6ef2nw+tAv5u4J9GJkai4B9TxnUjfTdyT6MRIVNwD+vjy9FWn98J/N3FPohMjUXEP6PyB29WYvpu4J9GJkaj4B3T+4Mqin+/esr/c+p7IgnsSnRiJSoOAHqH1PZEF9yQ6MRIVUzECGh73JDoxEhVTMQIaHvckOjESFVMxAhoe9yQ6MRIVUzECGh73JDoxEhVTMQIaHvckOjESFVMxAhoe9yQ6MRIVUzECGh73JDoxEhVTMQIaHvckOjESFVMxAhoe9yQ6MRIVUzECGh73JDoxEhVTMQIaHvckOjESFVMxAhoe9yQ6MRIVUzECGh73JDoxEhVTMQIaHvckOjESFVMxAhoe9yQ6MRIVUzECGh73JDoxEhVTMQIaHvckOjESFVMxAhoe9yQ6MRIVUzECGh73JDoxEhVTMQIaHvckOjESFVMxAhoe9yQ6MRIVUzECGh73JDoxEhVTMQIaHvckOjESFVMxAhoe9yQ6MRIVUzECGh73JDoxEhVTMQIaHvckOjESFVOxhgGFxvPPt/43wOgxkoEQ0PA4G+jESAZCQMPjbKATIxkIAQ2Ps4FOjGQgBDQ8zgY6MZKBENDwOBvoxEgGQkDD42ygEyMZCAEFgEoEFAAqEVAAqERAAaASAQWASgQUACoRUACoREABoBIBDeHRxen7+z995Yum/y4Yk8eXp+dv7f/0w7b/Mt9BBDSERUDPfbL5KQHFgft7m/+23tlPKdwQ0BAWAZ2+tvkpAcWWm9PVIB5d3Pw3Fn4IaAiLw/E368/PCCgO2Xx55+bmP7FwREBDWFTzf+xtHmisfnxwZTqdvnu96b8WxuBO+fLO/fU+FsPYm05/en31858tRvLv/7bhv1x2BDSEZTXXjzDWAb2zOCUL53ja4Dvv8eXlMq6tP0O5vzWM9c95aDocAhrCsprrJ1lXAV0cjXf/9/zxv0z5uhfu75375P7e6hmkxSf0792aP/7X5RdGF4v5D4tf/Lc9RjIYAhpCqebqk7RVQDdf8LrGowssVnD+v6wjuRnGzen7PK3kgICGsKpmqWX56f5L/njpCrZfpPH48rqZy0eki5W8+j9b/nt9BxDQEFYBLY8oyk/3H1vwnDzmy/+OrmewaObG4lduLn989b/yn9jhENAQNs8cLR5vrgO6PjAEFPPV483yk+Vj0YOAzv/8N+Wn75HQoRDQEDadvDZ9n0egeMJWQM2XPR//9+Urmd5/2j8EAQIawqaTi/Px3/gaKKz9gD7t/fCP/5WRDIaAhrD/QPPO9K/2eBYexn5AF8NY/Wz5X9bNa+sPfhdqBDSEg8/Ur62+uLV6HehfrvA6UMy3E/no4vT89fn8z3uLR6LLKzUtfv7gMv+VHQwBDeEgoIty8k4kGFuPMdfDmL43P3gn0qt8nXwoBDSEreeKNhff4b3w2Lf9SfrqvfD/ePDzv/qPfAI/GAIKAJUIKABUIqAAUImAAkAlAgoAlQgoAFQioABQiYACQCUCCgCVCCgAVCKgAFCJgAJAJQIKAJUIKABUIqAAUImAAkAlAgoAlQgoAFQioABQiYACQCUCCgCVCCgAVCKgAFCJgAJAJQIKAJUIKABUIqAAUImAAkAlAgoAlQgoAFQioABQiYACQCUCCgCVCCgAVCKgAFCJgAJAJQIKAJUIKABUIqAAUImAAkAlAgoAlQgoAFQioABQiYACQCUCCgCVCCgAVCKgAFCJgAJAJQIKAJUIKABUIqAAUOn/A71FEGOQyBlxAAAAAElFTkSuQmCC">
             <a:extLst>
               <a:ext uri="{FF2B5EF4-FFF2-40B4-BE49-F238E27FC236}">
-                <a16:creationId xmlns:a16="http://schemas.microsoft.com/office/drawing/2014/main" id="{27CC6064-973B-4FF1-9446-C7722D5F572B}"/>
+                <a16:creationId xmlns="" xmlns:a16="http://schemas.microsoft.com/office/drawing/2014/main" id="{27CC6064-973B-4FF1-9446-C7722D5F572B}"/>
               </a:ext>
             </a:extLst>
           </p:cNvPr>
@@ -5978,7 +6023,7 @@
           <p:cNvPr id="6" name="AutoShape 4" descr="data:image/png;base64,iVBORw0KGgoAAAANSUhEUgAABUAAAAPACAMAAADDuCPrAAABYlBMVEUAAAAAADoAAGYAOjoAOmYAOpAAZrYzMzM6AAA6OgA6Ojo6OmY6ZmY6ZpA6ZrY6kLY6kNtNTU1NTW5NTY5Nbm5Nbo5NbqtNjshmAABmADpmOgBmOjpmZjpmZmZmZpBmkGZmkLZmkNtmtttmtv9uTU1ubk1ubm5ubo5ujqtujshuq8huq+SOTU2Obk2Obm6Oq8iOyOSOyP+QOgCQOjqQZjqQZmaQZpCQkGaQkLaQtraQttuQ2/+rbk2rjk2rjm6rq8iryOSr5Mir5P+2ZgC2Zjq2kDq2kGa2kJC2tpC2tra2ttu229u22/+2///Ijk3Ijm7Iq27Iq6vIyKvI5KvI5OTI5P/I///bkDrbkGbbtmbbtpDbtrbb27bb29vb2//b/7bb///kq27kyI7kyKvk5P/k///r6+v8jVn/tmb/yI7/25D/27b/29v/5Kv/5Mj/5OT//7b//7///8j//9v//+T///+zjZs9AAAACXBIWXMAAB2HAAAdhwGP5fFlAAAgAElEQVR4nO3d/59b5ZnecU0wMDGEILMYh0CWwmwDxaSLN3S7xHW3mGQXkni3aY0TEijO1q2/YMe1rP+/0iNpRnPbM+fMM9e5n3PffN4/xB472Eiv6/mgGUlnJnMAQJVJ638BAIiKgAJAJQIKAJUIKABUIqAAUImAAkAlAgoAlQgoAFQioABQiYACQCUCCgCVCCgAVCKgAFCJgAJAJQIKAJVGENDZl298fzKZ7Lzw8Ten/rNuT570zvzhhcnOLwT/pgCwrXlAZ7/aPWjdS6dNKAEF4Kd1QO+9fih2p+0cAQXgp3FA7y4ffu689dXip9/+6vuCgh78ud/7reRPAoCjtA3o4qHh1ufts1/KCkpAAQyvbUCvLor59tbHy8/An1P8wQQUwPCaBnT5CfzLh37lRvmapeRPJqAABtY0oItcmswtP6d/rvzGwQPRq5vK3vv5Irg7P/jNwT/9zuzT3cnOC09+1n84oJsnka4ufyh/ygsfL3/9yx8vev3Cr/f/f+YvAIBjtQzo7NKTn7Cvmroo3n7/NvWbfWpe7LQM6NUjnro/OqA31n/Iywd/4PpB8BN/AQAcq2VAlw837efrt1c9vHrwO4tfefabVW03VtVdpPBs+fDZJ3t3ZED/fv8Pefvq4ddOPfkXAMCxWgZ0UbknHjyuo3r7IGLrli4fOb709Xz+7aebx4zlseQPv5l/+/VT/+inBnRh+Rn6l4tP1Z+Z7Lz9zeqZ/+fmT/0LAOBYLQN6+ymffS8D+vJ866Xv68/mtx6t3l5/5fTGMaE7OqAvb/6MzV9wdfUQ9il/AQAca6QBXdZxlbr180nbTysdPCY98kWjRwZ0/aubv2a+/yWCp/wFAHCssQZ0UcDypc3lVyaXMdtu2u39xj7lq58rRwb0uYO/5p1D/9en/AUAcKyRfg10Gc7ye+uQbj/Ds3mW58YxT/YcGdCXD//K/v/1aX8BABxrbM/C70f19qFP5W3f7Cfd1qkDeuRjWwDYGOfrQOclcYuIbR6IElAA4zPOdyItlbcNbV7OtPlSqPmntQHliSMAJ9I0oFu5XNt6L3z5HH7/qZ2rTz6vIw3o0/4CADhW26sx2Zdy3t765HnxmPDZ/7X/ls7tp9xv7H95VBjQp/wFAHCstgEtX3k8eOf5jcn2C5tulDderku2deGmzfNM2oA+5S8AgGM1viL9veUVlQ9dkf7gC5Grq9VvSrZ8F9GZX6+/h9LmvZfCgD7lLwCAY435eyJd3X42fPtp8lUbxQF98i8AgGO1Duih78q5c/g6crcn28+Mz36++b+dWV2wUxzQJ/8CADhW84AufPnz5Sfvz7xovy/89lVBl/60vN7x+lrIc31An/gLAOBYYwgoAIREQAGgEgEFgEoEFAAqEVAAqERAAaASAQWASgQUACoRUACoREABoBIBBYBKBBQAKhFQAKhEQAGgEgEFgEoEFAAqEVAAqNQwoP8HEtyT6MRIVEzFCGh43JPoxEhUTMUIaHjck+jESFRMxQhoeNyT6MRIVEzFCGh43JPoxEhUTMUIaHjck+jESFRMxQhoeNyT6MRIVEzFCGh43JPoxEhUTMUIaHjck+jESFRMxQhoeNyT6MRIVEzFCGh43JPoxEhUTMUIaHjck+jESFRMxQhoeNyT6MRIVEzFCGh43JPoxEhUTMUIaHjck+jESFRMxQhoeNyT6MRIVEzFCGh43JPoxEhUTMUIaHjck+jESFRMxQhoeNyT6MRIVEzFCGh43JPoxEhUTMUIaHjck+jESFRMxQhoeNyT6MRIVEzFCGh43JPoxEhUTMUIaHjck+jESFRMxQhoeNyT6MRIVEzFCGh43JPoxEhUTMUIaHjck+jESFRMxQhoeNyT6MRIVEzFCGh43JPoxEhUTMUIaHjck+jESFRMxQhoeNyT6MRIVEzFCGh43JPoxEhUTMUIaHjck+jESFRMxQhoeNyT6MRIVEzFCGh43JPoxEhUTMUIaHjck+jESFRMxQhoeNyT6MRIVEzFUgX0/+I7RL+fxAioiqkYAUVQ+v0kRkBVTMUIKILS7ycxAqpiKkZAEZR+P4kRUBVTMQKKoPT7SYyAqpiKEVAEpd9PYgRUxVSMgCIo/X4SI6AqpmIEFEHp95MYAVUxFSOgCEq/n8QIqIqpGAFFUPr9JEZAVUzFCCiC0u8nMQKqYipGQBGUfj+JEVAVUzECiqD0+0mMgKqYihFQBKXfT2IEVMVUjIAiKP1+EiOgKqZiBBRB6feTGAFVMRUjoAhKv5/ECKiKqRgBRVD6/SRGQFVMxQgogtLvJzECqmIqRkARlH4/iRFQFVMxAoqg9PtJjICqmIoRUASl309iBFTFVIyAIij9fhIjoCqmYgQUQen3kxgBVTEVI6AISr+fxAioiqkYAUVQ+v0kRkBVTMUIKILS7ycxAqpiKkZAEZR+P4kRUBVTMQKKoPT7SYyAqpiKEVAEpd9PYgRUxVSMgCIo/X4SI6AqpmKnDeiji6+tf/b4yt50+u71rg8IKDT0+0mMgKqIA3pt+tqmpNOlV744/gMCChH9fhIjoCrSgD6+Nt0E9Nr0/PX5g8vT87eO/YCAQkS/n8QIqIoyoP/2wXQT0Pt75RHmo4vnPjnuAwIKFf1+EiOgKsKA3pxO3/vzOqA39398/7gPCChU9PtJjICqKAP66j/O76zzeG36YfmxfHz0BwQUKvr9JEZAVYQB3cri48vrT9Dv752/dfQHq3/m+ZVT/s1P0fpIw5N+P8BJEVAEpd8PcFL6gL7yxdEfHPpH9Y+uWx9peNLvJzE+hVcZPKDdj0AJKAT0+0mMgKoQUOSg309iBFRlmIDyLDy86feTGAFVGSigm1d5rl/6edQHBBQq+v0kRkBVBgoo70SCM/1+EiOgKgMF9PHl6av773g/+gMCChX9fhIjoCoDBXT+YPuaS0d/QEAhot9PYgRUZaiAzh9cWVTy3VtdHxBQaOj3kxgBVREH9BT0t631kYYn/X4SI6AqpmIEFEHp95MYAVUxFSOgCEq/n8QIqIqpGAFFUPr9JEZAVUzFCCiC0u8nMQKqYipGQBGUfj+JEVAVUzECiqD0+0mMgKqYihFQBKXfT2IEVMVUjIAiKP1+EiOgKqZiBBRB6feTGAFVMRUjoAhKv5/ECKiKqRgBRVD6/SRGQFVMxQgogtLvJzECqmIqRkARlH4/iRFQFVMxAoqg9PtJjICqmIoRUASl309iBFTFVIyAIij9fhIjoCqmYgQUQen3kxgBVTEVI6AISr+fxAioiqkYAUVQ+v0kRkBVTMUIKILS7ycxAqpiKkZAEZR+P4kRUBVTMQKKoPT7SYyAqpiKEVAEpd9PYgRUxVSMgCIo/X4SI6AqpmIEFEHp95MYAVUxFSOgCEq/n8QIqIqpGAFFUPr9JEZAVUzFCCiC0u8nMQKqYipGQBGUfj+JEVAVUzECiqD0+0mMgKqYihFQBKXfT2IEVMVUjIAiKP1+EiOgKqZiBBRB6feTGAFVMRUjoAhKv5/ECKiKqRgBRVD6/SRGQFVMxQgogtLvJzECqmIqRkARlH4/iRFQFVMxAoqg9PtJjICqmIoRUASl309iBFTFVIyAIij9fhIjoCqmYgQUQen3kxgBVTEVI6AISr+fxAioiqkYAUVQ+v0kRkBVTMUIKILS7ycxAqpiKkZAEZR+P4kRUBVTMQKKoPT7SYyAqpiKEVAEpd9PYgRUxVSMgCIo/X4SI6AqpmIEFEHp95MYAVUxFSOgCEq/n8QIqIqpGAFFUPr9JEZAVUzFCCiC0u8nMQKqYipGQBGUfj+JEVAVUzECiqD0+0mMgKqYihFQBKXfT2IEVMVUjIAiKP1+EiOgKqZiBBRB6feTGAFVMRUjoAhKv5/ECKiKqRgBRVD6/SRGQFVMxQgogtLvJzECqmIqRkARlH4/iRFQFVMxAoqg9PtJjICqmIoRUASl309iBFTFVIyAIij9fhIjoCqmYgQUQen3kxgBVTEVI6AISr+fxAioiqkYAUVQ+v0kRkBVTMUIKILS7ycxAqpiKkZAEZR+P4kRUBVTMQKKoPT7SYyAqpiKEVAEpd9PYgRUxVSMgCIo/X4SI6AqpmIEFEHp95MYAVUxFSOgCEq/n8QIqIqpGAFFUPr9JEZAVUzFCCiC0u8nMQKqYipGQBGUfj+JEVAVU7GGAdVrfaThqfXaAB6BIiz9fhLjEaiKqRgBRVD6/SRGQFVMxQgogtLvJzECqmIqRkARlH4/iRFQFVMxAoqg9PtJjICqmIoRUASl309iBFTFVIyAIij9fhIjoCqmYgQUQen3kxgBVTEVI6AISr+fxAioiqkYAUVQ+v0kRkBVTMUIKILS7ycxAqpiKkZAEZR+P4kRUBVTMQKKoPT7SYyAqpiKEVAEpd9PYgRUxVSMgCIo/X4SI6AqpmIEFEHp95MYAVUxFSOgCEq/n8QIqIqpGAFFUPr9JEZAVUzFCCiC0u8nMQKqYipGQBGUfj+JEVAVUzECiqD0+0mMgKqYihFQBKXfT2IEVMVUjIAiKP1+EiOgKqZiBBRB6feTGAFVMRUjoAhKv5/ECKiKqRgBRVD6/SRGQFVMxQgogtLvJzECqmIqRkARlH4/iRFQFVMxAoqg9PtJjICqmIoRUASl309iBFTFVIyAIij9fhIjoCqmYgQUQen3kxgBVTEVI6AISr+fxAioiqkYAUVQ+v0kRkBVTMUIKILS7ycxAqpiKkZAEZR+P4kRUBVTMQKKoPT7SYyAqpiKEVAEpd9PYgRUxVSMgCIo/X4SI6AqpmIEFEHp95MYAVUxFSOgCEq/n8QIqIqpGAFFUPr9JEZAVUzFCCiC0u8nMQKqYipGQBGUfj+JEVAVUzECiqD0+0mMgKqYihFQBKXfT2IEVMVUjIAiKP1+EiOgKqZiBBRB6feTGAFVMRUjoAhKv5/ECKiKqRgBRVD6/SRGQFVMxQgogtLvJzECqmIqRkARlH4/iRFQFVMxAoqg9PtJjICqmIoRUASl309iBFTFVIyAIij9fhIjoCqmYgQUQen3kxgBVTEVI6AISr+fxAioiqkYAUVQ+v0kRkBVTMUIKILS7ycxAqpiKkZAEZR+P4kRUBVTMQKKoPT7SYyAqpiKEVAEpd9PYgRUxVSMgCIo/X4SI6AqpmIEFEHp95MYAVUxFSOgCEq/n8QIqIqpGAFFUPr9JEZAVUzFCCiC0u8nMQKqYipGQBGUfj+JEVAVUzECiqD0+0mMgKqYihFQBKXfT2IEVMVUjIAiKP1+EiOgKqZiBBRB6feTGAFVMRUjoAhKv5/ECKiKqRgBRVD6/SRGQFVMxQgogtLvJzECqmIqRkARlH4/iRFQFVMxAoqg9PtJjICqmIoRUASl309iBFTFVIyAIij9fhIjoCqmYgQUQen3kxgBVTEVI6AISr+fxAioiqmYKKCPL083XvliPn908eDni9+8sjedvnudgEJJv5/ECKiKS0Dv720FdF3TVUwJKET0+0mMgKoME9CN+3vnPln8cGf62sGvXZuevz5/cHl6/hYBhY5+P4kRUJVBA7p4IPr+qpnvbzV1/Ti0pJWAQkS/n8QIqMqgAb25epj5+PJWLG+uH43e3IoqAcWp6feTGAFVGTKgjy5OP1z9eP53H0ynP72+/ODa6tcOf1pPQHFa+v0kRkBVhgzo5sHm5jmkZTr3H43e39t8EfT5FeXfvNL6SMOTfj/ASSkDuv9lzjvT6Xu35n+5Ml18TEAxDP1+gJNSBvTO5on2zSPR5XNJWwE1L2TSP7pufaThSb+fxPgUXmW4gD6+vP5q56GiPuURKAGFgH4/iRFQleEC+sRDzPIrBBTD0O8nMQKqMlxAn3iafdVMnoXHIPT7SYyAqgwX0P1Xz+9/Ll+auXn9J68DhZR+P4kRUJXBArr16vlrqwebq5DyTiQMQr+fxAioymABfXRx/0ug9/eWL2N68EF5Vn6R0Vd5Lzzk9PtJjICqDBbQ7SeJbq4vxnR9+cEDrsaEAej3kxgBVRksoHe2H2I++Nl0eu699ccPriz6+e4t+w/ob1vrIw1P+v0kRkBVBgvoielvW+sjDU/6/SRGQFVMxQgogtLvJzECqmIqRkARlH4/iRFQFVMxAoqg9PtJjICqmIoRUASl309iBFTFVKwjoLM/fvY5AcUY6feTGAFV6RvQe//pm/n84euTyeTMLwgoxke/n8QIqErPgN6YfO+38/nVydLyZwQUI6PfT2IEVKVfQG+XbN7dnTz7zb0Lk5cJKEZHv5/ECKhKv4BeXZRzmdGdXyz/d/lzAopx0e8nMQKq0iugs0vLcq4z+vDCMJ/D629b6yMNT/r9JEZAVXoFdNXMhxcmz80JKMZJv5/ECKjKCQJ6d3fyDgHFSOn3kxgBVekV0NWn8DfKl0D5GihGSb+fxAioSq+Azq9Onls+/b4sJ8/CY5T0+0mMgKr0C+jt8gLQxWfws59PVo9DCSjGRb+fxAioSr+ALj59X3iuPJG0884g/SSgOBX9fhIjoCo9Azq/99FPPl788PBHP/jNMP0koDgV/X4SI6AqfQM6PP1ta32k4Um/n8QIqIqp2LEBnX09YD8JKE5Fv5/ECKiKqdjRAf3yx8v3wz/80VuDvIaJgOKU9PtJjICq9Azo7NPVdZgeXpicGeZiTAQUp6LfT2IEVKVnQK9OJmf+evd7v5393WSg19ETUJyKfj+JEVCVfgG9PZm8vX4P5x9Wb+gkoBgX/X4SI6Aq/QJ6dfnuo/Wb4G+US4oQUIyLfj+JEVCVXgFdvRd+HdC7u1xMBOOj309iBFSlV0A3l7Mr5eRqTBgj/X4SI6AqBBQ56PeTGAFV6RXQ2aXlE0frcnI5O4yRfj+JEVCVXgFdPXG0CugipjyJhPHR7ycxAqrSL6B3dycvfVMCeu91LmeHMdLvJzECqtIvoOVydmd3d178/uLHYa6nTEBxKvr9JEZAVXoGdP773cnaQP0koDgV/X4SI6AqfQM6//ZXZxf1fGawy4ESUJyKfj+JEVCV3gEdnP62tT7S8KTfT2IEVMVUjOuBIij9fhIjoCqmYlwPFEHp95MYAVXpGVCuB4qR0+8nMQKq0jOgXA8UI6ffT2IEVKVfQLkeKMZOv5/ECKhKv4ByPVCMnX4/iRFQlV4B5XqgGD39fhIjoCq9Asrl7DB6+v0kRkBVCChy0O8nMQKq0iugXA8Uo6ffT2IEVKVXQLkeKEZPv5/ECKhKv4ByPVCMnX4/iRFQlX4B5XqgGDv9fhIjoCo9A8r1QDFy+v0kRkBV+gaU64Fi3PT7SYyAqvQO6OD0t631kYYn/X4SI6AqpmIEFEHp95MYAVUxFTvihfQ/emnQaykTUJyafj+JEVCVfgG9MJk8M9iVlAkoBPT7SYyAqvQK6OpyypMzHw/ZUP1ta32k4Um/n8QIqEqvgC786celoS98TEAxSvr9JEZAVfoGdL76rkgLQ72QSX/bWh9peNLvJzECqnKCgC4+lf/y9WVCd94a4ikl/W1rfaThSb+fxAioyokCuvDtz8tbkl7QPwzV37bWRxqe9PtJjICqnCigs199f/OGzslLBBRjot9PYgRUpX9AN/VcPhf/7af698Trb1vrIw1P+v0kRkBVegZ0/dXPg1eD6i+rrL9trY80POn3kxgBVekV0NmliX3ySP+NPfS3rfWRhif9fhIjoCq9Arp8J9LO4ZcvPbzAI1CMiX4/iRFQlZ4B/cGvzS/NPle/lEl/21ofaXjS7ycxAqrSK6Au9Let9ZGGJ/1+EiOgKqZiBBRB6feTGAFVMRXruCL9ztlB3oREQHFq+v0kRkBV+gb0xv4r6PmeSBgj/X4SI6AqPQO67OczL775Bt+VEyOl309iBFSlX0Dv7k6eXb2K6d4lvi88xki/n8QIqEq/gF49eN/R7NLkOQKK0dHvJzECqtIroLNLW4867+6qX0JPQHF6+v0kRkBVegX00Ps29W/iJKA4Pf1+EiOgKgQUOej3kxgBVekV0NmlyTv7H+ivw0RAcXr6/SRGQFV6BZQnkTB6+v0kRkBV+gX07u7kzOpyIn96nZcxYYz0+0mMgKr0C+jqjUhnz54d8q1Icq2PNDy1XhtwzFs5/7C7fifnztsD/dX6/zi0PtLwpN9PYjwCVekb0PnsyzcWj0Bf/HiQJ5AIKE5Lv5/ECKhK74AOTn/bWh9peNLvJzECqmIqRkARlH4/iRFQFVMxG9DZR28+6Se8DhSjo99PYgRUpSOgy28n9wTeiYTx0e8nMQKqQkCRg34/iRFQlY6AOtLfttZHGp70+0mMgKqYihFQBKXfT2IEVMVU7PiAfjVcPgkoTke/n8QIqIqp2NEB/fLH5X1IP/gNAcUY6feTGAFV6RnQ2aX9p5BeGui9SPrb1vpIw5N+P4kRUJV+AV32c+fFf/jsn97YnQx0NTsCilPR7ycxAqrSL6A3JpMfrh54zn452bq4MgHFWOj3kxgBVekV0MUD0INr2F3lgsoYIf1+EiOgKr0C+vDCoe/KyQvpMT76/SRGQFV6BpRvKoeR0+8nMQKq0iugfF94jJ5+P4kRUJVeAZ3f2Pq65w2+BooR0u8nMQKq0i+gs0v7L/+8MdC1RAgoTkW/n8QIqEqvgM4+Wr7+88W3Pvvn5Y8vDHNVUP1ta32k4Um/n8QIqEqvgLpc1E5/21ofaXjS7ycxAqpCQJGDfj+JEVCVXgF1ob9trY80POn3kxgBVTEVI6AISr+fxAioiqkYAUVQ+v0kRkBVTMWODugfP9v3OS+kx+jo95MYAVXpGdDf7/JN5TBq+v0kRkBV+gX0Nt+VEyOn309iBFSlV0BnlyY7H3+17+sh+klAcSr6/SRGQFV6BfThhYEuokxAoaLfT2IEVKVnQAd6/zsBhYp+P4kRUJVeAZ1dIqAYOf1+EiOgKr0COr/Bp/AYOf1+EiOgKv0Ceuh7ehBQjJB+P4kRUJV+AZ3fuzA58+aG+kJ2BBSnp99PYgRUpWdAP+V1oBg3/X4SI6Aq/QJ6gxfSY+T0+0mMgKr0Cmh5If0gn7cTUIjo95MYAVXpFVCP55AIKE5Fv5/ECKhKz4DyOlCMnH4/iRFQlV4B5YX0GD39fhIjoCq9Ajq/MXmZgGLU9PtJjICq9Avo7NLO2wQUY6bfT2IEVKVXQGcfvTGZ7LzIC+kxXvr9JEZAVXoF1HxbY14HivHR7ycxAqpCQJGDfj+JEVCVXgF1ob9trY80POn3kxgBVTEVI6AISr+fxAioiqkYAUVQ+v0kRkBVTMVsQGd/tN8F/uGPz77A10AxOvr9JEZAVToC+vDC6imj2UebFy9tfoWAYlT0+0mMgKr0DOhBNgkoRkm/n8QIqAoBRQ76/SRGQFUIKHLQ7ycxAqpCQJGDfj+JEVAVAooc9PtJjICqEFDkoN9PYgRUhYAiB/1+EiOgKgQUOej3kxgBVSGgyEG/n8QIqAoBRQ76/SRGQFUIKHLQ7ycxAqrSHdAnEVCMj34/iRFQFQKKHPT7SYyAqnQEdPbRm0/im8phfPT7SYyAqnQE1JH+trU+0vCk309iBFTFVIyAIij9fhIjoCqmYgQUQen3kxgBVTEVI6AISr+fxAioiqkYAUVQ+v0kRkBVTMUIKILS7ycxAqpiKkZAEZR+P4kRUBVTMQKKoPT7SYyAqpiKEVAEpd9PYgRUxVTsiXciXdr5xeKHb78moBg3/X4SI6AqHQF9eGH5xvfV/xJQjJh+P4kRUJXOgC4fgRJQjJ5+P4kRUJWOgM4uTZ79/Ks/Xfjer786MMzn8/rb1vpIw5N+P4kRUJWOgM5vcDk7hKDfT2IEVKUroLNP6wL66OK0eOWL5UePr+xNp+9eX/3WoQ8IKDT0+0mMgKp0BXSR0K8+++fdnX/47MDnPa4Hen9vK6Drmq5ieugDAgoR/X4SI6Aq3QGdVz2JdGf62sEH16bnr88fXJ6ev2U/IKAQ0e8nMQKq0iugs49OfBH6a9P3939+f2/9OPTcJ+YDAgoV/X4SI6AqvQJ6co8vb/Xx5vrR6M1lVA99QEChot9PYgRUpXdAv/3V2clk5+xb/V7D9Oji+d99MJ3+9Pryg2vTD8svlk/rD31AQKGi309iBFSlb0APXs70cp+Abp5DWtZy/9Ho/b3ztw59sPr/Pr/S5489mdZHGp70+wFO6qiALvv5zItvvvH9ngW9M52+d2v+lyvTRS4JKBzo9wOc1BEBvbs7efY35Wf3Lk3K5UU6bL7SuXwuaauZr3xx6IND/4j+0XXrIw1P+v0kxqfwKv0CenXy7OZp+NmlyXPdAd24MzUPOp/yCJSAQkC/n8QIqEqvgK4vardyd/fZ/q9pMg86CSiGot9PYgRUpVdAD72Q/kSvqi+Z5Fl4DE+/n8QIqMowAX18eTuTm5d8rl8HuvUBAYWKfj+JEVCVXgGdXZq8s//B7UmPT+GvrR5frkLKO5EwPP1+EiOgKr0CevInke7vLV/G9OCD8o73RUZf3X/7+6EPCChU9PtJjICq9Avo3d3JmV+Xn/3p9V4vY1p8hr665tL15QcPti/A9ICrMWEA+v0kRkBV+gV09Uaks2fP9n4r0vzBz6bTc++tH2U+uLJI5rtP+4CAQkO/n8QIqErPgM7/sLt+J+fO2736eXL629b6SMOTfj+JEVCVvgGdz758Y/EI9MWPT3pdOwIKF/r9JEZAVXoHdHD629b6SMOTfj+JEVAVUzECiqD0+0mMgKqYihFQBKXfT2IEVMVUjIAiKP1+EiOgKqZiBBRB6feTGAFVMRUjoAhKv5/ECKiKqRgBRVD6/SRGQFVMxQgogtLvJzECqmIqRkARlH4/iRFQFVOxo67G9IPfEFCMmn4/iRFQlV4BfXhh63qgBBRjpN9PYgRUpWdAT/BdPAgoWtDvJzECqtIroIe+qRwBxRjp95MYAVXpFdD5jc23hSegGCn9fhIjoCr9AvrtLyeTZ158c+0ng1zSTn/bWh9peJuln3QAABwGSURBVNLvJzECqtIroA8vTLYN8wVR/W1rfaThSb+fxAioCgFFDvr9JEZAVXoF1IX+trU+0vCk309iBFTFVIyAIij9fhIjoCqmYscGdPb1gP0koDgV/X4SI6AqpmJHB/TLHy+/+PnwR28N9V3l9Let9ZGGJ/1+EiOgKj0DOvt09ezRwwuTMwO9KUl/21ofaXjS7ycxAqrSM6BXJ5Mzf737vd/O/m4yeXaYx6D629b6SMOTfj+JEVCVfgG9PZm8vX5H/B92B7qwiP62tT7S8KTfT2IEVKVfQK9OXt6/pMiNyXMEFKOj309iBFSlV0BXFxNZB/TuLi+kx/jo95MYAVXpFdBVOtcBHeradvrb1vpIw5N+P4kRUBUCihz0+0mMgKr0Cujs0vKJo3U5bw/0NLz+trU+0vCk309iBFSlV0BXTxytArqIKU8iYXz0+0mMgKr0C+jd3clL35SA3nt9MtDV6fW3rfWRhif9fhIjoCr9Arp4CDqZnN3defH7ix9fHqSfBBSnot9PYgRUpWdA57/f3VwNdKB+ElCcin4/iRFQlb4BnX/7q7OLej4z3DeI19+21kcanvT7SYyAqvQO6OD0t631kYYn/X4SI6AqpmLHXw/0qwH7SUBxKvr9JEZAVUzFjr8e6AKfwmOc9PtJjICq9Azo7NL+t5R7aaArKutvW+sjDU/6/SRGQFX6BXTZz50X//Nn//TGoqDDvI6egOJU9PtJjICq9Avo7f1XL81+OeF6oBgh/X4SI6AqvQK6eAB68OrPq7yVEyOk309iBFSlV0AfXth6+ybXA8UY6feTGAFV6RnQrWZyOTuMkX4/iRFQlV4BXV2Rfu3uLpezw/jo95MYAVXpFdBD3wfpxkDvhtffttZHGp70+0mMgKr0C+jDC5MffrPp5zCfwRNQnIp+P4kRUJWOgM4+erN4Y/U60H9+c3cyefEnfAqP0dHvJzECqtIR0MVDzyfxJBLGR7+fxAioCgFFDpUj+X/4DpH2pegIqCP9bWt9pOGpciStjzQ8SftSmIoRUARVOZLWRxqepH0pTMUIKIKqHEnrIw1P0r4UpmJHB/SPn+37nGfhMTqVI2l9pOFJ2peiZ0APvqccTyJhlCpH0vpIw5O0L0W/gN7mWXiMXOVIWh9peJL2pegV0Nmlyc7HX+37eoh+ElCcSuVIWh9peJL2pegV0IcXBrqIMgGFSuVIWh9peJL2pegZ0IHe/05AoVI5ktZHGp6kfSl6BXR2iYBi5CpH0vpIw5O0L0WvgM5v8Ck8Rq5yJK2PNDxJ+1L0C+ih7+lBQDFClSNpfaThSdqXol9A5/cuTM68ucHl7DA+lSNpfaThSdqXomdAP+V1oBi3ypG0PtLwJO1L0S+gN3ghPUauciStjzQ8SftS9ApoeSH9IJ+3E1CIVI6k9ZGGJ2lfil4B9XgOiYDiVCpH0vpIw5O0L0XPgPI6UIxc5UhaH2l4kval6BVQXkiP0ascSesjDU/SvhS9AjrY94InoFCpHEnrIw1P0r4U/QI6u7TzNgHFmFWOpPWRhidpX4peAZ19VL4vPC+kx3hVjqT1kYYnaV+KXgE139yY14FifCpH0vpIw5O0LwUBRQ6VI2l9pOFJ2peiV0Bd6G9b6yMNT5UjaX2k4Unal8JUjIAiqMqRtD7S8CTtS2EqRkARVOVIWh9peJL2pTAVOyKg3361jW8qh/GpHEnrIw1P0r4UvQLq8iSSXusjDU+VI2l9pOFJ2pen4Vl4BFU5ktZHGp6kfSl6BXT2x8/W/v71yc4/fM4L6TE6lSNpfaThSdqXoldAt93dfXaYK4Pqb1vrIw1PlSNpfaThSdqX4sQBHezCIvrb1vpIw1PlSFofaXiS9qU4eUCHegiqv22tjzQ8VY6k9ZGGJ2lfipMHdKirK+tvW+sjDU+VI2l9pOFJ2pfi5AG9u0tAMT6VI2l9pOFJ2pfixAGdXZ3wKTzGp3IkrY80PEn7UvQK6OyjzaVA33xjd8KTSBihypG0PtLwJO1L0Sugh19Iz8uYMEKVI2l9pOFJ2pfixAF95q2BvkG8/ra1PtLwVDmS1kcanqR9KXoF1IX+trU+0vBUOZLWRxqepH0pTMUIKIKqHEnrIw1P0r4UpmIEFEFVjqT1kYYnaV8KUzECiqAqR9L6SMOTtC+FqZgN6NYLmA7wbY0xPpUjaX2k4Unal6IjoOZKoFwPFGNVOZLWRxqepH0pCChyqBxJ6yMNT9K+FB0Btb7cnfBOJIxR5UhaH2l4kvalOFFAZz9f5PPMbwbpJwHFqVSOpPWRhidpX4qTBPQPi4efO0O9EYmA4lQqR9L6SMOTtC9F/4AO+vCTgOKUKkfS+kjDk7QvRe+Aloef/26wfBJQnE7lSFofaXiS9qXoGdB7Az/8JKA4pcqRtD7S8CTtS9EvoIM//CSgOKXKkbQ+0vAk7UvRJ6D3Li2vAjrow08CilOqHEnrIw1P0r4UPQJaHn6+PXA+CShOp3IkrY80PEn7UnQG1OfhJwHFKVWOpPWRhidpX4qugP7e5+EnAcUpVY6k9ZGGJ2lfio6A8l54BFE5ktZHGp6kfSkIKHKoHEnrIw1P0r4UHQHleqAIonIkrY80PEn7UnQE1JH+trU+0vBUOZLWRxqepH0pTMUIKIKqHEnrIw1P0r4UpmIEFEFVjqT1kYYnaV8KUzECiqAqR9L6SMOTtC+FqRgBRVCVI2l9pOFJ2pfCVIyAIqjKkbQ+0vAk7UthKkZAEVTlSFofaXiS9qUwFSOgCKpyJK2PNDxJ+1KYihFQBFU5ktZHGp6kfSlMxQgogqocSesjDU/SvhSmYgQUQVWOpPWRhidpXwpTMQKKoCpH0vpIw5O0L4WpGAFFUJUjaX2k4Unal8JUjIAiqMqRtD7S8CTtS2EqRkARVOVIWh9peJL2pTAVI6AIqnIkrY80PEn7UpiKEVAEVTmS1kcanqR9KUzFCCiCqhxJ6yMNT9K+FKZiBBRBVY6k9ZGGJ2lfClMxAoqgKkfS+kjDk7QvhakYAUVQlSNpfaThSdqXwlSMgCKoypG0PtLwJO1LYSpGQBFU5UhaH2l4kvalMBUjoAiqciStjzQ8SftSmIoRUARVOZLWRxqepH0pTMUIKIKqHEnrIw1P0r4UpmIEFEFVjqT1kYYnaV8KUzECiqAqR9L6SMOTtC+FqRgBRVCVI2l9pOFJ2pfCVIyAIqjKkbQ+0vAk7UthKkZAEVTlSFofaXiS9qUwFSOgCKpyJK2PNDxJ+1KYihFQBFU5ktZHGp6kfSlMxQgogqocSesjDU/SvhSmYgQUQVWOpPWRhidpXwpTMQKKoCpH0vpIw5O0L4WpGAFFUJUjaX2k4Unal8JUjIAiqMqRtD7S8CTtS2EqRkARVOVIWh9peJL2pTAVI6AIqnIkrY80PEn7UpiKEVAEVTmS1kcanqR9KUzFCCiCqhxJ6yMNT9K+FKZiBBRBVY6k9ZGGJ2lfClMxAoqgKkfS+kjDk7QvhakYAUVQlSNpfaThSdqXwlSMgCKoypG0PtLwJO1LYSpGQBFU5UhaH2l4kvalMBUjoAiqciStjzQ8SftSmIrpAvpvP5tOz717vfz80cVp8coXy48eX9mbTte/Q0AhUjmS1kcanqR9KYYK6L+sknnuk+UH9/e2Arqu6SqmBBQilSNpfaThSdqXYqCA3pme+9v5/MHlVSfvTF87+K1r0/PXl79z/hYBhU7lSFofaXiS9qUYJqCPL08/XP64eLT5YWnm+/u/dX9v/Th09eCUgEKjciStjzQ8SftSDBPQRxfXn6GXdD6+vBXLm+tHoze3okpAcWqVI2l9pOFJ2pdimIDuKwF9dPH87z6YTn96ffUr5bHp4U/rCShOq3IkrY80PEn7Ugwb0NUn6pvnkJbp3H80en9v80XQ51e0f/NS6yMNT5UjaX2k4Unal6cRB3T1+fqd6fS9W/O/XFk+J09AMYzKkbQ+0vAk7cvTaAN6Z/Uyps2XPZefz28F1LyQSf/ouvWRhqfKkbQ+0vAk7UsxZEDv7J378HBPz996yiNQAgqBypG0PtLwJO1LMWBAb07NK5WWDzoJKIZROZLWRxqepH0phgvov9h+rprJs/AYROVIWh9peJL2pRgqoI+vTV9df41z86r6VTM3r//kdaCQqhxJ6yMNT9K+FEMF9NrWWzWvrR5srkLKO5EwiMqRtD7S8CTtSzFQQG9uv9X9/t7yZUwPPii/tsjoq7wXHnKVI2l9pOFJ2pdimIBurl+38FrJ6eoCTNeXv/eAqzFhAJUjaX2k4Unal2KYgN6ZHgro/MHy4qDvrR9yPriy+OV3b9l/Rn/bWh9peKocSesjDU/SvhTDBLSG/ra1PtLwVDmS1kcanqR9KUzFCCiCqhxJ6yMNT9K+FKZiBBRBVY6k9ZGGJ2lfClMxAoqgKkfS+kjDk7QvhakYAUVQlSNpfaThSdqXwlSMgCKoypG0PtLwJO1LYSpGQBFU5UhaH2l4kvalMBUjoAiqciStjzQ8SftSmIoRUARVOZLWRxqepH0pTMUIKIKqHEnrIw1P0r4UpmIEFEFVjqT1kYYnaV8KUzECiqAqR9L6SMOTtC+FqRgBRVCVI2l9pOFJ2pfCVIyAIqjKkbQ+0vAk7UthKkZAEVTlSFofaXiS9qUwFSOgCKpyJK2PNDxJ+1KYihFQBFU5ktZHGp6kfSlMxQgogqocSesjDU/SvhSmYgQUQVWOpPWRhidpXwpTMQKKoCpH0vpIw5O0L4WpGAFFUJUjaX2k4Unal8JUjIAiqMqRtD7S8CTtS2EqRkARVOVIWh9peJL2pTAVI6AIqnIkrY80PEn7UpiKEVAEVTmS1kcanqR9KUzFCCiCqhxJ6yMNT9K+FKZiBBRBVY6k9ZGGJ2lfClMxAoqgKkfS+kjDk7QvhakYAUVQlSNpfaThSdqXwlSMgCKoypG0PtLwJO1LYSpGQBFU5UhaH2l4kvalMBUjoAiqciStjzQ8SftSmIoRUARVOZLWRxqepH0pTMUIKIKqHEnrIw1P0r4UpmIEFEFVjqT1kYYnaV8KUzECiqAqR9L6SMOTtC+FqRgBRVCVI2l9pOFJ2pfCVIyAIqjKkbQ+0vAk7UthKkZAEVTlSFofaXiS9qUwFSOgCKpyJK2PNDxJ+1KYihFQBFU5ktZHGp6kfSlMxQgogqocSesjDU/SvhSmYgQUQVWOpPWRhidpXwpTMQKKoCpH0vpIw5O0L4WpGAFFUJUjaX2k4Unal8JUjIAiqMqRtD7S8CTtS2EqRkARVOVIWh9peJL2pTAVI6AIqnIkrY80PEn7UpiKEVAEVTmS1kcanqR9KUzFCCiCqhxJ6yMNT9K+FKZiBBRBVY6k9ZGGJ2lfClMxAoqgKkfS+kjDk7QvhakYAUVQlSNpfaThSdqXwlSMgCKoypG0PtLwJO1LYSpGQBFU5UhaH2l4kvalMBUjoAiqciStjzQ8SftSmIoRUARVOZLWRxqepH0pTMUIKIKqHEnrIw1P0r4UpmIEFEFVjqT1kYYnaV8KUzECiqAqR9L6SMOTtC+FqRgBRVCVI2l9pOFJ2pfCVIyAIqjKkbQ+0vAk7UthKkZAEVTlSFofaXiS9qUwFSOgCKpyJK2PNDxJ+1KYihFQBFU5ktZHGp6kfSlMxQgogqocSesjDU/SvhSmYgQUQVWOpPWRhidpXwpTMQKKoCpH0vpIw5O0L4WpGAFFUJUjaX2k4Unal8JUjIAiqMqRtD7S8CTtS2EqRkARVOVIWh9peJL2pTAVI6AIqnIkrY80PEn7UpiKEVAEVTmS1kcanqR9KUzFCCiCqhxJ6yMNT9K+FKZiBBRBVY6k9ZGGJ2lfClMxAoqgKkfS+kjDk7QvhakYAUVQlSNpfaThSdqXwlSMgCKoypG0PtLwJO1LYSpGQBFU5UhaH2l4kvalMBVrGFC91kcanipH0vpIw5O0L0/DI1AEVTmS1kcanqR9KUzFCCiCqhxJ6yMNT9K+FKZiBBRBVY6k9ZGGJ2lfClMxAoqgKkfS+kjDk7QvhakYAUVQlSNpfaThSdqXwlSMgCKoypG0PtLwJO1LYSpGQBFU5UhaH2l4kvalMBUjoAiqciStjzQ8SftSmIoRUARVOZLWRxqepH0pTMUIKIKqHEnrIw1P0r4UpmIEFEFVjqT1kYYnaV8KUzECiqAqR9L6SMOTtC+FqRgBRVCVI2l9pOFJ2pfCVIyAIqjKkbQ+0vAk7UthKkZAEVTlSFofaXiS9qUwFSOgCKpyJK2PNDxJ+1KYihFQBFU5ktZHGp6kfSlMxQgogqocSesjDU/SvhSmYgQUQVWOpPWRhidpXwpTMQKKoCpH0vpIw5O0L4WpGAFFUJUjaX2k4Unal8JUjIAiqMqRtD7S8CTtS2EqRkARVOVIWh9peJL2pTAVI6AIqnIkrY80PEn7UpiKEVAEVTmS1kcanqR9KUzFCCiCqhxJ6yMNT9K+FKZiBBRBVY6k9ZGGJ2lfClMxAoqgKkfS+kjDk7QvhakYAUVQlSNpfaThSdqXwlSMgCKoypG0PtLwJO1LYSpGQBFU5UhaH2l4kvalMBUjoAiqciStjzQ8SftSmIoRUARVOZLWRxqepH0pTMUIKIKqHEnrIw1P0r4UpmIEFEFVjqT1kYYnaV8KUzECiqAqR9L6SMOTtC+FqRgBRVCVI2l9pOFJ2pfCVIyAIqjKkbQ+0vAk7UthKkZAEVTlSFofaXiS9qUwFSOgCKpyJK2PNDxJ+1KYihFQBFU5ktZHGp6kfSlMxQgogqocSesjDU/SvhSmYgQUQVWOpPWRhidpXwpTMQKKoCpH0vpIw5O0L4WpGAFFUJUjaX2k4Unal8JUjIAiqMqRtD7S8CTtS2EqRkARVOVIWh9peJL2pTAVI6AIqnIkrY80PEn7UpiKEVAEVTmS1kcanqR9KUzFCCiCqhxJ6yMNT9K+FKZiBBRBVY6k9ZGGJ2lfClMxAoqgKkfS+kjDk7QvhakYAUVQlSNpfaThSdqXwlSMgCKoypG0PtLwJO1LYSpGQBFU5UhaH2l4kvalMBUjoAiqciStjzQ8SftSmIoRUARVOZLWRxqepH0pTMUIKIKqHEnrIw1P0r4UpmIEFEFVjqT1kYYnaV8KUzECiqAqR9L6SMOTtC+FqRgBRVCVI2l9pOFJ2pfCVIyAIqjKkbQ+0vAk7UthKkZAEVTlSFofaXiS9qUwFSOgCKpyJK2PNDxJ+1KYihFQBFU5ktZHGp6kfSlMxQgogqocSesjDU/SvhSmYgQUQVWOpPWRhidpXwpTMQKKoCpH0vpIw5O0L4WpGAFFUJUjaX2k4Unal8JUjIAiqMqRtD7S8CTtS2EqRkARVOVIWh9peJL2pTAVI6AIqnIkrY80PEn7UpiKEVAEVTmS1kcanqR9KUzFCCiCqhxJ6yMNT9K+FKZiBBRBVY6k9ZGGJ2lfClMxAoqgKkfS+kjDk7QvhakYAUVQlSNpfaThSdqXwlSMgCKoypG0PtLwJO1LYSpGQBFU5UhaH2l4kvalMBUjoAiqciStjzQ8SftSmIp5BPTxlb3p9N3rBBRKlSNpfaThSdqXwj+gjy5Ol175goBCqHIkrY80PEn7UvgH9Nr0/PX5g8vT87cIKHQqR9L6SMOTtC+Fe0Dv75XHno8unvuEgEKnciStjzQ8SftSuAf05vS19Y/vE1DoVI6k9ZGGJ2lfCveAXpt+WH68sw4pAYVE5UhaH2l4kval8A7o48vrT93v722+CPr8iv7van2k4alyJK2PNDxJ+/I0qQIKAJ48A2peyKR/dP3dxD2JToxEpWFAzeuYWt8TWXBPohMjUSGg2XBPohMjUfEOqOez8N9N3JPoxEhU3AO6ef2nw+tAv5u4J9GJkai4B9TxnUjfTdyT6MRIVNwD+vjy9FWn98J/N3FPohMjUXEP6PyB29WYvpu4J9GJkaj4B3T+4Mqin+/esr/c+p7IgnsSnRiJSoOAHqH1PZEF9yQ6MRIVUzECGh73JDoxEhVTMQIaHvckOjESFVMxAhoe9yQ6MRIVUzECGh73JDoxEhVTMQIaHvckOjESFVMxAhoe9yQ6MRIVUzECGh73JDoxEhVTMQIaHvckOjESFVMxAhoe9yQ6MRIVUzECGh73JDoxEhVTMQIaHvckOjESFVMxAhoe9yQ6MRIVUzECGh73JDoxEhVTMQIaHvckOjESFVMxAhoe9yQ6MRIVUzECGh73JDoxEhVTMQIaHvckOjESFVMxAhoe9yQ6MRIVUzECGh73JDoxEhVTMQIaHvckOjESFVMxAhoe9yQ6MRIVUzECGh73JDoxEhVTMQIaHvckOjESFVMxAhoe9yQ6MRIVUzECGh73JDoxEhVTMQIaHvckOjESFVOxhgGFxvPPt/43wOgxkoEQ0PA4G+jESAZCQMPjbKATIxkIAQ2Ps4FOjGQgBDQ8zgY6MZKBENDwOBvoxEgGQkDD42ygEyMZCAEFgEoEFAAqEVAAqERAAaASAQWASgQUACoRUACoREABoBIBDeHRxen7+z995Yum/y4Yk8eXp+dv7f/0w7b/Mt9BBDSERUDPfbL5KQHFgft7m/+23tlPKdwQ0BAWAZ2+tvkpAcWWm9PVIB5d3Pw3Fn4IaAiLw/E368/PCCgO2Xx55+bmP7FwREBDWFTzf+xtHmisfnxwZTqdvnu96b8WxuBO+fLO/fU+FsPYm05/en31858tRvLv/7bhv1x2BDSEZTXXjzDWAb2zOCUL53ja4Dvv8eXlMq6tP0O5vzWM9c95aDocAhrCsprrJ1lXAV0cjXf/9/zxv0z5uhfu75375P7e6hmkxSf0792aP/7X5RdGF4v5D4tf/Lc9RjIYAhpCqebqk7RVQDdf8LrGowssVnD+v6wjuRnGzen7PK3kgICGsKpmqWX56f5L/njpCrZfpPH48rqZy0eki5W8+j9b/nt9BxDQEFYBLY8oyk/3H1vwnDzmy/+OrmewaObG4lduLn989b/yn9jhENAQNs8cLR5vrgO6PjAEFPPV483yk+Vj0YOAzv/8N+Wn75HQoRDQEDadvDZ9n0egeMJWQM2XPR//9+Urmd5/2j8EAQIawqaTi/Px3/gaKKz9gD7t/fCP/5WRDIaAhrD/QPPO9K/2eBYexn5AF8NY/Wz5X9bNa+sPfhdqBDSEg8/Ur62+uLV6HehfrvA6UMy3E/no4vT89fn8z3uLR6LLKzUtfv7gMv+VHQwBDeEgoIty8k4kGFuPMdfDmL43P3gn0qt8nXwoBDSEreeKNhff4b3w2Lf9SfrqvfD/ePDzv/qPfAI/GAIKAJUIKABUIqAAUImAAkAlAgoAlQgoAFQioABQiYACQCUCCgCVCCgAVCKgAFCJgAJAJQIKAJUIKABUIqAAUImAAkAlAgoAlQgoAFQioABQiYACQCUCCgCVCCgAVCKgAFCJgAJAJQIKAJUIKABUIqAAUImAAkAlAgoAlQgoAFQioABQiYACQCUCCgCVCCgAVCKgAFCJgAJAJQIKAJUIKABUIqAAUImAAkAlAgoAlQgoAFQioABQiYACQCUCCgCVCCgAVCKgAFCJgAJAJQIKAJUIKABUIqAAUOn/A71FEGOQyBlxAAAAAElFTkSuQmCC">
             <a:extLst>
               <a:ext uri="{FF2B5EF4-FFF2-40B4-BE49-F238E27FC236}">
-                <a16:creationId xmlns:a16="http://schemas.microsoft.com/office/drawing/2014/main" id="{303DEEFB-7094-4F9F-A65F-D2AFDD19F5FE}"/>
+                <a16:creationId xmlns="" xmlns:a16="http://schemas.microsoft.com/office/drawing/2014/main" id="{303DEEFB-7094-4F9F-A65F-D2AFDD19F5FE}"/>
               </a:ext>
             </a:extLst>
           </p:cNvPr>
@@ -6021,7 +6066,7 @@
     </p:spTree>
     <p:extLst>
       <p:ext uri="{BB962C8B-B14F-4D97-AF65-F5344CB8AC3E}">
-        <p14:creationId xmlns:p14="http://schemas.microsoft.com/office/powerpoint/2010/main" val="2186280307"/>
+        <p14:creationId xmlns:p14="http://schemas.microsoft.com/office/powerpoint/2010/main" val="1982764186"/>
       </p:ext>
     </p:extLst>
   </p:cSld>
@@ -6034,6 +6079,31 @@
 <file path=ppt/slides/slide11.xml><?xml version="1.0" encoding="utf-8"?>
 <p:sld xmlns:a="http://schemas.openxmlformats.org/drawingml/2006/main" xmlns:r="http://schemas.openxmlformats.org/officeDocument/2006/relationships" xmlns:p="http://schemas.openxmlformats.org/presentationml/2006/main">
   <p:cSld>
+    <p:bg>
+      <p:bgPr>
+        <a:gradFill rotWithShape="1">
+          <a:gsLst>
+            <a:gs pos="10000">
+              <a:schemeClr val="bg2">
+                <a:tint val="97000"/>
+                <a:hueMod val="92000"/>
+                <a:satMod val="169000"/>
+                <a:lumMod val="164000"/>
+              </a:schemeClr>
+            </a:gs>
+            <a:gs pos="100000">
+              <a:schemeClr val="bg2">
+                <a:shade val="96000"/>
+                <a:satMod val="120000"/>
+                <a:lumMod val="90000"/>
+              </a:schemeClr>
+            </a:gs>
+          </a:gsLst>
+          <a:lin ang="6120000" scaled="1"/>
+        </a:gradFill>
+        <a:effectLst/>
+      </p:bgPr>
+    </p:bg>
     <p:spTree>
       <p:nvGrpSpPr>
         <p:cNvPr id="1" name=""/>
@@ -6050,10 +6120,39 @@
       </p:grpSpPr>
       <p:sp>
         <p:nvSpPr>
-          <p:cNvPr id="2" name="Title 1">
+          <p:cNvPr id="2" name="Title 1"/>
+          <p:cNvSpPr>
+            <a:spLocks noGrp="1"/>
+          </p:cNvSpPr>
+          <p:nvPr>
+            <p:ph type="title"/>
+          </p:nvPr>
+        </p:nvSpPr>
+        <p:spPr>
+          <a:xfrm>
+            <a:off x="4546886" y="685799"/>
+            <a:ext cx="7077667" cy="4892676"/>
+          </a:xfrm>
+        </p:spPr>
+        <p:txBody>
+          <a:bodyPr vert="horz" lIns="91440" tIns="45720" rIns="91440" bIns="45720" rtlCol="0" anchor="ctr">
+            <a:normAutofit/>
+          </a:bodyPr>
+          <a:lstStyle/>
+          <a:p>
+            <a:r>
+              <a:rPr lang="en-US" sz="4800"/>
+              <a:t>Life Satisfaction</a:t>
+            </a:r>
+          </a:p>
+        </p:txBody>
+      </p:sp>
+      <p:sp>
+        <p:nvSpPr>
+          <p:cNvPr id="7" name="Text Placeholder 6">
             <a:extLst>
               <a:ext uri="{FF2B5EF4-FFF2-40B4-BE49-F238E27FC236}">
-                <a16:creationId xmlns:a16="http://schemas.microsoft.com/office/drawing/2014/main" id="{B82558F1-4876-454A-B771-BA837016AE1A}"/>
+                <a16:creationId xmlns="" xmlns:a16="http://schemas.microsoft.com/office/drawing/2014/main" id="{68BE2056-ED35-43E3-8265-E8D944FA51C9}"/>
               </a:ext>
             </a:extLst>
           </p:cNvPr>
@@ -6061,56 +6160,186 @@
             <a:spLocks noGrp="1"/>
           </p:cNvSpPr>
           <p:nvPr>
-            <p:ph type="title"/>
-          </p:nvPr>
-        </p:nvSpPr>
-        <p:spPr/>
-        <p:txBody>
-          <a:bodyPr/>
-          <a:lstStyle/>
-          <a:p>
-            <a:r>
-              <a:rPr lang="en-US" dirty="0"/>
-              <a:t>Other findings</a:t>
-            </a:r>
-          </a:p>
-        </p:txBody>
-      </p:sp>
-      <p:sp>
-        <p:nvSpPr>
-          <p:cNvPr id="3" name="Text Placeholder 2">
+            <p:ph type="body" idx="1"/>
+          </p:nvPr>
+        </p:nvSpPr>
+        <p:spPr>
+          <a:xfrm>
+            <a:off x="684212" y="685800"/>
+            <a:ext cx="2888773" cy="4892675"/>
+          </a:xfrm>
+        </p:spPr>
+        <p:txBody>
+          <a:bodyPr vert="horz" lIns="91440" tIns="45720" rIns="91440" bIns="45720" rtlCol="0" anchor="ctr">
+            <a:normAutofit/>
+          </a:bodyPr>
+          <a:lstStyle/>
+          <a:p>
+            <a:pPr algn="r"/>
+            <a:r>
+              <a:rPr lang="en-US" sz="2100" b="1" dirty="0">
+                <a:solidFill>
+                  <a:schemeClr val="accent6"/>
+                </a:solidFill>
+              </a:rPr>
+              <a:t>**Jodi Will enter visual here by noon Monday (promise!).   I will be looking at Those that worked overtime against Work Life balance self reporting. </a:t>
+            </a:r>
+            <a:r>
+              <a:rPr lang="en-US" sz="2100" b="1" dirty="0">
+                <a:solidFill>
+                  <a:schemeClr val="accent6"/>
+                </a:solidFill>
+                <a:sym typeface="Wingdings" panose="05000000000000000000" pitchFamily="2" charset="2"/>
+              </a:rPr>
+              <a:t> </a:t>
+            </a:r>
+            <a:endParaRPr lang="en-US" sz="2100" b="1" dirty="0">
+              <a:solidFill>
+                <a:schemeClr val="accent6"/>
+              </a:solidFill>
+            </a:endParaRPr>
+          </a:p>
+        </p:txBody>
+      </p:sp>
+      <p:sp>
+        <p:nvSpPr>
+          <p:cNvPr id="4" name="AutoShape 2" descr="data:image/png;base64,iVBORw0KGgoAAAANSUhEUgAABUAAAAPACAMAAADDuCPrAAABYlBMVEUAAAAAADoAAGYAOjoAOmYAOpAAZrYzMzM6AAA6OgA6Ojo6OmY6ZmY6ZpA6ZrY6kLY6kNtNTU1NTW5NTY5Nbm5Nbo5NbqtNjshmAABmADpmOgBmOjpmZjpmZmZmZpBmkGZmkLZmkNtmtttmtv9uTU1ubk1ubm5ubo5ujqtujshuq8huq+SOTU2Obk2Obm6Oq8iOyOSOyP+QOgCQOjqQZjqQZmaQZpCQkGaQkLaQtraQttuQ2/+rbk2rjk2rjm6rq8iryOSr5Mir5P+2ZgC2Zjq2kDq2kGa2kJC2tpC2tra2ttu229u22/+2///Ijk3Ijm7Iq27Iq6vIyKvI5KvI5OTI5P/I///bkDrbkGbbtmbbtpDbtrbb27bb29vb2//b/7bb///kq27kyI7kyKvk5P/k///r6+v8jVn/tmb/yI7/25D/27b/29v/5Kv/5Mj/5OT//7b//7///8j//9v//+T///+zjZs9AAAACXBIWXMAAB2HAAAdhwGP5fFlAAAgAElEQVR4nO3d/59b5ZnecU0wMDGEILMYh0CWwmwDxaSLN3S7xHW3mGQXkni3aY0TEijO1q2/YMe1rP+/0iNpRnPbM+fMM9e5n3PffN4/xB472Eiv6/mgGUlnJnMAQJVJ638BAIiKgAJAJQIKAJUIKABUIqAAUImAAkAlAgoAlQgoAFQioABQiYACQCUCCgCVCCgAVCKgAFCJgAJAJQIKAJVGENDZl298fzKZ7Lzw8Ten/rNuT570zvzhhcnOLwT/pgCwrXlAZ7/aPWjdS6dNKAEF4Kd1QO+9fih2p+0cAQXgp3FA7y4ffu689dXip9/+6vuCgh78ud/7reRPAoCjtA3o4qHh1ufts1/KCkpAAQyvbUCvLor59tbHy8/An1P8wQQUwPCaBnT5CfzLh37lRvmapeRPJqAABtY0oItcmswtP6d/rvzGwQPRq5vK3vv5Irg7P/jNwT/9zuzT3cnOC09+1n84oJsnka4ufyh/ygsfL3/9yx8vev3Cr/f/f+YvAIBjtQzo7NKTn7Cvmroo3n7/NvWbfWpe7LQM6NUjnro/OqA31n/Iywd/4PpB8BN/AQAcq2VAlw837efrt1c9vHrwO4tfefabVW03VtVdpPBs+fDZJ3t3ZED/fv8Pefvq4ddOPfkXAMCxWgZ0UbknHjyuo3r7IGLrli4fOb709Xz+7aebx4zlseQPv5l/+/VT/+inBnRh+Rn6l4tP1Z+Z7Lz9zeqZ/+fmT/0LAOBYLQN6+ymffS8D+vJ866Xv68/mtx6t3l5/5fTGMaE7OqAvb/6MzV9wdfUQ9il/AQAca6QBXdZxlbr180nbTysdPCY98kWjRwZ0/aubv2a+/yWCp/wFAHCssQZ0UcDypc3lVyaXMdtu2u39xj7lq58rRwb0uYO/5p1D/9en/AUAcKyRfg10Gc7ye+uQbj/Ds3mW58YxT/YcGdCXD//K/v/1aX8BABxrbM/C70f19qFP5W3f7Cfd1qkDeuRjWwDYGOfrQOclcYuIbR6IElAA4zPOdyItlbcNbV7OtPlSqPmntQHliSMAJ9I0oFu5XNt6L3z5HH7/qZ2rTz6vIw3o0/4CADhW26sx2Zdy3t765HnxmPDZ/7X/ls7tp9xv7H95VBjQp/wFAHCstgEtX3k8eOf5jcn2C5tulDderku2deGmzfNM2oA+5S8AgGM1viL9veUVlQ9dkf7gC5Grq9VvSrZ8F9GZX6+/h9LmvZfCgD7lLwCAY435eyJd3X42fPtp8lUbxQF98i8AgGO1Duih78q5c/g6crcn28+Mz36++b+dWV2wUxzQJ/8CADhW84AufPnz5Sfvz7xovy/89lVBl/60vN7x+lrIc31An/gLAOBYYwgoAIREQAGgEgEFgEoEFAAqEVAAqERAAaASAQWASgQUACoRUACoREABoBIBBYBKBBQAKhFQAKhEQAGgEgEFgEoEFAAqEVAAqNQwoP8HEtyT6MRIVEzFCGh43JPoxEhUTMUIaHjck+jESFRMxQhoeNyT6MRIVEzFCGh43JPoxEhUTMUIaHjck+jESFRMxQhoeNyT6MRIVEzFCGh43JPoxEhUTMUIaHjck+jESFRMxQhoeNyT6MRIVEzFCGh43JPoxEhUTMUIaHjck+jESFRMxQhoeNyT6MRIVEzFCGh43JPoxEhUTMUIaHjck+jESFRMxQhoeNyT6MRIVEzFCGh43JPoxEhUTMUIaHjck+jESFRMxQhoeNyT6MRIVEzFCGh43JPoxEhUTMUIaHjck+jESFRMxQhoeNyT6MRIVEzFCGh43JPoxEhUTMUIaHjck+jESFRMxQhoeNyT6MRIVEzFCGh43JPoxEhUTMUIaHjck+jESFRMxQhoeNyT6MRIVEzFCGh43JPoxEhUTMUIaHjck+jESFRMxQhoeNyT6MRIVEzFCGh43JPoxEhUTMUIaHjck+jESFRMxQhoeNyT6MRIVEzFCGh43JPoxEhUTMUIaHjck+jESFRMxQhoeNyT6MRIVEzFUgX0/+I7RL+fxAioiqkYAUVQ+v0kRkBVTMUIKILS7ycxAqpiKkZAEZR+P4kRUBVTMQKKoPT7SYyAqpiKEVAEpd9PYgRUxVSMgCIo/X4SI6AqpmIEFEHp95MYAVUxFSOgCEq/n8QIqIqpGAFFUPr9JEZAVUzFCCiC0u8nMQKqYipGQBGUfj+JEVAVUzECiqD0+0mMgKqYihFQBKXfT2IEVMVUjIAiKP1+EiOgKqZiBBRB6feTGAFVMRUjoAhKv5/ECKiKqRgBRVD6/SRGQFVMxQgogtLvJzECqmIqRkARlH4/iRFQFVMxAoqg9PtJjICqmIoRUASl309iBFTFVIyAIij9fhIjoCqmYgQUQen3kxgBVTEVI6AISr+fxAioiqkYAUVQ+v0kRkBVTMUIKILS7ycxAqpiKkZAEZR+P4kRUBVTMQKKoPT7SYyAqpiKEVAEpd9PYgRUxVSMgCIo/X4SI6AqpmKnDeiji6+tf/b4yt50+u71rg8IKDT0+0mMgKqIA3pt+tqmpNOlV744/gMCChH9fhIjoCrSgD6+Nt0E9Nr0/PX5g8vT87eO/YCAQkS/n8QIqIoyoP/2wXQT0Pt75RHmo4vnPjnuAwIKFf1+EiOgKsKA3pxO3/vzOqA39398/7gPCChU9PtJjICqKAP66j/O76zzeG36YfmxfHz0BwQUKvr9JEZAVYQB3cri48vrT9Dv752/dfQHq3/m+ZVT/s1P0fpIw5N+P8BJEVAEpd8PcFL6gL7yxdEfHPpH9Y+uWx9peNLvJzE+hVcZPKDdj0AJKAT0+0mMgKoQUOSg309iBFRlmIDyLDy86feTGAFVGSigm1d5rl/6edQHBBQq+v0kRkBVBgoo70SCM/1+EiOgKgMF9PHl6av773g/+gMCChX9fhIjoCoDBXT+YPuaS0d/QEAhot9PYgRUZaiAzh9cWVTy3VtdHxBQaOj3kxgBVREH9BT0t631kYYn/X4SI6AqpmIEFEHp95MYAVUxFSOgCEq/n8QIqIqpGAFFUPr9JEZAVUzFCCiC0u8nMQKqYipGQBGUfj+JEVAVUzECiqD0+0mMgKqYihFQBKXfT2IEVMVUjIAiKP1+EiOgKqZiBBRB6feTGAFVMRUjoAhKv5/ECKiKqRgBRVD6/SRGQFVMxQgogtLvJzECqmIqRkARlH4/iRFQFVMxAoqg9PtJjICqmIoRUASl309iBFTFVIyAIij9fhIjoCqmYgQUQen3kxgBVTEVI6AISr+fxAioiqkYAUVQ+v0kRkBVTMUIKILS7ycxAqpiKkZAEZR+P4kRUBVTMQKKoPT7SYyAqpiKEVAEpd9PYgRUxVSMgCIo/X4SI6AqpmIEFEHp95MYAVUxFSOgCEq/n8QIqIqpGAFFUPr9JEZAVUzFCCiC0u8nMQKqYipGQBGUfj+JEVAVUzECiqD0+0mMgKqYihFQBKXfT2IEVMVUjIAiKP1+EiOgKqZiBBRB6feTGAFVMRUjoAhKv5/ECKiKqRgBRVD6/SRGQFVMxQgogtLvJzECqmIqRkARlH4/iRFQFVMxAoqg9PtJjICqmIoRUASl309iBFTFVIyAIij9fhIjoCqmYgQUQen3kxgBVTEVI6AISr+fxAioiqkYAUVQ+v0kRkBVTMUIKILS7ycxAqpiKkZAEZR+P4kRUBVTMQKKoPT7SYyAqpiKEVAEpd9PYgRUxVSMgCIo/X4SI6AqpmIEFEHp95MYAVUxFSOgCEq/n8QIqIqpGAFFUPr9JEZAVUzFCCiC0u8nMQKqYipGQBGUfj+JEVAVUzECiqD0+0mMgKqYihFQBKXfT2IEVMVUjIAiKP1+EiOgKqZiBBRB6feTGAFVMRUjoAhKv5/ECKiKqRgBRVD6/SRGQFVMxQgogtLvJzECqmIqRkARlH4/iRFQFVMxAoqg9PtJjICqmIoRUASl309iBFTFVIyAIij9fhIjoCqmYgQUQen3kxgBVTEVI6AISr+fxAioiqkYAUVQ+v0kRkBVTMUIKILS7ycxAqpiKkZAEZR+P4kRUBVTMQKKoPT7SYyAqpiKEVAEpd9PYgRUxVSMgCIo/X4SI6AqpmIEFEHp95MYAVUxFSOgCEq/n8QIqIqpGAFFUPr9JEZAVUzFCCiC0u8nMQKqYipGQBGUfj+JEVAVU7GGAdVrfaThqfXaAB6BIiz9fhLjEaiKqRgBRVD6/SRGQFVMxQgogtLvJzECqmIqRkARlH4/iRFQFVMxAoqg9PtJjICqmIoRUASl309iBFTFVIyAIij9fhIjoCqmYgQUQen3kxgBVTEVI6AISr+fxAioiqkYAUVQ+v0kRkBVTMUIKILS7ycxAqpiKkZAEZR+P4kRUBVTMQKKoPT7SYyAqpiKEVAEpd9PYgRUxVSMgCIo/X4SI6AqpmIEFEHp95MYAVUxFSOgCEq/n8QIqIqpGAFFUPr9JEZAVUzFCCiC0u8nMQKqYipGQBGUfj+JEVAVUzECiqD0+0mMgKqYihFQBKXfT2IEVMVUjIAiKP1+EiOgKqZiBBRB6feTGAFVMRUjoAhKv5/ECKiKqRgBRVD6/SRGQFVMxQgogtLvJzECqmIqRkARlH4/iRFQFVMxAoqg9PtJjICqmIoRUASl309iBFTFVIyAIij9fhIjoCqmYgQUQen3kxgBVTEVI6AISr+fxAioiqkYAUVQ+v0kRkBVTMUIKILS7ycxAqpiKkZAEZR+P4kRUBVTMQKKoPT7SYyAqpiKEVAEpd9PYgRUxVSMgCIo/X4SI6AqpmIEFEHp95MYAVUxFSOgCEq/n8QIqIqpGAFFUPr9JEZAVUzFCCiC0u8nMQKqYipGQBGUfj+JEVAVUzECiqD0+0mMgKqYihFQBKXfT2IEVMVUjIAiKP1+EiOgKqZiBBRB6feTGAFVMRUjoAhKv5/ECKiKqRgBRVD6/SRGQFVMxQgogtLvJzECqmIqRkARlH4/iRFQFVMxAoqg9PtJjICqmIoRUASl309iBFTFVIyAIij9fhIjoCqmYgQUQen3kxgBVTEVI6AISr+fxAioiqkYAUVQ+v0kRkBVTMUIKILS7ycxAqpiKkZAEZR+P4kRUBVTMQKKoPT7SYyAqpiKEVAEpd9PYgRUxVSMgCIo/X4SI6AqpmIEFEHp95MYAVUxFSOgCEq/n8QIqIqpGAFFUPr9JEZAVUzFCCiC0u8nMQKqYipGQBGUfj+JEVAVUzECiqD0+0mMgKqYihFQBKXfT2IEVMVUjIAiKP1+EiOgKqZiBBRB6feTGAFVMRUjoAhKv5/ECKiKqRgBRVD6/SRGQFVMxQgogtLvJzECqmIqRkARlH4/iRFQFVMxAoqg9PtJjICqmIoRUASl309iBFTFVIyAIij9fhIjoCqmYgQUQen3kxgBVTEVI6AISr+fxAioiqmYKKCPL083XvliPn908eDni9+8sjedvnudgEJJv5/ECKiKS0Dv720FdF3TVUwJKET0+0mMgKoME9CN+3vnPln8cGf62sGvXZuevz5/cHl6/hYBhY5+P4kRUJVBA7p4IPr+qpnvbzV1/Ti0pJWAQkS/n8QIqMqgAb25epj5+PJWLG+uH43e3IoqAcWp6feTGAFVGTKgjy5OP1z9eP53H0ynP72+/ODa6tcOf1pPQHFa+v0kRkBVhgzo5sHm5jmkZTr3H43e39t8EfT5FeXfvNL6SMOTfj/ASSkDuv9lzjvT6Xu35n+5Ml18TEAxDP1+gJNSBvTO5on2zSPR5XNJWwE1L2TSP7pufaThSb+fxPgUXmW4gD6+vP5q56GiPuURKAGFgH4/iRFQleEC+sRDzPIrBBTD0O8nMQKqMlxAn3iafdVMnoXHIPT7SYyAqgwX0P1Xz+9/Ll+auXn9J68DhZR+P4kRUJXBArr16vlrqwebq5DyTiQMQr+fxAioymABfXRx/0ug9/eWL2N68EF5Vn6R0Vd5Lzzk9PtJjICqDBbQ7SeJbq4vxnR9+cEDrsaEAej3kxgBVRksoHe2H2I++Nl0eu699ccPriz6+e4t+w/ob1vrIw1P+v0kRkBVBgvoielvW+sjDU/6/SRGQFVMxQgogtLvJzECqmIqRkARlH4/iRFQFVMxAoqg9PtJjICqmIoRUASl309iBFTFVKwjoLM/fvY5AcUY6feTGAFV6RvQe//pm/n84euTyeTMLwgoxke/n8QIqErPgN6YfO+38/nVydLyZwQUI6PfT2IEVKVfQG+XbN7dnTz7zb0Lk5cJKEZHv5/ECKhKv4BeXZRzmdGdXyz/d/lzAopx0e8nMQKq0iugs0vLcq4z+vDCMJ/D629b6yMNT/r9JEZAVXoFdNXMhxcmz80JKMZJv5/ECKjKCQJ6d3fyDgHFSOn3kxgBVekV0NWn8DfKl0D5GihGSb+fxAioSq+Azq9Onls+/b4sJ8/CY5T0+0mMgKr0C+jt8gLQxWfws59PVo9DCSjGRb+fxAioSr+ALj59X3iuPJG0884g/SSgOBX9fhIjoCo9Azq/99FPPl788PBHP/jNMP0koDgV/X4SI6AqfQM6PP1ta32k4Um/n8QIqIqp2LEBnX09YD8JKE5Fv5/ECKiKqdjRAf3yx8v3wz/80VuDvIaJgOKU9PtJjICq9Azo7NPVdZgeXpicGeZiTAQUp6LfT2IEVKVnQK9OJmf+evd7v5393WSg19ETUJyKfj+JEVCVfgG9PZm8vX4P5x9Wb+gkoBgX/X4SI6Aq/QJ6dfnuo/Wb4G+US4oQUIyLfj+JEVCVXgFdvRd+HdC7u1xMBOOj309iBFSlV0A3l7Mr5eRqTBgj/X4SI6AqBBQ56PeTGAFV6RXQ2aXlE0frcnI5O4yRfj+JEVCVXgFdPXG0CugipjyJhPHR7ycxAqrSL6B3dycvfVMCeu91LmeHMdLvJzECqtIvoOVydmd3d178/uLHYa6nTEBxKvr9JEZAVXoGdP773cnaQP0koDgV/X4SI6AqfQM6//ZXZxf1fGawy4ESUJyKfj+JEVCV3gEdnP62tT7S8KTfT2IEVMVUjOuBIij9fhIjoCqmYlwPFEHp95MYAVXpGVCuB4qR0+8nMQKq0jOgXA8UI6ffT2IEVKVfQLkeKMZOv5/ECKhKv4ByPVCMnX4/iRFQlV4B5XqgGD39fhIjoCq9Asrl7DB6+v0kRkBVCChy0O8nMQKq0iugXA8Uo6ffT2IEVKVXQLkeKEZPv5/ECKhKv4ByPVCMnX4/iRFQlX4B5XqgGDv9fhIjoCo9A8r1QDFy+v0kRkBV+gaU64Fi3PT7SYyAqvQO6OD0t631kYYn/X4SI6AqpmIEFEHp95MYAVUxFTvihfQ/emnQaykTUJyafj+JEVCVfgG9MJk8M9iVlAkoBPT7SYyAqvQK6OpyypMzHw/ZUP1ta32k4Um/n8QIqEqvgC786celoS98TEAxSvr9JEZAVfoGdL76rkgLQ72QSX/bWh9peNLvJzECqnKCgC4+lf/y9WVCd94a4ikl/W1rfaThSb+fxAioyokCuvDtz8tbkl7QPwzV37bWRxqe9PtJjICqnCigs199f/OGzslLBBRjot9PYgRUpX9AN/VcPhf/7af698Trb1vrIw1P+v0kRkBVegZ0/dXPg1eD6i+rrL9trY80POn3kxgBVekV0NmliX3ySP+NPfS3rfWRhif9fhIjoCq9Arp8J9LO4ZcvPbzAI1CMiX4/iRFQlZ4B/cGvzS/NPle/lEl/21ofaXjS7ycxAqrSK6Au9Let9ZGGJ/1+EiOgKqZiBBRB6feTGAFVMRXruCL9ztlB3oREQHFq+v0kRkBV+gb0xv4r6PmeSBgj/X4SI6AqPQO67OczL775Bt+VEyOl309iBFSlX0Dv7k6eXb2K6d4lvi88xki/n8QIqEq/gF49eN/R7NLkOQKK0dHvJzECqtIroLNLW4867+6qX0JPQHF6+v0kRkBVegX00Ps29W/iJKA4Pf1+EiOgKgQUOej3kxgBVekV0NmlyTv7H+ivw0RAcXr6/SRGQFV6BZQnkTB6+v0kRkBV+gX07u7kzOpyIn96nZcxYYz0+0mMgKr0C+jqjUhnz54d8q1Icq2PNDy1XhtwzFs5/7C7fifnztsD/dX6/zi0PtLwpN9PYjwCVekb0PnsyzcWj0Bf/HiQJ5AIKE5Lv5/ECKhK74AOTn/bWh9peNLvJzECqmIqRkARlH4/iRFQFVMxG9DZR28+6Se8DhSjo99PYgRUpSOgy28n9wTeiYTx0e8nMQKqQkCRg34/iRFQlY6AOtLfttZHGp70+0mMgKqYihFQBKXfT2IEVMVU7PiAfjVcPgkoTke/n8QIqIqp2NEB/fLH5X1IP/gNAcUY6feTGAFV6RnQ2aX9p5BeGui9SPrb1vpIw5N+P4kRUJV+AV32c+fFf/jsn97YnQx0NTsCilPR7ycxAqrSL6A3JpMfrh54zn452bq4MgHFWOj3kxgBVekV0MUD0INr2F3lgsoYIf1+EiOgKr0C+vDCoe/KyQvpMT76/SRGQFV6BpRvKoeR0+8nMQKq0iugfF94jJ5+P4kRUJVeAZ3f2Pq65w2+BooR0u8nMQKq0i+gs0v7L/+8MdC1RAgoTkW/n8QIqEqvgM4+Wr7+88W3Pvvn5Y8vDHNVUP1ta32k4Um/n8QIqEqvgLpc1E5/21ofaXjS7ycxAqpCQJGDfj+JEVCVXgF1ob9trY80POn3kxgBVTEVI6AISr+fxAioiqkYAUVQ+v0kRkBVTMWODugfP9v3OS+kx+jo95MYAVXpGdDf7/JN5TBq+v0kRkBV+gX0Nt+VEyOn309iBFSlV0BnlyY7H3+17+sh+klAcSr6/SRGQFV6BfThhYEuokxAoaLfT2IEVKVnQAd6/zsBhYp+P4kRUJVeAZ1dIqAYOf1+EiOgKr0COr/Bp/AYOf1+EiOgKv0Ceuh7ehBQjJB+P4kRUJV+AZ3fuzA58+aG+kJ2BBSnp99PYgRUpWdAP+V1oBg3/X4SI6Aq/QJ6gxfSY+T0+0mMgKr0Cmh5If0gn7cTUIjo95MYAVXpFVCP55AIKE5Fv5/ECKhKz4DyOlCMnH4/iRFQlV4B5YX0GD39fhIjoCq9Ajq/MXmZgGLU9PtJjICq9Avo7NLO2wQUY6bfT2IEVKVXQGcfvTGZ7LzIC+kxXvr9JEZAVXoF1HxbY14HivHR7ycxAqpCQJGDfj+JEVCVXgF1ob9trY80POn3kxgBVTEVI6AISr+fxAioiqkYAUVQ+v0kRkBVTMVsQGd/tN8F/uGPz77A10AxOvr9JEZAVToC+vDC6imj2UebFy9tfoWAYlT0+0mMgKr0DOhBNgkoRkm/n8QIqAoBRQ76/SRGQFUIKHLQ7ycxAqpCQJGDfj+JEVAVAooc9PtJjICqEFDkoN9PYgRUhYAiB/1+EiOgKgQUOej3kxgBVSGgyEG/n8QIqAoBRQ76/SRGQFUIKHLQ7ycxAqrSHdAnEVCMj34/iRFQFQKKHPT7SYyAqnQEdPbRm0/im8phfPT7SYyAqnQE1JH+trU+0vCk309iBFTFVIyAIij9fhIjoCqmYgQUQen3kxgBVTEVI6AISr+fxAioiqkYAUVQ+v0kRkBVTMUIKILS7ycxAqpiKkZAEZR+P4kRUBVTMQKKoPT7SYyAqpiKEVAEpd9PYgRUxVTsiXciXdr5xeKHb78moBg3/X4SI6AqHQF9eGH5xvfV/xJQjJh+P4kRUJXOgC4fgRJQjJ5+P4kRUJWOgM4uTZ79/Ks/Xfjer786MMzn8/rb1vpIw5N+P4kRUJWOgM5vcDk7hKDfT2IEVKUroLNP6wL66OK0eOWL5UePr+xNp+9eX/3WoQ8IKDT0+0mMgKp0BXSR0K8+++fdnX/47MDnPa4Hen9vK6Drmq5ieugDAgoR/X4SI6Aq3QGdVz2JdGf62sEH16bnr88fXJ6ev2U/IKAQ0e8nMQKq0iugs49OfBH6a9P3939+f2/9OPTcJ+YDAgoV/X4SI6AqvQJ6co8vb/Xx5vrR6M1lVA99QEChot9PYgRUpXdAv/3V2clk5+xb/V7D9Oji+d99MJ3+9Pryg2vTD8svlk/rD31AQKGi309iBFSlb0APXs70cp+Abp5DWtZy/9Ho/b3ztw59sPr/Pr/S5489mdZHGp70+wFO6qiALvv5zItvvvH9ngW9M52+d2v+lyvTRS4JKBzo9wOc1BEBvbs7efY35Wf3Lk3K5UU6bL7SuXwuaauZr3xx6IND/4j+0XXrIw1P+v0kxqfwKv0CenXy7OZp+NmlyXPdAd24MzUPOp/yCJSAQkC/n8QIqEqvgK4vardyd/fZ/q9pMg86CSiGot9PYgRUpVdAD72Q/kSvqi+Z5Fl4DE+/n8QIqMowAX18eTuTm5d8rl8HuvUBAYWKfj+JEVCVXgGdXZq8s//B7UmPT+GvrR5frkLKO5EwPP1+EiOgKr0CevInke7vLV/G9OCD8o73RUZf3X/7+6EPCChU9PtJjICq9Avo3d3JmV+Xn/3p9V4vY1p8hr665tL15QcPti/A9ICrMWEA+v0kRkBV+gV09Uaks2fP9n4r0vzBz6bTc++tH2U+uLJI5rtP+4CAQkO/n8QIqErPgM7/sLt+J+fO2736eXL629b6SMOTfj+JEVCVvgGdz758Y/EI9MWPT3pdOwIKF/r9JEZAVXoHdHD629b6SMOTfj+JEVAVUzECiqD0+0mMgKqYihFQBKXfT2IEVMVUjIAiKP1+EiOgKqZiBBRB6feTGAFVMRUjoAhKv5/ECKiKqRgBRVD6/SRGQFVMxQgogtLvJzECqmIqRkARlH4/iRFQFVOxo67G9IPfEFCMmn4/iRFQlV4BfXhh63qgBBRjpN9PYgRUpWdAT/BdPAgoWtDvJzECqtIroIe+qRwBxRjp95MYAVXpFdD5jc23hSegGCn9fhIjoCr9AvrtLyeTZ158c+0ng1zSTn/bWh9peJuln3QAABwGSURBVNLvJzECqtIroA8vTLYN8wVR/W1rfaThSb+fxAioCgFFDvr9JEZAVXoF1IX+trU+0vCk309iBFTFVIyAIij9fhIjoCqmYscGdPb1gP0koDgV/X4SI6AqpmJHB/TLHy+/+PnwR28N9V3l9Let9ZGGJ/1+EiOgKj0DOvt09ezRwwuTMwO9KUl/21ofaXjS7ycxAqrSM6BXJ5Mzf737vd/O/m4yeXaYx6D629b6SMOTfj+JEVCVfgG9PZm8vX5H/B92B7qwiP62tT7S8KTfT2IEVKVfQK9OXt6/pMiNyXMEFKOj309iBFSlV0BXFxNZB/TuLi+kx/jo95MYAVXpFdBVOtcBHeradvrb1vpIw5N+P4kRUBUCihz0+0mMgKr0Cujs0vKJo3U5bw/0NLz+trU+0vCk309iBFSlV0BXTxytArqIKU8iYXz0+0mMgKr0C+jd3clL35SA3nt9MtDV6fW3rfWRhif9fhIjoCr9Arp4CDqZnN3defH7ix9fHqSfBBSnot9PYgRUpWdA57/f3VwNdKB+ElCcin4/iRFQlb4BnX/7q7OLej4z3DeI19+21kcanvT7SYyAqvQO6OD0t631kYYn/X4SI6AqpmLHXw/0qwH7SUBxKvr9JEZAVUzFjr8e6AKfwmOc9PtJjICq9Azo7NL+t5R7aaArKutvW+sjDU/6/SRGQFX6BXTZz50X//Nn//TGoqDDvI6egOJU9PtJjICq9Avo7f1XL81+OeF6oBgh/X4SI6AqvQK6eAB68OrPq7yVEyOk309iBFSlV0AfXth6+ybXA8UY6feTGAFV6RnQrWZyOTuMkX4/iRFQlV4BXV2Rfu3uLpezw/jo95MYAVXpFdBD3wfpxkDvhtffttZHGp70+0mMgKr0C+jDC5MffrPp5zCfwRNQnIp+P4kRUJWOgM4+erN4Y/U60H9+c3cyefEnfAqP0dHvJzECqtIR0MVDzyfxJBLGR7+fxAioCgFFDpUj+X/4DpH2pegIqCP9bWt9pOGpciStjzQ8SftSmIoRUARVOZLWRxqepH0pTMUIKIKqHEnrIw1P0r4UpmJHB/SPn+37nGfhMTqVI2l9pOFJ2peiZ0APvqccTyJhlCpH0vpIw5O0L0W/gN7mWXiMXOVIWh9peJL2pegV0Nmlyc7HX+37eoh+ElCcSuVIWh9peJL2pegV0IcXBrqIMgGFSuVIWh9peJL2pegZ0IHe/05AoVI5ktZHGp6kfSl6BXR2iYBi5CpH0vpIw5O0L0WvgM5v8Ck8Rq5yJK2PNDxJ+1L0C+ih7+lBQDFClSNpfaThSdqXol9A5/cuTM68ucHl7DA+lSNpfaThSdqXomdAP+V1oBi3ypG0PtLwJO1L0S+gN3ghPUauciStjzQ8SftS9ApoeSH9IJ+3E1CIVI6k9ZGGJ2lfil4B9XgOiYDiVCpH0vpIw5O0L0XPgPI6UIxc5UhaH2l4kval6BVQXkiP0ascSesjDU/SvhS9AjrY94InoFCpHEnrIw1P0r4U/QI6u7TzNgHFmFWOpPWRhidpX4peAZ19VL4vPC+kx3hVjqT1kYYnaV+KXgE139yY14FifCpH0vpIw5O0LwUBRQ6VI2l9pOFJ2peiV0Bd6G9b6yMNT5UjaX2k4Unal8JUjIAiqMqRtD7S8CTtS2EqRkARVOVIWh9peJL2pTAVOyKg3361jW8qh/GpHEnrIw1P0r4UvQLq8iSSXusjDU+VI2l9pOFJ2pen4Vl4BFU5ktZHGp6kfSl6BXT2x8/W/v71yc4/fM4L6TE6lSNpfaThSdqXoldAt93dfXaYK4Pqb1vrIw1PlSNpfaThSdqX4sQBHezCIvrb1vpIw1PlSFofaXiS9qU4eUCHegiqv22tjzQ8VY6k9ZGGJ2lfipMHdKirK+tvW+sjDU+VI2l9pOFJ2pfi5AG9u0tAMT6VI2l9pOFJ2pfixAGdXZ3wKTzGp3IkrY80PEn7UvQK6OyjzaVA33xjd8KTSBihypG0PtLwJO1L0Sugh19Iz8uYMEKVI2l9pOFJ2pfixAF95q2BvkG8/ra1PtLwVDmS1kcanqR9KXoF1IX+trU+0vBUOZLWRxqepH0pTMUIKIKqHEnrIw1P0r4UpmIEFEFVjqT1kYYnaV8KUzECiqAqR9L6SMOTtC+FqZgN6NYLmA7wbY0xPpUjaX2k4Unal6IjoOZKoFwPFGNVOZLWRxqepH0pCChyqBxJ6yMNT9K+FB0Btb7cnfBOJIxR5UhaH2l4kvalOFFAZz9f5PPMbwbpJwHFqVSOpPWRhidpX4qTBPQPi4efO0O9EYmA4lQqR9L6SMOTtC9F/4AO+vCTgOKUKkfS+kjDk7QvRe+Aloef/26wfBJQnE7lSFofaXiS9qXoGdB7Az/8JKA4pcqRtD7S8CTtS9EvoIM//CSgOKXKkbQ+0vAk7UvRJ6D3Li2vAjrow08CilOqHEnrIw1P0r4UPQJaHn6+PXA+CShOp3IkrY80PEn7UnQG1OfhJwHFKVWOpPWRhidpX4qugP7e5+EnAcUpVY6k9ZGGJ2lfio6A8l54BFE5ktZHGp6kfSkIKHKoHEnrIw1P0r4UHQHleqAIonIkrY80PEn7UnQE1JH+trU+0vBUOZLWRxqepH0pTMUIKIKqHEnrIw1P0r4UpmIEFEFVjqT1kYYnaV8KUzECiqAqR9L6SMOTtC+FqRgBRVCVI2l9pOFJ2pfCVIyAIqjKkbQ+0vAk7UthKkZAEVTlSFofaXiS9qUwFSOgCKpyJK2PNDxJ+1KYihFQBFU5ktZHGp6kfSlMxQgogqocSesjDU/SvhSmYgQUQVWOpPWRhidpXwpTMQKKoCpH0vpIw5O0L4WpGAFFUJUjaX2k4Unal8JUjIAiqMqRtD7S8CTtS2EqRkARVOVIWh9peJL2pTAVI6AIqnIkrY80PEn7UpiKEVAEVTmS1kcanqR9KUzFCCiCqhxJ6yMNT9K+FKZiBBRBVY6k9ZGGJ2lfClMxAoqgKkfS+kjDk7QvhakYAUVQlSNpfaThSdqXwlSMgCKoypG0PtLwJO1LYSpGQBFU5UhaH2l4kvalMBUjoAiqciStjzQ8SftSmIoRUARVOZLWRxqepH0pTMUIKIKqHEnrIw1P0r4UpmIEFEFVjqT1kYYnaV8KUzECiqAqR9L6SMOTtC+FqRgBRVCVI2l9pOFJ2pfCVIyAIqjKkbQ+0vAk7UthKkZAEVTlSFofaXiS9qUwFSOgCKpyJK2PNDxJ+1KYihFQBFU5ktZHGp6kfSlMxQgogqocSesjDU/SvhSmYgQUQVWOpPWRhidpXwpTMQKKoCpH0vpIw5O0L4WpGAFFUJUjaX2k4Unal8JUjIAiqMqRtD7S8CTtS2EqRkARVOVIWh9peJL2pTAVI6AIqnIkrY80PEn7UpiKEVAEVTmS1kcanqR9KUzFCCiCqhxJ6yMNT9K+FKZiBBRBVY6k9ZGGJ2lfClMxAoqgKkfS+kjDk7QvhakYAUVQlSNpfaThSdqXwlSMgCKoypG0PtLwJO1LYSpGQBFU5UhaH2l4kvalMBUjoAiqciStjzQ8SftSmIrpAvpvP5tOz717vfz80cVp8coXy48eX9mbTte/Q0AhUjmS1kcanqR9KYYK6L+sknnuk+UH9/e2Arqu6SqmBBQilSNpfaThSdqXYqCA3pme+9v5/MHlVSfvTF87+K1r0/PXl79z/hYBhU7lSFofaXiS9qUYJqCPL08/XP64eLT5YWnm+/u/dX9v/Th09eCUgEKjciStjzQ8SftSDBPQRxfXn6GXdD6+vBXLm+tHoze3okpAcWqVI2l9pOFJ2pdimIDuKwF9dPH87z6YTn96ffUr5bHp4U/rCShOq3IkrY80PEn7Ugwb0NUn6pvnkJbp3H80en9v80XQ51e0f/NS6yMNT5UjaX2k4Unal6cRB3T1+fqd6fS9W/O/XFk+J09AMYzKkbQ+0vAk7cvTaAN6Z/Uyps2XPZefz28F1LyQSf/ouvWRhqfKkbQ+0vAk7UsxZEDv7J378HBPz996yiNQAgqBypG0PtLwJO1LMWBAb07NK5WWDzoJKIZROZLWRxqepH0phgvov9h+rprJs/AYROVIWh9peJL2pRgqoI+vTV9df41z86r6VTM3r//kdaCQqhxJ6yMNT9K+FEMF9NrWWzWvrR5srkLKO5EwiMqRtD7S8CTtSzFQQG9uv9X9/t7yZUwPPii/tsjoq7wXHnKVI2l9pOFJ2pdimIBurl+38FrJ6eoCTNeXv/eAqzFhAJUjaX2k4Unal2KYgN6ZHgro/MHy4qDvrR9yPriy+OV3b9l/Rn/bWh9peKocSesjDU/SvhTDBLSG/ra1PtLwVDmS1kcanqR9KUzFCCiCqhxJ6yMNT9K+FKZiBBRBVY6k9ZGGJ2lfClMxAoqgKkfS+kjDk7QvhakYAUVQlSNpfaThSdqXwlSMgCKoypG0PtLwJO1LYSpGQBFU5UhaH2l4kvalMBUjoAiqciStjzQ8SftSmIoRUARVOZLWRxqepH0pTMUIKIKqHEnrIw1P0r4UpmIEFEFVjqT1kYYnaV8KUzECiqAqR9L6SMOTtC+FqRgBRVCVI2l9pOFJ2pfCVIyAIqjKkbQ+0vAk7UthKkZAEVTlSFofaXiS9qUwFSOgCKpyJK2PNDxJ+1KYihFQBFU5ktZHGp6kfSlMxQgogqocSesjDU/SvhSmYgQUQVWOpPWRhidpXwpTMQKKoCpH0vpIw5O0L4WpGAFFUJUjaX2k4Unal8JUjIAiqMqRtD7S8CTtS2EqRkARVOVIWh9peJL2pTAVI6AIqnIkrY80PEn7UpiKEVAEVTmS1kcanqR9KUzFCCiCqhxJ6yMNT9K+FKZiBBRBVY6k9ZGGJ2lfClMxAoqgKkfS+kjDk7QvhakYAUVQlSNpfaThSdqXwlSMgCKoypG0PtLwJO1LYSpGQBFU5UhaH2l4kvalMBUjoAiqciStjzQ8SftSmIoRUARVOZLWRxqepH0pTMUIKIKqHEnrIw1P0r4UpmIEFEFVjqT1kYYnaV8KUzECiqAqR9L6SMOTtC+FqRgBRVCVI2l9pOFJ2pfCVIyAIqjKkbQ+0vAk7UthKkZAEVTlSFofaXiS9qUwFSOgCKpyJK2PNDxJ+1KYihFQBFU5ktZHGp6kfSlMxQgogqocSesjDU/SvhSmYgQUQVWOpPWRhidpXwpTMQKKoCpH0vpIw5O0L4WpGAFFUJUjaX2k4Unal8JUjIAiqMqRtD7S8CTtS2EqRkARVOVIWh9peJL2pTAVI6AIqnIkrY80PEn7UpiKEVAEVTmS1kcanqR9KUzFCCiCqhxJ6yMNT9K+FKZiBBRBVY6k9ZGGJ2lfClMxAoqgKkfS+kjDk7QvhakYAUVQlSNpfaThSdqXwlSMgCKoypG0PtLwJO1LYSpGQBFU5UhaH2l4kvalMBUjoAiqciStjzQ8SftSmIoRUARVOZLWRxqepH0pTMUIKIKqHEnrIw1P0r4UpmIEFEFVjqT1kYYnaV8KUzECiqAqR9L6SMOTtC+FqRgBRVCVI2l9pOFJ2pfCVIyAIqjKkbQ+0vAk7UthKkZAEVTlSFofaXiS9qUwFSOgCKpyJK2PNDxJ+1KYihFQBFU5ktZHGp6kfSlMxQgogqocSesjDU/SvhSmYgQUQVWOpPWRhidpXwpTMQKKoCpH0vpIw5O0L4WpGAFFUJUjaX2k4Unal8JUjIAiqMqRtD7S8CTtS2EqRkARVOVIWh9peJL2pTAVI6AIqnIkrY80PEn7UpiKEVAEVTmS1kcanqR9KUzFCCiCqhxJ6yMNT9K+FKZiBBRBVY6k9ZGGJ2lfClMxAoqgKkfS+kjDk7QvhakYAUVQlSNpfaThSdqXwlSMgCKoypG0PtLwJO1LYSpGQBFU5UhaH2l4kvalMBVrGFC91kcanipH0vpIw5O0L0/DI1AEVTmS1kcanqR9KUzFCCiCqhxJ6yMNT9K+FKZiBBRBVY6k9ZGGJ2lfClMxAoqgKkfS+kjDk7QvhakYAUVQlSNpfaThSdqXwlSMgCKoypG0PtLwJO1LYSpGQBFU5UhaH2l4kvalMBUjoAiqciStjzQ8SftSmIoRUARVOZLWRxqepH0pTMUIKIKqHEnrIw1P0r4UpmIEFEFVjqT1kYYnaV8KUzECiqAqR9L6SMOTtC+FqRgBRVCVI2l9pOFJ2pfCVIyAIqjKkbQ+0vAk7UthKkZAEVTlSFofaXiS9qUwFSOgCKpyJK2PNDxJ+1KYihFQBFU5ktZHGp6kfSlMxQgogqocSesjDU/SvhSmYgQUQVWOpPWRhidpXwpTMQKKoCpH0vpIw5O0L4WpGAFFUJUjaX2k4Unal8JUjIAiqMqRtD7S8CTtS2EqRkARVOVIWh9peJL2pTAVI6AIqnIkrY80PEn7UpiKEVAEVTmS1kcanqR9KUzFCCiCqhxJ6yMNT9K+FKZiBBRBVY6k9ZGGJ2lfClMxAoqgKkfS+kjDk7QvhakYAUVQlSNpfaThSdqXwlSMgCKoypG0PtLwJO1LYSpGQBFU5UhaH2l4kvalMBUjoAiqciStjzQ8SftSmIoRUARVOZLWRxqepH0pTMUIKIKqHEnrIw1P0r4UpmIEFEFVjqT1kYYnaV8KUzECiqAqR9L6SMOTtC+FqRgBRVCVI2l9pOFJ2pfCVIyAIqjKkbQ+0vAk7UthKkZAEVTlSFofaXiS9qUwFSOgCKpyJK2PNDxJ+1KYihFQBFU5ktZHGp6kfSlMxQgogqocSesjDU/SvhSmYgQUQVWOpPWRhidpXwpTMQKKoCpH0vpIw5O0L4WpGAFFUJUjaX2k4Unal8JUjIAiqMqRtD7S8CTtS2EqRkARVOVIWh9peJL2pTAVI6AIqnIkrY80PEn7UpiKEVAEVTmS1kcanqR9KUzFCCiCqhxJ6yMNT9K+FKZiBBRBVY6k9ZGGJ2lfClMxAoqgKkfS+kjDk7QvhakYAUVQlSNpfaThSdqXwlSMgCKoypG0PtLwJO1LYSpGQBFU5UhaH2l4kvalMBUjoAiqciStjzQ8SftSmIoRUARVOZLWRxqepH0pTMUIKIKqHEnrIw1P0r4UpmIEFEFVjqT1kYYnaV8KUzECiqAqR9L6SMOTtC+FqRgBRVCVI2l9pOFJ2pfCVIyAIqjKkbQ+0vAk7UthKkZAEVTlSFofaXiS9qUwFSOgCKpyJK2PNDxJ+1KYihFQBFU5ktZHGp6kfSlMxQgogqocSesjDU/SvhSmYgQUQVWOpPWRhidpXwpTMQKKoCpH0vpIw5O0L4WpGAFFUJUjaX2k4Unal8JUjIAiqMqRtD7S8CTtS2EqRkARVOVIWh9peJL2pTAVI6AIqnIkrY80PEn7UpiKEVAEVTmS1kcanqR9KUzFCCiCqhxJ6yMNT9K+FKZiBBRBVY6k9ZGGJ2lfClMxAoqgKkfS+kjDk7QvhakYAUVQlSNpfaThSdqXwlSMgCKoypG0PtLwJO1LYSpGQBFU5UhaH2l4kvalMBUjoAiqciStjzQ8SftSmIp5BPTxlb3p9N3rBBRKlSNpfaThSdqXwj+gjy5Ol175goBCqHIkrY80PEn7UvgH9Nr0/PX5g8vT87cIKHQqR9L6SMOTtC+Fe0Dv75XHno8unvuEgEKnciStjzQ8SftSuAf05vS19Y/vE1DoVI6k9ZGGJ2lfCveAXpt+WH68sw4pAYVE5UhaH2l4kval8A7o48vrT93v722+CPr8iv7van2k4alyJK2PNDxJ+/I0qQIKAJ48A2peyKR/dP3dxD2JToxEpWFAzeuYWt8TWXBPohMjUSGg2XBPohMjUfEOqOez8N9N3JPoxEhU3AO6ef2nw+tAv5u4J9GJkai4B9TxnUjfTdyT6MRIVNwD+vjy9FWn98J/N3FPohMjUXEP6PyB29WYvpu4J9GJkaj4B3T+4Mqin+/esr/c+p7IgnsSnRiJSoOAHqH1PZEF9yQ6MRIVUzECGh73JDoxEhVTMQIaHvckOjESFVMxAhoe9yQ6MRIVUzECGh73JDoxEhVTMQIaHvckOjESFVMxAhoe9yQ6MRIVUzECGh73JDoxEhVTMQIaHvckOjESFVMxAhoe9yQ6MRIVUzECGh73JDoxEhVTMQIaHvckOjESFVMxAhoe9yQ6MRIVUzECGh73JDoxEhVTMQIaHvckOjESFVMxAhoe9yQ6MRIVUzECGh73JDoxEhVTMQIaHvckOjESFVMxAhoe9yQ6MRIVUzECGh73JDoxEhVTMQIaHvckOjESFVMxAhoe9yQ6MRIVUzECGh73JDoxEhVTMQIaHvckOjESFVMxAhoe9yQ6MRIVUzECGh73JDoxEhVTMQIaHvckOjESFVOxhgGFxvPPt/43wOgxkoEQ0PA4G+jESAZCQMPjbKATIxkIAQ2Ps4FOjGQgBDQ8zgY6MZKBENDwOBvoxEgGQkDD42ygEyMZCAEFgEoEFAAqEVAAqERAAaASAQWASgQUACoRUACoREABoBIBDeHRxen7+z995Yum/y4Yk8eXp+dv7f/0w7b/Mt9BBDSERUDPfbL5KQHFgft7m/+23tlPKdwQ0BAWAZ2+tvkpAcWWm9PVIB5d3Pw3Fn4IaAiLw/E368/PCCgO2Xx55+bmP7FwREBDWFTzf+xtHmisfnxwZTqdvnu96b8WxuBO+fLO/fU+FsPYm05/en31858tRvLv/7bhv1x2BDSEZTXXjzDWAb2zOCUL53ja4Dvv8eXlMq6tP0O5vzWM9c95aDocAhrCsprrJ1lXAV0cjXf/9/zxv0z5uhfu75375P7e6hmkxSf0792aP/7X5RdGF4v5D4tf/Lc9RjIYAhpCqebqk7RVQDdf8LrGowssVnD+v6wjuRnGzen7PK3kgICGsKpmqWX56f5L/njpCrZfpPH48rqZy0eki5W8+j9b/nt9BxDQEFYBLY8oyk/3H1vwnDzmy/+OrmewaObG4lduLn989b/yn9jhENAQNs8cLR5vrgO6PjAEFPPV483yk+Vj0YOAzv/8N+Wn75HQoRDQEDadvDZ9n0egeMJWQM2XPR//9+Urmd5/2j8EAQIawqaTi/Px3/gaKKz9gD7t/fCP/5WRDIaAhrD/QPPO9K/2eBYexn5AF8NY/Wz5X9bNa+sPfhdqBDSEg8/Ur62+uLV6HehfrvA6UMy3E/no4vT89fn8z3uLR6LLKzUtfv7gMv+VHQwBDeEgoIty8k4kGFuPMdfDmL43P3gn0qt8nXwoBDSEreeKNhff4b3w2Lf9SfrqvfD/ePDzv/qPfAI/GAIKAJUIKABUIqAAUImAAkAlAgoAlQgoAFQioABQiYACQCUCCgCVCCgAVCKgAFCJgAJAJQIKAJUIKABUIqAAUImAAkAlAgoAlQgoAFQioABQiYACQCUCCgCVCCgAVCKgAFCJgAJAJQIKAJUIKABUIqAAUImAAkAlAgoAlQgoAFQioABQiYACQCUCCgCVCCgAVCKgAFCJgAJAJQIKAJUIKABUIqAAUImAAkAlAgoAlQgoAFQioABQiYACQCUCCgCVCCgAVCKgAFCJgAJAJQIKAJUIKABUIqAAUOn/A71FEGOQyBlxAAAAAElFTkSuQmCC">
             <a:extLst>
               <a:ext uri="{FF2B5EF4-FFF2-40B4-BE49-F238E27FC236}">
-                <a16:creationId xmlns:a16="http://schemas.microsoft.com/office/drawing/2014/main" id="{D364D651-6EB2-244D-94BF-CDF4925ACCFE}"/>
+                <a16:creationId xmlns="" xmlns:a16="http://schemas.microsoft.com/office/drawing/2014/main" id="{8CC047BC-7FEC-4EB1-BCEA-02FB6A9AD576}"/>
               </a:ext>
             </a:extLst>
           </p:cNvPr>
           <p:cNvSpPr>
-            <a:spLocks noGrp="1"/>
-          </p:cNvSpPr>
-          <p:nvPr>
-            <p:ph type="body" idx="1"/>
-          </p:nvPr>
-        </p:nvSpPr>
-        <p:spPr/>
-        <p:txBody>
-          <a:bodyPr/>
-          <a:lstStyle/>
-          <a:p>
-            <a:r>
-              <a:rPr lang="en-US" dirty="0"/>
-              <a:t>“Tell me about any job role specific trends that may exist in the data set”</a:t>
-            </a:r>
-          </a:p>
-          <a:p>
-            <a:endParaRPr lang="en-US" dirty="0"/>
+            <a:spLocks noChangeAspect="1" noChangeArrowheads="1"/>
+          </p:cNvSpPr>
+          <p:nvPr/>
+        </p:nvSpPr>
+        <p:spPr bwMode="auto">
+          <a:xfrm>
+            <a:off x="5963478" y="3296478"/>
+            <a:ext cx="284922" cy="284922"/>
+          </a:xfrm>
+          <a:prstGeom prst="rect">
+            <a:avLst/>
+          </a:prstGeom>
+          <a:noFill/>
+          <a:extLst>
+            <a:ext uri="{909E8E84-426E-40DD-AFC4-6F175D3DCCD1}">
+              <a14:hiddenFill xmlns:a14="http://schemas.microsoft.com/office/drawing/2010/main">
+                <a:solidFill>
+                  <a:srgbClr val="FFFFFF"/>
+                </a:solidFill>
+              </a14:hiddenFill>
+            </a:ext>
+          </a:extLst>
+        </p:spPr>
+        <p:txBody>
+          <a:bodyPr vert="horz" wrap="square" lIns="91440" tIns="45720" rIns="91440" bIns="45720" numCol="1" anchor="t" anchorCtr="0" compatLnSpc="1">
+            <a:prstTxWarp prst="textNoShape">
+              <a:avLst/>
+            </a:prstTxWarp>
+          </a:bodyPr>
+          <a:lstStyle/>
+          <a:p>
+            <a:endParaRPr lang="en-US"/>
+          </a:p>
+        </p:txBody>
+      </p:sp>
+      <p:sp>
+        <p:nvSpPr>
+          <p:cNvPr id="5" name="AutoShape 2" descr="data:image/png;base64,iVBORw0KGgoAAAANSUhEUgAABUAAAAPACAMAAADDuCPrAAABYlBMVEUAAAAAADoAAGYAOjoAOmYAOpAAZrYzMzM6AAA6OgA6Ojo6OmY6ZmY6ZpA6ZrY6kLY6kNtNTU1NTW5NTY5Nbm5Nbo5NbqtNjshmAABmADpmOgBmOjpmZjpmZmZmZpBmkGZmkLZmkNtmtttmtv9uTU1ubk1ubm5ubo5ujqtujshuq8huq+SOTU2Obk2Obm6Oq8iOyOSOyP+QOgCQOjqQZjqQZmaQZpCQkGaQkLaQtraQttuQ2/+rbk2rjk2rjm6rq8iryOSr5Mir5P+2ZgC2Zjq2kDq2kGa2kJC2tpC2tra2ttu229u22/+2///Ijk3Ijm7Iq27Iq6vIyKvI5KvI5OTI5P/I///bkDrbkGbbtmbbtpDbtrbb27bb29vb2//b/7bb///kq27kyI7kyKvk5P/k///r6+v8jVn/tmb/yI7/25D/27b/29v/5Kv/5Mj/5OT//7b//7///8j//9v//+T///+zjZs9AAAACXBIWXMAAB2HAAAdhwGP5fFlAAAgAElEQVR4nO3d/59b5ZnecU0wMDGEILMYh0CWwmwDxaSLN3S7xHW3mGQXkni3aY0TEijO1q2/YMe1rP+/0iNpRnPbM+fMM9e5n3PffN4/xB472Eiv6/mgGUlnJnMAQJVJ638BAIiKgAJAJQIKAJUIKABUIqAAUImAAkAlAgoAlQgoAFQioABQiYACQCUCCgCVCCgAVCKgAFCJgAJAJQIKAJVGENDZl298fzKZ7Lzw8Ten/rNuT570zvzhhcnOLwT/pgCwrXlAZ7/aPWjdS6dNKAEF4Kd1QO+9fih2p+0cAQXgp3FA7y4ffu689dXip9/+6vuCgh78ud/7reRPAoCjtA3o4qHh1ufts1/KCkpAAQyvbUCvLor59tbHy8/An1P8wQQUwPCaBnT5CfzLh37lRvmapeRPJqAABtY0oItcmswtP6d/rvzGwQPRq5vK3vv5Irg7P/jNwT/9zuzT3cnOC09+1n84oJsnka4ufyh/ygsfL3/9yx8vev3Cr/f/f+YvAIBjtQzo7NKTn7Cvmroo3n7/NvWbfWpe7LQM6NUjnro/OqA31n/Iywd/4PpB8BN/AQAcq2VAlw837efrt1c9vHrwO4tfefabVW03VtVdpPBs+fDZJ3t3ZED/fv8Pefvq4ddOPfkXAMCxWgZ0UbknHjyuo3r7IGLrli4fOb709Xz+7aebx4zlseQPv5l/+/VT/+inBnRh+Rn6l4tP1Z+Z7Lz9zeqZ/+fmT/0LAOBYLQN6+ymffS8D+vJ866Xv68/mtx6t3l5/5fTGMaE7OqAvb/6MzV9wdfUQ9il/AQAca6QBXdZxlbr180nbTysdPCY98kWjRwZ0/aubv2a+/yWCp/wFAHCssQZ0UcDypc3lVyaXMdtu2u39xj7lq58rRwb0uYO/5p1D/9en/AUAcKyRfg10Gc7ye+uQbj/Ds3mW58YxT/YcGdCXD//K/v/1aX8BABxrbM/C70f19qFP5W3f7Cfd1qkDeuRjWwDYGOfrQOclcYuIbR6IElAA4zPOdyItlbcNbV7OtPlSqPmntQHliSMAJ9I0oFu5XNt6L3z5HH7/qZ2rTz6vIw3o0/4CADhW26sx2Zdy3t765HnxmPDZ/7X/ls7tp9xv7H95VBjQp/wFAHCstgEtX3k8eOf5jcn2C5tulDderku2deGmzfNM2oA+5S8AgGM1viL9veUVlQ9dkf7gC5Grq9VvSrZ8F9GZX6+/h9LmvZfCgD7lLwCAY435eyJd3X42fPtp8lUbxQF98i8AgGO1Duih78q5c/g6crcn28+Mz36++b+dWV2wUxzQJ/8CADhW84AufPnz5Sfvz7xovy/89lVBl/60vN7x+lrIc31An/gLAOBYYwgoAIREQAGgEgEFgEoEFAAqEVAAqERAAaASAQWASgQUACoRUACoREABoBIBBYBKBBQAKhFQAKhEQAGgEgEFgEoEFAAqEVAAqNQwoP8HEtyT6MRIVEzFCGh43JPoxEhUTMUIaHjck+jESFRMxQhoeNyT6MRIVEzFCGh43JPoxEhUTMUIaHjck+jESFRMxQhoeNyT6MRIVEzFCGh43JPoxEhUTMUIaHjck+jESFRMxQhoeNyT6MRIVEzFCGh43JPoxEhUTMUIaHjck+jESFRMxQhoeNyT6MRIVEzFCGh43JPoxEhUTMUIaHjck+jESFRMxQhoeNyT6MRIVEzFCGh43JPoxEhUTMUIaHjck+jESFRMxQhoeNyT6MRIVEzFCGh43JPoxEhUTMUIaHjck+jESFRMxQhoeNyT6MRIVEzFCGh43JPoxEhUTMUIaHjck+jESFRMxQhoeNyT6MRIVEzFCGh43JPoxEhUTMUIaHjck+jESFRMxQhoeNyT6MRIVEzFCGh43JPoxEhUTMUIaHjck+jESFRMxQhoeNyT6MRIVEzFCGh43JPoxEhUTMUIaHjck+jESFRMxQhoeNyT6MRIVEzFCGh43JPoxEhUTMUIaHjck+jESFRMxQhoeNyT6MRIVEzFUgX0/+I7RL+fxAioiqkYAUVQ+v0kRkBVTMUIKILS7ycxAqpiKkZAEZR+P4kRUBVTMQKKoPT7SYyAqpiKEVAEpd9PYgRUxVSMgCIo/X4SI6AqpmIEFEHp95MYAVUxFSOgCEq/n8QIqIqpGAFFUPr9JEZAVUzFCCiC0u8nMQKqYipGQBGUfj+JEVAVUzECiqD0+0mMgKqYihFQBKXfT2IEVMVUjIAiKP1+EiOgKqZiBBRB6feTGAFVMRUjoAhKv5/ECKiKqRgBRVD6/SRGQFVMxQgogtLvJzECqmIqRkARlH4/iRFQFVMxAoqg9PtJjICqmIoRUASl309iBFTFVIyAIij9fhIjoCqmYgQUQen3kxgBVTEVI6AISr+fxAioiqkYAUVQ+v0kRkBVTMUIKILS7ycxAqpiKkZAEZR+P4kRUBVTMQKKoPT7SYyAqpiKEVAEpd9PYgRUxVSMgCIo/X4SI6AqpmKnDeiji6+tf/b4yt50+u71rg8IKDT0+0mMgKqIA3pt+tqmpNOlV744/gMCChH9fhIjoCrSgD6+Nt0E9Nr0/PX5g8vT87eO/YCAQkS/n8QIqIoyoP/2wXQT0Pt75RHmo4vnPjnuAwIKFf1+EiOgKsKA3pxO3/vzOqA39398/7gPCChU9PtJjICqKAP66j/O76zzeG36YfmxfHz0BwQUKvr9JEZAVYQB3cri48vrT9Dv752/dfQHq3/m+ZVT/s1P0fpIw5N+P8BJEVAEpd8PcFL6gL7yxdEfHPpH9Y+uWx9peNLvJzE+hVcZPKDdj0AJKAT0+0mMgKoQUOSg309iBFRlmIDyLDy86feTGAFVGSigm1d5rl/6edQHBBQq+v0kRkBVBgoo70SCM/1+EiOgKgMF9PHl6av773g/+gMCChX9fhIjoCoDBXT+YPuaS0d/QEAhot9PYgRUZaiAzh9cWVTy3VtdHxBQaOj3kxgBVREH9BT0t631kYYn/X4SI6AqpmIEFEHp95MYAVUxFSOgCEq/n8QIqIqpGAFFUPr9JEZAVUzFCCiC0u8nMQKqYipGQBGUfj+JEVAVUzECiqD0+0mMgKqYihFQBKXfT2IEVMVUjIAiKP1+EiOgKqZiBBRB6feTGAFVMRUjoAhKv5/ECKiKqRgBRVD6/SRGQFVMxQgogtLvJzECqmIqRkARlH4/iRFQFVMxAoqg9PtJjICqmIoRUASl309iBFTFVIyAIij9fhIjoCqmYgQUQen3kxgBVTEVI6AISr+fxAioiqkYAUVQ+v0kRkBVTMUIKILS7ycxAqpiKkZAEZR+P4kRUBVTMQKKoPT7SYyAqpiKEVAEpd9PYgRUxVSMgCIo/X4SI6AqpmIEFEHp95MYAVUxFSOgCEq/n8QIqIqpGAFFUPr9JEZAVUzFCCiC0u8nMQKqYipGQBGUfj+JEVAVUzECiqD0+0mMgKqYihFQBKXfT2IEVMVUjIAiKP1+EiOgKqZiBBRB6feTGAFVMRUjoAhKv5/ECKiKqRgBRVD6/SRGQFVMxQgogtLvJzECqmIqRkARlH4/iRFQFVMxAoqg9PtJjICqmIoRUASl309iBFTFVIyAIij9fhIjoCqmYgQUQen3kxgBVTEVI6AISr+fxAioiqkYAUVQ+v0kRkBVTMUIKILS7ycxAqpiKkZAEZR+P4kRUBVTMQKKoPT7SYyAqpiKEVAEpd9PYgRUxVSMgCIo/X4SI6AqpmIEFEHp95MYAVUxFSOgCEq/n8QIqIqpGAFFUPr9JEZAVUzFCCiC0u8nMQKqYipGQBGUfj+JEVAVUzECiqD0+0mMgKqYihFQBKXfT2IEVMVUjIAiKP1+EiOgKqZiBBRB6feTGAFVMRUjoAhKv5/ECKiKqRgBRVD6/SRGQFVMxQgogtLvJzECqmIqRkARlH4/iRFQFVMxAoqg9PtJjICqmIoRUASl309iBFTFVIyAIij9fhIjoCqmYgQUQen3kxgBVTEVI6AISr+fxAioiqkYAUVQ+v0kRkBVTMUIKILS7ycxAqpiKkZAEZR+P4kRUBVTMQKKoPT7SYyAqpiKEVAEpd9PYgRUxVSMgCIo/X4SI6AqpmIEFEHp95MYAVUxFSOgCEq/n8QIqIqpGAFFUPr9JEZAVUzFCCiC0u8nMQKqYipGQBGUfj+JEVAVU7GGAdVrfaThqfXaAB6BIiz9fhLjEaiKqRgBRVD6/SRGQFVMxQgogtLvJzECqmIqRkARlH4/iRFQFVMxAoqg9PtJjICqmIoRUASl309iBFTFVIyAIij9fhIjoCqmYgQUQen3kxgBVTEVI6AISr+fxAioiqkYAUVQ+v0kRkBVTMUIKILS7ycxAqpiKkZAEZR+P4kRUBVTMQKKoPT7SYyAqpiKEVAEpd9PYgRUxVSMgCIo/X4SI6AqpmIEFEHp95MYAVUxFSOgCEq/n8QIqIqpGAFFUPr9JEZAVUzFCCiC0u8nMQKqYipGQBGUfj+JEVAVUzECiqD0+0mMgKqYihFQBKXfT2IEVMVUjIAiKP1+EiOgKqZiBBRB6feTGAFVMRUjoAhKv5/ECKiKqRgBRVD6/SRGQFVMxQgogtLvJzECqmIqRkARlH4/iRFQFVMxAoqg9PtJjICqmIoRUASl309iBFTFVIyAIij9fhIjoCqmYgQUQen3kxgBVTEVI6AISr+fxAioiqkYAUVQ+v0kRkBVTMUIKILS7ycxAqpiKkZAEZR+P4kRUBVTMQKKoPT7SYyAqpiKEVAEpd9PYgRUxVSMgCIo/X4SI6AqpmIEFEHp95MYAVUxFSOgCEq/n8QIqIqpGAFFUPr9JEZAVUzFCCiC0u8nMQKqYipGQBGUfj+JEVAVUzECiqD0+0mMgKqYihFQBKXfT2IEVMVUjIAiKP1+EiOgKqZiBBRB6feTGAFVMRUjoAhKv5/ECKiKqRgBRVD6/SRGQFVMxQgogtLvJzECqmIqRkARlH4/iRFQFVMxAoqg9PtJjICqmIoRUASl309iBFTFVIyAIij9fhIjoCqmYgQUQen3kxgBVTEVI6AISr+fxAioiqkYAUVQ+v0kRkBVTMUIKILS7ycxAqpiKkZAEZR+P4kRUBVTMQKKoPT7SYyAqpiKEVAEpd9PYgRUxVSMgCIo/X4SI6AqpmIEFEHp95MYAVUxFSOgCEq/n8QIqIqpGAFFUPr9JEZAVUzFCCiC0u8nMQKqYipGQBGUfj+JEVAVUzECiqD0+0mMgKqYihFQBKXfT2IEVMVUjIAiKP1+EiOgKqZiBBRB6feTGAFVMRUjoAhKv5/ECKiKqRgBRVD6/SRGQFVMxQgogtLvJzECqmIqRkARlH4/iRFQFVMxAoqg9PtJjICqmIoRUASl309iBFTFVIyAIij9fhIjoCqmYgQUQen3kxgBVTEVI6AISr+fxAioiqmYKKCPL083XvliPn908eDni9+8sjedvnudgEJJv5/ECKiKS0Dv720FdF3TVUwJKET0+0mMgKoME9CN+3vnPln8cGf62sGvXZuevz5/cHl6/hYBhY5+P4kRUJVBA7p4IPr+qpnvbzV1/Ti0pJWAQkS/n8QIqMqgAb25epj5+PJWLG+uH43e3IoqAcWp6feTGAFVGTKgjy5OP1z9eP53H0ynP72+/ODa6tcOf1pPQHFa+v0kRkBVhgzo5sHm5jmkZTr3H43e39t8EfT5FeXfvNL6SMOTfj/ASSkDuv9lzjvT6Xu35n+5Ml18TEAxDP1+gJNSBvTO5on2zSPR5XNJWwE1L2TSP7pufaThSb+fxPgUXmW4gD6+vP5q56GiPuURKAGFgH4/iRFQleEC+sRDzPIrBBTD0O8nMQKqMlxAn3iafdVMnoXHIPT7SYyAqgwX0P1Xz+9/Ll+auXn9J68DhZR+P4kRUJXBArr16vlrqwebq5DyTiQMQr+fxAioymABfXRx/0ug9/eWL2N68EF5Vn6R0Vd5Lzzk9PtJjICqDBbQ7SeJbq4vxnR9+cEDrsaEAej3kxgBVRksoHe2H2I++Nl0eu699ccPriz6+e4t+w/ob1vrIw1P+v0kRkBVBgvoielvW+sjDU/6/SRGQFVMxQgogtLvJzECqmIqRkARlH4/iRFQFVMxAoqg9PtJjICqmIoRUASl309iBFTFVKwjoLM/fvY5AcUY6feTGAFV6RvQe//pm/n84euTyeTMLwgoxke/n8QIqErPgN6YfO+38/nVydLyZwQUI6PfT2IEVKVfQG+XbN7dnTz7zb0Lk5cJKEZHv5/ECKhKv4BeXZRzmdGdXyz/d/lzAopx0e8nMQKq0iugs0vLcq4z+vDCMJ/D629b6yMNT/r9JEZAVXoFdNXMhxcmz80JKMZJv5/ECKjKCQJ6d3fyDgHFSOn3kxgBVekV0NWn8DfKl0D5GihGSb+fxAioSq+Azq9Onls+/b4sJ8/CY5T0+0mMgKr0C+jt8gLQxWfws59PVo9DCSjGRb+fxAioSr+ALj59X3iuPJG0884g/SSgOBX9fhIjoCo9Azq/99FPPl788PBHP/jNMP0koDgV/X4SI6AqfQM6PP1ta32k4Um/n8QIqIqp2LEBnX09YD8JKE5Fv5/ECKiKqdjRAf3yx8v3wz/80VuDvIaJgOKU9PtJjICq9Azo7NPVdZgeXpicGeZiTAQUp6LfT2IEVKVnQK9OJmf+evd7v5393WSg19ETUJyKfj+JEVCVfgG9PZm8vX4P5x9Wb+gkoBgX/X4SI6Aq/QJ6dfnuo/Wb4G+US4oQUIyLfj+JEVCVXgFdvRd+HdC7u1xMBOOj309iBFSlV0A3l7Mr5eRqTBgj/X4SI6AqBBQ56PeTGAFV6RXQ2aXlE0frcnI5O4yRfj+JEVCVXgFdPXG0CugipjyJhPHR7ycxAqrSL6B3dycvfVMCeu91LmeHMdLvJzECqtIvoOVydmd3d178/uLHYa6nTEBxKvr9JEZAVXoGdP773cnaQP0koDgV/X4SI6AqfQM6//ZXZxf1fGawy4ESUJyKfj+JEVCV3gEdnP62tT7S8KTfT2IEVMVUjOuBIij9fhIjoCqmYlwPFEHp95MYAVXpGVCuB4qR0+8nMQKq0jOgXA8UI6ffT2IEVKVfQLkeKMZOv5/ECKhKv4ByPVCMnX4/iRFQlV4B5XqgGD39fhIjoCq9Asrl7DB6+v0kRkBVCChy0O8nMQKq0iugXA8Uo6ffT2IEVKVXQLkeKEZPv5/ECKhKv4ByPVCMnX4/iRFQlX4B5XqgGDv9fhIjoCo9A8r1QDFy+v0kRkBV+gaU64Fi3PT7SYyAqvQO6OD0t631kYYn/X4SI6AqpmIEFEHp95MYAVUxFTvihfQ/emnQaykTUJyafj+JEVCVfgG9MJk8M9iVlAkoBPT7SYyAqvQK6OpyypMzHw/ZUP1ta32k4Um/n8QIqEqvgC786celoS98TEAxSvr9JEZAVfoGdL76rkgLQ72QSX/bWh9peNLvJzECqnKCgC4+lf/y9WVCd94a4ikl/W1rfaThSb+fxAioyokCuvDtz8tbkl7QPwzV37bWRxqe9PtJjICqnCigs199f/OGzslLBBRjot9PYgRUpX9AN/VcPhf/7af698Trb1vrIw1P+v0kRkBVegZ0/dXPg1eD6i+rrL9trY80POn3kxgBVekV0NmliX3ySP+NPfS3rfWRhif9fhIjoCq9Arp8J9LO4ZcvPbzAI1CMiX4/iRFQlZ4B/cGvzS/NPle/lEl/21ofaXjS7ycxAqrSK6Au9Let9ZGGJ/1+EiOgKqZiBBRB6feTGAFVMRXruCL9ztlB3oREQHFq+v0kRkBV+gb0xv4r6PmeSBgj/X4SI6AqPQO67OczL775Bt+VEyOl309iBFSlX0Dv7k6eXb2K6d4lvi88xki/n8QIqEq/gF49eN/R7NLkOQKK0dHvJzECqtIroLNLW4867+6qX0JPQHF6+v0kRkBVegX00Ps29W/iJKA4Pf1+EiOgKgQUOej3kxgBVekV0NmlyTv7H+ivw0RAcXr6/SRGQFV6BZQnkTB6+v0kRkBV+gX07u7kzOpyIn96nZcxYYz0+0mMgKr0C+jqjUhnz54d8q1Icq2PNDy1XhtwzFs5/7C7fifnztsD/dX6/zi0PtLwpN9PYjwCVekb0PnsyzcWj0Bf/HiQJ5AIKE5Lv5/ECKhK74AOTn/bWh9peNLvJzECqmIqRkARlH4/iRFQFVMxG9DZR28+6Se8DhSjo99PYgRUpSOgy28n9wTeiYTx0e8nMQKqQkCRg34/iRFQlY6AOtLfttZHGp70+0mMgKqYihFQBKXfT2IEVMVU7PiAfjVcPgkoTke/n8QIqIqp2NEB/fLH5X1IP/gNAcUY6feTGAFV6RnQ2aX9p5BeGui9SPrb1vpIw5N+P4kRUJV+AV32c+fFf/jsn97YnQx0NTsCilPR7ycxAqrSL6A3JpMfrh54zn452bq4MgHFWOj3kxgBVekV0MUD0INr2F3lgsoYIf1+EiOgKr0C+vDCoe/KyQvpMT76/SRGQFV6BpRvKoeR0+8nMQKq0iugfF94jJ5+P4kRUJVeAZ3f2Pq65w2+BooR0u8nMQKq0i+gs0v7L/+8MdC1RAgoTkW/n8QIqEqvgM4+Wr7+88W3Pvvn5Y8vDHNVUP1ta32k4Um/n8QIqEqvgLpc1E5/21ofaXjS7ycxAqpCQJGDfj+JEVCVXgF1ob9trY80POn3kxgBVTEVI6AISr+fxAioiqkYAUVQ+v0kRkBVTMWODugfP9v3OS+kx+jo95MYAVXpGdDf7/JN5TBq+v0kRkBV+gX0Nt+VEyOn309iBFSlV0BnlyY7H3+17+sh+klAcSr6/SRGQFV6BfThhYEuokxAoaLfT2IEVKVnQAd6/zsBhYp+P4kRUJVeAZ1dIqAYOf1+EiOgKr0COr/Bp/AYOf1+EiOgKv0Ceuh7ehBQjJB+P4kRUJV+AZ3fuzA58+aG+kJ2BBSnp99PYgRUpWdAP+V1oBg3/X4SI6Aq/QJ6gxfSY+T0+0mMgKr0Cmh5If0gn7cTUIjo95MYAVXpFVCP55AIKE5Fv5/ECKhKz4DyOlCMnH4/iRFQlV4B5YX0GD39fhIjoCq9Ajq/MXmZgGLU9PtJjICq9Avo7NLO2wQUY6bfT2IEVKVXQGcfvTGZ7LzIC+kxXvr9JEZAVXoF1HxbY14HivHR7ycxAqpCQJGDfj+JEVCVXgF1ob9trY80POn3kxgBVTEVI6AISr+fxAioiqkYAUVQ+v0kRkBVTMVsQGd/tN8F/uGPz77A10AxOvr9JEZAVToC+vDC6imj2UebFy9tfoWAYlT0+0mMgKr0DOhBNgkoRkm/n8QIqAoBRQ76/SRGQFUIKHLQ7ycxAqpCQJGDfj+JEVAVAooc9PtJjICqEFDkoN9PYgRUhYAiB/1+EiOgKgQUOej3kxgBVSGgyEG/n8QIqAoBRQ76/SRGQFUIKHLQ7ycxAqrSHdAnEVCMj34/iRFQFQKKHPT7SYyAqnQEdPbRm0/im8phfPT7SYyAqnQE1JH+trU+0vCk309iBFTFVIyAIij9fhIjoCqmYgQUQen3kxgBVTEVI6AISr+fxAioiqkYAUVQ+v0kRkBVTMUIKILS7ycxAqpiKkZAEZR+P4kRUBVTMQKKoPT7SYyAqpiKEVAEpd9PYgRUxVTsiXciXdr5xeKHb78moBg3/X4SI6AqHQF9eGH5xvfV/xJQjJh+P4kRUJXOgC4fgRJQjJ5+P4kRUJWOgM4uTZ79/Ks/Xfjer786MMzn8/rb1vpIw5N+P4kRUJWOgM5vcDk7hKDfT2IEVKUroLNP6wL66OK0eOWL5UePr+xNp+9eX/3WoQ8IKDT0+0mMgKp0BXSR0K8+++fdnX/47MDnPa4Hen9vK6Drmq5ieugDAgoR/X4SI6Aq3QGdVz2JdGf62sEH16bnr88fXJ6ev2U/IKAQ0e8nMQKq0iugs49OfBH6a9P3939+f2/9OPTcJ+YDAgoV/X4SI6AqvQJ6co8vb/Xx5vrR6M1lVA99QEChot9PYgRUpXdAv/3V2clk5+xb/V7D9Oji+d99MJ3+9Pryg2vTD8svlk/rD31AQKGi309iBFSlb0APXs70cp+Abp5DWtZy/9Ho/b3ztw59sPr/Pr/S5489mdZHGp70+wFO6qiALvv5zItvvvH9ngW9M52+d2v+lyvTRS4JKBzo9wOc1BEBvbs7efY35Wf3Lk3K5UU6bL7SuXwuaauZr3xx6IND/4j+0XXrIw1P+v0kxqfwKv0CenXy7OZp+NmlyXPdAd24MzUPOp/yCJSAQkC/n8QIqEqvgK4vardyd/fZ/q9pMg86CSiGot9PYgRUpVdAD72Q/kSvqi+Z5Fl4DE+/n8QIqMowAX18eTuTm5d8rl8HuvUBAYWKfj+JEVCVXgGdXZq8s//B7UmPT+GvrR5frkLKO5EwPP1+EiOgKr0CevInke7vLV/G9OCD8o73RUZf3X/7+6EPCChU9PtJjICq9Avo3d3JmV+Xn/3p9V4vY1p8hr665tL15QcPti/A9ICrMWEA+v0kRkBV+gV09Uaks2fP9n4r0vzBz6bTc++tH2U+uLJI5rtP+4CAQkO/n8QIqErPgM7/sLt+J+fO2736eXL629b6SMOTfj+JEVCVvgGdz758Y/EI9MWPT3pdOwIKF/r9JEZAVXoHdHD629b6SMOTfj+JEVAVUzECiqD0+0mMgKqYihFQBKXfT2IEVMVUjIAiKP1+EiOgKqZiBBRB6feTGAFVMRUjoAhKv5/ECKiKqRgBRVD6/SRGQFVMxQgogtLvJzECqmIqRkARlH4/iRFQFVOxo67G9IPfEFCMmn4/iRFQlV4BfXhh63qgBBRjpN9PYgRUpWdAT/BdPAgoWtDvJzECqtIroIe+qRwBxRjp95MYAVXpFdD5jc23hSegGCn9fhIjoCr9AvrtLyeTZ158c+0ng1zSTn/bWh9peJuln3QAABwGSURBVNLvJzECqtIroA8vTLYN8wVR/W1rfaThSb+fxAioCgFFDvr9JEZAVXoF1IX+trU+0vCk309iBFTFVIyAIij9fhIjoCqmYscGdPb1gP0koDgV/X4SI6AqpmJHB/TLHy+/+PnwR28N9V3l9Let9ZGGJ/1+EiOgKj0DOvt09ezRwwuTMwO9KUl/21ofaXjS7ycxAqrSM6BXJ5Mzf737vd/O/m4yeXaYx6D629b6SMOTfj+JEVCVfgG9PZm8vX5H/B92B7qwiP62tT7S8KTfT2IEVKVfQK9OXt6/pMiNyXMEFKOj309iBFSlV0BXFxNZB/TuLi+kx/jo95MYAVXpFdBVOtcBHeradvrb1vpIw5N+P4kRUBUCihz0+0mMgKr0Cujs0vKJo3U5bw/0NLz+trU+0vCk309iBFSlV0BXTxytArqIKU8iYXz0+0mMgKr0C+jd3clL35SA3nt9MtDV6fW3rfWRhif9fhIjoCr9Arp4CDqZnN3defH7ix9fHqSfBBSnot9PYgRUpWdA57/f3VwNdKB+ElCcin4/iRFQlb4BnX/7q7OLej4z3DeI19+21kcanvT7SYyAqvQO6OD0t631kYYn/X4SI6AqpmLHXw/0qwH7SUBxKvr9JEZAVUzFjr8e6AKfwmOc9PtJjICq9Azo7NL+t5R7aaArKutvW+sjDU/6/SRGQFX6BXTZz50X//Nn//TGoqDDvI6egOJU9PtJjICq9Avo7f1XL81+OeF6oBgh/X4SI6AqvQK6eAB68OrPq7yVEyOk309iBFSlV0AfXth6+ybXA8UY6feTGAFV6RnQrWZyOTuMkX4/iRFQlV4BXV2Rfu3uLpezw/jo95MYAVXpFdBD3wfpxkDvhtffttZHGp70+0mMgKr0C+jDC5MffrPp5zCfwRNQnIp+P4kRUJWOgM4+erN4Y/U60H9+c3cyefEnfAqP0dHvJzECqtIR0MVDzyfxJBLGR7+fxAioCgFFDpUj+X/4DpH2pegIqCP9bWt9pOGpciStjzQ8SftSmIoRUARVOZLWRxqepH0pTMUIKIKqHEnrIw1P0r4UpmJHB/SPn+37nGfhMTqVI2l9pOFJ2peiZ0APvqccTyJhlCpH0vpIw5O0L0W/gN7mWXiMXOVIWh9peJL2pegV0Nmlyc7HX+37eoh+ElCcSuVIWh9peJL2pegV0IcXBrqIMgGFSuVIWh9peJL2pegZ0IHe/05AoVI5ktZHGp6kfSl6BXR2iYBi5CpH0vpIw5O0L0WvgM5v8Ck8Rq5yJK2PNDxJ+1L0C+ih7+lBQDFClSNpfaThSdqXol9A5/cuTM68ucHl7DA+lSNpfaThSdqXomdAP+V1oBi3ypG0PtLwJO1L0S+gN3ghPUauciStjzQ8SftS9ApoeSH9IJ+3E1CIVI6k9ZGGJ2lfil4B9XgOiYDiVCpH0vpIw5O0L0XPgPI6UIxc5UhaH2l4kval6BVQXkiP0ascSesjDU/SvhS9AjrY94InoFCpHEnrIw1P0r4U/QI6u7TzNgHFmFWOpPWRhidpX4peAZ19VL4vPC+kx3hVjqT1kYYnaV+KXgE139yY14FifCpH0vpIw5O0LwUBRQ6VI2l9pOFJ2peiV0Bd6G9b6yMNT5UjaX2k4Unal8JUjIAiqMqRtD7S8CTtS2EqRkARVOVIWh9peJL2pTAVOyKg3361jW8qh/GpHEnrIw1P0r4UvQLq8iSSXusjDU+VI2l9pOFJ2pen4Vl4BFU5ktZHGp6kfSl6BXT2x8/W/v71yc4/fM4L6TE6lSNpfaThSdqXoldAt93dfXaYK4Pqb1vrIw1PlSNpfaThSdqX4sQBHezCIvrb1vpIw1PlSFofaXiS9qU4eUCHegiqv22tjzQ8VY6k9ZGGJ2lfipMHdKirK+tvW+sjDU+VI2l9pOFJ2pfi5AG9u0tAMT6VI2l9pOFJ2pfixAGdXZ3wKTzGp3IkrY80PEn7UvQK6OyjzaVA33xjd8KTSBihypG0PtLwJO1L0Sugh19Iz8uYMEKVI2l9pOFJ2pfixAF95q2BvkG8/ra1PtLwVDmS1kcanqR9KXoF1IX+trU+0vBUOZLWRxqepH0pTMUIKIKqHEnrIw1P0r4UpmIEFEFVjqT1kYYnaV8KUzECiqAqR9L6SMOTtC+FqZgN6NYLmA7wbY0xPpUjaX2k4Unal6IjoOZKoFwPFGNVOZLWRxqepH0pCChyqBxJ6yMNT9K+FB0Btb7cnfBOJIxR5UhaH2l4kvalOFFAZz9f5PPMbwbpJwHFqVSOpPWRhidpX4qTBPQPi4efO0O9EYmA4lQqR9L6SMOTtC9F/4AO+vCTgOKUKkfS+kjDk7QvRe+Aloef/26wfBJQnE7lSFofaXiS9qXoGdB7Az/8JKA4pcqRtD7S8CTtS9EvoIM//CSgOKXKkbQ+0vAk7UvRJ6D3Li2vAjrow08CilOqHEnrIw1P0r4UPQJaHn6+PXA+CShOp3IkrY80PEn7UnQG1OfhJwHFKVWOpPWRhidpX4qugP7e5+EnAcUpVY6k9ZGGJ2lfio6A8l54BFE5ktZHGp6kfSkIKHKoHEnrIw1P0r4UHQHleqAIonIkrY80PEn7UnQE1JH+trU+0vBUOZLWRxqepH0pTMUIKIKqHEnrIw1P0r4UpmIEFEFVjqT1kYYnaV8KUzECiqAqR9L6SMOTtC+FqRgBRVCVI2l9pOFJ2pfCVIyAIqjKkbQ+0vAk7UthKkZAEVTlSFofaXiS9qUwFSOgCKpyJK2PNDxJ+1KYihFQBFU5ktZHGp6kfSlMxQgogqocSesjDU/SvhSmYgQUQVWOpPWRhidpXwpTMQKKoCpH0vpIw5O0L4WpGAFFUJUjaX2k4Unal8JUjIAiqMqRtD7S8CTtS2EqRkARVOVIWh9peJL2pTAVI6AIqnIkrY80PEn7UpiKEVAEVTmS1kcanqR9KUzFCCiCqhxJ6yMNT9K+FKZiBBRBVY6k9ZGGJ2lfClMxAoqgKkfS+kjDk7QvhakYAUVQlSNpfaThSdqXwlSMgCKoypG0PtLwJO1LYSpGQBFU5UhaH2l4kvalMBUjoAiqciStjzQ8SftSmIoRUARVOZLWRxqepH0pTMUIKIKqHEnrIw1P0r4UpmIEFEFVjqT1kYYnaV8KUzECiqAqR9L6SMOTtC+FqRgBRVCVI2l9pOFJ2pfCVIyAIqjKkbQ+0vAk7UthKkZAEVTlSFofaXiS9qUwFSOgCKpyJK2PNDxJ+1KYihFQBFU5ktZHGp6kfSlMxQgogqocSesjDU/SvhSmYgQUQVWOpPWRhidpXwpTMQKKoCpH0vpIw5O0L4WpGAFFUJUjaX2k4Unal8JUjIAiqMqRtD7S8CTtS2EqRkARVOVIWh9peJL2pTAVI6AIqnIkrY80PEn7UpiKEVAEVTmS1kcanqR9KUzFCCiCqhxJ6yMNT9K+FKZiBBRBVY6k9ZGGJ2lfClMxAoqgKkfS+kjDk7QvhakYAUVQlSNpfaThSdqXwlSMgCKoypG0PtLwJO1LYSpGQBFU5UhaH2l4kvalMBUjoAiqciStjzQ8SftSmIrpAvpvP5tOz717vfz80cVp8coXy48eX9mbTte/Q0AhUjmS1kcanqR9KYYK6L+sknnuk+UH9/e2Arqu6SqmBBQilSNpfaThSdqXYqCA3pme+9v5/MHlVSfvTF87+K1r0/PXl79z/hYBhU7lSFofaXiS9qUYJqCPL08/XP64eLT5YWnm+/u/dX9v/Th09eCUgEKjciStjzQ8SftSDBPQRxfXn6GXdD6+vBXLm+tHoze3okpAcWqVI2l9pOFJ2pdimIDuKwF9dPH87z6YTn96ffUr5bHp4U/rCShOq3IkrY80PEn7Ugwb0NUn6pvnkJbp3H80en9v80XQ51e0f/NS6yMNT5UjaX2k4Unal6cRB3T1+fqd6fS9W/O/XFk+J09AMYzKkbQ+0vAk7cvTaAN6Z/Uyps2XPZefz28F1LyQSf/ouvWRhqfKkbQ+0vAk7UsxZEDv7J378HBPz996yiNQAgqBypG0PtLwJO1LMWBAb07NK5WWDzoJKIZROZLWRxqepH0phgvov9h+rprJs/AYROVIWh9peJL2pRgqoI+vTV9df41z86r6VTM3r//kdaCQqhxJ6yMNT9K+FEMF9NrWWzWvrR5srkLKO5EwiMqRtD7S8CTtSzFQQG9uv9X9/t7yZUwPPii/tsjoq7wXHnKVI2l9pOFJ2pdimIBurl+38FrJ6eoCTNeXv/eAqzFhAJUjaX2k4Unal2KYgN6ZHgro/MHy4qDvrR9yPriy+OV3b9l/Rn/bWh9peKocSesjDU/SvhTDBLSG/ra1PtLwVDmS1kcanqR9KUzFCCiCqhxJ6yMNT9K+FKZiBBRBVY6k9ZGGJ2lfClMxAoqgKkfS+kjDk7QvhakYAUVQlSNpfaThSdqXwlSMgCKoypG0PtLwJO1LYSpGQBFU5UhaH2l4kvalMBUjoAiqciStjzQ8SftSmIoRUARVOZLWRxqepH0pTMUIKIKqHEnrIw1P0r4UpmIEFEFVjqT1kYYnaV8KUzECiqAqR9L6SMOTtC+FqRgBRVCVI2l9pOFJ2pfCVIyAIqjKkbQ+0vAk7UthKkZAEVTlSFofaXiS9qUwFSOgCKpyJK2PNDxJ+1KYihFQBFU5ktZHGp6kfSlMxQgogqocSesjDU/SvhSmYgQUQVWOpPWRhidpXwpTMQKKoCpH0vpIw5O0L4WpGAFFUJUjaX2k4Unal8JUjIAiqMqRtD7S8CTtS2EqRkARVOVIWh9peJL2pTAVI6AIqnIkrY80PEn7UpiKEVAEVTmS1kcanqR9KUzFCCiCqhxJ6yMNT9K+FKZiBBRBVY6k9ZGGJ2lfClMxAoqgKkfS+kjDk7QvhakYAUVQlSNpfaThSdqXwlSMgCKoypG0PtLwJO1LYSpGQBFU5UhaH2l4kvalMBUjoAiqciStjzQ8SftSmIoRUARVOZLWRxqepH0pTMUIKIKqHEnrIw1P0r4UpmIEFEFVjqT1kYYnaV8KUzECiqAqR9L6SMOTtC+FqRgBRVCVI2l9pOFJ2pfCVIyAIqjKkbQ+0vAk7UthKkZAEVTlSFofaXiS9qUwFSOgCKpyJK2PNDxJ+1KYihFQBFU5ktZHGp6kfSlMxQgogqocSesjDU/SvhSmYgQUQVWOpPWRhidpXwpTMQKKoCpH0vpIw5O0L4WpGAFFUJUjaX2k4Unal8JUjIAiqMqRtD7S8CTtS2EqRkARVOVIWh9peJL2pTAVI6AIqnIkrY80PEn7UpiKEVAEVTmS1kcanqR9KUzFCCiCqhxJ6yMNT9K+FKZiBBRBVY6k9ZGGJ2lfClMxAoqgKkfS+kjDk7QvhakYAUVQlSNpfaThSdqXwlSMgCKoypG0PtLwJO1LYSpGQBFU5UhaH2l4kvalMBUjoAiqciStjzQ8SftSmIoRUARVOZLWRxqepH0pTMUIKIKqHEnrIw1P0r4UpmIEFEFVjqT1kYYnaV8KUzECiqAqR9L6SMOTtC+FqRgBRVCVI2l9pOFJ2pfCVIyAIqjKkbQ+0vAk7UthKkZAEVTlSFofaXiS9qUwFSOgCKpyJK2PNDxJ+1KYihFQBFU5ktZHGp6kfSlMxQgogqocSesjDU/SvhSmYgQUQVWOpPWRhidpXwpTMQKKoCpH0vpIw5O0L4WpGAFFUJUjaX2k4Unal8JUjIAiqMqRtD7S8CTtS2EqRkARVOVIWh9peJL2pTAVI6AIqnIkrY80PEn7UpiKEVAEVTmS1kcanqR9KUzFCCiCqhxJ6yMNT9K+FKZiBBRBVY6k9ZGGJ2lfClMxAoqgKkfS+kjDk7QvhakYAUVQlSNpfaThSdqXwlSMgCKoypG0PtLwJO1LYSpGQBFU5UhaH2l4kvalMBVrGFC91kcanipH0vpIw5O0L0/DI1AEVTmS1kcanqR9KUzFCCiCqhxJ6yMNT9K+FKZiBBRBVY6k9ZGGJ2lfClMxAoqgKkfS+kjDk7QvhakYAUVQlSNpfaThSdqXwlSMgCKoypG0PtLwJO1LYSpGQBFU5UhaH2l4kvalMBUjoAiqciStjzQ8SftSmIoRUARVOZLWRxqepH0pTMUIKIKqHEnrIw1P0r4UpmIEFEFVjqT1kYYnaV8KUzECiqAqR9L6SMOTtC+FqRgBRVCVI2l9pOFJ2pfCVIyAIqjKkbQ+0vAk7UthKkZAEVTlSFofaXiS9qUwFSOgCKpyJK2PNDxJ+1KYihFQBFU5ktZHGp6kfSlMxQgogqocSesjDU/SvhSmYgQUQVWOpPWRhidpXwpTMQKKoCpH0vpIw5O0L4WpGAFFUJUjaX2k4Unal8JUjIAiqMqRtD7S8CTtS2EqRkARVOVIWh9peJL2pTAVI6AIqnIkrY80PEn7UpiKEVAEVTmS1kcanqR9KUzFCCiCqhxJ6yMNT9K+FKZiBBRBVY6k9ZGGJ2lfClMxAoqgKkfS+kjDk7QvhakYAUVQlSNpfaThSdqXwlSMgCKoypG0PtLwJO1LYSpGQBFU5UhaH2l4kvalMBUjoAiqciStjzQ8SftSmIoRUARVOZLWRxqepH0pTMUIKIKqHEnrIw1P0r4UpmIEFEFVjqT1kYYnaV8KUzECiqAqR9L6SMOTtC+FqRgBRVCVI2l9pOFJ2pfCVIyAIqjKkbQ+0vAk7UthKkZAEVTlSFofaXiS9qUwFSOgCKpyJK2PNDxJ+1KYihFQBFU5ktZHGp6kfSlMxQgogqocSesjDU/SvhSmYgQUQVWOpPWRhidpXwpTMQKKoCpH0vpIw5O0L4WpGAFFUJUjaX2k4Unal8JUjIAiqMqRtD7S8CTtS2EqRkARVOVIWh9peJL2pTAVI6AIqnIkrY80PEn7UpiKEVAEVTmS1kcanqR9KUzFCCiCqhxJ6yMNT9K+FKZiBBRBVY6k9ZGGJ2lfClMxAoqgKkfS+kjDk7QvhakYAUVQlSNpfaThSdqXwlSMgCKoypG0PtLwJO1LYSpGQBFU5UhaH2l4kvalMBUjoAiqciStjzQ8SftSmIoRUARVOZLWRxqepH0pTMUIKIKqHEnrIw1P0r4UpmIEFEFVjqT1kYYnaV8KUzECiqAqR9L6SMOTtC+FqRgBRVCVI2l9pOFJ2pfCVIyAIqjKkbQ+0vAk7UthKkZAEVTlSFofaXiS9qUwFSOgCKpyJK2PNDxJ+1KYihFQBFU5ktZHGp6kfSlMxQgogqocSesjDU/SvhSmYgQUQVWOpPWRhidpXwpTMQKKoCpH0vpIw5O0L4WpGAFFUJUjaX2k4Unal8JUjIAiqMqRtD7S8CTtS2EqRkARVOVIWh9peJL2pTAVI6AIqnIkrY80PEn7UpiKEVAEVTmS1kcanqR9KUzFCCiCqhxJ6yMNT9K+FKZiBBRBVY6k9ZGGJ2lfClMxAoqgKkfS+kjDk7QvhakYAUVQlSNpfaThSdqXwlSMgCKoypG0PtLwJO1LYSpGQBFU5UhaH2l4kvalMBUjoAiqciStjzQ8SftSmIp5BPTxlb3p9N3rBBRKlSNpfaThSdqXwj+gjy5Ol175goBCqHIkrY80PEn7UvgH9Nr0/PX5g8vT87cIKHQqR9L6SMOTtC+Fe0Dv75XHno8unvuEgEKnciStjzQ8SftSuAf05vS19Y/vE1DoVI6k9ZGGJ2lfCveAXpt+WH68sw4pAYVE5UhaH2l4kval8A7o48vrT93v722+CPr8iv7van2k4alyJK2PNDxJ+/I0qQIKAJ48A2peyKR/dP3dxD2JToxEpWFAzeuYWt8TWXBPohMjUSGg2XBPohMjUfEOqOez8N9N3JPoxEhU3AO6ef2nw+tAv5u4J9GJkai4B9TxnUjfTdyT6MRIVNwD+vjy9FWn98J/N3FPohMjUXEP6PyB29WYvpu4J9GJkaj4B3T+4Mqin+/esr/c+p7IgnsSnRiJSoOAHqH1PZEF9yQ6MRIVUzECGh73JDoxEhVTMQIaHvckOjESFVMxAhoe9yQ6MRIVUzECGh73JDoxEhVTMQIaHvckOjESFVMxAhoe9yQ6MRIVUzECGh73JDoxEhVTMQIaHvckOjESFVMxAhoe9yQ6MRIVUzECGh73JDoxEhVTMQIaHvckOjESFVMxAhoe9yQ6MRIVUzECGh73JDoxEhVTMQIaHvckOjESFVMxAhoe9yQ6MRIVUzECGh73JDoxEhVTMQIaHvckOjESFVMxAhoe9yQ6MRIVUzECGh73JDoxEhVTMQIaHvckOjESFVMxAhoe9yQ6MRIVUzECGh73JDoxEhVTMQIaHvckOjESFVMxAhoe9yQ6MRIVUzECGh73JDoxEhVTMQIaHvckOjESFVOxhgGFxvPPt/43wOgxkoEQ0PA4G+jESAZCQMPjbKATIxkIAQ2Ps4FOjGQgBDQ8zgY6MZKBENDwOBvoxEgGQkDD42ygEyMZCAEFgEoEFAAqEVAAqERAAaASAQWASgQUACoRUACoREABoBIBDeHRxen7+z995Yum/y4Yk8eXp+dv7f/0w7b/Mt9BBDSERUDPfbL5KQHFgft7m/+23tlPKdwQ0BAWAZ2+tvkpAcWWm9PVIB5d3Pw3Fn4IaAiLw/E368/PCCgO2Xx55+bmP7FwREBDWFTzf+xtHmisfnxwZTqdvnu96b8WxuBO+fLO/fU+FsPYm05/en31858tRvLv/7bhv1x2BDSEZTXXjzDWAb2zOCUL53ja4Dvv8eXlMq6tP0O5vzWM9c95aDocAhrCsprrJ1lXAV0cjXf/9/zxv0z5uhfu75375P7e6hmkxSf0792aP/7X5RdGF4v5D4tf/Lc9RjIYAhpCqebqk7RVQDdf8LrGowssVnD+v6wjuRnGzen7PK3kgICGsKpmqWX56f5L/njpCrZfpPH48rqZy0eki5W8+j9b/nt9BxDQEFYBLY8oyk/3H1vwnDzmy/+OrmewaObG4lduLn989b/yn9jhENAQNs8cLR5vrgO6PjAEFPPV483yk+Vj0YOAzv/8N+Wn75HQoRDQEDadvDZ9n0egeMJWQM2XPR//9+Urmd5/2j8EAQIawqaTi/Px3/gaKKz9gD7t/fCP/5WRDIaAhrD/QPPO9K/2eBYexn5AF8NY/Wz5X9bNa+sPfhdqBDSEg8/Ur62+uLV6HehfrvA6UMy3E/no4vT89fn8z3uLR6LLKzUtfv7gMv+VHQwBDeEgoIty8k4kGFuPMdfDmL43P3gn0qt8nXwoBDSEreeKNhff4b3w2Lf9SfrqvfD/ePDzv/qPfAI/GAIKAJUIKABUIqAAUImAAkAlAgoAlQgoAFQioABQiYACQCUCCgCVCCgAVCKgAFCJgAJAJQIKAJUIKABUIqAAUImAAkAlAgoAlQgoAFQioABQiYACQCUCCgCVCCgAVCKgAFCJgAJAJQIKAJUIKABUIqAAUImAAkAlAgoAlQgoAFQioABQiYACQCUCCgCVCCgAVCKgAFCJgAJAJQIKAJUIKABUIqAAUImAAkAlAgoAlQgoAFQioABQiYACQCUCCgCVCCgAVCKgAFCJgAJAJQIKAJUIKABUIqAAUOn/A71FEGOQyBlxAAAAAElFTkSuQmCC">
+            <a:extLst>
+              <a:ext uri="{FF2B5EF4-FFF2-40B4-BE49-F238E27FC236}">
+                <a16:creationId xmlns="" xmlns:a16="http://schemas.microsoft.com/office/drawing/2014/main" id="{27CC6064-973B-4FF1-9446-C7722D5F572B}"/>
+              </a:ext>
+            </a:extLst>
+          </p:cNvPr>
+          <p:cNvSpPr>
+            <a:spLocks noChangeAspect="1" noChangeArrowheads="1"/>
+          </p:cNvSpPr>
+          <p:nvPr/>
+        </p:nvSpPr>
+        <p:spPr bwMode="auto">
+          <a:xfrm>
+            <a:off x="2895600" y="228600"/>
+            <a:ext cx="6400800" cy="6400800"/>
+          </a:xfrm>
+          <a:prstGeom prst="rect">
+            <a:avLst/>
+          </a:prstGeom>
+          <a:noFill/>
+          <a:extLst>
+            <a:ext uri="{909E8E84-426E-40DD-AFC4-6F175D3DCCD1}">
+              <a14:hiddenFill xmlns:a14="http://schemas.microsoft.com/office/drawing/2010/main">
+                <a:solidFill>
+                  <a:srgbClr val="FFFFFF"/>
+                </a:solidFill>
+              </a14:hiddenFill>
+            </a:ext>
+          </a:extLst>
+        </p:spPr>
+        <p:txBody>
+          <a:bodyPr vert="horz" wrap="square" lIns="91440" tIns="45720" rIns="91440" bIns="45720" numCol="1" anchor="t" anchorCtr="0" compatLnSpc="1">
+            <a:prstTxWarp prst="textNoShape">
+              <a:avLst/>
+            </a:prstTxWarp>
+          </a:bodyPr>
+          <a:lstStyle/>
+          <a:p>
+            <a:endParaRPr lang="en-US"/>
+          </a:p>
+        </p:txBody>
+      </p:sp>
+      <p:sp>
+        <p:nvSpPr>
+          <p:cNvPr id="6" name="AutoShape 4" descr="data:image/png;base64,iVBORw0KGgoAAAANSUhEUgAABUAAAAPACAMAAADDuCPrAAABYlBMVEUAAAAAADoAAGYAOjoAOmYAOpAAZrYzMzM6AAA6OgA6Ojo6OmY6ZmY6ZpA6ZrY6kLY6kNtNTU1NTW5NTY5Nbm5Nbo5NbqtNjshmAABmADpmOgBmOjpmZjpmZmZmZpBmkGZmkLZmkNtmtttmtv9uTU1ubk1ubm5ubo5ujqtujshuq8huq+SOTU2Obk2Obm6Oq8iOyOSOyP+QOgCQOjqQZjqQZmaQZpCQkGaQkLaQtraQttuQ2/+rbk2rjk2rjm6rq8iryOSr5Mir5P+2ZgC2Zjq2kDq2kGa2kJC2tpC2tra2ttu229u22/+2///Ijk3Ijm7Iq27Iq6vIyKvI5KvI5OTI5P/I///bkDrbkGbbtmbbtpDbtrbb27bb29vb2//b/7bb///kq27kyI7kyKvk5P/k///r6+v8jVn/tmb/yI7/25D/27b/29v/5Kv/5Mj/5OT//7b//7///8j//9v//+T///+zjZs9AAAACXBIWXMAAB2HAAAdhwGP5fFlAAAgAElEQVR4nO3d/59b5ZnecU0wMDGEILMYh0CWwmwDxaSLN3S7xHW3mGQXkni3aY0TEijO1q2/YMe1rP+/0iNpRnPbM+fMM9e5n3PffN4/xB472Eiv6/mgGUlnJnMAQJVJ638BAIiKgAJAJQIKAJUIKABUIqAAUImAAkAlAgoAlQgoAFQioABQiYACQCUCCgCVCCgAVCKgAFCJgAJAJQIKAJVGENDZl298fzKZ7Lzw8Ten/rNuT570zvzhhcnOLwT/pgCwrXlAZ7/aPWjdS6dNKAEF4Kd1QO+9fih2p+0cAQXgp3FA7y4ffu689dXip9/+6vuCgh78ud/7reRPAoCjtA3o4qHh1ufts1/KCkpAAQyvbUCvLor59tbHy8/An1P8wQQUwPCaBnT5CfzLh37lRvmapeRPJqAABtY0oItcmswtP6d/rvzGwQPRq5vK3vv5Irg7P/jNwT/9zuzT3cnOC09+1n84oJsnka4ufyh/ygsfL3/9yx8vev3Cr/f/f+YvAIBjtQzo7NKTn7Cvmroo3n7/NvWbfWpe7LQM6NUjnro/OqA31n/Iywd/4PpB8BN/AQAcq2VAlw837efrt1c9vHrwO4tfefabVW03VtVdpPBs+fDZJ3t3ZED/fv8Pefvq4ddOPfkXAMCxWgZ0UbknHjyuo3r7IGLrli4fOb709Xz+7aebx4zlseQPv5l/+/VT/+inBnRh+Rn6l4tP1Z+Z7Lz9zeqZ/+fmT/0LAOBYLQN6+ymffS8D+vJ866Xv68/mtx6t3l5/5fTGMaE7OqAvb/6MzV9wdfUQ9il/AQAca6QBXdZxlbr180nbTysdPCY98kWjRwZ0/aubv2a+/yWCp/wFAHCssQZ0UcDypc3lVyaXMdtu2u39xj7lq58rRwb0uYO/5p1D/9en/AUAcKyRfg10Gc7ye+uQbj/Ds3mW58YxT/YcGdCXD//K/v/1aX8BABxrbM/C70f19qFP5W3f7Cfd1qkDeuRjWwDYGOfrQOclcYuIbR6IElAA4zPOdyItlbcNbV7OtPlSqPmntQHliSMAJ9I0oFu5XNt6L3z5HH7/qZ2rTz6vIw3o0/4CADhW26sx2Zdy3t765HnxmPDZ/7X/ls7tp9xv7H95VBjQp/wFAHCstgEtX3k8eOf5jcn2C5tulDderku2deGmzfNM2oA+5S8AgGM1viL9veUVlQ9dkf7gC5Grq9VvSrZ8F9GZX6+/h9LmvZfCgD7lLwCAY435eyJd3X42fPtp8lUbxQF98i8AgGO1Duih78q5c/g6crcn28+Mz36++b+dWV2wUxzQJ/8CADhW84AufPnz5Sfvz7xovy/89lVBl/60vN7x+lrIc31An/gLAOBYYwgoAIREQAGgEgEFgEoEFAAqEVAAqERAAaASAQWASgQUACoRUACoREABoBIBBYBKBBQAKhFQAKhEQAGgEgEFgEoEFAAqEVAAqNQwoP8HEtyT6MRIVEzFCGh43JPoxEhUTMUIaHjck+jESFRMxQhoeNyT6MRIVEzFCGh43JPoxEhUTMUIaHjck+jESFRMxQhoeNyT6MRIVEzFCGh43JPoxEhUTMUIaHjck+jESFRMxQhoeNyT6MRIVEzFCGh43JPoxEhUTMUIaHjck+jESFRMxQhoeNyT6MRIVEzFCGh43JPoxEhUTMUIaHjck+jESFRMxQhoeNyT6MRIVEzFCGh43JPoxEhUTMUIaHjck+jESFRMxQhoeNyT6MRIVEzFCGh43JPoxEhUTMUIaHjck+jESFRMxQhoeNyT6MRIVEzFCGh43JPoxEhUTMUIaHjck+jESFRMxQhoeNyT6MRIVEzFCGh43JPoxEhUTMUIaHjck+jESFRMxQhoeNyT6MRIVEzFCGh43JPoxEhUTMUIaHjck+jESFRMxQhoeNyT6MRIVEzFCGh43JPoxEhUTMUIaHjck+jESFRMxQhoeNyT6MRIVEzFCGh43JPoxEhUTMUIaHjck+jESFRMxQhoeNyT6MRIVEzFUgX0/+I7RL+fxAioiqkYAUVQ+v0kRkBVTMUIKILS7ycxAqpiKkZAEZR+P4kRUBVTMQKKoPT7SYyAqpiKEVAEpd9PYgRUxVSMgCIo/X4SI6AqpmIEFEHp95MYAVUxFSOgCEq/n8QIqIqpGAFFUPr9JEZAVUzFCCiC0u8nMQKqYipGQBGUfj+JEVAVUzECiqD0+0mMgKqYihFQBKXfT2IEVMVUjIAiKP1+EiOgKqZiBBRB6feTGAFVMRUjoAhKv5/ECKiKqRgBRVD6/SRGQFVMxQgogtLvJzECqmIqRkARlH4/iRFQFVMxAoqg9PtJjICqmIoRUASl309iBFTFVIyAIij9fhIjoCqmYgQUQen3kxgBVTEVI6AISr+fxAioiqkYAUVQ+v0kRkBVTMUIKILS7ycxAqpiKkZAEZR+P4kRUBVTMQKKoPT7SYyAqpiKEVAEpd9PYgRUxVSMgCIo/X4SI6AqpmKnDeiji6+tf/b4yt50+u71rg8IKDT0+0mMgKqIA3pt+tqmpNOlV744/gMCChH9fhIjoCrSgD6+Nt0E9Nr0/PX5g8vT87eO/YCAQkS/n8QIqIoyoP/2wXQT0Pt75RHmo4vnPjnuAwIKFf1+EiOgKsKA3pxO3/vzOqA39398/7gPCChU9PtJjICqKAP66j/O76zzeG36YfmxfHz0BwQUKvr9JEZAVYQB3cri48vrT9Dv752/dfQHq3/m+ZVT/s1P0fpIw5N+P8BJEVAEpd8PcFL6gL7yxdEfHPpH9Y+uWx9peNLvJzE+hVcZPKDdj0AJKAT0+0mMgKoQUOSg309iBFRlmIDyLDy86feTGAFVGSigm1d5rl/6edQHBBQq+v0kRkBVBgoo70SCM/1+EiOgKgMF9PHl6av773g/+gMCChX9fhIjoCoDBXT+YPuaS0d/QEAhot9PYgRUZaiAzh9cWVTy3VtdHxBQaOj3kxgBVREH9BT0t631kYYn/X4SI6AqpmIEFEHp95MYAVUxFSOgCEq/n8QIqIqpGAFFUPr9JEZAVUzFCCiC0u8nMQKqYipGQBGUfj+JEVAVUzECiqD0+0mMgKqYihFQBKXfT2IEVMVUjIAiKP1+EiOgKqZiBBRB6feTGAFVMRUjoAhKv5/ECKiKqRgBRVD6/SRGQFVMxQgogtLvJzECqmIqRkARlH4/iRFQFVMxAoqg9PtJjICqmIoRUASl309iBFTFVIyAIij9fhIjoCqmYgQUQen3kxgBVTEVI6AISr+fxAioiqkYAUVQ+v0kRkBVTMUIKILS7ycxAqpiKkZAEZR+P4kRUBVTMQKKoPT7SYyAqpiKEVAEpd9PYgRUxVSMgCIo/X4SI6AqpmIEFEHp95MYAVUxFSOgCEq/n8QIqIqpGAFFUPr9JEZAVUzFCCiC0u8nMQKqYipGQBGUfj+JEVAVUzECiqD0+0mMgKqYihFQBKXfT2IEVMVUjIAiKP1+EiOgKqZiBBRB6feTGAFVMRUjoAhKv5/ECKiKqRgBRVD6/SRGQFVMxQgogtLvJzECqmIqRkARlH4/iRFQFVMxAoqg9PtJjICqmIoRUASl309iBFTFVIyAIij9fhIjoCqmYgQUQen3kxgBVTEVI6AISr+fxAioiqkYAUVQ+v0kRkBVTMUIKILS7ycxAqpiKkZAEZR+P4kRUBVTMQKKoPT7SYyAqpiKEVAEpd9PYgRUxVSMgCIo/X4SI6AqpmIEFEHp95MYAVUxFSOgCEq/n8QIqIqpGAFFUPr9JEZAVUzFCCiC0u8nMQKqYipGQBGUfj+JEVAVUzECiqD0+0mMgKqYihFQBKXfT2IEVMVUjIAiKP1+EiOgKqZiBBRB6feTGAFVMRUjoAhKv5/ECKiKqRgBRVD6/SRGQFVMxQgogtLvJzECqmIqRkARlH4/iRFQFVMxAoqg9PtJjICqmIoRUASl309iBFTFVIyAIij9fhIjoCqmYgQUQen3kxgBVTEVI6AISr+fxAioiqkYAUVQ+v0kRkBVTMUIKILS7ycxAqpiKkZAEZR+P4kRUBVTMQKKoPT7SYyAqpiKEVAEpd9PYgRUxVSMgCIo/X4SI6AqpmIEFEHp95MYAVUxFSOgCEq/n8QIqIqpGAFFUPr9JEZAVUzFCCiC0u8nMQKqYipGQBGUfj+JEVAVU7GGAdVrfaThqfXaAB6BIiz9fhLjEaiKqRgBRVD6/SRGQFVMxQgogtLvJzECqmIqRkARlH4/iRFQFVMxAoqg9PtJjICqmIoRUASl309iBFTFVIyAIij9fhIjoCqmYgQUQen3kxgBVTEVI6AISr+fxAioiqkYAUVQ+v0kRkBVTMUIKILS7ycxAqpiKkZAEZR+P4kRUBVTMQKKoPT7SYyAqpiKEVAEpd9PYgRUxVSMgCIo/X4SI6AqpmIEFEHp95MYAVUxFSOgCEq/n8QIqIqpGAFFUPr9JEZAVUzFCCiC0u8nMQKqYipGQBGUfj+JEVAVUzECiqD0+0mMgKqYihFQBKXfT2IEVMVUjIAiKP1+EiOgKqZiBBRB6feTGAFVMRUjoAhKv5/ECKiKqRgBRVD6/SRGQFVMxQgogtLvJzECqmIqRkARlH4/iRFQFVMxAoqg9PtJjICqmIoRUASl309iBFTFVIyAIij9fhIjoCqmYgQUQen3kxgBVTEVI6AISr+fxAioiqkYAUVQ+v0kRkBVTMUIKILS7ycxAqpiKkZAEZR+P4kRUBVTMQKKoPT7SYyAqpiKEVAEpd9PYgRUxVSMgCIo/X4SI6AqpmIEFEHp95MYAVUxFSOgCEq/n8QIqIqpGAFFUPr9JEZAVUzFCCiC0u8nMQKqYipGQBGUfj+JEVAVUzECiqD0+0mMgKqYihFQBKXfT2IEVMVUjIAiKP1+EiOgKqZiBBRB6feTGAFVMRUjoAhKv5/ECKiKqRgBRVD6/SRGQFVMxQgogtLvJzECqmIqRkARlH4/iRFQFVMxAoqg9PtJjICqmIoRUASl309iBFTFVIyAIij9fhIjoCqmYgQUQen3kxgBVTEVI6AISr+fxAioiqkYAUVQ+v0kRkBVTMUIKILS7ycxAqpiKkZAEZR+P4kRUBVTMQKKoPT7SYyAqpiKEVAEpd9PYgRUxVSMgCIo/X4SI6AqpmIEFEHp95MYAVUxFSOgCEq/n8QIqIqpGAFFUPr9JEZAVUzFCCiC0u8nMQKqYipGQBGUfj+JEVAVUzECiqD0+0mMgKqYihFQBKXfT2IEVMVUjIAiKP1+EiOgKqZiBBRB6feTGAFVMRUjoAhKv5/ECKiKqRgBRVD6/SRGQFVMxQgogtLvJzECqmIqRkARlH4/iRFQFVMxAoqg9PtJjICqmIoRUASl309iBFTFVIyAIij9fhIjoCqmYgQUQen3kxgBVTEVI6AISr+fxAioiqmYKKCPL083XvliPn908eDni9+8sjedvnudgEJJv5/ECKiKS0Dv720FdF3TVUwJKET0+0mMgKoME9CN+3vnPln8cGf62sGvXZuevz5/cHl6/hYBhY5+P4kRUJVBA7p4IPr+qpnvbzV1/Ti0pJWAQkS/n8QIqMqgAb25epj5+PJWLG+uH43e3IoqAcWp6feTGAFVGTKgjy5OP1z9eP53H0ynP72+/ODa6tcOf1pPQHFa+v0kRkBVhgzo5sHm5jmkZTr3H43e39t8EfT5FeXfvNL6SMOTfj/ASSkDuv9lzjvT6Xu35n+5Ml18TEAxDP1+gJNSBvTO5on2zSPR5XNJWwE1L2TSP7pufaThSb+fxPgUXmW4gD6+vP5q56GiPuURKAGFgH4/iRFQleEC+sRDzPIrBBTD0O8nMQKqMlxAn3iafdVMnoXHIPT7SYyAqgwX0P1Xz+9/Ll+auXn9J68DhZR+P4kRUJXBArr16vlrqwebq5DyTiQMQr+fxAioymABfXRx/0ug9/eWL2N68EF5Vn6R0Vd5Lzzk9PtJjICqDBbQ7SeJbq4vxnR9+cEDrsaEAej3kxgBVRksoHe2H2I++Nl0eu699ccPriz6+e4t+w/ob1vrIw1P+v0kRkBVBgvoielvW+sjDU/6/SRGQFVMxQgogtLvJzECqmIqRkARlH4/iRFQFVMxAoqg9PtJjICqmIoRUASl309iBFTFVKwjoLM/fvY5AcUY6feTGAFV6RvQe//pm/n84euTyeTMLwgoxke/n8QIqErPgN6YfO+38/nVydLyZwQUI6PfT2IEVKVfQG+XbN7dnTz7zb0Lk5cJKEZHv5/ECKhKv4BeXZRzmdGdXyz/d/lzAopx0e8nMQKq0iugs0vLcq4z+vDCMJ/D629b6yMNT/r9JEZAVXoFdNXMhxcmz80JKMZJv5/ECKjKCQJ6d3fyDgHFSOn3kxgBVekV0NWn8DfKl0D5GihGSb+fxAioSq+Azq9Onls+/b4sJ8/CY5T0+0mMgKr0C+jt8gLQxWfws59PVo9DCSjGRb+fxAioSr+ALj59X3iuPJG0884g/SSgOBX9fhIjoCo9Azq/99FPPl788PBHP/jNMP0koDgV/X4SI6AqfQM6PP1ta32k4Um/n8QIqIqp2LEBnX09YD8JKE5Fv5/ECKiKqdjRAf3yx8v3wz/80VuDvIaJgOKU9PtJjICq9Azo7NPVdZgeXpicGeZiTAQUp6LfT2IEVKVnQK9OJmf+evd7v5393WSg19ETUJyKfj+JEVCVfgG9PZm8vX4P5x9Wb+gkoBgX/X4SI6Aq/QJ6dfnuo/Wb4G+US4oQUIyLfj+JEVCVXgFdvRd+HdC7u1xMBOOj309iBFSlV0A3l7Mr5eRqTBgj/X4SI6AqBBQ56PeTGAFV6RXQ2aXlE0frcnI5O4yRfj+JEVCVXgFdPXG0CugipjyJhPHR7ycxAqrSL6B3dycvfVMCeu91LmeHMdLvJzECqtIvoOVydmd3d178/uLHYa6nTEBxKvr9JEZAVXoGdP773cnaQP0koDgV/X4SI6AqfQM6//ZXZxf1fGawy4ESUJyKfj+JEVCV3gEdnP62tT7S8KTfT2IEVMVUjOuBIij9fhIjoCqmYlwPFEHp95MYAVXpGVCuB4qR0+8nMQKq0jOgXA8UI6ffT2IEVKVfQLkeKMZOv5/ECKhKv4ByPVCMnX4/iRFQlV4B5XqgGD39fhIjoCq9Asrl7DB6+v0kRkBVCChy0O8nMQKq0iugXA8Uo6ffT2IEVKVXQLkeKEZPv5/ECKhKv4ByPVCMnX4/iRFQlX4B5XqgGDv9fhIjoCo9A8r1QDFy+v0kRkBV+gaU64Fi3PT7SYyAqvQO6OD0t631kYYn/X4SI6AqpmIEFEHp95MYAVUxFTvihfQ/emnQaykTUJyafj+JEVCVfgG9MJk8M9iVlAkoBPT7SYyAqvQK6OpyypMzHw/ZUP1ta32k4Um/n8QIqEqvgC786celoS98TEAxSvr9JEZAVfoGdL76rkgLQ72QSX/bWh9peNLvJzECqnKCgC4+lf/y9WVCd94a4ikl/W1rfaThSb+fxAioyokCuvDtz8tbkl7QPwzV37bWRxqe9PtJjICqnCigs199f/OGzslLBBRjot9PYgRUpX9AN/VcPhf/7af698Trb1vrIw1P+v0kRkBVegZ0/dXPg1eD6i+rrL9trY80POn3kxgBVekV0NmliX3ySP+NPfS3rfWRhif9fhIjoCq9Arp8J9LO4ZcvPbzAI1CMiX4/iRFQlZ4B/cGvzS/NPle/lEl/21ofaXjS7ycxAqrSK6Au9Let9ZGGJ/1+EiOgKqZiBBRB6feTGAFVMRXruCL9ztlB3oREQHFq+v0kRkBV+gb0xv4r6PmeSBgj/X4SI6AqPQO67OczL775Bt+VEyOl309iBFSlX0Dv7k6eXb2K6d4lvi88xki/n8QIqEq/gF49eN/R7NLkOQKK0dHvJzECqtIroLNLW4867+6qX0JPQHF6+v0kRkBVegX00Ps29W/iJKA4Pf1+EiOgKgQUOej3kxgBVekV0NmlyTv7H+ivw0RAcXr6/SRGQFV6BZQnkTB6+v0kRkBV+gX07u7kzOpyIn96nZcxYYz0+0mMgKr0C+jqjUhnz54d8q1Icq2PNDy1XhtwzFs5/7C7fifnztsD/dX6/zi0PtLwpN9PYjwCVekb0PnsyzcWj0Bf/HiQJ5AIKE5Lv5/ECKhK74AOTn/bWh9peNLvJzECqmIqRkARlH4/iRFQFVMxG9DZR28+6Se8DhSjo99PYgRUpSOgy28n9wTeiYTx0e8nMQKqQkCRg34/iRFQlY6AOtLfttZHGp70+0mMgKqYihFQBKXfT2IEVMVU7PiAfjVcPgkoTke/n8QIqIqp2NEB/fLH5X1IP/gNAcUY6feTGAFV6RnQ2aX9p5BeGui9SPrb1vpIw5N+P4kRUJV+AV32c+fFf/jsn97YnQx0NTsCilPR7ycxAqrSL6A3JpMfrh54zn452bq4MgHFWOj3kxgBVekV0MUD0INr2F3lgsoYIf1+EiOgKr0C+vDCoe/KyQvpMT76/SRGQFV6BpRvKoeR0+8nMQKq0iugfF94jJ5+P4kRUJVeAZ3f2Pq65w2+BooR0u8nMQKq0i+gs0v7L/+8MdC1RAgoTkW/n8QIqEqvgM4+Wr7+88W3Pvvn5Y8vDHNVUP1ta32k4Um/n8QIqEqvgLpc1E5/21ofaXjS7ycxAqpCQJGDfj+JEVCVXgF1ob9trY80POn3kxgBVTEVI6AISr+fxAioiqkYAUVQ+v0kRkBVTMWODugfP9v3OS+kx+jo95MYAVXpGdDf7/JN5TBq+v0kRkBV+gX0Nt+VEyOn309iBFSlV0BnlyY7H3+17+sh+klAcSr6/SRGQFV6BfThhYEuokxAoaLfT2IEVKVnQAd6/zsBhYp+P4kRUJVeAZ1dIqAYOf1+EiOgKr0COr/Bp/AYOf1+EiOgKv0Ceuh7ehBQjJB+P4kRUJV+AZ3fuzA58+aG+kJ2BBSnp99PYgRUpWdAP+V1oBg3/X4SI6Aq/QJ6gxfSY+T0+0mMgKr0Cmh5If0gn7cTUIjo95MYAVXpFVCP55AIKE5Fv5/ECKhKz4DyOlCMnH4/iRFQlV4B5YX0GD39fhIjoCq9Ajq/MXmZgGLU9PtJjICq9Avo7NLO2wQUY6bfT2IEVKVXQGcfvTGZ7LzIC+kxXvr9JEZAVXoF1HxbY14HivHR7ycxAqpCQJGDfj+JEVCVXgF1ob9trY80POn3kxgBVTEVI6AISr+fxAioiqkYAUVQ+v0kRkBVTMVsQGd/tN8F/uGPz77A10AxOvr9JEZAVToC+vDC6imj2UebFy9tfoWAYlT0+0mMgKr0DOhBNgkoRkm/n8QIqAoBRQ76/SRGQFUIKHLQ7ycxAqpCQJGDfj+JEVAVAooc9PtJjICqEFDkoN9PYgRUhYAiB/1+EiOgKgQUOej3kxgBVSGgyEG/n8QIqAoBRQ76/SRGQFUIKHLQ7ycxAqrSHdAnEVCMj34/iRFQFQKKHPT7SYyAqnQEdPbRm0/im8phfPT7SYyAqnQE1JH+trU+0vCk309iBFTFVIyAIij9fhIjoCqmYgQUQen3kxgBVTEVI6AISr+fxAioiqkYAUVQ+v0kRkBVTMUIKILS7ycxAqpiKkZAEZR+P4kRUBVTMQKKoPT7SYyAqpiKEVAEpd9PYgRUxVTsiXciXdr5xeKHb78moBg3/X4SI6AqHQF9eGH5xvfV/xJQjJh+P4kRUJXOgC4fgRJQjJ5+P4kRUJWOgM4uTZ79/Ks/Xfjer786MMzn8/rb1vpIw5N+P4kRUJWOgM5vcDk7hKDfT2IEVKUroLNP6wL66OK0eOWL5UePr+xNp+9eX/3WoQ8IKDT0+0mMgKp0BXSR0K8+++fdnX/47MDnPa4Hen9vK6Drmq5ieugDAgoR/X4SI6Aq3QGdVz2JdGf62sEH16bnr88fXJ6ev2U/IKAQ0e8nMQKq0iugs49OfBH6a9P3939+f2/9OPTcJ+YDAgoV/X4SI6AqvQJ6co8vb/Xx5vrR6M1lVA99QEChot9PYgRUpXdAv/3V2clk5+xb/V7D9Oji+d99MJ3+9Pryg2vTD8svlk/rD31AQKGi309iBFSlb0APXs70cp+Abp5DWtZy/9Ho/b3ztw59sPr/Pr/S5489mdZHGp70+wFO6qiALvv5zItvvvH9ngW9M52+d2v+lyvTRS4JKBzo9wOc1BEBvbs7efY35Wf3Lk3K5UU6bL7SuXwuaauZr3xx6IND/4j+0XXrIw1P+v0kxqfwKv0CenXy7OZp+NmlyXPdAd24MzUPOp/yCJSAQkC/n8QIqEqvgK4vardyd/fZ/q9pMg86CSiGot9PYgRUpVdAD72Q/kSvqi+Z5Fl4DE+/n8QIqMowAX18eTuTm5d8rl8HuvUBAYWKfj+JEVCVXgGdXZq8s//B7UmPT+GvrR5frkLKO5EwPP1+EiOgKr0CevInke7vLV/G9OCD8o73RUZf3X/7+6EPCChU9PtJjICq9Avo3d3JmV+Xn/3p9V4vY1p8hr665tL15QcPti/A9ICrMWEA+v0kRkBV+gV09Uaks2fP9n4r0vzBz6bTc++tH2U+uLJI5rtP+4CAQkO/n8QIqErPgM7/sLt+J+fO2736eXL629b6SMOTfj+JEVCVvgGdz758Y/EI9MWPT3pdOwIKF/r9JEZAVXoHdHD629b6SMOTfj+JEVAVUzECiqD0+0mMgKqYihFQBKXfT2IEVMVUjIAiKP1+EiOgKqZiBBRB6feTGAFVMRUjoAhKv5/ECKiKqRgBRVD6/SRGQFVMxQgogtLvJzECqmIqRkARlH4/iRFQFVOxo67G9IPfEFCMmn4/iRFQlV4BfXhh63qgBBRjpN9PYgRUpWdAT/BdPAgoWtDvJzECqtIroIe+qRwBxRjp95MYAVXpFdD5jc23hSegGCn9fhIjoCr9AvrtLyeTZ158c+0ng1zSTn/bWh9peJuln3QAABwGSURBVNLvJzECqtIroA8vTLYN8wVR/W1rfaThSb+fxAioCgFFDvr9JEZAVXoF1IX+trU+0vCk309iBFTFVIyAIij9fhIjoCqmYscGdPb1gP0koDgV/X4SI6AqpmJHB/TLHy+/+PnwR28N9V3l9Let9ZGGJ/1+EiOgKj0DOvt09ezRwwuTMwO9KUl/21ofaXjS7ycxAqrSM6BXJ5Mzf737vd/O/m4yeXaYx6D629b6SMOTfj+JEVCVfgG9PZm8vX5H/B92B7qwiP62tT7S8KTfT2IEVKVfQK9OXt6/pMiNyXMEFKOj309iBFSlV0BXFxNZB/TuLi+kx/jo95MYAVXpFdBVOtcBHeradvrb1vpIw5N+P4kRUBUCihz0+0mMgKr0Cujs0vKJo3U5bw/0NLz+trU+0vCk309iBFSlV0BXTxytArqIKU8iYXz0+0mMgKr0C+jd3clL35SA3nt9MtDV6fW3rfWRhif9fhIjoCr9Arp4CDqZnN3defH7ix9fHqSfBBSnot9PYgRUpWdA57/f3VwNdKB+ElCcin4/iRFQlb4BnX/7q7OLej4z3DeI19+21kcanvT7SYyAqvQO6OD0t631kYYn/X4SI6AqpmLHXw/0qwH7SUBxKvr9JEZAVUzFjr8e6AKfwmOc9PtJjICq9Azo7NL+t5R7aaArKutvW+sjDU/6/SRGQFX6BXTZz50X//Nn//TGoqDDvI6egOJU9PtJjICq9Avo7f1XL81+OeF6oBgh/X4SI6AqvQK6eAB68OrPq7yVEyOk309iBFSlV0AfXth6+ybXA8UY6feTGAFV6RnQrWZyOTuMkX4/iRFQlV4BXV2Rfu3uLpezw/jo95MYAVXpFdBD3wfpxkDvhtffttZHGp70+0mMgKr0C+jDC5MffrPp5zCfwRNQnIp+P4kRUJWOgM4+erN4Y/U60H9+c3cyefEnfAqP0dHvJzECqtIR0MVDzyfxJBLGR7+fxAioCgFFDpUj+X/4DpH2pegIqCP9bWt9pOGpciStjzQ8SftSmIoRUARVOZLWRxqepH0pTMUIKIKqHEnrIw1P0r4UpmJHB/SPn+37nGfhMTqVI2l9pOFJ2peiZ0APvqccTyJhlCpH0vpIw5O0L0W/gN7mWXiMXOVIWh9peJL2pegV0Nmlyc7HX+37eoh+ElCcSuVIWh9peJL2pegV0IcXBrqIMgGFSuVIWh9peJL2pegZ0IHe/05AoVI5ktZHGp6kfSl6BXR2iYBi5CpH0vpIw5O0L0WvgM5v8Ck8Rq5yJK2PNDxJ+1L0C+ih7+lBQDFClSNpfaThSdqXol9A5/cuTM68ucHl7DA+lSNpfaThSdqXomdAP+V1oBi3ypG0PtLwJO1L0S+gN3ghPUauciStjzQ8SftS9ApoeSH9IJ+3E1CIVI6k9ZGGJ2lfil4B9XgOiYDiVCpH0vpIw5O0L0XPgPI6UIxc5UhaH2l4kval6BVQXkiP0ascSesjDU/SvhS9AjrY94InoFCpHEnrIw1P0r4U/QI6u7TzNgHFmFWOpPWRhidpX4peAZ19VL4vPC+kx3hVjqT1kYYnaV+KXgE139yY14FifCpH0vpIw5O0LwUBRQ6VI2l9pOFJ2peiV0Bd6G9b6yMNT5UjaX2k4Unal8JUjIAiqMqRtD7S8CTtS2EqRkARVOVIWh9peJL2pTAVOyKg3361jW8qh/GpHEnrIw1P0r4UvQLq8iSSXusjDU+VI2l9pOFJ2pen4Vl4BFU5ktZHGp6kfSl6BXT2x8/W/v71yc4/fM4L6TE6lSNpfaThSdqXoldAt93dfXaYK4Pqb1vrIw1PlSNpfaThSdqX4sQBHezCIvrb1vpIw1PlSFofaXiS9qU4eUCHegiqv22tjzQ8VY6k9ZGGJ2lfipMHdKirK+tvW+sjDU+VI2l9pOFJ2pfi5AG9u0tAMT6VI2l9pOFJ2pfixAGdXZ3wKTzGp3IkrY80PEn7UvQK6OyjzaVA33xjd8KTSBihypG0PtLwJO1L0Sugh19Iz8uYMEKVI2l9pOFJ2pfixAF95q2BvkG8/ra1PtLwVDmS1kcanqR9KXoF1IX+trU+0vBUOZLWRxqepH0pTMUIKIKqHEnrIw1P0r4UpmIEFEFVjqT1kYYnaV8KUzECiqAqR9L6SMOTtC+FqZgN6NYLmA7wbY0xPpUjaX2k4Unal6IjoOZKoFwPFGNVOZLWRxqepH0pCChyqBxJ6yMNT9K+FB0Btb7cnfBOJIxR5UhaH2l4kvalOFFAZz9f5PPMbwbpJwHFqVSOpPWRhidpX4qTBPQPi4efO0O9EYmA4lQqR9L6SMOTtC9F/4AO+vCTgOKUKkfS+kjDk7QvRe+Aloef/26wfBJQnE7lSFofaXiS9qXoGdB7Az/8JKA4pcqRtD7S8CTtS9EvoIM//CSgOKXKkbQ+0vAk7UvRJ6D3Li2vAjrow08CilOqHEnrIw1P0r4UPQJaHn6+PXA+CShOp3IkrY80PEn7UnQG1OfhJwHFKVWOpPWRhidpX4qugP7e5+EnAcUpVY6k9ZGGJ2lfio6A8l54BFE5ktZHGp6kfSkIKHKoHEnrIw1P0r4UHQHleqAIonIkrY80PEn7UnQE1JH+trU+0vBUOZLWRxqepH0pTMUIKIKqHEnrIw1P0r4UpmIEFEFVjqT1kYYnaV8KUzECiqAqR9L6SMOTtC+FqRgBRVCVI2l9pOFJ2pfCVIyAIqjKkbQ+0vAk7UthKkZAEVTlSFofaXiS9qUwFSOgCKpyJK2PNDxJ+1KYihFQBFU5ktZHGp6kfSlMxQgogqocSesjDU/SvhSmYgQUQVWOpPWRhidpXwpTMQKKoCpH0vpIw5O0L4WpGAFFUJUjaX2k4Unal8JUjIAiqMqRtD7S8CTtS2EqRkARVOVIWh9peJL2pTAVI6AIqnIkrY80PEn7UpiKEVAEVTmS1kcanqR9KUzFCCiCqhxJ6yMNT9K+FKZiBBRBVY6k9ZGGJ2lfClMxAoqgKkfS+kjDk7QvhakYAUVQlSNpfaThSdqXwlSMgCKoypG0PtLwJO1LYSpGQBFU5UhaH2l4kvalMBUjoAiqciStjzQ8SftSmIoRUARVOZLWRxqepH0pTMUIKIKqHEnrIw1P0r4UpmIEFEFVjqT1kYYnaV8KUzECiqAqR9L6SMOTtC+FqRgBRVCVI2l9pOFJ2pfCVIyAIqjKkbQ+0vAk7UthKkZAEVTlSFofaXiS9qUwFSOgCKpyJK2PNDxJ+1KYihFQBFU5ktZHGp6kfSlMxQgogqocSesjDU/SvhSmYgQUQVWOpPWRhidpXwpTMQKKoCpH0vpIw5O0L4WpGAFFUJUjaX2k4Unal8JUjIAiqMqRtD7S8CTtS2EqRkARVOVIWh9peJL2pTAVI6AIqnIkrY80PEn7UpiKEVAEVTmS1kcanqR9KUzFCCiCqhxJ6yMNT9K+FKZiBBRBVY6k9ZGGJ2lfClMxAoqgKkfS+kjDk7QvhakYAUVQlSNpfaThSdqXwlSMgCKoypG0PtLwJO1LYSpGQBFU5UhaH2l4kvalMBUjoAiqciStjzQ8SftSmIrpAvpvP5tOz717vfz80cVp8coXy48eX9mbTte/Q0AhUjmS1kcanqR9KYYK6L+sknnuk+UH9/e2Arqu6SqmBBQilSNpfaThSdqXYqCA3pme+9v5/MHlVSfvTF87+K1r0/PXl79z/hYBhU7lSFofaXiS9qUYJqCPL08/XP64eLT5YWnm+/u/dX9v/Th09eCUgEKjciStjzQ8SftSDBPQRxfXn6GXdD6+vBXLm+tHoze3okpAcWqVI2l9pOFJ2pdimIDuKwF9dPH87z6YTn96ffUr5bHp4U/rCShOq3IkrY80PEn7Ugwb0NUn6pvnkJbp3H80en9v80XQ51e0f/NS6yMNT5UjaX2k4Unal6cRB3T1+fqd6fS9W/O/XFk+J09AMYzKkbQ+0vAk7cvTaAN6Z/Uyps2XPZefz28F1LyQSf/ouvWRhqfKkbQ+0vAk7UsxZEDv7J378HBPz996yiNQAgqBypG0PtLwJO1LMWBAb07NK5WWDzoJKIZROZLWRxqepH0phgvov9h+rprJs/AYROVIWh9peJL2pRgqoI+vTV9df41z86r6VTM3r//kdaCQqhxJ6yMNT9K+FEMF9NrWWzWvrR5srkLKO5EwiMqRtD7S8CTtSzFQQG9uv9X9/t7yZUwPPii/tsjoq7wXHnKVI2l9pOFJ2pdimIBurl+38FrJ6eoCTNeXv/eAqzFhAJUjaX2k4Unal2KYgN6ZHgro/MHy4qDvrR9yPriy+OV3b9l/Rn/bWh9peKocSesjDU/SvhTDBLSG/ra1PtLwVDmS1kcanqR9KUzFCCiCqhxJ6yMNT9K+FKZiBBRBVY6k9ZGGJ2lfClMxAoqgKkfS+kjDk7QvhakYAUVQlSNpfaThSdqXwlSMgCKoypG0PtLwJO1LYSpGQBFU5UhaH2l4kvalMBUjoAiqciStjzQ8SftSmIoRUARVOZLWRxqepH0pTMUIKIKqHEnrIw1P0r4UpmIEFEFVjqT1kYYnaV8KUzECiqAqR9L6SMOTtC+FqRgBRVCVI2l9pOFJ2pfCVIyAIqjKkbQ+0vAk7UthKkZAEVTlSFofaXiS9qUwFSOgCKpyJK2PNDxJ+1KYihFQBFU5ktZHGp6kfSlMxQgogqocSesjDU/SvhSmYgQUQVWOpPWRhidpXwpTMQKKoCpH0vpIw5O0L4WpGAFFUJUjaX2k4Unal8JUjIAiqMqRtD7S8CTtS2EqRkARVOVIWh9peJL2pTAVI6AIqnIkrY80PEn7UpiKEVAEVTmS1kcanqR9KUzFCCiCqhxJ6yMNT9K+FKZiBBRBVY6k9ZGGJ2lfClMxAoqgKkfS+kjDk7QvhakYAUVQlSNpfaThSdqXwlSMgCKoypG0PtLwJO1LYSpGQBFU5UhaH2l4kvalMBUjoAiqciStjzQ8SftSmIoRUARVOZLWRxqepH0pTMUIKIKqHEnrIw1P0r4UpmIEFEFVjqT1kYYnaV8KUzECiqAqR9L6SMOTtC+FqRgBRVCVI2l9pOFJ2pfCVIyAIqjKkbQ+0vAk7UthKkZAEVTlSFofaXiS9qUwFSOgCKpyJK2PNDxJ+1KYihFQBFU5ktZHGp6kfSlMxQgogqocSesjDU/SvhSmYgQUQVWOpPWRhidpXwpTMQKKoCpH0vpIw5O0L4WpGAFFUJUjaX2k4Unal8JUjIAiqMqRtD7S8CTtS2EqRkARVOVIWh9peJL2pTAVI6AIqnIkrY80PEn7UpiKEVAEVTmS1kcanqR9KUzFCCiCqhxJ6yMNT9K+FKZiBBRBVY6k9ZGGJ2lfClMxAoqgKkfS+kjDk7QvhakYAUVQlSNpfaThSdqXwlSMgCKoypG0PtLwJO1LYSpGQBFU5UhaH2l4kvalMBUjoAiqciStjzQ8SftSmIoRUARVOZLWRxqepH0pTMUIKIKqHEnrIw1P0r4UpmIEFEFVjqT1kYYnaV8KUzECiqAqR9L6SMOTtC+FqRgBRVCVI2l9pOFJ2pfCVIyAIqjKkbQ+0vAk7UthKkZAEVTlSFofaXiS9qUwFSOgCKpyJK2PNDxJ+1KYihFQBFU5ktZHGp6kfSlMxQgogqocSesjDU/SvhSmYgQUQVWOpPWRhidpXwpTMQKKoCpH0vpIw5O0L4WpGAFFUJUjaX2k4Unal8JUjIAiqMqRtD7S8CTtS2EqRkARVOVIWh9peJL2pTAVI6AIqnIkrY80PEn7UpiKEVAEVTmS1kcanqR9KUzFCCiCqhxJ6yMNT9K+FKZiBBRBVY6k9ZGGJ2lfClMxAoqgKkfS+kjDk7QvhakYAUVQlSNpfaThSdqXwlSMgCKoypG0PtLwJO1LYSpGQBFU5UhaH2l4kvalMBVrGFC91kcanipH0vpIw5O0L0/DI1AEVTmS1kcanqR9KUzFCCiCqhxJ6yMNT9K+FKZiBBRBVY6k9ZGGJ2lfClMxAoqgKkfS+kjDk7QvhakYAUVQlSNpfaThSdqXwlSMgCKoypG0PtLwJO1LYSpGQBFU5UhaH2l4kvalMBUjoAiqciStjzQ8SftSmIoRUARVOZLWRxqepH0pTMUIKIKqHEnrIw1P0r4UpmIEFEFVjqT1kYYnaV8KUzECiqAqR9L6SMOTtC+FqRgBRVCVI2l9pOFJ2pfCVIyAIqjKkbQ+0vAk7UthKkZAEVTlSFofaXiS9qUwFSOgCKpyJK2PNDxJ+1KYihFQBFU5ktZHGp6kfSlMxQgogqocSesjDU/SvhSmYgQUQVWOpPWRhidpXwpTMQKKoCpH0vpIw5O0L4WpGAFFUJUjaX2k4Unal8JUjIAiqMqRtD7S8CTtS2EqRkARVOVIWh9peJL2pTAVI6AIqnIkrY80PEn7UpiKEVAEVTmS1kcanqR9KUzFCCiCqhxJ6yMNT9K+FKZiBBRBVY6k9ZGGJ2lfClMxAoqgKkfS+kjDk7QvhakYAUVQlSNpfaThSdqXwlSMgCKoypG0PtLwJO1LYSpGQBFU5UhaH2l4kvalMBUjoAiqciStjzQ8SftSmIoRUARVOZLWRxqepH0pTMUIKIKqHEnrIw1P0r4UpmIEFEFVjqT1kYYnaV8KUzECiqAqR9L6SMOTtC+FqRgBRVCVI2l9pOFJ2pfCVIyAIqjKkbQ+0vAk7UthKkZAEVTlSFofaXiS9qUwFSOgCKpyJK2PNDxJ+1KYihFQBFU5ktZHGp6kfSlMxQgogqocSesjDU/SvhSmYgQUQVWOpPWRhidpXwpTMQKKoCpH0vpIw5O0L4WpGAFFUJUjaX2k4Unal8JUjIAiqMqRtD7S8CTtS2EqRkARVOVIWh9peJL2pTAVI6AIqnIkrY80PEn7UpiKEVAEVTmS1kcanqR9KUzFCCiCqhxJ6yMNT9K+FKZiBBRBVY6k9ZGGJ2lfClMxAoqgKkfS+kjDk7QvhakYAUVQlSNpfaThSdqXwlSMgCKoypG0PtLwJO1LYSpGQBFU5UhaH2l4kvalMBUjoAiqciStjzQ8SftSmIoRUARVOZLWRxqepH0pTMUIKIKqHEnrIw1P0r4UpmIEFEFVjqT1kYYnaV8KUzECiqAqR9L6SMOTtC+FqRgBRVCVI2l9pOFJ2pfCVIyAIqjKkbQ+0vAk7UthKkZAEVTlSFofaXiS9qUwFSOgCKpyJK2PNDxJ+1KYihFQBFU5ktZHGp6kfSlMxQgogqocSesjDU/SvhSmYgQUQVWOpPWRhidpXwpTMQKKoCpH0vpIw5O0L4WpGAFFUJUjaX2k4Unal8JUjIAiqMqRtD7S8CTtS2EqRkARVOVIWh9peJL2pTAVI6AIqnIkrY80PEn7UpiKEVAEVTmS1kcanqR9KUzFCCiCqhxJ6yMNT9K+FKZiBBRBVY6k9ZGGJ2lfClMxAoqgKkfS+kjDk7QvhakYAUVQlSNpfaThSdqXwlSMgCKoypG0PtLwJO1LYSpGQBFU5UhaH2l4kvalMBUjoAiqciStjzQ8SftSmIp5BPTxlb3p9N3rBBRKlSNpfaThSdqXwj+gjy5Ol175goBCqHIkrY80PEn7UvgH9Nr0/PX5g8vT87cIKHQqR9L6SMOTtC+Fe0Dv75XHno8unvuEgEKnciStjzQ8SftSuAf05vS19Y/vE1DoVI6k9ZGGJ2lfCveAXpt+WH68sw4pAYVE5UhaH2l4kval8A7o48vrT93v722+CPr8iv7van2k4alyJK2PNDxJ+/I0qQIKAJ48A2peyKR/dP3dxD2JToxEpWFAzeuYWt8TWXBPohMjUSGg2XBPohMjUfEOqOez8N9N3JPoxEhU3AO6ef2nw+tAv5u4J9GJkai4B9TxnUjfTdyT6MRIVNwD+vjy9FWn98J/N3FPohMjUXEP6PyB29WYvpu4J9GJkaj4B3T+4Mqin+/esr/c+p7IgnsSnRiJSoOAHqH1PZEF9yQ6MRIVUzECGh73JDoxEhVTMQIaHvckOjESFVMxAhoe9yQ6MRIVUzECGh73JDoxEhVTMQIaHvckOjESFVMxAhoe9yQ6MRIVUzECGh73JDoxEhVTMQIaHvckOjESFVMxAhoe9yQ6MRIVUzECGh73JDoxEhVTMQIaHvckOjESFVMxAhoe9yQ6MRIVUzECGh73JDoxEhVTMQIaHvckOjESFVMxAhoe9yQ6MRIVUzECGh73JDoxEhVTMQIaHvckOjESFVMxAhoe9yQ6MRIVUzECGh73JDoxEhVTMQIaHvckOjESFVMxAhoe9yQ6MRIVUzECGh73JDoxEhVTMQIaHvckOjESFVMxAhoe9yQ6MRIVUzECGh73JDoxEhVTMQIaHvckOjESFVOxhgGFxvPPt/43wOgxkoEQ0PA4G+jESAZCQMPjbKATIxkIAQ2Ps4FOjGQgBDQ8zgY6MZKBENDwOBvoxEgGQkDD42ygEyMZCAEFgEoEFAAqEVAAqERAAaASAQWASgQUACoRUACoREABoBIBDeHRxen7+z995Yum/y4Yk8eXp+dv7f/0w7b/Mt9BBDSERUDPfbL5KQHFgft7m/+23tlPKdwQ0BAWAZ2+tvkpAcWWm9PVIB5d3Pw3Fn4IaAiLw/E368/PCCgO2Xx55+bmP7FwREBDWFTzf+xtHmisfnxwZTqdvnu96b8WxuBO+fLO/fU+FsPYm05/en31858tRvLv/7bhv1x2BDSEZTXXjzDWAb2zOCUL53ja4Dvv8eXlMq6tP0O5vzWM9c95aDocAhrCsprrJ1lXAV0cjXf/9/zxv0z5uhfu75375P7e6hmkxSf0792aP/7X5RdGF4v5D4tf/Lc9RjIYAhpCqebqk7RVQDdf8LrGowssVnD+v6wjuRnGzen7PK3kgICGsKpmqWX56f5L/njpCrZfpPH48rqZy0eki5W8+j9b/nt9BxDQEFYBLY8oyk/3H1vwnDzmy/+OrmewaObG4lduLn989b/yn9jhENAQNs8cLR5vrgO6PjAEFPPV483yk+Vj0YOAzv/8N+Wn75HQoRDQEDadvDZ9n0egeMJWQM2XPR//9+Urmd5/2j8EAQIawqaTi/Px3/gaKKz9gD7t/fCP/5WRDIaAhrD/QPPO9K/2eBYexn5AF8NY/Wz5X9bNa+sPfhdqBDSEg8/Ur62+uLV6HehfrvA6UMy3E/no4vT89fn8z3uLR6LLKzUtfv7gMv+VHQwBDeEgoIty8k4kGFuPMdfDmL43P3gn0qt8nXwoBDSEreeKNhff4b3w2Lf9SfrqvfD/ePDzv/qPfAI/GAIKAJUIKABUIqAAUImAAkAlAgoAlQgoAFQioABQiYACQCUCCgCVCCgAVCKgAFCJgAJAJQIKAJUIKABUIqAAUImAAkAlAgoAlQgoAFQioABQiYACQCUCCgCVCCgAVCKgAFCJgAJAJQIKAJUIKABUIqAAUImAAkAlAgoAlQgoAFQioABQiYACQCUCCgCVCCgAVCKgAFCJgAJAJQIKAJUIKABUIqAAUImAAkAlAgoAlQgoAFQioABQiYACQCUCCgCVCCgAVCKgAFCJgAJAJQIKAJUIKABUIqAAUOn/A71FEGOQyBlxAAAAAElFTkSuQmCC">
+            <a:extLst>
+              <a:ext uri="{FF2B5EF4-FFF2-40B4-BE49-F238E27FC236}">
+                <a16:creationId xmlns="" xmlns:a16="http://schemas.microsoft.com/office/drawing/2014/main" id="{303DEEFB-7094-4F9F-A65F-D2AFDD19F5FE}"/>
+              </a:ext>
+            </a:extLst>
+          </p:cNvPr>
+          <p:cNvSpPr>
+            <a:spLocks noChangeAspect="1" noChangeArrowheads="1"/>
+          </p:cNvSpPr>
+          <p:nvPr/>
+        </p:nvSpPr>
+        <p:spPr bwMode="auto">
+          <a:xfrm>
+            <a:off x="5943600" y="3276600"/>
+            <a:ext cx="304800" cy="304800"/>
+          </a:xfrm>
+          <a:prstGeom prst="rect">
+            <a:avLst/>
+          </a:prstGeom>
+          <a:noFill/>
+          <a:extLst>
+            <a:ext uri="{909E8E84-426E-40DD-AFC4-6F175D3DCCD1}">
+              <a14:hiddenFill xmlns:a14="http://schemas.microsoft.com/office/drawing/2010/main">
+                <a:solidFill>
+                  <a:srgbClr val="FFFFFF"/>
+                </a:solidFill>
+              </a14:hiddenFill>
+            </a:ext>
+          </a:extLst>
+        </p:spPr>
+        <p:txBody>
+          <a:bodyPr vert="horz" wrap="square" lIns="91440" tIns="45720" rIns="91440" bIns="45720" numCol="1" anchor="t" anchorCtr="0" compatLnSpc="1">
+            <a:prstTxWarp prst="textNoShape">
+              <a:avLst/>
+            </a:prstTxWarp>
+          </a:bodyPr>
+          <a:lstStyle/>
+          <a:p>
+            <a:endParaRPr lang="en-US"/>
           </a:p>
         </p:txBody>
       </p:sp>
     </p:spTree>
     <p:extLst>
       <p:ext uri="{BB962C8B-B14F-4D97-AF65-F5344CB8AC3E}">
-        <p14:creationId xmlns:p14="http://schemas.microsoft.com/office/powerpoint/2010/main" val="1166549020"/>
+        <p14:creationId xmlns:p14="http://schemas.microsoft.com/office/powerpoint/2010/main" val="2186280307"/>
       </p:ext>
     </p:extLst>
   </p:cSld>
@@ -6139,176 +6368,67 @@
       </p:grpSpPr>
       <p:sp>
         <p:nvSpPr>
-          <p:cNvPr id="2" name="Title 1"/>
-          <p:cNvSpPr>
-            <a:spLocks noGrp="1"/>
-          </p:cNvSpPr>
-          <p:nvPr>
-            <p:ph type="title"/>
-          </p:nvPr>
-        </p:nvSpPr>
-        <p:spPr>
-          <a:xfrm>
-            <a:off x="557211" y="342900"/>
-            <a:ext cx="8534401" cy="685800"/>
-          </a:xfrm>
-        </p:spPr>
-        <p:txBody>
-          <a:bodyPr/>
-          <a:lstStyle/>
-          <a:p>
-            <a:r>
-              <a:rPr lang="en-US"/>
-              <a:t>How to mitigate attrition</a:t>
-            </a:r>
-            <a:endParaRPr lang="en-US" dirty="0"/>
-          </a:p>
-        </p:txBody>
-      </p:sp>
-      <p:sp>
-        <p:nvSpPr>
-          <p:cNvPr id="3" name="Text Placeholder 2"/>
-          <p:cNvSpPr>
-            <a:spLocks noGrp="1"/>
-          </p:cNvSpPr>
-          <p:nvPr>
-            <p:ph type="body" idx="1"/>
-          </p:nvPr>
-        </p:nvSpPr>
-        <p:spPr>
-          <a:xfrm>
-            <a:off x="684213" y="1193800"/>
-            <a:ext cx="8534400" cy="4800600"/>
-          </a:xfrm>
-        </p:spPr>
-        <p:txBody>
-          <a:bodyPr/>
-          <a:lstStyle/>
-          <a:p>
-            <a:r>
-              <a:rPr lang="en-US" b="1" dirty="0">
-                <a:solidFill>
-                  <a:srgbClr val="FF0000"/>
-                </a:solidFill>
-              </a:rPr>
-              <a:t>**Content in Progress (by Jodi) – feel free to add.  I will finalize Monday morning!</a:t>
-            </a:r>
-          </a:p>
-          <a:p>
-            <a:endParaRPr lang="en-US" dirty="0"/>
-          </a:p>
-          <a:p>
-            <a:pPr marL="285750" indent="-285750">
-              <a:buFont typeface="Arial" panose="020B0604020202020204" pitchFamily="34" charset="0"/>
-              <a:buChar char="•"/>
-            </a:pPr>
-            <a:r>
-              <a:rPr lang="en-US" dirty="0">
-                <a:solidFill>
-                  <a:schemeClr val="tx1"/>
-                </a:solidFill>
-              </a:rPr>
-              <a:t>We recommend that the HR team further review…….</a:t>
-            </a:r>
-          </a:p>
-          <a:p>
-            <a:pPr marL="742950" lvl="1" indent="-285750">
-              <a:buFont typeface="Arial" panose="020B0604020202020204" pitchFamily="34" charset="0"/>
-              <a:buChar char="•"/>
-            </a:pPr>
-            <a:r>
-              <a:rPr lang="en-US" dirty="0"/>
-              <a:t>Stock Options…</a:t>
-            </a:r>
-          </a:p>
-          <a:p>
-            <a:pPr marL="742950" lvl="1" indent="-285750">
-              <a:buFont typeface="Arial" panose="020B0604020202020204" pitchFamily="34" charset="0"/>
-              <a:buChar char="•"/>
-            </a:pPr>
-            <a:r>
-              <a:rPr lang="en-US" dirty="0"/>
-              <a:t>Job Role…</a:t>
-            </a:r>
-          </a:p>
-          <a:p>
-            <a:pPr marL="742950" lvl="1" indent="-285750">
-              <a:buFont typeface="Arial" panose="020B0604020202020204" pitchFamily="34" charset="0"/>
-              <a:buChar char="•"/>
-            </a:pPr>
-            <a:r>
-              <a:rPr lang="en-US" dirty="0"/>
-              <a:t>Overtime…</a:t>
-            </a:r>
-          </a:p>
-          <a:p>
-            <a:r>
-              <a:rPr lang="en-US" dirty="0"/>
-              <a:t>Make sure this conclusion and the conclusion in the </a:t>
-            </a:r>
-            <a:r>
-              <a:rPr lang="en-US" dirty="0" err="1"/>
-              <a:t>rmd</a:t>
-            </a:r>
-            <a:r>
-              <a:rPr lang="en-US" dirty="0"/>
-              <a:t> match.</a:t>
-            </a:r>
-          </a:p>
-          <a:p>
-            <a:endParaRPr lang="en-US" dirty="0"/>
-          </a:p>
-        </p:txBody>
-      </p:sp>
-      <p:sp>
-        <p:nvSpPr>
-          <p:cNvPr id="4" name="AutoShape 2" descr="data:image/png;base64,iVBORw0KGgoAAAANSUhEUgAABUAAAAPACAMAAADDuCPrAAABYlBMVEUAAAAAADoAAGYAOjoAOmYAOpAAZrYzMzM6AAA6OgA6Ojo6OmY6ZmY6ZpA6ZrY6kLY6kNtNTU1NTW5NTY5Nbm5Nbo5NbqtNjshmAABmADpmOgBmOjpmZjpmZmZmZpBmkGZmkLZmkNtmtttmtv9uTU1ubk1ubm5ubo5ujqtujshuq8huq+SOTU2Obk2Obm6Oq8iOyOSOyP+QOgCQOjqQZjqQZmaQZpCQkGaQkLaQtraQttuQ2/+rbk2rjk2rjm6rq8iryOSr5Mir5P+2ZgC2Zjq2kDq2kGa2kJC2tpC2tra2ttu229u22/+2///Ijk3Ijm7Iq27Iq6vIyKvI5KvI5OTI5P/I///bkDrbkGbbtmbbtpDbtrbb27bb29vb2//b/7bb///kq27kyI7kyKvk5P/k///r6+v8jVn/tmb/yI7/25D/27b/29v/5Kv/5Mj/5OT//7b//7///8j//9v//+T///+zjZs9AAAACXBIWXMAAB2HAAAdhwGP5fFlAAAgAElEQVR4nO3d/59b5ZnecU0wMDGEILMYh0CWwmwDxaSLN3S7xHW3mGQXkni3aY0TEijO1q2/YMe1rP+/0iNpRnPbM+fMM9e5n3PffN4/xB472Eiv6/mgGUlnJnMAQJVJ638BAIiKgAJAJQIKAJUIKABUIqAAUImAAkAlAgoAlQgoAFQioABQiYACQCUCCgCVCCgAVCKgAFCJgAJAJQIKAJVGENDZl298fzKZ7Lzw8Ten/rNuT570zvzhhcnOLwT/pgCwrXlAZ7/aPWjdS6dNKAEF4Kd1QO+9fih2p+0cAQXgp3FA7y4ffu689dXip9/+6vuCgh78ud/7reRPAoCjtA3o4qHh1ufts1/KCkpAAQyvbUCvLor59tbHy8/An1P8wQQUwPCaBnT5CfzLh37lRvmapeRPJqAABtY0oItcmswtP6d/rvzGwQPRq5vK3vv5Irg7P/jNwT/9zuzT3cnOC09+1n84oJsnka4ufyh/ygsfL3/9yx8vev3Cr/f/f+YvAIBjtQzo7NKTn7Cvmroo3n7/NvWbfWpe7LQM6NUjnro/OqA31n/Iywd/4PpB8BN/AQAcq2VAlw837efrt1c9vHrwO4tfefabVW03VtVdpPBs+fDZJ3t3ZED/fv8Pefvq4ddOPfkXAMCxWgZ0UbknHjyuo3r7IGLrli4fOb709Xz+7aebx4zlseQPv5l/+/VT/+inBnRh+Rn6l4tP1Z+Z7Lz9zeqZ/+fmT/0LAOBYLQN6+ymffS8D+vJ866Xv68/mtx6t3l5/5fTGMaE7OqAvb/6MzV9wdfUQ9il/AQAca6QBXdZxlbr180nbTysdPCY98kWjRwZ0/aubv2a+/yWCp/wFAHCssQZ0UcDypc3lVyaXMdtu2u39xj7lq58rRwb0uYO/5p1D/9en/AUAcKyRfg10Gc7ye+uQbj/Ds3mW58YxT/YcGdCXD//K/v/1aX8BABxrbM/C70f19qFP5W3f7Cfd1qkDeuRjWwDYGOfrQOclcYuIbR6IElAA4zPOdyItlbcNbV7OtPlSqPmntQHliSMAJ9I0oFu5XNt6L3z5HH7/qZ2rTz6vIw3o0/4CADhW26sx2Zdy3t765HnxmPDZ/7X/ls7tp9xv7H95VBjQp/wFAHCstgEtX3k8eOf5jcn2C5tulDderku2deGmzfNM2oA+5S8AgGM1viL9veUVlQ9dkf7gC5Grq9VvSrZ8F9GZX6+/h9LmvZfCgD7lLwCAY435eyJd3X42fPtp8lUbxQF98i8AgGO1Duih78q5c/g6crcn28+Mz36++b+dWV2wUxzQJ/8CADhW84AufPnz5Sfvz7xovy/89lVBl/60vN7x+lrIc31An/gLAOBYYwgoAIREQAGgEgEFgEoEFAAqEVAAqERAAaASAQWASgQUACoRUACoREABoBIBBYBKBBQAKhFQAKhEQAGgEgEFgEoEFAAqEVAAqNQwoP8HEtyT6MRIVEzFCGh43JPoxEhUTMUIaHjck+jESFRMxQhoeNyT6MRIVEzFCGh43JPoxEhUTMUIaHjck+jESFRMxQhoeNyT6MRIVEzFCGh43JPoxEhUTMUIaHjck+jESFRMxQhoeNyT6MRIVEzFCGh43JPoxEhUTMUIaHjck+jESFRMxQhoeNyT6MRIVEzFCGh43JPoxEhUTMUIaHjck+jESFRMxQhoeNyT6MRIVEzFCGh43JPoxEhUTMUIaHjck+jESFRMxQhoeNyT6MRIVEzFCGh43JPoxEhUTMUIaHjck+jESFRMxQhoeNyT6MRIVEzFCGh43JPoxEhUTMUIaHjck+jESFRMxQhoeNyT6MRIVEzFCGh43JPoxEhUTMUIaHjck+jESFRMxQhoeNyT6MRIVEzFCGh43JPoxEhUTMUIaHjck+jESFRMxQhoeNyT6MRIVEzFCGh43JPoxEhUTMUIaHjck+jESFRMxQhoeNyT6MRIVEzFCGh43JPoxEhUTMUIaHjck+jESFRMxQhoeNyT6MRIVEzFUgX0/+I7RL+fxAioiqkYAUVQ+v0kRkBVTMUIKILS7ycxAqpiKkZAEZR+P4kRUBVTMQKKoPT7SYyAqpiKEVAEpd9PYgRUxVSMgCIo/X4SI6AqpmIEFEHp95MYAVUxFSOgCEq/n8QIqIqpGAFFUPr9JEZAVUzFCCiC0u8nMQKqYipGQBGUfj+JEVAVUzECiqD0+0mMgKqYihFQBKXfT2IEVMVUjIAiKP1+EiOgKqZiBBRB6feTGAFVMRUjoAhKv5/ECKiKqRgBRVD6/SRGQFVMxQgogtLvJzECqmIqRkARlH4/iRFQFVMxAoqg9PtJjICqmIoRUASl309iBFTFVIyAIij9fhIjoCqmYgQUQen3kxgBVTEVI6AISr+fxAioiqkYAUVQ+v0kRkBVTMUIKILS7ycxAqpiKkZAEZR+P4kRUBVTMQKKoPT7SYyAqpiKEVAEpd9PYgRUxVSMgCIo/X4SI6AqpmKnDeiji6+tf/b4yt50+u71rg8IKDT0+0mMgKqIA3pt+tqmpNOlV744/gMCChH9fhIjoCrSgD6+Nt0E9Nr0/PX5g8vT87eO/YCAQkS/n8QIqIoyoP/2wXQT0Pt75RHmo4vnPjnuAwIKFf1+EiOgKsKA3pxO3/vzOqA39398/7gPCChU9PtJjICqKAP66j/O76zzeG36YfmxfHz0BwQUKvr9JEZAVYQB3cri48vrT9Dv752/dfQHq3/m+ZVT/s1P0fpIw5N+P8BJEVAEpd8PcFL6gL7yxdEfHPpH9Y+uWx9peNLvJzE+hVcZPKDdj0AJKAT0+0mMgKoQUOSg309iBFRlmIDyLDy86feTGAFVGSigm1d5rl/6edQHBBQq+v0kRkBVBgoo70SCM/1+EiOgKgMF9PHl6av773g/+gMCChX9fhIjoCoDBXT+YPuaS0d/QEAhot9PYgRUZaiAzh9cWVTy3VtdHxBQaOj3kxgBVREH9BT0t631kYYn/X4SI6AqpmIEFEHp95MYAVUxFSOgCEq/n8QIqIqpGAFFUPr9JEZAVUzFCCiC0u8nMQKqYipGQBGUfj+JEVAVUzECiqD0+0mMgKqYihFQBKXfT2IEVMVUjIAiKP1+EiOgKqZiBBRB6feTGAFVMRUjoAhKv5/ECKiKqRgBRVD6/SRGQFVMxQgogtLvJzECqmIqRkARlH4/iRFQFVMxAoqg9PtJjICqmIoRUASl309iBFTFVIyAIij9fhIjoCqmYgQUQen3kxgBVTEVI6AISr+fxAioiqkYAUVQ+v0kRkBVTMUIKILS7ycxAqpiKkZAEZR+P4kRUBVTMQKKoPT7SYyAqpiKEVAEpd9PYgRUxVSMgCIo/X4SI6AqpmIEFEHp95MYAVUxFSOgCEq/n8QIqIqpGAFFUPr9JEZAVUzFCCiC0u8nMQKqYipGQBGUfj+JEVAVUzECiqD0+0mMgKqYihFQBKXfT2IEVMVUjIAiKP1+EiOgKqZiBBRB6feTGAFVMRUjoAhKv5/ECKiKqRgBRVD6/SRGQFVMxQgogtLvJzECqmIqRkARlH4/iRFQFVMxAoqg9PtJjICqmIoRUASl309iBFTFVIyAIij9fhIjoCqmYgQUQen3kxgBVTEVI6AISr+fxAioiqkYAUVQ+v0kRkBVTMUIKILS7ycxAqpiKkZAEZR+P4kRUBVTMQKKoPT7SYyAqpiKEVAEpd9PYgRUxVSMgCIo/X4SI6AqpmIEFEHp95MYAVUxFSOgCEq/n8QIqIqpGAFFUPr9JEZAVUzFCCiC0u8nMQKqYipGQBGUfj+JEVAVUzECiqD0+0mMgKqYihFQBKXfT2IEVMVUjIAiKP1+EiOgKqZiBBRB6feTGAFVMRUjoAhKv5/ECKiKqRgBRVD6/SRGQFVMxQgogtLvJzECqmIqRkARlH4/iRFQFVMxAoqg9PtJjICqmIoRUASl309iBFTFVIyAIij9fhIjoCqmYgQUQen3kxgBVTEVI6AISr+fxAioiqkYAUVQ+v0kRkBVTMUIKILS7ycxAqpiKkZAEZR+P4kRUBVTMQKKoPT7SYyAqpiKEVAEpd9PYgRUxVSMgCIo/X4SI6AqpmIEFEHp95MYAVUxFSOgCEq/n8QIqIqpGAFFUPr9JEZAVUzFCCiC0u8nMQKqYipGQBGUfj+JEVAVU7GGAdVrfaThqfXaAB6BIiz9fhLjEaiKqRgBRVD6/SRGQFVMxQgogtLvJzECqmIqRkARlH4/iRFQFVMxAoqg9PtJjICqmIoRUASl309iBFTFVIyAIij9fhIjoCqmYgQUQen3kxgBVTEVI6AISr+fxAioiqkYAUVQ+v0kRkBVTMUIKILS7ycxAqpiKkZAEZR+P4kRUBVTMQKKoPT7SYyAqpiKEVAEpd9PYgRUxVSMgCIo/X4SI6AqpmIEFEHp95MYAVUxFSOgCEq/n8QIqIqpGAFFUPr9JEZAVUzFCCiC0u8nMQKqYipGQBGUfj+JEVAVUzECiqD0+0mMgKqYihFQBKXfT2IEVMVUjIAiKP1+EiOgKqZiBBRB6feTGAFVMRUjoAhKv5/ECKiKqRgBRVD6/SRGQFVMxQgogtLvJzECqmIqRkARlH4/iRFQFVMxAoqg9PtJjICqmIoRUASl309iBFTFVIyAIij9fhIjoCqmYgQUQen3kxgBVTEVI6AISr+fxAioiqkYAUVQ+v0kRkBVTMUIKILS7ycxAqpiKkZAEZR+P4kRUBVTMQKKoPT7SYyAqpiKEVAEpd9PYgRUxVSMgCIo/X4SI6AqpmIEFEHp95MYAVUxFSOgCEq/n8QIqIqpGAFFUPr9JEZAVUzFCCiC0u8nMQKqYipGQBGUfj+JEVAVUzECiqD0+0mMgKqYihFQBKXfT2IEVMVUjIAiKP1+EiOgKqZiBBRB6feTGAFVMRUjoAhKv5/ECKiKqRgBRVD6/SRGQFVMxQgogtLvJzECqmIqRkARlH4/iRFQFVMxAoqg9PtJjICqmIoRUASl309iBFTFVIyAIij9fhIjoCqmYgQUQen3kxgBVTEVI6AISr+fxAioiqkYAUVQ+v0kRkBVTMUIKILS7ycxAqpiKkZAEZR+P4kRUBVTMQKKoPT7SYyAqpiKEVAEpd9PYgRUxVSMgCIo/X4SI6AqpmIEFEHp95MYAVUxFSOgCEq/n8QIqIqpGAFFUPr9JEZAVUzFCCiC0u8nMQKqYipGQBGUfj+JEVAVUzECiqD0+0mMgKqYihFQBKXfT2IEVMVUjIAiKP1+EiOgKqZiBBRB6feTGAFVMRUjoAhKv5/ECKiKqRgBRVD6/SRGQFVMxQgogtLvJzECqmIqRkARlH4/iRFQFVMxAoqg9PtJjICqmIoRUASl309iBFTFVIyAIij9fhIjoCqmYgQUQen3kxgBVTEVI6AISr+fxAioiqmYKKCPL083XvliPn908eDni9+8sjedvnudgEJJv5/ECKiKS0Dv720FdF3TVUwJKET0+0mMgKoME9CN+3vnPln8cGf62sGvXZuevz5/cHl6/hYBhY5+P4kRUJVBA7p4IPr+qpnvbzV1/Ti0pJWAQkS/n8QIqMqgAb25epj5+PJWLG+uH43e3IoqAcWp6feTGAFVGTKgjy5OP1z9eP53H0ynP72+/ODa6tcOf1pPQHFa+v0kRkBVhgzo5sHm5jmkZTr3H43e39t8EfT5FeXfvNL6SMOTfj/ASSkDuv9lzjvT6Xu35n+5Ml18TEAxDP1+gJNSBvTO5on2zSPR5XNJWwE1L2TSP7pufaThSb+fxPgUXmW4gD6+vP5q56GiPuURKAGFgH4/iRFQleEC+sRDzPIrBBTD0O8nMQKqMlxAn3iafdVMnoXHIPT7SYyAqgwX0P1Xz+9/Ll+auXn9J68DhZR+P4kRUJXBArr16vlrqwebq5DyTiQMQr+fxAioymABfXRx/0ug9/eWL2N68EF5Vn6R0Vd5Lzzk9PtJjICqDBbQ7SeJbq4vxnR9+cEDrsaEAej3kxgBVRksoHe2H2I++Nl0eu699ccPriz6+e4t+w/ob1vrIw1P+v0kRkBVBgvoielvW+sjDU/6/SRGQFVMxQgogtLvJzECqmIqRkARlH4/iRFQFVMxAoqg9PtJjICqmIoRUASl309iBFTFVKwjoLM/fvY5AcUY6feTGAFV6RvQe//pm/n84euTyeTMLwgoxke/n8QIqErPgN6YfO+38/nVydLyZwQUI6PfT2IEVKVfQG+XbN7dnTz7zb0Lk5cJKEZHv5/ECKhKv4BeXZRzmdGdXyz/d/lzAopx0e8nMQKq0iugs0vLcq4z+vDCMJ/D629b6yMNT/r9JEZAVXoFdNXMhxcmz80JKMZJv5/ECKjKCQJ6d3fyDgHFSOn3kxgBVekV0NWn8DfKl0D5GihGSb+fxAioSq+Azq9Onls+/b4sJ8/CY5T0+0mMgKr0C+jt8gLQxWfws59PVo9DCSjGRb+fxAioSr+ALj59X3iuPJG0884g/SSgOBX9fhIjoCo9Azq/99FPPl788PBHP/jNMP0koDgV/X4SI6AqfQM6PP1ta32k4Um/n8QIqIqp2LEBnX09YD8JKE5Fv5/ECKiKqdjRAf3yx8v3wz/80VuDvIaJgOKU9PtJjICq9Azo7NPVdZgeXpicGeZiTAQUp6LfT2IEVKVnQK9OJmf+evd7v5393WSg19ETUJyKfj+JEVCVfgG9PZm8vX4P5x9Wb+gkoBgX/X4SI6Aq/QJ6dfnuo/Wb4G+US4oQUIyLfj+JEVCVXgFdvRd+HdC7u1xMBOOj309iBFSlV0A3l7Mr5eRqTBgj/X4SI6AqBBQ56PeTGAFV6RXQ2aXlE0frcnI5O4yRfj+JEVCVXgFdPXG0CugipjyJhPHR7ycxAqrSL6B3dycvfVMCeu91LmeHMdLvJzECqtIvoOVydmd3d178/uLHYa6nTEBxKvr9JEZAVXoGdP773cnaQP0koDgV/X4SI6AqfQM6//ZXZxf1fGawy4ESUJyKfj+JEVCV3gEdnP62tT7S8KTfT2IEVMVUjOuBIij9fhIjoCqmYlwPFEHp95MYAVXpGVCuB4qR0+8nMQKq0jOgXA8UI6ffT2IEVKVfQLkeKMZOv5/ECKhKv4ByPVCMnX4/iRFQlV4B5XqgGD39fhIjoCq9Asrl7DB6+v0kRkBVCChy0O8nMQKq0iugXA8Uo6ffT2IEVKVXQLkeKEZPv5/ECKhKv4ByPVCMnX4/iRFQlX4B5XqgGDv9fhIjoCo9A8r1QDFy+v0kRkBV+gaU64Fi3PT7SYyAqvQO6OD0t631kYYn/X4SI6AqpmIEFEHp95MYAVUxFTvihfQ/emnQaykTUJyafj+JEVCVfgG9MJk8M9iVlAkoBPT7SYyAqvQK6OpyypMzHw/ZUP1ta32k4Um/n8QIqEqvgC786celoS98TEAxSvr9JEZAVfoGdL76rkgLQ72QSX/bWh9peNLvJzECqnKCgC4+lf/y9WVCd94a4ikl/W1rfaThSb+fxAioyokCuvDtz8tbkl7QPwzV37bWRxqe9PtJjICqnCigs199f/OGzslLBBRjot9PYgRUpX9AN/VcPhf/7af698Trb1vrIw1P+v0kRkBVegZ0/dXPg1eD6i+rrL9trY80POn3kxgBVekV0NmliX3ySP+NPfS3rfWRhif9fhIjoCq9Arp8J9LO4ZcvPbzAI1CMiX4/iRFQlZ4B/cGvzS/NPle/lEl/21ofaXjS7ycxAqrSK6Au9Let9ZGGJ/1+EiOgKqZiBBRB6feTGAFVMRXruCL9ztlB3oREQHFq+v0kRkBV+gb0xv4r6PmeSBgj/X4SI6AqPQO67OczL775Bt+VEyOl309iBFSlX0Dv7k6eXb2K6d4lvi88xki/n8QIqEq/gF49eN/R7NLkOQKK0dHvJzECqtIroLNLW4867+6qX0JPQHF6+v0kRkBVegX00Ps29W/iJKA4Pf1+EiOgKgQUOej3kxgBVekV0NmlyTv7H+ivw0RAcXr6/SRGQFV6BZQnkTB6+v0kRkBV+gX07u7kzOpyIn96nZcxYYz0+0mMgKr0C+jqjUhnz54d8q1Icq2PNDy1XhtwzFs5/7C7fifnztsD/dX6/zi0PtLwpN9PYjwCVekb0PnsyzcWj0Bf/HiQJ5AIKE5Lv5/ECKhK74AOTn/bWh9peNLvJzECqmIqRkARlH4/iRFQFVMxG9DZR28+6Se8DhSjo99PYgRUpSOgy28n9wTeiYTx0e8nMQKqQkCRg34/iRFQlY6AOtLfttZHGp70+0mMgKqYihFQBKXfT2IEVMVU7PiAfjVcPgkoTke/n8QIqIqp2NEB/fLH5X1IP/gNAcUY6feTGAFV6RnQ2aX9p5BeGui9SPrb1vpIw5N+P4kRUJV+AV32c+fFf/jsn97YnQx0NTsCilPR7ycxAqrSL6A3JpMfrh54zn452bq4MgHFWOj3kxgBVekV0MUD0INr2F3lgsoYIf1+EiOgKr0C+vDCoe/KyQvpMT76/SRGQFV6BpRvKoeR0+8nMQKq0iugfF94jJ5+P4kRUJVeAZ3f2Pq65w2+BooR0u8nMQKq0i+gs0v7L/+8MdC1RAgoTkW/n8QIqEqvgM4+Wr7+88W3Pvvn5Y8vDHNVUP1ta32k4Um/n8QIqEqvgLpc1E5/21ofaXjS7ycxAqpCQJGDfj+JEVCVXgF1ob9trY80POn3kxgBVTEVI6AISr+fxAioiqkYAUVQ+v0kRkBVTMWODugfP9v3OS+kx+jo95MYAVXpGdDf7/JN5TBq+v0kRkBV+gX0Nt+VEyOn309iBFSlV0BnlyY7H3+17+sh+klAcSr6/SRGQFV6BfThhYEuokxAoaLfT2IEVKVnQAd6/zsBhYp+P4kRUJVeAZ1dIqAYOf1+EiOgKr0COr/Bp/AYOf1+EiOgKv0Ceuh7ehBQjJB+P4kRUJV+AZ3fuzA58+aG+kJ2BBSnp99PYgRUpWdAP+V1oBg3/X4SI6Aq/QJ6gxfSY+T0+0mMgKr0Cmh5If0gn7cTUIjo95MYAVXpFVCP55AIKE5Fv5/ECKhKz4DyOlCMnH4/iRFQlV4B5YX0GD39fhIjoCq9Ajq/MXmZgGLU9PtJjICq9Avo7NLO2wQUY6bfT2IEVKVXQGcfvTGZ7LzIC+kxXvr9JEZAVXoF1HxbY14HivHR7ycxAqpCQJGDfj+JEVCVXgF1ob9trY80POn3kxgBVTEVI6AISr+fxAioiqkYAUVQ+v0kRkBVTMVsQGd/tN8F/uGPz77A10AxOvr9JEZAVToC+vDC6imj2UebFy9tfoWAYlT0+0mMgKr0DOhBNgkoRkm/n8QIqAoBRQ76/SRGQFUIKHLQ7ycxAqpCQJGDfj+JEVAVAooc9PtJjICqEFDkoN9PYgRUhYAiB/1+EiOgKgQUOej3kxgBVSGgyEG/n8QIqAoBRQ76/SRGQFUIKHLQ7ycxAqrSHdAnEVCMj34/iRFQFQKKHPT7SYyAqnQEdPbRm0/im8phfPT7SYyAqnQE1JH+trU+0vCk309iBFTFVIyAIij9fhIjoCqmYgQUQen3kxgBVTEVI6AISr+fxAioiqkYAUVQ+v0kRkBVTMUIKILS7ycxAqpiKkZAEZR+P4kRUBVTMQKKoPT7SYyAqpiKEVAEpd9PYgRUxVTsiXciXdr5xeKHb78moBg3/X4SI6AqHQF9eGH5xvfV/xJQjJh+P4kRUJXOgC4fgRJQjJ5+P4kRUJWOgM4uTZ79/Ks/Xfjer786MMzn8/rb1vpIw5N+P4kRUJWOgM5vcDk7hKDfT2IEVKUroLNP6wL66OK0eOWL5UePr+xNp+9eX/3WoQ8IKDT0+0mMgKp0BXSR0K8+++fdnX/47MDnPa4Hen9vK6Drmq5ieugDAgoR/X4SI6Aq3QGdVz2JdGf62sEH16bnr88fXJ6ev2U/IKAQ0e8nMQKq0iugs49OfBH6a9P3939+f2/9OPTcJ+YDAgoV/X4SI6AqvQJ6co8vb/Xx5vrR6M1lVA99QEChot9PYgRUpXdAv/3V2clk5+xb/V7D9Oji+d99MJ3+9Pryg2vTD8svlk/rD31AQKGi309iBFSlb0APXs70cp+Abp5DWtZy/9Ho/b3ztw59sPr/Pr/S5489mdZHGp70+wFO6qiALvv5zItvvvH9ngW9M52+d2v+lyvTRS4JKBzo9wOc1BEBvbs7efY35Wf3Lk3K5UU6bL7SuXwuaauZr3xx6IND/4j+0XXrIw1P+v0kxqfwKv0CenXy7OZp+NmlyXPdAd24MzUPOp/yCJSAQkC/n8QIqEqvgK4vardyd/fZ/q9pMg86CSiGot9PYgRUpVdAD72Q/kSvqi+Z5Fl4DE+/n8QIqMowAX18eTuTm5d8rl8HuvUBAYWKfj+JEVCVXgGdXZq8s//B7UmPT+GvrR5frkLKO5EwPP1+EiOgKr0CevInke7vLV/G9OCD8o73RUZf3X/7+6EPCChU9PtJjICq9Avo3d3JmV+Xn/3p9V4vY1p8hr665tL15QcPti/A9ICrMWEA+v0kRkBV+gV09Uaks2fP9n4r0vzBz6bTc++tH2U+uLJI5rtP+4CAQkO/n8QIqErPgM7/sLt+J+fO2736eXL629b6SMOTfj+JEVCVvgGdz758Y/EI9MWPT3pdOwIKF/r9JEZAVXoHdHD629b6SMOTfj+JEVAVUzECiqD0+0mMgKqYihFQBKXfT2IEVMVUjIAiKP1+EiOgKqZiBBRB6feTGAFVMRUjoAhKv5/ECKiKqRgBRVD6/SRGQFVMxQgogtLvJzECqmIqRkARlH4/iRFQFVOxo67G9IPfEFCMmn4/iRFQlV4BfXhh63qgBBRjpN9PYgRUpWdAT/BdPAgoWtDvJzECqtIroIe+qRwBxRjp95MYAVXpFdD5jc23hSegGCn9fhIjoCr9AvrtLyeTZ158c+0ng1zSTn/bWh9peJuln3QAABwGSURBVNLvJzECqtIroA8vTLYN8wVR/W1rfaThSb+fxAioCgFFDvr9JEZAVXoF1IX+trU+0vCk309iBFTFVIyAIij9fhIjoCqmYscGdPb1gP0koDgV/X4SI6AqpmJHB/TLHy+/+PnwR28N9V3l9Let9ZGGJ/1+EiOgKj0DOvt09ezRwwuTMwO9KUl/21ofaXjS7ycxAqrSM6BXJ5Mzf737vd/O/m4yeXaYx6D629b6SMOTfj+JEVCVfgG9PZm8vX5H/B92B7qwiP62tT7S8KTfT2IEVKVfQK9OXt6/pMiNyXMEFKOj309iBFSlV0BXFxNZB/TuLi+kx/jo95MYAVXpFdBVOtcBHeradvrb1vpIw5N+P4kRUBUCihz0+0mMgKr0Cujs0vKJo3U5bw/0NLz+trU+0vCk309iBFSlV0BXTxytArqIKU8iYXz0+0mMgKr0C+jd3clL35SA3nt9MtDV6fW3rfWRhif9fhIjoCr9Arp4CDqZnN3defH7ix9fHqSfBBSnot9PYgRUpWdA57/f3VwNdKB+ElCcin4/iRFQlb4BnX/7q7OLej4z3DeI19+21kcanvT7SYyAqvQO6OD0t631kYYn/X4SI6AqpmLHXw/0qwH7SUBxKvr9JEZAVUzFjr8e6AKfwmOc9PtJjICq9Azo7NL+t5R7aaArKutvW+sjDU/6/SRGQFX6BXTZz50X//Nn//TGoqDDvI6egOJU9PtJjICq9Avo7f1XL81+OeF6oBgh/X4SI6AqvQK6eAB68OrPq7yVEyOk309iBFSlV0AfXth6+ybXA8UY6feTGAFV6RnQrWZyOTuMkX4/iRFQlV4BXV2Rfu3uLpezw/jo95MYAVXpFdBD3wfpxkDvhtffttZHGp70+0mMgKr0C+jDC5MffrPp5zCfwRNQnIp+P4kRUJWOgM4+erN4Y/U60H9+c3cyefEnfAqP0dHvJzECqtIR0MVDzyfxJBLGR7+fxAioCgFFDpUj+X/4DpH2pegIqCP9bWt9pOGpciStjzQ8SftSmIoRUARVOZLWRxqepH0pTMUIKIKqHEnrIw1P0r4UpmJHB/SPn+37nGfhMTqVI2l9pOFJ2peiZ0APvqccTyJhlCpH0vpIw5O0L0W/gN7mWXiMXOVIWh9peJL2pegV0Nmlyc7HX+37eoh+ElCcSuVIWh9peJL2pegV0IcXBrqIMgGFSuVIWh9peJL2pegZ0IHe/05AoVI5ktZHGp6kfSl6BXR2iYBi5CpH0vpIw5O0L0WvgM5v8Ck8Rq5yJK2PNDxJ+1L0C+ih7+lBQDFClSNpfaThSdqXol9A5/cuTM68ucHl7DA+lSNpfaThSdqXomdAP+V1oBi3ypG0PtLwJO1L0S+gN3ghPUauciStjzQ8SftS9ApoeSH9IJ+3E1CIVI6k9ZGGJ2lfil4B9XgOiYDiVCpH0vpIw5O0L0XPgPI6UIxc5UhaH2l4kval6BVQXkiP0ascSesjDU/SvhS9AjrY94InoFCpHEnrIw1P0r4U/QI6u7TzNgHFmFWOpPWRhidpX4peAZ19VL4vPC+kx3hVjqT1kYYnaV+KXgE139yY14FifCpH0vpIw5O0LwUBRQ6VI2l9pOFJ2peiV0Bd6G9b6yMNT5UjaX2k4Unal8JUjIAiqMqRtD7S8CTtS2EqRkARVOVIWh9peJL2pTAVOyKg3361jW8qh/GpHEnrIw1P0r4UvQLq8iSSXusjDU+VI2l9pOFJ2pen4Vl4BFU5ktZHGp6kfSl6BXT2x8/W/v71yc4/fM4L6TE6lSNpfaThSdqXoldAt93dfXaYK4Pqb1vrIw1PlSNpfaThSdqX4sQBHezCIvrb1vpIw1PlSFofaXiS9qU4eUCHegiqv22tjzQ8VY6k9ZGGJ2lfipMHdKirK+tvW+sjDU+VI2l9pOFJ2pfi5AG9u0tAMT6VI2l9pOFJ2pfixAGdXZ3wKTzGp3IkrY80PEn7UvQK6OyjzaVA33xjd8KTSBihypG0PtLwJO1L0Sugh19Iz8uYMEKVI2l9pOFJ2pfixAF95q2BvkG8/ra1PtLwVDmS1kcanqR9KXoF1IX+trU+0vBUOZLWRxqepH0pTMUIKIKqHEnrIw1P0r4UpmIEFEFVjqT1kYYnaV8KUzECiqAqR9L6SMOTtC+FqZgN6NYLmA7wbY0xPpUjaX2k4Unal6IjoOZKoFwPFGNVOZLWRxqepH0pCChyqBxJ6yMNT9K+FB0Btb7cnfBOJIxR5UhaH2l4kvalOFFAZz9f5PPMbwbpJwHFqVSOpPWRhidpX4qTBPQPi4efO0O9EYmA4lQqR9L6SMOTtC9F/4AO+vCTgOKUKkfS+kjDk7QvRe+Aloef/26wfBJQnE7lSFofaXiS9qXoGdB7Az/8JKA4pcqRtD7S8CTtS9EvoIM//CSgOKXKkbQ+0vAk7UvRJ6D3Li2vAjrow08CilOqHEnrIw1P0r4UPQJaHn6+PXA+CShOp3IkrY80PEn7UnQG1OfhJwHFKVWOpPWRhidpX4qugP7e5+EnAcUpVY6k9ZGGJ2lfio6A8l54BFE5ktZHGp6kfSkIKHKoHEnrIw1P0r4UHQHleqAIonIkrY80PEn7UnQE1JH+trU+0vBUOZLWRxqepH0pTMUIKIKqHEnrIw1P0r4UpmIEFEFVjqT1kYYnaV8KUzECiqAqR9L6SMOTtC+FqRgBRVCVI2l9pOFJ2pfCVIyAIqjKkbQ+0vAk7UthKkZAEVTlSFofaXiS9qUwFSOgCKpyJK2PNDxJ+1KYihFQBFU5ktZHGp6kfSlMxQgogqocSesjDU/SvhSmYgQUQVWOpPWRhidpXwpTMQKKoCpH0vpIw5O0L4WpGAFFUJUjaX2k4Unal8JUjIAiqMqRtD7S8CTtS2EqRkARVOVIWh9peJL2pTAVI6AIqnIkrY80PEn7UpiKEVAEVTmS1kcanqR9KUzFCCiCqhxJ6yMNT9K+FKZiBBRBVY6k9ZGGJ2lfClMxAoqgKkfS+kjDk7QvhakYAUVQlSNpfaThSdqXwlSMgCKoypG0PtLwJO1LYSpGQBFU5UhaH2l4kvalMBUjoAiqciStjzQ8SftSmIoRUARVOZLWRxqepH0pTMUIKIKqHEnrIw1P0r4UpmIEFEFVjqT1kYYnaV8KUzECiqAqR9L6SMOTtC+FqRgBRVCVI2l9pOFJ2pfCVIyAIqjKkbQ+0vAk7UthKkZAEVTlSFofaXiS9qUwFSOgCKpyJK2PNDxJ+1KYihFQBFU5ktZHGp6kfSlMxQgogqocSesjDU/SvhSmYgQUQVWOpPWRhidpXwpTMQKKoCpH0vpIw5O0L4WpGAFFUJUjaX2k4Unal8JUjIAiqMqRtD7S8CTtS2EqRkARVOVIWh9peJL2pTAVI6AIqnIkrY80PEn7UpiKEVAEVTmS1kcanqR9KUzFCCiCqhxJ6yMNT9K+FKZiBBRBVY6k9ZGGJ2lfClMxAoqgKkfS+kjDk7QvhakYAUVQlSNpfaThSdqXwlSMgCKoypG0PtLwJO1LYSpGQBFU5UhaH2l4kvalMBUjoAiqciStjzQ8SftSmIrpAvpvP5tOz717vfz80cVp8coXy48eX9mbTte/Q0AhUjmS1kcanqR9KYYK6L+sknnuk+UH9/e2Arqu6SqmBBQilSNpfaThSdqXYqCA3pme+9v5/MHlVSfvTF87+K1r0/PXl79z/hYBhU7lSFofaXiS9qUYJqCPL08/XP64eLT5YWnm+/u/dX9v/Th09eCUgEKjciStjzQ8SftSDBPQRxfXn6GXdD6+vBXLm+tHoze3okpAcWqVI2l9pOFJ2pdimIDuKwF9dPH87z6YTn96ffUr5bHp4U/rCShOq3IkrY80PEn7Ugwb0NUn6pvnkJbp3H80en9v80XQ51e0f/NS6yMNT5UjaX2k4Unal6cRB3T1+fqd6fS9W/O/XFk+J09AMYzKkbQ+0vAk7cvTaAN6Z/Uyps2XPZefz28F1LyQSf/ouvWRhqfKkbQ+0vAk7UsxZEDv7J378HBPz996yiNQAgqBypG0PtLwJO1LMWBAb07NK5WWDzoJKIZROZLWRxqepH0phgvov9h+rprJs/AYROVIWh9peJL2pRgqoI+vTV9df41z86r6VTM3r//kdaCQqhxJ6yMNT9K+FEMF9NrWWzWvrR5srkLKO5EwiMqRtD7S8CTtSzFQQG9uv9X9/t7yZUwPPii/tsjoq7wXHnKVI2l9pOFJ2pdimIBurl+38FrJ6eoCTNeXv/eAqzFhAJUjaX2k4Unal2KYgN6ZHgro/MHy4qDvrR9yPriy+OV3b9l/Rn/bWh9peKocSesjDU/SvhTDBLSG/ra1PtLwVDmS1kcanqR9KUzFCCiCqhxJ6yMNT9K+FKZiBBRBVY6k9ZGGJ2lfClMxAoqgKkfS+kjDk7QvhakYAUVQlSNpfaThSdqXwlSMgCKoypG0PtLwJO1LYSpGQBFU5UhaH2l4kvalMBUjoAiqciStjzQ8SftSmIoRUARVOZLWRxqepH0pTMUIKIKqHEnrIw1P0r4UpmIEFEFVjqT1kYYnaV8KUzECiqAqR9L6SMOTtC+FqRgBRVCVI2l9pOFJ2pfCVIyAIqjKkbQ+0vAk7UthKkZAEVTlSFofaXiS9qUwFSOgCKpyJK2PNDxJ+1KYihFQBFU5ktZHGp6kfSlMxQgogqocSesjDU/SvhSmYgQUQVWOpPWRhidpXwpTMQKKoCpH0vpIw5O0L4WpGAFFUJUjaX2k4Unal8JUjIAiqMqRtD7S8CTtS2EqRkARVOVIWh9peJL2pTAVI6AIqnIkrY80PEn7UpiKEVAEVTmS1kcanqR9KUzFCCiCqhxJ6yMNT9K+FKZiBBRBVY6k9ZGGJ2lfClMxAoqgKkfS+kjDk7QvhakYAUVQlSNpfaThSdqXwlSMgCKoypG0PtLwJO1LYSpGQBFU5UhaH2l4kvalMBUjoAiqciStjzQ8SftSmIoRUARVOZLWRxqepH0pTMUIKIKqHEnrIw1P0r4UpmIEFEFVjqT1kYYnaV8KUzECiqAqR9L6SMOTtC+FqRgBRVCVI2l9pOFJ2pfCVIyAIqjKkbQ+0vAk7UthKkZAEVTlSFofaXiS9qUwFSOgCKpyJK2PNDxJ+1KYihFQBFU5ktZHGp6kfSlMxQgogqocSesjDU/SvhSmYgQUQVWOpPWRhidpXwpTMQKKoCpH0vpIw5O0L4WpGAFFUJUjaX2k4Unal8JUjIAiqMqRtD7S8CTtS2EqRkARVOVIWh9peJL2pTAVI6AIqnIkrY80PEn7UpiKEVAEVTmS1kcanqR9KUzFCCiCqhxJ6yMNT9K+FKZiBBRBVY6k9ZGGJ2lfClMxAoqgKkfS+kjDk7QvhakYAUVQlSNpfaThSdqXwlSMgCKoypG0PtLwJO1LYSpGQBFU5UhaH2l4kvalMBUjoAiqciStjzQ8SftSmIoRUARVOZLWRxqepH0pTMUIKIKqHEnrIw1P0r4UpmIEFEFVjqT1kYYnaV8KUzECiqAqR9L6SMOTtC+FqRgBRVCVI2l9pOFJ2pfCVIyAIqjKkbQ+0vAk7UthKkZAEVTlSFofaXiS9qUwFSOgCKpyJK2PNDxJ+1KYihFQBFU5ktZHGp6kfSlMxQgogqocSesjDU/SvhSmYgQUQVWOpPWRhidpXwpTMQKKoCpH0vpIw5O0L4WpGAFFUJUjaX2k4Unal8JUjIAiqMqRtD7S8CTtS2EqRkARVOVIWh9peJL2pTAVI6AIqnIkrY80PEn7UpiKEVAEVTmS1kcanqR9KUzFCCiCqhxJ6yMNT9K+FKZiBBRBVY6k9ZGGJ2lfClMxAoqgKkfS+kjDk7QvhakYAUVQlSNpfaThSdqXwlSMgCKoypG0PtLwJO1LYSpGQBFU5UhaH2l4kvalMBVrGFC91kcanipH0vpIw5O0L0/DI1AEVTmS1kcanqR9KUzFCCiCqhxJ6yMNT9K+FKZiBBRBVY6k9ZGGJ2lfClMxAoqgKkfS+kjDk7QvhakYAUVQlSNpfaThSdqXwlSMgCKoypG0PtLwJO1LYSpGQBFU5UhaH2l4kvalMBUjoAiqciStjzQ8SftSmIoRUARVOZLWRxqepH0pTMUIKIKqHEnrIw1P0r4UpmIEFEFVjqT1kYYnaV8KUzECiqAqR9L6SMOTtC+FqRgBRVCVI2l9pOFJ2pfCVIyAIqjKkbQ+0vAk7UthKkZAEVTlSFofaXiS9qUwFSOgCKpyJK2PNDxJ+1KYihFQBFU5ktZHGp6kfSlMxQgogqocSesjDU/SvhSmYgQUQVWOpPWRhidpXwpTMQKKoCpH0vpIw5O0L4WpGAFFUJUjaX2k4Unal8JUjIAiqMqRtD7S8CTtS2EqRkARVOVIWh9peJL2pTAVI6AIqnIkrY80PEn7UpiKEVAEVTmS1kcanqR9KUzFCCiCqhxJ6yMNT9K+FKZiBBRBVY6k9ZGGJ2lfClMxAoqgKkfS+kjDk7QvhakYAUVQlSNpfaThSdqXwlSMgCKoypG0PtLwJO1LYSpGQBFU5UhaH2l4kvalMBUjoAiqciStjzQ8SftSmIoRUARVOZLWRxqepH0pTMUIKIKqHEnrIw1P0r4UpmIEFEFVjqT1kYYnaV8KUzECiqAqR9L6SMOTtC+FqRgBRVCVI2l9pOFJ2pfCVIyAIqjKkbQ+0vAk7UthKkZAEVTlSFofaXiS9qUwFSOgCKpyJK2PNDxJ+1KYihFQBFU5ktZHGp6kfSlMxQgogqocSesjDU/SvhSmYgQUQVWOpPWRhidpXwpTMQKKoCpH0vpIw5O0L4WpGAFFUJUjaX2k4Unal8JUjIAiqMqRtD7S8CTtS2EqRkARVOVIWh9peJL2pTAVI6AIqnIkrY80PEn7UpiKEVAEVTmS1kcanqR9KUzFCCiCqhxJ6yMNT9K+FKZiBBRBVY6k9ZGGJ2lfClMxAoqgKkfS+kjDk7QvhakYAUVQlSNpfaThSdqXwlSMgCKoypG0PtLwJO1LYSpGQBFU5UhaH2l4kvalMBUjoAiqciStjzQ8SftSmIoRUARVOZLWRxqepH0pTMUIKIKqHEnrIw1P0r4UpmIEFEFVjqT1kYYnaV8KUzECiqAqR9L6SMOTtC+FqRgBRVCVI2l9pOFJ2pfCVIyAIqjKkbQ+0vAk7UthKkZAEVTlSFofaXiS9qUwFSOgCKpyJK2PNDxJ+1KYihFQBFU5ktZHGp6kfSlMxQgogqocSesjDU/SvhSmYgQUQVWOpPWRhidpXwpTMQKKoCpH0vpIw5O0L4WpGAFFUJUjaX2k4Unal8JUjIAiqMqRtD7S8CTtS2EqRkARVOVIWh9peJL2pTAVI6AIqnIkrY80PEn7UpiKEVAEVTmS1kcanqR9KUzFCCiCqhxJ6yMNT9K+FKZiBBRBVY6k9ZGGJ2lfClMxAoqgKkfS+kjDk7QvhakYAUVQlSNpfaThSdqXwlSMgCKoypG0PtLwJO1LYSpGQBFU5UhaH2l4kvalMBUjoAiqciStjzQ8SftSmIp5BPTxlb3p9N3rBBRKlSNpfaThSdqXwj+gjy5Ol175goBCqHIkrY80PEn7UvgH9Nr0/PX5g8vT87cIKHQqR9L6SMOTtC+Fe0Dv75XHno8unvuEgEKnciStjzQ8SftSuAf05vS19Y/vE1DoVI6k9ZGGJ2lfCveAXpt+WH68sw4pAYVE5UhaH2l4kval8A7o48vrT93v722+CPr8iv7van2k4alyJK2PNDxJ+/I0qQIKAJ48A2peyKR/dP3dxD2JToxEpWFAzeuYWt8TWXBPohMjUSGg2XBPohMjUfEOqOez8N9N3JPoxEhU3AO6ef2nw+tAv5u4J9GJkai4B9TxnUjfTdyT6MRIVNwD+vjy9FWn98J/N3FPohMjUXEP6PyB29WYvpu4J9GJkaj4B3T+4Mqin+/esr/c+p7IgnsSnRiJSoOAHqH1PZEF9yQ6MRIVUzECGh73JDoxEhVTMQIaHvckOjESFVMxAhoe9yQ6MRIVUzECGh73JDoxEhVTMQIaHvckOjESFVMxAhoe9yQ6MRIVUzECGh73JDoxEhVTMQIaHvckOjESFVMxAhoe9yQ6MRIVUzECGh73JDoxEhVTMQIaHvckOjESFVMxAhoe9yQ6MRIVUzECGh73JDoxEhVTMQIaHvckOjESFVMxAhoe9yQ6MRIVUzECGh73JDoxEhVTMQIaHvckOjESFVMxAhoe9yQ6MRIVUzECGh73JDoxEhVTMQIaHvckOjESFVMxAhoe9yQ6MRIVUzECGh73JDoxEhVTMQIaHvckOjESFVMxAhoe9yQ6MRIVUzECGh73JDoxEhVTMQIaHvckOjESFVOxhgGFxvPPt/43wOgxkoEQ0PA4G+jESAZCQMPjbKATIxkIAQ2Ps4FOjGQgBDQ8zgY6MZKBENDwOBvoxEgGQkDD42ygEyMZCAEFgEoEFAAqEVAAqERAAaASAQWASgQUACoRUACoREABoBIBDeHRxen7+z995Yum/y4Yk8eXp+dv7f/0w7b/Mt9BBDSERUDPfbL5KQHFgft7m/+23tlPKdwQ0BAWAZ2+tvkpAcWWm9PVIB5d3Pw3Fn4IaAiLw/E368/PCCgO2Xx55+bmP7FwREBDWFTzf+xtHmisfnxwZTqdvnu96b8WxuBO+fLO/fU+FsPYm05/en31858tRvLv/7bhv1x2BDSEZTXXjzDWAb2zOCUL53ja4Dvv8eXlMq6tP0O5vzWM9c95aDocAhrCsprrJ1lXAV0cjXf/9/zxv0z5uhfu75375P7e6hmkxSf0792aP/7X5RdGF4v5D4tf/Lc9RjIYAhpCqebqk7RVQDdf8LrGowssVnD+v6wjuRnGzen7PK3kgICGsKpmqWX56f5L/njpCrZfpPH48rqZy0eki5W8+j9b/nt9BxDQEFYBLY8oyk/3H1vwnDzmy/+OrmewaObG4lduLn989b/yn9jhENAQNs8cLR5vrgO6PjAEFPPV483yk+Vj0YOAzv/8N+Wn75HQoRDQEDadvDZ9n0egeMJWQM2XPR//9+Urmd5/2j8EAQIawqaTi/Px3/gaKKz9gD7t/fCP/5WRDIaAhrD/QPPO9K/2eBYexn5AF8NY/Wz5X9bNa+sPfhdqBDSEg8/Ur62+uLV6HehfrvA6UMy3E/no4vT89fn8z3uLR6LLKzUtfv7gMv+VHQwBDeEgoIty8k4kGFuPMdfDmL43P3gn0qt8nXwoBDSEreeKNhff4b3w2Lf9SfrqvfD/ePDzv/qPfAI/GAIKAJUIKABUIqAAUImAAkAlAgoAlQgoAFQioABQiYACQCUCCgCVCCgAVCKgAFCJgAJAJQIKAJUIKABUIqAAUImAAkAlAgoAlQgoAFQioABQiYACQCUCCgCVCCgAVCKgAFCJgAJAJQIKAJUIKABUIqAAUImAAkAlAgoAlQgoAFQioABQiYACQCUCCgCVCCgAVCKgAFCJgAJAJQIKAJUIKABUIqAAUImAAkAlAgoAlQgoAFQioABQiYACQCUCCgCVCCgAVCKgAFCJgAJAJQIKAJUIKABUIqAAUOn/A71FEGOQyBlxAAAAAElFTkSuQmCC">
+          <p:cNvPr id="2" name="Title 1">
             <a:extLst>
               <a:ext uri="{FF2B5EF4-FFF2-40B4-BE49-F238E27FC236}">
-                <a16:creationId xmlns:a16="http://schemas.microsoft.com/office/drawing/2014/main" id="{8CC047BC-7FEC-4EB1-BCEA-02FB6A9AD576}"/>
+                <a16:creationId xmlns="" xmlns:a16="http://schemas.microsoft.com/office/drawing/2014/main" id="{B82558F1-4876-454A-B771-BA837016AE1A}"/>
               </a:ext>
             </a:extLst>
           </p:cNvPr>
           <p:cNvSpPr>
-            <a:spLocks noChangeAspect="1" noChangeArrowheads="1"/>
-          </p:cNvSpPr>
-          <p:nvPr/>
-        </p:nvSpPr>
-        <p:spPr bwMode="auto">
-          <a:xfrm>
-            <a:off x="5963478" y="3296478"/>
-            <a:ext cx="284922" cy="284922"/>
-          </a:xfrm>
-          <a:prstGeom prst="rect">
-            <a:avLst/>
-          </a:prstGeom>
-          <a:noFill/>
-          <a:extLst>
-            <a:ext uri="{909E8E84-426E-40DD-AFC4-6F175D3DCCD1}">
-              <a14:hiddenFill xmlns:a14="http://schemas.microsoft.com/office/drawing/2010/main">
-                <a:solidFill>
-                  <a:srgbClr val="FFFFFF"/>
-                </a:solidFill>
-              </a14:hiddenFill>
-            </a:ext>
-          </a:extLst>
-        </p:spPr>
-        <p:txBody>
-          <a:bodyPr vert="horz" wrap="square" lIns="91440" tIns="45720" rIns="91440" bIns="45720" numCol="1" anchor="t" anchorCtr="0" compatLnSpc="1">
-            <a:prstTxWarp prst="textNoShape">
-              <a:avLst/>
-            </a:prstTxWarp>
-          </a:bodyPr>
-          <a:lstStyle/>
-          <a:p>
-            <a:endParaRPr lang="en-US"/>
+            <a:spLocks noGrp="1"/>
+          </p:cNvSpPr>
+          <p:nvPr>
+            <p:ph type="title"/>
+          </p:nvPr>
+        </p:nvSpPr>
+        <p:spPr/>
+        <p:txBody>
+          <a:bodyPr/>
+          <a:lstStyle/>
+          <a:p>
+            <a:r>
+              <a:rPr lang="en-US" dirty="0"/>
+              <a:t>Other findings</a:t>
+            </a:r>
+          </a:p>
+        </p:txBody>
+      </p:sp>
+      <p:sp>
+        <p:nvSpPr>
+          <p:cNvPr id="3" name="Text Placeholder 2">
+            <a:extLst>
+              <a:ext uri="{FF2B5EF4-FFF2-40B4-BE49-F238E27FC236}">
+                <a16:creationId xmlns="" xmlns:a16="http://schemas.microsoft.com/office/drawing/2014/main" id="{D364D651-6EB2-244D-94BF-CDF4925ACCFE}"/>
+              </a:ext>
+            </a:extLst>
+          </p:cNvPr>
+          <p:cNvSpPr>
+            <a:spLocks noGrp="1"/>
+          </p:cNvSpPr>
+          <p:nvPr>
+            <p:ph type="body" idx="1"/>
+          </p:nvPr>
+        </p:nvSpPr>
+        <p:spPr/>
+        <p:txBody>
+          <a:bodyPr/>
+          <a:lstStyle/>
+          <a:p>
+            <a:r>
+              <a:rPr lang="en-US" dirty="0"/>
+              <a:t>“Tell me about any job role specific trends that may exist in the data set”</a:t>
+            </a:r>
+          </a:p>
+          <a:p>
+            <a:endParaRPr lang="en-US" dirty="0"/>
           </a:p>
         </p:txBody>
       </p:sp>
     </p:spTree>
     <p:extLst>
       <p:ext uri="{BB962C8B-B14F-4D97-AF65-F5344CB8AC3E}">
-        <p14:creationId xmlns:p14="http://schemas.microsoft.com/office/powerpoint/2010/main" val="288936918"/>
+        <p14:creationId xmlns:p14="http://schemas.microsoft.com/office/powerpoint/2010/main" val="1166549020"/>
       </p:ext>
     </p:extLst>
   </p:cSld>
@@ -6356,111 +6476,157 @@
           <a:lstStyle/>
           <a:p>
             <a:r>
-              <a:rPr lang="en-US" dirty="0"/>
-              <a:t>CURIOUS? WANT TO LEARN MORE?</a:t>
-            </a:r>
-          </a:p>
-        </p:txBody>
-      </p:sp>
-      <p:sp>
-        <p:nvSpPr>
-          <p:cNvPr id="4" name="TextBox 3"/>
-          <p:cNvSpPr txBox="1"/>
-          <p:nvPr/>
+              <a:rPr lang="en-US"/>
+              <a:t>How to mitigate attrition</a:t>
+            </a:r>
+            <a:endParaRPr lang="en-US" dirty="0"/>
+          </a:p>
+        </p:txBody>
+      </p:sp>
+      <p:sp>
+        <p:nvSpPr>
+          <p:cNvPr id="3" name="Text Placeholder 2"/>
+          <p:cNvSpPr>
+            <a:spLocks noGrp="1"/>
+          </p:cNvSpPr>
+          <p:nvPr>
+            <p:ph type="body" idx="1"/>
+          </p:nvPr>
         </p:nvSpPr>
         <p:spPr>
           <a:xfrm>
-            <a:off x="557211" y="1152395"/>
-            <a:ext cx="9725438" cy="1323439"/>
+            <a:off x="684213" y="1193800"/>
+            <a:ext cx="8534400" cy="4800600"/>
+          </a:xfrm>
+        </p:spPr>
+        <p:txBody>
+          <a:bodyPr/>
+          <a:lstStyle/>
+          <a:p>
+            <a:r>
+              <a:rPr lang="en-US" b="1" dirty="0">
+                <a:solidFill>
+                  <a:srgbClr val="FF0000"/>
+                </a:solidFill>
+              </a:rPr>
+              <a:t>**Content in Progress (by Jodi) – feel free to add.  I will finalize Monday morning!</a:t>
+            </a:r>
+          </a:p>
+          <a:p>
+            <a:endParaRPr lang="en-US" dirty="0"/>
+          </a:p>
+          <a:p>
+            <a:pPr marL="285750" indent="-285750">
+              <a:buFont typeface="Arial" panose="020B0604020202020204" pitchFamily="34" charset="0"/>
+              <a:buChar char="•"/>
+            </a:pPr>
+            <a:r>
+              <a:rPr lang="en-US" dirty="0">
+                <a:solidFill>
+                  <a:schemeClr val="tx1"/>
+                </a:solidFill>
+              </a:rPr>
+              <a:t>We recommend that the HR team further review…….</a:t>
+            </a:r>
+          </a:p>
+          <a:p>
+            <a:pPr marL="742950" lvl="1" indent="-285750">
+              <a:buFont typeface="Arial" panose="020B0604020202020204" pitchFamily="34" charset="0"/>
+              <a:buChar char="•"/>
+            </a:pPr>
+            <a:r>
+              <a:rPr lang="en-US" dirty="0"/>
+              <a:t>Stock Options…</a:t>
+            </a:r>
+          </a:p>
+          <a:p>
+            <a:pPr marL="742950" lvl="1" indent="-285750">
+              <a:buFont typeface="Arial" panose="020B0604020202020204" pitchFamily="34" charset="0"/>
+              <a:buChar char="•"/>
+            </a:pPr>
+            <a:r>
+              <a:rPr lang="en-US" dirty="0"/>
+              <a:t>Job Role…</a:t>
+            </a:r>
+          </a:p>
+          <a:p>
+            <a:pPr marL="742950" lvl="1" indent="-285750">
+              <a:buFont typeface="Arial" panose="020B0604020202020204" pitchFamily="34" charset="0"/>
+              <a:buChar char="•"/>
+            </a:pPr>
+            <a:r>
+              <a:rPr lang="en-US" dirty="0"/>
+              <a:t>Overtime…</a:t>
+            </a:r>
+          </a:p>
+          <a:p>
+            <a:r>
+              <a:rPr lang="en-US" dirty="0"/>
+              <a:t>Make sure this conclusion and the conclusion in the </a:t>
+            </a:r>
+            <a:r>
+              <a:rPr lang="en-US" dirty="0" err="1"/>
+              <a:t>rmd</a:t>
+            </a:r>
+            <a:r>
+              <a:rPr lang="en-US" dirty="0"/>
+              <a:t> match.</a:t>
+            </a:r>
+          </a:p>
+          <a:p>
+            <a:endParaRPr lang="en-US" dirty="0"/>
+          </a:p>
+        </p:txBody>
+      </p:sp>
+      <p:sp>
+        <p:nvSpPr>
+          <p:cNvPr id="4" name="AutoShape 2" descr="data:image/png;base64,iVBORw0KGgoAAAANSUhEUgAABUAAAAPACAMAAADDuCPrAAABYlBMVEUAAAAAADoAAGYAOjoAOmYAOpAAZrYzMzM6AAA6OgA6Ojo6OmY6ZmY6ZpA6ZrY6kLY6kNtNTU1NTW5NTY5Nbm5Nbo5NbqtNjshmAABmADpmOgBmOjpmZjpmZmZmZpBmkGZmkLZmkNtmtttmtv9uTU1ubk1ubm5ubo5ujqtujshuq8huq+SOTU2Obk2Obm6Oq8iOyOSOyP+QOgCQOjqQZjqQZmaQZpCQkGaQkLaQtraQttuQ2/+rbk2rjk2rjm6rq8iryOSr5Mir5P+2ZgC2Zjq2kDq2kGa2kJC2tpC2tra2ttu229u22/+2///Ijk3Ijm7Iq27Iq6vIyKvI5KvI5OTI5P/I///bkDrbkGbbtmbbtpDbtrbb27bb29vb2//b/7bb///kq27kyI7kyKvk5P/k///r6+v8jVn/tmb/yI7/25D/27b/29v/5Kv/5Mj/5OT//7b//7///8j//9v//+T///+zjZs9AAAACXBIWXMAAB2HAAAdhwGP5fFlAAAgAElEQVR4nO3d/59b5ZnecU0wMDGEILMYh0CWwmwDxaSLN3S7xHW3mGQXkni3aY0TEijO1q2/YMe1rP+/0iNpRnPbM+fMM9e5n3PffN4/xB472Eiv6/mgGUlnJnMAQJVJ638BAIiKgAJAJQIKAJUIKABUIqAAUImAAkAlAgoAlQgoAFQioABQiYACQCUCCgCVCCgAVCKgAFCJgAJAJQIKAJVGENDZl298fzKZ7Lzw8Ten/rNuT570zvzhhcnOLwT/pgCwrXlAZ7/aPWjdS6dNKAEF4Kd1QO+9fih2p+0cAQXgp3FA7y4ffu689dXip9/+6vuCgh78ud/7reRPAoCjtA3o4qHh1ufts1/KCkpAAQyvbUCvLor59tbHy8/An1P8wQQUwPCaBnT5CfzLh37lRvmapeRPJqAABtY0oItcmswtP6d/rvzGwQPRq5vK3vv5Irg7P/jNwT/9zuzT3cnOC09+1n84oJsnka4ufyh/ygsfL3/9yx8vev3Cr/f/f+YvAIBjtQzo7NKTn7Cvmroo3n7/NvWbfWpe7LQM6NUjnro/OqA31n/Iywd/4PpB8BN/AQAcq2VAlw837efrt1c9vHrwO4tfefabVW03VtVdpPBs+fDZJ3t3ZED/fv8Pefvq4ddOPfkXAMCxWgZ0UbknHjyuo3r7IGLrli4fOb709Xz+7aebx4zlseQPv5l/+/VT/+inBnRh+Rn6l4tP1Z+Z7Lz9zeqZ/+fmT/0LAOBYLQN6+ymffS8D+vJ866Xv68/mtx6t3l5/5fTGMaE7OqAvb/6MzV9wdfUQ9il/AQAca6QBXdZxlbr180nbTysdPCY98kWjRwZ0/aubv2a+/yWCp/wFAHCssQZ0UcDypc3lVyaXMdtu2u39xj7lq58rRwb0uYO/5p1D/9en/AUAcKyRfg10Gc7ye+uQbj/Ds3mW58YxT/YcGdCXD//K/v/1aX8BABxrbM/C70f19qFP5W3f7Cfd1qkDeuRjWwDYGOfrQOclcYuIbR6IElAA4zPOdyItlbcNbV7OtPlSqPmntQHliSMAJ9I0oFu5XNt6L3z5HH7/qZ2rTz6vIw3o0/4CADhW26sx2Zdy3t765HnxmPDZ/7X/ls7tp9xv7H95VBjQp/wFAHCstgEtX3k8eOf5jcn2C5tulDderku2deGmzfNM2oA+5S8AgGM1viL9veUVlQ9dkf7gC5Grq9VvSrZ8F9GZX6+/h9LmvZfCgD7lLwCAY435eyJd3X42fPtp8lUbxQF98i8AgGO1Duih78q5c/g6crcn28+Mz36++b+dWV2wUxzQJ/8CADhW84AufPnz5Sfvz7xovy/89lVBl/60vN7x+lrIc31An/gLAOBYYwgoAIREQAGgEgEFgEoEFAAqEVAAqERAAaASAQWASgQUACoRUACoREABoBIBBYBKBBQAKhFQAKhEQAGgEgEFgEoEFAAqEVAAqNQwoP8HEtyT6MRIVEzFCGh43JPoxEhUTMUIaHjck+jESFRMxQhoeNyT6MRIVEzFCGh43JPoxEhUTMUIaHjck+jESFRMxQhoeNyT6MRIVEzFCGh43JPoxEhUTMUIaHjck+jESFRMxQhoeNyT6MRIVEzFCGh43JPoxEhUTMUIaHjck+jESFRMxQhoeNyT6MRIVEzFCGh43JPoxEhUTMUIaHjck+jESFRMxQhoeNyT6MRIVEzFCGh43JPoxEhUTMUIaHjck+jESFRMxQhoeNyT6MRIVEzFCGh43JPoxEhUTMUIaHjck+jESFRMxQhoeNyT6MRIVEzFCGh43JPoxEhUTMUIaHjck+jESFRMxQhoeNyT6MRIVEzFCGh43JPoxEhUTMUIaHjck+jESFRMxQhoeNyT6MRIVEzFCGh43JPoxEhUTMUIaHjck+jESFRMxQhoeNyT6MRIVEzFCGh43JPoxEhUTMUIaHjck+jESFRMxQhoeNyT6MRIVEzFCGh43JPoxEhUTMUIaHjck+jESFRMxQhoeNyT6MRIVEzFUgX0/+I7RL+fxAioiqkYAUVQ+v0kRkBVTMUIKILS7ycxAqpiKkZAEZR+P4kRUBVTMQKKoPT7SYyAqpiKEVAEpd9PYgRUxVSMgCIo/X4SI6AqpmIEFEHp95MYAVUxFSOgCEq/n8QIqIqpGAFFUPr9JEZAVUzFCCiC0u8nMQKqYipGQBGUfj+JEVAVUzECiqD0+0mMgKqYihFQBKXfT2IEVMVUjIAiKP1+EiOgKqZiBBRB6feTGAFVMRUjoAhKv5/ECKiKqRgBRVD6/SRGQFVMxQgogtLvJzECqmIqRkARlH4/iRFQFVMxAoqg9PtJjICqmIoRUASl309iBFTFVIyAIij9fhIjoCqmYgQUQen3kxgBVTEVI6AISr+fxAioiqkYAUVQ+v0kRkBVTMUIKILS7ycxAqpiKkZAEZR+P4kRUBVTMQKKoPT7SYyAqpiKEVAEpd9PYgRUxVSMgCIo/X4SI6AqpmKnDeiji6+tf/b4yt50+u71rg8IKDT0+0mMgKqIA3pt+tqmpNOlV744/gMCChH9fhIjoCrSgD6+Nt0E9Nr0/PX5g8vT87eO/YCAQkS/n8QIqIoyoP/2wXQT0Pt75RHmo4vnPjnuAwIKFf1+EiOgKsKA3pxO3/vzOqA39398/7gPCChU9PtJjICqKAP66j/O76zzeG36YfmxfHz0BwQUKvr9JEZAVYQB3cri48vrT9Dv752/dfQHq3/m+ZVT/s1P0fpIw5N+P8BJEVAEpd8PcFL6gL7yxdEfHPpH9Y+uWx9peNLvJzE+hVcZPKDdj0AJKAT0+0mMgKoQUOSg309iBFRlmIDyLDy86feTGAFVGSigm1d5rl/6edQHBBQq+v0kRkBVBgoo70SCM/1+EiOgKgMF9PHl6av773g/+gMCChX9fhIjoCoDBXT+YPuaS0d/QEAhot9PYgRUZaiAzh9cWVTy3VtdHxBQaOj3kxgBVREH9BT0t631kYYn/X4SI6AqpmIEFEHp95MYAVUxFSOgCEq/n8QIqIqpGAFFUPr9JEZAVUzFCCiC0u8nMQKqYipGQBGUfj+JEVAVUzECiqD0+0mMgKqYihFQBKXfT2IEVMVUjIAiKP1+EiOgKqZiBBRB6feTGAFVMRUjoAhKv5/ECKiKqRgBRVD6/SRGQFVMxQgogtLvJzECqmIqRkARlH4/iRFQFVMxAoqg9PtJjICqmIoRUASl309iBFTFVIyAIij9fhIjoCqmYgQUQen3kxgBVTEVI6AISr+fxAioiqkYAUVQ+v0kRkBVTMUIKILS7ycxAqpiKkZAEZR+P4kRUBVTMQKKoPT7SYyAqpiKEVAEpd9PYgRUxVSMgCIo/X4SI6AqpmIEFEHp95MYAVUxFSOgCEq/n8QIqIqpGAFFUPr9JEZAVUzFCCiC0u8nMQKqYipGQBGUfj+JEVAVUzECiqD0+0mMgKqYihFQBKXfT2IEVMVUjIAiKP1+EiOgKqZiBBRB6feTGAFVMRUjoAhKv5/ECKiKqRgBRVD6/SRGQFVMxQgogtLvJzECqmIqRkARlH4/iRFQFVMxAoqg9PtJjICqmIoRUASl309iBFTFVIyAIij9fhIjoCqmYgQUQen3kxgBVTEVI6AISr+fxAioiqkYAUVQ+v0kRkBVTMUIKILS7ycxAqpiKkZAEZR+P4kRUBVTMQKKoPT7SYyAqpiKEVAEpd9PYgRUxVSMgCIo/X4SI6AqpmIEFEHp95MYAVUxFSOgCEq/n8QIqIqpGAFFUPr9JEZAVUzFCCiC0u8nMQKqYipGQBGUfj+JEVAVUzECiqD0+0mMgKqYihFQBKXfT2IEVMVUjIAiKP1+EiOgKqZiBBRB6feTGAFVMRUjoAhKv5/ECKiKqRgBRVD6/SRGQFVMxQgogtLvJzECqmIqRkARlH4/iRFQFVMxAoqg9PtJjICqmIoRUASl309iBFTFVIyAIij9fhIjoCqmYgQUQen3kxgBVTEVI6AISr+fxAioiqkYAUVQ+v0kRkBVTMUIKILS7ycxAqpiKkZAEZR+P4kRUBVTMQKKoPT7SYyAqpiKEVAEpd9PYgRUxVSMgCIo/X4SI6AqpmIEFEHp95MYAVUxFSOgCEq/n8QIqIqpGAFFUPr9JEZAVUzFCCiC0u8nMQKqYipGQBGUfj+JEVAVU7GGAdVrfaThqfXaAB6BIiz9fhLjEaiKqRgBRVD6/SRGQFVMxQgogtLvJzECqmIqRkARlH4/iRFQFVMxAoqg9PtJjICqmIoRUASl309iBFTFVIyAIij9fhIjoCqmYgQUQen3kxgBVTEVI6AISr+fxAioiqkYAUVQ+v0kRkBVTMUIKILS7ycxAqpiKkZAEZR+P4kRUBVTMQKKoPT7SYyAqpiKEVAEpd9PYgRUxVSMgCIo/X4SI6AqpmIEFEHp95MYAVUxFSOgCEq/n8QIqIqpGAFFUPr9JEZAVUzFCCiC0u8nMQKqYipGQBGUfj+JEVAVUzECiqD0+0mMgKqYihFQBKXfT2IEVMVUjIAiKP1+EiOgKqZiBBRB6feTGAFVMRUjoAhKv5/ECKiKqRgBRVD6/SRGQFVMxQgogtLvJzECqmIqRkARlH4/iRFQFVMxAoqg9PtJjICqmIoRUASl309iBFTFVIyAIij9fhIjoCqmYgQUQen3kxgBVTEVI6AISr+fxAioiqkYAUVQ+v0kRkBVTMUIKILS7ycxAqpiKkZAEZR+P4kRUBVTMQKKoPT7SYyAqpiKEVAEpd9PYgRUxVSMgCIo/X4SI6AqpmIEFEHp95MYAVUxFSOgCEq/n8QIqIqpGAFFUPr9JEZAVUzFCCiC0u8nMQKqYipGQBGUfj+JEVAVUzECiqD0+0mMgKqYihFQBKXfT2IEVMVUjIAiKP1+EiOgKqZiBBRB6feTGAFVMRUjoAhKv5/ECKiKqRgBRVD6/SRGQFVMxQgogtLvJzECqmIqRkARlH4/iRFQFVMxAoqg9PtJjICqmIoRUASl309iBFTFVIyAIij9fhIjoCqmYgQUQen3kxgBVTEVI6AISr+fxAioiqkYAUVQ+v0kRkBVTMUIKILS7ycxAqpiKkZAEZR+P4kRUBVTMQKKoPT7SYyAqpiKEVAEpd9PYgRUxVSMgCIo/X4SI6AqpmIEFEHp95MYAVUxFSOgCEq/n8QIqIqpGAFFUPr9JEZAVUzFCCiC0u8nMQKqYipGQBGUfj+JEVAVUzECiqD0+0mMgKqYihFQBKXfT2IEVMVUjIAiKP1+EiOgKqZiBBRB6feTGAFVMRUjoAhKv5/ECKiKqRgBRVD6/SRGQFVMxQgogtLvJzECqmIqRkARlH4/iRFQFVMxAoqg9PtJjICqmIoRUASl309iBFTFVIyAIij9fhIjoCqmYgQUQen3kxgBVTEVI6AISr+fxAioiqmYKKCPL083XvliPn908eDni9+8sjedvnudgEJJv5/ECKiKS0Dv720FdF3TVUwJKET0+0mMgKoME9CN+3vnPln8cGf62sGvXZuevz5/cHl6/hYBhY5+P4kRUJVBA7p4IPr+qpnvbzV1/Ti0pJWAQkS/n8QIqMqgAb25epj5+PJWLG+uH43e3IoqAcWp6feTGAFVGTKgjy5OP1z9eP53H0ynP72+/ODa6tcOf1pPQHFa+v0kRkBVhgzo5sHm5jmkZTr3H43e39t8EfT5FeXfvNL6SMOTfj/ASSkDuv9lzjvT6Xu35n+5Ml18TEAxDP1+gJNSBvTO5on2zSPR5XNJWwE1L2TSP7pufaThSb+fxPgUXmW4gD6+vP5q56GiPuURKAGFgH4/iRFQleEC+sRDzPIrBBTD0O8nMQKqMlxAn3iafdVMnoXHIPT7SYyAqgwX0P1Xz+9/Ll+auXn9J68DhZR+P4kRUJXBArr16vlrqwebq5DyTiQMQr+fxAioymABfXRx/0ug9/eWL2N68EF5Vn6R0Vd5Lzzk9PtJjICqDBbQ7SeJbq4vxnR9+cEDrsaEAej3kxgBVRksoHe2H2I++Nl0eu699ccPriz6+e4t+w/ob1vrIw1P+v0kRkBVBgvoielvW+sjDU/6/SRGQFVMxQgogtLvJzECqmIqRkARlH4/iRFQFVMxAoqg9PtJjICqmIoRUASl309iBFTFVKwjoLM/fvY5AcUY6feTGAFV6RvQe//pm/n84euTyeTMLwgoxke/n8QIqErPgN6YfO+38/nVydLyZwQUI6PfT2IEVKVfQG+XbN7dnTz7zb0Lk5cJKEZHv5/ECKhKv4BeXZRzmdGdXyz/d/lzAopx0e8nMQKq0iugs0vLcq4z+vDCMJ/D629b6yMNT/r9JEZAVXoFdNXMhxcmz80JKMZJv5/ECKjKCQJ6d3fyDgHFSOn3kxgBVekV0NWn8DfKl0D5GihGSb+fxAioSq+Azq9Onls+/b4sJ8/CY5T0+0mMgKr0C+jt8gLQxWfws59PVo9DCSjGRb+fxAioSr+ALj59X3iuPJG0884g/SSgOBX9fhIjoCo9Azq/99FPPl788PBHP/jNMP0koDgV/X4SI6AqfQM6PP1ta32k4Um/n8QIqIqp2LEBnX09YD8JKE5Fv5/ECKiKqdjRAf3yx8v3wz/80VuDvIaJgOKU9PtJjICq9Azo7NPVdZgeXpicGeZiTAQUp6LfT2IEVKVnQK9OJmf+evd7v5393WSg19ETUJyKfj+JEVCVfgG9PZm8vX4P5x9Wb+gkoBgX/X4SI6Aq/QJ6dfnuo/Wb4G+US4oQUIyLfj+JEVCVXgFdvRd+HdC7u1xMBOOj309iBFSlV0A3l7Mr5eRqTBgj/X4SI6AqBBQ56PeTGAFV6RXQ2aXlE0frcnI5O4yRfj+JEVCVXgFdPXG0CugipjyJhPHR7ycxAqrSL6B3dycvfVMCeu91LmeHMdLvJzECqtIvoOVydmd3d178/uLHYa6nTEBxKvr9JEZAVXoGdP773cnaQP0koDgV/X4SI6AqfQM6//ZXZxf1fGawy4ESUJyKfj+JEVCV3gEdnP62tT7S8KTfT2IEVMVUjOuBIij9fhIjoCqmYlwPFEHp95MYAVXpGVCuB4qR0+8nMQKq0jOgXA8UI6ffT2IEVKVfQLkeKMZOv5/ECKhKv4ByPVCMnX4/iRFQlV4B5XqgGD39fhIjoCq9Asrl7DB6+v0kRkBVCChy0O8nMQKq0iugXA8Uo6ffT2IEVKVXQLkeKEZPv5/ECKhKv4ByPVCMnX4/iRFQlX4B5XqgGDv9fhIjoCo9A8r1QDFy+v0kRkBV+gaU64Fi3PT7SYyAqvQO6OD0t631kYYn/X4SI6AqpmIEFEHp95MYAVUxFTvihfQ/emnQaykTUJyafj+JEVCVfgG9MJk8M9iVlAkoBPT7SYyAqvQK6OpyypMzHw/ZUP1ta32k4Um/n8QIqEqvgC786celoS98TEAxSvr9JEZAVfoGdL76rkgLQ72QSX/bWh9peNLvJzECqnKCgC4+lf/y9WVCd94a4ikl/W1rfaThSb+fxAioyokCuvDtz8tbkl7QPwzV37bWRxqe9PtJjICqnCigs199f/OGzslLBBRjot9PYgRUpX9AN/VcPhf/7af698Trb1vrIw1P+v0kRkBVegZ0/dXPg1eD6i+rrL9trY80POn3kxgBVekV0NmliX3ySP+NPfS3rfWRhif9fhIjoCq9Arp8J9LO4ZcvPbzAI1CMiX4/iRFQlZ4B/cGvzS/NPle/lEl/21ofaXjS7ycxAqrSK6Au9Let9ZGGJ/1+EiOgKqZiBBRB6feTGAFVMRXruCL9ztlB3oREQHFq+v0kRkBV+gb0xv4r6PmeSBgj/X4SI6AqPQO67OczL775Bt+VEyOl309iBFSlX0Dv7k6eXb2K6d4lvi88xki/n8QIqEq/gF49eN/R7NLkOQKK0dHvJzECqtIroLNLW4867+6qX0JPQHF6+v0kRkBVegX00Ps29W/iJKA4Pf1+EiOgKgQUOej3kxgBVekV0NmlyTv7H+ivw0RAcXr6/SRGQFV6BZQnkTB6+v0kRkBV+gX07u7kzOpyIn96nZcxYYz0+0mMgKr0C+jqjUhnz54d8q1Icq2PNDy1XhtwzFs5/7C7fifnztsD/dX6/zi0PtLwpN9PYjwCVekb0PnsyzcWj0Bf/HiQJ5AIKE5Lv5/ECKhK74AOTn/bWh9peNLvJzECqmIqRkARlH4/iRFQFVMxG9DZR28+6Se8DhSjo99PYgRUpSOgy28n9wTeiYTx0e8nMQKqQkCRg34/iRFQlY6AOtLfttZHGp70+0mMgKqYihFQBKXfT2IEVMVU7PiAfjVcPgkoTke/n8QIqIqp2NEB/fLH5X1IP/gNAcUY6feTGAFV6RnQ2aX9p5BeGui9SPrb1vpIw5N+P4kRUJV+AV32c+fFf/jsn97YnQx0NTsCilPR7ycxAqrSL6A3JpMfrh54zn452bq4MgHFWOj3kxgBVekV0MUD0INr2F3lgsoYIf1+EiOgKr0C+vDCoe/KyQvpMT76/SRGQFV6BpRvKoeR0+8nMQKq0iugfF94jJ5+P4kRUJVeAZ3f2Pq65w2+BooR0u8nMQKq0i+gs0v7L/+8MdC1RAgoTkW/n8QIqEqvgM4+Wr7+88W3Pvvn5Y8vDHNVUP1ta32k4Um/n8QIqEqvgLpc1E5/21ofaXjS7ycxAqpCQJGDfj+JEVCVXgF1ob9trY80POn3kxgBVTEVI6AISr+fxAioiqkYAUVQ+v0kRkBVTMWODugfP9v3OS+kx+jo95MYAVXpGdDf7/JN5TBq+v0kRkBV+gX0Nt+VEyOn309iBFSlV0BnlyY7H3+17+sh+klAcSr6/SRGQFV6BfThhYEuokxAoaLfT2IEVKVnQAd6/zsBhYp+P4kRUJVeAZ1dIqAYOf1+EiOgKr0COr/Bp/AYOf1+EiOgKv0Ceuh7ehBQjJB+P4kRUJV+AZ3fuzA58+aG+kJ2BBSnp99PYgRUpWdAP+V1oBg3/X4SI6Aq/QJ6gxfSY+T0+0mMgKr0Cmh5If0gn7cTUIjo95MYAVXpFVCP55AIKE5Fv5/ECKhKz4DyOlCMnH4/iRFQlV4B5YX0GD39fhIjoCq9Ajq/MXmZgGLU9PtJjICq9Avo7NLO2wQUY6bfT2IEVKVXQGcfvTGZ7LzIC+kxXvr9JEZAVXoF1HxbY14HivHR7ycxAqpCQJGDfj+JEVCVXgF1ob9trY80POn3kxgBVTEVI6AISr+fxAioiqkYAUVQ+v0kRkBVTMVsQGd/tN8F/uGPz77A10AxOvr9JEZAVToC+vDC6imj2UebFy9tfoWAYlT0+0mMgKr0DOhBNgkoRkm/n8QIqAoBRQ76/SRGQFUIKHLQ7ycxAqpCQJGDfj+JEVAVAooc9PtJjICqEFDkoN9PYgRUhYAiB/1+EiOgKgQUOej3kxgBVSGgyEG/n8QIqAoBRQ76/SRGQFUIKHLQ7ycxAqrSHdAnEVCMj34/iRFQFQKKHPT7SYyAqnQEdPbRm0/im8phfPT7SYyAqnQE1JH+trU+0vCk309iBFTFVIyAIij9fhIjoCqmYgQUQen3kxgBVTEVI6AISr+fxAioiqkYAUVQ+v0kRkBVTMUIKILS7ycxAqpiKkZAEZR+P4kRUBVTMQKKoPT7SYyAqpiKEVAEpd9PYgRUxVTsiXciXdr5xeKHb78moBg3/X4SI6AqHQF9eGH5xvfV/xJQjJh+P4kRUJXOgC4fgRJQjJ5+P4kRUJWOgM4uTZ79/Ks/Xfjer786MMzn8/rb1vpIw5N+P4kRUJWOgM5vcDk7hKDfT2IEVKUroLNP6wL66OK0eOWL5UePr+xNp+9eX/3WoQ8IKDT0+0mMgKp0BXSR0K8+++fdnX/47MDnPa4Hen9vK6Drmq5ieugDAgoR/X4SI6Aq3QGdVz2JdGf62sEH16bnr88fXJ6ev2U/IKAQ0e8nMQKq0iugs49OfBH6a9P3939+f2/9OPTcJ+YDAgoV/X4SI6AqvQJ6co8vb/Xx5vrR6M1lVA99QEChot9PYgRUpXdAv/3V2clk5+xb/V7D9Oji+d99MJ3+9Pryg2vTD8svlk/rD31AQKGi309iBFSlb0APXs70cp+Abp5DWtZy/9Ho/b3ztw59sPr/Pr/S5489mdZHGp70+wFO6qiALvv5zItvvvH9ngW9M52+d2v+lyvTRS4JKBzo9wOc1BEBvbs7efY35Wf3Lk3K5UU6bL7SuXwuaauZr3xx6IND/4j+0XXrIw1P+v0kxqfwKv0CenXy7OZp+NmlyXPdAd24MzUPOp/yCJSAQkC/n8QIqEqvgK4vardyd/fZ/q9pMg86CSiGot9PYgRUpVdAD72Q/kSvqi+Z5Fl4DE+/n8QIqMowAX18eTuTm5d8rl8HuvUBAYWKfj+JEVCVXgGdXZq8s//B7UmPT+GvrR5frkLKO5EwPP1+EiOgKr0CevInke7vLV/G9OCD8o73RUZf3X/7+6EPCChU9PtJjICq9Avo3d3JmV+Xn/3p9V4vY1p8hr665tL15QcPti/A9ICrMWEA+v0kRkBV+gV09Uaks2fP9n4r0vzBz6bTc++tH2U+uLJI5rtP+4CAQkO/n8QIqErPgM7/sLt+J+fO2736eXL629b6SMOTfj+JEVCVvgGdz758Y/EI9MWPT3pdOwIKF/r9JEZAVXoHdHD629b6SMOTfj+JEVAVUzECiqD0+0mMgKqYihFQBKXfT2IEVMVUjIAiKP1+EiOgKqZiBBRB6feTGAFVMRUjoAhKv5/ECKiKqRgBRVD6/SRGQFVMxQgogtLvJzECqmIqRkARlH4/iRFQFVOxo67G9IPfEFCMmn4/iRFQlV4BfXhh63qgBBRjpN9PYgRUpWdAT/BdPAgoWtDvJzECqtIroIe+qRwBxRjp95MYAVXpFdD5jc23hSegGCn9fhIjoCr9AvrtLyeTZ158c+0ng1zSTn/bWh9peJuln3QAABwGSURBVNLvJzECqtIroA8vTLYN8wVR/W1rfaThSb+fxAioCgFFDvr9JEZAVXoF1IX+trU+0vCk309iBFTFVIyAIij9fhIjoCqmYscGdPb1gP0koDgV/X4SI6AqpmJHB/TLHy+/+PnwR28N9V3l9Let9ZGGJ/1+EiOgKj0DOvt09ezRwwuTMwO9KUl/21ofaXjS7ycxAqrSM6BXJ5Mzf737vd/O/m4yeXaYx6D629b6SMOTfj+JEVCVfgG9PZm8vX5H/B92B7qwiP62tT7S8KTfT2IEVKVfQK9OXt6/pMiNyXMEFKOj309iBFSlV0BXFxNZB/TuLi+kx/jo95MYAVXpFdBVOtcBHeradvrb1vpIw5N+P4kRUBUCihz0+0mMgKr0Cujs0vKJo3U5bw/0NLz+trU+0vCk309iBFSlV0BXTxytArqIKU8iYXz0+0mMgKr0C+jd3clL35SA3nt9MtDV6fW3rfWRhif9fhIjoCr9Arp4CDqZnN3defH7ix9fHqSfBBSnot9PYgRUpWdA57/f3VwNdKB+ElCcin4/iRFQlb4BnX/7q7OLej4z3DeI19+21kcanvT7SYyAqvQO6OD0t631kYYn/X4SI6AqpmLHXw/0qwH7SUBxKvr9JEZAVUzFjr8e6AKfwmOc9PtJjICq9Azo7NL+t5R7aaArKutvW+sjDU/6/SRGQFX6BXTZz50X//Nn//TGoqDDvI6egOJU9PtJjICq9Avo7f1XL81+OeF6oBgh/X4SI6AqvQK6eAB68OrPq7yVEyOk309iBFSlV0AfXth6+ybXA8UY6feTGAFV6RnQrWZyOTuMkX4/iRFQlV4BXV2Rfu3uLpezw/jo95MYAVXpFdBD3wfpxkDvhtffttZHGp70+0mMgKr0C+jDC5MffrPp5zCfwRNQnIp+P4kRUJWOgM4+erN4Y/U60H9+c3cyefEnfAqP0dHvJzECqtIR0MVDzyfxJBLGR7+fxAioCgFFDpUj+X/4DpH2pegIqCP9bWt9pOGpciStjzQ8SftSmIoRUARVOZLWRxqepH0pTMUIKIKqHEnrIw1P0r4UpmJHB/SPn+37nGfhMTqVI2l9pOFJ2peiZ0APvqccTyJhlCpH0vpIw5O0L0W/gN7mWXiMXOVIWh9peJL2pegV0Nmlyc7HX+37eoh+ElCcSuVIWh9peJL2pegV0IcXBrqIMgGFSuVIWh9peJL2pegZ0IHe/05AoVI5ktZHGp6kfSl6BXR2iYBi5CpH0vpIw5O0L0WvgM5v8Ck8Rq5yJK2PNDxJ+1L0C+ih7+lBQDFClSNpfaThSdqXol9A5/cuTM68ucHl7DA+lSNpfaThSdqXomdAP+V1oBi3ypG0PtLwJO1L0S+gN3ghPUauciStjzQ8SftS9ApoeSH9IJ+3E1CIVI6k9ZGGJ2lfil4B9XgOiYDiVCpH0vpIw5O0L0XPgPI6UIxc5UhaH2l4kval6BVQXkiP0ascSesjDU/SvhS9AjrY94InoFCpHEnrIw1P0r4U/QI6u7TzNgHFmFWOpPWRhidpX4peAZ19VL4vPC+kx3hVjqT1kYYnaV+KXgE139yY14FifCpH0vpIw5O0LwUBRQ6VI2l9pOFJ2peiV0Bd6G9b6yMNT5UjaX2k4Unal8JUjIAiqMqRtD7S8CTtS2EqRkARVOVIWh9peJL2pTAVOyKg3361jW8qh/GpHEnrIw1P0r4UvQLq8iSSXusjDU+VI2l9pOFJ2pen4Vl4BFU5ktZHGp6kfSl6BXT2x8/W/v71yc4/fM4L6TE6lSNpfaThSdqXoldAt93dfXaYK4Pqb1vrIw1PlSNpfaThSdqX4sQBHezCIvrb1vpIw1PlSFofaXiS9qU4eUCHegiqv22tjzQ8VY6k9ZGGJ2lfipMHdKirK+tvW+sjDU+VI2l9pOFJ2pfi5AG9u0tAMT6VI2l9pOFJ2pfixAGdXZ3wKTzGp3IkrY80PEn7UvQK6OyjzaVA33xjd8KTSBihypG0PtLwJO1L0Sugh19Iz8uYMEKVI2l9pOFJ2pfixAF95q2BvkG8/ra1PtLwVDmS1kcanqR9KXoF1IX+trU+0vBUOZLWRxqepH0pTMUIKIKqHEnrIw1P0r4UpmIEFEFVjqT1kYYnaV8KUzECiqAqR9L6SMOTtC+FqZgN6NYLmA7wbY0xPpUjaX2k4Unal6IjoOZKoFwPFGNVOZLWRxqepH0pCChyqBxJ6yMNT9K+FB0Btb7cnfBOJIxR5UhaH2l4kvalOFFAZz9f5PPMbwbpJwHFqVSOpPWRhidpX4qTBPQPi4efO0O9EYmA4lQqR9L6SMOTtC9F/4AO+vCTgOKUKkfS+kjDk7QvRe+Aloef/26wfBJQnE7lSFofaXiS9qXoGdB7Az/8JKA4pcqRtD7S8CTtS9EvoIM//CSgOKXKkbQ+0vAk7UvRJ6D3Li2vAjrow08CilOqHEnrIw1P0r4UPQJaHn6+PXA+CShOp3IkrY80PEn7UnQG1OfhJwHFKVWOpPWRhidpX4qugP7e5+EnAcUpVY6k9ZGGJ2lfio6A8l54BFE5ktZHGp6kfSkIKHKoHEnrIw1P0r4UHQHleqAIonIkrY80PEn7UnQE1JH+trU+0vBUOZLWRxqepH0pTMUIKIKqHEnrIw1P0r4UpmIEFEFVjqT1kYYnaV8KUzECiqAqR9L6SMOTtC+FqRgBRVCVI2l9pOFJ2pfCVIyAIqjKkbQ+0vAk7UthKkZAEVTlSFofaXiS9qUwFSOgCKpyJK2PNDxJ+1KYihFQBFU5ktZHGp6kfSlMxQgogqocSesjDU/SvhSmYgQUQVWOpPWRhidpXwpTMQKKoCpH0vpIw5O0L4WpGAFFUJUjaX2k4Unal8JUjIAiqMqRtD7S8CTtS2EqRkARVOVIWh9peJL2pTAVI6AIqnIkrY80PEn7UpiKEVAEVTmS1kcanqR9KUzFCCiCqhxJ6yMNT9K+FKZiBBRBVY6k9ZGGJ2lfClMxAoqgKkfS+kjDk7QvhakYAUVQlSNpfaThSdqXwlSMgCKoypG0PtLwJO1LYSpGQBFU5UhaH2l4kvalMBUjoAiqciStjzQ8SftSmIoRUARVOZLWRxqepH0pTMUIKIKqHEnrIw1P0r4UpmIEFEFVjqT1kYYnaV8KUzECiqAqR9L6SMOTtC+FqRgBRVCVI2l9pOFJ2pfCVIyAIqjKkbQ+0vAk7UthKkZAEVTlSFofaXiS9qUwFSOgCKpyJK2PNDxJ+1KYihFQBFU5ktZHGp6kfSlMxQgogqocSesjDU/SvhSmYgQUQVWOpPWRhidpXwpTMQKKoCpH0vpIw5O0L4WpGAFFUJUjaX2k4Unal8JUjIAiqMqRtD7S8CTtS2EqRkARVOVIWh9peJL2pTAVI6AIqnIkrY80PEn7UpiKEVAEVTmS1kcanqR9KUzFCCiCqhxJ6yMNT9K+FKZiBBRBVY6k9ZGGJ2lfClMxAoqgKkfS+kjDk7QvhakYAUVQlSNpfaThSdqXwlSMgCKoypG0PtLwJO1LYSpGQBFU5UhaH2l4kvalMBUjoAiqciStjzQ8SftSmIrpAvpvP5tOz717vfz80cVp8coXy48eX9mbTte/Q0AhUjmS1kcanqR9KYYK6L+sknnuk+UH9/e2Arqu6SqmBBQilSNpfaThSdqXYqCA3pme+9v5/MHlVSfvTF87+K1r0/PXl79z/hYBhU7lSFofaXiS9qUYJqCPL08/XP64eLT5YWnm+/u/dX9v/Th09eCUgEKjciStjzQ8SftSDBPQRxfXn6GXdD6+vBXLm+tHoze3okpAcWqVI2l9pOFJ2pdimIDuKwF9dPH87z6YTn96ffUr5bHp4U/rCShOq3IkrY80PEn7Ugwb0NUn6pvnkJbp3H80en9v80XQ51e0f/NS6yMNT5UjaX2k4Unal6cRB3T1+fqd6fS9W/O/XFk+J09AMYzKkbQ+0vAk7cvTaAN6Z/Uyps2XPZefz28F1LyQSf/ouvWRhqfKkbQ+0vAk7UsxZEDv7J378HBPz996yiNQAgqBypG0PtLwJO1LMWBAb07NK5WWDzoJKIZROZLWRxqepH0phgvov9h+rprJs/AYROVIWh9peJL2pRgqoI+vTV9df41z86r6VTM3r//kdaCQqhxJ6yMNT9K+FEMF9NrWWzWvrR5srkLKO5EwiMqRtD7S8CTtSzFQQG9uv9X9/t7yZUwPPii/tsjoq7wXHnKVI2l9pOFJ2pdimIBurl+38FrJ6eoCTNeXv/eAqzFhAJUjaX2k4Unal2KYgN6ZHgro/MHy4qDvrR9yPriy+OV3b9l/Rn/bWh9peKocSesjDU/SvhTDBLSG/ra1PtLwVDmS1kcanqR9KUzFCCiCqhxJ6yMNT9K+FKZiBBRBVY6k9ZGGJ2lfClMxAoqgKkfS+kjDk7QvhakYAUVQlSNpfaThSdqXwlSMgCKoypG0PtLwJO1LYSpGQBFU5UhaH2l4kvalMBUjoAiqciStjzQ8SftSmIoRUARVOZLWRxqepH0pTMUIKIKqHEnrIw1P0r4UpmIEFEFVjqT1kYYnaV8KUzECiqAqR9L6SMOTtC+FqRgBRVCVI2l9pOFJ2pfCVIyAIqjKkbQ+0vAk7UthKkZAEVTlSFofaXiS9qUwFSOgCKpyJK2PNDxJ+1KYihFQBFU5ktZHGp6kfSlMxQgogqocSesjDU/SvhSmYgQUQVWOpPWRhidpXwpTMQKKoCpH0vpIw5O0L4WpGAFFUJUjaX2k4Unal8JUjIAiqMqRtD7S8CTtS2EqRkARVOVIWh9peJL2pTAVI6AIqnIkrY80PEn7UpiKEVAEVTmS1kcanqR9KUzFCCiCqhxJ6yMNT9K+FKZiBBRBVY6k9ZGGJ2lfClMxAoqgKkfS+kjDk7QvhakYAUVQlSNpfaThSdqXwlSMgCKoypG0PtLwJO1LYSpGQBFU5UhaH2l4kvalMBUjoAiqciStjzQ8SftSmIoRUARVOZLWRxqepH0pTMUIKIKqHEnrIw1P0r4UpmIEFEFVjqT1kYYnaV8KUzECiqAqR9L6SMOTtC+FqRgBRVCVI2l9pOFJ2pfCVIyAIqjKkbQ+0vAk7UthKkZAEVTlSFofaXiS9qUwFSOgCKpyJK2PNDxJ+1KYihFQBFU5ktZHGp6kfSlMxQgogqocSesjDU/SvhSmYgQUQVWOpPWRhidpXwpTMQKKoCpH0vpIw5O0L4WpGAFFUJUjaX2k4Unal8JUjIAiqMqRtD7S8CTtS2EqRkARVOVIWh9peJL2pTAVI6AIqnIkrY80PEn7UpiKEVAEVTmS1kcanqR9KUzFCCiCqhxJ6yMNT9K+FKZiBBRBVY6k9ZGGJ2lfClMxAoqgKkfS+kjDk7QvhakYAUVQlSNpfaThSdqXwlSMgCKoypG0PtLwJO1LYSpGQBFU5UhaH2l4kvalMBUjoAiqciStjzQ8SftSmIoRUARVOZLWRxqepH0pTMUIKIKqHEnrIw1P0r4UpmIEFEFVjqT1kYYnaV8KUzECiqAqR9L6SMOTtC+FqRgBRVCVI2l9pOFJ2pfCVIyAIqjKkbQ+0vAk7UthKkZAEVTlSFofaXiS9qUwFSOgCKpyJK2PNDxJ+1KYihFQBFU5ktZHGp6kfSlMxQgogqocSesjDU/SvhSmYgQUQVWOpPWRhidpXwpTMQKKoCpH0vpIw5O0L4WpGAFFUJUjaX2k4Unal8JUjIAiqMqRtD7S8CTtS2EqRkARVOVIWh9peJL2pTAVI6AIqnIkrY80PEn7UpiKEVAEVTmS1kcanqR9KUzFCCiCqhxJ6yMNT9K+FKZiBBRBVY6k9ZGGJ2lfClMxAoqgKkfS+kjDk7QvhakYAUVQlSNpfaThSdqXwlSMgCKoypG0PtLwJO1LYSpGQBFU5UhaH2l4kvalMBVrGFC91kcanipH0vpIw5O0L0/DI1AEVTmS1kcanqR9KUzFCCiCqhxJ6yMNT9K+FKZiBBRBVY6k9ZGGJ2lfClMxAoqgKkfS+kjDk7QvhakYAUVQlSNpfaThSdqXwlSMgCKoypG0PtLwJO1LYSpGQBFU5UhaH2l4kvalMBUjoAiqciStjzQ8SftSmIoRUARVOZLWRxqepH0pTMUIKIKqHEnrIw1P0r4UpmIEFEFVjqT1kYYnaV8KUzECiqAqR9L6SMOTtC+FqRgBRVCVI2l9pOFJ2pfCVIyAIqjKkbQ+0vAk7UthKkZAEVTlSFofaXiS9qUwFSOgCKpyJK2PNDxJ+1KYihFQBFU5ktZHGp6kfSlMxQgogqocSesjDU/SvhSmYgQUQVWOpPWRhidpXwpTMQKKoCpH0vpIw5O0L4WpGAFFUJUjaX2k4Unal8JUjIAiqMqRtD7S8CTtS2EqRkARVOVIWh9peJL2pTAVI6AIqnIkrY80PEn7UpiKEVAEVTmS1kcanqR9KUzFCCiCqhxJ6yMNT9K+FKZiBBRBVY6k9ZGGJ2lfClMxAoqgKkfS+kjDk7QvhakYAUVQlSNpfaThSdqXwlSMgCKoypG0PtLwJO1LYSpGQBFU5UhaH2l4kvalMBUjoAiqciStjzQ8SftSmIoRUARVOZLWRxqepH0pTMUIKIKqHEnrIw1P0r4UpmIEFEFVjqT1kYYnaV8KUzECiqAqR9L6SMOTtC+FqRgBRVCVI2l9pOFJ2pfCVIyAIqjKkbQ+0vAk7UthKkZAEVTlSFofaXiS9qUwFSOgCKpyJK2PNDxJ+1KYihFQBFU5ktZHGp6kfSlMxQgogqocSesjDU/SvhSmYgQUQVWOpPWRhidpXwpTMQKKoCpH0vpIw5O0L4WpGAFFUJUjaX2k4Unal8JUjIAiqMqRtD7S8CTtS2EqRkARVOVIWh9peJL2pTAVI6AIqnIkrY80PEn7UpiKEVAEVTmS1kcanqR9KUzFCCiCqhxJ6yMNT9K+FKZiBBRBVY6k9ZGGJ2lfClMxAoqgKkfS+kjDk7QvhakYAUVQlSNpfaThSdqXwlSMgCKoypG0PtLwJO1LYSpGQBFU5UhaH2l4kvalMBUjoAiqciStjzQ8SftSmIoRUARVOZLWRxqepH0pTMUIKIKqHEnrIw1P0r4UpmIEFEFVjqT1kYYnaV8KUzECiqAqR9L6SMOTtC+FqRgBRVCVI2l9pOFJ2pfCVIyAIqjKkbQ+0vAk7UthKkZAEVTlSFofaXiS9qUwFSOgCKpyJK2PNDxJ+1KYihFQBFU5ktZHGp6kfSlMxQgogqocSesjDU/SvhSmYgQUQVWOpPWRhidpXwpTMQKKoCpH0vpIw5O0L4WpGAFFUJUjaX2k4Unal8JUjIAiqMqRtD7S8CTtS2EqRkARVOVIWh9peJL2pTAVI6AIqnIkrY80PEn7UpiKEVAEVTmS1kcanqR9KUzFCCiCqhxJ6yMNT9K+FKZiBBRBVY6k9ZGGJ2lfClMxAoqgKkfS+kjDk7QvhakYAUVQlSNpfaThSdqXwlSMgCKoypG0PtLwJO1LYSpGQBFU5UhaH2l4kvalMBUjoAiqciStjzQ8SftSmIp5BPTxlb3p9N3rBBRKlSNpfaThSdqXwj+gjy5Ol175goBCqHIkrY80PEn7UvgH9Nr0/PX5g8vT87cIKHQqR9L6SMOTtC+Fe0Dv75XHno8unvuEgEKnciStjzQ8SftSuAf05vS19Y/vE1DoVI6k9ZGGJ2lfCveAXpt+WH68sw4pAYVE5UhaH2l4kval8A7o48vrT93v722+CPr8iv7van2k4alyJK2PNDxJ+/I0qQIKAJ48A2peyKR/dP3dxD2JToxEpWFAzeuYWt8TWXBPohMjUSGg2XBPohMjUfEOqOez8N9N3JPoxEhU3AO6ef2nw+tAv5u4J9GJkai4B9TxnUjfTdyT6MRIVNwD+vjy9FWn98J/N3FPohMjUXEP6PyB29WYvpu4J9GJkaj4B3T+4Mqin+/esr/c+p7IgnsSnRiJSoOAHqH1PZEF9yQ6MRIVUzECGh73JDoxEhVTMQIaHvckOjESFVMxAhoe9yQ6MRIVUzECGh73JDoxEhVTMQIaHvckOjESFVMxAhoe9yQ6MRIVUzECGh73JDoxEhVTMQIaHvckOjESFVMxAhoe9yQ6MRIVUzECGh73JDoxEhVTMQIaHvckOjESFVMxAhoe9yQ6MRIVUzECGh73JDoxEhVTMQIaHvckOjESFVMxAhoe9yQ6MRIVUzECGh73JDoxEhVTMQIaHvckOjESFVMxAhoe9yQ6MRIVUzECGh73JDoxEhVTMQIaHvckOjESFVMxAhoe9yQ6MRIVUzECGh73JDoxEhVTMQIaHvckOjESFVMxAhoe9yQ6MRIVUzECGh73JDoxEhVTMQIaHvckOjESFVOxhgGFxvPPt/43wOgxkoEQ0PA4G+jESAZCQMPjbKATIxkIAQ2Ps4FOjGQgBDQ8zgY6MZKBENDwOBvoxEgGQkDD42ygEyMZCAEFgEoEFAAqEVAAqERAAaASAQWASgQUACoRUACoREABoBIBDeHRxen7+z995Yum/y4Yk8eXp+dv7f/0w7b/Mt9BBDSERUDPfbL5KQHFgft7m/+23tlPKdwQ0BAWAZ2+tvkpAcWWm9PVIB5d3Pw3Fn4IaAiLw/E368/PCCgO2Xx55+bmP7FwREBDWFTzf+xtHmisfnxwZTqdvnu96b8WxuBO+fLO/fU+FsPYm05/en31858tRvLv/7bhv1x2BDSEZTXXjzDWAb2zOCUL53ja4Dvv8eXlMq6tP0O5vzWM9c95aDocAhrCsprrJ1lXAV0cjXf/9/zxv0z5uhfu75375P7e6hmkxSf0792aP/7X5RdGF4v5D4tf/Lc9RjIYAhpCqebqk7RVQDdf8LrGowssVnD+v6wjuRnGzen7PK3kgICGsKpmqWX56f5L/njpCrZfpPH48rqZy0eki5W8+j9b/nt9BxDQEFYBLY8oyk/3H1vwnDzmy/+OrmewaObG4lduLn989b/yn9jhENAQNs8cLR5vrgO6PjAEFPPV483yk+Vj0YOAzv/8N+Wn75HQoRDQEDadvDZ9n0egeMJWQM2XPR//9+Urmd5/2j8EAQIawqaTi/Px3/gaKKz9gD7t/fCP/5WRDIaAhrD/QPPO9K/2eBYexn5AF8NY/Wz5X9bNa+sPfhdqBDSEg8/Ur62+uLV6HehfrvA6UMy3E/no4vT89fn8z3uLR6LLKzUtfv7gMv+VHQwBDeEgoIty8k4kGFuPMdfDmL43P3gn0qt8nXwoBDSEreeKNhff4b3w2Lf9SfrqvfD/ePDzv/qPfAI/GAIKAJUIKABUIqAAUImAAkAlAgoAlQgoAFQioABQiYACQCUCCgCVCCgAVCKgAFCJgAJAJQIKAJUIKABUIqAAUImAAkAlAgoAlQgoAFQioABQiYACQCUCCgCVCCgAVCKgAFCJgAJAJQIKAJUIKABUIqAAUImAAkAlAgoAlQgoAFQioABQiYACQCUCCgCVCCgAVCKgAFCJgAJAJQIKAJUIKABUIqAAUImAAkAlAgoAlQgoAFQioABQiYACQCUCCgCVCCgAVCKgAFCJgAJAJQIKAJUIKABUIqAAUOn/A71FEGOQyBlxAAAAAElFTkSuQmCC">
+            <a:extLst>
+              <a:ext uri="{FF2B5EF4-FFF2-40B4-BE49-F238E27FC236}">
+                <a16:creationId xmlns="" xmlns:a16="http://schemas.microsoft.com/office/drawing/2014/main" id="{8CC047BC-7FEC-4EB1-BCEA-02FB6A9AD576}"/>
+              </a:ext>
+            </a:extLst>
+          </p:cNvPr>
+          <p:cNvSpPr>
+            <a:spLocks noChangeAspect="1" noChangeArrowheads="1"/>
+          </p:cNvSpPr>
+          <p:nvPr/>
+        </p:nvSpPr>
+        <p:spPr bwMode="auto">
+          <a:xfrm>
+            <a:off x="5963478" y="3296478"/>
+            <a:ext cx="284922" cy="284922"/>
           </a:xfrm>
           <a:prstGeom prst="rect">
             <a:avLst/>
           </a:prstGeom>
           <a:noFill/>
+          <a:extLst>
+            <a:ext uri="{909E8E84-426E-40DD-AFC4-6F175D3DCCD1}">
+              <a14:hiddenFill xmlns:a14="http://schemas.microsoft.com/office/drawing/2010/main">
+                <a:solidFill>
+                  <a:srgbClr val="FFFFFF"/>
+                </a:solidFill>
+              </a14:hiddenFill>
+            </a:ext>
+          </a:extLst>
         </p:spPr>
         <p:txBody>
-          <a:bodyPr wrap="square" rtlCol="0">
-            <a:spAutoFit/>
+          <a:bodyPr vert="horz" wrap="square" lIns="91440" tIns="45720" rIns="91440" bIns="45720" numCol="1" anchor="t" anchorCtr="0" compatLnSpc="1">
+            <a:prstTxWarp prst="textNoShape">
+              <a:avLst/>
+            </a:prstTxWarp>
           </a:bodyPr>
           <a:lstStyle/>
           <a:p>
-            <a:r>
-              <a:rPr lang="en-US" sz="2000" dirty="0">
-                <a:solidFill>
-                  <a:srgbClr val="002060"/>
-                </a:solidFill>
-              </a:rPr>
-              <a:t>The data, and information on our code, our full report, and our methods can be </a:t>
-            </a:r>
-            <a:r>
-              <a:rPr lang="en-US" sz="2000">
-                <a:solidFill>
-                  <a:srgbClr val="002060"/>
-                </a:solidFill>
-              </a:rPr>
-              <a:t>found online at:</a:t>
-            </a:r>
-            <a:endParaRPr lang="en-US" sz="2000" dirty="0">
-              <a:solidFill>
-                <a:srgbClr val="002060"/>
-              </a:solidFill>
-            </a:endParaRPr>
-          </a:p>
-          <a:p>
-            <a:endParaRPr lang="en-US" sz="2000" dirty="0">
-              <a:solidFill>
-                <a:srgbClr val="002060"/>
-              </a:solidFill>
-            </a:endParaRPr>
-          </a:p>
-          <a:p>
-            <a:r>
-              <a:rPr lang="en-US" sz="2000" dirty="0">
-                <a:solidFill>
-                  <a:srgbClr val="002060"/>
-                </a:solidFill>
-              </a:rPr>
-              <a:t> https://</a:t>
-            </a:r>
-            <a:r>
-              <a:rPr lang="en-US" sz="2000" dirty="0" err="1">
-                <a:solidFill>
-                  <a:srgbClr val="002060"/>
-                </a:solidFill>
-              </a:rPr>
-              <a:t>github.com</a:t>
-            </a:r>
-            <a:r>
-              <a:rPr lang="en-US" sz="2000" dirty="0">
-                <a:solidFill>
-                  <a:srgbClr val="002060"/>
-                </a:solidFill>
-              </a:rPr>
-              <a:t>/R-</a:t>
-            </a:r>
-            <a:r>
-              <a:rPr lang="en-US" sz="2000" dirty="0" err="1">
-                <a:solidFill>
-                  <a:srgbClr val="002060"/>
-                </a:solidFill>
-              </a:rPr>
-              <a:t>Chandna</a:t>
-            </a:r>
-            <a:r>
-              <a:rPr lang="en-US" sz="2000" dirty="0">
-                <a:solidFill>
-                  <a:srgbClr val="002060"/>
-                </a:solidFill>
-              </a:rPr>
-              <a:t>/MSDS6306_CaseStudy_2.git</a:t>
-            </a:r>
+            <a:endParaRPr lang="en-US"/>
           </a:p>
         </p:txBody>
       </p:sp>
     </p:spTree>
     <p:extLst>
       <p:ext uri="{BB962C8B-B14F-4D97-AF65-F5344CB8AC3E}">
-        <p14:creationId xmlns:p14="http://schemas.microsoft.com/office/powerpoint/2010/main" val="1926449743"/>
+        <p14:creationId xmlns:p14="http://schemas.microsoft.com/office/powerpoint/2010/main" val="288936918"/>
       </p:ext>
     </p:extLst>
   </p:cSld>
@@ -6489,10 +6655,162 @@
       </p:grpSpPr>
       <p:sp>
         <p:nvSpPr>
+          <p:cNvPr id="2" name="Title 1"/>
+          <p:cNvSpPr>
+            <a:spLocks noGrp="1"/>
+          </p:cNvSpPr>
+          <p:nvPr>
+            <p:ph type="title"/>
+          </p:nvPr>
+        </p:nvSpPr>
+        <p:spPr>
+          <a:xfrm>
+            <a:off x="557211" y="342900"/>
+            <a:ext cx="8534401" cy="685800"/>
+          </a:xfrm>
+        </p:spPr>
+        <p:txBody>
+          <a:bodyPr/>
+          <a:lstStyle/>
+          <a:p>
+            <a:r>
+              <a:rPr lang="en-US" dirty="0"/>
+              <a:t>CURIOUS? WANT TO LEARN MORE?</a:t>
+            </a:r>
+          </a:p>
+        </p:txBody>
+      </p:sp>
+      <p:sp>
+        <p:nvSpPr>
+          <p:cNvPr id="4" name="TextBox 3"/>
+          <p:cNvSpPr txBox="1"/>
+          <p:nvPr/>
+        </p:nvSpPr>
+        <p:spPr>
+          <a:xfrm>
+            <a:off x="557211" y="1152395"/>
+            <a:ext cx="9725438" cy="1323439"/>
+          </a:xfrm>
+          <a:prstGeom prst="rect">
+            <a:avLst/>
+          </a:prstGeom>
+          <a:noFill/>
+        </p:spPr>
+        <p:txBody>
+          <a:bodyPr wrap="square" rtlCol="0">
+            <a:spAutoFit/>
+          </a:bodyPr>
+          <a:lstStyle/>
+          <a:p>
+            <a:r>
+              <a:rPr lang="en-US" sz="2000" dirty="0">
+                <a:solidFill>
+                  <a:srgbClr val="002060"/>
+                </a:solidFill>
+              </a:rPr>
+              <a:t>The data, and information on our code, our full report, and our methods can be </a:t>
+            </a:r>
+            <a:r>
+              <a:rPr lang="en-US" sz="2000">
+                <a:solidFill>
+                  <a:srgbClr val="002060"/>
+                </a:solidFill>
+              </a:rPr>
+              <a:t>found online at:</a:t>
+            </a:r>
+            <a:endParaRPr lang="en-US" sz="2000" dirty="0">
+              <a:solidFill>
+                <a:srgbClr val="002060"/>
+              </a:solidFill>
+            </a:endParaRPr>
+          </a:p>
+          <a:p>
+            <a:endParaRPr lang="en-US" sz="2000" dirty="0">
+              <a:solidFill>
+                <a:srgbClr val="002060"/>
+              </a:solidFill>
+            </a:endParaRPr>
+          </a:p>
+          <a:p>
+            <a:r>
+              <a:rPr lang="en-US" sz="2000" dirty="0">
+                <a:solidFill>
+                  <a:srgbClr val="002060"/>
+                </a:solidFill>
+              </a:rPr>
+              <a:t> https://</a:t>
+            </a:r>
+            <a:r>
+              <a:rPr lang="en-US" sz="2000" dirty="0" err="1">
+                <a:solidFill>
+                  <a:srgbClr val="002060"/>
+                </a:solidFill>
+              </a:rPr>
+              <a:t>github.com</a:t>
+            </a:r>
+            <a:r>
+              <a:rPr lang="en-US" sz="2000" dirty="0">
+                <a:solidFill>
+                  <a:srgbClr val="002060"/>
+                </a:solidFill>
+              </a:rPr>
+              <a:t>/R-</a:t>
+            </a:r>
+            <a:r>
+              <a:rPr lang="en-US" sz="2000" dirty="0" err="1">
+                <a:solidFill>
+                  <a:srgbClr val="002060"/>
+                </a:solidFill>
+              </a:rPr>
+              <a:t>Chandna</a:t>
+            </a:r>
+            <a:r>
+              <a:rPr lang="en-US" sz="2000" dirty="0">
+                <a:solidFill>
+                  <a:srgbClr val="002060"/>
+                </a:solidFill>
+              </a:rPr>
+              <a:t>/MSDS6306_CaseStudy_2.git</a:t>
+            </a:r>
+          </a:p>
+        </p:txBody>
+      </p:sp>
+    </p:spTree>
+    <p:extLst>
+      <p:ext uri="{BB962C8B-B14F-4D97-AF65-F5344CB8AC3E}">
+        <p14:creationId xmlns:p14="http://schemas.microsoft.com/office/powerpoint/2010/main" val="1926449743"/>
+      </p:ext>
+    </p:extLst>
+  </p:cSld>
+  <p:clrMapOvr>
+    <a:masterClrMapping/>
+  </p:clrMapOvr>
+</p:sld>
+</file>
+
+<file path=ppt/slides/slide15.xml><?xml version="1.0" encoding="utf-8"?>
+<p:sld xmlns:a="http://schemas.openxmlformats.org/drawingml/2006/main" xmlns:r="http://schemas.openxmlformats.org/officeDocument/2006/relationships" xmlns:p="http://schemas.openxmlformats.org/presentationml/2006/main">
+  <p:cSld>
+    <p:spTree>
+      <p:nvGrpSpPr>
+        <p:cNvPr id="1" name=""/>
+        <p:cNvGrpSpPr/>
+        <p:nvPr/>
+      </p:nvGrpSpPr>
+      <p:grpSpPr>
+        <a:xfrm>
+          <a:off x="0" y="0"/>
+          <a:ext cx="0" cy="0"/>
+          <a:chOff x="0" y="0"/>
+          <a:chExt cx="0" cy="0"/>
+        </a:xfrm>
+      </p:grpSpPr>
+      <p:sp>
+        <p:nvSpPr>
           <p:cNvPr id="2" name="Title 1">
             <a:extLst>
               <a:ext uri="{FF2B5EF4-FFF2-40B4-BE49-F238E27FC236}">
-                <a16:creationId xmlns:a16="http://schemas.microsoft.com/office/drawing/2014/main" id="{17CB2D08-4BAE-2F4A-8071-3E05ECE51CA4}"/>
+                <a16:creationId xmlns="" xmlns:a16="http://schemas.microsoft.com/office/drawing/2014/main" id="{17CB2D08-4BAE-2F4A-8071-3E05ECE51CA4}"/>
               </a:ext>
             </a:extLst>
           </p:cNvPr>
@@ -6520,7 +6838,7 @@
           <p:cNvPr id="3" name="Text Placeholder 2">
             <a:extLst>
               <a:ext uri="{FF2B5EF4-FFF2-40B4-BE49-F238E27FC236}">
-                <a16:creationId xmlns:a16="http://schemas.microsoft.com/office/drawing/2014/main" id="{2CB8F888-4E88-3C48-97A3-DE897DD7A13A}"/>
+                <a16:creationId xmlns="" xmlns:a16="http://schemas.microsoft.com/office/drawing/2014/main" id="{2CB8F888-4E88-3C48-97A3-DE897DD7A13A}"/>
               </a:ext>
             </a:extLst>
           </p:cNvPr>
@@ -6578,7 +6896,7 @@
           <p:cNvPr id="2" name="Title 1">
             <a:extLst>
               <a:ext uri="{FF2B5EF4-FFF2-40B4-BE49-F238E27FC236}">
-                <a16:creationId xmlns:a16="http://schemas.microsoft.com/office/drawing/2014/main" id="{3129F6F4-C26D-2D4B-8E4C-6A94B3DD3867}"/>
+                <a16:creationId xmlns="" xmlns:a16="http://schemas.microsoft.com/office/drawing/2014/main" id="{3129F6F4-C26D-2D4B-8E4C-6A94B3DD3867}"/>
               </a:ext>
             </a:extLst>
           </p:cNvPr>
@@ -6589,7 +6907,12 @@
             <p:ph type="title"/>
           </p:nvPr>
         </p:nvSpPr>
-        <p:spPr/>
+        <p:spPr>
+          <a:xfrm>
+            <a:off x="684212" y="0"/>
+            <a:ext cx="8534400" cy="1507067"/>
+          </a:xfrm>
+        </p:spPr>
         <p:txBody>
           <a:bodyPr/>
           <a:lstStyle/>
@@ -6606,7 +6929,7 @@
           <p:cNvPr id="3" name="Content Placeholder 2">
             <a:extLst>
               <a:ext uri="{FF2B5EF4-FFF2-40B4-BE49-F238E27FC236}">
-                <a16:creationId xmlns:a16="http://schemas.microsoft.com/office/drawing/2014/main" id="{951BCDC8-4300-354A-9B8D-54FED2B48CE2}"/>
+                <a16:creationId xmlns="" xmlns:a16="http://schemas.microsoft.com/office/drawing/2014/main" id="{951BCDC8-4300-354A-9B8D-54FED2B48CE2}"/>
               </a:ext>
             </a:extLst>
           </p:cNvPr>
@@ -6712,9 +7035,10 @@
           <a:lstStyle/>
           <a:p>
             <a:r>
-              <a:rPr lang="en-US" dirty="0"/>
-              <a:t>Introduction/OBJECTIVES</a:t>
-            </a:r>
+              <a:rPr lang="en-US" dirty="0" smtClean="0"/>
+              <a:t>Introduction</a:t>
+            </a:r>
+            <a:endParaRPr lang="en-US" dirty="0"/>
           </a:p>
         </p:txBody>
       </p:sp>
@@ -6777,7 +7101,7 @@
         <p:spPr>
           <a:xfrm>
             <a:off x="1625600" y="2912533"/>
-            <a:ext cx="6908800" cy="2677656"/>
+            <a:ext cx="6908800" cy="3416320"/>
           </a:xfrm>
           <a:prstGeom prst="rect">
             <a:avLst/>
@@ -6800,8 +7124,46 @@
                   <a:srgbClr val="002060"/>
                 </a:solidFill>
               </a:rPr>
-              <a:t>The top 3 factors that contribute to attrition</a:t>
-            </a:r>
+              <a:t>The top 3 factors that contribute to </a:t>
+            </a:r>
+            <a:r>
+              <a:rPr lang="en-US" sz="2400" dirty="0" smtClean="0">
+                <a:solidFill>
+                  <a:srgbClr val="002060"/>
+                </a:solidFill>
+              </a:rPr>
+              <a:t>attrition</a:t>
+            </a:r>
+          </a:p>
+          <a:p>
+            <a:pPr marL="285750" indent="-285750">
+              <a:buFont typeface="Arial" charset="0"/>
+              <a:buChar char="•"/>
+            </a:pPr>
+            <a:endParaRPr lang="en-US" sz="2400" dirty="0">
+              <a:solidFill>
+                <a:srgbClr val="002060"/>
+              </a:solidFill>
+            </a:endParaRPr>
+          </a:p>
+          <a:p>
+            <a:pPr marL="285750" indent="-285750">
+              <a:buFont typeface="Arial" charset="0"/>
+              <a:buChar char="•"/>
+            </a:pPr>
+            <a:r>
+              <a:rPr lang="en-US" sz="2400" dirty="0" smtClean="0">
+                <a:solidFill>
+                  <a:srgbClr val="002060"/>
+                </a:solidFill>
+              </a:rPr>
+              <a:t>Methodology</a:t>
+            </a:r>
+            <a:endParaRPr lang="en-US" sz="2400" dirty="0">
+              <a:solidFill>
+                <a:srgbClr val="002060"/>
+              </a:solidFill>
+            </a:endParaRPr>
           </a:p>
           <a:p>
             <a:pPr marL="285750" indent="-285750">
@@ -6921,8 +7283,66 @@
           <a:p>
             <a:r>
               <a:rPr lang="en-US" dirty="0"/>
-              <a:t>Data Source/DEMOGRAPHICS</a:t>
-            </a:r>
+              <a:t>Data Source</a:t>
+            </a:r>
+          </a:p>
+        </p:txBody>
+      </p:sp>
+      <p:sp>
+        <p:nvSpPr>
+          <p:cNvPr id="3" name="Text Placeholder 2"/>
+          <p:cNvSpPr>
+            <a:spLocks noGrp="1"/>
+          </p:cNvSpPr>
+          <p:nvPr>
+            <p:ph type="body" idx="1"/>
+          </p:nvPr>
+        </p:nvSpPr>
+        <p:spPr>
+          <a:xfrm>
+            <a:off x="557211" y="1970171"/>
+            <a:ext cx="3275753" cy="1042441"/>
+          </a:xfrm>
+        </p:spPr>
+        <p:txBody>
+          <a:bodyPr>
+            <a:normAutofit fontScale="92500" lnSpcReduction="20000"/>
+          </a:bodyPr>
+          <a:lstStyle/>
+          <a:p>
+            <a:r>
+              <a:rPr lang="en-US" b="1" u="sng" dirty="0" smtClean="0">
+                <a:solidFill>
+                  <a:srgbClr val="002060"/>
+                </a:solidFill>
+              </a:rPr>
+              <a:t>Data Dimension</a:t>
+            </a:r>
+          </a:p>
+          <a:p>
+            <a:r>
+              <a:rPr lang="en-US" dirty="0" smtClean="0">
+                <a:solidFill>
+                  <a:srgbClr val="002060"/>
+                </a:solidFill>
+              </a:rPr>
+              <a:t>Total Observations: 1470</a:t>
+            </a:r>
+          </a:p>
+          <a:p>
+            <a:r>
+              <a:rPr lang="en-US" dirty="0" smtClean="0">
+                <a:solidFill>
+                  <a:srgbClr val="002060"/>
+                </a:solidFill>
+              </a:rPr>
+              <a:t>Total Variables	 :  35</a:t>
+            </a:r>
+            <a:endParaRPr lang="en-US" dirty="0">
+              <a:solidFill>
+                <a:srgbClr val="002060"/>
+              </a:solidFill>
+            </a:endParaRPr>
           </a:p>
         </p:txBody>
       </p:sp>
@@ -6948,8 +7368,8 @@
         </p:blipFill>
         <p:spPr>
           <a:xfrm>
-            <a:off x="7500135" y="1533816"/>
-            <a:ext cx="4490692" cy="4762125"/>
+            <a:off x="7954027" y="2015143"/>
+            <a:ext cx="4036800" cy="4280798"/>
           </a:xfrm>
           <a:prstGeom prst="rect">
             <a:avLst/>
@@ -7016,14 +7436,14 @@
       </p:sp>
       <p:sp>
         <p:nvSpPr>
-          <p:cNvPr id="6" name="TextBox 5"/>
+          <p:cNvPr id="5" name="TextBox 4"/>
           <p:cNvSpPr txBox="1"/>
           <p:nvPr/>
         </p:nvSpPr>
         <p:spPr>
           <a:xfrm>
-            <a:off x="557211" y="1198756"/>
-            <a:ext cx="6942924" cy="2031325"/>
+            <a:off x="557211" y="5372611"/>
+            <a:ext cx="3689112" cy="923330"/>
           </a:xfrm>
           <a:prstGeom prst="rect">
             <a:avLst/>
@@ -7037,61 +7457,55 @@
           <a:lstStyle/>
           <a:p>
             <a:r>
-              <a:rPr lang="en-US" b="1" dirty="0">
+              <a:rPr lang="en-US" b="1" u="sng" dirty="0" smtClean="0">
                 <a:solidFill>
                   <a:srgbClr val="002060"/>
                 </a:solidFill>
               </a:rPr>
-              <a:t>Summary: </a:t>
-            </a:r>
-          </a:p>
-          <a:p>
-            <a:pPr marL="285750" indent="-285750">
-              <a:buFont typeface="Arial" panose="020B0604020202020204" pitchFamily="34" charset="0"/>
-              <a:buChar char="•"/>
-            </a:pPr>
-            <a:r>
-              <a:rPr lang="en-US" dirty="0">
+              <a:t>Excluded Variables: </a:t>
+            </a:r>
+          </a:p>
+          <a:p>
+            <a:r>
+              <a:rPr lang="en-US" dirty="0" err="1" smtClean="0">
                 <a:solidFill>
                   <a:srgbClr val="002060"/>
                 </a:solidFill>
               </a:rPr>
-              <a:t>Self-report data from 1,470 employees from corporate office</a:t>
-            </a:r>
-          </a:p>
-          <a:p>
-            <a:pPr marL="285750" indent="-285750">
-              <a:buFont typeface="Arial" panose="020B0604020202020204" pitchFamily="34" charset="0"/>
-              <a:buChar char="•"/>
-            </a:pPr>
-            <a:r>
-              <a:rPr lang="en-US" dirty="0">
+              <a:t>HeadCount</a:t>
+            </a:r>
+            <a:r>
+              <a:rPr lang="en-US" dirty="0" smtClean="0">
                 <a:solidFill>
                   <a:srgbClr val="002060"/>
                 </a:solidFill>
               </a:rPr>
-              <a:t>Demographics, personal, and professional data</a:t>
-            </a:r>
-          </a:p>
-          <a:p>
-            <a:pPr marL="742950" lvl="1" indent="-285750">
-              <a:buFont typeface="Arial" panose="020B0604020202020204" pitchFamily="34" charset="0"/>
-              <a:buChar char="•"/>
-            </a:pPr>
-            <a:r>
-              <a:rPr lang="en-US" dirty="0">
+              <a:t>, </a:t>
+            </a:r>
+            <a:r>
+              <a:rPr lang="en-US" dirty="0" err="1" smtClean="0">
                 <a:solidFill>
                   <a:srgbClr val="002060"/>
                 </a:solidFill>
               </a:rPr>
-              <a:t>35 variables, including age, gender, job role, work-life balance, etc.</a:t>
-            </a:r>
-          </a:p>
-          <a:p>
-            <a:pPr marL="285750" indent="-285750">
-              <a:buFont typeface="Arial" panose="020B0604020202020204" pitchFamily="34" charset="0"/>
-              <a:buChar char="•"/>
-            </a:pPr>
+              <a:t>EmployeeID</a:t>
+            </a:r>
+            <a:r>
+              <a:rPr lang="en-US" dirty="0" smtClean="0">
+                <a:solidFill>
+                  <a:srgbClr val="002060"/>
+                </a:solidFill>
+              </a:rPr>
+              <a:t>, Over18, </a:t>
+            </a:r>
+            <a:r>
+              <a:rPr lang="en-US" dirty="0" err="1" smtClean="0">
+                <a:solidFill>
+                  <a:srgbClr val="002060"/>
+                </a:solidFill>
+              </a:rPr>
+              <a:t>StdHours</a:t>
+            </a:r>
             <a:endParaRPr lang="en-US" dirty="0">
               <a:solidFill>
                 <a:srgbClr val="002060"/>
@@ -7102,20 +7516,14 @@
       </p:sp>
       <p:sp>
         <p:nvSpPr>
-          <p:cNvPr id="15" name="TextBox 14">
-            <a:extLst>
-              <a:ext uri="{FF2B5EF4-FFF2-40B4-BE49-F238E27FC236}">
-                <a16:creationId xmlns:a16="http://schemas.microsoft.com/office/drawing/2014/main" id="{81BFBD42-B2FD-9146-AFA4-30B7C60592A0}"/>
-              </a:ext>
-            </a:extLst>
-          </p:cNvPr>
+          <p:cNvPr id="6" name="TextBox 5"/>
           <p:cNvSpPr txBox="1"/>
           <p:nvPr/>
         </p:nvSpPr>
         <p:spPr>
           <a:xfrm>
-            <a:off x="1068512" y="4407613"/>
-            <a:ext cx="4068567" cy="1200329"/>
+            <a:off x="557211" y="1130103"/>
+            <a:ext cx="11001730" cy="646331"/>
           </a:xfrm>
           <a:prstGeom prst="rect">
             <a:avLst/>
@@ -7123,27 +7531,194 @@
           <a:noFill/>
         </p:spPr>
         <p:txBody>
+          <a:bodyPr wrap="none" rtlCol="0">
+            <a:spAutoFit/>
+          </a:bodyPr>
+          <a:lstStyle/>
+          <a:p>
+            <a:r>
+              <a:rPr lang="en-US" b="1" dirty="0" smtClean="0">
+                <a:solidFill>
+                  <a:srgbClr val="002060"/>
+                </a:solidFill>
+              </a:rPr>
+              <a:t>Summary: </a:t>
+            </a:r>
+            <a:r>
+              <a:rPr lang="en-US" dirty="0" smtClean="0">
+                <a:solidFill>
+                  <a:srgbClr val="002060"/>
+                </a:solidFill>
+              </a:rPr>
+              <a:t>The dataset provided required minimal tidying.  There was no missing data (i.e. NA).  It </a:t>
+            </a:r>
+          </a:p>
+          <a:p>
+            <a:r>
+              <a:rPr lang="en-US" dirty="0">
+                <a:solidFill>
+                  <a:srgbClr val="002060"/>
+                </a:solidFill>
+              </a:rPr>
+              <a:t>i</a:t>
+            </a:r>
+            <a:r>
+              <a:rPr lang="en-US" dirty="0" smtClean="0">
+                <a:solidFill>
+                  <a:srgbClr val="002060"/>
+                </a:solidFill>
+              </a:rPr>
+              <a:t>ncluded both personal and professional data on employee from various departments.</a:t>
+            </a:r>
+            <a:endParaRPr lang="en-US" dirty="0">
+              <a:solidFill>
+                <a:srgbClr val="002060"/>
+              </a:solidFill>
+            </a:endParaRPr>
+          </a:p>
+        </p:txBody>
+      </p:sp>
+      <p:sp>
+        <p:nvSpPr>
+          <p:cNvPr id="7" name="TextBox 6"/>
+          <p:cNvSpPr txBox="1"/>
+          <p:nvPr/>
+        </p:nvSpPr>
+        <p:spPr>
+          <a:xfrm>
+            <a:off x="557211" y="3323270"/>
+            <a:ext cx="2353770" cy="923330"/>
+          </a:xfrm>
+          <a:prstGeom prst="rect">
+            <a:avLst/>
+          </a:prstGeom>
+          <a:noFill/>
+        </p:spPr>
+        <p:txBody>
           <a:bodyPr wrap="square" rtlCol="0">
             <a:spAutoFit/>
           </a:bodyPr>
           <a:lstStyle/>
           <a:p>
             <a:r>
-              <a:rPr lang="en-US" dirty="0"/>
-              <a:t>Include a few more pictures and graphs of our EDA and descriptive statistics on this slide and the next- match the </a:t>
-            </a:r>
-            <a:r>
-              <a:rPr lang="en-US" dirty="0" err="1"/>
-              <a:t>rmd</a:t>
-            </a:r>
-            <a:endParaRPr lang="en-US" dirty="0"/>
-          </a:p>
-        </p:txBody>
-      </p:sp>
+              <a:rPr lang="en-US" b="1" u="sng" dirty="0" smtClean="0">
+                <a:solidFill>
+                  <a:srgbClr val="002060"/>
+                </a:solidFill>
+              </a:rPr>
+              <a:t>Data Class Type</a:t>
+            </a:r>
+          </a:p>
+          <a:p>
+            <a:r>
+              <a:rPr lang="en-US" dirty="0" smtClean="0">
+                <a:solidFill>
+                  <a:srgbClr val="002060"/>
+                </a:solidFill>
+              </a:rPr>
+              <a:t>Numeric 	: 25</a:t>
+            </a:r>
+          </a:p>
+          <a:p>
+            <a:r>
+              <a:rPr lang="en-US" dirty="0" smtClean="0">
+                <a:solidFill>
+                  <a:srgbClr val="002060"/>
+                </a:solidFill>
+              </a:rPr>
+              <a:t>Character	: 10</a:t>
+            </a:r>
+            <a:endParaRPr lang="en-US" dirty="0">
+              <a:solidFill>
+                <a:srgbClr val="002060"/>
+              </a:solidFill>
+            </a:endParaRPr>
+          </a:p>
+        </p:txBody>
+      </p:sp>
+      <p:sp>
+        <p:nvSpPr>
+          <p:cNvPr id="8" name="TextBox 7"/>
+          <p:cNvSpPr txBox="1"/>
+          <p:nvPr/>
+        </p:nvSpPr>
+        <p:spPr>
+          <a:xfrm>
+            <a:off x="557211" y="4608818"/>
+            <a:ext cx="3093928" cy="677108"/>
+          </a:xfrm>
+          <a:prstGeom prst="rect">
+            <a:avLst/>
+          </a:prstGeom>
+          <a:noFill/>
+        </p:spPr>
+        <p:txBody>
+          <a:bodyPr wrap="square" rtlCol="0">
+            <a:spAutoFit/>
+          </a:bodyPr>
+          <a:lstStyle/>
+          <a:p>
+            <a:r>
+              <a:rPr lang="en-US" b="1" u="sng" dirty="0" smtClean="0">
+                <a:solidFill>
+                  <a:srgbClr val="002060"/>
+                </a:solidFill>
+              </a:rPr>
+              <a:t>Length &gt; 12 Variables</a:t>
+            </a:r>
+          </a:p>
+          <a:p>
+            <a:pPr lvl="1"/>
+            <a:r>
+              <a:rPr lang="en-US" sz="2000" dirty="0" smtClean="0">
+                <a:solidFill>
+                  <a:srgbClr val="002060"/>
+                </a:solidFill>
+              </a:rPr>
+              <a:t>	23</a:t>
+            </a:r>
+            <a:endParaRPr lang="en-US" sz="2000" dirty="0">
+              <a:solidFill>
+                <a:srgbClr val="002060"/>
+              </a:solidFill>
+            </a:endParaRPr>
+          </a:p>
+        </p:txBody>
+      </p:sp>
+      <p:pic>
+        <p:nvPicPr>
+          <p:cNvPr id="12" name="Picture 11"/>
+          <p:cNvPicPr>
+            <a:picLocks noChangeAspect="1"/>
+          </p:cNvPicPr>
+          <p:nvPr/>
+        </p:nvPicPr>
+        <p:blipFill>
+          <a:blip r:embed="rId3">
+            <a:extLst>
+              <a:ext uri="{28A0092B-C50C-407E-A947-70E740481C1C}">
+                <a14:useLocalDpi xmlns:a14="http://schemas.microsoft.com/office/drawing/2010/main" val="0"/>
+              </a:ext>
+            </a:extLst>
+          </a:blip>
+          <a:stretch>
+            <a:fillRect/>
+          </a:stretch>
+        </p:blipFill>
+        <p:spPr>
+          <a:xfrm>
+            <a:off x="3635986" y="2015142"/>
+            <a:ext cx="3811383" cy="4280799"/>
+          </a:xfrm>
+          <a:prstGeom prst="rect">
+            <a:avLst/>
+          </a:prstGeom>
+        </p:spPr>
+      </p:pic>
     </p:spTree>
     <p:extLst>
       <p:ext uri="{BB962C8B-B14F-4D97-AF65-F5344CB8AC3E}">
-        <p14:creationId xmlns:p14="http://schemas.microsoft.com/office/powerpoint/2010/main" val="255234722"/>
+        <p14:creationId xmlns:p14="http://schemas.microsoft.com/office/powerpoint/2010/main" val="692286035"/>
       </p:ext>
     </p:extLst>
   </p:cSld>
@@ -7175,7 +7750,7 @@
           <p:cNvPr id="4" name="Title 1">
             <a:extLst>
               <a:ext uri="{FF2B5EF4-FFF2-40B4-BE49-F238E27FC236}">
-                <a16:creationId xmlns:a16="http://schemas.microsoft.com/office/drawing/2014/main" id="{10025774-F3AC-0B46-BFAD-62F83C5E6558}"/>
+                <a16:creationId xmlns="" xmlns:a16="http://schemas.microsoft.com/office/drawing/2014/main" id="{10025774-F3AC-0B46-BFAD-62F83C5E6558}"/>
               </a:ext>
             </a:extLst>
           </p:cNvPr>
@@ -7288,7 +7863,7 @@
           <p:cNvPr id="5" name="Text Placeholder 2">
             <a:extLst>
               <a:ext uri="{FF2B5EF4-FFF2-40B4-BE49-F238E27FC236}">
-                <a16:creationId xmlns:a16="http://schemas.microsoft.com/office/drawing/2014/main" id="{9958FC6C-D112-8144-B815-67A37B638E30}"/>
+                <a16:creationId xmlns="" xmlns:a16="http://schemas.microsoft.com/office/drawing/2014/main" id="{9958FC6C-D112-8144-B815-67A37B638E30}"/>
               </a:ext>
             </a:extLst>
           </p:cNvPr>
@@ -7363,53 +7938,133 @@
         </p:nvSpPr>
         <p:spPr>
           <a:xfrm>
-            <a:off x="557211" y="342900"/>
-            <a:ext cx="8534401" cy="685800"/>
+            <a:off x="444477" y="163970"/>
+            <a:ext cx="10327907" cy="685800"/>
           </a:xfrm>
         </p:spPr>
         <p:txBody>
-          <a:bodyPr/>
+          <a:bodyPr>
+            <a:normAutofit/>
+          </a:bodyPr>
           <a:lstStyle/>
           <a:p>
             <a:r>
               <a:rPr lang="en-US" dirty="0"/>
-              <a:t>Methodology – Random Forest</a:t>
-            </a:r>
-          </a:p>
-        </p:txBody>
-      </p:sp>
-      <p:sp>
-        <p:nvSpPr>
-          <p:cNvPr id="3" name="Text Placeholder 2"/>
-          <p:cNvSpPr>
-            <a:spLocks noGrp="1"/>
-          </p:cNvSpPr>
-          <p:nvPr>
-            <p:ph type="body" idx="1"/>
-          </p:nvPr>
+              <a:t>Methodology – </a:t>
+            </a:r>
+            <a:r>
+              <a:rPr lang="en-US" dirty="0" smtClean="0"/>
+              <a:t>ALGORITHMS Considered</a:t>
+            </a:r>
+            <a:endParaRPr lang="en-US" dirty="0"/>
+          </a:p>
+        </p:txBody>
+      </p:sp>
+      <p:sp>
+        <p:nvSpPr>
+          <p:cNvPr id="3" name="TextBox 2"/>
+          <p:cNvSpPr txBox="1"/>
+          <p:nvPr/>
         </p:nvSpPr>
         <p:spPr>
           <a:xfrm>
-            <a:off x="684213" y="1193800"/>
-            <a:ext cx="8534400" cy="4800600"/>
+            <a:off x="444477" y="1077238"/>
+            <a:ext cx="3231975" cy="1477328"/>
           </a:xfrm>
+          <a:prstGeom prst="rect">
+            <a:avLst/>
+          </a:prstGeom>
+          <a:noFill/>
         </p:spPr>
         <p:txBody>
-          <a:bodyPr/>
-          <a:lstStyle/>
-          <a:p>
-            <a:r>
-              <a:rPr lang="en-US" dirty="0"/>
-              <a:t>RAJAT to provide content- explain in plain language only, an “elevator pitch” of what random forest is and what it told us. Include the actual explanation in the </a:t>
-            </a:r>
-            <a:r>
-              <a:rPr lang="en-US" dirty="0" err="1"/>
-              <a:t>rmd</a:t>
-            </a:r>
-            <a:r>
-              <a:rPr lang="en-US" dirty="0"/>
-              <a:t> file.</a:t>
-            </a:r>
+          <a:bodyPr wrap="none" rtlCol="0">
+            <a:spAutoFit/>
+          </a:bodyPr>
+          <a:lstStyle/>
+          <a:p>
+            <a:r>
+              <a:rPr lang="en-US" dirty="0" smtClean="0">
+                <a:solidFill>
+                  <a:srgbClr val="002060"/>
+                </a:solidFill>
+              </a:rPr>
+              <a:t>Random Forest</a:t>
+            </a:r>
+          </a:p>
+          <a:p>
+            <a:endParaRPr lang="en-US" dirty="0">
+              <a:solidFill>
+                <a:srgbClr val="002060"/>
+              </a:solidFill>
+            </a:endParaRPr>
+          </a:p>
+          <a:p>
+            <a:r>
+              <a:rPr lang="en-US" dirty="0" smtClean="0">
+                <a:solidFill>
+                  <a:srgbClr val="002060"/>
+                </a:solidFill>
+              </a:rPr>
+              <a:t>Logistics Regression</a:t>
+            </a:r>
+          </a:p>
+          <a:p>
+            <a:endParaRPr lang="en-US" dirty="0">
+              <a:solidFill>
+                <a:srgbClr val="002060"/>
+              </a:solidFill>
+            </a:endParaRPr>
+          </a:p>
+          <a:p>
+            <a:r>
+              <a:rPr lang="en-US" dirty="0" smtClean="0">
+                <a:solidFill>
+                  <a:srgbClr val="002060"/>
+                </a:solidFill>
+              </a:rPr>
+              <a:t>Conditional Random Forest</a:t>
+            </a:r>
+            <a:endParaRPr lang="en-US" dirty="0">
+              <a:solidFill>
+                <a:srgbClr val="002060"/>
+              </a:solidFill>
+            </a:endParaRPr>
+          </a:p>
+        </p:txBody>
+      </p:sp>
+      <p:sp>
+        <p:nvSpPr>
+          <p:cNvPr id="7" name="TextBox 6"/>
+          <p:cNvSpPr txBox="1"/>
+          <p:nvPr/>
+        </p:nvSpPr>
+        <p:spPr>
+          <a:xfrm>
+            <a:off x="1014609" y="3219189"/>
+            <a:ext cx="8778365" cy="646331"/>
+          </a:xfrm>
+          <a:prstGeom prst="rect">
+            <a:avLst/>
+          </a:prstGeom>
+          <a:noFill/>
+        </p:spPr>
+        <p:txBody>
+          <a:bodyPr wrap="none" rtlCol="0">
+            <a:spAutoFit/>
+          </a:bodyPr>
+          <a:lstStyle/>
+          <a:p>
+            <a:r>
+              <a:rPr lang="en-US" dirty="0" smtClean="0"/>
+              <a:t>RAJAT TO ADD CONTENT ON THE DIFFERENCES, STRENGTHS, AND WEAKNESSES</a:t>
+            </a:r>
+          </a:p>
+          <a:p>
+            <a:r>
+              <a:rPr lang="en-US" dirty="0" smtClean="0"/>
+              <a:t>OF EACH METHOD</a:t>
+            </a:r>
+            <a:endParaRPr lang="en-US" dirty="0"/>
           </a:p>
         </p:txBody>
       </p:sp>
@@ -7455,6 +8110,214 @@
         </p:nvSpPr>
         <p:spPr>
           <a:xfrm>
+            <a:off x="444477" y="163970"/>
+            <a:ext cx="10327907" cy="685800"/>
+          </a:xfrm>
+        </p:spPr>
+        <p:txBody>
+          <a:bodyPr>
+            <a:normAutofit fontScale="90000"/>
+          </a:bodyPr>
+          <a:lstStyle/>
+          <a:p>
+            <a:r>
+              <a:rPr lang="en-US" dirty="0"/>
+              <a:t>Methodology – </a:t>
+            </a:r>
+            <a:r>
+              <a:rPr lang="en-US" dirty="0" smtClean="0"/>
+              <a:t>Conditional Random Forest</a:t>
+            </a:r>
+            <a:endParaRPr lang="en-US" dirty="0"/>
+          </a:p>
+        </p:txBody>
+      </p:sp>
+      <p:sp>
+        <p:nvSpPr>
+          <p:cNvPr id="4" name="TextBox 3"/>
+          <p:cNvSpPr txBox="1"/>
+          <p:nvPr/>
+        </p:nvSpPr>
+        <p:spPr>
+          <a:xfrm>
+            <a:off x="444477" y="1412960"/>
+            <a:ext cx="6745463" cy="923330"/>
+          </a:xfrm>
+          <a:prstGeom prst="rect">
+            <a:avLst/>
+          </a:prstGeom>
+          <a:noFill/>
+        </p:spPr>
+        <p:txBody>
+          <a:bodyPr wrap="square" rtlCol="0">
+            <a:spAutoFit/>
+          </a:bodyPr>
+          <a:lstStyle/>
+          <a:p>
+            <a:r>
+              <a:rPr lang="en-US" dirty="0" smtClean="0">
+                <a:solidFill>
+                  <a:srgbClr val="002060"/>
+                </a:solidFill>
+              </a:rPr>
+              <a:t>Both Conditional Random Forest (and Logistic Regression) confirm the following top 3 factors:</a:t>
+            </a:r>
+          </a:p>
+          <a:p>
+            <a:endParaRPr lang="en-US" dirty="0">
+              <a:solidFill>
+                <a:srgbClr val="002060"/>
+              </a:solidFill>
+            </a:endParaRPr>
+          </a:p>
+        </p:txBody>
+      </p:sp>
+      <p:sp>
+        <p:nvSpPr>
+          <p:cNvPr id="5" name="TextBox 4"/>
+          <p:cNvSpPr txBox="1"/>
+          <p:nvPr/>
+        </p:nvSpPr>
+        <p:spPr>
+          <a:xfrm>
+            <a:off x="444477" y="912803"/>
+            <a:ext cx="2895344" cy="369332"/>
+          </a:xfrm>
+          <a:prstGeom prst="rect">
+            <a:avLst/>
+          </a:prstGeom>
+          <a:noFill/>
+        </p:spPr>
+        <p:txBody>
+          <a:bodyPr wrap="none" rtlCol="0">
+            <a:spAutoFit/>
+          </a:bodyPr>
+          <a:lstStyle/>
+          <a:p>
+            <a:r>
+              <a:rPr lang="en-US" b="1" dirty="0" smtClean="0">
+                <a:solidFill>
+                  <a:srgbClr val="002060"/>
+                </a:solidFill>
+              </a:rPr>
+              <a:t>Prediction Score: 85.79%</a:t>
+            </a:r>
+            <a:endParaRPr lang="en-US" b="1" dirty="0">
+              <a:solidFill>
+                <a:srgbClr val="002060"/>
+              </a:solidFill>
+            </a:endParaRPr>
+          </a:p>
+        </p:txBody>
+      </p:sp>
+      <p:pic>
+        <p:nvPicPr>
+          <p:cNvPr id="6" name="Picture 5"/>
+          <p:cNvPicPr>
+            <a:picLocks noChangeAspect="1"/>
+          </p:cNvPicPr>
+          <p:nvPr/>
+        </p:nvPicPr>
+        <p:blipFill>
+          <a:blip r:embed="rId2">
+            <a:extLst>
+              <a:ext uri="{28A0092B-C50C-407E-A947-70E740481C1C}">
+                <a14:useLocalDpi xmlns:a14="http://schemas.microsoft.com/office/drawing/2010/main" val="0"/>
+              </a:ext>
+            </a:extLst>
+          </a:blip>
+          <a:stretch>
+            <a:fillRect/>
+          </a:stretch>
+        </p:blipFill>
+        <p:spPr>
+          <a:xfrm>
+            <a:off x="550953" y="2241647"/>
+            <a:ext cx="5753100" cy="3416300"/>
+          </a:xfrm>
+          <a:prstGeom prst="rect">
+            <a:avLst/>
+          </a:prstGeom>
+        </p:spPr>
+      </p:pic>
+      <p:sp>
+        <p:nvSpPr>
+          <p:cNvPr id="3" name="TextBox 2"/>
+          <p:cNvSpPr txBox="1"/>
+          <p:nvPr/>
+        </p:nvSpPr>
+        <p:spPr>
+          <a:xfrm>
+            <a:off x="7327727" y="3206663"/>
+            <a:ext cx="3823483" cy="646331"/>
+          </a:xfrm>
+          <a:prstGeom prst="rect">
+            <a:avLst/>
+          </a:prstGeom>
+          <a:noFill/>
+        </p:spPr>
+        <p:txBody>
+          <a:bodyPr wrap="none" rtlCol="0">
+            <a:spAutoFit/>
+          </a:bodyPr>
+          <a:lstStyle/>
+          <a:p>
+            <a:r>
+              <a:rPr lang="en-US" dirty="0" smtClean="0"/>
+              <a:t>RAJAT TO ADD ANOTHER CHART </a:t>
+            </a:r>
+          </a:p>
+          <a:p>
+            <a:r>
+              <a:rPr lang="en-US" dirty="0" smtClean="0"/>
+              <a:t>OR INFOGRAPHIC OF SORT </a:t>
+            </a:r>
+            <a:endParaRPr lang="en-US" dirty="0"/>
+          </a:p>
+        </p:txBody>
+      </p:sp>
+    </p:spTree>
+    <p:extLst>
+      <p:ext uri="{BB962C8B-B14F-4D97-AF65-F5344CB8AC3E}">
+        <p14:creationId xmlns:p14="http://schemas.microsoft.com/office/powerpoint/2010/main" val="625729325"/>
+      </p:ext>
+    </p:extLst>
+  </p:cSld>
+  <p:clrMapOvr>
+    <a:masterClrMapping/>
+  </p:clrMapOvr>
+</p:sld>
+</file>
+
+<file path=ppt/slides/slide8.xml><?xml version="1.0" encoding="utf-8"?>
+<p:sld xmlns:a="http://schemas.openxmlformats.org/drawingml/2006/main" xmlns:r="http://schemas.openxmlformats.org/officeDocument/2006/relationships" xmlns:p="http://schemas.openxmlformats.org/presentationml/2006/main">
+  <p:cSld>
+    <p:spTree>
+      <p:nvGrpSpPr>
+        <p:cNvPr id="1" name=""/>
+        <p:cNvGrpSpPr/>
+        <p:nvPr/>
+      </p:nvGrpSpPr>
+      <p:grpSpPr>
+        <a:xfrm>
+          <a:off x="0" y="0"/>
+          <a:ext cx="0" cy="0"/>
+          <a:chOff x="0" y="0"/>
+          <a:chExt cx="0" cy="0"/>
+        </a:xfrm>
+      </p:grpSpPr>
+      <p:sp>
+        <p:nvSpPr>
+          <p:cNvPr id="2" name="Title 1"/>
+          <p:cNvSpPr>
+            <a:spLocks noGrp="1"/>
+          </p:cNvSpPr>
+          <p:nvPr>
+            <p:ph type="title"/>
+          </p:nvPr>
+        </p:nvSpPr>
+        <p:spPr>
+          <a:xfrm>
             <a:off x="557211" y="342900"/>
             <a:ext cx="8534401" cy="685800"/>
           </a:xfrm>
@@ -7502,7 +8365,7 @@
           <p:cNvPr id="5" name="Table 4">
             <a:extLst>
               <a:ext uri="{FF2B5EF4-FFF2-40B4-BE49-F238E27FC236}">
-                <a16:creationId xmlns:a16="http://schemas.microsoft.com/office/drawing/2014/main" id="{B703D80E-7F52-4EC4-8019-B211F825CC91}"/>
+                <a16:creationId xmlns="" xmlns:a16="http://schemas.microsoft.com/office/drawing/2014/main" id="{B703D80E-7F52-4EC4-8019-B211F825CC91}"/>
               </a:ext>
             </a:extLst>
           </p:cNvPr>
@@ -7531,49 +8394,49 @@
                 <a:gridCol w="3299143">
                   <a:extLst>
                     <a:ext uri="{9D8B030D-6E8A-4147-A177-3AD203B41FA5}">
-                      <a16:colId xmlns:a16="http://schemas.microsoft.com/office/drawing/2014/main" val="2088784793"/>
+                      <a16:colId xmlns="" xmlns:a16="http://schemas.microsoft.com/office/drawing/2014/main" val="2088784793"/>
                     </a:ext>
                   </a:extLst>
                 </a:gridCol>
                 <a:gridCol w="1071880">
                   <a:extLst>
                     <a:ext uri="{9D8B030D-6E8A-4147-A177-3AD203B41FA5}">
-                      <a16:colId xmlns:a16="http://schemas.microsoft.com/office/drawing/2014/main" val="44769478"/>
+                      <a16:colId xmlns="" xmlns:a16="http://schemas.microsoft.com/office/drawing/2014/main" val="44769478"/>
                     </a:ext>
                   </a:extLst>
                 </a:gridCol>
                 <a:gridCol w="1160963">
                   <a:extLst>
                     <a:ext uri="{9D8B030D-6E8A-4147-A177-3AD203B41FA5}">
-                      <a16:colId xmlns:a16="http://schemas.microsoft.com/office/drawing/2014/main" val="2042025665"/>
+                      <a16:colId xmlns="" xmlns:a16="http://schemas.microsoft.com/office/drawing/2014/main" val="2042025665"/>
                     </a:ext>
                   </a:extLst>
                 </a:gridCol>
                 <a:gridCol w="1153844">
                   <a:extLst>
                     <a:ext uri="{9D8B030D-6E8A-4147-A177-3AD203B41FA5}">
-                      <a16:colId xmlns:a16="http://schemas.microsoft.com/office/drawing/2014/main" val="3310055283"/>
+                      <a16:colId xmlns="" xmlns:a16="http://schemas.microsoft.com/office/drawing/2014/main" val="3310055283"/>
                     </a:ext>
                   </a:extLst>
                 </a:gridCol>
                 <a:gridCol w="1126087">
                   <a:extLst>
                     <a:ext uri="{9D8B030D-6E8A-4147-A177-3AD203B41FA5}">
-                      <a16:colId xmlns:a16="http://schemas.microsoft.com/office/drawing/2014/main" val="3606606852"/>
+                      <a16:colId xmlns="" xmlns:a16="http://schemas.microsoft.com/office/drawing/2014/main" val="3606606852"/>
                     </a:ext>
                   </a:extLst>
                 </a:gridCol>
                 <a:gridCol w="1098329">
                   <a:extLst>
                     <a:ext uri="{9D8B030D-6E8A-4147-A177-3AD203B41FA5}">
-                      <a16:colId xmlns:a16="http://schemas.microsoft.com/office/drawing/2014/main" val="801426414"/>
+                      <a16:colId xmlns="" xmlns:a16="http://schemas.microsoft.com/office/drawing/2014/main" val="801426414"/>
                     </a:ext>
                   </a:extLst>
                 </a:gridCol>
                 <a:gridCol w="1217785">
                   <a:extLst>
                     <a:ext uri="{9D8B030D-6E8A-4147-A177-3AD203B41FA5}">
-                      <a16:colId xmlns:a16="http://schemas.microsoft.com/office/drawing/2014/main" val="2064332225"/>
+                      <a16:colId xmlns="" xmlns:a16="http://schemas.microsoft.com/office/drawing/2014/main" val="2064332225"/>
                     </a:ext>
                   </a:extLst>
                 </a:gridCol>
@@ -7691,7 +8554,7 @@
                 </a:tc>
                 <a:extLst>
                   <a:ext uri="{0D108BD9-81ED-4DB2-BD59-A6C34878D82A}">
-                    <a16:rowId xmlns:a16="http://schemas.microsoft.com/office/drawing/2014/main" val="4011550691"/>
+                    <a16:rowId xmlns="" xmlns:a16="http://schemas.microsoft.com/office/drawing/2014/main" val="4011550691"/>
                   </a:ext>
                 </a:extLst>
               </a:tr>
@@ -7795,7 +8658,7 @@
                 </a:tc>
                 <a:extLst>
                   <a:ext uri="{0D108BD9-81ED-4DB2-BD59-A6C34878D82A}">
-                    <a16:rowId xmlns:a16="http://schemas.microsoft.com/office/drawing/2014/main" val="4283831565"/>
+                    <a16:rowId xmlns="" xmlns:a16="http://schemas.microsoft.com/office/drawing/2014/main" val="4283831565"/>
                   </a:ext>
                 </a:extLst>
               </a:tr>
@@ -7899,7 +8762,7 @@
                 </a:tc>
                 <a:extLst>
                   <a:ext uri="{0D108BD9-81ED-4DB2-BD59-A6C34878D82A}">
-                    <a16:rowId xmlns:a16="http://schemas.microsoft.com/office/drawing/2014/main" val="1934653851"/>
+                    <a16:rowId xmlns="" xmlns:a16="http://schemas.microsoft.com/office/drawing/2014/main" val="1934653851"/>
                   </a:ext>
                 </a:extLst>
               </a:tr>
@@ -8003,7 +8866,7 @@
                 </a:tc>
                 <a:extLst>
                   <a:ext uri="{0D108BD9-81ED-4DB2-BD59-A6C34878D82A}">
-                    <a16:rowId xmlns:a16="http://schemas.microsoft.com/office/drawing/2014/main" val="3996762099"/>
+                    <a16:rowId xmlns="" xmlns:a16="http://schemas.microsoft.com/office/drawing/2014/main" val="3996762099"/>
                   </a:ext>
                 </a:extLst>
               </a:tr>
@@ -8123,7 +8986,7 @@
                 </a:tc>
                 <a:extLst>
                   <a:ext uri="{0D108BD9-81ED-4DB2-BD59-A6C34878D82A}">
-                    <a16:rowId xmlns:a16="http://schemas.microsoft.com/office/drawing/2014/main" val="3424020629"/>
+                    <a16:rowId xmlns="" xmlns:a16="http://schemas.microsoft.com/office/drawing/2014/main" val="3424020629"/>
                   </a:ext>
                 </a:extLst>
               </a:tr>
@@ -8227,7 +9090,7 @@
                 </a:tc>
                 <a:extLst>
                   <a:ext uri="{0D108BD9-81ED-4DB2-BD59-A6C34878D82A}">
-                    <a16:rowId xmlns:a16="http://schemas.microsoft.com/office/drawing/2014/main" val="2676320322"/>
+                    <a16:rowId xmlns="" xmlns:a16="http://schemas.microsoft.com/office/drawing/2014/main" val="2676320322"/>
                   </a:ext>
                 </a:extLst>
               </a:tr>
@@ -8331,7 +9194,7 @@
                 </a:tc>
                 <a:extLst>
                   <a:ext uri="{0D108BD9-81ED-4DB2-BD59-A6C34878D82A}">
-                    <a16:rowId xmlns:a16="http://schemas.microsoft.com/office/drawing/2014/main" val="1617085218"/>
+                    <a16:rowId xmlns="" xmlns:a16="http://schemas.microsoft.com/office/drawing/2014/main" val="1617085218"/>
                   </a:ext>
                 </a:extLst>
               </a:tr>
@@ -8440,7 +9303,7 @@
                 </a:tc>
                 <a:extLst>
                   <a:ext uri="{0D108BD9-81ED-4DB2-BD59-A6C34878D82A}">
-                    <a16:rowId xmlns:a16="http://schemas.microsoft.com/office/drawing/2014/main" val="3306714524"/>
+                    <a16:rowId xmlns="" xmlns:a16="http://schemas.microsoft.com/office/drawing/2014/main" val="3306714524"/>
                   </a:ext>
                 </a:extLst>
               </a:tr>
@@ -8461,7 +9324,7 @@
 </p:sld>
 </file>
 
-<file path=ppt/slides/slide8.xml><?xml version="1.0" encoding="utf-8"?>
+<file path=ppt/slides/slide9.xml><?xml version="1.0" encoding="utf-8"?>
 <p:sld xmlns:a="http://schemas.openxmlformats.org/drawingml/2006/main" xmlns:r="http://schemas.openxmlformats.org/officeDocument/2006/relationships" xmlns:p="http://schemas.openxmlformats.org/presentationml/2006/main">
   <p:cSld>
     <p:spTree>
@@ -8609,7 +9472,7 @@
           <p:cNvPr id="4" name="Picture 3">
             <a:extLst>
               <a:ext uri="{FF2B5EF4-FFF2-40B4-BE49-F238E27FC236}">
-                <a16:creationId xmlns:a16="http://schemas.microsoft.com/office/drawing/2014/main" id="{83E526A8-A255-469E-8E06-53C7CD74A94E}"/>
+                <a16:creationId xmlns="" xmlns:a16="http://schemas.microsoft.com/office/drawing/2014/main" id="{83E526A8-A255-469E-8E06-53C7CD74A94E}"/>
               </a:ext>
             </a:extLst>
           </p:cNvPr>
@@ -8639,7 +9502,7 @@
           <p:cNvPr id="5" name="Picture 4">
             <a:extLst>
               <a:ext uri="{FF2B5EF4-FFF2-40B4-BE49-F238E27FC236}">
-                <a16:creationId xmlns:a16="http://schemas.microsoft.com/office/drawing/2014/main" id="{CBD66ADA-93F9-4C07-BC0C-98D35D5D57BB}"/>
+                <a16:creationId xmlns="" xmlns:a16="http://schemas.microsoft.com/office/drawing/2014/main" id="{CBD66ADA-93F9-4C07-BC0C-98D35D5D57BB}"/>
               </a:ext>
             </a:extLst>
           </p:cNvPr>
@@ -8669,7 +9532,7 @@
           <p:cNvPr id="6" name="Picture 5">
             <a:extLst>
               <a:ext uri="{FF2B5EF4-FFF2-40B4-BE49-F238E27FC236}">
-                <a16:creationId xmlns:a16="http://schemas.microsoft.com/office/drawing/2014/main" id="{A405E111-F8BB-4FFA-BAED-ABC207E3B77D}"/>
+                <a16:creationId xmlns="" xmlns:a16="http://schemas.microsoft.com/office/drawing/2014/main" id="{A405E111-F8BB-4FFA-BAED-ABC207E3B77D}"/>
               </a:ext>
             </a:extLst>
           </p:cNvPr>
@@ -8698,319 +9561,6 @@
     <p:extLst>
       <p:ext uri="{BB962C8B-B14F-4D97-AF65-F5344CB8AC3E}">
         <p14:creationId xmlns:p14="http://schemas.microsoft.com/office/powerpoint/2010/main" val="1162005675"/>
-      </p:ext>
-    </p:extLst>
-  </p:cSld>
-  <p:clrMapOvr>
-    <a:masterClrMapping/>
-  </p:clrMapOvr>
-</p:sld>
-</file>
-
-<file path=ppt/slides/slide9.xml><?xml version="1.0" encoding="utf-8"?>
-<p:sld xmlns:a="http://schemas.openxmlformats.org/drawingml/2006/main" xmlns:r="http://schemas.openxmlformats.org/officeDocument/2006/relationships" xmlns:p="http://schemas.openxmlformats.org/presentationml/2006/main">
-  <p:cSld>
-    <p:bg>
-      <p:bgPr>
-        <a:gradFill rotWithShape="1">
-          <a:gsLst>
-            <a:gs pos="10000">
-              <a:schemeClr val="bg2">
-                <a:tint val="97000"/>
-                <a:hueMod val="92000"/>
-                <a:satMod val="169000"/>
-                <a:lumMod val="164000"/>
-              </a:schemeClr>
-            </a:gs>
-            <a:gs pos="100000">
-              <a:schemeClr val="bg2">
-                <a:shade val="96000"/>
-                <a:satMod val="120000"/>
-                <a:lumMod val="90000"/>
-              </a:schemeClr>
-            </a:gs>
-          </a:gsLst>
-          <a:lin ang="6120000" scaled="1"/>
-        </a:gradFill>
-        <a:effectLst/>
-      </p:bgPr>
-    </p:bg>
-    <p:spTree>
-      <p:nvGrpSpPr>
-        <p:cNvPr id="1" name=""/>
-        <p:cNvGrpSpPr/>
-        <p:nvPr/>
-      </p:nvGrpSpPr>
-      <p:grpSpPr>
-        <a:xfrm>
-          <a:off x="0" y="0"/>
-          <a:ext cx="0" cy="0"/>
-          <a:chOff x="0" y="0"/>
-          <a:chExt cx="0" cy="0"/>
-        </a:xfrm>
-      </p:grpSpPr>
-      <p:sp>
-        <p:nvSpPr>
-          <p:cNvPr id="2" name="Title 1"/>
-          <p:cNvSpPr>
-            <a:spLocks noGrp="1"/>
-          </p:cNvSpPr>
-          <p:nvPr>
-            <p:ph type="title"/>
-          </p:nvPr>
-        </p:nvSpPr>
-        <p:spPr>
-          <a:xfrm>
-            <a:off x="665641" y="4473679"/>
-            <a:ext cx="9552558" cy="1233251"/>
-          </a:xfrm>
-        </p:spPr>
-        <p:txBody>
-          <a:bodyPr vert="horz" lIns="91440" tIns="45720" rIns="91440" bIns="45720" rtlCol="0" anchor="b">
-            <a:normAutofit/>
-          </a:bodyPr>
-          <a:lstStyle/>
-          <a:p>
-            <a:pPr>
-              <a:lnSpc>
-                <a:spcPct val="90000"/>
-              </a:lnSpc>
-            </a:pPr>
-            <a:r>
-              <a:rPr lang="en-US" sz="4100"/>
-              <a:t>Top Two Factors Attributed to Company’s Attrition</a:t>
-            </a:r>
-          </a:p>
-        </p:txBody>
-      </p:sp>
-      <p:sp>
-        <p:nvSpPr>
-          <p:cNvPr id="3" name="Text Placeholder 2"/>
-          <p:cNvSpPr>
-            <a:spLocks noGrp="1"/>
-          </p:cNvSpPr>
-          <p:nvPr>
-            <p:ph type="body" idx="1"/>
-          </p:nvPr>
-        </p:nvSpPr>
-        <p:spPr>
-          <a:xfrm>
-            <a:off x="668815" y="5686129"/>
-            <a:ext cx="9623477" cy="462967"/>
-          </a:xfrm>
-        </p:spPr>
-        <p:txBody>
-          <a:bodyPr vert="horz" lIns="91440" tIns="45720" rIns="91440" bIns="45720" rtlCol="0" anchor="t">
-            <a:normAutofit/>
-          </a:bodyPr>
-          <a:lstStyle/>
-          <a:p>
-            <a:r>
-              <a:rPr lang="en-US" sz="2100" dirty="0"/>
-              <a:t>Does this need updating?</a:t>
-            </a:r>
-          </a:p>
-        </p:txBody>
-      </p:sp>
-      <p:pic>
-        <p:nvPicPr>
-          <p:cNvPr id="12" name="Picture 11">
-            <a:extLst>
-              <a:ext uri="{FF2B5EF4-FFF2-40B4-BE49-F238E27FC236}">
-                <a16:creationId xmlns:a16="http://schemas.microsoft.com/office/drawing/2014/main" id="{E2B66158-1DF2-447F-A805-9EFB84231251}"/>
-              </a:ext>
-            </a:extLst>
-          </p:cNvPr>
-          <p:cNvPicPr>
-            <a:picLocks noChangeAspect="1"/>
-          </p:cNvPicPr>
-          <p:nvPr/>
-        </p:nvPicPr>
-        <p:blipFill>
-          <a:blip r:embed="rId2"/>
-          <a:stretch>
-            <a:fillRect/>
-          </a:stretch>
-        </p:blipFill>
-        <p:spPr>
-          <a:xfrm>
-            <a:off x="5744777" y="1151070"/>
-            <a:ext cx="4201297" cy="3000926"/>
-          </a:xfrm>
-          <a:prstGeom prst="rect">
-            <a:avLst/>
-          </a:prstGeom>
-        </p:spPr>
-      </p:pic>
-      <p:pic>
-        <p:nvPicPr>
-          <p:cNvPr id="8" name="Picture 7">
-            <a:extLst>
-              <a:ext uri="{FF2B5EF4-FFF2-40B4-BE49-F238E27FC236}">
-                <a16:creationId xmlns:a16="http://schemas.microsoft.com/office/drawing/2014/main" id="{808FDCEC-C955-44EE-B530-C6DE790D3AB2}"/>
-              </a:ext>
-            </a:extLst>
-          </p:cNvPr>
-          <p:cNvPicPr>
-            <a:picLocks noChangeAspect="1"/>
-          </p:cNvPicPr>
-          <p:nvPr/>
-        </p:nvPicPr>
-        <p:blipFill>
-          <a:blip r:embed="rId3"/>
-          <a:stretch>
-            <a:fillRect/>
-          </a:stretch>
-        </p:blipFill>
-        <p:spPr>
-          <a:xfrm>
-            <a:off x="1049892" y="1165301"/>
-            <a:ext cx="4157293" cy="2972463"/>
-          </a:xfrm>
-          <a:prstGeom prst="rect">
-            <a:avLst/>
-          </a:prstGeom>
-        </p:spPr>
-      </p:pic>
-      <p:sp>
-        <p:nvSpPr>
-          <p:cNvPr id="4" name="AutoShape 2" descr="data:image/png;base64,iVBORw0KGgoAAAANSUhEUgAABUAAAAPACAMAAADDuCPrAAABYlBMVEUAAAAAADoAAGYAOjoAOmYAOpAAZrYzMzM6AAA6OgA6Ojo6OmY6ZmY6ZpA6ZrY6kLY6kNtNTU1NTW5NTY5Nbm5Nbo5NbqtNjshmAABmADpmOgBmOjpmZjpmZmZmZpBmkGZmkLZmkNtmtttmtv9uTU1ubk1ubm5ubo5ujqtujshuq8huq+SOTU2Obk2Obm6Oq8iOyOSOyP+QOgCQOjqQZjqQZmaQZpCQkGaQkLaQtraQttuQ2/+rbk2rjk2rjm6rq8iryOSr5Mir5P+2ZgC2Zjq2kDq2kGa2kJC2tpC2tra2ttu229u22/+2///Ijk3Ijm7Iq27Iq6vIyKvI5KvI5OTI5P/I///bkDrbkGbbtmbbtpDbtrbb27bb29vb2//b/7bb///kq27kyI7kyKvk5P/k///r6+v8jVn/tmb/yI7/25D/27b/29v/5Kv/5Mj/5OT//7b//7///8j//9v//+T///+zjZs9AAAACXBIWXMAAB2HAAAdhwGP5fFlAAAgAElEQVR4nO3d/59b5ZnecU0wMDGEILMYh0CWwmwDxaSLN3S7xHW3mGQXkni3aY0TEijO1q2/YMe1rP+/0iNpRnPbM+fMM9e5n3PffN4/xB472Eiv6/mgGUlnJnMAQJVJ638BAIiKgAJAJQIKAJUIKABUIqAAUImAAkAlAgoAlQgoAFQioABQiYACQCUCCgCVCCgAVCKgAFCJgAJAJQIKAJVGENDZl298fzKZ7Lzw8Ten/rNuT570zvzhhcnOLwT/pgCwrXlAZ7/aPWjdS6dNKAEF4Kd1QO+9fih2p+0cAQXgp3FA7y4ffu689dXip9/+6vuCgh78ud/7reRPAoCjtA3o4qHh1ufts1/KCkpAAQyvbUCvLor59tbHy8/An1P8wQQUwPCaBnT5CfzLh37lRvmapeRPJqAABtY0oItcmswtP6d/rvzGwQPRq5vK3vv5Irg7P/jNwT/9zuzT3cnOC09+1n84oJsnka4ufyh/ygsfL3/9yx8vev3Cr/f/f+YvAIBjtQzo7NKTn7Cvmroo3n7/NvWbfWpe7LQM6NUjnro/OqA31n/Iywd/4PpB8BN/AQAcq2VAlw837efrt1c9vHrwO4tfefabVW03VtVdpPBs+fDZJ3t3ZED/fv8Pefvq4ddOPfkXAMCxWgZ0UbknHjyuo3r7IGLrli4fOb709Xz+7aebx4zlseQPv5l/+/VT/+inBnRh+Rn6l4tP1Z+Z7Lz9zeqZ/+fmT/0LAOBYLQN6+ymffS8D+vJ866Xv68/mtx6t3l5/5fTGMaE7OqAvb/6MzV9wdfUQ9il/AQAca6QBXdZxlbr180nbTysdPCY98kWjRwZ0/aubv2a+/yWCp/wFAHCssQZ0UcDypc3lVyaXMdtu2u39xj7lq58rRwb0uYO/5p1D/9en/AUAcKyRfg10Gc7ye+uQbj/Ds3mW58YxT/YcGdCXD//K/v/1aX8BABxrbM/C70f19qFP5W3f7Cfd1qkDeuRjWwDYGOfrQOclcYuIbR6IElAA4zPOdyItlbcNbV7OtPlSqPmntQHliSMAJ9I0oFu5XNt6L3z5HH7/qZ2rTz6vIw3o0/4CADhW26sx2Zdy3t765HnxmPDZ/7X/ls7tp9xv7H95VBjQp/wFAHCstgEtX3k8eOf5jcn2C5tulDderku2deGmzfNM2oA+5S8AgGM1viL9veUVlQ9dkf7gC5Grq9VvSrZ8F9GZX6+/h9LmvZfCgD7lLwCAY435eyJd3X42fPtp8lUbxQF98i8AgGO1Duih78q5c/g6crcn28+Mz36++b+dWV2wUxzQJ/8CADhW84AufPnz5Sfvz7xovy/89lVBl/60vN7x+lrIc31An/gLAOBYYwgoAIREQAGgEgEFgEoEFAAqEVAAqERAAaASAQWASgQUACoRUACoREABoBIBBYBKBBQAKhFQAKhEQAGgEgEFgEoEFAAqEVAAqNQwoP8HEtyT6MRIVEzFCGh43JPoxEhUTMUIaHjck+jESFRMxQhoeNyT6MRIVEzFCGh43JPoxEhUTMUIaHjck+jESFRMxQhoeNyT6MRIVEzFCGh43JPoxEhUTMUIaHjck+jESFRMxQhoeNyT6MRIVEzFCGh43JPoxEhUTMUIaHjck+jESFRMxQhoeNyT6MRIVEzFCGh43JPoxEhUTMUIaHjck+jESFRMxQhoeNyT6MRIVEzFCGh43JPoxEhUTMUIaHjck+jESFRMxQhoeNyT6MRIVEzFCGh43JPoxEhUTMUIaHjck+jESFRMxQhoeNyT6MRIVEzFCGh43JPoxEhUTMUIaHjck+jESFRMxQhoeNyT6MRIVEzFCGh43JPoxEhUTMUIaHjck+jESFRMxQhoeNyT6MRIVEzFCGh43JPoxEhUTMUIaHjck+jESFRMxQhoeNyT6MRIVEzFCGh43JPoxEhUTMUIaHjck+jESFRMxQhoeNyT6MRIVEzFCGh43JPoxEhUTMUIaHjck+jESFRMxQhoeNyT6MRIVEzFUgX0/+I7RL+fxAioiqkYAUVQ+v0kRkBVTMUIKILS7ycxAqpiKkZAEZR+P4kRUBVTMQKKoPT7SYyAqpiKEVAEpd9PYgRUxVSMgCIo/X4SI6AqpmIEFEHp95MYAVUxFSOgCEq/n8QIqIqpGAFFUPr9JEZAVUzFCCiC0u8nMQKqYipGQBGUfj+JEVAVUzECiqD0+0mMgKqYihFQBKXfT2IEVMVUjIAiKP1+EiOgKqZiBBRB6feTGAFVMRUjoAhKv5/ECKiKqRgBRVD6/SRGQFVMxQgogtLvJzECqmIqRkARlH4/iRFQFVMxAoqg9PtJjICqmIoRUASl309iBFTFVIyAIij9fhIjoCqmYgQUQen3kxgBVTEVI6AISr+fxAioiqkYAUVQ+v0kRkBVTMUIKILS7ycxAqpiKkZAEZR+P4kRUBVTMQKKoPT7SYyAqpiKEVAEpd9PYgRUxVSMgCIo/X4SI6AqpmKnDeiji6+tf/b4yt50+u71rg8IKDT0+0mMgKqIA3pt+tqmpNOlV744/gMCChH9fhIjoCrSgD6+Nt0E9Nr0/PX5g8vT87eO/YCAQkS/n8QIqIoyoP/2wXQT0Pt75RHmo4vnPjnuAwIKFf1+EiOgKsKA3pxO3/vzOqA39398/7gPCChU9PtJjICqKAP66j/O76zzeG36YfmxfHz0BwQUKvr9JEZAVYQB3cri48vrT9Dv752/dfQHq3/m+ZVT/s1P0fpIw5N+P8BJEVAEpd8PcFL6gL7yxdEfHPpH9Y+uWx9peNLvJzE+hVcZPKDdj0AJKAT0+0mMgKoQUOSg309iBFRlmIDyLDy86feTGAFVGSigm1d5rl/6edQHBBQq+v0kRkBVBgoo70SCM/1+EiOgKgMF9PHl6av773g/+gMCChX9fhIjoCoDBXT+YPuaS0d/QEAhot9PYgRUZaiAzh9cWVTy3VtdHxBQaOj3kxgBVREH9BT0t631kYYn/X4SI6AqpmIEFEHp95MYAVUxFSOgCEq/n8QIqIqpGAFFUPr9JEZAVUzFCCiC0u8nMQKqYipGQBGUfj+JEVAVUzECiqD0+0mMgKqYihFQBKXfT2IEVMVUjIAiKP1+EiOgKqZiBBRB6feTGAFVMRUjoAhKv5/ECKiKqRgBRVD6/SRGQFVMxQgogtLvJzECqmIqRkARlH4/iRFQFVMxAoqg9PtJjICqmIoRUASl309iBFTFVIyAIij9fhIjoCqmYgQUQen3kxgBVTEVI6AISr+fxAioiqkYAUVQ+v0kRkBVTMUIKILS7ycxAqpiKkZAEZR+P4kRUBVTMQKKoPT7SYyAqpiKEVAEpd9PYgRUxVSMgCIo/X4SI6AqpmIEFEHp95MYAVUxFSOgCEq/n8QIqIqpGAFFUPr9JEZAVUzFCCiC0u8nMQKqYipGQBGUfj+JEVAVUzECiqD0+0mMgKqYihFQBKXfT2IEVMVUjIAiKP1+EiOgKqZiBBRB6feTGAFVMRUjoAhKv5/ECKiKqRgBRVD6/SRGQFVMxQgogtLvJzECqmIqRkARlH4/iRFQFVMxAoqg9PtJjICqmIoRUASl309iBFTFVIyAIij9fhIjoCqmYgQUQen3kxgBVTEVI6AISr+fxAioiqkYAUVQ+v0kRkBVTMUIKILS7ycxAqpiKkZAEZR+P4kRUBVTMQKKoPT7SYyAqpiKEVAEpd9PYgRUxVSMgCIo/X4SI6AqpmIEFEHp95MYAVUxFSOgCEq/n8QIqIqpGAFFUPr9JEZAVUzFCCiC0u8nMQKqYipGQBGUfj+JEVAVUzECiqD0+0mMgKqYihFQBKXfT2IEVMVUjIAiKP1+EiOgKqZiBBRB6feTGAFVMRUjoAhKv5/ECKiKqRgBRVD6/SRGQFVMxQgogtLvJzECqmIqRkARlH4/iRFQFVMxAoqg9PtJjICqmIoRUASl309iBFTFVIyAIij9fhIjoCqmYgQUQen3kxgBVTEVI6AISr+fxAioiqkYAUVQ+v0kRkBVTMUIKILS7ycxAqpiKkZAEZR+P4kRUBVTMQKKoPT7SYyAqpiKEVAEpd9PYgRUxVSMgCIo/X4SI6AqpmIEFEHp95MYAVUxFSOgCEq/n8QIqIqpGAFFUPr9JEZAVUzFCCiC0u8nMQKqYipGQBGUfj+JEVAVU7GGAdVrfaThqfXaAB6BIiz9fhLjEaiKqRgBRVD6/SRGQFVMxQgogtLvJzECqmIqRkARlH4/iRFQFVMxAoqg9PtJjICqmIoRUASl309iBFTFVIyAIij9fhIjoCqmYgQUQen3kxgBVTEVI6AISr+fxAioiqkYAUVQ+v0kRkBVTMUIKILS7ycxAqpiKkZAEZR+P4kRUBVTMQKKoPT7SYyAqpiKEVAEpd9PYgRUxVSMgCIo/X4SI6AqpmIEFEHp95MYAVUxFSOgCEq/n8QIqIqpGAFFUPr9JEZAVUzFCCiC0u8nMQKqYipGQBGUfj+JEVAVUzECiqD0+0mMgKqYihFQBKXfT2IEVMVUjIAiKP1+EiOgKqZiBBRB6feTGAFVMRUjoAhKv5/ECKiKqRgBRVD6/SRGQFVMxQgogtLvJzECqmIqRkARlH4/iRFQFVMxAoqg9PtJjICqmIoRUASl309iBFTFVIyAIij9fhIjoCqmYgQUQen3kxgBVTEVI6AISr+fxAioiqkYAUVQ+v0kRkBVTMUIKILS7ycxAqpiKkZAEZR+P4kRUBVTMQKKoPT7SYyAqpiKEVAEpd9PYgRUxVSMgCIo/X4SI6AqpmIEFEHp95MYAVUxFSOgCEq/n8QIqIqpGAFFUPr9JEZAVUzFCCiC0u8nMQKqYipGQBGUfj+JEVAVUzECiqD0+0mMgKqYihFQBKXfT2IEVMVUjIAiKP1+EiOgKqZiBBRB6feTGAFVMRUjoAhKv5/ECKiKqRgBRVD6/SRGQFVMxQgogtLvJzECqmIqRkARlH4/iRFQFVMxAoqg9PtJjICqmIoRUASl309iBFTFVIyAIij9fhIjoCqmYgQUQen3kxgBVTEVI6AISr+fxAioiqkYAUVQ+v0kRkBVTMUIKILS7ycxAqpiKkZAEZR+P4kRUBVTMQKKoPT7SYyAqpiKEVAEpd9PYgRUxVSMgCIo/X4SI6AqpmIEFEHp95MYAVUxFSOgCEq/n8QIqIqpGAFFUPr9JEZAVUzFCCiC0u8nMQKqYipGQBGUfj+JEVAVUzECiqD0+0mMgKqYihFQBKXfT2IEVMVUjIAiKP1+EiOgKqZiBBRB6feTGAFVMRUjoAhKv5/ECKiKqRgBRVD6/SRGQFVMxQgogtLvJzECqmIqRkARlH4/iRFQFVMxAoqg9PtJjICqmIoRUASl309iBFTFVIyAIij9fhIjoCqmYgQUQen3kxgBVTEVI6AISr+fxAioiqmYKKCPL083XvliPn908eDni9+8sjedvnudgEJJv5/ECKiKS0Dv720FdF3TVUwJKET0+0mMgKoME9CN+3vnPln8cGf62sGvXZuevz5/cHl6/hYBhY5+P4kRUJVBA7p4IPr+qpnvbzV1/Ti0pJWAQkS/n8QIqMqgAb25epj5+PJWLG+uH43e3IoqAcWp6feTGAFVGTKgjy5OP1z9eP53H0ynP72+/ODa6tcOf1pPQHFa+v0kRkBVhgzo5sHm5jmkZTr3H43e39t8EfT5FeXfvNL6SMOTfj/ASSkDuv9lzjvT6Xu35n+5Ml18TEAxDP1+gJNSBvTO5on2zSPR5XNJWwE1L2TSP7pufaThSb+fxPgUXmW4gD6+vP5q56GiPuURKAGFgH4/iRFQleEC+sRDzPIrBBTD0O8nMQKqMlxAn3iafdVMnoXHIPT7SYyAqgwX0P1Xz+9/Ll+auXn9J68DhZR+P4kRUJXBArr16vlrqwebq5DyTiQMQr+fxAioymABfXRx/0ug9/eWL2N68EF5Vn6R0Vd5Lzzk9PtJjICqDBbQ7SeJbq4vxnR9+cEDrsaEAej3kxgBVRksoHe2H2I++Nl0eu699ccPriz6+e4t+w/ob1vrIw1P+v0kRkBVBgvoielvW+sjDU/6/SRGQFVMxQgogtLvJzECqmIqRkARlH4/iRFQFVMxAoqg9PtJjICqmIoRUASl309iBFTFVKwjoLM/fvY5AcUY6feTGAFV6RvQe//pm/n84euTyeTMLwgoxke/n8QIqErPgN6YfO+38/nVydLyZwQUI6PfT2IEVKVfQG+XbN7dnTz7zb0Lk5cJKEZHv5/ECKhKv4BeXZRzmdGdXyz/d/lzAopx0e8nMQKq0iugs0vLcq4z+vDCMJ/D629b6yMNT/r9JEZAVXoFdNXMhxcmz80JKMZJv5/ECKjKCQJ6d3fyDgHFSOn3kxgBVekV0NWn8DfKl0D5GihGSb+fxAioSq+Azq9Onls+/b4sJ8/CY5T0+0mMgKr0C+jt8gLQxWfws59PVo9DCSjGRb+fxAioSr+ALj59X3iuPJG0884g/SSgOBX9fhIjoCo9Azq/99FPPl788PBHP/jNMP0koDgV/X4SI6AqfQM6PP1ta32k4Um/n8QIqIqp2LEBnX09YD8JKE5Fv5/ECKiKqdjRAf3yx8v3wz/80VuDvIaJgOKU9PtJjICq9Azo7NPVdZgeXpicGeZiTAQUp6LfT2IEVKVnQK9OJmf+evd7v5393WSg19ETUJyKfj+JEVCVfgG9PZm8vX4P5x9Wb+gkoBgX/X4SI6Aq/QJ6dfnuo/Wb4G+US4oQUIyLfj+JEVCVXgFdvRd+HdC7u1xMBOOj309iBFSlV0A3l7Mr5eRqTBgj/X4SI6AqBBQ56PeTGAFV6RXQ2aXlE0frcnI5O4yRfj+JEVCVXgFdPXG0CugipjyJhPHR7ycxAqrSL6B3dycvfVMCeu91LmeHMdLvJzECqtIvoOVydmd3d178/uLHYa6nTEBxKvr9JEZAVXoGdP773cnaQP0koDgV/X4SI6AqfQM6//ZXZxf1fGawy4ESUJyKfj+JEVCV3gEdnP62tT7S8KTfT2IEVMVUjOuBIij9fhIjoCqmYlwPFEHp95MYAVXpGVCuB4qR0+8nMQKq0jOgXA8UI6ffT2IEVKVfQLkeKMZOv5/ECKhKv4ByPVCMnX4/iRFQlV4B5XqgGD39fhIjoCq9Asrl7DB6+v0kRkBVCChy0O8nMQKq0iugXA8Uo6ffT2IEVKVXQLkeKEZPv5/ECKhKv4ByPVCMnX4/iRFQlX4B5XqgGDv9fhIjoCo9A8r1QDFy+v0kRkBV+gaU64Fi3PT7SYyAqvQO6OD0t631kYYn/X4SI6AqpmIEFEHp95MYAVUxFTvihfQ/emnQaykTUJyafj+JEVCVfgG9MJk8M9iVlAkoBPT7SYyAqvQK6OpyypMzHw/ZUP1ta32k4Um/n8QIqEqvgC786celoS98TEAxSvr9JEZAVfoGdL76rkgLQ72QSX/bWh9peNLvJzECqnKCgC4+lf/y9WVCd94a4ikl/W1rfaThSb+fxAioyokCuvDtz8tbkl7QPwzV37bWRxqe9PtJjICqnCigs199f/OGzslLBBRjot9PYgRUpX9AN/VcPhf/7af698Trb1vrIw1P+v0kRkBVegZ0/dXPg1eD6i+rrL9trY80POn3kxgBVekV0NmliX3ySP+NPfS3rfWRhif9fhIjoCq9Arp8J9LO4ZcvPbzAI1CMiX4/iRFQlZ4B/cGvzS/NPle/lEl/21ofaXjS7ycxAqrSK6Au9Let9ZGGJ/1+EiOgKqZiBBRB6feTGAFVMRXruCL9ztlB3oREQHFq+v0kRkBV+gb0xv4r6PmeSBgj/X4SI6AqPQO67OczL775Bt+VEyOl309iBFSlX0Dv7k6eXb2K6d4lvi88xki/n8QIqEq/gF49eN/R7NLkOQKK0dHvJzECqtIroLNLW4867+6qX0JPQHF6+v0kRkBVegX00Ps29W/iJKA4Pf1+EiOgKgQUOej3kxgBVekV0NmlyTv7H+ivw0RAcXr6/SRGQFV6BZQnkTB6+v0kRkBV+gX07u7kzOpyIn96nZcxYYz0+0mMgKr0C+jqjUhnz54d8q1Icq2PNDy1XhtwzFs5/7C7fifnztsD/dX6/zi0PtLwpN9PYjwCVekb0PnsyzcWj0Bf/HiQJ5AIKE5Lv5/ECKhK74AOTn/bWh9peNLvJzECqmIqRkARlH4/iRFQFVMxG9DZR28+6Se8DhSjo99PYgRUpSOgy28n9wTeiYTx0e8nMQKqQkCRg34/iRFQlY6AOtLfttZHGp70+0mMgKqYihFQBKXfT2IEVMVU7PiAfjVcPgkoTke/n8QIqIqp2NEB/fLH5X1IP/gNAcUY6feTGAFV6RnQ2aX9p5BeGui9SPrb1vpIw5N+P4kRUJV+AV32c+fFf/jsn97YnQx0NTsCilPR7ycxAqrSL6A3JpMfrh54zn452bq4MgHFWOj3kxgBVekV0MUD0INr2F3lgsoYIf1+EiOgKr0C+vDCoe/KyQvpMT76/SRGQFV6BpRvKoeR0+8nMQKq0iugfF94jJ5+P4kRUJVeAZ3f2Pq65w2+BooR0u8nMQKq0i+gs0v7L/+8MdC1RAgoTkW/n8QIqEqvgM4+Wr7+88W3Pvvn5Y8vDHNVUP1ta32k4Um/n8QIqEqvgLpc1E5/21ofaXjS7ycxAqpCQJGDfj+JEVCVXgF1ob9trY80POn3kxgBVTEVI6AISr+fxAioiqkYAUVQ+v0kRkBVTMWODugfP9v3OS+kx+jo95MYAVXpGdDf7/JN5TBq+v0kRkBV+gX0Nt+VEyOn309iBFSlV0BnlyY7H3+17+sh+klAcSr6/SRGQFV6BfThhYEuokxAoaLfT2IEVKVnQAd6/zsBhYp+P4kRUJVeAZ1dIqAYOf1+EiOgKr0COr/Bp/AYOf1+EiOgKv0Ceuh7ehBQjJB+P4kRUJV+AZ3fuzA58+aG+kJ2BBSnp99PYgRUpWdAP+V1oBg3/X4SI6Aq/QJ6gxfSY+T0+0mMgKr0Cmh5If0gn7cTUIjo95MYAVXpFVCP55AIKE5Fv5/ECKhKz4DyOlCMnH4/iRFQlV4B5YX0GD39fhIjoCq9Ajq/MXmZgGLU9PtJjICq9Avo7NLO2wQUY6bfT2IEVKVXQGcfvTGZ7LzIC+kxXvr9JEZAVXoF1HxbY14HivHR7ycxAqpCQJGDfj+JEVCVXgF1ob9trY80POn3kxgBVTEVI6AISr+fxAioiqkYAUVQ+v0kRkBVTMVsQGd/tN8F/uGPz77A10AxOvr9JEZAVToC+vDC6imj2UebFy9tfoWAYlT0+0mMgKr0DOhBNgkoRkm/n8QIqAoBRQ76/SRGQFUIKHLQ7ycxAqpCQJGDfj+JEVAVAooc9PtJjICqEFDkoN9PYgRUhYAiB/1+EiOgKgQUOej3kxgBVSGgyEG/n8QIqAoBRQ76/SRGQFUIKHLQ7ycxAqrSHdAnEVCMj34/iRFQFQKKHPT7SYyAqnQEdPbRm0/im8phfPT7SYyAqnQE1JH+trU+0vCk309iBFTFVIyAIij9fhIjoCqmYgQUQen3kxgBVTEVI6AISr+fxAioiqkYAUVQ+v0kRkBVTMUIKILS7ycxAqpiKkZAEZR+P4kRUBVTMQKKoPT7SYyAqpiKEVAEpd9PYgRUxVTsiXciXdr5xeKHb78moBg3/X4SI6AqHQF9eGH5xvfV/xJQjJh+P4kRUJXOgC4fgRJQjJ5+P4kRUJWOgM4uTZ79/Ks/Xfjer786MMzn8/rb1vpIw5N+P4kRUJWOgM5vcDk7hKDfT2IEVKUroLNP6wL66OK0eOWL5UePr+xNp+9eX/3WoQ8IKDT0+0mMgKp0BXSR0K8+++fdnX/47MDnPa4Hen9vK6Drmq5ieugDAgoR/X4SI6Aq3QGdVz2JdGf62sEH16bnr88fXJ6ev2U/IKAQ0e8nMQKq0iugs49OfBH6a9P3939+f2/9OPTcJ+YDAgoV/X4SI6AqvQJ6co8vb/Xx5vrR6M1lVA99QEChot9PYgRUpXdAv/3V2clk5+xb/V7D9Oji+d99MJ3+9Pryg2vTD8svlk/rD31AQKGi309iBFSlb0APXs70cp+Abp5DWtZy/9Ho/b3ztw59sPr/Pr/S5489mdZHGp70+wFO6qiALvv5zItvvvH9ngW9M52+d2v+lyvTRS4JKBzo9wOc1BEBvbs7efY35Wf3Lk3K5UU6bL7SuXwuaauZr3xx6IND/4j+0XXrIw1P+v0kxqfwKv0CenXy7OZp+NmlyXPdAd24MzUPOp/yCJSAQkC/n8QIqEqvgK4vardyd/fZ/q9pMg86CSiGot9PYgRUpVdAD72Q/kSvqi+Z5Fl4DE+/n8QIqMowAX18eTuTm5d8rl8HuvUBAYWKfj+JEVCVXgGdXZq8s//B7UmPT+GvrR5frkLKO5EwPP1+EiOgKr0CevInke7vLV/G9OCD8o73RUZf3X/7+6EPCChU9PtJjICq9Avo3d3JmV+Xn/3p9V4vY1p8hr665tL15QcPti/A9ICrMWEA+v0kRkBV+gV09Uaks2fP9n4r0vzBz6bTc++tH2U+uLJI5rtP+4CAQkO/n8QIqErPgM7/sLt+J+fO2736eXL629b6SMOTfj+JEVCVvgGdz758Y/EI9MWPT3pdOwIKF/r9JEZAVXoHdHD629b6SMOTfj+JEVAVUzECiqD0+0mMgKqYihFQBKXfT2IEVMVUjIAiKP1+EiOgKqZiBBRB6feTGAFVMRUjoAhKv5/ECKiKqRgBRVD6/SRGQFVMxQgogtLvJzECqmIqRkARlH4/iRFQFVOxo67G9IPfEFCMmn4/iRFQlV4BfXhh63qgBBRjpN9PYgRUpWdAT/BdPAgoWtDvJzECqtIroIe+qRwBxRjp95MYAVXpFdD5jc23hSegGCn9fhIjoCr9AvrtLyeTZ158c+0ng1zSTn/bWh9peJuln3QAABwGSURBVNLvJzECqtIroA8vTLYN8wVR/W1rfaThSb+fxAioCgFFDvr9JEZAVXoF1IX+trU+0vCk309iBFTFVIyAIij9fhIjoCqmYscGdPb1gP0koDgV/X4SI6AqpmJHB/TLHy+/+PnwR28N9V3l9Let9ZGGJ/1+EiOgKj0DOvt09ezRwwuTMwO9KUl/21ofaXjS7ycxAqrSM6BXJ5Mzf737vd/O/m4yeXaYx6D629b6SMOTfj+JEVCVfgG9PZm8vX5H/B92B7qwiP62tT7S8KTfT2IEVKVfQK9OXt6/pMiNyXMEFKOj309iBFSlV0BXFxNZB/TuLi+kx/jo95MYAVXpFdBVOtcBHeradvrb1vpIw5N+P4kRUBUCihz0+0mMgKr0Cujs0vKJo3U5bw/0NLz+trU+0vCk309iBFSlV0BXTxytArqIKU8iYXz0+0mMgKr0C+jd3clL35SA3nt9MtDV6fW3rfWRhif9fhIjoCr9Arp4CDqZnN3defH7ix9fHqSfBBSnot9PYgRUpWdA57/f3VwNdKB+ElCcin4/iRFQlb4BnX/7q7OLej4z3DeI19+21kcanvT7SYyAqvQO6OD0t631kYYn/X4SI6AqpmLHXw/0qwH7SUBxKvr9JEZAVUzFjr8e6AKfwmOc9PtJjICq9Azo7NL+t5R7aaArKutvW+sjDU/6/SRGQFX6BXTZz50X//Nn//TGoqDDvI6egOJU9PtJjICq9Avo7f1XL81+OeF6oBgh/X4SI6AqvQK6eAB68OrPq7yVEyOk309iBFSlV0AfXth6+ybXA8UY6feTGAFV6RnQrWZyOTuMkX4/iRFQlV4BXV2Rfu3uLpezw/jo95MYAVXpFdBD3wfpxkDvhtffttZHGp70+0mMgKr0C+jDC5MffrPp5zCfwRNQnIp+P4kRUJWOgM4+erN4Y/U60H9+c3cyefEnfAqP0dHvJzECqtIR0MVDzyfxJBLGR7+fxAioCgFFDpUj+X/4DpH2pegIqCP9bWt9pOGpciStjzQ8SftSmIoRUARVOZLWRxqepH0pTMUIKIKqHEnrIw1P0r4UpmJHB/SPn+37nGfhMTqVI2l9pOFJ2peiZ0APvqccTyJhlCpH0vpIw5O0L0W/gN7mWXiMXOVIWh9peJL2pegV0Nmlyc7HX+37eoh+ElCcSuVIWh9peJL2pegV0IcXBrqIMgGFSuVIWh9peJL2pegZ0IHe/05AoVI5ktZHGp6kfSl6BXR2iYBi5CpH0vpIw5O0L0WvgM5v8Ck8Rq5yJK2PNDxJ+1L0C+ih7+lBQDFClSNpfaThSdqXol9A5/cuTM68ucHl7DA+lSNpfaThSdqXomdAP+V1oBi3ypG0PtLwJO1L0S+gN3ghPUauciStjzQ8SftS9ApoeSH9IJ+3E1CIVI6k9ZGGJ2lfil4B9XgOiYDiVCpH0vpIw5O0L0XPgPI6UIxc5UhaH2l4kval6BVQXkiP0ascSesjDU/SvhS9AjrY94InoFCpHEnrIw1P0r4U/QI6u7TzNgHFmFWOpPWRhidpX4peAZ19VL4vPC+kx3hVjqT1kYYnaV+KXgE139yY14FifCpH0vpIw5O0LwUBRQ6VI2l9pOFJ2peiV0Bd6G9b6yMNT5UjaX2k4Unal8JUjIAiqMqRtD7S8CTtS2EqRkARVOVIWh9peJL2pTAVOyKg3361jW8qh/GpHEnrIw1P0r4UvQLq8iSSXusjDU+VI2l9pOFJ2pen4Vl4BFU5ktZHGp6kfSl6BXT2x8/W/v71yc4/fM4L6TE6lSNpfaThSdqXoldAt93dfXaYK4Pqb1vrIw1PlSNpfaThSdqX4sQBHezCIvrb1vpIw1PlSFofaXiS9qU4eUCHegiqv22tjzQ8VY6k9ZGGJ2lfipMHdKirK+tvW+sjDU+VI2l9pOFJ2pfi5AG9u0tAMT6VI2l9pOFJ2pfixAGdXZ3wKTzGp3IkrY80PEn7UvQK6OyjzaVA33xjd8KTSBihypG0PtLwJO1L0Sugh19Iz8uYMEKVI2l9pOFJ2pfixAF95q2BvkG8/ra1PtLwVDmS1kcanqR9KXoF1IX+trU+0vBUOZLWRxqepH0pTMUIKIKqHEnrIw1P0r4UpmIEFEFVjqT1kYYnaV8KUzECiqAqR9L6SMOTtC+FqZgN6NYLmA7wbY0xPpUjaX2k4Unal6IjoOZKoFwPFGNVOZLWRxqepH0pCChyqBxJ6yMNT9K+FB0Btb7cnfBOJIxR5UhaH2l4kvalOFFAZz9f5PPMbwbpJwHFqVSOpPWRhidpX4qTBPQPi4efO0O9EYmA4lQqR9L6SMOTtC9F/4AO+vCTgOKUKkfS+kjDk7QvRe+Aloef/26wfBJQnE7lSFofaXiS9qXoGdB7Az/8JKA4pcqRtD7S8CTtS9EvoIM//CSgOKXKkbQ+0vAk7UvRJ6D3Li2vAjrow08CilOqHEnrIw1P0r4UPQJaHn6+PXA+CShOp3IkrY80PEn7UnQG1OfhJwHFKVWOpPWRhidpX4qugP7e5+EnAcUpVY6k9ZGGJ2lfio6A8l54BFE5ktZHGp6kfSkIKHKoHEnrIw1P0r4UHQHleqAIonIkrY80PEn7UnQE1JH+trU+0vBUOZLWRxqepH0pTMUIKIKqHEnrIw1P0r4UpmIEFEFVjqT1kYYnaV8KUzECiqAqR9L6SMOTtC+FqRgBRVCVI2l9pOFJ2pfCVIyAIqjKkbQ+0vAk7UthKkZAEVTlSFofaXiS9qUwFSOgCKpyJK2PNDxJ+1KYihFQBFU5ktZHGp6kfSlMxQgogqocSesjDU/SvhSmYgQUQVWOpPWRhidpXwpTMQKKoCpH0vpIw5O0L4WpGAFFUJUjaX2k4Unal8JUjIAiqMqRtD7S8CTtS2EqRkARVOVIWh9peJL2pTAVI6AIqnIkrY80PEn7UpiKEVAEVTmS1kcanqR9KUzFCCiCqhxJ6yMNT9K+FKZiBBRBVY6k9ZGGJ2lfClMxAoqgKkfS+kjDk7QvhakYAUVQlSNpfaThSdqXwlSMgCKoypG0PtLwJO1LYSpGQBFU5UhaH2l4kvalMBUjoAiqciStjzQ8SftSmIoRUARVOZLWRxqepH0pTMUIKIKqHEnrIw1P0r4UpmIEFEFVjqT1kYYnaV8KUzECiqAqR9L6SMOTtC+FqRgBRVCVI2l9pOFJ2pfCVIyAIqjKkbQ+0vAk7UthKkZAEVTlSFofaXiS9qUwFSOgCKpyJK2PNDxJ+1KYihFQBFU5ktZHGp6kfSlMxQgogqocSesjDU/SvhSmYgQUQVWOpPWRhidpXwpTMQKKoCpH0vpIw5O0L4WpGAFFUJUjaX2k4Unal8JUjIAiqMqRtD7S8CTtS2EqRkARVOVIWh9peJL2pTAVI6AIqnIkrY80PEn7UpiKEVAEVTmS1kcanqR9KUzFCCiCqhxJ6yMNT9K+FKZiBBRBVY6k9ZGGJ2lfClMxAoqgKkfS+kjDk7QvhakYAUVQlSNpfaThSdqXwlSMgCKoypG0PtLwJO1LYSpGQBFU5UhaH2l4kvalMBUjoAiqciStjzQ8SftSmIrpAvpvP5tOz717vfz80cVp8coXy48eX9mbTte/Q0AhUjmS1kcanqR9KYYK6L+sknnuk+UH9/e2Arqu6SqmBBQilSNpfaThSdqXYqCA3pme+9v5/MHlVSfvTF87+K1r0/PXl79z/hYBhU7lSFofaXiS9qUYJqCPL08/XP64eLT5YWnm+/u/dX9v/Th09eCUgEKjciStjzQ8SftSDBPQRxfXn6GXdD6+vBXLm+tHoze3okpAcWqVI2l9pOFJ2pdimIDuKwF9dPH87z6YTn96ffUr5bHp4U/rCShOq3IkrY80PEn7Ugwb0NUn6pvnkJbp3H80en9v80XQ51e0f/NS6yMNT5UjaX2k4Unal6cRB3T1+fqd6fS9W/O/XFk+J09AMYzKkbQ+0vAk7cvTaAN6Z/Uyps2XPZefz28F1LyQSf/ouvWRhqfKkbQ+0vAk7UsxZEDv7J378HBPz996yiNQAgqBypG0PtLwJO1LMWBAb07NK5WWDzoJKIZROZLWRxqepH0phgvov9h+rprJs/AYROVIWh9peJL2pRgqoI+vTV9df41z86r6VTM3r//kdaCQqhxJ6yMNT9K+FEMF9NrWWzWvrR5srkLKO5EwiMqRtD7S8CTtSzFQQG9uv9X9/t7yZUwPPii/tsjoq7wXHnKVI2l9pOFJ2pdimIBurl+38FrJ6eoCTNeXv/eAqzFhAJUjaX2k4Unal2KYgN6ZHgro/MHy4qDvrR9yPriy+OV3b9l/Rn/bWh9peKocSesjDU/SvhTDBLSG/ra1PtLwVDmS1kcanqR9KUzFCCiCqhxJ6yMNT9K+FKZiBBRBVY6k9ZGGJ2lfClMxAoqgKkfS+kjDk7QvhakYAUVQlSNpfaThSdqXwlSMgCKoypG0PtLwJO1LYSpGQBFU5UhaH2l4kvalMBUjoAiqciStjzQ8SftSmIoRUARVOZLWRxqepH0pTMUIKIKqHEnrIw1P0r4UpmIEFEFVjqT1kYYnaV8KUzECiqAqR9L6SMOTtC+FqRgBRVCVI2l9pOFJ2pfCVIyAIqjKkbQ+0vAk7UthKkZAEVTlSFofaXiS9qUwFSOgCKpyJK2PNDxJ+1KYihFQBFU5ktZHGp6kfSlMxQgogqocSesjDU/SvhSmYgQUQVWOpPWRhidpXwpTMQKKoCpH0vpIw5O0L4WpGAFFUJUjaX2k4Unal8JUjIAiqMqRtD7S8CTtS2EqRkARVOVIWh9peJL2pTAVI6AIqnIkrY80PEn7UpiKEVAEVTmS1kcanqR9KUzFCCiCqhxJ6yMNT9K+FKZiBBRBVY6k9ZGGJ2lfClMxAoqgKkfS+kjDk7QvhakYAUVQlSNpfaThSdqXwlSMgCKoypG0PtLwJO1LYSpGQBFU5UhaH2l4kvalMBUjoAiqciStjzQ8SftSmIoRUARVOZLWRxqepH0pTMUIKIKqHEnrIw1P0r4UpmIEFEFVjqT1kYYnaV8KUzECiqAqR9L6SMOTtC+FqRgBRVCVI2l9pOFJ2pfCVIyAIqjKkbQ+0vAk7UthKkZAEVTlSFofaXiS9qUwFSOgCKpyJK2PNDxJ+1KYihFQBFU5ktZHGp6kfSlMxQgogqocSesjDU/SvhSmYgQUQVWOpPWRhidpXwpTMQKKoCpH0vpIw5O0L4WpGAFFUJUjaX2k4Unal8JUjIAiqMqRtD7S8CTtS2EqRkARVOVIWh9peJL2pTAVI6AIqnIkrY80PEn7UpiKEVAEVTmS1kcanqR9KUzFCCiCqhxJ6yMNT9K+FKZiBBRBVY6k9ZGGJ2lfClMxAoqgKkfS+kjDk7QvhakYAUVQlSNpfaThSdqXwlSMgCKoypG0PtLwJO1LYSpGQBFU5UhaH2l4kvalMBUjoAiqciStjzQ8SftSmIoRUARVOZLWRxqepH0pTMUIKIKqHEnrIw1P0r4UpmIEFEFVjqT1kYYnaV8KUzECiqAqR9L6SMOTtC+FqRgBRVCVI2l9pOFJ2pfCVIyAIqjKkbQ+0vAk7UthKkZAEVTlSFofaXiS9qUwFSOgCKpyJK2PNDxJ+1KYihFQBFU5ktZHGp6kfSlMxQgogqocSesjDU/SvhSmYgQUQVWOpPWRhidpXwpTMQKKoCpH0vpIw5O0L4WpGAFFUJUjaX2k4Unal8JUjIAiqMqRtD7S8CTtS2EqRkARVOVIWh9peJL2pTAVI6AIqnIkrY80PEn7UpiKEVAEVTmS1kcanqR9KUzFCCiCqhxJ6yMNT9K+FKZiBBRBVY6k9ZGGJ2lfClMxAoqgKkfS+kjDk7QvhakYAUVQlSNpfaThSdqXwlSMgCKoypG0PtLwJO1LYSpGQBFU5UhaH2l4kvalMBVrGFC91kcanipH0vpIw5O0L0/DI1AEVTmS1kcanqR9KUzFCCiCqhxJ6yMNT9K+FKZiBBRBVY6k9ZGGJ2lfClMxAoqgKkfS+kjDk7QvhakYAUVQlSNpfaThSdqXwlSMgCKoypG0PtLwJO1LYSpGQBFU5UhaH2l4kvalMBUjoAiqciStjzQ8SftSmIoRUARVOZLWRxqepH0pTMUIKIKqHEnrIw1P0r4UpmIEFEFVjqT1kYYnaV8KUzECiqAqR9L6SMOTtC+FqRgBRVCVI2l9pOFJ2pfCVIyAIqjKkbQ+0vAk7UthKkZAEVTlSFofaXiS9qUwFSOgCKpyJK2PNDxJ+1KYihFQBFU5ktZHGp6kfSlMxQgogqocSesjDU/SvhSmYgQUQVWOpPWRhidpXwpTMQKKoCpH0vpIw5O0L4WpGAFFUJUjaX2k4Unal8JUjIAiqMqRtD7S8CTtS2EqRkARVOVIWh9peJL2pTAVI6AIqnIkrY80PEn7UpiKEVAEVTmS1kcanqR9KUzFCCiCqhxJ6yMNT9K+FKZiBBRBVY6k9ZGGJ2lfClMxAoqgKkfS+kjDk7QvhakYAUVQlSNpfaThSdqXwlSMgCKoypG0PtLwJO1LYSpGQBFU5UhaH2l4kvalMBUjoAiqciStjzQ8SftSmIoRUARVOZLWRxqepH0pTMUIKIKqHEnrIw1P0r4UpmIEFEFVjqT1kYYnaV8KUzECiqAqR9L6SMOTtC+FqRgBRVCVI2l9pOFJ2pfCVIyAIqjKkbQ+0vAk7UthKkZAEVTlSFofaXiS9qUwFSOgCKpyJK2PNDxJ+1KYihFQBFU5ktZHGp6kfSlMxQgogqocSesjDU/SvhSmYgQUQVWOpPWRhidpXwpTMQKKoCpH0vpIw5O0L4WpGAFFUJUjaX2k4Unal8JUjIAiqMqRtD7S8CTtS2EqRkARVOVIWh9peJL2pTAVI6AIqnIkrY80PEn7UpiKEVAEVTmS1kcanqR9KUzFCCiCqhxJ6yMNT9K+FKZiBBRBVY6k9ZGGJ2lfClMxAoqgKkfS+kjDk7QvhakYAUVQlSNpfaThSdqXwlSMgCKoypG0PtLwJO1LYSpGQBFU5UhaH2l4kvalMBUjoAiqciStjzQ8SftSmIoRUARVOZLWRxqepH0pTMUIKIKqHEnrIw1P0r4UpmIEFEFVjqT1kYYnaV8KUzECiqAqR9L6SMOTtC+FqRgBRVCVI2l9pOFJ2pfCVIyAIqjKkbQ+0vAk7UthKkZAEVTlSFofaXiS9qUwFSOgCKpyJK2PNDxJ+1KYihFQBFU5ktZHGp6kfSlMxQgogqocSesjDU/SvhSmYgQUQVWOpPWRhidpXwpTMQKKoCpH0vpIw5O0L4WpGAFFUJUjaX2k4Unal8JUjIAiqMqRtD7S8CTtS2EqRkARVOVIWh9peJL2pTAVI6AIqnIkrY80PEn7UpiKEVAEVTmS1kcanqR9KUzFCCiCqhxJ6yMNT9K+FKZiBBRBVY6k9ZGGJ2lfClMxAoqgKkfS+kjDk7QvhakYAUVQlSNpfaThSdqXwlSMgCKoypG0PtLwJO1LYSpGQBFU5UhaH2l4kvalMBUjoAiqciStjzQ8SftSmIp5BPTxlb3p9N3rBBRKlSNpfaThSdqXwj+gjy5Ol175goBCqHIkrY80PEn7UvgH9Nr0/PX5g8vT87cIKHQqR9L6SMOTtC+Fe0Dv75XHno8unvuEgEKnciStjzQ8SftSuAf05vS19Y/vE1DoVI6k9ZGGJ2lfCveAXpt+WH68sw4pAYVE5UhaH2l4kval8A7o48vrT93v722+CPr8iv7van2k4alyJK2PNDxJ+/I0qQIKAJ48A2peyKR/dP3dxD2JToxEpWFAzeuYWt8TWXBPohMjUSGg2XBPohMjUfEOqOez8N9N3JPoxEhU3AO6ef2nw+tAv5u4J9GJkai4B9TxnUjfTdyT6MRIVNwD+vjy9FWn98J/N3FPohMjUXEP6PyB29WYvpu4J9GJkaj4B3T+4Mqin+/esr/c+p7IgnsSnRiJSoOAHqH1PZEF9yQ6MRIVUzECGh73JDoxEhVTMQIaHvckOjESFVMxAhoe9yQ6MRIVUzECGh73JDoxEhVTMQIaHvckOjESFVMxAhoe9yQ6MRIVUzECGh73JDoxEhVTMQIaHvckOjESFVMxAhoe9yQ6MRIVUzECGh73JDoxEhVTMQIaHvckOjESFVMxAhoe9yQ6MRIVUzECGh73JDoxEhVTMQIaHvckOjESFVMxAhoe9yQ6MRIVUzECGh73JDoxEhVTMQIaHvckOjESFVMxAhoe9yQ6MRIVUzECGh73JDoxEhVTMQIaHvckOjESFVMxAhoe9yQ6MRIVUzECGh73JDoxEhVTMQIaHvckOjESFVMxAhoe9yQ6MRIVUzECGh73JDoxEhVTMQIaHvckOjESFVOxhgGFxvPPt/43wOgxkoEQ0PA4G+jESAZCQMPjbKATIxkIAQ2Ps4FOjGQgBDQ8zgY6MZKBENDwOBvoxEgGQkDD42ygEyMZCAEFgEoEFAAqEVAAqERAAaASAQWASgQUACoRUACoREABoBIBDeHRxen7+z995Yum/y4Yk8eXp+dv7f/0w7b/Mt9BBDSERUDPfbL5KQHFgft7m/+23tlPKdwQ0BAWAZ2+tvkpAcWWm9PVIB5d3Pw3Fn4IaAiLw/E368/PCCgO2Xx55+bmP7FwREBDWFTzf+xtHmisfnxwZTqdvnu96b8WxuBO+fLO/fU+FsPYm05/en31858tRvLv/7bhv1x2BDSEZTXXjzDWAb2zOCUL53ja4Dvv8eXlMq6tP0O5vzWM9c95aDocAhrCsprrJ1lXAV0cjXf/9/zxv0z5uhfu75375P7e6hmkxSf0792aP/7X5RdGF4v5D4tf/Lc9RjIYAhpCqebqk7RVQDdf8LrGowssVnD+v6wjuRnGzen7PK3kgICGsKpmqWX56f5L/njpCrZfpPH48rqZy0eki5W8+j9b/nt9BxDQEFYBLY8oyk/3H1vwnDzmy/+OrmewaObG4lduLn989b/yn9jhENAQNs8cLR5vrgO6PjAEFPPV483yk+Vj0YOAzv/8N+Wn75HQoRDQEDadvDZ9n0egeMJWQM2XPR//9+Urmd5/2j8EAQIawqaTi/Px3/gaKKz9gD7t/fCP/5WRDIaAhrD/QPPO9K/2eBYexn5AF8NY/Wz5X9bNa+sPfhdqBDSEg8/Ur62+uLV6HehfrvA6UMy3E/no4vT89fn8z3uLR6LLKzUtfv7gMv+VHQwBDeEgoIty8k4kGFuPMdfDmL43P3gn0qt8nXwoBDSEreeKNhff4b3w2Lf9SfrqvfD/ePDzv/qPfAI/GAIKAJUIKABUIqAAUImAAkAlAgoAlQgoAFQioABQiYACQCUCCgCVCCgAVCKgAFCJgAJAJQIKAJUIKABUIqAAUImAAkAlAgoAlQgoAFQioABQiYACQCUCCgCVCCgAVCKgAFCJgAJAJQIKAJUIKABUIqAAUImAAkAlAgoAlQgoAFQioABQiYACQCUCCgCVCCgAVCKgAFCJgAJAJQIKAJUIKABUIqAAUImAAkAlAgoAlQgoAFQioABQiYACQCUCCgCVCCgAVCKgAFCJgAJAJQIKAJUIKABUIqAAUOn/A71FEGOQyBlxAAAAAElFTkSuQmCC">
-            <a:extLst>
-              <a:ext uri="{FF2B5EF4-FFF2-40B4-BE49-F238E27FC236}">
-                <a16:creationId xmlns:a16="http://schemas.microsoft.com/office/drawing/2014/main" id="{8CC047BC-7FEC-4EB1-BCEA-02FB6A9AD576}"/>
-              </a:ext>
-            </a:extLst>
-          </p:cNvPr>
-          <p:cNvSpPr>
-            <a:spLocks noChangeAspect="1" noChangeArrowheads="1"/>
-          </p:cNvSpPr>
-          <p:nvPr/>
-        </p:nvSpPr>
-        <p:spPr bwMode="auto">
-          <a:xfrm>
-            <a:off x="5963478" y="3296478"/>
-            <a:ext cx="284922" cy="284922"/>
-          </a:xfrm>
-          <a:prstGeom prst="rect">
-            <a:avLst/>
-          </a:prstGeom>
-          <a:noFill/>
-          <a:extLst>
-            <a:ext uri="{909E8E84-426E-40DD-AFC4-6F175D3DCCD1}">
-              <a14:hiddenFill xmlns:a14="http://schemas.microsoft.com/office/drawing/2010/main">
-                <a:solidFill>
-                  <a:srgbClr val="FFFFFF"/>
-                </a:solidFill>
-              </a14:hiddenFill>
-            </a:ext>
-          </a:extLst>
-        </p:spPr>
-        <p:txBody>
-          <a:bodyPr vert="horz" wrap="square" lIns="91440" tIns="45720" rIns="91440" bIns="45720" numCol="1" anchor="t" anchorCtr="0" compatLnSpc="1">
-            <a:prstTxWarp prst="textNoShape">
-              <a:avLst/>
-            </a:prstTxWarp>
-          </a:bodyPr>
-          <a:lstStyle/>
-          <a:p>
-            <a:endParaRPr lang="en-US"/>
-          </a:p>
-        </p:txBody>
-      </p:sp>
-      <p:sp>
-        <p:nvSpPr>
-          <p:cNvPr id="5" name="AutoShape 2" descr="data:image/png;base64,iVBORw0KGgoAAAANSUhEUgAABUAAAAPACAMAAADDuCPrAAABYlBMVEUAAAAAADoAAGYAOjoAOmYAOpAAZrYzMzM6AAA6OgA6Ojo6OmY6ZmY6ZpA6ZrY6kLY6kNtNTU1NTW5NTY5Nbm5Nbo5NbqtNjshmAABmADpmOgBmOjpmZjpmZmZmZpBmkGZmkLZmkNtmtttmtv9uTU1ubk1ubm5ubo5ujqtujshuq8huq+SOTU2Obk2Obm6Oq8iOyOSOyP+QOgCQOjqQZjqQZmaQZpCQkGaQkLaQtraQttuQ2/+rbk2rjk2rjm6rq8iryOSr5Mir5P+2ZgC2Zjq2kDq2kGa2kJC2tpC2tra2ttu229u22/+2///Ijk3Ijm7Iq27Iq6vIyKvI5KvI5OTI5P/I///bkDrbkGbbtmbbtpDbtrbb27bb29vb2//b/7bb///kq27kyI7kyKvk5P/k///r6+v8jVn/tmb/yI7/25D/27b/29v/5Kv/5Mj/5OT//7b//7///8j//9v//+T///+zjZs9AAAACXBIWXMAAB2HAAAdhwGP5fFlAAAgAElEQVR4nO3d/59b5ZnecU0wMDGEILMYh0CWwmwDxaSLN3S7xHW3mGQXkni3aY0TEijO1q2/YMe1rP+/0iNpRnPbM+fMM9e5n3PffN4/xB472Eiv6/mgGUlnJnMAQJVJ638BAIiKgAJAJQIKAJUIKABUIqAAUImAAkAlAgoAlQgoAFQioABQiYACQCUCCgCVCCgAVCKgAFCJgAJAJQIKAJVGENDZl298fzKZ7Lzw8Ten/rNuT570zvzhhcnOLwT/pgCwrXlAZ7/aPWjdS6dNKAEF4Kd1QO+9fih2p+0cAQXgp3FA7y4ffu689dXip9/+6vuCgh78ud/7reRPAoCjtA3o4qHh1ufts1/KCkpAAQyvbUCvLor59tbHy8/An1P8wQQUwPCaBnT5CfzLh37lRvmapeRPJqAABtY0oItcmswtP6d/rvzGwQPRq5vK3vv5Irg7P/jNwT/9zuzT3cnOC09+1n84oJsnka4ufyh/ygsfL3/9yx8vev3Cr/f/f+YvAIBjtQzo7NKTn7Cvmroo3n7/NvWbfWpe7LQM6NUjnro/OqA31n/Iywd/4PpB8BN/AQAcq2VAlw837efrt1c9vHrwO4tfefabVW03VtVdpPBs+fDZJ3t3ZED/fv8Pefvq4ddOPfkXAMCxWgZ0UbknHjyuo3r7IGLrli4fOb709Xz+7aebx4zlseQPv5l/+/VT/+inBnRh+Rn6l4tP1Z+Z7Lz9zeqZ/+fmT/0LAOBYLQN6+ymffS8D+vJ866Xv68/mtx6t3l5/5fTGMaE7OqAvb/6MzV9wdfUQ9il/AQAca6QBXdZxlbr180nbTysdPCY98kWjRwZ0/aubv2a+/yWCp/wFAHCssQZ0UcDypc3lVyaXMdtu2u39xj7lq58rRwb0uYO/5p1D/9en/AUAcKyRfg10Gc7ye+uQbj/Ds3mW58YxT/YcGdCXD//K/v/1aX8BABxrbM/C70f19qFP5W3f7Cfd1qkDeuRjWwDYGOfrQOclcYuIbR6IElAA4zPOdyItlbcNbV7OtPlSqPmntQHliSMAJ9I0oFu5XNt6L3z5HH7/qZ2rTz6vIw3o0/4CADhW26sx2Zdy3t765HnxmPDZ/7X/ls7tp9xv7H95VBjQp/wFAHCstgEtX3k8eOf5jcn2C5tulDderku2deGmzfNM2oA+5S8AgGM1viL9veUVlQ9dkf7gC5Grq9VvSrZ8F9GZX6+/h9LmvZfCgD7lLwCAY435eyJd3X42fPtp8lUbxQF98i8AgGO1Duih78q5c/g6crcn28+Mz36++b+dWV2wUxzQJ/8CADhW84AufPnz5Sfvz7xovy/89lVBl/60vN7x+lrIc31An/gLAOBYYwgoAIREQAGgEgEFgEoEFAAqEVAAqERAAaASAQWASgQUACoRUACoREABoBIBBYBKBBQAKhFQAKhEQAGgEgEFgEoEFAAqEVAAqNQwoP8HEtyT6MRIVEzFCGh43JPoxEhUTMUIaHjck+jESFRMxQhoeNyT6MRIVEzFCGh43JPoxEhUTMUIaHjck+jESFRMxQhoeNyT6MRIVEzFCGh43JPoxEhUTMUIaHjck+jESFRMxQhoeNyT6MRIVEzFCGh43JPoxEhUTMUIaHjck+jESFRMxQhoeNyT6MRIVEzFCGh43JPoxEhUTMUIaHjck+jESFRMxQhoeNyT6MRIVEzFCGh43JPoxEhUTMUIaHjck+jESFRMxQhoeNyT6MRIVEzFCGh43JPoxEhUTMUIaHjck+jESFRMxQhoeNyT6MRIVEzFCGh43JPoxEhUTMUIaHjck+jESFRMxQhoeNyT6MRIVEzFCGh43JPoxEhUTMUIaHjck+jESFRMxQhoeNyT6MRIVEzFCGh43JPoxEhUTMUIaHjck+jESFRMxQhoeNyT6MRIVEzFCGh43JPoxEhUTMUIaHjck+jESFRMxQhoeNyT6MRIVEzFCGh43JPoxEhUTMUIaHjck+jESFRMxQhoeNyT6MRIVEzFUgX0/+I7RL+fxAioiqkYAUVQ+v0kRkBVTMUIKILS7ycxAqpiKkZAEZR+P4kRUBVTMQKKoPT7SYyAqpiKEVAEpd9PYgRUxVSMgCIo/X4SI6AqpmIEFEHp95MYAVUxFSOgCEq/n8QIqIqpGAFFUPr9JEZAVUzFCCiC0u8nMQKqYipGQBGUfj+JEVAVUzECiqD0+0mMgKqYihFQBKXfT2IEVMVUjIAiKP1+EiOgKqZiBBRB6feTGAFVMRUjoAhKv5/ECKiKqRgBRVD6/SRGQFVMxQgogtLvJzECqmIqRkARlH4/iRFQFVMxAoqg9PtJjICqmIoRUASl309iBFTFVIyAIij9fhIjoCqmYgQUQen3kxgBVTEVI6AISr+fxAioiqkYAUVQ+v0kRkBVTMUIKILS7ycxAqpiKkZAEZR+P4kRUBVTMQKKoPT7SYyAqpiKEVAEpd9PYgRUxVSMgCIo/X4SI6AqpmKnDeiji6+tf/b4yt50+u71rg8IKDT0+0mMgKqIA3pt+tqmpNOlV744/gMCChH9fhIjoCrSgD6+Nt0E9Nr0/PX5g8vT87eO/YCAQkS/n8QIqIoyoP/2wXQT0Pt75RHmo4vnPjnuAwIKFf1+EiOgKsKA3pxO3/vzOqA39398/7gPCChU9PtJjICqKAP66j/O76zzeG36YfmxfHz0BwQUKvr9JEZAVYQB3cri48vrT9Dv752/dfQHq3/m+ZVT/s1P0fpIw5N+P8BJEVAEpd8PcFL6gL7yxdEfHPpH9Y+uWx9peNLvJzE+hVcZPKDdj0AJKAT0+0mMgKoQUOSg309iBFRlmIDyLDy86feTGAFVGSigm1d5rl/6edQHBBQq+v0kRkBVBgoo70SCM/1+EiOgKgMF9PHl6av773g/+gMCChX9fhIjoCoDBXT+YPuaS0d/QEAhot9PYgRUZaiAzh9cWVTy3VtdHxBQaOj3kxgBVREH9BT0t631kYYn/X4SI6AqpmIEFEHp95MYAVUxFSOgCEq/n8QIqIqpGAFFUPr9JEZAVUzFCCiC0u8nMQKqYipGQBGUfj+JEVAVUzECiqD0+0mMgKqYihFQBKXfT2IEVMVUjIAiKP1+EiOgKqZiBBRB6feTGAFVMRUjoAhKv5/ECKiKqRgBRVD6/SRGQFVMxQgogtLvJzECqmIqRkARlH4/iRFQFVMxAoqg9PtJjICqmIoRUASl309iBFTFVIyAIij9fhIjoCqmYgQUQen3kxgBVTEVI6AISr+fxAioiqkYAUVQ+v0kRkBVTMUIKILS7ycxAqpiKkZAEZR+P4kRUBVTMQKKoPT7SYyAqpiKEVAEpd9PYgRUxVSMgCIo/X4SI6AqpmIEFEHp95MYAVUxFSOgCEq/n8QIqIqpGAFFUPr9JEZAVUzFCCiC0u8nMQKqYipGQBGUfj+JEVAVUzECiqD0+0mMgKqYihFQBKXfT2IEVMVUjIAiKP1+EiOgKqZiBBRB6feTGAFVMRUjoAhKv5/ECKiKqRgBRVD6/SRGQFVMxQgogtLvJzECqmIqRkARlH4/iRFQFVMxAoqg9PtJjICqmIoRUASl309iBFTFVIyAIij9fhIjoCqmYgQUQen3kxgBVTEVI6AISr+fxAioiqkYAUVQ+v0kRkBVTMUIKILS7ycxAqpiKkZAEZR+P4kRUBVTMQKKoPT7SYyAqpiKEVAEpd9PYgRUxVSMgCIo/X4SI6AqpmIEFEHp95MYAVUxFSOgCEq/n8QIqIqpGAFFUPr9JEZAVUzFCCiC0u8nMQKqYipGQBGUfj+JEVAVUzECiqD0+0mMgKqYihFQBKXfT2IEVMVUjIAiKP1+EiOgKqZiBBRB6feTGAFVMRUjoAhKv5/ECKiKqRgBRVD6/SRGQFVMxQgogtLvJzECqmIqRkARlH4/iRFQFVMxAoqg9PtJjICqmIoRUASl309iBFTFVIyAIij9fhIjoCqmYgQUQen3kxgBVTEVI6AISr+fxAioiqkYAUVQ+v0kRkBVTMUIKILS7ycxAqpiKkZAEZR+P4kRUBVTMQKKoPT7SYyAqpiKEVAEpd9PYgRUxVSMgCIo/X4SI6AqpmIEFEHp95MYAVUxFSOgCEq/n8QIqIqpGAFFUPr9JEZAVUzFCCiC0u8nMQKqYipGQBGUfj+JEVAVU7GGAdVrfaThqfXaAB6BIiz9fhLjEaiKqRgBRVD6/SRGQFVMxQgogtLvJzECqmIqRkARlH4/iRFQFVMxAoqg9PtJjICqmIoRUASl309iBFTFVIyAIij9fhIjoCqmYgQUQen3kxgBVTEVI6AISr+fxAioiqkYAUVQ+v0kRkBVTMUIKILS7ycxAqpiKkZAEZR+P4kRUBVTMQKKoPT7SYyAqpiKEVAEpd9PYgRUxVSMgCIo/X4SI6AqpmIEFEHp95MYAVUxFSOgCEq/n8QIqIqpGAFFUPr9JEZAVUzFCCiC0u8nMQKqYipGQBGUfj+JEVAVUzECiqD0+0mMgKqYihFQBKXfT2IEVMVUjIAiKP1+EiOgKqZiBBRB6feTGAFVMRUjoAhKv5/ECKiKqRgBRVD6/SRGQFVMxQgogtLvJzECqmIqRkARlH4/iRFQFVMxAoqg9PtJjICqmIoRUASl309iBFTFVIyAIij9fhIjoCqmYgQUQen3kxgBVTEVI6AISr+fxAioiqkYAUVQ+v0kRkBVTMUIKILS7ycxAqpiKkZAEZR+P4kRUBVTMQKKoPT7SYyAqpiKEVAEpd9PYgRUxVSMgCIo/X4SI6AqpmIEFEHp95MYAVUxFSOgCEq/n8QIqIqpGAFFUPr9JEZAVUzFCCiC0u8nMQKqYipGQBGUfj+JEVAVUzECiqD0+0mMgKqYihFQBKXfT2IEVMVUjIAiKP1+EiOgKqZiBBRB6feTGAFVMRUjoAhKv5/ECKiKqRgBRVD6/SRGQFVMxQgogtLvJzECqmIqRkARlH4/iRFQFVMxAoqg9PtJjICqmIoRUASl309iBFTFVIyAIij9fhIjoCqmYgQUQen3kxgBVTEVI6AISr+fxAioiqkYAUVQ+v0kRkBVTMUIKILS7ycxAqpiKkZAEZR+P4kRUBVTMQKKoPT7SYyAqpiKEVAEpd9PYgRUxVSMgCIo/X4SI6AqpmIEFEHp95MYAVUxFSOgCEq/n8QIqIqpGAFFUPr9JEZAVUzFCCiC0u8nMQKqYipGQBGUfj+JEVAVUzECiqD0+0mMgKqYihFQBKXfT2IEVMVUjIAiKP1+EiOgKqZiBBRB6feTGAFVMRUjoAhKv5/ECKiKqRgBRVD6/SRGQFVMxQgogtLvJzECqmIqRkARlH4/iRFQFVMxAoqg9PtJjICqmIoRUASl309iBFTFVIyAIij9fhIjoCqmYgQUQen3kxgBVTEVI6AISr+fxAioiqmYKKCPL083XvliPn908eDni9+8sjedvnudgEJJv5/ECKiKS0Dv720FdF3TVUwJKET0+0mMgKoME9CN+3vnPln8cGf62sGvXZuevz5/cHl6/hYBhY5+P4kRUJVBA7p4IPr+qpnvbzV1/Ti0pJWAQkS/n8QIqMqgAb25epj5+PJWLG+uH43e3IoqAcWp6feTGAFVGTKgjy5OP1z9eP53H0ynP72+/ODa6tcOf1pPQHFa+v0kRkBVhgzo5sHm5jmkZTr3H43e39t8EfT5FeXfvNL6SMOTfj/ASSkDuv9lzjvT6Xu35n+5Ml18TEAxDP1+gJNSBvTO5on2zSPR5XNJWwE1L2TSP7pufaThSb+fxPgUXmW4gD6+vP5q56GiPuURKAGFgH4/iRFQleEC+sRDzPIrBBTD0O8nMQKqMlxAn3iafdVMnoXHIPT7SYyAqgwX0P1Xz+9/Ll+auXn9J68DhZR+P4kRUJXBArr16vlrqwebq5DyTiQMQr+fxAioymABfXRx/0ug9/eWL2N68EF5Vn6R0Vd5Lzzk9PtJjICqDBbQ7SeJbq4vxnR9+cEDrsaEAej3kxgBVRksoHe2H2I++Nl0eu699ccPriz6+e4t+w/ob1vrIw1P+v0kRkBVBgvoielvW+sjDU/6/SRGQFVMxQgogtLvJzECqmIqRkARlH4/iRFQFVMxAoqg9PtJjICqmIoRUASl309iBFTFVKwjoLM/fvY5AcUY6feTGAFV6RvQe//pm/n84euTyeTMLwgoxke/n8QIqErPgN6YfO+38/nVydLyZwQUI6PfT2IEVKVfQG+XbN7dnTz7zb0Lk5cJKEZHv5/ECKhKv4BeXZRzmdGdXyz/d/lzAopx0e8nMQKq0iugs0vLcq4z+vDCMJ/D629b6yMNT/r9JEZAVXoFdNXMhxcmz80JKMZJv5/ECKjKCQJ6d3fyDgHFSOn3kxgBVekV0NWn8DfKl0D5GihGSb+fxAioSq+Azq9Onls+/b4sJ8/CY5T0+0mMgKr0C+jt8gLQxWfws59PVo9DCSjGRb+fxAioSr+ALj59X3iuPJG0884g/SSgOBX9fhIjoCo9Azq/99FPPl788PBHP/jNMP0koDgV/X4SI6AqfQM6PP1ta32k4Um/n8QIqIqp2LEBnX09YD8JKE5Fv5/ECKiKqdjRAf3yx8v3wz/80VuDvIaJgOKU9PtJjICq9Azo7NPVdZgeXpicGeZiTAQUp6LfT2IEVKVnQK9OJmf+evd7v5393WSg19ETUJyKfj+JEVCVfgG9PZm8vX4P5x9Wb+gkoBgX/X4SI6Aq/QJ6dfnuo/Wb4G+US4oQUIyLfj+JEVCVXgFdvRd+HdC7u1xMBOOj309iBFSlV0A3l7Mr5eRqTBgj/X4SI6AqBBQ56PeTGAFV6RXQ2aXlE0frcnI5O4yRfj+JEVCVXgFdPXG0CugipjyJhPHR7ycxAqrSL6B3dycvfVMCeu91LmeHMdLvJzECqtIvoOVydmd3d178/uLHYa6nTEBxKvr9JEZAVXoGdP773cnaQP0koDgV/X4SI6AqfQM6//ZXZxf1fGawy4ESUJyKfj+JEVCV3gEdnP62tT7S8KTfT2IEVMVUjOuBIij9fhIjoCqmYlwPFEHp95MYAVXpGVCuB4qR0+8nMQKq0jOgXA8UI6ffT2IEVKVfQLkeKMZOv5/ECKhKv4ByPVCMnX4/iRFQlV4B5XqgGD39fhIjoCq9Asrl7DB6+v0kRkBVCChy0O8nMQKq0iugXA8Uo6ffT2IEVKVXQLkeKEZPv5/ECKhKv4ByPVCMnX4/iRFQlX4B5XqgGDv9fhIjoCo9A8r1QDFy+v0kRkBV+gaU64Fi3PT7SYyAqvQO6OD0t631kYYn/X4SI6AqpmIEFEHp95MYAVUxFTvihfQ/emnQaykTUJyafj+JEVCVfgG9MJk8M9iVlAkoBPT7SYyAqvQK6OpyypMzHw/ZUP1ta32k4Um/n8QIqEqvgC786celoS98TEAxSvr9JEZAVfoGdL76rkgLQ72QSX/bWh9peNLvJzECqnKCgC4+lf/y9WVCd94a4ikl/W1rfaThSb+fxAioyokCuvDtz8tbkl7QPwzV37bWRxqe9PtJjICqnCigs199f/OGzslLBBRjot9PYgRUpX9AN/VcPhf/7af698Trb1vrIw1P+v0kRkBVegZ0/dXPg1eD6i+rrL9trY80POn3kxgBVekV0NmliX3ySP+NPfS3rfWRhif9fhIjoCq9Arp8J9LO4ZcvPbzAI1CMiX4/iRFQlZ4B/cGvzS/NPle/lEl/21ofaXjS7ycxAqrSK6Au9Let9ZGGJ/1+EiOgKqZiBBRB6feTGAFVMRXruCL9ztlB3oREQHFq+v0kRkBV+gb0xv4r6PmeSBgj/X4SI6AqPQO67OczL775Bt+VEyOl309iBFSlX0Dv7k6eXb2K6d4lvi88xki/n8QIqEq/gF49eN/R7NLkOQKK0dHvJzECqtIroLNLW4867+6qX0JPQHF6+v0kRkBVegX00Ps29W/iJKA4Pf1+EiOgKgQUOej3kxgBVekV0NmlyTv7H+ivw0RAcXr6/SRGQFV6BZQnkTB6+v0kRkBV+gX07u7kzOpyIn96nZcxYYz0+0mMgKr0C+jqjUhnz54d8q1Icq2PNDy1XhtwzFs5/7C7fifnztsD/dX6/zi0PtLwpN9PYjwCVekb0PnsyzcWj0Bf/HiQJ5AIKE5Lv5/ECKhK74AOTn/bWh9peNLvJzECqmIqRkARlH4/iRFQFVMxG9DZR28+6Se8DhSjo99PYgRUpSOgy28n9wTeiYTx0e8nMQKqQkCRg34/iRFQlY6AOtLfttZHGp70+0mMgKqYihFQBKXfT2IEVMVU7PiAfjVcPgkoTke/n8QIqIqp2NEB/fLH5X1IP/gNAcUY6feTGAFV6RnQ2aX9p5BeGui9SPrb1vpIw5N+P4kRUJV+AV32c+fFf/jsn97YnQx0NTsCilPR7ycxAqrSL6A3JpMfrh54zn452bq4MgHFWOj3kxgBVekV0MUD0INr2F3lgsoYIf1+EiOgKr0C+vDCoe/KyQvpMT76/SRGQFV6BpRvKoeR0+8nMQKq0iugfF94jJ5+P4kRUJVeAZ3f2Pq65w2+BooR0u8nMQKq0i+gs0v7L/+8MdC1RAgoTkW/n8QIqEqvgM4+Wr7+88W3Pvvn5Y8vDHNVUP1ta32k4Um/n8QIqEqvgLpc1E5/21ofaXjS7ycxAqpCQJGDfj+JEVCVXgF1ob9trY80POn3kxgBVTEVI6AISr+fxAioiqkYAUVQ+v0kRkBVTMWODugfP9v3OS+kx+jo95MYAVXpGdDf7/JN5TBq+v0kRkBV+gX0Nt+VEyOn309iBFSlV0BnlyY7H3+17+sh+klAcSr6/SRGQFV6BfThhYEuokxAoaLfT2IEVKVnQAd6/zsBhYp+P4kRUJVeAZ1dIqAYOf1+EiOgKr0COr/Bp/AYOf1+EiOgKv0Ceuh7ehBQjJB+P4kRUJV+AZ3fuzA58+aG+kJ2BBSnp99PYgRUpWdAP+V1oBg3/X4SI6Aq/QJ6gxfSY+T0+0mMgKr0Cmh5If0gn7cTUIjo95MYAVXpFVCP55AIKE5Fv5/ECKhKz4DyOlCMnH4/iRFQlV4B5YX0GD39fhIjoCq9Ajq/MXmZgGLU9PtJjICq9Avo7NLO2wQUY6bfT2IEVKVXQGcfvTGZ7LzIC+kxXvr9JEZAVXoF1HxbY14HivHR7ycxAqpCQJGDfj+JEVCVXgF1ob9trY80POn3kxgBVTEVI6AISr+fxAioiqkYAUVQ+v0kRkBVTMVsQGd/tN8F/uGPz77A10AxOvr9JEZAVToC+vDC6imj2UebFy9tfoWAYlT0+0mMgKr0DOhBNgkoRkm/n8QIqAoBRQ76/SRGQFUIKHLQ7ycxAqpCQJGDfj+JEVAVAooc9PtJjICqEFDkoN9PYgRUhYAiB/1+EiOgKgQUOej3kxgBVSGgyEG/n8QIqAoBRQ76/SRGQFUIKHLQ7ycxAqrSHdAnEVCMj34/iRFQFQKKHPT7SYyAqnQEdPbRm0/im8phfPT7SYyAqnQE1JH+trU+0vCk309iBFTFVIyAIij9fhIjoCqmYgQUQen3kxgBVTEVI6AISr+fxAioiqkYAUVQ+v0kRkBVTMUIKILS7ycxAqpiKkZAEZR+P4kRUBVTMQKKoPT7SYyAqpiKEVAEpd9PYgRUxVTsiXciXdr5xeKHb78moBg3/X4SI6AqHQF9eGH5xvfV/xJQjJh+P4kRUJXOgC4fgRJQjJ5+P4kRUJWOgM4uTZ79/Ks/Xfjer786MMzn8/rb1vpIw5N+P4kRUJWOgM5vcDk7hKDfT2IEVKUroLNP6wL66OK0eOWL5UePr+xNp+9eX/3WoQ8IKDT0+0mMgKp0BXSR0K8+++fdnX/47MDnPa4Hen9vK6Drmq5ieugDAgoR/X4SI6Aq3QGdVz2JdGf62sEH16bnr88fXJ6ev2U/IKAQ0e8nMQKq0iugs49OfBH6a9P3939+f2/9OPTcJ+YDAgoV/X4SI6AqvQJ6co8vb/Xx5vrR6M1lVA99QEChot9PYgRUpXdAv/3V2clk5+xb/V7D9Oji+d99MJ3+9Pryg2vTD8svlk/rD31AQKGi309iBFSlb0APXs70cp+Abp5DWtZy/9Ho/b3ztw59sPr/Pr/S5489mdZHGp70+wFO6qiALvv5zItvvvH9ngW9M52+d2v+lyvTRS4JKBzo9wOc1BEBvbs7efY35Wf3Lk3K5UU6bL7SuXwuaauZr3xx6IND/4j+0XXrIw1P+v0kxqfwKv0CenXy7OZp+NmlyXPdAd24MzUPOp/yCJSAQkC/n8QIqEqvgK4vardyd/fZ/q9pMg86CSiGot9PYgRUpVdAD72Q/kSvqi+Z5Fl4DE+/n8QIqMowAX18eTuTm5d8rl8HuvUBAYWKfj+JEVCVXgGdXZq8s//B7UmPT+GvrR5frkLKO5EwPP1+EiOgKr0CevInke7vLV/G9OCD8o73RUZf3X/7+6EPCChU9PtJjICq9Avo3d3JmV+Xn/3p9V4vY1p8hr665tL15QcPti/A9ICrMWEA+v0kRkBV+gV09Uaks2fP9n4r0vzBz6bTc++tH2U+uLJI5rtP+4CAQkO/n8QIqErPgM7/sLt+J+fO2736eXL629b6SMOTfj+JEVCVvgGdz758Y/EI9MWPT3pdOwIKF/r9JEZAVXoHdHD629b6SMOTfj+JEVAVUzECiqD0+0mMgKqYihFQBKXfT2IEVMVUjIAiKP1+EiOgKqZiBBRB6feTGAFVMRUjoAhKv5/ECKiKqRgBRVD6/SRGQFVMxQgogtLvJzECqmIqRkARlH4/iRFQFVOxo67G9IPfEFCMmn4/iRFQlV4BfXhh63qgBBRjpN9PYgRUpWdAT/BdPAgoWtDvJzECqtIroIe+qRwBxRjp95MYAVXpFdD5jc23hSegGCn9fhIjoCr9AvrtLyeTZ158c+0ng1zSTn/bWh9peJuln3QAABwGSURBVNLvJzECqtIroA8vTLYN8wVR/W1rfaThSb+fxAioCgFFDvr9JEZAVXoF1IX+trU+0vCk309iBFTFVIyAIij9fhIjoCqmYscGdPb1gP0koDgV/X4SI6AqpmJHB/TLHy+/+PnwR28N9V3l9Let9ZGGJ/1+EiOgKj0DOvt09ezRwwuTMwO9KUl/21ofaXjS7ycxAqrSM6BXJ5Mzf737vd/O/m4yeXaYx6D629b6SMOTfj+JEVCVfgG9PZm8vX5H/B92B7qwiP62tT7S8KTfT2IEVKVfQK9OXt6/pMiNyXMEFKOj309iBFSlV0BXFxNZB/TuLi+kx/jo95MYAVXpFdBVOtcBHeradvrb1vpIw5N+P4kRUBUCihz0+0mMgKr0Cujs0vKJo3U5bw/0NLz+trU+0vCk309iBFSlV0BXTxytArqIKU8iYXz0+0mMgKr0C+jd3clL35SA3nt9MtDV6fW3rfWRhif9fhIjoCr9Arp4CDqZnN3defH7ix9fHqSfBBSnot9PYgRUpWdA57/f3VwNdKB+ElCcin4/iRFQlb4BnX/7q7OLej4z3DeI19+21kcanvT7SYyAqvQO6OD0t631kYYn/X4SI6AqpmLHXw/0qwH7SUBxKvr9JEZAVUzFjr8e6AKfwmOc9PtJjICq9Azo7NL+t5R7aaArKutvW+sjDU/6/SRGQFX6BXTZz50X//Nn//TGoqDDvI6egOJU9PtJjICq9Avo7f1XL81+OeF6oBgh/X4SI6AqvQK6eAB68OrPq7yVEyOk309iBFSlV0AfXth6+ybXA8UY6feTGAFV6RnQrWZyOTuMkX4/iRFQlV4BXV2Rfu3uLpezw/jo95MYAVXpFdBD3wfpxkDvhtffttZHGp70+0mMgKr0C+jDC5MffrPp5zCfwRNQnIp+P4kRUJWOgM4+erN4Y/U60H9+c3cyefEnfAqP0dHvJzECqtIR0MVDzyfxJBLGR7+fxAioCgFFDpUj+X/4DpH2pegIqCP9bWt9pOGpciStjzQ8SftSmIoRUARVOZLWRxqepH0pTMUIKIKqHEnrIw1P0r4UpmJHB/SPn+37nGfhMTqVI2l9pOFJ2peiZ0APvqccTyJhlCpH0vpIw5O0L0W/gN7mWXiMXOVIWh9peJL2pegV0Nmlyc7HX+37eoh+ElCcSuVIWh9peJL2pegV0IcXBrqIMgGFSuVIWh9peJL2pegZ0IHe/05AoVI5ktZHGp6kfSl6BXR2iYBi5CpH0vpIw5O0L0WvgM5v8Ck8Rq5yJK2PNDxJ+1L0C+ih7+lBQDFClSNpfaThSdqXol9A5/cuTM68ucHl7DA+lSNpfaThSdqXomdAP+V1oBi3ypG0PtLwJO1L0S+gN3ghPUauciStjzQ8SftS9ApoeSH9IJ+3E1CIVI6k9ZGGJ2lfil4B9XgOiYDiVCpH0vpIw5O0L0XPgPI6UIxc5UhaH2l4kval6BVQXkiP0ascSesjDU/SvhS9AjrY94InoFCpHEnrIw1P0r4U/QI6u7TzNgHFmFWOpPWRhidpX4peAZ19VL4vPC+kx3hVjqT1kYYnaV+KXgE139yY14FifCpH0vpIw5O0LwUBRQ6VI2l9pOFJ2peiV0Bd6G9b6yMNT5UjaX2k4Unal8JUjIAiqMqRtD7S8CTtS2EqRkARVOVIWh9peJL2pTAVOyKg3361jW8qh/GpHEnrIw1P0r4UvQLq8iSSXusjDU+VI2l9pOFJ2pen4Vl4BFU5ktZHGp6kfSl6BXT2x8/W/v71yc4/fM4L6TE6lSNpfaThSdqXoldAt93dfXaYK4Pqb1vrIw1PlSNpfaThSdqX4sQBHezCIvrb1vpIw1PlSFofaXiS9qU4eUCHegiqv22tjzQ8VY6k9ZGGJ2lfipMHdKirK+tvW+sjDU+VI2l9pOFJ2pfi5AG9u0tAMT6VI2l9pOFJ2pfixAGdXZ3wKTzGp3IkrY80PEn7UvQK6OyjzaVA33xjd8KTSBihypG0PtLwJO1L0Sugh19Iz8uYMEKVI2l9pOFJ2pfixAF95q2BvkG8/ra1PtLwVDmS1kcanqR9KXoF1IX+trU+0vBUOZLWRxqepH0pTMUIKIKqHEnrIw1P0r4UpmIEFEFVjqT1kYYnaV8KUzECiqAqR9L6SMOTtC+FqZgN6NYLmA7wbY0xPpUjaX2k4Unal6IjoOZKoFwPFGNVOZLWRxqepH0pCChyqBxJ6yMNT9K+FB0Btb7cnfBOJIxR5UhaH2l4kvalOFFAZz9f5PPMbwbpJwHFqVSOpPWRhidpX4qTBPQPi4efO0O9EYmA4lQqR9L6SMOTtC9F/4AO+vCTgOKUKkfS+kjDk7QvRe+Aloef/26wfBJQnE7lSFofaXiS9qXoGdB7Az/8JKA4pcqRtD7S8CTtS9EvoIM//CSgOKXKkbQ+0vAk7UvRJ6D3Li2vAjrow08CilOqHEnrIw1P0r4UPQJaHn6+PXA+CShOp3IkrY80PEn7UnQG1OfhJwHFKVWOpPWRhidpX4qugP7e5+EnAcUpVY6k9ZGGJ2lfio6A8l54BFE5ktZHGp6kfSkIKHKoHEnrIw1P0r4UHQHleqAIonIkrY80PEn7UnQE1JH+trU+0vBUOZLWRxqepH0pTMUIKIKqHEnrIw1P0r4UpmIEFEFVjqT1kYYnaV8KUzECiqAqR9L6SMOTtC+FqRgBRVCVI2l9pOFJ2pfCVIyAIqjKkbQ+0vAk7UthKkZAEVTlSFofaXiS9qUwFSOgCKpyJK2PNDxJ+1KYihFQBFU5ktZHGp6kfSlMxQgogqocSesjDU/SvhSmYgQUQVWOpPWRhidpXwpTMQKKoCpH0vpIw5O0L4WpGAFFUJUjaX2k4Unal8JUjIAiqMqRtD7S8CTtS2EqRkARVOVIWh9peJL2pTAVI6AIqnIkrY80PEn7UpiKEVAEVTmS1kcanqR9KUzFCCiCqhxJ6yMNT9K+FKZiBBRBVY6k9ZGGJ2lfClMxAoqgKkfS+kjDk7QvhakYAUVQlSNpfaThSdqXwlSMgCKoypG0PtLwJO1LYSpGQBFU5UhaH2l4kvalMBUjoAiqciStjzQ8SftSmIoRUARVOZLWRxqepH0pTMUIKIKqHEnrIw1P0r4UpmIEFEFVjqT1kYYnaV8KUzECiqAqR9L6SMOTtC+FqRgBRVCVI2l9pOFJ2pfCVIyAIqjKkbQ+0vAk7UthKkZAEVTlSFofaXiS9qUwFSOgCKpyJK2PNDxJ+1KYihFQBFU5ktZHGp6kfSlMxQgogqocSesjDU/SvhSmYgQUQVWOpPWRhidpXwpTMQKKoCpH0vpIw5O0L4WpGAFFUJUjaX2k4Unal8JUjIAiqMqRtD7S8CTtS2EqRkARVOVIWh9peJL2pTAVI6AIqnIkrY80PEn7UpiKEVAEVTmS1kcanqR9KUzFCCiCqhxJ6yMNT9K+FKZiBBRBVY6k9ZGGJ2lfClMxAoqgKkfS+kjDk7QvhakYAUVQlSNpfaThSdqXwlSMgCKoypG0PtLwJO1LYSpGQBFU5UhaH2l4kvalMBUjoAiqciStjzQ8SftSmIrpAvpvP5tOz717vfz80cVp8coXy48eX9mbTte/Q0AhUjmS1kcanqR9KYYK6L+sknnuk+UH9/e2Arqu6SqmBBQilSNpfaThSdqXYqCA3pme+9v5/MHlVSfvTF87+K1r0/PXl79z/hYBhU7lSFofaXiS9qUYJqCPL08/XP64eLT5YWnm+/u/dX9v/Th09eCUgEKjciStjzQ8SftSDBPQRxfXn6GXdD6+vBXLm+tHoze3okpAcWqVI2l9pOFJ2pdimIDuKwF9dPH87z6YTn96ffUr5bHp4U/rCShOq3IkrY80PEn7Ugwb0NUn6pvnkJbp3H80en9v80XQ51e0f/NS6yMNT5UjaX2k4Unal6cRB3T1+fqd6fS9W/O/XFk+J09AMYzKkbQ+0vAk7cvTaAN6Z/Uyps2XPZefz28F1LyQSf/ouvWRhqfKkbQ+0vAk7UsxZEDv7J378HBPz996yiNQAgqBypG0PtLwJO1LMWBAb07NK5WWDzoJKIZROZLWRxqepH0phgvov9h+rprJs/AYROVIWh9peJL2pRgqoI+vTV9df41z86r6VTM3r//kdaCQqhxJ6yMNT9K+FEMF9NrWWzWvrR5srkLKO5EwiMqRtD7S8CTtSzFQQG9uv9X9/t7yZUwPPii/tsjoq7wXHnKVI2l9pOFJ2pdimIBurl+38FrJ6eoCTNeXv/eAqzFhAJUjaX2k4Unal2KYgN6ZHgro/MHy4qDvrR9yPriy+OV3b9l/Rn/bWh9peKocSesjDU/SvhTDBLSG/ra1PtLwVDmS1kcanqR9KUzFCCiCqhxJ6yMNT9K+FKZiBBRBVY6k9ZGGJ2lfClMxAoqgKkfS+kjDk7QvhakYAUVQlSNpfaThSdqXwlSMgCKoypG0PtLwJO1LYSpGQBFU5UhaH2l4kvalMBUjoAiqciStjzQ8SftSmIoRUARVOZLWRxqepH0pTMUIKIKqHEnrIw1P0r4UpmIEFEFVjqT1kYYnaV8KUzECiqAqR9L6SMOTtC+FqRgBRVCVI2l9pOFJ2pfCVIyAIqjKkbQ+0vAk7UthKkZAEVTlSFofaXiS9qUwFSOgCKpyJK2PNDxJ+1KYihFQBFU5ktZHGp6kfSlMxQgogqocSesjDU/SvhSmYgQUQVWOpPWRhidpXwpTMQKKoCpH0vpIw5O0L4WpGAFFUJUjaX2k4Unal8JUjIAiqMqRtD7S8CTtS2EqRkARVOVIWh9peJL2pTAVI6AIqnIkrY80PEn7UpiKEVAEVTmS1kcanqR9KUzFCCiCqhxJ6yMNT9K+FKZiBBRBVY6k9ZGGJ2lfClMxAoqgKkfS+kjDk7QvhakYAUVQlSNpfaThSdqXwlSMgCKoypG0PtLwJO1LYSpGQBFU5UhaH2l4kvalMBUjoAiqciStjzQ8SftSmIoRUARVOZLWRxqepH0pTMUIKIKqHEnrIw1P0r4UpmIEFEFVjqT1kYYnaV8KUzECiqAqR9L6SMOTtC+FqRgBRVCVI2l9pOFJ2pfCVIyAIqjKkbQ+0vAk7UthKkZAEVTlSFofaXiS9qUwFSOgCKpyJK2PNDxJ+1KYihFQBFU5ktZHGp6kfSlMxQgogqocSesjDU/SvhSmYgQUQVWOpPWRhidpXwpTMQKKoCpH0vpIw5O0L4WpGAFFUJUjaX2k4Unal8JUjIAiqMqRtD7S8CTtS2EqRkARVOVIWh9peJL2pTAVI6AIqnIkrY80PEn7UpiKEVAEVTmS1kcanqR9KUzFCCiCqhxJ6yMNT9K+FKZiBBRBVY6k9ZGGJ2lfClMxAoqgKkfS+kjDk7QvhakYAUVQlSNpfaThSdqXwlSMgCKoypG0PtLwJO1LYSpGQBFU5UhaH2l4kvalMBUjoAiqciStjzQ8SftSmIoRUARVOZLWRxqepH0pTMUIKIKqHEnrIw1P0r4UpmIEFEFVjqT1kYYnaV8KUzECiqAqR9L6SMOTtC+FqRgBRVCVI2l9pOFJ2pfCVIyAIqjKkbQ+0vAk7UthKkZAEVTlSFofaXiS9qUwFSOgCKpyJK2PNDxJ+1KYihFQBFU5ktZHGp6kfSlMxQgogqocSesjDU/SvhSmYgQUQVWOpPWRhidpXwpTMQKKoCpH0vpIw5O0L4WpGAFFUJUjaX2k4Unal8JUjIAiqMqRtD7S8CTtS2EqRkARVOVIWh9peJL2pTAVI6AIqnIkrY80PEn7UpiKEVAEVTmS1kcanqR9KUzFCCiCqhxJ6yMNT9K+FKZiBBRBVY6k9ZGGJ2lfClMxAoqgKkfS+kjDk7QvhakYAUVQlSNpfaThSdqXwlSMgCKoypG0PtLwJO1LYSpGQBFU5UhaH2l4kvalMBVrGFC91kcanipH0vpIw5O0L0/DI1AEVTmS1kcanqR9KUzFCCiCqhxJ6yMNT9K+FKZiBBRBVY6k9ZGGJ2lfClMxAoqgKkfS+kjDk7QvhakYAUVQlSNpfaThSdqXwlSMgCKoypG0PtLwJO1LYSpGQBFU5UhaH2l4kvalMBUjoAiqciStjzQ8SftSmIoRUARVOZLWRxqepH0pTMUIKIKqHEnrIw1P0r4UpmIEFEFVjqT1kYYnaV8KUzECiqAqR9L6SMOTtC+FqRgBRVCVI2l9pOFJ2pfCVIyAIqjKkbQ+0vAk7UthKkZAEVTlSFofaXiS9qUwFSOgCKpyJK2PNDxJ+1KYihFQBFU5ktZHGp6kfSlMxQgogqocSesjDU/SvhSmYgQUQVWOpPWRhidpXwpTMQKKoCpH0vpIw5O0L4WpGAFFUJUjaX2k4Unal8JUjIAiqMqRtD7S8CTtS2EqRkARVOVIWh9peJL2pTAVI6AIqnIkrY80PEn7UpiKEVAEVTmS1kcanqR9KUzFCCiCqhxJ6yMNT9K+FKZiBBRBVY6k9ZGGJ2lfClMxAoqgKkfS+kjDk7QvhakYAUVQlSNpfaThSdqXwlSMgCKoypG0PtLwJO1LYSpGQBFU5UhaH2l4kvalMBUjoAiqciStjzQ8SftSmIoRUARVOZLWRxqepH0pTMUIKIKqHEnrIw1P0r4UpmIEFEFVjqT1kYYnaV8KUzECiqAqR9L6SMOTtC+FqRgBRVCVI2l9pOFJ2pfCVIyAIqjKkbQ+0vAk7UthKkZAEVTlSFofaXiS9qUwFSOgCKpyJK2PNDxJ+1KYihFQBFU5ktZHGp6kfSlMxQgogqocSesjDU/SvhSmYgQUQVWOpPWRhidpXwpTMQKKoCpH0vpIw5O0L4WpGAFFUJUjaX2k4Unal8JUjIAiqMqRtD7S8CTtS2EqRkARVOVIWh9peJL2pTAVI6AIqnIkrY80PEn7UpiKEVAEVTmS1kcanqR9KUzFCCiCqhxJ6yMNT9K+FKZiBBRBVY6k9ZGGJ2lfClMxAoqgKkfS+kjDk7QvhakYAUVQlSNpfaThSdqXwlSMgCKoypG0PtLwJO1LYSpGQBFU5UhaH2l4kvalMBUjoAiqciStjzQ8SftSmIoRUARVOZLWRxqepH0pTMUIKIKqHEnrIw1P0r4UpmIEFEFVjqT1kYYnaV8KUzECiqAqR9L6SMOTtC+FqRgBRVCVI2l9pOFJ2pfCVIyAIqjKkbQ+0vAk7UthKkZAEVTlSFofaXiS9qUwFSOgCKpyJK2PNDxJ+1KYihFQBFU5ktZHGp6kfSlMxQgogqocSesjDU/SvhSmYgQUQVWOpPWRhidpXwpTMQKKoCpH0vpIw5O0L4WpGAFFUJUjaX2k4Unal8JUjIAiqMqRtD7S8CTtS2EqRkARVOVIWh9peJL2pTAVI6AIqnIkrY80PEn7UpiKEVAEVTmS1kcanqR9KUzFCCiCqhxJ6yMNT9K+FKZiBBRBVY6k9ZGGJ2lfClMxAoqgKkfS+kjDk7QvhakYAUVQlSNpfaThSdqXwlSMgCKoypG0PtLwJO1LYSpGQBFU5UhaH2l4kvalMBUjoAiqciStjzQ8SftSmIp5BPTxlb3p9N3rBBRKlSNpfaThSdqXwj+gjy5Ol175goBCqHIkrY80PEn7UvgH9Nr0/PX5g8vT87cIKHQqR9L6SMOTtC+Fe0Dv75XHno8unvuEgEKnciStjzQ8SftSuAf05vS19Y/vE1DoVI6k9ZGGJ2lfCveAXpt+WH68sw4pAYVE5UhaH2l4kval8A7o48vrT93v722+CPr8iv7van2k4alyJK2PNDxJ+/I0qQIKAJ48A2peyKR/dP3dxD2JToxEpWFAzeuYWt8TWXBPohMjUSGg2XBPohMjUfEOqOez8N9N3JPoxEhU3AO6ef2nw+tAv5u4J9GJkai4B9TxnUjfTdyT6MRIVNwD+vjy9FWn98J/N3FPohMjUXEP6PyB29WYvpu4J9GJkaj4B3T+4Mqin+/esr/c+p7IgnsSnRiJSoOAHqH1PZEF9yQ6MRIVUzECGh73JDoxEhVTMQIaHvckOjESFVMxAhoe9yQ6MRIVUzECGh73JDoxEhVTMQIaHvckOjESFVMxAhoe9yQ6MRIVUzECGh73JDoxEhVTMQIaHvckOjESFVMxAhoe9yQ6MRIVUzECGh73JDoxEhVTMQIaHvckOjESFVMxAhoe9yQ6MRIVUzECGh73JDoxEhVTMQIaHvckOjESFVMxAhoe9yQ6MRIVUzECGh73JDoxEhVTMQIaHvckOjESFVMxAhoe9yQ6MRIVUzECGh73JDoxEhVTMQIaHvckOjESFVMxAhoe9yQ6MRIVUzECGh73JDoxEhVTMQIaHvckOjESFVMxAhoe9yQ6MRIVUzECGh73JDoxEhVTMQIaHvckOjESFVOxhgGFxvPPt/43wOgxkoEQ0PA4G+jESAZCQMPjbKATIxkIAQ2Ps4FOjGQgBDQ8zgY6MZKBENDwOBvoxEgGQkDD42ygEyMZCAEFgEoEFAAqEVAAqERAAaASAQWASgQUACoRUACoREABoBIBDeHRxen7+z995Yum/y4Yk8eXp+dv7f/0w7b/Mt9BBDSERUDPfbL5KQHFgft7m/+23tlPKdwQ0BAWAZ2+tvkpAcWWm9PVIB5d3Pw3Fn4IaAiLw/E368/PCCgO2Xx55+bmP7FwREBDWFTzf+xtHmisfnxwZTqdvnu96b8WxuBO+fLO/fU+FsPYm05/en31858tRvLv/7bhv1x2BDSEZTXXjzDWAb2zOCUL53ja4Dvv8eXlMq6tP0O5vzWM9c95aDocAhrCsprrJ1lXAV0cjXf/9/zxv0z5uhfu75375P7e6hmkxSf0792aP/7X5RdGF4v5D4tf/Lc9RjIYAhpCqebqk7RVQDdf8LrGowssVnD+v6wjuRnGzen7PK3kgICGsKpmqWX56f5L/njpCrZfpPH48rqZy0eki5W8+j9b/nt9BxDQEFYBLY8oyk/3H1vwnDzmy/+OrmewaObG4lduLn989b/yn9jhENAQNs8cLR5vrgO6PjAEFPPV483yk+Vj0YOAzv/8N+Wn75HQoRDQEDadvDZ9n0egeMJWQM2XPR//9+Urmd5/2j8EAQIawqaTi/Px3/gaKKz9gD7t/fCP/5WRDIaAhrD/QPPO9K/2eBYexn5AF8NY/Wz5X9bNa+sPfhdqBDSEg8/Ur62+uLV6HehfrvA6UMy3E/no4vT89fn8z3uLR6LLKzUtfv7gMv+VHQwBDeEgoIty8k4kGFuPMdfDmL43P3gn0qt8nXwoBDSEreeKNhff4b3w2Lf9SfrqvfD/ePDzv/qPfAI/GAIKAJUIKABUIqAAUImAAkAlAgoAlQgoAFQioABQiYACQCUCCgCVCCgAVCKgAFCJgAJAJQIKAJUIKABUIqAAUImAAkAlAgoAlQgoAFQioABQiYACQCUCCgCVCCgAVCKgAFCJgAJAJQIKAJUIKABUIqAAUImAAkAlAgoAlQgoAFQioABQiYACQCUCCgCVCCgAVCKgAFCJgAJAJQIKAJUIKABUIqAAUImAAkAlAgoAlQgoAFQioABQiYACQCUCCgCVCCgAVCKgAFCJgAJAJQIKAJUIKABUIqAAUOn/A71FEGOQyBlxAAAAAElFTkSuQmCC">
-            <a:extLst>
-              <a:ext uri="{FF2B5EF4-FFF2-40B4-BE49-F238E27FC236}">
-                <a16:creationId xmlns:a16="http://schemas.microsoft.com/office/drawing/2014/main" id="{27CC6064-973B-4FF1-9446-C7722D5F572B}"/>
-              </a:ext>
-            </a:extLst>
-          </p:cNvPr>
-          <p:cNvSpPr>
-            <a:spLocks noChangeAspect="1" noChangeArrowheads="1"/>
-          </p:cNvSpPr>
-          <p:nvPr/>
-        </p:nvSpPr>
-        <p:spPr bwMode="auto">
-          <a:xfrm>
-            <a:off x="2895600" y="228600"/>
-            <a:ext cx="6400800" cy="6400800"/>
-          </a:xfrm>
-          <a:prstGeom prst="rect">
-            <a:avLst/>
-          </a:prstGeom>
-          <a:noFill/>
-          <a:extLst>
-            <a:ext uri="{909E8E84-426E-40DD-AFC4-6F175D3DCCD1}">
-              <a14:hiddenFill xmlns:a14="http://schemas.microsoft.com/office/drawing/2010/main">
-                <a:solidFill>
-                  <a:srgbClr val="FFFFFF"/>
-                </a:solidFill>
-              </a14:hiddenFill>
-            </a:ext>
-          </a:extLst>
-        </p:spPr>
-        <p:txBody>
-          <a:bodyPr vert="horz" wrap="square" lIns="91440" tIns="45720" rIns="91440" bIns="45720" numCol="1" anchor="t" anchorCtr="0" compatLnSpc="1">
-            <a:prstTxWarp prst="textNoShape">
-              <a:avLst/>
-            </a:prstTxWarp>
-          </a:bodyPr>
-          <a:lstStyle/>
-          <a:p>
-            <a:endParaRPr lang="en-US"/>
-          </a:p>
-        </p:txBody>
-      </p:sp>
-      <p:sp>
-        <p:nvSpPr>
-          <p:cNvPr id="6" name="AutoShape 4" descr="data:image/png;base64,iVBORw0KGgoAAAANSUhEUgAABUAAAAPACAMAAADDuCPrAAABYlBMVEUAAAAAADoAAGYAOjoAOmYAOpAAZrYzMzM6AAA6OgA6Ojo6OmY6ZmY6ZpA6ZrY6kLY6kNtNTU1NTW5NTY5Nbm5Nbo5NbqtNjshmAABmADpmOgBmOjpmZjpmZmZmZpBmkGZmkLZmkNtmtttmtv9uTU1ubk1ubm5ubo5ujqtujshuq8huq+SOTU2Obk2Obm6Oq8iOyOSOyP+QOgCQOjqQZjqQZmaQZpCQkGaQkLaQtraQttuQ2/+rbk2rjk2rjm6rq8iryOSr5Mir5P+2ZgC2Zjq2kDq2kGa2kJC2tpC2tra2ttu229u22/+2///Ijk3Ijm7Iq27Iq6vIyKvI5KvI5OTI5P/I///bkDrbkGbbtmbbtpDbtrbb27bb29vb2//b/7bb///kq27kyI7kyKvk5P/k///r6+v8jVn/tmb/yI7/25D/27b/29v/5Kv/5Mj/5OT//7b//7///8j//9v//+T///+zjZs9AAAACXBIWXMAAB2HAAAdhwGP5fFlAAAgAElEQVR4nO3d/59b5ZnecU0wMDGEILMYh0CWwmwDxaSLN3S7xHW3mGQXkni3aY0TEijO1q2/YMe1rP+/0iNpRnPbM+fMM9e5n3PffN4/xB472Eiv6/mgGUlnJnMAQJVJ638BAIiKgAJAJQIKAJUIKABUIqAAUImAAkAlAgoAlQgoAFQioABQiYACQCUCCgCVCCgAVCKgAFCJgAJAJQIKAJVGENDZl298fzKZ7Lzw8Ten/rNuT570zvzhhcnOLwT/pgCwrXlAZ7/aPWjdS6dNKAEF4Kd1QO+9fih2p+0cAQXgp3FA7y4ffu689dXip9/+6vuCgh78ud/7reRPAoCjtA3o4qHh1ufts1/KCkpAAQyvbUCvLor59tbHy8/An1P8wQQUwPCaBnT5CfzLh37lRvmapeRPJqAABtY0oItcmswtP6d/rvzGwQPRq5vK3vv5Irg7P/jNwT/9zuzT3cnOC09+1n84oJsnka4ufyh/ygsfL3/9yx8vev3Cr/f/f+YvAIBjtQzo7NKTn7Cvmroo3n7/NvWbfWpe7LQM6NUjnro/OqA31n/Iywd/4PpB8BN/AQAcq2VAlw837efrt1c9vHrwO4tfefabVW03VtVdpPBs+fDZJ3t3ZED/fv8Pefvq4ddOPfkXAMCxWgZ0UbknHjyuo3r7IGLrli4fOb709Xz+7aebx4zlseQPv5l/+/VT/+inBnRh+Rn6l4tP1Z+Z7Lz9zeqZ/+fmT/0LAOBYLQN6+ymffS8D+vJ866Xv68/mtx6t3l5/5fTGMaE7OqAvb/6MzV9wdfUQ9il/AQAca6QBXdZxlbr180nbTysdPCY98kWjRwZ0/aubv2a+/yWCp/wFAHCssQZ0UcDypc3lVyaXMdtu2u39xj7lq58rRwb0uYO/5p1D/9en/AUAcKyRfg10Gc7ye+uQbj/Ds3mW58YxT/YcGdCXD//K/v/1aX8BABxrbM/C70f19qFP5W3f7Cfd1qkDeuRjWwDYGOfrQOclcYuIbR6IElAA4zPOdyItlbcNbV7OtPlSqPmntQHliSMAJ9I0oFu5XNt6L3z5HH7/qZ2rTz6vIw3o0/4CADhW26sx2Zdy3t765HnxmPDZ/7X/ls7tp9xv7H95VBjQp/wFAHCstgEtX3k8eOf5jcn2C5tulDderku2deGmzfNM2oA+5S8AgGM1viL9veUVlQ9dkf7gC5Grq9VvSrZ8F9GZX6+/h9LmvZfCgD7lLwCAY435eyJd3X42fPtp8lUbxQF98i8AgGO1Duih78q5c/g6crcn28+Mz36++b+dWV2wUxzQJ/8CADhW84AufPnz5Sfvz7xovy/89lVBl/60vN7x+lrIc31An/gLAOBYYwgoAIREQAGgEgEFgEoEFAAqEVAAqERAAaASAQWASgQUACoRUACoREABoBIBBYBKBBQAKhFQAKhEQAGgEgEFgEoEFAAqEVAAqNQwoP8HEtyT6MRIVEzFCGh43JPoxEhUTMUIaHjck+jESFRMxQhoeNyT6MRIVEzFCGh43JPoxEhUTMUIaHjck+jESFRMxQhoeNyT6MRIVEzFCGh43JPoxEhUTMUIaHjck+jESFRMxQhoeNyT6MRIVEzFCGh43JPoxEhUTMUIaHjck+jESFRMxQhoeNyT6MRIVEzFCGh43JPoxEhUTMUIaHjck+jESFRMxQhoeNyT6MRIVEzFCGh43JPoxEhUTMUIaHjck+jESFRMxQhoeNyT6MRIVEzFCGh43JPoxEhUTMUIaHjck+jESFRMxQhoeNyT6MRIVEzFCGh43JPoxEhUTMUIaHjck+jESFRMxQhoeNyT6MRIVEzFCGh43JPoxEhUTMUIaHjck+jESFRMxQhoeNyT6MRIVEzFCGh43JPoxEhUTMUIaHjck+jESFRMxQhoeNyT6MRIVEzFCGh43JPoxEhUTMUIaHjck+jESFRMxQhoeNyT6MRIVEzFCGh43JPoxEhUTMUIaHjck+jESFRMxQhoeNyT6MRIVEzFUgX0/+I7RL+fxAioiqkYAUVQ+v0kRkBVTMUIKILS7ycxAqpiKkZAEZR+P4kRUBVTMQKKoPT7SYyAqpiKEVAEpd9PYgRUxVSMgCIo/X4SI6AqpmIEFEHp95MYAVUxFSOgCEq/n8QIqIqpGAFFUPr9JEZAVUzFCCiC0u8nMQKqYipGQBGUfj+JEVAVUzECiqD0+0mMgKqYihFQBKXfT2IEVMVUjIAiKP1+EiOgKqZiBBRB6feTGAFVMRUjoAhKv5/ECKiKqRgBRVD6/SRGQFVMxQgogtLvJzECqmIqRkARlH4/iRFQFVMxAoqg9PtJjICqmIoRUASl309iBFTFVIyAIij9fhIjoCqmYgQUQen3kxgBVTEVI6AISr+fxAioiqkYAUVQ+v0kRkBVTMUIKILS7ycxAqpiKkZAEZR+P4kRUBVTMQKKoPT7SYyAqpiKEVAEpd9PYgRUxVSMgCIo/X4SI6AqpmKnDeiji6+tf/b4yt50+u71rg8IKDT0+0mMgKqIA3pt+tqmpNOlV744/gMCChH9fhIjoCrSgD6+Nt0E9Nr0/PX5g8vT87eO/YCAQkS/n8QIqIoyoP/2wXQT0Pt75RHmo4vnPjnuAwIKFf1+EiOgKsKA3pxO3/vzOqA39398/7gPCChU9PtJjICqKAP66j/O76zzeG36YfmxfHz0BwQUKvr9JEZAVYQB3cri48vrT9Dv752/dfQHq3/m+ZVT/s1P0fpIw5N+P8BJEVAEpd8PcFL6gL7yxdEfHPpH9Y+uWx9peNLvJzE+hVcZPKDdj0AJKAT0+0mMgKoQUOSg309iBFRlmIDyLDy86feTGAFVGSigm1d5rl/6edQHBBQq+v0kRkBVBgoo70SCM/1+EiOgKgMF9PHl6av773g/+gMCChX9fhIjoCoDBXT+YPuaS0d/QEAhot9PYgRUZaiAzh9cWVTy3VtdHxBQaOj3kxgBVREH9BT0t631kYYn/X4SI6AqpmIEFEHp95MYAVUxFSOgCEq/n8QIqIqpGAFFUPr9JEZAVUzFCCiC0u8nMQKqYipGQBGUfj+JEVAVUzECiqD0+0mMgKqYihFQBKXfT2IEVMVUjIAiKP1+EiOgKqZiBBRB6feTGAFVMRUjoAhKv5/ECKiKqRgBRVD6/SRGQFVMxQgogtLvJzECqmIqRkARlH4/iRFQFVMxAoqg9PtJjICqmIoRUASl309iBFTFVIyAIij9fhIjoCqmYgQUQen3kxgBVTEVI6AISr+fxAioiqkYAUVQ+v0kRkBVTMUIKILS7ycxAqpiKkZAEZR+P4kRUBVTMQKKoPT7SYyAqpiKEVAEpd9PYgRUxVSMgCIo/X4SI6AqpmIEFEHp95MYAVUxFSOgCEq/n8QIqIqpGAFFUPr9JEZAVUzFCCiC0u8nMQKqYipGQBGUfj+JEVAVUzECiqD0+0mMgKqYihFQBKXfT2IEVMVUjIAiKP1+EiOgKqZiBBRB6feTGAFVMRUjoAhKv5/ECKiKqRgBRVD6/SRGQFVMxQgogtLvJzECqmIqRkARlH4/iRFQFVMxAoqg9PtJjICqmIoRUASl309iBFTFVIyAIij9fhIjoCqmYgQUQen3kxgBVTEVI6AISr+fxAioiqkYAUVQ+v0kRkBVTMUIKILS7ycxAqpiKkZAEZR+P4kRUBVTMQKKoPT7SYyAqpiKEVAEpd9PYgRUxVSMgCIo/X4SI6AqpmIEFEHp95MYAVUxFSOgCEq/n8QIqIqpGAFFUPr9JEZAVUzFCCiC0u8nMQKqYipGQBGUfj+JEVAVUzECiqD0+0mMgKqYihFQBKXfT2IEVMVUjIAiKP1+EiOgKqZiBBRB6feTGAFVMRUjoAhKv5/ECKiKqRgBRVD6/SRGQFVMxQgogtLvJzECqmIqRkARlH4/iRFQFVMxAoqg9PtJjICqmIoRUASl309iBFTFVIyAIij9fhIjoCqmYgQUQen3kxgBVTEVI6AISr+fxAioiqkYAUVQ+v0kRkBVTMUIKILS7ycxAqpiKkZAEZR+P4kRUBVTMQKKoPT7SYyAqpiKEVAEpd9PYgRUxVSMgCIo/X4SI6AqpmIEFEHp95MYAVUxFSOgCEq/n8QIqIqpGAFFUPr9JEZAVUzFCCiC0u8nMQKqYipGQBGUfj+JEVAVU7GGAdVrfaThqfXaAB6BIiz9fhLjEaiKqRgBRVD6/SRGQFVMxQgogtLvJzECqmIqRkARlH4/iRFQFVMxAoqg9PtJjICqmIoRUASl309iBFTFVIyAIij9fhIjoCqmYgQUQen3kxgBVTEVI6AISr+fxAioiqkYAUVQ+v0kRkBVTMUIKILS7ycxAqpiKkZAEZR+P4kRUBVTMQKKoPT7SYyAqpiKEVAEpd9PYgRUxVSMgCIo/X4SI6AqpmIEFEHp95MYAVUxFSOgCEq/n8QIqIqpGAFFUPr9JEZAVUzFCCiC0u8nMQKqYipGQBGUfj+JEVAVUzECiqD0+0mMgKqYihFQBKXfT2IEVMVUjIAiKP1+EiOgKqZiBBRB6feTGAFVMRUjoAhKv5/ECKiKqRgBRVD6/SRGQFVMxQgogtLvJzECqmIqRkARlH4/iRFQFVMxAoqg9PtJjICqmIoRUASl309iBFTFVIyAIij9fhIjoCqmYgQUQen3kxgBVTEVI6AISr+fxAioiqkYAUVQ+v0kRkBVTMUIKILS7ycxAqpiKkZAEZR+P4kRUBVTMQKKoPT7SYyAqpiKEVAEpd9PYgRUxVSMgCIo/X4SI6AqpmIEFEHp95MYAVUxFSOgCEq/n8QIqIqpGAFFUPr9JEZAVUzFCCiC0u8nMQKqYipGQBGUfj+JEVAVUzECiqD0+0mMgKqYihFQBKXfT2IEVMVUjIAiKP1+EiOgKqZiBBRB6feTGAFVMRUjoAhKv5/ECKiKqRgBRVD6/SRGQFVMxQgogtLvJzECqmIqRkARlH4/iRFQFVMxAoqg9PtJjICqmIoRUASl309iBFTFVIyAIij9fhIjoCqmYgQUQen3kxgBVTEVI6AISr+fxAioiqkYAUVQ+v0kRkBVTMUIKILS7ycxAqpiKkZAEZR+P4kRUBVTMQKKoPT7SYyAqpiKEVAEpd9PYgRUxVSMgCIo/X4SI6AqpmIEFEHp95MYAVUxFSOgCEq/n8QIqIqpGAFFUPr9JEZAVUzFCCiC0u8nMQKqYipGQBGUfj+JEVAVUzECiqD0+0mMgKqYihFQBKXfT2IEVMVUjIAiKP1+EiOgKqZiBBRB6feTGAFVMRUjoAhKv5/ECKiKqRgBRVD6/SRGQFVMxQgogtLvJzECqmIqRkARlH4/iRFQFVMxAoqg9PtJjICqmIoRUASl309iBFTFVIyAIij9fhIjoCqmYgQUQen3kxgBVTEVI6AISr+fxAioiqmYKKCPL083XvliPn908eDni9+8sjedvnudgEJJv5/ECKiKS0Dv720FdF3TVUwJKET0+0mMgKoME9CN+3vnPln8cGf62sGvXZuevz5/cHl6/hYBhY5+P4kRUJVBA7p4IPr+qpnvbzV1/Ti0pJWAQkS/n8QIqMqgAb25epj5+PJWLG+uH43e3IoqAcWp6feTGAFVGTKgjy5OP1z9eP53H0ynP72+/ODa6tcOf1pPQHFa+v0kRkBVhgzo5sHm5jmkZTr3H43e39t8EfT5FeXfvNL6SMOTfj/ASSkDuv9lzjvT6Xu35n+5Ml18TEAxDP1+gJNSBvTO5on2zSPR5XNJWwE1L2TSP7pufaThSb+fxPgUXmW4gD6+vP5q56GiPuURKAGFgH4/iRFQleEC+sRDzPIrBBTD0O8nMQKqMlxAn3iafdVMnoXHIPT7SYyAqgwX0P1Xz+9/Ll+auXn9J68DhZR+P4kRUJXBArr16vlrqwebq5DyTiQMQr+fxAioymABfXRx/0ug9/eWL2N68EF5Vn6R0Vd5Lzzk9PtJjICqDBbQ7SeJbq4vxnR9+cEDrsaEAej3kxgBVRksoHe2H2I++Nl0eu699ccPriz6+e4t+w/ob1vrIw1P+v0kRkBVBgvoielvW+sjDU/6/SRGQFVMxQgogtLvJzECqmIqRkARlH4/iRFQFVMxAoqg9PtJjICqmIoRUASl309iBFTFVKwjoLM/fvY5AcUY6feTGAFV6RvQe//pm/n84euTyeTMLwgoxke/n8QIqErPgN6YfO+38/nVydLyZwQUI6PfT2IEVKVfQG+XbN7dnTz7zb0Lk5cJKEZHv5/ECKhKv4BeXZRzmdGdXyz/d/lzAopx0e8nMQKq0iugs0vLcq4z+vDCMJ/D629b6yMNT/r9JEZAVXoFdNXMhxcmz80JKMZJv5/ECKjKCQJ6d3fyDgHFSOn3kxgBVekV0NWn8DfKl0D5GihGSb+fxAioSq+Azq9Onls+/b4sJ8/CY5T0+0mMgKr0C+jt8gLQxWfws59PVo9DCSjGRb+fxAioSr+ALj59X3iuPJG0884g/SSgOBX9fhIjoCo9Azq/99FPPl788PBHP/jNMP0koDgV/X4SI6AqfQM6PP1ta32k4Um/n8QIqIqp2LEBnX09YD8JKE5Fv5/ECKiKqdjRAf3yx8v3wz/80VuDvIaJgOKU9PtJjICq9Azo7NPVdZgeXpicGeZiTAQUp6LfT2IEVKVnQK9OJmf+evd7v5393WSg19ETUJyKfj+JEVCVfgG9PZm8vX4P5x9Wb+gkoBgX/X4SI6Aq/QJ6dfnuo/Wb4G+US4oQUIyLfj+JEVCVXgFdvRd+HdC7u1xMBOOj309iBFSlV0A3l7Mr5eRqTBgj/X4SI6AqBBQ56PeTGAFV6RXQ2aXlE0frcnI5O4yRfj+JEVCVXgFdPXG0CugipjyJhPHR7ycxAqrSL6B3dycvfVMCeu91LmeHMdLvJzECqtIvoOVydmd3d178/uLHYa6nTEBxKvr9JEZAVXoGdP773cnaQP0koDgV/X4SI6AqfQM6//ZXZxf1fGawy4ESUJyKfj+JEVCV3gEdnP62tT7S8KTfT2IEVMVUjOuBIij9fhIjoCqmYlwPFEHp95MYAVXpGVCuB4qR0+8nMQKq0jOgXA8UI6ffT2IEVKVfQLkeKMZOv5/ECKhKv4ByPVCMnX4/iRFQlV4B5XqgGD39fhIjoCq9Asrl7DB6+v0kRkBVCChy0O8nMQKq0iugXA8Uo6ffT2IEVKVXQLkeKEZPv5/ECKhKv4ByPVCMnX4/iRFQlX4B5XqgGDv9fhIjoCo9A8r1QDFy+v0kRkBV+gaU64Fi3PT7SYyAqvQO6OD0t631kYYn/X4SI6AqpmIEFEHp95MYAVUxFTvihfQ/emnQaykTUJyafj+JEVCVfgG9MJk8M9iVlAkoBPT7SYyAqvQK6OpyypMzHw/ZUP1ta32k4Um/n8QIqEqvgC786celoS98TEAxSvr9JEZAVfoGdL76rkgLQ72QSX/bWh9peNLvJzECqnKCgC4+lf/y9WVCd94a4ikl/W1rfaThSb+fxAioyokCuvDtz8tbkl7QPwzV37bWRxqe9PtJjICqnCigs199f/OGzslLBBRjot9PYgRUpX9AN/VcPhf/7af698Trb1vrIw1P+v0kRkBVegZ0/dXPg1eD6i+rrL9trY80POn3kxgBVekV0NmliX3ySP+NPfS3rfWRhif9fhIjoCq9Arp8J9LO4ZcvPbzAI1CMiX4/iRFQlZ4B/cGvzS/NPle/lEl/21ofaXjS7ycxAqrSK6Au9Let9ZGGJ/1+EiOgKqZiBBRB6feTGAFVMRXruCL9ztlB3oREQHFq+v0kRkBV+gb0xv4r6PmeSBgj/X4SI6AqPQO67OczL775Bt+VEyOl309iBFSlX0Dv7k6eXb2K6d4lvi88xki/n8QIqEq/gF49eN/R7NLkOQKK0dHvJzECqtIroLNLW4867+6qX0JPQHF6+v0kRkBVegX00Ps29W/iJKA4Pf1+EiOgKgQUOej3kxgBVekV0NmlyTv7H+ivw0RAcXr6/SRGQFV6BZQnkTB6+v0kRkBV+gX07u7kzOpyIn96nZcxYYz0+0mMgKr0C+jqjUhnz54d8q1Icq2PNDy1XhtwzFs5/7C7fifnztsD/dX6/zi0PtLwpN9PYjwCVekb0PnsyzcWj0Bf/HiQJ5AIKE5Lv5/ECKhK74AOTn/bWh9peNLvJzECqmIqRkARlH4/iRFQFVMxG9DZR28+6Se8DhSjo99PYgRUpSOgy28n9wTeiYTx0e8nMQKqQkCRg34/iRFQlY6AOtLfttZHGp70+0mMgKqYihFQBKXfT2IEVMVU7PiAfjVcPgkoTke/n8QIqIqp2NEB/fLH5X1IP/gNAcUY6feTGAFV6RnQ2aX9p5BeGui9SPrb1vpIw5N+P4kRUJV+AV32c+fFf/jsn97YnQx0NTsCilPR7ycxAqrSL6A3JpMfrh54zn452bq4MgHFWOj3kxgBVekV0MUD0INr2F3lgsoYIf1+EiOgKr0C+vDCoe/KyQvpMT76/SRGQFV6BpRvKoeR0+8nMQKq0iugfF94jJ5+P4kRUJVeAZ3f2Pq65w2+BooR0u8nMQKq0i+gs0v7L/+8MdC1RAgoTkW/n8QIqEqvgM4+Wr7+88W3Pvvn5Y8vDHNVUP1ta32k4Um/n8QIqEqvgLpc1E5/21ofaXjS7ycxAqpCQJGDfj+JEVCVXgF1ob9trY80POn3kxgBVTEVI6AISr+fxAioiqkYAUVQ+v0kRkBVTMWODugfP9v3OS+kx+jo95MYAVXpGdDf7/JN5TBq+v0kRkBV+gX0Nt+VEyOn309iBFSlV0BnlyY7H3+17+sh+klAcSr6/SRGQFV6BfThhYEuokxAoaLfT2IEVKVnQAd6/zsBhYp+P4kRUJVeAZ1dIqAYOf1+EiOgKr0COr/Bp/AYOf1+EiOgKv0Ceuh7ehBQjJB+P4kRUJV+AZ3fuzA58+aG+kJ2BBSnp99PYgRUpWdAP+V1oBg3/X4SI6Aq/QJ6gxfSY+T0+0mMgKr0Cmh5If0gn7cTUIjo95MYAVXpFVCP55AIKE5Fv5/ECKhKz4DyOlCMnH4/iRFQlV4B5YX0GD39fhIjoCq9Ajq/MXmZgGLU9PtJjICq9Avo7NLO2wQUY6bfT2IEVKVXQGcfvTGZ7LzIC+kxXvr9JEZAVXoF1HxbY14HivHR7ycxAqpCQJGDfj+JEVCVXgF1ob9trY80POn3kxgBVTEVI6AISr+fxAioiqkYAUVQ+v0kRkBVTMVsQGd/tN8F/uGPz77A10AxOvr9JEZAVToC+vDC6imj2UebFy9tfoWAYlT0+0mMgKr0DOhBNgkoRkm/n8QIqAoBRQ76/SRGQFUIKHLQ7ycxAqpCQJGDfj+JEVAVAooc9PtJjICqEFDkoN9PYgRUhYAiB/1+EiOgKgQUOej3kxgBVSGgyEG/n8QIqAoBRQ76/SRGQFUIKHLQ7ycxAqrSHdAnEVCMj34/iRFQFQKKHPT7SYyAqnQEdPbRm0/im8phfPT7SYyAqnQE1JH+trU+0vCk309iBFTFVIyAIij9fhIjoCqmYgQUQen3kxgBVTEVI6AISr+fxAioiqkYAUVQ+v0kRkBVTMUIKILS7ycxAqpiKkZAEZR+P4kRUBVTMQKKoPT7SYyAqpiKEVAEpd9PYgRUxVTsiXciXdr5xeKHb78moBg3/X4SI6AqHQF9eGH5xvfV/xJQjJh+P4kRUJXOgC4fgRJQjJ5+P4kRUJWOgM4uTZ79/Ks/Xfjer786MMzn8/rb1vpIw5N+P4kRUJWOgM5vcDk7hKDfT2IEVKUroLNP6wL66OK0eOWL5UePr+xNp+9eX/3WoQ8IKDT0+0mMgKp0BXSR0K8+++fdnX/47MDnPa4Hen9vK6Drmq5ieugDAgoR/X4SI6Aq3QGdVz2JdGf62sEH16bnr88fXJ6ev2U/IKAQ0e8nMQKq0iugs49OfBH6a9P3939+f2/9OPTcJ+YDAgoV/X4SI6AqvQJ6co8vb/Xx5vrR6M1lVA99QEChot9PYgRUpXdAv/3V2clk5+xb/V7D9Oji+d99MJ3+9Pryg2vTD8svlk/rD31AQKGi309iBFSlb0APXs70cp+Abp5DWtZy/9Ho/b3ztw59sPr/Pr/S5489mdZHGp70+wFO6qiALvv5zItvvvH9ngW9M52+d2v+lyvTRS4JKBzo9wOc1BEBvbs7efY35Wf3Lk3K5UU6bL7SuXwuaauZr3xx6IND/4j+0XXrIw1P+v0kxqfwKv0CenXy7OZp+NmlyXPdAd24MzUPOp/yCJSAQkC/n8QIqEqvgK4vardyd/fZ/q9pMg86CSiGot9PYgRUpVdAD72Q/kSvqi+Z5Fl4DE+/n8QIqMowAX18eTuTm5d8rl8HuvUBAYWKfj+JEVCVXgGdXZq8s//B7UmPT+GvrR5frkLKO5EwPP1+EiOgKr0CevInke7vLV/G9OCD8o73RUZf3X/7+6EPCChU9PtJjICq9Avo3d3JmV+Xn/3p9V4vY1p8hr665tL15QcPti/A9ICrMWEA+v0kRkBV+gV09Uaks2fP9n4r0vzBz6bTc++tH2U+uLJI5rtP+4CAQkO/n8QIqErPgM7/sLt+J+fO2736eXL629b6SMOTfj+JEVCVvgGdz758Y/EI9MWPT3pdOwIKF/r9JEZAVXoHdHD629b6SMOTfj+JEVAVUzECiqD0+0mMgKqYihFQBKXfT2IEVMVUjIAiKP1+EiOgKqZiBBRB6feTGAFVMRUjoAhKv5/ECKiKqRgBRVD6/SRGQFVMxQgogtLvJzECqmIqRkARlH4/iRFQFVOxo67G9IPfEFCMmn4/iRFQlV4BfXhh63qgBBRjpN9PYgRUpWdAT/BdPAgoWtDvJzECqtIroIe+qRwBxRjp95MYAVXpFdD5jc23hSegGCn9fhIjoCr9AvrtLyeTZ158c+0ng1zSTn/bWh9peJuln3QAABwGSURBVNLvJzECqtIroA8vTLYN8wVR/W1rfaThSb+fxAioCgFFDvr9JEZAVXoF1IX+trU+0vCk309iBFTFVIyAIij9fhIjoCqmYscGdPb1gP0koDgV/X4SI6AqpmJHB/TLHy+/+PnwR28N9V3l9Let9ZGGJ/1+EiOgKj0DOvt09ezRwwuTMwO9KUl/21ofaXjS7ycxAqrSM6BXJ5Mzf737vd/O/m4yeXaYx6D629b6SMOTfj+JEVCVfgG9PZm8vX5H/B92B7qwiP62tT7S8KTfT2IEVKVfQK9OXt6/pMiNyXMEFKOj309iBFSlV0BXFxNZB/TuLi+kx/jo95MYAVXpFdBVOtcBHeradvrb1vpIw5N+P4kRUBUCihz0+0mMgKr0Cujs0vKJo3U5bw/0NLz+trU+0vCk309iBFSlV0BXTxytArqIKU8iYXz0+0mMgKr0C+jd3clL35SA3nt9MtDV6fW3rfWRhif9fhIjoCr9Arp4CDqZnN3defH7ix9fHqSfBBSnot9PYgRUpWdA57/f3VwNdKB+ElCcin4/iRFQlb4BnX/7q7OLej4z3DeI19+21kcanvT7SYyAqvQO6OD0t631kYYn/X4SI6AqpmLHXw/0qwH7SUBxKvr9JEZAVUzFjr8e6AKfwmOc9PtJjICq9Azo7NL+t5R7aaArKutvW+sjDU/6/SRGQFX6BXTZz50X//Nn//TGoqDDvI6egOJU9PtJjICq9Avo7f1XL81+OeF6oBgh/X4SI6AqvQK6eAB68OrPq7yVEyOk309iBFSlV0AfXth6+ybXA8UY6feTGAFV6RnQrWZyOTuMkX4/iRFQlV4BXV2Rfu3uLpezw/jo95MYAVXpFdBD3wfpxkDvhtffttZHGp70+0mMgKr0C+jDC5MffrPp5zCfwRNQnIp+P4kRUJWOgM4+erN4Y/U60H9+c3cyefEnfAqP0dHvJzECqtIR0MVDzyfxJBLGR7+fxAioCgFFDpUj+X/4DpH2pegIqCP9bWt9pOGpciStjzQ8SftSmIoRUARVOZLWRxqepH0pTMUIKIKqHEnrIw1P0r4UpmJHB/SPn+37nGfhMTqVI2l9pOFJ2peiZ0APvqccTyJhlCpH0vpIw5O0L0W/gN7mWXiMXOVIWh9peJL2pegV0Nmlyc7HX+37eoh+ElCcSuVIWh9peJL2pegV0IcXBrqIMgGFSuVIWh9peJL2pegZ0IHe/05AoVI5ktZHGp6kfSl6BXR2iYBi5CpH0vpIw5O0L0WvgM5v8Ck8Rq5yJK2PNDxJ+1L0C+ih7+lBQDFClSNpfaThSdqXol9A5/cuTM68ucHl7DA+lSNpfaThSdqXomdAP+V1oBi3ypG0PtLwJO1L0S+gN3ghPUauciStjzQ8SftS9ApoeSH9IJ+3E1CIVI6k9ZGGJ2lfil4B9XgOiYDiVCpH0vpIw5O0L0XPgPI6UIxc5UhaH2l4kval6BVQXkiP0ascSesjDU/SvhS9AjrY94InoFCpHEnrIw1P0r4U/QI6u7TzNgHFmFWOpPWRhidpX4peAZ19VL4vPC+kx3hVjqT1kYYnaV+KXgE139yY14FifCpH0vpIw5O0LwUBRQ6VI2l9pOFJ2peiV0Bd6G9b6yMNT5UjaX2k4Unal8JUjIAiqMqRtD7S8CTtS2EqRkARVOVIWh9peJL2pTAVOyKg3361jW8qh/GpHEnrIw1P0r4UvQLq8iSSXusjDU+VI2l9pOFJ2pen4Vl4BFU5ktZHGp6kfSl6BXT2x8/W/v71yc4/fM4L6TE6lSNpfaThSdqXoldAt93dfXaYK4Pqb1vrIw1PlSNpfaThSdqX4sQBHezCIvrb1vpIw1PlSFofaXiS9qU4eUCHegiqv22tjzQ8VY6k9ZGGJ2lfipMHdKirK+tvW+sjDU+VI2l9pOFJ2pfi5AG9u0tAMT6VI2l9pOFJ2pfixAGdXZ3wKTzGp3IkrY80PEn7UvQK6OyjzaVA33xjd8KTSBihypG0PtLwJO1L0Sugh19Iz8uYMEKVI2l9pOFJ2pfixAF95q2BvkG8/ra1PtLwVDmS1kcanqR9KXoF1IX+trU+0vBUOZLWRxqepH0pTMUIKIKqHEnrIw1P0r4UpmIEFEFVjqT1kYYnaV8KUzECiqAqR9L6SMOTtC+FqZgN6NYLmA7wbY0xPpUjaX2k4Unal6IjoOZKoFwPFGNVOZLWRxqepH0pCChyqBxJ6yMNT9K+FB0Btb7cnfBOJIxR5UhaH2l4kvalOFFAZz9f5PPMbwbpJwHFqVSOpPWRhidpX4qTBPQPi4efO0O9EYmA4lQqR9L6SMOTtC9F/4AO+vCTgOKUKkfS+kjDk7QvRe+Aloef/26wfBJQnE7lSFofaXiS9qXoGdB7Az/8JKA4pcqRtD7S8CTtS9EvoIM//CSgOKXKkbQ+0vAk7UvRJ6D3Li2vAjrow08CilOqHEnrIw1P0r4UPQJaHn6+PXA+CShOp3IkrY80PEn7UnQG1OfhJwHFKVWOpPWRhidpX4qugP7e5+EnAcUpVY6k9ZGGJ2lfio6A8l54BFE5ktZHGp6kfSkIKHKoHEnrIw1P0r4UHQHleqAIonIkrY80PEn7UnQE1JH+trU+0vBUOZLWRxqepH0pTMUIKIKqHEnrIw1P0r4UpmIEFEFVjqT1kYYnaV8KUzECiqAqR9L6SMOTtC+FqRgBRVCVI2l9pOFJ2pfCVIyAIqjKkbQ+0vAk7UthKkZAEVTlSFofaXiS9qUwFSOgCKpyJK2PNDxJ+1KYihFQBFU5ktZHGp6kfSlMxQgogqocSesjDU/SvhSmYgQUQVWOpPWRhidpXwpTMQKKoCpH0vpIw5O0L4WpGAFFUJUjaX2k4Unal8JUjIAiqMqRtD7S8CTtS2EqRkARVOVIWh9peJL2pTAVI6AIqnIkrY80PEn7UpiKEVAEVTmS1kcanqR9KUzFCCiCqhxJ6yMNT9K+FKZiBBRBVY6k9ZGGJ2lfClMxAoqgKkfS+kjDk7QvhakYAUVQlSNpfaThSdqXwlSMgCKoypG0PtLwJO1LYSpGQBFU5UhaH2l4kvalMBUjoAiqciStjzQ8SftSmIoRUARVOZLWRxqepH0pTMUIKIKqHEnrIw1P0r4UpmIEFEFVjqT1kYYnaV8KUzECiqAqR9L6SMOTtC+FqRgBRVCVI2l9pOFJ2pfCVIyAIqjKkbQ+0vAk7UthKkZAEVTlSFofaXiS9qUwFSOgCKpyJK2PNDxJ+1KYihFQBFU5ktZHGp6kfSlMxQgogqocSesjDU/SvhSmYgQUQVWOpPWRhidpXwpTMQKKoCpH0vpIw5O0L4WpGAFFUJUjaX2k4Unal8JUjIAiqMqRtD7S8CTtS2EqRkARVOVIWh9peJL2pTAVI6AIqnIkrY80PEn7UpiKEVAEVTmS1kcanqR9KUzFCCiCqhxJ6yMNT9K+FKZiBBRBVY6k9ZGGJ2lfClMxAoqgKkfS+kjDk7QvhakYAUVQlSNpfaThSdqXwlSMgCKoypG0PtLwJO1LYSpGQBFU5UhaH2l4kvalMBUjoAiqciStjzQ8SftSmIrpAvpvP5tOz717vfz80cVp8coXy48eX9mbTte/Q0AhUjmS1kcanqR9KYYK6L+sknnuk+UH9/e2Arqu6SqmBBQilSNpfaThSdqXYqCA3pme+9v5/MHlVSfvTF87+K1r0/PXl79z/hYBhU7lSFofaXiS9qUYJqCPL08/XP64eLT5YWnm+/u/dX9v/Th09eCUgEKjciStjzQ8SftSDBPQRxfXn6GXdD6+vBXLm+tHoze3okpAcWqVI2l9pOFJ2pdimIDuKwF9dPH87z6YTn96ffUr5bHp4U/rCShOq3IkrY80PEn7Ugwb0NUn6pvnkJbp3H80en9v80XQ51e0f/NS6yMNT5UjaX2k4Unal6cRB3T1+fqd6fS9W/O/XFk+J09AMYzKkbQ+0vAk7cvTaAN6Z/Uyps2XPZefz28F1LyQSf/ouvWRhqfKkbQ+0vAk7UsxZEDv7J378HBPz996yiNQAgqBypG0PtLwJO1LMWBAb07NK5WWDzoJKIZROZLWRxqepH0phgvov9h+rprJs/AYROVIWh9peJL2pRgqoI+vTV9df41z86r6VTM3r//kdaCQqhxJ6yMNT9K+FEMF9NrWWzWvrR5srkLKO5EwiMqRtD7S8CTtSzFQQG9uv9X9/t7yZUwPPii/tsjoq7wXHnKVI2l9pOFJ2pdimIBurl+38FrJ6eoCTNeXv/eAqzFhAJUjaX2k4Unal2KYgN6ZHgro/MHy4qDvrR9yPriy+OV3b9l/Rn/bWh9peKocSesjDU/SvhTDBLSG/ra1PtLwVDmS1kcanqR9KUzFCCiCqhxJ6yMNT9K+FKZiBBRBVY6k9ZGGJ2lfClMxAoqgKkfS+kjDk7QvhakYAUVQlSNpfaThSdqXwlSMgCKoypG0PtLwJO1LYSpGQBFU5UhaH2l4kvalMBUjoAiqciStjzQ8SftSmIoRUARVOZLWRxqepH0pTMUIKIKqHEnrIw1P0r4UpmIEFEFVjqT1kYYnaV8KUzECiqAqR9L6SMOTtC+FqRgBRVCVI2l9pOFJ2pfCVIyAIqjKkbQ+0vAk7UthKkZAEVTlSFofaXiS9qUwFSOgCKpyJK2PNDxJ+1KYihFQBFU5ktZHGp6kfSlMxQgogqocSesjDU/SvhSmYgQUQVWOpPWRhidpXwpTMQKKoCpH0vpIw5O0L4WpGAFFUJUjaX2k4Unal8JUjIAiqMqRtD7S8CTtS2EqRkARVOVIWh9peJL2pTAVI6AIqnIkrY80PEn7UpiKEVAEVTmS1kcanqR9KUzFCCiCqhxJ6yMNT9K+FKZiBBRBVY6k9ZGGJ2lfClMxAoqgKkfS+kjDk7QvhakYAUVQlSNpfaThSdqXwlSMgCKoypG0PtLwJO1LYSpGQBFU5UhaH2l4kvalMBUjoAiqciStjzQ8SftSmIoRUARVOZLWRxqepH0pTMUIKIKqHEnrIw1P0r4UpmIEFEFVjqT1kYYnaV8KUzECiqAqR9L6SMOTtC+FqRgBRVCVI2l9pOFJ2pfCVIyAIqjKkbQ+0vAk7UthKkZAEVTlSFofaXiS9qUwFSOgCKpyJK2PNDxJ+1KYihFQBFU5ktZHGp6kfSlMxQgogqocSesjDU/SvhSmYgQUQVWOpPWRhidpXwpTMQKKoCpH0vpIw5O0L4WpGAFFUJUjaX2k4Unal8JUjIAiqMqRtD7S8CTtS2EqRkARVOVIWh9peJL2pTAVI6AIqnIkrY80PEn7UpiKEVAEVTmS1kcanqR9KUzFCCiCqhxJ6yMNT9K+FKZiBBRBVY6k9ZGGJ2lfClMxAoqgKkfS+kjDk7QvhakYAUVQlSNpfaThSdqXwlSMgCKoypG0PtLwJO1LYSpGQBFU5UhaH2l4kvalMBUjoAiqciStjzQ8SftSmIoRUARVOZLWRxqepH0pTMUIKIKqHEnrIw1P0r4UpmIEFEFVjqT1kYYnaV8KUzECiqAqR9L6SMOTtC+FqRgBRVCVI2l9pOFJ2pfCVIyAIqjKkbQ+0vAk7UthKkZAEVTlSFofaXiS9qUwFSOgCKpyJK2PNDxJ+1KYihFQBFU5ktZHGp6kfSlMxQgogqocSesjDU/SvhSmYgQUQVWOpPWRhidpXwpTMQKKoCpH0vpIw5O0L4WpGAFFUJUjaX2k4Unal8JUjIAiqMqRtD7S8CTtS2EqRkARVOVIWh9peJL2pTAVI6AIqnIkrY80PEn7UpiKEVAEVTmS1kcanqR9KUzFCCiCqhxJ6yMNT9K+FKZiBBRBVY6k9ZGGJ2lfClMxAoqgKkfS+kjDk7QvhakYAUVQlSNpfaThSdqXwlSMgCKoypG0PtLwJO1LYSpGQBFU5UhaH2l4kvalMBVrGFC91kcanipH0vpIw5O0L0/DI1AEVTmS1kcanqR9KUzFCCiCqhxJ6yMNT9K+FKZiBBRBVY6k9ZGGJ2lfClMxAoqgKkfS+kjDk7QvhakYAUVQlSNpfaThSdqXwlSMgCKoypG0PtLwJO1LYSpGQBFU5UhaH2l4kvalMBUjoAiqciStjzQ8SftSmIoRUARVOZLWRxqepH0pTMUIKIKqHEnrIw1P0r4UpmIEFEFVjqT1kYYnaV8KUzECiqAqR9L6SMOTtC+FqRgBRVCVI2l9pOFJ2pfCVIyAIqjKkbQ+0vAk7UthKkZAEVTlSFofaXiS9qUwFSOgCKpyJK2PNDxJ+1KYihFQBFU5ktZHGp6kfSlMxQgogqocSesjDU/SvhSmYgQUQVWOpPWRhidpXwpTMQKKoCpH0vpIw5O0L4WpGAFFUJUjaX2k4Unal8JUjIAiqMqRtD7S8CTtS2EqRkARVOVIWh9peJL2pTAVI6AIqnIkrY80PEn7UpiKEVAEVTmS1kcanqR9KUzFCCiCqhxJ6yMNT9K+FKZiBBRBVY6k9ZGGJ2lfClMxAoqgKkfS+kjDk7QvhakYAUVQlSNpfaThSdqXwlSMgCKoypG0PtLwJO1LYSpGQBFU5UhaH2l4kvalMBUjoAiqciStjzQ8SftSmIoRUARVOZLWRxqepH0pTMUIKIKqHEnrIw1P0r4UpmIEFEFVjqT1kYYnaV8KUzECiqAqR9L6SMOTtC+FqRgBRVCVI2l9pOFJ2pfCVIyAIqjKkbQ+0vAk7UthKkZAEVTlSFofaXiS9qUwFSOgCKpyJK2PNDxJ+1KYihFQBFU5ktZHGp6kfSlMxQgogqocSesjDU/SvhSmYgQUQVWOpPWRhidpXwpTMQKKoCpH0vpIw5O0L4WpGAFFUJUjaX2k4Unal8JUjIAiqMqRtD7S8CTtS2EqRkARVOVIWh9peJL2pTAVI6AIqnIkrY80PEn7UpiKEVAEVTmS1kcanqR9KUzFCCiCqhxJ6yMNT9K+FKZiBBRBVY6k9ZGGJ2lfClMxAoqgKkfS+kjDk7QvhakYAUVQlSNpfaThSdqXwlSMgCKoypG0PtLwJO1LYSpGQBFU5UhaH2l4kvalMBUjoAiqciStjzQ8SftSmIoRUARVOZLWRxqepH0pTMUIKIKqHEnrIw1P0r4UpmIEFEFVjqT1kYYnaV8KUzECiqAqR9L6SMOTtC+FqRgBRVCVI2l9pOFJ2pfCVIyAIqjKkbQ+0vAk7UthKkZAEVTlSFofaXiS9qUwFSOgCKpyJK2PNDxJ+1KYihFQBFU5ktZHGp6kfSlMxQgogqocSesjDU/SvhSmYgQUQVWOpPWRhidpXwpTMQKKoCpH0vpIw5O0L4WpGAFFUJUjaX2k4Unal8JUjIAiqMqRtD7S8CTtS2EqRkARVOVIWh9peJL2pTAVI6AIqnIkrY80PEn7UpiKEVAEVTmS1kcanqR9KUzFCCiCqhxJ6yMNT9K+FKZiBBRBVY6k9ZGGJ2lfClMxAoqgKkfS+kjDk7QvhakYAUVQlSNpfaThSdqXwlSMgCKoypG0PtLwJO1LYSpGQBFU5UhaH2l4kvalMBUjoAiqciStjzQ8SftSmIp5BPTxlb3p9N3rBBRKlSNpfaThSdqXwj+gjy5Ol175goBCqHIkrY80PEn7UvgH9Nr0/PX5g8vT87cIKHQqR9L6SMOTtC+Fe0Dv75XHno8unvuEgEKnciStjzQ8SftSuAf05vS19Y/vE1DoVI6k9ZGGJ2lfCveAXpt+WH68sw4pAYVE5UhaH2l4kval8A7o48vrT93v722+CPr8iv7van2k4alyJK2PNDxJ+/I0qQIKAJ48A2peyKR/dP3dxD2JToxEpWFAzeuYWt8TWXBPohMjUSGg2XBPohMjUfEOqOez8N9N3JPoxEhU3AO6ef2nw+tAv5u4J9GJkai4B9TxnUjfTdyT6MRIVNwD+vjy9FWn98J/N3FPohMjUXEP6PyB29WYvpu4J9GJkaj4B3T+4Mqin+/esr/c+p7IgnsSnRiJSoOAHqH1PZEF9yQ6MRIVUzECGh73JDoxEhVTMQIaHvckOjESFVMxAhoe9yQ6MRIVUzECGh73JDoxEhVTMQIaHvckOjESFVMxAhoe9yQ6MRIVUzECGh73JDoxEhVTMQIaHvckOjESFVMxAhoe9yQ6MRIVUzECGh73JDoxEhVTMQIaHvckOjESFVMxAhoe9yQ6MRIVUzECGh73JDoxEhVTMQIaHvckOjESFVMxAhoe9yQ6MRIVUzECGh73JDoxEhVTMQIaHvckOjESFVMxAhoe9yQ6MRIVUzECGh73JDoxEhVTMQIaHvckOjESFVMxAhoe9yQ6MRIVUzECGh73JDoxEhVTMQIaHvckOjESFVMxAhoe9yQ6MRIVUzECGh73JDoxEhVTMQIaHvckOjESFVOxhgGFxvPPt/43wOgxkoEQ0PA4G+jESAZCQMPjbKATIxkIAQ2Ps4FOjGQgBDQ8zgY6MZKBENDwOBvoxEgGQkDD42ygEyMZCAEFgEoEFAAqEVAAqERAAaASAQWASgQUACoRUACoREABoBIBDeHRxen7+z995Yum/y4Yk8eXp+dv7f/0w7b/Mt9BBDSERUDPfbL5KQHFgft7m/+23tlPKdwQ0BAWAZ2+tvkpAcWWm9PVIB5d3Pw3Fn4IaAiLw/E368/PCCgO2Xx55+bmP7FwREBDWFTzf+xtHmisfnxwZTqdvnu96b8WxuBO+fLO/fU+FsPYm05/en31858tRvLv/7bhv1x2BDSEZTXXjzDWAb2zOCUL53ja4Dvv8eXlMq6tP0O5vzWM9c95aDocAhrCsprrJ1lXAV0cjXf/9/zxv0z5uhfu75375P7e6hmkxSf0792aP/7X5RdGF4v5D4tf/Lc9RjIYAhpCqebqk7RVQDdf8LrGowssVnD+v6wjuRnGzen7PK3kgICGsKpmqWX56f5L/njpCrZfpPH48rqZy0eki5W8+j9b/nt9BxDQEFYBLY8oyk/3H1vwnDzmy/+OrmewaObG4lduLn989b/yn9jhENAQNs8cLR5vrgO6PjAEFPPV483yk+Vj0YOAzv/8N+Wn75HQoRDQEDadvDZ9n0egeMJWQM2XPR//9+Urmd5/2j8EAQIawqaTi/Px3/gaKKz9gD7t/fCP/5WRDIaAhrD/QPPO9K/2eBYexn5AF8NY/Wz5X9bNa+sPfhdqBDSEg8/Ur62+uLV6HehfrvA6UMy3E/no4vT89fn8z3uLR6LLKzUtfv7gMv+VHQwBDeEgoIty8k4kGFuPMdfDmL43P3gn0qt8nXwoBDSEreeKNhff4b3w2Lf9SfrqvfD/ePDzv/qPfAI/GAIKAJUIKABUIqAAUImAAkAlAgoAlQgoAFQioABQiYACQCUCCgCVCCgAVCKgAFCJgAJAJQIKAJUIKABUIqAAUImAAkAlAgoAlQgoAFQioABQiYACQCUCCgCVCCgAVCKgAFCJgAJAJQIKAJUIKABUIqAAUImAAkAlAgoAlQgoAFQioABQiYACQCUCCgCVCCgAVCKgAFCJgAJAJQIKAJUIKABUIqAAUImAAkAlAgoAlQgoAFQioABQiYACQCUCCgCVCCgAVCKgAFCJgAJAJQIKAJUIKABUIqAAUOn/A71FEGOQyBlxAAAAAElFTkSuQmCC">
-            <a:extLst>
-              <a:ext uri="{FF2B5EF4-FFF2-40B4-BE49-F238E27FC236}">
-                <a16:creationId xmlns:a16="http://schemas.microsoft.com/office/drawing/2014/main" id="{303DEEFB-7094-4F9F-A65F-D2AFDD19F5FE}"/>
-              </a:ext>
-            </a:extLst>
-          </p:cNvPr>
-          <p:cNvSpPr>
-            <a:spLocks noChangeAspect="1" noChangeArrowheads="1"/>
-          </p:cNvSpPr>
-          <p:nvPr/>
-        </p:nvSpPr>
-        <p:spPr bwMode="auto">
-          <a:xfrm>
-            <a:off x="5943600" y="3276600"/>
-            <a:ext cx="304800" cy="304800"/>
-          </a:xfrm>
-          <a:prstGeom prst="rect">
-            <a:avLst/>
-          </a:prstGeom>
-          <a:noFill/>
-          <a:extLst>
-            <a:ext uri="{909E8E84-426E-40DD-AFC4-6F175D3DCCD1}">
-              <a14:hiddenFill xmlns:a14="http://schemas.microsoft.com/office/drawing/2010/main">
-                <a:solidFill>
-                  <a:srgbClr val="FFFFFF"/>
-                </a:solidFill>
-              </a14:hiddenFill>
-            </a:ext>
-          </a:extLst>
-        </p:spPr>
-        <p:txBody>
-          <a:bodyPr vert="horz" wrap="square" lIns="91440" tIns="45720" rIns="91440" bIns="45720" numCol="1" anchor="t" anchorCtr="0" compatLnSpc="1">
-            <a:prstTxWarp prst="textNoShape">
-              <a:avLst/>
-            </a:prstTxWarp>
-          </a:bodyPr>
-          <a:lstStyle/>
-          <a:p>
-            <a:endParaRPr lang="en-US"/>
-          </a:p>
-        </p:txBody>
-      </p:sp>
-    </p:spTree>
-    <p:extLst>
-      <p:ext uri="{BB962C8B-B14F-4D97-AF65-F5344CB8AC3E}">
-        <p14:creationId xmlns:p14="http://schemas.microsoft.com/office/powerpoint/2010/main" val="1982764186"/>
       </p:ext>
     </p:extLst>
   </p:cSld>

</xml_diff>

<commit_message>
add job satisfaction vs job role and over time vs job satisfaction
</commit_message>
<xml_diff>
--- a/Attrition_Case_Study_2_pptx_TAJAR_IP.pptx
+++ b/Attrition_Case_Study_2_pptx_TAJAR_IP.pptx
@@ -211,7 +211,7 @@
           <a:p>
             <a:fld id="{380F82E0-DA90-F642-BDF9-D28F7CF5A168}" type="datetimeFigureOut">
               <a:rPr lang="en-US" smtClean="0"/>
-              <a:t>8/5/18</a:t>
+              <a:t>8/6/2018</a:t>
             </a:fld>
             <a:endParaRPr lang="en-US"/>
           </a:p>
@@ -670,7 +670,7 @@
             <a:fld id="{B61BEF0D-F0BB-DE4B-95CE-6DB70DBA9567}" type="datetimeFigureOut">
               <a:rPr lang="en-US" dirty="0"/>
               <a:pPr/>
-              <a:t>8/5/18</a:t>
+              <a:t>8/6/2018</a:t>
             </a:fld>
             <a:endParaRPr lang="en-US" dirty="0"/>
           </a:p>
@@ -1103,7 +1103,7 @@
             <a:fld id="{B61BEF0D-F0BB-DE4B-95CE-6DB70DBA9567}" type="datetimeFigureOut">
               <a:rPr lang="en-US" dirty="0"/>
               <a:pPr/>
-              <a:t>8/5/18</a:t>
+              <a:t>8/6/2018</a:t>
             </a:fld>
             <a:endParaRPr lang="en-US" dirty="0"/>
           </a:p>
@@ -1350,7 +1350,7 @@
             <a:fld id="{B61BEF0D-F0BB-DE4B-95CE-6DB70DBA9567}" type="datetimeFigureOut">
               <a:rPr lang="en-US" dirty="0"/>
               <a:pPr/>
-              <a:t>8/5/18</a:t>
+              <a:t>8/6/2018</a:t>
             </a:fld>
             <a:endParaRPr lang="en-US" dirty="0"/>
           </a:p>
@@ -1655,7 +1655,7 @@
             <a:fld id="{B61BEF0D-F0BB-DE4B-95CE-6DB70DBA9567}" type="datetimeFigureOut">
               <a:rPr lang="en-US" dirty="0"/>
               <a:pPr/>
-              <a:t>8/5/18</a:t>
+              <a:t>8/6/2018</a:t>
             </a:fld>
             <a:endParaRPr lang="en-US" dirty="0"/>
           </a:p>
@@ -1970,7 +1970,7 @@
             <a:fld id="{B61BEF0D-F0BB-DE4B-95CE-6DB70DBA9567}" type="datetimeFigureOut">
               <a:rPr lang="en-US" dirty="0"/>
               <a:pPr/>
-              <a:t>8/5/18</a:t>
+              <a:t>8/6/2018</a:t>
             </a:fld>
             <a:endParaRPr lang="en-US" dirty="0"/>
           </a:p>
@@ -2269,7 +2269,7 @@
             <a:fld id="{B61BEF0D-F0BB-DE4B-95CE-6DB70DBA9567}" type="datetimeFigureOut">
               <a:rPr lang="en-US" dirty="0"/>
               <a:pPr/>
-              <a:t>8/5/18</a:t>
+              <a:t>8/6/2018</a:t>
             </a:fld>
             <a:endParaRPr lang="en-US" dirty="0"/>
           </a:p>
@@ -2633,7 +2633,7 @@
             <a:fld id="{B61BEF0D-F0BB-DE4B-95CE-6DB70DBA9567}" type="datetimeFigureOut">
               <a:rPr lang="en-US" dirty="0"/>
               <a:pPr/>
-              <a:t>8/5/18</a:t>
+              <a:t>8/6/2018</a:t>
             </a:fld>
             <a:endParaRPr lang="en-US" dirty="0"/>
           </a:p>
@@ -2804,7 +2804,7 @@
             <a:fld id="{B61BEF0D-F0BB-DE4B-95CE-6DB70DBA9567}" type="datetimeFigureOut">
               <a:rPr lang="en-US" dirty="0"/>
               <a:pPr/>
-              <a:t>8/5/18</a:t>
+              <a:t>8/6/2018</a:t>
             </a:fld>
             <a:endParaRPr lang="en-US" dirty="0"/>
           </a:p>
@@ -2981,7 +2981,7 @@
             <a:fld id="{B61BEF0D-F0BB-DE4B-95CE-6DB70DBA9567}" type="datetimeFigureOut">
               <a:rPr lang="en-US" dirty="0"/>
               <a:pPr/>
-              <a:t>8/5/18</a:t>
+              <a:t>8/6/2018</a:t>
             </a:fld>
             <a:endParaRPr lang="en-US" dirty="0"/>
           </a:p>
@@ -3148,7 +3148,7 @@
             <a:fld id="{B61BEF0D-F0BB-DE4B-95CE-6DB70DBA9567}" type="datetimeFigureOut">
               <a:rPr lang="en-US" dirty="0"/>
               <a:pPr/>
-              <a:t>8/5/18</a:t>
+              <a:t>8/6/2018</a:t>
             </a:fld>
             <a:endParaRPr lang="en-US" dirty="0"/>
           </a:p>
@@ -3395,7 +3395,7 @@
             <a:fld id="{B61BEF0D-F0BB-DE4B-95CE-6DB70DBA9567}" type="datetimeFigureOut">
               <a:rPr lang="en-US" dirty="0"/>
               <a:pPr/>
-              <a:t>8/5/18</a:t>
+              <a:t>8/6/2018</a:t>
             </a:fld>
             <a:endParaRPr lang="en-US" dirty="0"/>
           </a:p>
@@ -3628,7 +3628,7 @@
             <a:fld id="{B61BEF0D-F0BB-DE4B-95CE-6DB70DBA9567}" type="datetimeFigureOut">
               <a:rPr lang="en-US" dirty="0"/>
               <a:pPr/>
-              <a:t>8/5/18</a:t>
+              <a:t>8/6/2018</a:t>
             </a:fld>
             <a:endParaRPr lang="en-US" dirty="0"/>
           </a:p>
@@ -4007,7 +4007,7 @@
             <a:fld id="{B61BEF0D-F0BB-DE4B-95CE-6DB70DBA9567}" type="datetimeFigureOut">
               <a:rPr lang="en-US" dirty="0"/>
               <a:pPr/>
-              <a:t>8/5/18</a:t>
+              <a:t>8/6/2018</a:t>
             </a:fld>
             <a:endParaRPr lang="en-US" dirty="0"/>
           </a:p>
@@ -4122,7 +4122,7 @@
             <a:fld id="{B61BEF0D-F0BB-DE4B-95CE-6DB70DBA9567}" type="datetimeFigureOut">
               <a:rPr lang="en-US" dirty="0"/>
               <a:pPr/>
-              <a:t>8/5/18</a:t>
+              <a:t>8/6/2018</a:t>
             </a:fld>
             <a:endParaRPr lang="en-US" dirty="0"/>
           </a:p>
@@ -4214,7 +4214,7 @@
             <a:fld id="{B61BEF0D-F0BB-DE4B-95CE-6DB70DBA9567}" type="datetimeFigureOut">
               <a:rPr lang="en-US" dirty="0"/>
               <a:pPr/>
-              <a:t>8/5/18</a:t>
+              <a:t>8/6/2018</a:t>
             </a:fld>
             <a:endParaRPr lang="en-US" dirty="0"/>
           </a:p>
@@ -4466,7 +4466,7 @@
             <a:fld id="{B61BEF0D-F0BB-DE4B-95CE-6DB70DBA9567}" type="datetimeFigureOut">
               <a:rPr lang="en-US" dirty="0"/>
               <a:pPr/>
-              <a:t>8/5/18</a:t>
+              <a:t>8/6/2018</a:t>
             </a:fld>
             <a:endParaRPr lang="en-US" dirty="0"/>
           </a:p>
@@ -4746,7 +4746,7 @@
             <a:fld id="{B61BEF0D-F0BB-DE4B-95CE-6DB70DBA9567}" type="datetimeFigureOut">
               <a:rPr lang="en-US" dirty="0"/>
               <a:pPr/>
-              <a:t>8/5/18</a:t>
+              <a:t>8/6/2018</a:t>
             </a:fld>
             <a:endParaRPr lang="en-US" dirty="0"/>
           </a:p>
@@ -5149,7 +5149,7 @@
             <a:fld id="{B61BEF0D-F0BB-DE4B-95CE-6DB70DBA9567}" type="datetimeFigureOut">
               <a:rPr lang="en-US" dirty="0"/>
               <a:pPr/>
-              <a:t>8/5/18</a:t>
+              <a:t>8/6/2018</a:t>
             </a:fld>
             <a:endParaRPr lang="en-US" dirty="0"/>
           </a:p>
@@ -5695,10 +5695,6 @@
           <a:bodyPr/>
           <a:lstStyle/>
           <a:p>
-            <a:r>
-              <a:rPr lang="en-US" dirty="0"/>
-              <a:t/>
-            </a:r>
             <a:br>
               <a:rPr lang="en-US" dirty="0"/>
             </a:br>
@@ -5873,7 +5869,7 @@
           <p:cNvPr id="12" name="Picture 11">
             <a:extLst>
               <a:ext uri="{FF2B5EF4-FFF2-40B4-BE49-F238E27FC236}">
-                <a16:creationId xmlns="" xmlns:a16="http://schemas.microsoft.com/office/drawing/2014/main" id="{E2B66158-1DF2-447F-A805-9EFB84231251}"/>
+                <a16:creationId xmlns:a16="http://schemas.microsoft.com/office/drawing/2014/main" id="{E2B66158-1DF2-447F-A805-9EFB84231251}"/>
               </a:ext>
             </a:extLst>
           </p:cNvPr>
@@ -5903,7 +5899,7 @@
           <p:cNvPr id="8" name="Picture 7">
             <a:extLst>
               <a:ext uri="{FF2B5EF4-FFF2-40B4-BE49-F238E27FC236}">
-                <a16:creationId xmlns="" xmlns:a16="http://schemas.microsoft.com/office/drawing/2014/main" id="{808FDCEC-C955-44EE-B530-C6DE790D3AB2}"/>
+                <a16:creationId xmlns:a16="http://schemas.microsoft.com/office/drawing/2014/main" id="{808FDCEC-C955-44EE-B530-C6DE790D3AB2}"/>
               </a:ext>
             </a:extLst>
           </p:cNvPr>
@@ -5933,7 +5929,7 @@
           <p:cNvPr id="4" name="AutoShape 2" descr="data:image/png;base64,iVBORw0KGgoAAAANSUhEUgAABUAAAAPACAMAAADDuCPrAAABYlBMVEUAAAAAADoAAGYAOjoAOmYAOpAAZrYzMzM6AAA6OgA6Ojo6OmY6ZmY6ZpA6ZrY6kLY6kNtNTU1NTW5NTY5Nbm5Nbo5NbqtNjshmAABmADpmOgBmOjpmZjpmZmZmZpBmkGZmkLZmkNtmtttmtv9uTU1ubk1ubm5ubo5ujqtujshuq8huq+SOTU2Obk2Obm6Oq8iOyOSOyP+QOgCQOjqQZjqQZmaQZpCQkGaQkLaQtraQttuQ2/+rbk2rjk2rjm6rq8iryOSr5Mir5P+2ZgC2Zjq2kDq2kGa2kJC2tpC2tra2ttu229u22/+2///Ijk3Ijm7Iq27Iq6vIyKvI5KvI5OTI5P/I///bkDrbkGbbtmbbtpDbtrbb27bb29vb2//b/7bb///kq27kyI7kyKvk5P/k///r6+v8jVn/tmb/yI7/25D/27b/29v/5Kv/5Mj/5OT//7b//7///8j//9v//+T///+zjZs9AAAACXBIWXMAAB2HAAAdhwGP5fFlAAAgAElEQVR4nO3d/59b5ZnecU0wMDGEILMYh0CWwmwDxaSLN3S7xHW3mGQXkni3aY0TEijO1q2/YMe1rP+/0iNpRnPbM+fMM9e5n3PffN4/xB472Eiv6/mgGUlnJnMAQJVJ638BAIiKgAJAJQIKAJUIKABUIqAAUImAAkAlAgoAlQgoAFQioABQiYACQCUCCgCVCCgAVCKgAFCJgAJAJQIKAJVGENDZl298fzKZ7Lzw8Ten/rNuT570zvzhhcnOLwT/pgCwrXlAZ7/aPWjdS6dNKAEF4Kd1QO+9fih2p+0cAQXgp3FA7y4ffu689dXip9/+6vuCgh78ud/7reRPAoCjtA3o4qHh1ufts1/KCkpAAQyvbUCvLor59tbHy8/An1P8wQQUwPCaBnT5CfzLh37lRvmapeRPJqAABtY0oItcmswtP6d/rvzGwQPRq5vK3vv5Irg7P/jNwT/9zuzT3cnOC09+1n84oJsnka4ufyh/ygsfL3/9yx8vev3Cr/f/f+YvAIBjtQzo7NKTn7Cvmroo3n7/NvWbfWpe7LQM6NUjnro/OqA31n/Iywd/4PpB8BN/AQAcq2VAlw837efrt1c9vHrwO4tfefabVW03VtVdpPBs+fDZJ3t3ZED/fv8Pefvq4ddOPfkXAMCxWgZ0UbknHjyuo3r7IGLrli4fOb709Xz+7aebx4zlseQPv5l/+/VT/+inBnRh+Rn6l4tP1Z+Z7Lz9zeqZ/+fmT/0LAOBYLQN6+ymffS8D+vJ866Xv68/mtx6t3l5/5fTGMaE7OqAvb/6MzV9wdfUQ9il/AQAca6QBXdZxlbr180nbTysdPCY98kWjRwZ0/aubv2a+/yWCp/wFAHCssQZ0UcDypc3lVyaXMdtu2u39xj7lq58rRwb0uYO/5p1D/9en/AUAcKyRfg10Gc7ye+uQbj/Ds3mW58YxT/YcGdCXD//K/v/1aX8BABxrbM/C70f19qFP5W3f7Cfd1qkDeuRjWwDYGOfrQOclcYuIbR6IElAA4zPOdyItlbcNbV7OtPlSqPmntQHliSMAJ9I0oFu5XNt6L3z5HH7/qZ2rTz6vIw3o0/4CADhW26sx2Zdy3t765HnxmPDZ/7X/ls7tp9xv7H95VBjQp/wFAHCstgEtX3k8eOf5jcn2C5tulDderku2deGmzfNM2oA+5S8AgGM1viL9veUVlQ9dkf7gC5Grq9VvSrZ8F9GZX6+/h9LmvZfCgD7lLwCAY435eyJd3X42fPtp8lUbxQF98i8AgGO1Duih78q5c/g6crcn28+Mz36++b+dWV2wUxzQJ/8CADhW84AufPnz5Sfvz7xovy/89lVBl/60vN7x+lrIc31An/gLAOBYYwgoAIREQAGgEgEFgEoEFAAqEVAAqERAAaASAQWASgQUACoRUACoREABoBIBBYBKBBQAKhFQAKhEQAGgEgEFgEoEFAAqEVAAqNQwoP8HEtyT6MRIVEzFCGh43JPoxEhUTMUIaHjck+jESFRMxQhoeNyT6MRIVEzFCGh43JPoxEhUTMUIaHjck+jESFRMxQhoeNyT6MRIVEzFCGh43JPoxEhUTMUIaHjck+jESFRMxQhoeNyT6MRIVEzFCGh43JPoxEhUTMUIaHjck+jESFRMxQhoeNyT6MRIVEzFCGh43JPoxEhUTMUIaHjck+jESFRMxQhoeNyT6MRIVEzFCGh43JPoxEhUTMUIaHjck+jESFRMxQhoeNyT6MRIVEzFCGh43JPoxEhUTMUIaHjck+jESFRMxQhoeNyT6MRIVEzFCGh43JPoxEhUTMUIaHjck+jESFRMxQhoeNyT6MRIVEzFCGh43JPoxEhUTMUIaHjck+jESFRMxQhoeNyT6MRIVEzFCGh43JPoxEhUTMUIaHjck+jESFRMxQhoeNyT6MRIVEzFCGh43JPoxEhUTMUIaHjck+jESFRMxQhoeNyT6MRIVEzFCGh43JPoxEhUTMUIaHjck+jESFRMxQhoeNyT6MRIVEzFUgX0/+I7RL+fxAioiqkYAUVQ+v0kRkBVTMUIKILS7ycxAqpiKkZAEZR+P4kRUBVTMQKKoPT7SYyAqpiKEVAEpd9PYgRUxVSMgCIo/X4SI6AqpmIEFEHp95MYAVUxFSOgCEq/n8QIqIqpGAFFUPr9JEZAVUzFCCiC0u8nMQKqYipGQBGUfj+JEVAVUzECiqD0+0mMgKqYihFQBKXfT2IEVMVUjIAiKP1+EiOgKqZiBBRB6feTGAFVMRUjoAhKv5/ECKiKqRgBRVD6/SRGQFVMxQgogtLvJzECqmIqRkARlH4/iRFQFVMxAoqg9PtJjICqmIoRUASl309iBFTFVIyAIij9fhIjoCqmYgQUQen3kxgBVTEVI6AISr+fxAioiqkYAUVQ+v0kRkBVTMUIKILS7ycxAqpiKkZAEZR+P4kRUBVTMQKKoPT7SYyAqpiKEVAEpd9PYgRUxVSMgCIo/X4SI6AqpmKnDeiji6+tf/b4yt50+u71rg8IKDT0+0mMgKqIA3pt+tqmpNOlV744/gMCChH9fhIjoCrSgD6+Nt0E9Nr0/PX5g8vT87eO/YCAQkS/n8QIqIoyoP/2wXQT0Pt75RHmo4vnPjnuAwIKFf1+EiOgKsKA3pxO3/vzOqA39398/7gPCChU9PtJjICqKAP66j/O76zzeG36YfmxfHz0BwQUKvr9JEZAVYQB3cri48vrT9Dv752/dfQHq3/m+ZVT/s1P0fpIw5N+P8BJEVAEpd8PcFL6gL7yxdEfHPpH9Y+uWx9peNLvJzE+hVcZPKDdj0AJKAT0+0mMgKoQUOSg309iBFRlmIDyLDy86feTGAFVGSigm1d5rl/6edQHBBQq+v0kRkBVBgoo70SCM/1+EiOgKgMF9PHl6av773g/+gMCChX9fhIjoCoDBXT+YPuaS0d/QEAhot9PYgRUZaiAzh9cWVTy3VtdHxBQaOj3kxgBVREH9BT0t631kYYn/X4SI6AqpmIEFEHp95MYAVUxFSOgCEq/n8QIqIqpGAFFUPr9JEZAVUzFCCiC0u8nMQKqYipGQBGUfj+JEVAVUzECiqD0+0mMgKqYihFQBKXfT2IEVMVUjIAiKP1+EiOgKqZiBBRB6feTGAFVMRUjoAhKv5/ECKiKqRgBRVD6/SRGQFVMxQgogtLvJzECqmIqRkARlH4/iRFQFVMxAoqg9PtJjICqmIoRUASl309iBFTFVIyAIij9fhIjoCqmYgQUQen3kxgBVTEVI6AISr+fxAioiqkYAUVQ+v0kRkBVTMUIKILS7ycxAqpiKkZAEZR+P4kRUBVTMQKKoPT7SYyAqpiKEVAEpd9PYgRUxVSMgCIo/X4SI6AqpmIEFEHp95MYAVUxFSOgCEq/n8QIqIqpGAFFUPr9JEZAVUzFCCiC0u8nMQKqYipGQBGUfj+JEVAVUzECiqD0+0mMgKqYihFQBKXfT2IEVMVUjIAiKP1+EiOgKqZiBBRB6feTGAFVMRUjoAhKv5/ECKiKqRgBRVD6/SRGQFVMxQgogtLvJzECqmIqRkARlH4/iRFQFVMxAoqg9PtJjICqmIoRUASl309iBFTFVIyAIij9fhIjoCqmYgQUQen3kxgBVTEVI6AISr+fxAioiqkYAUVQ+v0kRkBVTMUIKILS7ycxAqpiKkZAEZR+P4kRUBVTMQKKoPT7SYyAqpiKEVAEpd9PYgRUxVSMgCIo/X4SI6AqpmIEFEHp95MYAVUxFSOgCEq/n8QIqIqpGAFFUPr9JEZAVUzFCCiC0u8nMQKqYipGQBGUfj+JEVAVUzECiqD0+0mMgKqYihFQBKXfT2IEVMVUjIAiKP1+EiOgKqZiBBRB6feTGAFVMRUjoAhKv5/ECKiKqRgBRVD6/SRGQFVMxQgogtLvJzECqmIqRkARlH4/iRFQFVMxAoqg9PtJjICqmIoRUASl309iBFTFVIyAIij9fhIjoCqmYgQUQen3kxgBVTEVI6AISr+fxAioiqkYAUVQ+v0kRkBVTMUIKILS7ycxAqpiKkZAEZR+P4kRUBVTMQKKoPT7SYyAqpiKEVAEpd9PYgRUxVSMgCIo/X4SI6AqpmIEFEHp95MYAVUxFSOgCEq/n8QIqIqpGAFFUPr9JEZAVUzFCCiC0u8nMQKqYipGQBGUfj+JEVAVU7GGAdVrfaThqfXaAB6BIiz9fhLjEaiKqRgBRVD6/SRGQFVMxQgogtLvJzECqmIqRkARlH4/iRFQFVMxAoqg9PtJjICqmIoRUASl309iBFTFVIyAIij9fhIjoCqmYgQUQen3kxgBVTEVI6AISr+fxAioiqkYAUVQ+v0kRkBVTMUIKILS7ycxAqpiKkZAEZR+P4kRUBVTMQKKoPT7SYyAqpiKEVAEpd9PYgRUxVSMgCIo/X4SI6AqpmIEFEHp95MYAVUxFSOgCEq/n8QIqIqpGAFFUPr9JEZAVUzFCCiC0u8nMQKqYipGQBGUfj+JEVAVUzECiqD0+0mMgKqYihFQBKXfT2IEVMVUjIAiKP1+EiOgKqZiBBRB6feTGAFVMRUjoAhKv5/ECKiKqRgBRVD6/SRGQFVMxQgogtLvJzECqmIqRkARlH4/iRFQFVMxAoqg9PtJjICqmIoRUASl309iBFTFVIyAIij9fhIjoCqmYgQUQen3kxgBVTEVI6AISr+fxAioiqkYAUVQ+v0kRkBVTMUIKILS7ycxAqpiKkZAEZR+P4kRUBVTMQKKoPT7SYyAqpiKEVAEpd9PYgRUxVSMgCIo/X4SI6AqpmIEFEHp95MYAVUxFSOgCEq/n8QIqIqpGAFFUPr9JEZAVUzFCCiC0u8nMQKqYipGQBGUfj+JEVAVUzECiqD0+0mMgKqYihFQBKXfT2IEVMVUjIAiKP1+EiOgKqZiBBRB6feTGAFVMRUjoAhKv5/ECKiKqRgBRVD6/SRGQFVMxQgogtLvJzECqmIqRkARlH4/iRFQFVMxAoqg9PtJjICqmIoRUASl309iBFTFVIyAIij9fhIjoCqmYgQUQen3kxgBVTEVI6AISr+fxAioiqkYAUVQ+v0kRkBVTMUIKILS7ycxAqpiKkZAEZR+P4kRUBVTMQKKoPT7SYyAqpiKEVAEpd9PYgRUxVSMgCIo/X4SI6AqpmIEFEHp95MYAVUxFSOgCEq/n8QIqIqpGAFFUPr9JEZAVUzFCCiC0u8nMQKqYipGQBGUfj+JEVAVUzECiqD0+0mMgKqYihFQBKXfT2IEVMVUjIAiKP1+EiOgKqZiBBRB6feTGAFVMRUjoAhKv5/ECKiKqRgBRVD6/SRGQFVMxQgogtLvJzECqmIqRkARlH4/iRFQFVMxAoqg9PtJjICqmIoRUASl309iBFTFVIyAIij9fhIjoCqmYgQUQen3kxgBVTEVI6AISr+fxAioiqmYKKCPL083XvliPn908eDni9+8sjedvnudgEJJv5/ECKiKS0Dv720FdF3TVUwJKET0+0mMgKoME9CN+3vnPln8cGf62sGvXZuevz5/cHl6/hYBhY5+P4kRUJVBA7p4IPr+qpnvbzV1/Ti0pJWAQkS/n8QIqMqgAb25epj5+PJWLG+uH43e3IoqAcWp6feTGAFVGTKgjy5OP1z9eP53H0ynP72+/ODa6tcOf1pPQHFa+v0kRkBVhgzo5sHm5jmkZTr3H43e39t8EfT5FeXfvNL6SMOTfj/ASSkDuv9lzjvT6Xu35n+5Ml18TEAxDP1+gJNSBvTO5on2zSPR5XNJWwE1L2TSP7pufaThSb+fxPgUXmW4gD6+vP5q56GiPuURKAGFgH4/iRFQleEC+sRDzPIrBBTD0O8nMQKqMlxAn3iafdVMnoXHIPT7SYyAqgwX0P1Xz+9/Ll+auXn9J68DhZR+P4kRUJXBArr16vlrqwebq5DyTiQMQr+fxAioymABfXRx/0ug9/eWL2N68EF5Vn6R0Vd5Lzzk9PtJjICqDBbQ7SeJbq4vxnR9+cEDrsaEAej3kxgBVRksoHe2H2I++Nl0eu699ccPriz6+e4t+w/ob1vrIw1P+v0kRkBVBgvoielvW+sjDU/6/SRGQFVMxQgogtLvJzECqmIqRkARlH4/iRFQFVMxAoqg9PtJjICqmIoRUASl309iBFTFVKwjoLM/fvY5AcUY6feTGAFV6RvQe//pm/n84euTyeTMLwgoxke/n8QIqErPgN6YfO+38/nVydLyZwQUI6PfT2IEVKVfQG+XbN7dnTz7zb0Lk5cJKEZHv5/ECKhKv4BeXZRzmdGdXyz/d/lzAopx0e8nMQKq0iugs0vLcq4z+vDCMJ/D629b6yMNT/r9JEZAVXoFdNXMhxcmz80JKMZJv5/ECKjKCQJ6d3fyDgHFSOn3kxgBVekV0NWn8DfKl0D5GihGSb+fxAioSq+Azq9Onls+/b4sJ8/CY5T0+0mMgKr0C+jt8gLQxWfws59PVo9DCSjGRb+fxAioSr+ALj59X3iuPJG0884g/SSgOBX9fhIjoCo9Azq/99FPPl788PBHP/jNMP0koDgV/X4SI6AqfQM6PP1ta32k4Um/n8QIqIqp2LEBnX09YD8JKE5Fv5/ECKiKqdjRAf3yx8v3wz/80VuDvIaJgOKU9PtJjICq9Azo7NPVdZgeXpicGeZiTAQUp6LfT2IEVKVnQK9OJmf+evd7v5393WSg19ETUJyKfj+JEVCVfgG9PZm8vX4P5x9Wb+gkoBgX/X4SI6Aq/QJ6dfnuo/Wb4G+US4oQUIyLfj+JEVCVXgFdvRd+HdC7u1xMBOOj309iBFSlV0A3l7Mr5eRqTBgj/X4SI6AqBBQ56PeTGAFV6RXQ2aXlE0frcnI5O4yRfj+JEVCVXgFdPXG0CugipjyJhPHR7ycxAqrSL6B3dycvfVMCeu91LmeHMdLvJzECqtIvoOVydmd3d178/uLHYa6nTEBxKvr9JEZAVXoGdP773cnaQP0koDgV/X4SI6AqfQM6//ZXZxf1fGawy4ESUJyKfj+JEVCV3gEdnP62tT7S8KTfT2IEVMVUjOuBIij9fhIjoCqmYlwPFEHp95MYAVXpGVCuB4qR0+8nMQKq0jOgXA8UI6ffT2IEVKVfQLkeKMZOv5/ECKhKv4ByPVCMnX4/iRFQlV4B5XqgGD39fhIjoCq9Asrl7DB6+v0kRkBVCChy0O8nMQKq0iugXA8Uo6ffT2IEVKVXQLkeKEZPv5/ECKhKv4ByPVCMnX4/iRFQlX4B5XqgGDv9fhIjoCo9A8r1QDFy+v0kRkBV+gaU64Fi3PT7SYyAqvQO6OD0t631kYYn/X4SI6AqpmIEFEHp95MYAVUxFTvihfQ/emnQaykTUJyafj+JEVCVfgG9MJk8M9iVlAkoBPT7SYyAqvQK6OpyypMzHw/ZUP1ta32k4Um/n8QIqEqvgC786celoS98TEAxSvr9JEZAVfoGdL76rkgLQ72QSX/bWh9peNLvJzECqnKCgC4+lf/y9WVCd94a4ikl/W1rfaThSb+fxAioyokCuvDtz8tbkl7QPwzV37bWRxqe9PtJjICqnCigs199f/OGzslLBBRjot9PYgRUpX9AN/VcPhf/7af698Trb1vrIw1P+v0kRkBVegZ0/dXPg1eD6i+rrL9trY80POn3kxgBVekV0NmliX3ySP+NPfS3rfWRhif9fhIjoCq9Arp8J9LO4ZcvPbzAI1CMiX4/iRFQlZ4B/cGvzS/NPle/lEl/21ofaXjS7ycxAqrSK6Au9Let9ZGGJ/1+EiOgKqZiBBRB6feTGAFVMRXruCL9ztlB3oREQHFq+v0kRkBV+gb0xv4r6PmeSBgj/X4SI6AqPQO67OczL775Bt+VEyOl309iBFSlX0Dv7k6eXb2K6d4lvi88xki/n8QIqEq/gF49eN/R7NLkOQKK0dHvJzECqtIroLNLW4867+6qX0JPQHF6+v0kRkBVegX00Ps29W/iJKA4Pf1+EiOgKgQUOej3kxgBVekV0NmlyTv7H+ivw0RAcXr6/SRGQFV6BZQnkTB6+v0kRkBV+gX07u7kzOpyIn96nZcxYYz0+0mMgKr0C+jqjUhnz54d8q1Icq2PNDy1XhtwzFs5/7C7fifnztsD/dX6/zi0PtLwpN9PYjwCVekb0PnsyzcWj0Bf/HiQJ5AIKE5Lv5/ECKhK74AOTn/bWh9peNLvJzECqmIqRkARlH4/iRFQFVMxG9DZR28+6Se8DhSjo99PYgRUpSOgy28n9wTeiYTx0e8nMQKqQkCRg34/iRFQlY6AOtLfttZHGp70+0mMgKqYihFQBKXfT2IEVMVU7PiAfjVcPgkoTke/n8QIqIqp2NEB/fLH5X1IP/gNAcUY6feTGAFV6RnQ2aX9p5BeGui9SPrb1vpIw5N+P4kRUJV+AV32c+fFf/jsn97YnQx0NTsCilPR7ycxAqrSL6A3JpMfrh54zn452bq4MgHFWOj3kxgBVekV0MUD0INr2F3lgsoYIf1+EiOgKr0C+vDCoe/KyQvpMT76/SRGQFV6BpRvKoeR0+8nMQKq0iugfF94jJ5+P4kRUJVeAZ3f2Pq65w2+BooR0u8nMQKq0i+gs0v7L/+8MdC1RAgoTkW/n8QIqEqvgM4+Wr7+88W3Pvvn5Y8vDHNVUP1ta32k4Um/n8QIqEqvgLpc1E5/21ofaXjS7ycxAqpCQJGDfj+JEVCVXgF1ob9trY80POn3kxgBVTEVI6AISr+fxAioiqkYAUVQ+v0kRkBVTMWODugfP9v3OS+kx+jo95MYAVXpGdDf7/JN5TBq+v0kRkBV+gX0Nt+VEyOn309iBFSlV0BnlyY7H3+17+sh+klAcSr6/SRGQFV6BfThhYEuokxAoaLfT2IEVKVnQAd6/zsBhYp+P4kRUJVeAZ1dIqAYOf1+EiOgKr0COr/Bp/AYOf1+EiOgKv0Ceuh7ehBQjJB+P4kRUJV+AZ3fuzA58+aG+kJ2BBSnp99PYgRUpWdAP+V1oBg3/X4SI6Aq/QJ6gxfSY+T0+0mMgKr0Cmh5If0gn7cTUIjo95MYAVXpFVCP55AIKE5Fv5/ECKhKz4DyOlCMnH4/iRFQlV4B5YX0GD39fhIjoCq9Ajq/MXmZgGLU9PtJjICq9Avo7NLO2wQUY6bfT2IEVKVXQGcfvTGZ7LzIC+kxXvr9JEZAVXoF1HxbY14HivHR7ycxAqpCQJGDfj+JEVCVXgF1ob9trY80POn3kxgBVTEVI6AISr+fxAioiqkYAUVQ+v0kRkBVTMVsQGd/tN8F/uGPz77A10AxOvr9JEZAVToC+vDC6imj2UebFy9tfoWAYlT0+0mMgKr0DOhBNgkoRkm/n8QIqAoBRQ76/SRGQFUIKHLQ7ycxAqpCQJGDfj+JEVAVAooc9PtJjICqEFDkoN9PYgRUhYAiB/1+EiOgKgQUOej3kxgBVSGgyEG/n8QIqAoBRQ76/SRGQFUIKHLQ7ycxAqrSHdAnEVCMj34/iRFQFQKKHPT7SYyAqnQEdPbRm0/im8phfPT7SYyAqnQE1JH+trU+0vCk309iBFTFVIyAIij9fhIjoCqmYgQUQen3kxgBVTEVI6AISr+fxAioiqkYAUVQ+v0kRkBVTMUIKILS7ycxAqpiKkZAEZR+P4kRUBVTMQKKoPT7SYyAqpiKEVAEpd9PYgRUxVTsiXciXdr5xeKHb78moBg3/X4SI6AqHQF9eGH5xvfV/xJQjJh+P4kRUJXOgC4fgRJQjJ5+P4kRUJWOgM4uTZ79/Ks/Xfjer786MMzn8/rb1vpIw5N+P4kRUJWOgM5vcDk7hKDfT2IEVKUroLNP6wL66OK0eOWL5UePr+xNp+9eX/3WoQ8IKDT0+0mMgKp0BXSR0K8+++fdnX/47MDnPa4Hen9vK6Drmq5ieugDAgoR/X4SI6Aq3QGdVz2JdGf62sEH16bnr88fXJ6ev2U/IKAQ0e8nMQKq0iugs49OfBH6a9P3939+f2/9OPTcJ+YDAgoV/X4SI6AqvQJ6co8vb/Xx5vrR6M1lVA99QEChot9PYgRUpXdAv/3V2clk5+xb/V7D9Oji+d99MJ3+9Pryg2vTD8svlk/rD31AQKGi309iBFSlb0APXs70cp+Abp5DWtZy/9Ho/b3ztw59sPr/Pr/S5489mdZHGp70+wFO6qiALvv5zItvvvH9ngW9M52+d2v+lyvTRS4JKBzo9wOc1BEBvbs7efY35Wf3Lk3K5UU6bL7SuXwuaauZr3xx6IND/4j+0XXrIw1P+v0kxqfwKv0CenXy7OZp+NmlyXPdAd24MzUPOp/yCJSAQkC/n8QIqEqvgK4vardyd/fZ/q9pMg86CSiGot9PYgRUpVdAD72Q/kSvqi+Z5Fl4DE+/n8QIqMowAX18eTuTm5d8rl8HuvUBAYWKfj+JEVCVXgGdXZq8s//B7UmPT+GvrR5frkLKO5EwPP1+EiOgKr0CevInke7vLV/G9OCD8o73RUZf3X/7+6EPCChU9PtJjICq9Avo3d3JmV+Xn/3p9V4vY1p8hr665tL15QcPti/A9ICrMWEA+v0kRkBV+gV09Uaks2fP9n4r0vzBz6bTc++tH2U+uLJI5rtP+4CAQkO/n8QIqErPgM7/sLt+J+fO2736eXL629b6SMOTfj+JEVCVvgGdz758Y/EI9MWPT3pdOwIKF/r9JEZAVXoHdHD629b6SMOTfj+JEVAVUzECiqD0+0mMgKqYihFQBKXfT2IEVMVUjIAiKP1+EiOgKqZiBBRB6feTGAFVMRUjoAhKv5/ECKiKqRgBRVD6/SRGQFVMxQgogtLvJzECqmIqRkARlH4/iRFQFVOxo67G9IPfEFCMmn4/iRFQlV4BfXhh63qgBBRjpN9PYgRUpWdAT/BdPAgoWtDvJzECqtIroIe+qRwBxRjp95MYAVXpFdD5jc23hSegGCn9fhIjoCr9AvrtLyeTZ158c+0ng1zSTn/bWh9peJuln3QAABwGSURBVNLvJzECqtIroA8vTLYN8wVR/W1rfaThSb+fxAioCgFFDvr9JEZAVXoF1IX+trU+0vCk309iBFTFVIyAIij9fhIjoCqmYscGdPb1gP0koDgV/X4SI6AqpmJHB/TLHy+/+PnwR28N9V3l9Let9ZGGJ/1+EiOgKj0DOvt09ezRwwuTMwO9KUl/21ofaXjS7ycxAqrSM6BXJ5Mzf737vd/O/m4yeXaYx6D629b6SMOTfj+JEVCVfgG9PZm8vX5H/B92B7qwiP62tT7S8KTfT2IEVKVfQK9OXt6/pMiNyXMEFKOj309iBFSlV0BXFxNZB/TuLi+kx/jo95MYAVXpFdBVOtcBHeradvrb1vpIw5N+P4kRUBUCihz0+0mMgKr0Cujs0vKJo3U5bw/0NLz+trU+0vCk309iBFSlV0BXTxytArqIKU8iYXz0+0mMgKr0C+jd3clL35SA3nt9MtDV6fW3rfWRhif9fhIjoCr9Arp4CDqZnN3defH7ix9fHqSfBBSnot9PYgRUpWdA57/f3VwNdKB+ElCcin4/iRFQlb4BnX/7q7OLej4z3DeI19+21kcanvT7SYyAqvQO6OD0t631kYYn/X4SI6AqpmLHXw/0qwH7SUBxKvr9JEZAVUzFjr8e6AKfwmOc9PtJjICq9Azo7NL+t5R7aaArKutvW+sjDU/6/SRGQFX6BXTZz50X//Nn//TGoqDDvI6egOJU9PtJjICq9Avo7f1XL81+OeF6oBgh/X4SI6AqvQK6eAB68OrPq7yVEyOk309iBFSlV0AfXth6+ybXA8UY6feTGAFV6RnQrWZyOTuMkX4/iRFQlV4BXV2Rfu3uLpezw/jo95MYAVXpFdBD3wfpxkDvhtffttZHGp70+0mMgKr0C+jDC5MffrPp5zCfwRNQnIp+P4kRUJWOgM4+erN4Y/U60H9+c3cyefEnfAqP0dHvJzECqtIR0MVDzyfxJBLGR7+fxAioCgFFDpUj+X/4DpH2pegIqCP9bWt9pOGpciStjzQ8SftSmIoRUARVOZLWRxqepH0pTMUIKIKqHEnrIw1P0r4UpmJHB/SPn+37nGfhMTqVI2l9pOFJ2peiZ0APvqccTyJhlCpH0vpIw5O0L0W/gN7mWXiMXOVIWh9peJL2pegV0Nmlyc7HX+37eoh+ElCcSuVIWh9peJL2pegV0IcXBrqIMgGFSuVIWh9peJL2pegZ0IHe/05AoVI5ktZHGp6kfSl6BXR2iYBi5CpH0vpIw5O0L0WvgM5v8Ck8Rq5yJK2PNDxJ+1L0C+ih7+lBQDFClSNpfaThSdqXol9A5/cuTM68ucHl7DA+lSNpfaThSdqXomdAP+V1oBi3ypG0PtLwJO1L0S+gN3ghPUauciStjzQ8SftS9ApoeSH9IJ+3E1CIVI6k9ZGGJ2lfil4B9XgOiYDiVCpH0vpIw5O0L0XPgPI6UIxc5UhaH2l4kval6BVQXkiP0ascSesjDU/SvhS9AjrY94InoFCpHEnrIw1P0r4U/QI6u7TzNgHFmFWOpPWRhidpX4peAZ19VL4vPC+kx3hVjqT1kYYnaV+KXgE139yY14FifCpH0vpIw5O0LwUBRQ6VI2l9pOFJ2peiV0Bd6G9b6yMNT5UjaX2k4Unal8JUjIAiqMqRtD7S8CTtS2EqRkARVOVIWh9peJL2pTAVOyKg3361jW8qh/GpHEnrIw1P0r4UvQLq8iSSXusjDU+VI2l9pOFJ2pen4Vl4BFU5ktZHGp6kfSl6BXT2x8/W/v71yc4/fM4L6TE6lSNpfaThSdqXoldAt93dfXaYK4Pqb1vrIw1PlSNpfaThSdqX4sQBHezCIvrb1vpIw1PlSFofaXiS9qU4eUCHegiqv22tjzQ8VY6k9ZGGJ2lfipMHdKirK+tvW+sjDU+VI2l9pOFJ2pfi5AG9u0tAMT6VI2l9pOFJ2pfixAGdXZ3wKTzGp3IkrY80PEn7UvQK6OyjzaVA33xjd8KTSBihypG0PtLwJO1L0Sugh19Iz8uYMEKVI2l9pOFJ2pfixAF95q2BvkG8/ra1PtLwVDmS1kcanqR9KXoF1IX+trU+0vBUOZLWRxqepH0pTMUIKIKqHEnrIw1P0r4UpmIEFEFVjqT1kYYnaV8KUzECiqAqR9L6SMOTtC+FqZgN6NYLmA7wbY0xPpUjaX2k4Unal6IjoOZKoFwPFGNVOZLWRxqepH0pCChyqBxJ6yMNT9K+FB0Btb7cnfBOJIxR5UhaH2l4kvalOFFAZz9f5PPMbwbpJwHFqVSOpPWRhidpX4qTBPQPi4efO0O9EYmA4lQqR9L6SMOTtC9F/4AO+vCTgOKUKkfS+kjDk7QvRe+Aloef/26wfBJQnE7lSFofaXiS9qXoGdB7Az/8JKA4pcqRtD7S8CTtS9EvoIM//CSgOKXKkbQ+0vAk7UvRJ6D3Li2vAjrow08CilOqHEnrIw1P0r4UPQJaHn6+PXA+CShOp3IkrY80PEn7UnQG1OfhJwHFKVWOpPWRhidpX4qugP7e5+EnAcUpVY6k9ZGGJ2lfio6A8l54BFE5ktZHGp6kfSkIKHKoHEnrIw1P0r4UHQHleqAIonIkrY80PEn7UnQE1JH+trU+0vBUOZLWRxqepH0pTMUIKIKqHEnrIw1P0r4UpmIEFEFVjqT1kYYnaV8KUzECiqAqR9L6SMOTtC+FqRgBRVCVI2l9pOFJ2pfCVIyAIqjKkbQ+0vAk7UthKkZAEVTlSFofaXiS9qUwFSOgCKpyJK2PNDxJ+1KYihFQBFU5ktZHGp6kfSlMxQgogqocSesjDU/SvhSmYgQUQVWOpPWRhidpXwpTMQKKoCpH0vpIw5O0L4WpGAFFUJUjaX2k4Unal8JUjIAiqMqRtD7S8CTtS2EqRkARVOVIWh9peJL2pTAVI6AIqnIkrY80PEn7UpiKEVAEVTmS1kcanqR9KUzFCCiCqhxJ6yMNT9K+FKZiBBRBVY6k9ZGGJ2lfClMxAoqgKkfS+kjDk7QvhakYAUVQlSNpfaThSdqXwlSMgCKoypG0PtLwJO1LYSpGQBFU5UhaH2l4kvalMBUjoAiqciStjzQ8SftSmIoRUARVOZLWRxqepH0pTMUIKIKqHEnrIw1P0r4UpmIEFEFVjqT1kYYnaV8KUzECiqAqR9L6SMOTtC+FqRgBRVCVI2l9pOFJ2pfCVIyAIqjKkbQ+0vAk7UthKkZAEVTlSFofaXiS9qUwFSOgCKpyJK2PNDxJ+1KYihFQBFU5ktZHGp6kfSlMxQgogqocSesjDU/SvhSmYgQUQVWOpPWRhidpXwpTMQKKoCpH0vpIw5O0L4WpGAFFUJUjaX2k4Unal8JUjIAiqMqRtD7S8CTtS2EqRkARVOVIWh9peJL2pTAVI6AIqnIkrY80PEn7UpiKEVAEVTmS1kcanqR9KUzFCCiCqhxJ6yMNT9K+FKZiBBRBVY6k9ZGGJ2lfClMxAoqgKkfS+kjDk7QvhakYAUVQlSNpfaThSdqXwlSMgCKoypG0PtLwJO1LYSpGQBFU5UhaH2l4kvalMBUjoAiqciStjzQ8SftSmIrpAvpvP5tOz717vfz80cVp8coXy48eX9mbTte/Q0AhUjmS1kcanqR9KYYK6L+sknnuk+UH9/e2Arqu6SqmBBQilSNpfaThSdqXYqCA3pme+9v5/MHlVSfvTF87+K1r0/PXl79z/hYBhU7lSFofaXiS9qUYJqCPL08/XP64eLT5YWnm+/u/dX9v/Th09eCUgEKjciStjzQ8SftSDBPQRxfXn6GXdD6+vBXLm+tHoze3okpAcWqVI2l9pOFJ2pdimIDuKwF9dPH87z6YTn96ffUr5bHp4U/rCShOq3IkrY80PEn7Ugwb0NUn6pvnkJbp3H80en9v80XQ51e0f/NS6yMNT5UjaX2k4Unal6cRB3T1+fqd6fS9W/O/XFk+J09AMYzKkbQ+0vAk7cvTaAN6Z/Uyps2XPZefz28F1LyQSf/ouvWRhqfKkbQ+0vAk7UsxZEDv7J378HBPz996yiNQAgqBypG0PtLwJO1LMWBAb07NK5WWDzoJKIZROZLWRxqepH0phgvov9h+rprJs/AYROVIWh9peJL2pRgqoI+vTV9df41z86r6VTM3r//kdaCQqhxJ6yMNT9K+FEMF9NrWWzWvrR5srkLKO5EwiMqRtD7S8CTtSzFQQG9uv9X9/t7yZUwPPii/tsjoq7wXHnKVI2l9pOFJ2pdimIBurl+38FrJ6eoCTNeXv/eAqzFhAJUjaX2k4Unal2KYgN6ZHgro/MHy4qDvrR9yPriy+OV3b9l/Rn/bWh9peKocSesjDU/SvhTDBLSG/ra1PtLwVDmS1kcanqR9KUzFCCiCqhxJ6yMNT9K+FKZiBBRBVY6k9ZGGJ2lfClMxAoqgKkfS+kjDk7QvhakYAUVQlSNpfaThSdqXwlSMgCKoypG0PtLwJO1LYSpGQBFU5UhaH2l4kvalMBUjoAiqciStjzQ8SftSmIoRUARVOZLWRxqepH0pTMUIKIKqHEnrIw1P0r4UpmIEFEFVjqT1kYYnaV8KUzECiqAqR9L6SMOTtC+FqRgBRVCVI2l9pOFJ2pfCVIyAIqjKkbQ+0vAk7UthKkZAEVTlSFofaXiS9qUwFSOgCKpyJK2PNDxJ+1KYihFQBFU5ktZHGp6kfSlMxQgogqocSesjDU/SvhSmYgQUQVWOpPWRhidpXwpTMQKKoCpH0vpIw5O0L4WpGAFFUJUjaX2k4Unal8JUjIAiqMqRtD7S8CTtS2EqRkARVOVIWh9peJL2pTAVI6AIqnIkrY80PEn7UpiKEVAEVTmS1kcanqR9KUzFCCiCqhxJ6yMNT9K+FKZiBBRBVY6k9ZGGJ2lfClMxAoqgKkfS+kjDk7QvhakYAUVQlSNpfaThSdqXwlSMgCKoypG0PtLwJO1LYSpGQBFU5UhaH2l4kvalMBUjoAiqciStjzQ8SftSmIoRUARVOZLWRxqepH0pTMUIKIKqHEnrIw1P0r4UpmIEFEFVjqT1kYYnaV8KUzECiqAqR9L6SMOTtC+FqRgBRVCVI2l9pOFJ2pfCVIyAIqjKkbQ+0vAk7UthKkZAEVTlSFofaXiS9qUwFSOgCKpyJK2PNDxJ+1KYihFQBFU5ktZHGp6kfSlMxQgogqocSesjDU/SvhSmYgQUQVWOpPWRhidpXwpTMQKKoCpH0vpIw5O0L4WpGAFFUJUjaX2k4Unal8JUjIAiqMqRtD7S8CTtS2EqRkARVOVIWh9peJL2pTAVI6AIqnIkrY80PEn7UpiKEVAEVTmS1kcanqR9KUzFCCiCqhxJ6yMNT9K+FKZiBBRBVY6k9ZGGJ2lfClMxAoqgKkfS+kjDk7QvhakYAUVQlSNpfaThSdqXwlSMgCKoypG0PtLwJO1LYSpGQBFU5UhaH2l4kvalMBUjoAiqciStjzQ8SftSmIoRUARVOZLWRxqepH0pTMUIKIKqHEnrIw1P0r4UpmIEFEFVjqT1kYYnaV8KUzECiqAqR9L6SMOTtC+FqRgBRVCVI2l9pOFJ2pfCVIyAIqjKkbQ+0vAk7UthKkZAEVTlSFofaXiS9qUwFSOgCKpyJK2PNDxJ+1KYihFQBFU5ktZHGp6kfSlMxQgogqocSesjDU/SvhSmYgQUQVWOpPWRhidpXwpTMQKKoCpH0vpIw5O0L4WpGAFFUJUjaX2k4Unal8JUjIAiqMqRtD7S8CTtS2EqRkARVOVIWh9peJL2pTAVI6AIqnIkrY80PEn7UpiKEVAEVTmS1kcanqR9KUzFCCiCqhxJ6yMNT9K+FKZiBBRBVY6k9ZGGJ2lfClMxAoqgKkfS+kjDk7QvhakYAUVQlSNpfaThSdqXwlSMgCKoypG0PtLwJO1LYSpGQBFU5UhaH2l4kvalMBVrGFC91kcanipH0vpIw5O0L0/DI1AEVTmS1kcanqR9KUzFCCiCqhxJ6yMNT9K+FKZiBBRBVY6k9ZGGJ2lfClMxAoqgKkfS+kjDk7QvhakYAUVQlSNpfaThSdqXwlSMgCKoypG0PtLwJO1LYSpGQBFU5UhaH2l4kvalMBUjoAiqciStjzQ8SftSmIoRUARVOZLWRxqepH0pTMUIKIKqHEnrIw1P0r4UpmIEFEFVjqT1kYYnaV8KUzECiqAqR9L6SMOTtC+FqRgBRVCVI2l9pOFJ2pfCVIyAIqjKkbQ+0vAk7UthKkZAEVTlSFofaXiS9qUwFSOgCKpyJK2PNDxJ+1KYihFQBFU5ktZHGp6kfSlMxQgogqocSesjDU/SvhSmYgQUQVWOpPWRhidpXwpTMQKKoCpH0vpIw5O0L4WpGAFFUJUjaX2k4Unal8JUjIAiqMqRtD7S8CTtS2EqRkARVOVIWh9peJL2pTAVI6AIqnIkrY80PEn7UpiKEVAEVTmS1kcanqR9KUzFCCiCqhxJ6yMNT9K+FKZiBBRBVY6k9ZGGJ2lfClMxAoqgKkfS+kjDk7QvhakYAUVQlSNpfaThSdqXwlSMgCKoypG0PtLwJO1LYSpGQBFU5UhaH2l4kvalMBUjoAiqciStjzQ8SftSmIoRUARVOZLWRxqepH0pTMUIKIKqHEnrIw1P0r4UpmIEFEFVjqT1kYYnaV8KUzECiqAqR9L6SMOTtC+FqRgBRVCVI2l9pOFJ2pfCVIyAIqjKkbQ+0vAk7UthKkZAEVTlSFofaXiS9qUwFSOgCKpyJK2PNDxJ+1KYihFQBFU5ktZHGp6kfSlMxQgogqocSesjDU/SvhSmYgQUQVWOpPWRhidpXwpTMQKKoCpH0vpIw5O0L4WpGAFFUJUjaX2k4Unal8JUjIAiqMqRtD7S8CTtS2EqRkARVOVIWh9peJL2pTAVI6AIqnIkrY80PEn7UpiKEVAEVTmS1kcanqR9KUzFCCiCqhxJ6yMNT9K+FKZiBBRBVY6k9ZGGJ2lfClMxAoqgKkfS+kjDk7QvhakYAUVQlSNpfaThSdqXwlSMgCKoypG0PtLwJO1LYSpGQBFU5UhaH2l4kvalMBUjoAiqciStjzQ8SftSmIoRUARVOZLWRxqepH0pTMUIKIKqHEnrIw1P0r4UpmIEFEFVjqT1kYYnaV8KUzECiqAqR9L6SMOTtC+FqRgBRVCVI2l9pOFJ2pfCVIyAIqjKkbQ+0vAk7UthKkZAEVTlSFofaXiS9qUwFSOgCKpyJK2PNDxJ+1KYihFQBFU5ktZHGp6kfSlMxQgogqocSesjDU/SvhSmYgQUQVWOpPWRhidpXwpTMQKKoCpH0vpIw5O0L4WpGAFFUJUjaX2k4Unal8JUjIAiqMqRtD7S8CTtS2EqRkARVOVIWh9peJL2pTAVI6AIqnIkrY80PEn7UpiKEVAEVTmS1kcanqR9KUzFCCiCqhxJ6yMNT9K+FKZiBBRBVY6k9ZGGJ2lfClMxAoqgKkfS+kjDk7QvhakYAUVQlSNpfaThSdqXwlSMgCKoypG0PtLwJO1LYSpGQBFU5UhaH2l4kvalMBUjoAiqciStjzQ8SftSmIp5BPTxlb3p9N3rBBRKlSNpfaThSdqXwj+gjy5Ol175goBCqHIkrY80PEn7UvgH9Nr0/PX5g8vT87cIKHQqR9L6SMOTtC+Fe0Dv75XHno8unvuEgEKnciStjzQ8SftSuAf05vS19Y/vE1DoVI6k9ZGGJ2lfCveAXpt+WH68sw4pAYVE5UhaH2l4kval8A7o48vrT93v722+CPr8iv7van2k4alyJK2PNDxJ+/I0qQIKAJ48A2peyKR/dP3dxD2JToxEpWFAzeuYWt8TWXBPohMjUSGg2XBPohMjUfEOqOez8N9N3JPoxEhU3AO6ef2nw+tAv5u4J9GJkai4B9TxnUjfTdyT6MRIVNwD+vjy9FWn98J/N3FPohMjUXEP6PyB29WYvpu4J9GJkaj4B3T+4Mqin+/esr/c+p7IgnsSnRiJSoOAHqH1PZEF9yQ6MRIVUzECGh73JDoxEhVTMQIaHvckOjESFVMxAhoe9yQ6MRIVUzECGh73JDoxEhVTMQIaHvckOjESFVMxAhoe9yQ6MRIVUzECGh73JDoxEhVTMQIaHvckOjESFVMxAhoe9yQ6MRIVUzECGh73JDoxEhVTMQIaHvckOjESFVMxAhoe9yQ6MRIVUzECGh73JDoxEhVTMQIaHvckOjESFVMxAhoe9yQ6MRIVUzECGh73JDoxEhVTMQIaHvckOjESFVMxAhoe9yQ6MRIVUzECGh73JDoxEhVTMQIaHvckOjESFVMxAhoe9yQ6MRIVUzECGh73JDoxEhVTMQIaHvckOjESFVMxAhoe9yQ6MRIVUzECGh73JDoxEhVTMQIaHvckOjESFVOxhgGFxvPPt/43wOgxkoEQ0PA4G+jESAZCQMPjbKATIxkIAQ2Ps4FOjGQgBDQ8zgY6MZKBENDwOBvoxEgGQkDD42ygEyMZCAEFgEoEFAAqEVAAqERAAaASAQWASgQUACoRUACoREABoBIBDeHRxen7+z995Yum/y4Yk8eXp+dv7f/0w7b/Mt9BBDSERUDPfbL5KQHFgft7m/+23tlPKdwQ0BAWAZ2+tvkpAcWWm9PVIB5d3Pw3Fn4IaAiLw/E368/PCCgO2Xx55+bmP7FwREBDWFTzf+xtHmisfnxwZTqdvnu96b8WxuBO+fLO/fU+FsPYm05/en31858tRvLv/7bhv1x2BDSEZTXXjzDWAb2zOCUL53ja4Dvv8eXlMq6tP0O5vzWM9c95aDocAhrCsprrJ1lXAV0cjXf/9/zxv0z5uhfu75375P7e6hmkxSf0792aP/7X5RdGF4v5D4tf/Lc9RjIYAhpCqebqk7RVQDdf8LrGowssVnD+v6wjuRnGzen7PK3kgICGsKpmqWX56f5L/njpCrZfpPH48rqZy0eki5W8+j9b/nt9BxDQEFYBLY8oyk/3H1vwnDzmy/+OrmewaObG4lduLn989b/yn9jhENAQNs8cLR5vrgO6PjAEFPPV483yk+Vj0YOAzv/8N+Wn75HQoRDQEDadvDZ9n0egeMJWQM2XPR//9+Urmd5/2j8EAQIawqaTi/Px3/gaKKz9gD7t/fCP/5WRDIaAhrD/QPPO9K/2eBYexn5AF8NY/Wz5X9bNa+sPfhdqBDSEg8/Ur62+uLV6HehfrvA6UMy3E/no4vT89fn8z3uLR6LLKzUtfv7gMv+VHQwBDeEgoIty8k4kGFuPMdfDmL43P3gn0qt8nXwoBDSEreeKNhff4b3w2Lf9SfrqvfD/ePDzv/qPfAI/GAIKAJUIKABUIqAAUImAAkAlAgoAlQgoAFQioABQiYACQCUCCgCVCCgAVCKgAFCJgAJAJQIKAJUIKABUIqAAUImAAkAlAgoAlQgoAFQioABQiYACQCUCCgCVCCgAVCKgAFCJgAJAJQIKAJUIKABUIqAAUImAAkAlAgoAlQgoAFQioABQiYACQCUCCgCVCCgAVCKgAFCJgAJAJQIKAJUIKABUIqAAUImAAkAlAgoAlQgoAFQioABQiYACQCUCCgCVCCgAVCKgAFCJgAJAJQIKAJUIKABUIqAAUOn/A71FEGOQyBlxAAAAAElFTkSuQmCC">
             <a:extLst>
               <a:ext uri="{FF2B5EF4-FFF2-40B4-BE49-F238E27FC236}">
-                <a16:creationId xmlns="" xmlns:a16="http://schemas.microsoft.com/office/drawing/2014/main" id="{8CC047BC-7FEC-4EB1-BCEA-02FB6A9AD576}"/>
+                <a16:creationId xmlns:a16="http://schemas.microsoft.com/office/drawing/2014/main" id="{8CC047BC-7FEC-4EB1-BCEA-02FB6A9AD576}"/>
               </a:ext>
             </a:extLst>
           </p:cNvPr>
@@ -5978,7 +5974,7 @@
           <p:cNvPr id="5" name="AutoShape 2" descr="data:image/png;base64,iVBORw0KGgoAAAANSUhEUgAABUAAAAPACAMAAADDuCPrAAABYlBMVEUAAAAAADoAAGYAOjoAOmYAOpAAZrYzMzM6AAA6OgA6Ojo6OmY6ZmY6ZpA6ZrY6kLY6kNtNTU1NTW5NTY5Nbm5Nbo5NbqtNjshmAABmADpmOgBmOjpmZjpmZmZmZpBmkGZmkLZmkNtmtttmtv9uTU1ubk1ubm5ubo5ujqtujshuq8huq+SOTU2Obk2Obm6Oq8iOyOSOyP+QOgCQOjqQZjqQZmaQZpCQkGaQkLaQtraQttuQ2/+rbk2rjk2rjm6rq8iryOSr5Mir5P+2ZgC2Zjq2kDq2kGa2kJC2tpC2tra2ttu229u22/+2///Ijk3Ijm7Iq27Iq6vIyKvI5KvI5OTI5P/I///bkDrbkGbbtmbbtpDbtrbb27bb29vb2//b/7bb///kq27kyI7kyKvk5P/k///r6+v8jVn/tmb/yI7/25D/27b/29v/5Kv/5Mj/5OT//7b//7///8j//9v//+T///+zjZs9AAAACXBIWXMAAB2HAAAdhwGP5fFlAAAgAElEQVR4nO3d/59b5ZnecU0wMDGEILMYh0CWwmwDxaSLN3S7xHW3mGQXkni3aY0TEijO1q2/YMe1rP+/0iNpRnPbM+fMM9e5n3PffN4/xB472Eiv6/mgGUlnJnMAQJVJ638BAIiKgAJAJQIKAJUIKABUIqAAUImAAkAlAgoAlQgoAFQioABQiYACQCUCCgCVCCgAVCKgAFCJgAJAJQIKAJVGENDZl298fzKZ7Lzw8Ten/rNuT570zvzhhcnOLwT/pgCwrXlAZ7/aPWjdS6dNKAEF4Kd1QO+9fih2p+0cAQXgp3FA7y4ffu689dXip9/+6vuCgh78ud/7reRPAoCjtA3o4qHh1ufts1/KCkpAAQyvbUCvLor59tbHy8/An1P8wQQUwPCaBnT5CfzLh37lRvmapeRPJqAABtY0oItcmswtP6d/rvzGwQPRq5vK3vv5Irg7P/jNwT/9zuzT3cnOC09+1n84oJsnka4ufyh/ygsfL3/9yx8vev3Cr/f/f+YvAIBjtQzo7NKTn7Cvmroo3n7/NvWbfWpe7LQM6NUjnro/OqA31n/Iywd/4PpB8BN/AQAcq2VAlw837efrt1c9vHrwO4tfefabVW03VtVdpPBs+fDZJ3t3ZED/fv8Pefvq4ddOPfkXAMCxWgZ0UbknHjyuo3r7IGLrli4fOb709Xz+7aebx4zlseQPv5l/+/VT/+inBnRh+Rn6l4tP1Z+Z7Lz9zeqZ/+fmT/0LAOBYLQN6+ymffS8D+vJ866Xv68/mtx6t3l5/5fTGMaE7OqAvb/6MzV9wdfUQ9il/AQAca6QBXdZxlbr180nbTysdPCY98kWjRwZ0/aubv2a+/yWCp/wFAHCssQZ0UcDypc3lVyaXMdtu2u39xj7lq58rRwb0uYO/5p1D/9en/AUAcKyRfg10Gc7ye+uQbj/Ds3mW58YxT/YcGdCXD//K/v/1aX8BABxrbM/C70f19qFP5W3f7Cfd1qkDeuRjWwDYGOfrQOclcYuIbR6IElAA4zPOdyItlbcNbV7OtPlSqPmntQHliSMAJ9I0oFu5XNt6L3z5HH7/qZ2rTz6vIw3o0/4CADhW26sx2Zdy3t765HnxmPDZ/7X/ls7tp9xv7H95VBjQp/wFAHCstgEtX3k8eOf5jcn2C5tulDderku2deGmzfNM2oA+5S8AgGM1viL9veUVlQ9dkf7gC5Grq9VvSrZ8F9GZX6+/h9LmvZfCgD7lLwCAY435eyJd3X42fPtp8lUbxQF98i8AgGO1Duih78q5c/g6crcn28+Mz36++b+dWV2wUxzQJ/8CADhW84AufPnz5Sfvz7xovy/89lVBl/60vN7x+lrIc31An/gLAOBYYwgoAIREQAGgEgEFgEoEFAAqEVAAqERAAaASAQWASgQUACoRUACoREABoBIBBYBKBBQAKhFQAKhEQAGgEgEFgEoEFAAqEVAAqNQwoP8HEtyT6MRIVEzFCGh43JPoxEhUTMUIaHjck+jESFRMxQhoeNyT6MRIVEzFCGh43JPoxEhUTMUIaHjck+jESFRMxQhoeNyT6MRIVEzFCGh43JPoxEhUTMUIaHjck+jESFRMxQhoeNyT6MRIVEzFCGh43JPoxEhUTMUIaHjck+jESFRMxQhoeNyT6MRIVEzFCGh43JPoxEhUTMUIaHjck+jESFRMxQhoeNyT6MRIVEzFCGh43JPoxEhUTMUIaHjck+jESFRMxQhoeNyT6MRIVEzFCGh43JPoxEhUTMUIaHjck+jESFRMxQhoeNyT6MRIVEzFCGh43JPoxEhUTMUIaHjck+jESFRMxQhoeNyT6MRIVEzFCGh43JPoxEhUTMUIaHjck+jESFRMxQhoeNyT6MRIVEzFCGh43JPoxEhUTMUIaHjck+jESFRMxQhoeNyT6MRIVEzFCGh43JPoxEhUTMUIaHjck+jESFRMxQhoeNyT6MRIVEzFCGh43JPoxEhUTMUIaHjck+jESFRMxQhoeNyT6MRIVEzFUgX0/+I7RL+fxAioiqkYAUVQ+v0kRkBVTMUIKILS7ycxAqpiKkZAEZR+P4kRUBVTMQKKoPT7SYyAqpiKEVAEpd9PYgRUxVSMgCIo/X4SI6AqpmIEFEHp95MYAVUxFSOgCEq/n8QIqIqpGAFFUPr9JEZAVUzFCCiC0u8nMQKqYipGQBGUfj+JEVAVUzECiqD0+0mMgKqYihFQBKXfT2IEVMVUjIAiKP1+EiOgKqZiBBRB6feTGAFVMRUjoAhKv5/ECKiKqRgBRVD6/SRGQFVMxQgogtLvJzECqmIqRkARlH4/iRFQFVMxAoqg9PtJjICqmIoRUASl309iBFTFVIyAIij9fhIjoCqmYgQUQen3kxgBVTEVI6AISr+fxAioiqkYAUVQ+v0kRkBVTMUIKILS7ycxAqpiKkZAEZR+P4kRUBVTMQKKoPT7SYyAqpiKEVAEpd9PYgRUxVSMgCIo/X4SI6AqpmKnDeiji6+tf/b4yt50+u71rg8IKDT0+0mMgKqIA3pt+tqmpNOlV744/gMCChH9fhIjoCrSgD6+Nt0E9Nr0/PX5g8vT87eO/YCAQkS/n8QIqIoyoP/2wXQT0Pt75RHmo4vnPjnuAwIKFf1+EiOgKsKA3pxO3/vzOqA39398/7gPCChU9PtJjICqKAP66j/O76zzeG36YfmxfHz0BwQUKvr9JEZAVYQB3cri48vrT9Dv752/dfQHq3/m+ZVT/s1P0fpIw5N+P8BJEVAEpd8PcFL6gL7yxdEfHPpH9Y+uWx9peNLvJzE+hVcZPKDdj0AJKAT0+0mMgKoQUOSg309iBFRlmIDyLDy86feTGAFVGSigm1d5rl/6edQHBBQq+v0kRkBVBgoo70SCM/1+EiOgKgMF9PHl6av773g/+gMCChX9fhIjoCoDBXT+YPuaS0d/QEAhot9PYgRUZaiAzh9cWVTy3VtdHxBQaOj3kxgBVREH9BT0t631kYYn/X4SI6AqpmIEFEHp95MYAVUxFSOgCEq/n8QIqIqpGAFFUPr9JEZAVUzFCCiC0u8nMQKqYipGQBGUfj+JEVAVUzECiqD0+0mMgKqYihFQBKXfT2IEVMVUjIAiKP1+EiOgKqZiBBRB6feTGAFVMRUjoAhKv5/ECKiKqRgBRVD6/SRGQFVMxQgogtLvJzECqmIqRkARlH4/iRFQFVMxAoqg9PtJjICqmIoRUASl309iBFTFVIyAIij9fhIjoCqmYgQUQen3kxgBVTEVI6AISr+fxAioiqkYAUVQ+v0kRkBVTMUIKILS7ycxAqpiKkZAEZR+P4kRUBVTMQKKoPT7SYyAqpiKEVAEpd9PYgRUxVSMgCIo/X4SI6AqpmIEFEHp95MYAVUxFSOgCEq/n8QIqIqpGAFFUPr9JEZAVUzFCCiC0u8nMQKqYipGQBGUfj+JEVAVUzECiqD0+0mMgKqYihFQBKXfT2IEVMVUjIAiKP1+EiOgKqZiBBRB6feTGAFVMRUjoAhKv5/ECKiKqRgBRVD6/SRGQFVMxQgogtLvJzECqmIqRkARlH4/iRFQFVMxAoqg9PtJjICqmIoRUASl309iBFTFVIyAIij9fhIjoCqmYgQUQen3kxgBVTEVI6AISr+fxAioiqkYAUVQ+v0kRkBVTMUIKILS7ycxAqpiKkZAEZR+P4kRUBVTMQKKoPT7SYyAqpiKEVAEpd9PYgRUxVSMgCIo/X4SI6AqpmIEFEHp95MYAVUxFSOgCEq/n8QIqIqpGAFFUPr9JEZAVUzFCCiC0u8nMQKqYipGQBGUfj+JEVAVUzECiqD0+0mMgKqYihFQBKXfT2IEVMVUjIAiKP1+EiOgKqZiBBRB6feTGAFVMRUjoAhKv5/ECKiKqRgBRVD6/SRGQFVMxQgogtLvJzECqmIqRkARlH4/iRFQFVMxAoqg9PtJjICqmIoRUASl309iBFTFVIyAIij9fhIjoCqmYgQUQen3kxgBVTEVI6AISr+fxAioiqkYAUVQ+v0kRkBVTMUIKILS7ycxAqpiKkZAEZR+P4kRUBVTMQKKoPT7SYyAqpiKEVAEpd9PYgRUxVSMgCIo/X4SI6AqpmIEFEHp95MYAVUxFSOgCEq/n8QIqIqpGAFFUPr9JEZAVUzFCCiC0u8nMQKqYipGQBGUfj+JEVAVU7GGAdVrfaThqfXaAB6BIiz9fhLjEaiKqRgBRVD6/SRGQFVMxQgogtLvJzECqmIqRkARlH4/iRFQFVMxAoqg9PtJjICqmIoRUASl309iBFTFVIyAIij9fhIjoCqmYgQUQen3kxgBVTEVI6AISr+fxAioiqkYAUVQ+v0kRkBVTMUIKILS7ycxAqpiKkZAEZR+P4kRUBVTMQKKoPT7SYyAqpiKEVAEpd9PYgRUxVSMgCIo/X4SI6AqpmIEFEHp95MYAVUxFSOgCEq/n8QIqIqpGAFFUPr9JEZAVUzFCCiC0u8nMQKqYipGQBGUfj+JEVAVUzECiqD0+0mMgKqYihFQBKXfT2IEVMVUjIAiKP1+EiOgKqZiBBRB6feTGAFVMRUjoAhKv5/ECKiKqRgBRVD6/SRGQFVMxQgogtLvJzECqmIqRkARlH4/iRFQFVMxAoqg9PtJjICqmIoRUASl309iBFTFVIyAIij9fhIjoCqmYgQUQen3kxgBVTEVI6AISr+fxAioiqkYAUVQ+v0kRkBVTMUIKILS7ycxAqpiKkZAEZR+P4kRUBVTMQKKoPT7SYyAqpiKEVAEpd9PYgRUxVSMgCIo/X4SI6AqpmIEFEHp95MYAVUxFSOgCEq/n8QIqIqpGAFFUPr9JEZAVUzFCCiC0u8nMQKqYipGQBGUfj+JEVAVUzECiqD0+0mMgKqYihFQBKXfT2IEVMVUjIAiKP1+EiOgKqZiBBRB6feTGAFVMRUjoAhKv5/ECKiKqRgBRVD6/SRGQFVMxQgogtLvJzECqmIqRkARlH4/iRFQFVMxAoqg9PtJjICqmIoRUASl309iBFTFVIyAIij9fhIjoCqmYgQUQen3kxgBVTEVI6AISr+fxAioiqkYAUVQ+v0kRkBVTMUIKILS7ycxAqpiKkZAEZR+P4kRUBVTMQKKoPT7SYyAqpiKEVAEpd9PYgRUxVSMgCIo/X4SI6AqpmIEFEHp95MYAVUxFSOgCEq/n8QIqIqpGAFFUPr9JEZAVUzFCCiC0u8nMQKqYipGQBGUfj+JEVAVUzECiqD0+0mMgKqYihFQBKXfT2IEVMVUjIAiKP1+EiOgKqZiBBRB6feTGAFVMRUjoAhKv5/ECKiKqRgBRVD6/SRGQFVMxQgogtLvJzECqmIqRkARlH4/iRFQFVMxAoqg9PtJjICqmIoRUASl309iBFTFVIyAIij9fhIjoCqmYgQUQen3kxgBVTEVI6AISr+fxAioiqmYKKCPL083XvliPn908eDni9+8sjedvnudgEJJv5/ECKiKS0Dv720FdF3TVUwJKET0+0mMgKoME9CN+3vnPln8cGf62sGvXZuevz5/cHl6/hYBhY5+P4kRUJVBA7p4IPr+qpnvbzV1/Ti0pJWAQkS/n8QIqMqgAb25epj5+PJWLG+uH43e3IoqAcWp6feTGAFVGTKgjy5OP1z9eP53H0ynP72+/ODa6tcOf1pPQHFa+v0kRkBVhgzo5sHm5jmkZTr3H43e39t8EfT5FeXfvNL6SMOTfj/ASSkDuv9lzjvT6Xu35n+5Ml18TEAxDP1+gJNSBvTO5on2zSPR5XNJWwE1L2TSP7pufaThSb+fxPgUXmW4gD6+vP5q56GiPuURKAGFgH4/iRFQleEC+sRDzPIrBBTD0O8nMQKqMlxAn3iafdVMnoXHIPT7SYyAqgwX0P1Xz+9/Ll+auXn9J68DhZR+P4kRUJXBArr16vlrqwebq5DyTiQMQr+fxAioymABfXRx/0ug9/eWL2N68EF5Vn6R0Vd5Lzzk9PtJjICqDBbQ7SeJbq4vxnR9+cEDrsaEAej3kxgBVRksoHe2H2I++Nl0eu699ccPriz6+e4t+w/ob1vrIw1P+v0kRkBVBgvoielvW+sjDU/6/SRGQFVMxQgogtLvJzECqmIqRkARlH4/iRFQFVMxAoqg9PtJjICqmIoRUASl309iBFTFVKwjoLM/fvY5AcUY6feTGAFV6RvQe//pm/n84euTyeTMLwgoxke/n8QIqErPgN6YfO+38/nVydLyZwQUI6PfT2IEVKVfQG+XbN7dnTz7zb0Lk5cJKEZHv5/ECKhKv4BeXZRzmdGdXyz/d/lzAopx0e8nMQKq0iugs0vLcq4z+vDCMJ/D629b6yMNT/r9JEZAVXoFdNXMhxcmz80JKMZJv5/ECKjKCQJ6d3fyDgHFSOn3kxgBVekV0NWn8DfKl0D5GihGSb+fxAioSq+Azq9Onls+/b4sJ8/CY5T0+0mMgKr0C+jt8gLQxWfws59PVo9DCSjGRb+fxAioSr+ALj59X3iuPJG0884g/SSgOBX9fhIjoCo9Azq/99FPPl788PBHP/jNMP0koDgV/X4SI6AqfQM6PP1ta32k4Um/n8QIqIqp2LEBnX09YD8JKE5Fv5/ECKiKqdjRAf3yx8v3wz/80VuDvIaJgOKU9PtJjICq9Azo7NPVdZgeXpicGeZiTAQUp6LfT2IEVKVnQK9OJmf+evd7v5393WSg19ETUJyKfj+JEVCVfgG9PZm8vX4P5x9Wb+gkoBgX/X4SI6Aq/QJ6dfnuo/Wb4G+US4oQUIyLfj+JEVCVXgFdvRd+HdC7u1xMBOOj309iBFSlV0A3l7Mr5eRqTBgj/X4SI6AqBBQ56PeTGAFV6RXQ2aXlE0frcnI5O4yRfj+JEVCVXgFdPXG0CugipjyJhPHR7ycxAqrSL6B3dycvfVMCeu91LmeHMdLvJzECqtIvoOVydmd3d178/uLHYa6nTEBxKvr9JEZAVXoGdP773cnaQP0koDgV/X4SI6AqfQM6//ZXZxf1fGawy4ESUJyKfj+JEVCV3gEdnP62tT7S8KTfT2IEVMVUjOuBIij9fhIjoCqmYlwPFEHp95MYAVXpGVCuB4qR0+8nMQKq0jOgXA8UI6ffT2IEVKVfQLkeKMZOv5/ECKhKv4ByPVCMnX4/iRFQlV4B5XqgGD39fhIjoCq9Asrl7DB6+v0kRkBVCChy0O8nMQKq0iugXA8Uo6ffT2IEVKVXQLkeKEZPv5/ECKhKv4ByPVCMnX4/iRFQlX4B5XqgGDv9fhIjoCo9A8r1QDFy+v0kRkBV+gaU64Fi3PT7SYyAqvQO6OD0t631kYYn/X4SI6AqpmIEFEHp95MYAVUxFTvihfQ/emnQaykTUJyafj+JEVCVfgG9MJk8M9iVlAkoBPT7SYyAqvQK6OpyypMzHw/ZUP1ta32k4Um/n8QIqEqvgC786celoS98TEAxSvr9JEZAVfoGdL76rkgLQ72QSX/bWh9peNLvJzECqnKCgC4+lf/y9WVCd94a4ikl/W1rfaThSb+fxAioyokCuvDtz8tbkl7QPwzV37bWRxqe9PtJjICqnCigs199f/OGzslLBBRjot9PYgRUpX9AN/VcPhf/7af698Trb1vrIw1P+v0kRkBVegZ0/dXPg1eD6i+rrL9trY80POn3kxgBVekV0NmliX3ySP+NPfS3rfWRhif9fhIjoCq9Arp8J9LO4ZcvPbzAI1CMiX4/iRFQlZ4B/cGvzS/NPle/lEl/21ofaXjS7ycxAqrSK6Au9Let9ZGGJ/1+EiOgKqZiBBRB6feTGAFVMRXruCL9ztlB3oREQHFq+v0kRkBV+gb0xv4r6PmeSBgj/X4SI6AqPQO67OczL775Bt+VEyOl309iBFSlX0Dv7k6eXb2K6d4lvi88xki/n8QIqEq/gF49eN/R7NLkOQKK0dHvJzECqtIroLNLW4867+6qX0JPQHF6+v0kRkBVegX00Ps29W/iJKA4Pf1+EiOgKgQUOej3kxgBVekV0NmlyTv7H+ivw0RAcXr6/SRGQFV6BZQnkTB6+v0kRkBV+gX07u7kzOpyIn96nZcxYYz0+0mMgKr0C+jqjUhnz54d8q1Icq2PNDy1XhtwzFs5/7C7fifnztsD/dX6/zi0PtLwpN9PYjwCVekb0PnsyzcWj0Bf/HiQJ5AIKE5Lv5/ECKhK74AOTn/bWh9peNLvJzECqmIqRkARlH4/iRFQFVMxG9DZR28+6Se8DhSjo99PYgRUpSOgy28n9wTeiYTx0e8nMQKqQkCRg34/iRFQlY6AOtLfttZHGp70+0mMgKqYihFQBKXfT2IEVMVU7PiAfjVcPgkoTke/n8QIqIqp2NEB/fLH5X1IP/gNAcUY6feTGAFV6RnQ2aX9p5BeGui9SPrb1vpIw5N+P4kRUJV+AV32c+fFf/jsn97YnQx0NTsCilPR7ycxAqrSL6A3JpMfrh54zn452bq4MgHFWOj3kxgBVekV0MUD0INr2F3lgsoYIf1+EiOgKr0C+vDCoe/KyQvpMT76/SRGQFV6BpRvKoeR0+8nMQKq0iugfF94jJ5+P4kRUJVeAZ3f2Pq65w2+BooR0u8nMQKq0i+gs0v7L/+8MdC1RAgoTkW/n8QIqEqvgM4+Wr7+88W3Pvvn5Y8vDHNVUP1ta32k4Um/n8QIqEqvgLpc1E5/21ofaXjS7ycxAqpCQJGDfj+JEVCVXgF1ob9trY80POn3kxgBVTEVI6AISr+fxAioiqkYAUVQ+v0kRkBVTMWODugfP9v3OS+kx+jo95MYAVXpGdDf7/JN5TBq+v0kRkBV+gX0Nt+VEyOn309iBFSlV0BnlyY7H3+17+sh+klAcSr6/SRGQFV6BfThhYEuokxAoaLfT2IEVKVnQAd6/zsBhYp+P4kRUJVeAZ1dIqAYOf1+EiOgKr0COr/Bp/AYOf1+EiOgKv0Ceuh7ehBQjJB+P4kRUJV+AZ3fuzA58+aG+kJ2BBSnp99PYgRUpWdAP+V1oBg3/X4SI6Aq/QJ6gxfSY+T0+0mMgKr0Cmh5If0gn7cTUIjo95MYAVXpFVCP55AIKE5Fv5/ECKhKz4DyOlCMnH4/iRFQlV4B5YX0GD39fhIjoCq9Ajq/MXmZgGLU9PtJjICq9Avo7NLO2wQUY6bfT2IEVKVXQGcfvTGZ7LzIC+kxXvr9JEZAVXoF1HxbY14HivHR7ycxAqpCQJGDfj+JEVCVXgF1ob9trY80POn3kxgBVTEVI6AISr+fxAioiqkYAUVQ+v0kRkBVTMVsQGd/tN8F/uGPz77A10AxOvr9JEZAVToC+vDC6imj2UebFy9tfoWAYlT0+0mMgKr0DOhBNgkoRkm/n8QIqAoBRQ76/SRGQFUIKHLQ7ycxAqpCQJGDfj+JEVAVAooc9PtJjICqEFDkoN9PYgRUhYAiB/1+EiOgKgQUOej3kxgBVSGgyEG/n8QIqAoBRQ76/SRGQFUIKHLQ7ycxAqrSHdAnEVCMj34/iRFQFQKKHPT7SYyAqnQEdPbRm0/im8phfPT7SYyAqnQE1JH+trU+0vCk309iBFTFVIyAIij9fhIjoCqmYgQUQen3kxgBVTEVI6AISr+fxAioiqkYAUVQ+v0kRkBVTMUIKILS7ycxAqpiKkZAEZR+P4kRUBVTMQKKoPT7SYyAqpiKEVAEpd9PYgRUxVTsiXciXdr5xeKHb78moBg3/X4SI6AqHQF9eGH5xvfV/xJQjJh+P4kRUJXOgC4fgRJQjJ5+P4kRUJWOgM4uTZ79/Ks/Xfjer786MMzn8/rb1vpIw5N+P4kRUJWOgM5vcDk7hKDfT2IEVKUroLNP6wL66OK0eOWL5UePr+xNp+9eX/3WoQ8IKDT0+0mMgKp0BXSR0K8+++fdnX/47MDnPa4Hen9vK6Drmq5ieugDAgoR/X4SI6Aq3QGdVz2JdGf62sEH16bnr88fXJ6ev2U/IKAQ0e8nMQKq0iugs49OfBH6a9P3939+f2/9OPTcJ+YDAgoV/X4SI6AqvQJ6co8vb/Xx5vrR6M1lVA99QEChot9PYgRUpXdAv/3V2clk5+xb/V7D9Oji+d99MJ3+9Pryg2vTD8svlk/rD31AQKGi309iBFSlb0APXs70cp+Abp5DWtZy/9Ho/b3ztw59sPr/Pr/S5489mdZHGp70+wFO6qiALvv5zItvvvH9ngW9M52+d2v+lyvTRS4JKBzo9wOc1BEBvbs7efY35Wf3Lk3K5UU6bL7SuXwuaauZr3xx6IND/4j+0XXrIw1P+v0kxqfwKv0CenXy7OZp+NmlyXPdAd24MzUPOp/yCJSAQkC/n8QIqEqvgK4vardyd/fZ/q9pMg86CSiGot9PYgRUpVdAD72Q/kSvqi+Z5Fl4DE+/n8QIqMowAX18eTuTm5d8rl8HuvUBAYWKfj+JEVCVXgGdXZq8s//B7UmPT+GvrR5frkLKO5EwPP1+EiOgKr0CevInke7vLV/G9OCD8o73RUZf3X/7+6EPCChU9PtJjICq9Avo3d3JmV+Xn/3p9V4vY1p8hr665tL15QcPti/A9ICrMWEA+v0kRkBV+gV09Uaks2fP9n4r0vzBz6bTc++tH2U+uLJI5rtP+4CAQkO/n8QIqErPgM7/sLt+J+fO2736eXL629b6SMOTfj+JEVCVvgGdz758Y/EI9MWPT3pdOwIKF/r9JEZAVXoHdHD629b6SMOTfj+JEVAVUzECiqD0+0mMgKqYihFQBKXfT2IEVMVUjIAiKP1+EiOgKqZiBBRB6feTGAFVMRUjoAhKv5/ECKiKqRgBRVD6/SRGQFVMxQgogtLvJzECqmIqRkARlH4/iRFQFVOxo67G9IPfEFCMmn4/iRFQlV4BfXhh63qgBBRjpN9PYgRUpWdAT/BdPAgoWtDvJzECqtIroIe+qRwBxRjp95MYAVXpFdD5jc23hSegGCn9fhIjoCr9AvrtLyeTZ158c+0ng1zSTn/bWh9peJuln3QAABwGSURBVNLvJzECqtIroA8vTLYN8wVR/W1rfaThSb+fxAioCgFFDvr9JEZAVXoF1IX+trU+0vCk309iBFTFVIyAIij9fhIjoCqmYscGdPb1gP0koDgV/X4SI6AqpmJHB/TLHy+/+PnwR28N9V3l9Let9ZGGJ/1+EiOgKj0DOvt09ezRwwuTMwO9KUl/21ofaXjS7ycxAqrSM6BXJ5Mzf737vd/O/m4yeXaYx6D629b6SMOTfj+JEVCVfgG9PZm8vX5H/B92B7qwiP62tT7S8KTfT2IEVKVfQK9OXt6/pMiNyXMEFKOj309iBFSlV0BXFxNZB/TuLi+kx/jo95MYAVXpFdBVOtcBHeradvrb1vpIw5N+P4kRUBUCihz0+0mMgKr0Cujs0vKJo3U5bw/0NLz+trU+0vCk309iBFSlV0BXTxytArqIKU8iYXz0+0mMgKr0C+jd3clL35SA3nt9MtDV6fW3rfWRhif9fhIjoCr9Arp4CDqZnN3defH7ix9fHqSfBBSnot9PYgRUpWdA57/f3VwNdKB+ElCcin4/iRFQlb4BnX/7q7OLej4z3DeI19+21kcanvT7SYyAqvQO6OD0t631kYYn/X4SI6AqpmLHXw/0qwH7SUBxKvr9JEZAVUzFjr8e6AKfwmOc9PtJjICq9Azo7NL+t5R7aaArKutvW+sjDU/6/SRGQFX6BXTZz50X//Nn//TGoqDDvI6egOJU9PtJjICq9Avo7f1XL81+OeF6oBgh/X4SI6AqvQK6eAB68OrPq7yVEyOk309iBFSlV0AfXth6+ybXA8UY6feTGAFV6RnQrWZyOTuMkX4/iRFQlV4BXV2Rfu3uLpezw/jo95MYAVXpFdBD3wfpxkDvhtffttZHGp70+0mMgKr0C+jDC5MffrPp5zCfwRNQnIp+P4kRUJWOgM4+erN4Y/U60H9+c3cyefEnfAqP0dHvJzECqtIR0MVDzyfxJBLGR7+fxAioCgFFDpUj+X/4DpH2pegIqCP9bWt9pOGpciStjzQ8SftSmIoRUARVOZLWRxqepH0pTMUIKIKqHEnrIw1P0r4UpmJHB/SPn+37nGfhMTqVI2l9pOFJ2peiZ0APvqccTyJhlCpH0vpIw5O0L0W/gN7mWXiMXOVIWh9peJL2pegV0Nmlyc7HX+37eoh+ElCcSuVIWh9peJL2pegV0IcXBrqIMgGFSuVIWh9peJL2pegZ0IHe/05AoVI5ktZHGp6kfSl6BXR2iYBi5CpH0vpIw5O0L0WvgM5v8Ck8Rq5yJK2PNDxJ+1L0C+ih7+lBQDFClSNpfaThSdqXol9A5/cuTM68ucHl7DA+lSNpfaThSdqXomdAP+V1oBi3ypG0PtLwJO1L0S+gN3ghPUauciStjzQ8SftS9ApoeSH9IJ+3E1CIVI6k9ZGGJ2lfil4B9XgOiYDiVCpH0vpIw5O0L0XPgPI6UIxc5UhaH2l4kval6BVQXkiP0ascSesjDU/SvhS9AjrY94InoFCpHEnrIw1P0r4U/QI6u7TzNgHFmFWOpPWRhidpX4peAZ19VL4vPC+kx3hVjqT1kYYnaV+KXgE139yY14FifCpH0vpIw5O0LwUBRQ6VI2l9pOFJ2peiV0Bd6G9b6yMNT5UjaX2k4Unal8JUjIAiqMqRtD7S8CTtS2EqRkARVOVIWh9peJL2pTAVOyKg3361jW8qh/GpHEnrIw1P0r4UvQLq8iSSXusjDU+VI2l9pOFJ2pen4Vl4BFU5ktZHGp6kfSl6BXT2x8/W/v71yc4/fM4L6TE6lSNpfaThSdqXoldAt93dfXaYK4Pqb1vrIw1PlSNpfaThSdqX4sQBHezCIvrb1vpIw1PlSFofaXiS9qU4eUCHegiqv22tjzQ8VY6k9ZGGJ2lfipMHdKirK+tvW+sjDU+VI2l9pOFJ2pfi5AG9u0tAMT6VI2l9pOFJ2pfixAGdXZ3wKTzGp3IkrY80PEn7UvQK6OyjzaVA33xjd8KTSBihypG0PtLwJO1L0Sugh19Iz8uYMEKVI2l9pOFJ2pfixAF95q2BvkG8/ra1PtLwVDmS1kcanqR9KXoF1IX+trU+0vBUOZLWRxqepH0pTMUIKIKqHEnrIw1P0r4UpmIEFEFVjqT1kYYnaV8KUzECiqAqR9L6SMOTtC+FqZgN6NYLmA7wbY0xPpUjaX2k4Unal6IjoOZKoFwPFGNVOZLWRxqepH0pCChyqBxJ6yMNT9K+FB0Btb7cnfBOJIxR5UhaH2l4kvalOFFAZz9f5PPMbwbpJwHFqVSOpPWRhidpX4qTBPQPi4efO0O9EYmA4lQqR9L6SMOTtC9F/4AO+vCTgOKUKkfS+kjDk7QvRe+Aloef/26wfBJQnE7lSFofaXiS9qXoGdB7Az/8JKA4pcqRtD7S8CTtS9EvoIM//CSgOKXKkbQ+0vAk7UvRJ6D3Li2vAjrow08CilOqHEnrIw1P0r4UPQJaHn6+PXA+CShOp3IkrY80PEn7UnQG1OfhJwHFKVWOpPWRhidpX4qugP7e5+EnAcUpVY6k9ZGGJ2lfio6A8l54BFE5ktZHGp6kfSkIKHKoHEnrIw1P0r4UHQHleqAIonIkrY80PEn7UnQE1JH+trU+0vBUOZLWRxqepH0pTMUIKIKqHEnrIw1P0r4UpmIEFEFVjqT1kYYnaV8KUzECiqAqR9L6SMOTtC+FqRgBRVCVI2l9pOFJ2pfCVIyAIqjKkbQ+0vAk7UthKkZAEVTlSFofaXiS9qUwFSOgCKpyJK2PNDxJ+1KYihFQBFU5ktZHGp6kfSlMxQgogqocSesjDU/SvhSmYgQUQVWOpPWRhidpXwpTMQKKoCpH0vpIw5O0L4WpGAFFUJUjaX2k4Unal8JUjIAiqMqRtD7S8CTtS2EqRkARVOVIWh9peJL2pTAVI6AIqnIkrY80PEn7UpiKEVAEVTmS1kcanqR9KUzFCCiCqhxJ6yMNT9K+FKZiBBRBVY6k9ZGGJ2lfClMxAoqgKkfS+kjDk7QvhakYAUVQlSNpfaThSdqXwlSMgCKoypG0PtLwJO1LYSpGQBFU5UhaH2l4kvalMBUjoAiqciStjzQ8SftSmIoRUARVOZLWRxqepH0pTMUIKIKqHEnrIw1P0r4UpmIEFEFVjqT1kYYnaV8KUzECiqAqR9L6SMOTtC+FqRgBRVCVI2l9pOFJ2pfCVIyAIqjKkbQ+0vAk7UthKkZAEVTlSFofaXiS9qUwFSOgCKpyJK2PNDxJ+1KYihFQBFU5ktZHGp6kfSlMxQgogqocSesjDU/SvhSmYgQUQVWOpPWRhidpXwpTMQKKoCpH0vpIw5O0L4WpGAFFUJUjaX2k4Unal8JUjIAiqMqRtD7S8CTtS2EqRkARVOVIWh9peJL2pTAVI6AIqnIkrY80PEn7UpiKEVAEVTmS1kcanqR9KUzFCCiCqhxJ6yMNT9K+FKZiBBRBVY6k9ZGGJ2lfClMxAoqgKkfS+kjDk7QvhakYAUVQlSNpfaThSdqXwlSMgCKoypG0PtLwJO1LYSpGQBFU5UhaH2l4kvalMBUjoAiqciStjzQ8SftSmIrpAvpvP5tOz717vfz80cVp8coXy48eX9mbTte/Q0AhUjmS1kcanqR9KYYK6L+sknnuk+UH9/e2Arqu6SqmBBQilSNpfaThSdqXYqCA3pme+9v5/MHlVSfvTF87+K1r0/PXl79z/hYBhU7lSFofaXiS9qUYJqCPL08/XP64eLT5YWnm+/u/dX9v/Th09eCUgEKjciStjzQ8SftSDBPQRxfXn6GXdD6+vBXLm+tHoze3okpAcWqVI2l9pOFJ2pdimIDuKwF9dPH87z6YTn96ffUr5bHp4U/rCShOq3IkrY80PEn7Ugwb0NUn6pvnkJbp3H80en9v80XQ51e0f/NS6yMNT5UjaX2k4Unal6cRB3T1+fqd6fS9W/O/XFk+J09AMYzKkbQ+0vAk7cvTaAN6Z/Uyps2XPZefz28F1LyQSf/ouvWRhqfKkbQ+0vAk7UsxZEDv7J378HBPz996yiNQAgqBypG0PtLwJO1LMWBAb07NK5WWDzoJKIZROZLWRxqepH0phgvov9h+rprJs/AYROVIWh9peJL2pRgqoI+vTV9df41z86r6VTM3r//kdaCQqhxJ6yMNT9K+FEMF9NrWWzWvrR5srkLKO5EwiMqRtD7S8CTtSzFQQG9uv9X9/t7yZUwPPii/tsjoq7wXHnKVI2l9pOFJ2pdimIBurl+38FrJ6eoCTNeXv/eAqzFhAJUjaX2k4Unal2KYgN6ZHgro/MHy4qDvrR9yPriy+OV3b9l/Rn/bWh9peKocSesjDU/SvhTDBLSG/ra1PtLwVDmS1kcanqR9KUzFCCiCqhxJ6yMNT9K+FKZiBBRBVY6k9ZGGJ2lfClMxAoqgKkfS+kjDk7QvhakYAUVQlSNpfaThSdqXwlSMgCKoypG0PtLwJO1LYSpGQBFU5UhaH2l4kvalMBUjoAiqciStjzQ8SftSmIoRUARVOZLWRxqepH0pTMUIKIKqHEnrIw1P0r4UpmIEFEFVjqT1kYYnaV8KUzECiqAqR9L6SMOTtC+FqRgBRVCVI2l9pOFJ2pfCVIyAIqjKkbQ+0vAk7UthKkZAEVTlSFofaXiS9qUwFSOgCKpyJK2PNDxJ+1KYihFQBFU5ktZHGp6kfSlMxQgogqocSesjDU/SvhSmYgQUQVWOpPWRhidpXwpTMQKKoCpH0vpIw5O0L4WpGAFFUJUjaX2k4Unal8JUjIAiqMqRtD7S8CTtS2EqRkARVOVIWh9peJL2pTAVI6AIqnIkrY80PEn7UpiKEVAEVTmS1kcanqR9KUzFCCiCqhxJ6yMNT9K+FKZiBBRBVY6k9ZGGJ2lfClMxAoqgKkfS+kjDk7QvhakYAUVQlSNpfaThSdqXwlSMgCKoypG0PtLwJO1LYSpGQBFU5UhaH2l4kvalMBUjoAiqciStjzQ8SftSmIoRUARVOZLWRxqepH0pTMUIKIKqHEnrIw1P0r4UpmIEFEFVjqT1kYYnaV8KUzECiqAqR9L6SMOTtC+FqRgBRVCVI2l9pOFJ2pfCVIyAIqjKkbQ+0vAk7UthKkZAEVTlSFofaXiS9qUwFSOgCKpyJK2PNDxJ+1KYihFQBFU5ktZHGp6kfSlMxQgogqocSesjDU/SvhSmYgQUQVWOpPWRhidpXwpTMQKKoCpH0vpIw5O0L4WpGAFFUJUjaX2k4Unal8JUjIAiqMqRtD7S8CTtS2EqRkARVOVIWh9peJL2pTAVI6AIqnIkrY80PEn7UpiKEVAEVTmS1kcanqR9KUzFCCiCqhxJ6yMNT9K+FKZiBBRBVY6k9ZGGJ2lfClMxAoqgKkfS+kjDk7QvhakYAUVQlSNpfaThSdqXwlSMgCKoypG0PtLwJO1LYSpGQBFU5UhaH2l4kvalMBUjoAiqciStjzQ8SftSmIoRUARVOZLWRxqepH0pTMUIKIKqHEnrIw1P0r4UpmIEFEFVjqT1kYYnaV8KUzECiqAqR9L6SMOTtC+FqRgBRVCVI2l9pOFJ2pfCVIyAIqjKkbQ+0vAk7UthKkZAEVTlSFofaXiS9qUwFSOgCKpyJK2PNDxJ+1KYihFQBFU5ktZHGp6kfSlMxQgogqocSesjDU/SvhSmYgQUQVWOpPWRhidpXwpTMQKKoCpH0vpIw5O0L4WpGAFFUJUjaX2k4Unal8JUjIAiqMqRtD7S8CTtS2EqRkARVOVIWh9peJL2pTAVI6AIqnIkrY80PEn7UpiKEVAEVTmS1kcanqR9KUzFCCiCqhxJ6yMNT9K+FKZiBBRBVY6k9ZGGJ2lfClMxAoqgKkfS+kjDk7QvhakYAUVQlSNpfaThSdqXwlSMgCKoypG0PtLwJO1LYSpGQBFU5UhaH2l4kvalMBVrGFC91kcanipH0vpIw5O0L0/DI1AEVTmS1kcanqR9KUzFCCiCqhxJ6yMNT9K+FKZiBBRBVY6k9ZGGJ2lfClMxAoqgKkfS+kjDk7QvhakYAUVQlSNpfaThSdqXwlSMgCKoypG0PtLwJO1LYSpGQBFU5UhaH2l4kvalMBUjoAiqciStjzQ8SftSmIoRUARVOZLWRxqepH0pTMUIKIKqHEnrIw1P0r4UpmIEFEFVjqT1kYYnaV8KUzECiqAqR9L6SMOTtC+FqRgBRVCVI2l9pOFJ2pfCVIyAIqjKkbQ+0vAk7UthKkZAEVTlSFofaXiS9qUwFSOgCKpyJK2PNDxJ+1KYihFQBFU5ktZHGp6kfSlMxQgogqocSesjDU/SvhSmYgQUQVWOpPWRhidpXwpTMQKKoCpH0vpIw5O0L4WpGAFFUJUjaX2k4Unal8JUjIAiqMqRtD7S8CTtS2EqRkARVOVIWh9peJL2pTAVI6AIqnIkrY80PEn7UpiKEVAEVTmS1kcanqR9KUzFCCiCqhxJ6yMNT9K+FKZiBBRBVY6k9ZGGJ2lfClMxAoqgKkfS+kjDk7QvhakYAUVQlSNpfaThSdqXwlSMgCKoypG0PtLwJO1LYSpGQBFU5UhaH2l4kvalMBUjoAiqciStjzQ8SftSmIoRUARVOZLWRxqepH0pTMUIKIKqHEnrIw1P0r4UpmIEFEFVjqT1kYYnaV8KUzECiqAqR9L6SMOTtC+FqRgBRVCVI2l9pOFJ2pfCVIyAIqjKkbQ+0vAk7UthKkZAEVTlSFofaXiS9qUwFSOgCKpyJK2PNDxJ+1KYihFQBFU5ktZHGp6kfSlMxQgogqocSesjDU/SvhSmYgQUQVWOpPWRhidpXwpTMQKKoCpH0vpIw5O0L4WpGAFFUJUjaX2k4Unal8JUjIAiqMqRtD7S8CTtS2EqRkARVOVIWh9peJL2pTAVI6AIqnIkrY80PEn7UpiKEVAEVTmS1kcanqR9KUzFCCiCqhxJ6yMNT9K+FKZiBBRBVY6k9ZGGJ2lfClMxAoqgKkfS+kjDk7QvhakYAUVQlSNpfaThSdqXwlSMgCKoypG0PtLwJO1LYSpGQBFU5UhaH2l4kvalMBUjoAiqciStjzQ8SftSmIoRUARVOZLWRxqepH0pTMUIKIKqHEnrIw1P0r4UpmIEFEFVjqT1kYYnaV8KUzECiqAqR9L6SMOTtC+FqRgBRVCVI2l9pOFJ2pfCVIyAIqjKkbQ+0vAk7UthKkZAEVTlSFofaXiS9qUwFSOgCKpyJK2PNDxJ+1KYihFQBFU5ktZHGp6kfSlMxQgogqocSesjDU/SvhSmYgQUQVWOpPWRhidpXwpTMQKKoCpH0vpIw5O0L4WpGAFFUJUjaX2k4Unal8JUjIAiqMqRtD7S8CTtS2EqRkARVOVIWh9peJL2pTAVI6AIqnIkrY80PEn7UpiKEVAEVTmS1kcanqR9KUzFCCiCqhxJ6yMNT9K+FKZiBBRBVY6k9ZGGJ2lfClMxAoqgKkfS+kjDk7QvhakYAUVQlSNpfaThSdqXwlSMgCKoypG0PtLwJO1LYSpGQBFU5UhaH2l4kvalMBUjoAiqciStjzQ8SftSmIp5BPTxlb3p9N3rBBRKlSNpfaThSdqXwj+gjy5Ol175goBCqHIkrY80PEn7UvgH9Nr0/PX5g8vT87cIKHQqR9L6SMOTtC+Fe0Dv75XHno8unvuEgEKnciStjzQ8SftSuAf05vS19Y/vE1DoVI6k9ZGGJ2lfCveAXpt+WH68sw4pAYVE5UhaH2l4kval8A7o48vrT93v722+CPr8iv7van2k4alyJK2PNDxJ+/I0qQIKAJ48A2peyKR/dP3dxD2JToxEpWFAzeuYWt8TWXBPohMjUSGg2XBPohMjUfEOqOez8N9N3JPoxEhU3AO6ef2nw+tAv5u4J9GJkai4B9TxnUjfTdyT6MRIVNwD+vjy9FWn98J/N3FPohMjUXEP6PyB29WYvpu4J9GJkaj4B3T+4Mqin+/esr/c+p7IgnsSnRiJSoOAHqH1PZEF9yQ6MRIVUzECGh73JDoxEhVTMQIaHvckOjESFVMxAhoe9yQ6MRIVUzECGh73JDoxEhVTMQIaHvckOjESFVMxAhoe9yQ6MRIVUzECGh73JDoxEhVTMQIaHvckOjESFVMxAhoe9yQ6MRIVUzECGh73JDoxEhVTMQIaHvckOjESFVMxAhoe9yQ6MRIVUzECGh73JDoxEhVTMQIaHvckOjESFVMxAhoe9yQ6MRIVUzECGh73JDoxEhVTMQIaHvckOjESFVMxAhoe9yQ6MRIVUzECGh73JDoxEhVTMQIaHvckOjESFVMxAhoe9yQ6MRIVUzECGh73JDoxEhVTMQIaHvckOjESFVMxAhoe9yQ6MRIVUzECGh73JDoxEhVTMQIaHvckOjESFVOxhgGFxvPPt/43wOgxkoEQ0PA4G+jESAZCQMPjbKATIxkIAQ2Ps4FOjGQgBDQ8zgY6MZKBENDwOBvoxEgGQkDD42ygEyMZCAEFgEoEFAAqEVAAqERAAaASAQWASgQUACoRUACoREABoBIBDeHRxen7+z995Yum/y4Yk8eXp+dv7f/0w7b/Mt9BBDSERUDPfbL5KQHFgft7m/+23tlPKdwQ0BAWAZ2+tvkpAcWWm9PVIB5d3Pw3Fn4IaAiLw/E368/PCCgO2Xx55+bmP7FwREBDWFTzf+xtHmisfnxwZTqdvnu96b8WxuBO+fLO/fU+FsPYm05/en31858tRvLv/7bhv1x2BDSEZTXXjzDWAb2zOCUL53ja4Dvv8eXlMq6tP0O5vzWM9c95aDocAhrCsprrJ1lXAV0cjXf/9/zxv0z5uhfu75375P7e6hmkxSf0792aP/7X5RdGF4v5D4tf/Lc9RjIYAhpCqebqk7RVQDdf8LrGowssVnD+v6wjuRnGzen7PK3kgICGsKpmqWX56f5L/njpCrZfpPH48rqZy0eki5W8+j9b/nt9BxDQEFYBLY8oyk/3H1vwnDzmy/+OrmewaObG4lduLn989b/yn9jhENAQNs8cLR5vrgO6PjAEFPPV483yk+Vj0YOAzv/8N+Wn75HQoRDQEDadvDZ9n0egeMJWQM2XPR//9+Urmd5/2j8EAQIawqaTi/Px3/gaKKz9gD7t/fCP/5WRDIaAhrD/QPPO9K/2eBYexn5AF8NY/Wz5X9bNa+sPfhdqBDSEg8/Ur62+uLV6HehfrvA6UMy3E/no4vT89fn8z3uLR6LLKzUtfv7gMv+VHQwBDeEgoIty8k4kGFuPMdfDmL43P3gn0qt8nXwoBDSEreeKNhff4b3w2Lf9SfrqvfD/ePDzv/qPfAI/GAIKAJUIKABUIqAAUImAAkAlAgoAlQgoAFQioABQiYACQCUCCgCVCCgAVCKgAFCJgAJAJQIKAJUIKABUIqAAUImAAkAlAgoAlQgoAFQioABQiYACQCUCCgCVCCgAVCKgAFCJgAJAJQIKAJUIKABUIqAAUImAAkAlAgoAlQgoAFQioABQiYACQCUCCgCVCCgAVCKgAFCJgAJAJQIKAJUIKABUIqAAUImAAkAlAgoAlQgoAFQioABQiYACQCUCCgCVCCgAVCKgAFCJgAJAJQIKAJUIKABUIqAAUOn/A71FEGOQyBlxAAAAAElFTkSuQmCC">
             <a:extLst>
               <a:ext uri="{FF2B5EF4-FFF2-40B4-BE49-F238E27FC236}">
-                <a16:creationId xmlns="" xmlns:a16="http://schemas.microsoft.com/office/drawing/2014/main" id="{27CC6064-973B-4FF1-9446-C7722D5F572B}"/>
+                <a16:creationId xmlns:a16="http://schemas.microsoft.com/office/drawing/2014/main" id="{27CC6064-973B-4FF1-9446-C7722D5F572B}"/>
               </a:ext>
             </a:extLst>
           </p:cNvPr>
@@ -6023,7 +6019,7 @@
           <p:cNvPr id="6" name="AutoShape 4" descr="data:image/png;base64,iVBORw0KGgoAAAANSUhEUgAABUAAAAPACAMAAADDuCPrAAABYlBMVEUAAAAAADoAAGYAOjoAOmYAOpAAZrYzMzM6AAA6OgA6Ojo6OmY6ZmY6ZpA6ZrY6kLY6kNtNTU1NTW5NTY5Nbm5Nbo5NbqtNjshmAABmADpmOgBmOjpmZjpmZmZmZpBmkGZmkLZmkNtmtttmtv9uTU1ubk1ubm5ubo5ujqtujshuq8huq+SOTU2Obk2Obm6Oq8iOyOSOyP+QOgCQOjqQZjqQZmaQZpCQkGaQkLaQtraQttuQ2/+rbk2rjk2rjm6rq8iryOSr5Mir5P+2ZgC2Zjq2kDq2kGa2kJC2tpC2tra2ttu229u22/+2///Ijk3Ijm7Iq27Iq6vIyKvI5KvI5OTI5P/I///bkDrbkGbbtmbbtpDbtrbb27bb29vb2//b/7bb///kq27kyI7kyKvk5P/k///r6+v8jVn/tmb/yI7/25D/27b/29v/5Kv/5Mj/5OT//7b//7///8j//9v//+T///+zjZs9AAAACXBIWXMAAB2HAAAdhwGP5fFlAAAgAElEQVR4nO3d/59b5ZnecU0wMDGEILMYh0CWwmwDxaSLN3S7xHW3mGQXkni3aY0TEijO1q2/YMe1rP+/0iNpRnPbM+fMM9e5n3PffN4/xB472Eiv6/mgGUlnJnMAQJVJ638BAIiKgAJAJQIKAJUIKABUIqAAUImAAkAlAgoAlQgoAFQioABQiYACQCUCCgCVCCgAVCKgAFCJgAJAJQIKAJVGENDZl298fzKZ7Lzw8Ten/rNuT570zvzhhcnOLwT/pgCwrXlAZ7/aPWjdS6dNKAEF4Kd1QO+9fih2p+0cAQXgp3FA7y4ffu689dXip9/+6vuCgh78ud/7reRPAoCjtA3o4qHh1ufts1/KCkpAAQyvbUCvLor59tbHy8/An1P8wQQUwPCaBnT5CfzLh37lRvmapeRPJqAABtY0oItcmswtP6d/rvzGwQPRq5vK3vv5Irg7P/jNwT/9zuzT3cnOC09+1n84oJsnka4ufyh/ygsfL3/9yx8vev3Cr/f/f+YvAIBjtQzo7NKTn7Cvmroo3n7/NvWbfWpe7LQM6NUjnro/OqA31n/Iywd/4PpB8BN/AQAcq2VAlw837efrt1c9vHrwO4tfefabVW03VtVdpPBs+fDZJ3t3ZED/fv8Pefvq4ddOPfkXAMCxWgZ0UbknHjyuo3r7IGLrli4fOb709Xz+7aebx4zlseQPv5l/+/VT/+inBnRh+Rn6l4tP1Z+Z7Lz9zeqZ/+fmT/0LAOBYLQN6+ymffS8D+vJ866Xv68/mtx6t3l5/5fTGMaE7OqAvb/6MzV9wdfUQ9il/AQAca6QBXdZxlbr180nbTysdPCY98kWjRwZ0/aubv2a+/yWCp/wFAHCssQZ0UcDypc3lVyaXMdtu2u39xj7lq58rRwb0uYO/5p1D/9en/AUAcKyRfg10Gc7ye+uQbj/Ds3mW58YxT/YcGdCXD//K/v/1aX8BABxrbM/C70f19qFP5W3f7Cfd1qkDeuRjWwDYGOfrQOclcYuIbR6IElAA4zPOdyItlbcNbV7OtPlSqPmntQHliSMAJ9I0oFu5XNt6L3z5HH7/qZ2rTz6vIw3o0/4CADhW26sx2Zdy3t765HnxmPDZ/7X/ls7tp9xv7H95VBjQp/wFAHCstgEtX3k8eOf5jcn2C5tulDderku2deGmzfNM2oA+5S8AgGM1viL9veUVlQ9dkf7gC5Grq9VvSrZ8F9GZX6+/h9LmvZfCgD7lLwCAY435eyJd3X42fPtp8lUbxQF98i8AgGO1Duih78q5c/g6crcn28+Mz36++b+dWV2wUxzQJ/8CADhW84AufPnz5Sfvz7xovy/89lVBl/60vN7x+lrIc31An/gLAOBYYwgoAIREQAGgEgEFgEoEFAAqEVAAqERAAaASAQWASgQUACoRUACoREABoBIBBYBKBBQAKhFQAKhEQAGgEgEFgEoEFAAqEVAAqNQwoP8HEtyT6MRIVEzFCGh43JPoxEhUTMUIaHjck+jESFRMxQhoeNyT6MRIVEzFCGh43JPoxEhUTMUIaHjck+jESFRMxQhoeNyT6MRIVEzFCGh43JPoxEhUTMUIaHjck+jESFRMxQhoeNyT6MRIVEzFCGh43JPoxEhUTMUIaHjck+jESFRMxQhoeNyT6MRIVEzFCGh43JPoxEhUTMUIaHjck+jESFRMxQhoeNyT6MRIVEzFCGh43JPoxEhUTMUIaHjck+jESFRMxQhoeNyT6MRIVEzFCGh43JPoxEhUTMUIaHjck+jESFRMxQhoeNyT6MRIVEzFCGh43JPoxEhUTMUIaHjck+jESFRMxQhoeNyT6MRIVEzFCGh43JPoxEhUTMUIaHjck+jESFRMxQhoeNyT6MRIVEzFCGh43JPoxEhUTMUIaHjck+jESFRMxQhoeNyT6MRIVEzFCGh43JPoxEhUTMUIaHjck+jESFRMxQhoeNyT6MRIVEzFCGh43JPoxEhUTMUIaHjck+jESFRMxQhoeNyT6MRIVEzFUgX0/+I7RL+fxAioiqkYAUVQ+v0kRkBVTMUIKILS7ycxAqpiKkZAEZR+P4kRUBVTMQKKoPT7SYyAqpiKEVAEpd9PYgRUxVSMgCIo/X4SI6AqpmIEFEHp95MYAVUxFSOgCEq/n8QIqIqpGAFFUPr9JEZAVUzFCCiC0u8nMQKqYipGQBGUfj+JEVAVUzECiqD0+0mMgKqYihFQBKXfT2IEVMVUjIAiKP1+EiOgKqZiBBRB6feTGAFVMRUjoAhKv5/ECKiKqRgBRVD6/SRGQFVMxQgogtLvJzECqmIqRkARlH4/iRFQFVMxAoqg9PtJjICqmIoRUASl309iBFTFVIyAIij9fhIjoCqmYgQUQen3kxgBVTEVI6AISr+fxAioiqkYAUVQ+v0kRkBVTMUIKILS7ycxAqpiKkZAEZR+P4kRUBVTMQKKoPT7SYyAqpiKEVAEpd9PYgRUxVSMgCIo/X4SI6AqpmKnDeiji6+tf/b4yt50+u71rg8IKDT0+0mMgKqIA3pt+tqmpNOlV744/gMCChH9fhIjoCrSgD6+Nt0E9Nr0/PX5g8vT87eO/YCAQkS/n8QIqIoyoP/2wXQT0Pt75RHmo4vnPjnuAwIKFf1+EiOgKsKA3pxO3/vzOqA39398/7gPCChU9PtJjICqKAP66j/O76zzeG36YfmxfHz0BwQUKvr9JEZAVYQB3cri48vrT9Dv752/dfQHq3/m+ZVT/s1P0fpIw5N+P8BJEVAEpd8PcFL6gL7yxdEfHPpH9Y+uWx9peNLvJzE+hVcZPKDdj0AJKAT0+0mMgKoQUOSg309iBFRlmIDyLDy86feTGAFVGSigm1d5rl/6edQHBBQq+v0kRkBVBgoo70SCM/1+EiOgKgMF9PHl6av773g/+gMCChX9fhIjoCoDBXT+YPuaS0d/QEAhot9PYgRUZaiAzh9cWVTy3VtdHxBQaOj3kxgBVREH9BT0t631kYYn/X4SI6AqpmIEFEHp95MYAVUxFSOgCEq/n8QIqIqpGAFFUPr9JEZAVUzFCCiC0u8nMQKqYipGQBGUfj+JEVAVUzECiqD0+0mMgKqYihFQBKXfT2IEVMVUjIAiKP1+EiOgKqZiBBRB6feTGAFVMRUjoAhKv5/ECKiKqRgBRVD6/SRGQFVMxQgogtLvJzECqmIqRkARlH4/iRFQFVMxAoqg9PtJjICqmIoRUASl309iBFTFVIyAIij9fhIjoCqmYgQUQen3kxgBVTEVI6AISr+fxAioiqkYAUVQ+v0kRkBVTMUIKILS7ycxAqpiKkZAEZR+P4kRUBVTMQKKoPT7SYyAqpiKEVAEpd9PYgRUxVSMgCIo/X4SI6AqpmIEFEHp95MYAVUxFSOgCEq/n8QIqIqpGAFFUPr9JEZAVUzFCCiC0u8nMQKqYipGQBGUfj+JEVAVUzECiqD0+0mMgKqYihFQBKXfT2IEVMVUjIAiKP1+EiOgKqZiBBRB6feTGAFVMRUjoAhKv5/ECKiKqRgBRVD6/SRGQFVMxQgogtLvJzECqmIqRkARlH4/iRFQFVMxAoqg9PtJjICqmIoRUASl309iBFTFVIyAIij9fhIjoCqmYgQUQen3kxgBVTEVI6AISr+fxAioiqkYAUVQ+v0kRkBVTMUIKILS7ycxAqpiKkZAEZR+P4kRUBVTMQKKoPT7SYyAqpiKEVAEpd9PYgRUxVSMgCIo/X4SI6AqpmIEFEHp95MYAVUxFSOgCEq/n8QIqIqpGAFFUPr9JEZAVUzFCCiC0u8nMQKqYipGQBGUfj+JEVAVUzECiqD0+0mMgKqYihFQBKXfT2IEVMVUjIAiKP1+EiOgKqZiBBRB6feTGAFVMRUjoAhKv5/ECKiKqRgBRVD6/SRGQFVMxQgogtLvJzECqmIqRkARlH4/iRFQFVMxAoqg9PtJjICqmIoRUASl309iBFTFVIyAIij9fhIjoCqmYgQUQen3kxgBVTEVI6AISr+fxAioiqkYAUVQ+v0kRkBVTMUIKILS7ycxAqpiKkZAEZR+P4kRUBVTMQKKoPT7SYyAqpiKEVAEpd9PYgRUxVSMgCIo/X4SI6AqpmIEFEHp95MYAVUxFSOgCEq/n8QIqIqpGAFFUPr9JEZAVUzFCCiC0u8nMQKqYipGQBGUfj+JEVAVU7GGAdVrfaThqfXaAB6BIiz9fhLjEaiKqRgBRVD6/SRGQFVMxQgogtLvJzECqmIqRkARlH4/iRFQFVMxAoqg9PtJjICqmIoRUASl309iBFTFVIyAIij9fhIjoCqmYgQUQen3kxgBVTEVI6AISr+fxAioiqkYAUVQ+v0kRkBVTMUIKILS7ycxAqpiKkZAEZR+P4kRUBVTMQKKoPT7SYyAqpiKEVAEpd9PYgRUxVSMgCIo/X4SI6AqpmIEFEHp95MYAVUxFSOgCEq/n8QIqIqpGAFFUPr9JEZAVUzFCCiC0u8nMQKqYipGQBGUfj+JEVAVUzECiqD0+0mMgKqYihFQBKXfT2IEVMVUjIAiKP1+EiOgKqZiBBRB6feTGAFVMRUjoAhKv5/ECKiKqRgBRVD6/SRGQFVMxQgogtLvJzECqmIqRkARlH4/iRFQFVMxAoqg9PtJjICqmIoRUASl309iBFTFVIyAIij9fhIjoCqmYgQUQen3kxgBVTEVI6AISr+fxAioiqkYAUVQ+v0kRkBVTMUIKILS7ycxAqpiKkZAEZR+P4kRUBVTMQKKoPT7SYyAqpiKEVAEpd9PYgRUxVSMgCIo/X4SI6AqpmIEFEHp95MYAVUxFSOgCEq/n8QIqIqpGAFFUPr9JEZAVUzFCCiC0u8nMQKqYipGQBGUfj+JEVAVUzECiqD0+0mMgKqYihFQBKXfT2IEVMVUjIAiKP1+EiOgKqZiBBRB6feTGAFVMRUjoAhKv5/ECKiKqRgBRVD6/SRGQFVMxQgogtLvJzECqmIqRkARlH4/iRFQFVMxAoqg9PtJjICqmIoRUASl309iBFTFVIyAIij9fhIjoCqmYgQUQen3kxgBVTEVI6AISr+fxAioiqkYAUVQ+v0kRkBVTMUIKILS7ycxAqpiKkZAEZR+P4kRUBVTMQKKoPT7SYyAqpiKEVAEpd9PYgRUxVSMgCIo/X4SI6AqpmIEFEHp95MYAVUxFSOgCEq/n8QIqIqpGAFFUPr9JEZAVUzFCCiC0u8nMQKqYipGQBGUfj+JEVAVUzECiqD0+0mMgKqYihFQBKXfT2IEVMVUjIAiKP1+EiOgKqZiBBRB6feTGAFVMRUjoAhKv5/ECKiKqRgBRVD6/SRGQFVMxQgogtLvJzECqmIqRkARlH4/iRFQFVMxAoqg9PtJjICqmIoRUASl309iBFTFVIyAIij9fhIjoCqmYgQUQen3kxgBVTEVI6AISr+fxAioiqmYKKCPL083XvliPn908eDni9+8sjedvnudgEJJv5/ECKiKS0Dv720FdF3TVUwJKET0+0mMgKoME9CN+3vnPln8cGf62sGvXZuevz5/cHl6/hYBhY5+P4kRUJVBA7p4IPr+qpnvbzV1/Ti0pJWAQkS/n8QIqMqgAb25epj5+PJWLG+uH43e3IoqAcWp6feTGAFVGTKgjy5OP1z9eP53H0ynP72+/ODa6tcOf1pPQHFa+v0kRkBVhgzo5sHm5jmkZTr3H43e39t8EfT5FeXfvNL6SMOTfj/ASSkDuv9lzjvT6Xu35n+5Ml18TEAxDP1+gJNSBvTO5on2zSPR5XNJWwE1L2TSP7pufaThSb+fxPgUXmW4gD6+vP5q56GiPuURKAGFgH4/iRFQleEC+sRDzPIrBBTD0O8nMQKqMlxAn3iafdVMnoXHIPT7SYyAqgwX0P1Xz+9/Ll+auXn9J68DhZR+P4kRUJXBArr16vlrqwebq5DyTiQMQr+fxAioymABfXRx/0ug9/eWL2N68EF5Vn6R0Vd5Lzzk9PtJjICqDBbQ7SeJbq4vxnR9+cEDrsaEAej3kxgBVRksoHe2H2I++Nl0eu699ccPriz6+e4t+w/ob1vrIw1P+v0kRkBVBgvoielvW+sjDU/6/SRGQFVMxQgogtLvJzECqmIqRkARlH4/iRFQFVMxAoqg9PtJjICqmIoRUASl309iBFTFVKwjoLM/fvY5AcUY6feTGAFV6RvQe//pm/n84euTyeTMLwgoxke/n8QIqErPgN6YfO+38/nVydLyZwQUI6PfT2IEVKVfQG+XbN7dnTz7zb0Lk5cJKEZHv5/ECKhKv4BeXZRzmdGdXyz/d/lzAopx0e8nMQKq0iugs0vLcq4z+vDCMJ/D629b6yMNT/r9JEZAVXoFdNXMhxcmz80JKMZJv5/ECKjKCQJ6d3fyDgHFSOn3kxgBVekV0NWn8DfKl0D5GihGSb+fxAioSq+Azq9Onls+/b4sJ8/CY5T0+0mMgKr0C+jt8gLQxWfws59PVo9DCSjGRb+fxAioSr+ALj59X3iuPJG0884g/SSgOBX9fhIjoCo9Azq/99FPPl788PBHP/jNMP0koDgV/X4SI6AqfQM6PP1ta32k4Um/n8QIqIqp2LEBnX09YD8JKE5Fv5/ECKiKqdjRAf3yx8v3wz/80VuDvIaJgOKU9PtJjICq9Azo7NPVdZgeXpicGeZiTAQUp6LfT2IEVKVnQK9OJmf+evd7v5393WSg19ETUJyKfj+JEVCVfgG9PZm8vX4P5x9Wb+gkoBgX/X4SI6Aq/QJ6dfnuo/Wb4G+US4oQUIyLfj+JEVCVXgFdvRd+HdC7u1xMBOOj309iBFSlV0A3l7Mr5eRqTBgj/X4SI6AqBBQ56PeTGAFV6RXQ2aXlE0frcnI5O4yRfj+JEVCVXgFdPXG0CugipjyJhPHR7ycxAqrSL6B3dycvfVMCeu91LmeHMdLvJzECqtIvoOVydmd3d178/uLHYa6nTEBxKvr9JEZAVXoGdP773cnaQP0koDgV/X4SI6AqfQM6//ZXZxf1fGawy4ESUJyKfj+JEVCV3gEdnP62tT7S8KTfT2IEVMVUjOuBIij9fhIjoCqmYlwPFEHp95MYAVXpGVCuB4qR0+8nMQKq0jOgXA8UI6ffT2IEVKVfQLkeKMZOv5/ECKhKv4ByPVCMnX4/iRFQlV4B5XqgGD39fhIjoCq9Asrl7DB6+v0kRkBVCChy0O8nMQKq0iugXA8Uo6ffT2IEVKVXQLkeKEZPv5/ECKhKv4ByPVCMnX4/iRFQlX4B5XqgGDv9fhIjoCo9A8r1QDFy+v0kRkBV+gaU64Fi3PT7SYyAqvQO6OD0t631kYYn/X4SI6AqpmIEFEHp95MYAVUxFTvihfQ/emnQaykTUJyafj+JEVCVfgG9MJk8M9iVlAkoBPT7SYyAqvQK6OpyypMzHw/ZUP1ta32k4Um/n8QIqEqvgC786celoS98TEAxSvr9JEZAVfoGdL76rkgLQ72QSX/bWh9peNLvJzECqnKCgC4+lf/y9WVCd94a4ikl/W1rfaThSb+fxAioyokCuvDtz8tbkl7QPwzV37bWRxqe9PtJjICqnCigs199f/OGzslLBBRjot9PYgRUpX9AN/VcPhf/7af698Trb1vrIw1P+v0kRkBVegZ0/dXPg1eD6i+rrL9trY80POn3kxgBVekV0NmliX3ySP+NPfS3rfWRhif9fhIjoCq9Arp8J9LO4ZcvPbzAI1CMiX4/iRFQlZ4B/cGvzS/NPle/lEl/21ofaXjS7ycxAqrSK6Au9Let9ZGGJ/1+EiOgKqZiBBRB6feTGAFVMRXruCL9ztlB3oREQHFq+v0kRkBV+gb0xv4r6PmeSBgj/X4SI6AqPQO67OczL775Bt+VEyOl309iBFSlX0Dv7k6eXb2K6d4lvi88xki/n8QIqEq/gF49eN/R7NLkOQKK0dHvJzECqtIroLNLW4867+6qX0JPQHF6+v0kRkBVegX00Ps29W/iJKA4Pf1+EiOgKgQUOej3kxgBVekV0NmlyTv7H+ivw0RAcXr6/SRGQFV6BZQnkTB6+v0kRkBV+gX07u7kzOpyIn96nZcxYYz0+0mMgKr0C+jqjUhnz54d8q1Icq2PNDy1XhtwzFs5/7C7fifnztsD/dX6/zi0PtLwpN9PYjwCVekb0PnsyzcWj0Bf/HiQJ5AIKE5Lv5/ECKhK74AOTn/bWh9peNLvJzECqmIqRkARlH4/iRFQFVMxG9DZR28+6Se8DhSjo99PYgRUpSOgy28n9wTeiYTx0e8nMQKqQkCRg34/iRFQlY6AOtLfttZHGp70+0mMgKqYihFQBKXfT2IEVMVU7PiAfjVcPgkoTke/n8QIqIqp2NEB/fLH5X1IP/gNAcUY6feTGAFV6RnQ2aX9p5BeGui9SPrb1vpIw5N+P4kRUJV+AV32c+fFf/jsn97YnQx0NTsCilPR7ycxAqrSL6A3JpMfrh54zn452bq4MgHFWOj3kxgBVekV0MUD0INr2F3lgsoYIf1+EiOgKr0C+vDCoe/KyQvpMT76/SRGQFV6BpRvKoeR0+8nMQKq0iugfF94jJ5+P4kRUJVeAZ3f2Pq65w2+BooR0u8nMQKq0i+gs0v7L/+8MdC1RAgoTkW/n8QIqEqvgM4+Wr7+88W3Pvvn5Y8vDHNVUP1ta32k4Um/n8QIqEqvgLpc1E5/21ofaXjS7ycxAqpCQJGDfj+JEVCVXgF1ob9trY80POn3kxgBVTEVI6AISr+fxAioiqkYAUVQ+v0kRkBVTMWODugfP9v3OS+kx+jo95MYAVXpGdDf7/JN5TBq+v0kRkBV+gX0Nt+VEyOn309iBFSlV0BnlyY7H3+17+sh+klAcSr6/SRGQFV6BfThhYEuokxAoaLfT2IEVKVnQAd6/zsBhYp+P4kRUJVeAZ1dIqAYOf1+EiOgKr0COr/Bp/AYOf1+EiOgKv0Ceuh7ehBQjJB+P4kRUJV+AZ3fuzA58+aG+kJ2BBSnp99PYgRUpWdAP+V1oBg3/X4SI6Aq/QJ6gxfSY+T0+0mMgKr0Cmh5If0gn7cTUIjo95MYAVXpFVCP55AIKE5Fv5/ECKhKz4DyOlCMnH4/iRFQlV4B5YX0GD39fhIjoCq9Ajq/MXmZgGLU9PtJjICq9Avo7NLO2wQUY6bfT2IEVKVXQGcfvTGZ7LzIC+kxXvr9JEZAVXoF1HxbY14HivHR7ycxAqpCQJGDfj+JEVCVXgF1ob9trY80POn3kxgBVTEVI6AISr+fxAioiqkYAUVQ+v0kRkBVTMVsQGd/tN8F/uGPz77A10AxOvr9JEZAVToC+vDC6imj2UebFy9tfoWAYlT0+0mMgKr0DOhBNgkoRkm/n8QIqAoBRQ76/SRGQFUIKHLQ7ycxAqpCQJGDfj+JEVAVAooc9PtJjICqEFDkoN9PYgRUhYAiB/1+EiOgKgQUOej3kxgBVSGgyEG/n8QIqAoBRQ76/SRGQFUIKHLQ7ycxAqrSHdAnEVCMj34/iRFQFQKKHPT7SYyAqnQEdPbRm0/im8phfPT7SYyAqnQE1JH+trU+0vCk309iBFTFVIyAIij9fhIjoCqmYgQUQen3kxgBVTEVI6AISr+fxAioiqkYAUVQ+v0kRkBVTMUIKILS7ycxAqpiKkZAEZR+P4kRUBVTMQKKoPT7SYyAqpiKEVAEpd9PYgRUxVTsiXciXdr5xeKHb78moBg3/X4SI6AqHQF9eGH5xvfV/xJQjJh+P4kRUJXOgC4fgRJQjJ5+P4kRUJWOgM4uTZ79/Ks/Xfjer786MMzn8/rb1vpIw5N+P4kRUJWOgM5vcDk7hKDfT2IEVKUroLNP6wL66OK0eOWL5UePr+xNp+9eX/3WoQ8IKDT0+0mMgKp0BXSR0K8+++fdnX/47MDnPa4Hen9vK6Drmq5ieugDAgoR/X4SI6Aq3QGdVz2JdGf62sEH16bnr88fXJ6ev2U/IKAQ0e8nMQKq0iugs49OfBH6a9P3939+f2/9OPTcJ+YDAgoV/X4SI6AqvQJ6co8vb/Xx5vrR6M1lVA99QEChot9PYgRUpXdAv/3V2clk5+xb/V7D9Oji+d99MJ3+9Pryg2vTD8svlk/rD31AQKGi309iBFSlb0APXs70cp+Abp5DWtZy/9Ho/b3ztw59sPr/Pr/S5489mdZHGp70+wFO6qiALvv5zItvvvH9ngW9M52+d2v+lyvTRS4JKBzo9wOc1BEBvbs7efY35Wf3Lk3K5UU6bL7SuXwuaauZr3xx6IND/4j+0XXrIw1P+v0kxqfwKv0CenXy7OZp+NmlyXPdAd24MzUPOp/yCJSAQkC/n8QIqEqvgK4vardyd/fZ/q9pMg86CSiGot9PYgRUpVdAD72Q/kSvqi+Z5Fl4DE+/n8QIqMowAX18eTuTm5d8rl8HuvUBAYWKfj+JEVCVXgGdXZq8s//B7UmPT+GvrR5frkLKO5EwPP1+EiOgKr0CevInke7vLV/G9OCD8o73RUZf3X/7+6EPCChU9PtJjICq9Avo3d3JmV+Xn/3p9V4vY1p8hr665tL15QcPti/A9ICrMWEA+v0kRkBV+gV09Uaks2fP9n4r0vzBz6bTc++tH2U+uLJI5rtP+4CAQkO/n8QIqErPgM7/sLt+J+fO2736eXL629b6SMOTfj+JEVCVvgGdz758Y/EI9MWPT3pdOwIKF/r9JEZAVXoHdHD629b6SMOTfj+JEVAVUzECiqD0+0mMgKqYihFQBKXfT2IEVMVUjIAiKP1+EiOgKqZiBBRB6feTGAFVMRUjoAhKv5/ECKiKqRgBRVD6/SRGQFVMxQgogtLvJzECqmIqRkARlH4/iRFQFVOxo67G9IPfEFCMmn4/iRFQlV4BfXhh63qgBBRjpN9PYgRUpWdAT/BdPAgoWtDvJzECqtIroIe+qRwBxRjp95MYAVXpFdD5jc23hSegGCn9fhIjoCr9AvrtLyeTZ158c+0ng1zSTn/bWh9peJuln3QAABwGSURBVNLvJzECqtIroA8vTLYN8wVR/W1rfaThSb+fxAioCgFFDvr9JEZAVXoF1IX+trU+0vCk309iBFTFVIyAIij9fhIjoCqmYscGdPb1gP0koDgV/X4SI6AqpmJHB/TLHy+/+PnwR28N9V3l9Let9ZGGJ/1+EiOgKj0DOvt09ezRwwuTMwO9KUl/21ofaXjS7ycxAqrSM6BXJ5Mzf737vd/O/m4yeXaYx6D629b6SMOTfj+JEVCVfgG9PZm8vX5H/B92B7qwiP62tT7S8KTfT2IEVKVfQK9OXt6/pMiNyXMEFKOj309iBFSlV0BXFxNZB/TuLi+kx/jo95MYAVXpFdBVOtcBHeradvrb1vpIw5N+P4kRUBUCihz0+0mMgKr0Cujs0vKJo3U5bw/0NLz+trU+0vCk309iBFSlV0BXTxytArqIKU8iYXz0+0mMgKr0C+jd3clL35SA3nt9MtDV6fW3rfWRhif9fhIjoCr9Arp4CDqZnN3defH7ix9fHqSfBBSnot9PYgRUpWdA57/f3VwNdKB+ElCcin4/iRFQlb4BnX/7q7OLej4z3DeI19+21kcanvT7SYyAqvQO6OD0t631kYYn/X4SI6AqpmLHXw/0qwH7SUBxKvr9JEZAVUzFjr8e6AKfwmOc9PtJjICq9Azo7NL+t5R7aaArKutvW+sjDU/6/SRGQFX6BXTZz50X//Nn//TGoqDDvI6egOJU9PtJjICq9Avo7f1XL81+OeF6oBgh/X4SI6AqvQK6eAB68OrPq7yVEyOk309iBFSlV0AfXth6+ybXA8UY6feTGAFV6RnQrWZyOTuMkX4/iRFQlV4BXV2Rfu3uLpezw/jo95MYAVXpFdBD3wfpxkDvhtffttZHGp70+0mMgKr0C+jDC5MffrPp5zCfwRNQnIp+P4kRUJWOgM4+erN4Y/U60H9+c3cyefEnfAqP0dHvJzECqtIR0MVDzyfxJBLGR7+fxAioCgFFDpUj+X/4DpH2pegIqCP9bWt9pOGpciStjzQ8SftSmIoRUARVOZLWRxqepH0pTMUIKIKqHEnrIw1P0r4UpmJHB/SPn+37nGfhMTqVI2l9pOFJ2peiZ0APvqccTyJhlCpH0vpIw5O0L0W/gN7mWXiMXOVIWh9peJL2pegV0Nmlyc7HX+37eoh+ElCcSuVIWh9peJL2pegV0IcXBrqIMgGFSuVIWh9peJL2pegZ0IHe/05AoVI5ktZHGp6kfSl6BXR2iYBi5CpH0vpIw5O0L0WvgM5v8Ck8Rq5yJK2PNDxJ+1L0C+ih7+lBQDFClSNpfaThSdqXol9A5/cuTM68ucHl7DA+lSNpfaThSdqXomdAP+V1oBi3ypG0PtLwJO1L0S+gN3ghPUauciStjzQ8SftS9ApoeSH9IJ+3E1CIVI6k9ZGGJ2lfil4B9XgOiYDiVCpH0vpIw5O0L0XPgPI6UIxc5UhaH2l4kval6BVQXkiP0ascSesjDU/SvhS9AjrY94InoFCpHEnrIw1P0r4U/QI6u7TzNgHFmFWOpPWRhidpX4peAZ19VL4vPC+kx3hVjqT1kYYnaV+KXgE139yY14FifCpH0vpIw5O0LwUBRQ6VI2l9pOFJ2peiV0Bd6G9b6yMNT5UjaX2k4Unal8JUjIAiqMqRtD7S8CTtS2EqRkARVOVIWh9peJL2pTAVOyKg3361jW8qh/GpHEnrIw1P0r4UvQLq8iSSXusjDU+VI2l9pOFJ2pen4Vl4BFU5ktZHGp6kfSl6BXT2x8/W/v71yc4/fM4L6TE6lSNpfaThSdqXoldAt93dfXaYK4Pqb1vrIw1PlSNpfaThSdqX4sQBHezCIvrb1vpIw1PlSFofaXiS9qU4eUCHegiqv22tjzQ8VY6k9ZGGJ2lfipMHdKirK+tvW+sjDU+VI2l9pOFJ2pfi5AG9u0tAMT6VI2l9pOFJ2pfixAGdXZ3wKTzGp3IkrY80PEn7UvQK6OyjzaVA33xjd8KTSBihypG0PtLwJO1L0Sugh19Iz8uYMEKVI2l9pOFJ2pfixAF95q2BvkG8/ra1PtLwVDmS1kcanqR9KXoF1IX+trU+0vBUOZLWRxqepH0pTMUIKIKqHEnrIw1P0r4UpmIEFEFVjqT1kYYnaV8KUzECiqAqR9L6SMOTtC+FqZgN6NYLmA7wbY0xPpUjaX2k4Unal6IjoOZKoFwPFGNVOZLWRxqepH0pCChyqBxJ6yMNT9K+FB0Btb7cnfBOJIxR5UhaH2l4kvalOFFAZz9f5PPMbwbpJwHFqVSOpPWRhidpX4qTBPQPi4efO0O9EYmA4lQqR9L6SMOTtC9F/4AO+vCTgOKUKkfS+kjDk7QvRe+Aloef/26wfBJQnE7lSFofaXiS9qXoGdB7Az/8JKA4pcqRtD7S8CTtS9EvoIM//CSgOKXKkbQ+0vAk7UvRJ6D3Li2vAjrow08CilOqHEnrIw1P0r4UPQJaHn6+PXA+CShOp3IkrY80PEn7UnQG1OfhJwHFKVWOpPWRhidpX4qugP7e5+EnAcUpVY6k9ZGGJ2lfio6A8l54BFE5ktZHGp6kfSkIKHKoHEnrIw1P0r4UHQHleqAIonIkrY80PEn7UnQE1JH+trU+0vBUOZLWRxqepH0pTMUIKIKqHEnrIw1P0r4UpmIEFEFVjqT1kYYnaV8KUzECiqAqR9L6SMOTtC+FqRgBRVCVI2l9pOFJ2pfCVIyAIqjKkbQ+0vAk7UthKkZAEVTlSFofaXiS9qUwFSOgCKpyJK2PNDxJ+1KYihFQBFU5ktZHGp6kfSlMxQgogqocSesjDU/SvhSmYgQUQVWOpPWRhidpXwpTMQKKoCpH0vpIw5O0L4WpGAFFUJUjaX2k4Unal8JUjIAiqMqRtD7S8CTtS2EqRkARVOVIWh9peJL2pTAVI6AIqnIkrY80PEn7UpiKEVAEVTmS1kcanqR9KUzFCCiCqhxJ6yMNT9K+FKZiBBRBVY6k9ZGGJ2lfClMxAoqgKkfS+kjDk7QvhakYAUVQlSNpfaThSdqXwlSMgCKoypG0PtLwJO1LYSpGQBFU5UhaH2l4kvalMBUjoAiqciStjzQ8SftSmIoRUARVOZLWRxqepH0pTMUIKIKqHEnrIw1P0r4UpmIEFEFVjqT1kYYnaV8KUzECiqAqR9L6SMOTtC+FqRgBRVCVI2l9pOFJ2pfCVIyAIqjKkbQ+0vAk7UthKkZAEVTlSFofaXiS9qUwFSOgCKpyJK2PNDxJ+1KYihFQBFU5ktZHGp6kfSlMxQgogqocSesjDU/SvhSmYgQUQVWOpPWRhidpXwpTMQKKoCpH0vpIw5O0L4WpGAFFUJUjaX2k4Unal8JUjIAiqMqRtD7S8CTtS2EqRkARVOVIWh9peJL2pTAVI6AIqnIkrY80PEn7UpiKEVAEVTmS1kcanqR9KUzFCCiCqhxJ6yMNT9K+FKZiBBRBVY6k9ZGGJ2lfClMxAoqgKkfS+kjDk7QvhakYAUVQlSNpfaThSdqXwlSMgCKoypG0PtLwJO1LYSpGQBFU5UhaH2l4kvalMBUjoAiqciStjzQ8SftSmIrpAvpvP5tOz717vfz80cVp8coXy48eX9mbTte/Q0AhUjmS1kcanqR9KYYK6L+sknnuk+UH9/e2Arqu6SqmBBQilSNpfaThSdqXYqCA3pme+9v5/MHlVSfvTF87+K1r0/PXl79z/hYBhU7lSFofaXiS9qUYJqCPL08/XP64eLT5YWnm+/u/dX9v/Th09eCUgEKjciStjzQ8SftSDBPQRxfXn6GXdD6+vBXLm+tHoze3okpAcWqVI2l9pOFJ2pdimIDuKwF9dPH87z6YTn96ffUr5bHp4U/rCShOq3IkrY80PEn7Ugwb0NUn6pvnkJbp3H80en9v80XQ51e0f/NS6yMNT5UjaX2k4Unal6cRB3T1+fqd6fS9W/O/XFk+J09AMYzKkbQ+0vAk7cvTaAN6Z/Uyps2XPZefz28F1LyQSf/ouvWRhqfKkbQ+0vAk7UsxZEDv7J378HBPz996yiNQAgqBypG0PtLwJO1LMWBAb07NK5WWDzoJKIZROZLWRxqepH0phgvov9h+rprJs/AYROVIWh9peJL2pRgqoI+vTV9df41z86r6VTM3r//kdaCQqhxJ6yMNT9K+FEMF9NrWWzWvrR5srkLKO5EwiMqRtD7S8CTtSzFQQG9uv9X9/t7yZUwPPii/tsjoq7wXHnKVI2l9pOFJ2pdimIBurl+38FrJ6eoCTNeXv/eAqzFhAJUjaX2k4Unal2KYgN6ZHgro/MHy4qDvrR9yPriy+OV3b9l/Rn/bWh9peKocSesjDU/SvhTDBLSG/ra1PtLwVDmS1kcanqR9KUzFCCiCqhxJ6yMNT9K+FKZiBBRBVY6k9ZGGJ2lfClMxAoqgKkfS+kjDk7QvhakYAUVQlSNpfaThSdqXwlSMgCKoypG0PtLwJO1LYSpGQBFU5UhaH2l4kvalMBUjoAiqciStjzQ8SftSmIoRUARVOZLWRxqepH0pTMUIKIKqHEnrIw1P0r4UpmIEFEFVjqT1kYYnaV8KUzECiqAqR9L6SMOTtC+FqRgBRVCVI2l9pOFJ2pfCVIyAIqjKkbQ+0vAk7UthKkZAEVTlSFofaXiS9qUwFSOgCKpyJK2PNDxJ+1KYihFQBFU5ktZHGp6kfSlMxQgogqocSesjDU/SvhSmYgQUQVWOpPWRhidpXwpTMQKKoCpH0vpIw5O0L4WpGAFFUJUjaX2k4Unal8JUjIAiqMqRtD7S8CTtS2EqRkARVOVIWh9peJL2pTAVI6AIqnIkrY80PEn7UpiKEVAEVTmS1kcanqR9KUzFCCiCqhxJ6yMNT9K+FKZiBBRBVY6k9ZGGJ2lfClMxAoqgKkfS+kjDk7QvhakYAUVQlSNpfaThSdqXwlSMgCKoypG0PtLwJO1LYSpGQBFU5UhaH2l4kvalMBUjoAiqciStjzQ8SftSmIoRUARVOZLWRxqepH0pTMUIKIKqHEnrIw1P0r4UpmIEFEFVjqT1kYYnaV8KUzECiqAqR9L6SMOTtC+FqRgBRVCVI2l9pOFJ2pfCVIyAIqjKkbQ+0vAk7UthKkZAEVTlSFofaXiS9qUwFSOgCKpyJK2PNDxJ+1KYihFQBFU5ktZHGp6kfSlMxQgogqocSesjDU/SvhSmYgQUQVWOpPWRhidpXwpTMQKKoCpH0vpIw5O0L4WpGAFFUJUjaX2k4Unal8JUjIAiqMqRtD7S8CTtS2EqRkARVOVIWh9peJL2pTAVI6AIqnIkrY80PEn7UpiKEVAEVTmS1kcanqR9KUzFCCiCqhxJ6yMNT9K+FKZiBBRBVY6k9ZGGJ2lfClMxAoqgKkfS+kjDk7QvhakYAUVQlSNpfaThSdqXwlSMgCKoypG0PtLwJO1LYSpGQBFU5UhaH2l4kvalMBUjoAiqciStjzQ8SftSmIoRUARVOZLWRxqepH0pTMUIKIKqHEnrIw1P0r4UpmIEFEFVjqT1kYYnaV8KUzECiqAqR9L6SMOTtC+FqRgBRVCVI2l9pOFJ2pfCVIyAIqjKkbQ+0vAk7UthKkZAEVTlSFofaXiS9qUwFSOgCKpyJK2PNDxJ+1KYihFQBFU5ktZHGp6kfSlMxQgogqocSesjDU/SvhSmYgQUQVWOpPWRhidpXwpTMQKKoCpH0vpIw5O0L4WpGAFFUJUjaX2k4Unal8JUjIAiqMqRtD7S8CTtS2EqRkARVOVIWh9peJL2pTAVI6AIqnIkrY80PEn7UpiKEVAEVTmS1kcanqR9KUzFCCiCqhxJ6yMNT9K+FKZiBBRBVY6k9ZGGJ2lfClMxAoqgKkfS+kjDk7QvhakYAUVQlSNpfaThSdqXwlSMgCKoypG0PtLwJO1LYSpGQBFU5UhaH2l4kvalMBVrGFC91kcanipH0vpIw5O0L0/DI1AEVTmS1kcanqR9KUzFCCiCqhxJ6yMNT9K+FKZiBBRBVY6k9ZGGJ2lfClMxAoqgKkfS+kjDk7QvhakYAUVQlSNpfaThSdqXwlSMgCKoypG0PtLwJO1LYSpGQBFU5UhaH2l4kvalMBUjoAiqciStjzQ8SftSmIoRUARVOZLWRxqepH0pTMUIKIKqHEnrIw1P0r4UpmIEFEFVjqT1kYYnaV8KUzECiqAqR9L6SMOTtC+FqRgBRVCVI2l9pOFJ2pfCVIyAIqjKkbQ+0vAk7UthKkZAEVTlSFofaXiS9qUwFSOgCKpyJK2PNDxJ+1KYihFQBFU5ktZHGp6kfSlMxQgogqocSesjDU/SvhSmYgQUQVWOpPWRhidpXwpTMQKKoCpH0vpIw5O0L4WpGAFFUJUjaX2k4Unal8JUjIAiqMqRtD7S8CTtS2EqRkARVOVIWh9peJL2pTAVI6AIqnIkrY80PEn7UpiKEVAEVTmS1kcanqR9KUzFCCiCqhxJ6yMNT9K+FKZiBBRBVY6k9ZGGJ2lfClMxAoqgKkfS+kjDk7QvhakYAUVQlSNpfaThSdqXwlSMgCKoypG0PtLwJO1LYSpGQBFU5UhaH2l4kvalMBUjoAiqciStjzQ8SftSmIoRUARVOZLWRxqepH0pTMUIKIKqHEnrIw1P0r4UpmIEFEFVjqT1kYYnaV8KUzECiqAqR9L6SMOTtC+FqRgBRVCVI2l9pOFJ2pfCVIyAIqjKkbQ+0vAk7UthKkZAEVTlSFofaXiS9qUwFSOgCKpyJK2PNDxJ+1KYihFQBFU5ktZHGp6kfSlMxQgogqocSesjDU/SvhSmYgQUQVWOpPWRhidpXwpTMQKKoCpH0vpIw5O0L4WpGAFFUJUjaX2k4Unal8JUjIAiqMqRtD7S8CTtS2EqRkARVOVIWh9peJL2pTAVI6AIqnIkrY80PEn7UpiKEVAEVTmS1kcanqR9KUzFCCiCqhxJ6yMNT9K+FKZiBBRBVY6k9ZGGJ2lfClMxAoqgKkfS+kjDk7QvhakYAUVQlSNpfaThSdqXwlSMgCKoypG0PtLwJO1LYSpGQBFU5UhaH2l4kvalMBUjoAiqciStjzQ8SftSmIoRUARVOZLWRxqepH0pTMUIKIKqHEnrIw1P0r4UpmIEFEFVjqT1kYYnaV8KUzECiqAqR9L6SMOTtC+FqRgBRVCVI2l9pOFJ2pfCVIyAIqjKkbQ+0vAk7UthKkZAEVTlSFofaXiS9qUwFSOgCKpyJK2PNDxJ+1KYihFQBFU5ktZHGp6kfSlMxQgogqocSesjDU/SvhSmYgQUQVWOpPWRhidpXwpTMQKKoCpH0vpIw5O0L4WpGAFFUJUjaX2k4Unal8JUjIAiqMqRtD7S8CTtS2EqRkARVOVIWh9peJL2pTAVI6AIqnIkrY80PEn7UpiKEVAEVTmS1kcanqR9KUzFCCiCqhxJ6yMNT9K+FKZiBBRBVY6k9ZGGJ2lfClMxAoqgKkfS+kjDk7QvhakYAUVQlSNpfaThSdqXwlSMgCKoypG0PtLwJO1LYSpGQBFU5UhaH2l4kvalMBUjoAiqciStjzQ8SftSmIp5BPTxlb3p9N3rBBRKlSNpfaThSdqXwj+gjy5Ol175goBCqHIkrY80PEn7UvgH9Nr0/PX5g8vT87cIKHQqR9L6SMOTtC+Fe0Dv75XHno8unvuEgEKnciStjzQ8SftSuAf05vS19Y/vE1DoVI6k9ZGGJ2lfCveAXpt+WH68sw4pAYVE5UhaH2l4kval8A7o48vrT93v722+CPr8iv7van2k4alyJK2PNDxJ+/I0qQIKAJ48A2peyKR/dP3dxD2JToxEpWFAzeuYWt8TWXBPohMjUSGg2XBPohMjUfEOqOez8N9N3JPoxEhU3AO6ef2nw+tAv5u4J9GJkai4B9TxnUjfTdyT6MRIVNwD+vjy9FWn98J/N3FPohMjUXEP6PyB29WYvpu4J9GJkaj4B3T+4Mqin+/esr/c+p7IgnsSnRiJSoOAHqH1PZEF9yQ6MRIVUzECGh73JDoxEhVTMQIaHvckOjESFVMxAhoe9yQ6MRIVUzECGh73JDoxEhVTMQIaHvckOjESFVMxAhoe9yQ6MRIVUzECGh73JDoxEhVTMQIaHvckOjESFVMxAhoe9yQ6MRIVUzECGh73JDoxEhVTMQIaHvckOjESFVMxAhoe9yQ6MRIVUzECGh73JDoxEhVTMQIaHvckOjESFVMxAhoe9yQ6MRIVUzECGh73JDoxEhVTMQIaHvckOjESFVMxAhoe9yQ6MRIVUzECGh73JDoxEhVTMQIaHvckOjESFVMxAhoe9yQ6MRIVUzECGh73JDoxEhVTMQIaHvckOjESFVMxAhoe9yQ6MRIVUzECGh73JDoxEhVTMQIaHvckOjESFVOxhgGFxvPPt/43wOgxkoEQ0PA4G+jESAZCQMPjbKATIxkIAQ2Ps4FOjGQgBDQ8zgY6MZKBENDwOBvoxEgGQkDD42ygEyMZCAEFgEoEFAAqEVAAqERAAaASAQWASgQUACoRUACoREABoBIBDeHRxen7+z995Yum/y4Yk8eXp+dv7f/0w7b/Mt9BBDSERUDPfbL5KQHFgft7m/+23tlPKdwQ0BAWAZ2+tvkpAcWWm9PVIB5d3Pw3Fn4IaAiLw/E368/PCCgO2Xx55+bmP7FwREBDWFTzf+xtHmisfnxwZTqdvnu96b8WxuBO+fLO/fU+FsPYm05/en31858tRvLv/7bhv1x2BDSEZTXXjzDWAb2zOCUL53ja4Dvv8eXlMq6tP0O5vzWM9c95aDocAhrCsprrJ1lXAV0cjXf/9/zxv0z5uhfu75375P7e6hmkxSf0792aP/7X5RdGF4v5D4tf/Lc9RjIYAhpCqebqk7RVQDdf8LrGowssVnD+v6wjuRnGzen7PK3kgICGsKpmqWX56f5L/njpCrZfpPH48rqZy0eki5W8+j9b/nt9BxDQEFYBLY8oyk/3H1vwnDzmy/+OrmewaObG4lduLn989b/yn9jhENAQNs8cLR5vrgO6PjAEFPPV483yk+Vj0YOAzv/8N+Wn75HQoRDQEDadvDZ9n0egeMJWQM2XPR//9+Urmd5/2j8EAQIawqaTi/Px3/gaKKz9gD7t/fCP/5WRDIaAhrD/QPPO9K/2eBYexn5AF8NY/Wz5X9bNa+sPfhdqBDSEg8/Ur62+uLV6HehfrvA6UMy3E/no4vT89fn8z3uLR6LLKzUtfv7gMv+VHQwBDeEgoIty8k4kGFuPMdfDmL43P3gn0qt8nXwoBDSEreeKNhff4b3w2Lf9SfrqvfD/ePDzv/qPfAI/GAIKAJUIKABUIqAAUImAAkAlAgoAlQgoAFQioABQiYACQCUCCgCVCCgAVCKgAFCJgAJAJQIKAJUIKABUIqAAUImAAkAlAgoAlQgoAFQioABQiYACQCUCCgCVCCgAVCKgAFCJgAJAJQIKAJUIKABUIqAAUImAAkAlAgoAlQgoAFQioABQiYACQCUCCgCVCCgAVCKgAFCJgAJAJQIKAJUIKABUIqAAUImAAkAlAgoAlQgoAFQioABQiYACQCUCCgCVCCgAVCKgAFCJgAJAJQIKAJUIKABUIqAAUOn/A71FEGOQyBlxAAAAAElFTkSuQmCC">
             <a:extLst>
               <a:ext uri="{FF2B5EF4-FFF2-40B4-BE49-F238E27FC236}">
-                <a16:creationId xmlns="" xmlns:a16="http://schemas.microsoft.com/office/drawing/2014/main" id="{303DEEFB-7094-4F9F-A65F-D2AFDD19F5FE}"/>
+                <a16:creationId xmlns:a16="http://schemas.microsoft.com/office/drawing/2014/main" id="{303DEEFB-7094-4F9F-A65F-D2AFDD19F5FE}"/>
               </a:ext>
             </a:extLst>
           </p:cNvPr>
@@ -6152,7 +6148,7 @@
           <p:cNvPr id="7" name="Text Placeholder 6">
             <a:extLst>
               <a:ext uri="{FF2B5EF4-FFF2-40B4-BE49-F238E27FC236}">
-                <a16:creationId xmlns="" xmlns:a16="http://schemas.microsoft.com/office/drawing/2014/main" id="{68BE2056-ED35-43E3-8265-E8D944FA51C9}"/>
+                <a16:creationId xmlns:a16="http://schemas.microsoft.com/office/drawing/2014/main" id="{68BE2056-ED35-43E3-8265-E8D944FA51C9}"/>
               </a:ext>
             </a:extLst>
           </p:cNvPr>
@@ -6206,7 +6202,7 @@
           <p:cNvPr id="4" name="AutoShape 2" descr="data:image/png;base64,iVBORw0KGgoAAAANSUhEUgAABUAAAAPACAMAAADDuCPrAAABYlBMVEUAAAAAADoAAGYAOjoAOmYAOpAAZrYzMzM6AAA6OgA6Ojo6OmY6ZmY6ZpA6ZrY6kLY6kNtNTU1NTW5NTY5Nbm5Nbo5NbqtNjshmAABmADpmOgBmOjpmZjpmZmZmZpBmkGZmkLZmkNtmtttmtv9uTU1ubk1ubm5ubo5ujqtujshuq8huq+SOTU2Obk2Obm6Oq8iOyOSOyP+QOgCQOjqQZjqQZmaQZpCQkGaQkLaQtraQttuQ2/+rbk2rjk2rjm6rq8iryOSr5Mir5P+2ZgC2Zjq2kDq2kGa2kJC2tpC2tra2ttu229u22/+2///Ijk3Ijm7Iq27Iq6vIyKvI5KvI5OTI5P/I///bkDrbkGbbtmbbtpDbtrbb27bb29vb2//b/7bb///kq27kyI7kyKvk5P/k///r6+v8jVn/tmb/yI7/25D/27b/29v/5Kv/5Mj/5OT//7b//7///8j//9v//+T///+zjZs9AAAACXBIWXMAAB2HAAAdhwGP5fFlAAAgAElEQVR4nO3d/59b5ZnecU0wMDGEILMYh0CWwmwDxaSLN3S7xHW3mGQXkni3aY0TEijO1q2/YMe1rP+/0iNpRnPbM+fMM9e5n3PffN4/xB472Eiv6/mgGUlnJnMAQJVJ638BAIiKgAJAJQIKAJUIKABUIqAAUImAAkAlAgoAlQgoAFQioABQiYACQCUCCgCVCCgAVCKgAFCJgAJAJQIKAJVGENDZl298fzKZ7Lzw8Ten/rNuT570zvzhhcnOLwT/pgCwrXlAZ7/aPWjdS6dNKAEF4Kd1QO+9fih2p+0cAQXgp3FA7y4ffu689dXip9/+6vuCgh78ud/7reRPAoCjtA3o4qHh1ufts1/KCkpAAQyvbUCvLor59tbHy8/An1P8wQQUwPCaBnT5CfzLh37lRvmapeRPJqAABtY0oItcmswtP6d/rvzGwQPRq5vK3vv5Irg7P/jNwT/9zuzT3cnOC09+1n84oJsnka4ufyh/ygsfL3/9yx8vev3Cr/f/f+YvAIBjtQzo7NKTn7Cvmroo3n7/NvWbfWpe7LQM6NUjnro/OqA31n/Iywd/4PpB8BN/AQAcq2VAlw837efrt1c9vHrwO4tfefabVW03VtVdpPBs+fDZJ3t3ZED/fv8Pefvq4ddOPfkXAMCxWgZ0UbknHjyuo3r7IGLrli4fOb709Xz+7aebx4zlseQPv5l/+/VT/+inBnRh+Rn6l4tP1Z+Z7Lz9zeqZ/+fmT/0LAOBYLQN6+ymffS8D+vJ866Xv68/mtx6t3l5/5fTGMaE7OqAvb/6MzV9wdfUQ9il/AQAca6QBXdZxlbr180nbTysdPCY98kWjRwZ0/aubv2a+/yWCp/wFAHCssQZ0UcDypc3lVyaXMdtu2u39xj7lq58rRwb0uYO/5p1D/9en/AUAcKyRfg10Gc7ye+uQbj/Ds3mW58YxT/YcGdCXD//K/v/1aX8BABxrbM/C70f19qFP5W3f7Cfd1qkDeuRjWwDYGOfrQOclcYuIbR6IElAA4zPOdyItlbcNbV7OtPlSqPmntQHliSMAJ9I0oFu5XNt6L3z5HH7/qZ2rTz6vIw3o0/4CADhW26sx2Zdy3t765HnxmPDZ/7X/ls7tp9xv7H95VBjQp/wFAHCstgEtX3k8eOf5jcn2C5tulDderku2deGmzfNM2oA+5S8AgGM1viL9veUVlQ9dkf7gC5Grq9VvSrZ8F9GZX6+/h9LmvZfCgD7lLwCAY435eyJd3X42fPtp8lUbxQF98i8AgGO1Duih78q5c/g6crcn28+Mz36++b+dWV2wUxzQJ/8CADhW84AufPnz5Sfvz7xovy/89lVBl/60vN7x+lrIc31An/gLAOBYYwgoAIREQAGgEgEFgEoEFAAqEVAAqERAAaASAQWASgQUACoRUACoREABoBIBBYBKBBQAKhFQAKhEQAGgEgEFgEoEFAAqEVAAqNQwoP8HEtyT6MRIVEzFCGh43JPoxEhUTMUIaHjck+jESFRMxQhoeNyT6MRIVEzFCGh43JPoxEhUTMUIaHjck+jESFRMxQhoeNyT6MRIVEzFCGh43JPoxEhUTMUIaHjck+jESFRMxQhoeNyT6MRIVEzFCGh43JPoxEhUTMUIaHjck+jESFRMxQhoeNyT6MRIVEzFCGh43JPoxEhUTMUIaHjck+jESFRMxQhoeNyT6MRIVEzFCGh43JPoxEhUTMUIaHjck+jESFRMxQhoeNyT6MRIVEzFCGh43JPoxEhUTMUIaHjck+jESFRMxQhoeNyT6MRIVEzFCGh43JPoxEhUTMUIaHjck+jESFRMxQhoeNyT6MRIVEzFCGh43JPoxEhUTMUIaHjck+jESFRMxQhoeNyT6MRIVEzFCGh43JPoxEhUTMUIaHjck+jESFRMxQhoeNyT6MRIVEzFCGh43JPoxEhUTMUIaHjck+jESFRMxQhoeNyT6MRIVEzFCGh43JPoxEhUTMUIaHjck+jESFRMxQhoeNyT6MRIVEzFUgX0/+I7RL+fxAioiqkYAUVQ+v0kRkBVTMUIKILS7ycxAqpiKkZAEZR+P4kRUBVTMQKKoPT7SYyAqpiKEVAEpd9PYgRUxVSMgCIo/X4SI6AqpmIEFEHp95MYAVUxFSOgCEq/n8QIqIqpGAFFUPr9JEZAVUzFCCiC0u8nMQKqYipGQBGUfj+JEVAVUzECiqD0+0mMgKqYihFQBKXfT2IEVMVUjIAiKP1+EiOgKqZiBBRB6feTGAFVMRUjoAhKv5/ECKiKqRgBRVD6/SRGQFVMxQgogtLvJzECqmIqRkARlH4/iRFQFVMxAoqg9PtJjICqmIoRUASl309iBFTFVIyAIij9fhIjoCqmYgQUQen3kxgBVTEVI6AISr+fxAioiqkYAUVQ+v0kRkBVTMUIKILS7ycxAqpiKkZAEZR+P4kRUBVTMQKKoPT7SYyAqpiKEVAEpd9PYgRUxVSMgCIo/X4SI6AqpmKnDeiji6+tf/b4yt50+u71rg8IKDT0+0mMgKqIA3pt+tqmpNOlV744/gMCChH9fhIjoCrSgD6+Nt0E9Nr0/PX5g8vT87eO/YCAQkS/n8QIqIoyoP/2wXQT0Pt75RHmo4vnPjnuAwIKFf1+EiOgKsKA3pxO3/vzOqA39398/7gPCChU9PtJjICqKAP66j/O76zzeG36YfmxfHz0BwQUKvr9JEZAVYQB3cri48vrT9Dv752/dfQHq3/m+ZVT/s1P0fpIw5N+P8BJEVAEpd8PcFL6gL7yxdEfHPpH9Y+uWx9peNLvJzE+hVcZPKDdj0AJKAT0+0mMgKoQUOSg309iBFRlmIDyLDy86feTGAFVGSigm1d5rl/6edQHBBQq+v0kRkBVBgoo70SCM/1+EiOgKgMF9PHl6av773g/+gMCChX9fhIjoCoDBXT+YPuaS0d/QEAhot9PYgRUZaiAzh9cWVTy3VtdHxBQaOj3kxgBVREH9BT0t631kYYn/X4SI6AqpmIEFEHp95MYAVUxFSOgCEq/n8QIqIqpGAFFUPr9JEZAVUzFCCiC0u8nMQKqYipGQBGUfj+JEVAVUzECiqD0+0mMgKqYihFQBKXfT2IEVMVUjIAiKP1+EiOgKqZiBBRB6feTGAFVMRUjoAhKv5/ECKiKqRgBRVD6/SRGQFVMxQgogtLvJzECqmIqRkARlH4/iRFQFVMxAoqg9PtJjICqmIoRUASl309iBFTFVIyAIij9fhIjoCqmYgQUQen3kxgBVTEVI6AISr+fxAioiqkYAUVQ+v0kRkBVTMUIKILS7ycxAqpiKkZAEZR+P4kRUBVTMQKKoPT7SYyAqpiKEVAEpd9PYgRUxVSMgCIo/X4SI6AqpmIEFEHp95MYAVUxFSOgCEq/n8QIqIqpGAFFUPr9JEZAVUzFCCiC0u8nMQKqYipGQBGUfj+JEVAVUzECiqD0+0mMgKqYihFQBKXfT2IEVMVUjIAiKP1+EiOgKqZiBBRB6feTGAFVMRUjoAhKv5/ECKiKqRgBRVD6/SRGQFVMxQgogtLvJzECqmIqRkARlH4/iRFQFVMxAoqg9PtJjICqmIoRUASl309iBFTFVIyAIij9fhIjoCqmYgQUQen3kxgBVTEVI6AISr+fxAioiqkYAUVQ+v0kRkBVTMUIKILS7ycxAqpiKkZAEZR+P4kRUBVTMQKKoPT7SYyAqpiKEVAEpd9PYgRUxVSMgCIo/X4SI6AqpmIEFEHp95MYAVUxFSOgCEq/n8QIqIqpGAFFUPr9JEZAVUzFCCiC0u8nMQKqYipGQBGUfj+JEVAVUzECiqD0+0mMgKqYihFQBKXfT2IEVMVUjIAiKP1+EiOgKqZiBBRB6feTGAFVMRUjoAhKv5/ECKiKqRgBRVD6/SRGQFVMxQgogtLvJzECqmIqRkARlH4/iRFQFVMxAoqg9PtJjICqmIoRUASl309iBFTFVIyAIij9fhIjoCqmYgQUQen3kxgBVTEVI6AISr+fxAioiqkYAUVQ+v0kRkBVTMUIKILS7ycxAqpiKkZAEZR+P4kRUBVTMQKKoPT7SYyAqpiKEVAEpd9PYgRUxVSMgCIo/X4SI6AqpmIEFEHp95MYAVUxFSOgCEq/n8QIqIqpGAFFUPr9JEZAVUzFCCiC0u8nMQKqYipGQBGUfj+JEVAVU7GGAdVrfaThqfXaAB6BIiz9fhLjEaiKqRgBRVD6/SRGQFVMxQgogtLvJzECqmIqRkARlH4/iRFQFVMxAoqg9PtJjICqmIoRUASl309iBFTFVIyAIij9fhIjoCqmYgQUQen3kxgBVTEVI6AISr+fxAioiqkYAUVQ+v0kRkBVTMUIKILS7ycxAqpiKkZAEZR+P4kRUBVTMQKKoPT7SYyAqpiKEVAEpd9PYgRUxVSMgCIo/X4SI6AqpmIEFEHp95MYAVUxFSOgCEq/n8QIqIqpGAFFUPr9JEZAVUzFCCiC0u8nMQKqYipGQBGUfj+JEVAVUzECiqD0+0mMgKqYihFQBKXfT2IEVMVUjIAiKP1+EiOgKqZiBBRB6feTGAFVMRUjoAhKv5/ECKiKqRgBRVD6/SRGQFVMxQgogtLvJzECqmIqRkARlH4/iRFQFVMxAoqg9PtJjICqmIoRUASl309iBFTFVIyAIij9fhIjoCqmYgQUQen3kxgBVTEVI6AISr+fxAioiqkYAUVQ+v0kRkBVTMUIKILS7ycxAqpiKkZAEZR+P4kRUBVTMQKKoPT7SYyAqpiKEVAEpd9PYgRUxVSMgCIo/X4SI6AqpmIEFEHp95MYAVUxFSOgCEq/n8QIqIqpGAFFUPr9JEZAVUzFCCiC0u8nMQKqYipGQBGUfj+JEVAVUzECiqD0+0mMgKqYihFQBKXfT2IEVMVUjIAiKP1+EiOgKqZiBBRB6feTGAFVMRUjoAhKv5/ECKiKqRgBRVD6/SRGQFVMxQgogtLvJzECqmIqRkARlH4/iRFQFVMxAoqg9PtJjICqmIoRUASl309iBFTFVIyAIij9fhIjoCqmYgQUQen3kxgBVTEVI6AISr+fxAioiqkYAUVQ+v0kRkBVTMUIKILS7ycxAqpiKkZAEZR+P4kRUBVTMQKKoPT7SYyAqpiKEVAEpd9PYgRUxVSMgCIo/X4SI6AqpmIEFEHp95MYAVUxFSOgCEq/n8QIqIqpGAFFUPr9JEZAVUzFCCiC0u8nMQKqYipGQBGUfj+JEVAVUzECiqD0+0mMgKqYihFQBKXfT2IEVMVUjIAiKP1+EiOgKqZiBBRB6feTGAFVMRUjoAhKv5/ECKiKqRgBRVD6/SRGQFVMxQgogtLvJzECqmIqRkARlH4/iRFQFVMxAoqg9PtJjICqmIoRUASl309iBFTFVIyAIij9fhIjoCqmYgQUQen3kxgBVTEVI6AISr+fxAioiqmYKKCPL083XvliPn908eDni9+8sjedvnudgEJJv5/ECKiKS0Dv720FdF3TVUwJKET0+0mMgKoME9CN+3vnPln8cGf62sGvXZuevz5/cHl6/hYBhY5+P4kRUJVBA7p4IPr+qpnvbzV1/Ti0pJWAQkS/n8QIqMqgAb25epj5+PJWLG+uH43e3IoqAcWp6feTGAFVGTKgjy5OP1z9eP53H0ynP72+/ODa6tcOf1pPQHFa+v0kRkBVhgzo5sHm5jmkZTr3H43e39t8EfT5FeXfvNL6SMOTfj/ASSkDuv9lzjvT6Xu35n+5Ml18TEAxDP1+gJNSBvTO5on2zSPR5XNJWwE1L2TSP7pufaThSb+fxPgUXmW4gD6+vP5q56GiPuURKAGFgH4/iRFQleEC+sRDzPIrBBTD0O8nMQKqMlxAn3iafdVMnoXHIPT7SYyAqgwX0P1Xz+9/Ll+auXn9J68DhZR+P4kRUJXBArr16vlrqwebq5DyTiQMQr+fxAioymABfXRx/0ug9/eWL2N68EF5Vn6R0Vd5Lzzk9PtJjICqDBbQ7SeJbq4vxnR9+cEDrsaEAej3kxgBVRksoHe2H2I++Nl0eu699ccPriz6+e4t+w/ob1vrIw1P+v0kRkBVBgvoielvW+sjDU/6/SRGQFVMxQgogtLvJzECqmIqRkARlH4/iRFQFVMxAoqg9PtJjICqmIoRUASl309iBFTFVKwjoLM/fvY5AcUY6feTGAFV6RvQe//pm/n84euTyeTMLwgoxke/n8QIqErPgN6YfO+38/nVydLyZwQUI6PfT2IEVKVfQG+XbN7dnTz7zb0Lk5cJKEZHv5/ECKhKv4BeXZRzmdGdXyz/d/lzAopx0e8nMQKq0iugs0vLcq4z+vDCMJ/D629b6yMNT/r9JEZAVXoFdNXMhxcmz80JKMZJv5/ECKjKCQJ6d3fyDgHFSOn3kxgBVekV0NWn8DfKl0D5GihGSb+fxAioSq+Azq9Onls+/b4sJ8/CY5T0+0mMgKr0C+jt8gLQxWfws59PVo9DCSjGRb+fxAioSr+ALj59X3iuPJG0884g/SSgOBX9fhIjoCo9Azq/99FPPl788PBHP/jNMP0koDgV/X4SI6AqfQM6PP1ta32k4Um/n8QIqIqp2LEBnX09YD8JKE5Fv5/ECKiKqdjRAf3yx8v3wz/80VuDvIaJgOKU9PtJjICq9Azo7NPVdZgeXpicGeZiTAQUp6LfT2IEVKVnQK9OJmf+evd7v5393WSg19ETUJyKfj+JEVCVfgG9PZm8vX4P5x9Wb+gkoBgX/X4SI6Aq/QJ6dfnuo/Wb4G+US4oQUIyLfj+JEVCVXgFdvRd+HdC7u1xMBOOj309iBFSlV0A3l7Mr5eRqTBgj/X4SI6AqBBQ56PeTGAFV6RXQ2aXlE0frcnI5O4yRfj+JEVCVXgFdPXG0CugipjyJhPHR7ycxAqrSL6B3dycvfVMCeu91LmeHMdLvJzECqtIvoOVydmd3d178/uLHYa6nTEBxKvr9JEZAVXoGdP773cnaQP0koDgV/X4SI6AqfQM6//ZXZxf1fGawy4ESUJyKfj+JEVCV3gEdnP62tT7S8KTfT2IEVMVUjOuBIij9fhIjoCqmYlwPFEHp95MYAVXpGVCuB4qR0+8nMQKq0jOgXA8UI6ffT2IEVKVfQLkeKMZOv5/ECKhKv4ByPVCMnX4/iRFQlV4B5XqgGD39fhIjoCq9Asrl7DB6+v0kRkBVCChy0O8nMQKq0iugXA8Uo6ffT2IEVKVXQLkeKEZPv5/ECKhKv4ByPVCMnX4/iRFQlX4B5XqgGDv9fhIjoCo9A8r1QDFy+v0kRkBV+gaU64Fi3PT7SYyAqvQO6OD0t631kYYn/X4SI6AqpmIEFEHp95MYAVUxFTvihfQ/emnQaykTUJyafj+JEVCVfgG9MJk8M9iVlAkoBPT7SYyAqvQK6OpyypMzHw/ZUP1ta32k4Um/n8QIqEqvgC786celoS98TEAxSvr9JEZAVfoGdL76rkgLQ72QSX/bWh9peNLvJzECqnKCgC4+lf/y9WVCd94a4ikl/W1rfaThSb+fxAioyokCuvDtz8tbkl7QPwzV37bWRxqe9PtJjICqnCigs199f/OGzslLBBRjot9PYgRUpX9AN/VcPhf/7af698Trb1vrIw1P+v0kRkBVegZ0/dXPg1eD6i+rrL9trY80POn3kxgBVekV0NmliX3ySP+NPfS3rfWRhif9fhIjoCq9Arp8J9LO4ZcvPbzAI1CMiX4/iRFQlZ4B/cGvzS/NPle/lEl/21ofaXjS7ycxAqrSK6Au9Let9ZGGJ/1+EiOgKqZiBBRB6feTGAFVMRXruCL9ztlB3oREQHFq+v0kRkBV+gb0xv4r6PmeSBgj/X4SI6AqPQO67OczL775Bt+VEyOl309iBFSlX0Dv7k6eXb2K6d4lvi88xki/n8QIqEq/gF49eN/R7NLkOQKK0dHvJzECqtIroLNLW4867+6qX0JPQHF6+v0kRkBVegX00Ps29W/iJKA4Pf1+EiOgKgQUOej3kxgBVekV0NmlyTv7H+ivw0RAcXr6/SRGQFV6BZQnkTB6+v0kRkBV+gX07u7kzOpyIn96nZcxYYz0+0mMgKr0C+jqjUhnz54d8q1Icq2PNDy1XhtwzFs5/7C7fifnztsD/dX6/zi0PtLwpN9PYjwCVekb0PnsyzcWj0Bf/HiQJ5AIKE5Lv5/ECKhK74AOTn/bWh9peNLvJzECqmIqRkARlH4/iRFQFVMxG9DZR28+6Se8DhSjo99PYgRUpSOgy28n9wTeiYTx0e8nMQKqQkCRg34/iRFQlY6AOtLfttZHGp70+0mMgKqYihFQBKXfT2IEVMVU7PiAfjVcPgkoTke/n8QIqIqp2NEB/fLH5X1IP/gNAcUY6feTGAFV6RnQ2aX9p5BeGui9SPrb1vpIw5N+P4kRUJV+AV32c+fFf/jsn97YnQx0NTsCilPR7ycxAqrSL6A3JpMfrh54zn452bq4MgHFWOj3kxgBVekV0MUD0INr2F3lgsoYIf1+EiOgKr0C+vDCoe/KyQvpMT76/SRGQFV6BpRvKoeR0+8nMQKq0iugfF94jJ5+P4kRUJVeAZ3f2Pq65w2+BooR0u8nMQKq0i+gs0v7L/+8MdC1RAgoTkW/n8QIqEqvgM4+Wr7+88W3Pvvn5Y8vDHNVUP1ta32k4Um/n8QIqEqvgLpc1E5/21ofaXjS7ycxAqpCQJGDfj+JEVCVXgF1ob9trY80POn3kxgBVTEVI6AISr+fxAioiqkYAUVQ+v0kRkBVTMWODugfP9v3OS+kx+jo95MYAVXpGdDf7/JN5TBq+v0kRkBV+gX0Nt+VEyOn309iBFSlV0BnlyY7H3+17+sh+klAcSr6/SRGQFV6BfThhYEuokxAoaLfT2IEVKVnQAd6/zsBhYp+P4kRUJVeAZ1dIqAYOf1+EiOgKr0COr/Bp/AYOf1+EiOgKv0Ceuh7ehBQjJB+P4kRUJV+AZ3fuzA58+aG+kJ2BBSnp99PYgRUpWdAP+V1oBg3/X4SI6Aq/QJ6gxfSY+T0+0mMgKr0Cmh5If0gn7cTUIjo95MYAVXpFVCP55AIKE5Fv5/ECKhKz4DyOlCMnH4/iRFQlV4B5YX0GD39fhIjoCq9Ajq/MXmZgGLU9PtJjICq9Avo7NLO2wQUY6bfT2IEVKVXQGcfvTGZ7LzIC+kxXvr9JEZAVXoF1HxbY14HivHR7ycxAqpCQJGDfj+JEVCVXgF1ob9trY80POn3kxgBVTEVI6AISr+fxAioiqkYAUVQ+v0kRkBVTMVsQGd/tN8F/uGPz77A10AxOvr9JEZAVToC+vDC6imj2UebFy9tfoWAYlT0+0mMgKr0DOhBNgkoRkm/n8QIqAoBRQ76/SRGQFUIKHLQ7ycxAqpCQJGDfj+JEVAVAooc9PtJjICqEFDkoN9PYgRUhYAiB/1+EiOgKgQUOej3kxgBVSGgyEG/n8QIqAoBRQ76/SRGQFUIKHLQ7ycxAqrSHdAnEVCMj34/iRFQFQKKHPT7SYyAqnQEdPbRm0/im8phfPT7SYyAqnQE1JH+trU+0vCk309iBFTFVIyAIij9fhIjoCqmYgQUQen3kxgBVTEVI6AISr+fxAioiqkYAUVQ+v0kRkBVTMUIKILS7ycxAqpiKkZAEZR+P4kRUBVTMQKKoPT7SYyAqpiKEVAEpd9PYgRUxVTsiXciXdr5xeKHb78moBg3/X4SI6AqHQF9eGH5xvfV/xJQjJh+P4kRUJXOgC4fgRJQjJ5+P4kRUJWOgM4uTZ79/Ks/Xfjer786MMzn8/rb1vpIw5N+P4kRUJWOgM5vcDk7hKDfT2IEVKUroLNP6wL66OK0eOWL5UePr+xNp+9eX/3WoQ8IKDT0+0mMgKp0BXSR0K8+++fdnX/47MDnPa4Hen9vK6Drmq5ieugDAgoR/X4SI6Aq3QGdVz2JdGf62sEH16bnr88fXJ6ev2U/IKAQ0e8nMQKq0iugs49OfBH6a9P3939+f2/9OPTcJ+YDAgoV/X4SI6AqvQJ6co8vb/Xx5vrR6M1lVA99QEChot9PYgRUpXdAv/3V2clk5+xb/V7D9Oji+d99MJ3+9Pryg2vTD8svlk/rD31AQKGi309iBFSlb0APXs70cp+Abp5DWtZy/9Ho/b3ztw59sPr/Pr/S5489mdZHGp70+wFO6qiALvv5zItvvvH9ngW9M52+d2v+lyvTRS4JKBzo9wOc1BEBvbs7efY35Wf3Lk3K5UU6bL7SuXwuaauZr3xx6IND/4j+0XXrIw1P+v0kxqfwKv0CenXy7OZp+NmlyXPdAd24MzUPOp/yCJSAQkC/n8QIqEqvgK4vardyd/fZ/q9pMg86CSiGot9PYgRUpVdAD72Q/kSvqi+Z5Fl4DE+/n8QIqMowAX18eTuTm5d8rl8HuvUBAYWKfj+JEVCVXgGdXZq8s//B7UmPT+GvrR5frkLKO5EwPP1+EiOgKr0CevInke7vLV/G9OCD8o73RUZf3X/7+6EPCChU9PtJjICq9Avo3d3JmV+Xn/3p9V4vY1p8hr665tL15QcPti/A9ICrMWEA+v0kRkBV+gV09Uaks2fP9n4r0vzBz6bTc++tH2U+uLJI5rtP+4CAQkO/n8QIqErPgM7/sLt+J+fO2736eXL629b6SMOTfj+JEVCVvgGdz758Y/EI9MWPT3pdOwIKF/r9JEZAVXoHdHD629b6SMOTfj+JEVAVUzECiqD0+0mMgKqYihFQBKXfT2IEVMVUjIAiKP1+EiOgKqZiBBRB6feTGAFVMRUjoAhKv5/ECKiKqRgBRVD6/SRGQFVMxQgogtLvJzECqmIqRkARlH4/iRFQFVOxo67G9IPfEFCMmn4/iRFQlV4BfXhh63qgBBRjpN9PYgRUpWdAT/BdPAgoWtDvJzECqtIroIe+qRwBxRjp95MYAVXpFdD5jc23hSegGCn9fhIjoCr9AvrtLyeTZ158c+0ng1zSTn/bWh9peJuln3QAABwGSURBVNLvJzECqtIroA8vTLYN8wVR/W1rfaThSb+fxAioCgFFDvr9JEZAVXoF1IX+trU+0vCk309iBFTFVIyAIij9fhIjoCqmYscGdPb1gP0koDgV/X4SI6AqpmJHB/TLHy+/+PnwR28N9V3l9Let9ZGGJ/1+EiOgKj0DOvt09ezRwwuTMwO9KUl/21ofaXjS7ycxAqrSM6BXJ5Mzf737vd/O/m4yeXaYx6D629b6SMOTfj+JEVCVfgG9PZm8vX5H/B92B7qwiP62tT7S8KTfT2IEVKVfQK9OXt6/pMiNyXMEFKOj309iBFSlV0BXFxNZB/TuLi+kx/jo95MYAVXpFdBVOtcBHeradvrb1vpIw5N+P4kRUBUCihz0+0mMgKr0Cujs0vKJo3U5bw/0NLz+trU+0vCk309iBFSlV0BXTxytArqIKU8iYXz0+0mMgKr0C+jd3clL35SA3nt9MtDV6fW3rfWRhif9fhIjoCr9Arp4CDqZnN3defH7ix9fHqSfBBSnot9PYgRUpWdA57/f3VwNdKB+ElCcin4/iRFQlb4BnX/7q7OLej4z3DeI19+21kcanvT7SYyAqvQO6OD0t631kYYn/X4SI6AqpmLHXw/0qwH7SUBxKvr9JEZAVUzFjr8e6AKfwmOc9PtJjICq9Azo7NL+t5R7aaArKutvW+sjDU/6/SRGQFX6BXTZz50X//Nn//TGoqDDvI6egOJU9PtJjICq9Avo7f1XL81+OeF6oBgh/X4SI6AqvQK6eAB68OrPq7yVEyOk309iBFSlV0AfXth6+ybXA8UY6feTGAFV6RnQrWZyOTuMkX4/iRFQlV4BXV2Rfu3uLpezw/jo95MYAVXpFdBD3wfpxkDvhtffttZHGp70+0mMgKr0C+jDC5MffrPp5zCfwRNQnIp+P4kRUJWOgM4+erN4Y/U60H9+c3cyefEnfAqP0dHvJzECqtIR0MVDzyfxJBLGR7+fxAioCgFFDpUj+X/4DpH2pegIqCP9bWt9pOGpciStjzQ8SftSmIoRUARVOZLWRxqepH0pTMUIKIKqHEnrIw1P0r4UpmJHB/SPn+37nGfhMTqVI2l9pOFJ2peiZ0APvqccTyJhlCpH0vpIw5O0L0W/gN7mWXiMXOVIWh9peJL2pegV0Nmlyc7HX+37eoh+ElCcSuVIWh9peJL2pegV0IcXBrqIMgGFSuVIWh9peJL2pegZ0IHe/05AoVI5ktZHGp6kfSl6BXR2iYBi5CpH0vpIw5O0L0WvgM5v8Ck8Rq5yJK2PNDxJ+1L0C+ih7+lBQDFClSNpfaThSdqXol9A5/cuTM68ucHl7DA+lSNpfaThSdqXomdAP+V1oBi3ypG0PtLwJO1L0S+gN3ghPUauciStjzQ8SftS9ApoeSH9IJ+3E1CIVI6k9ZGGJ2lfil4B9XgOiYDiVCpH0vpIw5O0L0XPgPI6UIxc5UhaH2l4kval6BVQXkiP0ascSesjDU/SvhS9AjrY94InoFCpHEnrIw1P0r4U/QI6u7TzNgHFmFWOpPWRhidpX4peAZ19VL4vPC+kx3hVjqT1kYYnaV+KXgE139yY14FifCpH0vpIw5O0LwUBRQ6VI2l9pOFJ2peiV0Bd6G9b6yMNT5UjaX2k4Unal8JUjIAiqMqRtD7S8CTtS2EqRkARVOVIWh9peJL2pTAVOyKg3361jW8qh/GpHEnrIw1P0r4UvQLq8iSSXusjDU+VI2l9pOFJ2pen4Vl4BFU5ktZHGp6kfSl6BXT2x8/W/v71yc4/fM4L6TE6lSNpfaThSdqXoldAt93dfXaYK4Pqb1vrIw1PlSNpfaThSdqX4sQBHezCIvrb1vpIw1PlSFofaXiS9qU4eUCHegiqv22tjzQ8VY6k9ZGGJ2lfipMHdKirK+tvW+sjDU+VI2l9pOFJ2pfi5AG9u0tAMT6VI2l9pOFJ2pfixAGdXZ3wKTzGp3IkrY80PEn7UvQK6OyjzaVA33xjd8KTSBihypG0PtLwJO1L0Sugh19Iz8uYMEKVI2l9pOFJ2pfixAF95q2BvkG8/ra1PtLwVDmS1kcanqR9KXoF1IX+trU+0vBUOZLWRxqepH0pTMUIKIKqHEnrIw1P0r4UpmIEFEFVjqT1kYYnaV8KUzECiqAqR9L6SMOTtC+FqZgN6NYLmA7wbY0xPpUjaX2k4Unal6IjoOZKoFwPFGNVOZLWRxqepH0pCChyqBxJ6yMNT9K+FB0Btb7cnfBOJIxR5UhaH2l4kvalOFFAZz9f5PPMbwbpJwHFqVSOpPWRhidpX4qTBPQPi4efO0O9EYmA4lQqR9L6SMOTtC9F/4AO+vCTgOKUKkfS+kjDk7QvRe+Aloef/26wfBJQnE7lSFofaXiS9qXoGdB7Az/8JKA4pcqRtD7S8CTtS9EvoIM//CSgOKXKkbQ+0vAk7UvRJ6D3Li2vAjrow08CilOqHEnrIw1P0r4UPQJaHn6+PXA+CShOp3IkrY80PEn7UnQG1OfhJwHFKVWOpPWRhidpX4qugP7e5+EnAcUpVY6k9ZGGJ2lfio6A8l54BFE5ktZHGp6kfSkIKHKoHEnrIw1P0r4UHQHleqAIonIkrY80PEn7UnQE1JH+trU+0vBUOZLWRxqepH0pTMUIKIKqHEnrIw1P0r4UpmIEFEFVjqT1kYYnaV8KUzECiqAqR9L6SMOTtC+FqRgBRVCVI2l9pOFJ2pfCVIyAIqjKkbQ+0vAk7UthKkZAEVTlSFofaXiS9qUwFSOgCKpyJK2PNDxJ+1KYihFQBFU5ktZHGp6kfSlMxQgogqocSesjDU/SvhSmYgQUQVWOpPWRhidpXwpTMQKKoCpH0vpIw5O0L4WpGAFFUJUjaX2k4Unal8JUjIAiqMqRtD7S8CTtS2EqRkARVOVIWh9peJL2pTAVI6AIqnIkrY80PEn7UpiKEVAEVTmS1kcanqR9KUzFCCiCqhxJ6yMNT9K+FKZiBBRBVY6k9ZGGJ2lfClMxAoqgKkfS+kjDk7QvhakYAUVQlSNpfaThSdqXwlSMgCKoypG0PtLwJO1LYSpGQBFU5UhaH2l4kvalMBUjoAiqciStjzQ8SftSmIoRUARVOZLWRxqepH0pTMUIKIKqHEnrIw1P0r4UpmIEFEFVjqT1kYYnaV8KUzECiqAqR9L6SMOTtC+FqRgBRVCVI2l9pOFJ2pfCVIyAIqjKkbQ+0vAk7UthKkZAEVTlSFofaXiS9qUwFSOgCKpyJK2PNDxJ+1KYihFQBFU5ktZHGp6kfSlMxQgogqocSesjDU/SvhSmYgQUQVWOpPWRhidpXwpTMQKKoCpH0vpIw5O0L4WpGAFFUJUjaX2k4Unal8JUjIAiqMqRtD7S8CTtS2EqRkARVOVIWh9peJL2pTAVI6AIqnIkrY80PEn7UpiKEVAEVTmS1kcanqR9KUzFCCiCqhxJ6yMNT9K+FKZiBBRBVY6k9ZGGJ2lfClMxAoqgKkfS+kjDk7QvhakYAUVQlSNpfaThSdqXwlSMgCKoypG0PtLwJO1LYSpGQBFU5UhaH2l4kvalMBUjoAiqciStjzQ8SftSmIrpAvpvP5tOz717vfz80cVp8coXy48eX9mbTte/Q0AhUjmS1kcanqR9KYYK6L+sknnuk+UH9/e2Arqu6SqmBBQilSNpfaThSdqXYqCA3pme+9v5/MHlVSfvTF87+K1r0/PXl79z/hYBhU7lSFofaXiS9qUYJqCPL08/XP64eLT5YWnm+/u/dX9v/Th09eCUgEKjciStjzQ8SftSDBPQRxfXn6GXdD6+vBXLm+tHoze3okpAcWqVI2l9pOFJ2pdimIDuKwF9dPH87z6YTn96ffUr5bHp4U/rCShOq3IkrY80PEn7Ugwb0NUn6pvnkJbp3H80en9v80XQ51e0f/NS6yMNT5UjaX2k4Unal6cRB3T1+fqd6fS9W/O/XFk+J09AMYzKkbQ+0vAk7cvTaAN6Z/Uyps2XPZefz28F1LyQSf/ouvWRhqfKkbQ+0vAk7UsxZEDv7J378HBPz996yiNQAgqBypG0PtLwJO1LMWBAb07NK5WWDzoJKIZROZLWRxqepH0phgvov9h+rprJs/AYROVIWh9peJL2pRgqoI+vTV9df41z86r6VTM3r//kdaCQqhxJ6yMNT9K+FEMF9NrWWzWvrR5srkLKO5EwiMqRtD7S8CTtSzFQQG9uv9X9/t7yZUwPPii/tsjoq7wXHnKVI2l9pOFJ2pdimIBurl+38FrJ6eoCTNeXv/eAqzFhAJUjaX2k4Unal2KYgN6ZHgro/MHy4qDvrR9yPriy+OV3b9l/Rn/bWh9peKocSesjDU/SvhTDBLSG/ra1PtLwVDmS1kcanqR9KUzFCCiCqhxJ6yMNT9K+FKZiBBRBVY6k9ZGGJ2lfClMxAoqgKkfS+kjDk7QvhakYAUVQlSNpfaThSdqXwlSMgCKoypG0PtLwJO1LYSpGQBFU5UhaH2l4kvalMBUjoAiqciStjzQ8SftSmIoRUARVOZLWRxqepH0pTMUIKIKqHEnrIw1P0r4UpmIEFEFVjqT1kYYnaV8KUzECiqAqR9L6SMOTtC+FqRgBRVCVI2l9pOFJ2pfCVIyAIqjKkbQ+0vAk7UthKkZAEVTlSFofaXiS9qUwFSOgCKpyJK2PNDxJ+1KYihFQBFU5ktZHGp6kfSlMxQgogqocSesjDU/SvhSmYgQUQVWOpPWRhidpXwpTMQKKoCpH0vpIw5O0L4WpGAFFUJUjaX2k4Unal8JUjIAiqMqRtD7S8CTtS2EqRkARVOVIWh9peJL2pTAVI6AIqnIkrY80PEn7UpiKEVAEVTmS1kcanqR9KUzFCCiCqhxJ6yMNT9K+FKZiBBRBVY6k9ZGGJ2lfClMxAoqgKkfS+kjDk7QvhakYAUVQlSNpfaThSdqXwlSMgCKoypG0PtLwJO1LYSpGQBFU5UhaH2l4kvalMBUjoAiqciStjzQ8SftSmIoRUARVOZLWRxqepH0pTMUIKIKqHEnrIw1P0r4UpmIEFEFVjqT1kYYnaV8KUzECiqAqR9L6SMOTtC+FqRgBRVCVI2l9pOFJ2pfCVIyAIqjKkbQ+0vAk7UthKkZAEVTlSFofaXiS9qUwFSOgCKpyJK2PNDxJ+1KYihFQBFU5ktZHGp6kfSlMxQgogqocSesjDU/SvhSmYgQUQVWOpPWRhidpXwpTMQKKoCpH0vpIw5O0L4WpGAFFUJUjaX2k4Unal8JUjIAiqMqRtD7S8CTtS2EqRkARVOVIWh9peJL2pTAVI6AIqnIkrY80PEn7UpiKEVAEVTmS1kcanqR9KUzFCCiCqhxJ6yMNT9K+FKZiBBRBVY6k9ZGGJ2lfClMxAoqgKkfS+kjDk7QvhakYAUVQlSNpfaThSdqXwlSMgCKoypG0PtLwJO1LYSpGQBFU5UhaH2l4kvalMBUjoAiqciStjzQ8SftSmIoRUARVOZLWRxqepH0pTMUIKIKqHEnrIw1P0r4UpmIEFEFVjqT1kYYnaV8KUzECiqAqR9L6SMOTtC+FqRgBRVCVI2l9pOFJ2pfCVIyAIqjKkbQ+0vAk7UthKkZAEVTlSFofaXiS9qUwFSOgCKpyJK2PNDxJ+1KYihFQBFU5ktZHGp6kfSlMxQgogqocSesjDU/SvhSmYgQUQVWOpPWRhidpXwpTMQKKoCpH0vpIw5O0L4WpGAFFUJUjaX2k4Unal8JUjIAiqMqRtD7S8CTtS2EqRkARVOVIWh9peJL2pTAVI6AIqnIkrY80PEn7UpiKEVAEVTmS1kcanqR9KUzFCCiCqhxJ6yMNT9K+FKZiBBRBVY6k9ZGGJ2lfClMxAoqgKkfS+kjDk7QvhakYAUVQlSNpfaThSdqXwlSMgCKoypG0PtLwJO1LYSpGQBFU5UhaH2l4kvalMBVrGFC91kcanipH0vpIw5O0L0/DI1AEVTmS1kcanqR9KUzFCCiCqhxJ6yMNT9K+FKZiBBRBVY6k9ZGGJ2lfClMxAoqgKkfS+kjDk7QvhakYAUVQlSNpfaThSdqXwlSMgCKoypG0PtLwJO1LYSpGQBFU5UhaH2l4kvalMBUjoAiqciStjzQ8SftSmIoRUARVOZLWRxqepH0pTMUIKIKqHEnrIw1P0r4UpmIEFEFVjqT1kYYnaV8KUzECiqAqR9L6SMOTtC+FqRgBRVCVI2l9pOFJ2pfCVIyAIqjKkbQ+0vAk7UthKkZAEVTlSFofaXiS9qUwFSOgCKpyJK2PNDxJ+1KYihFQBFU5ktZHGp6kfSlMxQgogqocSesjDU/SvhSmYgQUQVWOpPWRhidpXwpTMQKKoCpH0vpIw5O0L4WpGAFFUJUjaX2k4Unal8JUjIAiqMqRtD7S8CTtS2EqRkARVOVIWh9peJL2pTAVI6AIqnIkrY80PEn7UpiKEVAEVTmS1kcanqR9KUzFCCiCqhxJ6yMNT9K+FKZiBBRBVY6k9ZGGJ2lfClMxAoqgKkfS+kjDk7QvhakYAUVQlSNpfaThSdqXwlSMgCKoypG0PtLwJO1LYSpGQBFU5UhaH2l4kvalMBUjoAiqciStjzQ8SftSmIoRUARVOZLWRxqepH0pTMUIKIKqHEnrIw1P0r4UpmIEFEFVjqT1kYYnaV8KUzECiqAqR9L6SMOTtC+FqRgBRVCVI2l9pOFJ2pfCVIyAIqjKkbQ+0vAk7UthKkZAEVTlSFofaXiS9qUwFSOgCKpyJK2PNDxJ+1KYihFQBFU5ktZHGp6kfSlMxQgogqocSesjDU/SvhSmYgQUQVWOpPWRhidpXwpTMQKKoCpH0vpIw5O0L4WpGAFFUJUjaX2k4Unal8JUjIAiqMqRtD7S8CTtS2EqRkARVOVIWh9peJL2pTAVI6AIqnIkrY80PEn7UpiKEVAEVTmS1kcanqR9KUzFCCiCqhxJ6yMNT9K+FKZiBBRBVY6k9ZGGJ2lfClMxAoqgKkfS+kjDk7QvhakYAUVQlSNpfaThSdqXwlSMgCKoypG0PtLwJO1LYSpGQBFU5UhaH2l4kvalMBUjoAiqciStjzQ8SftSmIoRUARVOZLWRxqepH0pTMUIKIKqHEnrIw1P0r4UpmIEFEFVjqT1kYYnaV8KUzECiqAqR9L6SMOTtC+FqRgBRVCVI2l9pOFJ2pfCVIyAIqjKkbQ+0vAk7UthKkZAEVTlSFofaXiS9qUwFSOgCKpyJK2PNDxJ+1KYihFQBFU5ktZHGp6kfSlMxQgogqocSesjDU/SvhSmYgQUQVWOpPWRhidpXwpTMQKKoCpH0vpIw5O0L4WpGAFFUJUjaX2k4Unal8JUjIAiqMqRtD7S8CTtS2EqRkARVOVIWh9peJL2pTAVI6AIqnIkrY80PEn7UpiKEVAEVTmS1kcanqR9KUzFCCiCqhxJ6yMNT9K+FKZiBBRBVY6k9ZGGJ2lfClMxAoqgKkfS+kjDk7QvhakYAUVQlSNpfaThSdqXwlSMgCKoypG0PtLwJO1LYSpGQBFU5UhaH2l4kvalMBUjoAiqciStjzQ8SftSmIp5BPTxlb3p9N3rBBRKlSNpfaThSdqXwj+gjy5Ol175goBCqHIkrY80PEn7UvgH9Nr0/PX5g8vT87cIKHQqR9L6SMOTtC+Fe0Dv75XHno8unvuEgEKnciStjzQ8SftSuAf05vS19Y/vE1DoVI6k9ZGGJ2lfCveAXpt+WH68sw4pAYVE5UhaH2l4kval8A7o48vrT93v722+CPr8iv7van2k4alyJK2PNDxJ+/I0qQIKAJ48A2peyKR/dP3dxD2JToxEpWFAzeuYWt8TWXBPohMjUSGg2XBPohMjUfEOqOez8N9N3JPoxEhU3AO6ef2nw+tAv5u4J9GJkai4B9TxnUjfTdyT6MRIVNwD+vjy9FWn98J/N3FPohMjUXEP6PyB29WYvpu4J9GJkaj4B3T+4Mqin+/esr/c+p7IgnsSnRiJSoOAHqH1PZEF9yQ6MRIVUzECGh73JDoxEhVTMQIaHvckOjESFVMxAhoe9yQ6MRIVUzECGh73JDoxEhVTMQIaHvckOjESFVMxAhoe9yQ6MRIVUzECGh73JDoxEhVTMQIaHvckOjESFVMxAhoe9yQ6MRIVUzECGh73JDoxEhVTMQIaHvckOjESFVMxAhoe9yQ6MRIVUzECGh73JDoxEhVTMQIaHvckOjESFVMxAhoe9yQ6MRIVUzECGh73JDoxEhVTMQIaHvckOjESFVMxAhoe9yQ6MRIVUzECGh73JDoxEhVTMQIaHvckOjESFVMxAhoe9yQ6MRIVUzECGh73JDoxEhVTMQIaHvckOjESFVMxAhoe9yQ6MRIVUzECGh73JDoxEhVTMQIaHvckOjESFVOxhgGFxvPPt/43wOgxkoEQ0PA4G+jESAZCQMPjbKATIxkIAQ2Ps4FOjGQgBDQ8zgY6MZKBENDwOBvoxEgGQkDD42ygEyMZCAEFgEoEFAAqEVAAqERAAaASAQWASgQUACoRUACoREABoBIBDeHRxen7+z995Yum/y4Yk8eXp+dv7f/0w7b/Mt9BBDSERUDPfbL5KQHFgft7m/+23tlPKdwQ0BAWAZ2+tvkpAcWWm9PVIB5d3Pw3Fn4IaAiLw/E368/PCCgO2Xx55+bmP7FwREBDWFTzf+xtHmisfnxwZTqdvnu96b8WxuBO+fLO/fU+FsPYm05/en31858tRvLv/7bhv1x2BDSEZTXXjzDWAb2zOCUL53ja4Dvv8eXlMq6tP0O5vzWM9c95aDocAhrCsprrJ1lXAV0cjXf/9/zxv0z5uhfu75375P7e6hmkxSf0792aP/7X5RdGF4v5D4tf/Lc9RjIYAhpCqebqk7RVQDdf8LrGowssVnD+v6wjuRnGzen7PK3kgICGsKpmqWX56f5L/njpCrZfpPH48rqZy0eki5W8+j9b/nt9BxDQEFYBLY8oyk/3H1vwnDzmy/+OrmewaObG4lduLn989b/yn9jhENAQNs8cLR5vrgO6PjAEFPPV483yk+Vj0YOAzv/8N+Wn75HQoRDQEDadvDZ9n0egeMJWQM2XPR//9+Urmd5/2j8EAQIawqaTi/Px3/gaKKz9gD7t/fCP/5WRDIaAhrD/QPPO9K/2eBYexn5AF8NY/Wz5X9bNa+sPfhdqBDSEg8/Ur62+uLV6HehfrvA6UMy3E/no4vT89fn8z3uLR6LLKzUtfv7gMv+VHQwBDeEgoIty8k4kGFuPMdfDmL43P3gn0qt8nXwoBDSEreeKNhff4b3w2Lf9SfrqvfD/ePDzv/qPfAI/GAIKAJUIKABUIqAAUImAAkAlAgoAlQgoAFQioABQiYACQCUCCgCVCCgAVCKgAFCJgAJAJQIKAJUIKABUIqAAUImAAkAlAgoAlQgoAFQioABQiYACQCUCCgCVCCgAVCKgAFCJgAJAJQIKAJUIKABUIqAAUImAAkAlAgoAlQgoAFQioABQiYACQCUCCgCVCCgAVCKgAFCJgAJAJQIKAJUIKABUIqAAUImAAkAlAgoAlQgoAFQioABQiYACQCUCCgCVCCgAVCKgAFCJgAJAJQIKAJUIKABUIqAAUOn/A71FEGOQyBlxAAAAAElFTkSuQmCC">
             <a:extLst>
               <a:ext uri="{FF2B5EF4-FFF2-40B4-BE49-F238E27FC236}">
-                <a16:creationId xmlns="" xmlns:a16="http://schemas.microsoft.com/office/drawing/2014/main" id="{8CC047BC-7FEC-4EB1-BCEA-02FB6A9AD576}"/>
+                <a16:creationId xmlns:a16="http://schemas.microsoft.com/office/drawing/2014/main" id="{8CC047BC-7FEC-4EB1-BCEA-02FB6A9AD576}"/>
               </a:ext>
             </a:extLst>
           </p:cNvPr>
@@ -6251,7 +6247,7 @@
           <p:cNvPr id="5" name="AutoShape 2" descr="data:image/png;base64,iVBORw0KGgoAAAANSUhEUgAABUAAAAPACAMAAADDuCPrAAABYlBMVEUAAAAAADoAAGYAOjoAOmYAOpAAZrYzMzM6AAA6OgA6Ojo6OmY6ZmY6ZpA6ZrY6kLY6kNtNTU1NTW5NTY5Nbm5Nbo5NbqtNjshmAABmADpmOgBmOjpmZjpmZmZmZpBmkGZmkLZmkNtmtttmtv9uTU1ubk1ubm5ubo5ujqtujshuq8huq+SOTU2Obk2Obm6Oq8iOyOSOyP+QOgCQOjqQZjqQZmaQZpCQkGaQkLaQtraQttuQ2/+rbk2rjk2rjm6rq8iryOSr5Mir5P+2ZgC2Zjq2kDq2kGa2kJC2tpC2tra2ttu229u22/+2///Ijk3Ijm7Iq27Iq6vIyKvI5KvI5OTI5P/I///bkDrbkGbbtmbbtpDbtrbb27bb29vb2//b/7bb///kq27kyI7kyKvk5P/k///r6+v8jVn/tmb/yI7/25D/27b/29v/5Kv/5Mj/5OT//7b//7///8j//9v//+T///+zjZs9AAAACXBIWXMAAB2HAAAdhwGP5fFlAAAgAElEQVR4nO3d/59b5ZnecU0wMDGEILMYh0CWwmwDxaSLN3S7xHW3mGQXkni3aY0TEijO1q2/YMe1rP+/0iNpRnPbM+fMM9e5n3PffN4/xB472Eiv6/mgGUlnJnMAQJVJ638BAIiKgAJAJQIKAJUIKABUIqAAUImAAkAlAgoAlQgoAFQioABQiYACQCUCCgCVCCgAVCKgAFCJgAJAJQIKAJVGENDZl298fzKZ7Lzw8Ten/rNuT570zvzhhcnOLwT/pgCwrXlAZ7/aPWjdS6dNKAEF4Kd1QO+9fih2p+0cAQXgp3FA7y4ffu689dXip9/+6vuCgh78ud/7reRPAoCjtA3o4qHh1ufts1/KCkpAAQyvbUCvLor59tbHy8/An1P8wQQUwPCaBnT5CfzLh37lRvmapeRPJqAABtY0oItcmswtP6d/rvzGwQPRq5vK3vv5Irg7P/jNwT/9zuzT3cnOC09+1n84oJsnka4ufyh/ygsfL3/9yx8vev3Cr/f/f+YvAIBjtQzo7NKTn7Cvmroo3n7/NvWbfWpe7LQM6NUjnro/OqA31n/Iywd/4PpB8BN/AQAcq2VAlw837efrt1c9vHrwO4tfefabVW03VtVdpPBs+fDZJ3t3ZED/fv8Pefvq4ddOPfkXAMCxWgZ0UbknHjyuo3r7IGLrli4fOb709Xz+7aebx4zlseQPv5l/+/VT/+inBnRh+Rn6l4tP1Z+Z7Lz9zeqZ/+fmT/0LAOBYLQN6+ymffS8D+vJ866Xv68/mtx6t3l5/5fTGMaE7OqAvb/6MzV9wdfUQ9il/AQAca6QBXdZxlbr180nbTysdPCY98kWjRwZ0/aubv2a+/yWCp/wFAHCssQZ0UcDypc3lVyaXMdtu2u39xj7lq58rRwb0uYO/5p1D/9en/AUAcKyRfg10Gc7ye+uQbj/Ds3mW58YxT/YcGdCXD//K/v/1aX8BABxrbM/C70f19qFP5W3f7Cfd1qkDeuRjWwDYGOfrQOclcYuIbR6IElAA4zPOdyItlbcNbV7OtPlSqPmntQHliSMAJ9I0oFu5XNt6L3z5HH7/qZ2rTz6vIw3o0/4CADhW26sx2Zdy3t765HnxmPDZ/7X/ls7tp9xv7H95VBjQp/wFAHCstgEtX3k8eOf5jcn2C5tulDderku2deGmzfNM2oA+5S8AgGM1viL9veUVlQ9dkf7gC5Grq9VvSrZ8F9GZX6+/h9LmvZfCgD7lLwCAY435eyJd3X42fPtp8lUbxQF98i8AgGO1Duih78q5c/g6crcn28+Mz36++b+dWV2wUxzQJ/8CADhW84AufPnz5Sfvz7xovy/89lVBl/60vN7x+lrIc31An/gLAOBYYwgoAIREQAGgEgEFgEoEFAAqEVAAqERAAaASAQWASgQUACoRUACoREABoBIBBYBKBBQAKhFQAKhEQAGgEgEFgEoEFAAqEVAAqNQwoP8HEtyT6MRIVEzFCGh43JPoxEhUTMUIaHjck+jESFRMxQhoeNyT6MRIVEzFCGh43JPoxEhUTMUIaHjck+jESFRMxQhoeNyT6MRIVEzFCGh43JPoxEhUTMUIaHjck+jESFRMxQhoeNyT6MRIVEzFCGh43JPoxEhUTMUIaHjck+jESFRMxQhoeNyT6MRIVEzFCGh43JPoxEhUTMUIaHjck+jESFRMxQhoeNyT6MRIVEzFCGh43JPoxEhUTMUIaHjck+jESFRMxQhoeNyT6MRIVEzFCGh43JPoxEhUTMUIaHjck+jESFRMxQhoeNyT6MRIVEzFCGh43JPoxEhUTMUIaHjck+jESFRMxQhoeNyT6MRIVEzFCGh43JPoxEhUTMUIaHjck+jESFRMxQhoeNyT6MRIVEzFCGh43JPoxEhUTMUIaHjck+jESFRMxQhoeNyT6MRIVEzFCGh43JPoxEhUTMUIaHjck+jESFRMxQhoeNyT6MRIVEzFCGh43JPoxEhUTMUIaHjck+jESFRMxQhoeNyT6MRIVEzFUgX0/+I7RL+fxAioiqkYAUVQ+v0kRkBVTMUIKILS7ycxAqpiKkZAEZR+P4kRUBVTMQKKoPT7SYyAqpiKEVAEpd9PYgRUxVSMgCIo/X4SI6AqpmIEFEHp95MYAVUxFSOgCEq/n8QIqIqpGAFFUPr9JEZAVUzFCCiC0u8nMQKqYipGQBGUfj+JEVAVUzECiqD0+0mMgKqYihFQBKXfT2IEVMVUjIAiKP1+EiOgKqZiBBRB6feTGAFVMRUjoAhKv5/ECKiKqRgBRVD6/SRGQFVMxQgogtLvJzECqmIqRkARlH4/iRFQFVMxAoqg9PtJjICqmIoRUASl309iBFTFVIyAIij9fhIjoCqmYgQUQen3kxgBVTEVI6AISr+fxAioiqkYAUVQ+v0kRkBVTMUIKILS7ycxAqpiKkZAEZR+P4kRUBVTMQKKoPT7SYyAqpiKEVAEpd9PYgRUxVSMgCIo/X4SI6AqpmKnDeiji6+tf/b4yt50+u71rg8IKDT0+0mMgKqIA3pt+tqmpNOlV744/gMCChH9fhIjoCrSgD6+Nt0E9Nr0/PX5g8vT87eO/YCAQkS/n8QIqIoyoP/2wXQT0Pt75RHmo4vnPjnuAwIKFf1+EiOgKsKA3pxO3/vzOqA39398/7gPCChU9PtJjICqKAP66j/O76zzeG36YfmxfHz0BwQUKvr9JEZAVYQB3cri48vrT9Dv752/dfQHq3/m+ZVT/s1P0fpIw5N+P8BJEVAEpd8PcFL6gL7yxdEfHPpH9Y+uWx9peNLvJzE+hVcZPKDdj0AJKAT0+0mMgKoQUOSg309iBFRlmIDyLDy86feTGAFVGSigm1d5rl/6edQHBBQq+v0kRkBVBgoo70SCM/1+EiOgKgMF9PHl6av773g/+gMCChX9fhIjoCoDBXT+YPuaS0d/QEAhot9PYgRUZaiAzh9cWVTy3VtdHxBQaOj3kxgBVREH9BT0t631kYYn/X4SI6AqpmIEFEHp95MYAVUxFSOgCEq/n8QIqIqpGAFFUPr9JEZAVUzFCCiC0u8nMQKqYipGQBGUfj+JEVAVUzECiqD0+0mMgKqYihFQBKXfT2IEVMVUjIAiKP1+EiOgKqZiBBRB6feTGAFVMRUjoAhKv5/ECKiKqRgBRVD6/SRGQFVMxQgogtLvJzECqmIqRkARlH4/iRFQFVMxAoqg9PtJjICqmIoRUASl309iBFTFVIyAIij9fhIjoCqmYgQUQen3kxgBVTEVI6AISr+fxAioiqkYAUVQ+v0kRkBVTMUIKILS7ycxAqpiKkZAEZR+P4kRUBVTMQKKoPT7SYyAqpiKEVAEpd9PYgRUxVSMgCIo/X4SI6AqpmIEFEHp95MYAVUxFSOgCEq/n8QIqIqpGAFFUPr9JEZAVUzFCCiC0u8nMQKqYipGQBGUfj+JEVAVUzECiqD0+0mMgKqYihFQBKXfT2IEVMVUjIAiKP1+EiOgKqZiBBRB6feTGAFVMRUjoAhKv5/ECKiKqRgBRVD6/SRGQFVMxQgogtLvJzECqmIqRkARlH4/iRFQFVMxAoqg9PtJjICqmIoRUASl309iBFTFVIyAIij9fhIjoCqmYgQUQen3kxgBVTEVI6AISr+fxAioiqkYAUVQ+v0kRkBVTMUIKILS7ycxAqpiKkZAEZR+P4kRUBVTMQKKoPT7SYyAqpiKEVAEpd9PYgRUxVSMgCIo/X4SI6AqpmIEFEHp95MYAVUxFSOgCEq/n8QIqIqpGAFFUPr9JEZAVUzFCCiC0u8nMQKqYipGQBGUfj+JEVAVUzECiqD0+0mMgKqYihFQBKXfT2IEVMVUjIAiKP1+EiOgKqZiBBRB6feTGAFVMRUjoAhKv5/ECKiKqRgBRVD6/SRGQFVMxQgogtLvJzECqmIqRkARlH4/iRFQFVMxAoqg9PtJjICqmIoRUASl309iBFTFVIyAIij9fhIjoCqmYgQUQen3kxgBVTEVI6AISr+fxAioiqkYAUVQ+v0kRkBVTMUIKILS7ycxAqpiKkZAEZR+P4kRUBVTMQKKoPT7SYyAqpiKEVAEpd9PYgRUxVSMgCIo/X4SI6AqpmIEFEHp95MYAVUxFSOgCEq/n8QIqIqpGAFFUPr9JEZAVUzFCCiC0u8nMQKqYipGQBGUfj+JEVAVU7GGAdVrfaThqfXaAB6BIiz9fhLjEaiKqRgBRVD6/SRGQFVMxQgogtLvJzECqmIqRkARlH4/iRFQFVMxAoqg9PtJjICqmIoRUASl309iBFTFVIyAIij9fhIjoCqmYgQUQen3kxgBVTEVI6AISr+fxAioiqkYAUVQ+v0kRkBVTMUIKILS7ycxAqpiKkZAEZR+P4kRUBVTMQKKoPT7SYyAqpiKEVAEpd9PYgRUxVSMgCIo/X4SI6AqpmIEFEHp95MYAVUxFSOgCEq/n8QIqIqpGAFFUPr9JEZAVUzFCCiC0u8nMQKqYipGQBGUfj+JEVAVUzECiqD0+0mMgKqYihFQBKXfT2IEVMVUjIAiKP1+EiOgKqZiBBRB6feTGAFVMRUjoAhKv5/ECKiKqRgBRVD6/SRGQFVMxQgogtLvJzECqmIqRkARlH4/iRFQFVMxAoqg9PtJjICqmIoRUASl309iBFTFVIyAIij9fhIjoCqmYgQUQen3kxgBVTEVI6AISr+fxAioiqkYAUVQ+v0kRkBVTMUIKILS7ycxAqpiKkZAEZR+P4kRUBVTMQKKoPT7SYyAqpiKEVAEpd9PYgRUxVSMgCIo/X4SI6AqpmIEFEHp95MYAVUxFSOgCEq/n8QIqIqpGAFFUPr9JEZAVUzFCCiC0u8nMQKqYipGQBGUfj+JEVAVUzECiqD0+0mMgKqYihFQBKXfT2IEVMVUjIAiKP1+EiOgKqZiBBRB6feTGAFVMRUjoAhKv5/ECKiKqRgBRVD6/SRGQFVMxQgogtLvJzECqmIqRkARlH4/iRFQFVMxAoqg9PtJjICqmIoRUASl309iBFTFVIyAIij9fhIjoCqmYgQUQen3kxgBVTEVI6AISr+fxAioiqkYAUVQ+v0kRkBVTMUIKILS7ycxAqpiKkZAEZR+P4kRUBVTMQKKoPT7SYyAqpiKEVAEpd9PYgRUxVSMgCIo/X4SI6AqpmIEFEHp95MYAVUxFSOgCEq/n8QIqIqpGAFFUPr9JEZAVUzFCCiC0u8nMQKqYipGQBGUfj+JEVAVUzECiqD0+0mMgKqYihFQBKXfT2IEVMVUjIAiKP1+EiOgKqZiBBRB6feTGAFVMRUjoAhKv5/ECKiKqRgBRVD6/SRGQFVMxQgogtLvJzECqmIqRkARlH4/iRFQFVMxAoqg9PtJjICqmIoRUASl309iBFTFVIyAIij9fhIjoCqmYgQUQen3kxgBVTEVI6AISr+fxAioiqmYKKCPL083XvliPn908eDni9+8sjedvnudgEJJv5/ECKiKS0Dv720FdF3TVUwJKET0+0mMgKoME9CN+3vnPln8cGf62sGvXZuevz5/cHl6/hYBhY5+P4kRUJVBA7p4IPr+qpnvbzV1/Ti0pJWAQkS/n8QIqMqgAb25epj5+PJWLG+uH43e3IoqAcWp6feTGAFVGTKgjy5OP1z9eP53H0ynP72+/ODa6tcOf1pPQHFa+v0kRkBVhgzo5sHm5jmkZTr3H43e39t8EfT5FeXfvNL6SMOTfj/ASSkDuv9lzjvT6Xu35n+5Ml18TEAxDP1+gJNSBvTO5on2zSPR5XNJWwE1L2TSP7pufaThSb+fxPgUXmW4gD6+vP5q56GiPuURKAGFgH4/iRFQleEC+sRDzPIrBBTD0O8nMQKqMlxAn3iafdVMnoXHIPT7SYyAqgwX0P1Xz+9/Ll+auXn9J68DhZR+P4kRUJXBArr16vlrqwebq5DyTiQMQr+fxAioymABfXRx/0ug9/eWL2N68EF5Vn6R0Vd5Lzzk9PtJjICqDBbQ7SeJbq4vxnR9+cEDrsaEAej3kxgBVRksoHe2H2I++Nl0eu699ccPriz6+e4t+w/ob1vrIw1P+v0kRkBVBgvoielvW+sjDU/6/SRGQFVMxQgogtLvJzECqmIqRkARlH4/iRFQFVMxAoqg9PtJjICqmIoRUASl309iBFTFVKwjoLM/fvY5AcUY6feTGAFV6RvQe//pm/n84euTyeTMLwgoxke/n8QIqErPgN6YfO+38/nVydLyZwQUI6PfT2IEVKVfQG+XbN7dnTz7zb0Lk5cJKEZHv5/ECKhKv4BeXZRzmdGdXyz/d/lzAopx0e8nMQKq0iugs0vLcq4z+vDCMJ/D629b6yMNT/r9JEZAVXoFdNXMhxcmz80JKMZJv5/ECKjKCQJ6d3fyDgHFSOn3kxgBVekV0NWn8DfKl0D5GihGSb+fxAioSq+Azq9Onls+/b4sJ8/CY5T0+0mMgKr0C+jt8gLQxWfws59PVo9DCSjGRb+fxAioSr+ALj59X3iuPJG0884g/SSgOBX9fhIjoCo9Azq/99FPPl788PBHP/jNMP0koDgV/X4SI6AqfQM6PP1ta32k4Um/n8QIqIqp2LEBnX09YD8JKE5Fv5/ECKiKqdjRAf3yx8v3wz/80VuDvIaJgOKU9PtJjICq9Azo7NPVdZgeXpicGeZiTAQUp6LfT2IEVKVnQK9OJmf+evd7v5393WSg19ETUJyKfj+JEVCVfgG9PZm8vX4P5x9Wb+gkoBgX/X4SI6Aq/QJ6dfnuo/Wb4G+US4oQUIyLfj+JEVCVXgFdvRd+HdC7u1xMBOOj309iBFSlV0A3l7Mr5eRqTBgj/X4SI6AqBBQ56PeTGAFV6RXQ2aXlE0frcnI5O4yRfj+JEVCVXgFdPXG0CugipjyJhPHR7ycxAqrSL6B3dycvfVMCeu91LmeHMdLvJzECqtIvoOVydmd3d178/uLHYa6nTEBxKvr9JEZAVXoGdP773cnaQP0koDgV/X4SI6AqfQM6//ZXZxf1fGawy4ESUJyKfj+JEVCV3gEdnP62tT7S8KTfT2IEVMVUjOuBIij9fhIjoCqmYlwPFEHp95MYAVXpGVCuB4qR0+8nMQKq0jOgXA8UI6ffT2IEVKVfQLkeKMZOv5/ECKhKv4ByPVCMnX4/iRFQlV4B5XqgGD39fhIjoCq9Asrl7DB6+v0kRkBVCChy0O8nMQKq0iugXA8Uo6ffT2IEVKVXQLkeKEZPv5/ECKhKv4ByPVCMnX4/iRFQlX4B5XqgGDv9fhIjoCo9A8r1QDFy+v0kRkBV+gaU64Fi3PT7SYyAqvQO6OD0t631kYYn/X4SI6AqpmIEFEHp95MYAVUxFTvihfQ/emnQaykTUJyafj+JEVCVfgG9MJk8M9iVlAkoBPT7SYyAqvQK6OpyypMzHw/ZUP1ta32k4Um/n8QIqEqvgC786celoS98TEAxSvr9JEZAVfoGdL76rkgLQ72QSX/bWh9peNLvJzECqnKCgC4+lf/y9WVCd94a4ikl/W1rfaThSb+fxAioyokCuvDtz8tbkl7QPwzV37bWRxqe9PtJjICqnCigs199f/OGzslLBBRjot9PYgRUpX9AN/VcPhf/7af698Trb1vrIw1P+v0kRkBVegZ0/dXPg1eD6i+rrL9trY80POn3kxgBVekV0NmliX3ySP+NPfS3rfWRhif9fhIjoCq9Arp8J9LO4ZcvPbzAI1CMiX4/iRFQlZ4B/cGvzS/NPle/lEl/21ofaXjS7ycxAqrSK6Au9Let9ZGGJ/1+EiOgKqZiBBRB6feTGAFVMRXruCL9ztlB3oREQHFq+v0kRkBV+gb0xv4r6PmeSBgj/X4SI6AqPQO67OczL775Bt+VEyOl309iBFSlX0Dv7k6eXb2K6d4lvi88xki/n8QIqEq/gF49eN/R7NLkOQKK0dHvJzECqtIroLNLW4867+6qX0JPQHF6+v0kRkBVegX00Ps29W/iJKA4Pf1+EiOgKgQUOej3kxgBVekV0NmlyTv7H+ivw0RAcXr6/SRGQFV6BZQnkTB6+v0kRkBV+gX07u7kzOpyIn96nZcxYYz0+0mMgKr0C+jqjUhnz54d8q1Icq2PNDy1XhtwzFs5/7C7fifnztsD/dX6/zi0PtLwpN9PYjwCVekb0PnsyzcWj0Bf/HiQJ5AIKE5Lv5/ECKhK74AOTn/bWh9peNLvJzECqmIqRkARlH4/iRFQFVMxG9DZR28+6Se8DhSjo99PYgRUpSOgy28n9wTeiYTx0e8nMQKqQkCRg34/iRFQlY6AOtLfttZHGp70+0mMgKqYihFQBKXfT2IEVMVU7PiAfjVcPgkoTke/n8QIqIqp2NEB/fLH5X1IP/gNAcUY6feTGAFV6RnQ2aX9p5BeGui9SPrb1vpIw5N+P4kRUJV+AV32c+fFf/jsn97YnQx0NTsCilPR7ycxAqrSL6A3JpMfrh54zn452bq4MgHFWOj3kxgBVekV0MUD0INr2F3lgsoYIf1+EiOgKr0C+vDCoe/KyQvpMT76/SRGQFV6BpRvKoeR0+8nMQKq0iugfF94jJ5+P4kRUJVeAZ3f2Pq65w2+BooR0u8nMQKq0i+gs0v7L/+8MdC1RAgoTkW/n8QIqEqvgM4+Wr7+88W3Pvvn5Y8vDHNVUP1ta32k4Um/n8QIqEqvgLpc1E5/21ofaXjS7ycxAqpCQJGDfj+JEVCVXgF1ob9trY80POn3kxgBVTEVI6AISr+fxAioiqkYAUVQ+v0kRkBVTMWODugfP9v3OS+kx+jo95MYAVXpGdDf7/JN5TBq+v0kRkBV+gX0Nt+VEyOn309iBFSlV0BnlyY7H3+17+sh+klAcSr6/SRGQFV6BfThhYEuokxAoaLfT2IEVKVnQAd6/zsBhYp+P4kRUJVeAZ1dIqAYOf1+EiOgKr0COr/Bp/AYOf1+EiOgKv0Ceuh7ehBQjJB+P4kRUJV+AZ3fuzA58+aG+kJ2BBSnp99PYgRUpWdAP+V1oBg3/X4SI6Aq/QJ6gxfSY+T0+0mMgKr0Cmh5If0gn7cTUIjo95MYAVXpFVCP55AIKE5Fv5/ECKhKz4DyOlCMnH4/iRFQlV4B5YX0GD39fhIjoCq9Ajq/MXmZgGLU9PtJjICq9Avo7NLO2wQUY6bfT2IEVKVXQGcfvTGZ7LzIC+kxXvr9JEZAVXoF1HxbY14HivHR7ycxAqpCQJGDfj+JEVCVXgF1ob9trY80POn3kxgBVTEVI6AISr+fxAioiqkYAUVQ+v0kRkBVTMVsQGd/tN8F/uGPz77A10AxOvr9JEZAVToC+vDC6imj2UebFy9tfoWAYlT0+0mMgKr0DOhBNgkoRkm/n8QIqAoBRQ76/SRGQFUIKHLQ7ycxAqpCQJGDfj+JEVAVAooc9PtJjICqEFDkoN9PYgRUhYAiB/1+EiOgKgQUOej3kxgBVSGgyEG/n8QIqAoBRQ76/SRGQFUIKHLQ7ycxAqrSHdAnEVCMj34/iRFQFQKKHPT7SYyAqnQEdPbRm0/im8phfPT7SYyAqnQE1JH+trU+0vCk309iBFTFVIyAIij9fhIjoCqmYgQUQen3kxgBVTEVI6AISr+fxAioiqkYAUVQ+v0kRkBVTMUIKILS7ycxAqpiKkZAEZR+P4kRUBVTMQKKoPT7SYyAqpiKEVAEpd9PYgRUxVTsiXciXdr5xeKHb78moBg3/X4SI6AqHQF9eGH5xvfV/xJQjJh+P4kRUJXOgC4fgRJQjJ5+P4kRUJWOgM4uTZ79/Ks/Xfjer786MMzn8/rb1vpIw5N+P4kRUJWOgM5vcDk7hKDfT2IEVKUroLNP6wL66OK0eOWL5UePr+xNp+9eX/3WoQ8IKDT0+0mMgKp0BXSR0K8+++fdnX/47MDnPa4Hen9vK6Drmq5ieugDAgoR/X4SI6Aq3QGdVz2JdGf62sEH16bnr88fXJ6ev2U/IKAQ0e8nMQKq0iugs49OfBH6a9P3939+f2/9OPTcJ+YDAgoV/X4SI6AqvQJ6co8vb/Xx5vrR6M1lVA99QEChot9PYgRUpXdAv/3V2clk5+xb/V7D9Oji+d99MJ3+9Pryg2vTD8svlk/rD31AQKGi309iBFSlb0APXs70cp+Abp5DWtZy/9Ho/b3ztw59sPr/Pr/S5489mdZHGp70+wFO6qiALvv5zItvvvH9ngW9M52+d2v+lyvTRS4JKBzo9wOc1BEBvbs7efY35Wf3Lk3K5UU6bL7SuXwuaauZr3xx6IND/4j+0XXrIw1P+v0kxqfwKv0CenXy7OZp+NmlyXPdAd24MzUPOp/yCJSAQkC/n8QIqEqvgK4vardyd/fZ/q9pMg86CSiGot9PYgRUpVdAD72Q/kSvqi+Z5Fl4DE+/n8QIqMowAX18eTuTm5d8rl8HuvUBAYWKfj+JEVCVXgGdXZq8s//B7UmPT+GvrR5frkLKO5EwPP1+EiOgKr0CevInke7vLV/G9OCD8o73RUZf3X/7+6EPCChU9PtJjICq9Avo3d3JmV+Xn/3p9V4vY1p8hr665tL15QcPti/A9ICrMWEA+v0kRkBV+gV09Uaks2fP9n4r0vzBz6bTc++tH2U+uLJI5rtP+4CAQkO/n8QIqErPgM7/sLt+J+fO2736eXL629b6SMOTfj+JEVCVvgGdz758Y/EI9MWPT3pdOwIKF/r9JEZAVXoHdHD629b6SMOTfj+JEVAVUzECiqD0+0mMgKqYihFQBKXfT2IEVMVUjIAiKP1+EiOgKqZiBBRB6feTGAFVMRUjoAhKv5/ECKiKqRgBRVD6/SRGQFVMxQgogtLvJzECqmIqRkARlH4/iRFQFVOxo67G9IPfEFCMmn4/iRFQlV4BfXhh63qgBBRjpN9PYgRUpWdAT/BdPAgoWtDvJzECqtIroIe+qRwBxRjp95MYAVXpFdD5jc23hSegGCn9fhIjoCr9AvrtLyeTZ158c+0ng1zSTn/bWh9peJuln3QAABwGSURBVNLvJzECqtIroA8vTLYN8wVR/W1rfaThSb+fxAioCgFFDvr9JEZAVXoF1IX+trU+0vCk309iBFTFVIyAIij9fhIjoCqmYscGdPb1gP0koDgV/X4SI6AqpmJHB/TLHy+/+PnwR28N9V3l9Let9ZGGJ/1+EiOgKj0DOvt09ezRwwuTMwO9KUl/21ofaXjS7ycxAqrSM6BXJ5Mzf737vd/O/m4yeXaYx6D629b6SMOTfj+JEVCVfgG9PZm8vX5H/B92B7qwiP62tT7S8KTfT2IEVKVfQK9OXt6/pMiNyXMEFKOj309iBFSlV0BXFxNZB/TuLi+kx/jo95MYAVXpFdBVOtcBHeradvrb1vpIw5N+P4kRUBUCihz0+0mMgKr0Cujs0vKJo3U5bw/0NLz+trU+0vCk309iBFSlV0BXTxytArqIKU8iYXz0+0mMgKr0C+jd3clL35SA3nt9MtDV6fW3rfWRhif9fhIjoCr9Arp4CDqZnN3defH7ix9fHqSfBBSnot9PYgRUpWdA57/f3VwNdKB+ElCcin4/iRFQlb4BnX/7q7OLej4z3DeI19+21kcanvT7SYyAqvQO6OD0t631kYYn/X4SI6AqpmLHXw/0qwH7SUBxKvr9JEZAVUzFjr8e6AKfwmOc9PtJjICq9Azo7NL+t5R7aaArKutvW+sjDU/6/SRGQFX6BXTZz50X//Nn//TGoqDDvI6egOJU9PtJjICq9Avo7f1XL81+OeF6oBgh/X4SI6AqvQK6eAB68OrPq7yVEyOk309iBFSlV0AfXth6+ybXA8UY6feTGAFV6RnQrWZyOTuMkX4/iRFQlV4BXV2Rfu3uLpezw/jo95MYAVXpFdBD3wfpxkDvhtffttZHGp70+0mMgKr0C+jDC5MffrPp5zCfwRNQnIp+P4kRUJWOgM4+erN4Y/U60H9+c3cyefEnfAqP0dHvJzECqtIR0MVDzyfxJBLGR7+fxAioCgFFDpUj+X/4DpH2pegIqCP9bWt9pOGpciStjzQ8SftSmIoRUARVOZLWRxqepH0pTMUIKIKqHEnrIw1P0r4UpmJHB/SPn+37nGfhMTqVI2l9pOFJ2peiZ0APvqccTyJhlCpH0vpIw5O0L0W/gN7mWXiMXOVIWh9peJL2pegV0Nmlyc7HX+37eoh+ElCcSuVIWh9peJL2pegV0IcXBrqIMgGFSuVIWh9peJL2pegZ0IHe/05AoVI5ktZHGp6kfSl6BXR2iYBi5CpH0vpIw5O0L0WvgM5v8Ck8Rq5yJK2PNDxJ+1L0C+ih7+lBQDFClSNpfaThSdqXol9A5/cuTM68ucHl7DA+lSNpfaThSdqXomdAP+V1oBi3ypG0PtLwJO1L0S+gN3ghPUauciStjzQ8SftS9ApoeSH9IJ+3E1CIVI6k9ZGGJ2lfil4B9XgOiYDiVCpH0vpIw5O0L0XPgPI6UIxc5UhaH2l4kval6BVQXkiP0ascSesjDU/SvhS9AjrY94InoFCpHEnrIw1P0r4U/QI6u7TzNgHFmFWOpPWRhidpX4peAZ19VL4vPC+kx3hVjqT1kYYnaV+KXgE139yY14FifCpH0vpIw5O0LwUBRQ6VI2l9pOFJ2peiV0Bd6G9b6yMNT5UjaX2k4Unal8JUjIAiqMqRtD7S8CTtS2EqRkARVOVIWh9peJL2pTAVOyKg3361jW8qh/GpHEnrIw1P0r4UvQLq8iSSXusjDU+VI2l9pOFJ2pen4Vl4BFU5ktZHGp6kfSl6BXT2x8/W/v71yc4/fM4L6TE6lSNpfaThSdqXoldAt93dfXaYK4Pqb1vrIw1PlSNpfaThSdqX4sQBHezCIvrb1vpIw1PlSFofaXiS9qU4eUCHegiqv22tjzQ8VY6k9ZGGJ2lfipMHdKirK+tvW+sjDU+VI2l9pOFJ2pfi5AG9u0tAMT6VI2l9pOFJ2pfixAGdXZ3wKTzGp3IkrY80PEn7UvQK6OyjzaVA33xjd8KTSBihypG0PtLwJO1L0Sugh19Iz8uYMEKVI2l9pOFJ2pfixAF95q2BvkG8/ra1PtLwVDmS1kcanqR9KXoF1IX+trU+0vBUOZLWRxqepH0pTMUIKIKqHEnrIw1P0r4UpmIEFEFVjqT1kYYnaV8KUzECiqAqR9L6SMOTtC+FqZgN6NYLmA7wbY0xPpUjaX2k4Unal6IjoOZKoFwPFGNVOZLWRxqepH0pCChyqBxJ6yMNT9K+FB0Btb7cnfBOJIxR5UhaH2l4kvalOFFAZz9f5PPMbwbpJwHFqVSOpPWRhidpX4qTBPQPi4efO0O9EYmA4lQqR9L6SMOTtC9F/4AO+vCTgOKUKkfS+kjDk7QvRe+Aloef/26wfBJQnE7lSFofaXiS9qXoGdB7Az/8JKA4pcqRtD7S8CTtS9EvoIM//CSgOKXKkbQ+0vAk7UvRJ6D3Li2vAjrow08CilOqHEnrIw1P0r4UPQJaHn6+PXA+CShOp3IkrY80PEn7UnQG1OfhJwHFKVWOpPWRhidpX4qugP7e5+EnAcUpVY6k9ZGGJ2lfio6A8l54BFE5ktZHGp6kfSkIKHKoHEnrIw1P0r4UHQHleqAIonIkrY80PEn7UnQE1JH+trU+0vBUOZLWRxqepH0pTMUIKIKqHEnrIw1P0r4UpmIEFEFVjqT1kYYnaV8KUzECiqAqR9L6SMOTtC+FqRgBRVCVI2l9pOFJ2pfCVIyAIqjKkbQ+0vAk7UthKkZAEVTlSFofaXiS9qUwFSOgCKpyJK2PNDxJ+1KYihFQBFU5ktZHGp6kfSlMxQgogqocSesjDU/SvhSmYgQUQVWOpPWRhidpXwpTMQKKoCpH0vpIw5O0L4WpGAFFUJUjaX2k4Unal8JUjIAiqMqRtD7S8CTtS2EqRkARVOVIWh9peJL2pTAVI6AIqnIkrY80PEn7UpiKEVAEVTmS1kcanqR9KUzFCCiCqhxJ6yMNT9K+FKZiBBRBVY6k9ZGGJ2lfClMxAoqgKkfS+kjDk7QvhakYAUVQlSNpfaThSdqXwlSMgCKoypG0PtLwJO1LYSpGQBFU5UhaH2l4kvalMBUjoAiqciStjzQ8SftSmIoRUARVOZLWRxqepH0pTMUIKIKqHEnrIw1P0r4UpmIEFEFVjqT1kYYnaV8KUzECiqAqR9L6SMOTtC+FqRgBRVCVI2l9pOFJ2pfCVIyAIqjKkbQ+0vAk7UthKkZAEVTlSFofaXiS9qUwFSOgCKpyJK2PNDxJ+1KYihFQBFU5ktZHGp6kfSlMxQgogqocSesjDU/SvhSmYgQUQVWOpPWRhidpXwpTMQKKoCpH0vpIw5O0L4WpGAFFUJUjaX2k4Unal8JUjIAiqMqRtD7S8CTtS2EqRkARVOVIWh9peJL2pTAVI6AIqnIkrY80PEn7UpiKEVAEVTmS1kcanqR9KUzFCCiCqhxJ6yMNT9K+FKZiBBRBVY6k9ZGGJ2lfClMxAoqgKkfS+kjDk7QvhakYAUVQlSNpfaThSdqXwlSMgCKoypG0PtLwJO1LYSpGQBFU5UhaH2l4kvalMBUjoAiqciStjzQ8SftSmIrpAvpvP5tOz717vfz80cVp8coXy48eX9mbTte/Q0AhUjmS1kcanqR9KYYK6L+sknnuk+UH9/e2Arqu6SqmBBQilSNpfaThSdqXYqCA3pme+9v5/MHlVSfvTF87+K1r0/PXl79z/hYBhU7lSFofaXiS9qUYJqCPL08/XP64eLT5YWnm+/u/dX9v/Th09eCUgEKjciStjzQ8SftSDBPQRxfXn6GXdD6+vBXLm+tHoze3okpAcWqVI2l9pOFJ2pdimIDuKwF9dPH87z6YTn96ffUr5bHp4U/rCShOq3IkrY80PEn7Ugwb0NUn6pvnkJbp3H80en9v80XQ51e0f/NS6yMNT5UjaX2k4Unal6cRB3T1+fqd6fS9W/O/XFk+J09AMYzKkbQ+0vAk7cvTaAN6Z/Uyps2XPZefz28F1LyQSf/ouvWRhqfKkbQ+0vAk7UsxZEDv7J378HBPz996yiNQAgqBypG0PtLwJO1LMWBAb07NK5WWDzoJKIZROZLWRxqepH0phgvov9h+rprJs/AYROVIWh9peJL2pRgqoI+vTV9df41z86r6VTM3r//kdaCQqhxJ6yMNT9K+FEMF9NrWWzWvrR5srkLKO5EwiMqRtD7S8CTtSzFQQG9uv9X9/t7yZUwPPii/tsjoq7wXHnKVI2l9pOFJ2pdimIBurl+38FrJ6eoCTNeXv/eAqzFhAJUjaX2k4Unal2KYgN6ZHgro/MHy4qDvrR9yPriy+OV3b9l/Rn/bWh9peKocSesjDU/SvhTDBLSG/ra1PtLwVDmS1kcanqR9KUzFCCiCqhxJ6yMNT9K+FKZiBBRBVY6k9ZGGJ2lfClMxAoqgKkfS+kjDk7QvhakYAUVQlSNpfaThSdqXwlSMgCKoypG0PtLwJO1LYSpGQBFU5UhaH2l4kvalMBUjoAiqciStjzQ8SftSmIoRUARVOZLWRxqepH0pTMUIKIKqHEnrIw1P0r4UpmIEFEFVjqT1kYYnaV8KUzECiqAqR9L6SMOTtC+FqRgBRVCVI2l9pOFJ2pfCVIyAIqjKkbQ+0vAk7UthKkZAEVTlSFofaXiS9qUwFSOgCKpyJK2PNDxJ+1KYihFQBFU5ktZHGp6kfSlMxQgogqocSesjDU/SvhSmYgQUQVWOpPWRhidpXwpTMQKKoCpH0vpIw5O0L4WpGAFFUJUjaX2k4Unal8JUjIAiqMqRtD7S8CTtS2EqRkARVOVIWh9peJL2pTAVI6AIqnIkrY80PEn7UpiKEVAEVTmS1kcanqR9KUzFCCiCqhxJ6yMNT9K+FKZiBBRBVY6k9ZGGJ2lfClMxAoqgKkfS+kjDk7QvhakYAUVQlSNpfaThSdqXwlSMgCKoypG0PtLwJO1LYSpGQBFU5UhaH2l4kvalMBUjoAiqciStjzQ8SftSmIoRUARVOZLWRxqepH0pTMUIKIKqHEnrIw1P0r4UpmIEFEFVjqT1kYYnaV8KUzECiqAqR9L6SMOTtC+FqRgBRVCVI2l9pOFJ2pfCVIyAIqjKkbQ+0vAk7UthKkZAEVTlSFofaXiS9qUwFSOgCKpyJK2PNDxJ+1KYihFQBFU5ktZHGp6kfSlMxQgogqocSesjDU/SvhSmYgQUQVWOpPWRhidpXwpTMQKKoCpH0vpIw5O0L4WpGAFFUJUjaX2k4Unal8JUjIAiqMqRtD7S8CTtS2EqRkARVOVIWh9peJL2pTAVI6AIqnIkrY80PEn7UpiKEVAEVTmS1kcanqR9KUzFCCiCqhxJ6yMNT9K+FKZiBBRBVY6k9ZGGJ2lfClMxAoqgKkfS+kjDk7QvhakYAUVQlSNpfaThSdqXwlSMgCKoypG0PtLwJO1LYSpGQBFU5UhaH2l4kvalMBUjoAiqciStjzQ8SftSmIoRUARVOZLWRxqepH0pTMUIKIKqHEnrIw1P0r4UpmIEFEFVjqT1kYYnaV8KUzECiqAqR9L6SMOTtC+FqRgBRVCVI2l9pOFJ2pfCVIyAIqjKkbQ+0vAk7UthKkZAEVTlSFofaXiS9qUwFSOgCKpyJK2PNDxJ+1KYihFQBFU5ktZHGp6kfSlMxQgogqocSesjDU/SvhSmYgQUQVWOpPWRhidpXwpTMQKKoCpH0vpIw5O0L4WpGAFFUJUjaX2k4Unal8JUjIAiqMqRtD7S8CTtS2EqRkARVOVIWh9peJL2pTAVI6AIqnIkrY80PEn7UpiKEVAEVTmS1kcanqR9KUzFCCiCqhxJ6yMNT9K+FKZiBBRBVY6k9ZGGJ2lfClMxAoqgKkfS+kjDk7QvhakYAUVQlSNpfaThSdqXwlSMgCKoypG0PtLwJO1LYSpGQBFU5UhaH2l4kvalMBVrGFC91kcanipH0vpIw5O0L0/DI1AEVTmS1kcanqR9KUzFCCiCqhxJ6yMNT9K+FKZiBBRBVY6k9ZGGJ2lfClMxAoqgKkfS+kjDk7QvhakYAUVQlSNpfaThSdqXwlSMgCKoypG0PtLwJO1LYSpGQBFU5UhaH2l4kvalMBUjoAiqciStjzQ8SftSmIoRUARVOZLWRxqepH0pTMUIKIKqHEnrIw1P0r4UpmIEFEFVjqT1kYYnaV8KUzECiqAqR9L6SMOTtC+FqRgBRVCVI2l9pOFJ2pfCVIyAIqjKkbQ+0vAk7UthKkZAEVTlSFofaXiS9qUwFSOgCKpyJK2PNDxJ+1KYihFQBFU5ktZHGp6kfSlMxQgogqocSesjDU/SvhSmYgQUQVWOpPWRhidpXwpTMQKKoCpH0vpIw5O0L4WpGAFFUJUjaX2k4Unal8JUjIAiqMqRtD7S8CTtS2EqRkARVOVIWh9peJL2pTAVI6AIqnIkrY80PEn7UpiKEVAEVTmS1kcanqR9KUzFCCiCqhxJ6yMNT9K+FKZiBBRBVY6k9ZGGJ2lfClMxAoqgKkfS+kjDk7QvhakYAUVQlSNpfaThSdqXwlSMgCKoypG0PtLwJO1LYSpGQBFU5UhaH2l4kvalMBUjoAiqciStjzQ8SftSmIoRUARVOZLWRxqepH0pTMUIKIKqHEnrIw1P0r4UpmIEFEFVjqT1kYYnaV8KUzECiqAqR9L6SMOTtC+FqRgBRVCVI2l9pOFJ2pfCVIyAIqjKkbQ+0vAk7UthKkZAEVTlSFofaXiS9qUwFSOgCKpyJK2PNDxJ+1KYihFQBFU5ktZHGp6kfSlMxQgogqocSesjDU/SvhSmYgQUQVWOpPWRhidpXwpTMQKKoCpH0vpIw5O0L4WpGAFFUJUjaX2k4Unal8JUjIAiqMqRtD7S8CTtS2EqRkARVOVIWh9peJL2pTAVI6AIqnIkrY80PEn7UpiKEVAEVTmS1kcanqR9KUzFCCiCqhxJ6yMNT9K+FKZiBBRBVY6k9ZGGJ2lfClMxAoqgKkfS+kjDk7QvhakYAUVQlSNpfaThSdqXwlSMgCKoypG0PtLwJO1LYSpGQBFU5UhaH2l4kvalMBUjoAiqciStjzQ8SftSmIoRUARVOZLWRxqepH0pTMUIKIKqHEnrIw1P0r4UpmIEFEFVjqT1kYYnaV8KUzECiqAqR9L6SMOTtC+FqRgBRVCVI2l9pOFJ2pfCVIyAIqjKkbQ+0vAk7UthKkZAEVTlSFofaXiS9qUwFSOgCKpyJK2PNDxJ+1KYihFQBFU5ktZHGp6kfSlMxQgogqocSesjDU/SvhSmYgQUQVWOpPWRhidpXwpTMQKKoCpH0vpIw5O0L4WpGAFFUJUjaX2k4Unal8JUjIAiqMqRtD7S8CTtS2EqRkARVOVIWh9peJL2pTAVI6AIqnIkrY80PEn7UpiKEVAEVTmS1kcanqR9KUzFCCiCqhxJ6yMNT9K+FKZiBBRBVY6k9ZGGJ2lfClMxAoqgKkfS+kjDk7QvhakYAUVQlSNpfaThSdqXwlSMgCKoypG0PtLwJO1LYSpGQBFU5UhaH2l4kvalMBUjoAiqciStjzQ8SftSmIp5BPTxlb3p9N3rBBRKlSNpfaThSdqXwj+gjy5Ol175goBCqHIkrY80PEn7UvgH9Nr0/PX5g8vT87cIKHQqR9L6SMOTtC+Fe0Dv75XHno8unvuEgEKnciStjzQ8SftSuAf05vS19Y/vE1DoVI6k9ZGGJ2lfCveAXpt+WH68sw4pAYVE5UhaH2l4kval8A7o48vrT93v722+CPr8iv7van2k4alyJK2PNDxJ+/I0qQIKAJ48A2peyKR/dP3dxD2JToxEpWFAzeuYWt8TWXBPohMjUSGg2XBPohMjUfEOqOez8N9N3JPoxEhU3AO6ef2nw+tAv5u4J9GJkai4B9TxnUjfTdyT6MRIVNwD+vjy9FWn98J/N3FPohMjUXEP6PyB29WYvpu4J9GJkaj4B3T+4Mqin+/esr/c+p7IgnsSnRiJSoOAHqH1PZEF9yQ6MRIVUzECGh73JDoxEhVTMQIaHvckOjESFVMxAhoe9yQ6MRIVUzECGh73JDoxEhVTMQIaHvckOjESFVMxAhoe9yQ6MRIVUzECGh73JDoxEhVTMQIaHvckOjESFVMxAhoe9yQ6MRIVUzECGh73JDoxEhVTMQIaHvckOjESFVMxAhoe9yQ6MRIVUzECGh73JDoxEhVTMQIaHvckOjESFVMxAhoe9yQ6MRIVUzECGh73JDoxEhVTMQIaHvckOjESFVMxAhoe9yQ6MRIVUzECGh73JDoxEhVTMQIaHvckOjESFVMxAhoe9yQ6MRIVUzECGh73JDoxEhVTMQIaHvckOjESFVMxAhoe9yQ6MRIVUzECGh73JDoxEhVTMQIaHvckOjESFVOxhgGFxvPPt/43wOgxkoEQ0PA4G+jESAZCQMPjbKATIxkIAQ2Ps4FOjGQgBDQ8zgY6MZKBENDwOBvoxEgGQkDD42ygEyMZCAEFgEoEFAAqEVAAqERAAaASAQWASgQUACoRUACoREABoBIBDeHRxen7+z995Yum/y4Yk8eXp+dv7f/0w7b/Mt9BBDSERUDPfbL5KQHFgft7m/+23tlPKdwQ0BAWAZ2+tvkpAcWWm9PVIB5d3Pw3Fn4IaAiLw/E368/PCCgO2Xx55+bmP7FwREBDWFTzf+xtHmisfnxwZTqdvnu96b8WxuBO+fLO/fU+FsPYm05/en31858tRvLv/7bhv1x2BDSEZTXXjzDWAb2zOCUL53ja4Dvv8eXlMq6tP0O5vzWM9c95aDocAhrCsprrJ1lXAV0cjXf/9/zxv0z5uhfu75375P7e6hmkxSf0792aP/7X5RdGF4v5D4tf/Lc9RjIYAhpCqebqk7RVQDdf8LrGowssVnD+v6wjuRnGzen7PK3kgICGsKpmqWX56f5L/njpCrZfpPH48rqZy0eki5W8+j9b/nt9BxDQEFYBLY8oyk/3H1vwnDzmy/+OrmewaObG4lduLn989b/yn9jhENAQNs8cLR5vrgO6PjAEFPPV483yk+Vj0YOAzv/8N+Wn75HQoRDQEDadvDZ9n0egeMJWQM2XPR//9+Urmd5/2j8EAQIawqaTi/Px3/gaKKz9gD7t/fCP/5WRDIaAhrD/QPPO9K/2eBYexn5AF8NY/Wz5X9bNa+sPfhdqBDSEg8/Ur62+uLV6HehfrvA6UMy3E/no4vT89fn8z3uLR6LLKzUtfv7gMv+VHQwBDeEgoIty8k4kGFuPMdfDmL43P3gn0qt8nXwoBDSEreeKNhff4b3w2Lf9SfrqvfD/ePDzv/qPfAI/GAIKAJUIKABUIqAAUImAAkAlAgoAlQgoAFQioABQiYACQCUCCgCVCCgAVCKgAFCJgAJAJQIKAJUIKABUIqAAUImAAkAlAgoAlQgoAFQioABQiYACQCUCCgCVCCgAVCKgAFCJgAJAJQIKAJUIKABUIqAAUImAAkAlAgoAlQgoAFQioABQiYACQCUCCgCVCCgAVCKgAFCJgAJAJQIKAJUIKABUIqAAUImAAkAlAgoAlQgoAFQioABQiYACQCUCCgCVCCgAVCKgAFCJgAJAJQIKAJUIKABUIqAAUOn/A71FEGOQyBlxAAAAAElFTkSuQmCC">
             <a:extLst>
               <a:ext uri="{FF2B5EF4-FFF2-40B4-BE49-F238E27FC236}">
-                <a16:creationId xmlns="" xmlns:a16="http://schemas.microsoft.com/office/drawing/2014/main" id="{27CC6064-973B-4FF1-9446-C7722D5F572B}"/>
+                <a16:creationId xmlns:a16="http://schemas.microsoft.com/office/drawing/2014/main" id="{27CC6064-973B-4FF1-9446-C7722D5F572B}"/>
               </a:ext>
             </a:extLst>
           </p:cNvPr>
@@ -6296,7 +6292,7 @@
           <p:cNvPr id="6" name="AutoShape 4" descr="data:image/png;base64,iVBORw0KGgoAAAANSUhEUgAABUAAAAPACAMAAADDuCPrAAABYlBMVEUAAAAAADoAAGYAOjoAOmYAOpAAZrYzMzM6AAA6OgA6Ojo6OmY6ZmY6ZpA6ZrY6kLY6kNtNTU1NTW5NTY5Nbm5Nbo5NbqtNjshmAABmADpmOgBmOjpmZjpmZmZmZpBmkGZmkLZmkNtmtttmtv9uTU1ubk1ubm5ubo5ujqtujshuq8huq+SOTU2Obk2Obm6Oq8iOyOSOyP+QOgCQOjqQZjqQZmaQZpCQkGaQkLaQtraQttuQ2/+rbk2rjk2rjm6rq8iryOSr5Mir5P+2ZgC2Zjq2kDq2kGa2kJC2tpC2tra2ttu229u22/+2///Ijk3Ijm7Iq27Iq6vIyKvI5KvI5OTI5P/I///bkDrbkGbbtmbbtpDbtrbb27bb29vb2//b/7bb///kq27kyI7kyKvk5P/k///r6+v8jVn/tmb/yI7/25D/27b/29v/5Kv/5Mj/5OT//7b//7///8j//9v//+T///+zjZs9AAAACXBIWXMAAB2HAAAdhwGP5fFlAAAgAElEQVR4nO3d/59b5ZnecU0wMDGEILMYh0CWwmwDxaSLN3S7xHW3mGQXkni3aY0TEijO1q2/YMe1rP+/0iNpRnPbM+fMM9e5n3PffN4/xB472Eiv6/mgGUlnJnMAQJVJ638BAIiKgAJAJQIKAJUIKABUIqAAUImAAkAlAgoAlQgoAFQioABQiYACQCUCCgCVCCgAVCKgAFCJgAJAJQIKAJVGENDZl298fzKZ7Lzw8Ten/rNuT570zvzhhcnOLwT/pgCwrXlAZ7/aPWjdS6dNKAEF4Kd1QO+9fih2p+0cAQXgp3FA7y4ffu689dXip9/+6vuCgh78ud/7reRPAoCjtA3o4qHh1ufts1/KCkpAAQyvbUCvLor59tbHy8/An1P8wQQUwPCaBnT5CfzLh37lRvmapeRPJqAABtY0oItcmswtP6d/rvzGwQPRq5vK3vv5Irg7P/jNwT/9zuzT3cnOC09+1n84oJsnka4ufyh/ygsfL3/9yx8vev3Cr/f/f+YvAIBjtQzo7NKTn7Cvmroo3n7/NvWbfWpe7LQM6NUjnro/OqA31n/Iywd/4PpB8BN/AQAcq2VAlw837efrt1c9vHrwO4tfefabVW03VtVdpPBs+fDZJ3t3ZED/fv8Pefvq4ddOPfkXAMCxWgZ0UbknHjyuo3r7IGLrli4fOb709Xz+7aebx4zlseQPv5l/+/VT/+inBnRh+Rn6l4tP1Z+Z7Lz9zeqZ/+fmT/0LAOBYLQN6+ymffS8D+vJ866Xv68/mtx6t3l5/5fTGMaE7OqAvb/6MzV9wdfUQ9il/AQAca6QBXdZxlbr180nbTysdPCY98kWjRwZ0/aubv2a+/yWCp/wFAHCssQZ0UcDypc3lVyaXMdtu2u39xj7lq58rRwb0uYO/5p1D/9en/AUAcKyRfg10Gc7ye+uQbj/Ds3mW58YxT/YcGdCXD//K/v/1aX8BABxrbM/C70f19qFP5W3f7Cfd1qkDeuRjWwDYGOfrQOclcYuIbR6IElAA4zPOdyItlbcNbV7OtPlSqPmntQHliSMAJ9I0oFu5XNt6L3z5HH7/qZ2rTz6vIw3o0/4CADhW26sx2Zdy3t765HnxmPDZ/7X/ls7tp9xv7H95VBjQp/wFAHCstgEtX3k8eOf5jcn2C5tulDderku2deGmzfNM2oA+5S8AgGM1viL9veUVlQ9dkf7gC5Grq9VvSrZ8F9GZX6+/h9LmvZfCgD7lLwCAY435eyJd3X42fPtp8lUbxQF98i8AgGO1Duih78q5c/g6crcn28+Mz36++b+dWV2wUxzQJ/8CADhW84AufPnz5Sfvz7xovy/89lVBl/60vN7x+lrIc31An/gLAOBYYwgoAIREQAGgEgEFgEoEFAAqEVAAqERAAaASAQWASgQUACoRUACoREABoBIBBYBKBBQAKhFQAKhEQAGgEgEFgEoEFAAqEVAAqNQwoP8HEtyT6MRIVEzFCGh43JPoxEhUTMUIaHjck+jESFRMxQhoeNyT6MRIVEzFCGh43JPoxEhUTMUIaHjck+jESFRMxQhoeNyT6MRIVEzFCGh43JPoxEhUTMUIaHjck+jESFRMxQhoeNyT6MRIVEzFCGh43JPoxEhUTMUIaHjck+jESFRMxQhoeNyT6MRIVEzFCGh43JPoxEhUTMUIaHjck+jESFRMxQhoeNyT6MRIVEzFCGh43JPoxEhUTMUIaHjck+jESFRMxQhoeNyT6MRIVEzFCGh43JPoxEhUTMUIaHjck+jESFRMxQhoeNyT6MRIVEzFCGh43JPoxEhUTMUIaHjck+jESFRMxQhoeNyT6MRIVEzFCGh43JPoxEhUTMUIaHjck+jESFRMxQhoeNyT6MRIVEzFCGh43JPoxEhUTMUIaHjck+jESFRMxQhoeNyT6MRIVEzFCGh43JPoxEhUTMUIaHjck+jESFRMxQhoeNyT6MRIVEzFCGh43JPoxEhUTMUIaHjck+jESFRMxQhoeNyT6MRIVEzFUgX0/+I7RL+fxAioiqkYAUVQ+v0kRkBVTMUIKILS7ycxAqpiKkZAEZR+P4kRUBVTMQKKoPT7SYyAqpiKEVAEpd9PYgRUxVSMgCIo/X4SI6AqpmIEFEHp95MYAVUxFSOgCEq/n8QIqIqpGAFFUPr9JEZAVUzFCCiC0u8nMQKqYipGQBGUfj+JEVAVUzECiqD0+0mMgKqYihFQBKXfT2IEVMVUjIAiKP1+EiOgKqZiBBRB6feTGAFVMRUjoAhKv5/ECKiKqRgBRVD6/SRGQFVMxQgogtLvJzECqmIqRkARlH4/iRFQFVMxAoqg9PtJjICqmIoRUASl309iBFTFVIyAIij9fhIjoCqmYgQUQen3kxgBVTEVI6AISr+fxAioiqkYAUVQ+v0kRkBVTMUIKILS7ycxAqpiKkZAEZR+P4kRUBVTMQKKoPT7SYyAqpiKEVAEpd9PYgRUxVSMgCIo/X4SI6AqpmKnDeiji6+tf/b4yt50+u71rg8IKDT0+0mMgKqIA3pt+tqmpNOlV744/gMCChH9fhIjoCrSgD6+Nt0E9Nr0/PX5g8vT87eO/YCAQkS/n8QIqIoyoP/2wXQT0Pt75RHmo4vnPjnuAwIKFf1+EiOgKsKA3pxO3/vzOqA39398/7gPCChU9PtJjICqKAP66j/O76zzeG36YfmxfHz0BwQUKvr9JEZAVYQB3cri48vrT9Dv752/dfQHq3/m+ZVT/s1P0fpIw5N+P8BJEVAEpd8PcFL6gL7yxdEfHPpH9Y+uWx9peNLvJzE+hVcZPKDdj0AJKAT0+0mMgKoQUOSg309iBFRlmIDyLDy86feTGAFVGSigm1d5rl/6edQHBBQq+v0kRkBVBgoo70SCM/1+EiOgKgMF9PHl6av773g/+gMCChX9fhIjoCoDBXT+YPuaS0d/QEAhot9PYgRUZaiAzh9cWVTy3VtdHxBQaOj3kxgBVREH9BT0t631kYYn/X4SI6AqpmIEFEHp95MYAVUxFSOgCEq/n8QIqIqpGAFFUPr9JEZAVUzFCCiC0u8nMQKqYipGQBGUfj+JEVAVUzECiqD0+0mMgKqYihFQBKXfT2IEVMVUjIAiKP1+EiOgKqZiBBRB6feTGAFVMRUjoAhKv5/ECKiKqRgBRVD6/SRGQFVMxQgogtLvJzECqmIqRkARlH4/iRFQFVMxAoqg9PtJjICqmIoRUASl309iBFTFVIyAIij9fhIjoCqmYgQUQen3kxgBVTEVI6AISr+fxAioiqkYAUVQ+v0kRkBVTMUIKILS7ycxAqpiKkZAEZR+P4kRUBVTMQKKoPT7SYyAqpiKEVAEpd9PYgRUxVSMgCIo/X4SI6AqpmIEFEHp95MYAVUxFSOgCEq/n8QIqIqpGAFFUPr9JEZAVUzFCCiC0u8nMQKqYipGQBGUfj+JEVAVUzECiqD0+0mMgKqYihFQBKXfT2IEVMVUjIAiKP1+EiOgKqZiBBRB6feTGAFVMRUjoAhKv5/ECKiKqRgBRVD6/SRGQFVMxQgogtLvJzECqmIqRkARlH4/iRFQFVMxAoqg9PtJjICqmIoRUASl309iBFTFVIyAIij9fhIjoCqmYgQUQen3kxgBVTEVI6AISr+fxAioiqkYAUVQ+v0kRkBVTMUIKILS7ycxAqpiKkZAEZR+P4kRUBVTMQKKoPT7SYyAqpiKEVAEpd9PYgRUxVSMgCIo/X4SI6AqpmIEFEHp95MYAVUxFSOgCEq/n8QIqIqpGAFFUPr9JEZAVUzFCCiC0u8nMQKqYipGQBGUfj+JEVAVUzECiqD0+0mMgKqYihFQBKXfT2IEVMVUjIAiKP1+EiOgKqZiBBRB6feTGAFVMRUjoAhKv5/ECKiKqRgBRVD6/SRGQFVMxQgogtLvJzECqmIqRkARlH4/iRFQFVMxAoqg9PtJjICqmIoRUASl309iBFTFVIyAIij9fhIjoCqmYgQUQen3kxgBVTEVI6AISr+fxAioiqkYAUVQ+v0kRkBVTMUIKILS7ycxAqpiKkZAEZR+P4kRUBVTMQKKoPT7SYyAqpiKEVAEpd9PYgRUxVSMgCIo/X4SI6AqpmIEFEHp95MYAVUxFSOgCEq/n8QIqIqpGAFFUPr9JEZAVUzFCCiC0u8nMQKqYipGQBGUfj+JEVAVU7GGAdVrfaThqfXaAB6BIiz9fhLjEaiKqRgBRVD6/SRGQFVMxQgogtLvJzECqmIqRkARlH4/iRFQFVMxAoqg9PtJjICqmIoRUASl309iBFTFVIyAIij9fhIjoCqmYgQUQen3kxgBVTEVI6AISr+fxAioiqkYAUVQ+v0kRkBVTMUIKILS7ycxAqpiKkZAEZR+P4kRUBVTMQKKoPT7SYyAqpiKEVAEpd9PYgRUxVSMgCIo/X4SI6AqpmIEFEHp95MYAVUxFSOgCEq/n8QIqIqpGAFFUPr9JEZAVUzFCCiC0u8nMQKqYipGQBGUfj+JEVAVUzECiqD0+0mMgKqYihFQBKXfT2IEVMVUjIAiKP1+EiOgKqZiBBRB6feTGAFVMRUjoAhKv5/ECKiKqRgBRVD6/SRGQFVMxQgogtLvJzECqmIqRkARlH4/iRFQFVMxAoqg9PtJjICqmIoRUASl309iBFTFVIyAIij9fhIjoCqmYgQUQen3kxgBVTEVI6AISr+fxAioiqkYAUVQ+v0kRkBVTMUIKILS7ycxAqpiKkZAEZR+P4kRUBVTMQKKoPT7SYyAqpiKEVAEpd9PYgRUxVSMgCIo/X4SI6AqpmIEFEHp95MYAVUxFSOgCEq/n8QIqIqpGAFFUPr9JEZAVUzFCCiC0u8nMQKqYipGQBGUfj+JEVAVUzECiqD0+0mMgKqYihFQBKXfT2IEVMVUjIAiKP1+EiOgKqZiBBRB6feTGAFVMRUjoAhKv5/ECKiKqRgBRVD6/SRGQFVMxQgogtLvJzECqmIqRkARlH4/iRFQFVMxAoqg9PtJjICqmIoRUASl309iBFTFVIyAIij9fhIjoCqmYgQUQen3kxgBVTEVI6AISr+fxAioiqkYAUVQ+v0kRkBVTMUIKILS7ycxAqpiKkZAEZR+P4kRUBVTMQKKoPT7SYyAqpiKEVAEpd9PYgRUxVSMgCIo/X4SI6AqpmIEFEHp95MYAVUxFSOgCEq/n8QIqIqpGAFFUPr9JEZAVUzFCCiC0u8nMQKqYipGQBGUfj+JEVAVUzECiqD0+0mMgKqYihFQBKXfT2IEVMVUjIAiKP1+EiOgKqZiBBRB6feTGAFVMRUjoAhKv5/ECKiKqRgBRVD6/SRGQFVMxQgogtLvJzECqmIqRkARlH4/iRFQFVMxAoqg9PtJjICqmIoRUASl309iBFTFVIyAIij9fhIjoCqmYgQUQen3kxgBVTEVI6AISr+fxAioiqmYKKCPL083XvliPn908eDni9+8sjedvnudgEJJv5/ECKiKS0Dv720FdF3TVUwJKET0+0mMgKoME9CN+3vnPln8cGf62sGvXZuevz5/cHl6/hYBhY5+P4kRUJVBA7p4IPr+qpnvbzV1/Ti0pJWAQkS/n8QIqMqgAb25epj5+PJWLG+uH43e3IoqAcWp6feTGAFVGTKgjy5OP1z9eP53H0ynP72+/ODa6tcOf1pPQHFa+v0kRkBVhgzo5sHm5jmkZTr3H43e39t8EfT5FeXfvNL6SMOTfj/ASSkDuv9lzjvT6Xu35n+5Ml18TEAxDP1+gJNSBvTO5on2zSPR5XNJWwE1L2TSP7pufaThSb+fxPgUXmW4gD6+vP5q56GiPuURKAGFgH4/iRFQleEC+sRDzPIrBBTD0O8nMQKqMlxAn3iafdVMnoXHIPT7SYyAqgwX0P1Xz+9/Ll+auXn9J68DhZR+P4kRUJXBArr16vlrqwebq5DyTiQMQr+fxAioymABfXRx/0ug9/eWL2N68EF5Vn6R0Vd5Lzzk9PtJjICqDBbQ7SeJbq4vxnR9+cEDrsaEAej3kxgBVRksoHe2H2I++Nl0eu699ccPriz6+e4t+w/ob1vrIw1P+v0kRkBVBgvoielvW+sjDU/6/SRGQFVMxQgogtLvJzECqmIqRkARlH4/iRFQFVMxAoqg9PtJjICqmIoRUASl309iBFTFVKwjoLM/fvY5AcUY6feTGAFV6RvQe//pm/n84euTyeTMLwgoxke/n8QIqErPgN6YfO+38/nVydLyZwQUI6PfT2IEVKVfQG+XbN7dnTz7zb0Lk5cJKEZHv5/ECKhKv4BeXZRzmdGdXyz/d/lzAopx0e8nMQKq0iugs0vLcq4z+vDCMJ/D629b6yMNT/r9JEZAVXoFdNXMhxcmz80JKMZJv5/ECKjKCQJ6d3fyDgHFSOn3kxgBVekV0NWn8DfKl0D5GihGSb+fxAioSq+Azq9Onls+/b4sJ8/CY5T0+0mMgKr0C+jt8gLQxWfws59PVo9DCSjGRb+fxAioSr+ALj59X3iuPJG0884g/SSgOBX9fhIjoCo9Azq/99FPPl788PBHP/jNMP0koDgV/X4SI6AqfQM6PP1ta32k4Um/n8QIqIqp2LEBnX09YD8JKE5Fv5/ECKiKqdjRAf3yx8v3wz/80VuDvIaJgOKU9PtJjICq9Azo7NPVdZgeXpicGeZiTAQUp6LfT2IEVKVnQK9OJmf+evd7v5393WSg19ETUJyKfj+JEVCVfgG9PZm8vX4P5x9Wb+gkoBgX/X4SI6Aq/QJ6dfnuo/Wb4G+US4oQUIyLfj+JEVCVXgFdvRd+HdC7u1xMBOOj309iBFSlV0A3l7Mr5eRqTBgj/X4SI6AqBBQ56PeTGAFV6RXQ2aXlE0frcnI5O4yRfj+JEVCVXgFdPXG0CugipjyJhPHR7ycxAqrSL6B3dycvfVMCeu91LmeHMdLvJzECqtIvoOVydmd3d178/uLHYa6nTEBxKvr9JEZAVXoGdP773cnaQP0koDgV/X4SI6AqfQM6//ZXZxf1fGawy4ESUJyKfj+JEVCV3gEdnP62tT7S8KTfT2IEVMVUjOuBIij9fhIjoCqmYlwPFEHp95MYAVXpGVCuB4qR0+8nMQKq0jOgXA8UI6ffT2IEVKVfQLkeKMZOv5/ECKhKv4ByPVCMnX4/iRFQlV4B5XqgGD39fhIjoCq9Asrl7DB6+v0kRkBVCChy0O8nMQKq0iugXA8Uo6ffT2IEVKVXQLkeKEZPv5/ECKhKv4ByPVCMnX4/iRFQlX4B5XqgGDv9fhIjoCo9A8r1QDFy+v0kRkBV+gaU64Fi3PT7SYyAqvQO6OD0t631kYYn/X4SI6AqpmIEFEHp95MYAVUxFTvihfQ/emnQaykTUJyafj+JEVCVfgG9MJk8M9iVlAkoBPT7SYyAqvQK6OpyypMzHw/ZUP1ta32k4Um/n8QIqEqvgC786celoS98TEAxSvr9JEZAVfoGdL76rkgLQ72QSX/bWh9peNLvJzECqnKCgC4+lf/y9WVCd94a4ikl/W1rfaThSb+fxAioyokCuvDtz8tbkl7QPwzV37bWRxqe9PtJjICqnCigs199f/OGzslLBBRjot9PYgRUpX9AN/VcPhf/7af698Trb1vrIw1P+v0kRkBVegZ0/dXPg1eD6i+rrL9trY80POn3kxgBVekV0NmliX3ySP+NPfS3rfWRhif9fhIjoCq9Arp8J9LO4ZcvPbzAI1CMiX4/iRFQlZ4B/cGvzS/NPle/lEl/21ofaXjS7ycxAqrSK6Au9Let9ZGGJ/1+EiOgKqZiBBRB6feTGAFVMRXruCL9ztlB3oREQHFq+v0kRkBV+gb0xv4r6PmeSBgj/X4SI6AqPQO67OczL775Bt+VEyOl309iBFSlX0Dv7k6eXb2K6d4lvi88xki/n8QIqEq/gF49eN/R7NLkOQKK0dHvJzECqtIroLNLW4867+6qX0JPQHF6+v0kRkBVegX00Ps29W/iJKA4Pf1+EiOgKgQUOej3kxgBVekV0NmlyTv7H+ivw0RAcXr6/SRGQFV6BZQnkTB6+v0kRkBV+gX07u7kzOpyIn96nZcxYYz0+0mMgKr0C+jqjUhnz54d8q1Icq2PNDy1XhtwzFs5/7C7fifnztsD/dX6/zi0PtLwpN9PYjwCVekb0PnsyzcWj0Bf/HiQJ5AIKE5Lv5/ECKhK74AOTn/bWh9peNLvJzECqmIqRkARlH4/iRFQFVMxG9DZR28+6Se8DhSjo99PYgRUpSOgy28n9wTeiYTx0e8nMQKqQkCRg34/iRFQlY6AOtLfttZHGp70+0mMgKqYihFQBKXfT2IEVMVU7PiAfjVcPgkoTke/n8QIqIqp2NEB/fLH5X1IP/gNAcUY6feTGAFV6RnQ2aX9p5BeGui9SPrb1vpIw5N+P4kRUJV+AV32c+fFf/jsn97YnQx0NTsCilPR7ycxAqrSL6A3JpMfrh54zn452bq4MgHFWOj3kxgBVekV0MUD0INr2F3lgsoYIf1+EiOgKr0C+vDCoe/KyQvpMT76/SRGQFV6BpRvKoeR0+8nMQKq0iugfF94jJ5+P4kRUJVeAZ3f2Pq65w2+BooR0u8nMQKq0i+gs0v7L/+8MdC1RAgoTkW/n8QIqEqvgM4+Wr7+88W3Pvvn5Y8vDHNVUP1ta32k4Um/n8QIqEqvgLpc1E5/21ofaXjS7ycxAqpCQJGDfj+JEVCVXgF1ob9trY80POn3kxgBVTEVI6AISr+fxAioiqkYAUVQ+v0kRkBVTMWODugfP9v3OS+kx+jo95MYAVXpGdDf7/JN5TBq+v0kRkBV+gX0Nt+VEyOn309iBFSlV0BnlyY7H3+17+sh+klAcSr6/SRGQFV6BfThhYEuokxAoaLfT2IEVKVnQAd6/zsBhYp+P4kRUJVeAZ1dIqAYOf1+EiOgKr0COr/Bp/AYOf1+EiOgKv0Ceuh7ehBQjJB+P4kRUJV+AZ3fuzA58+aG+kJ2BBSnp99PYgRUpWdAP+V1oBg3/X4SI6Aq/QJ6gxfSY+T0+0mMgKr0Cmh5If0gn7cTUIjo95MYAVXpFVCP55AIKE5Fv5/ECKhKz4DyOlCMnH4/iRFQlV4B5YX0GD39fhIjoCq9Ajq/MXmZgGLU9PtJjICq9Avo7NLO2wQUY6bfT2IEVKVXQGcfvTGZ7LzIC+kxXvr9JEZAVXoF1HxbY14HivHR7ycxAqpCQJGDfj+JEVCVXgF1ob9trY80POn3kxgBVTEVI6AISr+fxAioiqkYAUVQ+v0kRkBVTMVsQGd/tN8F/uGPz77A10AxOvr9JEZAVToC+vDC6imj2UebFy9tfoWAYlT0+0mMgKr0DOhBNgkoRkm/n8QIqAoBRQ76/SRGQFUIKHLQ7ycxAqpCQJGDfj+JEVAVAooc9PtJjICqEFDkoN9PYgRUhYAiB/1+EiOgKgQUOej3kxgBVSGgyEG/n8QIqAoBRQ76/SRGQFUIKHLQ7ycxAqrSHdAnEVCMj34/iRFQFQKKHPT7SYyAqnQEdPbRm0/im8phfPT7SYyAqnQE1JH+trU+0vCk309iBFTFVIyAIij9fhIjoCqmYgQUQen3kxgBVTEVI6AISr+fxAioiqkYAUVQ+v0kRkBVTMUIKILS7ycxAqpiKkZAEZR+P4kRUBVTMQKKoPT7SYyAqpiKEVAEpd9PYgRUxVTsiXciXdr5xeKHb78moBg3/X4SI6AqHQF9eGH5xvfV/xJQjJh+P4kRUJXOgC4fgRJQjJ5+P4kRUJWOgM4uTZ79/Ks/Xfjer786MMzn8/rb1vpIw5N+P4kRUJWOgM5vcDk7hKDfT2IEVKUroLNP6wL66OK0eOWL5UePr+xNp+9eX/3WoQ8IKDT0+0mMgKp0BXSR0K8+++fdnX/47MDnPa4Hen9vK6Drmq5ieugDAgoR/X4SI6Aq3QGdVz2JdGf62sEH16bnr88fXJ6ev2U/IKAQ0e8nMQKq0iugs49OfBH6a9P3939+f2/9OPTcJ+YDAgoV/X4SI6AqvQJ6co8vb/Xx5vrR6M1lVA99QEChot9PYgRUpXdAv/3V2clk5+xb/V7D9Oji+d99MJ3+9Pryg2vTD8svlk/rD31AQKGi309iBFSlb0APXs70cp+Abp5DWtZy/9Ho/b3ztw59sPr/Pr/S5489mdZHGp70+wFO6qiALvv5zItvvvH9ngW9M52+d2v+lyvTRS4JKBzo9wOc1BEBvbs7efY35Wf3Lk3K5UU6bL7SuXwuaauZr3xx6IND/4j+0XXrIw1P+v0kxqfwKv0CenXy7OZp+NmlyXPdAd24MzUPOp/yCJSAQkC/n8QIqEqvgK4vardyd/fZ/q9pMg86CSiGot9PYgRUpVdAD72Q/kSvqi+Z5Fl4DE+/n8QIqMowAX18eTuTm5d8rl8HuvUBAYWKfj+JEVCVXgGdXZq8s//B7UmPT+GvrR5frkLKO5EwPP1+EiOgKr0CevInke7vLV/G9OCD8o73RUZf3X/7+6EPCChU9PtJjICq9Avo3d3JmV+Xn/3p9V4vY1p8hr665tL15QcPti/A9ICrMWEA+v0kRkBV+gV09Uaks2fP9n4r0vzBz6bTc++tH2U+uLJI5rtP+4CAQkO/n8QIqErPgM7/sLt+J+fO2736eXL629b6SMOTfj+JEVCVvgGdz758Y/EI9MWPT3pdOwIKF/r9JEZAVXoHdHD629b6SMOTfj+JEVAVUzECiqD0+0mMgKqYihFQBKXfT2IEVMVUjIAiKP1+EiOgKqZiBBRB6feTGAFVMRUjoAhKv5/ECKiKqRgBRVD6/SRGQFVMxQgogtLvJzECqmIqRkARlH4/iRFQFVOxo67G9IPfEFCMmn4/iRFQlV4BfXhh63qgBBRjpN9PYgRUpWdAT/BdPAgoWtDvJzECqtIroIe+qRwBxRjp95MYAVXpFdD5jc23hSegGCn9fhIjoCr9AvrtLyeTZ158c+0ng1zSTn/bWh9peJuln3QAABwGSURBVNLvJzECqtIroA8vTLYN8wVR/W1rfaThSb+fxAioCgFFDvr9JEZAVXoF1IX+trU+0vCk309iBFTFVIyAIij9fhIjoCqmYscGdPb1gP0koDgV/X4SI6AqpmJHB/TLHy+/+PnwR28N9V3l9Let9ZGGJ/1+EiOgKj0DOvt09ezRwwuTMwO9KUl/21ofaXjS7ycxAqrSM6BXJ5Mzf737vd/O/m4yeXaYx6D629b6SMOTfj+JEVCVfgG9PZm8vX5H/B92B7qwiP62tT7S8KTfT2IEVKVfQK9OXt6/pMiNyXMEFKOj309iBFSlV0BXFxNZB/TuLi+kx/jo95MYAVXpFdBVOtcBHeradvrb1vpIw5N+P4kRUBUCihz0+0mMgKr0Cujs0vKJo3U5bw/0NLz+trU+0vCk309iBFSlV0BXTxytArqIKU8iYXz0+0mMgKr0C+jd3clL35SA3nt9MtDV6fW3rfWRhif9fhIjoCr9Arp4CDqZnN3defH7ix9fHqSfBBSnot9PYgRUpWdA57/f3VwNdKB+ElCcin4/iRFQlb4BnX/7q7OLej4z3DeI19+21kcanvT7SYyAqvQO6OD0t631kYYn/X4SI6AqpmLHXw/0qwH7SUBxKvr9JEZAVUzFjr8e6AKfwmOc9PtJjICq9Azo7NL+t5R7aaArKutvW+sjDU/6/SRGQFX6BXTZz50X//Nn//TGoqDDvI6egOJU9PtJjICq9Avo7f1XL81+OeF6oBgh/X4SI6AqvQK6eAB68OrPq7yVEyOk309iBFSlV0AfXth6+ybXA8UY6feTGAFV6RnQrWZyOTuMkX4/iRFQlV4BXV2Rfu3uLpezw/jo95MYAVXpFdBD3wfpxkDvhtffttZHGp70+0mMgKr0C+jDC5MffrPp5zCfwRNQnIp+P4kRUJWOgM4+erN4Y/U60H9+c3cyefEnfAqP0dHvJzECqtIR0MVDzyfxJBLGR7+fxAioCgFFDpUj+X/4DpH2pegIqCP9bWt9pOGpciStjzQ8SftSmIoRUARVOZLWRxqepH0pTMUIKIKqHEnrIw1P0r4UpmJHB/SPn+37nGfhMTqVI2l9pOFJ2peiZ0APvqccTyJhlCpH0vpIw5O0L0W/gN7mWXiMXOVIWh9peJL2pegV0Nmlyc7HX+37eoh+ElCcSuVIWh9peJL2pegV0IcXBrqIMgGFSuVIWh9peJL2pegZ0IHe/05AoVI5ktZHGp6kfSl6BXR2iYBi5CpH0vpIw5O0L0WvgM5v8Ck8Rq5yJK2PNDxJ+1L0C+ih7+lBQDFClSNpfaThSdqXol9A5/cuTM68ucHl7DA+lSNpfaThSdqXomdAP+V1oBi3ypG0PtLwJO1L0S+gN3ghPUauciStjzQ8SftS9ApoeSH9IJ+3E1CIVI6k9ZGGJ2lfil4B9XgOiYDiVCpH0vpIw5O0L0XPgPI6UIxc5UhaH2l4kval6BVQXkiP0ascSesjDU/SvhS9AjrY94InoFCpHEnrIw1P0r4U/QI6u7TzNgHFmFWOpPWRhidpX4peAZ19VL4vPC+kx3hVjqT1kYYnaV+KXgE139yY14FifCpH0vpIw5O0LwUBRQ6VI2l9pOFJ2peiV0Bd6G9b6yMNT5UjaX2k4Unal8JUjIAiqMqRtD7S8CTtS2EqRkARVOVIWh9peJL2pTAVOyKg3361jW8qh/GpHEnrIw1P0r4UvQLq8iSSXusjDU+VI2l9pOFJ2pen4Vl4BFU5ktZHGp6kfSl6BXT2x8/W/v71yc4/fM4L6TE6lSNpfaThSdqXoldAt93dfXaYK4Pqb1vrIw1PlSNpfaThSdqX4sQBHezCIvrb1vpIw1PlSFofaXiS9qU4eUCHegiqv22tjzQ8VY6k9ZGGJ2lfipMHdKirK+tvW+sjDU+VI2l9pOFJ2pfi5AG9u0tAMT6VI2l9pOFJ2pfixAGdXZ3wKTzGp3IkrY80PEn7UvQK6OyjzaVA33xjd8KTSBihypG0PtLwJO1L0Sugh19Iz8uYMEKVI2l9pOFJ2pfixAF95q2BvkG8/ra1PtLwVDmS1kcanqR9KXoF1IX+trU+0vBUOZLWRxqepH0pTMUIKIKqHEnrIw1P0r4UpmIEFEFVjqT1kYYnaV8KUzECiqAqR9L6SMOTtC+FqZgN6NYLmA7wbY0xPpUjaX2k4Unal6IjoOZKoFwPFGNVOZLWRxqepH0pCChyqBxJ6yMNT9K+FB0Btb7cnfBOJIxR5UhaH2l4kvalOFFAZz9f5PPMbwbpJwHFqVSOpPWRhidpX4qTBPQPi4efO0O9EYmA4lQqR9L6SMOTtC9F/4AO+vCTgOKUKkfS+kjDk7QvRe+Aloef/26wfBJQnE7lSFofaXiS9qXoGdB7Az/8JKA4pcqRtD7S8CTtS9EvoIM//CSgOKXKkbQ+0vAk7UvRJ6D3Li2vAjrow08CilOqHEnrIw1P0r4UPQJaHn6+PXA+CShOp3IkrY80PEn7UnQG1OfhJwHFKVWOpPWRhidpX4qugP7e5+EnAcUpVY6k9ZGGJ2lfio6A8l54BFE5ktZHGp6kfSkIKHKoHEnrIw1P0r4UHQHleqAIonIkrY80PEn7UnQE1JH+trU+0vBUOZLWRxqepH0pTMUIKIKqHEnrIw1P0r4UpmIEFEFVjqT1kYYnaV8KUzECiqAqR9L6SMOTtC+FqRgBRVCVI2l9pOFJ2pfCVIyAIqjKkbQ+0vAk7UthKkZAEVTlSFofaXiS9qUwFSOgCKpyJK2PNDxJ+1KYihFQBFU5ktZHGp6kfSlMxQgogqocSesjDU/SvhSmYgQUQVWOpPWRhidpXwpTMQKKoCpH0vpIw5O0L4WpGAFFUJUjaX2k4Unal8JUjIAiqMqRtD7S8CTtS2EqRkARVOVIWh9peJL2pTAVI6AIqnIkrY80PEn7UpiKEVAEVTmS1kcanqR9KUzFCCiCqhxJ6yMNT9K+FKZiBBRBVY6k9ZGGJ2lfClMxAoqgKkfS+kjDk7QvhakYAUVQlSNpfaThSdqXwlSMgCKoypG0PtLwJO1LYSpGQBFU5UhaH2l4kvalMBUjoAiqciStjzQ8SftSmIoRUARVOZLWRxqepH0pTMUIKIKqHEnrIw1P0r4UpmIEFEFVjqT1kYYnaV8KUzECiqAqR9L6SMOTtC+FqRgBRVCVI2l9pOFJ2pfCVIyAIqjKkbQ+0vAk7UthKkZAEVTlSFofaXiS9qUwFSOgCKpyJK2PNDxJ+1KYihFQBFU5ktZHGp6kfSlMxQgogqocSesjDU/SvhSmYgQUQVWOpPWRhidpXwpTMQKKoCpH0vpIw5O0L4WpGAFFUJUjaX2k4Unal8JUjIAiqMqRtD7S8CTtS2EqRkARVOVIWh9peJL2pTAVI6AIqnIkrY80PEn7UpiKEVAEVTmS1kcanqR9KUzFCCiCqhxJ6yMNT9K+FKZiBBRBVY6k9ZGGJ2lfClMxAoqgKkfS+kjDk7QvhakYAUVQlSNpfaThSdqXwlSMgCKoypG0PtLwJO1LYSpGQBFU5UhaH2l4kvalMBUjoAiqciStjzQ8SftSmIrpAvpvP5tOz717vfz80cVp8coXy48eX9mbTte/Q0AhUjmS1kcanqR9KYYK6L+sknnuk+UH9/e2Arqu6SqmBBQilSNpfaThSdqXYqCA3pme+9v5/MHlVSfvTF87+K1r0/PXl79z/hYBhU7lSFofaXiS9qUYJqCPL08/XP64eLT5YWnm+/u/dX9v/Th09eCUgEKjciStjzQ8SftSDBPQRxfXn6GXdD6+vBXLm+tHoze3okpAcWqVI2l9pOFJ2pdimIDuKwF9dPH87z6YTn96ffUr5bHp4U/rCShOq3IkrY80PEn7Ugwb0NUn6pvnkJbp3H80en9v80XQ51e0f/NS6yMNT5UjaX2k4Unal6cRB3T1+fqd6fS9W/O/XFk+J09AMYzKkbQ+0vAk7cvTaAN6Z/Uyps2XPZefz28F1LyQSf/ouvWRhqfKkbQ+0vAk7UsxZEDv7J378HBPz996yiNQAgqBypG0PtLwJO1LMWBAb07NK5WWDzoJKIZROZLWRxqepH0phgvov9h+rprJs/AYROVIWh9peJL2pRgqoI+vTV9df41z86r6VTM3r//kdaCQqhxJ6yMNT9K+FEMF9NrWWzWvrR5srkLKO5EwiMqRtD7S8CTtSzFQQG9uv9X9/t7yZUwPPii/tsjoq7wXHnKVI2l9pOFJ2pdimIBurl+38FrJ6eoCTNeXv/eAqzFhAJUjaX2k4Unal2KYgN6ZHgro/MHy4qDvrR9yPriy+OV3b9l/Rn/bWh9peKocSesjDU/SvhTDBLSG/ra1PtLwVDmS1kcanqR9KUzFCCiCqhxJ6yMNT9K+FKZiBBRBVY6k9ZGGJ2lfClMxAoqgKkfS+kjDk7QvhakYAUVQlSNpfaThSdqXwlSMgCKoypG0PtLwJO1LYSpGQBFU5UhaH2l4kvalMBUjoAiqciStjzQ8SftSmIoRUARVOZLWRxqepH0pTMUIKIKqHEnrIw1P0r4UpmIEFEFVjqT1kYYnaV8KUzECiqAqR9L6SMOTtC+FqRgBRVCVI2l9pOFJ2pfCVIyAIqjKkbQ+0vAk7UthKkZAEVTlSFofaXiS9qUwFSOgCKpyJK2PNDxJ+1KYihFQBFU5ktZHGp6kfSlMxQgogqocSesjDU/SvhSmYgQUQVWOpPWRhidpXwpTMQKKoCpH0vpIw5O0L4WpGAFFUJUjaX2k4Unal8JUjIAiqMqRtD7S8CTtS2EqRkARVOVIWh9peJL2pTAVI6AIqnIkrY80PEn7UpiKEVAEVTmS1kcanqR9KUzFCCiCqhxJ6yMNT9K+FKZiBBRBVY6k9ZGGJ2lfClMxAoqgKkfS+kjDk7QvhakYAUVQlSNpfaThSdqXwlSMgCKoypG0PtLwJO1LYSpGQBFU5UhaH2l4kvalMBUjoAiqciStjzQ8SftSmIoRUARVOZLWRxqepH0pTMUIKIKqHEnrIw1P0r4UpmIEFEFVjqT1kYYnaV8KUzECiqAqR9L6SMOTtC+FqRgBRVCVI2l9pOFJ2pfCVIyAIqjKkbQ+0vAk7UthKkZAEVTlSFofaXiS9qUwFSOgCKpyJK2PNDxJ+1KYihFQBFU5ktZHGp6kfSlMxQgogqocSesjDU/SvhSmYgQUQVWOpPWRhidpXwpTMQKKoCpH0vpIw5O0L4WpGAFFUJUjaX2k4Unal8JUjIAiqMqRtD7S8CTtS2EqRkARVOVIWh9peJL2pTAVI6AIqnIkrY80PEn7UpiKEVAEVTmS1kcanqR9KUzFCCiCqhxJ6yMNT9K+FKZiBBRBVY6k9ZGGJ2lfClMxAoqgKkfS+kjDk7QvhakYAUVQlSNpfaThSdqXwlSMgCKoypG0PtLwJO1LYSpGQBFU5UhaH2l4kvalMBUjoAiqciStjzQ8SftSmIoRUARVOZLWRxqepH0pTMUIKIKqHEnrIw1P0r4UpmIEFEFVjqT1kYYnaV8KUzECiqAqR9L6SMOTtC+FqRgBRVCVI2l9pOFJ2pfCVIyAIqjKkbQ+0vAk7UthKkZAEVTlSFofaXiS9qUwFSOgCKpyJK2PNDxJ+1KYihFQBFU5ktZHGp6kfSlMxQgogqocSesjDU/SvhSmYgQUQVWOpPWRhidpXwpTMQKKoCpH0vpIw5O0L4WpGAFFUJUjaX2k4Unal8JUjIAiqMqRtD7S8CTtS2EqRkARVOVIWh9peJL2pTAVI6AIqnIkrY80PEn7UpiKEVAEVTmS1kcanqR9KUzFCCiCqhxJ6yMNT9K+FKZiBBRBVY6k9ZGGJ2lfClMxAoqgKkfS+kjDk7QvhakYAUVQlSNpfaThSdqXwlSMgCKoypG0PtLwJO1LYSpGQBFU5UhaH2l4kvalMBVrGFC91kcanipH0vpIw5O0L0/DI1AEVTmS1kcanqR9KUzFCCiCqhxJ6yMNT9K+FKZiBBRBVY6k9ZGGJ2lfClMxAoqgKkfS+kjDk7QvhakYAUVQlSNpfaThSdqXwlSMgCKoypG0PtLwJO1LYSpGQBFU5UhaH2l4kvalMBUjoAiqciStjzQ8SftSmIoRUARVOZLWRxqepH0pTMUIKIKqHEnrIw1P0r4UpmIEFEFVjqT1kYYnaV8KUzECiqAqR9L6SMOTtC+FqRgBRVCVI2l9pOFJ2pfCVIyAIqjKkbQ+0vAk7UthKkZAEVTlSFofaXiS9qUwFSOgCKpyJK2PNDxJ+1KYihFQBFU5ktZHGp6kfSlMxQgogqocSesjDU/SvhSmYgQUQVWOpPWRhidpXwpTMQKKoCpH0vpIw5O0L4WpGAFFUJUjaX2k4Unal8JUjIAiqMqRtD7S8CTtS2EqRkARVOVIWh9peJL2pTAVI6AIqnIkrY80PEn7UpiKEVAEVTmS1kcanqR9KUzFCCiCqhxJ6yMNT9K+FKZiBBRBVY6k9ZGGJ2lfClMxAoqgKkfS+kjDk7QvhakYAUVQlSNpfaThSdqXwlSMgCKoypG0PtLwJO1LYSpGQBFU5UhaH2l4kvalMBUjoAiqciStjzQ8SftSmIoRUARVOZLWRxqepH0pTMUIKIKqHEnrIw1P0r4UpmIEFEFVjqT1kYYnaV8KUzECiqAqR9L6SMOTtC+FqRgBRVCVI2l9pOFJ2pfCVIyAIqjKkbQ+0vAk7UthKkZAEVTlSFofaXiS9qUwFSOgCKpyJK2PNDxJ+1KYihFQBFU5ktZHGp6kfSlMxQgogqocSesjDU/SvhSmYgQUQVWOpPWRhidpXwpTMQKKoCpH0vpIw5O0L4WpGAFFUJUjaX2k4Unal8JUjIAiqMqRtD7S8CTtS2EqRkARVOVIWh9peJL2pTAVI6AIqnIkrY80PEn7UpiKEVAEVTmS1kcanqR9KUzFCCiCqhxJ6yMNT9K+FKZiBBRBVY6k9ZGGJ2lfClMxAoqgKkfS+kjDk7QvhakYAUVQlSNpfaThSdqXwlSMgCKoypG0PtLwJO1LYSpGQBFU5UhaH2l4kvalMBUjoAiqciStjzQ8SftSmIoRUARVOZLWRxqepH0pTMUIKIKqHEnrIw1P0r4UpmIEFEFVjqT1kYYnaV8KUzECiqAqR9L6SMOTtC+FqRgBRVCVI2l9pOFJ2pfCVIyAIqjKkbQ+0vAk7UthKkZAEVTlSFofaXiS9qUwFSOgCKpyJK2PNDxJ+1KYihFQBFU5ktZHGp6kfSlMxQgogqocSesjDU/SvhSmYgQUQVWOpPWRhidpXwpTMQKKoCpH0vpIw5O0L4WpGAFFUJUjaX2k4Unal8JUjIAiqMqRtD7S8CTtS2EqRkARVOVIWh9peJL2pTAVI6AIqnIkrY80PEn7UpiKEVAEVTmS1kcanqR9KUzFCCiCqhxJ6yMNT9K+FKZiBBRBVY6k9ZGGJ2lfClMxAoqgKkfS+kjDk7QvhakYAUVQlSNpfaThSdqXwlSMgCKoypG0PtLwJO1LYSpGQBFU5UhaH2l4kvalMBUjoAiqciStjzQ8SftSmIp5BPTxlb3p9N3rBBRKlSNpfaThSdqXwj+gjy5Ol175goBCqHIkrY80PEn7UvgH9Nr0/PX5g8vT87cIKHQqR9L6SMOTtC+Fe0Dv75XHno8unvuEgEKnciStjzQ8SftSuAf05vS19Y/vE1DoVI6k9ZGGJ2lfCveAXpt+WH68sw4pAYVE5UhaH2l4kval8A7o48vrT93v722+CPr8iv7van2k4alyJK2PNDxJ+/I0qQIKAJ48A2peyKR/dP3dxD2JToxEpWFAzeuYWt8TWXBPohMjUSGg2XBPohMjUfEOqOez8N9N3JPoxEhU3AO6ef2nw+tAv5u4J9GJkai4B9TxnUjfTdyT6MRIVNwD+vjy9FWn98J/N3FPohMjUXEP6PyB29WYvpu4J9GJkaj4B3T+4Mqin+/esr/c+p7IgnsSnRiJSoOAHqH1PZEF9yQ6MRIVUzECGh73JDoxEhVTMQIaHvckOjESFVMxAhoe9yQ6MRIVUzECGh73JDoxEhVTMQIaHvckOjESFVMxAhoe9yQ6MRIVUzECGh73JDoxEhVTMQIaHvckOjESFVMxAhoe9yQ6MRIVUzECGh73JDoxEhVTMQIaHvckOjESFVMxAhoe9yQ6MRIVUzECGh73JDoxEhVTMQIaHvckOjESFVMxAhoe9yQ6MRIVUzECGh73JDoxEhVTMQIaHvckOjESFVMxAhoe9yQ6MRIVUzECGh73JDoxEhVTMQIaHvckOjESFVMxAhoe9yQ6MRIVUzECGh73JDoxEhVTMQIaHvckOjESFVMxAhoe9yQ6MRIVUzECGh73JDoxEhVTMQIaHvckOjESFVOxhgGFxvPPt/43wOgxkoEQ0PA4G+jESAZCQMPjbKATIxkIAQ2Ps4FOjGQgBDQ8zgY6MZKBENDwOBvoxEgGQkDD42ygEyMZCAEFgEoEFAAqEVAAqERAAaASAQWASgQUACoRUACoREABoBIBDeHRxen7+z995Yum/y4Yk8eXp+dv7f/0w7b/Mt9BBDSERUDPfbL5KQHFgft7m/+23tlPKdwQ0BAWAZ2+tvkpAcWWm9PVIB5d3Pw3Fn4IaAiLw/E368/PCCgO2Xx55+bmP7FwREBDWFTzf+xtHmisfnxwZTqdvnu96b8WxuBO+fLO/fU+FsPYm05/en31858tRvLv/7bhv1x2BDSEZTXXjzDWAb2zOCUL53ja4Dvv8eXlMq6tP0O5vzWM9c95aDocAhrCsprrJ1lXAV0cjXf/9/zxv0z5uhfu75375P7e6hmkxSf0792aP/7X5RdGF4v5D4tf/Lc9RjIYAhpCqebqk7RVQDdf8LrGowssVnD+v6wjuRnGzen7PK3kgICGsKpmqWX56f5L/njpCrZfpPH48rqZy0eki5W8+j9b/nt9BxDQEFYBLY8oyk/3H1vwnDzmy/+OrmewaObG4lduLn989b/yn9jhENAQNs8cLR5vrgO6PjAEFPPV483yk+Vj0YOAzv/8N+Wn75HQoRDQEDadvDZ9n0egeMJWQM2XPR//9+Urmd5/2j8EAQIawqaTi/Px3/gaKKz9gD7t/fCP/5WRDIaAhrD/QPPO9K/2eBYexn5AF8NY/Wz5X9bNa+sPfhdqBDSEg8/Ur62+uLV6HehfrvA6UMy3E/no4vT89fn8z3uLR6LLKzUtfv7gMv+VHQwBDeEgoIty8k4kGFuPMdfDmL43P3gn0qt8nXwoBDSEreeKNhff4b3w2Lf9SfrqvfD/ePDzv/qPfAI/GAIKAJUIKABUIqAAUImAAkAlAgoAlQgoAFQioABQiYACQCUCCgCVCCgAVCKgAFCJgAJAJQIKAJUIKABUIqAAUImAAkAlAgoAlQgoAFQioABQiYACQCUCCgCVCCgAVCKgAFCJgAJAJQIKAJUIKABUIqAAUImAAkAlAgoAlQgoAFQioABQiYACQCUCCgCVCCgAVCKgAFCJgAJAJQIKAJUIKABUIqAAUImAAkAlAgoAlQgoAFQioABQiYACQCUCCgCVCCgAVCKgAFCJgAJAJQIKAJUIKABUIqAAUOn/A71FEGOQyBlxAAAAAElFTkSuQmCC">
             <a:extLst>
               <a:ext uri="{FF2B5EF4-FFF2-40B4-BE49-F238E27FC236}">
-                <a16:creationId xmlns="" xmlns:a16="http://schemas.microsoft.com/office/drawing/2014/main" id="{303DEEFB-7094-4F9F-A65F-D2AFDD19F5FE}"/>
+                <a16:creationId xmlns:a16="http://schemas.microsoft.com/office/drawing/2014/main" id="{303DEEFB-7094-4F9F-A65F-D2AFDD19F5FE}"/>
               </a:ext>
             </a:extLst>
           </p:cNvPr>
@@ -6371,7 +6367,7 @@
           <p:cNvPr id="2" name="Title 1">
             <a:extLst>
               <a:ext uri="{FF2B5EF4-FFF2-40B4-BE49-F238E27FC236}">
-                <a16:creationId xmlns="" xmlns:a16="http://schemas.microsoft.com/office/drawing/2014/main" id="{B82558F1-4876-454A-B771-BA837016AE1A}"/>
+                <a16:creationId xmlns:a16="http://schemas.microsoft.com/office/drawing/2014/main" id="{B82558F1-4876-454A-B771-BA837016AE1A}"/>
               </a:ext>
             </a:extLst>
           </p:cNvPr>
@@ -6399,7 +6395,7 @@
           <p:cNvPr id="3" name="Text Placeholder 2">
             <a:extLst>
               <a:ext uri="{FF2B5EF4-FFF2-40B4-BE49-F238E27FC236}">
-                <a16:creationId xmlns="" xmlns:a16="http://schemas.microsoft.com/office/drawing/2014/main" id="{D364D651-6EB2-244D-94BF-CDF4925ACCFE}"/>
+                <a16:creationId xmlns:a16="http://schemas.microsoft.com/office/drawing/2014/main" id="{D364D651-6EB2-244D-94BF-CDF4925ACCFE}"/>
               </a:ext>
             </a:extLst>
           </p:cNvPr>
@@ -6583,7 +6579,7 @@
           <p:cNvPr id="4" name="AutoShape 2" descr="data:image/png;base64,iVBORw0KGgoAAAANSUhEUgAABUAAAAPACAMAAADDuCPrAAABYlBMVEUAAAAAADoAAGYAOjoAOmYAOpAAZrYzMzM6AAA6OgA6Ojo6OmY6ZmY6ZpA6ZrY6kLY6kNtNTU1NTW5NTY5Nbm5Nbo5NbqtNjshmAABmADpmOgBmOjpmZjpmZmZmZpBmkGZmkLZmkNtmtttmtv9uTU1ubk1ubm5ubo5ujqtujshuq8huq+SOTU2Obk2Obm6Oq8iOyOSOyP+QOgCQOjqQZjqQZmaQZpCQkGaQkLaQtraQttuQ2/+rbk2rjk2rjm6rq8iryOSr5Mir5P+2ZgC2Zjq2kDq2kGa2kJC2tpC2tra2ttu229u22/+2///Ijk3Ijm7Iq27Iq6vIyKvI5KvI5OTI5P/I///bkDrbkGbbtmbbtpDbtrbb27bb29vb2//b/7bb///kq27kyI7kyKvk5P/k///r6+v8jVn/tmb/yI7/25D/27b/29v/5Kv/5Mj/5OT//7b//7///8j//9v//+T///+zjZs9AAAACXBIWXMAAB2HAAAdhwGP5fFlAAAgAElEQVR4nO3d/59b5ZnecU0wMDGEILMYh0CWwmwDxaSLN3S7xHW3mGQXkni3aY0TEijO1q2/YMe1rP+/0iNpRnPbM+fMM9e5n3PffN4/xB472Eiv6/mgGUlnJnMAQJVJ638BAIiKgAJAJQIKAJUIKABUIqAAUImAAkAlAgoAlQgoAFQioABQiYACQCUCCgCVCCgAVCKgAFCJgAJAJQIKAJVGENDZl298fzKZ7Lzw8Ten/rNuT570zvzhhcnOLwT/pgCwrXlAZ7/aPWjdS6dNKAEF4Kd1QO+9fih2p+0cAQXgp3FA7y4ffu689dXip9/+6vuCgh78ud/7reRPAoCjtA3o4qHh1ufts1/KCkpAAQyvbUCvLor59tbHy8/An1P8wQQUwPCaBnT5CfzLh37lRvmapeRPJqAABtY0oItcmswtP6d/rvzGwQPRq5vK3vv5Irg7P/jNwT/9zuzT3cnOC09+1n84oJsnka4ufyh/ygsfL3/9yx8vev3Cr/f/f+YvAIBjtQzo7NKTn7Cvmroo3n7/NvWbfWpe7LQM6NUjnro/OqA31n/Iywd/4PpB8BN/AQAcq2VAlw837efrt1c9vHrwO4tfefabVW03VtVdpPBs+fDZJ3t3ZED/fv8Pefvq4ddOPfkXAMCxWgZ0UbknHjyuo3r7IGLrli4fOb709Xz+7aebx4zlseQPv5l/+/VT/+inBnRh+Rn6l4tP1Z+Z7Lz9zeqZ/+fmT/0LAOBYLQN6+ymffS8D+vJ866Xv68/mtx6t3l5/5fTGMaE7OqAvb/6MzV9wdfUQ9il/AQAca6QBXdZxlbr180nbTysdPCY98kWjRwZ0/aubv2a+/yWCp/wFAHCssQZ0UcDypc3lVyaXMdtu2u39xj7lq58rRwb0uYO/5p1D/9en/AUAcKyRfg10Gc7ye+uQbj/Ds3mW58YxT/YcGdCXD//K/v/1aX8BABxrbM/C70f19qFP5W3f7Cfd1qkDeuRjWwDYGOfrQOclcYuIbR6IElAA4zPOdyItlbcNbV7OtPlSqPmntQHliSMAJ9I0oFu5XNt6L3z5HH7/qZ2rTz6vIw3o0/4CADhW26sx2Zdy3t765HnxmPDZ/7X/ls7tp9xv7H95VBjQp/wFAHCstgEtX3k8eOf5jcn2C5tulDderku2deGmzfNM2oA+5S8AgGM1viL9veUVlQ9dkf7gC5Grq9VvSrZ8F9GZX6+/h9LmvZfCgD7lLwCAY435eyJd3X42fPtp8lUbxQF98i8AgGO1Duih78q5c/g6crcn28+Mz36++b+dWV2wUxzQJ/8CADhW84AufPnz5Sfvz7xovy/89lVBl/60vN7x+lrIc31An/gLAOBYYwgoAIREQAGgEgEFgEoEFAAqEVAAqERAAaASAQWASgQUACoRUACoREABoBIBBYBKBBQAKhFQAKhEQAGgEgEFgEoEFAAqEVAAqNQwoP8HEtyT6MRIVEzFCGh43JPoxEhUTMUIaHjck+jESFRMxQhoeNyT6MRIVEzFCGh43JPoxEhUTMUIaHjck+jESFRMxQhoeNyT6MRIVEzFCGh43JPoxEhUTMUIaHjck+jESFRMxQhoeNyT6MRIVEzFCGh43JPoxEhUTMUIaHjck+jESFRMxQhoeNyT6MRIVEzFCGh43JPoxEhUTMUIaHjck+jESFRMxQhoeNyT6MRIVEzFCGh43JPoxEhUTMUIaHjck+jESFRMxQhoeNyT6MRIVEzFCGh43JPoxEhUTMUIaHjck+jESFRMxQhoeNyT6MRIVEzFCGh43JPoxEhUTMUIaHjck+jESFRMxQhoeNyT6MRIVEzFCGh43JPoxEhUTMUIaHjck+jESFRMxQhoeNyT6MRIVEzFCGh43JPoxEhUTMUIaHjck+jESFRMxQhoeNyT6MRIVEzFCGh43JPoxEhUTMUIaHjck+jESFRMxQhoeNyT6MRIVEzFCGh43JPoxEhUTMUIaHjck+jESFRMxQhoeNyT6MRIVEzFUgX0/+I7RL+fxAioiqkYAUVQ+v0kRkBVTMUIKILS7ycxAqpiKkZAEZR+P4kRUBVTMQKKoPT7SYyAqpiKEVAEpd9PYgRUxVSMgCIo/X4SI6AqpmIEFEHp95MYAVUxFSOgCEq/n8QIqIqpGAFFUPr9JEZAVUzFCCiC0u8nMQKqYipGQBGUfj+JEVAVUzECiqD0+0mMgKqYihFQBKXfT2IEVMVUjIAiKP1+EiOgKqZiBBRB6feTGAFVMRUjoAhKv5/ECKiKqRgBRVD6/SRGQFVMxQgogtLvJzECqmIqRkARlH4/iRFQFVMxAoqg9PtJjICqmIoRUASl309iBFTFVIyAIij9fhIjoCqmYgQUQen3kxgBVTEVI6AISr+fxAioiqkYAUVQ+v0kRkBVTMUIKILS7ycxAqpiKkZAEZR+P4kRUBVTMQKKoPT7SYyAqpiKEVAEpd9PYgRUxVSMgCIo/X4SI6AqpmKnDeiji6+tf/b4yt50+u71rg8IKDT0+0mMgKqIA3pt+tqmpNOlV744/gMCChH9fhIjoCrSgD6+Nt0E9Nr0/PX5g8vT87eO/YCAQkS/n8QIqIoyoP/2wXQT0Pt75RHmo4vnPjnuAwIKFf1+EiOgKsKA3pxO3/vzOqA39398/7gPCChU9PtJjICqKAP66j/O76zzeG36YfmxfHz0BwQUKvr9JEZAVYQB3cri48vrT9Dv752/dfQHq3/m+ZVT/s1P0fpIw5N+P8BJEVAEpd8PcFL6gL7yxdEfHPpH9Y+uWx9peNLvJzE+hVcZPKDdj0AJKAT0+0mMgKoQUOSg309iBFRlmIDyLDy86feTGAFVGSigm1d5rl/6edQHBBQq+v0kRkBVBgoo70SCM/1+EiOgKgMF9PHl6av773g/+gMCChX9fhIjoCoDBXT+YPuaS0d/QEAhot9PYgRUZaiAzh9cWVTy3VtdHxBQaOj3kxgBVREH9BT0t631kYYn/X4SI6AqpmIEFEHp95MYAVUxFSOgCEq/n8QIqIqpGAFFUPr9JEZAVUzFCCiC0u8nMQKqYipGQBGUfj+JEVAVUzECiqD0+0mMgKqYihFQBKXfT2IEVMVUjIAiKP1+EiOgKqZiBBRB6feTGAFVMRUjoAhKv5/ECKiKqRgBRVD6/SRGQFVMxQgogtLvJzECqmIqRkARlH4/iRFQFVMxAoqg9PtJjICqmIoRUASl309iBFTFVIyAIij9fhIjoCqmYgQUQen3kxgBVTEVI6AISr+fxAioiqkYAUVQ+v0kRkBVTMUIKILS7ycxAqpiKkZAEZR+P4kRUBVTMQKKoPT7SYyAqpiKEVAEpd9PYgRUxVSMgCIo/X4SI6AqpmIEFEHp95MYAVUxFSOgCEq/n8QIqIqpGAFFUPr9JEZAVUzFCCiC0u8nMQKqYipGQBGUfj+JEVAVUzECiqD0+0mMgKqYihFQBKXfT2IEVMVUjIAiKP1+EiOgKqZiBBRB6feTGAFVMRUjoAhKv5/ECKiKqRgBRVD6/SRGQFVMxQgogtLvJzECqmIqRkARlH4/iRFQFVMxAoqg9PtJjICqmIoRUASl309iBFTFVIyAIij9fhIjoCqmYgQUQen3kxgBVTEVI6AISr+fxAioiqkYAUVQ+v0kRkBVTMUIKILS7ycxAqpiKkZAEZR+P4kRUBVTMQKKoPT7SYyAqpiKEVAEpd9PYgRUxVSMgCIo/X4SI6AqpmIEFEHp95MYAVUxFSOgCEq/n8QIqIqpGAFFUPr9JEZAVUzFCCiC0u8nMQKqYipGQBGUfj+JEVAVUzECiqD0+0mMgKqYihFQBKXfT2IEVMVUjIAiKP1+EiOgKqZiBBRB6feTGAFVMRUjoAhKv5/ECKiKqRgBRVD6/SRGQFVMxQgogtLvJzECqmIqRkARlH4/iRFQFVMxAoqg9PtJjICqmIoRUASl309iBFTFVIyAIij9fhIjoCqmYgQUQen3kxgBVTEVI6AISr+fxAioiqkYAUVQ+v0kRkBVTMUIKILS7ycxAqpiKkZAEZR+P4kRUBVTMQKKoPT7SYyAqpiKEVAEpd9PYgRUxVSMgCIo/X4SI6AqpmIEFEHp95MYAVUxFSOgCEq/n8QIqIqpGAFFUPr9JEZAVUzFCCiC0u8nMQKqYipGQBGUfj+JEVAVU7GGAdVrfaThqfXaAB6BIiz9fhLjEaiKqRgBRVD6/SRGQFVMxQgogtLvJzECqmIqRkARlH4/iRFQFVMxAoqg9PtJjICqmIoRUASl309iBFTFVIyAIij9fhIjoCqmYgQUQen3kxgBVTEVI6AISr+fxAioiqkYAUVQ+v0kRkBVTMUIKILS7ycxAqpiKkZAEZR+P4kRUBVTMQKKoPT7SYyAqpiKEVAEpd9PYgRUxVSMgCIo/X4SI6AqpmIEFEHp95MYAVUxFSOgCEq/n8QIqIqpGAFFUPr9JEZAVUzFCCiC0u8nMQKqYipGQBGUfj+JEVAVUzECiqD0+0mMgKqYihFQBKXfT2IEVMVUjIAiKP1+EiOgKqZiBBRB6feTGAFVMRUjoAhKv5/ECKiKqRgBRVD6/SRGQFVMxQgogtLvJzECqmIqRkARlH4/iRFQFVMxAoqg9PtJjICqmIoRUASl309iBFTFVIyAIij9fhIjoCqmYgQUQen3kxgBVTEVI6AISr+fxAioiqkYAUVQ+v0kRkBVTMUIKILS7ycxAqpiKkZAEZR+P4kRUBVTMQKKoPT7SYyAqpiKEVAEpd9PYgRUxVSMgCIo/X4SI6AqpmIEFEHp95MYAVUxFSOgCEq/n8QIqIqpGAFFUPr9JEZAVUzFCCiC0u8nMQKqYipGQBGUfj+JEVAVUzECiqD0+0mMgKqYihFQBKXfT2IEVMVUjIAiKP1+EiOgKqZiBBRB6feTGAFVMRUjoAhKv5/ECKiKqRgBRVD6/SRGQFVMxQgogtLvJzECqmIqRkARlH4/iRFQFVMxAoqg9PtJjICqmIoRUASl309iBFTFVIyAIij9fhIjoCqmYgQUQen3kxgBVTEVI6AISr+fxAioiqkYAUVQ+v0kRkBVTMUIKILS7ycxAqpiKkZAEZR+P4kRUBVTMQKKoPT7SYyAqpiKEVAEpd9PYgRUxVSMgCIo/X4SI6AqpmIEFEHp95MYAVUxFSOgCEq/n8QIqIqpGAFFUPr9JEZAVUzFCCiC0u8nMQKqYipGQBGUfj+JEVAVUzECiqD0+0mMgKqYihFQBKXfT2IEVMVUjIAiKP1+EiOgKqZiBBRB6feTGAFVMRUjoAhKv5/ECKiKqRgBRVD6/SRGQFVMxQgogtLvJzECqmIqRkARlH4/iRFQFVMxAoqg9PtJjICqmIoRUASl309iBFTFVIyAIij9fhIjoCqmYgQUQen3kxgBVTEVI6AISr+fxAioiqmYKKCPL083XvliPn908eDni9+8sjedvnudgEJJv5/ECKiKS0Dv720FdF3TVUwJKET0+0mMgKoME9CN+3vnPln8cGf62sGvXZuevz5/cHl6/hYBhY5+P4kRUJVBA7p4IPr+qpnvbzV1/Ti0pJWAQkS/n8QIqMqgAb25epj5+PJWLG+uH43e3IoqAcWp6feTGAFVGTKgjy5OP1z9eP53H0ynP72+/ODa6tcOf1pPQHFa+v0kRkBVhgzo5sHm5jmkZTr3H43e39t8EfT5FeXfvNL6SMOTfj/ASSkDuv9lzjvT6Xu35n+5Ml18TEAxDP1+gJNSBvTO5on2zSPR5XNJWwE1L2TSP7pufaThSb+fxPgUXmW4gD6+vP5q56GiPuURKAGFgH4/iRFQleEC+sRDzPIrBBTD0O8nMQKqMlxAn3iafdVMnoXHIPT7SYyAqgwX0P1Xz+9/Ll+auXn9J68DhZR+P4kRUJXBArr16vlrqwebq5DyTiQMQr+fxAioymABfXRx/0ug9/eWL2N68EF5Vn6R0Vd5Lzzk9PtJjICqDBbQ7SeJbq4vxnR9+cEDrsaEAej3kxgBVRksoHe2H2I++Nl0eu699ccPriz6+e4t+w/ob1vrIw1P+v0kRkBVBgvoielvW+sjDU/6/SRGQFVMxQgogtLvJzECqmIqRkARlH4/iRFQFVMxAoqg9PtJjICqmIoRUASl309iBFTFVKwjoLM/fvY5AcUY6feTGAFV6RvQe//pm/n84euTyeTMLwgoxke/n8QIqErPgN6YfO+38/nVydLyZwQUI6PfT2IEVKVfQG+XbN7dnTz7zb0Lk5cJKEZHv5/ECKhKv4BeXZRzmdGdXyz/d/lzAopx0e8nMQKq0iugs0vLcq4z+vDCMJ/D629b6yMNT/r9JEZAVXoFdNXMhxcmz80JKMZJv5/ECKjKCQJ6d3fyDgHFSOn3kxgBVekV0NWn8DfKl0D5GihGSb+fxAioSq+Azq9Onls+/b4sJ8/CY5T0+0mMgKr0C+jt8gLQxWfws59PVo9DCSjGRb+fxAioSr+ALj59X3iuPJG0884g/SSgOBX9fhIjoCo9Azq/99FPPl788PBHP/jNMP0koDgV/X4SI6AqfQM6PP1ta32k4Um/n8QIqIqp2LEBnX09YD8JKE5Fv5/ECKiKqdjRAf3yx8v3wz/80VuDvIaJgOKU9PtJjICq9Azo7NPVdZgeXpicGeZiTAQUp6LfT2IEVKVnQK9OJmf+evd7v5393WSg19ETUJyKfj+JEVCVfgG9PZm8vX4P5x9Wb+gkoBgX/X4SI6Aq/QJ6dfnuo/Wb4G+US4oQUIyLfj+JEVCVXgFdvRd+HdC7u1xMBOOj309iBFSlV0A3l7Mr5eRqTBgj/X4SI6AqBBQ56PeTGAFV6RXQ2aXlE0frcnI5O4yRfj+JEVCVXgFdPXG0CugipjyJhPHR7ycxAqrSL6B3dycvfVMCeu91LmeHMdLvJzECqtIvoOVydmd3d178/uLHYa6nTEBxKvr9JEZAVXoGdP773cnaQP0koDgV/X4SI6AqfQM6//ZXZxf1fGawy4ESUJyKfj+JEVCV3gEdnP62tT7S8KTfT2IEVMVUjOuBIij9fhIjoCqmYlwPFEHp95MYAVXpGVCuB4qR0+8nMQKq0jOgXA8UI6ffT2IEVKVfQLkeKMZOv5/ECKhKv4ByPVCMnX4/iRFQlV4B5XqgGD39fhIjoCq9Asrl7DB6+v0kRkBVCChy0O8nMQKq0iugXA8Uo6ffT2IEVKVXQLkeKEZPv5/ECKhKv4ByPVCMnX4/iRFQlX4B5XqgGDv9fhIjoCo9A8r1QDFy+v0kRkBV+gaU64Fi3PT7SYyAqvQO6OD0t631kYYn/X4SI6AqpmIEFEHp95MYAVUxFTvihfQ/emnQaykTUJyafj+JEVCVfgG9MJk8M9iVlAkoBPT7SYyAqvQK6OpyypMzHw/ZUP1ta32k4Um/n8QIqEqvgC786celoS98TEAxSvr9JEZAVfoGdL76rkgLQ72QSX/bWh9peNLvJzECqnKCgC4+lf/y9WVCd94a4ikl/W1rfaThSb+fxAioyokCuvDtz8tbkl7QPwzV37bWRxqe9PtJjICqnCigs199f/OGzslLBBRjot9PYgRUpX9AN/VcPhf/7af698Trb1vrIw1P+v0kRkBVegZ0/dXPg1eD6i+rrL9trY80POn3kxgBVekV0NmliX3ySP+NPfS3rfWRhif9fhIjoCq9Arp8J9LO4ZcvPbzAI1CMiX4/iRFQlZ4B/cGvzS/NPle/lEl/21ofaXjS7ycxAqrSK6Au9Let9ZGGJ/1+EiOgKqZiBBRB6feTGAFVMRXruCL9ztlB3oREQHFq+v0kRkBV+gb0xv4r6PmeSBgj/X4SI6AqPQO67OczL775Bt+VEyOl309iBFSlX0Dv7k6eXb2K6d4lvi88xki/n8QIqEq/gF49eN/R7NLkOQKK0dHvJzECqtIroLNLW4867+6qX0JPQHF6+v0kRkBVegX00Ps29W/iJKA4Pf1+EiOgKgQUOej3kxgBVekV0NmlyTv7H+ivw0RAcXr6/SRGQFV6BZQnkTB6+v0kRkBV+gX07u7kzOpyIn96nZcxYYz0+0mMgKr0C+jqjUhnz54d8q1Icq2PNDy1XhtwzFs5/7C7fifnztsD/dX6/zi0PtLwpN9PYjwCVekb0PnsyzcWj0Bf/HiQJ5AIKE5Lv5/ECKhK74AOTn/bWh9peNLvJzECqmIqRkARlH4/iRFQFVMxG9DZR28+6Se8DhSjo99PYgRUpSOgy28n9wTeiYTx0e8nMQKqQkCRg34/iRFQlY6AOtLfttZHGp70+0mMgKqYihFQBKXfT2IEVMVU7PiAfjVcPgkoTke/n8QIqIqp2NEB/fLH5X1IP/gNAcUY6feTGAFV6RnQ2aX9p5BeGui9SPrb1vpIw5N+P4kRUJV+AV32c+fFf/jsn97YnQx0NTsCilPR7ycxAqrSL6A3JpMfrh54zn452bq4MgHFWOj3kxgBVekV0MUD0INr2F3lgsoYIf1+EiOgKr0C+vDCoe/KyQvpMT76/SRGQFV6BpRvKoeR0+8nMQKq0iugfF94jJ5+P4kRUJVeAZ3f2Pq65w2+BooR0u8nMQKq0i+gs0v7L/+8MdC1RAgoTkW/n8QIqEqvgM4+Wr7+88W3Pvvn5Y8vDHNVUP1ta32k4Um/n8QIqEqvgLpc1E5/21ofaXjS7ycxAqpCQJGDfj+JEVCVXgF1ob9trY80POn3kxgBVTEVI6AISr+fxAioiqkYAUVQ+v0kRkBVTMWODugfP9v3OS+kx+jo95MYAVXpGdDf7/JN5TBq+v0kRkBV+gX0Nt+VEyOn309iBFSlV0BnlyY7H3+17+sh+klAcSr6/SRGQFV6BfThhYEuokxAoaLfT2IEVKVnQAd6/zsBhYp+P4kRUJVeAZ1dIqAYOf1+EiOgKr0COr/Bp/AYOf1+EiOgKv0Ceuh7ehBQjJB+P4kRUJV+AZ3fuzA58+aG+kJ2BBSnp99PYgRUpWdAP+V1oBg3/X4SI6Aq/QJ6gxfSY+T0+0mMgKr0Cmh5If0gn7cTUIjo95MYAVXpFVCP55AIKE5Fv5/ECKhKz4DyOlCMnH4/iRFQlV4B5YX0GD39fhIjoCq9Ajq/MXmZgGLU9PtJjICq9Avo7NLO2wQUY6bfT2IEVKVXQGcfvTGZ7LzIC+kxXvr9JEZAVXoF1HxbY14HivHR7ycxAqpCQJGDfj+JEVCVXgF1ob9trY80POn3kxgBVTEVI6AISr+fxAioiqkYAUVQ+v0kRkBVTMVsQGd/tN8F/uGPz77A10AxOvr9JEZAVToC+vDC6imj2UebFy9tfoWAYlT0+0mMgKr0DOhBNgkoRkm/n8QIqAoBRQ76/SRGQFUIKHLQ7ycxAqpCQJGDfj+JEVAVAooc9PtJjICqEFDkoN9PYgRUhYAiB/1+EiOgKgQUOej3kxgBVSGgyEG/n8QIqAoBRQ76/SRGQFUIKHLQ7ycxAqrSHdAnEVCMj34/iRFQFQKKHPT7SYyAqnQEdPbRm0/im8phfPT7SYyAqnQE1JH+trU+0vCk309iBFTFVIyAIij9fhIjoCqmYgQUQen3kxgBVTEVI6AISr+fxAioiqkYAUVQ+v0kRkBVTMUIKILS7ycxAqpiKkZAEZR+P4kRUBVTMQKKoPT7SYyAqpiKEVAEpd9PYgRUxVTsiXciXdr5xeKHb78moBg3/X4SI6AqHQF9eGH5xvfV/xJQjJh+P4kRUJXOgC4fgRJQjJ5+P4kRUJWOgM4uTZ79/Ks/Xfjer786MMzn8/rb1vpIw5N+P4kRUJWOgM5vcDk7hKDfT2IEVKUroLNP6wL66OK0eOWL5UePr+xNp+9eX/3WoQ8IKDT0+0mMgKp0BXSR0K8+++fdnX/47MDnPa4Hen9vK6Drmq5ieugDAgoR/X4SI6Aq3QGdVz2JdGf62sEH16bnr88fXJ6ev2U/IKAQ0e8nMQKq0iugs49OfBH6a9P3939+f2/9OPTcJ+YDAgoV/X4SI6AqvQJ6co8vb/Xx5vrR6M1lVA99QEChot9PYgRUpXdAv/3V2clk5+xb/V7D9Oji+d99MJ3+9Pryg2vTD8svlk/rD31AQKGi309iBFSlb0APXs70cp+Abp5DWtZy/9Ho/b3ztw59sPr/Pr/S5489mdZHGp70+wFO6qiALvv5zItvvvH9ngW9M52+d2v+lyvTRS4JKBzo9wOc1BEBvbs7efY35Wf3Lk3K5UU6bL7SuXwuaauZr3xx6IND/4j+0XXrIw1P+v0kxqfwKv0CenXy7OZp+NmlyXPdAd24MzUPOp/yCJSAQkC/n8QIqEqvgK4vardyd/fZ/q9pMg86CSiGot9PYgRUpVdAD72Q/kSvqi+Z5Fl4DE+/n8QIqMowAX18eTuTm5d8rl8HuvUBAYWKfj+JEVCVXgGdXZq8s//B7UmPT+GvrR5frkLKO5EwPP1+EiOgKr0CevInke7vLV/G9OCD8o73RUZf3X/7+6EPCChU9PtJjICq9Avo3d3JmV+Xn/3p9V4vY1p8hr665tL15QcPti/A9ICrMWEA+v0kRkBV+gV09Uaks2fP9n4r0vzBz6bTc++tH2U+uLJI5rtP+4CAQkO/n8QIqErPgM7/sLt+J+fO2736eXL629b6SMOTfj+JEVCVvgGdz758Y/EI9MWPT3pdOwIKF/r9JEZAVXoHdHD629b6SMOTfj+JEVAVUzECiqD0+0mMgKqYihFQBKXfT2IEVMVUjIAiKP1+EiOgKqZiBBRB6feTGAFVMRUjoAhKv5/ECKiKqRgBRVD6/SRGQFVMxQgogtLvJzECqmIqRkARlH4/iRFQFVOxo67G9IPfEFCMmn4/iRFQlV4BfXhh63qgBBRjpN9PYgRUpWdAT/BdPAgoWtDvJzECqtIroIe+qRwBxRjp95MYAVXpFdD5jc23hSegGCn9fhIjoCr9AvrtLyeTZ158c+0ng1zSTn/bWh9peJuln3QAABwGSURBVNLvJzECqtIroA8vTLYN8wVR/W1rfaThSb+fxAioCgFFDvr9JEZAVXoF1IX+trU+0vCk309iBFTFVIyAIij9fhIjoCqmYscGdPb1gP0koDgV/X4SI6AqpmJHB/TLHy+/+PnwR28N9V3l9Let9ZGGJ/1+EiOgKj0DOvt09ezRwwuTMwO9KUl/21ofaXjS7ycxAqrSM6BXJ5Mzf737vd/O/m4yeXaYx6D629b6SMOTfj+JEVCVfgG9PZm8vX5H/B92B7qwiP62tT7S8KTfT2IEVKVfQK9OXt6/pMiNyXMEFKOj309iBFSlV0BXFxNZB/TuLi+kx/jo95MYAVXpFdBVOtcBHeradvrb1vpIw5N+P4kRUBUCihz0+0mMgKr0Cujs0vKJo3U5bw/0NLz+trU+0vCk309iBFSlV0BXTxytArqIKU8iYXz0+0mMgKr0C+jd3clL35SA3nt9MtDV6fW3rfWRhif9fhIjoCr9Arp4CDqZnN3defH7ix9fHqSfBBSnot9PYgRUpWdA57/f3VwNdKB+ElCcin4/iRFQlb4BnX/7q7OLej4z3DeI19+21kcanvT7SYyAqvQO6OD0t631kYYn/X4SI6AqpmLHXw/0qwH7SUBxKvr9JEZAVUzFjr8e6AKfwmOc9PtJjICq9Azo7NL+t5R7aaArKutvW+sjDU/6/SRGQFX6BXTZz50X//Nn//TGoqDDvI6egOJU9PtJjICq9Avo7f1XL81+OeF6oBgh/X4SI6AqvQK6eAB68OrPq7yVEyOk309iBFSlV0AfXth6+ybXA8UY6feTGAFV6RnQrWZyOTuMkX4/iRFQlV4BXV2Rfu3uLpezw/jo95MYAVXpFdBD3wfpxkDvhtffttZHGp70+0mMgKr0C+jDC5MffrPp5zCfwRNQnIp+P4kRUJWOgM4+erN4Y/U60H9+c3cyefEnfAqP0dHvJzECqtIR0MVDzyfxJBLGR7+fxAioCgFFDpUj+X/4DpH2pegIqCP9bWt9pOGpciStjzQ8SftSmIoRUARVOZLWRxqepH0pTMUIKIKqHEnrIw1P0r4UpmJHB/SPn+37nGfhMTqVI2l9pOFJ2peiZ0APvqccTyJhlCpH0vpIw5O0L0W/gN7mWXiMXOVIWh9peJL2pegV0Nmlyc7HX+37eoh+ElCcSuVIWh9peJL2pegV0IcXBrqIMgGFSuVIWh9peJL2pegZ0IHe/05AoVI5ktZHGp6kfSl6BXR2iYBi5CpH0vpIw5O0L0WvgM5v8Ck8Rq5yJK2PNDxJ+1L0C+ih7+lBQDFClSNpfaThSdqXol9A5/cuTM68ucHl7DA+lSNpfaThSdqXomdAP+V1oBi3ypG0PtLwJO1L0S+gN3ghPUauciStjzQ8SftS9ApoeSH9IJ+3E1CIVI6k9ZGGJ2lfil4B9XgOiYDiVCpH0vpIw5O0L0XPgPI6UIxc5UhaH2l4kval6BVQXkiP0ascSesjDU/SvhS9AjrY94InoFCpHEnrIw1P0r4U/QI6u7TzNgHFmFWOpPWRhidpX4peAZ19VL4vPC+kx3hVjqT1kYYnaV+KXgE139yY14FifCpH0vpIw5O0LwUBRQ6VI2l9pOFJ2peiV0Bd6G9b6yMNT5UjaX2k4Unal8JUjIAiqMqRtD7S8CTtS2EqRkARVOVIWh9peJL2pTAVOyKg3361jW8qh/GpHEnrIw1P0r4UvQLq8iSSXusjDU+VI2l9pOFJ2pen4Vl4BFU5ktZHGp6kfSl6BXT2x8/W/v71yc4/fM4L6TE6lSNpfaThSdqXoldAt93dfXaYK4Pqb1vrIw1PlSNpfaThSdqX4sQBHezCIvrb1vpIw1PlSFofaXiS9qU4eUCHegiqv22tjzQ8VY6k9ZGGJ2lfipMHdKirK+tvW+sjDU+VI2l9pOFJ2pfi5AG9u0tAMT6VI2l9pOFJ2pfixAGdXZ3wKTzGp3IkrY80PEn7UvQK6OyjzaVA33xjd8KTSBihypG0PtLwJO1L0Sugh19Iz8uYMEKVI2l9pOFJ2pfixAF95q2BvkG8/ra1PtLwVDmS1kcanqR9KXoF1IX+trU+0vBUOZLWRxqepH0pTMUIKIKqHEnrIw1P0r4UpmIEFEFVjqT1kYYnaV8KUzECiqAqR9L6SMOTtC+FqZgN6NYLmA7wbY0xPpUjaX2k4Unal6IjoOZKoFwPFGNVOZLWRxqepH0pCChyqBxJ6yMNT9K+FB0Btb7cnfBOJIxR5UhaH2l4kvalOFFAZz9f5PPMbwbpJwHFqVSOpPWRhidpX4qTBPQPi4efO0O9EYmA4lQqR9L6SMOTtC9F/4AO+vCTgOKUKkfS+kjDk7QvRe+Aloef/26wfBJQnE7lSFofaXiS9qXoGdB7Az/8JKA4pcqRtD7S8CTtS9EvoIM//CSgOKXKkbQ+0vAk7UvRJ6D3Li2vAjrow08CilOqHEnrIw1P0r4UPQJaHn6+PXA+CShOp3IkrY80PEn7UnQG1OfhJwHFKVWOpPWRhidpX4qugP7e5+EnAcUpVY6k9ZGGJ2lfio6A8l54BFE5ktZHGp6kfSkIKHKoHEnrIw1P0r4UHQHleqAIonIkrY80PEn7UnQE1JH+trU+0vBUOZLWRxqepH0pTMUIKIKqHEnrIw1P0r4UpmIEFEFVjqT1kYYnaV8KUzECiqAqR9L6SMOTtC+FqRgBRVCVI2l9pOFJ2pfCVIyAIqjKkbQ+0vAk7UthKkZAEVTlSFofaXiS9qUwFSOgCKpyJK2PNDxJ+1KYihFQBFU5ktZHGp6kfSlMxQgogqocSesjDU/SvhSmYgQUQVWOpPWRhidpXwpTMQKKoCpH0vpIw5O0L4WpGAFFUJUjaX2k4Unal8JUjIAiqMqRtD7S8CTtS2EqRkARVOVIWh9peJL2pTAVI6AIqnIkrY80PEn7UpiKEVAEVTmS1kcanqR9KUzFCCiCqhxJ6yMNT9K+FKZiBBRBVY6k9ZGGJ2lfClMxAoqgKkfS+kjDk7QvhakYAUVQlSNpfaThSdqXwlSMgCKoypG0PtLwJO1LYSpGQBFU5UhaH2l4kvalMBUjoAiqciStjzQ8SftSmIoRUARVOZLWRxqepH0pTMUIKIKqHEnrIw1P0r4UpmIEFEFVjqT1kYYnaV8KUzECiqAqR9L6SMOTtC+FqRgBRVCVI2l9pOFJ2pfCVIyAIqjKkbQ+0vAk7UthKkZAEVTlSFofaXiS9qUwFSOgCKpyJK2PNDxJ+1KYihFQBFU5ktZHGp6kfSlMxQgogqocSesjDU/SvhSmYgQUQVWOpPWRhidpXwpTMQKKoCpH0vpIw5O0L4WpGAFFUJUjaX2k4Unal8JUjIAiqMqRtD7S8CTtS2EqRkARVOVIWh9peJL2pTAVI6AIqnIkrY80PEn7UpiKEVAEVTmS1kcanqR9KUzFCCiCqhxJ6yMNT9K+FKZiBBRBVY6k9ZGGJ2lfClMxAoqgKkfS+kjDk7QvhakYAUVQlSNpfaThSdqXwlSMgCKoypG0PtLwJO1LYSpGQBFU5UhaH2l4kvalMBUjoAiqciStjzQ8SftSmIrpAvpvP5tOz717vfz80cVp8coXy48eX9mbTte/Q0AhUjmS1kcanqR9KYYK6L+sknnuk+UH9/e2Arqu6SqmBBQilSNpfaThSdqXYqCA3pme+9v5/MHlVSfvTF87+K1r0/PXl79z/hYBhU7lSFofaXiS9qUYJqCPL08/XP64eLT5YWnm+/u/dX9v/Th09eCUgEKjciStjzQ8SftSDBPQRxfXn6GXdD6+vBXLm+tHoze3okpAcWqVI2l9pOFJ2pdimIDuKwF9dPH87z6YTn96ffUr5bHp4U/rCShOq3IkrY80PEn7Ugwb0NUn6pvnkJbp3H80en9v80XQ51e0f/NS6yMNT5UjaX2k4Unal6cRB3T1+fqd6fS9W/O/XFk+J09AMYzKkbQ+0vAk7cvTaAN6Z/Uyps2XPZefz28F1LyQSf/ouvWRhqfKkbQ+0vAk7UsxZEDv7J378HBPz996yiNQAgqBypG0PtLwJO1LMWBAb07NK5WWDzoJKIZROZLWRxqepH0phgvov9h+rprJs/AYROVIWh9peJL2pRgqoI+vTV9df41z86r6VTM3r//kdaCQqhxJ6yMNT9K+FEMF9NrWWzWvrR5srkLKO5EwiMqRtD7S8CTtSzFQQG9uv9X9/t7yZUwPPii/tsjoq7wXHnKVI2l9pOFJ2pdimIBurl+38FrJ6eoCTNeXv/eAqzFhAJUjaX2k4Unal2KYgN6ZHgro/MHy4qDvrR9yPriy+OV3b9l/Rn/bWh9peKocSesjDU/SvhTDBLSG/ra1PtLwVDmS1kcanqR9KUzFCCiCqhxJ6yMNT9K+FKZiBBRBVY6k9ZGGJ2lfClMxAoqgKkfS+kjDk7QvhakYAUVQlSNpfaThSdqXwlSMgCKoypG0PtLwJO1LYSpGQBFU5UhaH2l4kvalMBUjoAiqciStjzQ8SftSmIoRUARVOZLWRxqepH0pTMUIKIKqHEnrIw1P0r4UpmIEFEFVjqT1kYYnaV8KUzECiqAqR9L6SMOTtC+FqRgBRVCVI2l9pOFJ2pfCVIyAIqjKkbQ+0vAk7UthKkZAEVTlSFofaXiS9qUwFSOgCKpyJK2PNDxJ+1KYihFQBFU5ktZHGp6kfSlMxQgogqocSesjDU/SvhSmYgQUQVWOpPWRhidpXwpTMQKKoCpH0vpIw5O0L4WpGAFFUJUjaX2k4Unal8JUjIAiqMqRtD7S8CTtS2EqRkARVOVIWh9peJL2pTAVI6AIqnIkrY80PEn7UpiKEVAEVTmS1kcanqR9KUzFCCiCqhxJ6yMNT9K+FKZiBBRBVY6k9ZGGJ2lfClMxAoqgKkfS+kjDk7QvhakYAUVQlSNpfaThSdqXwlSMgCKoypG0PtLwJO1LYSpGQBFU5UhaH2l4kvalMBUjoAiqciStjzQ8SftSmIoRUARVOZLWRxqepH0pTMUIKIKqHEnrIw1P0r4UpmIEFEFVjqT1kYYnaV8KUzECiqAqR9L6SMOTtC+FqRgBRVCVI2l9pOFJ2pfCVIyAIqjKkbQ+0vAk7UthKkZAEVTlSFofaXiS9qUwFSOgCKpyJK2PNDxJ+1KYihFQBFU5ktZHGp6kfSlMxQgogqocSesjDU/SvhSmYgQUQVWOpPWRhidpXwpTMQKKoCpH0vpIw5O0L4WpGAFFUJUjaX2k4Unal8JUjIAiqMqRtD7S8CTtS2EqRkARVOVIWh9peJL2pTAVI6AIqnIkrY80PEn7UpiKEVAEVTmS1kcanqR9KUzFCCiCqhxJ6yMNT9K+FKZiBBRBVY6k9ZGGJ2lfClMxAoqgKkfS+kjDk7QvhakYAUVQlSNpfaThSdqXwlSMgCKoypG0PtLwJO1LYSpGQBFU5UhaH2l4kvalMBUjoAiqciStjzQ8SftSmIoRUARVOZLWRxqepH0pTMUIKIKqHEnrIw1P0r4UpmIEFEFVjqT1kYYnaV8KUzECiqAqR9L6SMOTtC+FqRgBRVCVI2l9pOFJ2pfCVIyAIqjKkbQ+0vAk7UthKkZAEVTlSFofaXiS9qUwFSOgCKpyJK2PNDxJ+1KYihFQBFU5ktZHGp6kfSlMxQgogqocSesjDU/SvhSmYgQUQVWOpPWRhidpXwpTMQKKoCpH0vpIw5O0L4WpGAFFUJUjaX2k4Unal8JUjIAiqMqRtD7S8CTtS2EqRkARVOVIWh9peJL2pTAVI6AIqnIkrY80PEn7UpiKEVAEVTmS1kcanqR9KUzFCCiCqhxJ6yMNT9K+FKZiBBRBVY6k9ZGGJ2lfClMxAoqgKkfS+kjDk7QvhakYAUVQlSNpfaThSdqXwlSMgCKoypG0PtLwJO1LYSpGQBFU5UhaH2l4kvalMBVrGFC91kcanipH0vpIw5O0L0/DI1AEVTmS1kcanqR9KUzFCCiCqhxJ6yMNT9K+FKZiBBRBVY6k9ZGGJ2lfClMxAoqgKkfS+kjDk7QvhakYAUVQlSNpfaThSdqXwlSMgCKoypG0PtLwJO1LYSpGQBFU5UhaH2l4kvalMBUjoAiqciStjzQ8SftSmIoRUARVOZLWRxqepH0pTMUIKIKqHEnrIw1P0r4UpmIEFEFVjqT1kYYnaV8KUzECiqAqR9L6SMOTtC+FqRgBRVCVI2l9pOFJ2pfCVIyAIqjKkbQ+0vAk7UthKkZAEVTlSFofaXiS9qUwFSOgCKpyJK2PNDxJ+1KYihFQBFU5ktZHGp6kfSlMxQgogqocSesjDU/SvhSmYgQUQVWOpPWRhidpXwpTMQKKoCpH0vpIw5O0L4WpGAFFUJUjaX2k4Unal8JUjIAiqMqRtD7S8CTtS2EqRkARVOVIWh9peJL2pTAVI6AIqnIkrY80PEn7UpiKEVAEVTmS1kcanqR9KUzFCCiCqhxJ6yMNT9K+FKZiBBRBVY6k9ZGGJ2lfClMxAoqgKkfS+kjDk7QvhakYAUVQlSNpfaThSdqXwlSMgCKoypG0PtLwJO1LYSpGQBFU5UhaH2l4kvalMBUjoAiqciStjzQ8SftSmIoRUARVOZLWRxqepH0pTMUIKIKqHEnrIw1P0r4UpmIEFEFVjqT1kYYnaV8KUzECiqAqR9L6SMOTtC+FqRgBRVCVI2l9pOFJ2pfCVIyAIqjKkbQ+0vAk7UthKkZAEVTlSFofaXiS9qUwFSOgCKpyJK2PNDxJ+1KYihFQBFU5ktZHGp6kfSlMxQgogqocSesjDU/SvhSmYgQUQVWOpPWRhidpXwpTMQKKoCpH0vpIw5O0L4WpGAFFUJUjaX2k4Unal8JUjIAiqMqRtD7S8CTtS2EqRkARVOVIWh9peJL2pTAVI6AIqnIkrY80PEn7UpiKEVAEVTmS1kcanqR9KUzFCCiCqhxJ6yMNT9K+FKZiBBRBVY6k9ZGGJ2lfClMxAoqgKkfS+kjDk7QvhakYAUVQlSNpfaThSdqXwlSMgCKoypG0PtLwJO1LYSpGQBFU5UhaH2l4kvalMBUjoAiqciStjzQ8SftSmIoRUARVOZLWRxqepH0pTMUIKIKqHEnrIw1P0r4UpmIEFEFVjqT1kYYnaV8KUzECiqAqR9L6SMOTtC+FqRgBRVCVI2l9pOFJ2pfCVIyAIqjKkbQ+0vAk7UthKkZAEVTlSFofaXiS9qUwFSOgCKpyJK2PNDxJ+1KYihFQBFU5ktZHGp6kfSlMxQgogqocSesjDU/SvhSmYgQUQVWOpPWRhidpXwpTMQKKoCpH0vpIw5O0L4WpGAFFUJUjaX2k4Unal8JUjIAiqMqRtD7S8CTtS2EqRkARVOVIWh9peJL2pTAVI6AIqnIkrY80PEn7UpiKEVAEVTmS1kcanqR9KUzFCCiCqhxJ6yMNT9K+FKZiBBRBVY6k9ZGGJ2lfClMxAoqgKkfS+kjDk7QvhakYAUVQlSNpfaThSdqXwlSMgCKoypG0PtLwJO1LYSpGQBFU5UhaH2l4kvalMBUjoAiqciStjzQ8SftSmIp5BPTxlb3p9N3rBBRKlSNpfaThSdqXwj+gjy5Ol175goBCqHIkrY80PEn7UvgH9Nr0/PX5g8vT87cIKHQqR9L6SMOTtC+Fe0Dv75XHno8unvuEgEKnciStjzQ8SftSuAf05vS19Y/vE1DoVI6k9ZGGJ2lfCveAXpt+WH68sw4pAYVE5UhaH2l4kval8A7o48vrT93v722+CPr8iv7van2k4alyJK2PNDxJ+/I0qQIKAJ48A2peyKR/dP3dxD2JToxEpWFAzeuYWt8TWXBPohMjUSGg2XBPohMjUfEOqOez8N9N3JPoxEhU3AO6ef2nw+tAv5u4J9GJkai4B9TxnUjfTdyT6MRIVNwD+vjy9FWn98J/N3FPohMjUXEP6PyB29WYvpu4J9GJkaj4B3T+4Mqin+/esr/c+p7IgnsSnRiJSoOAHqH1PZEF9yQ6MRIVUzECGh73JDoxEhVTMQIaHvckOjESFVMxAhoe9yQ6MRIVUzECGh73JDoxEhVTMQIaHvckOjESFVMxAhoe9yQ6MRIVUzECGh73JDoxEhVTMQIaHvckOjESFVMxAhoe9yQ6MRIVUzECGh73JDoxEhVTMQIaHvckOjESFVMxAhoe9yQ6MRIVUzECGh73JDoxEhVTMQIaHvckOjESFVMxAhoe9yQ6MRIVUzECGh73JDoxEhVTMQIaHvckOjESFVMxAhoe9yQ6MRIVUzECGh73JDoxEhVTMQIaHvckOjESFVMxAhoe9yQ6MRIVUzECGh73JDoxEhVTMQIaHvckOjESFVMxAhoe9yQ6MRIVUzECGh73JDoxEhVTMQIaHvckOjESFVOxhgGFxvPPt/43wOgxkoEQ0PA4G+jESAZCQMPjbKATIxkIAQ2Ps4FOjGQgBDQ8zgY6MZKBENDwOBvoxEgGQkDD42ygEyMZCAEFgEoEFAAqEVAAqERAAaASAQWASgQUACoRUACoREABoBIBDeHRxen7+z995Yum/y4Yk8eXp+dv7f/0w7b/Mt9BBDSERUDPfbL5KQHFgft7m/+23tlPKdwQ0BAWAZ2+tvkpAcWWm9PVIB5d3Pw3Fn4IaAiLw/E368/PCCgO2Xx55+bmP7FwREBDWFTzf+xtHmisfnxwZTqdvnu96b8WxuBO+fLO/fU+FsPYm05/en31858tRvLv/7bhv1x2BDSEZTXXjzDWAb2zOCUL53ja4Dvv8eXlMq6tP0O5vzWM9c95aDocAhrCsprrJ1lXAV0cjXf/9/zxv0z5uhfu75375P7e6hmkxSf0792aP/7X5RdGF4v5D4tf/Lc9RjIYAhpCqebqk7RVQDdf8LrGowssVnD+v6wjuRnGzen7PK3kgICGsKpmqWX56f5L/njpCrZfpPH48rqZy0eki5W8+j9b/nt9BxDQEFYBLY8oyk/3H1vwnDzmy/+OrmewaObG4lduLn989b/yn9jhENAQNs8cLR5vrgO6PjAEFPPV483yk+Vj0YOAzv/8N+Wn75HQoRDQEDadvDZ9n0egeMJWQM2XPR//9+Urmd5/2j8EAQIawqaTi/Px3/gaKKz9gD7t/fCP/5WRDIaAhrD/QPPO9K/2eBYexn5AF8NY/Wz5X9bNa+sPfhdqBDSEg8/Ur62+uLV6HehfrvA6UMy3E/no4vT89fn8z3uLR6LLKzUtfv7gMv+VHQwBDeEgoIty8k4kGFuPMdfDmL43P3gn0qt8nXwoBDSEreeKNhff4b3w2Lf9SfrqvfD/ePDzv/qPfAI/GAIKAJUIKABUIqAAUImAAkAlAgoAlQgoAFQioABQiYACQCUCCgCVCCgAVCKgAFCJgAJAJQIKAJUIKABUIqAAUImAAkAlAgoAlQgoAFQioABQiYACQCUCCgCVCCgAVCKgAFCJgAJAJQIKAJUIKABUIqAAUImAAkAlAgoAlQgoAFQioABQiYACQCUCCgCVCCgAVCKgAFCJgAJAJQIKAJUIKABUIqAAUImAAkAlAgoAlQgoAFQioABQiYACQCUCCgCVCCgAVCKgAFCJgAJAJQIKAJUIKABUIqAAUOn/A71FEGOQyBlxAAAAAElFTkSuQmCC">
             <a:extLst>
               <a:ext uri="{FF2B5EF4-FFF2-40B4-BE49-F238E27FC236}">
-                <a16:creationId xmlns="" xmlns:a16="http://schemas.microsoft.com/office/drawing/2014/main" id="{8CC047BC-7FEC-4EB1-BCEA-02FB6A9AD576}"/>
+                <a16:creationId xmlns:a16="http://schemas.microsoft.com/office/drawing/2014/main" id="{8CC047BC-7FEC-4EB1-BCEA-02FB6A9AD576}"/>
               </a:ext>
             </a:extLst>
           </p:cNvPr>
@@ -6810,7 +6806,7 @@
           <p:cNvPr id="2" name="Title 1">
             <a:extLst>
               <a:ext uri="{FF2B5EF4-FFF2-40B4-BE49-F238E27FC236}">
-                <a16:creationId xmlns="" xmlns:a16="http://schemas.microsoft.com/office/drawing/2014/main" id="{17CB2D08-4BAE-2F4A-8071-3E05ECE51CA4}"/>
+                <a16:creationId xmlns:a16="http://schemas.microsoft.com/office/drawing/2014/main" id="{17CB2D08-4BAE-2F4A-8071-3E05ECE51CA4}"/>
               </a:ext>
             </a:extLst>
           </p:cNvPr>
@@ -6838,7 +6834,7 @@
           <p:cNvPr id="3" name="Text Placeholder 2">
             <a:extLst>
               <a:ext uri="{FF2B5EF4-FFF2-40B4-BE49-F238E27FC236}">
-                <a16:creationId xmlns="" xmlns:a16="http://schemas.microsoft.com/office/drawing/2014/main" id="{2CB8F888-4E88-3C48-97A3-DE897DD7A13A}"/>
+                <a16:creationId xmlns:a16="http://schemas.microsoft.com/office/drawing/2014/main" id="{2CB8F888-4E88-3C48-97A3-DE897DD7A13A}"/>
               </a:ext>
             </a:extLst>
           </p:cNvPr>
@@ -6896,7 +6892,7 @@
           <p:cNvPr id="2" name="Title 1">
             <a:extLst>
               <a:ext uri="{FF2B5EF4-FFF2-40B4-BE49-F238E27FC236}">
-                <a16:creationId xmlns="" xmlns:a16="http://schemas.microsoft.com/office/drawing/2014/main" id="{3129F6F4-C26D-2D4B-8E4C-6A94B3DD3867}"/>
+                <a16:creationId xmlns:a16="http://schemas.microsoft.com/office/drawing/2014/main" id="{3129F6F4-C26D-2D4B-8E4C-6A94B3DD3867}"/>
               </a:ext>
             </a:extLst>
           </p:cNvPr>
@@ -6929,7 +6925,7 @@
           <p:cNvPr id="3" name="Content Placeholder 2">
             <a:extLst>
               <a:ext uri="{FF2B5EF4-FFF2-40B4-BE49-F238E27FC236}">
-                <a16:creationId xmlns="" xmlns:a16="http://schemas.microsoft.com/office/drawing/2014/main" id="{951BCDC8-4300-354A-9B8D-54FED2B48CE2}"/>
+                <a16:creationId xmlns:a16="http://schemas.microsoft.com/office/drawing/2014/main" id="{951BCDC8-4300-354A-9B8D-54FED2B48CE2}"/>
               </a:ext>
             </a:extLst>
           </p:cNvPr>
@@ -7035,10 +7031,9 @@
           <a:lstStyle/>
           <a:p>
             <a:r>
-              <a:rPr lang="en-US" dirty="0" smtClean="0"/>
+              <a:rPr lang="en-US" dirty="0"/>
               <a:t>Introduction</a:t>
             </a:r>
-            <a:endParaRPr lang="en-US" dirty="0"/>
           </a:p>
         </p:txBody>
       </p:sp>
@@ -7124,15 +7119,7 @@
                   <a:srgbClr val="002060"/>
                 </a:solidFill>
               </a:rPr>
-              <a:t>The top 3 factors that contribute to </a:t>
-            </a:r>
-            <a:r>
-              <a:rPr lang="en-US" sz="2400" dirty="0" smtClean="0">
-                <a:solidFill>
-                  <a:srgbClr val="002060"/>
-                </a:solidFill>
-              </a:rPr>
-              <a:t>attrition</a:t>
+              <a:t>The top 3 factors that contribute to attrition</a:t>
             </a:r>
           </a:p>
           <a:p>
@@ -7152,18 +7139,13 @@
               <a:buChar char="•"/>
             </a:pPr>
             <a:r>
-              <a:rPr lang="en-US" sz="2400" dirty="0" smtClean="0">
+              <a:rPr lang="en-US" sz="2400" dirty="0">
                 <a:solidFill>
                   <a:srgbClr val="002060"/>
                 </a:solidFill>
               </a:rPr>
               <a:t>Methodology</a:t>
             </a:r>
-            <a:endParaRPr lang="en-US" sz="2400" dirty="0">
-              <a:solidFill>
-                <a:srgbClr val="002060"/>
-              </a:solidFill>
-            </a:endParaRPr>
           </a:p>
           <a:p>
             <a:pPr marL="285750" indent="-285750">
@@ -7311,7 +7293,7 @@
           <a:lstStyle/>
           <a:p>
             <a:r>
-              <a:rPr lang="en-US" b="1" u="sng" dirty="0" smtClean="0">
+              <a:rPr lang="en-US" b="1" u="sng" dirty="0">
                 <a:solidFill>
                   <a:srgbClr val="002060"/>
                 </a:solidFill>
@@ -7321,7 +7303,7 @@
           </a:p>
           <a:p>
             <a:r>
-              <a:rPr lang="en-US" dirty="0" smtClean="0">
+              <a:rPr lang="en-US" dirty="0">
                 <a:solidFill>
                   <a:srgbClr val="002060"/>
                 </a:solidFill>
@@ -7331,18 +7313,13 @@
           </a:p>
           <a:p>
             <a:r>
-              <a:rPr lang="en-US" dirty="0" smtClean="0">
+              <a:rPr lang="en-US" dirty="0">
                 <a:solidFill>
                   <a:srgbClr val="002060"/>
                 </a:solidFill>
               </a:rPr>
               <a:t>Total Variables	 :  35</a:t>
             </a:r>
-            <a:endParaRPr lang="en-US" dirty="0">
-              <a:solidFill>
-                <a:srgbClr val="002060"/>
-              </a:solidFill>
-            </a:endParaRPr>
           </a:p>
         </p:txBody>
       </p:sp>
@@ -7457,7 +7434,7 @@
           <a:lstStyle/>
           <a:p>
             <a:r>
-              <a:rPr lang="en-US" b="1" u="sng" dirty="0" smtClean="0">
+              <a:rPr lang="en-US" b="1" u="sng" dirty="0">
                 <a:solidFill>
                   <a:srgbClr val="002060"/>
                 </a:solidFill>
@@ -7467,7 +7444,7 @@
           </a:p>
           <a:p>
             <a:r>
-              <a:rPr lang="en-US" dirty="0" err="1" smtClean="0">
+              <a:rPr lang="en-US" dirty="0" err="1">
                 <a:solidFill>
                   <a:srgbClr val="002060"/>
                 </a:solidFill>
@@ -7475,7 +7452,7 @@
               <a:t>HeadCount</a:t>
             </a:r>
             <a:r>
-              <a:rPr lang="en-US" dirty="0" smtClean="0">
+              <a:rPr lang="en-US" dirty="0">
                 <a:solidFill>
                   <a:srgbClr val="002060"/>
                 </a:solidFill>
@@ -7483,7 +7460,7 @@
               <a:t>, </a:t>
             </a:r>
             <a:r>
-              <a:rPr lang="en-US" dirty="0" err="1" smtClean="0">
+              <a:rPr lang="en-US" dirty="0" err="1">
                 <a:solidFill>
                   <a:srgbClr val="002060"/>
                 </a:solidFill>
@@ -7491,7 +7468,7 @@
               <a:t>EmployeeID</a:t>
             </a:r>
             <a:r>
-              <a:rPr lang="en-US" dirty="0" smtClean="0">
+              <a:rPr lang="en-US" dirty="0">
                 <a:solidFill>
                   <a:srgbClr val="002060"/>
                 </a:solidFill>
@@ -7499,7 +7476,7 @@
               <a:t>, Over18, </a:t>
             </a:r>
             <a:r>
-              <a:rPr lang="en-US" dirty="0" err="1" smtClean="0">
+              <a:rPr lang="en-US" dirty="0" err="1">
                 <a:solidFill>
                   <a:srgbClr val="002060"/>
                 </a:solidFill>
@@ -7537,7 +7514,7 @@
           <a:lstStyle/>
           <a:p>
             <a:r>
-              <a:rPr lang="en-US" b="1" dirty="0" smtClean="0">
+              <a:rPr lang="en-US" b="1" dirty="0">
                 <a:solidFill>
                   <a:srgbClr val="002060"/>
                 </a:solidFill>
@@ -7545,7 +7522,7 @@
               <a:t>Summary: </a:t>
             </a:r>
             <a:r>
-              <a:rPr lang="en-US" dirty="0" smtClean="0">
+              <a:rPr lang="en-US" dirty="0">
                 <a:solidFill>
                   <a:srgbClr val="002060"/>
                 </a:solidFill>
@@ -7560,21 +7537,8 @@
                   <a:srgbClr val="002060"/>
                 </a:solidFill>
               </a:rPr>
-              <a:t>i</a:t>
-            </a:r>
-            <a:r>
-              <a:rPr lang="en-US" dirty="0" smtClean="0">
-                <a:solidFill>
-                  <a:srgbClr val="002060"/>
-                </a:solidFill>
-              </a:rPr>
-              <a:t>ncluded both personal and professional data on employee from various departments.</a:t>
-            </a:r>
-            <a:endParaRPr lang="en-US" dirty="0">
-              <a:solidFill>
-                <a:srgbClr val="002060"/>
-              </a:solidFill>
-            </a:endParaRPr>
+              <a:t>included both personal and professional data on employee from various departments.</a:t>
+            </a:r>
           </a:p>
         </p:txBody>
       </p:sp>
@@ -7601,7 +7565,7 @@
           <a:lstStyle/>
           <a:p>
             <a:r>
-              <a:rPr lang="en-US" b="1" u="sng" dirty="0" smtClean="0">
+              <a:rPr lang="en-US" b="1" u="sng" dirty="0">
                 <a:solidFill>
                   <a:srgbClr val="002060"/>
                 </a:solidFill>
@@ -7611,7 +7575,7 @@
           </a:p>
           <a:p>
             <a:r>
-              <a:rPr lang="en-US" dirty="0" smtClean="0">
+              <a:rPr lang="en-US" dirty="0">
                 <a:solidFill>
                   <a:srgbClr val="002060"/>
                 </a:solidFill>
@@ -7621,18 +7585,13 @@
           </a:p>
           <a:p>
             <a:r>
-              <a:rPr lang="en-US" dirty="0" smtClean="0">
+              <a:rPr lang="en-US" dirty="0">
                 <a:solidFill>
                   <a:srgbClr val="002060"/>
                 </a:solidFill>
               </a:rPr>
               <a:t>Character	: 10</a:t>
             </a:r>
-            <a:endParaRPr lang="en-US" dirty="0">
-              <a:solidFill>
-                <a:srgbClr val="002060"/>
-              </a:solidFill>
-            </a:endParaRPr>
           </a:p>
         </p:txBody>
       </p:sp>
@@ -7659,7 +7618,7 @@
           <a:lstStyle/>
           <a:p>
             <a:r>
-              <a:rPr lang="en-US" b="1" u="sng" dirty="0" smtClean="0">
+              <a:rPr lang="en-US" b="1" u="sng" dirty="0">
                 <a:solidFill>
                   <a:srgbClr val="002060"/>
                 </a:solidFill>
@@ -7670,18 +7629,13 @@
           <a:p>
             <a:pPr lvl="1"/>
             <a:r>
-              <a:rPr lang="en-US" sz="2000" dirty="0" smtClean="0">
+              <a:rPr lang="en-US" sz="2000" dirty="0">
                 <a:solidFill>
                   <a:srgbClr val="002060"/>
                 </a:solidFill>
               </a:rPr>
               <a:t>	23</a:t>
             </a:r>
-            <a:endParaRPr lang="en-US" sz="2000" dirty="0">
-              <a:solidFill>
-                <a:srgbClr val="002060"/>
-              </a:solidFill>
-            </a:endParaRPr>
           </a:p>
         </p:txBody>
       </p:sp>
@@ -7750,7 +7704,7 @@
           <p:cNvPr id="4" name="Title 1">
             <a:extLst>
               <a:ext uri="{FF2B5EF4-FFF2-40B4-BE49-F238E27FC236}">
-                <a16:creationId xmlns="" xmlns:a16="http://schemas.microsoft.com/office/drawing/2014/main" id="{10025774-F3AC-0B46-BFAD-62F83C5E6558}"/>
+                <a16:creationId xmlns:a16="http://schemas.microsoft.com/office/drawing/2014/main" id="{10025774-F3AC-0B46-BFAD-62F83C5E6558}"/>
               </a:ext>
             </a:extLst>
           </p:cNvPr>
@@ -7863,7 +7817,7 @@
           <p:cNvPr id="5" name="Text Placeholder 2">
             <a:extLst>
               <a:ext uri="{FF2B5EF4-FFF2-40B4-BE49-F238E27FC236}">
-                <a16:creationId xmlns="" xmlns:a16="http://schemas.microsoft.com/office/drawing/2014/main" id="{9958FC6C-D112-8144-B815-67A37B638E30}"/>
+                <a16:creationId xmlns:a16="http://schemas.microsoft.com/office/drawing/2014/main" id="{9958FC6C-D112-8144-B815-67A37B638E30}"/>
               </a:ext>
             </a:extLst>
           </p:cNvPr>
@@ -7950,13 +7904,8 @@
           <a:p>
             <a:r>
               <a:rPr lang="en-US" dirty="0"/>
-              <a:t>Methodology – </a:t>
-            </a:r>
-            <a:r>
-              <a:rPr lang="en-US" dirty="0" smtClean="0"/>
-              <a:t>ALGORITHMS Considered</a:t>
-            </a:r>
-            <a:endParaRPr lang="en-US" dirty="0"/>
+              <a:t>Methodology – ALGORITHMS Considered</a:t>
+            </a:r>
           </a:p>
         </p:txBody>
       </p:sp>
@@ -7983,7 +7932,7 @@
           <a:lstStyle/>
           <a:p>
             <a:r>
-              <a:rPr lang="en-US" dirty="0" smtClean="0">
+              <a:rPr lang="en-US" dirty="0">
                 <a:solidFill>
                   <a:srgbClr val="002060"/>
                 </a:solidFill>
@@ -8000,7 +7949,7 @@
           </a:p>
           <a:p>
             <a:r>
-              <a:rPr lang="en-US" dirty="0" smtClean="0">
+              <a:rPr lang="en-US" dirty="0">
                 <a:solidFill>
                   <a:srgbClr val="002060"/>
                 </a:solidFill>
@@ -8017,18 +7966,13 @@
           </a:p>
           <a:p>
             <a:r>
-              <a:rPr lang="en-US" dirty="0" smtClean="0">
+              <a:rPr lang="en-US" dirty="0">
                 <a:solidFill>
                   <a:srgbClr val="002060"/>
                 </a:solidFill>
               </a:rPr>
               <a:t>Conditional Random Forest</a:t>
             </a:r>
-            <a:endParaRPr lang="en-US" dirty="0">
-              <a:solidFill>
-                <a:srgbClr val="002060"/>
-              </a:solidFill>
-            </a:endParaRPr>
           </a:p>
         </p:txBody>
       </p:sp>
@@ -8055,16 +7999,15 @@
           <a:lstStyle/>
           <a:p>
             <a:r>
-              <a:rPr lang="en-US" dirty="0" smtClean="0"/>
+              <a:rPr lang="en-US" dirty="0"/>
               <a:t>RAJAT TO ADD CONTENT ON THE DIFFERENCES, STRENGTHS, AND WEAKNESSES</a:t>
             </a:r>
           </a:p>
           <a:p>
             <a:r>
-              <a:rPr lang="en-US" dirty="0" smtClean="0"/>
+              <a:rPr lang="en-US" dirty="0"/>
               <a:t>OF EACH METHOD</a:t>
             </a:r>
-            <a:endParaRPr lang="en-US" dirty="0"/>
           </a:p>
         </p:txBody>
       </p:sp>
@@ -8122,13 +8065,8 @@
           <a:p>
             <a:r>
               <a:rPr lang="en-US" dirty="0"/>
-              <a:t>Methodology – </a:t>
-            </a:r>
-            <a:r>
-              <a:rPr lang="en-US" dirty="0" smtClean="0"/>
-              <a:t>Conditional Random Forest</a:t>
-            </a:r>
-            <a:endParaRPr lang="en-US" dirty="0"/>
+              <a:t>Methodology – Conditional Random Forest</a:t>
+            </a:r>
           </a:p>
         </p:txBody>
       </p:sp>
@@ -8155,7 +8093,7 @@
           <a:lstStyle/>
           <a:p>
             <a:r>
-              <a:rPr lang="en-US" dirty="0" smtClean="0">
+              <a:rPr lang="en-US" dirty="0">
                 <a:solidFill>
                   <a:srgbClr val="002060"/>
                 </a:solidFill>
@@ -8195,18 +8133,13 @@
           <a:lstStyle/>
           <a:p>
             <a:r>
-              <a:rPr lang="en-US" b="1" dirty="0" smtClean="0">
+              <a:rPr lang="en-US" b="1" dirty="0">
                 <a:solidFill>
                   <a:srgbClr val="002060"/>
                 </a:solidFill>
               </a:rPr>
               <a:t>Prediction Score: 85.79%</a:t>
             </a:r>
-            <a:endParaRPr lang="en-US" b="1" dirty="0">
-              <a:solidFill>
-                <a:srgbClr val="002060"/>
-              </a:solidFill>
-            </a:endParaRPr>
           </a:p>
         </p:txBody>
       </p:sp>
@@ -8263,16 +8196,15 @@
           <a:lstStyle/>
           <a:p>
             <a:r>
-              <a:rPr lang="en-US" dirty="0" smtClean="0"/>
+              <a:rPr lang="en-US" dirty="0"/>
               <a:t>RAJAT TO ADD ANOTHER CHART </a:t>
             </a:r>
           </a:p>
           <a:p>
             <a:r>
-              <a:rPr lang="en-US" dirty="0" smtClean="0"/>
+              <a:rPr lang="en-US" dirty="0"/>
               <a:t>OR INFOGRAPHIC OF SORT </a:t>
             </a:r>
-            <a:endParaRPr lang="en-US" dirty="0"/>
           </a:p>
         </p:txBody>
       </p:sp>
@@ -8365,7 +8297,7 @@
           <p:cNvPr id="5" name="Table 4">
             <a:extLst>
               <a:ext uri="{FF2B5EF4-FFF2-40B4-BE49-F238E27FC236}">
-                <a16:creationId xmlns="" xmlns:a16="http://schemas.microsoft.com/office/drawing/2014/main" id="{B703D80E-7F52-4EC4-8019-B211F825CC91}"/>
+                <a16:creationId xmlns:a16="http://schemas.microsoft.com/office/drawing/2014/main" id="{B703D80E-7F52-4EC4-8019-B211F825CC91}"/>
               </a:ext>
             </a:extLst>
           </p:cNvPr>
@@ -8394,49 +8326,49 @@
                 <a:gridCol w="3299143">
                   <a:extLst>
                     <a:ext uri="{9D8B030D-6E8A-4147-A177-3AD203B41FA5}">
-                      <a16:colId xmlns="" xmlns:a16="http://schemas.microsoft.com/office/drawing/2014/main" val="2088784793"/>
+                      <a16:colId xmlns:a16="http://schemas.microsoft.com/office/drawing/2014/main" val="2088784793"/>
                     </a:ext>
                   </a:extLst>
                 </a:gridCol>
                 <a:gridCol w="1071880">
                   <a:extLst>
                     <a:ext uri="{9D8B030D-6E8A-4147-A177-3AD203B41FA5}">
-                      <a16:colId xmlns="" xmlns:a16="http://schemas.microsoft.com/office/drawing/2014/main" val="44769478"/>
+                      <a16:colId xmlns:a16="http://schemas.microsoft.com/office/drawing/2014/main" val="44769478"/>
                     </a:ext>
                   </a:extLst>
                 </a:gridCol>
                 <a:gridCol w="1160963">
                   <a:extLst>
                     <a:ext uri="{9D8B030D-6E8A-4147-A177-3AD203B41FA5}">
-                      <a16:colId xmlns="" xmlns:a16="http://schemas.microsoft.com/office/drawing/2014/main" val="2042025665"/>
+                      <a16:colId xmlns:a16="http://schemas.microsoft.com/office/drawing/2014/main" val="2042025665"/>
                     </a:ext>
                   </a:extLst>
                 </a:gridCol>
                 <a:gridCol w="1153844">
                   <a:extLst>
                     <a:ext uri="{9D8B030D-6E8A-4147-A177-3AD203B41FA5}">
-                      <a16:colId xmlns="" xmlns:a16="http://schemas.microsoft.com/office/drawing/2014/main" val="3310055283"/>
+                      <a16:colId xmlns:a16="http://schemas.microsoft.com/office/drawing/2014/main" val="3310055283"/>
                     </a:ext>
                   </a:extLst>
                 </a:gridCol>
                 <a:gridCol w="1126087">
                   <a:extLst>
                     <a:ext uri="{9D8B030D-6E8A-4147-A177-3AD203B41FA5}">
-                      <a16:colId xmlns="" xmlns:a16="http://schemas.microsoft.com/office/drawing/2014/main" val="3606606852"/>
+                      <a16:colId xmlns:a16="http://schemas.microsoft.com/office/drawing/2014/main" val="3606606852"/>
                     </a:ext>
                   </a:extLst>
                 </a:gridCol>
                 <a:gridCol w="1098329">
                   <a:extLst>
                     <a:ext uri="{9D8B030D-6E8A-4147-A177-3AD203B41FA5}">
-                      <a16:colId xmlns="" xmlns:a16="http://schemas.microsoft.com/office/drawing/2014/main" val="801426414"/>
+                      <a16:colId xmlns:a16="http://schemas.microsoft.com/office/drawing/2014/main" val="801426414"/>
                     </a:ext>
                   </a:extLst>
                 </a:gridCol>
                 <a:gridCol w="1217785">
                   <a:extLst>
                     <a:ext uri="{9D8B030D-6E8A-4147-A177-3AD203B41FA5}">
-                      <a16:colId xmlns="" xmlns:a16="http://schemas.microsoft.com/office/drawing/2014/main" val="2064332225"/>
+                      <a16:colId xmlns:a16="http://schemas.microsoft.com/office/drawing/2014/main" val="2064332225"/>
                     </a:ext>
                   </a:extLst>
                 </a:gridCol>
@@ -8554,7 +8486,7 @@
                 </a:tc>
                 <a:extLst>
                   <a:ext uri="{0D108BD9-81ED-4DB2-BD59-A6C34878D82A}">
-                    <a16:rowId xmlns="" xmlns:a16="http://schemas.microsoft.com/office/drawing/2014/main" val="4011550691"/>
+                    <a16:rowId xmlns:a16="http://schemas.microsoft.com/office/drawing/2014/main" val="4011550691"/>
                   </a:ext>
                 </a:extLst>
               </a:tr>
@@ -8658,7 +8590,7 @@
                 </a:tc>
                 <a:extLst>
                   <a:ext uri="{0D108BD9-81ED-4DB2-BD59-A6C34878D82A}">
-                    <a16:rowId xmlns="" xmlns:a16="http://schemas.microsoft.com/office/drawing/2014/main" val="4283831565"/>
+                    <a16:rowId xmlns:a16="http://schemas.microsoft.com/office/drawing/2014/main" val="4283831565"/>
                   </a:ext>
                 </a:extLst>
               </a:tr>
@@ -8762,7 +8694,7 @@
                 </a:tc>
                 <a:extLst>
                   <a:ext uri="{0D108BD9-81ED-4DB2-BD59-A6C34878D82A}">
-                    <a16:rowId xmlns="" xmlns:a16="http://schemas.microsoft.com/office/drawing/2014/main" val="1934653851"/>
+                    <a16:rowId xmlns:a16="http://schemas.microsoft.com/office/drawing/2014/main" val="1934653851"/>
                   </a:ext>
                 </a:extLst>
               </a:tr>
@@ -8866,7 +8798,7 @@
                 </a:tc>
                 <a:extLst>
                   <a:ext uri="{0D108BD9-81ED-4DB2-BD59-A6C34878D82A}">
-                    <a16:rowId xmlns="" xmlns:a16="http://schemas.microsoft.com/office/drawing/2014/main" val="3996762099"/>
+                    <a16:rowId xmlns:a16="http://schemas.microsoft.com/office/drawing/2014/main" val="3996762099"/>
                   </a:ext>
                 </a:extLst>
               </a:tr>
@@ -8986,7 +8918,7 @@
                 </a:tc>
                 <a:extLst>
                   <a:ext uri="{0D108BD9-81ED-4DB2-BD59-A6C34878D82A}">
-                    <a16:rowId xmlns="" xmlns:a16="http://schemas.microsoft.com/office/drawing/2014/main" val="3424020629"/>
+                    <a16:rowId xmlns:a16="http://schemas.microsoft.com/office/drawing/2014/main" val="3424020629"/>
                   </a:ext>
                 </a:extLst>
               </a:tr>
@@ -9090,7 +9022,7 @@
                 </a:tc>
                 <a:extLst>
                   <a:ext uri="{0D108BD9-81ED-4DB2-BD59-A6C34878D82A}">
-                    <a16:rowId xmlns="" xmlns:a16="http://schemas.microsoft.com/office/drawing/2014/main" val="2676320322"/>
+                    <a16:rowId xmlns:a16="http://schemas.microsoft.com/office/drawing/2014/main" val="2676320322"/>
                   </a:ext>
                 </a:extLst>
               </a:tr>
@@ -9194,7 +9126,7 @@
                 </a:tc>
                 <a:extLst>
                   <a:ext uri="{0D108BD9-81ED-4DB2-BD59-A6C34878D82A}">
-                    <a16:rowId xmlns="" xmlns:a16="http://schemas.microsoft.com/office/drawing/2014/main" val="1617085218"/>
+                    <a16:rowId xmlns:a16="http://schemas.microsoft.com/office/drawing/2014/main" val="1617085218"/>
                   </a:ext>
                 </a:extLst>
               </a:tr>
@@ -9303,7 +9235,7 @@
                 </a:tc>
                 <a:extLst>
                   <a:ext uri="{0D108BD9-81ED-4DB2-BD59-A6C34878D82A}">
-                    <a16:rowId xmlns="" xmlns:a16="http://schemas.microsoft.com/office/drawing/2014/main" val="3306714524"/>
+                    <a16:rowId xmlns:a16="http://schemas.microsoft.com/office/drawing/2014/main" val="3306714524"/>
                   </a:ext>
                 </a:extLst>
               </a:tr>
@@ -9382,8 +9314,8 @@
         </p:nvSpPr>
         <p:spPr>
           <a:xfrm>
-            <a:off x="684213" y="5167867"/>
-            <a:ext cx="6797468" cy="1347233"/>
+            <a:off x="684213" y="4999383"/>
+            <a:ext cx="6797468" cy="1515717"/>
           </a:xfrm>
         </p:spPr>
         <p:txBody>
@@ -9420,7 +9352,7 @@
             </a:r>
           </a:p>
           <a:p>
-            <a:pPr marL="342900" indent="-342900">
+            <a:pPr marL="800100" lvl="1" indent="-342900">
               <a:buFont typeface="Arial" panose="020B0604020202020204" pitchFamily="34" charset="0"/>
               <a:buChar char="•"/>
             </a:pPr>
@@ -9430,7 +9362,7 @@
                   <a:schemeClr val="tx1"/>
                 </a:solidFill>
               </a:rPr>
-              <a:t>For every 1 year increase in age for males there is a $256.70  increase in the average monthly income( R</a:t>
+              <a:t>Males: For every 1 year increase in age there is a $256.70  increase in the average monthly income( R</a:t>
             </a:r>
             <a:r>
               <a:rPr lang="en-US" sz="1400" b="1" baseline="30000" dirty="0">
@@ -9446,7 +9378,21 @@
                   <a:schemeClr val="tx1"/>
                 </a:solidFill>
               </a:rPr>
-              <a:t> of 0.2424) and for every 1 year increase in age for females there is a $255.74 increase in the average monthly income (R</a:t>
+              <a:t> of 0.2424).</a:t>
+            </a:r>
+          </a:p>
+          <a:p>
+            <a:pPr marL="800100" lvl="1" indent="-342900">
+              <a:buFont typeface="Arial" panose="020B0604020202020204" pitchFamily="34" charset="0"/>
+              <a:buChar char="•"/>
+            </a:pPr>
+            <a:r>
+              <a:rPr lang="en-US" sz="1400" b="1" dirty="0">
+                <a:solidFill>
+                  <a:schemeClr val="tx1"/>
+                </a:solidFill>
+              </a:rPr>
+              <a:t>Females:  For every 1 year increase in age there is a $255.74 increase in the average monthly income (R</a:t>
             </a:r>
             <a:r>
               <a:rPr lang="en-US" sz="1400" b="1" baseline="30000" dirty="0">
@@ -9472,7 +9418,7 @@
           <p:cNvPr id="4" name="Picture 3">
             <a:extLst>
               <a:ext uri="{FF2B5EF4-FFF2-40B4-BE49-F238E27FC236}">
-                <a16:creationId xmlns="" xmlns:a16="http://schemas.microsoft.com/office/drawing/2014/main" id="{83E526A8-A255-469E-8E06-53C7CD74A94E}"/>
+                <a16:creationId xmlns:a16="http://schemas.microsoft.com/office/drawing/2014/main" id="{83E526A8-A255-469E-8E06-53C7CD74A94E}"/>
               </a:ext>
             </a:extLst>
           </p:cNvPr>
@@ -9502,7 +9448,7 @@
           <p:cNvPr id="5" name="Picture 4">
             <a:extLst>
               <a:ext uri="{FF2B5EF4-FFF2-40B4-BE49-F238E27FC236}">
-                <a16:creationId xmlns="" xmlns:a16="http://schemas.microsoft.com/office/drawing/2014/main" id="{CBD66ADA-93F9-4C07-BC0C-98D35D5D57BB}"/>
+                <a16:creationId xmlns:a16="http://schemas.microsoft.com/office/drawing/2014/main" id="{CBD66ADA-93F9-4C07-BC0C-98D35D5D57BB}"/>
               </a:ext>
             </a:extLst>
           </p:cNvPr>
@@ -9532,7 +9478,7 @@
           <p:cNvPr id="6" name="Picture 5">
             <a:extLst>
               <a:ext uri="{FF2B5EF4-FFF2-40B4-BE49-F238E27FC236}">
-                <a16:creationId xmlns="" xmlns:a16="http://schemas.microsoft.com/office/drawing/2014/main" id="{A405E111-F8BB-4FFA-BAED-ABC207E3B77D}"/>
+                <a16:creationId xmlns:a16="http://schemas.microsoft.com/office/drawing/2014/main" id="{A405E111-F8BB-4FFA-BAED-ABC207E3B77D}"/>
               </a:ext>
             </a:extLst>
           </p:cNvPr>

</xml_diff>

<commit_message>
Jodi Edits to PP and Deliverable
</commit_message>
<xml_diff>
--- a/Attrition_Case_Study_2_pptx_TAJAR_IP.pptx
+++ b/Attrition_Case_Study_2_pptx_TAJAR_IP.pptx
@@ -5,7 +5,7 @@
     <p:sldMasterId id="2147483648" r:id="rId1"/>
   </p:sldMasterIdLst>
   <p:notesMasterIdLst>
-    <p:notesMasterId r:id="rId18"/>
+    <p:notesMasterId r:id="rId19"/>
   </p:notesMasterIdLst>
   <p:sldIdLst>
     <p:sldId id="256" r:id="rId2"/>
@@ -22,8 +22,9 @@
     <p:sldId id="269" r:id="rId13"/>
     <p:sldId id="268" r:id="rId14"/>
     <p:sldId id="263" r:id="rId15"/>
-    <p:sldId id="271" r:id="rId16"/>
-    <p:sldId id="267" r:id="rId17"/>
+    <p:sldId id="277" r:id="rId16"/>
+    <p:sldId id="271" r:id="rId17"/>
+    <p:sldId id="267" r:id="rId18"/>
   </p:sldIdLst>
   <p:sldSz cx="12192000" cy="6858000"/>
   <p:notesSz cx="6858000" cy="9144000"/>
@@ -7066,8 +7067,8 @@
         </p:nvSpPr>
         <p:spPr>
           <a:xfrm>
-            <a:off x="4546886" y="685799"/>
-            <a:ext cx="7077667" cy="4892676"/>
+            <a:off x="2804573" y="324321"/>
+            <a:ext cx="7077667" cy="1337554"/>
           </a:xfrm>
         </p:spPr>
         <p:txBody>
@@ -7077,63 +7078,9 @@
           <a:lstStyle/>
           <a:p>
             <a:r>
-              <a:rPr lang="en-US" sz="4800"/>
+              <a:rPr lang="en-US" sz="4800" dirty="0"/>
               <a:t>Life Satisfaction</a:t>
             </a:r>
-          </a:p>
-        </p:txBody>
-      </p:sp>
-      <p:sp>
-        <p:nvSpPr>
-          <p:cNvPr id="7" name="Text Placeholder 6">
-            <a:extLst>
-              <a:ext uri="{FF2B5EF4-FFF2-40B4-BE49-F238E27FC236}">
-                <a16:creationId xmlns:a16="http://schemas.microsoft.com/office/drawing/2014/main" id="{68BE2056-ED35-43E3-8265-E8D944FA51C9}"/>
-              </a:ext>
-            </a:extLst>
-          </p:cNvPr>
-          <p:cNvSpPr>
-            <a:spLocks noGrp="1"/>
-          </p:cNvSpPr>
-          <p:nvPr>
-            <p:ph type="body" idx="1"/>
-          </p:nvPr>
-        </p:nvSpPr>
-        <p:spPr>
-          <a:xfrm>
-            <a:off x="684212" y="685800"/>
-            <a:ext cx="2888773" cy="4892675"/>
-          </a:xfrm>
-        </p:spPr>
-        <p:txBody>
-          <a:bodyPr vert="horz" lIns="91440" tIns="45720" rIns="91440" bIns="45720" rtlCol="0" anchor="ctr">
-            <a:normAutofit/>
-          </a:bodyPr>
-          <a:lstStyle/>
-          <a:p>
-            <a:pPr algn="r"/>
-            <a:r>
-              <a:rPr lang="en-US" sz="2100" b="1" dirty="0">
-                <a:solidFill>
-                  <a:schemeClr val="accent6"/>
-                </a:solidFill>
-              </a:rPr>
-              <a:t>**Jodi Will enter visual here by noon Monday (promise!).   I will be looking at Those that worked overtime against Work Life balance self reporting. </a:t>
-            </a:r>
-            <a:r>
-              <a:rPr lang="en-US" sz="2100" b="1" dirty="0">
-                <a:solidFill>
-                  <a:schemeClr val="accent6"/>
-                </a:solidFill>
-                <a:sym typeface="Wingdings" panose="05000000000000000000" pitchFamily="2" charset="2"/>
-              </a:rPr>
-              <a:t> </a:t>
-            </a:r>
-            <a:endParaRPr lang="en-US" sz="2100" b="1" dirty="0">
-              <a:solidFill>
-                <a:schemeClr val="accent6"/>
-              </a:solidFill>
-            </a:endParaRPr>
           </a:p>
         </p:txBody>
       </p:sp>
@@ -7272,6 +7219,212 @@
           </a:p>
         </p:txBody>
       </p:sp>
+      <p:grpSp>
+        <p:nvGrpSpPr>
+          <p:cNvPr id="13" name="Group 12">
+            <a:extLst>
+              <a:ext uri="{FF2B5EF4-FFF2-40B4-BE49-F238E27FC236}">
+                <a16:creationId xmlns:a16="http://schemas.microsoft.com/office/drawing/2014/main" id="{8E7FC7AA-7A16-4E21-B31E-3BCD8099D604}"/>
+              </a:ext>
+            </a:extLst>
+          </p:cNvPr>
+          <p:cNvGrpSpPr/>
+          <p:nvPr/>
+        </p:nvGrpSpPr>
+        <p:grpSpPr>
+          <a:xfrm>
+            <a:off x="494815" y="2202027"/>
+            <a:ext cx="5601185" cy="2712955"/>
+            <a:chOff x="494815" y="2202027"/>
+            <a:chExt cx="5601185" cy="2712955"/>
+          </a:xfrm>
+        </p:grpSpPr>
+        <p:pic>
+          <p:nvPicPr>
+            <p:cNvPr id="3" name="Picture 2">
+              <a:extLst>
+                <a:ext uri="{FF2B5EF4-FFF2-40B4-BE49-F238E27FC236}">
+                  <a16:creationId xmlns:a16="http://schemas.microsoft.com/office/drawing/2014/main" id="{29FF43C2-F3E5-418D-9300-E688714834FC}"/>
+                </a:ext>
+              </a:extLst>
+            </p:cNvPr>
+            <p:cNvPicPr>
+              <a:picLocks noChangeAspect="1"/>
+            </p:cNvPicPr>
+            <p:nvPr/>
+          </p:nvPicPr>
+          <p:blipFill>
+            <a:blip r:embed="rId2"/>
+            <a:stretch>
+              <a:fillRect/>
+            </a:stretch>
+          </p:blipFill>
+          <p:spPr>
+            <a:xfrm>
+              <a:off x="494815" y="2202027"/>
+              <a:ext cx="5601185" cy="2712955"/>
+            </a:xfrm>
+            <a:prstGeom prst="rect">
+              <a:avLst/>
+            </a:prstGeom>
+          </p:spPr>
+        </p:pic>
+        <p:sp>
+          <p:nvSpPr>
+            <p:cNvPr id="11" name="Rectangle: Rounded Corners 10">
+              <a:extLst>
+                <a:ext uri="{FF2B5EF4-FFF2-40B4-BE49-F238E27FC236}">
+                  <a16:creationId xmlns:a16="http://schemas.microsoft.com/office/drawing/2014/main" id="{1AC50FB9-CF86-4D14-AB77-DAA6A5C01DD8}"/>
+                </a:ext>
+              </a:extLst>
+            </p:cNvPr>
+            <p:cNvSpPr/>
+            <p:nvPr/>
+          </p:nvSpPr>
+          <p:spPr>
+            <a:xfrm>
+              <a:off x="1060315" y="2480553"/>
+              <a:ext cx="1011676" cy="2198451"/>
+            </a:xfrm>
+            <a:prstGeom prst="roundRect">
+              <a:avLst/>
+            </a:prstGeom>
+            <a:noFill/>
+            <a:ln>
+              <a:solidFill>
+                <a:schemeClr val="accent2"/>
+              </a:solidFill>
+            </a:ln>
+          </p:spPr>
+          <p:style>
+            <a:lnRef idx="2">
+              <a:schemeClr val="accent1">
+                <a:shade val="50000"/>
+              </a:schemeClr>
+            </a:lnRef>
+            <a:fillRef idx="1">
+              <a:schemeClr val="accent1"/>
+            </a:fillRef>
+            <a:effectRef idx="0">
+              <a:schemeClr val="accent1"/>
+            </a:effectRef>
+            <a:fontRef idx="minor">
+              <a:schemeClr val="lt1"/>
+            </a:fontRef>
+          </p:style>
+          <p:txBody>
+            <a:bodyPr rtlCol="0" anchor="ctr"/>
+            <a:lstStyle/>
+            <a:p>
+              <a:pPr algn="ctr"/>
+              <a:endParaRPr lang="en-US"/>
+            </a:p>
+          </p:txBody>
+        </p:sp>
+      </p:grpSp>
+      <p:grpSp>
+        <p:nvGrpSpPr>
+          <p:cNvPr id="14" name="Group 13">
+            <a:extLst>
+              <a:ext uri="{FF2B5EF4-FFF2-40B4-BE49-F238E27FC236}">
+                <a16:creationId xmlns:a16="http://schemas.microsoft.com/office/drawing/2014/main" id="{26F8F68E-A4BD-4748-A5E6-034A25311F39}"/>
+              </a:ext>
+            </a:extLst>
+          </p:cNvPr>
+          <p:cNvGrpSpPr/>
+          <p:nvPr/>
+        </p:nvGrpSpPr>
+        <p:grpSpPr>
+          <a:xfrm>
+            <a:off x="6343407" y="2202026"/>
+            <a:ext cx="5601185" cy="2712955"/>
+            <a:chOff x="6343407" y="2202026"/>
+            <a:chExt cx="5601185" cy="2712955"/>
+          </a:xfrm>
+        </p:grpSpPr>
+        <p:pic>
+          <p:nvPicPr>
+            <p:cNvPr id="10" name="Picture 9">
+              <a:extLst>
+                <a:ext uri="{FF2B5EF4-FFF2-40B4-BE49-F238E27FC236}">
+                  <a16:creationId xmlns:a16="http://schemas.microsoft.com/office/drawing/2014/main" id="{384D56CA-405C-4B9B-991A-C2EE845E03C8}"/>
+                </a:ext>
+              </a:extLst>
+            </p:cNvPr>
+            <p:cNvPicPr>
+              <a:picLocks noChangeAspect="1"/>
+            </p:cNvPicPr>
+            <p:nvPr/>
+          </p:nvPicPr>
+          <p:blipFill>
+            <a:blip r:embed="rId3"/>
+            <a:stretch>
+              <a:fillRect/>
+            </a:stretch>
+          </p:blipFill>
+          <p:spPr>
+            <a:xfrm>
+              <a:off x="6343407" y="2202026"/>
+              <a:ext cx="5601185" cy="2712955"/>
+            </a:xfrm>
+            <a:prstGeom prst="rect">
+              <a:avLst/>
+            </a:prstGeom>
+          </p:spPr>
+        </p:pic>
+        <p:sp>
+          <p:nvSpPr>
+            <p:cNvPr id="12" name="Rectangle: Rounded Corners 11">
+              <a:extLst>
+                <a:ext uri="{FF2B5EF4-FFF2-40B4-BE49-F238E27FC236}">
+                  <a16:creationId xmlns:a16="http://schemas.microsoft.com/office/drawing/2014/main" id="{0324C425-D4D1-416E-A188-F15D9636EF02}"/>
+                </a:ext>
+              </a:extLst>
+            </p:cNvPr>
+            <p:cNvSpPr/>
+            <p:nvPr/>
+          </p:nvSpPr>
+          <p:spPr>
+            <a:xfrm>
+              <a:off x="6914258" y="2459277"/>
+              <a:ext cx="1011676" cy="2198451"/>
+            </a:xfrm>
+            <a:prstGeom prst="roundRect">
+              <a:avLst/>
+            </a:prstGeom>
+            <a:noFill/>
+            <a:ln>
+              <a:solidFill>
+                <a:schemeClr val="accent2"/>
+              </a:solidFill>
+            </a:ln>
+          </p:spPr>
+          <p:style>
+            <a:lnRef idx="2">
+              <a:schemeClr val="accent1">
+                <a:shade val="50000"/>
+              </a:schemeClr>
+            </a:lnRef>
+            <a:fillRef idx="1">
+              <a:schemeClr val="accent1"/>
+            </a:fillRef>
+            <a:effectRef idx="0">
+              <a:schemeClr val="accent1"/>
+            </a:effectRef>
+            <a:fontRef idx="minor">
+              <a:schemeClr val="lt1"/>
+            </a:fontRef>
+          </p:style>
+          <p:txBody>
+            <a:bodyPr rtlCol="0" anchor="ctr"/>
+            <a:lstStyle/>
+            <a:p>
+              <a:pPr algn="ctr"/>
+              <a:endParaRPr lang="en-US"/>
+            </a:p>
+          </p:txBody>
+        </p:sp>
+      </p:grpSp>
     </p:spTree>
     <p:extLst>
       <p:ext uri="{BB962C8B-B14F-4D97-AF65-F5344CB8AC3E}">
@@ -7377,6 +7530,31 @@
 <file path=ppt/slides/slide14.xml><?xml version="1.0" encoding="utf-8"?>
 <p:sld xmlns:a="http://schemas.openxmlformats.org/drawingml/2006/main" xmlns:r="http://schemas.openxmlformats.org/officeDocument/2006/relationships" xmlns:p="http://schemas.openxmlformats.org/presentationml/2006/main">
   <p:cSld>
+    <p:bg>
+      <p:bgPr>
+        <a:gradFill rotWithShape="1">
+          <a:gsLst>
+            <a:gs pos="10000">
+              <a:schemeClr val="bg2">
+                <a:tint val="97000"/>
+                <a:hueMod val="92000"/>
+                <a:satMod val="169000"/>
+                <a:lumMod val="164000"/>
+              </a:schemeClr>
+            </a:gs>
+            <a:gs pos="100000">
+              <a:schemeClr val="bg2">
+                <a:shade val="96000"/>
+                <a:satMod val="120000"/>
+                <a:lumMod val="90000"/>
+              </a:schemeClr>
+            </a:gs>
+          </a:gsLst>
+          <a:lin ang="6120000" scaled="1"/>
+        </a:gradFill>
+        <a:effectLst/>
+      </p:bgPr>
+    </p:bg>
     <p:spTree>
       <p:nvGrpSpPr>
         <p:cNvPr id="1" name=""/>
@@ -7391,129 +7569,749 @@
           <a:chExt cx="0" cy="0"/>
         </a:xfrm>
       </p:grpSpPr>
-      <p:sp>
-        <p:nvSpPr>
-          <p:cNvPr id="2" name="Title 1"/>
-          <p:cNvSpPr>
-            <a:spLocks noGrp="1"/>
-          </p:cNvSpPr>
-          <p:nvPr>
-            <p:ph type="title"/>
+      <p:cxnSp>
+        <p:nvCxnSpPr>
+          <p:cNvPr id="11" name="Straight Connector 10">
+            <a:extLst>
+              <a:ext uri="{FF2B5EF4-FFF2-40B4-BE49-F238E27FC236}">
+                <a16:creationId xmlns:a16="http://schemas.microsoft.com/office/drawing/2014/main" id="{0512F9CB-A1A0-4043-A103-F6A4B94B695A}"/>
+              </a:ext>
+              <a:ext uri="{C183D7F6-B498-43B3-948B-1728B52AA6E4}">
+                <adec:decorative xmlns:adec="http://schemas.microsoft.com/office/drawing/2017/decorative" val="1"/>
+              </a:ext>
+            </a:extLst>
+          </p:cNvPr>
+          <p:cNvCxnSpPr>
+            <a:cxnSpLocks noGrp="1" noRot="1" noChangeAspect="1" noMove="1" noResize="1" noEditPoints="1" noAdjustHandles="1" noChangeArrowheads="1" noChangeShapeType="1"/>
+          </p:cNvCxnSpPr>
+          <p:nvPr>
+            <p:extLst>
+              <p:ext uri="{386F3935-93C4-4BCD-93E2-E3B085C9AB24}">
+                <p16:designElem xmlns:p16="http://schemas.microsoft.com/office/powerpoint/2015/main" val="1"/>
+              </p:ext>
+            </p:extLst>
+          </p:nvPr>
+        </p:nvCxnSpPr>
+        <p:spPr>
+          <a:xfrm flipH="1">
+            <a:off x="8228012" y="8467"/>
+            <a:ext cx="3810000" cy="3810000"/>
+          </a:xfrm>
+          <a:prstGeom prst="line">
+            <a:avLst/>
+          </a:prstGeom>
+          <a:ln w="12700">
+            <a:solidFill>
+              <a:schemeClr val="tx1"/>
+            </a:solidFill>
+          </a:ln>
+        </p:spPr>
+        <p:style>
+          <a:lnRef idx="2">
+            <a:schemeClr val="accent1"/>
+          </a:lnRef>
+          <a:fillRef idx="0">
+            <a:schemeClr val="accent1"/>
+          </a:fillRef>
+          <a:effectRef idx="1">
+            <a:schemeClr val="accent1"/>
+          </a:effectRef>
+          <a:fontRef idx="minor">
+            <a:schemeClr val="tx1"/>
+          </a:fontRef>
+        </p:style>
+      </p:cxnSp>
+      <p:cxnSp>
+        <p:nvCxnSpPr>
+          <p:cNvPr id="13" name="Straight Connector 12">
+            <a:extLst>
+              <a:ext uri="{FF2B5EF4-FFF2-40B4-BE49-F238E27FC236}">
+                <a16:creationId xmlns:a16="http://schemas.microsoft.com/office/drawing/2014/main" id="{ADBE6588-EE16-4389-857C-86A156D49E5D}"/>
+              </a:ext>
+              <a:ext uri="{C183D7F6-B498-43B3-948B-1728B52AA6E4}">
+                <adec:decorative xmlns:adec="http://schemas.microsoft.com/office/drawing/2017/decorative" val="1"/>
+              </a:ext>
+            </a:extLst>
+          </p:cNvPr>
+          <p:cNvCxnSpPr>
+            <a:cxnSpLocks noGrp="1" noRot="1" noChangeAspect="1" noMove="1" noResize="1" noEditPoints="1" noAdjustHandles="1" noChangeArrowheads="1" noChangeShapeType="1"/>
+          </p:cNvCxnSpPr>
+          <p:nvPr>
+            <p:extLst>
+              <p:ext uri="{386F3935-93C4-4BCD-93E2-E3B085C9AB24}">
+                <p16:designElem xmlns:p16="http://schemas.microsoft.com/office/powerpoint/2015/main" val="1"/>
+              </p:ext>
+            </p:extLst>
+          </p:nvPr>
+        </p:nvCxnSpPr>
+        <p:spPr>
+          <a:xfrm flipH="1">
+            <a:off x="6108170" y="91545"/>
+            <a:ext cx="6080655" cy="6080655"/>
+          </a:xfrm>
+          <a:prstGeom prst="line">
+            <a:avLst/>
+          </a:prstGeom>
+          <a:ln w="12700">
+            <a:solidFill>
+              <a:schemeClr val="tx1"/>
+            </a:solidFill>
+          </a:ln>
+        </p:spPr>
+        <p:style>
+          <a:lnRef idx="2">
+            <a:schemeClr val="accent1"/>
+          </a:lnRef>
+          <a:fillRef idx="0">
+            <a:schemeClr val="accent1"/>
+          </a:fillRef>
+          <a:effectRef idx="1">
+            <a:schemeClr val="accent1"/>
+          </a:effectRef>
+          <a:fontRef idx="minor">
+            <a:schemeClr val="tx1"/>
+          </a:fontRef>
+        </p:style>
+      </p:cxnSp>
+      <p:cxnSp>
+        <p:nvCxnSpPr>
+          <p:cNvPr id="15" name="Straight Connector 14">
+            <a:extLst>
+              <a:ext uri="{FF2B5EF4-FFF2-40B4-BE49-F238E27FC236}">
+                <a16:creationId xmlns:a16="http://schemas.microsoft.com/office/drawing/2014/main" id="{17FD48D2-B0A7-413D-B947-AA55AC1296D5}"/>
+              </a:ext>
+              <a:ext uri="{C183D7F6-B498-43B3-948B-1728B52AA6E4}">
+                <adec:decorative xmlns:adec="http://schemas.microsoft.com/office/drawing/2017/decorative" val="1"/>
+              </a:ext>
+            </a:extLst>
+          </p:cNvPr>
+          <p:cNvCxnSpPr>
+            <a:cxnSpLocks noGrp="1" noRot="1" noChangeAspect="1" noMove="1" noResize="1" noEditPoints="1" noAdjustHandles="1" noChangeArrowheads="1" noChangeShapeType="1"/>
+          </p:cNvCxnSpPr>
+          <p:nvPr>
+            <p:extLst>
+              <p:ext uri="{386F3935-93C4-4BCD-93E2-E3B085C9AB24}">
+                <p16:designElem xmlns:p16="http://schemas.microsoft.com/office/powerpoint/2015/main" val="1"/>
+              </p:ext>
+            </p:extLst>
+          </p:nvPr>
+        </p:nvCxnSpPr>
+        <p:spPr>
+          <a:xfrm flipH="1">
+            <a:off x="7235825" y="228600"/>
+            <a:ext cx="4953000" cy="4953000"/>
+          </a:xfrm>
+          <a:prstGeom prst="line">
+            <a:avLst/>
+          </a:prstGeom>
+          <a:ln w="12700">
+            <a:solidFill>
+              <a:schemeClr val="tx1"/>
+            </a:solidFill>
+          </a:ln>
+        </p:spPr>
+        <p:style>
+          <a:lnRef idx="2">
+            <a:schemeClr val="accent1"/>
+          </a:lnRef>
+          <a:fillRef idx="0">
+            <a:schemeClr val="accent1"/>
+          </a:fillRef>
+          <a:effectRef idx="1">
+            <a:schemeClr val="accent1"/>
+          </a:effectRef>
+          <a:fontRef idx="minor">
+            <a:schemeClr val="tx1"/>
+          </a:fontRef>
+        </p:style>
+      </p:cxnSp>
+      <p:cxnSp>
+        <p:nvCxnSpPr>
+          <p:cNvPr id="17" name="Straight Connector 16">
+            <a:extLst>
+              <a:ext uri="{FF2B5EF4-FFF2-40B4-BE49-F238E27FC236}">
+                <a16:creationId xmlns:a16="http://schemas.microsoft.com/office/drawing/2014/main" id="{2BE668D0-D906-4EEE-B32F-8C028624B837}"/>
+              </a:ext>
+              <a:ext uri="{C183D7F6-B498-43B3-948B-1728B52AA6E4}">
+                <adec:decorative xmlns:adec="http://schemas.microsoft.com/office/drawing/2017/decorative" val="1"/>
+              </a:ext>
+            </a:extLst>
+          </p:cNvPr>
+          <p:cNvCxnSpPr>
+            <a:cxnSpLocks noGrp="1" noRot="1" noChangeAspect="1" noMove="1" noResize="1" noEditPoints="1" noAdjustHandles="1" noChangeArrowheads="1" noChangeShapeType="1"/>
+          </p:cNvCxnSpPr>
+          <p:nvPr>
+            <p:extLst>
+              <p:ext uri="{386F3935-93C4-4BCD-93E2-E3B085C9AB24}">
+                <p16:designElem xmlns:p16="http://schemas.microsoft.com/office/powerpoint/2015/main" val="1"/>
+              </p:ext>
+            </p:extLst>
+          </p:nvPr>
+        </p:nvCxnSpPr>
+        <p:spPr>
+          <a:xfrm flipH="1">
+            <a:off x="7335837" y="32278"/>
+            <a:ext cx="4852989" cy="4852989"/>
+          </a:xfrm>
+          <a:prstGeom prst="line">
+            <a:avLst/>
+          </a:prstGeom>
+          <a:ln w="31750">
+            <a:solidFill>
+              <a:schemeClr val="tx1"/>
+            </a:solidFill>
+          </a:ln>
+        </p:spPr>
+        <p:style>
+          <a:lnRef idx="2">
+            <a:schemeClr val="accent1"/>
+          </a:lnRef>
+          <a:fillRef idx="0">
+            <a:schemeClr val="accent1"/>
+          </a:fillRef>
+          <a:effectRef idx="1">
+            <a:schemeClr val="accent1"/>
+          </a:effectRef>
+          <a:fontRef idx="minor">
+            <a:schemeClr val="tx1"/>
+          </a:fontRef>
+        </p:style>
+      </p:cxnSp>
+      <p:cxnSp>
+        <p:nvCxnSpPr>
+          <p:cNvPr id="19" name="Straight Connector 18">
+            <a:extLst>
+              <a:ext uri="{FF2B5EF4-FFF2-40B4-BE49-F238E27FC236}">
+                <a16:creationId xmlns:a16="http://schemas.microsoft.com/office/drawing/2014/main" id="{D1DE67A3-B8F6-4CFD-A8E0-D15200F23152}"/>
+              </a:ext>
+              <a:ext uri="{C183D7F6-B498-43B3-948B-1728B52AA6E4}">
+                <adec:decorative xmlns:adec="http://schemas.microsoft.com/office/drawing/2017/decorative" val="1"/>
+              </a:ext>
+            </a:extLst>
+          </p:cNvPr>
+          <p:cNvCxnSpPr>
+            <a:cxnSpLocks noGrp="1" noRot="1" noChangeAspect="1" noMove="1" noResize="1" noEditPoints="1" noAdjustHandles="1" noChangeArrowheads="1" noChangeShapeType="1"/>
+          </p:cNvCxnSpPr>
+          <p:nvPr>
+            <p:extLst>
+              <p:ext uri="{386F3935-93C4-4BCD-93E2-E3B085C9AB24}">
+                <p16:designElem xmlns:p16="http://schemas.microsoft.com/office/powerpoint/2015/main" val="1"/>
+              </p:ext>
+            </p:extLst>
+          </p:nvPr>
+        </p:nvCxnSpPr>
+        <p:spPr>
+          <a:xfrm flipH="1">
+            <a:off x="7845426" y="609601"/>
+            <a:ext cx="4343399" cy="4343399"/>
+          </a:xfrm>
+          <a:prstGeom prst="line">
+            <a:avLst/>
+          </a:prstGeom>
+          <a:ln w="31750">
+            <a:solidFill>
+              <a:schemeClr val="tx1"/>
+            </a:solidFill>
+          </a:ln>
+        </p:spPr>
+        <p:style>
+          <a:lnRef idx="2">
+            <a:schemeClr val="accent1"/>
+          </a:lnRef>
+          <a:fillRef idx="0">
+            <a:schemeClr val="accent1"/>
+          </a:fillRef>
+          <a:effectRef idx="1">
+            <a:schemeClr val="accent1"/>
+          </a:effectRef>
+          <a:fontRef idx="minor">
+            <a:schemeClr val="tx1"/>
+          </a:fontRef>
+        </p:style>
+      </p:cxnSp>
+      <p:sp useBgFill="1">
+        <p:nvSpPr>
+          <p:cNvPr id="21" name="Rectangle 20">
+            <a:extLst>
+              <a:ext uri="{FF2B5EF4-FFF2-40B4-BE49-F238E27FC236}">
+                <a16:creationId xmlns:a16="http://schemas.microsoft.com/office/drawing/2014/main" id="{0B65EC2C-5E72-45C4-9792-4143706AA7D7}"/>
+              </a:ext>
+              <a:ext uri="{C183D7F6-B498-43B3-948B-1728B52AA6E4}">
+                <adec:decorative xmlns:adec="http://schemas.microsoft.com/office/drawing/2017/decorative" val="1"/>
+              </a:ext>
+            </a:extLst>
+          </p:cNvPr>
+          <p:cNvSpPr>
+            <a:spLocks noGrp="1" noRot="1" noChangeAspect="1" noMove="1" noResize="1" noEditPoints="1" noAdjustHandles="1" noChangeArrowheads="1" noChangeShapeType="1" noTextEdit="1"/>
+          </p:cNvSpPr>
+          <p:nvPr>
+            <p:extLst>
+              <p:ext uri="{386F3935-93C4-4BCD-93E2-E3B085C9AB24}">
+                <p16:designElem xmlns:p16="http://schemas.microsoft.com/office/powerpoint/2015/main" val="1"/>
+              </p:ext>
+            </p:extLst>
           </p:nvPr>
         </p:nvSpPr>
         <p:spPr>
           <a:xfrm>
-            <a:off x="557211" y="342900"/>
-            <a:ext cx="8534401" cy="685800"/>
-          </a:xfrm>
+            <a:off x="0" y="0"/>
+            <a:ext cx="12192000" cy="6858000"/>
+          </a:xfrm>
+          <a:prstGeom prst="rect">
+            <a:avLst/>
+          </a:prstGeom>
+          <a:ln>
+            <a:noFill/>
+          </a:ln>
         </p:spPr>
-        <p:txBody>
-          <a:bodyPr/>
+        <p:style>
+          <a:lnRef idx="2">
+            <a:schemeClr val="accent1">
+              <a:shade val="50000"/>
+            </a:schemeClr>
+          </a:lnRef>
+          <a:fillRef idx="1">
+            <a:schemeClr val="accent1"/>
+          </a:fillRef>
+          <a:effectRef idx="0">
+            <a:schemeClr val="accent1"/>
+          </a:effectRef>
+          <a:fontRef idx="minor">
+            <a:schemeClr val="lt1"/>
+          </a:fontRef>
+        </p:style>
+        <p:txBody>
+          <a:bodyPr rtlCol="0" anchor="ctr"/>
           <a:lstStyle/>
           <a:p>
-            <a:r>
-              <a:rPr lang="en-US"/>
-              <a:t>How to mitigate attrition</a:t>
-            </a:r>
+            <a:pPr algn="ctr"/>
             <a:endParaRPr lang="en-US" dirty="0"/>
           </a:p>
         </p:txBody>
       </p:sp>
       <p:sp>
         <p:nvSpPr>
-          <p:cNvPr id="3" name="Text Placeholder 2"/>
+          <p:cNvPr id="2" name="Title 1"/>
           <p:cNvSpPr>
             <a:spLocks noGrp="1"/>
           </p:cNvSpPr>
           <p:nvPr>
-            <p:ph type="body" idx="1"/>
+            <p:ph type="title"/>
           </p:nvPr>
         </p:nvSpPr>
         <p:spPr>
           <a:xfrm>
-            <a:off x="684213" y="1193800"/>
-            <a:ext cx="8534400" cy="4800600"/>
+            <a:off x="2053127" y="264848"/>
+            <a:ext cx="9337753" cy="1437745"/>
           </a:xfrm>
         </p:spPr>
         <p:txBody>
-          <a:bodyPr/>
+          <a:bodyPr vert="horz" lIns="91440" tIns="45720" rIns="91440" bIns="45720" rtlCol="0" anchor="b">
+            <a:normAutofit/>
+          </a:bodyPr>
           <a:lstStyle/>
           <a:p>
             <a:r>
-              <a:rPr lang="en-US" b="1" dirty="0">
-                <a:solidFill>
-                  <a:srgbClr val="FF0000"/>
+              <a:rPr lang="en-US" sz="4800" dirty="0"/>
+              <a:t>How to mitigate attrition</a:t>
+            </a:r>
+          </a:p>
+        </p:txBody>
+      </p:sp>
+      <p:sp>
+        <p:nvSpPr>
+          <p:cNvPr id="3" name="Text Placeholder 2"/>
+          <p:cNvSpPr>
+            <a:spLocks noGrp="1"/>
+          </p:cNvSpPr>
+          <p:nvPr>
+            <p:ph type="body" idx="1"/>
+          </p:nvPr>
+        </p:nvSpPr>
+        <p:spPr>
+          <a:xfrm>
+            <a:off x="4236454" y="2850309"/>
+            <a:ext cx="6421491" cy="1371775"/>
+          </a:xfrm>
+        </p:spPr>
+        <p:txBody>
+          <a:bodyPr vert="horz" lIns="91440" tIns="45720" rIns="91440" bIns="45720" rtlCol="0" anchor="t">
+            <a:normAutofit fontScale="92500" lnSpcReduction="20000"/>
+          </a:bodyPr>
+          <a:lstStyle/>
+          <a:p>
+            <a:pPr>
+              <a:lnSpc>
+                <a:spcPct val="90000"/>
+              </a:lnSpc>
+            </a:pPr>
+            <a:endParaRPr lang="en-US" sz="1900" dirty="0">
+              <a:solidFill>
+                <a:schemeClr val="tx1"/>
+              </a:solidFill>
+            </a:endParaRPr>
+          </a:p>
+          <a:p>
+            <a:pPr marL="0" lvl="1">
+              <a:lnSpc>
+                <a:spcPct val="90000"/>
+              </a:lnSpc>
+            </a:pPr>
+            <a:r>
+              <a:rPr lang="en-US" sz="6600" dirty="0">
+                <a:solidFill>
+                  <a:schemeClr val="tx1"/>
                 </a:solidFill>
               </a:rPr>
-              <a:t>**Content in Progress (by Jodi) – feel free to add.  I will finalize Monday morning!</a:t>
-            </a:r>
-          </a:p>
-          <a:p>
-            <a:endParaRPr lang="en-US" dirty="0"/>
-          </a:p>
-          <a:p>
-            <a:pPr marL="285750" indent="-285750">
-              <a:buFont typeface="Arial" panose="020B0604020202020204" pitchFamily="34" charset="0"/>
-              <a:buChar char="•"/>
+              <a:t>Monthly Income</a:t>
+            </a:r>
+          </a:p>
+          <a:p>
+            <a:pPr>
+              <a:lnSpc>
+                <a:spcPct val="90000"/>
+              </a:lnSpc>
             </a:pPr>
-            <a:r>
-              <a:rPr lang="en-US" dirty="0">
-                <a:solidFill>
-                  <a:schemeClr val="tx1"/>
-                </a:solidFill>
-              </a:rPr>
-              <a:t>We recommend that the HR team further review…….</a:t>
-            </a:r>
-          </a:p>
-          <a:p>
-            <a:pPr marL="742950" lvl="1" indent="-285750">
-              <a:buFont typeface="Arial" panose="020B0604020202020204" pitchFamily="34" charset="0"/>
-              <a:buChar char="•"/>
-            </a:pPr>
-            <a:r>
-              <a:rPr lang="en-US" dirty="0"/>
-              <a:t>Stock Options…</a:t>
-            </a:r>
-          </a:p>
-          <a:p>
-            <a:pPr marL="742950" lvl="1" indent="-285750">
-              <a:buFont typeface="Arial" panose="020B0604020202020204" pitchFamily="34" charset="0"/>
-              <a:buChar char="•"/>
-            </a:pPr>
-            <a:r>
-              <a:rPr lang="en-US" dirty="0"/>
-              <a:t>Job Role…</a:t>
-            </a:r>
-          </a:p>
-          <a:p>
-            <a:pPr marL="742950" lvl="1" indent="-285750">
-              <a:buFont typeface="Arial" panose="020B0604020202020204" pitchFamily="34" charset="0"/>
-              <a:buChar char="•"/>
-            </a:pPr>
-            <a:r>
-              <a:rPr lang="en-US" dirty="0"/>
-              <a:t>Overtime…</a:t>
-            </a:r>
-          </a:p>
-          <a:p>
-            <a:r>
-              <a:rPr lang="en-US" dirty="0"/>
-              <a:t>Make sure this conclusion and the conclusion in the </a:t>
-            </a:r>
-            <a:r>
-              <a:rPr lang="en-US" dirty="0" err="1"/>
-              <a:t>rmd</a:t>
-            </a:r>
-            <a:r>
-              <a:rPr lang="en-US" dirty="0"/>
-              <a:t> match.</a:t>
-            </a:r>
-          </a:p>
-          <a:p>
-            <a:endParaRPr lang="en-US" dirty="0"/>
-          </a:p>
-        </p:txBody>
-      </p:sp>
+            <a:endParaRPr lang="en-US" sz="1900" dirty="0">
+              <a:solidFill>
+                <a:schemeClr val="tx1"/>
+              </a:solidFill>
+            </a:endParaRPr>
+          </a:p>
+        </p:txBody>
+      </p:sp>
+      <p:pic>
+        <p:nvPicPr>
+          <p:cNvPr id="8" name="Graphic 7" descr="Arrow: Clockwise curve">
+            <a:extLst>
+              <a:ext uri="{FF2B5EF4-FFF2-40B4-BE49-F238E27FC236}">
+                <a16:creationId xmlns:a16="http://schemas.microsoft.com/office/drawing/2014/main" id="{B7FBC31B-AF0B-42DB-8496-FF4F410A777A}"/>
+              </a:ext>
+            </a:extLst>
+          </p:cNvPr>
+          <p:cNvPicPr>
+            <a:picLocks noChangeAspect="1"/>
+          </p:cNvPicPr>
+          <p:nvPr/>
+        </p:nvPicPr>
+        <p:blipFill>
+          <a:blip r:embed="rId2">
+            <a:extLst>
+              <a:ext uri="{96DAC541-7B7A-43D3-8B79-37D633B846F1}">
+                <asvg:svgBlip xmlns:asvg="http://schemas.microsoft.com/office/drawing/2016/SVG/main" r:embed="rId3"/>
+              </a:ext>
+            </a:extLst>
+          </a:blip>
+          <a:stretch>
+            <a:fillRect/>
+          </a:stretch>
+        </p:blipFill>
+        <p:spPr>
+          <a:xfrm>
+            <a:off x="947220" y="2123544"/>
+            <a:ext cx="3152439" cy="3152439"/>
+          </a:xfrm>
+          <a:prstGeom prst="rect">
+            <a:avLst/>
+          </a:prstGeom>
+          <a:ln w="15875">
+            <a:solidFill>
+              <a:srgbClr val="FFFFFF">
+                <a:alpha val="40000"/>
+              </a:srgbClr>
+            </a:solidFill>
+          </a:ln>
+          <a:effectLst>
+            <a:innerShdw blurRad="57150" dist="38100" dir="14460000">
+              <a:prstClr val="black">
+                <a:alpha val="70000"/>
+              </a:prstClr>
+            </a:innerShdw>
+          </a:effectLst>
+        </p:spPr>
+      </p:pic>
+      <p:grpSp>
+        <p:nvGrpSpPr>
+          <p:cNvPr id="23" name="Group 22">
+            <a:extLst>
+              <a:ext uri="{FF2B5EF4-FFF2-40B4-BE49-F238E27FC236}">
+                <a16:creationId xmlns:a16="http://schemas.microsoft.com/office/drawing/2014/main" id="{9073B6DB-4B88-4BCD-97DE-9DD16B88A4B8}"/>
+              </a:ext>
+              <a:ext uri="{C183D7F6-B498-43B3-948B-1728B52AA6E4}">
+                <adec:decorative xmlns:adec="http://schemas.microsoft.com/office/drawing/2017/decorative" val="1"/>
+              </a:ext>
+            </a:extLst>
+          </p:cNvPr>
+          <p:cNvGrpSpPr>
+            <a:grpSpLocks noGrp="1" noUngrp="1" noRot="1" noChangeAspect="1" noMove="1" noResize="1"/>
+          </p:cNvGrpSpPr>
+          <p:nvPr>
+            <p:extLst>
+              <p:ext uri="{386F3935-93C4-4BCD-93E2-E3B085C9AB24}">
+                <p16:designElem xmlns:p16="http://schemas.microsoft.com/office/powerpoint/2015/main" val="1"/>
+              </p:ext>
+            </p:extLst>
+          </p:nvPr>
+        </p:nvGrpSpPr>
+        <p:grpSpPr>
+          <a:xfrm>
+            <a:off x="9206969" y="2963333"/>
+            <a:ext cx="2981858" cy="3208867"/>
+            <a:chOff x="9206969" y="2963333"/>
+            <a:chExt cx="2981858" cy="3208867"/>
+          </a:xfrm>
+        </p:grpSpPr>
+        <p:cxnSp>
+          <p:nvCxnSpPr>
+            <p:cNvPr id="24" name="Straight Connector 23">
+              <a:extLst>
+                <a:ext uri="{FF2B5EF4-FFF2-40B4-BE49-F238E27FC236}">
+                  <a16:creationId xmlns:a16="http://schemas.microsoft.com/office/drawing/2014/main" id="{346E4CB1-2A79-49F6-8FDD-74161D0D1B1D}"/>
+                </a:ext>
+                <a:ext uri="{C183D7F6-B498-43B3-948B-1728B52AA6E4}">
+                  <adec:decorative xmlns:adec="http://schemas.microsoft.com/office/drawing/2017/decorative" val="1"/>
+                </a:ext>
+              </a:extLst>
+            </p:cNvPr>
+            <p:cNvCxnSpPr/>
+            <p:nvPr>
+              <p:extLst>
+                <p:ext uri="{386F3935-93C4-4BCD-93E2-E3B085C9AB24}">
+                  <p16:designElem xmlns:p16="http://schemas.microsoft.com/office/powerpoint/2015/main" val="1"/>
+                </p:ext>
+              </p:extLst>
+            </p:nvPr>
+          </p:nvCxnSpPr>
+          <p:spPr>
+            <a:xfrm flipH="1">
+              <a:off x="11276012" y="2963333"/>
+              <a:ext cx="912814" cy="912812"/>
+            </a:xfrm>
+            <a:prstGeom prst="line">
+              <a:avLst/>
+            </a:prstGeom>
+            <a:ln w="9525">
+              <a:solidFill>
+                <a:schemeClr val="tx1"/>
+              </a:solidFill>
+            </a:ln>
+          </p:spPr>
+          <p:style>
+            <a:lnRef idx="2">
+              <a:schemeClr val="accent1"/>
+            </a:lnRef>
+            <a:fillRef idx="0">
+              <a:schemeClr val="accent1"/>
+            </a:fillRef>
+            <a:effectRef idx="1">
+              <a:schemeClr val="accent1"/>
+            </a:effectRef>
+            <a:fontRef idx="minor">
+              <a:schemeClr val="tx1"/>
+            </a:fontRef>
+          </p:style>
+        </p:cxnSp>
+        <p:cxnSp>
+          <p:nvCxnSpPr>
+            <p:cNvPr id="25" name="Straight Connector 24">
+              <a:extLst>
+                <a:ext uri="{FF2B5EF4-FFF2-40B4-BE49-F238E27FC236}">
+                  <a16:creationId xmlns:a16="http://schemas.microsoft.com/office/drawing/2014/main" id="{8AF7F103-B34D-460F-A43A-1A0953D57318}"/>
+                </a:ext>
+                <a:ext uri="{C183D7F6-B498-43B3-948B-1728B52AA6E4}">
+                  <adec:decorative xmlns:adec="http://schemas.microsoft.com/office/drawing/2017/decorative" val="1"/>
+                </a:ext>
+              </a:extLst>
+            </p:cNvPr>
+            <p:cNvCxnSpPr/>
+            <p:nvPr>
+              <p:extLst>
+                <p:ext uri="{386F3935-93C4-4BCD-93E2-E3B085C9AB24}">
+                  <p16:designElem xmlns:p16="http://schemas.microsoft.com/office/powerpoint/2015/main" val="1"/>
+                </p:ext>
+              </p:extLst>
+            </p:nvPr>
+          </p:nvCxnSpPr>
+          <p:spPr>
+            <a:xfrm flipH="1">
+              <a:off x="9206969" y="3190344"/>
+              <a:ext cx="2981857" cy="2981856"/>
+            </a:xfrm>
+            <a:prstGeom prst="line">
+              <a:avLst/>
+            </a:prstGeom>
+            <a:ln w="9525">
+              <a:solidFill>
+                <a:schemeClr val="tx1"/>
+              </a:solidFill>
+            </a:ln>
+          </p:spPr>
+          <p:style>
+            <a:lnRef idx="2">
+              <a:schemeClr val="accent1"/>
+            </a:lnRef>
+            <a:fillRef idx="0">
+              <a:schemeClr val="accent1"/>
+            </a:fillRef>
+            <a:effectRef idx="1">
+              <a:schemeClr val="accent1"/>
+            </a:effectRef>
+            <a:fontRef idx="minor">
+              <a:schemeClr val="tx1"/>
+            </a:fontRef>
+          </p:style>
+        </p:cxnSp>
+        <p:cxnSp>
+          <p:nvCxnSpPr>
+            <p:cNvPr id="26" name="Straight Connector 25">
+              <a:extLst>
+                <a:ext uri="{FF2B5EF4-FFF2-40B4-BE49-F238E27FC236}">
+                  <a16:creationId xmlns:a16="http://schemas.microsoft.com/office/drawing/2014/main" id="{AA6EF948-AE5B-4AFD-9071-4553E2EA584F}"/>
+                </a:ext>
+                <a:ext uri="{C183D7F6-B498-43B3-948B-1728B52AA6E4}">
+                  <adec:decorative xmlns:adec="http://schemas.microsoft.com/office/drawing/2017/decorative" val="1"/>
+                </a:ext>
+              </a:extLst>
+            </p:cNvPr>
+            <p:cNvCxnSpPr/>
+            <p:nvPr>
+              <p:extLst>
+                <p:ext uri="{386F3935-93C4-4BCD-93E2-E3B085C9AB24}">
+                  <p16:designElem xmlns:p16="http://schemas.microsoft.com/office/powerpoint/2015/main" val="1"/>
+                </p:ext>
+              </p:extLst>
+            </p:nvPr>
+          </p:nvCxnSpPr>
+          <p:spPr>
+            <a:xfrm flipH="1">
+              <a:off x="10292292" y="3285067"/>
+              <a:ext cx="1896534" cy="1896533"/>
+            </a:xfrm>
+            <a:prstGeom prst="line">
+              <a:avLst/>
+            </a:prstGeom>
+            <a:ln w="9525">
+              <a:solidFill>
+                <a:schemeClr val="tx1"/>
+              </a:solidFill>
+            </a:ln>
+          </p:spPr>
+          <p:style>
+            <a:lnRef idx="2">
+              <a:schemeClr val="accent1"/>
+            </a:lnRef>
+            <a:fillRef idx="0">
+              <a:schemeClr val="accent1"/>
+            </a:fillRef>
+            <a:effectRef idx="1">
+              <a:schemeClr val="accent1"/>
+            </a:effectRef>
+            <a:fontRef idx="minor">
+              <a:schemeClr val="tx1"/>
+            </a:fontRef>
+          </p:style>
+        </p:cxnSp>
+        <p:cxnSp>
+          <p:nvCxnSpPr>
+            <p:cNvPr id="27" name="Straight Connector 26">
+              <a:extLst>
+                <a:ext uri="{FF2B5EF4-FFF2-40B4-BE49-F238E27FC236}">
+                  <a16:creationId xmlns:a16="http://schemas.microsoft.com/office/drawing/2014/main" id="{7A008A68-D48C-4C79-AC7D-65C0D47EA0EB}"/>
+                </a:ext>
+                <a:ext uri="{C183D7F6-B498-43B3-948B-1728B52AA6E4}">
+                  <adec:decorative xmlns:adec="http://schemas.microsoft.com/office/drawing/2017/decorative" val="1"/>
+                </a:ext>
+              </a:extLst>
+            </p:cNvPr>
+            <p:cNvCxnSpPr/>
+            <p:nvPr>
+              <p:extLst>
+                <p:ext uri="{386F3935-93C4-4BCD-93E2-E3B085C9AB24}">
+                  <p16:designElem xmlns:p16="http://schemas.microsoft.com/office/powerpoint/2015/main" val="1"/>
+                </p:ext>
+              </p:extLst>
+            </p:nvPr>
+          </p:nvCxnSpPr>
+          <p:spPr>
+            <a:xfrm flipH="1">
+              <a:off x="10443103" y="3131080"/>
+              <a:ext cx="1745722" cy="1745720"/>
+            </a:xfrm>
+            <a:prstGeom prst="line">
+              <a:avLst/>
+            </a:prstGeom>
+            <a:ln w="28575">
+              <a:solidFill>
+                <a:schemeClr val="tx1"/>
+              </a:solidFill>
+            </a:ln>
+          </p:spPr>
+          <p:style>
+            <a:lnRef idx="2">
+              <a:schemeClr val="accent1"/>
+            </a:lnRef>
+            <a:fillRef idx="0">
+              <a:schemeClr val="accent1"/>
+            </a:fillRef>
+            <a:effectRef idx="1">
+              <a:schemeClr val="accent1"/>
+            </a:effectRef>
+            <a:fontRef idx="minor">
+              <a:schemeClr val="tx1"/>
+            </a:fontRef>
+          </p:style>
+        </p:cxnSp>
+        <p:cxnSp>
+          <p:nvCxnSpPr>
+            <p:cNvPr id="28" name="Straight Connector 27">
+              <a:extLst>
+                <a:ext uri="{FF2B5EF4-FFF2-40B4-BE49-F238E27FC236}">
+                  <a16:creationId xmlns:a16="http://schemas.microsoft.com/office/drawing/2014/main" id="{DD2F0D54-7F2F-45FC-BA8B-BE63A7DA4E6A}"/>
+                </a:ext>
+                <a:ext uri="{C183D7F6-B498-43B3-948B-1728B52AA6E4}">
+                  <adec:decorative xmlns:adec="http://schemas.microsoft.com/office/drawing/2017/decorative" val="1"/>
+                </a:ext>
+              </a:extLst>
+            </p:cNvPr>
+            <p:cNvCxnSpPr/>
+            <p:nvPr>
+              <p:extLst>
+                <p:ext uri="{386F3935-93C4-4BCD-93E2-E3B085C9AB24}">
+                  <p16:designElem xmlns:p16="http://schemas.microsoft.com/office/powerpoint/2015/main" val="1"/>
+                </p:ext>
+              </p:extLst>
+            </p:nvPr>
+          </p:nvCxnSpPr>
+          <p:spPr>
+            <a:xfrm flipH="1">
+              <a:off x="10918826" y="3683001"/>
+              <a:ext cx="1270001" cy="1269999"/>
+            </a:xfrm>
+            <a:prstGeom prst="line">
+              <a:avLst/>
+            </a:prstGeom>
+            <a:ln w="28575">
+              <a:solidFill>
+                <a:schemeClr val="tx1"/>
+              </a:solidFill>
+            </a:ln>
+          </p:spPr>
+          <p:style>
+            <a:lnRef idx="2">
+              <a:schemeClr val="accent1"/>
+            </a:lnRef>
+            <a:fillRef idx="0">
+              <a:schemeClr val="accent1"/>
+            </a:fillRef>
+            <a:effectRef idx="1">
+              <a:schemeClr val="accent1"/>
+            </a:effectRef>
+            <a:fontRef idx="minor">
+              <a:schemeClr val="tx1"/>
+            </a:fontRef>
+          </p:style>
+        </p:cxnSp>
+      </p:grpSp>
       <p:sp>
         <p:nvSpPr>
           <p:cNvPr id="4" name="AutoShape 2" descr="data:image/png;base64,iVBORw0KGgoAAAANSUhEUgAABUAAAAPACAMAAADDuCPrAAABYlBMVEUAAAAAADoAAGYAOjoAOmYAOpAAZrYzMzM6AAA6OgA6Ojo6OmY6ZmY6ZpA6ZrY6kLY6kNtNTU1NTW5NTY5Nbm5Nbo5NbqtNjshmAABmADpmOgBmOjpmZjpmZmZmZpBmkGZmkLZmkNtmtttmtv9uTU1ubk1ubm5ubo5ujqtujshuq8huq+SOTU2Obk2Obm6Oq8iOyOSOyP+QOgCQOjqQZjqQZmaQZpCQkGaQkLaQtraQttuQ2/+rbk2rjk2rjm6rq8iryOSr5Mir5P+2ZgC2Zjq2kDq2kGa2kJC2tpC2tra2ttu229u22/+2///Ijk3Ijm7Iq27Iq6vIyKvI5KvI5OTI5P/I///bkDrbkGbbtmbbtpDbtrbb27bb29vb2//b/7bb///kq27kyI7kyKvk5P/k///r6+v8jVn/tmb/yI7/25D/27b/29v/5Kv/5Mj/5OT//7b//7///8j//9v//+T///+zjZs9AAAACXBIWXMAAB2HAAAdhwGP5fFlAAAgAElEQVR4nO3d/59b5ZnecU0wMDGEILMYh0CWwmwDxaSLN3S7xHW3mGQXkni3aY0TEijO1q2/YMe1rP+/0iNpRnPbM+fMM9e5n3PffN4/xB472Eiv6/mgGUlnJnMAQJVJ638BAIiKgAJAJQIKAJUIKABUIqAAUImAAkAlAgoAlQgoAFQioABQiYACQCUCCgCVCCgAVCKgAFCJgAJAJQIKAJVGENDZl298fzKZ7Lzw8Ten/rNuT570zvzhhcnOLwT/pgCwrXlAZ7/aPWjdS6dNKAEF4Kd1QO+9fih2p+0cAQXgp3FA7y4ffu689dXip9/+6vuCgh78ud/7reRPAoCjtA3o4qHh1ufts1/KCkpAAQyvbUCvLor59tbHy8/An1P8wQQUwPCaBnT5CfzLh37lRvmapeRPJqAABtY0oItcmswtP6d/rvzGwQPRq5vK3vv5Irg7P/jNwT/9zuzT3cnOC09+1n84oJsnka4ufyh/ygsfL3/9yx8vev3Cr/f/f+YvAIBjtQzo7NKTn7Cvmroo3n7/NvWbfWpe7LQM6NUjnro/OqA31n/Iywd/4PpB8BN/AQAcq2VAlw837efrt1c9vHrwO4tfefabVW03VtVdpPBs+fDZJ3t3ZED/fv8Pefvq4ddOPfkXAMCxWgZ0UbknHjyuo3r7IGLrli4fOb709Xz+7aebx4zlseQPv5l/+/VT/+inBnRh+Rn6l4tP1Z+Z7Lz9zeqZ/+fmT/0LAOBYLQN6+ymffS8D+vJ866Xv68/mtx6t3l5/5fTGMaE7OqAvb/6MzV9wdfUQ9il/AQAca6QBXdZxlbr180nbTysdPCY98kWjRwZ0/aubv2a+/yWCp/wFAHCssQZ0UcDypc3lVyaXMdtu2u39xj7lq58rRwb0uYO/5p1D/9en/AUAcKyRfg10Gc7ye+uQbj/Ds3mW58YxT/YcGdCXD//K/v/1aX8BABxrbM/C70f19qFP5W3f7Cfd1qkDeuRjWwDYGOfrQOclcYuIbR6IElAA4zPOdyItlbcNbV7OtPlSqPmntQHliSMAJ9I0oFu5XNt6L3z5HH7/qZ2rTz6vIw3o0/4CADhW26sx2Zdy3t765HnxmPDZ/7X/ls7tp9xv7H95VBjQp/wFAHCstgEtX3k8eOf5jcn2C5tulDderku2deGmzfNM2oA+5S8AgGM1viL9veUVlQ9dkf7gC5Grq9VvSrZ8F9GZX6+/h9LmvZfCgD7lLwCAY435eyJd3X42fPtp8lUbxQF98i8AgGO1Duih78q5c/g6crcn28+Mz36++b+dWV2wUxzQJ/8CADhW84AufPnz5Sfvz7xovy/89lVBl/60vN7x+lrIc31An/gLAOBYYwgoAIREQAGgEgEFgEoEFAAqEVAAqERAAaASAQWASgQUACoRUACoREABoBIBBYBKBBQAKhFQAKhEQAGgEgEFgEoEFAAqEVAAqNQwoP8HEtyT6MRIVEzFCGh43JPoxEhUTMUIaHjck+jESFRMxQhoeNyT6MRIVEzFCGh43JPoxEhUTMUIaHjck+jESFRMxQhoeNyT6MRIVEzFCGh43JPoxEhUTMUIaHjck+jESFRMxQhoeNyT6MRIVEzFCGh43JPoxEhUTMUIaHjck+jESFRMxQhoeNyT6MRIVEzFCGh43JPoxEhUTMUIaHjck+jESFRMxQhoeNyT6MRIVEzFCGh43JPoxEhUTMUIaHjck+jESFRMxQhoeNyT6MRIVEzFCGh43JPoxEhUTMUIaHjck+jESFRMxQhoeNyT6MRIVEzFCGh43JPoxEhUTMUIaHjck+jESFRMxQhoeNyT6MRIVEzFCGh43JPoxEhUTMUIaHjck+jESFRMxQhoeNyT6MRIVEzFCGh43JPoxEhUTMUIaHjck+jESFRMxQhoeNyT6MRIVEzFCGh43JPoxEhUTMUIaHjck+jESFRMxQhoeNyT6MRIVEzFCGh43JPoxEhUTMUIaHjck+jESFRMxQhoeNyT6MRIVEzFUgX0/+I7RL+fxAioiqkYAUVQ+v0kRkBVTMUIKILS7ycxAqpiKkZAEZR+P4kRUBVTMQKKoPT7SYyAqpiKEVAEpd9PYgRUxVSMgCIo/X4SI6AqpmIEFEHp95MYAVUxFSOgCEq/n8QIqIqpGAFFUPr9JEZAVUzFCCiC0u8nMQKqYipGQBGUfj+JEVAVUzECiqD0+0mMgKqYihFQBKXfT2IEVMVUjIAiKP1+EiOgKqZiBBRB6feTGAFVMRUjoAhKv5/ECKiKqRgBRVD6/SRGQFVMxQgogtLvJzECqmIqRkARlH4/iRFQFVMxAoqg9PtJjICqmIoRUASl309iBFTFVIyAIij9fhIjoCqmYgQUQen3kxgBVTEVI6AISr+fxAioiqkYAUVQ+v0kRkBVTMUIKILS7ycxAqpiKkZAEZR+P4kRUBVTMQKKoPT7SYyAqpiKEVAEpd9PYgRUxVSMgCIo/X4SI6AqpmKnDeiji6+tf/b4yt50+u71rg8IKDT0+0mMgKqIA3pt+tqmpNOlV744/gMCChH9fhIjoCrSgD6+Nt0E9Nr0/PX5g8vT87eO/YCAQkS/n8QIqIoyoP/2wXQT0Pt75RHmo4vnPjnuAwIKFf1+EiOgKsKA3pxO3/vzOqA39398/7gPCChU9PtJjICqKAP66j/O76zzeG36YfmxfHz0BwQUKvr9JEZAVYQB3cri48vrT9Dv752/dfQHq3/m+ZVT/s1P0fpIw5N+P8BJEVAEpd8PcFL6gL7yxdEfHPpH9Y+uWx9peNLvJzE+hVcZPKDdj0AJKAT0+0mMgKoQUOSg309iBFRlmIDyLDy86feTGAFVGSigm1d5rl/6edQHBBQq+v0kRkBVBgoo70SCM/1+EiOgKgMF9PHl6av773g/+gMCChX9fhIjoCoDBXT+YPuaS0d/QEAhot9PYgRUZaiAzh9cWVTy3VtdHxBQaOj3kxgBVREH9BT0t631kYYn/X4SI6AqpmIEFEHp95MYAVUxFSOgCEq/n8QIqIqpGAFFUPr9JEZAVUzFCCiC0u8nMQKqYipGQBGUfj+JEVAVUzECiqD0+0mMgKqYihFQBKXfT2IEVMVUjIAiKP1+EiOgKqZiBBRB6feTGAFVMRUjoAhKv5/ECKiKqRgBRVD6/SRGQFVMxQgogtLvJzECqmIqRkARlH4/iRFQFVMxAoqg9PtJjICqmIoRUASl309iBFTFVIyAIij9fhIjoCqmYgQUQen3kxgBVTEVI6AISr+fxAioiqkYAUVQ+v0kRkBVTMUIKILS7ycxAqpiKkZAEZR+P4kRUBVTMQKKoPT7SYyAqpiKEVAEpd9PYgRUxVSMgCIo/X4SI6AqpmIEFEHp95MYAVUxFSOgCEq/n8QIqIqpGAFFUPr9JEZAVUzFCCiC0u8nMQKqYipGQBGUfj+JEVAVUzECiqD0+0mMgKqYihFQBKXfT2IEVMVUjIAiKP1+EiOgKqZiBBRB6feTGAFVMRUjoAhKv5/ECKiKqRgBRVD6/SRGQFVMxQgogtLvJzECqmIqRkARlH4/iRFQFVMxAoqg9PtJjICqmIoRUASl309iBFTFVIyAIij9fhIjoCqmYgQUQen3kxgBVTEVI6AISr+fxAioiqkYAUVQ+v0kRkBVTMUIKILS7ycxAqpiKkZAEZR+P4kRUBVTMQKKoPT7SYyAqpiKEVAEpd9PYgRUxVSMgCIo/X4SI6AqpmIEFEHp95MYAVUxFSOgCEq/n8QIqIqpGAFFUPr9JEZAVUzFCCiC0u8nMQKqYipGQBGUfj+JEVAVUzECiqD0+0mMgKqYihFQBKXfT2IEVMVUjIAiKP1+EiOgKqZiBBRB6feTGAFVMRUjoAhKv5/ECKiKqRgBRVD6/SRGQFVMxQgogtLvJzECqmIqRkARlH4/iRFQFVMxAoqg9PtJjICqmIoRUASl309iBFTFVIyAIij9fhIjoCqmYgQUQen3kxgBVTEVI6AISr+fxAioiqkYAUVQ+v0kRkBVTMUIKILS7ycxAqpiKkZAEZR+P4kRUBVTMQKKoPT7SYyAqpiKEVAEpd9PYgRUxVSMgCIo/X4SI6AqpmIEFEHp95MYAVUxFSOgCEq/n8QIqIqpGAFFUPr9JEZAVUzFCCiC0u8nMQKqYipGQBGUfj+JEVAVU7GGAdVrfaThqfXaAB6BIiz9fhLjEaiKqRgBRVD6/SRGQFVMxQgogtLvJzECqmIqRkARlH4/iRFQFVMxAoqg9PtJjICqmIoRUASl309iBFTFVIyAIij9fhIjoCqmYgQUQen3kxgBVTEVI6AISr+fxAioiqkYAUVQ+v0kRkBVTMUIKILS7ycxAqpiKkZAEZR+P4kRUBVTMQKKoPT7SYyAqpiKEVAEpd9PYgRUxVSMgCIo/X4SI6AqpmIEFEHp95MYAVUxFSOgCEq/n8QIqIqpGAFFUPr9JEZAVUzFCCiC0u8nMQKqYipGQBGUfj+JEVAVUzECiqD0+0mMgKqYihFQBKXfT2IEVMVUjIAiKP1+EiOgKqZiBBRB6feTGAFVMRUjoAhKv5/ECKiKqRgBRVD6/SRGQFVMxQgogtLvJzECqmIqRkARlH4/iRFQFVMxAoqg9PtJjICqmIoRUASl309iBFTFVIyAIij9fhIjoCqmYgQUQen3kxgBVTEVI6AISr+fxAioiqkYAUVQ+v0kRkBVTMUIKILS7ycxAqpiKkZAEZR+P4kRUBVTMQKKoPT7SYyAqpiKEVAEpd9PYgRUxVSMgCIo/X4SI6AqpmIEFEHp95MYAVUxFSOgCEq/n8QIqIqpGAFFUPr9JEZAVUzFCCiC0u8nMQKqYipGQBGUfj+JEVAVUzECiqD0+0mMgKqYihFQBKXfT2IEVMVUjIAiKP1+EiOgKqZiBBRB6feTGAFVMRUjoAhKv5/ECKiKqRgBRVD6/SRGQFVMxQgogtLvJzECqmIqRkARlH4/iRFQFVMxAoqg9PtJjICqmIoRUASl309iBFTFVIyAIij9fhIjoCqmYgQUQen3kxgBVTEVI6AISr+fxAioiqkYAUVQ+v0kRkBVTMUIKILS7ycxAqpiKkZAEZR+P4kRUBVTMQKKoPT7SYyAqpiKEVAEpd9PYgRUxVSMgCIo/X4SI6AqpmIEFEHp95MYAVUxFSOgCEq/n8QIqIqpGAFFUPr9JEZAVUzFCCiC0u8nMQKqYipGQBGUfj+JEVAVUzECiqD0+0mMgKqYihFQBKXfT2IEVMVUjIAiKP1+EiOgKqZiBBRB6feTGAFVMRUjoAhKv5/ECKiKqRgBRVD6/SRGQFVMxQgogtLvJzECqmIqRkARlH4/iRFQFVMxAoqg9PtJjICqmIoRUASl309iBFTFVIyAIij9fhIjoCqmYgQUQen3kxgBVTEVI6AISr+fxAioiqmYKKCPL083XvliPn908eDni9+8sjedvnudgEJJv5/ECKiKS0Dv720FdF3TVUwJKET0+0mMgKoME9CN+3vnPln8cGf62sGvXZuevz5/cHl6/hYBhY5+P4kRUJVBA7p4IPr+qpnvbzV1/Ti0pJWAQkS/n8QIqMqgAb25epj5+PJWLG+uH43e3IoqAcWp6feTGAFVGTKgjy5OP1z9eP53H0ynP72+/ODa6tcOf1pPQHFa+v0kRkBVhgzo5sHm5jmkZTr3H43e39t8EfT5FeXfvNL6SMOTfj/ASSkDuv9lzjvT6Xu35n+5Ml18TEAxDP1+gJNSBvTO5on2zSPR5XNJWwE1L2TSP7pufaThSb+fxPgUXmW4gD6+vP5q56GiPuURKAGFgH4/iRFQleEC+sRDzPIrBBTD0O8nMQKqMlxAn3iafdVMnoXHIPT7SYyAqgwX0P1Xz+9/Ll+auXn9J68DhZR+P4kRUJXBArr16vlrqwebq5DyTiQMQr+fxAioymABfXRx/0ug9/eWL2N68EF5Vn6R0Vd5Lzzk9PtJjICqDBbQ7SeJbq4vxnR9+cEDrsaEAej3kxgBVRksoHe2H2I++Nl0eu699ccPriz6+e4t+w/ob1vrIw1P+v0kRkBVBgvoielvW+sjDU/6/SRGQFVMxQgogtLvJzECqmIqRkARlH4/iRFQFVMxAoqg9PtJjICqmIoRUASl309iBFTFVKwjoLM/fvY5AcUY6feTGAFV6RvQe//pm/n84euTyeTMLwgoxke/n8QIqErPgN6YfO+38/nVydLyZwQUI6PfT2IEVKVfQG+XbN7dnTz7zb0Lk5cJKEZHv5/ECKhKv4BeXZRzmdGdXyz/d/lzAopx0e8nMQKq0iugs0vLcq4z+vDCMJ/D629b6yMNT/r9JEZAVXoFdNXMhxcmz80JKMZJv5/ECKjKCQJ6d3fyDgHFSOn3kxgBVekV0NWn8DfKl0D5GihGSb+fxAioSq+Azq9Onls+/b4sJ8/CY5T0+0mMgKr0C+jt8gLQxWfws59PVo9DCSjGRb+fxAioSr+ALj59X3iuPJG0884g/SSgOBX9fhIjoCo9Azq/99FPPl788PBHP/jNMP0koDgV/X4SI6AqfQM6PP1ta32k4Um/n8QIqIqp2LEBnX09YD8JKE5Fv5/ECKiKqdjRAf3yx8v3wz/80VuDvIaJgOKU9PtJjICq9Azo7NPVdZgeXpicGeZiTAQUp6LfT2IEVKVnQK9OJmf+evd7v5393WSg19ETUJyKfj+JEVCVfgG9PZm8vX4P5x9Wb+gkoBgX/X4SI6Aq/QJ6dfnuo/Wb4G+US4oQUIyLfj+JEVCVXgFdvRd+HdC7u1xMBOOj309iBFSlV0A3l7Mr5eRqTBgj/X4SI6AqBBQ56PeTGAFV6RXQ2aXlE0frcnI5O4yRfj+JEVCVXgFdPXG0CugipjyJhPHR7ycxAqrSL6B3dycvfVMCeu91LmeHMdLvJzECqtIvoOVydmd3d178/uLHYa6nTEBxKvr9JEZAVXoGdP773cnaQP0koDgV/X4SI6AqfQM6//ZXZxf1fGawy4ESUJyKfj+JEVCV3gEdnP62tT7S8KTfT2IEVMVUjOuBIij9fhIjoCqmYlwPFEHp95MYAVXpGVCuB4qR0+8nMQKq0jOgXA8UI6ffT2IEVKVfQLkeKMZOv5/ECKhKv4ByPVCMnX4/iRFQlV4B5XqgGD39fhIjoCq9Asrl7DB6+v0kRkBVCChy0O8nMQKq0iugXA8Uo6ffT2IEVKVXQLkeKEZPv5/ECKhKv4ByPVCMnX4/iRFQlX4B5XqgGDv9fhIjoCo9A8r1QDFy+v0kRkBV+gaU64Fi3PT7SYyAqvQO6OD0t631kYYn/X4SI6AqpmIEFEHp95MYAVUxFTvihfQ/emnQaykTUJyafj+JEVCVfgG9MJk8M9iVlAkoBPT7SYyAqvQK6OpyypMzHw/ZUP1ta32k4Um/n8QIqEqvgC786celoS98TEAxSvr9JEZAVfoGdL76rkgLQ72QSX/bWh9peNLvJzECqnKCgC4+lf/y9WVCd94a4ikl/W1rfaThSb+fxAioyokCuvDtz8tbkl7QPwzV37bWRxqe9PtJjICqnCigs199f/OGzslLBBRjot9PYgRUpX9AN/VcPhf/7af698Trb1vrIw1P+v0kRkBVegZ0/dXPg1eD6i+rrL9trY80POn3kxgBVekV0NmliX3ySP+NPfS3rfWRhif9fhIjoCq9Arp8J9LO4ZcvPbzAI1CMiX4/iRFQlZ4B/cGvzS/NPle/lEl/21ofaXjS7ycxAqrSK6Au9Let9ZGGJ/1+EiOgKqZiBBRB6feTGAFVMRXruCL9ztlB3oREQHFq+v0kRkBV+gb0xv4r6PmeSBgj/X4SI6AqPQO67OczL775Bt+VEyOl309iBFSlX0Dv7k6eXb2K6d4lvi88xki/n8QIqEq/gF49eN/R7NLkOQKK0dHvJzECqtIroLNLW4867+6qX0JPQHF6+v0kRkBVegX00Ps29W/iJKA4Pf1+EiOgKgQUOej3kxgBVekV0NmlyTv7H+ivw0RAcXr6/SRGQFV6BZQnkTB6+v0kRkBV+gX07u7kzOpyIn96nZcxYYz0+0mMgKr0C+jqjUhnz54d8q1Icq2PNDy1XhtwzFs5/7C7fifnztsD/dX6/zi0PtLwpN9PYjwCVekb0PnsyzcWj0Bf/HiQJ5AIKE5Lv5/ECKhK74AOTn/bWh9peNLvJzECqmIqRkARlH4/iRFQFVMxG9DZR28+6Se8DhSjo99PYgRUpSOgy28n9wTeiYTx0e8nMQKqQkCRg34/iRFQlY6AOtLfttZHGp70+0mMgKqYihFQBKXfT2IEVMVU7PiAfjVcPgkoTke/n8QIqIqp2NEB/fLH5X1IP/gNAcUY6feTGAFV6RnQ2aX9p5BeGui9SPrb1vpIw5N+P4kRUJV+AV32c+fFf/jsn97YnQx0NTsCilPR7ycxAqrSL6A3JpMfrh54zn452bq4MgHFWOj3kxgBVekV0MUD0INr2F3lgsoYIf1+EiOgKr0C+vDCoe/KyQvpMT76/SRGQFV6BpRvKoeR0+8nMQKq0iugfF94jJ5+P4kRUJVeAZ3f2Pq65w2+BooR0u8nMQKq0i+gs0v7L/+8MdC1RAgoTkW/n8QIqEqvgM4+Wr7+88W3Pvvn5Y8vDHNVUP1ta32k4Um/n8QIqEqvgLpc1E5/21ofaXjS7ycxAqpCQJGDfj+JEVCVXgF1ob9trY80POn3kxgBVTEVI6AISr+fxAioiqkYAUVQ+v0kRkBVTMWODugfP9v3OS+kx+jo95MYAVXpGdDf7/JN5TBq+v0kRkBV+gX0Nt+VEyOn309iBFSlV0BnlyY7H3+17+sh+klAcSr6/SRGQFV6BfThhYEuokxAoaLfT2IEVKVnQAd6/zsBhYp+P4kRUJVeAZ1dIqAYOf1+EiOgKr0COr/Bp/AYOf1+EiOgKv0Ceuh7ehBQjJB+P4kRUJV+AZ3fuzA58+aG+kJ2BBSnp99PYgRUpWdAP+V1oBg3/X4SI6Aq/QJ6gxfSY+T0+0mMgKr0Cmh5If0gn7cTUIjo95MYAVXpFVCP55AIKE5Fv5/ECKhKz4DyOlCMnH4/iRFQlV4B5YX0GD39fhIjoCq9Ajq/MXmZgGLU9PtJjICq9Avo7NLO2wQUY6bfT2IEVKVXQGcfvTGZ7LzIC+kxXvr9JEZAVXoF1HxbY14HivHR7ycxAqpCQJGDfj+JEVCVXgF1ob9trY80POn3kxgBVTEVI6AISr+fxAioiqkYAUVQ+v0kRkBVTMVsQGd/tN8F/uGPz77A10AxOvr9JEZAVToC+vDC6imj2UebFy9tfoWAYlT0+0mMgKr0DOhBNgkoRkm/n8QIqAoBRQ76/SRGQFUIKHLQ7ycxAqpCQJGDfj+JEVAVAooc9PtJjICqEFDkoN9PYgRUhYAiB/1+EiOgKgQUOej3kxgBVSGgyEG/n8QIqAoBRQ76/SRGQFUIKHLQ7ycxAqrSHdAnEVCMj34/iRFQFQKKHPT7SYyAqnQEdPbRm0/im8phfPT7SYyAqnQE1JH+trU+0vCk309iBFTFVIyAIij9fhIjoCqmYgQUQen3kxgBVTEVI6AISr+fxAioiqkYAUVQ+v0kRkBVTMUIKILS7ycxAqpiKkZAEZR+P4kRUBVTMQKKoPT7SYyAqpiKEVAEpd9PYgRUxVTsiXciXdr5xeKHb78moBg3/X4SI6AqHQF9eGH5xvfV/xJQjJh+P4kRUJXOgC4fgRJQjJ5+P4kRUJWOgM4uTZ79/Ks/Xfjer786MMzn8/rb1vpIw5N+P4kRUJWOgM5vcDk7hKDfT2IEVKUroLNP6wL66OK0eOWL5UePr+xNp+9eX/3WoQ8IKDT0+0mMgKp0BXSR0K8+++fdnX/47MDnPa4Hen9vK6Drmq5ieugDAgoR/X4SI6Aq3QGdVz2JdGf62sEH16bnr88fXJ6ev2U/IKAQ0e8nMQKq0iugs49OfBH6a9P3939+f2/9OPTcJ+YDAgoV/X4SI6AqvQJ6co8vb/Xx5vrR6M1lVA99QEChot9PYgRUpXdAv/3V2clk5+xb/V7D9Oji+d99MJ3+9Pryg2vTD8svlk/rD31AQKGi309iBFSlb0APXs70cp+Abp5DWtZy/9Ho/b3ztw59sPr/Pr/S5489mdZHGp70+wFO6qiALvv5zItvvvH9ngW9M52+d2v+lyvTRS4JKBzo9wOc1BEBvbs7efY35Wf3Lk3K5UU6bL7SuXwuaauZr3xx6IND/4j+0XXrIw1P+v0kxqfwKv0CenXy7OZp+NmlyXPdAd24MzUPOp/yCJSAQkC/n8QIqEqvgK4vardyd/fZ/q9pMg86CSiGot9PYgRUpVdAD72Q/kSvqi+Z5Fl4DE+/n8QIqMowAX18eTuTm5d8rl8HuvUBAYWKfj+JEVCVXgGdXZq8s//B7UmPT+GvrR5frkLKO5EwPP1+EiOgKr0CevInke7vLV/G9OCD8o73RUZf3X/7+6EPCChU9PtJjICq9Avo3d3JmV+Xn/3p9V4vY1p8hr665tL15QcPti/A9ICrMWEA+v0kRkBV+gV09Uaks2fP9n4r0vzBz6bTc++tH2U+uLJI5rtP+4CAQkO/n8QIqErPgM7/sLt+J+fO2736eXL629b6SMOTfj+JEVCVvgGdz758Y/EI9MWPT3pdOwIKF/r9JEZAVXoHdHD629b6SMOTfj+JEVAVUzECiqD0+0mMgKqYihFQBKXfT2IEVMVUjIAiKP1+EiOgKqZiBBRB6feTGAFVMRUjoAhKv5/ECKiKqRgBRVD6/SRGQFVMxQgogtLvJzECqmIqRkARlH4/iRFQFVOxo67G9IPfEFCMmn4/iRFQlV4BfXhh63qgBBRjpN9PYgRUpWdAT/BdPAgoWtDvJzECqtIroIe+qRwBxRjp95MYAVXpFdD5jc23hSegGCn9fhIjoCr9AvrtLyeTZ158c+0ng1zSTn/bWh9peJuln3QAABwGSURBVNLvJzECqtIroA8vTLYN8wVR/W1rfaThSb+fxAioCgFFDvr9JEZAVXoF1IX+trU+0vCk309iBFTFVIyAIij9fhIjoCqmYscGdPb1gP0koDgV/X4SI6AqpmJHB/TLHy+/+PnwR28N9V3l9Let9ZGGJ/1+EiOgKj0DOvt09ezRwwuTMwO9KUl/21ofaXjS7ycxAqrSM6BXJ5Mzf737vd/O/m4yeXaYx6D629b6SMOTfj+JEVCVfgG9PZm8vX5H/B92B7qwiP62tT7S8KTfT2IEVKVfQK9OXt6/pMiNyXMEFKOj309iBFSlV0BXFxNZB/TuLi+kx/jo95MYAVXpFdBVOtcBHeradvrb1vpIw5N+P4kRUBUCihz0+0mMgKr0Cujs0vKJo3U5bw/0NLz+trU+0vCk309iBFSlV0BXTxytArqIKU8iYXz0+0mMgKr0C+jd3clL35SA3nt9MtDV6fW3rfWRhif9fhIjoCr9Arp4CDqZnN3defH7ix9fHqSfBBSnot9PYgRUpWdA57/f3VwNdKB+ElCcin4/iRFQlb4BnX/7q7OLej4z3DeI19+21kcanvT7SYyAqvQO6OD0t631kYYn/X4SI6AqpmLHXw/0qwH7SUBxKvr9JEZAVUzFjr8e6AKfwmOc9PtJjICq9Azo7NL+t5R7aaArKutvW+sjDU/6/SRGQFX6BXTZz50X//Nn//TGoqDDvI6egOJU9PtJjICq9Avo7f1XL81+OeF6oBgh/X4SI6AqvQK6eAB68OrPq7yVEyOk309iBFSlV0AfXth6+ybXA8UY6feTGAFV6RnQrWZyOTuMkX4/iRFQlV4BXV2Rfu3uLpezw/jo95MYAVXpFdBD3wfpxkDvhtffttZHGp70+0mMgKr0C+jDC5MffrPp5zCfwRNQnIp+P4kRUJWOgM4+erN4Y/U60H9+c3cyefEnfAqP0dHvJzECqtIR0MVDzyfxJBLGR7+fxAioCgFFDpUj+X/4DpH2pegIqCP9bWt9pOGpciStjzQ8SftSmIoRUARVOZLWRxqepH0pTMUIKIKqHEnrIw1P0r4UpmJHB/SPn+37nGfhMTqVI2l9pOFJ2peiZ0APvqccTyJhlCpH0vpIw5O0L0W/gN7mWXiMXOVIWh9peJL2pegV0Nmlyc7HX+37eoh+ElCcSuVIWh9peJL2pegV0IcXBrqIMgGFSuVIWh9peJL2pegZ0IHe/05AoVI5ktZHGp6kfSl6BXR2iYBi5CpH0vpIw5O0L0WvgM5v8Ck8Rq5yJK2PNDxJ+1L0C+ih7+lBQDFClSNpfaThSdqXol9A5/cuTM68ucHl7DA+lSNpfaThSdqXomdAP+V1oBi3ypG0PtLwJO1L0S+gN3ghPUauciStjzQ8SftS9ApoeSH9IJ+3E1CIVI6k9ZGGJ2lfil4B9XgOiYDiVCpH0vpIw5O0L0XPgPI6UIxc5UhaH2l4kval6BVQXkiP0ascSesjDU/SvhS9AjrY94InoFCpHEnrIw1P0r4U/QI6u7TzNgHFmFWOpPWRhidpX4peAZ19VL4vPC+kx3hVjqT1kYYnaV+KXgE139yY14FifCpH0vpIw5O0LwUBRQ6VI2l9pOFJ2peiV0Bd6G9b6yMNT5UjaX2k4Unal8JUjIAiqMqRtD7S8CTtS2EqRkARVOVIWh9peJL2pTAVOyKg3361jW8qh/GpHEnrIw1P0r4UvQLq8iSSXusjDU+VI2l9pOFJ2pen4Vl4BFU5ktZHGp6kfSl6BXT2x8/W/v71yc4/fM4L6TE6lSNpfaThSdqXoldAt93dfXaYK4Pqb1vrIw1PlSNpfaThSdqX4sQBHezCIvrb1vpIw1PlSFofaXiS9qU4eUCHegiqv22tjzQ8VY6k9ZGGJ2lfipMHdKirK+tvW+sjDU+VI2l9pOFJ2pfi5AG9u0tAMT6VI2l9pOFJ2pfixAGdXZ3wKTzGp3IkrY80PEn7UvQK6OyjzaVA33xjd8KTSBihypG0PtLwJO1L0Sugh19Iz8uYMEKVI2l9pOFJ2pfixAF95q2BvkG8/ra1PtLwVDmS1kcanqR9KXoF1IX+trU+0vBUOZLWRxqepH0pTMUIKIKqHEnrIw1P0r4UpmIEFEFVjqT1kYYnaV8KUzECiqAqR9L6SMOTtC+FqZgN6NYLmA7wbY0xPpUjaX2k4Unal6IjoOZKoFwPFGNVOZLWRxqepH0pCChyqBxJ6yMNT9K+FB0Btb7cnfBOJIxR5UhaH2l4kvalOFFAZz9f5PPMbwbpJwHFqVSOpPWRhidpX4qTBPQPi4efO0O9EYmA4lQqR9L6SMOTtC9F/4AO+vCTgOKUKkfS+kjDk7QvRe+Aloef/26wfBJQnE7lSFofaXiS9qXoGdB7Az/8JKA4pcqRtD7S8CTtS9EvoIM//CSgOKXKkbQ+0vAk7UvRJ6D3Li2vAjrow08CilOqHEnrIw1P0r4UPQJaHn6+PXA+CShOp3IkrY80PEn7UnQG1OfhJwHFKVWOpPWRhidpX4qugP7e5+EnAcUpVY6k9ZGGJ2lfio6A8l54BFE5ktZHGp6kfSkIKHKoHEnrIw1P0r4UHQHleqAIonIkrY80PEn7UnQE1JH+trU+0vBUOZLWRxqepH0pTMUIKIKqHEnrIw1P0r4UpmIEFEFVjqT1kYYnaV8KUzECiqAqR9L6SMOTtC+FqRgBRVCVI2l9pOFJ2pfCVIyAIqjKkbQ+0vAk7UthKkZAEVTlSFofaXiS9qUwFSOgCKpyJK2PNDxJ+1KYihFQBFU5ktZHGp6kfSlMxQgogqocSesjDU/SvhSmYgQUQVWOpPWRhidpXwpTMQKKoCpH0vpIw5O0L4WpGAFFUJUjaX2k4Unal8JUjIAiqMqRtD7S8CTtS2EqRkARVOVIWh9peJL2pTAVI6AIqnIkrY80PEn7UpiKEVAEVTmS1kcanqR9KUzFCCiCqhxJ6yMNT9K+FKZiBBRBVY6k9ZGGJ2lfClMxAoqgKkfS+kjDk7QvhakYAUVQlSNpfaThSdqXwlSMgCKoypG0PtLwJO1LYSpGQBFU5UhaH2l4kvalMBUjoAiqciStjzQ8SftSmIoRUARVOZLWRxqepH0pTMUIKIKqHEnrIw1P0r4UpmIEFEFVjqT1kYYnaV8KUzECiqAqR9L6SMOTtC+FqRgBRVCVI2l9pOFJ2pfCVIyAIqjKkbQ+0vAk7UthKkZAEVTlSFofaXiS9qUwFSOgCKpyJK2PNDxJ+1KYihFQBFU5ktZHGp6kfSlMxQgogqocSesjDU/SvhSmYgQUQVWOpPWRhidpXwpTMQKKoCpH0vpIw5O0L4WpGAFFUJUjaX2k4Unal8JUjIAiqMqRtD7S8CTtS2EqRkARVOVIWh9peJL2pTAVI6AIqnIkrY80PEn7UpiKEVAEVTmS1kcanqR9KUzFCCiCqhxJ6yMNT9K+FKZiBBRBVY6k9ZGGJ2lfClMxAoqgKkfS+kjDk7QvhakYAUVQlSNpfaThSdqXwlSMgCKoypG0PtLwJO1LYSpGQBFU5UhaH2l4kvalMBUjoAiqciStjzQ8SftSmIrpAvpvP5tOz717vfz80cVp8coXy48eX9mbTte/Q0AhUjmS1kcanqR9KYYK6L+sknnuk+UH9/e2Arqu6SqmBBQilSNpfaThSdqXYqCA3pme+9v5/MHlVSfvTF87+K1r0/PXl79z/hYBhU7lSFofaXiS9qUYJqCPL08/XP64eLT5YWnm+/u/dX9v/Th09eCUgEKjciStjzQ8SftSDBPQRxfXn6GXdD6+vBXLm+tHoze3okpAcWqVI2l9pOFJ2pdimIDuKwF9dPH87z6YTn96ffUr5bHp4U/rCShOq3IkrY80PEn7Ugwb0NUn6pvnkJbp3H80en9v80XQ51e0f/NS6yMNT5UjaX2k4Unal6cRB3T1+fqd6fS9W/O/XFk+J09AMYzKkbQ+0vAk7cvTaAN6Z/Uyps2XPZefz28F1LyQSf/ouvWRhqfKkbQ+0vAk7UsxZEDv7J378HBPz996yiNQAgqBypG0PtLwJO1LMWBAb07NK5WWDzoJKIZROZLWRxqepH0phgvov9h+rprJs/AYROVIWh9peJL2pRgqoI+vTV9df41z86r6VTM3r//kdaCQqhxJ6yMNT9K+FEMF9NrWWzWvrR5srkLKO5EwiMqRtD7S8CTtSzFQQG9uv9X9/t7yZUwPPii/tsjoq7wXHnKVI2l9pOFJ2pdimIBurl+38FrJ6eoCTNeXv/eAqzFhAJUjaX2k4Unal2KYgN6ZHgro/MHy4qDvrR9yPriy+OV3b9l/Rn/bWh9peKocSesjDU/SvhTDBLSG/ra1PtLwVDmS1kcanqR9KUzFCCiCqhxJ6yMNT9K+FKZiBBRBVY6k9ZGGJ2lfClMxAoqgKkfS+kjDk7QvhakYAUVQlSNpfaThSdqXwlSMgCKoypG0PtLwJO1LYSpGQBFU5UhaH2l4kvalMBUjoAiqciStjzQ8SftSmIoRUARVOZLWRxqepH0pTMUIKIKqHEnrIw1P0r4UpmIEFEFVjqT1kYYnaV8KUzECiqAqR9L6SMOTtC+FqRgBRVCVI2l9pOFJ2pfCVIyAIqjKkbQ+0vAk7UthKkZAEVTlSFofaXiS9qUwFSOgCKpyJK2PNDxJ+1KYihFQBFU5ktZHGp6kfSlMxQgogqocSesjDU/SvhSmYgQUQVWOpPWRhidpXwpTMQKKoCpH0vpIw5O0L4WpGAFFUJUjaX2k4Unal8JUjIAiqMqRtD7S8CTtS2EqRkARVOVIWh9peJL2pTAVI6AIqnIkrY80PEn7UpiKEVAEVTmS1kcanqR9KUzFCCiCqhxJ6yMNT9K+FKZiBBRBVY6k9ZGGJ2lfClMxAoqgKkfS+kjDk7QvhakYAUVQlSNpfaThSdqXwlSMgCKoypG0PtLwJO1LYSpGQBFU5UhaH2l4kvalMBUjoAiqciStjzQ8SftSmIoRUARVOZLWRxqepH0pTMUIKIKqHEnrIw1P0r4UpmIEFEFVjqT1kYYnaV8KUzECiqAqR9L6SMOTtC+FqRgBRVCVI2l9pOFJ2pfCVIyAIqjKkbQ+0vAk7UthKkZAEVTlSFofaXiS9qUwFSOgCKpyJK2PNDxJ+1KYihFQBFU5ktZHGp6kfSlMxQgogqocSesjDU/SvhSmYgQUQVWOpPWRhidpXwpTMQKKoCpH0vpIw5O0L4WpGAFFUJUjaX2k4Unal8JUjIAiqMqRtD7S8CTtS2EqRkARVOVIWh9peJL2pTAVI6AIqnIkrY80PEn7UpiKEVAEVTmS1kcanqR9KUzFCCiCqhxJ6yMNT9K+FKZiBBRBVY6k9ZGGJ2lfClMxAoqgKkfS+kjDk7QvhakYAUVQlSNpfaThSdqXwlSMgCKoypG0PtLwJO1LYSpGQBFU5UhaH2l4kvalMBUjoAiqciStjzQ8SftSmIoRUARVOZLWRxqepH0pTMUIKIKqHEnrIw1P0r4UpmIEFEFVjqT1kYYnaV8KUzECiqAqR9L6SMOTtC+FqRgBRVCVI2l9pOFJ2pfCVIyAIqjKkbQ+0vAk7UthKkZAEVTlSFofaXiS9qUwFSOgCKpyJK2PNDxJ+1KYihFQBFU5ktZHGp6kfSlMxQgogqocSesjDU/SvhSmYgQUQVWOpPWRhidpXwpTMQKKoCpH0vpIw5O0L4WpGAFFUJUjaX2k4Unal8JUjIAiqMqRtD7S8CTtS2EqRkARVOVIWh9peJL2pTAVI6AIqnIkrY80PEn7UpiKEVAEVTmS1kcanqR9KUzFCCiCqhxJ6yMNT9K+FKZiBBRBVY6k9ZGGJ2lfClMxAoqgKkfS+kjDk7QvhakYAUVQlSNpfaThSdqXwlSMgCKoypG0PtLwJO1LYSpGQBFU5UhaH2l4kvalMBVrGFC91kcanipH0vpIw5O0L0/DI1AEVTmS1kcanqR9KUzFCCiCqhxJ6yMNT9K+FKZiBBRBVY6k9ZGGJ2lfClMxAoqgKkfS+kjDk7QvhakYAUVQlSNpfaThSdqXwlSMgCKoypG0PtLwJO1LYSpGQBFU5UhaH2l4kvalMBUjoAiqciStjzQ8SftSmIoRUARVOZLWRxqepH0pTMUIKIKqHEnrIw1P0r4UpmIEFEFVjqT1kYYnaV8KUzECiqAqR9L6SMOTtC+FqRgBRVCVI2l9pOFJ2pfCVIyAIqjKkbQ+0vAk7UthKkZAEVTlSFofaXiS9qUwFSOgCKpyJK2PNDxJ+1KYihFQBFU5ktZHGp6kfSlMxQgogqocSesjDU/SvhSmYgQUQVWOpPWRhidpXwpTMQKKoCpH0vpIw5O0L4WpGAFFUJUjaX2k4Unal8JUjIAiqMqRtD7S8CTtS2EqRkARVOVIWh9peJL2pTAVI6AIqnIkrY80PEn7UpiKEVAEVTmS1kcanqR9KUzFCCiCqhxJ6yMNT9K+FKZiBBRBVY6k9ZGGJ2lfClMxAoqgKkfS+kjDk7QvhakYAUVQlSNpfaThSdqXwlSMgCKoypG0PtLwJO1LYSpGQBFU5UhaH2l4kvalMBUjoAiqciStjzQ8SftSmIoRUARVOZLWRxqepH0pTMUIKIKqHEnrIw1P0r4UpmIEFEFVjqT1kYYnaV8KUzECiqAqR9L6SMOTtC+FqRgBRVCVI2l9pOFJ2pfCVIyAIqjKkbQ+0vAk7UthKkZAEVTlSFofaXiS9qUwFSOgCKpyJK2PNDxJ+1KYihFQBFU5ktZHGp6kfSlMxQgogqocSesjDU/SvhSmYgQUQVWOpPWRhidpXwpTMQKKoCpH0vpIw5O0L4WpGAFFUJUjaX2k4Unal8JUjIAiqMqRtD7S8CTtS2EqRkARVOVIWh9peJL2pTAVI6AIqnIkrY80PEn7UpiKEVAEVTmS1kcanqR9KUzFCCiCqhxJ6yMNT9K+FKZiBBRBVY6k9ZGGJ2lfClMxAoqgKkfS+kjDk7QvhakYAUVQlSNpfaThSdqXwlSMgCKoypG0PtLwJO1LYSpGQBFU5UhaH2l4kvalMBUjoAiqciStjzQ8SftSmIoRUARVOZLWRxqepH0pTMUIKIKqHEnrIw1P0r4UpmIEFEFVjqT1kYYnaV8KUzECiqAqR9L6SMOTtC+FqRgBRVCVI2l9pOFJ2pfCVIyAIqjKkbQ+0vAk7UthKkZAEVTlSFofaXiS9qUwFSOgCKpyJK2PNDxJ+1KYihFQBFU5ktZHGp6kfSlMxQgogqocSesjDU/SvhSmYgQUQVWOpPWRhidpXwpTMQKKoCpH0vpIw5O0L4WpGAFFUJUjaX2k4Unal8JUjIAiqMqRtD7S8CTtS2EqRkARVOVIWh9peJL2pTAVI6AIqnIkrY80PEn7UpiKEVAEVTmS1kcanqR9KUzFCCiCqhxJ6yMNT9K+FKZiBBRBVY6k9ZGGJ2lfClMxAoqgKkfS+kjDk7QvhakYAUVQlSNpfaThSdqXwlSMgCKoypG0PtLwJO1LYSpGQBFU5UhaH2l4kvalMBUjoAiqciStjzQ8SftSmIp5BPTxlb3p9N3rBBRKlSNpfaThSdqXwj+gjy5Ol175goBCqHIkrY80PEn7UvgH9Nr0/PX5g8vT87cIKHQqR9L6SMOTtC+Fe0Dv75XHno8unvuEgEKnciStjzQ8SftSuAf05vS19Y/vE1DoVI6k9ZGGJ2lfCveAXpt+WH68sw4pAYVE5UhaH2l4kval8A7o48vrT93v722+CPr8iv7van2k4alyJK2PNDxJ+/I0qQIKAJ48A2peyKR/dP3dxD2JToxEpWFAzeuYWt8TWXBPohMjUSGg2XBPohMjUfEOqOez8N9N3JPoxEhU3AO6ef2nw+tAv5u4J9GJkai4B9TxnUjfTdyT6MRIVNwD+vjy9FWn98J/N3FPohMjUXEP6PyB29WYvpu4J9GJkaj4B3T+4Mqin+/esr/c+p7IgnsSnRiJSoOAHqH1PZEF9yQ6MRIVUzECGh73JDoxEhVTMQIaHvckOjESFVMxAhoe9yQ6MRIVUzECGh73JDoxEhVTMQIaHvckOjESFVMxAhoe9yQ6MRIVUzECGh73JDoxEhVTMQIaHvckOjESFVMxAhoe9yQ6MRIVUzECGh73JDoxEhVTMQIaHvckOjESFVMxAhoe9yQ6MRIVUzECGh73JDoxEhVTMQIaHvckOjESFVMxAhoe9yQ6MRIVUzECGh73JDoxEhVTMQIaHvckOjESFVMxAhoe9yQ6MRIVUzECGh73JDoxEhVTMQIaHvckOjESFVMxAhoe9yQ6MRIVUzECGh73JDoxEhVTMQIaHvckOjESFVMxAhoe9yQ6MRIVUzECGh73JDoxEhVTMQIaHvckOjESFVOxhgGFxvPPt/43wOgxkoEQ0PA4G+jESAZCQMPjbKATIxkIAQ2Ps4FOjGQgBDQ8zgY6MZKBENDwOBvoxEgGQkDD42ygEyMZCAEFgEoEFAAqEVAAqERAAaASAQWASgQUACoRUACoREABoBIBDeHRxen7+z995Yum/y4Yk8eXp+dv7f/0w7b/Mt9BBDSERUDPfbL5KQHFgft7m/+23tlPKdwQ0BAWAZ2+tvkpAcWWm9PVIB5d3Pw3Fn4IaAiLw/E368/PCCgO2Xx55+bmP7FwREBDWFTzf+xtHmisfnxwZTqdvnu96b8WxuBO+fLO/fU+FsPYm05/en31858tRvLv/7bhv1x2BDSEZTXXjzDWAb2zOCUL53ja4Dvv8eXlMq6tP0O5vzWM9c95aDocAhrCsprrJ1lXAV0cjXf/9/zxv0z5uhfu75375P7e6hmkxSf0792aP/7X5RdGF4v5D4tf/Lc9RjIYAhpCqebqk7RVQDdf8LrGowssVnD+v6wjuRnGzen7PK3kgICGsKpmqWX56f5L/njpCrZfpPH48rqZy0eki5W8+j9b/nt9BxDQEFYBLY8oyk/3H1vwnDzmy/+OrmewaObG4lduLn989b/yn9jhENAQNs8cLR5vrgO6PjAEFPPV483yk+Vj0YOAzv/8N+Wn75HQoRDQEDadvDZ9n0egeMJWQM2XPR//9+Urmd5/2j8EAQIawqaTi/Px3/gaKKz9gD7t/fCP/5WRDIaAhrD/QPPO9K/2eBYexn5AF8NY/Wz5X9bNa+sPfhdqBDSEg8/Ur62+uLV6HehfrvA6UMy3E/no4vT89fn8z3uLR6LLKzUtfv7gMv+VHQwBDeEgoIty8k4kGFuPMdfDmL43P3gn0qt8nXwoBDSEreeKNhff4b3w2Lf9SfrqvfD/ePDzv/qPfAI/GAIKAJUIKABUIqAAUImAAkAlAgoAlQgoAFQioABQiYACQCUCCgCVCCgAVCKgAFCJgAJAJQIKAJUIKABUIqAAUImAAkAlAgoAlQgoAFQioABQiYACQCUCCgCVCCgAVCKgAFCJgAJAJQIKAJUIKABUIqAAUImAAkAlAgoAlQgoAFQioABQiYACQCUCCgCVCCgAVCKgAFCJgAJAJQIKAJUIKABUIqAAUImAAkAlAgoAlQgoAFQioABQiYACQCUCCgCVCCgAVCKgAFCJgAJAJQIKAJUIKABUIqAAUOn/A71FEGOQyBlxAAAAAElFTkSuQmCC">
@@ -7556,6 +8354,289 @@
           <a:lstStyle/>
           <a:p>
             <a:endParaRPr lang="en-US"/>
+          </a:p>
+        </p:txBody>
+      </p:sp>
+      <p:sp>
+        <p:nvSpPr>
+          <p:cNvPr id="18" name="Text Placeholder 2">
+            <a:extLst>
+              <a:ext uri="{FF2B5EF4-FFF2-40B4-BE49-F238E27FC236}">
+                <a16:creationId xmlns:a16="http://schemas.microsoft.com/office/drawing/2014/main" id="{B8D2580C-3D22-4F91-9C7C-28D8BD13B21F}"/>
+              </a:ext>
+            </a:extLst>
+          </p:cNvPr>
+          <p:cNvSpPr txBox="1">
+            <a:spLocks/>
+          </p:cNvSpPr>
+          <p:nvPr/>
+        </p:nvSpPr>
+        <p:spPr>
+          <a:xfrm>
+            <a:off x="6373273" y="5342466"/>
+            <a:ext cx="2775224" cy="1051687"/>
+          </a:xfrm>
+          <a:prstGeom prst="rect">
+            <a:avLst/>
+          </a:prstGeom>
+        </p:spPr>
+        <p:txBody>
+          <a:bodyPr vert="horz" lIns="91440" tIns="45720" rIns="91440" bIns="45720" rtlCol="0" anchor="t">
+            <a:normAutofit/>
+          </a:bodyPr>
+          <a:lstStyle>
+            <a:lvl1pPr marL="0" indent="0" algn="l" defTabSz="457200" rtl="0" eaLnBrk="1" latinLnBrk="0" hangingPunct="1">
+              <a:spcBef>
+                <a:spcPct val="20000"/>
+              </a:spcBef>
+              <a:spcAft>
+                <a:spcPts val="600"/>
+              </a:spcAft>
+              <a:buClr>
+                <a:schemeClr val="tx1"/>
+              </a:buClr>
+              <a:buSzPct val="80000"/>
+              <a:buFont typeface="Wingdings 3" panose="05040102010807070707" pitchFamily="18" charset="2"/>
+              <a:buNone/>
+              <a:defRPr sz="1800" kern="1200" cap="none">
+                <a:solidFill>
+                  <a:schemeClr val="bg2">
+                    <a:lumMod val="75000"/>
+                  </a:schemeClr>
+                </a:solidFill>
+                <a:effectLst/>
+                <a:latin typeface="+mn-lt"/>
+                <a:ea typeface="+mn-ea"/>
+                <a:cs typeface="+mn-cs"/>
+              </a:defRPr>
+            </a:lvl1pPr>
+            <a:lvl2pPr marL="457200" indent="0" algn="l" defTabSz="457200" rtl="0" eaLnBrk="1" latinLnBrk="0" hangingPunct="1">
+              <a:spcBef>
+                <a:spcPct val="20000"/>
+              </a:spcBef>
+              <a:spcAft>
+                <a:spcPts val="600"/>
+              </a:spcAft>
+              <a:buClr>
+                <a:schemeClr val="tx1"/>
+              </a:buClr>
+              <a:buSzPct val="80000"/>
+              <a:buFont typeface="Wingdings 3" panose="05040102010807070707" pitchFamily="18" charset="2"/>
+              <a:buNone/>
+              <a:defRPr sz="1800" kern="1200" cap="none">
+                <a:solidFill>
+                  <a:schemeClr val="tx1">
+                    <a:tint val="75000"/>
+                  </a:schemeClr>
+                </a:solidFill>
+                <a:effectLst/>
+                <a:latin typeface="+mn-lt"/>
+                <a:ea typeface="+mn-ea"/>
+                <a:cs typeface="+mn-cs"/>
+              </a:defRPr>
+            </a:lvl2pPr>
+            <a:lvl3pPr marL="914400" indent="0" algn="l" defTabSz="457200" rtl="0" eaLnBrk="1" latinLnBrk="0" hangingPunct="1">
+              <a:spcBef>
+                <a:spcPct val="20000"/>
+              </a:spcBef>
+              <a:spcAft>
+                <a:spcPts val="600"/>
+              </a:spcAft>
+              <a:buClr>
+                <a:schemeClr val="tx1"/>
+              </a:buClr>
+              <a:buSzPct val="80000"/>
+              <a:buFont typeface="Wingdings 3" panose="05040102010807070707" pitchFamily="18" charset="2"/>
+              <a:buNone/>
+              <a:defRPr sz="1600" kern="1200" cap="none">
+                <a:solidFill>
+                  <a:schemeClr val="tx1">
+                    <a:tint val="75000"/>
+                  </a:schemeClr>
+                </a:solidFill>
+                <a:effectLst/>
+                <a:latin typeface="+mn-lt"/>
+                <a:ea typeface="+mn-ea"/>
+                <a:cs typeface="+mn-cs"/>
+              </a:defRPr>
+            </a:lvl3pPr>
+            <a:lvl4pPr marL="1371600" indent="0" algn="l" defTabSz="457200" rtl="0" eaLnBrk="1" latinLnBrk="0" hangingPunct="1">
+              <a:spcBef>
+                <a:spcPct val="20000"/>
+              </a:spcBef>
+              <a:spcAft>
+                <a:spcPts val="600"/>
+              </a:spcAft>
+              <a:buClr>
+                <a:schemeClr val="tx1"/>
+              </a:buClr>
+              <a:buSzPct val="80000"/>
+              <a:buFont typeface="Wingdings 3" panose="05040102010807070707" pitchFamily="18" charset="2"/>
+              <a:buNone/>
+              <a:defRPr sz="1400" kern="1200" cap="none">
+                <a:solidFill>
+                  <a:schemeClr val="tx1">
+                    <a:tint val="75000"/>
+                  </a:schemeClr>
+                </a:solidFill>
+                <a:effectLst/>
+                <a:latin typeface="+mn-lt"/>
+                <a:ea typeface="+mn-ea"/>
+                <a:cs typeface="+mn-cs"/>
+              </a:defRPr>
+            </a:lvl4pPr>
+            <a:lvl5pPr marL="1828800" indent="0" algn="l" defTabSz="457200" rtl="0" eaLnBrk="1" latinLnBrk="0" hangingPunct="1">
+              <a:spcBef>
+                <a:spcPct val="20000"/>
+              </a:spcBef>
+              <a:spcAft>
+                <a:spcPts val="600"/>
+              </a:spcAft>
+              <a:buClr>
+                <a:schemeClr val="tx1"/>
+              </a:buClr>
+              <a:buSzPct val="80000"/>
+              <a:buFont typeface="Wingdings 3" panose="05040102010807070707" pitchFamily="18" charset="2"/>
+              <a:buNone/>
+              <a:defRPr sz="1400" kern="1200" cap="none">
+                <a:solidFill>
+                  <a:schemeClr val="tx1">
+                    <a:tint val="75000"/>
+                  </a:schemeClr>
+                </a:solidFill>
+                <a:effectLst/>
+                <a:latin typeface="+mn-lt"/>
+                <a:ea typeface="+mn-ea"/>
+                <a:cs typeface="+mn-cs"/>
+              </a:defRPr>
+            </a:lvl5pPr>
+            <a:lvl6pPr marL="2286000" indent="0" algn="l" defTabSz="457200" rtl="0" eaLnBrk="1" latinLnBrk="0" hangingPunct="1">
+              <a:spcBef>
+                <a:spcPct val="20000"/>
+              </a:spcBef>
+              <a:spcAft>
+                <a:spcPts val="600"/>
+              </a:spcAft>
+              <a:buClr>
+                <a:schemeClr val="tx1"/>
+              </a:buClr>
+              <a:buSzPct val="80000"/>
+              <a:buFont typeface="Wingdings 3" panose="05040102010807070707" pitchFamily="18" charset="2"/>
+              <a:buNone/>
+              <a:defRPr sz="1400" kern="1200" cap="none">
+                <a:solidFill>
+                  <a:schemeClr val="tx1">
+                    <a:tint val="75000"/>
+                  </a:schemeClr>
+                </a:solidFill>
+                <a:effectLst/>
+                <a:latin typeface="+mn-lt"/>
+                <a:ea typeface="+mn-ea"/>
+                <a:cs typeface="+mn-cs"/>
+              </a:defRPr>
+            </a:lvl6pPr>
+            <a:lvl7pPr marL="2743200" indent="0" algn="l" defTabSz="457200" rtl="0" eaLnBrk="1" latinLnBrk="0" hangingPunct="1">
+              <a:spcBef>
+                <a:spcPct val="20000"/>
+              </a:spcBef>
+              <a:spcAft>
+                <a:spcPts val="600"/>
+              </a:spcAft>
+              <a:buClr>
+                <a:schemeClr val="tx1"/>
+              </a:buClr>
+              <a:buSzPct val="80000"/>
+              <a:buFont typeface="Wingdings 3" panose="05040102010807070707" pitchFamily="18" charset="2"/>
+              <a:buNone/>
+              <a:defRPr sz="1400" kern="1200" cap="none">
+                <a:solidFill>
+                  <a:schemeClr val="tx1">
+                    <a:tint val="75000"/>
+                  </a:schemeClr>
+                </a:solidFill>
+                <a:effectLst/>
+                <a:latin typeface="+mn-lt"/>
+                <a:ea typeface="+mn-ea"/>
+                <a:cs typeface="+mn-cs"/>
+              </a:defRPr>
+            </a:lvl7pPr>
+            <a:lvl8pPr marL="3200400" indent="0" algn="l" defTabSz="457200" rtl="0" eaLnBrk="1" latinLnBrk="0" hangingPunct="1">
+              <a:spcBef>
+                <a:spcPct val="20000"/>
+              </a:spcBef>
+              <a:spcAft>
+                <a:spcPts val="600"/>
+              </a:spcAft>
+              <a:buClr>
+                <a:schemeClr val="tx1"/>
+              </a:buClr>
+              <a:buSzPct val="80000"/>
+              <a:buFont typeface="Wingdings 3" panose="05040102010807070707" pitchFamily="18" charset="2"/>
+              <a:buNone/>
+              <a:defRPr sz="1400" kern="1200" cap="none">
+                <a:solidFill>
+                  <a:schemeClr val="tx1">
+                    <a:tint val="75000"/>
+                  </a:schemeClr>
+                </a:solidFill>
+                <a:effectLst/>
+                <a:latin typeface="+mn-lt"/>
+                <a:ea typeface="+mn-ea"/>
+                <a:cs typeface="+mn-cs"/>
+              </a:defRPr>
+            </a:lvl8pPr>
+            <a:lvl9pPr marL="3657600" indent="0" algn="l" defTabSz="457200" rtl="0" eaLnBrk="1" latinLnBrk="0" hangingPunct="1">
+              <a:spcBef>
+                <a:spcPct val="20000"/>
+              </a:spcBef>
+              <a:spcAft>
+                <a:spcPts val="600"/>
+              </a:spcAft>
+              <a:buClr>
+                <a:schemeClr val="tx1"/>
+              </a:buClr>
+              <a:buSzPct val="80000"/>
+              <a:buFont typeface="Wingdings 3" panose="05040102010807070707" pitchFamily="18" charset="2"/>
+              <a:buNone/>
+              <a:defRPr sz="1400" kern="1200" cap="none">
+                <a:solidFill>
+                  <a:schemeClr val="tx1">
+                    <a:tint val="75000"/>
+                  </a:schemeClr>
+                </a:solidFill>
+                <a:effectLst/>
+                <a:latin typeface="+mn-lt"/>
+                <a:ea typeface="+mn-ea"/>
+                <a:cs typeface="+mn-cs"/>
+              </a:defRPr>
+            </a:lvl9pPr>
+          </a:lstStyle>
+          <a:p>
+            <a:pPr>
+              <a:lnSpc>
+                <a:spcPct val="90000"/>
+              </a:lnSpc>
+            </a:pPr>
+            <a:endParaRPr lang="en-US" sz="1900" dirty="0">
+              <a:solidFill>
+                <a:schemeClr val="tx1"/>
+              </a:solidFill>
+            </a:endParaRPr>
+          </a:p>
+          <a:p>
+            <a:pPr>
+              <a:lnSpc>
+                <a:spcPct val="90000"/>
+              </a:lnSpc>
+            </a:pPr>
+            <a:r>
+              <a:rPr lang="en-US" sz="1900" dirty="0">
+                <a:solidFill>
+                  <a:schemeClr val="tx1"/>
+                </a:solidFill>
+              </a:rPr>
+              <a:t>But not practical…</a:t>
+            </a:r>
           </a:p>
         </p:txBody>
       </p:sp>
@@ -7575,6 +8656,31 @@
 <file path=ppt/slides/slide15.xml><?xml version="1.0" encoding="utf-8"?>
 <p:sld xmlns:a="http://schemas.openxmlformats.org/drawingml/2006/main" xmlns:r="http://schemas.openxmlformats.org/officeDocument/2006/relationships" xmlns:p="http://schemas.openxmlformats.org/presentationml/2006/main">
   <p:cSld>
+    <p:bg>
+      <p:bgPr>
+        <a:gradFill rotWithShape="1">
+          <a:gsLst>
+            <a:gs pos="10000">
+              <a:schemeClr val="bg2">
+                <a:tint val="97000"/>
+                <a:hueMod val="92000"/>
+                <a:satMod val="169000"/>
+                <a:lumMod val="164000"/>
+              </a:schemeClr>
+            </a:gs>
+            <a:gs pos="100000">
+              <a:schemeClr val="bg2">
+                <a:shade val="96000"/>
+                <a:satMod val="120000"/>
+                <a:lumMod val="90000"/>
+              </a:schemeClr>
+            </a:gs>
+          </a:gsLst>
+          <a:lin ang="6120000" scaled="1"/>
+        </a:gradFill>
+        <a:effectLst/>
+      </p:bgPr>
+    </p:bg>
     <p:spTree>
       <p:nvGrpSpPr>
         <p:cNvPr id="1" name=""/>
@@ -7589,6 +8695,821 @@
           <a:chExt cx="0" cy="0"/>
         </a:xfrm>
       </p:grpSpPr>
+      <p:cxnSp>
+        <p:nvCxnSpPr>
+          <p:cNvPr id="33" name="Straight Connector 32">
+            <a:extLst>
+              <a:ext uri="{FF2B5EF4-FFF2-40B4-BE49-F238E27FC236}">
+                <a16:creationId xmlns:a16="http://schemas.microsoft.com/office/drawing/2014/main" id="{0512F9CB-A1A0-4043-A103-F6A4B94B695A}"/>
+              </a:ext>
+              <a:ext uri="{C183D7F6-B498-43B3-948B-1728B52AA6E4}">
+                <adec:decorative xmlns:adec="http://schemas.microsoft.com/office/drawing/2017/decorative" val="1"/>
+              </a:ext>
+            </a:extLst>
+          </p:cNvPr>
+          <p:cNvCxnSpPr>
+            <a:cxnSpLocks noGrp="1" noRot="1" noChangeAspect="1" noMove="1" noResize="1" noEditPoints="1" noAdjustHandles="1" noChangeArrowheads="1" noChangeShapeType="1"/>
+          </p:cNvCxnSpPr>
+          <p:nvPr>
+            <p:extLst>
+              <p:ext uri="{386F3935-93C4-4BCD-93E2-E3B085C9AB24}">
+                <p16:designElem xmlns:p16="http://schemas.microsoft.com/office/powerpoint/2015/main" val="1"/>
+              </p:ext>
+            </p:extLst>
+          </p:nvPr>
+        </p:nvCxnSpPr>
+        <p:spPr>
+          <a:xfrm flipH="1">
+            <a:off x="8228012" y="8467"/>
+            <a:ext cx="3810000" cy="3810000"/>
+          </a:xfrm>
+          <a:prstGeom prst="line">
+            <a:avLst/>
+          </a:prstGeom>
+          <a:ln w="12700">
+            <a:solidFill>
+              <a:schemeClr val="tx1"/>
+            </a:solidFill>
+          </a:ln>
+        </p:spPr>
+        <p:style>
+          <a:lnRef idx="2">
+            <a:schemeClr val="accent1"/>
+          </a:lnRef>
+          <a:fillRef idx="0">
+            <a:schemeClr val="accent1"/>
+          </a:fillRef>
+          <a:effectRef idx="1">
+            <a:schemeClr val="accent1"/>
+          </a:effectRef>
+          <a:fontRef idx="minor">
+            <a:schemeClr val="tx1"/>
+          </a:fontRef>
+        </p:style>
+      </p:cxnSp>
+      <p:cxnSp>
+        <p:nvCxnSpPr>
+          <p:cNvPr id="35" name="Straight Connector 34">
+            <a:extLst>
+              <a:ext uri="{FF2B5EF4-FFF2-40B4-BE49-F238E27FC236}">
+                <a16:creationId xmlns:a16="http://schemas.microsoft.com/office/drawing/2014/main" id="{ADBE6588-EE16-4389-857C-86A156D49E5D}"/>
+              </a:ext>
+              <a:ext uri="{C183D7F6-B498-43B3-948B-1728B52AA6E4}">
+                <adec:decorative xmlns:adec="http://schemas.microsoft.com/office/drawing/2017/decorative" val="1"/>
+              </a:ext>
+            </a:extLst>
+          </p:cNvPr>
+          <p:cNvCxnSpPr>
+            <a:cxnSpLocks noGrp="1" noRot="1" noChangeAspect="1" noMove="1" noResize="1" noEditPoints="1" noAdjustHandles="1" noChangeArrowheads="1" noChangeShapeType="1"/>
+          </p:cNvCxnSpPr>
+          <p:nvPr>
+            <p:extLst>
+              <p:ext uri="{386F3935-93C4-4BCD-93E2-E3B085C9AB24}">
+                <p16:designElem xmlns:p16="http://schemas.microsoft.com/office/powerpoint/2015/main" val="1"/>
+              </p:ext>
+            </p:extLst>
+          </p:nvPr>
+        </p:nvCxnSpPr>
+        <p:spPr>
+          <a:xfrm flipH="1">
+            <a:off x="6108170" y="91545"/>
+            <a:ext cx="6080655" cy="6080655"/>
+          </a:xfrm>
+          <a:prstGeom prst="line">
+            <a:avLst/>
+          </a:prstGeom>
+          <a:ln w="12700">
+            <a:solidFill>
+              <a:schemeClr val="tx1"/>
+            </a:solidFill>
+          </a:ln>
+        </p:spPr>
+        <p:style>
+          <a:lnRef idx="2">
+            <a:schemeClr val="accent1"/>
+          </a:lnRef>
+          <a:fillRef idx="0">
+            <a:schemeClr val="accent1"/>
+          </a:fillRef>
+          <a:effectRef idx="1">
+            <a:schemeClr val="accent1"/>
+          </a:effectRef>
+          <a:fontRef idx="minor">
+            <a:schemeClr val="tx1"/>
+          </a:fontRef>
+        </p:style>
+      </p:cxnSp>
+      <p:cxnSp>
+        <p:nvCxnSpPr>
+          <p:cNvPr id="37" name="Straight Connector 36">
+            <a:extLst>
+              <a:ext uri="{FF2B5EF4-FFF2-40B4-BE49-F238E27FC236}">
+                <a16:creationId xmlns:a16="http://schemas.microsoft.com/office/drawing/2014/main" id="{17FD48D2-B0A7-413D-B947-AA55AC1296D5}"/>
+              </a:ext>
+              <a:ext uri="{C183D7F6-B498-43B3-948B-1728B52AA6E4}">
+                <adec:decorative xmlns:adec="http://schemas.microsoft.com/office/drawing/2017/decorative" val="1"/>
+              </a:ext>
+            </a:extLst>
+          </p:cNvPr>
+          <p:cNvCxnSpPr>
+            <a:cxnSpLocks noGrp="1" noRot="1" noChangeAspect="1" noMove="1" noResize="1" noEditPoints="1" noAdjustHandles="1" noChangeArrowheads="1" noChangeShapeType="1"/>
+          </p:cNvCxnSpPr>
+          <p:nvPr>
+            <p:extLst>
+              <p:ext uri="{386F3935-93C4-4BCD-93E2-E3B085C9AB24}">
+                <p16:designElem xmlns:p16="http://schemas.microsoft.com/office/powerpoint/2015/main" val="1"/>
+              </p:ext>
+            </p:extLst>
+          </p:nvPr>
+        </p:nvCxnSpPr>
+        <p:spPr>
+          <a:xfrm flipH="1">
+            <a:off x="7235825" y="228600"/>
+            <a:ext cx="4953000" cy="4953000"/>
+          </a:xfrm>
+          <a:prstGeom prst="line">
+            <a:avLst/>
+          </a:prstGeom>
+          <a:ln w="12700">
+            <a:solidFill>
+              <a:schemeClr val="tx1"/>
+            </a:solidFill>
+          </a:ln>
+        </p:spPr>
+        <p:style>
+          <a:lnRef idx="2">
+            <a:schemeClr val="accent1"/>
+          </a:lnRef>
+          <a:fillRef idx="0">
+            <a:schemeClr val="accent1"/>
+          </a:fillRef>
+          <a:effectRef idx="1">
+            <a:schemeClr val="accent1"/>
+          </a:effectRef>
+          <a:fontRef idx="minor">
+            <a:schemeClr val="tx1"/>
+          </a:fontRef>
+        </p:style>
+      </p:cxnSp>
+      <p:cxnSp>
+        <p:nvCxnSpPr>
+          <p:cNvPr id="39" name="Straight Connector 38">
+            <a:extLst>
+              <a:ext uri="{FF2B5EF4-FFF2-40B4-BE49-F238E27FC236}">
+                <a16:creationId xmlns:a16="http://schemas.microsoft.com/office/drawing/2014/main" id="{2BE668D0-D906-4EEE-B32F-8C028624B837}"/>
+              </a:ext>
+              <a:ext uri="{C183D7F6-B498-43B3-948B-1728B52AA6E4}">
+                <adec:decorative xmlns:adec="http://schemas.microsoft.com/office/drawing/2017/decorative" val="1"/>
+              </a:ext>
+            </a:extLst>
+          </p:cNvPr>
+          <p:cNvCxnSpPr>
+            <a:cxnSpLocks noGrp="1" noRot="1" noChangeAspect="1" noMove="1" noResize="1" noEditPoints="1" noAdjustHandles="1" noChangeArrowheads="1" noChangeShapeType="1"/>
+          </p:cNvCxnSpPr>
+          <p:nvPr>
+            <p:extLst>
+              <p:ext uri="{386F3935-93C4-4BCD-93E2-E3B085C9AB24}">
+                <p16:designElem xmlns:p16="http://schemas.microsoft.com/office/powerpoint/2015/main" val="1"/>
+              </p:ext>
+            </p:extLst>
+          </p:nvPr>
+        </p:nvCxnSpPr>
+        <p:spPr>
+          <a:xfrm flipH="1">
+            <a:off x="7335837" y="32278"/>
+            <a:ext cx="4852989" cy="4852989"/>
+          </a:xfrm>
+          <a:prstGeom prst="line">
+            <a:avLst/>
+          </a:prstGeom>
+          <a:ln w="31750">
+            <a:solidFill>
+              <a:schemeClr val="tx1"/>
+            </a:solidFill>
+          </a:ln>
+        </p:spPr>
+        <p:style>
+          <a:lnRef idx="2">
+            <a:schemeClr val="accent1"/>
+          </a:lnRef>
+          <a:fillRef idx="0">
+            <a:schemeClr val="accent1"/>
+          </a:fillRef>
+          <a:effectRef idx="1">
+            <a:schemeClr val="accent1"/>
+          </a:effectRef>
+          <a:fontRef idx="minor">
+            <a:schemeClr val="tx1"/>
+          </a:fontRef>
+        </p:style>
+      </p:cxnSp>
+      <p:cxnSp>
+        <p:nvCxnSpPr>
+          <p:cNvPr id="41" name="Straight Connector 40">
+            <a:extLst>
+              <a:ext uri="{FF2B5EF4-FFF2-40B4-BE49-F238E27FC236}">
+                <a16:creationId xmlns:a16="http://schemas.microsoft.com/office/drawing/2014/main" id="{D1DE67A3-B8F6-4CFD-A8E0-D15200F23152}"/>
+              </a:ext>
+              <a:ext uri="{C183D7F6-B498-43B3-948B-1728B52AA6E4}">
+                <adec:decorative xmlns:adec="http://schemas.microsoft.com/office/drawing/2017/decorative" val="1"/>
+              </a:ext>
+            </a:extLst>
+          </p:cNvPr>
+          <p:cNvCxnSpPr>
+            <a:cxnSpLocks noGrp="1" noRot="1" noChangeAspect="1" noMove="1" noResize="1" noEditPoints="1" noAdjustHandles="1" noChangeArrowheads="1" noChangeShapeType="1"/>
+          </p:cNvCxnSpPr>
+          <p:nvPr>
+            <p:extLst>
+              <p:ext uri="{386F3935-93C4-4BCD-93E2-E3B085C9AB24}">
+                <p16:designElem xmlns:p16="http://schemas.microsoft.com/office/powerpoint/2015/main" val="1"/>
+              </p:ext>
+            </p:extLst>
+          </p:nvPr>
+        </p:nvCxnSpPr>
+        <p:spPr>
+          <a:xfrm flipH="1">
+            <a:off x="7845426" y="609601"/>
+            <a:ext cx="4343399" cy="4343399"/>
+          </a:xfrm>
+          <a:prstGeom prst="line">
+            <a:avLst/>
+          </a:prstGeom>
+          <a:ln w="31750">
+            <a:solidFill>
+              <a:schemeClr val="tx1"/>
+            </a:solidFill>
+          </a:ln>
+        </p:spPr>
+        <p:style>
+          <a:lnRef idx="2">
+            <a:schemeClr val="accent1"/>
+          </a:lnRef>
+          <a:fillRef idx="0">
+            <a:schemeClr val="accent1"/>
+          </a:fillRef>
+          <a:effectRef idx="1">
+            <a:schemeClr val="accent1"/>
+          </a:effectRef>
+          <a:fontRef idx="minor">
+            <a:schemeClr val="tx1"/>
+          </a:fontRef>
+        </p:style>
+      </p:cxnSp>
+      <p:sp useBgFill="1">
+        <p:nvSpPr>
+          <p:cNvPr id="43" name="Rectangle 42">
+            <a:extLst>
+              <a:ext uri="{FF2B5EF4-FFF2-40B4-BE49-F238E27FC236}">
+                <a16:creationId xmlns:a16="http://schemas.microsoft.com/office/drawing/2014/main" id="{637214A4-997B-4C95-951E-08E1B51B5AF9}"/>
+              </a:ext>
+              <a:ext uri="{C183D7F6-B498-43B3-948B-1728B52AA6E4}">
+                <adec:decorative xmlns:adec="http://schemas.microsoft.com/office/drawing/2017/decorative" val="1"/>
+              </a:ext>
+            </a:extLst>
+          </p:cNvPr>
+          <p:cNvSpPr>
+            <a:spLocks noGrp="1" noRot="1" noChangeAspect="1" noMove="1" noResize="1" noEditPoints="1" noAdjustHandles="1" noChangeArrowheads="1" noChangeShapeType="1" noTextEdit="1"/>
+          </p:cNvSpPr>
+          <p:nvPr>
+            <p:extLst>
+              <p:ext uri="{386F3935-93C4-4BCD-93E2-E3B085C9AB24}">
+                <p16:designElem xmlns:p16="http://schemas.microsoft.com/office/powerpoint/2015/main" val="1"/>
+              </p:ext>
+            </p:extLst>
+          </p:nvPr>
+        </p:nvSpPr>
+        <p:spPr>
+          <a:xfrm>
+            <a:off x="0" y="0"/>
+            <a:ext cx="12192000" cy="6858000"/>
+          </a:xfrm>
+          <a:prstGeom prst="rect">
+            <a:avLst/>
+          </a:prstGeom>
+          <a:ln>
+            <a:noFill/>
+          </a:ln>
+        </p:spPr>
+        <p:style>
+          <a:lnRef idx="2">
+            <a:schemeClr val="accent1">
+              <a:shade val="50000"/>
+            </a:schemeClr>
+          </a:lnRef>
+          <a:fillRef idx="1">
+            <a:schemeClr val="accent1"/>
+          </a:fillRef>
+          <a:effectRef idx="0">
+            <a:schemeClr val="accent1"/>
+          </a:effectRef>
+          <a:fontRef idx="minor">
+            <a:schemeClr val="lt1"/>
+          </a:fontRef>
+        </p:style>
+        <p:txBody>
+          <a:bodyPr rtlCol="0" anchor="ctr"/>
+          <a:lstStyle/>
+          <a:p>
+            <a:pPr algn="ctr"/>
+            <a:endParaRPr lang="en-US"/>
+          </a:p>
+        </p:txBody>
+      </p:sp>
+      <p:sp>
+        <p:nvSpPr>
+          <p:cNvPr id="2" name="Title 1"/>
+          <p:cNvSpPr>
+            <a:spLocks noGrp="1"/>
+          </p:cNvSpPr>
+          <p:nvPr>
+            <p:ph type="title"/>
+          </p:nvPr>
+        </p:nvSpPr>
+        <p:spPr>
+          <a:xfrm>
+            <a:off x="1144901" y="285237"/>
+            <a:ext cx="9850049" cy="1318099"/>
+          </a:xfrm>
+        </p:spPr>
+        <p:txBody>
+          <a:bodyPr vert="horz" lIns="91440" tIns="45720" rIns="91440" bIns="45720" rtlCol="0" anchor="b">
+            <a:normAutofit/>
+          </a:bodyPr>
+          <a:lstStyle/>
+          <a:p>
+            <a:r>
+              <a:rPr lang="en-US" sz="4800" dirty="0"/>
+              <a:t>How to mitigate attrition</a:t>
+            </a:r>
+          </a:p>
+        </p:txBody>
+      </p:sp>
+      <p:sp>
+        <p:nvSpPr>
+          <p:cNvPr id="3" name="Text Placeholder 2"/>
+          <p:cNvSpPr>
+            <a:spLocks noGrp="1"/>
+          </p:cNvSpPr>
+          <p:nvPr>
+            <p:ph type="body" idx="1"/>
+          </p:nvPr>
+        </p:nvSpPr>
+        <p:spPr>
+          <a:xfrm>
+            <a:off x="684212" y="2963333"/>
+            <a:ext cx="7007226" cy="2827867"/>
+          </a:xfrm>
+        </p:spPr>
+        <p:txBody>
+          <a:bodyPr vert="horz" lIns="91440" tIns="45720" rIns="91440" bIns="45720" rtlCol="0" anchor="t">
+            <a:normAutofit fontScale="92500" lnSpcReduction="10000"/>
+          </a:bodyPr>
+          <a:lstStyle/>
+          <a:p>
+            <a:endParaRPr lang="en-US" sz="2100" dirty="0"/>
+          </a:p>
+          <a:p>
+            <a:pPr marL="0" lvl="1"/>
+            <a:r>
+              <a:rPr lang="en-US" sz="2800" dirty="0">
+                <a:solidFill>
+                  <a:schemeClr val="tx1"/>
+                </a:solidFill>
+              </a:rPr>
+              <a:t>Less overtime – Workers set own hours</a:t>
+            </a:r>
+          </a:p>
+          <a:p>
+            <a:pPr marL="0" lvl="1"/>
+            <a:endParaRPr lang="en-US" sz="2800" dirty="0">
+              <a:solidFill>
+                <a:schemeClr val="tx1"/>
+              </a:solidFill>
+            </a:endParaRPr>
+          </a:p>
+          <a:p>
+            <a:pPr marL="0" lvl="1"/>
+            <a:r>
+              <a:rPr lang="en-US" sz="2800" dirty="0">
+                <a:solidFill>
+                  <a:schemeClr val="tx1"/>
+                </a:solidFill>
+              </a:rPr>
+              <a:t>Age – Look at your internal practices for younger employees.  What are you doing to keep them engaged?</a:t>
+            </a:r>
+          </a:p>
+          <a:p>
+            <a:endParaRPr lang="en-US" sz="2100" dirty="0"/>
+          </a:p>
+        </p:txBody>
+      </p:sp>
+      <p:pic>
+        <p:nvPicPr>
+          <p:cNvPr id="8" name="Graphic 7" descr="Checkmark">
+            <a:extLst>
+              <a:ext uri="{FF2B5EF4-FFF2-40B4-BE49-F238E27FC236}">
+                <a16:creationId xmlns:a16="http://schemas.microsoft.com/office/drawing/2014/main" id="{B7FBC31B-AF0B-42DB-8496-FF4F410A777A}"/>
+              </a:ext>
+            </a:extLst>
+          </p:cNvPr>
+          <p:cNvPicPr>
+            <a:picLocks noChangeAspect="1"/>
+          </p:cNvPicPr>
+          <p:nvPr/>
+        </p:nvPicPr>
+        <p:blipFill>
+          <a:blip r:embed="rId2">
+            <a:extLst>
+              <a:ext uri="{96DAC541-7B7A-43D3-8B79-37D633B846F1}">
+                <asvg:svgBlip xmlns:asvg="http://schemas.microsoft.com/office/drawing/2016/SVG/main" r:embed="rId3"/>
+              </a:ext>
+            </a:extLst>
+          </a:blip>
+          <a:stretch>
+            <a:fillRect/>
+          </a:stretch>
+        </p:blipFill>
+        <p:spPr>
+          <a:xfrm>
+            <a:off x="8228012" y="1852781"/>
+            <a:ext cx="3152439" cy="3152439"/>
+          </a:xfrm>
+          <a:prstGeom prst="rect">
+            <a:avLst/>
+          </a:prstGeom>
+          <a:ln w="15875">
+            <a:solidFill>
+              <a:srgbClr val="FFFFFF">
+                <a:alpha val="40000"/>
+              </a:srgbClr>
+            </a:solidFill>
+          </a:ln>
+          <a:effectLst>
+            <a:innerShdw blurRad="57150" dist="38100" dir="14460000">
+              <a:prstClr val="black">
+                <a:alpha val="70000"/>
+              </a:prstClr>
+            </a:innerShdw>
+          </a:effectLst>
+        </p:spPr>
+      </p:pic>
+      <p:grpSp>
+        <p:nvGrpSpPr>
+          <p:cNvPr id="45" name="Group 44">
+            <a:extLst>
+              <a:ext uri="{FF2B5EF4-FFF2-40B4-BE49-F238E27FC236}">
+                <a16:creationId xmlns:a16="http://schemas.microsoft.com/office/drawing/2014/main" id="{307A8868-805D-4C18-8A8B-4817BA9FF9B5}"/>
+              </a:ext>
+              <a:ext uri="{C183D7F6-B498-43B3-948B-1728B52AA6E4}">
+                <adec:decorative xmlns:adec="http://schemas.microsoft.com/office/drawing/2017/decorative" val="1"/>
+              </a:ext>
+            </a:extLst>
+          </p:cNvPr>
+          <p:cNvGrpSpPr>
+            <a:grpSpLocks noGrp="1" noUngrp="1" noRot="1" noChangeAspect="1" noMove="1" noResize="1"/>
+          </p:cNvGrpSpPr>
+          <p:nvPr>
+            <p:extLst>
+              <p:ext uri="{386F3935-93C4-4BCD-93E2-E3B085C9AB24}">
+                <p16:designElem xmlns:p16="http://schemas.microsoft.com/office/powerpoint/2015/main" val="1"/>
+              </p:ext>
+            </p:extLst>
+          </p:nvPr>
+        </p:nvGrpSpPr>
+        <p:grpSpPr>
+          <a:xfrm>
+            <a:off x="9206969" y="2963333"/>
+            <a:ext cx="2981858" cy="3208867"/>
+            <a:chOff x="9206969" y="2963333"/>
+            <a:chExt cx="2981858" cy="3208867"/>
+          </a:xfrm>
+        </p:grpSpPr>
+        <p:cxnSp>
+          <p:nvCxnSpPr>
+            <p:cNvPr id="46" name="Straight Connector 45">
+              <a:extLst>
+                <a:ext uri="{FF2B5EF4-FFF2-40B4-BE49-F238E27FC236}">
+                  <a16:creationId xmlns:a16="http://schemas.microsoft.com/office/drawing/2014/main" id="{0CF59EB9-1EAB-47CE-AC8B-8EFD96929F0D}"/>
+                </a:ext>
+                <a:ext uri="{C183D7F6-B498-43B3-948B-1728B52AA6E4}">
+                  <adec:decorative xmlns:adec="http://schemas.microsoft.com/office/drawing/2017/decorative" val="1"/>
+                </a:ext>
+              </a:extLst>
+            </p:cNvPr>
+            <p:cNvCxnSpPr/>
+            <p:nvPr>
+              <p:extLst>
+                <p:ext uri="{386F3935-93C4-4BCD-93E2-E3B085C9AB24}">
+                  <p16:designElem xmlns:p16="http://schemas.microsoft.com/office/powerpoint/2015/main" val="1"/>
+                </p:ext>
+              </p:extLst>
+            </p:nvPr>
+          </p:nvCxnSpPr>
+          <p:spPr>
+            <a:xfrm flipH="1">
+              <a:off x="11276012" y="2963333"/>
+              <a:ext cx="912814" cy="912812"/>
+            </a:xfrm>
+            <a:prstGeom prst="line">
+              <a:avLst/>
+            </a:prstGeom>
+            <a:ln w="9525">
+              <a:solidFill>
+                <a:schemeClr val="tx1"/>
+              </a:solidFill>
+            </a:ln>
+          </p:spPr>
+          <p:style>
+            <a:lnRef idx="2">
+              <a:schemeClr val="accent1"/>
+            </a:lnRef>
+            <a:fillRef idx="0">
+              <a:schemeClr val="accent1"/>
+            </a:fillRef>
+            <a:effectRef idx="1">
+              <a:schemeClr val="accent1"/>
+            </a:effectRef>
+            <a:fontRef idx="minor">
+              <a:schemeClr val="tx1"/>
+            </a:fontRef>
+          </p:style>
+        </p:cxnSp>
+        <p:cxnSp>
+          <p:nvCxnSpPr>
+            <p:cNvPr id="47" name="Straight Connector 46">
+              <a:extLst>
+                <a:ext uri="{FF2B5EF4-FFF2-40B4-BE49-F238E27FC236}">
+                  <a16:creationId xmlns:a16="http://schemas.microsoft.com/office/drawing/2014/main" id="{B8786ADE-071C-435B-81E3-54A82DD5D5A9}"/>
+                </a:ext>
+                <a:ext uri="{C183D7F6-B498-43B3-948B-1728B52AA6E4}">
+                  <adec:decorative xmlns:adec="http://schemas.microsoft.com/office/drawing/2017/decorative" val="1"/>
+                </a:ext>
+              </a:extLst>
+            </p:cNvPr>
+            <p:cNvCxnSpPr/>
+            <p:nvPr>
+              <p:extLst>
+                <p:ext uri="{386F3935-93C4-4BCD-93E2-E3B085C9AB24}">
+                  <p16:designElem xmlns:p16="http://schemas.microsoft.com/office/powerpoint/2015/main" val="1"/>
+                </p:ext>
+              </p:extLst>
+            </p:nvPr>
+          </p:nvCxnSpPr>
+          <p:spPr>
+            <a:xfrm flipH="1">
+              <a:off x="9206969" y="3190344"/>
+              <a:ext cx="2981857" cy="2981856"/>
+            </a:xfrm>
+            <a:prstGeom prst="line">
+              <a:avLst/>
+            </a:prstGeom>
+            <a:ln w="9525">
+              <a:solidFill>
+                <a:schemeClr val="tx1"/>
+              </a:solidFill>
+            </a:ln>
+          </p:spPr>
+          <p:style>
+            <a:lnRef idx="2">
+              <a:schemeClr val="accent1"/>
+            </a:lnRef>
+            <a:fillRef idx="0">
+              <a:schemeClr val="accent1"/>
+            </a:fillRef>
+            <a:effectRef idx="1">
+              <a:schemeClr val="accent1"/>
+            </a:effectRef>
+            <a:fontRef idx="minor">
+              <a:schemeClr val="tx1"/>
+            </a:fontRef>
+          </p:style>
+        </p:cxnSp>
+        <p:cxnSp>
+          <p:nvCxnSpPr>
+            <p:cNvPr id="48" name="Straight Connector 47">
+              <a:extLst>
+                <a:ext uri="{FF2B5EF4-FFF2-40B4-BE49-F238E27FC236}">
+                  <a16:creationId xmlns:a16="http://schemas.microsoft.com/office/drawing/2014/main" id="{0F46AF6B-37AC-410E-9A0A-2F70B937A39C}"/>
+                </a:ext>
+                <a:ext uri="{C183D7F6-B498-43B3-948B-1728B52AA6E4}">
+                  <adec:decorative xmlns:adec="http://schemas.microsoft.com/office/drawing/2017/decorative" val="1"/>
+                </a:ext>
+              </a:extLst>
+            </p:cNvPr>
+            <p:cNvCxnSpPr/>
+            <p:nvPr>
+              <p:extLst>
+                <p:ext uri="{386F3935-93C4-4BCD-93E2-E3B085C9AB24}">
+                  <p16:designElem xmlns:p16="http://schemas.microsoft.com/office/powerpoint/2015/main" val="1"/>
+                </p:ext>
+              </p:extLst>
+            </p:nvPr>
+          </p:nvCxnSpPr>
+          <p:spPr>
+            <a:xfrm flipH="1">
+              <a:off x="10292292" y="3285067"/>
+              <a:ext cx="1896534" cy="1896533"/>
+            </a:xfrm>
+            <a:prstGeom prst="line">
+              <a:avLst/>
+            </a:prstGeom>
+            <a:ln w="9525">
+              <a:solidFill>
+                <a:schemeClr val="tx1"/>
+              </a:solidFill>
+            </a:ln>
+          </p:spPr>
+          <p:style>
+            <a:lnRef idx="2">
+              <a:schemeClr val="accent1"/>
+            </a:lnRef>
+            <a:fillRef idx="0">
+              <a:schemeClr val="accent1"/>
+            </a:fillRef>
+            <a:effectRef idx="1">
+              <a:schemeClr val="accent1"/>
+            </a:effectRef>
+            <a:fontRef idx="minor">
+              <a:schemeClr val="tx1"/>
+            </a:fontRef>
+          </p:style>
+        </p:cxnSp>
+        <p:cxnSp>
+          <p:nvCxnSpPr>
+            <p:cNvPr id="49" name="Straight Connector 48">
+              <a:extLst>
+                <a:ext uri="{FF2B5EF4-FFF2-40B4-BE49-F238E27FC236}">
+                  <a16:creationId xmlns:a16="http://schemas.microsoft.com/office/drawing/2014/main" id="{FAEF4DD0-8A5B-40F1-88BA-ABE5ADE4D290}"/>
+                </a:ext>
+                <a:ext uri="{C183D7F6-B498-43B3-948B-1728B52AA6E4}">
+                  <adec:decorative xmlns:adec="http://schemas.microsoft.com/office/drawing/2017/decorative" val="1"/>
+                </a:ext>
+              </a:extLst>
+            </p:cNvPr>
+            <p:cNvCxnSpPr/>
+            <p:nvPr>
+              <p:extLst>
+                <p:ext uri="{386F3935-93C4-4BCD-93E2-E3B085C9AB24}">
+                  <p16:designElem xmlns:p16="http://schemas.microsoft.com/office/powerpoint/2015/main" val="1"/>
+                </p:ext>
+              </p:extLst>
+            </p:nvPr>
+          </p:nvCxnSpPr>
+          <p:spPr>
+            <a:xfrm flipH="1">
+              <a:off x="10443103" y="3131080"/>
+              <a:ext cx="1745722" cy="1745720"/>
+            </a:xfrm>
+            <a:prstGeom prst="line">
+              <a:avLst/>
+            </a:prstGeom>
+            <a:ln w="28575">
+              <a:solidFill>
+                <a:schemeClr val="tx1"/>
+              </a:solidFill>
+            </a:ln>
+          </p:spPr>
+          <p:style>
+            <a:lnRef idx="2">
+              <a:schemeClr val="accent1"/>
+            </a:lnRef>
+            <a:fillRef idx="0">
+              <a:schemeClr val="accent1"/>
+            </a:fillRef>
+            <a:effectRef idx="1">
+              <a:schemeClr val="accent1"/>
+            </a:effectRef>
+            <a:fontRef idx="minor">
+              <a:schemeClr val="tx1"/>
+            </a:fontRef>
+          </p:style>
+        </p:cxnSp>
+        <p:cxnSp>
+          <p:nvCxnSpPr>
+            <p:cNvPr id="50" name="Straight Connector 49">
+              <a:extLst>
+                <a:ext uri="{FF2B5EF4-FFF2-40B4-BE49-F238E27FC236}">
+                  <a16:creationId xmlns:a16="http://schemas.microsoft.com/office/drawing/2014/main" id="{3BA5EA8C-8F33-4994-A748-233E839E4A23}"/>
+                </a:ext>
+                <a:ext uri="{C183D7F6-B498-43B3-948B-1728B52AA6E4}">
+                  <adec:decorative xmlns:adec="http://schemas.microsoft.com/office/drawing/2017/decorative" val="1"/>
+                </a:ext>
+              </a:extLst>
+            </p:cNvPr>
+            <p:cNvCxnSpPr/>
+            <p:nvPr>
+              <p:extLst>
+                <p:ext uri="{386F3935-93C4-4BCD-93E2-E3B085C9AB24}">
+                  <p16:designElem xmlns:p16="http://schemas.microsoft.com/office/powerpoint/2015/main" val="1"/>
+                </p:ext>
+              </p:extLst>
+            </p:nvPr>
+          </p:nvCxnSpPr>
+          <p:spPr>
+            <a:xfrm flipH="1">
+              <a:off x="10918826" y="3683001"/>
+              <a:ext cx="1270001" cy="1269999"/>
+            </a:xfrm>
+            <a:prstGeom prst="line">
+              <a:avLst/>
+            </a:prstGeom>
+            <a:ln w="28575">
+              <a:solidFill>
+                <a:schemeClr val="tx1"/>
+              </a:solidFill>
+            </a:ln>
+          </p:spPr>
+          <p:style>
+            <a:lnRef idx="2">
+              <a:schemeClr val="accent1"/>
+            </a:lnRef>
+            <a:fillRef idx="0">
+              <a:schemeClr val="accent1"/>
+            </a:fillRef>
+            <a:effectRef idx="1">
+              <a:schemeClr val="accent1"/>
+            </a:effectRef>
+            <a:fontRef idx="minor">
+              <a:schemeClr val="tx1"/>
+            </a:fontRef>
+          </p:style>
+        </p:cxnSp>
+      </p:grpSp>
+      <p:sp>
+        <p:nvSpPr>
+          <p:cNvPr id="4" name="AutoShape 2" descr="data:image/png;base64,iVBORw0KGgoAAAANSUhEUgAABUAAAAPACAMAAADDuCPrAAABYlBMVEUAAAAAADoAAGYAOjoAOmYAOpAAZrYzMzM6AAA6OgA6Ojo6OmY6ZmY6ZpA6ZrY6kLY6kNtNTU1NTW5NTY5Nbm5Nbo5NbqtNjshmAABmADpmOgBmOjpmZjpmZmZmZpBmkGZmkLZmkNtmtttmtv9uTU1ubk1ubm5ubo5ujqtujshuq8huq+SOTU2Obk2Obm6Oq8iOyOSOyP+QOgCQOjqQZjqQZmaQZpCQkGaQkLaQtraQttuQ2/+rbk2rjk2rjm6rq8iryOSr5Mir5P+2ZgC2Zjq2kDq2kGa2kJC2tpC2tra2ttu229u22/+2///Ijk3Ijm7Iq27Iq6vIyKvI5KvI5OTI5P/I///bkDrbkGbbtmbbtpDbtrbb27bb29vb2//b/7bb///kq27kyI7kyKvk5P/k///r6+v8jVn/tmb/yI7/25D/27b/29v/5Kv/5Mj/5OT//7b//7///8j//9v//+T///+zjZs9AAAACXBIWXMAAB2HAAAdhwGP5fFlAAAgAElEQVR4nO3d/59b5ZnecU0wMDGEILMYh0CWwmwDxaSLN3S7xHW3mGQXkni3aY0TEijO1q2/YMe1rP+/0iNpRnPbM+fMM9e5n3PffN4/xB472Eiv6/mgGUlnJnMAQJVJ638BAIiKgAJAJQIKAJUIKABUIqAAUImAAkAlAgoAlQgoAFQioABQiYACQCUCCgCVCCgAVCKgAFCJgAJAJQIKAJVGENDZl298fzKZ7Lzw8Ten/rNuT570zvzhhcnOLwT/pgCwrXlAZ7/aPWjdS6dNKAEF4Kd1QO+9fih2p+0cAQXgp3FA7y4ffu689dXip9/+6vuCgh78ud/7reRPAoCjtA3o4qHh1ufts1/KCkpAAQyvbUCvLor59tbHy8/An1P8wQQUwPCaBnT5CfzLh37lRvmapeRPJqAABtY0oItcmswtP6d/rvzGwQPRq5vK3vv5Irg7P/jNwT/9zuzT3cnOC09+1n84oJsnka4ufyh/ygsfL3/9yx8vev3Cr/f/f+YvAIBjtQzo7NKTn7Cvmroo3n7/NvWbfWpe7LQM6NUjnro/OqA31n/Iywd/4PpB8BN/AQAcq2VAlw837efrt1c9vHrwO4tfefabVW03VtVdpPBs+fDZJ3t3ZED/fv8Pefvq4ddOPfkXAMCxWgZ0UbknHjyuo3r7IGLrli4fOb709Xz+7aebx4zlseQPv5l/+/VT/+inBnRh+Rn6l4tP1Z+Z7Lz9zeqZ/+fmT/0LAOBYLQN6+ymffS8D+vJ866Xv68/mtx6t3l5/5fTGMaE7OqAvb/6MzV9wdfUQ9il/AQAca6QBXdZxlbr180nbTysdPCY98kWjRwZ0/aubv2a+/yWCp/wFAHCssQZ0UcDypc3lVyaXMdtu2u39xj7lq58rRwb0uYO/5p1D/9en/AUAcKyRfg10Gc7ye+uQbj/Ds3mW58YxT/YcGdCXD//K/v/1aX8BABxrbM/C70f19qFP5W3f7Cfd1qkDeuRjWwDYGOfrQOclcYuIbR6IElAA4zPOdyItlbcNbV7OtPlSqPmntQHliSMAJ9I0oFu5XNt6L3z5HH7/qZ2rTz6vIw3o0/4CADhW26sx2Zdy3t765HnxmPDZ/7X/ls7tp9xv7H95VBjQp/wFAHCstgEtX3k8eOf5jcn2C5tulDderku2deGmzfNM2oA+5S8AgGM1viL9veUVlQ9dkf7gC5Grq9VvSrZ8F9GZX6+/h9LmvZfCgD7lLwCAY435eyJd3X42fPtp8lUbxQF98i8AgGO1Duih78q5c/g6crcn28+Mz36++b+dWV2wUxzQJ/8CADhW84AufPnz5Sfvz7xovy/89lVBl/60vN7x+lrIc31An/gLAOBYYwgoAIREQAGgEgEFgEoEFAAqEVAAqERAAaASAQWASgQUACoRUACoREABoBIBBYBKBBQAKhFQAKhEQAGgEgEFgEoEFAAqEVAAqNQwoP8HEtyT6MRIVEzFCGh43JPoxEhUTMUIaHjck+jESFRMxQhoeNyT6MRIVEzFCGh43JPoxEhUTMUIaHjck+jESFRMxQhoeNyT6MRIVEzFCGh43JPoxEhUTMUIaHjck+jESFRMxQhoeNyT6MRIVEzFCGh43JPoxEhUTMUIaHjck+jESFRMxQhoeNyT6MRIVEzFCGh43JPoxEhUTMUIaHjck+jESFRMxQhoeNyT6MRIVEzFCGh43JPoxEhUTMUIaHjck+jESFRMxQhoeNyT6MRIVEzFCGh43JPoxEhUTMUIaHjck+jESFRMxQhoeNyT6MRIVEzFCGh43JPoxEhUTMUIaHjck+jESFRMxQhoeNyT6MRIVEzFCGh43JPoxEhUTMUIaHjck+jESFRMxQhoeNyT6MRIVEzFCGh43JPoxEhUTMUIaHjck+jESFRMxQhoeNyT6MRIVEzFCGh43JPoxEhUTMUIaHjck+jESFRMxQhoeNyT6MRIVEzFCGh43JPoxEhUTMUIaHjck+jESFRMxQhoeNyT6MRIVEzFUgX0/+I7RL+fxAioiqkYAUVQ+v0kRkBVTMUIKILS7ycxAqpiKkZAEZR+P4kRUBVTMQKKoPT7SYyAqpiKEVAEpd9PYgRUxVSMgCIo/X4SI6AqpmIEFEHp95MYAVUxFSOgCEq/n8QIqIqpGAFFUPr9JEZAVUzFCCiC0u8nMQKqYipGQBGUfj+JEVAVUzECiqD0+0mMgKqYihFQBKXfT2IEVMVUjIAiKP1+EiOgKqZiBBRB6feTGAFVMRUjoAhKv5/ECKiKqRgBRVD6/SRGQFVMxQgogtLvJzECqmIqRkARlH4/iRFQFVMxAoqg9PtJjICqmIoRUASl309iBFTFVIyAIij9fhIjoCqmYgQUQen3kxgBVTEVI6AISr+fxAioiqkYAUVQ+v0kRkBVTMUIKILS7ycxAqpiKkZAEZR+P4kRUBVTMQKKoPT7SYyAqpiKEVAEpd9PYgRUxVSMgCIo/X4SI6AqpmKnDeiji6+tf/b4yt50+u71rg8IKDT0+0mMgKqIA3pt+tqmpNOlV744/gMCChH9fhIjoCrSgD6+Nt0E9Nr0/PX5g8vT87eO/YCAQkS/n8QIqIoyoP/2wXQT0Pt75RHmo4vnPjnuAwIKFf1+EiOgKsKA3pxO3/vzOqA39398/7gPCChU9PtJjICqKAP66j/O76zzeG36YfmxfHz0BwQUKvr9JEZAVYQB3cri48vrT9Dv752/dfQHq3/m+ZVT/s1P0fpIw5N+P8BJEVAEpd8PcFL6gL7yxdEfHPpH9Y+uWx9peNLvJzE+hVcZPKDdj0AJKAT0+0mMgKoQUOSg309iBFRlmIDyLDy86feTGAFVGSigm1d5rl/6edQHBBQq+v0kRkBVBgoo70SCM/1+EiOgKgMF9PHl6av773g/+gMCChX9fhIjoCoDBXT+YPuaS0d/QEAhot9PYgRUZaiAzh9cWVTy3VtdHxBQaOj3kxgBVREH9BT0t631kYYn/X4SI6AqpmIEFEHp95MYAVUxFSOgCEq/n8QIqIqpGAFFUPr9JEZAVUzFCCiC0u8nMQKqYipGQBGUfj+JEVAVUzECiqD0+0mMgKqYihFQBKXfT2IEVMVUjIAiKP1+EiOgKqZiBBRB6feTGAFVMRUjoAhKv5/ECKiKqRgBRVD6/SRGQFVMxQgogtLvJzECqmIqRkARlH4/iRFQFVMxAoqg9PtJjICqmIoRUASl309iBFTFVIyAIij9fhIjoCqmYgQUQen3kxgBVTEVI6AISr+fxAioiqkYAUVQ+v0kRkBVTMUIKILS7ycxAqpiKkZAEZR+P4kRUBVTMQKKoPT7SYyAqpiKEVAEpd9PYgRUxVSMgCIo/X4SI6AqpmIEFEHp95MYAVUxFSOgCEq/n8QIqIqpGAFFUPr9JEZAVUzFCCiC0u8nMQKqYipGQBGUfj+JEVAVUzECiqD0+0mMgKqYihFQBKXfT2IEVMVUjIAiKP1+EiOgKqZiBBRB6feTGAFVMRUjoAhKv5/ECKiKqRgBRVD6/SRGQFVMxQgogtLvJzECqmIqRkARlH4/iRFQFVMxAoqg9PtJjICqmIoRUASl309iBFTFVIyAIij9fhIjoCqmYgQUQen3kxgBVTEVI6AISr+fxAioiqkYAUVQ+v0kRkBVTMUIKILS7ycxAqpiKkZAEZR+P4kRUBVTMQKKoPT7SYyAqpiKEVAEpd9PYgRUxVSMgCIo/X4SI6AqpmIEFEHp95MYAVUxFSOgCEq/n8QIqIqpGAFFUPr9JEZAVUzFCCiC0u8nMQKqYipGQBGUfj+JEVAVUzECiqD0+0mMgKqYihFQBKXfT2IEVMVUjIAiKP1+EiOgKqZiBBRB6feTGAFVMRUjoAhKv5/ECKiKqRgBRVD6/SRGQFVMxQgogtLvJzECqmIqRkARlH4/iRFQFVMxAoqg9PtJjICqmIoRUASl309iBFTFVIyAIij9fhIjoCqmYgQUQen3kxgBVTEVI6AISr+fxAioiqkYAUVQ+v0kRkBVTMUIKILS7ycxAqpiKkZAEZR+P4kRUBVTMQKKoPT7SYyAqpiKEVAEpd9PYgRUxVSMgCIo/X4SI6AqpmIEFEHp95MYAVUxFSOgCEq/n8QIqIqpGAFFUPr9JEZAVUzFCCiC0u8nMQKqYipGQBGUfj+JEVAVU7GGAdVrfaThqfXaAB6BIiz9fhLjEaiKqRgBRVD6/SRGQFVMxQgogtLvJzECqmIqRkARlH4/iRFQFVMxAoqg9PtJjICqmIoRUASl309iBFTFVIyAIij9fhIjoCqmYgQUQen3kxgBVTEVI6AISr+fxAioiqkYAUVQ+v0kRkBVTMUIKILS7ycxAqpiKkZAEZR+P4kRUBVTMQKKoPT7SYyAqpiKEVAEpd9PYgRUxVSMgCIo/X4SI6AqpmIEFEHp95MYAVUxFSOgCEq/n8QIqIqpGAFFUPr9JEZAVUzFCCiC0u8nMQKqYipGQBGUfj+JEVAVUzECiqD0+0mMgKqYihFQBKXfT2IEVMVUjIAiKP1+EiOgKqZiBBRB6feTGAFVMRUjoAhKv5/ECKiKqRgBRVD6/SRGQFVMxQgogtLvJzECqmIqRkARlH4/iRFQFVMxAoqg9PtJjICqmIoRUASl309iBFTFVIyAIij9fhIjoCqmYgQUQen3kxgBVTEVI6AISr+fxAioiqkYAUVQ+v0kRkBVTMUIKILS7ycxAqpiKkZAEZR+P4kRUBVTMQKKoPT7SYyAqpiKEVAEpd9PYgRUxVSMgCIo/X4SI6AqpmIEFEHp95MYAVUxFSOgCEq/n8QIqIqpGAFFUPr9JEZAVUzFCCiC0u8nMQKqYipGQBGUfj+JEVAVUzECiqD0+0mMgKqYihFQBKXfT2IEVMVUjIAiKP1+EiOgKqZiBBRB6feTGAFVMRUjoAhKv5/ECKiKqRgBRVD6/SRGQFVMxQgogtLvJzECqmIqRkARlH4/iRFQFVMxAoqg9PtJjICqmIoRUASl309iBFTFVIyAIij9fhIjoCqmYgQUQen3kxgBVTEVI6AISr+fxAioiqkYAUVQ+v0kRkBVTMUIKILS7ycxAqpiKkZAEZR+P4kRUBVTMQKKoPT7SYyAqpiKEVAEpd9PYgRUxVSMgCIo/X4SI6AqpmIEFEHp95MYAVUxFSOgCEq/n8QIqIqpGAFFUPr9JEZAVUzFCCiC0u8nMQKqYipGQBGUfj+JEVAVUzECiqD0+0mMgKqYihFQBKXfT2IEVMVUjIAiKP1+EiOgKqZiBBRB6feTGAFVMRUjoAhKv5/ECKiKqRgBRVD6/SRGQFVMxQgogtLvJzECqmIqRkARlH4/iRFQFVMxAoqg9PtJjICqmIoRUASl309iBFTFVIyAIij9fhIjoCqmYgQUQen3kxgBVTEVI6AISr+fxAioiqmYKKCPL083XvliPn908eDni9+8sjedvnudgEJJv5/ECKiKS0Dv720FdF3TVUwJKET0+0mMgKoME9CN+3vnPln8cGf62sGvXZuevz5/cHl6/hYBhY5+P4kRUJVBA7p4IPr+qpnvbzV1/Ti0pJWAQkS/n8QIqMqgAb25epj5+PJWLG+uH43e3IoqAcWp6feTGAFVGTKgjy5OP1z9eP53H0ynP72+/ODa6tcOf1pPQHFa+v0kRkBVhgzo5sHm5jmkZTr3H43e39t8EfT5FeXfvNL6SMOTfj/ASSkDuv9lzjvT6Xu35n+5Ml18TEAxDP1+gJNSBvTO5on2zSPR5XNJWwE1L2TSP7pufaThSb+fxPgUXmW4gD6+vP5q56GiPuURKAGFgH4/iRFQleEC+sRDzPIrBBTD0O8nMQKqMlxAn3iafdVMnoXHIPT7SYyAqgwX0P1Xz+9/Ll+auXn9J68DhZR+P4kRUJXBArr16vlrqwebq5DyTiQMQr+fxAioymABfXRx/0ug9/eWL2N68EF5Vn6R0Vd5Lzzk9PtJjICqDBbQ7SeJbq4vxnR9+cEDrsaEAej3kxgBVRksoHe2H2I++Nl0eu699ccPriz6+e4t+w/ob1vrIw1P+v0kRkBVBgvoielvW+sjDU/6/SRGQFVMxQgogtLvJzECqmIqRkARlH4/iRFQFVMxAoqg9PtJjICqmIoRUASl309iBFTFVKwjoLM/fvY5AcUY6feTGAFV6RvQe//pm/n84euTyeTMLwgoxke/n8QIqErPgN6YfO+38/nVydLyZwQUI6PfT2IEVKVfQG+XbN7dnTz7zb0Lk5cJKEZHv5/ECKhKv4BeXZRzmdGdXyz/d/lzAopx0e8nMQKq0iugs0vLcq4z+vDCMJ/D629b6yMNT/r9JEZAVXoFdNXMhxcmz80JKMZJv5/ECKjKCQJ6d3fyDgHFSOn3kxgBVekV0NWn8DfKl0D5GihGSb+fxAioSq+Azq9Onls+/b4sJ8/CY5T0+0mMgKr0C+jt8gLQxWfws59PVo9DCSjGRb+fxAioSr+ALj59X3iuPJG0884g/SSgOBX9fhIjoCo9Azq/99FPPl788PBHP/jNMP0koDgV/X4SI6AqfQM6PP1ta32k4Um/n8QIqIqp2LEBnX09YD8JKE5Fv5/ECKiKqdjRAf3yx8v3wz/80VuDvIaJgOKU9PtJjICq9Azo7NPVdZgeXpicGeZiTAQUp6LfT2IEVKVnQK9OJmf+evd7v5393WSg19ETUJyKfj+JEVCVfgG9PZm8vX4P5x9Wb+gkoBgX/X4SI6Aq/QJ6dfnuo/Wb4G+US4oQUIyLfj+JEVCVXgFdvRd+HdC7u1xMBOOj309iBFSlV0A3l7Mr5eRqTBgj/X4SI6AqBBQ56PeTGAFV6RXQ2aXlE0frcnI5O4yRfj+JEVCVXgFdPXG0CugipjyJhPHR7ycxAqrSL6B3dycvfVMCeu91LmeHMdLvJzECqtIvoOVydmd3d178/uLHYa6nTEBxKvr9JEZAVXoGdP773cnaQP0koDgV/X4SI6AqfQM6//ZXZxf1fGawy4ESUJyKfj+JEVCV3gEdnP62tT7S8KTfT2IEVMVUjOuBIij9fhIjoCqmYlwPFEHp95MYAVXpGVCuB4qR0+8nMQKq0jOgXA8UI6ffT2IEVKVfQLkeKMZOv5/ECKhKv4ByPVCMnX4/iRFQlV4B5XqgGD39fhIjoCq9Asrl7DB6+v0kRkBVCChy0O8nMQKq0iugXA8Uo6ffT2IEVKVXQLkeKEZPv5/ECKhKv4ByPVCMnX4/iRFQlX4B5XqgGDv9fhIjoCo9A8r1QDFy+v0kRkBV+gaU64Fi3PT7SYyAqvQO6OD0t631kYYn/X4SI6AqpmIEFEHp95MYAVUxFTvihfQ/emnQaykTUJyafj+JEVCVfgG9MJk8M9iVlAkoBPT7SYyAqvQK6OpyypMzHw/ZUP1ta32k4Um/n8QIqEqvgC786celoS98TEAxSvr9JEZAVfoGdL76rkgLQ72QSX/bWh9peNLvJzECqnKCgC4+lf/y9WVCd94a4ikl/W1rfaThSb+fxAioyokCuvDtz8tbkl7QPwzV37bWRxqe9PtJjICqnCigs199f/OGzslLBBRjot9PYgRUpX9AN/VcPhf/7af698Trb1vrIw1P+v0kRkBVegZ0/dXPg1eD6i+rrL9trY80POn3kxgBVekV0NmliX3ySP+NPfS3rfWRhif9fhIjoCq9Arp8J9LO4ZcvPbzAI1CMiX4/iRFQlZ4B/cGvzS/NPle/lEl/21ofaXjS7ycxAqrSK6Au9Let9ZGGJ/1+EiOgKqZiBBRB6feTGAFVMRXruCL9ztlB3oREQHFq+v0kRkBV+gb0xv4r6PmeSBgj/X4SI6AqPQO67OczL775Bt+VEyOl309iBFSlX0Dv7k6eXb2K6d4lvi88xki/n8QIqEq/gF49eN/R7NLkOQKK0dHvJzECqtIroLNLW4867+6qX0JPQHF6+v0kRkBVegX00Ps29W/iJKA4Pf1+EiOgKgQUOej3kxgBVekV0NmlyTv7H+ivw0RAcXr6/SRGQFV6BZQnkTB6+v0kRkBV+gX07u7kzOpyIn96nZcxYYz0+0mMgKr0C+jqjUhnz54d8q1Icq2PNDy1XhtwzFs5/7C7fifnztsD/dX6/zi0PtLwpN9PYjwCVekb0PnsyzcWj0Bf/HiQJ5AIKE5Lv5/ECKhK74AOTn/bWh9peNLvJzECqmIqRkARlH4/iRFQFVMxG9DZR28+6Se8DhSjo99PYgRUpSOgy28n9wTeiYTx0e8nMQKqQkCRg34/iRFQlY6AOtLfttZHGp70+0mMgKqYihFQBKXfT2IEVMVU7PiAfjVcPgkoTke/n8QIqIqp2NEB/fLH5X1IP/gNAcUY6feTGAFV6RnQ2aX9p5BeGui9SPrb1vpIw5N+P4kRUJV+AV32c+fFf/jsn97YnQx0NTsCilPR7ycxAqrSL6A3JpMfrh54zn452bq4MgHFWOj3kxgBVekV0MUD0INr2F3lgsoYIf1+EiOgKr0C+vDCoe/KyQvpMT76/SRGQFV6BpRvKoeR0+8nMQKq0iugfF94jJ5+P4kRUJVeAZ3f2Pq65w2+BooR0u8nMQKq0i+gs0v7L/+8MdC1RAgoTkW/n8QIqEqvgM4+Wr7+88W3Pvvn5Y8vDHNVUP1ta32k4Um/n8QIqEqvgLpc1E5/21ofaXjS7ycxAqpCQJGDfj+JEVCVXgF1ob9trY80POn3kxgBVTEVI6AISr+fxAioiqkYAUVQ+v0kRkBVTMWODugfP9v3OS+kx+jo95MYAVXpGdDf7/JN5TBq+v0kRkBV+gX0Nt+VEyOn309iBFSlV0BnlyY7H3+17+sh+klAcSr6/SRGQFV6BfThhYEuokxAoaLfT2IEVKVnQAd6/zsBhYp+P4kRUJVeAZ1dIqAYOf1+EiOgKr0COr/Bp/AYOf1+EiOgKv0Ceuh7ehBQjJB+P4kRUJV+AZ3fuzA58+aG+kJ2BBSnp99PYgRUpWdAP+V1oBg3/X4SI6Aq/QJ6gxfSY+T0+0mMgKr0Cmh5If0gn7cTUIjo95MYAVXpFVCP55AIKE5Fv5/ECKhKz4DyOlCMnH4/iRFQlV4B5YX0GD39fhIjoCq9Ajq/MXmZgGLU9PtJjICq9Avo7NLO2wQUY6bfT2IEVKVXQGcfvTGZ7LzIC+kxXvr9JEZAVXoF1HxbY14HivHR7ycxAqpCQJGDfj+JEVCVXgF1ob9trY80POn3kxgBVTEVI6AISr+fxAioiqkYAUVQ+v0kRkBVTMVsQGd/tN8F/uGPz77A10AxOvr9JEZAVToC+vDC6imj2UebFy9tfoWAYlT0+0mMgKr0DOhBNgkoRkm/n8QIqAoBRQ76/SRGQFUIKHLQ7ycxAqpCQJGDfj+JEVAVAooc9PtJjICqEFDkoN9PYgRUhYAiB/1+EiOgKgQUOej3kxgBVSGgyEG/n8QIqAoBRQ76/SRGQFUIKHLQ7ycxAqrSHdAnEVCMj34/iRFQFQKKHPT7SYyAqnQEdPbRm0/im8phfPT7SYyAqnQE1JH+trU+0vCk309iBFTFVIyAIij9fhIjoCqmYgQUQen3kxgBVTEVI6AISr+fxAioiqkYAUVQ+v0kRkBVTMUIKILS7ycxAqpiKkZAEZR+P4kRUBVTMQKKoPT7SYyAqpiKEVAEpd9PYgRUxVTsiXciXdr5xeKHb78moBg3/X4SI6AqHQF9eGH5xvfV/xJQjJh+P4kRUJXOgC4fgRJQjJ5+P4kRUJWOgM4uTZ79/Ks/Xfjer786MMzn8/rb1vpIw5N+P4kRUJWOgM5vcDk7hKDfT2IEVKUroLNP6wL66OK0eOWL5UePr+xNp+9eX/3WoQ8IKDT0+0mMgKp0BXSR0K8+++fdnX/47MDnPa4Hen9vK6Drmq5ieugDAgoR/X4SI6Aq3QGdVz2JdGf62sEH16bnr88fXJ6ev2U/IKAQ0e8nMQKq0iugs49OfBH6a9P3939+f2/9OPTcJ+YDAgoV/X4SI6AqvQJ6co8vb/Xx5vrR6M1lVA99QEChot9PYgRUpXdAv/3V2clk5+xb/V7D9Oji+d99MJ3+9Pryg2vTD8svlk/rD31AQKGi309iBFSlb0APXs70cp+Abp5DWtZy/9Ho/b3ztw59sPr/Pr/S5489mdZHGp70+wFO6qiALvv5zItvvvH9ngW9M52+d2v+lyvTRS4JKBzo9wOc1BEBvbs7efY35Wf3Lk3K5UU6bL7SuXwuaauZr3xx6IND/4j+0XXrIw1P+v0kxqfwKv0CenXy7OZp+NmlyXPdAd24MzUPOp/yCJSAQkC/n8QIqEqvgK4vardyd/fZ/q9pMg86CSiGot9PYgRUpVdAD72Q/kSvqi+Z5Fl4DE+/n8QIqMowAX18eTuTm5d8rl8HuvUBAYWKfj+JEVCVXgGdXZq8s//B7UmPT+GvrR5frkLKO5EwPP1+EiOgKr0CevInke7vLV/G9OCD8o73RUZf3X/7+6EPCChU9PtJjICq9Avo3d3JmV+Xn/3p9V4vY1p8hr665tL15QcPti/A9ICrMWEA+v0kRkBV+gV09Uaks2fP9n4r0vzBz6bTc++tH2U+uLJI5rtP+4CAQkO/n8QIqErPgM7/sLt+J+fO2736eXL629b6SMOTfj+JEVCVvgGdz758Y/EI9MWPT3pdOwIKF/r9JEZAVXoHdHD629b6SMOTfj+JEVAVUzECiqD0+0mMgKqYihFQBKXfT2IEVMVUjIAiKP1+EiOgKqZiBBRB6feTGAFVMRUjoAhKv5/ECKiKqRgBRVD6/SRGQFVMxQgogtLvJzECqmIqRkARlH4/iRFQFVOxo67G9IPfEFCMmn4/iRFQlV4BfXhh63qgBBRjpN9PYgRUpWdAT/BdPAgoWtDvJzECqtIroIe+qRwBxRjp95MYAVXpFdD5jc23hSegGCn9fhIjoCr9AvrtLyeTZ158c+0ng1zSTn/bWh9peJuln3QAABwGSURBVNLvJzECqtIroA8vTLYN8wVR/W1rfaThSb+fxAioCgFFDvr9JEZAVXoF1IX+trU+0vCk309iBFTFVIyAIij9fhIjoCqmYscGdPb1gP0koDgV/X4SI6AqpmJHB/TLHy+/+PnwR28N9V3l9Let9ZGGJ/1+EiOgKj0DOvt09ezRwwuTMwO9KUl/21ofaXjS7ycxAqrSM6BXJ5Mzf737vd/O/m4yeXaYx6D629b6SMOTfj+JEVCVfgG9PZm8vX5H/B92B7qwiP62tT7S8KTfT2IEVKVfQK9OXt6/pMiNyXMEFKOj309iBFSlV0BXFxNZB/TuLi+kx/jo95MYAVXpFdBVOtcBHeradvrb1vpIw5N+P4kRUBUCihz0+0mMgKr0Cujs0vKJo3U5bw/0NLz+trU+0vCk309iBFSlV0BXTxytArqIKU8iYXz0+0mMgKr0C+jd3clL35SA3nt9MtDV6fW3rfWRhif9fhIjoCr9Arp4CDqZnN3defH7ix9fHqSfBBSnot9PYgRUpWdA57/f3VwNdKB+ElCcin4/iRFQlb4BnX/7q7OLej4z3DeI19+21kcanvT7SYyAqvQO6OD0t631kYYn/X4SI6AqpmLHXw/0qwH7SUBxKvr9JEZAVUzFjr8e6AKfwmOc9PtJjICq9Azo7NL+t5R7aaArKutvW+sjDU/6/SRGQFX6BXTZz50X//Nn//TGoqDDvI6egOJU9PtJjICq9Avo7f1XL81+OeF6oBgh/X4SI6AqvQK6eAB68OrPq7yVEyOk309iBFSlV0AfXth6+ybXA8UY6feTGAFV6RnQrWZyOTuMkX4/iRFQlV4BXV2Rfu3uLpezw/jo95MYAVXpFdBD3wfpxkDvhtffttZHGp70+0mMgKr0C+jDC5MffrPp5zCfwRNQnIp+P4kRUJWOgM4+erN4Y/U60H9+c3cyefEnfAqP0dHvJzECqtIR0MVDzyfxJBLGR7+fxAioCgFFDpUj+X/4DpH2pegIqCP9bWt9pOGpciStjzQ8SftSmIoRUARVOZLWRxqepH0pTMUIKIKqHEnrIw1P0r4UpmJHB/SPn+37nGfhMTqVI2l9pOFJ2peiZ0APvqccTyJhlCpH0vpIw5O0L0W/gN7mWXiMXOVIWh9peJL2pegV0Nmlyc7HX+37eoh+ElCcSuVIWh9peJL2pegV0IcXBrqIMgGFSuVIWh9peJL2pegZ0IHe/05AoVI5ktZHGp6kfSl6BXR2iYBi5CpH0vpIw5O0L0WvgM5v8Ck8Rq5yJK2PNDxJ+1L0C+ih7+lBQDFClSNpfaThSdqXol9A5/cuTM68ucHl7DA+lSNpfaThSdqXomdAP+V1oBi3ypG0PtLwJO1L0S+gN3ghPUauciStjzQ8SftS9ApoeSH9IJ+3E1CIVI6k9ZGGJ2lfil4B9XgOiYDiVCpH0vpIw5O0L0XPgPI6UIxc5UhaH2l4kval6BVQXkiP0ascSesjDU/SvhS9AjrY94InoFCpHEnrIw1P0r4U/QI6u7TzNgHFmFWOpPWRhidpX4peAZ19VL4vPC+kx3hVjqT1kYYnaV+KXgE139yY14FifCpH0vpIw5O0LwUBRQ6VI2l9pOFJ2peiV0Bd6G9b6yMNT5UjaX2k4Unal8JUjIAiqMqRtD7S8CTtS2EqRkARVOVIWh9peJL2pTAVOyKg3361jW8qh/GpHEnrIw1P0r4UvQLq8iSSXusjDU+VI2l9pOFJ2pen4Vl4BFU5ktZHGp6kfSl6BXT2x8/W/v71yc4/fM4L6TE6lSNpfaThSdqXoldAt93dfXaYK4Pqb1vrIw1PlSNpfaThSdqX4sQBHezCIvrb1vpIw1PlSFofaXiS9qU4eUCHegiqv22tjzQ8VY6k9ZGGJ2lfipMHdKirK+tvW+sjDU+VI2l9pOFJ2pfi5AG9u0tAMT6VI2l9pOFJ2pfixAGdXZ3wKTzGp3IkrY80PEn7UvQK6OyjzaVA33xjd8KTSBihypG0PtLwJO1L0Sugh19Iz8uYMEKVI2l9pOFJ2pfixAF95q2BvkG8/ra1PtLwVDmS1kcanqR9KXoF1IX+trU+0vBUOZLWRxqepH0pTMUIKIKqHEnrIw1P0r4UpmIEFEFVjqT1kYYnaV8KUzECiqAqR9L6SMOTtC+FqZgN6NYLmA7wbY0xPpUjaX2k4Unal6IjoOZKoFwPFGNVOZLWRxqepH0pCChyqBxJ6yMNT9K+FB0Btb7cnfBOJIxR5UhaH2l4kvalOFFAZz9f5PPMbwbpJwHFqVSOpPWRhidpX4qTBPQPi4efO0O9EYmA4lQqR9L6SMOTtC9F/4AO+vCTgOKUKkfS+kjDk7QvRe+Aloef/26wfBJQnE7lSFofaXiS9qXoGdB7Az/8JKA4pcqRtD7S8CTtS9EvoIM//CSgOKXKkbQ+0vAk7UvRJ6D3Li2vAjrow08CilOqHEnrIw1P0r4UPQJaHn6+PXA+CShOp3IkrY80PEn7UnQG1OfhJwHFKVWOpPWRhidpX4qugP7e5+EnAcUpVY6k9ZGGJ2lfio6A8l54BFE5ktZHGp6kfSkIKHKoHEnrIw1P0r4UHQHleqAIonIkrY80PEn7UnQE1JH+trU+0vBUOZLWRxqepH0pTMUIKIKqHEnrIw1P0r4UpmIEFEFVjqT1kYYnaV8KUzECiqAqR9L6SMOTtC+FqRgBRVCVI2l9pOFJ2pfCVIyAIqjKkbQ+0vAk7UthKkZAEVTlSFofaXiS9qUwFSOgCKpyJK2PNDxJ+1KYihFQBFU5ktZHGp6kfSlMxQgogqocSesjDU/SvhSmYgQUQVWOpPWRhidpXwpTMQKKoCpH0vpIw5O0L4WpGAFFUJUjaX2k4Unal8JUjIAiqMqRtD7S8CTtS2EqRkARVOVIWh9peJL2pTAVI6AIqnIkrY80PEn7UpiKEVAEVTmS1kcanqR9KUzFCCiCqhxJ6yMNT9K+FKZiBBRBVY6k9ZGGJ2lfClMxAoqgKkfS+kjDk7QvhakYAUVQlSNpfaThSdqXwlSMgCKoypG0PtLwJO1LYSpGQBFU5UhaH2l4kvalMBUjoAiqciStjzQ8SftSmIoRUARVOZLWRxqepH0pTMUIKIKqHEnrIw1P0r4UpmIEFEFVjqT1kYYnaV8KUzECiqAqR9L6SMOTtC+FqRgBRVCVI2l9pOFJ2pfCVIyAIqjKkbQ+0vAk7UthKkZAEVTlSFofaXiS9qUwFSOgCKpyJK2PNDxJ+1KYihFQBFU5ktZHGp6kfSlMxQgogqocSesjDU/SvhSmYgQUQVWOpPWRhidpXwpTMQKKoCpH0vpIw5O0L4WpGAFFUJUjaX2k4Unal8JUjIAiqMqRtD7S8CTtS2EqRkARVOVIWh9peJL2pTAVI6AIqnIkrY80PEn7UpiKEVAEVTmS1kcanqR9KUzFCCiCqhxJ6yMNT9K+FKZiBBRBVY6k9ZGGJ2lfClMxAoqgKkfS+kjDk7QvhakYAUVQlSNpfaThSdqXwlSMgCKoypG0PtLwJO1LYSpGQBFU5UhaH2l4kvalMBUjoAiqciStjzQ8SftSmIrpAvpvP5tOz717vfz80cVp8coXy48eX9mbTte/Q0AhUjmS1kcanqR9KYYK6L+sknnuk+UH9/e2Arqu6SqmBBQilSNpfaThSdqXYqCA3pme+9v5/MHlVSfvTF87+K1r0/PXl79z/hYBhU7lSFofaXiS9qUYJqCPL08/XP64eLT5YWnm+/u/dX9v/Th09eCUgEKjciStjzQ8SftSDBPQRxfXn6GXdD6+vBXLm+tHoze3okpAcWqVI2l9pOFJ2pdimIDuKwF9dPH87z6YTn96ffUr5bHp4U/rCShOq3IkrY80PEn7Ugwb0NUn6pvnkJbp3H80en9v80XQ51e0f/NS6yMNT5UjaX2k4Unal6cRB3T1+fqd6fS9W/O/XFk+J09AMYzKkbQ+0vAk7cvTaAN6Z/Uyps2XPZefz28F1LyQSf/ouvWRhqfKkbQ+0vAk7UsxZEDv7J378HBPz996yiNQAgqBypG0PtLwJO1LMWBAb07NK5WWDzoJKIZROZLWRxqepH0phgvov9h+rprJs/AYROVIWh9peJL2pRgqoI+vTV9df41z86r6VTM3r//kdaCQqhxJ6yMNT9K+FEMF9NrWWzWvrR5srkLKO5EwiMqRtD7S8CTtSzFQQG9uv9X9/t7yZUwPPii/tsjoq7wXHnKVI2l9pOFJ2pdimIBurl+38FrJ6eoCTNeXv/eAqzFhAJUjaX2k4Unal2KYgN6ZHgro/MHy4qDvrR9yPriy+OV3b9l/Rn/bWh9peKocSesjDU/SvhTDBLSG/ra1PtLwVDmS1kcanqR9KUzFCCiCqhxJ6yMNT9K+FKZiBBRBVY6k9ZGGJ2lfClMxAoqgKkfS+kjDk7QvhakYAUVQlSNpfaThSdqXwlSMgCKoypG0PtLwJO1LYSpGQBFU5UhaH2l4kvalMBUjoAiqciStjzQ8SftSmIoRUARVOZLWRxqepH0pTMUIKIKqHEnrIw1P0r4UpmIEFEFVjqT1kYYnaV8KUzECiqAqR9L6SMOTtC+FqRgBRVCVI2l9pOFJ2pfCVIyAIqjKkbQ+0vAk7UthKkZAEVTlSFofaXiS9qUwFSOgCKpyJK2PNDxJ+1KYihFQBFU5ktZHGp6kfSlMxQgogqocSesjDU/SvhSmYgQUQVWOpPWRhidpXwpTMQKKoCpH0vpIw5O0L4WpGAFFUJUjaX2k4Unal8JUjIAiqMqRtD7S8CTtS2EqRkARVOVIWh9peJL2pTAVI6AIqnIkrY80PEn7UpiKEVAEVTmS1kcanqR9KUzFCCiCqhxJ6yMNT9K+FKZiBBRBVY6k9ZGGJ2lfClMxAoqgKkfS+kjDk7QvhakYAUVQlSNpfaThSdqXwlSMgCKoypG0PtLwJO1LYSpGQBFU5UhaH2l4kvalMBUjoAiqciStjzQ8SftSmIoRUARVOZLWRxqepH0pTMUIKIKqHEnrIw1P0r4UpmIEFEFVjqT1kYYnaV8KUzECiqAqR9L6SMOTtC+FqRgBRVCVI2l9pOFJ2pfCVIyAIqjKkbQ+0vAk7UthKkZAEVTlSFofaXiS9qUwFSOgCKpyJK2PNDxJ+1KYihFQBFU5ktZHGp6kfSlMxQgogqocSesjDU/SvhSmYgQUQVWOpPWRhidpXwpTMQKKoCpH0vpIw5O0L4WpGAFFUJUjaX2k4Unal8JUjIAiqMqRtD7S8CTtS2EqRkARVOVIWh9peJL2pTAVI6AIqnIkrY80PEn7UpiKEVAEVTmS1kcanqR9KUzFCCiCqhxJ6yMNT9K+FKZiBBRBVY6k9ZGGJ2lfClMxAoqgKkfS+kjDk7QvhakYAUVQlSNpfaThSdqXwlSMgCKoypG0PtLwJO1LYSpGQBFU5UhaH2l4kvalMBUjoAiqciStjzQ8SftSmIoRUARVOZLWRxqepH0pTMUIKIKqHEnrIw1P0r4UpmIEFEFVjqT1kYYnaV8KUzECiqAqR9L6SMOTtC+FqRgBRVCVI2l9pOFJ2pfCVIyAIqjKkbQ+0vAk7UthKkZAEVTlSFofaXiS9qUwFSOgCKpyJK2PNDxJ+1KYihFQBFU5ktZHGp6kfSlMxQgogqocSesjDU/SvhSmYgQUQVWOpPWRhidpXwpTMQKKoCpH0vpIw5O0L4WpGAFFUJUjaX2k4Unal8JUjIAiqMqRtD7S8CTtS2EqRkARVOVIWh9peJL2pTAVI6AIqnIkrY80PEn7UpiKEVAEVTmS1kcanqR9KUzFCCiCqhxJ6yMNT9K+FKZiBBRBVY6k9ZGGJ2lfClMxAoqgKkfS+kjDk7QvhakYAUVQlSNpfaThSdqXwlSMgCKoypG0PtLwJO1LYSpGQBFU5UhaH2l4kvalMBVrGFC91kcanipH0vpIw5O0L0/DI1AEVTmS1kcanqR9KUzFCCiCqhxJ6yMNT9K+FKZiBBRBVY6k9ZGGJ2lfClMxAoqgKkfS+kjDk7QvhakYAUVQlSNpfaThSdqXwlSMgCKoypG0PtLwJO1LYSpGQBFU5UhaH2l4kvalMBUjoAiqciStjzQ8SftSmIoRUARVOZLWRxqepH0pTMUIKIKqHEnrIw1P0r4UpmIEFEFVjqT1kYYnaV8KUzECiqAqR9L6SMOTtC+FqRgBRVCVI2l9pOFJ2pfCVIyAIqjKkbQ+0vAk7UthKkZAEVTlSFofaXiS9qUwFSOgCKpyJK2PNDxJ+1KYihFQBFU5ktZHGp6kfSlMxQgogqocSesjDU/SvhSmYgQUQVWOpPWRhidpXwpTMQKKoCpH0vpIw5O0L4WpGAFFUJUjaX2k4Unal8JUjIAiqMqRtD7S8CTtS2EqRkARVOVIWh9peJL2pTAVI6AIqnIkrY80PEn7UpiKEVAEVTmS1kcanqR9KUzFCCiCqhxJ6yMNT9K+FKZiBBRBVY6k9ZGGJ2lfClMxAoqgKkfS+kjDk7QvhakYAUVQlSNpfaThSdqXwlSMgCKoypG0PtLwJO1LYSpGQBFU5UhaH2l4kvalMBUjoAiqciStjzQ8SftSmIoRUARVOZLWRxqepH0pTMUIKIKqHEnrIw1P0r4UpmIEFEFVjqT1kYYnaV8KUzECiqAqR9L6SMOTtC+FqRgBRVCVI2l9pOFJ2pfCVIyAIqjKkbQ+0vAk7UthKkZAEVTlSFofaXiS9qUwFSOgCKpyJK2PNDxJ+1KYihFQBFU5ktZHGp6kfSlMxQgogqocSesjDU/SvhSmYgQUQVWOpPWRhidpXwpTMQKKoCpH0vpIw5O0L4WpGAFFUJUjaX2k4Unal8JUjIAiqMqRtD7S8CTtS2EqRkARVOVIWh9peJL2pTAVI6AIqnIkrY80PEn7UpiKEVAEVTmS1kcanqR9KUzFCCiCqhxJ6yMNT9K+FKZiBBRBVY6k9ZGGJ2lfClMxAoqgKkfS+kjDk7QvhakYAUVQlSNpfaThSdqXwlSMgCKoypG0PtLwJO1LYSpGQBFU5UhaH2l4kvalMBUjoAiqciStjzQ8SftSmIoRUARVOZLWRxqepH0pTMUIKIKqHEnrIw1P0r4UpmIEFEFVjqT1kYYnaV8KUzECiqAqR9L6SMOTtC+FqRgBRVCVI2l9pOFJ2pfCVIyAIqjKkbQ+0vAk7UthKkZAEVTlSFofaXiS9qUwFSOgCKpyJK2PNDxJ+1KYihFQBFU5ktZHGp6kfSlMxQgogqocSesjDU/SvhSmYgQUQVWOpPWRhidpXwpTMQKKoCpH0vpIw5O0L4WpGAFFUJUjaX2k4Unal8JUjIAiqMqRtD7S8CTtS2EqRkARVOVIWh9peJL2pTAVI6AIqnIkrY80PEn7UpiKEVAEVTmS1kcanqR9KUzFCCiCqhxJ6yMNT9K+FKZiBBRBVY6k9ZGGJ2lfClMxAoqgKkfS+kjDk7QvhakYAUVQlSNpfaThSdqXwlSMgCKoypG0PtLwJO1LYSpGQBFU5UhaH2l4kvalMBUjoAiqciStjzQ8SftSmIp5BPTxlb3p9N3rBBRKlSNpfaThSdqXwj+gjy5Ol175goBCqHIkrY80PEn7UvgH9Nr0/PX5g8vT87cIKHQqR9L6SMOTtC+Fe0Dv75XHno8unvuEgEKnciStjzQ8SftSuAf05vS19Y/vE1DoVI6k9ZGGJ2lfCveAXpt+WH68sw4pAYVE5UhaH2l4kval8A7o48vrT93v722+CPr8iv7van2k4alyJK2PNDxJ+/I0qQIKAJ48A2peyKR/dP3dxD2JToxEpWFAzeuYWt8TWXBPohMjUSGg2XBPohMjUfEOqOez8N9N3JPoxEhU3AO6ef2nw+tAv5u4J9GJkai4B9TxnUjfTdyT6MRIVNwD+vjy9FWn98J/N3FPohMjUXEP6PyB29WYvpu4J9GJkaj4B3T+4Mqin+/esr/c+p7IgnsSnRiJSoOAHqH1PZEF9yQ6MRIVUzECGh73JDoxEhVTMQIaHvckOjESFVMxAhoe9yQ6MRIVUzECGh73JDoxEhVTMQIaHvckOjESFVMxAhoe9yQ6MRIVUzECGh73JDoxEhVTMQIaHvckOjESFVMxAhoe9yQ6MRIVUzECGh73JDoxEhVTMQIaHvckOjESFVMxAhoe9yQ6MRIVUzECGh73JDoxEhVTMQIaHvckOjESFVMxAhoe9yQ6MRIVUzECGh73JDoxEhVTMQIaHvckOjESFVMxAhoe9yQ6MRIVUzECGh73JDoxEhVTMQIaHvckOjESFVMxAhoe9yQ6MRIVUzECGh73JDoxEhVTMQIaHvckOjESFVMxAhoe9yQ6MRIVUzECGh73JDoxEhVTMQIaHvckOjESFVOxhgGFxvPPt/43wOgxkoEQ0PA4G+jESAZCQMPjbKATIxkIAQ2Ps4FOjGQgBDQ8zgY6MZKBENDwOBvoxEgGQkDD42ygEyMZCAEFgEoEFAAqEVAAqERAAaASAQWASgQUACoRUACoREABoBIBDeHRxen7+z995Yum/y4Yk8eXp+dv7f/0w7b/Mt9BBDSERUDPfbL5KQHFgft7m/+23tlPKdwQ0BAWAZ2+tvkpAcWWm9PVIB5d3Pw3Fn4IaAiLw/E368/PCCgO2Xx55+bmP7FwREBDWFTzf+xtHmisfnxwZTqdvnu96b8WxuBO+fLO/fU+FsPYm05/en31858tRvLv/7bhv1x2BDSEZTXXjzDWAb2zOCUL53ja4Dvv8eXlMq6tP0O5vzWM9c95aDocAhrCsprrJ1lXAV0cjXf/9/zxv0z5uhfu75375P7e6hmkxSf0792aP/7X5RdGF4v5D4tf/Lc9RjIYAhpCqebqk7RVQDdf8LrGowssVnD+v6wjuRnGzen7PK3kgICGsKpmqWX56f5L/njpCrZfpPH48rqZy0eki5W8+j9b/nt9BxDQEFYBLY8oyk/3H1vwnDzmy/+OrmewaObG4lduLn989b/yn9jhENAQNs8cLR5vrgO6PjAEFPPV483yk+Vj0YOAzv/8N+Wn75HQoRDQEDadvDZ9n0egeMJWQM2XPR//9+Urmd5/2j8EAQIawqaTi/Px3/gaKKz9gD7t/fCP/5WRDIaAhrD/QPPO9K/2eBYexn5AF8NY/Wz5X9bNa+sPfhdqBDSEg8/Ur62+uLV6HehfrvA6UMy3E/no4vT89fn8z3uLR6LLKzUtfv7gMv+VHQwBDeEgoIty8k4kGFuPMdfDmL43P3gn0qt8nXwoBDSEreeKNhff4b3w2Lf9SfrqvfD/ePDzv/qPfAI/GAIKAJUIKABUIqAAUImAAkAlAgoAlQgoAFQioABQiYACQCUCCgCVCCgAVCKgAFCJgAJAJQIKAJUIKABUIqAAUImAAkAlAgoAlQgoAFQioABQiYACQCUCCgCVCCgAVCKgAFCJgAJAJQIKAJUIKABUIqAAUImAAkAlAgoAlQgoAFQioABQiYACQCUCCgCVCCgAVCKgAFCJgAJAJQIKAJUIKABUIqAAUImAAkAlAgoAlQgoAFQioABQiYACQCUCCgCVCCgAVCKgAFCJgAJAJQIKAJUIKABUIqAAUOn/A71FEGOQyBlxAAAAAElFTkSuQmCC">
+            <a:extLst>
+              <a:ext uri="{FF2B5EF4-FFF2-40B4-BE49-F238E27FC236}">
+                <a16:creationId xmlns:a16="http://schemas.microsoft.com/office/drawing/2014/main" id="{8CC047BC-7FEC-4EB1-BCEA-02FB6A9AD576}"/>
+              </a:ext>
+            </a:extLst>
+          </p:cNvPr>
+          <p:cNvSpPr>
+            <a:spLocks noChangeAspect="1" noChangeArrowheads="1"/>
+          </p:cNvSpPr>
+          <p:nvPr/>
+        </p:nvSpPr>
+        <p:spPr bwMode="auto">
+          <a:xfrm>
+            <a:off x="5963478" y="3296478"/>
+            <a:ext cx="284922" cy="284922"/>
+          </a:xfrm>
+          <a:prstGeom prst="rect">
+            <a:avLst/>
+          </a:prstGeom>
+          <a:noFill/>
+          <a:extLst>
+            <a:ext uri="{909E8E84-426E-40DD-AFC4-6F175D3DCCD1}">
+              <a14:hiddenFill xmlns:a14="http://schemas.microsoft.com/office/drawing/2010/main">
+                <a:solidFill>
+                  <a:srgbClr val="FFFFFF"/>
+                </a:solidFill>
+              </a14:hiddenFill>
+            </a:ext>
+          </a:extLst>
+        </p:spPr>
+        <p:txBody>
+          <a:bodyPr vert="horz" wrap="square" lIns="91440" tIns="45720" rIns="91440" bIns="45720" numCol="1" anchor="t" anchorCtr="0" compatLnSpc="1">
+            <a:prstTxWarp prst="textNoShape">
+              <a:avLst/>
+            </a:prstTxWarp>
+          </a:bodyPr>
+          <a:lstStyle/>
+          <a:p>
+            <a:endParaRPr lang="en-US"/>
+          </a:p>
+        </p:txBody>
+      </p:sp>
+    </p:spTree>
+    <p:extLst>
+      <p:ext uri="{BB962C8B-B14F-4D97-AF65-F5344CB8AC3E}">
+        <p14:creationId xmlns:p14="http://schemas.microsoft.com/office/powerpoint/2010/main" val="2936037661"/>
+      </p:ext>
+    </p:extLst>
+  </p:cSld>
+  <p:clrMapOvr>
+    <a:masterClrMapping/>
+  </p:clrMapOvr>
+</p:sld>
+</file>
+
+<file path=ppt/slides/slide16.xml><?xml version="1.0" encoding="utf-8"?>
+<p:sld xmlns:a="http://schemas.openxmlformats.org/drawingml/2006/main" xmlns:r="http://schemas.openxmlformats.org/officeDocument/2006/relationships" xmlns:p="http://schemas.openxmlformats.org/presentationml/2006/main">
+  <p:cSld>
+    <p:spTree>
+      <p:nvGrpSpPr>
+        <p:cNvPr id="1" name=""/>
+        <p:cNvGrpSpPr/>
+        <p:nvPr/>
+      </p:nvGrpSpPr>
+      <p:grpSpPr>
+        <a:xfrm>
+          <a:off x="0" y="0"/>
+          <a:ext cx="0" cy="0"/>
+          <a:chOff x="0" y="0"/>
+          <a:chExt cx="0" cy="0"/>
+        </a:xfrm>
+      </p:grpSpPr>
       <p:sp>
         <p:nvSpPr>
           <p:cNvPr id="2" name="Title 1"/>
@@ -7724,7 +9645,7 @@
 </p:sld>
 </file>
 
-<file path=ppt/slides/slide16.xml><?xml version="1.0" encoding="utf-8"?>
+<file path=ppt/slides/slide17.xml><?xml version="1.0" encoding="utf-8"?>
 <p:sld xmlns:a="http://schemas.openxmlformats.org/drawingml/2006/main" xmlns:r="http://schemas.openxmlformats.org/officeDocument/2006/relationships" xmlns:p="http://schemas.openxmlformats.org/presentationml/2006/main">
   <p:cSld>
     <p:spTree>

</xml_diff>

<commit_message>
Tori updating ppt and a few edits to rmd NO KNIT
</commit_message>
<xml_diff>
--- a/Attrition_Case_Study_2_pptx_TAJAR_IP.pptx
+++ b/Attrition_Case_Study_2_pptx_TAJAR_IP.pptx
@@ -5,7 +5,7 @@
     <p:sldMasterId id="2147483648" r:id="rId1"/>
   </p:sldMasterIdLst>
   <p:notesMasterIdLst>
-    <p:notesMasterId r:id="rId19"/>
+    <p:notesMasterId r:id="rId18"/>
   </p:notesMasterIdLst>
   <p:sldIdLst>
     <p:sldId id="256" r:id="rId2"/>
@@ -24,7 +24,6 @@
     <p:sldId id="263" r:id="rId15"/>
     <p:sldId id="277" r:id="rId16"/>
     <p:sldId id="271" r:id="rId17"/>
-    <p:sldId id="267" r:id="rId18"/>
   </p:sldIdLst>
   <p:sldSz cx="12192000" cy="6858000"/>
   <p:notesSz cx="6858000" cy="9144000"/>
@@ -213,7 +212,7 @@
           <a:p>
             <a:fld id="{380F82E0-DA90-F642-BDF9-D28F7CF5A168}" type="datetimeFigureOut">
               <a:rPr lang="en-US" smtClean="0"/>
-              <a:t>8/6/2018</a:t>
+              <a:t>8/6/18</a:t>
             </a:fld>
             <a:endParaRPr lang="en-US"/>
           </a:p>
@@ -672,7 +671,7 @@
             <a:fld id="{B61BEF0D-F0BB-DE4B-95CE-6DB70DBA9567}" type="datetimeFigureOut">
               <a:rPr lang="en-US" dirty="0"/>
               <a:pPr/>
-              <a:t>8/6/2018</a:t>
+              <a:t>8/6/18</a:t>
             </a:fld>
             <a:endParaRPr lang="en-US" dirty="0"/>
           </a:p>
@@ -1105,7 +1104,7 @@
             <a:fld id="{B61BEF0D-F0BB-DE4B-95CE-6DB70DBA9567}" type="datetimeFigureOut">
               <a:rPr lang="en-US" dirty="0"/>
               <a:pPr/>
-              <a:t>8/6/2018</a:t>
+              <a:t>8/6/18</a:t>
             </a:fld>
             <a:endParaRPr lang="en-US" dirty="0"/>
           </a:p>
@@ -1352,7 +1351,7 @@
             <a:fld id="{B61BEF0D-F0BB-DE4B-95CE-6DB70DBA9567}" type="datetimeFigureOut">
               <a:rPr lang="en-US" dirty="0"/>
               <a:pPr/>
-              <a:t>8/6/2018</a:t>
+              <a:t>8/6/18</a:t>
             </a:fld>
             <a:endParaRPr lang="en-US" dirty="0"/>
           </a:p>
@@ -1657,7 +1656,7 @@
             <a:fld id="{B61BEF0D-F0BB-DE4B-95CE-6DB70DBA9567}" type="datetimeFigureOut">
               <a:rPr lang="en-US" dirty="0"/>
               <a:pPr/>
-              <a:t>8/6/2018</a:t>
+              <a:t>8/6/18</a:t>
             </a:fld>
             <a:endParaRPr lang="en-US" dirty="0"/>
           </a:p>
@@ -1972,7 +1971,7 @@
             <a:fld id="{B61BEF0D-F0BB-DE4B-95CE-6DB70DBA9567}" type="datetimeFigureOut">
               <a:rPr lang="en-US" dirty="0"/>
               <a:pPr/>
-              <a:t>8/6/2018</a:t>
+              <a:t>8/6/18</a:t>
             </a:fld>
             <a:endParaRPr lang="en-US" dirty="0"/>
           </a:p>
@@ -2271,7 +2270,7 @@
             <a:fld id="{B61BEF0D-F0BB-DE4B-95CE-6DB70DBA9567}" type="datetimeFigureOut">
               <a:rPr lang="en-US" dirty="0"/>
               <a:pPr/>
-              <a:t>8/6/2018</a:t>
+              <a:t>8/6/18</a:t>
             </a:fld>
             <a:endParaRPr lang="en-US" dirty="0"/>
           </a:p>
@@ -2635,7 +2634,7 @@
             <a:fld id="{B61BEF0D-F0BB-DE4B-95CE-6DB70DBA9567}" type="datetimeFigureOut">
               <a:rPr lang="en-US" dirty="0"/>
               <a:pPr/>
-              <a:t>8/6/2018</a:t>
+              <a:t>8/6/18</a:t>
             </a:fld>
             <a:endParaRPr lang="en-US" dirty="0"/>
           </a:p>
@@ -2806,7 +2805,7 @@
             <a:fld id="{B61BEF0D-F0BB-DE4B-95CE-6DB70DBA9567}" type="datetimeFigureOut">
               <a:rPr lang="en-US" dirty="0"/>
               <a:pPr/>
-              <a:t>8/6/2018</a:t>
+              <a:t>8/6/18</a:t>
             </a:fld>
             <a:endParaRPr lang="en-US" dirty="0"/>
           </a:p>
@@ -2983,7 +2982,7 @@
             <a:fld id="{B61BEF0D-F0BB-DE4B-95CE-6DB70DBA9567}" type="datetimeFigureOut">
               <a:rPr lang="en-US" dirty="0"/>
               <a:pPr/>
-              <a:t>8/6/2018</a:t>
+              <a:t>8/6/18</a:t>
             </a:fld>
             <a:endParaRPr lang="en-US" dirty="0"/>
           </a:p>
@@ -3150,7 +3149,7 @@
             <a:fld id="{B61BEF0D-F0BB-DE4B-95CE-6DB70DBA9567}" type="datetimeFigureOut">
               <a:rPr lang="en-US" dirty="0"/>
               <a:pPr/>
-              <a:t>8/6/2018</a:t>
+              <a:t>8/6/18</a:t>
             </a:fld>
             <a:endParaRPr lang="en-US" dirty="0"/>
           </a:p>
@@ -3397,7 +3396,7 @@
             <a:fld id="{B61BEF0D-F0BB-DE4B-95CE-6DB70DBA9567}" type="datetimeFigureOut">
               <a:rPr lang="en-US" dirty="0"/>
               <a:pPr/>
-              <a:t>8/6/2018</a:t>
+              <a:t>8/6/18</a:t>
             </a:fld>
             <a:endParaRPr lang="en-US" dirty="0"/>
           </a:p>
@@ -3630,7 +3629,7 @@
             <a:fld id="{B61BEF0D-F0BB-DE4B-95CE-6DB70DBA9567}" type="datetimeFigureOut">
               <a:rPr lang="en-US" dirty="0"/>
               <a:pPr/>
-              <a:t>8/6/2018</a:t>
+              <a:t>8/6/18</a:t>
             </a:fld>
             <a:endParaRPr lang="en-US" dirty="0"/>
           </a:p>
@@ -4009,7 +4008,7 @@
             <a:fld id="{B61BEF0D-F0BB-DE4B-95CE-6DB70DBA9567}" type="datetimeFigureOut">
               <a:rPr lang="en-US" dirty="0"/>
               <a:pPr/>
-              <a:t>8/6/2018</a:t>
+              <a:t>8/6/18</a:t>
             </a:fld>
             <a:endParaRPr lang="en-US" dirty="0"/>
           </a:p>
@@ -4124,7 +4123,7 @@
             <a:fld id="{B61BEF0D-F0BB-DE4B-95CE-6DB70DBA9567}" type="datetimeFigureOut">
               <a:rPr lang="en-US" dirty="0"/>
               <a:pPr/>
-              <a:t>8/6/2018</a:t>
+              <a:t>8/6/18</a:t>
             </a:fld>
             <a:endParaRPr lang="en-US" dirty="0"/>
           </a:p>
@@ -4216,7 +4215,7 @@
             <a:fld id="{B61BEF0D-F0BB-DE4B-95CE-6DB70DBA9567}" type="datetimeFigureOut">
               <a:rPr lang="en-US" dirty="0"/>
               <a:pPr/>
-              <a:t>8/6/2018</a:t>
+              <a:t>8/6/18</a:t>
             </a:fld>
             <a:endParaRPr lang="en-US" dirty="0"/>
           </a:p>
@@ -4468,7 +4467,7 @@
             <a:fld id="{B61BEF0D-F0BB-DE4B-95CE-6DB70DBA9567}" type="datetimeFigureOut">
               <a:rPr lang="en-US" dirty="0"/>
               <a:pPr/>
-              <a:t>8/6/2018</a:t>
+              <a:t>8/6/18</a:t>
             </a:fld>
             <a:endParaRPr lang="en-US" dirty="0"/>
           </a:p>
@@ -4748,7 +4747,7 @@
             <a:fld id="{B61BEF0D-F0BB-DE4B-95CE-6DB70DBA9567}" type="datetimeFigureOut">
               <a:rPr lang="en-US" dirty="0"/>
               <a:pPr/>
-              <a:t>8/6/2018</a:t>
+              <a:t>8/6/18</a:t>
             </a:fld>
             <a:endParaRPr lang="en-US" dirty="0"/>
           </a:p>
@@ -5151,7 +5150,7 @@
             <a:fld id="{B61BEF0D-F0BB-DE4B-95CE-6DB70DBA9567}" type="datetimeFigureOut">
               <a:rPr lang="en-US" dirty="0"/>
               <a:pPr/>
-              <a:t>8/6/2018</a:t>
+              <a:t>8/6/18</a:t>
             </a:fld>
             <a:endParaRPr lang="en-US" dirty="0"/>
           </a:p>
@@ -7513,7 +7512,12 @@
             <p:ph type="title"/>
           </p:nvPr>
         </p:nvSpPr>
-        <p:spPr/>
+        <p:spPr>
+          <a:xfrm>
+            <a:off x="293793" y="349321"/>
+            <a:ext cx="8534401" cy="753890"/>
+          </a:xfrm>
+        </p:spPr>
         <p:txBody>
           <a:bodyPr/>
           <a:lstStyle/>
@@ -7525,37 +7529,96 @@
           </a:p>
         </p:txBody>
       </p:sp>
-      <p:sp>
-        <p:nvSpPr>
-          <p:cNvPr id="3" name="Text Placeholder 2">
+      <p:pic>
+        <p:nvPicPr>
+          <p:cNvPr id="9" name="Picture 8">
             <a:extLst>
               <a:ext uri="{FF2B5EF4-FFF2-40B4-BE49-F238E27FC236}">
-                <a16:creationId xmlns:a16="http://schemas.microsoft.com/office/drawing/2014/main" id="{D364D651-6EB2-244D-94BF-CDF4925ACCFE}"/>
+                <a16:creationId xmlns:a16="http://schemas.microsoft.com/office/drawing/2014/main" id="{B5A6FF36-79A1-F845-8403-AC887A39DA13}"/>
               </a:ext>
             </a:extLst>
           </p:cNvPr>
-          <p:cNvSpPr>
-            <a:spLocks noGrp="1"/>
-          </p:cNvSpPr>
-          <p:nvPr>
-            <p:ph type="body" idx="1"/>
-          </p:nvPr>
-        </p:nvSpPr>
-        <p:spPr/>
-        <p:txBody>
-          <a:bodyPr/>
-          <a:lstStyle/>
-          <a:p>
-            <a:r>
-              <a:rPr lang="en-US" dirty="0"/>
-              <a:t>“Tell me about any job role specific trends that may exist in the data set”</a:t>
-            </a:r>
-          </a:p>
-          <a:p>
-            <a:endParaRPr lang="en-US" dirty="0"/>
-          </a:p>
-        </p:txBody>
-      </p:sp>
+          <p:cNvPicPr>
+            <a:picLocks noChangeAspect="1"/>
+          </p:cNvPicPr>
+          <p:nvPr/>
+        </p:nvPicPr>
+        <p:blipFill>
+          <a:blip r:embed="rId2"/>
+          <a:stretch>
+            <a:fillRect/>
+          </a:stretch>
+        </p:blipFill>
+        <p:spPr>
+          <a:xfrm>
+            <a:off x="8828194" y="447417"/>
+            <a:ext cx="3162300" cy="3467100"/>
+          </a:xfrm>
+          <a:prstGeom prst="rect">
+            <a:avLst/>
+          </a:prstGeom>
+        </p:spPr>
+      </p:pic>
+      <p:pic>
+        <p:nvPicPr>
+          <p:cNvPr id="13" name="Picture 12">
+            <a:extLst>
+              <a:ext uri="{FF2B5EF4-FFF2-40B4-BE49-F238E27FC236}">
+                <a16:creationId xmlns:a16="http://schemas.microsoft.com/office/drawing/2014/main" id="{ECB7B92D-AE6C-AE4F-8759-721D8810047D}"/>
+              </a:ext>
+            </a:extLst>
+          </p:cNvPr>
+          <p:cNvPicPr>
+            <a:picLocks noChangeAspect="1"/>
+          </p:cNvPicPr>
+          <p:nvPr/>
+        </p:nvPicPr>
+        <p:blipFill>
+          <a:blip r:embed="rId3"/>
+          <a:stretch>
+            <a:fillRect/>
+          </a:stretch>
+        </p:blipFill>
+        <p:spPr>
+          <a:xfrm>
+            <a:off x="4451939" y="2992909"/>
+            <a:ext cx="4178300" cy="3467100"/>
+          </a:xfrm>
+          <a:prstGeom prst="rect">
+            <a:avLst/>
+          </a:prstGeom>
+        </p:spPr>
+      </p:pic>
+      <p:pic>
+        <p:nvPicPr>
+          <p:cNvPr id="15" name="Picture 14">
+            <a:extLst>
+              <a:ext uri="{FF2B5EF4-FFF2-40B4-BE49-F238E27FC236}">
+                <a16:creationId xmlns:a16="http://schemas.microsoft.com/office/drawing/2014/main" id="{5D1028DF-50F7-F44A-BF78-FB498FC9C9FD}"/>
+              </a:ext>
+            </a:extLst>
+          </p:cNvPr>
+          <p:cNvPicPr>
+            <a:picLocks noChangeAspect="1"/>
+          </p:cNvPicPr>
+          <p:nvPr/>
+        </p:nvPicPr>
+        <p:blipFill>
+          <a:blip r:embed="rId4"/>
+          <a:stretch>
+            <a:fillRect/>
+          </a:stretch>
+        </p:blipFill>
+        <p:spPr>
+          <a:xfrm>
+            <a:off x="75685" y="1103211"/>
+            <a:ext cx="4178300" cy="3467100"/>
+          </a:xfrm>
+          <a:prstGeom prst="rect">
+            <a:avLst/>
+          </a:prstGeom>
+        </p:spPr>
+      </p:pic>
     </p:spTree>
     <p:extLst>
       <p:ext uri="{BB962C8B-B14F-4D97-AF65-F5344CB8AC3E}">
@@ -9674,96 +9737,156 @@
           </a:p>
         </p:txBody>
       </p:sp>
+      <p:sp>
+        <p:nvSpPr>
+          <p:cNvPr id="5" name="Title 1">
+            <a:extLst>
+              <a:ext uri="{FF2B5EF4-FFF2-40B4-BE49-F238E27FC236}">
+                <a16:creationId xmlns:a16="http://schemas.microsoft.com/office/drawing/2014/main" id="{14FFB619-0B53-E248-BEE3-9D34DFC23046}"/>
+              </a:ext>
+            </a:extLst>
+          </p:cNvPr>
+          <p:cNvSpPr txBox="1">
+            <a:spLocks/>
+          </p:cNvSpPr>
+          <p:nvPr/>
+        </p:nvSpPr>
+        <p:spPr>
+          <a:xfrm>
+            <a:off x="684211" y="2006600"/>
+            <a:ext cx="8534401" cy="2281600"/>
+          </a:xfrm>
+          <a:prstGeom prst="rect">
+            <a:avLst/>
+          </a:prstGeom>
+          <a:effectLst/>
+        </p:spPr>
+        <p:txBody>
+          <a:bodyPr vert="horz" lIns="91440" tIns="45720" rIns="91440" bIns="45720" rtlCol="0" anchor="b">
+            <a:normAutofit/>
+          </a:bodyPr>
+          <a:lstStyle>
+            <a:lvl1pPr algn="l" defTabSz="457200" rtl="0" eaLnBrk="1" latinLnBrk="0" hangingPunct="1">
+              <a:spcBef>
+                <a:spcPct val="0"/>
+              </a:spcBef>
+              <a:buNone/>
+              <a:defRPr sz="3600" b="0" kern="1200" cap="all">
+                <a:ln w="3175" cmpd="sng">
+                  <a:noFill/>
+                </a:ln>
+                <a:solidFill>
+                  <a:schemeClr val="tx1"/>
+                </a:solidFill>
+                <a:effectLst/>
+                <a:latin typeface="+mj-lt"/>
+                <a:ea typeface="+mj-ea"/>
+                <a:cs typeface="+mj-cs"/>
+              </a:defRPr>
+            </a:lvl1pPr>
+            <a:lvl2pPr eaLnBrk="1" hangingPunct="1">
+              <a:defRPr>
+                <a:solidFill>
+                  <a:schemeClr val="tx2"/>
+                </a:solidFill>
+              </a:defRPr>
+            </a:lvl2pPr>
+            <a:lvl3pPr eaLnBrk="1" hangingPunct="1">
+              <a:defRPr>
+                <a:solidFill>
+                  <a:schemeClr val="tx2"/>
+                </a:solidFill>
+              </a:defRPr>
+            </a:lvl3pPr>
+            <a:lvl4pPr eaLnBrk="1" hangingPunct="1">
+              <a:defRPr>
+                <a:solidFill>
+                  <a:schemeClr val="tx2"/>
+                </a:solidFill>
+              </a:defRPr>
+            </a:lvl4pPr>
+            <a:lvl5pPr eaLnBrk="1" hangingPunct="1">
+              <a:defRPr>
+                <a:solidFill>
+                  <a:schemeClr val="tx2"/>
+                </a:solidFill>
+              </a:defRPr>
+            </a:lvl5pPr>
+            <a:lvl6pPr eaLnBrk="1" hangingPunct="1">
+              <a:defRPr>
+                <a:solidFill>
+                  <a:schemeClr val="tx2"/>
+                </a:solidFill>
+              </a:defRPr>
+            </a:lvl6pPr>
+            <a:lvl7pPr eaLnBrk="1" hangingPunct="1">
+              <a:defRPr>
+                <a:solidFill>
+                  <a:schemeClr val="tx2"/>
+                </a:solidFill>
+              </a:defRPr>
+            </a:lvl7pPr>
+            <a:lvl8pPr eaLnBrk="1" hangingPunct="1">
+              <a:defRPr>
+                <a:solidFill>
+                  <a:schemeClr val="tx2"/>
+                </a:solidFill>
+              </a:defRPr>
+            </a:lvl8pPr>
+            <a:lvl9pPr eaLnBrk="1" hangingPunct="1">
+              <a:defRPr>
+                <a:solidFill>
+                  <a:schemeClr val="tx2"/>
+                </a:solidFill>
+              </a:defRPr>
+            </a:lvl9pPr>
+          </a:lstStyle>
+          <a:p>
+            <a:r>
+              <a:rPr lang="en-US"/>
+              <a:t>Questions?</a:t>
+            </a:r>
+            <a:endParaRPr lang="en-US" dirty="0"/>
+          </a:p>
+        </p:txBody>
+      </p:sp>
+      <p:sp>
+        <p:nvSpPr>
+          <p:cNvPr id="6" name="Text Placeholder 2">
+            <a:extLst>
+              <a:ext uri="{FF2B5EF4-FFF2-40B4-BE49-F238E27FC236}">
+                <a16:creationId xmlns:a16="http://schemas.microsoft.com/office/drawing/2014/main" id="{B1B58E4D-B34A-214F-8F9B-C7FDAAE33622}"/>
+              </a:ext>
+            </a:extLst>
+          </p:cNvPr>
+          <p:cNvSpPr>
+            <a:spLocks noGrp="1"/>
+          </p:cNvSpPr>
+          <p:nvPr>
+            <p:ph type="body" idx="1"/>
+          </p:nvPr>
+        </p:nvSpPr>
+        <p:spPr>
+          <a:xfrm>
+            <a:off x="684213" y="4495800"/>
+            <a:ext cx="8534400" cy="1498600"/>
+          </a:xfrm>
+        </p:spPr>
+        <p:txBody>
+          <a:bodyPr/>
+          <a:lstStyle/>
+          <a:p>
+            <a:r>
+              <a:rPr lang="en-US" dirty="0"/>
+              <a:t>Thank you for your time today!</a:t>
+            </a:r>
+          </a:p>
+        </p:txBody>
+      </p:sp>
     </p:spTree>
     <p:extLst>
       <p:ext uri="{BB962C8B-B14F-4D97-AF65-F5344CB8AC3E}">
         <p14:creationId xmlns:p14="http://schemas.microsoft.com/office/powerpoint/2010/main" val="1926449743"/>
-      </p:ext>
-    </p:extLst>
-  </p:cSld>
-  <p:clrMapOvr>
-    <a:masterClrMapping/>
-  </p:clrMapOvr>
-</p:sld>
-</file>
-
-<file path=ppt/slides/slide17.xml><?xml version="1.0" encoding="utf-8"?>
-<p:sld xmlns:a="http://schemas.openxmlformats.org/drawingml/2006/main" xmlns:r="http://schemas.openxmlformats.org/officeDocument/2006/relationships" xmlns:p="http://schemas.openxmlformats.org/presentationml/2006/main">
-  <p:cSld>
-    <p:spTree>
-      <p:nvGrpSpPr>
-        <p:cNvPr id="1" name=""/>
-        <p:cNvGrpSpPr/>
-        <p:nvPr/>
-      </p:nvGrpSpPr>
-      <p:grpSpPr>
-        <a:xfrm>
-          <a:off x="0" y="0"/>
-          <a:ext cx="0" cy="0"/>
-          <a:chOff x="0" y="0"/>
-          <a:chExt cx="0" cy="0"/>
-        </a:xfrm>
-      </p:grpSpPr>
-      <p:sp>
-        <p:nvSpPr>
-          <p:cNvPr id="2" name="Title 1">
-            <a:extLst>
-              <a:ext uri="{FF2B5EF4-FFF2-40B4-BE49-F238E27FC236}">
-                <a16:creationId xmlns:a16="http://schemas.microsoft.com/office/drawing/2014/main" id="{17CB2D08-4BAE-2F4A-8071-3E05ECE51CA4}"/>
-              </a:ext>
-            </a:extLst>
-          </p:cNvPr>
-          <p:cNvSpPr>
-            <a:spLocks noGrp="1"/>
-          </p:cNvSpPr>
-          <p:nvPr>
-            <p:ph type="title"/>
-          </p:nvPr>
-        </p:nvSpPr>
-        <p:spPr/>
-        <p:txBody>
-          <a:bodyPr/>
-          <a:lstStyle/>
-          <a:p>
-            <a:r>
-              <a:rPr lang="en-US" dirty="0"/>
-              <a:t>Questions?</a:t>
-            </a:r>
-          </a:p>
-        </p:txBody>
-      </p:sp>
-      <p:sp>
-        <p:nvSpPr>
-          <p:cNvPr id="3" name="Text Placeholder 2">
-            <a:extLst>
-              <a:ext uri="{FF2B5EF4-FFF2-40B4-BE49-F238E27FC236}">
-                <a16:creationId xmlns:a16="http://schemas.microsoft.com/office/drawing/2014/main" id="{2CB8F888-4E88-3C48-97A3-DE897DD7A13A}"/>
-              </a:ext>
-            </a:extLst>
-          </p:cNvPr>
-          <p:cNvSpPr>
-            <a:spLocks noGrp="1"/>
-          </p:cNvSpPr>
-          <p:nvPr>
-            <p:ph type="body" idx="1"/>
-          </p:nvPr>
-        </p:nvSpPr>
-        <p:spPr/>
-        <p:txBody>
-          <a:bodyPr/>
-          <a:lstStyle/>
-          <a:p>
-            <a:r>
-              <a:rPr lang="en-US" dirty="0"/>
-              <a:t>Thank you for your time today!</a:t>
-            </a:r>
-          </a:p>
-        </p:txBody>
-      </p:sp>
-    </p:spTree>
-    <p:extLst>
-      <p:ext uri="{BB962C8B-B14F-4D97-AF65-F5344CB8AC3E}">
-        <p14:creationId xmlns:p14="http://schemas.microsoft.com/office/powerpoint/2010/main" val="2907490136"/>
       </p:ext>
     </p:extLst>
   </p:cSld>
@@ -11669,10 +11792,7 @@
           </a:bodyPr>
           <a:lstStyle/>
           <a:p>
-            <a:r>
-              <a:rPr lang="en-US" sz="2100" dirty="0"/>
-              <a:t>Does this need updating?</a:t>
-            </a:r>
+            <a:endParaRPr lang="en-US" sz="2100" dirty="0"/>
           </a:p>
         </p:txBody>
       </p:sp>

</xml_diff>

<commit_message>
Tori edits to RMD and ppt, NO KNIT
</commit_message>
<xml_diff>
--- a/Attrition_Case_Study_2_pptx_TAJAR_IP.pptx
+++ b/Attrition_Case_Study_2_pptx_TAJAR_IP.pptx
@@ -5,7 +5,7 @@
     <p:sldMasterId id="2147483648" r:id="rId1"/>
   </p:sldMasterIdLst>
   <p:notesMasterIdLst>
-    <p:notesMasterId r:id="rId19"/>
+    <p:notesMasterId r:id="rId18"/>
   </p:notesMasterIdLst>
   <p:sldIdLst>
     <p:sldId id="256" r:id="rId2"/>
@@ -24,7 +24,6 @@
     <p:sldId id="263" r:id="rId15"/>
     <p:sldId id="277" r:id="rId16"/>
     <p:sldId id="271" r:id="rId17"/>
-    <p:sldId id="267" r:id="rId18"/>
   </p:sldIdLst>
   <p:sldSz cx="12192000" cy="6858000"/>
   <p:notesSz cx="6858000" cy="9144000"/>
@@ -213,7 +212,7 @@
           <a:p>
             <a:fld id="{380F82E0-DA90-F642-BDF9-D28F7CF5A168}" type="datetimeFigureOut">
               <a:rPr lang="en-US" smtClean="0"/>
-              <a:t>8/6/2018</a:t>
+              <a:t>8/6/18</a:t>
             </a:fld>
             <a:endParaRPr lang="en-US"/>
           </a:p>
@@ -672,7 +671,7 @@
             <a:fld id="{B61BEF0D-F0BB-DE4B-95CE-6DB70DBA9567}" type="datetimeFigureOut">
               <a:rPr lang="en-US" dirty="0"/>
               <a:pPr/>
-              <a:t>8/6/2018</a:t>
+              <a:t>8/6/18</a:t>
             </a:fld>
             <a:endParaRPr lang="en-US" dirty="0"/>
           </a:p>
@@ -1105,7 +1104,7 @@
             <a:fld id="{B61BEF0D-F0BB-DE4B-95CE-6DB70DBA9567}" type="datetimeFigureOut">
               <a:rPr lang="en-US" dirty="0"/>
               <a:pPr/>
-              <a:t>8/6/2018</a:t>
+              <a:t>8/6/18</a:t>
             </a:fld>
             <a:endParaRPr lang="en-US" dirty="0"/>
           </a:p>
@@ -1352,7 +1351,7 @@
             <a:fld id="{B61BEF0D-F0BB-DE4B-95CE-6DB70DBA9567}" type="datetimeFigureOut">
               <a:rPr lang="en-US" dirty="0"/>
               <a:pPr/>
-              <a:t>8/6/2018</a:t>
+              <a:t>8/6/18</a:t>
             </a:fld>
             <a:endParaRPr lang="en-US" dirty="0"/>
           </a:p>
@@ -1657,7 +1656,7 @@
             <a:fld id="{B61BEF0D-F0BB-DE4B-95CE-6DB70DBA9567}" type="datetimeFigureOut">
               <a:rPr lang="en-US" dirty="0"/>
               <a:pPr/>
-              <a:t>8/6/2018</a:t>
+              <a:t>8/6/18</a:t>
             </a:fld>
             <a:endParaRPr lang="en-US" dirty="0"/>
           </a:p>
@@ -1972,7 +1971,7 @@
             <a:fld id="{B61BEF0D-F0BB-DE4B-95CE-6DB70DBA9567}" type="datetimeFigureOut">
               <a:rPr lang="en-US" dirty="0"/>
               <a:pPr/>
-              <a:t>8/6/2018</a:t>
+              <a:t>8/6/18</a:t>
             </a:fld>
             <a:endParaRPr lang="en-US" dirty="0"/>
           </a:p>
@@ -2271,7 +2270,7 @@
             <a:fld id="{B61BEF0D-F0BB-DE4B-95CE-6DB70DBA9567}" type="datetimeFigureOut">
               <a:rPr lang="en-US" dirty="0"/>
               <a:pPr/>
-              <a:t>8/6/2018</a:t>
+              <a:t>8/6/18</a:t>
             </a:fld>
             <a:endParaRPr lang="en-US" dirty="0"/>
           </a:p>
@@ -2635,7 +2634,7 @@
             <a:fld id="{B61BEF0D-F0BB-DE4B-95CE-6DB70DBA9567}" type="datetimeFigureOut">
               <a:rPr lang="en-US" dirty="0"/>
               <a:pPr/>
-              <a:t>8/6/2018</a:t>
+              <a:t>8/6/18</a:t>
             </a:fld>
             <a:endParaRPr lang="en-US" dirty="0"/>
           </a:p>
@@ -2806,7 +2805,7 @@
             <a:fld id="{B61BEF0D-F0BB-DE4B-95CE-6DB70DBA9567}" type="datetimeFigureOut">
               <a:rPr lang="en-US" dirty="0"/>
               <a:pPr/>
-              <a:t>8/6/2018</a:t>
+              <a:t>8/6/18</a:t>
             </a:fld>
             <a:endParaRPr lang="en-US" dirty="0"/>
           </a:p>
@@ -2983,7 +2982,7 @@
             <a:fld id="{B61BEF0D-F0BB-DE4B-95CE-6DB70DBA9567}" type="datetimeFigureOut">
               <a:rPr lang="en-US" dirty="0"/>
               <a:pPr/>
-              <a:t>8/6/2018</a:t>
+              <a:t>8/6/18</a:t>
             </a:fld>
             <a:endParaRPr lang="en-US" dirty="0"/>
           </a:p>
@@ -3150,7 +3149,7 @@
             <a:fld id="{B61BEF0D-F0BB-DE4B-95CE-6DB70DBA9567}" type="datetimeFigureOut">
               <a:rPr lang="en-US" dirty="0"/>
               <a:pPr/>
-              <a:t>8/6/2018</a:t>
+              <a:t>8/6/18</a:t>
             </a:fld>
             <a:endParaRPr lang="en-US" dirty="0"/>
           </a:p>
@@ -3397,7 +3396,7 @@
             <a:fld id="{B61BEF0D-F0BB-DE4B-95CE-6DB70DBA9567}" type="datetimeFigureOut">
               <a:rPr lang="en-US" dirty="0"/>
               <a:pPr/>
-              <a:t>8/6/2018</a:t>
+              <a:t>8/6/18</a:t>
             </a:fld>
             <a:endParaRPr lang="en-US" dirty="0"/>
           </a:p>
@@ -3630,7 +3629,7 @@
             <a:fld id="{B61BEF0D-F0BB-DE4B-95CE-6DB70DBA9567}" type="datetimeFigureOut">
               <a:rPr lang="en-US" dirty="0"/>
               <a:pPr/>
-              <a:t>8/6/2018</a:t>
+              <a:t>8/6/18</a:t>
             </a:fld>
             <a:endParaRPr lang="en-US" dirty="0"/>
           </a:p>
@@ -4009,7 +4008,7 @@
             <a:fld id="{B61BEF0D-F0BB-DE4B-95CE-6DB70DBA9567}" type="datetimeFigureOut">
               <a:rPr lang="en-US" dirty="0"/>
               <a:pPr/>
-              <a:t>8/6/2018</a:t>
+              <a:t>8/6/18</a:t>
             </a:fld>
             <a:endParaRPr lang="en-US" dirty="0"/>
           </a:p>
@@ -4124,7 +4123,7 @@
             <a:fld id="{B61BEF0D-F0BB-DE4B-95CE-6DB70DBA9567}" type="datetimeFigureOut">
               <a:rPr lang="en-US" dirty="0"/>
               <a:pPr/>
-              <a:t>8/6/2018</a:t>
+              <a:t>8/6/18</a:t>
             </a:fld>
             <a:endParaRPr lang="en-US" dirty="0"/>
           </a:p>
@@ -4216,7 +4215,7 @@
             <a:fld id="{B61BEF0D-F0BB-DE4B-95CE-6DB70DBA9567}" type="datetimeFigureOut">
               <a:rPr lang="en-US" dirty="0"/>
               <a:pPr/>
-              <a:t>8/6/2018</a:t>
+              <a:t>8/6/18</a:t>
             </a:fld>
             <a:endParaRPr lang="en-US" dirty="0"/>
           </a:p>
@@ -4468,7 +4467,7 @@
             <a:fld id="{B61BEF0D-F0BB-DE4B-95CE-6DB70DBA9567}" type="datetimeFigureOut">
               <a:rPr lang="en-US" dirty="0"/>
               <a:pPr/>
-              <a:t>8/6/2018</a:t>
+              <a:t>8/6/18</a:t>
             </a:fld>
             <a:endParaRPr lang="en-US" dirty="0"/>
           </a:p>
@@ -4748,7 +4747,7 @@
             <a:fld id="{B61BEF0D-F0BB-DE4B-95CE-6DB70DBA9567}" type="datetimeFigureOut">
               <a:rPr lang="en-US" dirty="0"/>
               <a:pPr/>
-              <a:t>8/6/2018</a:t>
+              <a:t>8/6/18</a:t>
             </a:fld>
             <a:endParaRPr lang="en-US" dirty="0"/>
           </a:p>
@@ -5151,7 +5150,7 @@
             <a:fld id="{B61BEF0D-F0BB-DE4B-95CE-6DB70DBA9567}" type="datetimeFigureOut">
               <a:rPr lang="en-US" dirty="0"/>
               <a:pPr/>
-              <a:t>8/6/2018</a:t>
+              <a:t>8/6/18</a:t>
             </a:fld>
             <a:endParaRPr lang="en-US" dirty="0"/>
           </a:p>
@@ -7513,7 +7512,12 @@
             <p:ph type="title"/>
           </p:nvPr>
         </p:nvSpPr>
-        <p:spPr/>
+        <p:spPr>
+          <a:xfrm>
+            <a:off x="293793" y="349321"/>
+            <a:ext cx="8534401" cy="753890"/>
+          </a:xfrm>
+        </p:spPr>
         <p:txBody>
           <a:bodyPr/>
           <a:lstStyle/>
@@ -7525,37 +7529,96 @@
           </a:p>
         </p:txBody>
       </p:sp>
-      <p:sp>
-        <p:nvSpPr>
-          <p:cNvPr id="3" name="Text Placeholder 2">
+      <p:pic>
+        <p:nvPicPr>
+          <p:cNvPr id="9" name="Picture 8">
             <a:extLst>
               <a:ext uri="{FF2B5EF4-FFF2-40B4-BE49-F238E27FC236}">
-                <a16:creationId xmlns:a16="http://schemas.microsoft.com/office/drawing/2014/main" id="{D364D651-6EB2-244D-94BF-CDF4925ACCFE}"/>
+                <a16:creationId xmlns:a16="http://schemas.microsoft.com/office/drawing/2014/main" id="{B5A6FF36-79A1-F845-8403-AC887A39DA13}"/>
               </a:ext>
             </a:extLst>
           </p:cNvPr>
-          <p:cNvSpPr>
-            <a:spLocks noGrp="1"/>
-          </p:cNvSpPr>
-          <p:nvPr>
-            <p:ph type="body" idx="1"/>
-          </p:nvPr>
-        </p:nvSpPr>
-        <p:spPr/>
-        <p:txBody>
-          <a:bodyPr/>
-          <a:lstStyle/>
-          <a:p>
-            <a:r>
-              <a:rPr lang="en-US" dirty="0"/>
-              <a:t>“Tell me about any job role specific trends that may exist in the data set”</a:t>
-            </a:r>
-          </a:p>
-          <a:p>
-            <a:endParaRPr lang="en-US" dirty="0"/>
-          </a:p>
-        </p:txBody>
-      </p:sp>
+          <p:cNvPicPr>
+            <a:picLocks noChangeAspect="1"/>
+          </p:cNvPicPr>
+          <p:nvPr/>
+        </p:nvPicPr>
+        <p:blipFill>
+          <a:blip r:embed="rId2"/>
+          <a:stretch>
+            <a:fillRect/>
+          </a:stretch>
+        </p:blipFill>
+        <p:spPr>
+          <a:xfrm>
+            <a:off x="8828194" y="447417"/>
+            <a:ext cx="3162300" cy="3467100"/>
+          </a:xfrm>
+          <a:prstGeom prst="rect">
+            <a:avLst/>
+          </a:prstGeom>
+        </p:spPr>
+      </p:pic>
+      <p:pic>
+        <p:nvPicPr>
+          <p:cNvPr id="13" name="Picture 12">
+            <a:extLst>
+              <a:ext uri="{FF2B5EF4-FFF2-40B4-BE49-F238E27FC236}">
+                <a16:creationId xmlns:a16="http://schemas.microsoft.com/office/drawing/2014/main" id="{ECB7B92D-AE6C-AE4F-8759-721D8810047D}"/>
+              </a:ext>
+            </a:extLst>
+          </p:cNvPr>
+          <p:cNvPicPr>
+            <a:picLocks noChangeAspect="1"/>
+          </p:cNvPicPr>
+          <p:nvPr/>
+        </p:nvPicPr>
+        <p:blipFill>
+          <a:blip r:embed="rId3"/>
+          <a:stretch>
+            <a:fillRect/>
+          </a:stretch>
+        </p:blipFill>
+        <p:spPr>
+          <a:xfrm>
+            <a:off x="4451939" y="2992909"/>
+            <a:ext cx="4178300" cy="3467100"/>
+          </a:xfrm>
+          <a:prstGeom prst="rect">
+            <a:avLst/>
+          </a:prstGeom>
+        </p:spPr>
+      </p:pic>
+      <p:pic>
+        <p:nvPicPr>
+          <p:cNvPr id="15" name="Picture 14">
+            <a:extLst>
+              <a:ext uri="{FF2B5EF4-FFF2-40B4-BE49-F238E27FC236}">
+                <a16:creationId xmlns:a16="http://schemas.microsoft.com/office/drawing/2014/main" id="{5D1028DF-50F7-F44A-BF78-FB498FC9C9FD}"/>
+              </a:ext>
+            </a:extLst>
+          </p:cNvPr>
+          <p:cNvPicPr>
+            <a:picLocks noChangeAspect="1"/>
+          </p:cNvPicPr>
+          <p:nvPr/>
+        </p:nvPicPr>
+        <p:blipFill>
+          <a:blip r:embed="rId4"/>
+          <a:stretch>
+            <a:fillRect/>
+          </a:stretch>
+        </p:blipFill>
+        <p:spPr>
+          <a:xfrm>
+            <a:off x="75685" y="1103211"/>
+            <a:ext cx="4178300" cy="3467100"/>
+          </a:xfrm>
+          <a:prstGeom prst="rect">
+            <a:avLst/>
+          </a:prstGeom>
+        </p:spPr>
+      </p:pic>
     </p:spTree>
     <p:extLst>
       <p:ext uri="{BB962C8B-B14F-4D97-AF65-F5344CB8AC3E}">
@@ -9674,96 +9737,156 @@
           </a:p>
         </p:txBody>
       </p:sp>
+      <p:sp>
+        <p:nvSpPr>
+          <p:cNvPr id="5" name="Title 1">
+            <a:extLst>
+              <a:ext uri="{FF2B5EF4-FFF2-40B4-BE49-F238E27FC236}">
+                <a16:creationId xmlns:a16="http://schemas.microsoft.com/office/drawing/2014/main" id="{14FFB619-0B53-E248-BEE3-9D34DFC23046}"/>
+              </a:ext>
+            </a:extLst>
+          </p:cNvPr>
+          <p:cNvSpPr txBox="1">
+            <a:spLocks/>
+          </p:cNvSpPr>
+          <p:nvPr/>
+        </p:nvSpPr>
+        <p:spPr>
+          <a:xfrm>
+            <a:off x="684211" y="2006600"/>
+            <a:ext cx="8534401" cy="2281600"/>
+          </a:xfrm>
+          <a:prstGeom prst="rect">
+            <a:avLst/>
+          </a:prstGeom>
+          <a:effectLst/>
+        </p:spPr>
+        <p:txBody>
+          <a:bodyPr vert="horz" lIns="91440" tIns="45720" rIns="91440" bIns="45720" rtlCol="0" anchor="b">
+            <a:normAutofit/>
+          </a:bodyPr>
+          <a:lstStyle>
+            <a:lvl1pPr algn="l" defTabSz="457200" rtl="0" eaLnBrk="1" latinLnBrk="0" hangingPunct="1">
+              <a:spcBef>
+                <a:spcPct val="0"/>
+              </a:spcBef>
+              <a:buNone/>
+              <a:defRPr sz="3600" b="0" kern="1200" cap="all">
+                <a:ln w="3175" cmpd="sng">
+                  <a:noFill/>
+                </a:ln>
+                <a:solidFill>
+                  <a:schemeClr val="tx1"/>
+                </a:solidFill>
+                <a:effectLst/>
+                <a:latin typeface="+mj-lt"/>
+                <a:ea typeface="+mj-ea"/>
+                <a:cs typeface="+mj-cs"/>
+              </a:defRPr>
+            </a:lvl1pPr>
+            <a:lvl2pPr eaLnBrk="1" hangingPunct="1">
+              <a:defRPr>
+                <a:solidFill>
+                  <a:schemeClr val="tx2"/>
+                </a:solidFill>
+              </a:defRPr>
+            </a:lvl2pPr>
+            <a:lvl3pPr eaLnBrk="1" hangingPunct="1">
+              <a:defRPr>
+                <a:solidFill>
+                  <a:schemeClr val="tx2"/>
+                </a:solidFill>
+              </a:defRPr>
+            </a:lvl3pPr>
+            <a:lvl4pPr eaLnBrk="1" hangingPunct="1">
+              <a:defRPr>
+                <a:solidFill>
+                  <a:schemeClr val="tx2"/>
+                </a:solidFill>
+              </a:defRPr>
+            </a:lvl4pPr>
+            <a:lvl5pPr eaLnBrk="1" hangingPunct="1">
+              <a:defRPr>
+                <a:solidFill>
+                  <a:schemeClr val="tx2"/>
+                </a:solidFill>
+              </a:defRPr>
+            </a:lvl5pPr>
+            <a:lvl6pPr eaLnBrk="1" hangingPunct="1">
+              <a:defRPr>
+                <a:solidFill>
+                  <a:schemeClr val="tx2"/>
+                </a:solidFill>
+              </a:defRPr>
+            </a:lvl6pPr>
+            <a:lvl7pPr eaLnBrk="1" hangingPunct="1">
+              <a:defRPr>
+                <a:solidFill>
+                  <a:schemeClr val="tx2"/>
+                </a:solidFill>
+              </a:defRPr>
+            </a:lvl7pPr>
+            <a:lvl8pPr eaLnBrk="1" hangingPunct="1">
+              <a:defRPr>
+                <a:solidFill>
+                  <a:schemeClr val="tx2"/>
+                </a:solidFill>
+              </a:defRPr>
+            </a:lvl8pPr>
+            <a:lvl9pPr eaLnBrk="1" hangingPunct="1">
+              <a:defRPr>
+                <a:solidFill>
+                  <a:schemeClr val="tx2"/>
+                </a:solidFill>
+              </a:defRPr>
+            </a:lvl9pPr>
+          </a:lstStyle>
+          <a:p>
+            <a:r>
+              <a:rPr lang="en-US"/>
+              <a:t>Questions?</a:t>
+            </a:r>
+            <a:endParaRPr lang="en-US" dirty="0"/>
+          </a:p>
+        </p:txBody>
+      </p:sp>
+      <p:sp>
+        <p:nvSpPr>
+          <p:cNvPr id="6" name="Text Placeholder 2">
+            <a:extLst>
+              <a:ext uri="{FF2B5EF4-FFF2-40B4-BE49-F238E27FC236}">
+                <a16:creationId xmlns:a16="http://schemas.microsoft.com/office/drawing/2014/main" id="{B1B58E4D-B34A-214F-8F9B-C7FDAAE33622}"/>
+              </a:ext>
+            </a:extLst>
+          </p:cNvPr>
+          <p:cNvSpPr>
+            <a:spLocks noGrp="1"/>
+          </p:cNvSpPr>
+          <p:nvPr>
+            <p:ph type="body" idx="1"/>
+          </p:nvPr>
+        </p:nvSpPr>
+        <p:spPr>
+          <a:xfrm>
+            <a:off x="684213" y="4495800"/>
+            <a:ext cx="8534400" cy="1498600"/>
+          </a:xfrm>
+        </p:spPr>
+        <p:txBody>
+          <a:bodyPr/>
+          <a:lstStyle/>
+          <a:p>
+            <a:r>
+              <a:rPr lang="en-US" dirty="0"/>
+              <a:t>Thank you for your time today!</a:t>
+            </a:r>
+          </a:p>
+        </p:txBody>
+      </p:sp>
     </p:spTree>
     <p:extLst>
       <p:ext uri="{BB962C8B-B14F-4D97-AF65-F5344CB8AC3E}">
         <p14:creationId xmlns:p14="http://schemas.microsoft.com/office/powerpoint/2010/main" val="1926449743"/>
-      </p:ext>
-    </p:extLst>
-  </p:cSld>
-  <p:clrMapOvr>
-    <a:masterClrMapping/>
-  </p:clrMapOvr>
-</p:sld>
-</file>
-
-<file path=ppt/slides/slide17.xml><?xml version="1.0" encoding="utf-8"?>
-<p:sld xmlns:a="http://schemas.openxmlformats.org/drawingml/2006/main" xmlns:r="http://schemas.openxmlformats.org/officeDocument/2006/relationships" xmlns:p="http://schemas.openxmlformats.org/presentationml/2006/main">
-  <p:cSld>
-    <p:spTree>
-      <p:nvGrpSpPr>
-        <p:cNvPr id="1" name=""/>
-        <p:cNvGrpSpPr/>
-        <p:nvPr/>
-      </p:nvGrpSpPr>
-      <p:grpSpPr>
-        <a:xfrm>
-          <a:off x="0" y="0"/>
-          <a:ext cx="0" cy="0"/>
-          <a:chOff x="0" y="0"/>
-          <a:chExt cx="0" cy="0"/>
-        </a:xfrm>
-      </p:grpSpPr>
-      <p:sp>
-        <p:nvSpPr>
-          <p:cNvPr id="2" name="Title 1">
-            <a:extLst>
-              <a:ext uri="{FF2B5EF4-FFF2-40B4-BE49-F238E27FC236}">
-                <a16:creationId xmlns:a16="http://schemas.microsoft.com/office/drawing/2014/main" id="{17CB2D08-4BAE-2F4A-8071-3E05ECE51CA4}"/>
-              </a:ext>
-            </a:extLst>
-          </p:cNvPr>
-          <p:cNvSpPr>
-            <a:spLocks noGrp="1"/>
-          </p:cNvSpPr>
-          <p:nvPr>
-            <p:ph type="title"/>
-          </p:nvPr>
-        </p:nvSpPr>
-        <p:spPr/>
-        <p:txBody>
-          <a:bodyPr/>
-          <a:lstStyle/>
-          <a:p>
-            <a:r>
-              <a:rPr lang="en-US" dirty="0"/>
-              <a:t>Questions?</a:t>
-            </a:r>
-          </a:p>
-        </p:txBody>
-      </p:sp>
-      <p:sp>
-        <p:nvSpPr>
-          <p:cNvPr id="3" name="Text Placeholder 2">
-            <a:extLst>
-              <a:ext uri="{FF2B5EF4-FFF2-40B4-BE49-F238E27FC236}">
-                <a16:creationId xmlns:a16="http://schemas.microsoft.com/office/drawing/2014/main" id="{2CB8F888-4E88-3C48-97A3-DE897DD7A13A}"/>
-              </a:ext>
-            </a:extLst>
-          </p:cNvPr>
-          <p:cNvSpPr>
-            <a:spLocks noGrp="1"/>
-          </p:cNvSpPr>
-          <p:nvPr>
-            <p:ph type="body" idx="1"/>
-          </p:nvPr>
-        </p:nvSpPr>
-        <p:spPr/>
-        <p:txBody>
-          <a:bodyPr/>
-          <a:lstStyle/>
-          <a:p>
-            <a:r>
-              <a:rPr lang="en-US" dirty="0"/>
-              <a:t>Thank you for your time today!</a:t>
-            </a:r>
-          </a:p>
-        </p:txBody>
-      </p:sp>
-    </p:spTree>
-    <p:extLst>
-      <p:ext uri="{BB962C8B-B14F-4D97-AF65-F5344CB8AC3E}">
-        <p14:creationId xmlns:p14="http://schemas.microsoft.com/office/powerpoint/2010/main" val="2907490136"/>
       </p:ext>
     </p:extLst>
   </p:cSld>
@@ -11669,10 +11792,7 @@
           </a:bodyPr>
           <a:lstStyle/>
           <a:p>
-            <a:r>
-              <a:rPr lang="en-US" sz="2100" dirty="0"/>
-              <a:t>Does this need updating?</a:t>
-            </a:r>
+            <a:endParaRPr lang="en-US" sz="2100" dirty="0"/>
           </a:p>
         </p:txBody>
       </p:sp>

</xml_diff>

<commit_message>
Modified RandomForest and Conditional RandomForest Code.
</commit_message>
<xml_diff>
--- a/Attrition_Case_Study_2_pptx_TAJAR_IP.pptx
+++ b/Attrition_Case_Study_2_pptx_TAJAR_IP.pptx
@@ -212,7 +212,7 @@
           <a:p>
             <a:fld id="{380F82E0-DA90-F642-BDF9-D28F7CF5A168}" type="datetimeFigureOut">
               <a:rPr lang="en-US" smtClean="0"/>
-              <a:t>8/6/2018</a:t>
+              <a:t>8/7/2018</a:t>
             </a:fld>
             <a:endParaRPr lang="en-US"/>
           </a:p>
@@ -671,7 +671,7 @@
             <a:fld id="{B61BEF0D-F0BB-DE4B-95CE-6DB70DBA9567}" type="datetimeFigureOut">
               <a:rPr lang="en-US" dirty="0"/>
               <a:pPr/>
-              <a:t>8/6/2018</a:t>
+              <a:t>8/7/2018</a:t>
             </a:fld>
             <a:endParaRPr lang="en-US" dirty="0"/>
           </a:p>
@@ -1104,7 +1104,7 @@
             <a:fld id="{B61BEF0D-F0BB-DE4B-95CE-6DB70DBA9567}" type="datetimeFigureOut">
               <a:rPr lang="en-US" dirty="0"/>
               <a:pPr/>
-              <a:t>8/6/2018</a:t>
+              <a:t>8/7/2018</a:t>
             </a:fld>
             <a:endParaRPr lang="en-US" dirty="0"/>
           </a:p>
@@ -1351,7 +1351,7 @@
             <a:fld id="{B61BEF0D-F0BB-DE4B-95CE-6DB70DBA9567}" type="datetimeFigureOut">
               <a:rPr lang="en-US" dirty="0"/>
               <a:pPr/>
-              <a:t>8/6/2018</a:t>
+              <a:t>8/7/2018</a:t>
             </a:fld>
             <a:endParaRPr lang="en-US" dirty="0"/>
           </a:p>
@@ -1656,7 +1656,7 @@
             <a:fld id="{B61BEF0D-F0BB-DE4B-95CE-6DB70DBA9567}" type="datetimeFigureOut">
               <a:rPr lang="en-US" dirty="0"/>
               <a:pPr/>
-              <a:t>8/6/2018</a:t>
+              <a:t>8/7/2018</a:t>
             </a:fld>
             <a:endParaRPr lang="en-US" dirty="0"/>
           </a:p>
@@ -1971,7 +1971,7 @@
             <a:fld id="{B61BEF0D-F0BB-DE4B-95CE-6DB70DBA9567}" type="datetimeFigureOut">
               <a:rPr lang="en-US" dirty="0"/>
               <a:pPr/>
-              <a:t>8/6/2018</a:t>
+              <a:t>8/7/2018</a:t>
             </a:fld>
             <a:endParaRPr lang="en-US" dirty="0"/>
           </a:p>
@@ -2270,7 +2270,7 @@
             <a:fld id="{B61BEF0D-F0BB-DE4B-95CE-6DB70DBA9567}" type="datetimeFigureOut">
               <a:rPr lang="en-US" dirty="0"/>
               <a:pPr/>
-              <a:t>8/6/2018</a:t>
+              <a:t>8/7/2018</a:t>
             </a:fld>
             <a:endParaRPr lang="en-US" dirty="0"/>
           </a:p>
@@ -2634,7 +2634,7 @@
             <a:fld id="{B61BEF0D-F0BB-DE4B-95CE-6DB70DBA9567}" type="datetimeFigureOut">
               <a:rPr lang="en-US" dirty="0"/>
               <a:pPr/>
-              <a:t>8/6/2018</a:t>
+              <a:t>8/7/2018</a:t>
             </a:fld>
             <a:endParaRPr lang="en-US" dirty="0"/>
           </a:p>
@@ -2805,7 +2805,7 @@
             <a:fld id="{B61BEF0D-F0BB-DE4B-95CE-6DB70DBA9567}" type="datetimeFigureOut">
               <a:rPr lang="en-US" dirty="0"/>
               <a:pPr/>
-              <a:t>8/6/2018</a:t>
+              <a:t>8/7/2018</a:t>
             </a:fld>
             <a:endParaRPr lang="en-US" dirty="0"/>
           </a:p>
@@ -2982,7 +2982,7 @@
             <a:fld id="{B61BEF0D-F0BB-DE4B-95CE-6DB70DBA9567}" type="datetimeFigureOut">
               <a:rPr lang="en-US" dirty="0"/>
               <a:pPr/>
-              <a:t>8/6/2018</a:t>
+              <a:t>8/7/2018</a:t>
             </a:fld>
             <a:endParaRPr lang="en-US" dirty="0"/>
           </a:p>
@@ -3149,7 +3149,7 @@
             <a:fld id="{B61BEF0D-F0BB-DE4B-95CE-6DB70DBA9567}" type="datetimeFigureOut">
               <a:rPr lang="en-US" dirty="0"/>
               <a:pPr/>
-              <a:t>8/6/2018</a:t>
+              <a:t>8/7/2018</a:t>
             </a:fld>
             <a:endParaRPr lang="en-US" dirty="0"/>
           </a:p>
@@ -3396,7 +3396,7 @@
             <a:fld id="{B61BEF0D-F0BB-DE4B-95CE-6DB70DBA9567}" type="datetimeFigureOut">
               <a:rPr lang="en-US" dirty="0"/>
               <a:pPr/>
-              <a:t>8/6/2018</a:t>
+              <a:t>8/7/2018</a:t>
             </a:fld>
             <a:endParaRPr lang="en-US" dirty="0"/>
           </a:p>
@@ -3629,7 +3629,7 @@
             <a:fld id="{B61BEF0D-F0BB-DE4B-95CE-6DB70DBA9567}" type="datetimeFigureOut">
               <a:rPr lang="en-US" dirty="0"/>
               <a:pPr/>
-              <a:t>8/6/2018</a:t>
+              <a:t>8/7/2018</a:t>
             </a:fld>
             <a:endParaRPr lang="en-US" dirty="0"/>
           </a:p>
@@ -4008,7 +4008,7 @@
             <a:fld id="{B61BEF0D-F0BB-DE4B-95CE-6DB70DBA9567}" type="datetimeFigureOut">
               <a:rPr lang="en-US" dirty="0"/>
               <a:pPr/>
-              <a:t>8/6/2018</a:t>
+              <a:t>8/7/2018</a:t>
             </a:fld>
             <a:endParaRPr lang="en-US" dirty="0"/>
           </a:p>
@@ -4123,7 +4123,7 @@
             <a:fld id="{B61BEF0D-F0BB-DE4B-95CE-6DB70DBA9567}" type="datetimeFigureOut">
               <a:rPr lang="en-US" dirty="0"/>
               <a:pPr/>
-              <a:t>8/6/2018</a:t>
+              <a:t>8/7/2018</a:t>
             </a:fld>
             <a:endParaRPr lang="en-US" dirty="0"/>
           </a:p>
@@ -4215,7 +4215,7 @@
             <a:fld id="{B61BEF0D-F0BB-DE4B-95CE-6DB70DBA9567}" type="datetimeFigureOut">
               <a:rPr lang="en-US" dirty="0"/>
               <a:pPr/>
-              <a:t>8/6/2018</a:t>
+              <a:t>8/7/2018</a:t>
             </a:fld>
             <a:endParaRPr lang="en-US" dirty="0"/>
           </a:p>
@@ -4467,7 +4467,7 @@
             <a:fld id="{B61BEF0D-F0BB-DE4B-95CE-6DB70DBA9567}" type="datetimeFigureOut">
               <a:rPr lang="en-US" dirty="0"/>
               <a:pPr/>
-              <a:t>8/6/2018</a:t>
+              <a:t>8/7/2018</a:t>
             </a:fld>
             <a:endParaRPr lang="en-US" dirty="0"/>
           </a:p>
@@ -4747,7 +4747,7 @@
             <a:fld id="{B61BEF0D-F0BB-DE4B-95CE-6DB70DBA9567}" type="datetimeFigureOut">
               <a:rPr lang="en-US" dirty="0"/>
               <a:pPr/>
-              <a:t>8/6/2018</a:t>
+              <a:t>8/7/2018</a:t>
             </a:fld>
             <a:endParaRPr lang="en-US" dirty="0"/>
           </a:p>
@@ -5150,7 +5150,7 @@
             <a:fld id="{B61BEF0D-F0BB-DE4B-95CE-6DB70DBA9567}" type="datetimeFigureOut">
               <a:rPr lang="en-US" dirty="0"/>
               <a:pPr/>
-              <a:t>8/6/2018</a:t>
+              <a:t>8/7/2018</a:t>
             </a:fld>
             <a:endParaRPr lang="en-US" dirty="0"/>
           </a:p>
@@ -11717,19 +11717,19 @@
         </p:nvSpPr>
         <p:spPr>
           <a:xfrm>
-            <a:off x="444477" y="163970"/>
+            <a:off x="444477" y="306588"/>
             <a:ext cx="10327907" cy="685800"/>
           </a:xfrm>
         </p:spPr>
         <p:txBody>
           <a:bodyPr>
-            <a:normAutofit fontScale="90000"/>
+            <a:noAutofit/>
           </a:bodyPr>
           <a:lstStyle/>
           <a:p>
             <a:r>
-              <a:rPr lang="en-US" dirty="0"/>
-              <a:t>Methodology – Conditional Random Forest</a:t>
+              <a:rPr lang="en-US" sz="2800" dirty="0"/>
+              <a:t>Methodology – Random Forest And CONDITIONAL RANDOM FOREST</a:t>
             </a:r>
           </a:p>
         </p:txBody>
@@ -11742,7 +11742,7 @@
         </p:nvSpPr>
         <p:spPr>
           <a:xfrm>
-            <a:off x="444477" y="1412960"/>
+            <a:off x="444477" y="1737405"/>
             <a:ext cx="6745463" cy="923330"/>
           </a:xfrm>
           <a:prstGeom prst="rect">
@@ -11762,7 +11762,7 @@
                   <a:srgbClr val="002060"/>
                 </a:solidFill>
               </a:rPr>
-              <a:t>Both Conditional Random Forest (and Logistic Regression) confirm the following top 3 factors:</a:t>
+              <a:t>Both Conditional Random Forest and Random Forest confirm the following top 3 factors:</a:t>
             </a:r>
           </a:p>
           <a:p>
@@ -11782,8 +11782,8 @@
         </p:nvSpPr>
         <p:spPr>
           <a:xfrm>
-            <a:off x="444477" y="912803"/>
-            <a:ext cx="2895344" cy="369332"/>
+            <a:off x="444477" y="992388"/>
+            <a:ext cx="5429692" cy="646331"/>
           </a:xfrm>
           <a:prstGeom prst="rect">
             <a:avLst/>
@@ -11802,51 +11802,97 @@
                   <a:srgbClr val="002060"/>
                 </a:solidFill>
               </a:rPr>
-              <a:t>Prediction Score: 85.79%</a:t>
+              <a:t>Random Forest:  Accuracy: 86.46%</a:t>
+            </a:r>
+          </a:p>
+          <a:p>
+            <a:r>
+              <a:rPr lang="en-US" b="1" dirty="0">
+                <a:solidFill>
+                  <a:srgbClr val="002060"/>
+                </a:solidFill>
+              </a:rPr>
+              <a:t>                             Out-Of-Bag Error Rate: 13.54 %</a:t>
             </a:r>
           </a:p>
         </p:txBody>
       </p:sp>
       <p:pic>
         <p:nvPicPr>
-          <p:cNvPr id="6" name="Picture 5"/>
+          <p:cNvPr id="7" name="Picture 6">
+            <a:extLst>
+              <a:ext uri="{FF2B5EF4-FFF2-40B4-BE49-F238E27FC236}">
+                <a16:creationId xmlns:a16="http://schemas.microsoft.com/office/drawing/2014/main" id="{6F94AF42-E477-49F7-8FF7-78FBF244C9B5}"/>
+              </a:ext>
+            </a:extLst>
+          </p:cNvPr>
           <p:cNvPicPr>
             <a:picLocks noChangeAspect="1"/>
           </p:cNvPicPr>
           <p:nvPr/>
         </p:nvPicPr>
         <p:blipFill>
-          <a:blip r:embed="rId2">
-            <a:extLst>
-              <a:ext uri="{28A0092B-C50C-407E-A947-70E740481C1C}">
-                <a14:useLocalDpi xmlns:a14="http://schemas.microsoft.com/office/drawing/2010/main" val="0"/>
-              </a:ext>
-            </a:extLst>
-          </a:blip>
+          <a:blip r:embed="rId2"/>
           <a:stretch>
             <a:fillRect/>
           </a:stretch>
         </p:blipFill>
         <p:spPr>
           <a:xfrm>
-            <a:off x="550953" y="2241647"/>
-            <a:ext cx="5753100" cy="3416300"/>
+            <a:off x="6499170" y="2618789"/>
+            <a:ext cx="5520980" cy="3947480"/>
           </a:xfrm>
           <a:prstGeom prst="rect">
             <a:avLst/>
           </a:prstGeom>
         </p:spPr>
       </p:pic>
-      <p:sp>
-        <p:nvSpPr>
-          <p:cNvPr id="3" name="TextBox 2"/>
+      <p:pic>
+        <p:nvPicPr>
+          <p:cNvPr id="9" name="Picture 8">
+            <a:extLst>
+              <a:ext uri="{FF2B5EF4-FFF2-40B4-BE49-F238E27FC236}">
+                <a16:creationId xmlns:a16="http://schemas.microsoft.com/office/drawing/2014/main" id="{B148BE64-E262-4553-BD2E-3C92DD3EBFC2}"/>
+              </a:ext>
+            </a:extLst>
+          </p:cNvPr>
+          <p:cNvPicPr>
+            <a:picLocks noChangeAspect="1"/>
+          </p:cNvPicPr>
+          <p:nvPr/>
+        </p:nvPicPr>
+        <p:blipFill>
+          <a:blip r:embed="rId3"/>
+          <a:stretch>
+            <a:fillRect/>
+          </a:stretch>
+        </p:blipFill>
+        <p:spPr>
+          <a:xfrm>
+            <a:off x="171850" y="2638425"/>
+            <a:ext cx="6248000" cy="3947480"/>
+          </a:xfrm>
+          <a:prstGeom prst="rect">
+            <a:avLst/>
+          </a:prstGeom>
+        </p:spPr>
+      </p:pic>
+      <p:sp>
+        <p:nvSpPr>
+          <p:cNvPr id="11" name="TextBox 10">
+            <a:extLst>
+              <a:ext uri="{FF2B5EF4-FFF2-40B4-BE49-F238E27FC236}">
+                <a16:creationId xmlns:a16="http://schemas.microsoft.com/office/drawing/2014/main" id="{6262041B-609D-4D0C-8D42-CE971BC1182E}"/>
+              </a:ext>
+            </a:extLst>
+          </p:cNvPr>
           <p:cNvSpPr txBox="1"/>
           <p:nvPr/>
         </p:nvSpPr>
         <p:spPr>
           <a:xfrm>
-            <a:off x="7327727" y="3206663"/>
-            <a:ext cx="3823483" cy="646331"/>
+            <a:off x="6169002" y="847405"/>
+            <a:ext cx="5429692" cy="646331"/>
           </a:xfrm>
           <a:prstGeom prst="rect">
             <a:avLst/>
@@ -11860,14 +11906,22 @@
           <a:lstStyle/>
           <a:p>
             <a:r>
-              <a:rPr lang="en-US" dirty="0"/>
-              <a:t>RAJAT TO ADD ANOTHER CHART </a:t>
-            </a:r>
-          </a:p>
-          <a:p>
-            <a:r>
-              <a:rPr lang="en-US" dirty="0"/>
-              <a:t>OR INFOGRAPHIC OF SORT </a:t>
+              <a:rPr lang="en-US" b="1" dirty="0">
+                <a:solidFill>
+                  <a:srgbClr val="002060"/>
+                </a:solidFill>
+              </a:rPr>
+              <a:t>Conditional Random Forest:  Accuracy: 85.85%</a:t>
+            </a:r>
+          </a:p>
+          <a:p>
+            <a:r>
+              <a:rPr lang="en-US" b="1" dirty="0">
+                <a:solidFill>
+                  <a:srgbClr val="002060"/>
+                </a:solidFill>
+              </a:rPr>
+              <a:t>                        </a:t>
             </a:r>
           </a:p>
         </p:txBody>

</xml_diff>

<commit_message>
Final Jodi PP Edits
</commit_message>
<xml_diff>
--- a/Attrition_Case_Study_2_pptx_TAJAR_IP.pptx
+++ b/Attrition_Case_Study_2_pptx_TAJAR_IP.pptx
@@ -7108,12 +7108,12 @@
         </p:nvSpPr>
         <p:spPr>
           <a:xfrm>
-            <a:off x="2804573" y="324321"/>
-            <a:ext cx="7077667" cy="1337554"/>
-          </a:xfrm>
-        </p:spPr>
-        <p:txBody>
-          <a:bodyPr vert="horz" lIns="91440" tIns="45720" rIns="91440" bIns="45720" rtlCol="0" anchor="ctr">
+            <a:off x="5263897" y="137636"/>
+            <a:ext cx="6559859" cy="912813"/>
+          </a:xfrm>
+        </p:spPr>
+        <p:txBody>
+          <a:bodyPr vert="horz" lIns="91440" tIns="45720" rIns="91440" bIns="45720" rtlCol="0" anchor="b">
             <a:normAutofit/>
           </a:bodyPr>
           <a:lstStyle/>
@@ -7125,6 +7125,36 @@
           </a:p>
         </p:txBody>
       </p:sp>
+      <p:pic>
+        <p:nvPicPr>
+          <p:cNvPr id="8" name="Picture 7" descr="A screenshot of a cell phone&#10;&#10;Description generated with very high confidence">
+            <a:extLst>
+              <a:ext uri="{FF2B5EF4-FFF2-40B4-BE49-F238E27FC236}">
+                <a16:creationId xmlns:a16="http://schemas.microsoft.com/office/drawing/2014/main" id="{18116775-A47D-473A-A257-71AB1AF707F5}"/>
+              </a:ext>
+            </a:extLst>
+          </p:cNvPr>
+          <p:cNvPicPr>
+            <a:picLocks noChangeAspect="1"/>
+          </p:cNvPicPr>
+          <p:nvPr/>
+        </p:nvPicPr>
+        <p:blipFill>
+          <a:blip r:embed="rId2"/>
+          <a:stretch>
+            <a:fillRect/>
+          </a:stretch>
+        </p:blipFill>
+        <p:spPr>
+          <a:xfrm>
+            <a:off x="494822" y="840697"/>
+            <a:ext cx="3442150" cy="3337842"/>
+          </a:xfrm>
+          <a:prstGeom prst="rect">
+            <a:avLst/>
+          </a:prstGeom>
+        </p:spPr>
+      </p:pic>
       <p:sp>
         <p:nvSpPr>
           <p:cNvPr id="4" name="AutoShape 2" descr="data:image/png;base64,iVBORw0KGgoAAAANSUhEUgAABUAAAAPACAMAAADDuCPrAAABYlBMVEUAAAAAADoAAGYAOjoAOmYAOpAAZrYzMzM6AAA6OgA6Ojo6OmY6ZmY6ZpA6ZrY6kLY6kNtNTU1NTW5NTY5Nbm5Nbo5NbqtNjshmAABmADpmOgBmOjpmZjpmZmZmZpBmkGZmkLZmkNtmtttmtv9uTU1ubk1ubm5ubo5ujqtujshuq8huq+SOTU2Obk2Obm6Oq8iOyOSOyP+QOgCQOjqQZjqQZmaQZpCQkGaQkLaQtraQttuQ2/+rbk2rjk2rjm6rq8iryOSr5Mir5P+2ZgC2Zjq2kDq2kGa2kJC2tpC2tra2ttu229u22/+2///Ijk3Ijm7Iq27Iq6vIyKvI5KvI5OTI5P/I///bkDrbkGbbtmbbtpDbtrbb27bb29vb2//b/7bb///kq27kyI7kyKvk5P/k///r6+v8jVn/tmb/yI7/25D/27b/29v/5Kv/5Mj/5OT//7b//7///8j//9v//+T///+zjZs9AAAACXBIWXMAAB2HAAAdhwGP5fFlAAAgAElEQVR4nO3d/59b5ZnecU0wMDGEILMYh0CWwmwDxaSLN3S7xHW3mGQXkni3aY0TEijO1q2/YMe1rP+/0iNpRnPbM+fMM9e5n3PffN4/xB472Eiv6/mgGUlnJnMAQJVJ638BAIiKgAJAJQIKAJUIKABUIqAAUImAAkAlAgoAlQgoAFQioABQiYACQCUCCgCVCCgAVCKgAFCJgAJAJQIKAJVGENDZl298fzKZ7Lzw8Ten/rNuT570zvzhhcnOLwT/pgCwrXlAZ7/aPWjdS6dNKAEF4Kd1QO+9fih2p+0cAQXgp3FA7y4ffu689dXip9/+6vuCgh78ud/7reRPAoCjtA3o4qHh1ufts1/KCkpAAQyvbUCvLor59tbHy8/An1P8wQQUwPCaBnT5CfzLh37lRvmapeRPJqAABtY0oItcmswtP6d/rvzGwQPRq5vK3vv5Irg7P/jNwT/9zuzT3cnOC09+1n84oJsnka4ufyh/ygsfL3/9yx8vev3Cr/f/f+YvAIBjtQzo7NKTn7Cvmroo3n7/NvWbfWpe7LQM6NUjnro/OqA31n/Iywd/4PpB8BN/AQAcq2VAlw837efrt1c9vHrwO4tfefabVW03VtVdpPBs+fDZJ3t3ZED/fv8Pefvq4ddOPfkXAMCxWgZ0UbknHjyuo3r7IGLrli4fOb709Xz+7aebx4zlseQPv5l/+/VT/+inBnRh+Rn6l4tP1Z+Z7Lz9zeqZ/+fmT/0LAOBYLQN6+ymffS8D+vJ866Xv68/mtx6t3l5/5fTGMaE7OqAvb/6MzV9wdfUQ9il/AQAca6QBXdZxlbr180nbTysdPCY98kWjRwZ0/aubv2a+/yWCp/wFAHCssQZ0UcDypc3lVyaXMdtu2u39xj7lq58rRwb0uYO/5p1D/9en/AUAcKyRfg10Gc7ye+uQbj/Ds3mW58YxT/YcGdCXD//K/v/1aX8BABxrbM/C70f19qFP5W3f7Cfd1qkDeuRjWwDYGOfrQOclcYuIbR6IElAA4zPOdyItlbcNbV7OtPlSqPmntQHliSMAJ9I0oFu5XNt6L3z5HH7/qZ2rTz6vIw3o0/4CADhW26sx2Zdy3t765HnxmPDZ/7X/ls7tp9xv7H95VBjQp/wFAHCstgEtX3k8eOf5jcn2C5tulDderku2deGmzfNM2oA+5S8AgGM1viL9veUVlQ9dkf7gC5Grq9VvSrZ8F9GZX6+/h9LmvZfCgD7lLwCAY435eyJd3X42fPtp8lUbxQF98i8AgGO1Duih78q5c/g6crcn28+Mz36++b+dWV2wUxzQJ/8CADhW84AufPnz5Sfvz7xovy/89lVBl/60vN7x+lrIc31An/gLAOBYYwgoAIREQAGgEgEFgEoEFAAqEVAAqERAAaASAQWASgQUACoRUACoREABoBIBBYBKBBQAKhFQAKhEQAGgEgEFgEoEFAAqEVAAqNQwoP8HEtyT6MRIVEzFCGh43JPoxEhUTMUIaHjck+jESFRMxQhoeNyT6MRIVEzFCGh43JPoxEhUTMUIaHjck+jESFRMxQhoeNyT6MRIVEzFCGh43JPoxEhUTMUIaHjck+jESFRMxQhoeNyT6MRIVEzFCGh43JPoxEhUTMUIaHjck+jESFRMxQhoeNyT6MRIVEzFCGh43JPoxEhUTMUIaHjck+jESFRMxQhoeNyT6MRIVEzFCGh43JPoxEhUTMUIaHjck+jESFRMxQhoeNyT6MRIVEzFCGh43JPoxEhUTMUIaHjck+jESFRMxQhoeNyT6MRIVEzFCGh43JPoxEhUTMUIaHjck+jESFRMxQhoeNyT6MRIVEzFCGh43JPoxEhUTMUIaHjck+jESFRMxQhoeNyT6MRIVEzFCGh43JPoxEhUTMUIaHjck+jESFRMxQhoeNyT6MRIVEzFCGh43JPoxEhUTMUIaHjck+jESFRMxQhoeNyT6MRIVEzFCGh43JPoxEhUTMUIaHjck+jESFRMxQhoeNyT6MRIVEzFUgX0/+I7RL+fxAioiqkYAUVQ+v0kRkBVTMUIKILS7ycxAqpiKkZAEZR+P4kRUBVTMQKKoPT7SYyAqpiKEVAEpd9PYgRUxVSMgCIo/X4SI6AqpmIEFEHp95MYAVUxFSOgCEq/n8QIqIqpGAFFUPr9JEZAVUzFCCiC0u8nMQKqYipGQBGUfj+JEVAVUzECiqD0+0mMgKqYihFQBKXfT2IEVMVUjIAiKP1+EiOgKqZiBBRB6feTGAFVMRUjoAhKv5/ECKiKqRgBRVD6/SRGQFVMxQgogtLvJzECqmIqRkARlH4/iRFQFVMxAoqg9PtJjICqmIoRUASl309iBFTFVIyAIij9fhIjoCqmYgQUQen3kxgBVTEVI6AISr+fxAioiqkYAUVQ+v0kRkBVTMUIKILS7ycxAqpiKkZAEZR+P4kRUBVTMQKKoPT7SYyAqpiKEVAEpd9PYgRUxVSMgCIo/X4SI6AqpmKnDeiji6+tf/b4yt50+u71rg8IKDT0+0mMgKqIA3pt+tqmpNOlV744/gMCChH9fhIjoCrSgD6+Nt0E9Nr0/PX5g8vT87eO/YCAQkS/n8QIqIoyoP/2wXQT0Pt75RHmo4vnPjnuAwIKFf1+EiOgKsKA3pxO3/vzOqA39398/7gPCChU9PtJjICqKAP66j/O76zzeG36YfmxfHz0BwQUKvr9JEZAVYQB3cri48vrT9Dv752/dfQHq3/m+ZVT/s1P0fpIw5N+P8BJEVAEpd8PcFL6gL7yxdEfHPpH9Y+uWx9peNLvJzE+hVcZPKDdj0AJKAT0+0mMgKoQUOSg309iBFRlmIDyLDy86feTGAFVGSigm1d5rl/6edQHBBQq+v0kRkBVBgoo70SCM/1+EiOgKgMF9PHl6av773g/+gMCChX9fhIjoCoDBXT+YPuaS0d/QEAhot9PYgRUZaiAzh9cWVTy3VtdHxBQaOj3kxgBVREH9BT0t631kYYn/X4SI6AqpmIEFEHp95MYAVUxFSOgCEq/n8QIqIqpGAFFUPr9JEZAVUzFCCiC0u8nMQKqYipGQBGUfj+JEVAVUzECiqD0+0mMgKqYihFQBKXfT2IEVMVUjIAiKP1+EiOgKqZiBBRB6feTGAFVMRUjoAhKv5/ECKiKqRgBRVD6/SRGQFVMxQgogtLvJzECqmIqRkARlH4/iRFQFVMxAoqg9PtJjICqmIoRUASl309iBFTFVIyAIij9fhIjoCqmYgQUQen3kxgBVTEVI6AISr+fxAioiqkYAUVQ+v0kRkBVTMUIKILS7ycxAqpiKkZAEZR+P4kRUBVTMQKKoPT7SYyAqpiKEVAEpd9PYgRUxVSMgCIo/X4SI6AqpmIEFEHp95MYAVUxFSOgCEq/n8QIqIqpGAFFUPr9JEZAVUzFCCiC0u8nMQKqYipGQBGUfj+JEVAVUzECiqD0+0mMgKqYihFQBKXfT2IEVMVUjIAiKP1+EiOgKqZiBBRB6feTGAFVMRUjoAhKv5/ECKiKqRgBRVD6/SRGQFVMxQgogtLvJzECqmIqRkARlH4/iRFQFVMxAoqg9PtJjICqmIoRUASl309iBFTFVIyAIij9fhIjoCqmYgQUQen3kxgBVTEVI6AISr+fxAioiqkYAUVQ+v0kRkBVTMUIKILS7ycxAqpiKkZAEZR+P4kRUBVTMQKKoPT7SYyAqpiKEVAEpd9PYgRUxVSMgCIo/X4SI6AqpmIEFEHp95MYAVUxFSOgCEq/n8QIqIqpGAFFUPr9JEZAVUzFCCiC0u8nMQKqYipGQBGUfj+JEVAVUzECiqD0+0mMgKqYihFQBKXfT2IEVMVUjIAiKP1+EiOgKqZiBBRB6feTGAFVMRUjoAhKv5/ECKiKqRgBRVD6/SRGQFVMxQgogtLvJzECqmIqRkARlH4/iRFQFVMxAoqg9PtJjICqmIoRUASl309iBFTFVIyAIij9fhIjoCqmYgQUQen3kxgBVTEVI6AISr+fxAioiqkYAUVQ+v0kRkBVTMUIKILS7ycxAqpiKkZAEZR+P4kRUBVTMQKKoPT7SYyAqpiKEVAEpd9PYgRUxVSMgCIo/X4SI6AqpmIEFEHp95MYAVUxFSOgCEq/n8QIqIqpGAFFUPr9JEZAVUzFCCiC0u8nMQKqYipGQBGUfj+JEVAVU7GGAdVrfaThqfXaAB6BIiz9fhLjEaiKqRgBRVD6/SRGQFVMxQgogtLvJzECqmIqRkARlH4/iRFQFVMxAoqg9PtJjICqmIoRUASl309iBFTFVIyAIij9fhIjoCqmYgQUQen3kxgBVTEVI6AISr+fxAioiqkYAUVQ+v0kRkBVTMUIKILS7ycxAqpiKkZAEZR+P4kRUBVTMQKKoPT7SYyAqpiKEVAEpd9PYgRUxVSMgCIo/X4SI6AqpmIEFEHp95MYAVUxFSOgCEq/n8QIqIqpGAFFUPr9JEZAVUzFCCiC0u8nMQKqYipGQBGUfj+JEVAVUzECiqD0+0mMgKqYihFQBKXfT2IEVMVUjIAiKP1+EiOgKqZiBBRB6feTGAFVMRUjoAhKv5/ECKiKqRgBRVD6/SRGQFVMxQgogtLvJzECqmIqRkARlH4/iRFQFVMxAoqg9PtJjICqmIoRUASl309iBFTFVIyAIij9fhIjoCqmYgQUQen3kxgBVTEVI6AISr+fxAioiqkYAUVQ+v0kRkBVTMUIKILS7ycxAqpiKkZAEZR+P4kRUBVTMQKKoPT7SYyAqpiKEVAEpd9PYgRUxVSMgCIo/X4SI6AqpmIEFEHp95MYAVUxFSOgCEq/n8QIqIqpGAFFUPr9JEZAVUzFCCiC0u8nMQKqYipGQBGUfj+JEVAVUzECiqD0+0mMgKqYihFQBKXfT2IEVMVUjIAiKP1+EiOgKqZiBBRB6feTGAFVMRUjoAhKv5/ECKiKqRgBRVD6/SRGQFVMxQgogtLvJzECqmIqRkARlH4/iRFQFVMxAoqg9PtJjICqmIoRUASl309iBFTFVIyAIij9fhIjoCqmYgQUQen3kxgBVTEVI6AISr+fxAioiqkYAUVQ+v0kRkBVTMUIKILS7ycxAqpiKkZAEZR+P4kRUBVTMQKKoPT7SYyAqpiKEVAEpd9PYgRUxVSMgCIo/X4SI6AqpmIEFEHp95MYAVUxFSOgCEq/n8QIqIqpGAFFUPr9JEZAVUzFCCiC0u8nMQKqYipGQBGUfj+JEVAVUzECiqD0+0mMgKqYihFQBKXfT2IEVMVUjIAiKP1+EiOgKqZiBBRB6feTGAFVMRUjoAhKv5/ECKiKqRgBRVD6/SRGQFVMxQgogtLvJzECqmIqRkARlH4/iRFQFVMxAoqg9PtJjICqmIoRUASl309iBFTFVIyAIij9fhIjoCqmYgQUQen3kxgBVTEVI6AISr+fxAioiqmYKKCPL083XvliPn908eDni9+8sjedvnudgEJJv5/ECKiKS0Dv720FdF3TVUwJKET0+0mMgKoME9CN+3vnPln8cGf62sGvXZuevz5/cHl6/hYBhY5+P4kRUJVBA7p4IPr+qpnvbzV1/Ti0pJWAQkS/n8QIqMqgAb25epj5+PJWLG+uH43e3IoqAcWp6feTGAFVGTKgjy5OP1z9eP53H0ynP72+/ODa6tcOf1pPQHFa+v0kRkBVhgzo5sHm5jmkZTr3H43e39t8EfT5FeXfvNL6SMOTfj/ASSkDuv9lzjvT6Xu35n+5Ml18TEAxDP1+gJNSBvTO5on2zSPR5XNJWwE1L2TSP7pufaThSb+fxPgUXmW4gD6+vP5q56GiPuURKAGFgH4/iRFQleEC+sRDzPIrBBTD0O8nMQKqMlxAn3iafdVMnoXHIPT7SYyAqgwX0P1Xz+9/Ll+auXn9J68DhZR+P4kRUJXBArr16vlrqwebq5DyTiQMQr+fxAioymABfXRx/0ug9/eWL2N68EF5Vn6R0Vd5Lzzk9PtJjICqDBbQ7SeJbq4vxnR9+cEDrsaEAej3kxgBVRksoHe2H2I++Nl0eu699ccPriz6+e4t+w/ob1vrIw1P+v0kRkBVBgvoielvW+sjDU/6/SRGQFVMxQgogtLvJzECqmIqRkARlH4/iRFQFVMxAoqg9PtJjICqmIoRUASl309iBFTFVKwjoLM/fvY5AcUY6feTGAFV6RvQe//pm/n84euTyeTMLwgoxke/n8QIqErPgN6YfO+38/nVydLyZwQUI6PfT2IEVKVfQG+XbN7dnTz7zb0Lk5cJKEZHv5/ECKhKv4BeXZRzmdGdXyz/d/lzAopx0e8nMQKq0iugs0vLcq4z+vDCMJ/D629b6yMNT/r9JEZAVXoFdNXMhxcmz80JKMZJv5/ECKjKCQJ6d3fyDgHFSOn3kxgBVekV0NWn8DfKl0D5GihGSb+fxAioSq+Azq9Onls+/b4sJ8/CY5T0+0mMgKr0C+jt8gLQxWfws59PVo9DCSjGRb+fxAioSr+ALj59X3iuPJG0884g/SSgOBX9fhIjoCo9Azq/99FPPl788PBHP/jNMP0koDgV/X4SI6AqfQM6PP1ta32k4Um/n8QIqIqp2LEBnX09YD8JKE5Fv5/ECKiKqdjRAf3yx8v3wz/80VuDvIaJgOKU9PtJjICq9Azo7NPVdZgeXpicGeZiTAQUp6LfT2IEVKVnQK9OJmf+evd7v5393WSg19ETUJyKfj+JEVCVfgG9PZm8vX4P5x9Wb+gkoBgX/X4SI6Aq/QJ6dfnuo/Wb4G+US4oQUIyLfj+JEVCVXgFdvRd+HdC7u1xMBOOj309iBFSlV0A3l7Mr5eRqTBgj/X4SI6AqBBQ56PeTGAFV6RXQ2aXlE0frcnI5O4yRfj+JEVCVXgFdPXG0CugipjyJhPHR7ycxAqrSL6B3dycvfVMCeu91LmeHMdLvJzECqtIvoOVydmd3d178/uLHYa6nTEBxKvr9JEZAVXoGdP773cnaQP0koDgV/X4SI6AqfQM6//ZXZxf1fGawy4ESUJyKfj+JEVCV3gEdnP62tT7S8KTfT2IEVMVUjOuBIij9fhIjoCqmYlwPFEHp95MYAVXpGVCuB4qR0+8nMQKq0jOgXA8UI6ffT2IEVKVfQLkeKMZOv5/ECKhKv4ByPVCMnX4/iRFQlV4B5XqgGD39fhIjoCq9Asrl7DB6+v0kRkBVCChy0O8nMQKq0iugXA8Uo6ffT2IEVKVXQLkeKEZPv5/ECKhKv4ByPVCMnX4/iRFQlX4B5XqgGDv9fhIjoCo9A8r1QDFy+v0kRkBV+gaU64Fi3PT7SYyAqvQO6OD0t631kYYn/X4SI6AqpmIEFEHp95MYAVUxFTvihfQ/emnQaykTUJyafj+JEVCVfgG9MJk8M9iVlAkoBPT7SYyAqvQK6OpyypMzHw/ZUP1ta32k4Um/n8QIqEqvgC786celoS98TEAxSvr9JEZAVfoGdL76rkgLQ72QSX/bWh9peNLvJzECqnKCgC4+lf/y9WVCd94a4ikl/W1rfaThSb+fxAioyokCuvDtz8tbkl7QPwzV37bWRxqe9PtJjICqnCigs199f/OGzslLBBRjot9PYgRUpX9AN/VcPhf/7af698Trb1vrIw1P+v0kRkBVegZ0/dXPg1eD6i+rrL9trY80POn3kxgBVekV0NmliX3ySP+NPfS3rfWRhif9fhIjoCq9Arp8J9LO4ZcvPbzAI1CMiX4/iRFQlZ4B/cGvzS/NPle/lEl/21ofaXjS7ycxAqrSK6Au9Let9ZGGJ/1+EiOgKqZiBBRB6feTGAFVMRXruCL9ztlB3oREQHFq+v0kRkBV+gb0xv4r6PmeSBgj/X4SI6AqPQO67OczL775Bt+VEyOl309iBFSlX0Dv7k6eXb2K6d4lvi88xki/n8QIqEq/gF49eN/R7NLkOQKK0dHvJzECqtIroLNLW4867+6qX0JPQHF6+v0kRkBVegX00Ps29W/iJKA4Pf1+EiOgKgQUOej3kxgBVekV0NmlyTv7H+ivw0RAcXr6/SRGQFV6BZQnkTB6+v0kRkBV+gX07u7kzOpyIn96nZcxYYz0+0mMgKr0C+jqjUhnz54d8q1Icq2PNDy1XhtwzFs5/7C7fifnztsD/dX6/zi0PtLwpN9PYjwCVekb0PnsyzcWj0Bf/HiQJ5AIKE5Lv5/ECKhK74AOTn/bWh9peNLvJzECqmIqRkARlH4/iRFQFVMxG9DZR28+6Se8DhSjo99PYgRUpSOgy28n9wTeiYTx0e8nMQKqQkCRg34/iRFQlY6AOtLfttZHGp70+0mMgKqYihFQBKXfT2IEVMVU7PiAfjVcPgkoTke/n8QIqIqp2NEB/fLH5X1IP/gNAcUY6feTGAFV6RnQ2aX9p5BeGui9SPrb1vpIw5N+P4kRUJV+AV32c+fFf/jsn97YnQx0NTsCilPR7ycxAqrSL6A3JpMfrh54zn452bq4MgHFWOj3kxgBVekV0MUD0INr2F3lgsoYIf1+EiOgKr0C+vDCoe/KyQvpMT76/SRGQFV6BpRvKoeR0+8nMQKq0iugfF94jJ5+P4kRUJVeAZ3f2Pq65w2+BooR0u8nMQKq0i+gs0v7L/+8MdC1RAgoTkW/n8QIqEqvgM4+Wr7+88W3Pvvn5Y8vDHNVUP1ta32k4Um/n8QIqEqvgLpc1E5/21ofaXjS7ycxAqpCQJGDfj+JEVCVXgF1ob9trY80POn3kxgBVTEVI6AISr+fxAioiqkYAUVQ+v0kRkBVTMWODugfP9v3OS+kx+jo95MYAVXpGdDf7/JN5TBq+v0kRkBV+gX0Nt+VEyOn309iBFSlV0BnlyY7H3+17+sh+klAcSr6/SRGQFV6BfThhYEuokxAoaLfT2IEVKVnQAd6/zsBhYp+P4kRUJVeAZ1dIqAYOf1+EiOgKr0COr/Bp/AYOf1+EiOgKv0Ceuh7ehBQjJB+P4kRUJV+AZ3fuzA58+aG+kJ2BBSnp99PYgRUpWdAP+V1oBg3/X4SI6Aq/QJ6gxfSY+T0+0mMgKr0Cmh5If0gn7cTUIjo95MYAVXpFVCP55AIKE5Fv5/ECKhKz4DyOlCMnH4/iRFQlV4B5YX0GD39fhIjoCq9Ajq/MXmZgGLU9PtJjICq9Avo7NLO2wQUY6bfT2IEVKVXQGcfvTGZ7LzIC+kxXvr9JEZAVXoF1HxbY14HivHR7ycxAqpCQJGDfj+JEVCVXgF1ob9trY80POn3kxgBVTEVI6AISr+fxAioiqkYAUVQ+v0kRkBVTMVsQGd/tN8F/uGPz77A10AxOvr9JEZAVToC+vDC6imj2UebFy9tfoWAYlT0+0mMgKr0DOhBNgkoRkm/n8QIqAoBRQ76/SRGQFUIKHLQ7ycxAqpCQJGDfj+JEVAVAooc9PtJjICqEFDkoN9PYgRUhYAiB/1+EiOgKgQUOej3kxgBVSGgyEG/n8QIqAoBRQ76/SRGQFUIKHLQ7ycxAqrSHdAnEVCMj34/iRFQFQKKHPT7SYyAqnQEdPbRm0/im8phfPT7SYyAqnQE1JH+trU+0vCk309iBFTFVIyAIij9fhIjoCqmYgQUQen3kxgBVTEVI6AISr+fxAioiqkYAUVQ+v0kRkBVTMUIKILS7ycxAqpiKkZAEZR+P4kRUBVTMQKKoPT7SYyAqpiKEVAEpd9PYgRUxVTsiXciXdr5xeKHb78moBg3/X4SI6AqHQF9eGH5xvfV/xJQjJh+P4kRUJXOgC4fgRJQjJ5+P4kRUJWOgM4uTZ79/Ks/Xfjer786MMzn8/rb1vpIw5N+P4kRUJWOgM5vcDk7hKDfT2IEVKUroLNP6wL66OK0eOWL5UePr+xNp+9eX/3WoQ8IKDT0+0mMgKp0BXSR0K8+++fdnX/47MDnPa4Hen9vK6Drmq5ieugDAgoR/X4SI6Aq3QGdVz2JdGf62sEH16bnr88fXJ6ev2U/IKAQ0e8nMQKq0iugs49OfBH6a9P3939+f2/9OPTcJ+YDAgoV/X4SI6AqvQJ6co8vb/Xx5vrR6M1lVA99QEChot9PYgRUpXdAv/3V2clk5+xb/V7D9Oji+d99MJ3+9Pryg2vTD8svlk/rD31AQKGi309iBFSlb0APXs70cp+Abp5DWtZy/9Ho/b3ztw59sPr/Pr/S5489mdZHGp70+wFO6qiALvv5zItvvvH9ngW9M52+d2v+lyvTRS4JKBzo9wOc1BEBvbs7efY35Wf3Lk3K5UU6bL7SuXwuaauZr3xx6IND/4j+0XXrIw1P+v0kxqfwKv0CenXy7OZp+NmlyXPdAd24MzUPOp/yCJSAQkC/n8QIqEqvgK4vardyd/fZ/q9pMg86CSiGot9PYgRUpVdAD72Q/kSvqi+Z5Fl4DE+/n8QIqMowAX18eTuTm5d8rl8HuvUBAYWKfj+JEVCVXgGdXZq8s//B7UmPT+GvrR5frkLKO5EwPP1+EiOgKr0CevInke7vLV/G9OCD8o73RUZf3X/7+6EPCChU9PtJjICq9Avo3d3JmV+Xn/3p9V4vY1p8hr665tL15QcPti/A9ICrMWEA+v0kRkBV+gV09Uaks2fP9n4r0vzBz6bTc++tH2U+uLJI5rtP+4CAQkO/n8QIqErPgM7/sLt+J+fO2736eXL629b6SMOTfj+JEVCVvgGdz758Y/EI9MWPT3pdOwIKF/r9JEZAVXoHdHD629b6SMOTfj+JEVAVUzECiqD0+0mMgKqYihFQBKXfT2IEVMVUjIAiKP1+EiOgKqZiBBRB6feTGAFVMRUjoAhKv5/ECKiKqRgBRVD6/SRGQFVMxQgogtLvJzECqmIqRkARlH4/iRFQFVOxo67G9IPfEFCMmn4/iRFQlV4BfXhh63qgBBRjpN9PYgRUpWdAT/BdPAgoWtDvJzECqtIroIe+qRwBxRjp95MYAVXpFdD5jc23hSegGCn9fhIjoCr9AvrtLyeTZ158c+0ng1zSTn/bWh9peJuln3QAABwGSURBVNLvJzECqtIroA8vTLYN8wVR/W1rfaThSb+fxAioCgFFDvr9JEZAVXoF1IX+trU+0vCk309iBFTFVIyAIij9fhIjoCqmYscGdPb1gP0koDgV/X4SI6AqpmJHB/TLHy+/+PnwR28N9V3l9Let9ZGGJ/1+EiOgKj0DOvt09ezRwwuTMwO9KUl/21ofaXjS7ycxAqrSM6BXJ5Mzf737vd/O/m4yeXaYx6D629b6SMOTfj+JEVCVfgG9PZm8vX5H/B92B7qwiP62tT7S8KTfT2IEVKVfQK9OXt6/pMiNyXMEFKOj309iBFSlV0BXFxNZB/TuLi+kx/jo95MYAVXpFdBVOtcBHeradvrb1vpIw5N+P4kRUBUCihz0+0mMgKr0Cujs0vKJo3U5bw/0NLz+trU+0vCk309iBFSlV0BXTxytArqIKU8iYXz0+0mMgKr0C+jd3clL35SA3nt9MtDV6fW3rfWRhif9fhIjoCr9Arp4CDqZnN3defH7ix9fHqSfBBSnot9PYgRUpWdA57/f3VwNdKB+ElCcin4/iRFQlb4BnX/7q7OLej4z3DeI19+21kcanvT7SYyAqvQO6OD0t631kYYn/X4SI6AqpmLHXw/0qwH7SUBxKvr9JEZAVUzFjr8e6AKfwmOc9PtJjICq9Azo7NL+t5R7aaArKutvW+sjDU/6/SRGQFX6BXTZz50X//Nn//TGoqDDvI6egOJU9PtJjICq9Avo7f1XL81+OeF6oBgh/X4SI6AqvQK6eAB68OrPq7yVEyOk309iBFSlV0AfXth6+ybXA8UY6feTGAFV6RnQrWZyOTuMkX4/iRFQlV4BXV2Rfu3uLpezw/jo95MYAVXpFdBD3wfpxkDvhtffttZHGp70+0mMgKr0C+jDC5MffrPp5zCfwRNQnIp+P4kRUJWOgM4+erN4Y/U60H9+c3cyefEnfAqP0dHvJzECqtIR0MVDzyfxJBLGR7+fxAioCgFFDpUj+X/4DpH2pegIqCP9bWt9pOGpciStjzQ8SftSmIoRUARVOZLWRxqepH0pTMUIKIKqHEnrIw1P0r4UpmJHB/SPn+37nGfhMTqVI2l9pOFJ2peiZ0APvqccTyJhlCpH0vpIw5O0L0W/gN7mWXiMXOVIWh9peJL2pegV0Nmlyc7HX+37eoh+ElCcSuVIWh9peJL2pegV0IcXBrqIMgGFSuVIWh9peJL2pegZ0IHe/05AoVI5ktZHGp6kfSl6BXR2iYBi5CpH0vpIw5O0L0WvgM5v8Ck8Rq5yJK2PNDxJ+1L0C+ih7+lBQDFClSNpfaThSdqXol9A5/cuTM68ucHl7DA+lSNpfaThSdqXomdAP+V1oBi3ypG0PtLwJO1L0S+gN3ghPUauciStjzQ8SftS9ApoeSH9IJ+3E1CIVI6k9ZGGJ2lfil4B9XgOiYDiVCpH0vpIw5O0L0XPgPI6UIxc5UhaH2l4kval6BVQXkiP0ascSesjDU/SvhS9AjrY94InoFCpHEnrIw1P0r4U/QI6u7TzNgHFmFWOpPWRhidpX4peAZ19VL4vPC+kx3hVjqT1kYYnaV+KXgE139yY14FifCpH0vpIw5O0LwUBRQ6VI2l9pOFJ2peiV0Bd6G9b6yMNT5UjaX2k4Unal8JUjIAiqMqRtD7S8CTtS2EqRkARVOVIWh9peJL2pTAVOyKg3361jW8qh/GpHEnrIw1P0r4UvQLq8iSSXusjDU+VI2l9pOFJ2pen4Vl4BFU5ktZHGp6kfSl6BXT2x8/W/v71yc4/fM4L6TE6lSNpfaThSdqXoldAt93dfXaYK4Pqb1vrIw1PlSNpfaThSdqX4sQBHezCIvrb1vpIw1PlSFofaXiS9qU4eUCHegiqv22tjzQ8VY6k9ZGGJ2lfipMHdKirK+tvW+sjDU+VI2l9pOFJ2pfi5AG9u0tAMT6VI2l9pOFJ2pfixAGdXZ3wKTzGp3IkrY80PEn7UvQK6OyjzaVA33xjd8KTSBihypG0PtLwJO1L0Sugh19Iz8uYMEKVI2l9pOFJ2pfixAF95q2BvkG8/ra1PtLwVDmS1kcanqR9KXoF1IX+trU+0vBUOZLWRxqepH0pTMUIKIKqHEnrIw1P0r4UpmIEFEFVjqT1kYYnaV8KUzECiqAqR9L6SMOTtC+FqZgN6NYLmA7wbY0xPpUjaX2k4Unal6IjoOZKoFwPFGNVOZLWRxqepH0pCChyqBxJ6yMNT9K+FB0Btb7cnfBOJIxR5UhaH2l4kvalOFFAZz9f5PPMbwbpJwHFqVSOpPWRhidpX4qTBPQPi4efO0O9EYmA4lQqR9L6SMOTtC9F/4AO+vCTgOKUKkfS+kjDk7QvRe+Aloef/26wfBJQnE7lSFofaXiS9qXoGdB7Az/8JKA4pcqRtD7S8CTtS9EvoIM//CSgOKXKkbQ+0vAk7UvRJ6D3Li2vAjrow08CilOqHEnrIw1P0r4UPQJaHn6+PXA+CShOp3IkrY80PEn7UnQG1OfhJwHFKVWOpPWRhidpX4qugP7e5+EnAcUpVY6k9ZGGJ2lfio6A8l54BFE5ktZHGp6kfSkIKHKoHEnrIw1P0r4UHQHleqAIonIkrY80PEn7UnQE1JH+trU+0vBUOZLWRxqepH0pTMUIKIKqHEnrIw1P0r4UpmIEFEFVjqT1kYYnaV8KUzECiqAqR9L6SMOTtC+FqRgBRVCVI2l9pOFJ2pfCVIyAIqjKkbQ+0vAk7UthKkZAEVTlSFofaXiS9qUwFSOgCKpyJK2PNDxJ+1KYihFQBFU5ktZHGp6kfSlMxQgogqocSesjDU/SvhSmYgQUQVWOpPWRhidpXwpTMQKKoCpH0vpIw5O0L4WpGAFFUJUjaX2k4Unal8JUjIAiqMqRtD7S8CTtS2EqRkARVOVIWh9peJL2pTAVI6AIqnIkrY80PEn7UpiKEVAEVTmS1kcanqR9KUzFCCiCqhxJ6yMNT9K+FKZiBBRBVY6k9ZGGJ2lfClMxAoqgKkfS+kjDk7QvhakYAUVQlSNpfaThSdqXwlSMgCKoypG0PtLwJO1LYSpGQBFU5UhaH2l4kvalMBUjoAiqciStjzQ8SftSmIoRUARVOZLWRxqepH0pTMUIKIKqHEnrIw1P0r4UpmIEFEFVjqT1kYYnaV8KUzECiqAqR9L6SMOTtC+FqRgBRVCVI2l9pOFJ2pfCVIyAIqjKkbQ+0vAk7UthKkZAEVTlSFofaXiS9qUwFSOgCKpyJK2PNDxJ+1KYihFQBFU5ktZHGp6kfSlMxQgogqocSesjDU/SvhSmYgQUQVWOpPWRhidpXwpTMQKKoCpH0vpIw5O0L4WpGAFFUJUjaX2k4Unal8JUjIAiqMqRtD7S8CTtS2EqRkARVOVIWh9peJL2pTAVI6AIqnIkrY80PEn7UpiKEVAEVTmS1kcanqR9KUzFCCiCqhxJ6yMNT9K+FKZiBBRBVY6k9ZGGJ2lfClMxAoqgKkfS+kjDk7QvhakYAUVQlSNpfaThSdqXwlSMgCKoypG0PtLwJO1LYSpGQBFU5UhaH2l4kvalMBUjoAiqciStjzQ8SftSmIrpAvpvP5tOz717vfz80cVp8coXy48eX9mbTte/Q0AhUjmS1kcanqR9KYYK6L+sknnuk+UH9/e2Arqu6SqmBBQilSNpfaThSdqXYqCA3pme+9v5/MHlVSfvTF87+K1r0/PXl79z/hYBhU7lSFofaXiS9qUYJqCPL08/XP64eLT5YWnm+/u/dX9v/Th09eCUgEKjciStjzQ8SftSDBPQRxfXn6GXdD6+vBXLm+tHoze3okpAcWqVI2l9pOFJ2pdimIDuKwF9dPH87z6YTn96ffUr5bHp4U/rCShOq3IkrY80PEn7Ugwb0NUn6pvnkJbp3H80en9v80XQ51e0f/NS6yMNT5UjaX2k4Unal6cRB3T1+fqd6fS9W/O/XFk+J09AMYzKkbQ+0vAk7cvTaAN6Z/Uyps2XPZefz28F1LyQSf/ouvWRhqfKkbQ+0vAk7UsxZEDv7J378HBPz996yiNQAgqBypG0PtLwJO1LMWBAb07NK5WWDzoJKIZROZLWRxqepH0phgvov9h+rprJs/AYROVIWh9peJL2pRgqoI+vTV9df41z86r6VTM3r//kdaCQqhxJ6yMNT9K+FEMF9NrWWzWvrR5srkLKO5EwiMqRtD7S8CTtSzFQQG9uv9X9/t7yZUwPPii/tsjoq7wXHnKVI2l9pOFJ2pdimIBurl+38FrJ6eoCTNeXv/eAqzFhAJUjaX2k4Unal2KYgN6ZHgro/MHy4qDvrR9yPriy+OV3b9l/Rn/bWh9peKocSesjDU/SvhTDBLSG/ra1PtLwVDmS1kcanqR9KUzFCCiCqhxJ6yMNT9K+FKZiBBRBVY6k9ZGGJ2lfClMxAoqgKkfS+kjDk7QvhakYAUVQlSNpfaThSdqXwlSMgCKoypG0PtLwJO1LYSpGQBFU5UhaH2l4kvalMBUjoAiqciStjzQ8SftSmIoRUARVOZLWRxqepH0pTMUIKIKqHEnrIw1P0r4UpmIEFEFVjqT1kYYnaV8KUzECiqAqR9L6SMOTtC+FqRgBRVCVI2l9pOFJ2pfCVIyAIqjKkbQ+0vAk7UthKkZAEVTlSFofaXiS9qUwFSOgCKpyJK2PNDxJ+1KYihFQBFU5ktZHGp6kfSlMxQgogqocSesjDU/SvhSmYgQUQVWOpPWRhidpXwpTMQKKoCpH0vpIw5O0L4WpGAFFUJUjaX2k4Unal8JUjIAiqMqRtD7S8CTtS2EqRkARVOVIWh9peJL2pTAVI6AIqnIkrY80PEn7UpiKEVAEVTmS1kcanqR9KUzFCCiCqhxJ6yMNT9K+FKZiBBRBVY6k9ZGGJ2lfClMxAoqgKkfS+kjDk7QvhakYAUVQlSNpfaThSdqXwlSMgCKoypG0PtLwJO1LYSpGQBFU5UhaH2l4kvalMBUjoAiqciStjzQ8SftSmIoRUARVOZLWRxqepH0pTMUIKIKqHEnrIw1P0r4UpmIEFEFVjqT1kYYnaV8KUzECiqAqR9L6SMOTtC+FqRgBRVCVI2l9pOFJ2pfCVIyAIqjKkbQ+0vAk7UthKkZAEVTlSFofaXiS9qUwFSOgCKpyJK2PNDxJ+1KYihFQBFU5ktZHGp6kfSlMxQgogqocSesjDU/SvhSmYgQUQVWOpPWRhidpXwpTMQKKoCpH0vpIw5O0L4WpGAFFUJUjaX2k4Unal8JUjIAiqMqRtD7S8CTtS2EqRkARVOVIWh9peJL2pTAVI6AIqnIkrY80PEn7UpiKEVAEVTmS1kcanqR9KUzFCCiCqhxJ6yMNT9K+FKZiBBRBVY6k9ZGGJ2lfClMxAoqgKkfS+kjDk7QvhakYAUVQlSNpfaThSdqXwlSMgCKoypG0PtLwJO1LYSpGQBFU5UhaH2l4kvalMBUjoAiqciStjzQ8SftSmIoRUARVOZLWRxqepH0pTMUIKIKqHEnrIw1P0r4UpmIEFEFVjqT1kYYnaV8KUzECiqAqR9L6SMOTtC+FqRgBRVCVI2l9pOFJ2pfCVIyAIqjKkbQ+0vAk7UthKkZAEVTlSFofaXiS9qUwFSOgCKpyJK2PNDxJ+1KYihFQBFU5ktZHGp6kfSlMxQgogqocSesjDU/SvhSmYgQUQVWOpPWRhidpXwpTMQKKoCpH0vpIw5O0L4WpGAFFUJUjaX2k4Unal8JUjIAiqMqRtD7S8CTtS2EqRkARVOVIWh9peJL2pTAVI6AIqnIkrY80PEn7UpiKEVAEVTmS1kcanqR9KUzFCCiCqhxJ6yMNT9K+FKZiBBRBVY6k9ZGGJ2lfClMxAoqgKkfS+kjDk7QvhakYAUVQlSNpfaThSdqXwlSMgCKoypG0PtLwJO1LYSpGQBFU5UhaH2l4kvalMBVrGFC91kcanipH0vpIw5O0L0/DI1AEVTmS1kcanqR9KUzFCCiCqhxJ6yMNT9K+FKZiBBRBVY6k9ZGGJ2lfClMxAoqgKkfS+kjDk7QvhakYAUVQlSNpfaThSdqXwlSMgCKoypG0PtLwJO1LYSpGQBFU5UhaH2l4kvalMBUjoAiqciStjzQ8SftSmIoRUARVOZLWRxqepH0pTMUIKIKqHEnrIw1P0r4UpmIEFEFVjqT1kYYnaV8KUzECiqAqR9L6SMOTtC+FqRgBRVCVI2l9pOFJ2pfCVIyAIqjKkbQ+0vAk7UthKkZAEVTlSFofaXiS9qUwFSOgCKpyJK2PNDxJ+1KYihFQBFU5ktZHGp6kfSlMxQgogqocSesjDU/SvhSmYgQUQVWOpPWRhidpXwpTMQKKoCpH0vpIw5O0L4WpGAFFUJUjaX2k4Unal8JUjIAiqMqRtD7S8CTtS2EqRkARVOVIWh9peJL2pTAVI6AIqnIkrY80PEn7UpiKEVAEVTmS1kcanqR9KUzFCCiCqhxJ6yMNT9K+FKZiBBRBVY6k9ZGGJ2lfClMxAoqgKkfS+kjDk7QvhakYAUVQlSNpfaThSdqXwlSMgCKoypG0PtLwJO1LYSpGQBFU5UhaH2l4kvalMBUjoAiqciStjzQ8SftSmIoRUARVOZLWRxqepH0pTMUIKIKqHEnrIw1P0r4UpmIEFEFVjqT1kYYnaV8KUzECiqAqR9L6SMOTtC+FqRgBRVCVI2l9pOFJ2pfCVIyAIqjKkbQ+0vAk7UthKkZAEVTlSFofaXiS9qUwFSOgCKpyJK2PNDxJ+1KYihFQBFU5ktZHGp6kfSlMxQgogqocSesjDU/SvhSmYgQUQVWOpPWRhidpXwpTMQKKoCpH0vpIw5O0L4WpGAFFUJUjaX2k4Unal8JUjIAiqMqRtD7S8CTtS2EqRkARVOVIWh9peJL2pTAVI6AIqnIkrY80PEn7UpiKEVAEVTmS1kcanqR9KUzFCCiCqhxJ6yMNT9K+FKZiBBRBVY6k9ZGGJ2lfClMxAoqgKkfS+kjDk7QvhakYAUVQlSNpfaThSdqXwlSMgCKoypG0PtLwJO1LYSpGQBFU5UhaH2l4kvalMBUjoAiqciStjzQ8SftSmIoRUARVOZLWRxqepH0pTMUIKIKqHEnrIw1P0r4UpmIEFEFVjqT1kYYnaV8KUzECiqAqR9L6SMOTtC+FqRgBRVCVI2l9pOFJ2pfCVIyAIqjKkbQ+0vAk7UthKkZAEVTlSFofaXiS9qUwFSOgCKpyJK2PNDxJ+1KYihFQBFU5ktZHGp6kfSlMxQgogqocSesjDU/SvhSmYgQUQVWOpPWRhidpXwpTMQKKoCpH0vpIw5O0L4WpGAFFUJUjaX2k4Unal8JUjIAiqMqRtD7S8CTtS2EqRkARVOVIWh9peJL2pTAVI6AIqnIkrY80PEn7UpiKEVAEVTmS1kcanqR9KUzFCCiCqhxJ6yMNT9K+FKZiBBRBVY6k9ZGGJ2lfClMxAoqgKkfS+kjDk7QvhakYAUVQlSNpfaThSdqXwlSMgCKoypG0PtLwJO1LYSpGQBFU5UhaH2l4kvalMBUjoAiqciStjzQ8SftSmIp5BPTxlb3p9N3rBBRKlSNpfaThSdqXwj+gjy5Ol175goBCqHIkrY80PEn7UvgH9Nr0/PX5g8vT87cIKHQqR9L6SMOTtC+Fe0Dv75XHno8unvuEgEKnciStjzQ8SftSuAf05vS19Y/vE1DoVI6k9ZGGJ2lfCveAXpt+WH68sw4pAYVE5UhaH2l4kval8A7o48vrT93v722+CPr8iv7van2k4alyJK2PNDxJ+/I0qQIKAJ48A2peyKR/dP3dxD2JToxEpWFAzeuYWt8TWXBPohMjUSGg2XBPohMjUfEOqOez8N9N3JPoxEhU3AO6ef2nw+tAv5u4J9GJkai4B9TxnUjfTdyT6MRIVNwD+vjy9FWn98J/N3FPohMjUXEP6PyB29WYvpu4J9GJkaj4B3T+4Mqin+/esr/c+p7IgnsSnRiJSoOAHqH1PZEF9yQ6MRIVUzECGh73JDoxEhVTMQIaHvckOjESFVMxAhoe9yQ6MRIVUzECGh73JDoxEhVTMQIaHvckOjESFVMxAhoe9yQ6MRIVUzECGh73JDoxEhVTMQIaHvckOjESFVMxAhoe9yQ6MRIVUzECGh73JDoxEhVTMQIaHvckOjESFVMxAhoe9yQ6MRIVUzECGh73JDoxEhVTMQIaHvckOjESFVMxAhoe9yQ6MRIVUzECGh73JDoxEhVTMQIaHvckOjESFVMxAhoe9yQ6MRIVUzECGh73JDoxEhVTMQIaHvckOjESFVMxAhoe9yQ6MRIVUzECGh73JDoxEhVTMQIaHvckOjESFVMxAhoe9yQ6MRIVUzECGh73JDoxEhVTMQIaHvckOjESFVOxhgGFxvPPt/43wOgxkoEQ0PA4G+jESAZCQMPjbKATIxkIAQ2Ps4FOjGQgBDQ8zgY6MZKBENDwOBvoxEgGQkDD42ygEyMZCAEFgEoEFAAqEVAAqERAAaASAQWASgQUACoRUACoREABoBIBDeHRxen7+z995Yum/y4Yk8eXp+dv7f/0w7b/Mt9BBDSERUDPfbL5KQHFgft7m/+23tlPKdwQ0BAWAZ2+tvkpAcWWm9PVIB5d3Pw3Fn4IaAiLw/E368/PCCgO2Xx55+bmP7FwREBDWFTzf+xtHmisfnxwZTqdvnu96b8WxuBO+fLO/fU+FsPYm05/en31858tRvLv/7bhv1x2BDSEZTXXjzDWAb2zOCUL53ja4Dvv8eXlMq6tP0O5vzWM9c95aDocAhrCsprrJ1lXAV0cjXf/9/zxv0z5uhfu75375P7e6hmkxSf0792aP/7X5RdGF4v5D4tf/Lc9RjIYAhpCqebqk7RVQDdf8LrGowssVnD+v6wjuRnGzen7PK3kgICGsKpmqWX56f5L/njpCrZfpPH48rqZy0eki5W8+j9b/nt9BxDQEFYBLY8oyk/3H1vwnDzmy/+OrmewaObG4lduLn989b/yn9jhENAQNs8cLR5vrgO6PjAEFPPV483yk+Vj0YOAzv/8N+Wn75HQoRDQEDadvDZ9n0egeMJWQM2XPR//9+Urmd5/2j8EAQIawqaTi/Px3/gaKKz9gD7t/fCP/5WRDIaAhrD/QPPO9K/2eBYexn5AF8NY/Wz5X9bNa+sPfhdqBDSEg8/Ur62+uLV6HehfrvA6UMy3E/no4vT89fn8z3uLR6LLKzUtfv7gMv+VHQwBDeEgoIty8k4kGFuPMdfDmL43P3gn0qt8nXwoBDSEreeKNhff4b3w2Lf9SfrqvfD/ePDzv/qPfAI/GAIKAJUIKABUIqAAUImAAkAlAgoAlQgoAFQioABQiYACQCUCCgCVCCgAVCKgAFCJgAJAJQIKAJUIKABUIqAAUImAAkAlAgoAlQgoAFQioABQiYACQCUCCgCVCCgAVCKgAFCJgAJAJQIKAJUIKABUIqAAUImAAkAlAgoAlQgoAFQioABQiYACQCUCCgCVCCgAVCKgAFCJgAJAJQIKAJUIKABUIqAAUImAAkAlAgoAlQgoAFQioABQiYACQCUCCgCVCCgAVCKgAFCJgAJAJQIKAJUIKABUIqAAUOn/A71FEGOQyBlxAAAAAElFTkSuQmCC">
@@ -7262,10 +7292,10 @@
       </p:sp>
       <p:grpSp>
         <p:nvGrpSpPr>
-          <p:cNvPr id="13" name="Group 12">
+          <p:cNvPr id="22" name="Group 21">
             <a:extLst>
               <a:ext uri="{FF2B5EF4-FFF2-40B4-BE49-F238E27FC236}">
-                <a16:creationId xmlns:a16="http://schemas.microsoft.com/office/drawing/2014/main" id="{8E7FC7AA-7A16-4E21-B31E-3BCD8099D604}"/>
+                <a16:creationId xmlns:a16="http://schemas.microsoft.com/office/drawing/2014/main" id="{AB60B159-00AA-4B97-88B7-FCC3E69B511B}"/>
               </a:ext>
             </a:extLst>
           </p:cNvPr>
@@ -7274,18 +7304,18 @@
         </p:nvGrpSpPr>
         <p:grpSpPr>
           <a:xfrm>
-            <a:off x="494815" y="2202027"/>
-            <a:ext cx="5601185" cy="2712955"/>
-            <a:chOff x="494815" y="2202027"/>
-            <a:chExt cx="5601185" cy="2712955"/>
+            <a:off x="8395479" y="3280909"/>
+            <a:ext cx="3428277" cy="3324390"/>
+            <a:chOff x="489448" y="3473374"/>
+            <a:chExt cx="3428277" cy="3324390"/>
           </a:xfrm>
         </p:grpSpPr>
         <p:pic>
           <p:nvPicPr>
-            <p:cNvPr id="3" name="Picture 2">
+            <p:cNvPr id="7" name="Picture 6" descr="A screenshot of a cell phone&#10;&#10;Description generated with high confidence">
               <a:extLst>
                 <a:ext uri="{FF2B5EF4-FFF2-40B4-BE49-F238E27FC236}">
-                  <a16:creationId xmlns:a16="http://schemas.microsoft.com/office/drawing/2014/main" id="{29FF43C2-F3E5-418D-9300-E688714834FC}"/>
+                  <a16:creationId xmlns:a16="http://schemas.microsoft.com/office/drawing/2014/main" id="{7B2A482F-985C-4724-8738-055D42619260}"/>
                 </a:ext>
               </a:extLst>
             </p:cNvPr>
@@ -7295,15 +7325,15 @@
             <p:nvPr/>
           </p:nvPicPr>
           <p:blipFill>
-            <a:blip r:embed="rId2"/>
+            <a:blip r:embed="rId3"/>
             <a:stretch>
               <a:fillRect/>
             </a:stretch>
           </p:blipFill>
           <p:spPr>
             <a:xfrm>
-              <a:off x="494815" y="2202027"/>
-              <a:ext cx="5601185" cy="2712955"/>
+              <a:off x="489448" y="3473374"/>
+              <a:ext cx="3428277" cy="3324390"/>
             </a:xfrm>
             <a:prstGeom prst="rect">
               <a:avLst/>
@@ -7312,10 +7342,10 @@
         </p:pic>
         <p:sp>
           <p:nvSpPr>
-            <p:cNvPr id="11" name="Rectangle: Rounded Corners 10">
+            <p:cNvPr id="9" name="Rectangle: Rounded Corners 8">
               <a:extLst>
                 <a:ext uri="{FF2B5EF4-FFF2-40B4-BE49-F238E27FC236}">
-                  <a16:creationId xmlns:a16="http://schemas.microsoft.com/office/drawing/2014/main" id="{1AC50FB9-CF86-4D14-AB77-DAA6A5C01DD8}"/>
+                  <a16:creationId xmlns:a16="http://schemas.microsoft.com/office/drawing/2014/main" id="{82801AE0-8798-4D12-BA14-DFDFD068FD77}"/>
                 </a:ext>
               </a:extLst>
             </p:cNvPr>
@@ -7324,16 +7354,68 @@
           </p:nvSpPr>
           <p:spPr>
             <a:xfrm>
-              <a:off x="1060315" y="2480553"/>
-              <a:ext cx="1011676" cy="2198451"/>
+              <a:off x="1125393" y="5311043"/>
+              <a:ext cx="843366" cy="1294256"/>
             </a:xfrm>
             <a:prstGeom prst="roundRect">
               <a:avLst/>
             </a:prstGeom>
             <a:noFill/>
-            <a:ln>
+            <a:ln w="38100">
               <a:solidFill>
-                <a:schemeClr val="accent2"/>
+                <a:schemeClr val="accent1"/>
+              </a:solidFill>
+            </a:ln>
+          </p:spPr>
+          <p:style>
+            <a:lnRef idx="2">
+              <a:schemeClr val="accent1">
+                <a:shade val="50000"/>
+              </a:schemeClr>
+            </a:lnRef>
+            <a:fillRef idx="1">
+              <a:schemeClr val="accent1"/>
+            </a:fillRef>
+            <a:effectRef idx="0">
+              <a:schemeClr val="accent1"/>
+            </a:effectRef>
+            <a:fontRef idx="minor">
+              <a:schemeClr val="lt1"/>
+            </a:fontRef>
+          </p:style>
+          <p:txBody>
+            <a:bodyPr rtlCol="0" anchor="ctr"/>
+            <a:lstStyle/>
+            <a:p>
+              <a:pPr algn="ctr"/>
+              <a:endParaRPr lang="en-US"/>
+            </a:p>
+          </p:txBody>
+        </p:sp>
+        <p:sp>
+          <p:nvSpPr>
+            <p:cNvPr id="33" name="Rectangle: Rounded Corners 32">
+              <a:extLst>
+                <a:ext uri="{FF2B5EF4-FFF2-40B4-BE49-F238E27FC236}">
+                  <a16:creationId xmlns:a16="http://schemas.microsoft.com/office/drawing/2014/main" id="{CCE8B86A-4442-4744-851D-19CFD2E1F19D}"/>
+                </a:ext>
+              </a:extLst>
+            </p:cNvPr>
+            <p:cNvSpPr/>
+            <p:nvPr/>
+          </p:nvSpPr>
+          <p:spPr>
+            <a:xfrm>
+              <a:off x="2970211" y="5311043"/>
+              <a:ext cx="929747" cy="212682"/>
+            </a:xfrm>
+            <a:prstGeom prst="roundRect">
+              <a:avLst/>
+            </a:prstGeom>
+            <a:noFill/>
+            <a:ln w="38100">
+              <a:solidFill>
+                <a:schemeClr val="accent1"/>
               </a:solidFill>
             </a:ln>
           </p:spPr>
@@ -7363,109 +7445,98 @@
           </p:txBody>
         </p:sp>
       </p:grpSp>
-      <p:grpSp>
-        <p:nvGrpSpPr>
-          <p:cNvPr id="14" name="Group 13">
+      <p:sp>
+        <p:nvSpPr>
+          <p:cNvPr id="16" name="TextBox 15">
             <a:extLst>
               <a:ext uri="{FF2B5EF4-FFF2-40B4-BE49-F238E27FC236}">
-                <a16:creationId xmlns:a16="http://schemas.microsoft.com/office/drawing/2014/main" id="{26F8F68E-A4BD-4748-A5E6-034A25311F39}"/>
+                <a16:creationId xmlns:a16="http://schemas.microsoft.com/office/drawing/2014/main" id="{16019E98-9293-4B68-BF23-43C75BB8B212}"/>
               </a:ext>
             </a:extLst>
           </p:cNvPr>
-          <p:cNvGrpSpPr/>
+          <p:cNvSpPr txBox="1"/>
           <p:nvPr/>
-        </p:nvGrpSpPr>
-        <p:grpSpPr>
+        </p:nvSpPr>
+        <p:spPr>
           <a:xfrm>
-            <a:off x="6343407" y="2202026"/>
-            <a:ext cx="5601185" cy="2712955"/>
-            <a:chOff x="6343407" y="2202026"/>
-            <a:chExt cx="5601185" cy="2712955"/>
-          </a:xfrm>
-        </p:grpSpPr>
-        <p:pic>
-          <p:nvPicPr>
-            <p:cNvPr id="10" name="Picture 9">
-              <a:extLst>
-                <a:ext uri="{FF2B5EF4-FFF2-40B4-BE49-F238E27FC236}">
-                  <a16:creationId xmlns:a16="http://schemas.microsoft.com/office/drawing/2014/main" id="{384D56CA-405C-4B9B-991A-C2EE845E03C8}"/>
-                </a:ext>
-              </a:extLst>
-            </p:cNvPr>
-            <p:cNvPicPr>
-              <a:picLocks noChangeAspect="1"/>
-            </p:cNvPicPr>
-            <p:nvPr/>
-          </p:nvPicPr>
-          <p:blipFill>
-            <a:blip r:embed="rId3"/>
-            <a:stretch>
-              <a:fillRect/>
-            </a:stretch>
-          </p:blipFill>
-          <p:spPr>
-            <a:xfrm>
-              <a:off x="6343407" y="2202026"/>
-              <a:ext cx="5601185" cy="2712955"/>
-            </a:xfrm>
-            <a:prstGeom prst="rect">
-              <a:avLst/>
-            </a:prstGeom>
-          </p:spPr>
-        </p:pic>
-        <p:sp>
-          <p:nvSpPr>
-            <p:cNvPr id="12" name="Rectangle: Rounded Corners 11">
-              <a:extLst>
-                <a:ext uri="{FF2B5EF4-FFF2-40B4-BE49-F238E27FC236}">
-                  <a16:creationId xmlns:a16="http://schemas.microsoft.com/office/drawing/2014/main" id="{0324C425-D4D1-416E-A188-F15D9636EF02}"/>
-                </a:ext>
-              </a:extLst>
-            </p:cNvPr>
-            <p:cNvSpPr/>
-            <p:nvPr/>
-          </p:nvSpPr>
-          <p:spPr>
-            <a:xfrm>
-              <a:off x="6914258" y="2459277"/>
-              <a:ext cx="1011676" cy="2198451"/>
-            </a:xfrm>
-            <a:prstGeom prst="roundRect">
-              <a:avLst/>
-            </a:prstGeom>
-            <a:noFill/>
-            <a:ln>
-              <a:solidFill>
-                <a:schemeClr val="accent2"/>
-              </a:solidFill>
-            </a:ln>
-          </p:spPr>
-          <p:style>
-            <a:lnRef idx="2">
-              <a:schemeClr val="accent1">
-                <a:shade val="50000"/>
-              </a:schemeClr>
-            </a:lnRef>
-            <a:fillRef idx="1">
-              <a:schemeClr val="accent1"/>
-            </a:fillRef>
-            <a:effectRef idx="0">
-              <a:schemeClr val="accent1"/>
-            </a:effectRef>
-            <a:fontRef idx="minor">
-              <a:schemeClr val="lt1"/>
-            </a:fontRef>
-          </p:style>
-          <p:txBody>
-            <a:bodyPr rtlCol="0" anchor="ctr"/>
-            <a:lstStyle/>
-            <a:p>
-              <a:pPr algn="ctr"/>
-              <a:endParaRPr lang="en-US"/>
-            </a:p>
-          </p:txBody>
-        </p:sp>
-      </p:grpSp>
+            <a:off x="4015884" y="4381509"/>
+            <a:ext cx="4300683" cy="2031325"/>
+          </a:xfrm>
+          <a:prstGeom prst="rect">
+            <a:avLst/>
+          </a:prstGeom>
+          <a:noFill/>
+        </p:spPr>
+        <p:txBody>
+          <a:bodyPr wrap="square" rtlCol="0">
+            <a:spAutoFit/>
+          </a:bodyPr>
+          <a:lstStyle/>
+          <a:p>
+            <a:pPr marL="285750" indent="-285750">
+              <a:buFont typeface="Arial" panose="020B0604020202020204" pitchFamily="34" charset="0"/>
+              <a:buChar char="•"/>
+            </a:pPr>
+            <a:r>
+              <a:rPr lang="en-US" dirty="0"/>
+              <a:t>Even with the a self-reported Job Satisfaction Rating at “Very High”, there is still a great loss due to attrition when they are self-reporting a Work-Life Balance of “Bad” or even “Good”.</a:t>
+            </a:r>
+          </a:p>
+          <a:p>
+            <a:pPr marL="285750" indent="-285750">
+              <a:buFont typeface="Arial" panose="020B0604020202020204" pitchFamily="34" charset="0"/>
+              <a:buChar char="•"/>
+            </a:pPr>
+            <a:endParaRPr lang="en-US" dirty="0"/>
+          </a:p>
+        </p:txBody>
+      </p:sp>
+      <p:sp>
+        <p:nvSpPr>
+          <p:cNvPr id="34" name="TextBox 33">
+            <a:extLst>
+              <a:ext uri="{FF2B5EF4-FFF2-40B4-BE49-F238E27FC236}">
+                <a16:creationId xmlns:a16="http://schemas.microsoft.com/office/drawing/2014/main" id="{BEBF91F2-6AE2-4070-98E1-43B9EBF80F7F}"/>
+              </a:ext>
+            </a:extLst>
+          </p:cNvPr>
+          <p:cNvSpPr txBox="1"/>
+          <p:nvPr/>
+        </p:nvSpPr>
+        <p:spPr>
+          <a:xfrm>
+            <a:off x="3936972" y="1657380"/>
+            <a:ext cx="4300683" cy="1477328"/>
+          </a:xfrm>
+          <a:prstGeom prst="rect">
+            <a:avLst/>
+          </a:prstGeom>
+          <a:noFill/>
+        </p:spPr>
+        <p:txBody>
+          <a:bodyPr wrap="square" rtlCol="0">
+            <a:spAutoFit/>
+          </a:bodyPr>
+          <a:lstStyle/>
+          <a:p>
+            <a:pPr marL="285750" indent="-285750">
+              <a:buFont typeface="Arial" panose="020B0604020202020204" pitchFamily="34" charset="0"/>
+              <a:buChar char="•"/>
+            </a:pPr>
+            <a:r>
+              <a:rPr lang="en-US" dirty="0"/>
+              <a:t>Most employees who stay at the company feel satisfied with their role, even if they feel they don’t have a great Work-Life Balance.</a:t>
+            </a:r>
+          </a:p>
+          <a:p>
+            <a:pPr marL="285750" indent="-285750">
+              <a:buFont typeface="Arial" panose="020B0604020202020204" pitchFamily="34" charset="0"/>
+              <a:buChar char="•"/>
+            </a:pPr>
+            <a:endParaRPr lang="en-US" dirty="0"/>
+          </a:p>
+        </p:txBody>
+      </p:sp>
     </p:spTree>
     <p:extLst>
       <p:ext uri="{BB962C8B-B14F-4D97-AF65-F5344CB8AC3E}">
@@ -7674,326 +7745,6 @@
           <a:chExt cx="0" cy="0"/>
         </a:xfrm>
       </p:grpSpPr>
-      <p:cxnSp>
-        <p:nvCxnSpPr>
-          <p:cNvPr id="11" name="Straight Connector 10">
-            <a:extLst>
-              <a:ext uri="{FF2B5EF4-FFF2-40B4-BE49-F238E27FC236}">
-                <a16:creationId xmlns:a16="http://schemas.microsoft.com/office/drawing/2014/main" id="{0512F9CB-A1A0-4043-A103-F6A4B94B695A}"/>
-              </a:ext>
-              <a:ext uri="{C183D7F6-B498-43B3-948B-1728B52AA6E4}">
-                <adec:decorative xmlns:adec="http://schemas.microsoft.com/office/drawing/2017/decorative" val="1"/>
-              </a:ext>
-            </a:extLst>
-          </p:cNvPr>
-          <p:cNvCxnSpPr>
-            <a:cxnSpLocks noGrp="1" noRot="1" noChangeAspect="1" noMove="1" noResize="1" noEditPoints="1" noAdjustHandles="1" noChangeArrowheads="1" noChangeShapeType="1"/>
-          </p:cNvCxnSpPr>
-          <p:nvPr>
-            <p:extLst>
-              <p:ext uri="{386F3935-93C4-4BCD-93E2-E3B085C9AB24}">
-                <p16:designElem xmlns:p16="http://schemas.microsoft.com/office/powerpoint/2015/main" val="1"/>
-              </p:ext>
-            </p:extLst>
-          </p:nvPr>
-        </p:nvCxnSpPr>
-        <p:spPr>
-          <a:xfrm flipH="1">
-            <a:off x="8228012" y="8467"/>
-            <a:ext cx="3810000" cy="3810000"/>
-          </a:xfrm>
-          <a:prstGeom prst="line">
-            <a:avLst/>
-          </a:prstGeom>
-          <a:ln w="12700">
-            <a:solidFill>
-              <a:schemeClr val="tx1"/>
-            </a:solidFill>
-          </a:ln>
-        </p:spPr>
-        <p:style>
-          <a:lnRef idx="2">
-            <a:schemeClr val="accent1"/>
-          </a:lnRef>
-          <a:fillRef idx="0">
-            <a:schemeClr val="accent1"/>
-          </a:fillRef>
-          <a:effectRef idx="1">
-            <a:schemeClr val="accent1"/>
-          </a:effectRef>
-          <a:fontRef idx="minor">
-            <a:schemeClr val="tx1"/>
-          </a:fontRef>
-        </p:style>
-      </p:cxnSp>
-      <p:cxnSp>
-        <p:nvCxnSpPr>
-          <p:cNvPr id="13" name="Straight Connector 12">
-            <a:extLst>
-              <a:ext uri="{FF2B5EF4-FFF2-40B4-BE49-F238E27FC236}">
-                <a16:creationId xmlns:a16="http://schemas.microsoft.com/office/drawing/2014/main" id="{ADBE6588-EE16-4389-857C-86A156D49E5D}"/>
-              </a:ext>
-              <a:ext uri="{C183D7F6-B498-43B3-948B-1728B52AA6E4}">
-                <adec:decorative xmlns:adec="http://schemas.microsoft.com/office/drawing/2017/decorative" val="1"/>
-              </a:ext>
-            </a:extLst>
-          </p:cNvPr>
-          <p:cNvCxnSpPr>
-            <a:cxnSpLocks noGrp="1" noRot="1" noChangeAspect="1" noMove="1" noResize="1" noEditPoints="1" noAdjustHandles="1" noChangeArrowheads="1" noChangeShapeType="1"/>
-          </p:cNvCxnSpPr>
-          <p:nvPr>
-            <p:extLst>
-              <p:ext uri="{386F3935-93C4-4BCD-93E2-E3B085C9AB24}">
-                <p16:designElem xmlns:p16="http://schemas.microsoft.com/office/powerpoint/2015/main" val="1"/>
-              </p:ext>
-            </p:extLst>
-          </p:nvPr>
-        </p:nvCxnSpPr>
-        <p:spPr>
-          <a:xfrm flipH="1">
-            <a:off x="6108170" y="91545"/>
-            <a:ext cx="6080655" cy="6080655"/>
-          </a:xfrm>
-          <a:prstGeom prst="line">
-            <a:avLst/>
-          </a:prstGeom>
-          <a:ln w="12700">
-            <a:solidFill>
-              <a:schemeClr val="tx1"/>
-            </a:solidFill>
-          </a:ln>
-        </p:spPr>
-        <p:style>
-          <a:lnRef idx="2">
-            <a:schemeClr val="accent1"/>
-          </a:lnRef>
-          <a:fillRef idx="0">
-            <a:schemeClr val="accent1"/>
-          </a:fillRef>
-          <a:effectRef idx="1">
-            <a:schemeClr val="accent1"/>
-          </a:effectRef>
-          <a:fontRef idx="minor">
-            <a:schemeClr val="tx1"/>
-          </a:fontRef>
-        </p:style>
-      </p:cxnSp>
-      <p:cxnSp>
-        <p:nvCxnSpPr>
-          <p:cNvPr id="15" name="Straight Connector 14">
-            <a:extLst>
-              <a:ext uri="{FF2B5EF4-FFF2-40B4-BE49-F238E27FC236}">
-                <a16:creationId xmlns:a16="http://schemas.microsoft.com/office/drawing/2014/main" id="{17FD48D2-B0A7-413D-B947-AA55AC1296D5}"/>
-              </a:ext>
-              <a:ext uri="{C183D7F6-B498-43B3-948B-1728B52AA6E4}">
-                <adec:decorative xmlns:adec="http://schemas.microsoft.com/office/drawing/2017/decorative" val="1"/>
-              </a:ext>
-            </a:extLst>
-          </p:cNvPr>
-          <p:cNvCxnSpPr>
-            <a:cxnSpLocks noGrp="1" noRot="1" noChangeAspect="1" noMove="1" noResize="1" noEditPoints="1" noAdjustHandles="1" noChangeArrowheads="1" noChangeShapeType="1"/>
-          </p:cNvCxnSpPr>
-          <p:nvPr>
-            <p:extLst>
-              <p:ext uri="{386F3935-93C4-4BCD-93E2-E3B085C9AB24}">
-                <p16:designElem xmlns:p16="http://schemas.microsoft.com/office/powerpoint/2015/main" val="1"/>
-              </p:ext>
-            </p:extLst>
-          </p:nvPr>
-        </p:nvCxnSpPr>
-        <p:spPr>
-          <a:xfrm flipH="1">
-            <a:off x="7235825" y="228600"/>
-            <a:ext cx="4953000" cy="4953000"/>
-          </a:xfrm>
-          <a:prstGeom prst="line">
-            <a:avLst/>
-          </a:prstGeom>
-          <a:ln w="12700">
-            <a:solidFill>
-              <a:schemeClr val="tx1"/>
-            </a:solidFill>
-          </a:ln>
-        </p:spPr>
-        <p:style>
-          <a:lnRef idx="2">
-            <a:schemeClr val="accent1"/>
-          </a:lnRef>
-          <a:fillRef idx="0">
-            <a:schemeClr val="accent1"/>
-          </a:fillRef>
-          <a:effectRef idx="1">
-            <a:schemeClr val="accent1"/>
-          </a:effectRef>
-          <a:fontRef idx="minor">
-            <a:schemeClr val="tx1"/>
-          </a:fontRef>
-        </p:style>
-      </p:cxnSp>
-      <p:cxnSp>
-        <p:nvCxnSpPr>
-          <p:cNvPr id="17" name="Straight Connector 16">
-            <a:extLst>
-              <a:ext uri="{FF2B5EF4-FFF2-40B4-BE49-F238E27FC236}">
-                <a16:creationId xmlns:a16="http://schemas.microsoft.com/office/drawing/2014/main" id="{2BE668D0-D906-4EEE-B32F-8C028624B837}"/>
-              </a:ext>
-              <a:ext uri="{C183D7F6-B498-43B3-948B-1728B52AA6E4}">
-                <adec:decorative xmlns:adec="http://schemas.microsoft.com/office/drawing/2017/decorative" val="1"/>
-              </a:ext>
-            </a:extLst>
-          </p:cNvPr>
-          <p:cNvCxnSpPr>
-            <a:cxnSpLocks noGrp="1" noRot="1" noChangeAspect="1" noMove="1" noResize="1" noEditPoints="1" noAdjustHandles="1" noChangeArrowheads="1" noChangeShapeType="1"/>
-          </p:cNvCxnSpPr>
-          <p:nvPr>
-            <p:extLst>
-              <p:ext uri="{386F3935-93C4-4BCD-93E2-E3B085C9AB24}">
-                <p16:designElem xmlns:p16="http://schemas.microsoft.com/office/powerpoint/2015/main" val="1"/>
-              </p:ext>
-            </p:extLst>
-          </p:nvPr>
-        </p:nvCxnSpPr>
-        <p:spPr>
-          <a:xfrm flipH="1">
-            <a:off x="7335837" y="32278"/>
-            <a:ext cx="4852989" cy="4852989"/>
-          </a:xfrm>
-          <a:prstGeom prst="line">
-            <a:avLst/>
-          </a:prstGeom>
-          <a:ln w="31750">
-            <a:solidFill>
-              <a:schemeClr val="tx1"/>
-            </a:solidFill>
-          </a:ln>
-        </p:spPr>
-        <p:style>
-          <a:lnRef idx="2">
-            <a:schemeClr val="accent1"/>
-          </a:lnRef>
-          <a:fillRef idx="0">
-            <a:schemeClr val="accent1"/>
-          </a:fillRef>
-          <a:effectRef idx="1">
-            <a:schemeClr val="accent1"/>
-          </a:effectRef>
-          <a:fontRef idx="minor">
-            <a:schemeClr val="tx1"/>
-          </a:fontRef>
-        </p:style>
-      </p:cxnSp>
-      <p:cxnSp>
-        <p:nvCxnSpPr>
-          <p:cNvPr id="19" name="Straight Connector 18">
-            <a:extLst>
-              <a:ext uri="{FF2B5EF4-FFF2-40B4-BE49-F238E27FC236}">
-                <a16:creationId xmlns:a16="http://schemas.microsoft.com/office/drawing/2014/main" id="{D1DE67A3-B8F6-4CFD-A8E0-D15200F23152}"/>
-              </a:ext>
-              <a:ext uri="{C183D7F6-B498-43B3-948B-1728B52AA6E4}">
-                <adec:decorative xmlns:adec="http://schemas.microsoft.com/office/drawing/2017/decorative" val="1"/>
-              </a:ext>
-            </a:extLst>
-          </p:cNvPr>
-          <p:cNvCxnSpPr>
-            <a:cxnSpLocks noGrp="1" noRot="1" noChangeAspect="1" noMove="1" noResize="1" noEditPoints="1" noAdjustHandles="1" noChangeArrowheads="1" noChangeShapeType="1"/>
-          </p:cNvCxnSpPr>
-          <p:nvPr>
-            <p:extLst>
-              <p:ext uri="{386F3935-93C4-4BCD-93E2-E3B085C9AB24}">
-                <p16:designElem xmlns:p16="http://schemas.microsoft.com/office/powerpoint/2015/main" val="1"/>
-              </p:ext>
-            </p:extLst>
-          </p:nvPr>
-        </p:nvCxnSpPr>
-        <p:spPr>
-          <a:xfrm flipH="1">
-            <a:off x="7845426" y="609601"/>
-            <a:ext cx="4343399" cy="4343399"/>
-          </a:xfrm>
-          <a:prstGeom prst="line">
-            <a:avLst/>
-          </a:prstGeom>
-          <a:ln w="31750">
-            <a:solidFill>
-              <a:schemeClr val="tx1"/>
-            </a:solidFill>
-          </a:ln>
-        </p:spPr>
-        <p:style>
-          <a:lnRef idx="2">
-            <a:schemeClr val="accent1"/>
-          </a:lnRef>
-          <a:fillRef idx="0">
-            <a:schemeClr val="accent1"/>
-          </a:fillRef>
-          <a:effectRef idx="1">
-            <a:schemeClr val="accent1"/>
-          </a:effectRef>
-          <a:fontRef idx="minor">
-            <a:schemeClr val="tx1"/>
-          </a:fontRef>
-        </p:style>
-      </p:cxnSp>
-      <p:sp useBgFill="1">
-        <p:nvSpPr>
-          <p:cNvPr id="21" name="Rectangle 20">
-            <a:extLst>
-              <a:ext uri="{FF2B5EF4-FFF2-40B4-BE49-F238E27FC236}">
-                <a16:creationId xmlns:a16="http://schemas.microsoft.com/office/drawing/2014/main" id="{0B65EC2C-5E72-45C4-9792-4143706AA7D7}"/>
-              </a:ext>
-              <a:ext uri="{C183D7F6-B498-43B3-948B-1728B52AA6E4}">
-                <adec:decorative xmlns:adec="http://schemas.microsoft.com/office/drawing/2017/decorative" val="1"/>
-              </a:ext>
-            </a:extLst>
-          </p:cNvPr>
-          <p:cNvSpPr>
-            <a:spLocks noGrp="1" noRot="1" noChangeAspect="1" noMove="1" noResize="1" noEditPoints="1" noAdjustHandles="1" noChangeArrowheads="1" noChangeShapeType="1" noTextEdit="1"/>
-          </p:cNvSpPr>
-          <p:nvPr>
-            <p:extLst>
-              <p:ext uri="{386F3935-93C4-4BCD-93E2-E3B085C9AB24}">
-                <p16:designElem xmlns:p16="http://schemas.microsoft.com/office/powerpoint/2015/main" val="1"/>
-              </p:ext>
-            </p:extLst>
-          </p:nvPr>
-        </p:nvSpPr>
-        <p:spPr>
-          <a:xfrm>
-            <a:off x="0" y="0"/>
-            <a:ext cx="12192000" cy="6858000"/>
-          </a:xfrm>
-          <a:prstGeom prst="rect">
-            <a:avLst/>
-          </a:prstGeom>
-          <a:ln>
-            <a:noFill/>
-          </a:ln>
-        </p:spPr>
-        <p:style>
-          <a:lnRef idx="2">
-            <a:schemeClr val="accent1">
-              <a:shade val="50000"/>
-            </a:schemeClr>
-          </a:lnRef>
-          <a:fillRef idx="1">
-            <a:schemeClr val="accent1"/>
-          </a:fillRef>
-          <a:effectRef idx="0">
-            <a:schemeClr val="accent1"/>
-          </a:effectRef>
-          <a:fontRef idx="minor">
-            <a:schemeClr val="lt1"/>
-          </a:fontRef>
-        </p:style>
-        <p:txBody>
-          <a:bodyPr rtlCol="0" anchor="ctr"/>
-          <a:lstStyle/>
-          <a:p>
-            <a:pPr algn="ctr"/>
-            <a:endParaRPr lang="en-US" dirty="0"/>
-          </a:p>
-        </p:txBody>
-      </p:sp>
       <p:sp>
         <p:nvSpPr>
           <p:cNvPr id="2" name="Title 1"/>
@@ -8135,288 +7886,6 @@
           </a:effectLst>
         </p:spPr>
       </p:pic>
-      <p:grpSp>
-        <p:nvGrpSpPr>
-          <p:cNvPr id="23" name="Group 22">
-            <a:extLst>
-              <a:ext uri="{FF2B5EF4-FFF2-40B4-BE49-F238E27FC236}">
-                <a16:creationId xmlns:a16="http://schemas.microsoft.com/office/drawing/2014/main" id="{9073B6DB-4B88-4BCD-97DE-9DD16B88A4B8}"/>
-              </a:ext>
-              <a:ext uri="{C183D7F6-B498-43B3-948B-1728B52AA6E4}">
-                <adec:decorative xmlns:adec="http://schemas.microsoft.com/office/drawing/2017/decorative" val="1"/>
-              </a:ext>
-            </a:extLst>
-          </p:cNvPr>
-          <p:cNvGrpSpPr>
-            <a:grpSpLocks noGrp="1" noUngrp="1" noRot="1" noChangeAspect="1" noMove="1" noResize="1"/>
-          </p:cNvGrpSpPr>
-          <p:nvPr>
-            <p:extLst>
-              <p:ext uri="{386F3935-93C4-4BCD-93E2-E3B085C9AB24}">
-                <p16:designElem xmlns:p16="http://schemas.microsoft.com/office/powerpoint/2015/main" val="1"/>
-              </p:ext>
-            </p:extLst>
-          </p:nvPr>
-        </p:nvGrpSpPr>
-        <p:grpSpPr>
-          <a:xfrm>
-            <a:off x="9206969" y="2963333"/>
-            <a:ext cx="2981858" cy="3208867"/>
-            <a:chOff x="9206969" y="2963333"/>
-            <a:chExt cx="2981858" cy="3208867"/>
-          </a:xfrm>
-        </p:grpSpPr>
-        <p:cxnSp>
-          <p:nvCxnSpPr>
-            <p:cNvPr id="24" name="Straight Connector 23">
-              <a:extLst>
-                <a:ext uri="{FF2B5EF4-FFF2-40B4-BE49-F238E27FC236}">
-                  <a16:creationId xmlns:a16="http://schemas.microsoft.com/office/drawing/2014/main" id="{346E4CB1-2A79-49F6-8FDD-74161D0D1B1D}"/>
-                </a:ext>
-                <a:ext uri="{C183D7F6-B498-43B3-948B-1728B52AA6E4}">
-                  <adec:decorative xmlns:adec="http://schemas.microsoft.com/office/drawing/2017/decorative" val="1"/>
-                </a:ext>
-              </a:extLst>
-            </p:cNvPr>
-            <p:cNvCxnSpPr/>
-            <p:nvPr>
-              <p:extLst>
-                <p:ext uri="{386F3935-93C4-4BCD-93E2-E3B085C9AB24}">
-                  <p16:designElem xmlns:p16="http://schemas.microsoft.com/office/powerpoint/2015/main" val="1"/>
-                </p:ext>
-              </p:extLst>
-            </p:nvPr>
-          </p:nvCxnSpPr>
-          <p:spPr>
-            <a:xfrm flipH="1">
-              <a:off x="11276012" y="2963333"/>
-              <a:ext cx="912814" cy="912812"/>
-            </a:xfrm>
-            <a:prstGeom prst="line">
-              <a:avLst/>
-            </a:prstGeom>
-            <a:ln w="9525">
-              <a:solidFill>
-                <a:schemeClr val="tx1"/>
-              </a:solidFill>
-            </a:ln>
-          </p:spPr>
-          <p:style>
-            <a:lnRef idx="2">
-              <a:schemeClr val="accent1"/>
-            </a:lnRef>
-            <a:fillRef idx="0">
-              <a:schemeClr val="accent1"/>
-            </a:fillRef>
-            <a:effectRef idx="1">
-              <a:schemeClr val="accent1"/>
-            </a:effectRef>
-            <a:fontRef idx="minor">
-              <a:schemeClr val="tx1"/>
-            </a:fontRef>
-          </p:style>
-        </p:cxnSp>
-        <p:cxnSp>
-          <p:nvCxnSpPr>
-            <p:cNvPr id="25" name="Straight Connector 24">
-              <a:extLst>
-                <a:ext uri="{FF2B5EF4-FFF2-40B4-BE49-F238E27FC236}">
-                  <a16:creationId xmlns:a16="http://schemas.microsoft.com/office/drawing/2014/main" id="{8AF7F103-B34D-460F-A43A-1A0953D57318}"/>
-                </a:ext>
-                <a:ext uri="{C183D7F6-B498-43B3-948B-1728B52AA6E4}">
-                  <adec:decorative xmlns:adec="http://schemas.microsoft.com/office/drawing/2017/decorative" val="1"/>
-                </a:ext>
-              </a:extLst>
-            </p:cNvPr>
-            <p:cNvCxnSpPr/>
-            <p:nvPr>
-              <p:extLst>
-                <p:ext uri="{386F3935-93C4-4BCD-93E2-E3B085C9AB24}">
-                  <p16:designElem xmlns:p16="http://schemas.microsoft.com/office/powerpoint/2015/main" val="1"/>
-                </p:ext>
-              </p:extLst>
-            </p:nvPr>
-          </p:nvCxnSpPr>
-          <p:spPr>
-            <a:xfrm flipH="1">
-              <a:off x="9206969" y="3190344"/>
-              <a:ext cx="2981857" cy="2981856"/>
-            </a:xfrm>
-            <a:prstGeom prst="line">
-              <a:avLst/>
-            </a:prstGeom>
-            <a:ln w="9525">
-              <a:solidFill>
-                <a:schemeClr val="tx1"/>
-              </a:solidFill>
-            </a:ln>
-          </p:spPr>
-          <p:style>
-            <a:lnRef idx="2">
-              <a:schemeClr val="accent1"/>
-            </a:lnRef>
-            <a:fillRef idx="0">
-              <a:schemeClr val="accent1"/>
-            </a:fillRef>
-            <a:effectRef idx="1">
-              <a:schemeClr val="accent1"/>
-            </a:effectRef>
-            <a:fontRef idx="minor">
-              <a:schemeClr val="tx1"/>
-            </a:fontRef>
-          </p:style>
-        </p:cxnSp>
-        <p:cxnSp>
-          <p:nvCxnSpPr>
-            <p:cNvPr id="26" name="Straight Connector 25">
-              <a:extLst>
-                <a:ext uri="{FF2B5EF4-FFF2-40B4-BE49-F238E27FC236}">
-                  <a16:creationId xmlns:a16="http://schemas.microsoft.com/office/drawing/2014/main" id="{AA6EF948-AE5B-4AFD-9071-4553E2EA584F}"/>
-                </a:ext>
-                <a:ext uri="{C183D7F6-B498-43B3-948B-1728B52AA6E4}">
-                  <adec:decorative xmlns:adec="http://schemas.microsoft.com/office/drawing/2017/decorative" val="1"/>
-                </a:ext>
-              </a:extLst>
-            </p:cNvPr>
-            <p:cNvCxnSpPr/>
-            <p:nvPr>
-              <p:extLst>
-                <p:ext uri="{386F3935-93C4-4BCD-93E2-E3B085C9AB24}">
-                  <p16:designElem xmlns:p16="http://schemas.microsoft.com/office/powerpoint/2015/main" val="1"/>
-                </p:ext>
-              </p:extLst>
-            </p:nvPr>
-          </p:nvCxnSpPr>
-          <p:spPr>
-            <a:xfrm flipH="1">
-              <a:off x="10292292" y="3285067"/>
-              <a:ext cx="1896534" cy="1896533"/>
-            </a:xfrm>
-            <a:prstGeom prst="line">
-              <a:avLst/>
-            </a:prstGeom>
-            <a:ln w="9525">
-              <a:solidFill>
-                <a:schemeClr val="tx1"/>
-              </a:solidFill>
-            </a:ln>
-          </p:spPr>
-          <p:style>
-            <a:lnRef idx="2">
-              <a:schemeClr val="accent1"/>
-            </a:lnRef>
-            <a:fillRef idx="0">
-              <a:schemeClr val="accent1"/>
-            </a:fillRef>
-            <a:effectRef idx="1">
-              <a:schemeClr val="accent1"/>
-            </a:effectRef>
-            <a:fontRef idx="minor">
-              <a:schemeClr val="tx1"/>
-            </a:fontRef>
-          </p:style>
-        </p:cxnSp>
-        <p:cxnSp>
-          <p:nvCxnSpPr>
-            <p:cNvPr id="27" name="Straight Connector 26">
-              <a:extLst>
-                <a:ext uri="{FF2B5EF4-FFF2-40B4-BE49-F238E27FC236}">
-                  <a16:creationId xmlns:a16="http://schemas.microsoft.com/office/drawing/2014/main" id="{7A008A68-D48C-4C79-AC7D-65C0D47EA0EB}"/>
-                </a:ext>
-                <a:ext uri="{C183D7F6-B498-43B3-948B-1728B52AA6E4}">
-                  <adec:decorative xmlns:adec="http://schemas.microsoft.com/office/drawing/2017/decorative" val="1"/>
-                </a:ext>
-              </a:extLst>
-            </p:cNvPr>
-            <p:cNvCxnSpPr/>
-            <p:nvPr>
-              <p:extLst>
-                <p:ext uri="{386F3935-93C4-4BCD-93E2-E3B085C9AB24}">
-                  <p16:designElem xmlns:p16="http://schemas.microsoft.com/office/powerpoint/2015/main" val="1"/>
-                </p:ext>
-              </p:extLst>
-            </p:nvPr>
-          </p:nvCxnSpPr>
-          <p:spPr>
-            <a:xfrm flipH="1">
-              <a:off x="10443103" y="3131080"/>
-              <a:ext cx="1745722" cy="1745720"/>
-            </a:xfrm>
-            <a:prstGeom prst="line">
-              <a:avLst/>
-            </a:prstGeom>
-            <a:ln w="28575">
-              <a:solidFill>
-                <a:schemeClr val="tx1"/>
-              </a:solidFill>
-            </a:ln>
-          </p:spPr>
-          <p:style>
-            <a:lnRef idx="2">
-              <a:schemeClr val="accent1"/>
-            </a:lnRef>
-            <a:fillRef idx="0">
-              <a:schemeClr val="accent1"/>
-            </a:fillRef>
-            <a:effectRef idx="1">
-              <a:schemeClr val="accent1"/>
-            </a:effectRef>
-            <a:fontRef idx="minor">
-              <a:schemeClr val="tx1"/>
-            </a:fontRef>
-          </p:style>
-        </p:cxnSp>
-        <p:cxnSp>
-          <p:nvCxnSpPr>
-            <p:cNvPr id="28" name="Straight Connector 27">
-              <a:extLst>
-                <a:ext uri="{FF2B5EF4-FFF2-40B4-BE49-F238E27FC236}">
-                  <a16:creationId xmlns:a16="http://schemas.microsoft.com/office/drawing/2014/main" id="{DD2F0D54-7F2F-45FC-BA8B-BE63A7DA4E6A}"/>
-                </a:ext>
-                <a:ext uri="{C183D7F6-B498-43B3-948B-1728B52AA6E4}">
-                  <adec:decorative xmlns:adec="http://schemas.microsoft.com/office/drawing/2017/decorative" val="1"/>
-                </a:ext>
-              </a:extLst>
-            </p:cNvPr>
-            <p:cNvCxnSpPr/>
-            <p:nvPr>
-              <p:extLst>
-                <p:ext uri="{386F3935-93C4-4BCD-93E2-E3B085C9AB24}">
-                  <p16:designElem xmlns:p16="http://schemas.microsoft.com/office/powerpoint/2015/main" val="1"/>
-                </p:ext>
-              </p:extLst>
-            </p:nvPr>
-          </p:nvCxnSpPr>
-          <p:spPr>
-            <a:xfrm flipH="1">
-              <a:off x="10918826" y="3683001"/>
-              <a:ext cx="1270001" cy="1269999"/>
-            </a:xfrm>
-            <a:prstGeom prst="line">
-              <a:avLst/>
-            </a:prstGeom>
-            <a:ln w="28575">
-              <a:solidFill>
-                <a:schemeClr val="tx1"/>
-              </a:solidFill>
-            </a:ln>
-          </p:spPr>
-          <p:style>
-            <a:lnRef idx="2">
-              <a:schemeClr val="accent1"/>
-            </a:lnRef>
-            <a:fillRef idx="0">
-              <a:schemeClr val="accent1"/>
-            </a:fillRef>
-            <a:effectRef idx="1">
-              <a:schemeClr val="accent1"/>
-            </a:effectRef>
-            <a:fontRef idx="minor">
-              <a:schemeClr val="tx1"/>
-            </a:fontRef>
-          </p:style>
-        </p:cxnSp>
-      </p:grpSp>
       <p:sp>
         <p:nvSpPr>
           <p:cNvPr id="4" name="AutoShape 2" descr="data:image/png;base64,iVBORw0KGgoAAAANSUhEUgAABUAAAAPACAMAAADDuCPrAAABYlBMVEUAAAAAADoAAGYAOjoAOmYAOpAAZrYzMzM6AAA6OgA6Ojo6OmY6ZmY6ZpA6ZrY6kLY6kNtNTU1NTW5NTY5Nbm5Nbo5NbqtNjshmAABmADpmOgBmOjpmZjpmZmZmZpBmkGZmkLZmkNtmtttmtv9uTU1ubk1ubm5ubo5ujqtujshuq8huq+SOTU2Obk2Obm6Oq8iOyOSOyP+QOgCQOjqQZjqQZmaQZpCQkGaQkLaQtraQttuQ2/+rbk2rjk2rjm6rq8iryOSr5Mir5P+2ZgC2Zjq2kDq2kGa2kJC2tpC2tra2ttu229u22/+2///Ijk3Ijm7Iq27Iq6vIyKvI5KvI5OTI5P/I///bkDrbkGbbtmbbtpDbtrbb27bb29vb2//b/7bb///kq27kyI7kyKvk5P/k///r6+v8jVn/tmb/yI7/25D/27b/29v/5Kv/5Mj/5OT//7b//7///8j//9v//+T///+zjZs9AAAACXBIWXMAAB2HAAAdhwGP5fFlAAAgAElEQVR4nO3d/59b5ZnecU0wMDGEILMYh0CWwmwDxaSLN3S7xHW3mGQXkni3aY0TEijO1q2/YMe1rP+/0iNpRnPbM+fMM9e5n3PffN4/xB472Eiv6/mgGUlnJnMAQJVJ638BAIiKgAJAJQIKAJUIKABUIqAAUImAAkAlAgoAlQgoAFQioABQiYACQCUCCgCVCCgAVCKgAFCJgAJAJQIKAJVGENDZl298fzKZ7Lzw8Ten/rNuT570zvzhhcnOLwT/pgCwrXlAZ7/aPWjdS6dNKAEF4Kd1QO+9fih2p+0cAQXgp3FA7y4ffu689dXip9/+6vuCgh78ud/7reRPAoCjtA3o4qHh1ufts1/KCkpAAQyvbUCvLor59tbHy8/An1P8wQQUwPCaBnT5CfzLh37lRvmapeRPJqAABtY0oItcmswtP6d/rvzGwQPRq5vK3vv5Irg7P/jNwT/9zuzT3cnOC09+1n84oJsnka4ufyh/ygsfL3/9yx8vev3Cr/f/f+YvAIBjtQzo7NKTn7Cvmroo3n7/NvWbfWpe7LQM6NUjnro/OqA31n/Iywd/4PpB8BN/AQAcq2VAlw837efrt1c9vHrwO4tfefabVW03VtVdpPBs+fDZJ3t3ZED/fv8Pefvq4ddOPfkXAMCxWgZ0UbknHjyuo3r7IGLrli4fOb709Xz+7aebx4zlseQPv5l/+/VT/+inBnRh+Rn6l4tP1Z+Z7Lz9zeqZ/+fmT/0LAOBYLQN6+ymffS8D+vJ866Xv68/mtx6t3l5/5fTGMaE7OqAvb/6MzV9wdfUQ9il/AQAca6QBXdZxlbr180nbTysdPCY98kWjRwZ0/aubv2a+/yWCp/wFAHCssQZ0UcDypc3lVyaXMdtu2u39xj7lq58rRwb0uYO/5p1D/9en/AUAcKyRfg10Gc7ye+uQbj/Ds3mW58YxT/YcGdCXD//K/v/1aX8BABxrbM/C70f19qFP5W3f7Cfd1qkDeuRjWwDYGOfrQOclcYuIbR6IElAA4zPOdyItlbcNbV7OtPlSqPmntQHliSMAJ9I0oFu5XNt6L3z5HH7/qZ2rTz6vIw3o0/4CADhW26sx2Zdy3t765HnxmPDZ/7X/ls7tp9xv7H95VBjQp/wFAHCstgEtX3k8eOf5jcn2C5tulDderku2deGmzfNM2oA+5S8AgGM1viL9veUVlQ9dkf7gC5Grq9VvSrZ8F9GZX6+/h9LmvZfCgD7lLwCAY435eyJd3X42fPtp8lUbxQF98i8AgGO1Duih78q5c/g6crcn28+Mz36++b+dWV2wUxzQJ/8CADhW84AufPnz5Sfvz7xovy/89lVBl/60vN7x+lrIc31An/gLAOBYYwgoAIREQAGgEgEFgEoEFAAqEVAAqERAAaASAQWASgQUACoRUACoREABoBIBBYBKBBQAKhFQAKhEQAGgEgEFgEoEFAAqEVAAqNQwoP8HEtyT6MRIVEzFCGh43JPoxEhUTMUIaHjck+jESFRMxQhoeNyT6MRIVEzFCGh43JPoxEhUTMUIaHjck+jESFRMxQhoeNyT6MRIVEzFCGh43JPoxEhUTMUIaHjck+jESFRMxQhoeNyT6MRIVEzFCGh43JPoxEhUTMUIaHjck+jESFRMxQhoeNyT6MRIVEzFCGh43JPoxEhUTMUIaHjck+jESFRMxQhoeNyT6MRIVEzFCGh43JPoxEhUTMUIaHjck+jESFRMxQhoeNyT6MRIVEzFCGh43JPoxEhUTMUIaHjck+jESFRMxQhoeNyT6MRIVEzFCGh43JPoxEhUTMUIaHjck+jESFRMxQhoeNyT6MRIVEzFCGh43JPoxEhUTMUIaHjck+jESFRMxQhoeNyT6MRIVEzFCGh43JPoxEhUTMUIaHjck+jESFRMxQhoeNyT6MRIVEzFCGh43JPoxEhUTMUIaHjck+jESFRMxQhoeNyT6MRIVEzFCGh43JPoxEhUTMUIaHjck+jESFRMxQhoeNyT6MRIVEzFUgX0/+I7RL+fxAioiqkYAUVQ+v0kRkBVTMUIKILS7ycxAqpiKkZAEZR+P4kRUBVTMQKKoPT7SYyAqpiKEVAEpd9PYgRUxVSMgCIo/X4SI6AqpmIEFEHp95MYAVUxFSOgCEq/n8QIqIqpGAFFUPr9JEZAVUzFCCiC0u8nMQKqYipGQBGUfj+JEVAVUzECiqD0+0mMgKqYihFQBKXfT2IEVMVUjIAiKP1+EiOgKqZiBBRB6feTGAFVMRUjoAhKv5/ECKiKqRgBRVD6/SRGQFVMxQgogtLvJzECqmIqRkARlH4/iRFQFVMxAoqg9PtJjICqmIoRUASl309iBFTFVIyAIij9fhIjoCqmYgQUQen3kxgBVTEVI6AISr+fxAioiqkYAUVQ+v0kRkBVTMUIKILS7ycxAqpiKkZAEZR+P4kRUBVTMQKKoPT7SYyAqpiKEVAEpd9PYgRUxVSMgCIo/X4SI6AqpmKnDeiji6+tf/b4yt50+u71rg8IKDT0+0mMgKqIA3pt+tqmpNOlV744/gMCChH9fhIjoCrSgD6+Nt0E9Nr0/PX5g8vT87eO/YCAQkS/n8QIqIoyoP/2wXQT0Pt75RHmo4vnPjnuAwIKFf1+EiOgKsKA3pxO3/vzOqA39398/7gPCChU9PtJjICqKAP66j/O76zzeG36YfmxfHz0BwQUKvr9JEZAVYQB3cri48vrT9Dv752/dfQHq3/m+ZVT/s1P0fpIw5N+P8BJEVAEpd8PcFL6gL7yxdEfHPpH9Y+uWx9peNLvJzE+hVcZPKDdj0AJKAT0+0mMgKoQUOSg309iBFRlmIDyLDy86feTGAFVGSigm1d5rl/6edQHBBQq+v0kRkBVBgoo70SCM/1+EiOgKgMF9PHl6av773g/+gMCChX9fhIjoCoDBXT+YPuaS0d/QEAhot9PYgRUZaiAzh9cWVTy3VtdHxBQaOj3kxgBVREH9BT0t631kYYn/X4SI6AqpmIEFEHp95MYAVUxFSOgCEq/n8QIqIqpGAFFUPr9JEZAVUzFCCiC0u8nMQKqYipGQBGUfj+JEVAVUzECiqD0+0mMgKqYihFQBKXfT2IEVMVUjIAiKP1+EiOgKqZiBBRB6feTGAFVMRUjoAhKv5/ECKiKqRgBRVD6/SRGQFVMxQgogtLvJzECqmIqRkARlH4/iRFQFVMxAoqg9PtJjICqmIoRUASl309iBFTFVIyAIij9fhIjoCqmYgQUQen3kxgBVTEVI6AISr+fxAioiqkYAUVQ+v0kRkBVTMUIKILS7ycxAqpiKkZAEZR+P4kRUBVTMQKKoPT7SYyAqpiKEVAEpd9PYgRUxVSMgCIo/X4SI6AqpmIEFEHp95MYAVUxFSOgCEq/n8QIqIqpGAFFUPr9JEZAVUzFCCiC0u8nMQKqYipGQBGUfj+JEVAVUzECiqD0+0mMgKqYihFQBKXfT2IEVMVUjIAiKP1+EiOgKqZiBBRB6feTGAFVMRUjoAhKv5/ECKiKqRgBRVD6/SRGQFVMxQgogtLvJzECqmIqRkARlH4/iRFQFVMxAoqg9PtJjICqmIoRUASl309iBFTFVIyAIij9fhIjoCqmYgQUQen3kxgBVTEVI6AISr+fxAioiqkYAUVQ+v0kRkBVTMUIKILS7ycxAqpiKkZAEZR+P4kRUBVTMQKKoPT7SYyAqpiKEVAEpd9PYgRUxVSMgCIo/X4SI6AqpmIEFEHp95MYAVUxFSOgCEq/n8QIqIqpGAFFUPr9JEZAVUzFCCiC0u8nMQKqYipGQBGUfj+JEVAVUzECiqD0+0mMgKqYihFQBKXfT2IEVMVUjIAiKP1+EiOgKqZiBBRB6feTGAFVMRUjoAhKv5/ECKiKqRgBRVD6/SRGQFVMxQgogtLvJzECqmIqRkARlH4/iRFQFVMxAoqg9PtJjICqmIoRUASl309iBFTFVIyAIij9fhIjoCqmYgQUQen3kxgBVTEVI6AISr+fxAioiqkYAUVQ+v0kRkBVTMUIKILS7ycxAqpiKkZAEZR+P4kRUBVTMQKKoPT7SYyAqpiKEVAEpd9PYgRUxVSMgCIo/X4SI6AqpmIEFEHp95MYAVUxFSOgCEq/n8QIqIqpGAFFUPr9JEZAVUzFCCiC0u8nMQKqYipGQBGUfj+JEVAVU7GGAdVrfaThqfXaAB6BIiz9fhLjEaiKqRgBRVD6/SRGQFVMxQgogtLvJzECqmIqRkARlH4/iRFQFVMxAoqg9PtJjICqmIoRUASl309iBFTFVIyAIij9fhIjoCqmYgQUQen3kxgBVTEVI6AISr+fxAioiqkYAUVQ+v0kRkBVTMUIKILS7ycxAqpiKkZAEZR+P4kRUBVTMQKKoPT7SYyAqpiKEVAEpd9PYgRUxVSMgCIo/X4SI6AqpmIEFEHp95MYAVUxFSOgCEq/n8QIqIqpGAFFUPr9JEZAVUzFCCiC0u8nMQKqYipGQBGUfj+JEVAVUzECiqD0+0mMgKqYihFQBKXfT2IEVMVUjIAiKP1+EiOgKqZiBBRB6feTGAFVMRUjoAhKv5/ECKiKqRgBRVD6/SRGQFVMxQgogtLvJzECqmIqRkARlH4/iRFQFVMxAoqg9PtJjICqmIoRUASl309iBFTFVIyAIij9fhIjoCqmYgQUQen3kxgBVTEVI6AISr+fxAioiqkYAUVQ+v0kRkBVTMUIKILS7ycxAqpiKkZAEZR+P4kRUBVTMQKKoPT7SYyAqpiKEVAEpd9PYgRUxVSMgCIo/X4SI6AqpmIEFEHp95MYAVUxFSOgCEq/n8QIqIqpGAFFUPr9JEZAVUzFCCiC0u8nMQKqYipGQBGUfj+JEVAVUzECiqD0+0mMgKqYihFQBKXfT2IEVMVUjIAiKP1+EiOgKqZiBBRB6feTGAFVMRUjoAhKv5/ECKiKqRgBRVD6/SRGQFVMxQgogtLvJzECqmIqRkARlH4/iRFQFVMxAoqg9PtJjICqmIoRUASl309iBFTFVIyAIij9fhIjoCqmYgQUQen3kxgBVTEVI6AISr+fxAioiqkYAUVQ+v0kRkBVTMUIKILS7ycxAqpiKkZAEZR+P4kRUBVTMQKKoPT7SYyAqpiKEVAEpd9PYgRUxVSMgCIo/X4SI6AqpmIEFEHp95MYAVUxFSOgCEq/n8QIqIqpGAFFUPr9JEZAVUzFCCiC0u8nMQKqYipGQBGUfj+JEVAVUzECiqD0+0mMgKqYihFQBKXfT2IEVMVUjIAiKP1+EiOgKqZiBBRB6feTGAFVMRUjoAhKv5/ECKiKqRgBRVD6/SRGQFVMxQgogtLvJzECqmIqRkARlH4/iRFQFVMxAoqg9PtJjICqmIoRUASl309iBFTFVIyAIij9fhIjoCqmYgQUQen3kxgBVTEVI6AISr+fxAioiqmYKKCPL083XvliPn908eDni9+8sjedvnudgEJJv5/ECKiKS0Dv720FdF3TVUwJKET0+0mMgKoME9CN+3vnPln8cGf62sGvXZuevz5/cHl6/hYBhY5+P4kRUJVBA7p4IPr+qpnvbzV1/Ti0pJWAQkS/n8QIqMqgAb25epj5+PJWLG+uH43e3IoqAcWp6feTGAFVGTKgjy5OP1z9eP53H0ynP72+/ODa6tcOf1pPQHFa+v0kRkBVhgzo5sHm5jmkZTr3H43e39t8EfT5FeXfvNL6SMOTfj/ASSkDuv9lzjvT6Xu35n+5Ml18TEAxDP1+gJNSBvTO5on2zSPR5XNJWwE1L2TSP7pufaThSb+fxPgUXmW4gD6+vP5q56GiPuURKAGFgH4/iRFQleEC+sRDzPIrBBTD0O8nMQKqMlxAn3iafdVMnoXHIPT7SYyAqgwX0P1Xz+9/Ll+auXn9J68DhZR+P4kRUJXBArr16vlrqwebq5DyTiQMQr+fxAioymABfXRx/0ug9/eWL2N68EF5Vn6R0Vd5Lzzk9PtJjICqDBbQ7SeJbq4vxnR9+cEDrsaEAej3kxgBVRksoHe2H2I++Nl0eu699ccPriz6+e4t+w/ob1vrIw1P+v0kRkBVBgvoielvW+sjDU/6/SRGQFVMxQgogtLvJzECqmIqRkARlH4/iRFQFVMxAoqg9PtJjICqmIoRUASl309iBFTFVKwjoLM/fvY5AcUY6feTGAFV6RvQe//pm/n84euTyeTMLwgoxke/n8QIqErPgN6YfO+38/nVydLyZwQUI6PfT2IEVKVfQG+XbN7dnTz7zb0Lk5cJKEZHv5/ECKhKv4BeXZRzmdGdXyz/d/lzAopx0e8nMQKq0iugs0vLcq4z+vDCMJ/D629b6yMNT/r9JEZAVXoFdNXMhxcmz80JKMZJv5/ECKjKCQJ6d3fyDgHFSOn3kxgBVekV0NWn8DfKl0D5GihGSb+fxAioSq+Azq9Onls+/b4sJ8/CY5T0+0mMgKr0C+jt8gLQxWfws59PVo9DCSjGRb+fxAioSr+ALj59X3iuPJG0884g/SSgOBX9fhIjoCo9Azq/99FPPl788PBHP/jNMP0koDgV/X4SI6AqfQM6PP1ta32k4Um/n8QIqIqp2LEBnX09YD8JKE5Fv5/ECKiKqdjRAf3yx8v3wz/80VuDvIaJgOKU9PtJjICq9Azo7NPVdZgeXpicGeZiTAQUp6LfT2IEVKVnQK9OJmf+evd7v5393WSg19ETUJyKfj+JEVCVfgG9PZm8vX4P5x9Wb+gkoBgX/X4SI6Aq/QJ6dfnuo/Wb4G+US4oQUIyLfj+JEVCVXgFdvRd+HdC7u1xMBOOj309iBFSlV0A3l7Mr5eRqTBgj/X4SI6AqBBQ56PeTGAFV6RXQ2aXlE0frcnI5O4yRfj+JEVCVXgFdPXG0CugipjyJhPHR7ycxAqrSL6B3dycvfVMCeu91LmeHMdLvJzECqtIvoOVydmd3d178/uLHYa6nTEBxKvr9JEZAVXoGdP773cnaQP0koDgV/X4SI6AqfQM6//ZXZxf1fGawy4ESUJyKfj+JEVCV3gEdnP62tT7S8KTfT2IEVMVUjOuBIij9fhIjoCqmYlwPFEHp95MYAVXpGVCuB4qR0+8nMQKq0jOgXA8UI6ffT2IEVKVfQLkeKMZOv5/ECKhKv4ByPVCMnX4/iRFQlV4B5XqgGD39fhIjoCq9Asrl7DB6+v0kRkBVCChy0O8nMQKq0iugXA8Uo6ffT2IEVKVXQLkeKEZPv5/ECKhKv4ByPVCMnX4/iRFQlX4B5XqgGDv9fhIjoCo9A8r1QDFy+v0kRkBV+gaU64Fi3PT7SYyAqvQO6OD0t631kYYn/X4SI6AqpmIEFEHp95MYAVUxFTvihfQ/emnQaykTUJyafj+JEVCVfgG9MJk8M9iVlAkoBPT7SYyAqvQK6OpyypMzHw/ZUP1ta32k4Um/n8QIqEqvgC786celoS98TEAxSvr9JEZAVfoGdL76rkgLQ72QSX/bWh9peNLvJzECqnKCgC4+lf/y9WVCd94a4ikl/W1rfaThSb+fxAioyokCuvDtz8tbkl7QPwzV37bWRxqe9PtJjICqnCigs199f/OGzslLBBRjot9PYgRUpX9AN/VcPhf/7af698Trb1vrIw1P+v0kRkBVegZ0/dXPg1eD6i+rrL9trY80POn3kxgBVekV0NmliX3ySP+NPfS3rfWRhif9fhIjoCq9Arp8J9LO4ZcvPbzAI1CMiX4/iRFQlZ4B/cGvzS/NPle/lEl/21ofaXjS7ycxAqrSK6Au9Let9ZGGJ/1+EiOgKqZiBBRB6feTGAFVMRXruCL9ztlB3oREQHFq+v0kRkBV+gb0xv4r6PmeSBgj/X4SI6AqPQO67OczL775Bt+VEyOl309iBFSlX0Dv7k6eXb2K6d4lvi88xki/n8QIqEq/gF49eN/R7NLkOQKK0dHvJzECqtIroLNLW4867+6qX0JPQHF6+v0kRkBVegX00Ps29W/iJKA4Pf1+EiOgKgQUOej3kxgBVekV0NmlyTv7H+ivw0RAcXr6/SRGQFV6BZQnkTB6+v0kRkBV+gX07u7kzOpyIn96nZcxYYz0+0mMgKr0C+jqjUhnz54d8q1Icq2PNDy1XhtwzFs5/7C7fifnztsD/dX6/zi0PtLwpN9PYjwCVekb0PnsyzcWj0Bf/HiQJ5AIKE5Lv5/ECKhK74AOTn/bWh9peNLvJzECqmIqRkARlH4/iRFQFVMxG9DZR28+6Se8DhSjo99PYgRUpSOgy28n9wTeiYTx0e8nMQKqQkCRg34/iRFQlY6AOtLfttZHGp70+0mMgKqYihFQBKXfT2IEVMVU7PiAfjVcPgkoTke/n8QIqIqp2NEB/fLH5X1IP/gNAcUY6feTGAFV6RnQ2aX9p5BeGui9SPrb1vpIw5N+P4kRUJV+AV32c+fFf/jsn97YnQx0NTsCilPR7ycxAqrSL6A3JpMfrh54zn452bq4MgHFWOj3kxgBVekV0MUD0INr2F3lgsoYIf1+EiOgKr0C+vDCoe/KyQvpMT76/SRGQFV6BpRvKoeR0+8nMQKq0iugfF94jJ5+P4kRUJVeAZ3f2Pq65w2+BooR0u8nMQKq0i+gs0v7L/+8MdC1RAgoTkW/n8QIqEqvgM4+Wr7+88W3Pvvn5Y8vDHNVUP1ta32k4Um/n8QIqEqvgLpc1E5/21ofaXjS7ycxAqpCQJGDfj+JEVCVXgF1ob9trY80POn3kxgBVTEVI6AISr+fxAioiqkYAUVQ+v0kRkBVTMWODugfP9v3OS+kx+jo95MYAVXpGdDf7/JN5TBq+v0kRkBV+gX0Nt+VEyOn309iBFSlV0BnlyY7H3+17+sh+klAcSr6/SRGQFV6BfThhYEuokxAoaLfT2IEVKVnQAd6/zsBhYp+P4kRUJVeAZ1dIqAYOf1+EiOgKr0COr/Bp/AYOf1+EiOgKv0Ceuh7ehBQjJB+P4kRUJV+AZ3fuzA58+aG+kJ2BBSnp99PYgRUpWdAP+V1oBg3/X4SI6Aq/QJ6gxfSY+T0+0mMgKr0Cmh5If0gn7cTUIjo95MYAVXpFVCP55AIKE5Fv5/ECKhKz4DyOlCMnH4/iRFQlV4B5YX0GD39fhIjoCq9Ajq/MXmZgGLU9PtJjICq9Avo7NLO2wQUY6bfT2IEVKVXQGcfvTGZ7LzIC+kxXvr9JEZAVXoF1HxbY14HivHR7ycxAqpCQJGDfj+JEVCVXgF1ob9trY80POn3kxgBVTEVI6AISr+fxAioiqkYAUVQ+v0kRkBVTMVsQGd/tN8F/uGPz77A10AxOvr9JEZAVToC+vDC6imj2UebFy9tfoWAYlT0+0mMgKr0DOhBNgkoRkm/n8QIqAoBRQ76/SRGQFUIKHLQ7ycxAqpCQJGDfj+JEVAVAooc9PtJjICqEFDkoN9PYgRUhYAiB/1+EiOgKgQUOej3kxgBVSGgyEG/n8QIqAoBRQ76/SRGQFUIKHLQ7ycxAqrSHdAnEVCMj34/iRFQFQKKHPT7SYyAqnQEdPbRm0/im8phfPT7SYyAqnQE1JH+trU+0vCk309iBFTFVIyAIij9fhIjoCqmYgQUQen3kxgBVTEVI6AISr+fxAioiqkYAUVQ+v0kRkBVTMUIKILS7ycxAqpiKkZAEZR+P4kRUBVTMQKKoPT7SYyAqpiKEVAEpd9PYgRUxVTsiXciXdr5xeKHb78moBg3/X4SI6AqHQF9eGH5xvfV/xJQjJh+P4kRUJXOgC4fgRJQjJ5+P4kRUJWOgM4uTZ79/Ks/Xfjer786MMzn8/rb1vpIw5N+P4kRUJWOgM5vcDk7hKDfT2IEVKUroLNP6wL66OK0eOWL5UePr+xNp+9eX/3WoQ8IKDT0+0mMgKp0BXSR0K8+++fdnX/47MDnPa4Hen9vK6Drmq5ieugDAgoR/X4SI6Aq3QGdVz2JdGf62sEH16bnr88fXJ6ev2U/IKAQ0e8nMQKq0iugs49OfBH6a9P3939+f2/9OPTcJ+YDAgoV/X4SI6AqvQJ6co8vb/Xx5vrR6M1lVA99QEChot9PYgRUpXdAv/3V2clk5+xb/V7D9Oji+d99MJ3+9Pryg2vTD8svlk/rD31AQKGi309iBFSlb0APXs70cp+Abp5DWtZy/9Ho/b3ztw59sPr/Pr/S5489mdZHGp70+wFO6qiALvv5zItvvvH9ngW9M52+d2v+lyvTRS4JKBzo9wOc1BEBvbs7efY35Wf3Lk3K5UU6bL7SuXwuaauZr3xx6IND/4j+0XXrIw1P+v0kxqfwKv0CenXy7OZp+NmlyXPdAd24MzUPOp/yCJSAQkC/n8QIqEqvgK4vardyd/fZ/q9pMg86CSiGot9PYgRUpVdAD72Q/kSvqi+Z5Fl4DE+/n8QIqMowAX18eTuTm5d8rl8HuvUBAYWKfj+JEVCVXgGdXZq8s//B7UmPT+GvrR5frkLKO5EwPP1+EiOgKr0CevInke7vLV/G9OCD8o73RUZf3X/7+6EPCChU9PtJjICq9Avo3d3JmV+Xn/3p9V4vY1p8hr665tL15QcPti/A9ICrMWEA+v0kRkBV+gV09Uaks2fP9n4r0vzBz6bTc++tH2U+uLJI5rtP+4CAQkO/n8QIqErPgM7/sLt+J+fO2736eXL629b6SMOTfj+JEVCVvgGdz758Y/EI9MWPT3pdOwIKF/r9JEZAVXoHdHD629b6SMOTfj+JEVAVUzECiqD0+0mMgKqYihFQBKXfT2IEVMVUjIAiKP1+EiOgKqZiBBRB6feTGAFVMRUjoAhKv5/ECKiKqRgBRVD6/SRGQFVMxQgogtLvJzECqmIqRkARlH4/iRFQFVOxo67G9IPfEFCMmn4/iRFQlV4BfXhh63qgBBRjpN9PYgRUpWdAT/BdPAgoWtDvJzECqtIroIe+qRwBxRjp95MYAVXpFdD5jc23hSegGCn9fhIjoCr9AvrtLyeTZ158c+0ng1zSTn/bWh9peJuln3QAABwGSURBVNLvJzECqtIroA8vTLYN8wVR/W1rfaThSb+fxAioCgFFDvr9JEZAVXoF1IX+trU+0vCk309iBFTFVIyAIij9fhIjoCqmYscGdPb1gP0koDgV/X4SI6AqpmJHB/TLHy+/+PnwR28N9V3l9Let9ZGGJ/1+EiOgKj0DOvt09ezRwwuTMwO9KUl/21ofaXjS7ycxAqrSM6BXJ5Mzf737vd/O/m4yeXaYx6D629b6SMOTfj+JEVCVfgG9PZm8vX5H/B92B7qwiP62tT7S8KTfT2IEVKVfQK9OXt6/pMiNyXMEFKOj309iBFSlV0BXFxNZB/TuLi+kx/jo95MYAVXpFdBVOtcBHeradvrb1vpIw5N+P4kRUBUCihz0+0mMgKr0Cujs0vKJo3U5bw/0NLz+trU+0vCk309iBFSlV0BXTxytArqIKU8iYXz0+0mMgKr0C+jd3clL35SA3nt9MtDV6fW3rfWRhif9fhIjoCr9Arp4CDqZnN3defH7ix9fHqSfBBSnot9PYgRUpWdA57/f3VwNdKB+ElCcin4/iRFQlb4BnX/7q7OLej4z3DeI19+21kcanvT7SYyAqvQO6OD0t631kYYn/X4SI6AqpmLHXw/0qwH7SUBxKvr9JEZAVUzFjr8e6AKfwmOc9PtJjICq9Azo7NL+t5R7aaArKutvW+sjDU/6/SRGQFX6BXTZz50X//Nn//TGoqDDvI6egOJU9PtJjICq9Avo7f1XL81+OeF6oBgh/X4SI6AqvQK6eAB68OrPq7yVEyOk309iBFSlV0AfXth6+ybXA8UY6feTGAFV6RnQrWZyOTuMkX4/iRFQlV4BXV2Rfu3uLpezw/jo95MYAVXpFdBD3wfpxkDvhtffttZHGp70+0mMgKr0C+jDC5MffrPp5zCfwRNQnIp+P4kRUJWOgM4+erN4Y/U60H9+c3cyefEnfAqP0dHvJzECqtIR0MVDzyfxJBLGR7+fxAioCgFFDpUj+X/4DpH2pegIqCP9bWt9pOGpciStjzQ8SftSmIoRUARVOZLWRxqepH0pTMUIKIKqHEnrIw1P0r4UpmJHB/SPn+37nGfhMTqVI2l9pOFJ2peiZ0APvqccTyJhlCpH0vpIw5O0L0W/gN7mWXiMXOVIWh9peJL2pegV0Nmlyc7HX+37eoh+ElCcSuVIWh9peJL2pegV0IcXBrqIMgGFSuVIWh9peJL2pegZ0IHe/05AoVI5ktZHGp6kfSl6BXR2iYBi5CpH0vpIw5O0L0WvgM5v8Ck8Rq5yJK2PNDxJ+1L0C+ih7+lBQDFClSNpfaThSdqXol9A5/cuTM68ucHl7DA+lSNpfaThSdqXomdAP+V1oBi3ypG0PtLwJO1L0S+gN3ghPUauciStjzQ8SftS9ApoeSH9IJ+3E1CIVI6k9ZGGJ2lfil4B9XgOiYDiVCpH0vpIw5O0L0XPgPI6UIxc5UhaH2l4kval6BVQXkiP0ascSesjDU/SvhS9AjrY94InoFCpHEnrIw1P0r4U/QI6u7TzNgHFmFWOpPWRhidpX4peAZ19VL4vPC+kx3hVjqT1kYYnaV+KXgE139yY14FifCpH0vpIw5O0LwUBRQ6VI2l9pOFJ2peiV0Bd6G9b6yMNT5UjaX2k4Unal8JUjIAiqMqRtD7S8CTtS2EqRkARVOVIWh9peJL2pTAVOyKg3361jW8qh/GpHEnrIw1P0r4UvQLq8iSSXusjDU+VI2l9pOFJ2pen4Vl4BFU5ktZHGp6kfSl6BXT2x8/W/v71yc4/fM4L6TE6lSNpfaThSdqXoldAt93dfXaYK4Pqb1vrIw1PlSNpfaThSdqX4sQBHezCIvrb1vpIw1PlSFofaXiS9qU4eUCHegiqv22tjzQ8VY6k9ZGGJ2lfipMHdKirK+tvW+sjDU+VI2l9pOFJ2pfi5AG9u0tAMT6VI2l9pOFJ2pfixAGdXZ3wKTzGp3IkrY80PEn7UvQK6OyjzaVA33xjd8KTSBihypG0PtLwJO1L0Sugh19Iz8uYMEKVI2l9pOFJ2pfixAF95q2BvkG8/ra1PtLwVDmS1kcanqR9KXoF1IX+trU+0vBUOZLWRxqepH0pTMUIKIKqHEnrIw1P0r4UpmIEFEFVjqT1kYYnaV8KUzECiqAqR9L6SMOTtC+FqZgN6NYLmA7wbY0xPpUjaX2k4Unal6IjoOZKoFwPFGNVOZLWRxqepH0pCChyqBxJ6yMNT9K+FB0Btb7cnfBOJIxR5UhaH2l4kvalOFFAZz9f5PPMbwbpJwHFqVSOpPWRhidpX4qTBPQPi4efO0O9EYmA4lQqR9L6SMOTtC9F/4AO+vCTgOKUKkfS+kjDk7QvRe+Aloef/26wfBJQnE7lSFofaXiS9qXoGdB7Az/8JKA4pcqRtD7S8CTtS9EvoIM//CSgOKXKkbQ+0vAk7UvRJ6D3Li2vAjrow08CilOqHEnrIw1P0r4UPQJaHn6+PXA+CShOp3IkrY80PEn7UnQG1OfhJwHFKVWOpPWRhidpX4qugP7e5+EnAcUpVY6k9ZGGJ2lfio6A8l54BFE5ktZHGp6kfSkIKHKoHEnrIw1P0r4UHQHleqAIonIkrY80PEn7UnQE1JH+trU+0vBUOZLWRxqepH0pTMUIKIKqHEnrIw1P0r4UpmIEFEFVjqT1kYYnaV8KUzECiqAqR9L6SMOTtC+FqRgBRVCVI2l9pOFJ2pfCVIyAIqjKkbQ+0vAk7UthKkZAEVTlSFofaXiS9qUwFSOgCKpyJK2PNDxJ+1KYihFQBFU5ktZHGp6kfSlMxQgogqocSesjDU/SvhSmYgQUQVWOpPWRhidpXwpTMQKKoCpH0vpIw5O0L4WpGAFFUJUjaX2k4Unal8JUjIAiqMqRtD7S8CTtS2EqRkARVOVIWh9peJL2pTAVI6AIqnIkrY80PEn7UpiKEVAEVTmS1kcanqR9KUzFCCiCqhxJ6yMNT9K+FKZiBBRBVY6k9ZGGJ2lfClMxAoqgKkfS+kjDk7QvhakYAUVQlSNpfaThSdqXwlSMgCKoypG0PtLwJO1LYSpGQBFU5UhaH2l4kvalMBUjoAiqciStjzQ8SftSmIoRUARVOZLWRxqepH0pTMUIKIKqHEnrIw1P0r4UpmIEFEFVjqT1kYYnaV8KUzECiqAqR9L6SMOTtC+FqRgBRVCVI2l9pOFJ2pfCVIyAIqjKkbQ+0vAk7UthKkZAEVTlSFofaXiS9qUwFSOgCKpyJK2PNDxJ+1KYihFQBFU5ktZHGp6kfSlMxQgogqocSesjDU/SvhSmYgQUQVWOpPWRhidpXwpTMQKKoCpH0vpIw5O0L4WpGAFFUJUjaX2k4Unal8JUjIAiqMqRtD7S8CTtS2EqRkARVOVIWh9peJL2pTAVI6AIqnIkrY80PEn7UpiKEVAEVTmS1kcanqR9KUzFCCiCqhxJ6yMNT9K+FKZiBBRBVY6k9ZGGJ2lfClMxAoqgKkfS+kjDk7QvhakYAUVQlSNpfaThSdqXwlSMgCKoypG0PtLwJO1LYSpGQBFU5UhaH2l4kvalMBUjoAiqciStjzQ8SftSmIrpAvpvP5tOz717vfz80cVp8coXy48eX9mbTte/Q0AhUjmS1kcanqR9KYYK6L+sknnuk+UH9/e2Arqu6SqmBBQilSNpfaThSdqXYqCA3pme+9v5/MHlVSfvTF87+K1r0/PXl79z/hYBhU7lSFofaXiS9qUYJqCPL08/XP64eLT5YWnm+/u/dX9v/Th09eCUgEKjciStjzQ8SftSDBPQRxfXn6GXdD6+vBXLm+tHoze3okpAcWqVI2l9pOFJ2pdimIDuKwF9dPH87z6YTn96ffUr5bHp4U/rCShOq3IkrY80PEn7Ugwb0NUn6pvnkJbp3H80en9v80XQ51e0f/NS6yMNT5UjaX2k4Unal6cRB3T1+fqd6fS9W/O/XFk+J09AMYzKkbQ+0vAk7cvTaAN6Z/Uyps2XPZefz28F1LyQSf/ouvWRhqfKkbQ+0vAk7UsxZEDv7J378HBPz996yiNQAgqBypG0PtLwJO1LMWBAb07NK5WWDzoJKIZROZLWRxqepH0phgvov9h+rprJs/AYROVIWh9peJL2pRgqoI+vTV9df41z86r6VTM3r//kdaCQqhxJ6yMNT9K+FEMF9NrWWzWvrR5srkLKO5EwiMqRtD7S8CTtSzFQQG9uv9X9/t7yZUwPPii/tsjoq7wXHnKVI2l9pOFJ2pdimIBurl+38FrJ6eoCTNeXv/eAqzFhAJUjaX2k4Unal2KYgN6ZHgro/MHy4qDvrR9yPriy+OV3b9l/Rn/bWh9peKocSesjDU/SvhTDBLSG/ra1PtLwVDmS1kcanqR9KUzFCCiCqhxJ6yMNT9K+FKZiBBRBVY6k9ZGGJ2lfClMxAoqgKkfS+kjDk7QvhakYAUVQlSNpfaThSdqXwlSMgCKoypG0PtLwJO1LYSpGQBFU5UhaH2l4kvalMBUjoAiqciStjzQ8SftSmIoRUARVOZLWRxqepH0pTMUIKIKqHEnrIw1P0r4UpmIEFEFVjqT1kYYnaV8KUzECiqAqR9L6SMOTtC+FqRgBRVCVI2l9pOFJ2pfCVIyAIqjKkbQ+0vAk7UthKkZAEVTlSFofaXiS9qUwFSOgCKpyJK2PNDxJ+1KYihFQBFU5ktZHGp6kfSlMxQgogqocSesjDU/SvhSmYgQUQVWOpPWRhidpXwpTMQKKoCpH0vpIw5O0L4WpGAFFUJUjaX2k4Unal8JUjIAiqMqRtD7S8CTtS2EqRkARVOVIWh9peJL2pTAVI6AIqnIkrY80PEn7UpiKEVAEVTmS1kcanqR9KUzFCCiCqhxJ6yMNT9K+FKZiBBRBVY6k9ZGGJ2lfClMxAoqgKkfS+kjDk7QvhakYAUVQlSNpfaThSdqXwlSMgCKoypG0PtLwJO1LYSpGQBFU5UhaH2l4kvalMBUjoAiqciStjzQ8SftSmIoRUARVOZLWRxqepH0pTMUIKIKqHEnrIw1P0r4UpmIEFEFVjqT1kYYnaV8KUzECiqAqR9L6SMOTtC+FqRgBRVCVI2l9pOFJ2pfCVIyAIqjKkbQ+0vAk7UthKkZAEVTlSFofaXiS9qUwFSOgCKpyJK2PNDxJ+1KYihFQBFU5ktZHGp6kfSlMxQgogqocSesjDU/SvhSmYgQUQVWOpPWRhidpXwpTMQKKoCpH0vpIw5O0L4WpGAFFUJUjaX2k4Unal8JUjIAiqMqRtD7S8CTtS2EqRkARVOVIWh9peJL2pTAVI6AIqnIkrY80PEn7UpiKEVAEVTmS1kcanqR9KUzFCCiCqhxJ6yMNT9K+FKZiBBRBVY6k9ZGGJ2lfClMxAoqgKkfS+kjDk7QvhakYAUVQlSNpfaThSdqXwlSMgCKoypG0PtLwJO1LYSpGQBFU5UhaH2l4kvalMBUjoAiqciStjzQ8SftSmIoRUARVOZLWRxqepH0pTMUIKIKqHEnrIw1P0r4UpmIEFEFVjqT1kYYnaV8KUzECiqAqR9L6SMOTtC+FqRgBRVCVI2l9pOFJ2pfCVIyAIqjKkbQ+0vAk7UthKkZAEVTlSFofaXiS9qUwFSOgCKpyJK2PNDxJ+1KYihFQBFU5ktZHGp6kfSlMxQgogqocSesjDU/SvhSmYgQUQVWOpPWRhidpXwpTMQKKoCpH0vpIw5O0L4WpGAFFUJUjaX2k4Unal8JUjIAiqMqRtD7S8CTtS2EqRkARVOVIWh9peJL2pTAVI6AIqnIkrY80PEn7UpiKEVAEVTmS1kcanqR9KUzFCCiCqhxJ6yMNT9K+FKZiBBRBVY6k9ZGGJ2lfClMxAoqgKkfS+kjDk7QvhakYAUVQlSNpfaThSdqXwlSMgCKoypG0PtLwJO1LYSpGQBFU5UhaH2l4kvalMBVrGFC91kcanipH0vpIw5O0L0/DI1AEVTmS1kcanqR9KUzFCCiCqhxJ6yMNT9K+FKZiBBRBVY6k9ZGGJ2lfClMxAoqgKkfS+kjDk7QvhakYAUVQlSNpfaThSdqXwlSMgCKoypG0PtLwJO1LYSpGQBFU5UhaH2l4kvalMBUjoAiqciStjzQ8SftSmIoRUARVOZLWRxqepH0pTMUIKIKqHEnrIw1P0r4UpmIEFEFVjqT1kYYnaV8KUzECiqAqR9L6SMOTtC+FqRgBRVCVI2l9pOFJ2pfCVIyAIqjKkbQ+0vAk7UthKkZAEVTlSFofaXiS9qUwFSOgCKpyJK2PNDxJ+1KYihFQBFU5ktZHGp6kfSlMxQgogqocSesjDU/SvhSmYgQUQVWOpPWRhidpXwpTMQKKoCpH0vpIw5O0L4WpGAFFUJUjaX2k4Unal8JUjIAiqMqRtD7S8CTtS2EqRkARVOVIWh9peJL2pTAVI6AIqnIkrY80PEn7UpiKEVAEVTmS1kcanqR9KUzFCCiCqhxJ6yMNT9K+FKZiBBRBVY6k9ZGGJ2lfClMxAoqgKkfS+kjDk7QvhakYAUVQlSNpfaThSdqXwlSMgCKoypG0PtLwJO1LYSpGQBFU5UhaH2l4kvalMBUjoAiqciStjzQ8SftSmIoRUARVOZLWRxqepH0pTMUIKIKqHEnrIw1P0r4UpmIEFEFVjqT1kYYnaV8KUzECiqAqR9L6SMOTtC+FqRgBRVCVI2l9pOFJ2pfCVIyAIqjKkbQ+0vAk7UthKkZAEVTlSFofaXiS9qUwFSOgCKpyJK2PNDxJ+1KYihFQBFU5ktZHGp6kfSlMxQgogqocSesjDU/SvhSmYgQUQVWOpPWRhidpXwpTMQKKoCpH0vpIw5O0L4WpGAFFUJUjaX2k4Unal8JUjIAiqMqRtD7S8CTtS2EqRkARVOVIWh9peJL2pTAVI6AIqnIkrY80PEn7UpiKEVAEVTmS1kcanqR9KUzFCCiCqhxJ6yMNT9K+FKZiBBRBVY6k9ZGGJ2lfClMxAoqgKkfS+kjDk7QvhakYAUVQlSNpfaThSdqXwlSMgCKoypG0PtLwJO1LYSpGQBFU5UhaH2l4kvalMBUjoAiqciStjzQ8SftSmIoRUARVOZLWRxqepH0pTMUIKIKqHEnrIw1P0r4UpmIEFEFVjqT1kYYnaV8KUzECiqAqR9L6SMOTtC+FqRgBRVCVI2l9pOFJ2pfCVIyAIqjKkbQ+0vAk7UthKkZAEVTlSFofaXiS9qUwFSOgCKpyJK2PNDxJ+1KYihFQBFU5ktZHGp6kfSlMxQgogqocSesjDU/SvhSmYgQUQVWOpPWRhidpXwpTMQKKoCpH0vpIw5O0L4WpGAFFUJUjaX2k4Unal8JUjIAiqMqRtD7S8CTtS2EqRkARVOVIWh9peJL2pTAVI6AIqnIkrY80PEn7UpiKEVAEVTmS1kcanqR9KUzFCCiCqhxJ6yMNT9K+FKZiBBRBVY6k9ZGGJ2lfClMxAoqgKkfS+kjDk7QvhakYAUVQlSNpfaThSdqXwlSMgCKoypG0PtLwJO1LYSpGQBFU5UhaH2l4kvalMBUjoAiqciStjzQ8SftSmIp5BPTxlb3p9N3rBBRKlSNpfaThSdqXwj+gjy5Ol175goBCqHIkrY80PEn7UvgH9Nr0/PX5g8vT87cIKHQqR9L6SMOTtC+Fe0Dv75XHno8unvuEgEKnciStjzQ8SftSuAf05vS19Y/vE1DoVI6k9ZGGJ2lfCveAXpt+WH68sw4pAYVE5UhaH2l4kval8A7o48vrT93v722+CPr8iv7van2k4alyJK2PNDxJ+/I0qQIKAJ48A2peyKR/dP3dxD2JToxEpWFAzeuYWt8TWXBPohMjUSGg2XBPohMjUfEOqOez8N9N3JPoxEhU3AO6ef2nw+tAv5u4J9GJkai4B9TxnUjfTdyT6MRIVNwD+vjy9FWn98J/N3FPohMjUXEP6PyB29WYvpu4J9GJkaj4B3T+4Mqin+/esr/c+p7IgnsSnRiJSoOAHqH1PZEF9yQ6MRIVUzECGh73JDoxEhVTMQIaHvckOjESFVMxAhoe9yQ6MRIVUzECGh73JDoxEhVTMQIaHvckOjESFVMxAhoe9yQ6MRIVUzECGh73JDoxEhVTMQIaHvckOjESFVMxAhoe9yQ6MRIVUzECGh73JDoxEhVTMQIaHvckOjESFVMxAhoe9yQ6MRIVUzECGh73JDoxEhVTMQIaHvckOjESFVMxAhoe9yQ6MRIVUzECGh73JDoxEhVTMQIaHvckOjESFVMxAhoe9yQ6MRIVUzECGh73JDoxEhVTMQIaHvckOjESFVMxAhoe9yQ6MRIVUzECGh73JDoxEhVTMQIaHvckOjESFVMxAhoe9yQ6MRIVUzECGh73JDoxEhVTMQIaHvckOjESFVOxhgGFxvPPt/43wOgxkoEQ0PA4G+jESAZCQMPjbKATIxkIAQ2Ps4FOjGQgBDQ8zgY6MZKBENDwOBvoxEgGQkDD42ygEyMZCAEFgEoEFAAqEVAAqERAAaASAQWASgQUACoRUACoREABoBIBDeHRxen7+z995Yum/y4Yk8eXp+dv7f/0w7b/Mt9BBDSERUDPfbL5KQHFgft7m/+23tlPKdwQ0BAWAZ2+tvkpAcWWm9PVIB5d3Pw3Fn4IaAiLw/E368/PCCgO2Xx55+bmP7FwREBDWFTzf+xtHmisfnxwZTqdvnu96b8WxuBO+fLO/fU+FsPYm05/en31858tRvLv/7bhv1x2BDSEZTXXjzDWAb2zOCUL53ja4Dvv8eXlMq6tP0O5vzWM9c95aDocAhrCsprrJ1lXAV0cjXf/9/zxv0z5uhfu75375P7e6hmkxSf0792aP/7X5RdGF4v5D4tf/Lc9RjIYAhpCqebqk7RVQDdf8LrGowssVnD+v6wjuRnGzen7PK3kgICGsKpmqWX56f5L/njpCrZfpPH48rqZy0eki5W8+j9b/nt9BxDQEFYBLY8oyk/3H1vwnDzmy/+OrmewaObG4lduLn989b/yn9jhENAQNs8cLR5vrgO6PjAEFPPV483yk+Vj0YOAzv/8N+Wn75HQoRDQEDadvDZ9n0egeMJWQM2XPR//9+Urmd5/2j8EAQIawqaTi/Px3/gaKKz9gD7t/fCP/5WRDIaAhrD/QPPO9K/2eBYexn5AF8NY/Wz5X9bNa+sPfhdqBDSEg8/Ur62+uLV6HehfrvA6UMy3E/no4vT89fn8z3uLR6LLKzUtfv7gMv+VHQwBDeEgoIty8k4kGFuPMdfDmL43P3gn0qt8nXwoBDSEreeKNhff4b3w2Lf9SfrqvfD/ePDzv/qPfAI/GAIKAJUIKABUIqAAUImAAkAlAgoAlQgoAFQioABQiYACQCUCCgCVCCgAVCKgAFCJgAJAJQIKAJUIKABUIqAAUImAAkAlAgoAlQgoAFQioABQiYACQCUCCgCVCCgAVCKgAFCJgAJAJQIKAJUIKABUIqAAUImAAkAlAgoAlQgoAFQioABQiYACQCUCCgCVCCgAVCKgAFCJgAJAJQIKAJUIKABUIqAAUImAAkAlAgoAlQgoAFQioABQiYACQCUCCgCVCCgAVCKgAFCJgAJAJQIKAJUIKABUIqAAUOn/A71FEGOQyBlxAAAAAElFTkSuQmCC">
@@ -8800,326 +8269,6 @@
           <a:chExt cx="0" cy="0"/>
         </a:xfrm>
       </p:grpSpPr>
-      <p:cxnSp>
-        <p:nvCxnSpPr>
-          <p:cNvPr id="33" name="Straight Connector 32">
-            <a:extLst>
-              <a:ext uri="{FF2B5EF4-FFF2-40B4-BE49-F238E27FC236}">
-                <a16:creationId xmlns:a16="http://schemas.microsoft.com/office/drawing/2014/main" id="{0512F9CB-A1A0-4043-A103-F6A4B94B695A}"/>
-              </a:ext>
-              <a:ext uri="{C183D7F6-B498-43B3-948B-1728B52AA6E4}">
-                <adec:decorative xmlns:adec="http://schemas.microsoft.com/office/drawing/2017/decorative" val="1"/>
-              </a:ext>
-            </a:extLst>
-          </p:cNvPr>
-          <p:cNvCxnSpPr>
-            <a:cxnSpLocks noGrp="1" noRot="1" noChangeAspect="1" noMove="1" noResize="1" noEditPoints="1" noAdjustHandles="1" noChangeArrowheads="1" noChangeShapeType="1"/>
-          </p:cNvCxnSpPr>
-          <p:nvPr>
-            <p:extLst>
-              <p:ext uri="{386F3935-93C4-4BCD-93E2-E3B085C9AB24}">
-                <p16:designElem xmlns:p16="http://schemas.microsoft.com/office/powerpoint/2015/main" val="1"/>
-              </p:ext>
-            </p:extLst>
-          </p:nvPr>
-        </p:nvCxnSpPr>
-        <p:spPr>
-          <a:xfrm flipH="1">
-            <a:off x="8228012" y="8467"/>
-            <a:ext cx="3810000" cy="3810000"/>
-          </a:xfrm>
-          <a:prstGeom prst="line">
-            <a:avLst/>
-          </a:prstGeom>
-          <a:ln w="12700">
-            <a:solidFill>
-              <a:schemeClr val="tx1"/>
-            </a:solidFill>
-          </a:ln>
-        </p:spPr>
-        <p:style>
-          <a:lnRef idx="2">
-            <a:schemeClr val="accent1"/>
-          </a:lnRef>
-          <a:fillRef idx="0">
-            <a:schemeClr val="accent1"/>
-          </a:fillRef>
-          <a:effectRef idx="1">
-            <a:schemeClr val="accent1"/>
-          </a:effectRef>
-          <a:fontRef idx="minor">
-            <a:schemeClr val="tx1"/>
-          </a:fontRef>
-        </p:style>
-      </p:cxnSp>
-      <p:cxnSp>
-        <p:nvCxnSpPr>
-          <p:cNvPr id="35" name="Straight Connector 34">
-            <a:extLst>
-              <a:ext uri="{FF2B5EF4-FFF2-40B4-BE49-F238E27FC236}">
-                <a16:creationId xmlns:a16="http://schemas.microsoft.com/office/drawing/2014/main" id="{ADBE6588-EE16-4389-857C-86A156D49E5D}"/>
-              </a:ext>
-              <a:ext uri="{C183D7F6-B498-43B3-948B-1728B52AA6E4}">
-                <adec:decorative xmlns:adec="http://schemas.microsoft.com/office/drawing/2017/decorative" val="1"/>
-              </a:ext>
-            </a:extLst>
-          </p:cNvPr>
-          <p:cNvCxnSpPr>
-            <a:cxnSpLocks noGrp="1" noRot="1" noChangeAspect="1" noMove="1" noResize="1" noEditPoints="1" noAdjustHandles="1" noChangeArrowheads="1" noChangeShapeType="1"/>
-          </p:cNvCxnSpPr>
-          <p:nvPr>
-            <p:extLst>
-              <p:ext uri="{386F3935-93C4-4BCD-93E2-E3B085C9AB24}">
-                <p16:designElem xmlns:p16="http://schemas.microsoft.com/office/powerpoint/2015/main" val="1"/>
-              </p:ext>
-            </p:extLst>
-          </p:nvPr>
-        </p:nvCxnSpPr>
-        <p:spPr>
-          <a:xfrm flipH="1">
-            <a:off x="6108170" y="91545"/>
-            <a:ext cx="6080655" cy="6080655"/>
-          </a:xfrm>
-          <a:prstGeom prst="line">
-            <a:avLst/>
-          </a:prstGeom>
-          <a:ln w="12700">
-            <a:solidFill>
-              <a:schemeClr val="tx1"/>
-            </a:solidFill>
-          </a:ln>
-        </p:spPr>
-        <p:style>
-          <a:lnRef idx="2">
-            <a:schemeClr val="accent1"/>
-          </a:lnRef>
-          <a:fillRef idx="0">
-            <a:schemeClr val="accent1"/>
-          </a:fillRef>
-          <a:effectRef idx="1">
-            <a:schemeClr val="accent1"/>
-          </a:effectRef>
-          <a:fontRef idx="minor">
-            <a:schemeClr val="tx1"/>
-          </a:fontRef>
-        </p:style>
-      </p:cxnSp>
-      <p:cxnSp>
-        <p:nvCxnSpPr>
-          <p:cNvPr id="37" name="Straight Connector 36">
-            <a:extLst>
-              <a:ext uri="{FF2B5EF4-FFF2-40B4-BE49-F238E27FC236}">
-                <a16:creationId xmlns:a16="http://schemas.microsoft.com/office/drawing/2014/main" id="{17FD48D2-B0A7-413D-B947-AA55AC1296D5}"/>
-              </a:ext>
-              <a:ext uri="{C183D7F6-B498-43B3-948B-1728B52AA6E4}">
-                <adec:decorative xmlns:adec="http://schemas.microsoft.com/office/drawing/2017/decorative" val="1"/>
-              </a:ext>
-            </a:extLst>
-          </p:cNvPr>
-          <p:cNvCxnSpPr>
-            <a:cxnSpLocks noGrp="1" noRot="1" noChangeAspect="1" noMove="1" noResize="1" noEditPoints="1" noAdjustHandles="1" noChangeArrowheads="1" noChangeShapeType="1"/>
-          </p:cNvCxnSpPr>
-          <p:nvPr>
-            <p:extLst>
-              <p:ext uri="{386F3935-93C4-4BCD-93E2-E3B085C9AB24}">
-                <p16:designElem xmlns:p16="http://schemas.microsoft.com/office/powerpoint/2015/main" val="1"/>
-              </p:ext>
-            </p:extLst>
-          </p:nvPr>
-        </p:nvCxnSpPr>
-        <p:spPr>
-          <a:xfrm flipH="1">
-            <a:off x="7235825" y="228600"/>
-            <a:ext cx="4953000" cy="4953000"/>
-          </a:xfrm>
-          <a:prstGeom prst="line">
-            <a:avLst/>
-          </a:prstGeom>
-          <a:ln w="12700">
-            <a:solidFill>
-              <a:schemeClr val="tx1"/>
-            </a:solidFill>
-          </a:ln>
-        </p:spPr>
-        <p:style>
-          <a:lnRef idx="2">
-            <a:schemeClr val="accent1"/>
-          </a:lnRef>
-          <a:fillRef idx="0">
-            <a:schemeClr val="accent1"/>
-          </a:fillRef>
-          <a:effectRef idx="1">
-            <a:schemeClr val="accent1"/>
-          </a:effectRef>
-          <a:fontRef idx="minor">
-            <a:schemeClr val="tx1"/>
-          </a:fontRef>
-        </p:style>
-      </p:cxnSp>
-      <p:cxnSp>
-        <p:nvCxnSpPr>
-          <p:cNvPr id="39" name="Straight Connector 38">
-            <a:extLst>
-              <a:ext uri="{FF2B5EF4-FFF2-40B4-BE49-F238E27FC236}">
-                <a16:creationId xmlns:a16="http://schemas.microsoft.com/office/drawing/2014/main" id="{2BE668D0-D906-4EEE-B32F-8C028624B837}"/>
-              </a:ext>
-              <a:ext uri="{C183D7F6-B498-43B3-948B-1728B52AA6E4}">
-                <adec:decorative xmlns:adec="http://schemas.microsoft.com/office/drawing/2017/decorative" val="1"/>
-              </a:ext>
-            </a:extLst>
-          </p:cNvPr>
-          <p:cNvCxnSpPr>
-            <a:cxnSpLocks noGrp="1" noRot="1" noChangeAspect="1" noMove="1" noResize="1" noEditPoints="1" noAdjustHandles="1" noChangeArrowheads="1" noChangeShapeType="1"/>
-          </p:cNvCxnSpPr>
-          <p:nvPr>
-            <p:extLst>
-              <p:ext uri="{386F3935-93C4-4BCD-93E2-E3B085C9AB24}">
-                <p16:designElem xmlns:p16="http://schemas.microsoft.com/office/powerpoint/2015/main" val="1"/>
-              </p:ext>
-            </p:extLst>
-          </p:nvPr>
-        </p:nvCxnSpPr>
-        <p:spPr>
-          <a:xfrm flipH="1">
-            <a:off x="7335837" y="32278"/>
-            <a:ext cx="4852989" cy="4852989"/>
-          </a:xfrm>
-          <a:prstGeom prst="line">
-            <a:avLst/>
-          </a:prstGeom>
-          <a:ln w="31750">
-            <a:solidFill>
-              <a:schemeClr val="tx1"/>
-            </a:solidFill>
-          </a:ln>
-        </p:spPr>
-        <p:style>
-          <a:lnRef idx="2">
-            <a:schemeClr val="accent1"/>
-          </a:lnRef>
-          <a:fillRef idx="0">
-            <a:schemeClr val="accent1"/>
-          </a:fillRef>
-          <a:effectRef idx="1">
-            <a:schemeClr val="accent1"/>
-          </a:effectRef>
-          <a:fontRef idx="minor">
-            <a:schemeClr val="tx1"/>
-          </a:fontRef>
-        </p:style>
-      </p:cxnSp>
-      <p:cxnSp>
-        <p:nvCxnSpPr>
-          <p:cNvPr id="41" name="Straight Connector 40">
-            <a:extLst>
-              <a:ext uri="{FF2B5EF4-FFF2-40B4-BE49-F238E27FC236}">
-                <a16:creationId xmlns:a16="http://schemas.microsoft.com/office/drawing/2014/main" id="{D1DE67A3-B8F6-4CFD-A8E0-D15200F23152}"/>
-              </a:ext>
-              <a:ext uri="{C183D7F6-B498-43B3-948B-1728B52AA6E4}">
-                <adec:decorative xmlns:adec="http://schemas.microsoft.com/office/drawing/2017/decorative" val="1"/>
-              </a:ext>
-            </a:extLst>
-          </p:cNvPr>
-          <p:cNvCxnSpPr>
-            <a:cxnSpLocks noGrp="1" noRot="1" noChangeAspect="1" noMove="1" noResize="1" noEditPoints="1" noAdjustHandles="1" noChangeArrowheads="1" noChangeShapeType="1"/>
-          </p:cNvCxnSpPr>
-          <p:nvPr>
-            <p:extLst>
-              <p:ext uri="{386F3935-93C4-4BCD-93E2-E3B085C9AB24}">
-                <p16:designElem xmlns:p16="http://schemas.microsoft.com/office/powerpoint/2015/main" val="1"/>
-              </p:ext>
-            </p:extLst>
-          </p:nvPr>
-        </p:nvCxnSpPr>
-        <p:spPr>
-          <a:xfrm flipH="1">
-            <a:off x="7845426" y="609601"/>
-            <a:ext cx="4343399" cy="4343399"/>
-          </a:xfrm>
-          <a:prstGeom prst="line">
-            <a:avLst/>
-          </a:prstGeom>
-          <a:ln w="31750">
-            <a:solidFill>
-              <a:schemeClr val="tx1"/>
-            </a:solidFill>
-          </a:ln>
-        </p:spPr>
-        <p:style>
-          <a:lnRef idx="2">
-            <a:schemeClr val="accent1"/>
-          </a:lnRef>
-          <a:fillRef idx="0">
-            <a:schemeClr val="accent1"/>
-          </a:fillRef>
-          <a:effectRef idx="1">
-            <a:schemeClr val="accent1"/>
-          </a:effectRef>
-          <a:fontRef idx="minor">
-            <a:schemeClr val="tx1"/>
-          </a:fontRef>
-        </p:style>
-      </p:cxnSp>
-      <p:sp useBgFill="1">
-        <p:nvSpPr>
-          <p:cNvPr id="43" name="Rectangle 42">
-            <a:extLst>
-              <a:ext uri="{FF2B5EF4-FFF2-40B4-BE49-F238E27FC236}">
-                <a16:creationId xmlns:a16="http://schemas.microsoft.com/office/drawing/2014/main" id="{637214A4-997B-4C95-951E-08E1B51B5AF9}"/>
-              </a:ext>
-              <a:ext uri="{C183D7F6-B498-43B3-948B-1728B52AA6E4}">
-                <adec:decorative xmlns:adec="http://schemas.microsoft.com/office/drawing/2017/decorative" val="1"/>
-              </a:ext>
-            </a:extLst>
-          </p:cNvPr>
-          <p:cNvSpPr>
-            <a:spLocks noGrp="1" noRot="1" noChangeAspect="1" noMove="1" noResize="1" noEditPoints="1" noAdjustHandles="1" noChangeArrowheads="1" noChangeShapeType="1" noTextEdit="1"/>
-          </p:cNvSpPr>
-          <p:nvPr>
-            <p:extLst>
-              <p:ext uri="{386F3935-93C4-4BCD-93E2-E3B085C9AB24}">
-                <p16:designElem xmlns:p16="http://schemas.microsoft.com/office/powerpoint/2015/main" val="1"/>
-              </p:ext>
-            </p:extLst>
-          </p:nvPr>
-        </p:nvSpPr>
-        <p:spPr>
-          <a:xfrm>
-            <a:off x="0" y="0"/>
-            <a:ext cx="12192000" cy="6858000"/>
-          </a:xfrm>
-          <a:prstGeom prst="rect">
-            <a:avLst/>
-          </a:prstGeom>
-          <a:ln>
-            <a:noFill/>
-          </a:ln>
-        </p:spPr>
-        <p:style>
-          <a:lnRef idx="2">
-            <a:schemeClr val="accent1">
-              <a:shade val="50000"/>
-            </a:schemeClr>
-          </a:lnRef>
-          <a:fillRef idx="1">
-            <a:schemeClr val="accent1"/>
-          </a:fillRef>
-          <a:effectRef idx="0">
-            <a:schemeClr val="accent1"/>
-          </a:effectRef>
-          <a:fontRef idx="minor">
-            <a:schemeClr val="lt1"/>
-          </a:fontRef>
-        </p:style>
-        <p:txBody>
-          <a:bodyPr rtlCol="0" anchor="ctr"/>
-          <a:lstStyle/>
-          <a:p>
-            <a:pPr algn="ctr"/>
-            <a:endParaRPr lang="en-US"/>
-          </a:p>
-        </p:txBody>
-      </p:sp>
       <p:sp>
         <p:nvSpPr>
           <p:cNvPr id="2" name="Title 1"/>
@@ -9258,288 +8407,6 @@
           </a:effectLst>
         </p:spPr>
       </p:pic>
-      <p:grpSp>
-        <p:nvGrpSpPr>
-          <p:cNvPr id="45" name="Group 44">
-            <a:extLst>
-              <a:ext uri="{FF2B5EF4-FFF2-40B4-BE49-F238E27FC236}">
-                <a16:creationId xmlns:a16="http://schemas.microsoft.com/office/drawing/2014/main" id="{307A8868-805D-4C18-8A8B-4817BA9FF9B5}"/>
-              </a:ext>
-              <a:ext uri="{C183D7F6-B498-43B3-948B-1728B52AA6E4}">
-                <adec:decorative xmlns:adec="http://schemas.microsoft.com/office/drawing/2017/decorative" val="1"/>
-              </a:ext>
-            </a:extLst>
-          </p:cNvPr>
-          <p:cNvGrpSpPr>
-            <a:grpSpLocks noGrp="1" noUngrp="1" noRot="1" noChangeAspect="1" noMove="1" noResize="1"/>
-          </p:cNvGrpSpPr>
-          <p:nvPr>
-            <p:extLst>
-              <p:ext uri="{386F3935-93C4-4BCD-93E2-E3B085C9AB24}">
-                <p16:designElem xmlns:p16="http://schemas.microsoft.com/office/powerpoint/2015/main" val="1"/>
-              </p:ext>
-            </p:extLst>
-          </p:nvPr>
-        </p:nvGrpSpPr>
-        <p:grpSpPr>
-          <a:xfrm>
-            <a:off x="9206969" y="2963333"/>
-            <a:ext cx="2981858" cy="3208867"/>
-            <a:chOff x="9206969" y="2963333"/>
-            <a:chExt cx="2981858" cy="3208867"/>
-          </a:xfrm>
-        </p:grpSpPr>
-        <p:cxnSp>
-          <p:nvCxnSpPr>
-            <p:cNvPr id="46" name="Straight Connector 45">
-              <a:extLst>
-                <a:ext uri="{FF2B5EF4-FFF2-40B4-BE49-F238E27FC236}">
-                  <a16:creationId xmlns:a16="http://schemas.microsoft.com/office/drawing/2014/main" id="{0CF59EB9-1EAB-47CE-AC8B-8EFD96929F0D}"/>
-                </a:ext>
-                <a:ext uri="{C183D7F6-B498-43B3-948B-1728B52AA6E4}">
-                  <adec:decorative xmlns:adec="http://schemas.microsoft.com/office/drawing/2017/decorative" val="1"/>
-                </a:ext>
-              </a:extLst>
-            </p:cNvPr>
-            <p:cNvCxnSpPr/>
-            <p:nvPr>
-              <p:extLst>
-                <p:ext uri="{386F3935-93C4-4BCD-93E2-E3B085C9AB24}">
-                  <p16:designElem xmlns:p16="http://schemas.microsoft.com/office/powerpoint/2015/main" val="1"/>
-                </p:ext>
-              </p:extLst>
-            </p:nvPr>
-          </p:nvCxnSpPr>
-          <p:spPr>
-            <a:xfrm flipH="1">
-              <a:off x="11276012" y="2963333"/>
-              <a:ext cx="912814" cy="912812"/>
-            </a:xfrm>
-            <a:prstGeom prst="line">
-              <a:avLst/>
-            </a:prstGeom>
-            <a:ln w="9525">
-              <a:solidFill>
-                <a:schemeClr val="tx1"/>
-              </a:solidFill>
-            </a:ln>
-          </p:spPr>
-          <p:style>
-            <a:lnRef idx="2">
-              <a:schemeClr val="accent1"/>
-            </a:lnRef>
-            <a:fillRef idx="0">
-              <a:schemeClr val="accent1"/>
-            </a:fillRef>
-            <a:effectRef idx="1">
-              <a:schemeClr val="accent1"/>
-            </a:effectRef>
-            <a:fontRef idx="minor">
-              <a:schemeClr val="tx1"/>
-            </a:fontRef>
-          </p:style>
-        </p:cxnSp>
-        <p:cxnSp>
-          <p:nvCxnSpPr>
-            <p:cNvPr id="47" name="Straight Connector 46">
-              <a:extLst>
-                <a:ext uri="{FF2B5EF4-FFF2-40B4-BE49-F238E27FC236}">
-                  <a16:creationId xmlns:a16="http://schemas.microsoft.com/office/drawing/2014/main" id="{B8786ADE-071C-435B-81E3-54A82DD5D5A9}"/>
-                </a:ext>
-                <a:ext uri="{C183D7F6-B498-43B3-948B-1728B52AA6E4}">
-                  <adec:decorative xmlns:adec="http://schemas.microsoft.com/office/drawing/2017/decorative" val="1"/>
-                </a:ext>
-              </a:extLst>
-            </p:cNvPr>
-            <p:cNvCxnSpPr/>
-            <p:nvPr>
-              <p:extLst>
-                <p:ext uri="{386F3935-93C4-4BCD-93E2-E3B085C9AB24}">
-                  <p16:designElem xmlns:p16="http://schemas.microsoft.com/office/powerpoint/2015/main" val="1"/>
-                </p:ext>
-              </p:extLst>
-            </p:nvPr>
-          </p:nvCxnSpPr>
-          <p:spPr>
-            <a:xfrm flipH="1">
-              <a:off x="9206969" y="3190344"/>
-              <a:ext cx="2981857" cy="2981856"/>
-            </a:xfrm>
-            <a:prstGeom prst="line">
-              <a:avLst/>
-            </a:prstGeom>
-            <a:ln w="9525">
-              <a:solidFill>
-                <a:schemeClr val="tx1"/>
-              </a:solidFill>
-            </a:ln>
-          </p:spPr>
-          <p:style>
-            <a:lnRef idx="2">
-              <a:schemeClr val="accent1"/>
-            </a:lnRef>
-            <a:fillRef idx="0">
-              <a:schemeClr val="accent1"/>
-            </a:fillRef>
-            <a:effectRef idx="1">
-              <a:schemeClr val="accent1"/>
-            </a:effectRef>
-            <a:fontRef idx="minor">
-              <a:schemeClr val="tx1"/>
-            </a:fontRef>
-          </p:style>
-        </p:cxnSp>
-        <p:cxnSp>
-          <p:nvCxnSpPr>
-            <p:cNvPr id="48" name="Straight Connector 47">
-              <a:extLst>
-                <a:ext uri="{FF2B5EF4-FFF2-40B4-BE49-F238E27FC236}">
-                  <a16:creationId xmlns:a16="http://schemas.microsoft.com/office/drawing/2014/main" id="{0F46AF6B-37AC-410E-9A0A-2F70B937A39C}"/>
-                </a:ext>
-                <a:ext uri="{C183D7F6-B498-43B3-948B-1728B52AA6E4}">
-                  <adec:decorative xmlns:adec="http://schemas.microsoft.com/office/drawing/2017/decorative" val="1"/>
-                </a:ext>
-              </a:extLst>
-            </p:cNvPr>
-            <p:cNvCxnSpPr/>
-            <p:nvPr>
-              <p:extLst>
-                <p:ext uri="{386F3935-93C4-4BCD-93E2-E3B085C9AB24}">
-                  <p16:designElem xmlns:p16="http://schemas.microsoft.com/office/powerpoint/2015/main" val="1"/>
-                </p:ext>
-              </p:extLst>
-            </p:nvPr>
-          </p:nvCxnSpPr>
-          <p:spPr>
-            <a:xfrm flipH="1">
-              <a:off x="10292292" y="3285067"/>
-              <a:ext cx="1896534" cy="1896533"/>
-            </a:xfrm>
-            <a:prstGeom prst="line">
-              <a:avLst/>
-            </a:prstGeom>
-            <a:ln w="9525">
-              <a:solidFill>
-                <a:schemeClr val="tx1"/>
-              </a:solidFill>
-            </a:ln>
-          </p:spPr>
-          <p:style>
-            <a:lnRef idx="2">
-              <a:schemeClr val="accent1"/>
-            </a:lnRef>
-            <a:fillRef idx="0">
-              <a:schemeClr val="accent1"/>
-            </a:fillRef>
-            <a:effectRef idx="1">
-              <a:schemeClr val="accent1"/>
-            </a:effectRef>
-            <a:fontRef idx="minor">
-              <a:schemeClr val="tx1"/>
-            </a:fontRef>
-          </p:style>
-        </p:cxnSp>
-        <p:cxnSp>
-          <p:nvCxnSpPr>
-            <p:cNvPr id="49" name="Straight Connector 48">
-              <a:extLst>
-                <a:ext uri="{FF2B5EF4-FFF2-40B4-BE49-F238E27FC236}">
-                  <a16:creationId xmlns:a16="http://schemas.microsoft.com/office/drawing/2014/main" id="{FAEF4DD0-8A5B-40F1-88BA-ABE5ADE4D290}"/>
-                </a:ext>
-                <a:ext uri="{C183D7F6-B498-43B3-948B-1728B52AA6E4}">
-                  <adec:decorative xmlns:adec="http://schemas.microsoft.com/office/drawing/2017/decorative" val="1"/>
-                </a:ext>
-              </a:extLst>
-            </p:cNvPr>
-            <p:cNvCxnSpPr/>
-            <p:nvPr>
-              <p:extLst>
-                <p:ext uri="{386F3935-93C4-4BCD-93E2-E3B085C9AB24}">
-                  <p16:designElem xmlns:p16="http://schemas.microsoft.com/office/powerpoint/2015/main" val="1"/>
-                </p:ext>
-              </p:extLst>
-            </p:nvPr>
-          </p:nvCxnSpPr>
-          <p:spPr>
-            <a:xfrm flipH="1">
-              <a:off x="10443103" y="3131080"/>
-              <a:ext cx="1745722" cy="1745720"/>
-            </a:xfrm>
-            <a:prstGeom prst="line">
-              <a:avLst/>
-            </a:prstGeom>
-            <a:ln w="28575">
-              <a:solidFill>
-                <a:schemeClr val="tx1"/>
-              </a:solidFill>
-            </a:ln>
-          </p:spPr>
-          <p:style>
-            <a:lnRef idx="2">
-              <a:schemeClr val="accent1"/>
-            </a:lnRef>
-            <a:fillRef idx="0">
-              <a:schemeClr val="accent1"/>
-            </a:fillRef>
-            <a:effectRef idx="1">
-              <a:schemeClr val="accent1"/>
-            </a:effectRef>
-            <a:fontRef idx="minor">
-              <a:schemeClr val="tx1"/>
-            </a:fontRef>
-          </p:style>
-        </p:cxnSp>
-        <p:cxnSp>
-          <p:nvCxnSpPr>
-            <p:cNvPr id="50" name="Straight Connector 49">
-              <a:extLst>
-                <a:ext uri="{FF2B5EF4-FFF2-40B4-BE49-F238E27FC236}">
-                  <a16:creationId xmlns:a16="http://schemas.microsoft.com/office/drawing/2014/main" id="{3BA5EA8C-8F33-4994-A748-233E839E4A23}"/>
-                </a:ext>
-                <a:ext uri="{C183D7F6-B498-43B3-948B-1728B52AA6E4}">
-                  <adec:decorative xmlns:adec="http://schemas.microsoft.com/office/drawing/2017/decorative" val="1"/>
-                </a:ext>
-              </a:extLst>
-            </p:cNvPr>
-            <p:cNvCxnSpPr/>
-            <p:nvPr>
-              <p:extLst>
-                <p:ext uri="{386F3935-93C4-4BCD-93E2-E3B085C9AB24}">
-                  <p16:designElem xmlns:p16="http://schemas.microsoft.com/office/powerpoint/2015/main" val="1"/>
-                </p:ext>
-              </p:extLst>
-            </p:nvPr>
-          </p:nvCxnSpPr>
-          <p:spPr>
-            <a:xfrm flipH="1">
-              <a:off x="10918826" y="3683001"/>
-              <a:ext cx="1270001" cy="1269999"/>
-            </a:xfrm>
-            <a:prstGeom prst="line">
-              <a:avLst/>
-            </a:prstGeom>
-            <a:ln w="28575">
-              <a:solidFill>
-                <a:schemeClr val="tx1"/>
-              </a:solidFill>
-            </a:ln>
-          </p:spPr>
-          <p:style>
-            <a:lnRef idx="2">
-              <a:schemeClr val="accent1"/>
-            </a:lnRef>
-            <a:fillRef idx="0">
-              <a:schemeClr val="accent1"/>
-            </a:fillRef>
-            <a:effectRef idx="1">
-              <a:schemeClr val="accent1"/>
-            </a:effectRef>
-            <a:fontRef idx="minor">
-              <a:schemeClr val="tx1"/>
-            </a:fontRef>
-          </p:style>
-        </p:cxnSp>
-      </p:grpSp>
       <p:sp>
         <p:nvSpPr>
           <p:cNvPr id="4" name="AutoShape 2" descr="data:image/png;base64,iVBORw0KGgoAAAANSUhEUgAABUAAAAPACAMAAADDuCPrAAABYlBMVEUAAAAAADoAAGYAOjoAOmYAOpAAZrYzMzM6AAA6OgA6Ojo6OmY6ZmY6ZpA6ZrY6kLY6kNtNTU1NTW5NTY5Nbm5Nbo5NbqtNjshmAABmADpmOgBmOjpmZjpmZmZmZpBmkGZmkLZmkNtmtttmtv9uTU1ubk1ubm5ubo5ujqtujshuq8huq+SOTU2Obk2Obm6Oq8iOyOSOyP+QOgCQOjqQZjqQZmaQZpCQkGaQkLaQtraQttuQ2/+rbk2rjk2rjm6rq8iryOSr5Mir5P+2ZgC2Zjq2kDq2kGa2kJC2tpC2tra2ttu229u22/+2///Ijk3Ijm7Iq27Iq6vIyKvI5KvI5OTI5P/I///bkDrbkGbbtmbbtpDbtrbb27bb29vb2//b/7bb///kq27kyI7kyKvk5P/k///r6+v8jVn/tmb/yI7/25D/27b/29v/5Kv/5Mj/5OT//7b//7///8j//9v//+T///+zjZs9AAAACXBIWXMAAB2HAAAdhwGP5fFlAAAgAElEQVR4nO3d/59b5ZnecU0wMDGEILMYh0CWwmwDxaSLN3S7xHW3mGQXkni3aY0TEijO1q2/YMe1rP+/0iNpRnPbM+fMM9e5n3PffN4/xB472Eiv6/mgGUlnJnMAQJVJ638BAIiKgAJAJQIKAJUIKABUIqAAUImAAkAlAgoAlQgoAFQioABQiYACQCUCCgCVCCgAVCKgAFCJgAJAJQIKAJVGENDZl298fzKZ7Lzw8Ten/rNuT570zvzhhcnOLwT/pgCwrXlAZ7/aPWjdS6dNKAEF4Kd1QO+9fih2p+0cAQXgp3FA7y4ffu689dXip9/+6vuCgh78ud/7reRPAoCjtA3o4qHh1ufts1/KCkpAAQyvbUCvLor59tbHy8/An1P8wQQUwPCaBnT5CfzLh37lRvmapeRPJqAABtY0oItcmswtP6d/rvzGwQPRq5vK3vv5Irg7P/jNwT/9zuzT3cnOC09+1n84oJsnka4ufyh/ygsfL3/9yx8vev3Cr/f/f+YvAIBjtQzo7NKTn7Cvmroo3n7/NvWbfWpe7LQM6NUjnro/OqA31n/Iywd/4PpB8BN/AQAcq2VAlw837efrt1c9vHrwO4tfefabVW03VtVdpPBs+fDZJ3t3ZED/fv8Pefvq4ddOPfkXAMCxWgZ0UbknHjyuo3r7IGLrli4fOb709Xz+7aebx4zlseQPv5l/+/VT/+inBnRh+Rn6l4tP1Z+Z7Lz9zeqZ/+fmT/0LAOBYLQN6+ymffS8D+vJ866Xv68/mtx6t3l5/5fTGMaE7OqAvb/6MzV9wdfUQ9il/AQAca6QBXdZxlbr180nbTysdPCY98kWjRwZ0/aubv2a+/yWCp/wFAHCssQZ0UcDypc3lVyaXMdtu2u39xj7lq58rRwb0uYO/5p1D/9en/AUAcKyRfg10Gc7ye+uQbj/Ds3mW58YxT/YcGdCXD//K/v/1aX8BABxrbM/C70f19qFP5W3f7Cfd1qkDeuRjWwDYGOfrQOclcYuIbR6IElAA4zPOdyItlbcNbV7OtPlSqPmntQHliSMAJ9I0oFu5XNt6L3z5HH7/qZ2rTz6vIw3o0/4CADhW26sx2Zdy3t765HnxmPDZ/7X/ls7tp9xv7H95VBjQp/wFAHCstgEtX3k8eOf5jcn2C5tulDderku2deGmzfNM2oA+5S8AgGM1viL9veUVlQ9dkf7gC5Grq9VvSrZ8F9GZX6+/h9LmvZfCgD7lLwCAY435eyJd3X42fPtp8lUbxQF98i8AgGO1Duih78q5c/g6crcn28+Mz36++b+dWV2wUxzQJ/8CADhW84AufPnz5Sfvz7xovy/89lVBl/60vN7x+lrIc31An/gLAOBYYwgoAIREQAGgEgEFgEoEFAAqEVAAqERAAaASAQWASgQUACoRUACoREABoBIBBYBKBBQAKhFQAKhEQAGgEgEFgEoEFAAqEVAAqNQwoP8HEtyT6MRIVEzFCGh43JPoxEhUTMUIaHjck+jESFRMxQhoeNyT6MRIVEzFCGh43JPoxEhUTMUIaHjck+jESFRMxQhoeNyT6MRIVEzFCGh43JPoxEhUTMUIaHjck+jESFRMxQhoeNyT6MRIVEzFCGh43JPoxEhUTMUIaHjck+jESFRMxQhoeNyT6MRIVEzFCGh43JPoxEhUTMUIaHjck+jESFRMxQhoeNyT6MRIVEzFCGh43JPoxEhUTMUIaHjck+jESFRMxQhoeNyT6MRIVEzFCGh43JPoxEhUTMUIaHjck+jESFRMxQhoeNyT6MRIVEzFCGh43JPoxEhUTMUIaHjck+jESFRMxQhoeNyT6MRIVEzFCGh43JPoxEhUTMUIaHjck+jESFRMxQhoeNyT6MRIVEzFCGh43JPoxEhUTMUIaHjck+jESFRMxQhoeNyT6MRIVEzFCGh43JPoxEhUTMUIaHjck+jESFRMxQhoeNyT6MRIVEzFCGh43JPoxEhUTMUIaHjck+jESFRMxQhoeNyT6MRIVEzFUgX0/+I7RL+fxAioiqkYAUVQ+v0kRkBVTMUIKILS7ycxAqpiKkZAEZR+P4kRUBVTMQKKoPT7SYyAqpiKEVAEpd9PYgRUxVSMgCIo/X4SI6AqpmIEFEHp95MYAVUxFSOgCEq/n8QIqIqpGAFFUPr9JEZAVUzFCCiC0u8nMQKqYipGQBGUfj+JEVAVUzECiqD0+0mMgKqYihFQBKXfT2IEVMVUjIAiKP1+EiOgKqZiBBRB6feTGAFVMRUjoAhKv5/ECKiKqRgBRVD6/SRGQFVMxQgogtLvJzECqmIqRkARlH4/iRFQFVMxAoqg9PtJjICqmIoRUASl309iBFTFVIyAIij9fhIjoCqmYgQUQen3kxgBVTEVI6AISr+fxAioiqkYAUVQ+v0kRkBVTMUIKILS7ycxAqpiKkZAEZR+P4kRUBVTMQKKoPT7SYyAqpiKEVAEpd9PYgRUxVSMgCIo/X4SI6AqpmKnDeiji6+tf/b4yt50+u71rg8IKDT0+0mMgKqIA3pt+tqmpNOlV744/gMCChH9fhIjoCrSgD6+Nt0E9Nr0/PX5g8vT87eO/YCAQkS/n8QIqIoyoP/2wXQT0Pt75RHmo4vnPjnuAwIKFf1+EiOgKsKA3pxO3/vzOqA39398/7gPCChU9PtJjICqKAP66j/O76zzeG36YfmxfHz0BwQUKvr9JEZAVYQB3cri48vrT9Dv752/dfQHq3/m+ZVT/s1P0fpIw5N+P8BJEVAEpd8PcFL6gL7yxdEfHPpH9Y+uWx9peNLvJzE+hVcZPKDdj0AJKAT0+0mMgKoQUOSg309iBFRlmIDyLDy86feTGAFVGSigm1d5rl/6edQHBBQq+v0kRkBVBgoo70SCM/1+EiOgKgMF9PHl6av773g/+gMCChX9fhIjoCoDBXT+YPuaS0d/QEAhot9PYgRUZaiAzh9cWVTy3VtdHxBQaOj3kxgBVREH9BT0t631kYYn/X4SI6AqpmIEFEHp95MYAVUxFSOgCEq/n8QIqIqpGAFFUPr9JEZAVUzFCCiC0u8nMQKqYipGQBGUfj+JEVAVUzECiqD0+0mMgKqYihFQBKXfT2IEVMVUjIAiKP1+EiOgKqZiBBRB6feTGAFVMRUjoAhKv5/ECKiKqRgBRVD6/SRGQFVMxQgogtLvJzECqmIqRkARlH4/iRFQFVMxAoqg9PtJjICqmIoRUASl309iBFTFVIyAIij9fhIjoCqmYgQUQen3kxgBVTEVI6AISr+fxAioiqkYAUVQ+v0kRkBVTMUIKILS7ycxAqpiKkZAEZR+P4kRUBVTMQKKoPT7SYyAqpiKEVAEpd9PYgRUxVSMgCIo/X4SI6AqpmIEFEHp95MYAVUxFSOgCEq/n8QIqIqpGAFFUPr9JEZAVUzFCCiC0u8nMQKqYipGQBGUfj+JEVAVUzECiqD0+0mMgKqYihFQBKXfT2IEVMVUjIAiKP1+EiOgKqZiBBRB6feTGAFVMRUjoAhKv5/ECKiKqRgBRVD6/SRGQFVMxQgogtLvJzECqmIqRkARlH4/iRFQFVMxAoqg9PtJjICqmIoRUASl309iBFTFVIyAIij9fhIjoCqmYgQUQen3kxgBVTEVI6AISr+fxAioiqkYAUVQ+v0kRkBVTMUIKILS7ycxAqpiKkZAEZR+P4kRUBVTMQKKoPT7SYyAqpiKEVAEpd9PYgRUxVSMgCIo/X4SI6AqpmIEFEHp95MYAVUxFSOgCEq/n8QIqIqpGAFFUPr9JEZAVUzFCCiC0u8nMQKqYipGQBGUfj+JEVAVUzECiqD0+0mMgKqYihFQBKXfT2IEVMVUjIAiKP1+EiOgKqZiBBRB6feTGAFVMRUjoAhKv5/ECKiKqRgBRVD6/SRGQFVMxQgogtLvJzECqmIqRkARlH4/iRFQFVMxAoqg9PtJjICqmIoRUASl309iBFTFVIyAIij9fhIjoCqmYgQUQen3kxgBVTEVI6AISr+fxAioiqkYAUVQ+v0kRkBVTMUIKILS7ycxAqpiKkZAEZR+P4kRUBVTMQKKoPT7SYyAqpiKEVAEpd9PYgRUxVSMgCIo/X4SI6AqpmIEFEHp95MYAVUxFSOgCEq/n8QIqIqpGAFFUPr9JEZAVUzFCCiC0u8nMQKqYipGQBGUfj+JEVAVU7GGAdVrfaThqfXaAB6BIiz9fhLjEaiKqRgBRVD6/SRGQFVMxQgogtLvJzECqmIqRkARlH4/iRFQFVMxAoqg9PtJjICqmIoRUASl309iBFTFVIyAIij9fhIjoCqmYgQUQen3kxgBVTEVI6AISr+fxAioiqkYAUVQ+v0kRkBVTMUIKILS7ycxAqpiKkZAEZR+P4kRUBVTMQKKoPT7SYyAqpiKEVAEpd9PYgRUxVSMgCIo/X4SI6AqpmIEFEHp95MYAVUxFSOgCEq/n8QIqIqpGAFFUPr9JEZAVUzFCCiC0u8nMQKqYipGQBGUfj+JEVAVUzECiqD0+0mMgKqYihFQBKXfT2IEVMVUjIAiKP1+EiOgKqZiBBRB6feTGAFVMRUjoAhKv5/ECKiKqRgBRVD6/SRGQFVMxQgogtLvJzECqmIqRkARlH4/iRFQFVMxAoqg9PtJjICqmIoRUASl309iBFTFVIyAIij9fhIjoCqmYgQUQen3kxgBVTEVI6AISr+fxAioiqkYAUVQ+v0kRkBVTMUIKILS7ycxAqpiKkZAEZR+P4kRUBVTMQKKoPT7SYyAqpiKEVAEpd9PYgRUxVSMgCIo/X4SI6AqpmIEFEHp95MYAVUxFSOgCEq/n8QIqIqpGAFFUPr9JEZAVUzFCCiC0u8nMQKqYipGQBGUfj+JEVAVUzECiqD0+0mMgKqYihFQBKXfT2IEVMVUjIAiKP1+EiOgKqZiBBRB6feTGAFVMRUjoAhKv5/ECKiKqRgBRVD6/SRGQFVMxQgogtLvJzECqmIqRkARlH4/iRFQFVMxAoqg9PtJjICqmIoRUASl309iBFTFVIyAIij9fhIjoCqmYgQUQen3kxgBVTEVI6AISr+fxAioiqkYAUVQ+v0kRkBVTMUIKILS7ycxAqpiKkZAEZR+P4kRUBVTMQKKoPT7SYyAqpiKEVAEpd9PYgRUxVSMgCIo/X4SI6AqpmIEFEHp95MYAVUxFSOgCEq/n8QIqIqpGAFFUPr9JEZAVUzFCCiC0u8nMQKqYipGQBGUfj+JEVAVUzECiqD0+0mMgKqYihFQBKXfT2IEVMVUjIAiKP1+EiOgKqZiBBRB6feTGAFVMRUjoAhKv5/ECKiKqRgBRVD6/SRGQFVMxQgogtLvJzECqmIqRkARlH4/iRFQFVMxAoqg9PtJjICqmIoRUASl309iBFTFVIyAIij9fhIjoCqmYgQUQen3kxgBVTEVI6AISr+fxAioiqmYKKCPL083XvliPn908eDni9+8sjedvnudgEJJv5/ECKiKS0Dv720FdF3TVUwJKET0+0mMgKoME9CN+3vnPln8cGf62sGvXZuevz5/cHl6/hYBhY5+P4kRUJVBA7p4IPr+qpnvbzV1/Ti0pJWAQkS/n8QIqMqgAb25epj5+PJWLG+uH43e3IoqAcWp6feTGAFVGTKgjy5OP1z9eP53H0ynP72+/ODa6tcOf1pPQHFa+v0kRkBVhgzo5sHm5jmkZTr3H43e39t8EfT5FeXfvNL6SMOTfj/ASSkDuv9lzjvT6Xu35n+5Ml18TEAxDP1+gJNSBvTO5on2zSPR5XNJWwE1L2TSP7pufaThSb+fxPgUXmW4gD6+vP5q56GiPuURKAGFgH4/iRFQleEC+sRDzPIrBBTD0O8nMQKqMlxAn3iafdVMnoXHIPT7SYyAqgwX0P1Xz+9/Ll+auXn9J68DhZR+P4kRUJXBArr16vlrqwebq5DyTiQMQr+fxAioymABfXRx/0ug9/eWL2N68EF5Vn6R0Vd5Lzzk9PtJjICqDBbQ7SeJbq4vxnR9+cEDrsaEAej3kxgBVRksoHe2H2I++Nl0eu699ccPriz6+e4t+w/ob1vrIw1P+v0kRkBVBgvoielvW+sjDU/6/SRGQFVMxQgogtLvJzECqmIqRkARlH4/iRFQFVMxAoqg9PtJjICqmIoRUASl309iBFTFVKwjoLM/fvY5AcUY6feTGAFV6RvQe//pm/n84euTyeTMLwgoxke/n8QIqErPgN6YfO+38/nVydLyZwQUI6PfT2IEVKVfQG+XbN7dnTz7zb0Lk5cJKEZHv5/ECKhKv4BeXZRzmdGdXyz/d/lzAopx0e8nMQKq0iugs0vLcq4z+vDCMJ/D629b6yMNT/r9JEZAVXoFdNXMhxcmz80JKMZJv5/ECKjKCQJ6d3fyDgHFSOn3kxgBVekV0NWn8DfKl0D5GihGSb+fxAioSq+Azq9Onls+/b4sJ8/CY5T0+0mMgKr0C+jt8gLQxWfws59PVo9DCSjGRb+fxAioSr+ALj59X3iuPJG0884g/SSgOBX9fhIjoCo9Azq/99FPPl788PBHP/jNMP0koDgV/X4SI6AqfQM6PP1ta32k4Um/n8QIqIqp2LEBnX09YD8JKE5Fv5/ECKiKqdjRAf3yx8v3wz/80VuDvIaJgOKU9PtJjICq9Azo7NPVdZgeXpicGeZiTAQUp6LfT2IEVKVnQK9OJmf+evd7v5393WSg19ETUJyKfj+JEVCVfgG9PZm8vX4P5x9Wb+gkoBgX/X4SI6Aq/QJ6dfnuo/Wb4G+US4oQUIyLfj+JEVCVXgFdvRd+HdC7u1xMBOOj309iBFSlV0A3l7Mr5eRqTBgj/X4SI6AqBBQ56PeTGAFV6RXQ2aXlE0frcnI5O4yRfj+JEVCVXgFdPXG0CugipjyJhPHR7ycxAqrSL6B3dycvfVMCeu91LmeHMdLvJzECqtIvoOVydmd3d178/uLHYa6nTEBxKvr9JEZAVXoGdP773cnaQP0koDgV/X4SI6AqfQM6//ZXZxf1fGawy4ESUJyKfj+JEVCV3gEdnP62tT7S8KTfT2IEVMVUjOuBIij9fhIjoCqmYlwPFEHp95MYAVXpGVCuB4qR0+8nMQKq0jOgXA8UI6ffT2IEVKVfQLkeKMZOv5/ECKhKv4ByPVCMnX4/iRFQlV4B5XqgGD39fhIjoCq9Asrl7DB6+v0kRkBVCChy0O8nMQKq0iugXA8Uo6ffT2IEVKVXQLkeKEZPv5/ECKhKv4ByPVCMnX4/iRFQlX4B5XqgGDv9fhIjoCo9A8r1QDFy+v0kRkBV+gaU64Fi3PT7SYyAqvQO6OD0t631kYYn/X4SI6AqpmIEFEHp95MYAVUxFTvihfQ/emnQaykTUJyafj+JEVCVfgG9MJk8M9iVlAkoBPT7SYyAqvQK6OpyypMzHw/ZUP1ta32k4Um/n8QIqEqvgC786celoS98TEAxSvr9JEZAVfoGdL76rkgLQ72QSX/bWh9peNLvJzECqnKCgC4+lf/y9WVCd94a4ikl/W1rfaThSb+fxAioyokCuvDtz8tbkl7QPwzV37bWRxqe9PtJjICqnCigs199f/OGzslLBBRjot9PYgRUpX9AN/VcPhf/7af698Trb1vrIw1P+v0kRkBVegZ0/dXPg1eD6i+rrL9trY80POn3kxgBVekV0NmliX3ySP+NPfS3rfWRhif9fhIjoCq9Arp8J9LO4ZcvPbzAI1CMiX4/iRFQlZ4B/cGvzS/NPle/lEl/21ofaXjS7ycxAqrSK6Au9Let9ZGGJ/1+EiOgKqZiBBRB6feTGAFVMRXruCL9ztlB3oREQHFq+v0kRkBV+gb0xv4r6PmeSBgj/X4SI6AqPQO67OczL775Bt+VEyOl309iBFSlX0Dv7k6eXb2K6d4lvi88xki/n8QIqEq/gF49eN/R7NLkOQKK0dHvJzECqtIroLNLW4867+6qX0JPQHF6+v0kRkBVegX00Ps29W/iJKA4Pf1+EiOgKgQUOej3kxgBVekV0NmlyTv7H+ivw0RAcXr6/SRGQFV6BZQnkTB6+v0kRkBV+gX07u7kzOpyIn96nZcxYYz0+0mMgKr0C+jqjUhnz54d8q1Icq2PNDy1XhtwzFs5/7C7fifnztsD/dX6/zi0PtLwpN9PYjwCVekb0PnsyzcWj0Bf/HiQJ5AIKE5Lv5/ECKhK74AOTn/bWh9peNLvJzECqmIqRkARlH4/iRFQFVMxG9DZR28+6Se8DhSjo99PYgRUpSOgy28n9wTeiYTx0e8nMQKqQkCRg34/iRFQlY6AOtLfttZHGp70+0mMgKqYihFQBKXfT2IEVMVU7PiAfjVcPgkoTke/n8QIqIqp2NEB/fLH5X1IP/gNAcUY6feTGAFV6RnQ2aX9p5BeGui9SPrb1vpIw5N+P4kRUJV+AV32c+fFf/jsn97YnQx0NTsCilPR7ycxAqrSL6A3JpMfrh54zn452bq4MgHFWOj3kxgBVekV0MUD0INr2F3lgsoYIf1+EiOgKr0C+vDCoe/KyQvpMT76/SRGQFV6BpRvKoeR0+8nMQKq0iugfF94jJ5+P4kRUJVeAZ3f2Pq65w2+BooR0u8nMQKq0i+gs0v7L/+8MdC1RAgoTkW/n8QIqEqvgM4+Wr7+88W3Pvvn5Y8vDHNVUP1ta32k4Um/n8QIqEqvgLpc1E5/21ofaXjS7ycxAqpCQJGDfj+JEVCVXgF1ob9trY80POn3kxgBVTEVI6AISr+fxAioiqkYAUVQ+v0kRkBVTMWODugfP9v3OS+kx+jo95MYAVXpGdDf7/JN5TBq+v0kRkBV+gX0Nt+VEyOn309iBFSlV0BnlyY7H3+17+sh+klAcSr6/SRGQFV6BfThhYEuokxAoaLfT2IEVKVnQAd6/zsBhYp+P4kRUJVeAZ1dIqAYOf1+EiOgKr0COr/Bp/AYOf1+EiOgKv0Ceuh7ehBQjJB+P4kRUJV+AZ3fuzA58+aG+kJ2BBSnp99PYgRUpWdAP+V1oBg3/X4SI6Aq/QJ6gxfSY+T0+0mMgKr0Cmh5If0gn7cTUIjo95MYAVXpFVCP55AIKE5Fv5/ECKhKz4DyOlCMnH4/iRFQlV4B5YX0GD39fhIjoCq9Ajq/MXmZgGLU9PtJjICq9Avo7NLO2wQUY6bfT2IEVKVXQGcfvTGZ7LzIC+kxXvr9JEZAVXoF1HxbY14HivHR7ycxAqpCQJGDfj+JEVCVXgF1ob9trY80POn3kxgBVTEVI6AISr+fxAioiqkYAUVQ+v0kRkBVTMVsQGd/tN8F/uGPz77A10AxOvr9JEZAVToC+vDC6imj2UebFy9tfoWAYlT0+0mMgKr0DOhBNgkoRkm/n8QIqAoBRQ76/SRGQFUIKHLQ7ycxAqpCQJGDfj+JEVAVAooc9PtJjICqEFDkoN9PYgRUhYAiB/1+EiOgKgQUOej3kxgBVSGgyEG/n8QIqAoBRQ76/SRGQFUIKHLQ7ycxAqrSHdAnEVCMj34/iRFQFQKKHPT7SYyAqnQEdPbRm0/im8phfPT7SYyAqnQE1JH+trU+0vCk309iBFTFVIyAIij9fhIjoCqmYgQUQen3kxgBVTEVI6AISr+fxAioiqkYAUVQ+v0kRkBVTMUIKILS7ycxAqpiKkZAEZR+P4kRUBVTMQKKoPT7SYyAqpiKEVAEpd9PYgRUxVTsiXciXdr5xeKHb78moBg3/X4SI6AqHQF9eGH5xvfV/xJQjJh+P4kRUJXOgC4fgRJQjJ5+P4kRUJWOgM4uTZ79/Ks/Xfjer786MMzn8/rb1vpIw5N+P4kRUJWOgM5vcDk7hKDfT2IEVKUroLNP6wL66OK0eOWL5UePr+xNp+9eX/3WoQ8IKDT0+0mMgKp0BXSR0K8+++fdnX/47MDnPa4Hen9vK6Drmq5ieugDAgoR/X4SI6Aq3QGdVz2JdGf62sEH16bnr88fXJ6ev2U/IKAQ0e8nMQKq0iugs49OfBH6a9P3939+f2/9OPTcJ+YDAgoV/X4SI6AqvQJ6co8vb/Xx5vrR6M1lVA99QEChot9PYgRUpXdAv/3V2clk5+xb/V7D9Oji+d99MJ3+9Pryg2vTD8svlk/rD31AQKGi309iBFSlb0APXs70cp+Abp5DWtZy/9Ho/b3ztw59sPr/Pr/S5489mdZHGp70+wFO6qiALvv5zItvvvH9ngW9M52+d2v+lyvTRS4JKBzo9wOc1BEBvbs7efY35Wf3Lk3K5UU6bL7SuXwuaauZr3xx6IND/4j+0XXrIw1P+v0kxqfwKv0CenXy7OZp+NmlyXPdAd24MzUPOp/yCJSAQkC/n8QIqEqvgK4vardyd/fZ/q9pMg86CSiGot9PYgRUpVdAD72Q/kSvqi+Z5Fl4DE+/n8QIqMowAX18eTuTm5d8rl8HuvUBAYWKfj+JEVCVXgGdXZq8s//B7UmPT+GvrR5frkLKO5EwPP1+EiOgKr0CevInke7vLV/G9OCD8o73RUZf3X/7+6EPCChU9PtJjICq9Avo3d3JmV+Xn/3p9V4vY1p8hr665tL15QcPti/A9ICrMWEA+v0kRkBV+gV09Uaks2fP9n4r0vzBz6bTc++tH2U+uLJI5rtP+4CAQkO/n8QIqErPgM7/sLt+J+fO2736eXL629b6SMOTfj+JEVCVvgGdz758Y/EI9MWPT3pdOwIKF/r9JEZAVXoHdHD629b6SMOTfj+JEVAVUzECiqD0+0mMgKqYihFQBKXfT2IEVMVUjIAiKP1+EiOgKqZiBBRB6feTGAFVMRUjoAhKv5/ECKiKqRgBRVD6/SRGQFVMxQgogtLvJzECqmIqRkARlH4/iRFQFVOxo67G9IPfEFCMmn4/iRFQlV4BfXhh63qgBBRjpN9PYgRUpWdAT/BdPAgoWtDvJzECqtIroIe+qRwBxRjp95MYAVXpFdD5jc23hSegGCn9fhIjoCr9AvrtLyeTZ158c+0ng1zSTn/bWh9peJuln3QAABwGSURBVNLvJzECqtIroA8vTLYN8wVR/W1rfaThSb+fxAioCgFFDvr9JEZAVXoF1IX+trU+0vCk309iBFTFVIyAIij9fhIjoCqmYscGdPb1gP0koDgV/X4SI6AqpmJHB/TLHy+/+PnwR28N9V3l9Let9ZGGJ/1+EiOgKj0DOvt09ezRwwuTMwO9KUl/21ofaXjS7ycxAqrSM6BXJ5Mzf737vd/O/m4yeXaYx6D629b6SMOTfj+JEVCVfgG9PZm8vX5H/B92B7qwiP62tT7S8KTfT2IEVKVfQK9OXt6/pMiNyXMEFKOj309iBFSlV0BXFxNZB/TuLi+kx/jo95MYAVXpFdBVOtcBHeradvrb1vpIw5N+P4kRUBUCihz0+0mMgKr0Cujs0vKJo3U5bw/0NLz+trU+0vCk309iBFSlV0BXTxytArqIKU8iYXz0+0mMgKr0C+jd3clL35SA3nt9MtDV6fW3rfWRhif9fhIjoCr9Arp4CDqZnN3defH7ix9fHqSfBBSnot9PYgRUpWdA57/f3VwNdKB+ElCcin4/iRFQlb4BnX/7q7OLej4z3DeI19+21kcanvT7SYyAqvQO6OD0t631kYYn/X4SI6AqpmLHXw/0qwH7SUBxKvr9JEZAVUzFjr8e6AKfwmOc9PtJjICq9Azo7NL+t5R7aaArKutvW+sjDU/6/SRGQFX6BXTZz50X//Nn//TGoqDDvI6egOJU9PtJjICq9Avo7f1XL81+OeF6oBgh/X4SI6AqvQK6eAB68OrPq7yVEyOk309iBFSlV0AfXth6+ybXA8UY6feTGAFV6RnQrWZyOTuMkX4/iRFQlV4BXV2Rfu3uLpezw/jo95MYAVXpFdBD3wfpxkDvhtffttZHGp70+0mMgKr0C+jDC5MffrPp5zCfwRNQnIp+P4kRUJWOgM4+erN4Y/U60H9+c3cyefEnfAqP0dHvJzECqtIR0MVDzyfxJBLGR7+fxAioCgFFDpUj+X/4DpH2pegIqCP9bWt9pOGpciStjzQ8SftSmIoRUARVOZLWRxqepH0pTMUIKIKqHEnrIw1P0r4UpmJHB/SPn+37nGfhMTqVI2l9pOFJ2peiZ0APvqccTyJhlCpH0vpIw5O0L0W/gN7mWXiMXOVIWh9peJL2pegV0Nmlyc7HX+37eoh+ElCcSuVIWh9peJL2pegV0IcXBrqIMgGFSuVIWh9peJL2pegZ0IHe/05AoVI5ktZHGp6kfSl6BXR2iYBi5CpH0vpIw5O0L0WvgM5v8Ck8Rq5yJK2PNDxJ+1L0C+ih7+lBQDFClSNpfaThSdqXol9A5/cuTM68ucHl7DA+lSNpfaThSdqXomdAP+V1oBi3ypG0PtLwJO1L0S+gN3ghPUauciStjzQ8SftS9ApoeSH9IJ+3E1CIVI6k9ZGGJ2lfil4B9XgOiYDiVCpH0vpIw5O0L0XPgPI6UIxc5UhaH2l4kval6BVQXkiP0ascSesjDU/SvhS9AjrY94InoFCpHEnrIw1P0r4U/QI6u7TzNgHFmFWOpPWRhidpX4peAZ19VL4vPC+kx3hVjqT1kYYnaV+KXgE139yY14FifCpH0vpIw5O0LwUBRQ6VI2l9pOFJ2peiV0Bd6G9b6yMNT5UjaX2k4Unal8JUjIAiqMqRtD7S8CTtS2EqRkARVOVIWh9peJL2pTAVOyKg3361jW8qh/GpHEnrIw1P0r4UvQLq8iSSXusjDU+VI2l9pOFJ2pen4Vl4BFU5ktZHGp6kfSl6BXT2x8/W/v71yc4/fM4L6TE6lSNpfaThSdqXoldAt93dfXaYK4Pqb1vrIw1PlSNpfaThSdqX4sQBHezCIvrb1vpIw1PlSFofaXiS9qU4eUCHegiqv22tjzQ8VY6k9ZGGJ2lfipMHdKirK+tvW+sjDU+VI2l9pOFJ2pfi5AG9u0tAMT6VI2l9pOFJ2pfixAGdXZ3wKTzGp3IkrY80PEn7UvQK6OyjzaVA33xjd8KTSBihypG0PtLwJO1L0Sugh19Iz8uYMEKVI2l9pOFJ2pfixAF95q2BvkG8/ra1PtLwVDmS1kcanqR9KXoF1IX+trU+0vBUOZLWRxqepH0pTMUIKIKqHEnrIw1P0r4UpmIEFEFVjqT1kYYnaV8KUzECiqAqR9L6SMOTtC+FqZgN6NYLmA7wbY0xPpUjaX2k4Unal6IjoOZKoFwPFGNVOZLWRxqepH0pCChyqBxJ6yMNT9K+FB0Btb7cnfBOJIxR5UhaH2l4kvalOFFAZz9f5PPMbwbpJwHFqVSOpPWRhidpX4qTBPQPi4efO0O9EYmA4lQqR9L6SMOTtC9F/4AO+vCTgOKUKkfS+kjDk7QvRe+Aloef/26wfBJQnE7lSFofaXiS9qXoGdB7Az/8JKA4pcqRtD7S8CTtS9EvoIM//CSgOKXKkbQ+0vAk7UvRJ6D3Li2vAjrow08CilOqHEnrIw1P0r4UPQJaHn6+PXA+CShOp3IkrY80PEn7UnQG1OfhJwHFKVWOpPWRhidpX4qugP7e5+EnAcUpVY6k9ZGGJ2lfio6A8l54BFE5ktZHGp6kfSkIKHKoHEnrIw1P0r4UHQHleqAIonIkrY80PEn7UnQE1JH+trU+0vBUOZLWRxqepH0pTMUIKIKqHEnrIw1P0r4UpmIEFEFVjqT1kYYnaV8KUzECiqAqR9L6SMOTtC+FqRgBRVCVI2l9pOFJ2pfCVIyAIqjKkbQ+0vAk7UthKkZAEVTlSFofaXiS9qUwFSOgCKpyJK2PNDxJ+1KYihFQBFU5ktZHGp6kfSlMxQgogqocSesjDU/SvhSmYgQUQVWOpPWRhidpXwpTMQKKoCpH0vpIw5O0L4WpGAFFUJUjaX2k4Unal8JUjIAiqMqRtD7S8CTtS2EqRkARVOVIWh9peJL2pTAVI6AIqnIkrY80PEn7UpiKEVAEVTmS1kcanqR9KUzFCCiCqhxJ6yMNT9K+FKZiBBRBVY6k9ZGGJ2lfClMxAoqgKkfS+kjDk7QvhakYAUVQlSNpfaThSdqXwlSMgCKoypG0PtLwJO1LYSpGQBFU5UhaH2l4kvalMBUjoAiqciStjzQ8SftSmIoRUARVOZLWRxqepH0pTMUIKIKqHEnrIw1P0r4UpmIEFEFVjqT1kYYnaV8KUzECiqAqR9L6SMOTtC+FqRgBRVCVI2l9pOFJ2pfCVIyAIqjKkbQ+0vAk7UthKkZAEVTlSFofaXiS9qUwFSOgCKpyJK2PNDxJ+1KYihFQBFU5ktZHGp6kfSlMxQgogqocSesjDU/SvhSmYgQUQVWOpPWRhidpXwpTMQKKoCpH0vpIw5O0L4WpGAFFUJUjaX2k4Unal8JUjIAiqMqRtD7S8CTtS2EqRkARVOVIWh9peJL2pTAVI6AIqnIkrY80PEn7UpiKEVAEVTmS1kcanqR9KUzFCCiCqhxJ6yMNT9K+FKZiBBRBVY6k9ZGGJ2lfClMxAoqgKkfS+kjDk7QvhakYAUVQlSNpfaThSdqXwlSMgCKoypG0PtLwJO1LYSpGQBFU5UhaH2l4kvalMBUjoAiqciStjzQ8SftSmIrpAvpvP5tOz717vfz80cVp8coXy48eX9mbTte/Q0AhUjmS1kcanqR9KYYK6L+sknnuk+UH9/e2Arqu6SqmBBQilSNpfaThSdqXYqCA3pme+9v5/MHlVSfvTF87+K1r0/PXl79z/hYBhU7lSFofaXiS9qUYJqCPL08/XP64eLT5YWnm+/u/dX9v/Th09eCUgEKjciStjzQ8SftSDBPQRxfXn6GXdD6+vBXLm+tHoze3okpAcWqVI2l9pOFJ2pdimIDuKwF9dPH87z6YTn96ffUr5bHp4U/rCShOq3IkrY80PEn7Ugwb0NUn6pvnkJbp3H80en9v80XQ51e0f/NS6yMNT5UjaX2k4Unal6cRB3T1+fqd6fS9W/O/XFk+J09AMYzKkbQ+0vAk7cvTaAN6Z/Uyps2XPZefz28F1LyQSf/ouvWRhqfKkbQ+0vAk7UsxZEDv7J378HBPz996yiNQAgqBypG0PtLwJO1LMWBAb07NK5WWDzoJKIZROZLWRxqepH0phgvov9h+rprJs/AYROVIWh9peJL2pRgqoI+vTV9df41z86r6VTM3r//kdaCQqhxJ6yMNT9K+FEMF9NrWWzWvrR5srkLKO5EwiMqRtD7S8CTtSzFQQG9uv9X9/t7yZUwPPii/tsjoq7wXHnKVI2l9pOFJ2pdimIBurl+38FrJ6eoCTNeXv/eAqzFhAJUjaX2k4Unal2KYgN6ZHgro/MHy4qDvrR9yPriy+OV3b9l/Rn/bWh9peKocSesjDU/SvhTDBLSG/ra1PtLwVDmS1kcanqR9KUzFCCiCqhxJ6yMNT9K+FKZiBBRBVY6k9ZGGJ2lfClMxAoqgKkfS+kjDk7QvhakYAUVQlSNpfaThSdqXwlSMgCKoypG0PtLwJO1LYSpGQBFU5UhaH2l4kvalMBUjoAiqciStjzQ8SftSmIoRUARVOZLWRxqepH0pTMUIKIKqHEnrIw1P0r4UpmIEFEFVjqT1kYYnaV8KUzECiqAqR9L6SMOTtC+FqRgBRVCVI2l9pOFJ2pfCVIyAIqjKkbQ+0vAk7UthKkZAEVTlSFofaXiS9qUwFSOgCKpyJK2PNDxJ+1KYihFQBFU5ktZHGp6kfSlMxQgogqocSesjDU/SvhSmYgQUQVWOpPWRhidpXwpTMQKKoCpH0vpIw5O0L4WpGAFFUJUjaX2k4Unal8JUjIAiqMqRtD7S8CTtS2EqRkARVOVIWh9peJL2pTAVI6AIqnIkrY80PEn7UpiKEVAEVTmS1kcanqR9KUzFCCiCqhxJ6yMNT9K+FKZiBBRBVY6k9ZGGJ2lfClMxAoqgKkfS+kjDk7QvhakYAUVQlSNpfaThSdqXwlSMgCKoypG0PtLwJO1LYSpGQBFU5UhaH2l4kvalMBUjoAiqciStjzQ8SftSmIoRUARVOZLWRxqepH0pTMUIKIKqHEnrIw1P0r4UpmIEFEFVjqT1kYYnaV8KUzECiqAqR9L6SMOTtC+FqRgBRVCVI2l9pOFJ2pfCVIyAIqjKkbQ+0vAk7UthKkZAEVTlSFofaXiS9qUwFSOgCKpyJK2PNDxJ+1KYihFQBFU5ktZHGp6kfSlMxQgogqocSesjDU/SvhSmYgQUQVWOpPWRhidpXwpTMQKKoCpH0vpIw5O0L4WpGAFFUJUjaX2k4Unal8JUjIAiqMqRtD7S8CTtS2EqRkARVOVIWh9peJL2pTAVI6AIqnIkrY80PEn7UpiKEVAEVTmS1kcanqR9KUzFCCiCqhxJ6yMNT9K+FKZiBBRBVY6k9ZGGJ2lfClMxAoqgKkfS+kjDk7QvhakYAUVQlSNpfaThSdqXwlSMgCKoypG0PtLwJO1LYSpGQBFU5UhaH2l4kvalMBUjoAiqciStjzQ8SftSmIoRUARVOZLWRxqepH0pTMUIKIKqHEnrIw1P0r4UpmIEFEFVjqT1kYYnaV8KUzECiqAqR9L6SMOTtC+FqRgBRVCVI2l9pOFJ2pfCVIyAIqjKkbQ+0vAk7UthKkZAEVTlSFofaXiS9qUwFSOgCKpyJK2PNDxJ+1KYihFQBFU5ktZHGp6kfSlMxQgogqocSesjDU/SvhSmYgQUQVWOpPWRhidpXwpTMQKKoCpH0vpIw5O0L4WpGAFFUJUjaX2k4Unal8JUjIAiqMqRtD7S8CTtS2EqRkARVOVIWh9peJL2pTAVI6AIqnIkrY80PEn7UpiKEVAEVTmS1kcanqR9KUzFCCiCqhxJ6yMNT9K+FKZiBBRBVY6k9ZGGJ2lfClMxAoqgKkfS+kjDk7QvhakYAUVQlSNpfaThSdqXwlSMgCKoypG0PtLwJO1LYSpGQBFU5UhaH2l4kvalMBVrGFC91kcanipH0vpIw5O0L0/DI1AEVTmS1kcanqR9KUzFCCiCqhxJ6yMNT9K+FKZiBBRBVY6k9ZGGJ2lfClMxAoqgKkfS+kjDk7QvhakYAUVQlSNpfaThSdqXwlSMgCKoypG0PtLwJO1LYSpGQBFU5UhaH2l4kvalMBUjoAiqciStjzQ8SftSmIoRUARVOZLWRxqepH0pTMUIKIKqHEnrIw1P0r4UpmIEFEFVjqT1kYYnaV8KUzECiqAqR9L6SMOTtC+FqRgBRVCVI2l9pOFJ2pfCVIyAIqjKkbQ+0vAk7UthKkZAEVTlSFofaXiS9qUwFSOgCKpyJK2PNDxJ+1KYihFQBFU5ktZHGp6kfSlMxQgogqocSesjDU/SvhSmYgQUQVWOpPWRhidpXwpTMQKKoCpH0vpIw5O0L4WpGAFFUJUjaX2k4Unal8JUjIAiqMqRtD7S8CTtS2EqRkARVOVIWh9peJL2pTAVI6AIqnIkrY80PEn7UpiKEVAEVTmS1kcanqR9KUzFCCiCqhxJ6yMNT9K+FKZiBBRBVY6k9ZGGJ2lfClMxAoqgKkfS+kjDk7QvhakYAUVQlSNpfaThSdqXwlSMgCKoypG0PtLwJO1LYSpGQBFU5UhaH2l4kvalMBUjoAiqciStjzQ8SftSmIoRUARVOZLWRxqepH0pTMUIKIKqHEnrIw1P0r4UpmIEFEFVjqT1kYYnaV8KUzECiqAqR9L6SMOTtC+FqRgBRVCVI2l9pOFJ2pfCVIyAIqjKkbQ+0vAk7UthKkZAEVTlSFofaXiS9qUwFSOgCKpyJK2PNDxJ+1KYihFQBFU5ktZHGp6kfSlMxQgogqocSesjDU/SvhSmYgQUQVWOpPWRhidpXwpTMQKKoCpH0vpIw5O0L4WpGAFFUJUjaX2k4Unal8JUjIAiqMqRtD7S8CTtS2EqRkARVOVIWh9peJL2pTAVI6AIqnIkrY80PEn7UpiKEVAEVTmS1kcanqR9KUzFCCiCqhxJ6yMNT9K+FKZiBBRBVY6k9ZGGJ2lfClMxAoqgKkfS+kjDk7QvhakYAUVQlSNpfaThSdqXwlSMgCKoypG0PtLwJO1LYSpGQBFU5UhaH2l4kvalMBUjoAiqciStjzQ8SftSmIoRUARVOZLWRxqepH0pTMUIKIKqHEnrIw1P0r4UpmIEFEFVjqT1kYYnaV8KUzECiqAqR9L6SMOTtC+FqRgBRVCVI2l9pOFJ2pfCVIyAIqjKkbQ+0vAk7UthKkZAEVTlSFofaXiS9qUwFSOgCKpyJK2PNDxJ+1KYihFQBFU5ktZHGp6kfSlMxQgogqocSesjDU/SvhSmYgQUQVWOpPWRhidpXwpTMQKKoCpH0vpIw5O0L4WpGAFFUJUjaX2k4Unal8JUjIAiqMqRtD7S8CTtS2EqRkARVOVIWh9peJL2pTAVI6AIqnIkrY80PEn7UpiKEVAEVTmS1kcanqR9KUzFCCiCqhxJ6yMNT9K+FKZiBBRBVY6k9ZGGJ2lfClMxAoqgKkfS+kjDk7QvhakYAUVQlSNpfaThSdqXwlSMgCKoypG0PtLwJO1LYSpGQBFU5UhaH2l4kvalMBUjoAiqciStjzQ8SftSmIp5BPTxlb3p9N3rBBRKlSNpfaThSdqXwj+gjy5Ol175goBCqHIkrY80PEn7UvgH9Nr0/PX5g8vT87cIKHQqR9L6SMOTtC+Fe0Dv75XHno8unvuEgEKnciStjzQ8SftSuAf05vS19Y/vE1DoVI6k9ZGGJ2lfCveAXpt+WH68sw4pAYVE5UhaH2l4kval8A7o48vrT93v722+CPr8iv7van2k4alyJK2PNDxJ+/I0qQIKAJ48A2peyKR/dP3dxD2JToxEpWFAzeuYWt8TWXBPohMjUSGg2XBPohMjUfEOqOez8N9N3JPoxEhU3AO6ef2nw+tAv5u4J9GJkai4B9TxnUjfTdyT6MRIVNwD+vjy9FWn98J/N3FPohMjUXEP6PyB29WYvpu4J9GJkaj4B3T+4Mqin+/esr/c+p7IgnsSnRiJSoOAHqH1PZEF9yQ6MRIVUzECGh73JDoxEhVTMQIaHvckOjESFVMxAhoe9yQ6MRIVUzECGh73JDoxEhVTMQIaHvckOjESFVMxAhoe9yQ6MRIVUzECGh73JDoxEhVTMQIaHvckOjESFVMxAhoe9yQ6MRIVUzECGh73JDoxEhVTMQIaHvckOjESFVMxAhoe9yQ6MRIVUzECGh73JDoxEhVTMQIaHvckOjESFVMxAhoe9yQ6MRIVUzECGh73JDoxEhVTMQIaHvckOjESFVMxAhoe9yQ6MRIVUzECGh73JDoxEhVTMQIaHvckOjESFVMxAhoe9yQ6MRIVUzECGh73JDoxEhVTMQIaHvckOjESFVMxAhoe9yQ6MRIVUzECGh73JDoxEhVTMQIaHvckOjESFVOxhgGFxvPPt/43wOgxkoEQ0PA4G+jESAZCQMPjbKATIxkIAQ2Ps4FOjGQgBDQ8zgY6MZKBENDwOBvoxEgGQkDD42ygEyMZCAEFgEoEFAAqEVAAqERAAaASAQWASgQUACoRUACoREABoBIBDeHRxen7+z995Yum/y4Yk8eXp+dv7f/0w7b/Mt9BBDSERUDPfbL5KQHFgft7m/+23tlPKdwQ0BAWAZ2+tvkpAcWWm9PVIB5d3Pw3Fn4IaAiLw/E368/PCCgO2Xx55+bmP7FwREBDWFTzf+xtHmisfnxwZTqdvnu96b8WxuBO+fLO/fU+FsPYm05/en31858tRvLv/7bhv1x2BDSEZTXXjzDWAb2zOCUL53ja4Dvv8eXlMq6tP0O5vzWM9c95aDocAhrCsprrJ1lXAV0cjXf/9/zxv0z5uhfu75375P7e6hmkxSf0792aP/7X5RdGF4v5D4tf/Lc9RjIYAhpCqebqk7RVQDdf8LrGowssVnD+v6wjuRnGzen7PK3kgICGsKpmqWX56f5L/njpCrZfpPH48rqZy0eki5W8+j9b/nt9BxDQEFYBLY8oyk/3H1vwnDzmy/+OrmewaObG4lduLn989b/yn9jhENAQNs8cLR5vrgO6PjAEFPPV483yk+Vj0YOAzv/8N+Wn75HQoRDQEDadvDZ9n0egeMJWQM2XPR//9+Urmd5/2j8EAQIawqaTi/Px3/gaKKz9gD7t/fCP/5WRDIaAhrD/QPPO9K/2eBYexn5AF8NY/Wz5X9bNa+sPfhdqBDSEg8/Ur62+uLV6HehfrvA6UMy3E/no4vT89fn8z3uLR6LLKzUtfv7gMv+VHQwBDeEgoIty8k4kGFuPMdfDmL43P3gn0qt8nXwoBDSEreeKNhff4b3w2Lf9SfrqvfD/ePDzv/qPfAI/GAIKAJUIKABUIqAAUImAAkAlAgoAlQgoAFQioABQiYACQCUCCgCVCCgAVCKgAFCJgAJAJQIKAJUIKABUIqAAUImAAkAlAgoAlQgoAFQioABQiYACQCUCCgCVCCgAVCKgAFCJgAJAJQIKAJUIKABUIqAAUImAAkAlAgoAlQgoAFQioABQiYACQCUCCgCVCCgAVCKgAFCJgAJAJQIKAJUIKABUIqAAUImAAkAlAgoAlQgoAFQioABQiYACQCUCCgCVCCgAVCKgAFCJgAJAJQIKAJUIKABUIqAAUOn/A71FEGOQyBlxAAAAAElFTkSuQmCC">
@@ -9644,6 +8511,34 @@
       </p:sp>
       <p:sp>
         <p:nvSpPr>
+          <p:cNvPr id="6" name="Text Placeholder 2">
+            <a:extLst>
+              <a:ext uri="{FF2B5EF4-FFF2-40B4-BE49-F238E27FC236}">
+                <a16:creationId xmlns:a16="http://schemas.microsoft.com/office/drawing/2014/main" id="{B1B58E4D-B34A-214F-8F9B-C7FDAAE33622}"/>
+              </a:ext>
+            </a:extLst>
+          </p:cNvPr>
+          <p:cNvSpPr>
+            <a:spLocks noGrp="1"/>
+          </p:cNvSpPr>
+          <p:nvPr>
+            <p:ph type="body" idx="1"/>
+          </p:nvPr>
+        </p:nvSpPr>
+        <p:spPr/>
+        <p:txBody>
+          <a:bodyPr/>
+          <a:lstStyle/>
+          <a:p>
+            <a:r>
+              <a:rPr lang="en-US" dirty="0"/>
+              <a:t>Thank you for your time today!</a:t>
+            </a:r>
+          </a:p>
+        </p:txBody>
+      </p:sp>
+      <p:sp>
+        <p:nvSpPr>
           <p:cNvPr id="4" name="TextBox 3"/>
           <p:cNvSpPr txBox="1"/>
           <p:nvPr/>
@@ -9847,39 +8742,6 @@
               <a:t>Questions?</a:t>
             </a:r>
             <a:endParaRPr lang="en-US" dirty="0"/>
-          </a:p>
-        </p:txBody>
-      </p:sp>
-      <p:sp>
-        <p:nvSpPr>
-          <p:cNvPr id="6" name="Text Placeholder 2">
-            <a:extLst>
-              <a:ext uri="{FF2B5EF4-FFF2-40B4-BE49-F238E27FC236}">
-                <a16:creationId xmlns:a16="http://schemas.microsoft.com/office/drawing/2014/main" id="{B1B58E4D-B34A-214F-8F9B-C7FDAAE33622}"/>
-              </a:ext>
-            </a:extLst>
-          </p:cNvPr>
-          <p:cNvSpPr>
-            <a:spLocks noGrp="1"/>
-          </p:cNvSpPr>
-          <p:nvPr>
-            <p:ph type="body" idx="1"/>
-          </p:nvPr>
-        </p:nvSpPr>
-        <p:spPr>
-          <a:xfrm>
-            <a:off x="684213" y="4495800"/>
-            <a:ext cx="8534400" cy="1498600"/>
-          </a:xfrm>
-        </p:spPr>
-        <p:txBody>
-          <a:bodyPr/>
-          <a:lstStyle/>
-          <a:p>
-            <a:r>
-              <a:rPr lang="en-US" dirty="0"/>
-              <a:t>Thank you for your time today!</a:t>
-            </a:r>
           </a:p>
         </p:txBody>
       </p:sp>

</xml_diff>